<commit_message>
Add bootstrap to Reactjs
</commit_message>
<xml_diff>
--- a/tutorial/ReactjsTraining.pptx
+++ b/tutorial/ReactjsTraining.pptx
@@ -5,12 +5,16 @@
     <p:sldMasterId id="2147483648" r:id="rId1"/>
   </p:sldMasterIdLst>
   <p:notesMasterIdLst>
-    <p:notesMasterId r:id="rId5"/>
+    <p:notesMasterId r:id="rId9"/>
   </p:notesMasterIdLst>
   <p:sldIdLst>
     <p:sldId id="256" r:id="rId2"/>
     <p:sldId id="257" r:id="rId3"/>
     <p:sldId id="258" r:id="rId4"/>
+    <p:sldId id="259" r:id="rId5"/>
+    <p:sldId id="260" r:id="rId6"/>
+    <p:sldId id="262" r:id="rId7"/>
+    <p:sldId id="261" r:id="rId8"/>
   </p:sldIdLst>
   <p:sldSz cx="12192000" cy="6858000"/>
   <p:notesSz cx="6858000" cy="9144000"/>
@@ -109,6 +113,11 @@
       </a:defRPr>
     </a:lvl9pPr>
   </p:defaultTextStyle>
+  <p:extLst>
+    <p:ext uri="{EFAFB233-063F-42B5-8137-9DF3F51BA10A}">
+      <p15:sldGuideLst xmlns:p15="http://schemas.microsoft.com/office/powerpoint/2012/main"/>
+    </p:ext>
+  </p:extLst>
 </p:presentation>
 </file>
 
@@ -715,11 +724,91 @@
           <a:p>
             <a:r>
               <a:rPr lang="pl-PL" dirty="0"/>
-              <a:t>- tutaj pobranie przez grupę aplikacji z </a:t>
-            </a:r>
-            <a:r>
-              <a:rPr lang="pl-PL" dirty="0" err="1"/>
-              <a:t>repo</a:t>
+              <a:t>- </a:t>
+            </a:r>
+            <a:r>
+              <a:rPr lang="pl-PL" sz="1200" b="0" i="0" kern="1200" dirty="0" err="1">
+                <a:solidFill>
+                  <a:schemeClr val="tx1"/>
+                </a:solidFill>
+                <a:effectLst/>
+                <a:latin typeface="+mn-lt"/>
+                <a:ea typeface="+mn-ea"/>
+                <a:cs typeface="+mn-cs"/>
+              </a:rPr>
+              <a:t>Npm</a:t>
+            </a:r>
+            <a:r>
+              <a:rPr lang="pl-PL" sz="1200" b="0" i="0" kern="1200" dirty="0">
+                <a:solidFill>
+                  <a:schemeClr val="tx1"/>
+                </a:solidFill>
+                <a:effectLst/>
+                <a:latin typeface="+mn-lt"/>
+                <a:ea typeface="+mn-ea"/>
+                <a:cs typeface="+mn-cs"/>
+              </a:rPr>
+              <a:t> </a:t>
+            </a:r>
+            <a:r>
+              <a:rPr lang="pl-PL" sz="1200" b="0" i="0" kern="1200" dirty="0" err="1">
+                <a:solidFill>
+                  <a:schemeClr val="tx1"/>
+                </a:solidFill>
+                <a:effectLst/>
+                <a:latin typeface="+mn-lt"/>
+                <a:ea typeface="+mn-ea"/>
+                <a:cs typeface="+mn-cs"/>
+              </a:rPr>
+              <a:t>eject</a:t>
+            </a:r>
+            <a:r>
+              <a:rPr lang="pl-PL" sz="1200" b="0" i="0" kern="1200" dirty="0">
+                <a:solidFill>
+                  <a:schemeClr val="tx1"/>
+                </a:solidFill>
+                <a:effectLst/>
+                <a:latin typeface="+mn-lt"/>
+                <a:ea typeface="+mn-ea"/>
+                <a:cs typeface="+mn-cs"/>
+              </a:rPr>
+              <a:t> - </a:t>
+            </a:r>
+            <a:r>
+              <a:rPr lang="en-US" sz="1200" b="0" i="0" kern="1200" dirty="0">
+                <a:solidFill>
+                  <a:schemeClr val="tx1"/>
+                </a:solidFill>
+                <a:effectLst/>
+                <a:latin typeface="+mn-lt"/>
+                <a:ea typeface="+mn-ea"/>
+                <a:cs typeface="+mn-cs"/>
+              </a:rPr>
+              <a:t>This command will remove the single build dependency from your project.</a:t>
+            </a:r>
+            <a:r>
+              <a:rPr lang="pl-PL" sz="1200" b="0" i="0" kern="1200" dirty="0">
+                <a:solidFill>
+                  <a:schemeClr val="tx1"/>
+                </a:solidFill>
+                <a:effectLst/>
+                <a:latin typeface="+mn-lt"/>
+                <a:ea typeface="+mn-ea"/>
+                <a:cs typeface="+mn-cs"/>
+              </a:rPr>
+              <a:t> Od tej pory sami zarządzamy </a:t>
+            </a:r>
+            <a:r>
+              <a:rPr lang="pl-PL" sz="1200" b="0" i="0" kern="1200" dirty="0" err="1">
+                <a:solidFill>
+                  <a:schemeClr val="tx1"/>
+                </a:solidFill>
+                <a:effectLst/>
+                <a:latin typeface="+mn-lt"/>
+                <a:ea typeface="+mn-ea"/>
+                <a:cs typeface="+mn-cs"/>
+              </a:rPr>
+              <a:t>webpackiem</a:t>
             </a:r>
             <a:endParaRPr lang="pl-PL" dirty="0"/>
           </a:p>
@@ -800,6 +889,66 @@
               </a:rPr>
               <a:t> przy zachowaniu kompatybilności ze starszymi przeglądarkami.</a:t>
             </a:r>
+          </a:p>
+          <a:p>
+            <a:pPr marL="171450" indent="-171450">
+              <a:buFontTx/>
+              <a:buChar char="-"/>
+            </a:pPr>
+            <a:endParaRPr lang="pl-PL" sz="1200" b="0" i="0" kern="1200" dirty="0">
+              <a:solidFill>
+                <a:schemeClr val="tx1"/>
+              </a:solidFill>
+              <a:effectLst/>
+              <a:latin typeface="+mn-lt"/>
+              <a:ea typeface="+mn-ea"/>
+              <a:cs typeface="+mn-cs"/>
+            </a:endParaRPr>
+          </a:p>
+          <a:p>
+            <a:pPr marL="171450" marR="0" lvl="0" indent="-171450" algn="l" defTabSz="914400" rtl="0" eaLnBrk="1" fontAlgn="auto" latinLnBrk="0" hangingPunct="1">
+              <a:lnSpc>
+                <a:spcPct val="100000"/>
+              </a:lnSpc>
+              <a:spcBef>
+                <a:spcPts val="0"/>
+              </a:spcBef>
+              <a:spcAft>
+                <a:spcPts val="0"/>
+              </a:spcAft>
+              <a:buClrTx/>
+              <a:buSzTx/>
+              <a:buFontTx/>
+              <a:buChar char="-"/>
+              <a:tabLst/>
+              <a:defRPr/>
+            </a:pPr>
+            <a:r>
+              <a:rPr lang="pl-PL" dirty="0"/>
+              <a:t>tutaj pobranie przez grupę aplikacji z </a:t>
+            </a:r>
+            <a:r>
+              <a:rPr lang="pl-PL" dirty="0" err="1"/>
+              <a:t>repo</a:t>
+            </a:r>
+            <a:r>
+              <a:rPr lang="pl-PL" dirty="0"/>
+              <a:t>. Niech potem odpalą </a:t>
+            </a:r>
+            <a:r>
+              <a:rPr lang="pl-PL" dirty="0" err="1"/>
+              <a:t>npm</a:t>
+            </a:r>
+            <a:r>
+              <a:rPr lang="pl-PL" dirty="0"/>
+              <a:t> start</a:t>
+            </a:r>
+          </a:p>
+          <a:p>
+            <a:pPr marL="171450" indent="-171450">
+              <a:buFontTx/>
+              <a:buChar char="-"/>
+            </a:pPr>
             <a:endParaRPr lang="pl-PL" dirty="0"/>
           </a:p>
         </p:txBody>
@@ -831,6 +980,579 @@
     <p:extLst>
       <p:ext uri="{BB962C8B-B14F-4D97-AF65-F5344CB8AC3E}">
         <p14:creationId xmlns:p14="http://schemas.microsoft.com/office/powerpoint/2010/main" val="3844498564"/>
+      </p:ext>
+    </p:extLst>
+  </p:cSld>
+  <p:clrMapOvr>
+    <a:masterClrMapping/>
+  </p:clrMapOvr>
+</p:notes>
+</file>
+
+<file path=ppt/notesSlides/notesSlide4.xml><?xml version="1.0" encoding="utf-8"?>
+<p:notes xmlns:a="http://schemas.openxmlformats.org/drawingml/2006/main" xmlns:r="http://schemas.openxmlformats.org/officeDocument/2006/relationships" xmlns:p="http://schemas.openxmlformats.org/presentationml/2006/main">
+  <p:cSld>
+    <p:spTree>
+      <p:nvGrpSpPr>
+        <p:cNvPr id="1" name=""/>
+        <p:cNvGrpSpPr/>
+        <p:nvPr/>
+      </p:nvGrpSpPr>
+      <p:grpSpPr>
+        <a:xfrm>
+          <a:off x="0" y="0"/>
+          <a:ext cx="0" cy="0"/>
+          <a:chOff x="0" y="0"/>
+          <a:chExt cx="0" cy="0"/>
+        </a:xfrm>
+      </p:grpSpPr>
+      <p:sp>
+        <p:nvSpPr>
+          <p:cNvPr id="2" name="Symbol zastępczy obrazu slajdu 1"/>
+          <p:cNvSpPr>
+            <a:spLocks noGrp="1" noRot="1" noChangeAspect="1"/>
+          </p:cNvSpPr>
+          <p:nvPr>
+            <p:ph type="sldImg"/>
+          </p:nvPr>
+        </p:nvSpPr>
+        <p:spPr/>
+      </p:sp>
+      <p:sp>
+        <p:nvSpPr>
+          <p:cNvPr id="3" name="Symbol zastępczy notatek 2"/>
+          <p:cNvSpPr>
+            <a:spLocks noGrp="1"/>
+          </p:cNvSpPr>
+          <p:nvPr>
+            <p:ph type="body" idx="1"/>
+          </p:nvPr>
+        </p:nvSpPr>
+        <p:spPr/>
+        <p:txBody>
+          <a:bodyPr/>
+          <a:lstStyle/>
+          <a:p>
+            <a:r>
+              <a:rPr lang="pl-PL" dirty="0"/>
+              <a:t>- </a:t>
+            </a:r>
+            <a:r>
+              <a:rPr lang="pl-PL" sz="1200" b="0" i="0" kern="1200" dirty="0" err="1">
+                <a:solidFill>
+                  <a:schemeClr val="tx1"/>
+                </a:solidFill>
+                <a:effectLst/>
+                <a:latin typeface="+mn-lt"/>
+                <a:ea typeface="+mn-ea"/>
+                <a:cs typeface="+mn-cs"/>
+              </a:rPr>
+              <a:t>Npm</a:t>
+            </a:r>
+            <a:r>
+              <a:rPr lang="pl-PL" sz="1200" b="0" i="0" kern="1200" dirty="0">
+                <a:solidFill>
+                  <a:schemeClr val="tx1"/>
+                </a:solidFill>
+                <a:effectLst/>
+                <a:latin typeface="+mn-lt"/>
+                <a:ea typeface="+mn-ea"/>
+                <a:cs typeface="+mn-cs"/>
+              </a:rPr>
+              <a:t> </a:t>
+            </a:r>
+            <a:r>
+              <a:rPr lang="pl-PL" sz="1200" b="0" i="0" kern="1200" dirty="0" err="1">
+                <a:solidFill>
+                  <a:schemeClr val="tx1"/>
+                </a:solidFill>
+                <a:effectLst/>
+                <a:latin typeface="+mn-lt"/>
+                <a:ea typeface="+mn-ea"/>
+                <a:cs typeface="+mn-cs"/>
+              </a:rPr>
+              <a:t>eject</a:t>
+            </a:r>
+            <a:r>
+              <a:rPr lang="pl-PL" sz="1200" b="0" i="0" kern="1200" dirty="0">
+                <a:solidFill>
+                  <a:schemeClr val="tx1"/>
+                </a:solidFill>
+                <a:effectLst/>
+                <a:latin typeface="+mn-lt"/>
+                <a:ea typeface="+mn-ea"/>
+                <a:cs typeface="+mn-cs"/>
+              </a:rPr>
+              <a:t> - </a:t>
+            </a:r>
+            <a:r>
+              <a:rPr lang="en-US" sz="1200" b="0" i="0" kern="1200" dirty="0">
+                <a:solidFill>
+                  <a:schemeClr val="tx1"/>
+                </a:solidFill>
+                <a:effectLst/>
+                <a:latin typeface="+mn-lt"/>
+                <a:ea typeface="+mn-ea"/>
+                <a:cs typeface="+mn-cs"/>
+              </a:rPr>
+              <a:t>This command will remove the single build dependency from your project.</a:t>
+            </a:r>
+            <a:endParaRPr lang="pl-PL" dirty="0"/>
+          </a:p>
+          <a:p>
+            <a:pPr marL="171450" indent="-171450">
+              <a:buFontTx/>
+              <a:buChar char="-"/>
+            </a:pPr>
+            <a:r>
+              <a:rPr lang="pl-PL" dirty="0"/>
+              <a:t>wspomnieć o </a:t>
+            </a:r>
+            <a:r>
+              <a:rPr lang="pl-PL" dirty="0" err="1"/>
+              <a:t>Gatsby</a:t>
+            </a:r>
+            <a:r>
+              <a:rPr lang="pl-PL" dirty="0"/>
+              <a:t> – narzędzie z stronami startowymi dla </a:t>
+            </a:r>
+            <a:r>
+              <a:rPr lang="pl-PL" dirty="0" err="1"/>
+              <a:t>react</a:t>
+            </a:r>
+            <a:endParaRPr lang="pl-PL" dirty="0"/>
+          </a:p>
+          <a:p>
+            <a:pPr marL="171450" indent="-171450">
+              <a:buFontTx/>
+              <a:buChar char="-"/>
+            </a:pPr>
+            <a:r>
+              <a:rPr lang="pl-PL" sz="1200" b="0" i="0" u="none" strike="noStrike" kern="1200" dirty="0">
+                <a:solidFill>
+                  <a:schemeClr val="tx1"/>
+                </a:solidFill>
+                <a:effectLst/>
+                <a:latin typeface="+mn-lt"/>
+                <a:ea typeface="+mn-ea"/>
+                <a:cs typeface="+mn-cs"/>
+                <a:hlinkClick r:id="rId3"/>
+              </a:rPr>
+              <a:t>Babel</a:t>
+            </a:r>
+            <a:r>
+              <a:rPr lang="pl-PL" sz="1200" b="0" i="0" kern="1200" dirty="0">
+                <a:solidFill>
+                  <a:schemeClr val="tx1"/>
+                </a:solidFill>
+                <a:effectLst/>
+                <a:latin typeface="+mn-lt"/>
+                <a:ea typeface="+mn-ea"/>
+                <a:cs typeface="+mn-cs"/>
+              </a:rPr>
+              <a:t>. Pozwala on na stosowanie nowych wersji </a:t>
+            </a:r>
+            <a:r>
+              <a:rPr lang="pl-PL" sz="1200" b="0" i="0" kern="1200" dirty="0" err="1">
+                <a:solidFill>
+                  <a:schemeClr val="tx1"/>
+                </a:solidFill>
+                <a:effectLst/>
+                <a:latin typeface="+mn-lt"/>
+                <a:ea typeface="+mn-ea"/>
+                <a:cs typeface="+mn-cs"/>
+              </a:rPr>
+              <a:t>JavaScriptu</a:t>
+            </a:r>
+            <a:r>
+              <a:rPr lang="pl-PL" sz="1200" b="0" i="0" kern="1200" dirty="0">
+                <a:solidFill>
+                  <a:schemeClr val="tx1"/>
+                </a:solidFill>
+                <a:effectLst/>
+                <a:latin typeface="+mn-lt"/>
+                <a:ea typeface="+mn-ea"/>
+                <a:cs typeface="+mn-cs"/>
+              </a:rPr>
+              <a:t> przy zachowaniu kompatybilności ze starszymi przeglądarkami.</a:t>
+            </a:r>
+          </a:p>
+          <a:p>
+            <a:pPr marL="171450" indent="-171450">
+              <a:buFontTx/>
+              <a:buChar char="-"/>
+            </a:pPr>
+            <a:endParaRPr lang="pl-PL" sz="1200" b="0" i="0" kern="1200" dirty="0">
+              <a:solidFill>
+                <a:schemeClr val="tx1"/>
+              </a:solidFill>
+              <a:effectLst/>
+              <a:latin typeface="+mn-lt"/>
+              <a:ea typeface="+mn-ea"/>
+              <a:cs typeface="+mn-cs"/>
+            </a:endParaRPr>
+          </a:p>
+          <a:p>
+            <a:pPr marL="171450" marR="0" lvl="0" indent="-171450" algn="l" defTabSz="914400" rtl="0" eaLnBrk="1" fontAlgn="auto" latinLnBrk="0" hangingPunct="1">
+              <a:lnSpc>
+                <a:spcPct val="100000"/>
+              </a:lnSpc>
+              <a:spcBef>
+                <a:spcPts val="0"/>
+              </a:spcBef>
+              <a:spcAft>
+                <a:spcPts val="0"/>
+              </a:spcAft>
+              <a:buClrTx/>
+              <a:buSzTx/>
+              <a:buFontTx/>
+              <a:buChar char="-"/>
+              <a:tabLst/>
+              <a:defRPr/>
+            </a:pPr>
+            <a:r>
+              <a:rPr lang="pl-PL" dirty="0"/>
+              <a:t>tutaj pobranie przez grupę aplikacji z </a:t>
+            </a:r>
+            <a:r>
+              <a:rPr lang="pl-PL" dirty="0" err="1"/>
+              <a:t>repo</a:t>
+            </a:r>
+            <a:r>
+              <a:rPr lang="pl-PL" dirty="0"/>
+              <a:t>. Niech potem odpalą </a:t>
+            </a:r>
+            <a:r>
+              <a:rPr lang="pl-PL" dirty="0" err="1"/>
+              <a:t>npm</a:t>
+            </a:r>
+            <a:r>
+              <a:rPr lang="pl-PL" dirty="0"/>
+              <a:t> start</a:t>
+            </a:r>
+          </a:p>
+          <a:p>
+            <a:pPr marL="171450" indent="-171450">
+              <a:buFontTx/>
+              <a:buChar char="-"/>
+            </a:pPr>
+            <a:endParaRPr lang="pl-PL" dirty="0"/>
+          </a:p>
+        </p:txBody>
+      </p:sp>
+      <p:sp>
+        <p:nvSpPr>
+          <p:cNvPr id="4" name="Symbol zastępczy numeru slajdu 3"/>
+          <p:cNvSpPr>
+            <a:spLocks noGrp="1"/>
+          </p:cNvSpPr>
+          <p:nvPr>
+            <p:ph type="sldNum" sz="quarter" idx="5"/>
+          </p:nvPr>
+        </p:nvSpPr>
+        <p:spPr/>
+        <p:txBody>
+          <a:bodyPr/>
+          <a:lstStyle/>
+          <a:p>
+            <a:fld id="{810A6612-7A23-4B98-B0E9-4F3C882AD2EF}" type="slidenum">
+              <a:rPr lang="pl-PL" smtClean="0"/>
+              <a:t>4</a:t>
+            </a:fld>
+            <a:endParaRPr lang="pl-PL"/>
+          </a:p>
+        </p:txBody>
+      </p:sp>
+    </p:spTree>
+    <p:extLst>
+      <p:ext uri="{BB962C8B-B14F-4D97-AF65-F5344CB8AC3E}">
+        <p14:creationId xmlns:p14="http://schemas.microsoft.com/office/powerpoint/2010/main" val="2567423790"/>
+      </p:ext>
+    </p:extLst>
+  </p:cSld>
+  <p:clrMapOvr>
+    <a:masterClrMapping/>
+  </p:clrMapOvr>
+</p:notes>
+</file>
+
+<file path=ppt/notesSlides/notesSlide5.xml><?xml version="1.0" encoding="utf-8"?>
+<p:notes xmlns:a="http://schemas.openxmlformats.org/drawingml/2006/main" xmlns:r="http://schemas.openxmlformats.org/officeDocument/2006/relationships" xmlns:p="http://schemas.openxmlformats.org/presentationml/2006/main">
+  <p:cSld>
+    <p:spTree>
+      <p:nvGrpSpPr>
+        <p:cNvPr id="1" name=""/>
+        <p:cNvGrpSpPr/>
+        <p:nvPr/>
+      </p:nvGrpSpPr>
+      <p:grpSpPr>
+        <a:xfrm>
+          <a:off x="0" y="0"/>
+          <a:ext cx="0" cy="0"/>
+          <a:chOff x="0" y="0"/>
+          <a:chExt cx="0" cy="0"/>
+        </a:xfrm>
+      </p:grpSpPr>
+      <p:sp>
+        <p:nvSpPr>
+          <p:cNvPr id="2" name="Symbol zastępczy obrazu slajdu 1"/>
+          <p:cNvSpPr>
+            <a:spLocks noGrp="1" noRot="1" noChangeAspect="1"/>
+          </p:cNvSpPr>
+          <p:nvPr>
+            <p:ph type="sldImg"/>
+          </p:nvPr>
+        </p:nvSpPr>
+        <p:spPr/>
+      </p:sp>
+      <p:sp>
+        <p:nvSpPr>
+          <p:cNvPr id="3" name="Symbol zastępczy notatek 2"/>
+          <p:cNvSpPr>
+            <a:spLocks noGrp="1"/>
+          </p:cNvSpPr>
+          <p:nvPr>
+            <p:ph type="body" idx="1"/>
+          </p:nvPr>
+        </p:nvSpPr>
+        <p:spPr/>
+        <p:txBody>
+          <a:bodyPr/>
+          <a:lstStyle/>
+          <a:p>
+            <a:r>
+              <a:rPr lang="pl-PL" dirty="0"/>
+              <a:t>TODO: Coś o </a:t>
+            </a:r>
+            <a:r>
+              <a:rPr lang="pl-PL" dirty="0" err="1"/>
+              <a:t>serviceWorker</a:t>
+            </a:r>
+            <a:endParaRPr lang="pl-PL" dirty="0"/>
+          </a:p>
+          <a:p>
+            <a:pPr marL="171450" indent="-171450">
+              <a:buFontTx/>
+              <a:buChar char="-"/>
+            </a:pPr>
+            <a:endParaRPr lang="pl-PL" dirty="0"/>
+          </a:p>
+        </p:txBody>
+      </p:sp>
+      <p:sp>
+        <p:nvSpPr>
+          <p:cNvPr id="4" name="Symbol zastępczy numeru slajdu 3"/>
+          <p:cNvSpPr>
+            <a:spLocks noGrp="1"/>
+          </p:cNvSpPr>
+          <p:nvPr>
+            <p:ph type="sldNum" sz="quarter" idx="5"/>
+          </p:nvPr>
+        </p:nvSpPr>
+        <p:spPr/>
+        <p:txBody>
+          <a:bodyPr/>
+          <a:lstStyle/>
+          <a:p>
+            <a:fld id="{810A6612-7A23-4B98-B0E9-4F3C882AD2EF}" type="slidenum">
+              <a:rPr lang="pl-PL" smtClean="0"/>
+              <a:t>5</a:t>
+            </a:fld>
+            <a:endParaRPr lang="pl-PL"/>
+          </a:p>
+        </p:txBody>
+      </p:sp>
+    </p:spTree>
+    <p:extLst>
+      <p:ext uri="{BB962C8B-B14F-4D97-AF65-F5344CB8AC3E}">
+        <p14:creationId xmlns:p14="http://schemas.microsoft.com/office/powerpoint/2010/main" val="1883018751"/>
+      </p:ext>
+    </p:extLst>
+  </p:cSld>
+  <p:clrMapOvr>
+    <a:masterClrMapping/>
+  </p:clrMapOvr>
+</p:notes>
+</file>
+
+<file path=ppt/notesSlides/notesSlide6.xml><?xml version="1.0" encoding="utf-8"?>
+<p:notes xmlns:a="http://schemas.openxmlformats.org/drawingml/2006/main" xmlns:r="http://schemas.openxmlformats.org/officeDocument/2006/relationships" xmlns:p="http://schemas.openxmlformats.org/presentationml/2006/main">
+  <p:cSld>
+    <p:spTree>
+      <p:nvGrpSpPr>
+        <p:cNvPr id="1" name=""/>
+        <p:cNvGrpSpPr/>
+        <p:nvPr/>
+      </p:nvGrpSpPr>
+      <p:grpSpPr>
+        <a:xfrm>
+          <a:off x="0" y="0"/>
+          <a:ext cx="0" cy="0"/>
+          <a:chOff x="0" y="0"/>
+          <a:chExt cx="0" cy="0"/>
+        </a:xfrm>
+      </p:grpSpPr>
+      <p:sp>
+        <p:nvSpPr>
+          <p:cNvPr id="2" name="Symbol zastępczy obrazu slajdu 1"/>
+          <p:cNvSpPr>
+            <a:spLocks noGrp="1" noRot="1" noChangeAspect="1"/>
+          </p:cNvSpPr>
+          <p:nvPr>
+            <p:ph type="sldImg"/>
+          </p:nvPr>
+        </p:nvSpPr>
+        <p:spPr/>
+      </p:sp>
+      <p:sp>
+        <p:nvSpPr>
+          <p:cNvPr id="3" name="Symbol zastępczy notatek 2"/>
+          <p:cNvSpPr>
+            <a:spLocks noGrp="1"/>
+          </p:cNvSpPr>
+          <p:nvPr>
+            <p:ph type="body" idx="1"/>
+          </p:nvPr>
+        </p:nvSpPr>
+        <p:spPr/>
+        <p:txBody>
+          <a:bodyPr/>
+          <a:lstStyle/>
+          <a:p>
+            <a:r>
+              <a:rPr lang="pl-PL" dirty="0"/>
+              <a:t>TODO: Coś o </a:t>
+            </a:r>
+            <a:r>
+              <a:rPr lang="pl-PL" dirty="0" err="1"/>
+              <a:t>serviceWorker</a:t>
+            </a:r>
+            <a:endParaRPr lang="pl-PL" dirty="0"/>
+          </a:p>
+          <a:p>
+            <a:pPr marL="171450" indent="-171450">
+              <a:buFontTx/>
+              <a:buChar char="-"/>
+            </a:pPr>
+            <a:endParaRPr lang="pl-PL" dirty="0"/>
+          </a:p>
+        </p:txBody>
+      </p:sp>
+      <p:sp>
+        <p:nvSpPr>
+          <p:cNvPr id="4" name="Symbol zastępczy numeru slajdu 3"/>
+          <p:cNvSpPr>
+            <a:spLocks noGrp="1"/>
+          </p:cNvSpPr>
+          <p:nvPr>
+            <p:ph type="sldNum" sz="quarter" idx="5"/>
+          </p:nvPr>
+        </p:nvSpPr>
+        <p:spPr/>
+        <p:txBody>
+          <a:bodyPr/>
+          <a:lstStyle/>
+          <a:p>
+            <a:fld id="{810A6612-7A23-4B98-B0E9-4F3C882AD2EF}" type="slidenum">
+              <a:rPr lang="pl-PL" smtClean="0"/>
+              <a:t>6</a:t>
+            </a:fld>
+            <a:endParaRPr lang="pl-PL"/>
+          </a:p>
+        </p:txBody>
+      </p:sp>
+    </p:spTree>
+    <p:extLst>
+      <p:ext uri="{BB962C8B-B14F-4D97-AF65-F5344CB8AC3E}">
+        <p14:creationId xmlns:p14="http://schemas.microsoft.com/office/powerpoint/2010/main" val="3718335960"/>
+      </p:ext>
+    </p:extLst>
+  </p:cSld>
+  <p:clrMapOvr>
+    <a:masterClrMapping/>
+  </p:clrMapOvr>
+</p:notes>
+</file>
+
+<file path=ppt/notesSlides/notesSlide7.xml><?xml version="1.0" encoding="utf-8"?>
+<p:notes xmlns:a="http://schemas.openxmlformats.org/drawingml/2006/main" xmlns:r="http://schemas.openxmlformats.org/officeDocument/2006/relationships" xmlns:p="http://schemas.openxmlformats.org/presentationml/2006/main">
+  <p:cSld>
+    <p:spTree>
+      <p:nvGrpSpPr>
+        <p:cNvPr id="1" name=""/>
+        <p:cNvGrpSpPr/>
+        <p:nvPr/>
+      </p:nvGrpSpPr>
+      <p:grpSpPr>
+        <a:xfrm>
+          <a:off x="0" y="0"/>
+          <a:ext cx="0" cy="0"/>
+          <a:chOff x="0" y="0"/>
+          <a:chExt cx="0" cy="0"/>
+        </a:xfrm>
+      </p:grpSpPr>
+      <p:sp>
+        <p:nvSpPr>
+          <p:cNvPr id="2" name="Symbol zastępczy obrazu slajdu 1"/>
+          <p:cNvSpPr>
+            <a:spLocks noGrp="1" noRot="1" noChangeAspect="1"/>
+          </p:cNvSpPr>
+          <p:nvPr>
+            <p:ph type="sldImg"/>
+          </p:nvPr>
+        </p:nvSpPr>
+        <p:spPr/>
+      </p:sp>
+      <p:sp>
+        <p:nvSpPr>
+          <p:cNvPr id="3" name="Symbol zastępczy notatek 2"/>
+          <p:cNvSpPr>
+            <a:spLocks noGrp="1"/>
+          </p:cNvSpPr>
+          <p:nvPr>
+            <p:ph type="body" idx="1"/>
+          </p:nvPr>
+        </p:nvSpPr>
+        <p:spPr/>
+        <p:txBody>
+          <a:bodyPr/>
+          <a:lstStyle/>
+          <a:p>
+            <a:pPr marL="171450" indent="-171450">
+              <a:buFontTx/>
+              <a:buChar char="-"/>
+            </a:pPr>
+            <a:endParaRPr lang="pl-PL" dirty="0"/>
+          </a:p>
+        </p:txBody>
+      </p:sp>
+      <p:sp>
+        <p:nvSpPr>
+          <p:cNvPr id="4" name="Symbol zastępczy numeru slajdu 3"/>
+          <p:cNvSpPr>
+            <a:spLocks noGrp="1"/>
+          </p:cNvSpPr>
+          <p:nvPr>
+            <p:ph type="sldNum" sz="quarter" idx="5"/>
+          </p:nvPr>
+        </p:nvSpPr>
+        <p:spPr/>
+        <p:txBody>
+          <a:bodyPr/>
+          <a:lstStyle/>
+          <a:p>
+            <a:fld id="{810A6612-7A23-4B98-B0E9-4F3C882AD2EF}" type="slidenum">
+              <a:rPr lang="pl-PL" smtClean="0"/>
+              <a:t>7</a:t>
+            </a:fld>
+            <a:endParaRPr lang="pl-PL"/>
+          </a:p>
+        </p:txBody>
+      </p:sp>
+    </p:spTree>
+    <p:extLst>
+      <p:ext uri="{BB962C8B-B14F-4D97-AF65-F5344CB8AC3E}">
+        <p14:creationId xmlns:p14="http://schemas.microsoft.com/office/powerpoint/2010/main" val="667249772"/>
       </p:ext>
     </p:extLst>
   </p:cSld>
@@ -4760,6 +5482,2193 @@
     <p:extLst>
       <p:ext uri="{BB962C8B-B14F-4D97-AF65-F5344CB8AC3E}">
         <p14:creationId xmlns:p14="http://schemas.microsoft.com/office/powerpoint/2010/main" val="3337891046"/>
+      </p:ext>
+    </p:extLst>
+  </p:cSld>
+  <p:clrMapOvr>
+    <a:masterClrMapping/>
+  </p:clrMapOvr>
+</p:sld>
+</file>
+
+<file path=ppt/slides/slide4.xml><?xml version="1.0" encoding="utf-8"?>
+<p:sld xmlns:a="http://schemas.openxmlformats.org/drawingml/2006/main" xmlns:r="http://schemas.openxmlformats.org/officeDocument/2006/relationships" xmlns:p="http://schemas.openxmlformats.org/presentationml/2006/main">
+  <p:cSld>
+    <p:spTree>
+      <p:nvGrpSpPr>
+        <p:cNvPr id="1" name=""/>
+        <p:cNvGrpSpPr/>
+        <p:nvPr/>
+      </p:nvGrpSpPr>
+      <p:grpSpPr>
+        <a:xfrm>
+          <a:off x="0" y="0"/>
+          <a:ext cx="0" cy="0"/>
+          <a:chOff x="0" y="0"/>
+          <a:chExt cx="0" cy="0"/>
+        </a:xfrm>
+      </p:grpSpPr>
+      <p:sp>
+        <p:nvSpPr>
+          <p:cNvPr id="4" name="pole tekstowe 3">
+            <a:extLst>
+              <a:ext uri="{FF2B5EF4-FFF2-40B4-BE49-F238E27FC236}">
+                <a16:creationId xmlns:a16="http://schemas.microsoft.com/office/drawing/2014/main" id="{F164A7B3-8808-414C-9401-3B25194E3B5A}"/>
+              </a:ext>
+            </a:extLst>
+          </p:cNvPr>
+          <p:cNvSpPr txBox="1"/>
+          <p:nvPr/>
+        </p:nvSpPr>
+        <p:spPr>
+          <a:xfrm>
+            <a:off x="497840" y="538480"/>
+            <a:ext cx="2810321" cy="369332"/>
+          </a:xfrm>
+          <a:prstGeom prst="rect">
+            <a:avLst/>
+          </a:prstGeom>
+          <a:noFill/>
+        </p:spPr>
+        <p:txBody>
+          <a:bodyPr wrap="none" rtlCol="0">
+            <a:spAutoFit/>
+          </a:bodyPr>
+          <a:lstStyle/>
+          <a:p>
+            <a:r>
+              <a:rPr lang="pl-PL" dirty="0" err="1"/>
+              <a:t>Reactjs</a:t>
+            </a:r>
+            <a:r>
+              <a:rPr lang="pl-PL" dirty="0"/>
+              <a:t> – vs </a:t>
+            </a:r>
+            <a:r>
+              <a:rPr lang="pl-PL" dirty="0" err="1"/>
+              <a:t>code</a:t>
+            </a:r>
+            <a:r>
+              <a:rPr lang="pl-PL" dirty="0"/>
+              <a:t> </a:t>
+            </a:r>
+            <a:r>
+              <a:rPr lang="pl-PL" dirty="0" err="1"/>
+              <a:t>debugging</a:t>
+            </a:r>
+            <a:endParaRPr lang="pl-PL" dirty="0"/>
+          </a:p>
+        </p:txBody>
+      </p:sp>
+      <p:sp>
+        <p:nvSpPr>
+          <p:cNvPr id="3" name="Prostokąt 2">
+            <a:extLst>
+              <a:ext uri="{FF2B5EF4-FFF2-40B4-BE49-F238E27FC236}">
+                <a16:creationId xmlns:a16="http://schemas.microsoft.com/office/drawing/2014/main" id="{D60382DB-7209-4922-86CF-C7658E613D12}"/>
+              </a:ext>
+            </a:extLst>
+          </p:cNvPr>
+          <p:cNvSpPr/>
+          <p:nvPr/>
+        </p:nvSpPr>
+        <p:spPr>
+          <a:xfrm>
+            <a:off x="3180522" y="2273541"/>
+            <a:ext cx="6096000" cy="1754326"/>
+          </a:xfrm>
+          <a:prstGeom prst="rect">
+            <a:avLst/>
+          </a:prstGeom>
+          <a:solidFill>
+            <a:schemeClr val="tx1"/>
+          </a:solidFill>
+        </p:spPr>
+        <p:txBody>
+          <a:bodyPr>
+            <a:spAutoFit/>
+          </a:bodyPr>
+          <a:lstStyle/>
+          <a:p>
+            <a:r>
+              <a:rPr lang="en-US" b="0" dirty="0">
+                <a:solidFill>
+                  <a:srgbClr val="9CDCFE"/>
+                </a:solidFill>
+                <a:effectLst/>
+                <a:latin typeface="Consolas" panose="020B0609020204030204" pitchFamily="49" charset="0"/>
+              </a:rPr>
+              <a:t>"scripts"</a:t>
+            </a:r>
+            <a:r>
+              <a:rPr lang="en-US" b="0" dirty="0">
+                <a:solidFill>
+                  <a:srgbClr val="D4D4D4"/>
+                </a:solidFill>
+                <a:effectLst/>
+                <a:latin typeface="Consolas" panose="020B0609020204030204" pitchFamily="49" charset="0"/>
+              </a:rPr>
+              <a:t>: {</a:t>
+            </a:r>
+          </a:p>
+          <a:p>
+            <a:r>
+              <a:rPr lang="en-US" b="0" dirty="0">
+                <a:solidFill>
+                  <a:srgbClr val="D4D4D4"/>
+                </a:solidFill>
+                <a:effectLst/>
+                <a:latin typeface="Consolas" panose="020B0609020204030204" pitchFamily="49" charset="0"/>
+              </a:rPr>
+              <a:t>    </a:t>
+            </a:r>
+            <a:r>
+              <a:rPr lang="en-US" b="0" dirty="0">
+                <a:solidFill>
+                  <a:srgbClr val="9CDCFE"/>
+                </a:solidFill>
+                <a:effectLst/>
+                <a:latin typeface="Consolas" panose="020B0609020204030204" pitchFamily="49" charset="0"/>
+              </a:rPr>
+              <a:t>"start"</a:t>
+            </a:r>
+            <a:r>
+              <a:rPr lang="en-US" b="0" dirty="0">
+                <a:solidFill>
+                  <a:srgbClr val="D4D4D4"/>
+                </a:solidFill>
+                <a:effectLst/>
+                <a:latin typeface="Consolas" panose="020B0609020204030204" pitchFamily="49" charset="0"/>
+              </a:rPr>
+              <a:t>: </a:t>
+            </a:r>
+            <a:r>
+              <a:rPr lang="en-US" b="0" dirty="0">
+                <a:solidFill>
+                  <a:srgbClr val="CE9178"/>
+                </a:solidFill>
+                <a:effectLst/>
+                <a:latin typeface="Consolas" panose="020B0609020204030204" pitchFamily="49" charset="0"/>
+              </a:rPr>
+              <a:t>"react-scripts start"</a:t>
+            </a:r>
+            <a:r>
+              <a:rPr lang="en-US" b="0" dirty="0">
+                <a:solidFill>
+                  <a:srgbClr val="D4D4D4"/>
+                </a:solidFill>
+                <a:effectLst/>
+                <a:latin typeface="Consolas" panose="020B0609020204030204" pitchFamily="49" charset="0"/>
+              </a:rPr>
+              <a:t>,</a:t>
+            </a:r>
+          </a:p>
+          <a:p>
+            <a:r>
+              <a:rPr lang="en-US" b="0" dirty="0">
+                <a:solidFill>
+                  <a:srgbClr val="D4D4D4"/>
+                </a:solidFill>
+                <a:effectLst/>
+                <a:latin typeface="Consolas" panose="020B0609020204030204" pitchFamily="49" charset="0"/>
+              </a:rPr>
+              <a:t>    </a:t>
+            </a:r>
+            <a:r>
+              <a:rPr lang="en-US" b="0" dirty="0">
+                <a:solidFill>
+                  <a:srgbClr val="9CDCFE"/>
+                </a:solidFill>
+                <a:effectLst/>
+                <a:latin typeface="Consolas" panose="020B0609020204030204" pitchFamily="49" charset="0"/>
+              </a:rPr>
+              <a:t>"build"</a:t>
+            </a:r>
+            <a:r>
+              <a:rPr lang="en-US" b="0" dirty="0">
+                <a:solidFill>
+                  <a:srgbClr val="D4D4D4"/>
+                </a:solidFill>
+                <a:effectLst/>
+                <a:latin typeface="Consolas" panose="020B0609020204030204" pitchFamily="49" charset="0"/>
+              </a:rPr>
+              <a:t>: </a:t>
+            </a:r>
+            <a:r>
+              <a:rPr lang="en-US" b="0" dirty="0">
+                <a:solidFill>
+                  <a:srgbClr val="CE9178"/>
+                </a:solidFill>
+                <a:effectLst/>
+                <a:latin typeface="Consolas" panose="020B0609020204030204" pitchFamily="49" charset="0"/>
+              </a:rPr>
+              <a:t>"react-scripts build"</a:t>
+            </a:r>
+            <a:r>
+              <a:rPr lang="en-US" b="0" dirty="0">
+                <a:solidFill>
+                  <a:srgbClr val="D4D4D4"/>
+                </a:solidFill>
+                <a:effectLst/>
+                <a:latin typeface="Consolas" panose="020B0609020204030204" pitchFamily="49" charset="0"/>
+              </a:rPr>
+              <a:t>,</a:t>
+            </a:r>
+          </a:p>
+          <a:p>
+            <a:r>
+              <a:rPr lang="en-US" b="0" dirty="0">
+                <a:solidFill>
+                  <a:srgbClr val="D4D4D4"/>
+                </a:solidFill>
+                <a:effectLst/>
+                <a:latin typeface="Consolas" panose="020B0609020204030204" pitchFamily="49" charset="0"/>
+              </a:rPr>
+              <a:t>    </a:t>
+            </a:r>
+            <a:r>
+              <a:rPr lang="en-US" b="0" dirty="0">
+                <a:solidFill>
+                  <a:srgbClr val="9CDCFE"/>
+                </a:solidFill>
+                <a:effectLst/>
+                <a:latin typeface="Consolas" panose="020B0609020204030204" pitchFamily="49" charset="0"/>
+              </a:rPr>
+              <a:t>"test"</a:t>
+            </a:r>
+            <a:r>
+              <a:rPr lang="en-US" b="0" dirty="0">
+                <a:solidFill>
+                  <a:srgbClr val="D4D4D4"/>
+                </a:solidFill>
+                <a:effectLst/>
+                <a:latin typeface="Consolas" panose="020B0609020204030204" pitchFamily="49" charset="0"/>
+              </a:rPr>
+              <a:t>: </a:t>
+            </a:r>
+            <a:r>
+              <a:rPr lang="en-US" b="0" dirty="0">
+                <a:solidFill>
+                  <a:srgbClr val="CE9178"/>
+                </a:solidFill>
+                <a:effectLst/>
+                <a:latin typeface="Consolas" panose="020B0609020204030204" pitchFamily="49" charset="0"/>
+              </a:rPr>
+              <a:t>"react-scripts test"</a:t>
+            </a:r>
+            <a:r>
+              <a:rPr lang="en-US" b="0" dirty="0">
+                <a:solidFill>
+                  <a:srgbClr val="D4D4D4"/>
+                </a:solidFill>
+                <a:effectLst/>
+                <a:latin typeface="Consolas" panose="020B0609020204030204" pitchFamily="49" charset="0"/>
+              </a:rPr>
+              <a:t>,</a:t>
+            </a:r>
+          </a:p>
+          <a:p>
+            <a:r>
+              <a:rPr lang="en-US" b="0" dirty="0">
+                <a:solidFill>
+                  <a:srgbClr val="D4D4D4"/>
+                </a:solidFill>
+                <a:effectLst/>
+                <a:latin typeface="Consolas" panose="020B0609020204030204" pitchFamily="49" charset="0"/>
+              </a:rPr>
+              <a:t>    </a:t>
+            </a:r>
+            <a:r>
+              <a:rPr lang="en-US" b="0" dirty="0">
+                <a:solidFill>
+                  <a:srgbClr val="9CDCFE"/>
+                </a:solidFill>
+                <a:effectLst/>
+                <a:latin typeface="Consolas" panose="020B0609020204030204" pitchFamily="49" charset="0"/>
+              </a:rPr>
+              <a:t>"eject"</a:t>
+            </a:r>
+            <a:r>
+              <a:rPr lang="en-US" b="0" dirty="0">
+                <a:solidFill>
+                  <a:srgbClr val="D4D4D4"/>
+                </a:solidFill>
+                <a:effectLst/>
+                <a:latin typeface="Consolas" panose="020B0609020204030204" pitchFamily="49" charset="0"/>
+              </a:rPr>
+              <a:t>: </a:t>
+            </a:r>
+            <a:r>
+              <a:rPr lang="en-US" b="0" dirty="0">
+                <a:solidFill>
+                  <a:srgbClr val="CE9178"/>
+                </a:solidFill>
+                <a:effectLst/>
+                <a:latin typeface="Consolas" panose="020B0609020204030204" pitchFamily="49" charset="0"/>
+              </a:rPr>
+              <a:t>"react-scripts eject"</a:t>
+            </a:r>
+            <a:endParaRPr lang="en-US" b="0" dirty="0">
+              <a:solidFill>
+                <a:srgbClr val="D4D4D4"/>
+              </a:solidFill>
+              <a:effectLst/>
+              <a:latin typeface="Consolas" panose="020B0609020204030204" pitchFamily="49" charset="0"/>
+            </a:endParaRPr>
+          </a:p>
+          <a:p>
+            <a:r>
+              <a:rPr lang="en-US" b="0" dirty="0">
+                <a:solidFill>
+                  <a:srgbClr val="D4D4D4"/>
+                </a:solidFill>
+                <a:effectLst/>
+                <a:latin typeface="Consolas" panose="020B0609020204030204" pitchFamily="49" charset="0"/>
+              </a:rPr>
+              <a:t>  },</a:t>
+            </a:r>
+          </a:p>
+        </p:txBody>
+      </p:sp>
+      <p:sp>
+        <p:nvSpPr>
+          <p:cNvPr id="6" name="Prostokąt 5">
+            <a:extLst>
+              <a:ext uri="{FF2B5EF4-FFF2-40B4-BE49-F238E27FC236}">
+                <a16:creationId xmlns:a16="http://schemas.microsoft.com/office/drawing/2014/main" id="{307D64CC-1E64-4EDB-BF81-40AC355E07C6}"/>
+              </a:ext>
+            </a:extLst>
+          </p:cNvPr>
+          <p:cNvSpPr/>
+          <p:nvPr/>
+        </p:nvSpPr>
+        <p:spPr>
+          <a:xfrm>
+            <a:off x="7988253" y="4027867"/>
+            <a:ext cx="1393843" cy="369332"/>
+          </a:xfrm>
+          <a:prstGeom prst="rect">
+            <a:avLst/>
+          </a:prstGeom>
+        </p:spPr>
+        <p:txBody>
+          <a:bodyPr wrap="none">
+            <a:spAutoFit/>
+          </a:bodyPr>
+          <a:lstStyle/>
+          <a:p>
+            <a:r>
+              <a:rPr lang="pl-PL" dirty="0" err="1"/>
+              <a:t>package.json</a:t>
+            </a:r>
+            <a:endParaRPr lang="pl-PL" dirty="0"/>
+          </a:p>
+        </p:txBody>
+      </p:sp>
+    </p:spTree>
+    <p:extLst>
+      <p:ext uri="{BB962C8B-B14F-4D97-AF65-F5344CB8AC3E}">
+        <p14:creationId xmlns:p14="http://schemas.microsoft.com/office/powerpoint/2010/main" val="2384723857"/>
+      </p:ext>
+    </p:extLst>
+  </p:cSld>
+  <p:clrMapOvr>
+    <a:masterClrMapping/>
+  </p:clrMapOvr>
+</p:sld>
+</file>
+
+<file path=ppt/slides/slide5.xml><?xml version="1.0" encoding="utf-8"?>
+<p:sld xmlns:a="http://schemas.openxmlformats.org/drawingml/2006/main" xmlns:r="http://schemas.openxmlformats.org/officeDocument/2006/relationships" xmlns:p="http://schemas.openxmlformats.org/presentationml/2006/main">
+  <p:cSld>
+    <p:spTree>
+      <p:nvGrpSpPr>
+        <p:cNvPr id="1" name=""/>
+        <p:cNvGrpSpPr/>
+        <p:nvPr/>
+      </p:nvGrpSpPr>
+      <p:grpSpPr>
+        <a:xfrm>
+          <a:off x="0" y="0"/>
+          <a:ext cx="0" cy="0"/>
+          <a:chOff x="0" y="0"/>
+          <a:chExt cx="0" cy="0"/>
+        </a:xfrm>
+      </p:grpSpPr>
+      <p:sp>
+        <p:nvSpPr>
+          <p:cNvPr id="4" name="pole tekstowe 3">
+            <a:extLst>
+              <a:ext uri="{FF2B5EF4-FFF2-40B4-BE49-F238E27FC236}">
+                <a16:creationId xmlns:a16="http://schemas.microsoft.com/office/drawing/2014/main" id="{F164A7B3-8808-414C-9401-3B25194E3B5A}"/>
+              </a:ext>
+            </a:extLst>
+          </p:cNvPr>
+          <p:cNvSpPr txBox="1"/>
+          <p:nvPr/>
+        </p:nvSpPr>
+        <p:spPr>
+          <a:xfrm>
+            <a:off x="497840" y="538480"/>
+            <a:ext cx="755079" cy="369332"/>
+          </a:xfrm>
+          <a:prstGeom prst="rect">
+            <a:avLst/>
+          </a:prstGeom>
+          <a:noFill/>
+        </p:spPr>
+        <p:txBody>
+          <a:bodyPr wrap="none" rtlCol="0">
+            <a:spAutoFit/>
+          </a:bodyPr>
+          <a:lstStyle/>
+          <a:p>
+            <a:r>
+              <a:rPr lang="pl-PL" dirty="0"/>
+              <a:t>Index.</a:t>
+            </a:r>
+          </a:p>
+        </p:txBody>
+      </p:sp>
+      <p:sp>
+        <p:nvSpPr>
+          <p:cNvPr id="2" name="Prostokąt 1">
+            <a:extLst>
+              <a:ext uri="{FF2B5EF4-FFF2-40B4-BE49-F238E27FC236}">
+                <a16:creationId xmlns:a16="http://schemas.microsoft.com/office/drawing/2014/main" id="{FBFD37DF-3583-4D6D-8F39-E79BC0C83C87}"/>
+              </a:ext>
+            </a:extLst>
+          </p:cNvPr>
+          <p:cNvSpPr/>
+          <p:nvPr/>
+        </p:nvSpPr>
+        <p:spPr>
+          <a:xfrm>
+            <a:off x="1252919" y="1192050"/>
+            <a:ext cx="9912626" cy="2308324"/>
+          </a:xfrm>
+          <a:prstGeom prst="rect">
+            <a:avLst/>
+          </a:prstGeom>
+          <a:solidFill>
+            <a:schemeClr val="tx1"/>
+          </a:solidFill>
+        </p:spPr>
+        <p:txBody>
+          <a:bodyPr wrap="square">
+            <a:spAutoFit/>
+          </a:bodyPr>
+          <a:lstStyle/>
+          <a:p>
+            <a:r>
+              <a:rPr lang="pl-PL" dirty="0">
+                <a:solidFill>
+                  <a:srgbClr val="C586C0"/>
+                </a:solidFill>
+                <a:latin typeface="Consolas" panose="020B0609020204030204" pitchFamily="49" charset="0"/>
+              </a:rPr>
+              <a:t>import</a:t>
+            </a:r>
+            <a:r>
+              <a:rPr lang="pl-PL" dirty="0">
+                <a:solidFill>
+                  <a:srgbClr val="D4D4D4"/>
+                </a:solidFill>
+                <a:latin typeface="Consolas" panose="020B0609020204030204" pitchFamily="49" charset="0"/>
+              </a:rPr>
+              <a:t> </a:t>
+            </a:r>
+            <a:r>
+              <a:rPr lang="pl-PL" dirty="0" err="1">
+                <a:solidFill>
+                  <a:srgbClr val="9CDCFE"/>
+                </a:solidFill>
+                <a:latin typeface="Consolas" panose="020B0609020204030204" pitchFamily="49" charset="0"/>
+              </a:rPr>
+              <a:t>React</a:t>
+            </a:r>
+            <a:r>
+              <a:rPr lang="pl-PL" dirty="0">
+                <a:solidFill>
+                  <a:srgbClr val="D4D4D4"/>
+                </a:solidFill>
+                <a:latin typeface="Consolas" panose="020B0609020204030204" pitchFamily="49" charset="0"/>
+              </a:rPr>
+              <a:t> </a:t>
+            </a:r>
+            <a:r>
+              <a:rPr lang="pl-PL" dirty="0">
+                <a:solidFill>
+                  <a:srgbClr val="C586C0"/>
+                </a:solidFill>
+                <a:latin typeface="Consolas" panose="020B0609020204030204" pitchFamily="49" charset="0"/>
+              </a:rPr>
+              <a:t>from</a:t>
+            </a:r>
+            <a:r>
+              <a:rPr lang="pl-PL" dirty="0">
+                <a:solidFill>
+                  <a:srgbClr val="D4D4D4"/>
+                </a:solidFill>
+                <a:latin typeface="Consolas" panose="020B0609020204030204" pitchFamily="49" charset="0"/>
+              </a:rPr>
+              <a:t> </a:t>
+            </a:r>
+            <a:r>
+              <a:rPr lang="pl-PL" dirty="0">
+                <a:solidFill>
+                  <a:srgbClr val="CE9178"/>
+                </a:solidFill>
+                <a:latin typeface="Consolas" panose="020B0609020204030204" pitchFamily="49" charset="0"/>
+              </a:rPr>
+              <a:t>'</a:t>
+            </a:r>
+            <a:r>
+              <a:rPr lang="pl-PL" dirty="0" err="1">
+                <a:solidFill>
+                  <a:srgbClr val="CE9178"/>
+                </a:solidFill>
+                <a:latin typeface="Consolas" panose="020B0609020204030204" pitchFamily="49" charset="0"/>
+              </a:rPr>
+              <a:t>react</a:t>
+            </a:r>
+            <a:r>
+              <a:rPr lang="pl-PL" dirty="0">
+                <a:solidFill>
+                  <a:srgbClr val="CE9178"/>
+                </a:solidFill>
+                <a:latin typeface="Consolas" panose="020B0609020204030204" pitchFamily="49" charset="0"/>
+              </a:rPr>
+              <a:t>'</a:t>
+            </a:r>
+            <a:r>
+              <a:rPr lang="pl-PL" dirty="0">
+                <a:solidFill>
+                  <a:srgbClr val="D4D4D4"/>
+                </a:solidFill>
+                <a:latin typeface="Consolas" panose="020B0609020204030204" pitchFamily="49" charset="0"/>
+              </a:rPr>
+              <a:t>;</a:t>
+            </a:r>
+          </a:p>
+          <a:p>
+            <a:r>
+              <a:rPr lang="pl-PL" dirty="0">
+                <a:solidFill>
+                  <a:srgbClr val="C586C0"/>
+                </a:solidFill>
+                <a:latin typeface="Consolas" panose="020B0609020204030204" pitchFamily="49" charset="0"/>
+              </a:rPr>
+              <a:t>import</a:t>
+            </a:r>
+            <a:r>
+              <a:rPr lang="pl-PL" dirty="0">
+                <a:solidFill>
+                  <a:srgbClr val="D4D4D4"/>
+                </a:solidFill>
+                <a:latin typeface="Consolas" panose="020B0609020204030204" pitchFamily="49" charset="0"/>
+              </a:rPr>
+              <a:t> </a:t>
+            </a:r>
+            <a:r>
+              <a:rPr lang="pl-PL" dirty="0" err="1">
+                <a:solidFill>
+                  <a:srgbClr val="9CDCFE"/>
+                </a:solidFill>
+                <a:latin typeface="Consolas" panose="020B0609020204030204" pitchFamily="49" charset="0"/>
+              </a:rPr>
+              <a:t>ReactDOM</a:t>
+            </a:r>
+            <a:r>
+              <a:rPr lang="pl-PL" dirty="0">
+                <a:solidFill>
+                  <a:srgbClr val="D4D4D4"/>
+                </a:solidFill>
+                <a:latin typeface="Consolas" panose="020B0609020204030204" pitchFamily="49" charset="0"/>
+              </a:rPr>
+              <a:t> </a:t>
+            </a:r>
+            <a:r>
+              <a:rPr lang="pl-PL" dirty="0">
+                <a:solidFill>
+                  <a:srgbClr val="C586C0"/>
+                </a:solidFill>
+                <a:latin typeface="Consolas" panose="020B0609020204030204" pitchFamily="49" charset="0"/>
+              </a:rPr>
+              <a:t>from</a:t>
+            </a:r>
+            <a:r>
+              <a:rPr lang="pl-PL" dirty="0">
+                <a:solidFill>
+                  <a:srgbClr val="D4D4D4"/>
+                </a:solidFill>
+                <a:latin typeface="Consolas" panose="020B0609020204030204" pitchFamily="49" charset="0"/>
+              </a:rPr>
+              <a:t> </a:t>
+            </a:r>
+            <a:r>
+              <a:rPr lang="pl-PL" dirty="0">
+                <a:solidFill>
+                  <a:srgbClr val="CE9178"/>
+                </a:solidFill>
+                <a:latin typeface="Consolas" panose="020B0609020204030204" pitchFamily="49" charset="0"/>
+              </a:rPr>
+              <a:t>'</a:t>
+            </a:r>
+            <a:r>
+              <a:rPr lang="pl-PL" dirty="0" err="1">
+                <a:solidFill>
+                  <a:srgbClr val="CE9178"/>
+                </a:solidFill>
+                <a:latin typeface="Consolas" panose="020B0609020204030204" pitchFamily="49" charset="0"/>
+              </a:rPr>
+              <a:t>react</a:t>
+            </a:r>
+            <a:r>
+              <a:rPr lang="pl-PL" dirty="0">
+                <a:solidFill>
+                  <a:srgbClr val="CE9178"/>
+                </a:solidFill>
+                <a:latin typeface="Consolas" panose="020B0609020204030204" pitchFamily="49" charset="0"/>
+              </a:rPr>
+              <a:t>-dom'</a:t>
+            </a:r>
+            <a:r>
+              <a:rPr lang="pl-PL" dirty="0">
+                <a:solidFill>
+                  <a:srgbClr val="D4D4D4"/>
+                </a:solidFill>
+                <a:latin typeface="Consolas" panose="020B0609020204030204" pitchFamily="49" charset="0"/>
+              </a:rPr>
+              <a:t>;</a:t>
+            </a:r>
+          </a:p>
+          <a:p>
+            <a:r>
+              <a:rPr lang="pl-PL" dirty="0">
+                <a:solidFill>
+                  <a:srgbClr val="C586C0"/>
+                </a:solidFill>
+                <a:latin typeface="Consolas" panose="020B0609020204030204" pitchFamily="49" charset="0"/>
+              </a:rPr>
+              <a:t>import</a:t>
+            </a:r>
+            <a:r>
+              <a:rPr lang="pl-PL" dirty="0">
+                <a:solidFill>
+                  <a:srgbClr val="D4D4D4"/>
+                </a:solidFill>
+                <a:latin typeface="Consolas" panose="020B0609020204030204" pitchFamily="49" charset="0"/>
+              </a:rPr>
+              <a:t> </a:t>
+            </a:r>
+            <a:r>
+              <a:rPr lang="pl-PL" dirty="0">
+                <a:solidFill>
+                  <a:srgbClr val="CE9178"/>
+                </a:solidFill>
+                <a:latin typeface="Consolas" panose="020B0609020204030204" pitchFamily="49" charset="0"/>
+              </a:rPr>
+              <a:t>'./index.css'</a:t>
+            </a:r>
+            <a:r>
+              <a:rPr lang="pl-PL" dirty="0">
+                <a:solidFill>
+                  <a:srgbClr val="D4D4D4"/>
+                </a:solidFill>
+                <a:latin typeface="Consolas" panose="020B0609020204030204" pitchFamily="49" charset="0"/>
+              </a:rPr>
+              <a:t>;</a:t>
+            </a:r>
+          </a:p>
+          <a:p>
+            <a:r>
+              <a:rPr lang="pl-PL" dirty="0">
+                <a:solidFill>
+                  <a:srgbClr val="C586C0"/>
+                </a:solidFill>
+                <a:latin typeface="Consolas" panose="020B0609020204030204" pitchFamily="49" charset="0"/>
+              </a:rPr>
+              <a:t>import</a:t>
+            </a:r>
+            <a:r>
+              <a:rPr lang="pl-PL" dirty="0">
+                <a:solidFill>
+                  <a:srgbClr val="D4D4D4"/>
+                </a:solidFill>
+                <a:latin typeface="Consolas" panose="020B0609020204030204" pitchFamily="49" charset="0"/>
+              </a:rPr>
+              <a:t> </a:t>
+            </a:r>
+            <a:r>
+              <a:rPr lang="pl-PL" dirty="0" err="1">
+                <a:solidFill>
+                  <a:srgbClr val="9CDCFE"/>
+                </a:solidFill>
+                <a:latin typeface="Consolas" panose="020B0609020204030204" pitchFamily="49" charset="0"/>
+              </a:rPr>
+              <a:t>App</a:t>
+            </a:r>
+            <a:r>
+              <a:rPr lang="pl-PL" dirty="0">
+                <a:solidFill>
+                  <a:srgbClr val="D4D4D4"/>
+                </a:solidFill>
+                <a:latin typeface="Consolas" panose="020B0609020204030204" pitchFamily="49" charset="0"/>
+              </a:rPr>
+              <a:t> </a:t>
+            </a:r>
+            <a:r>
+              <a:rPr lang="pl-PL" dirty="0">
+                <a:solidFill>
+                  <a:srgbClr val="C586C0"/>
+                </a:solidFill>
+                <a:latin typeface="Consolas" panose="020B0609020204030204" pitchFamily="49" charset="0"/>
+              </a:rPr>
+              <a:t>from</a:t>
+            </a:r>
+            <a:r>
+              <a:rPr lang="pl-PL" dirty="0">
+                <a:solidFill>
+                  <a:srgbClr val="D4D4D4"/>
+                </a:solidFill>
+                <a:latin typeface="Consolas" panose="020B0609020204030204" pitchFamily="49" charset="0"/>
+              </a:rPr>
+              <a:t> </a:t>
+            </a:r>
+            <a:r>
+              <a:rPr lang="pl-PL" dirty="0">
+                <a:solidFill>
+                  <a:srgbClr val="CE9178"/>
+                </a:solidFill>
+                <a:latin typeface="Consolas" panose="020B0609020204030204" pitchFamily="49" charset="0"/>
+              </a:rPr>
+              <a:t>'./</a:t>
+            </a:r>
+            <a:r>
+              <a:rPr lang="pl-PL" dirty="0" err="1">
+                <a:solidFill>
+                  <a:srgbClr val="CE9178"/>
+                </a:solidFill>
+                <a:latin typeface="Consolas" panose="020B0609020204030204" pitchFamily="49" charset="0"/>
+              </a:rPr>
+              <a:t>App</a:t>
+            </a:r>
+            <a:r>
+              <a:rPr lang="pl-PL" dirty="0">
+                <a:solidFill>
+                  <a:srgbClr val="CE9178"/>
+                </a:solidFill>
+                <a:latin typeface="Consolas" panose="020B0609020204030204" pitchFamily="49" charset="0"/>
+              </a:rPr>
+              <a:t>'</a:t>
+            </a:r>
+            <a:r>
+              <a:rPr lang="pl-PL" dirty="0">
+                <a:solidFill>
+                  <a:srgbClr val="D4D4D4"/>
+                </a:solidFill>
+                <a:latin typeface="Consolas" panose="020B0609020204030204" pitchFamily="49" charset="0"/>
+              </a:rPr>
+              <a:t>;</a:t>
+            </a:r>
+          </a:p>
+          <a:p>
+            <a:r>
+              <a:rPr lang="pl-PL" dirty="0">
+                <a:solidFill>
+                  <a:srgbClr val="C586C0"/>
+                </a:solidFill>
+                <a:latin typeface="Consolas" panose="020B0609020204030204" pitchFamily="49" charset="0"/>
+              </a:rPr>
+              <a:t>import</a:t>
+            </a:r>
+            <a:r>
+              <a:rPr lang="pl-PL" dirty="0">
+                <a:solidFill>
+                  <a:srgbClr val="D4D4D4"/>
+                </a:solidFill>
+                <a:latin typeface="Consolas" panose="020B0609020204030204" pitchFamily="49" charset="0"/>
+              </a:rPr>
+              <a:t> </a:t>
+            </a:r>
+            <a:r>
+              <a:rPr lang="pl-PL" dirty="0">
+                <a:solidFill>
+                  <a:srgbClr val="569CD6"/>
+                </a:solidFill>
+                <a:latin typeface="Consolas" panose="020B0609020204030204" pitchFamily="49" charset="0"/>
+              </a:rPr>
+              <a:t>*</a:t>
+            </a:r>
+            <a:r>
+              <a:rPr lang="pl-PL" dirty="0">
+                <a:solidFill>
+                  <a:srgbClr val="D4D4D4"/>
+                </a:solidFill>
+                <a:latin typeface="Consolas" panose="020B0609020204030204" pitchFamily="49" charset="0"/>
+              </a:rPr>
+              <a:t> </a:t>
+            </a:r>
+            <a:r>
+              <a:rPr lang="pl-PL" dirty="0">
+                <a:solidFill>
+                  <a:srgbClr val="C586C0"/>
+                </a:solidFill>
+                <a:latin typeface="Consolas" panose="020B0609020204030204" pitchFamily="49" charset="0"/>
+              </a:rPr>
+              <a:t>as</a:t>
+            </a:r>
+            <a:r>
+              <a:rPr lang="pl-PL" dirty="0">
+                <a:solidFill>
+                  <a:srgbClr val="D4D4D4"/>
+                </a:solidFill>
+                <a:latin typeface="Consolas" panose="020B0609020204030204" pitchFamily="49" charset="0"/>
+              </a:rPr>
+              <a:t> </a:t>
+            </a:r>
+            <a:r>
+              <a:rPr lang="pl-PL" dirty="0" err="1">
+                <a:solidFill>
+                  <a:srgbClr val="9CDCFE"/>
+                </a:solidFill>
+                <a:latin typeface="Consolas" panose="020B0609020204030204" pitchFamily="49" charset="0"/>
+              </a:rPr>
+              <a:t>serviceWorker</a:t>
+            </a:r>
+            <a:r>
+              <a:rPr lang="pl-PL" dirty="0">
+                <a:solidFill>
+                  <a:srgbClr val="D4D4D4"/>
+                </a:solidFill>
+                <a:latin typeface="Consolas" panose="020B0609020204030204" pitchFamily="49" charset="0"/>
+              </a:rPr>
+              <a:t> </a:t>
+            </a:r>
+            <a:r>
+              <a:rPr lang="pl-PL" dirty="0">
+                <a:solidFill>
+                  <a:srgbClr val="C586C0"/>
+                </a:solidFill>
+                <a:latin typeface="Consolas" panose="020B0609020204030204" pitchFamily="49" charset="0"/>
+              </a:rPr>
+              <a:t>from</a:t>
+            </a:r>
+            <a:r>
+              <a:rPr lang="pl-PL" dirty="0">
+                <a:solidFill>
+                  <a:srgbClr val="D4D4D4"/>
+                </a:solidFill>
+                <a:latin typeface="Consolas" panose="020B0609020204030204" pitchFamily="49" charset="0"/>
+              </a:rPr>
+              <a:t> </a:t>
+            </a:r>
+            <a:r>
+              <a:rPr lang="pl-PL" dirty="0">
+                <a:solidFill>
+                  <a:srgbClr val="CE9178"/>
+                </a:solidFill>
+                <a:latin typeface="Consolas" panose="020B0609020204030204" pitchFamily="49" charset="0"/>
+              </a:rPr>
+              <a:t>'./</a:t>
+            </a:r>
+            <a:r>
+              <a:rPr lang="pl-PL" dirty="0" err="1">
+                <a:solidFill>
+                  <a:srgbClr val="CE9178"/>
+                </a:solidFill>
+                <a:latin typeface="Consolas" panose="020B0609020204030204" pitchFamily="49" charset="0"/>
+              </a:rPr>
+              <a:t>serviceWorker</a:t>
+            </a:r>
+            <a:r>
+              <a:rPr lang="pl-PL" dirty="0">
+                <a:solidFill>
+                  <a:srgbClr val="CE9178"/>
+                </a:solidFill>
+                <a:latin typeface="Consolas" panose="020B0609020204030204" pitchFamily="49" charset="0"/>
+              </a:rPr>
+              <a:t>'</a:t>
+            </a:r>
+            <a:r>
+              <a:rPr lang="pl-PL" dirty="0">
+                <a:solidFill>
+                  <a:srgbClr val="D4D4D4"/>
+                </a:solidFill>
+                <a:latin typeface="Consolas" panose="020B0609020204030204" pitchFamily="49" charset="0"/>
+              </a:rPr>
+              <a:t>;</a:t>
+            </a:r>
+          </a:p>
+          <a:p>
+            <a:br>
+              <a:rPr lang="pl-PL" dirty="0">
+                <a:solidFill>
+                  <a:srgbClr val="D4D4D4"/>
+                </a:solidFill>
+                <a:latin typeface="Consolas" panose="020B0609020204030204" pitchFamily="49" charset="0"/>
+              </a:rPr>
+            </a:br>
+            <a:r>
+              <a:rPr lang="pl-PL" dirty="0" err="1">
+                <a:solidFill>
+                  <a:srgbClr val="9CDCFE"/>
+                </a:solidFill>
+                <a:latin typeface="Consolas" panose="020B0609020204030204" pitchFamily="49" charset="0"/>
+              </a:rPr>
+              <a:t>ReactDOM</a:t>
+            </a:r>
+            <a:r>
+              <a:rPr lang="pl-PL" dirty="0" err="1">
+                <a:solidFill>
+                  <a:srgbClr val="D4D4D4"/>
+                </a:solidFill>
+                <a:latin typeface="Consolas" panose="020B0609020204030204" pitchFamily="49" charset="0"/>
+              </a:rPr>
+              <a:t>.</a:t>
+            </a:r>
+            <a:r>
+              <a:rPr lang="pl-PL" dirty="0" err="1">
+                <a:solidFill>
+                  <a:srgbClr val="DCDCAA"/>
+                </a:solidFill>
+                <a:latin typeface="Consolas" panose="020B0609020204030204" pitchFamily="49" charset="0"/>
+              </a:rPr>
+              <a:t>render</a:t>
+            </a:r>
+            <a:r>
+              <a:rPr lang="pl-PL" dirty="0">
+                <a:solidFill>
+                  <a:srgbClr val="D4D4D4"/>
+                </a:solidFill>
+                <a:latin typeface="Consolas" panose="020B0609020204030204" pitchFamily="49" charset="0"/>
+              </a:rPr>
+              <a:t>(</a:t>
+            </a:r>
+            <a:r>
+              <a:rPr lang="pl-PL" dirty="0">
+                <a:solidFill>
+                  <a:srgbClr val="808080"/>
+                </a:solidFill>
+                <a:latin typeface="Consolas" panose="020B0609020204030204" pitchFamily="49" charset="0"/>
+              </a:rPr>
+              <a:t>&lt;</a:t>
+            </a:r>
+            <a:r>
+              <a:rPr lang="pl-PL" dirty="0" err="1">
+                <a:solidFill>
+                  <a:srgbClr val="4EC9B0"/>
+                </a:solidFill>
+                <a:latin typeface="Consolas" panose="020B0609020204030204" pitchFamily="49" charset="0"/>
+              </a:rPr>
+              <a:t>App</a:t>
+            </a:r>
+            <a:r>
+              <a:rPr lang="pl-PL" dirty="0">
+                <a:solidFill>
+                  <a:srgbClr val="D4D4D4"/>
+                </a:solidFill>
+                <a:latin typeface="Consolas" panose="020B0609020204030204" pitchFamily="49" charset="0"/>
+              </a:rPr>
+              <a:t> </a:t>
+            </a:r>
+            <a:r>
+              <a:rPr lang="pl-PL" dirty="0">
+                <a:solidFill>
+                  <a:srgbClr val="808080"/>
+                </a:solidFill>
+                <a:latin typeface="Consolas" panose="020B0609020204030204" pitchFamily="49" charset="0"/>
+              </a:rPr>
+              <a:t>/&gt;</a:t>
+            </a:r>
+            <a:r>
+              <a:rPr lang="pl-PL" dirty="0">
+                <a:solidFill>
+                  <a:srgbClr val="D4D4D4"/>
+                </a:solidFill>
+                <a:latin typeface="Consolas" panose="020B0609020204030204" pitchFamily="49" charset="0"/>
+              </a:rPr>
+              <a:t>, </a:t>
+            </a:r>
+            <a:r>
+              <a:rPr lang="pl-PL" dirty="0" err="1">
+                <a:solidFill>
+                  <a:srgbClr val="9CDCFE"/>
+                </a:solidFill>
+                <a:latin typeface="Consolas" panose="020B0609020204030204" pitchFamily="49" charset="0"/>
+              </a:rPr>
+              <a:t>document</a:t>
+            </a:r>
+            <a:r>
+              <a:rPr lang="pl-PL" dirty="0" err="1">
+                <a:solidFill>
+                  <a:srgbClr val="D4D4D4"/>
+                </a:solidFill>
+                <a:latin typeface="Consolas" panose="020B0609020204030204" pitchFamily="49" charset="0"/>
+              </a:rPr>
+              <a:t>.</a:t>
+            </a:r>
+            <a:r>
+              <a:rPr lang="pl-PL" dirty="0" err="1">
+                <a:solidFill>
+                  <a:srgbClr val="DCDCAA"/>
+                </a:solidFill>
+                <a:latin typeface="Consolas" panose="020B0609020204030204" pitchFamily="49" charset="0"/>
+              </a:rPr>
+              <a:t>getElementById</a:t>
+            </a:r>
+            <a:r>
+              <a:rPr lang="pl-PL" dirty="0">
+                <a:solidFill>
+                  <a:srgbClr val="D4D4D4"/>
+                </a:solidFill>
+                <a:latin typeface="Consolas" panose="020B0609020204030204" pitchFamily="49" charset="0"/>
+              </a:rPr>
+              <a:t>(</a:t>
+            </a:r>
+            <a:r>
+              <a:rPr lang="pl-PL" dirty="0">
+                <a:solidFill>
+                  <a:srgbClr val="CE9178"/>
+                </a:solidFill>
+                <a:latin typeface="Consolas" panose="020B0609020204030204" pitchFamily="49" charset="0"/>
+              </a:rPr>
+              <a:t>'</a:t>
+            </a:r>
+            <a:r>
+              <a:rPr lang="pl-PL" dirty="0" err="1">
+                <a:solidFill>
+                  <a:srgbClr val="CE9178"/>
+                </a:solidFill>
+                <a:latin typeface="Consolas" panose="020B0609020204030204" pitchFamily="49" charset="0"/>
+              </a:rPr>
+              <a:t>root</a:t>
+            </a:r>
+            <a:r>
+              <a:rPr lang="pl-PL" dirty="0">
+                <a:solidFill>
+                  <a:srgbClr val="CE9178"/>
+                </a:solidFill>
+                <a:latin typeface="Consolas" panose="020B0609020204030204" pitchFamily="49" charset="0"/>
+              </a:rPr>
+              <a:t>'</a:t>
+            </a:r>
+            <a:r>
+              <a:rPr lang="pl-PL" dirty="0">
+                <a:solidFill>
+                  <a:srgbClr val="D4D4D4"/>
+                </a:solidFill>
+                <a:latin typeface="Consolas" panose="020B0609020204030204" pitchFamily="49" charset="0"/>
+              </a:rPr>
+              <a:t>));</a:t>
+            </a:r>
+          </a:p>
+          <a:p>
+            <a:r>
+              <a:rPr lang="pl-PL" dirty="0" err="1">
+                <a:solidFill>
+                  <a:srgbClr val="9CDCFE"/>
+                </a:solidFill>
+                <a:latin typeface="Consolas" panose="020B0609020204030204" pitchFamily="49" charset="0"/>
+              </a:rPr>
+              <a:t>serviceWorker</a:t>
+            </a:r>
+            <a:r>
+              <a:rPr lang="pl-PL" dirty="0" err="1">
+                <a:solidFill>
+                  <a:srgbClr val="D4D4D4"/>
+                </a:solidFill>
+                <a:latin typeface="Consolas" panose="020B0609020204030204" pitchFamily="49" charset="0"/>
+              </a:rPr>
+              <a:t>.</a:t>
+            </a:r>
+            <a:r>
+              <a:rPr lang="pl-PL" dirty="0" err="1">
+                <a:solidFill>
+                  <a:srgbClr val="DCDCAA"/>
+                </a:solidFill>
+                <a:latin typeface="Consolas" panose="020B0609020204030204" pitchFamily="49" charset="0"/>
+              </a:rPr>
+              <a:t>unregister</a:t>
+            </a:r>
+            <a:r>
+              <a:rPr lang="pl-PL" dirty="0">
+                <a:solidFill>
+                  <a:srgbClr val="D4D4D4"/>
+                </a:solidFill>
+                <a:latin typeface="Consolas" panose="020B0609020204030204" pitchFamily="49" charset="0"/>
+              </a:rPr>
+              <a:t>();</a:t>
+            </a:r>
+          </a:p>
+        </p:txBody>
+      </p:sp>
+      <p:sp>
+        <p:nvSpPr>
+          <p:cNvPr id="5" name="Prostokąt 4">
+            <a:extLst>
+              <a:ext uri="{FF2B5EF4-FFF2-40B4-BE49-F238E27FC236}">
+                <a16:creationId xmlns:a16="http://schemas.microsoft.com/office/drawing/2014/main" id="{9585E604-2F4E-4417-96FC-3FB580C0232E}"/>
+              </a:ext>
+            </a:extLst>
+          </p:cNvPr>
+          <p:cNvSpPr/>
+          <p:nvPr/>
+        </p:nvSpPr>
+        <p:spPr>
+          <a:xfrm>
+            <a:off x="1252919" y="4503290"/>
+            <a:ext cx="2844048" cy="369332"/>
+          </a:xfrm>
+          <a:prstGeom prst="rect">
+            <a:avLst/>
+          </a:prstGeom>
+          <a:solidFill>
+            <a:schemeClr val="tx1"/>
+          </a:solidFill>
+        </p:spPr>
+        <p:txBody>
+          <a:bodyPr wrap="none">
+            <a:spAutoFit/>
+          </a:bodyPr>
+          <a:lstStyle/>
+          <a:p>
+            <a:r>
+              <a:rPr lang="pl-PL" dirty="0">
+                <a:solidFill>
+                  <a:srgbClr val="808080"/>
+                </a:solidFill>
+                <a:latin typeface="Consolas" panose="020B0609020204030204" pitchFamily="49" charset="0"/>
+              </a:rPr>
+              <a:t>&lt;</a:t>
+            </a:r>
+            <a:r>
+              <a:rPr lang="pl-PL" dirty="0">
+                <a:solidFill>
+                  <a:srgbClr val="569CD6"/>
+                </a:solidFill>
+                <a:latin typeface="Consolas" panose="020B0609020204030204" pitchFamily="49" charset="0"/>
+              </a:rPr>
+              <a:t>div</a:t>
+            </a:r>
+            <a:r>
+              <a:rPr lang="pl-PL" dirty="0">
+                <a:solidFill>
+                  <a:srgbClr val="D4D4D4"/>
+                </a:solidFill>
+                <a:latin typeface="Consolas" panose="020B0609020204030204" pitchFamily="49" charset="0"/>
+              </a:rPr>
+              <a:t> </a:t>
+            </a:r>
+            <a:r>
+              <a:rPr lang="pl-PL" dirty="0">
+                <a:solidFill>
+                  <a:srgbClr val="4EC9B0"/>
+                </a:solidFill>
+                <a:latin typeface="Consolas" panose="020B0609020204030204" pitchFamily="49" charset="0"/>
+              </a:rPr>
+              <a:t>id</a:t>
+            </a:r>
+            <a:r>
+              <a:rPr lang="pl-PL" dirty="0">
+                <a:solidFill>
+                  <a:srgbClr val="569CD6"/>
+                </a:solidFill>
+                <a:latin typeface="Consolas" panose="020B0609020204030204" pitchFamily="49" charset="0"/>
+              </a:rPr>
+              <a:t>=</a:t>
+            </a:r>
+            <a:r>
+              <a:rPr lang="pl-PL" dirty="0">
+                <a:solidFill>
+                  <a:srgbClr val="CE9178"/>
+                </a:solidFill>
+                <a:latin typeface="Consolas" panose="020B0609020204030204" pitchFamily="49" charset="0"/>
+              </a:rPr>
+              <a:t>"</a:t>
+            </a:r>
+            <a:r>
+              <a:rPr lang="pl-PL" dirty="0" err="1">
+                <a:solidFill>
+                  <a:srgbClr val="CE9178"/>
+                </a:solidFill>
+                <a:latin typeface="Consolas" panose="020B0609020204030204" pitchFamily="49" charset="0"/>
+              </a:rPr>
+              <a:t>root</a:t>
+            </a:r>
+            <a:r>
+              <a:rPr lang="pl-PL" dirty="0">
+                <a:solidFill>
+                  <a:srgbClr val="CE9178"/>
+                </a:solidFill>
+                <a:latin typeface="Consolas" panose="020B0609020204030204" pitchFamily="49" charset="0"/>
+              </a:rPr>
+              <a:t>"</a:t>
+            </a:r>
+            <a:r>
+              <a:rPr lang="pl-PL" dirty="0">
+                <a:solidFill>
+                  <a:srgbClr val="808080"/>
+                </a:solidFill>
+                <a:latin typeface="Consolas" panose="020B0609020204030204" pitchFamily="49" charset="0"/>
+              </a:rPr>
+              <a:t>&gt;&lt;/</a:t>
+            </a:r>
+            <a:r>
+              <a:rPr lang="pl-PL" dirty="0">
+                <a:solidFill>
+                  <a:srgbClr val="569CD6"/>
+                </a:solidFill>
+                <a:latin typeface="Consolas" panose="020B0609020204030204" pitchFamily="49" charset="0"/>
+              </a:rPr>
+              <a:t>div</a:t>
+            </a:r>
+            <a:r>
+              <a:rPr lang="pl-PL" dirty="0">
+                <a:solidFill>
+                  <a:srgbClr val="808080"/>
+                </a:solidFill>
+                <a:latin typeface="Consolas" panose="020B0609020204030204" pitchFamily="49" charset="0"/>
+              </a:rPr>
+              <a:t>&gt;</a:t>
+            </a:r>
+            <a:endParaRPr lang="pl-PL" b="0" dirty="0">
+              <a:solidFill>
+                <a:srgbClr val="D4D4D4"/>
+              </a:solidFill>
+              <a:effectLst/>
+              <a:latin typeface="Consolas" panose="020B0609020204030204" pitchFamily="49" charset="0"/>
+            </a:endParaRPr>
+          </a:p>
+        </p:txBody>
+      </p:sp>
+      <p:sp>
+        <p:nvSpPr>
+          <p:cNvPr id="7" name="pole tekstowe 6">
+            <a:extLst>
+              <a:ext uri="{FF2B5EF4-FFF2-40B4-BE49-F238E27FC236}">
+                <a16:creationId xmlns:a16="http://schemas.microsoft.com/office/drawing/2014/main" id="{A9CD2010-9779-4169-908C-FB9CA74B61D3}"/>
+              </a:ext>
+            </a:extLst>
+          </p:cNvPr>
+          <p:cNvSpPr txBox="1"/>
+          <p:nvPr/>
+        </p:nvSpPr>
+        <p:spPr>
+          <a:xfrm>
+            <a:off x="10284570" y="3599946"/>
+            <a:ext cx="899349" cy="369332"/>
+          </a:xfrm>
+          <a:prstGeom prst="rect">
+            <a:avLst/>
+          </a:prstGeom>
+          <a:noFill/>
+        </p:spPr>
+        <p:txBody>
+          <a:bodyPr wrap="none" rtlCol="0">
+            <a:spAutoFit/>
+          </a:bodyPr>
+          <a:lstStyle/>
+          <a:p>
+            <a:r>
+              <a:rPr lang="pl-PL" dirty="0"/>
+              <a:t>Index.js</a:t>
+            </a:r>
+          </a:p>
+        </p:txBody>
+      </p:sp>
+      <p:sp>
+        <p:nvSpPr>
+          <p:cNvPr id="8" name="pole tekstowe 7">
+            <a:extLst>
+              <a:ext uri="{FF2B5EF4-FFF2-40B4-BE49-F238E27FC236}">
+                <a16:creationId xmlns:a16="http://schemas.microsoft.com/office/drawing/2014/main" id="{D4567886-F410-4105-A68B-B30D6498A7D9}"/>
+              </a:ext>
+            </a:extLst>
+          </p:cNvPr>
+          <p:cNvSpPr txBox="1"/>
+          <p:nvPr/>
+        </p:nvSpPr>
+        <p:spPr>
+          <a:xfrm>
+            <a:off x="2907987" y="4872622"/>
+            <a:ext cx="1188980" cy="369332"/>
+          </a:xfrm>
+          <a:prstGeom prst="rect">
+            <a:avLst/>
+          </a:prstGeom>
+          <a:noFill/>
+        </p:spPr>
+        <p:txBody>
+          <a:bodyPr wrap="none" rtlCol="0">
+            <a:spAutoFit/>
+          </a:bodyPr>
+          <a:lstStyle/>
+          <a:p>
+            <a:r>
+              <a:rPr lang="pl-PL" dirty="0"/>
+              <a:t>Index.html</a:t>
+            </a:r>
+          </a:p>
+        </p:txBody>
+      </p:sp>
+    </p:spTree>
+    <p:extLst>
+      <p:ext uri="{BB962C8B-B14F-4D97-AF65-F5344CB8AC3E}">
+        <p14:creationId xmlns:p14="http://schemas.microsoft.com/office/powerpoint/2010/main" val="1906514412"/>
+      </p:ext>
+    </p:extLst>
+  </p:cSld>
+  <p:clrMapOvr>
+    <a:masterClrMapping/>
+  </p:clrMapOvr>
+</p:sld>
+</file>
+
+<file path=ppt/slides/slide6.xml><?xml version="1.0" encoding="utf-8"?>
+<p:sld xmlns:a="http://schemas.openxmlformats.org/drawingml/2006/main" xmlns:r="http://schemas.openxmlformats.org/officeDocument/2006/relationships" xmlns:p="http://schemas.openxmlformats.org/presentationml/2006/main">
+  <p:cSld>
+    <p:spTree>
+      <p:nvGrpSpPr>
+        <p:cNvPr id="1" name=""/>
+        <p:cNvGrpSpPr/>
+        <p:nvPr/>
+      </p:nvGrpSpPr>
+      <p:grpSpPr>
+        <a:xfrm>
+          <a:off x="0" y="0"/>
+          <a:ext cx="0" cy="0"/>
+          <a:chOff x="0" y="0"/>
+          <a:chExt cx="0" cy="0"/>
+        </a:xfrm>
+      </p:grpSpPr>
+      <p:sp>
+        <p:nvSpPr>
+          <p:cNvPr id="4" name="pole tekstowe 3">
+            <a:extLst>
+              <a:ext uri="{FF2B5EF4-FFF2-40B4-BE49-F238E27FC236}">
+                <a16:creationId xmlns:a16="http://schemas.microsoft.com/office/drawing/2014/main" id="{F164A7B3-8808-414C-9401-3B25194E3B5A}"/>
+              </a:ext>
+            </a:extLst>
+          </p:cNvPr>
+          <p:cNvSpPr txBox="1"/>
+          <p:nvPr/>
+        </p:nvSpPr>
+        <p:spPr>
+          <a:xfrm>
+            <a:off x="497840" y="538480"/>
+            <a:ext cx="2249205" cy="369332"/>
+          </a:xfrm>
+          <a:prstGeom prst="rect">
+            <a:avLst/>
+          </a:prstGeom>
+          <a:noFill/>
+        </p:spPr>
+        <p:txBody>
+          <a:bodyPr wrap="none" rtlCol="0">
+            <a:spAutoFit/>
+          </a:bodyPr>
+          <a:lstStyle/>
+          <a:p>
+            <a:r>
+              <a:rPr lang="pl-PL" dirty="0" err="1"/>
+              <a:t>React</a:t>
+            </a:r>
+            <a:r>
+              <a:rPr lang="pl-PL" dirty="0"/>
+              <a:t> – </a:t>
+            </a:r>
+            <a:r>
+              <a:rPr lang="pl-PL" dirty="0" err="1"/>
+              <a:t>add</a:t>
+            </a:r>
+            <a:r>
+              <a:rPr lang="pl-PL" dirty="0"/>
+              <a:t> </a:t>
+            </a:r>
+            <a:r>
+              <a:rPr lang="pl-PL" dirty="0" err="1"/>
+              <a:t>bootstrap</a:t>
+            </a:r>
+            <a:endParaRPr lang="pl-PL" dirty="0"/>
+          </a:p>
+        </p:txBody>
+      </p:sp>
+      <p:sp>
+        <p:nvSpPr>
+          <p:cNvPr id="3" name="Rectangle 1">
+            <a:extLst>
+              <a:ext uri="{FF2B5EF4-FFF2-40B4-BE49-F238E27FC236}">
+                <a16:creationId xmlns:a16="http://schemas.microsoft.com/office/drawing/2014/main" id="{67C512EA-465B-47FF-9FA3-C20DAFB1E039}"/>
+              </a:ext>
+            </a:extLst>
+          </p:cNvPr>
+          <p:cNvSpPr>
+            <a:spLocks noChangeArrowheads="1"/>
+          </p:cNvSpPr>
+          <p:nvPr/>
+        </p:nvSpPr>
+        <p:spPr bwMode="auto">
+          <a:xfrm>
+            <a:off x="993912" y="2297703"/>
+            <a:ext cx="9799157" cy="1692771"/>
+          </a:xfrm>
+          <a:prstGeom prst="rect">
+            <a:avLst/>
+          </a:prstGeom>
+          <a:solidFill>
+            <a:srgbClr val="EFF0F1"/>
+          </a:solidFill>
+          <a:ln>
+            <a:noFill/>
+          </a:ln>
+          <a:effectLst/>
+          <a:extLst>
+            <a:ext uri="{91240B29-F687-4F45-9708-019B960494DF}">
+              <a14:hiddenLine xmlns:a14="http://schemas.microsoft.com/office/drawing/2010/main" w="9525">
+                <a:solidFill>
+                  <a:schemeClr val="tx1"/>
+                </a:solidFill>
+                <a:miter lim="800000"/>
+                <a:headEnd/>
+                <a:tailEnd/>
+              </a14:hiddenLine>
+            </a:ext>
+            <a:ext uri="{AF507438-7753-43E0-B8FC-AC1667EBCBE1}">
+              <a14:hiddenEffects xmlns:a14="http://schemas.microsoft.com/office/drawing/2010/main">
+                <a:effectLst>
+                  <a:outerShdw dist="35921" dir="2700000" algn="ctr" rotWithShape="0">
+                    <a:schemeClr val="bg2"/>
+                  </a:outerShdw>
+                </a:effectLst>
+              </a14:hiddenEffects>
+            </a:ext>
+          </a:extLst>
+        </p:spPr>
+        <p:txBody>
+          <a:bodyPr vert="horz" wrap="none" lIns="0" tIns="0" rIns="0" bIns="0" numCol="1" anchor="ctr" anchorCtr="0" compatLnSpc="1">
+            <a:prstTxWarp prst="textNoShape">
+              <a:avLst/>
+            </a:prstTxWarp>
+            <a:spAutoFit/>
+          </a:bodyPr>
+          <a:lstStyle>
+            <a:lvl1pPr eaLnBrk="0" fontAlgn="base" hangingPunct="0">
+              <a:spcBef>
+                <a:spcPct val="0"/>
+              </a:spcBef>
+              <a:spcAft>
+                <a:spcPct val="0"/>
+              </a:spcAft>
+              <a:defRPr>
+                <a:solidFill>
+                  <a:schemeClr val="tx1"/>
+                </a:solidFill>
+                <a:latin typeface="Arial" panose="020B0604020202020204" pitchFamily="34" charset="0"/>
+              </a:defRPr>
+            </a:lvl1pPr>
+            <a:lvl2pPr eaLnBrk="0" fontAlgn="base" hangingPunct="0">
+              <a:spcBef>
+                <a:spcPct val="0"/>
+              </a:spcBef>
+              <a:spcAft>
+                <a:spcPct val="0"/>
+              </a:spcAft>
+              <a:defRPr>
+                <a:solidFill>
+                  <a:schemeClr val="tx1"/>
+                </a:solidFill>
+                <a:latin typeface="Arial" panose="020B0604020202020204" pitchFamily="34" charset="0"/>
+              </a:defRPr>
+            </a:lvl2pPr>
+            <a:lvl3pPr eaLnBrk="0" fontAlgn="base" hangingPunct="0">
+              <a:spcBef>
+                <a:spcPct val="0"/>
+              </a:spcBef>
+              <a:spcAft>
+                <a:spcPct val="0"/>
+              </a:spcAft>
+              <a:defRPr>
+                <a:solidFill>
+                  <a:schemeClr val="tx1"/>
+                </a:solidFill>
+                <a:latin typeface="Arial" panose="020B0604020202020204" pitchFamily="34" charset="0"/>
+              </a:defRPr>
+            </a:lvl3pPr>
+            <a:lvl4pPr eaLnBrk="0" fontAlgn="base" hangingPunct="0">
+              <a:spcBef>
+                <a:spcPct val="0"/>
+              </a:spcBef>
+              <a:spcAft>
+                <a:spcPct val="0"/>
+              </a:spcAft>
+              <a:defRPr>
+                <a:solidFill>
+                  <a:schemeClr val="tx1"/>
+                </a:solidFill>
+                <a:latin typeface="Arial" panose="020B0604020202020204" pitchFamily="34" charset="0"/>
+              </a:defRPr>
+            </a:lvl4pPr>
+            <a:lvl5pPr eaLnBrk="0" fontAlgn="base" hangingPunct="0">
+              <a:spcBef>
+                <a:spcPct val="0"/>
+              </a:spcBef>
+              <a:spcAft>
+                <a:spcPct val="0"/>
+              </a:spcAft>
+              <a:defRPr>
+                <a:solidFill>
+                  <a:schemeClr val="tx1"/>
+                </a:solidFill>
+                <a:latin typeface="Arial" panose="020B0604020202020204" pitchFamily="34" charset="0"/>
+              </a:defRPr>
+            </a:lvl5pPr>
+            <a:lvl6pPr eaLnBrk="0" fontAlgn="base" hangingPunct="0">
+              <a:spcBef>
+                <a:spcPct val="0"/>
+              </a:spcBef>
+              <a:spcAft>
+                <a:spcPct val="0"/>
+              </a:spcAft>
+              <a:defRPr>
+                <a:solidFill>
+                  <a:schemeClr val="tx1"/>
+                </a:solidFill>
+                <a:latin typeface="Arial" panose="020B0604020202020204" pitchFamily="34" charset="0"/>
+              </a:defRPr>
+            </a:lvl6pPr>
+            <a:lvl7pPr eaLnBrk="0" fontAlgn="base" hangingPunct="0">
+              <a:spcBef>
+                <a:spcPct val="0"/>
+              </a:spcBef>
+              <a:spcAft>
+                <a:spcPct val="0"/>
+              </a:spcAft>
+              <a:defRPr>
+                <a:solidFill>
+                  <a:schemeClr val="tx1"/>
+                </a:solidFill>
+                <a:latin typeface="Arial" panose="020B0604020202020204" pitchFamily="34" charset="0"/>
+              </a:defRPr>
+            </a:lvl7pPr>
+            <a:lvl8pPr eaLnBrk="0" fontAlgn="base" hangingPunct="0">
+              <a:spcBef>
+                <a:spcPct val="0"/>
+              </a:spcBef>
+              <a:spcAft>
+                <a:spcPct val="0"/>
+              </a:spcAft>
+              <a:defRPr>
+                <a:solidFill>
+                  <a:schemeClr val="tx1"/>
+                </a:solidFill>
+                <a:latin typeface="Arial" panose="020B0604020202020204" pitchFamily="34" charset="0"/>
+              </a:defRPr>
+            </a:lvl8pPr>
+            <a:lvl9pPr eaLnBrk="0" fontAlgn="base" hangingPunct="0">
+              <a:spcBef>
+                <a:spcPct val="0"/>
+              </a:spcBef>
+              <a:spcAft>
+                <a:spcPct val="0"/>
+              </a:spcAft>
+              <a:defRPr>
+                <a:solidFill>
+                  <a:schemeClr val="tx1"/>
+                </a:solidFill>
+                <a:latin typeface="Arial" panose="020B0604020202020204" pitchFamily="34" charset="0"/>
+              </a:defRPr>
+            </a:lvl9pPr>
+          </a:lstStyle>
+          <a:p>
+            <a:pPr marL="0" marR="0" lvl="0" indent="0" algn="l" defTabSz="914400" rtl="0" eaLnBrk="0" fontAlgn="base" latinLnBrk="0" hangingPunct="0">
+              <a:lnSpc>
+                <a:spcPct val="100000"/>
+              </a:lnSpc>
+              <a:spcBef>
+                <a:spcPct val="0"/>
+              </a:spcBef>
+              <a:spcAft>
+                <a:spcPct val="0"/>
+              </a:spcAft>
+              <a:buClrTx/>
+              <a:buSzTx/>
+              <a:buFontTx/>
+              <a:buNone/>
+              <a:tabLst/>
+            </a:pPr>
+            <a:r>
+              <a:rPr kumimoji="0" lang="pl-PL" altLang="pl-PL" sz="2000" b="0" i="0" u="none" strike="noStrike" cap="none" normalizeH="0" baseline="0" dirty="0" err="1">
+                <a:ln>
+                  <a:noFill/>
+                </a:ln>
+                <a:solidFill>
+                  <a:srgbClr val="303336"/>
+                </a:solidFill>
+                <a:effectLst/>
+                <a:latin typeface="inherit"/>
+              </a:rPr>
+              <a:t>npm</a:t>
+            </a:r>
+            <a:r>
+              <a:rPr kumimoji="0" lang="pl-PL" altLang="pl-PL" sz="2000" b="0" i="0" u="none" strike="noStrike" cap="none" normalizeH="0" baseline="0" dirty="0">
+                <a:ln>
+                  <a:noFill/>
+                </a:ln>
+                <a:solidFill>
+                  <a:srgbClr val="303336"/>
+                </a:solidFill>
+                <a:effectLst/>
+                <a:latin typeface="inherit"/>
+              </a:rPr>
+              <a:t> </a:t>
+            </a:r>
+            <a:r>
+              <a:rPr kumimoji="0" lang="pl-PL" altLang="pl-PL" sz="2000" b="0" i="0" u="none" strike="noStrike" cap="none" normalizeH="0" baseline="0" dirty="0" err="1">
+                <a:ln>
+                  <a:noFill/>
+                </a:ln>
+                <a:solidFill>
+                  <a:srgbClr val="303336"/>
+                </a:solidFill>
+                <a:effectLst/>
+                <a:latin typeface="inherit"/>
+              </a:rPr>
+              <a:t>install</a:t>
+            </a:r>
+            <a:r>
+              <a:rPr kumimoji="0" lang="pl-PL" altLang="pl-PL" sz="2000" b="0" i="0" u="none" strike="noStrike" cap="none" normalizeH="0" baseline="0" dirty="0">
+                <a:ln>
+                  <a:noFill/>
+                </a:ln>
+                <a:solidFill>
+                  <a:srgbClr val="303336"/>
+                </a:solidFill>
+                <a:effectLst/>
+                <a:latin typeface="inherit"/>
+              </a:rPr>
+              <a:t> --</a:t>
+            </a:r>
+            <a:r>
+              <a:rPr kumimoji="0" lang="pl-PL" altLang="pl-PL" sz="2000" b="0" i="0" u="none" strike="noStrike" cap="none" normalizeH="0" baseline="0" dirty="0" err="1">
+                <a:ln>
+                  <a:noFill/>
+                </a:ln>
+                <a:solidFill>
+                  <a:srgbClr val="303336"/>
+                </a:solidFill>
+                <a:effectLst/>
+                <a:latin typeface="inherit"/>
+              </a:rPr>
+              <a:t>save</a:t>
+            </a:r>
+            <a:r>
+              <a:rPr kumimoji="0" lang="pl-PL" altLang="pl-PL" sz="2000" b="0" i="0" u="none" strike="noStrike" cap="none" normalizeH="0" baseline="0" dirty="0">
+                <a:ln>
+                  <a:noFill/>
+                </a:ln>
+                <a:solidFill>
+                  <a:srgbClr val="303336"/>
+                </a:solidFill>
+                <a:effectLst/>
+                <a:latin typeface="inherit"/>
+              </a:rPr>
+              <a:t> </a:t>
+            </a:r>
+            <a:r>
+              <a:rPr kumimoji="0" lang="pl-PL" altLang="pl-PL" sz="2000" b="0" i="0" u="none" strike="noStrike" cap="none" normalizeH="0" baseline="0" dirty="0" err="1">
+                <a:ln>
+                  <a:noFill/>
+                </a:ln>
+                <a:solidFill>
+                  <a:srgbClr val="303336"/>
+                </a:solidFill>
+                <a:effectLst/>
+                <a:latin typeface="inherit"/>
+              </a:rPr>
+              <a:t>bootstrap</a:t>
+            </a:r>
+            <a:endParaRPr kumimoji="0" lang="pl-PL" altLang="pl-PL" sz="2000" b="0" i="0" u="none" strike="noStrike" cap="none" normalizeH="0" baseline="0" dirty="0">
+              <a:ln>
+                <a:noFill/>
+              </a:ln>
+              <a:solidFill>
+                <a:srgbClr val="303336"/>
+              </a:solidFill>
+              <a:effectLst/>
+              <a:latin typeface="inherit"/>
+            </a:endParaRPr>
+          </a:p>
+          <a:p>
+            <a:pPr marL="0" marR="0" lvl="0" indent="0" algn="l" defTabSz="914400" rtl="0" eaLnBrk="0" fontAlgn="base" latinLnBrk="0" hangingPunct="0">
+              <a:lnSpc>
+                <a:spcPct val="100000"/>
+              </a:lnSpc>
+              <a:spcBef>
+                <a:spcPct val="0"/>
+              </a:spcBef>
+              <a:spcAft>
+                <a:spcPct val="0"/>
+              </a:spcAft>
+              <a:buClrTx/>
+              <a:buSzTx/>
+              <a:buFontTx/>
+              <a:buNone/>
+              <a:tabLst/>
+            </a:pPr>
+            <a:endParaRPr lang="pl-PL" altLang="pl-PL" sz="2000" dirty="0">
+              <a:solidFill>
+                <a:srgbClr val="303336"/>
+              </a:solidFill>
+              <a:latin typeface="inherit"/>
+            </a:endParaRPr>
+          </a:p>
+          <a:p>
+            <a:pPr marL="0" marR="0" lvl="0" indent="0" algn="l" defTabSz="914400" rtl="0" eaLnBrk="0" fontAlgn="base" latinLnBrk="0" hangingPunct="0">
+              <a:lnSpc>
+                <a:spcPct val="100000"/>
+              </a:lnSpc>
+              <a:spcBef>
+                <a:spcPct val="0"/>
+              </a:spcBef>
+              <a:spcAft>
+                <a:spcPct val="0"/>
+              </a:spcAft>
+              <a:buClrTx/>
+              <a:buSzTx/>
+              <a:buFontTx/>
+              <a:buNone/>
+              <a:tabLst/>
+            </a:pPr>
+            <a:endParaRPr kumimoji="0" lang="pl-PL" altLang="pl-PL" b="0" i="0" u="none" strike="noStrike" cap="none" normalizeH="0" baseline="0" dirty="0">
+              <a:ln>
+                <a:noFill/>
+              </a:ln>
+              <a:solidFill>
+                <a:schemeClr val="tx1"/>
+              </a:solidFill>
+              <a:effectLst/>
+            </a:endParaRPr>
+          </a:p>
+          <a:p>
+            <a:pPr marL="0" marR="0" lvl="0" indent="0" algn="l" defTabSz="914400" rtl="0" eaLnBrk="0" fontAlgn="base" latinLnBrk="0" hangingPunct="0">
+              <a:lnSpc>
+                <a:spcPct val="100000"/>
+              </a:lnSpc>
+              <a:spcBef>
+                <a:spcPct val="0"/>
+              </a:spcBef>
+              <a:spcAft>
+                <a:spcPct val="0"/>
+              </a:spcAft>
+              <a:buClrTx/>
+              <a:buSzTx/>
+              <a:buFontTx/>
+              <a:buNone/>
+              <a:tabLst/>
+            </a:pPr>
+            <a:r>
+              <a:rPr kumimoji="0" lang="pl-PL" altLang="pl-PL" sz="3200" b="0" i="0" u="none" strike="noStrike" cap="none" normalizeH="0" baseline="0" dirty="0">
+                <a:ln>
+                  <a:noFill/>
+                </a:ln>
+                <a:solidFill>
+                  <a:srgbClr val="242729"/>
+                </a:solidFill>
+                <a:effectLst/>
+                <a:cs typeface="Arial" panose="020B0604020202020204" pitchFamily="34" charset="0"/>
+              </a:rPr>
+              <a:t>Then </a:t>
+            </a:r>
+            <a:r>
+              <a:rPr kumimoji="0" lang="pl-PL" altLang="pl-PL" sz="3200" b="0" i="0" u="none" strike="noStrike" cap="none" normalizeH="0" baseline="0" dirty="0" err="1">
+                <a:ln>
+                  <a:noFill/>
+                </a:ln>
+                <a:solidFill>
+                  <a:srgbClr val="242729"/>
+                </a:solidFill>
+                <a:effectLst/>
+                <a:cs typeface="Arial" panose="020B0604020202020204" pitchFamily="34" charset="0"/>
+              </a:rPr>
+              <a:t>add</a:t>
+            </a:r>
+            <a:r>
+              <a:rPr kumimoji="0" lang="pl-PL" altLang="pl-PL" sz="3200" b="0" i="0" u="none" strike="noStrike" cap="none" normalizeH="0" baseline="0" dirty="0">
+                <a:ln>
+                  <a:noFill/>
+                </a:ln>
+                <a:solidFill>
+                  <a:srgbClr val="242729"/>
+                </a:solidFill>
+                <a:effectLst/>
+                <a:cs typeface="Arial" panose="020B0604020202020204" pitchFamily="34" charset="0"/>
+              </a:rPr>
+              <a:t> the </a:t>
+            </a:r>
+            <a:r>
+              <a:rPr kumimoji="0" lang="pl-PL" altLang="pl-PL" sz="3200" b="0" i="0" u="none" strike="noStrike" cap="none" normalizeH="0" baseline="0" dirty="0" err="1">
+                <a:ln>
+                  <a:noFill/>
+                </a:ln>
+                <a:solidFill>
+                  <a:srgbClr val="242729"/>
+                </a:solidFill>
+                <a:effectLst/>
+                <a:cs typeface="Arial" panose="020B0604020202020204" pitchFamily="34" charset="0"/>
+              </a:rPr>
+              <a:t>following</a:t>
+            </a:r>
+            <a:r>
+              <a:rPr kumimoji="0" lang="pl-PL" altLang="pl-PL" sz="3200" b="0" i="0" u="none" strike="noStrike" cap="none" normalizeH="0" baseline="0" dirty="0">
+                <a:ln>
+                  <a:noFill/>
+                </a:ln>
+                <a:solidFill>
+                  <a:srgbClr val="242729"/>
+                </a:solidFill>
+                <a:effectLst/>
+                <a:cs typeface="Arial" panose="020B0604020202020204" pitchFamily="34" charset="0"/>
+              </a:rPr>
+              <a:t> import </a:t>
+            </a:r>
+            <a:r>
+              <a:rPr kumimoji="0" lang="pl-PL" altLang="pl-PL" sz="3200" b="0" i="0" u="none" strike="noStrike" cap="none" normalizeH="0" baseline="0" dirty="0" err="1">
+                <a:ln>
+                  <a:noFill/>
+                </a:ln>
+                <a:solidFill>
+                  <a:srgbClr val="242729"/>
+                </a:solidFill>
+                <a:effectLst/>
+                <a:cs typeface="Arial" panose="020B0604020202020204" pitchFamily="34" charset="0"/>
+              </a:rPr>
+              <a:t>statement</a:t>
+            </a:r>
+            <a:r>
+              <a:rPr kumimoji="0" lang="pl-PL" altLang="pl-PL" sz="3200" b="0" i="0" u="none" strike="noStrike" cap="none" normalizeH="0" baseline="0" dirty="0">
+                <a:ln>
+                  <a:noFill/>
+                </a:ln>
+                <a:solidFill>
+                  <a:srgbClr val="242729"/>
+                </a:solidFill>
+                <a:effectLst/>
+                <a:cs typeface="Arial" panose="020B0604020202020204" pitchFamily="34" charset="0"/>
+              </a:rPr>
+              <a:t> to </a:t>
+            </a:r>
+            <a:r>
+              <a:rPr kumimoji="0" lang="pl-PL" altLang="pl-PL" sz="3200" b="1" i="0" u="none" strike="noStrike" cap="none" normalizeH="0" baseline="0" dirty="0">
+                <a:ln>
+                  <a:noFill/>
+                </a:ln>
+                <a:solidFill>
+                  <a:srgbClr val="242729"/>
+                </a:solidFill>
+                <a:effectLst/>
+                <a:latin typeface="inherit"/>
+                <a:cs typeface="Arial" panose="020B0604020202020204" pitchFamily="34" charset="0"/>
+              </a:rPr>
+              <a:t>index.js</a:t>
+            </a:r>
+            <a:r>
+              <a:rPr kumimoji="0" lang="pl-PL" altLang="pl-PL" sz="3200" b="0" i="0" u="none" strike="noStrike" cap="none" normalizeH="0" baseline="0" dirty="0">
+                <a:ln>
+                  <a:noFill/>
+                </a:ln>
+                <a:solidFill>
+                  <a:srgbClr val="242729"/>
+                </a:solidFill>
+                <a:effectLst/>
+                <a:cs typeface="Arial" panose="020B0604020202020204" pitchFamily="34" charset="0"/>
+              </a:rPr>
+              <a:t> file</a:t>
+            </a:r>
+            <a:endParaRPr kumimoji="0" lang="pl-PL" altLang="pl-PL" sz="2000" b="0" i="0" u="none" strike="noStrike" cap="none" normalizeH="0" baseline="0" dirty="0">
+              <a:ln>
+                <a:noFill/>
+              </a:ln>
+              <a:solidFill>
+                <a:srgbClr val="101094"/>
+              </a:solidFill>
+              <a:effectLst/>
+              <a:latin typeface="inherit"/>
+            </a:endParaRPr>
+          </a:p>
+          <a:p>
+            <a:pPr marL="0" marR="0" lvl="0" indent="0" algn="l" defTabSz="914400" rtl="0" eaLnBrk="0" fontAlgn="base" latinLnBrk="0" hangingPunct="0">
+              <a:lnSpc>
+                <a:spcPct val="100000"/>
+              </a:lnSpc>
+              <a:spcBef>
+                <a:spcPct val="0"/>
+              </a:spcBef>
+              <a:spcAft>
+                <a:spcPct val="0"/>
+              </a:spcAft>
+              <a:buClrTx/>
+              <a:buSzTx/>
+              <a:buFontTx/>
+              <a:buNone/>
+              <a:tabLst/>
+            </a:pPr>
+            <a:r>
+              <a:rPr kumimoji="0" lang="pl-PL" altLang="pl-PL" sz="2000" b="0" i="0" u="none" strike="noStrike" cap="none" normalizeH="0" baseline="0" dirty="0">
+                <a:ln>
+                  <a:noFill/>
+                </a:ln>
+                <a:solidFill>
+                  <a:srgbClr val="101094"/>
+                </a:solidFill>
+                <a:effectLst/>
+                <a:latin typeface="inherit"/>
+              </a:rPr>
+              <a:t>import</a:t>
+            </a:r>
+            <a:r>
+              <a:rPr kumimoji="0" lang="pl-PL" altLang="pl-PL" sz="2000" b="0" i="0" u="none" strike="noStrike" cap="none" normalizeH="0" baseline="0" dirty="0">
+                <a:ln>
+                  <a:noFill/>
+                </a:ln>
+                <a:solidFill>
+                  <a:srgbClr val="303336"/>
+                </a:solidFill>
+                <a:effectLst/>
+                <a:latin typeface="inherit"/>
+              </a:rPr>
+              <a:t> </a:t>
+            </a:r>
+            <a:r>
+              <a:rPr kumimoji="0" lang="pl-PL" altLang="pl-PL" sz="2000" b="0" i="0" u="none" strike="noStrike" cap="none" normalizeH="0" baseline="0" dirty="0">
+                <a:ln>
+                  <a:noFill/>
+                </a:ln>
+                <a:solidFill>
+                  <a:srgbClr val="7D2727"/>
+                </a:solidFill>
+                <a:effectLst/>
+                <a:latin typeface="inherit"/>
+              </a:rPr>
+              <a:t>'../</a:t>
+            </a:r>
+            <a:r>
+              <a:rPr kumimoji="0" lang="pl-PL" altLang="pl-PL" sz="2000" b="0" i="0" u="none" strike="noStrike" cap="none" normalizeH="0" baseline="0" dirty="0" err="1">
+                <a:ln>
+                  <a:noFill/>
+                </a:ln>
+                <a:solidFill>
+                  <a:srgbClr val="7D2727"/>
+                </a:solidFill>
+                <a:effectLst/>
+                <a:latin typeface="inherit"/>
+              </a:rPr>
+              <a:t>node_modules</a:t>
+            </a:r>
+            <a:r>
+              <a:rPr kumimoji="0" lang="pl-PL" altLang="pl-PL" sz="2000" b="0" i="0" u="none" strike="noStrike" cap="none" normalizeH="0" baseline="0" dirty="0">
+                <a:ln>
+                  <a:noFill/>
+                </a:ln>
+                <a:solidFill>
+                  <a:srgbClr val="7D2727"/>
+                </a:solidFill>
+                <a:effectLst/>
+                <a:latin typeface="inherit"/>
+              </a:rPr>
+              <a:t>/</a:t>
+            </a:r>
+            <a:r>
+              <a:rPr kumimoji="0" lang="pl-PL" altLang="pl-PL" sz="2000" b="0" i="0" u="none" strike="noStrike" cap="none" normalizeH="0" baseline="0" dirty="0" err="1">
+                <a:ln>
+                  <a:noFill/>
+                </a:ln>
+                <a:solidFill>
+                  <a:srgbClr val="7D2727"/>
+                </a:solidFill>
+                <a:effectLst/>
+                <a:latin typeface="inherit"/>
+              </a:rPr>
+              <a:t>bootstrap</a:t>
+            </a:r>
+            <a:r>
+              <a:rPr kumimoji="0" lang="pl-PL" altLang="pl-PL" sz="2000" b="0" i="0" u="none" strike="noStrike" cap="none" normalizeH="0" baseline="0" dirty="0">
+                <a:ln>
+                  <a:noFill/>
+                </a:ln>
+                <a:solidFill>
+                  <a:srgbClr val="7D2727"/>
+                </a:solidFill>
+                <a:effectLst/>
+                <a:latin typeface="inherit"/>
+              </a:rPr>
+              <a:t>/</a:t>
+            </a:r>
+            <a:r>
+              <a:rPr kumimoji="0" lang="pl-PL" altLang="pl-PL" sz="2000" b="0" i="0" u="none" strike="noStrike" cap="none" normalizeH="0" baseline="0" dirty="0" err="1">
+                <a:ln>
+                  <a:noFill/>
+                </a:ln>
+                <a:solidFill>
+                  <a:srgbClr val="7D2727"/>
+                </a:solidFill>
+                <a:effectLst/>
+                <a:latin typeface="inherit"/>
+              </a:rPr>
+              <a:t>dist</a:t>
+            </a:r>
+            <a:r>
+              <a:rPr kumimoji="0" lang="pl-PL" altLang="pl-PL" sz="2000" b="0" i="0" u="none" strike="noStrike" cap="none" normalizeH="0" baseline="0" dirty="0">
+                <a:ln>
+                  <a:noFill/>
+                </a:ln>
+                <a:solidFill>
+                  <a:srgbClr val="7D2727"/>
+                </a:solidFill>
+                <a:effectLst/>
+                <a:latin typeface="inherit"/>
+              </a:rPr>
+              <a:t>/</a:t>
+            </a:r>
+            <a:r>
+              <a:rPr kumimoji="0" lang="pl-PL" altLang="pl-PL" sz="2000" b="0" i="0" u="none" strike="noStrike" cap="none" normalizeH="0" baseline="0" dirty="0" err="1">
+                <a:ln>
+                  <a:noFill/>
+                </a:ln>
+                <a:solidFill>
+                  <a:srgbClr val="7D2727"/>
+                </a:solidFill>
+                <a:effectLst/>
+                <a:latin typeface="inherit"/>
+              </a:rPr>
+              <a:t>css</a:t>
+            </a:r>
+            <a:r>
+              <a:rPr kumimoji="0" lang="pl-PL" altLang="pl-PL" sz="2000" b="0" i="0" u="none" strike="noStrike" cap="none" normalizeH="0" baseline="0" dirty="0">
+                <a:ln>
+                  <a:noFill/>
+                </a:ln>
+                <a:solidFill>
+                  <a:srgbClr val="7D2727"/>
+                </a:solidFill>
+                <a:effectLst/>
+                <a:latin typeface="inherit"/>
+              </a:rPr>
+              <a:t>/bootstrap.min.css'</a:t>
+            </a:r>
+            <a:r>
+              <a:rPr kumimoji="0" lang="pl-PL" altLang="pl-PL" sz="2000" b="0" i="0" u="none" strike="noStrike" cap="none" normalizeH="0" baseline="0" dirty="0">
+                <a:ln>
+                  <a:noFill/>
+                </a:ln>
+                <a:solidFill>
+                  <a:srgbClr val="303336"/>
+                </a:solidFill>
+                <a:effectLst/>
+                <a:latin typeface="inherit"/>
+              </a:rPr>
+              <a:t>;</a:t>
+            </a:r>
+            <a:r>
+              <a:rPr kumimoji="0" lang="pl-PL" altLang="pl-PL" b="0" i="0" u="none" strike="noStrike" cap="none" normalizeH="0" baseline="0" dirty="0">
+                <a:ln>
+                  <a:noFill/>
+                </a:ln>
+                <a:solidFill>
+                  <a:schemeClr val="tx1"/>
+                </a:solidFill>
+                <a:effectLst/>
+              </a:rPr>
+              <a:t> </a:t>
+            </a:r>
+            <a:endParaRPr kumimoji="0" lang="pl-PL" altLang="pl-PL" sz="4800" b="0" i="0" u="none" strike="noStrike" cap="none" normalizeH="0" baseline="0" dirty="0">
+              <a:ln>
+                <a:noFill/>
+              </a:ln>
+              <a:solidFill>
+                <a:schemeClr val="tx1"/>
+              </a:solidFill>
+              <a:effectLst/>
+              <a:latin typeface="Arial" panose="020B0604020202020204" pitchFamily="34" charset="0"/>
+            </a:endParaRPr>
+          </a:p>
+        </p:txBody>
+      </p:sp>
+    </p:spTree>
+    <p:extLst>
+      <p:ext uri="{BB962C8B-B14F-4D97-AF65-F5344CB8AC3E}">
+        <p14:creationId xmlns:p14="http://schemas.microsoft.com/office/powerpoint/2010/main" val="4108847802"/>
+      </p:ext>
+    </p:extLst>
+  </p:cSld>
+  <p:clrMapOvr>
+    <a:masterClrMapping/>
+  </p:clrMapOvr>
+</p:sld>
+</file>
+
+<file path=ppt/slides/slide7.xml><?xml version="1.0" encoding="utf-8"?>
+<p:sld xmlns:a="http://schemas.openxmlformats.org/drawingml/2006/main" xmlns:r="http://schemas.openxmlformats.org/officeDocument/2006/relationships" xmlns:p="http://schemas.openxmlformats.org/presentationml/2006/main">
+  <p:cSld>
+    <p:spTree>
+      <p:nvGrpSpPr>
+        <p:cNvPr id="1" name=""/>
+        <p:cNvGrpSpPr/>
+        <p:nvPr/>
+      </p:nvGrpSpPr>
+      <p:grpSpPr>
+        <a:xfrm>
+          <a:off x="0" y="0"/>
+          <a:ext cx="0" cy="0"/>
+          <a:chOff x="0" y="0"/>
+          <a:chExt cx="0" cy="0"/>
+        </a:xfrm>
+      </p:grpSpPr>
+      <p:sp>
+        <p:nvSpPr>
+          <p:cNvPr id="4" name="pole tekstowe 3">
+            <a:extLst>
+              <a:ext uri="{FF2B5EF4-FFF2-40B4-BE49-F238E27FC236}">
+                <a16:creationId xmlns:a16="http://schemas.microsoft.com/office/drawing/2014/main" id="{F164A7B3-8808-414C-9401-3B25194E3B5A}"/>
+              </a:ext>
+            </a:extLst>
+          </p:cNvPr>
+          <p:cNvSpPr txBox="1"/>
+          <p:nvPr/>
+        </p:nvSpPr>
+        <p:spPr>
+          <a:xfrm>
+            <a:off x="497840" y="538480"/>
+            <a:ext cx="1822037" cy="369332"/>
+          </a:xfrm>
+          <a:prstGeom prst="rect">
+            <a:avLst/>
+          </a:prstGeom>
+          <a:noFill/>
+        </p:spPr>
+        <p:txBody>
+          <a:bodyPr wrap="none" rtlCol="0">
+            <a:spAutoFit/>
+          </a:bodyPr>
+          <a:lstStyle/>
+          <a:p>
+            <a:r>
+              <a:rPr lang="pl-PL" dirty="0"/>
+              <a:t>JSX - </a:t>
+            </a:r>
+            <a:r>
+              <a:rPr lang="pl-PL" dirty="0" err="1"/>
+              <a:t>introduction</a:t>
+            </a:r>
+            <a:endParaRPr lang="pl-PL" dirty="0"/>
+          </a:p>
+        </p:txBody>
+      </p:sp>
+    </p:spTree>
+    <p:extLst>
+      <p:ext uri="{BB962C8B-B14F-4D97-AF65-F5344CB8AC3E}">
+        <p14:creationId xmlns:p14="http://schemas.microsoft.com/office/powerpoint/2010/main" val="2486456924"/>
       </p:ext>
     </p:extLst>
   </p:cSld>

</xml_diff>

<commit_message>
Exercise 1 - red/green object depended on seconds
</commit_message>
<xml_diff>
--- a/tutorial/ReactjsTraining.pptx
+++ b/tutorial/ReactjsTraining.pptx
@@ -5,7 +5,7 @@
     <p:sldMasterId id="2147483648" r:id="rId1"/>
   </p:sldMasterIdLst>
   <p:notesMasterIdLst>
-    <p:notesMasterId r:id="rId9"/>
+    <p:notesMasterId r:id="rId10"/>
   </p:notesMasterIdLst>
   <p:sldIdLst>
     <p:sldId id="256" r:id="rId2"/>
@@ -15,6 +15,7 @@
     <p:sldId id="260" r:id="rId6"/>
     <p:sldId id="262" r:id="rId7"/>
     <p:sldId id="261" r:id="rId8"/>
+    <p:sldId id="263" r:id="rId9"/>
   </p:sldIdLst>
   <p:sldSz cx="12192000" cy="6858000"/>
   <p:notesSz cx="6858000" cy="9144000"/>
@@ -1421,11 +1422,27 @@
           <a:p>
             <a:r>
               <a:rPr lang="pl-PL" dirty="0"/>
-              <a:t>TODO: Coś o </a:t>
+              <a:t>Ćwiczenie 0 – </a:t>
             </a:r>
             <a:r>
               <a:rPr lang="pl-PL" dirty="0" err="1"/>
-              <a:t>serviceWorker</a:t>
+              <a:t>Add</a:t>
+            </a:r>
+            <a:r>
+              <a:rPr lang="pl-PL" dirty="0"/>
+              <a:t> </a:t>
+            </a:r>
+            <a:r>
+              <a:rPr lang="pl-PL" dirty="0" err="1"/>
+              <a:t>bootstrap</a:t>
+            </a:r>
+            <a:r>
+              <a:rPr lang="pl-PL" dirty="0"/>
+              <a:t> to </a:t>
+            </a:r>
+            <a:r>
+              <a:rPr lang="pl-PL" dirty="0" err="1"/>
+              <a:t>project</a:t>
             </a:r>
             <a:endParaRPr lang="pl-PL" dirty="0"/>
           </a:p>
@@ -1518,10 +1535,26 @@
           <a:bodyPr/>
           <a:lstStyle/>
           <a:p>
-            <a:pPr marL="171450" indent="-171450">
+            <a:pPr marL="0" indent="0">
               <a:buFontTx/>
-              <a:buChar char="-"/>
+              <a:buNone/>
             </a:pPr>
+            <a:r>
+              <a:rPr lang="pl-PL" dirty="0"/>
+              <a:t>Ćwiczenie 1 – obiekt jest czerwony dla parzystych sekund i zielony dla nieparzystych. Dodać, że z </a:t>
+            </a:r>
+            <a:r>
+              <a:rPr lang="pl-PL" dirty="0" err="1"/>
+              <a:t>odświażaniem</a:t>
+            </a:r>
+            <a:r>
+              <a:rPr lang="pl-PL" dirty="0"/>
+              <a:t>, potem dojdziemy do tego jak co sekundę </a:t>
+            </a:r>
+            <a:r>
+              <a:rPr lang="pl-PL" dirty="0" err="1"/>
+              <a:t>updateować</a:t>
+            </a:r>
             <a:endParaRPr lang="pl-PL" dirty="0"/>
           </a:p>
         </p:txBody>
@@ -1553,6 +1586,94 @@
     <p:extLst>
       <p:ext uri="{BB962C8B-B14F-4D97-AF65-F5344CB8AC3E}">
         <p14:creationId xmlns:p14="http://schemas.microsoft.com/office/powerpoint/2010/main" val="667249772"/>
+      </p:ext>
+    </p:extLst>
+  </p:cSld>
+  <p:clrMapOvr>
+    <a:masterClrMapping/>
+  </p:clrMapOvr>
+</p:notes>
+</file>
+
+<file path=ppt/notesSlides/notesSlide8.xml><?xml version="1.0" encoding="utf-8"?>
+<p:notes xmlns:a="http://schemas.openxmlformats.org/drawingml/2006/main" xmlns:r="http://schemas.openxmlformats.org/officeDocument/2006/relationships" xmlns:p="http://schemas.openxmlformats.org/presentationml/2006/main">
+  <p:cSld>
+    <p:spTree>
+      <p:nvGrpSpPr>
+        <p:cNvPr id="1" name=""/>
+        <p:cNvGrpSpPr/>
+        <p:nvPr/>
+      </p:nvGrpSpPr>
+      <p:grpSpPr>
+        <a:xfrm>
+          <a:off x="0" y="0"/>
+          <a:ext cx="0" cy="0"/>
+          <a:chOff x="0" y="0"/>
+          <a:chExt cx="0" cy="0"/>
+        </a:xfrm>
+      </p:grpSpPr>
+      <p:sp>
+        <p:nvSpPr>
+          <p:cNvPr id="2" name="Symbol zastępczy obrazu slajdu 1"/>
+          <p:cNvSpPr>
+            <a:spLocks noGrp="1" noRot="1" noChangeAspect="1"/>
+          </p:cNvSpPr>
+          <p:nvPr>
+            <p:ph type="sldImg"/>
+          </p:nvPr>
+        </p:nvSpPr>
+        <p:spPr/>
+      </p:sp>
+      <p:sp>
+        <p:nvSpPr>
+          <p:cNvPr id="3" name="Symbol zastępczy notatek 2"/>
+          <p:cNvSpPr>
+            <a:spLocks noGrp="1"/>
+          </p:cNvSpPr>
+          <p:nvPr>
+            <p:ph type="body" idx="1"/>
+          </p:nvPr>
+        </p:nvSpPr>
+        <p:spPr/>
+        <p:txBody>
+          <a:bodyPr/>
+          <a:lstStyle/>
+          <a:p>
+            <a:pPr marL="171450" indent="-171450">
+              <a:buFontTx/>
+              <a:buChar char="-"/>
+            </a:pPr>
+            <a:endParaRPr lang="pl-PL" dirty="0"/>
+          </a:p>
+        </p:txBody>
+      </p:sp>
+      <p:sp>
+        <p:nvSpPr>
+          <p:cNvPr id="4" name="Symbol zastępczy numeru slajdu 3"/>
+          <p:cNvSpPr>
+            <a:spLocks noGrp="1"/>
+          </p:cNvSpPr>
+          <p:nvPr>
+            <p:ph type="sldNum" sz="quarter" idx="5"/>
+          </p:nvPr>
+        </p:nvSpPr>
+        <p:spPr/>
+        <p:txBody>
+          <a:bodyPr/>
+          <a:lstStyle/>
+          <a:p>
+            <a:fld id="{810A6612-7A23-4B98-B0E9-4F3C882AD2EF}" type="slidenum">
+              <a:rPr lang="pl-PL" smtClean="0"/>
+              <a:t>8</a:t>
+            </a:fld>
+            <a:endParaRPr lang="pl-PL"/>
+          </a:p>
+        </p:txBody>
+      </p:sp>
+    </p:spTree>
+    <p:extLst>
+      <p:ext uri="{BB962C8B-B14F-4D97-AF65-F5344CB8AC3E}">
+        <p14:creationId xmlns:p14="http://schemas.microsoft.com/office/powerpoint/2010/main" val="3273722160"/>
       </p:ext>
     </p:extLst>
   </p:cSld>
@@ -7639,7 +7760,7 @@
         </p:nvSpPr>
         <p:spPr>
           <a:xfrm>
-            <a:off x="497840" y="538480"/>
+            <a:off x="271734" y="377114"/>
             <a:ext cx="1822037" cy="369332"/>
           </a:xfrm>
           <a:prstGeom prst="rect">
@@ -7665,10 +7786,1539 @@
           </a:p>
         </p:txBody>
       </p:sp>
+      <p:sp>
+        <p:nvSpPr>
+          <p:cNvPr id="2" name="Prostokąt 1">
+            <a:extLst>
+              <a:ext uri="{FF2B5EF4-FFF2-40B4-BE49-F238E27FC236}">
+                <a16:creationId xmlns:a16="http://schemas.microsoft.com/office/drawing/2014/main" id="{6D15B74F-F2A3-4833-B493-2A165FEE00BE}"/>
+              </a:ext>
+            </a:extLst>
+          </p:cNvPr>
+          <p:cNvSpPr/>
+          <p:nvPr/>
+        </p:nvSpPr>
+        <p:spPr>
+          <a:xfrm>
+            <a:off x="3201280" y="1072060"/>
+            <a:ext cx="8328106" cy="646331"/>
+          </a:xfrm>
+          <a:prstGeom prst="rect">
+            <a:avLst/>
+          </a:prstGeom>
+          <a:solidFill>
+            <a:schemeClr val="tx1"/>
+          </a:solidFill>
+        </p:spPr>
+        <p:txBody>
+          <a:bodyPr wrap="square">
+            <a:spAutoFit/>
+          </a:bodyPr>
+          <a:lstStyle/>
+          <a:p>
+            <a:r>
+              <a:rPr lang="en-US" dirty="0">
+                <a:solidFill>
+                  <a:srgbClr val="D4D4D4"/>
+                </a:solidFill>
+                <a:latin typeface="Consolas" panose="020B0609020204030204" pitchFamily="49" charset="0"/>
+              </a:rPr>
+              <a:t>  </a:t>
+            </a:r>
+            <a:r>
+              <a:rPr lang="en-US" dirty="0">
+                <a:solidFill>
+                  <a:srgbClr val="569CD6"/>
+                </a:solidFill>
+                <a:latin typeface="Consolas" panose="020B0609020204030204" pitchFamily="49" charset="0"/>
+              </a:rPr>
+              <a:t>const</a:t>
+            </a:r>
+            <a:r>
+              <a:rPr lang="en-US" dirty="0">
+                <a:solidFill>
+                  <a:srgbClr val="D4D4D4"/>
+                </a:solidFill>
+                <a:latin typeface="Consolas" panose="020B0609020204030204" pitchFamily="49" charset="0"/>
+              </a:rPr>
+              <a:t> </a:t>
+            </a:r>
+            <a:r>
+              <a:rPr lang="en-US" dirty="0">
+                <a:solidFill>
+                  <a:srgbClr val="9CDCFE"/>
+                </a:solidFill>
+                <a:latin typeface="Consolas" panose="020B0609020204030204" pitchFamily="49" charset="0"/>
+              </a:rPr>
+              <a:t>value</a:t>
+            </a:r>
+            <a:r>
+              <a:rPr lang="en-US" dirty="0">
+                <a:solidFill>
+                  <a:srgbClr val="D4D4D4"/>
+                </a:solidFill>
+                <a:latin typeface="Consolas" panose="020B0609020204030204" pitchFamily="49" charset="0"/>
+              </a:rPr>
+              <a:t> = </a:t>
+            </a:r>
+            <a:r>
+              <a:rPr lang="en-US" dirty="0">
+                <a:solidFill>
+                  <a:srgbClr val="CE9178"/>
+                </a:solidFill>
+                <a:latin typeface="Consolas" panose="020B0609020204030204" pitchFamily="49" charset="0"/>
+              </a:rPr>
+              <a:t>'Hello world'</a:t>
+            </a:r>
+            <a:endParaRPr lang="en-US" dirty="0">
+              <a:solidFill>
+                <a:srgbClr val="D4D4D4"/>
+              </a:solidFill>
+              <a:latin typeface="Consolas" panose="020B0609020204030204" pitchFamily="49" charset="0"/>
+            </a:endParaRPr>
+          </a:p>
+          <a:p>
+            <a:r>
+              <a:rPr lang="en-US" dirty="0">
+                <a:solidFill>
+                  <a:srgbClr val="D4D4D4"/>
+                </a:solidFill>
+                <a:latin typeface="Consolas" panose="020B0609020204030204" pitchFamily="49" charset="0"/>
+              </a:rPr>
+              <a:t>  </a:t>
+            </a:r>
+            <a:r>
+              <a:rPr lang="en-US" dirty="0">
+                <a:solidFill>
+                  <a:srgbClr val="C586C0"/>
+                </a:solidFill>
+                <a:latin typeface="Consolas" panose="020B0609020204030204" pitchFamily="49" charset="0"/>
+              </a:rPr>
+              <a:t>return</a:t>
+            </a:r>
+            <a:r>
+              <a:rPr lang="en-US" dirty="0">
+                <a:solidFill>
+                  <a:srgbClr val="D4D4D4"/>
+                </a:solidFill>
+                <a:latin typeface="Consolas" panose="020B0609020204030204" pitchFamily="49" charset="0"/>
+              </a:rPr>
+              <a:t> ( </a:t>
+            </a:r>
+            <a:r>
+              <a:rPr lang="en-US" dirty="0">
+                <a:solidFill>
+                  <a:srgbClr val="808080"/>
+                </a:solidFill>
+                <a:latin typeface="Consolas" panose="020B0609020204030204" pitchFamily="49" charset="0"/>
+              </a:rPr>
+              <a:t>&lt;</a:t>
+            </a:r>
+            <a:r>
+              <a:rPr lang="en-US" dirty="0">
+                <a:solidFill>
+                  <a:srgbClr val="569CD6"/>
+                </a:solidFill>
+                <a:latin typeface="Consolas" panose="020B0609020204030204" pitchFamily="49" charset="0"/>
+              </a:rPr>
+              <a:t>div</a:t>
+            </a:r>
+            <a:r>
+              <a:rPr lang="en-US" dirty="0">
+                <a:solidFill>
+                  <a:srgbClr val="D4D4D4"/>
+                </a:solidFill>
+                <a:latin typeface="Consolas" panose="020B0609020204030204" pitchFamily="49" charset="0"/>
+              </a:rPr>
+              <a:t> </a:t>
+            </a:r>
+            <a:r>
+              <a:rPr lang="en-US" dirty="0" err="1">
+                <a:solidFill>
+                  <a:srgbClr val="9CDCFE"/>
+                </a:solidFill>
+                <a:latin typeface="Consolas" panose="020B0609020204030204" pitchFamily="49" charset="0"/>
+              </a:rPr>
+              <a:t>className</a:t>
+            </a:r>
+            <a:r>
+              <a:rPr lang="en-US" dirty="0">
+                <a:solidFill>
+                  <a:srgbClr val="D4D4D4"/>
+                </a:solidFill>
+                <a:latin typeface="Consolas" panose="020B0609020204030204" pitchFamily="49" charset="0"/>
+              </a:rPr>
+              <a:t>=</a:t>
+            </a:r>
+            <a:r>
+              <a:rPr lang="en-US" dirty="0">
+                <a:solidFill>
+                  <a:srgbClr val="CE9178"/>
+                </a:solidFill>
+                <a:latin typeface="Consolas" panose="020B0609020204030204" pitchFamily="49" charset="0"/>
+              </a:rPr>
+              <a:t>"App"</a:t>
+            </a:r>
+            <a:r>
+              <a:rPr lang="en-US" dirty="0">
+                <a:solidFill>
+                  <a:srgbClr val="808080"/>
+                </a:solidFill>
+                <a:latin typeface="Consolas" panose="020B0609020204030204" pitchFamily="49" charset="0"/>
+              </a:rPr>
+              <a:t>&gt;</a:t>
+            </a:r>
+            <a:r>
+              <a:rPr lang="en-US" dirty="0">
+                <a:solidFill>
+                  <a:srgbClr val="569CD6"/>
+                </a:solidFill>
+                <a:latin typeface="Consolas" panose="020B0609020204030204" pitchFamily="49" charset="0"/>
+              </a:rPr>
+              <a:t>{</a:t>
+            </a:r>
+            <a:r>
+              <a:rPr lang="en-US" dirty="0">
+                <a:solidFill>
+                  <a:srgbClr val="9CDCFE"/>
+                </a:solidFill>
+                <a:latin typeface="Consolas" panose="020B0609020204030204" pitchFamily="49" charset="0"/>
+              </a:rPr>
+              <a:t>value</a:t>
+            </a:r>
+            <a:r>
+              <a:rPr lang="en-US" dirty="0">
+                <a:solidFill>
+                  <a:srgbClr val="569CD6"/>
+                </a:solidFill>
+                <a:latin typeface="Consolas" panose="020B0609020204030204" pitchFamily="49" charset="0"/>
+              </a:rPr>
+              <a:t>}</a:t>
+            </a:r>
+            <a:r>
+              <a:rPr lang="en-US" dirty="0">
+                <a:solidFill>
+                  <a:srgbClr val="808080"/>
+                </a:solidFill>
+                <a:latin typeface="Consolas" panose="020B0609020204030204" pitchFamily="49" charset="0"/>
+              </a:rPr>
+              <a:t>&lt;/</a:t>
+            </a:r>
+            <a:r>
+              <a:rPr lang="en-US" dirty="0">
+                <a:solidFill>
+                  <a:srgbClr val="569CD6"/>
+                </a:solidFill>
+                <a:latin typeface="Consolas" panose="020B0609020204030204" pitchFamily="49" charset="0"/>
+              </a:rPr>
+              <a:t>div</a:t>
+            </a:r>
+            <a:r>
+              <a:rPr lang="en-US" dirty="0">
+                <a:solidFill>
+                  <a:srgbClr val="808080"/>
+                </a:solidFill>
+                <a:latin typeface="Consolas" panose="020B0609020204030204" pitchFamily="49" charset="0"/>
+              </a:rPr>
+              <a:t>&gt;</a:t>
+            </a:r>
+            <a:r>
+              <a:rPr lang="en-US" dirty="0">
+                <a:solidFill>
+                  <a:srgbClr val="D4D4D4"/>
+                </a:solidFill>
+                <a:latin typeface="Consolas" panose="020B0609020204030204" pitchFamily="49" charset="0"/>
+              </a:rPr>
+              <a:t>);</a:t>
+            </a:r>
+            <a:endParaRPr lang="en-US" b="0" dirty="0">
+              <a:solidFill>
+                <a:srgbClr val="D4D4D4"/>
+              </a:solidFill>
+              <a:effectLst/>
+              <a:latin typeface="Consolas" panose="020B0609020204030204" pitchFamily="49" charset="0"/>
+            </a:endParaRPr>
+          </a:p>
+        </p:txBody>
+      </p:sp>
+      <p:sp>
+        <p:nvSpPr>
+          <p:cNvPr id="3" name="Prostokąt 2">
+            <a:extLst>
+              <a:ext uri="{FF2B5EF4-FFF2-40B4-BE49-F238E27FC236}">
+                <a16:creationId xmlns:a16="http://schemas.microsoft.com/office/drawing/2014/main" id="{6976F7E5-BEA2-4A65-BB95-B580E359A95A}"/>
+              </a:ext>
+            </a:extLst>
+          </p:cNvPr>
+          <p:cNvSpPr/>
+          <p:nvPr/>
+        </p:nvSpPr>
+        <p:spPr>
+          <a:xfrm>
+            <a:off x="3201279" y="1841567"/>
+            <a:ext cx="8328107" cy="923330"/>
+          </a:xfrm>
+          <a:prstGeom prst="rect">
+            <a:avLst/>
+          </a:prstGeom>
+          <a:solidFill>
+            <a:schemeClr val="tx1"/>
+          </a:solidFill>
+        </p:spPr>
+        <p:txBody>
+          <a:bodyPr wrap="square">
+            <a:spAutoFit/>
+          </a:bodyPr>
+          <a:lstStyle/>
+          <a:p>
+            <a:r>
+              <a:rPr lang="en-US" dirty="0">
+                <a:solidFill>
+                  <a:srgbClr val="D4D4D4"/>
+                </a:solidFill>
+                <a:latin typeface="Consolas" panose="020B0609020204030204" pitchFamily="49" charset="0"/>
+              </a:rPr>
+              <a:t>  </a:t>
+            </a:r>
+            <a:r>
+              <a:rPr lang="en-US" dirty="0">
+                <a:solidFill>
+                  <a:srgbClr val="569CD6"/>
+                </a:solidFill>
+                <a:latin typeface="Consolas" panose="020B0609020204030204" pitchFamily="49" charset="0"/>
+              </a:rPr>
+              <a:t>const</a:t>
+            </a:r>
+            <a:r>
+              <a:rPr lang="en-US" dirty="0">
+                <a:solidFill>
+                  <a:srgbClr val="D4D4D4"/>
+                </a:solidFill>
+                <a:latin typeface="Consolas" panose="020B0609020204030204" pitchFamily="49" charset="0"/>
+              </a:rPr>
+              <a:t> </a:t>
+            </a:r>
+            <a:r>
+              <a:rPr lang="en-US" dirty="0">
+                <a:solidFill>
+                  <a:srgbClr val="9CDCFE"/>
+                </a:solidFill>
+                <a:latin typeface="Consolas" panose="020B0609020204030204" pitchFamily="49" charset="0"/>
+              </a:rPr>
+              <a:t>value</a:t>
+            </a:r>
+            <a:r>
+              <a:rPr lang="en-US" dirty="0">
+                <a:solidFill>
+                  <a:srgbClr val="D4D4D4"/>
+                </a:solidFill>
+                <a:latin typeface="Consolas" panose="020B0609020204030204" pitchFamily="49" charset="0"/>
+              </a:rPr>
+              <a:t> = </a:t>
+            </a:r>
+            <a:r>
+              <a:rPr lang="en-US" dirty="0">
+                <a:solidFill>
+                  <a:srgbClr val="CE9178"/>
+                </a:solidFill>
+                <a:latin typeface="Consolas" panose="020B0609020204030204" pitchFamily="49" charset="0"/>
+              </a:rPr>
+              <a:t>'Hello World'</a:t>
+            </a:r>
+            <a:endParaRPr lang="en-US" dirty="0">
+              <a:solidFill>
+                <a:srgbClr val="D4D4D4"/>
+              </a:solidFill>
+              <a:latin typeface="Consolas" panose="020B0609020204030204" pitchFamily="49" charset="0"/>
+            </a:endParaRPr>
+          </a:p>
+          <a:p>
+            <a:r>
+              <a:rPr lang="en-US" dirty="0">
+                <a:solidFill>
+                  <a:srgbClr val="D4D4D4"/>
+                </a:solidFill>
+                <a:latin typeface="Consolas" panose="020B0609020204030204" pitchFamily="49" charset="0"/>
+              </a:rPr>
+              <a:t>  </a:t>
+            </a:r>
+            <a:r>
+              <a:rPr lang="en-US" dirty="0">
+                <a:solidFill>
+                  <a:srgbClr val="569CD6"/>
+                </a:solidFill>
+                <a:latin typeface="Consolas" panose="020B0609020204030204" pitchFamily="49" charset="0"/>
+              </a:rPr>
+              <a:t>const</a:t>
+            </a:r>
+            <a:r>
+              <a:rPr lang="en-US" dirty="0">
+                <a:solidFill>
+                  <a:srgbClr val="D4D4D4"/>
+                </a:solidFill>
+                <a:latin typeface="Consolas" panose="020B0609020204030204" pitchFamily="49" charset="0"/>
+              </a:rPr>
+              <a:t> </a:t>
+            </a:r>
+            <a:r>
+              <a:rPr lang="en-US" dirty="0">
+                <a:solidFill>
+                  <a:srgbClr val="9CDCFE"/>
+                </a:solidFill>
+                <a:latin typeface="Consolas" panose="020B0609020204030204" pitchFamily="49" charset="0"/>
+              </a:rPr>
+              <a:t>element</a:t>
+            </a:r>
+            <a:r>
+              <a:rPr lang="en-US" dirty="0">
+                <a:solidFill>
+                  <a:srgbClr val="D4D4D4"/>
+                </a:solidFill>
+                <a:latin typeface="Consolas" panose="020B0609020204030204" pitchFamily="49" charset="0"/>
+              </a:rPr>
+              <a:t> = </a:t>
+            </a:r>
+            <a:r>
+              <a:rPr lang="en-US" dirty="0">
+                <a:solidFill>
+                  <a:srgbClr val="808080"/>
+                </a:solidFill>
+                <a:latin typeface="Consolas" panose="020B0609020204030204" pitchFamily="49" charset="0"/>
+              </a:rPr>
+              <a:t>&lt;</a:t>
+            </a:r>
+            <a:r>
+              <a:rPr lang="en-US" dirty="0">
+                <a:solidFill>
+                  <a:srgbClr val="569CD6"/>
+                </a:solidFill>
+                <a:latin typeface="Consolas" panose="020B0609020204030204" pitchFamily="49" charset="0"/>
+              </a:rPr>
+              <a:t>div</a:t>
+            </a:r>
+            <a:r>
+              <a:rPr lang="en-US" dirty="0">
+                <a:solidFill>
+                  <a:srgbClr val="D4D4D4"/>
+                </a:solidFill>
+                <a:latin typeface="Consolas" panose="020B0609020204030204" pitchFamily="49" charset="0"/>
+              </a:rPr>
+              <a:t> </a:t>
+            </a:r>
+            <a:r>
+              <a:rPr lang="en-US" dirty="0" err="1">
+                <a:solidFill>
+                  <a:srgbClr val="9CDCFE"/>
+                </a:solidFill>
+                <a:latin typeface="Consolas" panose="020B0609020204030204" pitchFamily="49" charset="0"/>
+              </a:rPr>
+              <a:t>className</a:t>
+            </a:r>
+            <a:r>
+              <a:rPr lang="en-US" dirty="0">
+                <a:solidFill>
+                  <a:srgbClr val="D4D4D4"/>
+                </a:solidFill>
+                <a:latin typeface="Consolas" panose="020B0609020204030204" pitchFamily="49" charset="0"/>
+              </a:rPr>
+              <a:t>=</a:t>
+            </a:r>
+            <a:r>
+              <a:rPr lang="en-US" dirty="0">
+                <a:solidFill>
+                  <a:srgbClr val="CE9178"/>
+                </a:solidFill>
+                <a:latin typeface="Consolas" panose="020B0609020204030204" pitchFamily="49" charset="0"/>
+              </a:rPr>
+              <a:t>"App"</a:t>
+            </a:r>
+            <a:r>
+              <a:rPr lang="en-US" dirty="0">
+                <a:solidFill>
+                  <a:srgbClr val="808080"/>
+                </a:solidFill>
+                <a:latin typeface="Consolas" panose="020B0609020204030204" pitchFamily="49" charset="0"/>
+              </a:rPr>
+              <a:t>&gt;</a:t>
+            </a:r>
+            <a:r>
+              <a:rPr lang="en-US" dirty="0">
+                <a:solidFill>
+                  <a:srgbClr val="569CD6"/>
+                </a:solidFill>
+                <a:latin typeface="Consolas" panose="020B0609020204030204" pitchFamily="49" charset="0"/>
+              </a:rPr>
+              <a:t>{</a:t>
+            </a:r>
+            <a:r>
+              <a:rPr lang="en-US" dirty="0">
+                <a:solidFill>
+                  <a:srgbClr val="9CDCFE"/>
+                </a:solidFill>
+                <a:latin typeface="Consolas" panose="020B0609020204030204" pitchFamily="49" charset="0"/>
+              </a:rPr>
+              <a:t>value</a:t>
+            </a:r>
+            <a:r>
+              <a:rPr lang="en-US" dirty="0">
+                <a:solidFill>
+                  <a:srgbClr val="569CD6"/>
+                </a:solidFill>
+                <a:latin typeface="Consolas" panose="020B0609020204030204" pitchFamily="49" charset="0"/>
+              </a:rPr>
+              <a:t>}</a:t>
+            </a:r>
+            <a:r>
+              <a:rPr lang="en-US" dirty="0">
+                <a:solidFill>
+                  <a:srgbClr val="808080"/>
+                </a:solidFill>
+                <a:latin typeface="Consolas" panose="020B0609020204030204" pitchFamily="49" charset="0"/>
+              </a:rPr>
+              <a:t>&lt;/</a:t>
+            </a:r>
+            <a:r>
+              <a:rPr lang="en-US" dirty="0">
+                <a:solidFill>
+                  <a:srgbClr val="569CD6"/>
+                </a:solidFill>
+                <a:latin typeface="Consolas" panose="020B0609020204030204" pitchFamily="49" charset="0"/>
+              </a:rPr>
+              <a:t>div</a:t>
+            </a:r>
+            <a:r>
+              <a:rPr lang="en-US" dirty="0">
+                <a:solidFill>
+                  <a:srgbClr val="808080"/>
+                </a:solidFill>
+                <a:latin typeface="Consolas" panose="020B0609020204030204" pitchFamily="49" charset="0"/>
+              </a:rPr>
+              <a:t>&gt;</a:t>
+            </a:r>
+            <a:endParaRPr lang="en-US" dirty="0">
+              <a:solidFill>
+                <a:srgbClr val="D4D4D4"/>
+              </a:solidFill>
+              <a:latin typeface="Consolas" panose="020B0609020204030204" pitchFamily="49" charset="0"/>
+            </a:endParaRPr>
+          </a:p>
+          <a:p>
+            <a:r>
+              <a:rPr lang="en-US" dirty="0">
+                <a:solidFill>
+                  <a:srgbClr val="D4D4D4"/>
+                </a:solidFill>
+                <a:latin typeface="Consolas" panose="020B0609020204030204" pitchFamily="49" charset="0"/>
+              </a:rPr>
+              <a:t>  </a:t>
+            </a:r>
+            <a:r>
+              <a:rPr lang="en-US" dirty="0">
+                <a:solidFill>
+                  <a:srgbClr val="C586C0"/>
+                </a:solidFill>
+                <a:latin typeface="Consolas" panose="020B0609020204030204" pitchFamily="49" charset="0"/>
+              </a:rPr>
+              <a:t>return</a:t>
+            </a:r>
+            <a:r>
+              <a:rPr lang="en-US" dirty="0">
+                <a:solidFill>
+                  <a:srgbClr val="D4D4D4"/>
+                </a:solidFill>
+                <a:latin typeface="Consolas" panose="020B0609020204030204" pitchFamily="49" charset="0"/>
+              </a:rPr>
+              <a:t> (</a:t>
+            </a:r>
+            <a:r>
+              <a:rPr lang="en-US" dirty="0">
+                <a:solidFill>
+                  <a:srgbClr val="9CDCFE"/>
+                </a:solidFill>
+                <a:latin typeface="Consolas" panose="020B0609020204030204" pitchFamily="49" charset="0"/>
+              </a:rPr>
+              <a:t>element</a:t>
+            </a:r>
+            <a:r>
+              <a:rPr lang="en-US" dirty="0">
+                <a:solidFill>
+                  <a:srgbClr val="D4D4D4"/>
+                </a:solidFill>
+                <a:latin typeface="Consolas" panose="020B0609020204030204" pitchFamily="49" charset="0"/>
+              </a:rPr>
+              <a:t>);</a:t>
+            </a:r>
+            <a:endParaRPr lang="en-US" b="0" dirty="0">
+              <a:solidFill>
+                <a:srgbClr val="D4D4D4"/>
+              </a:solidFill>
+              <a:effectLst/>
+              <a:latin typeface="Consolas" panose="020B0609020204030204" pitchFamily="49" charset="0"/>
+            </a:endParaRPr>
+          </a:p>
+        </p:txBody>
+      </p:sp>
+      <p:sp>
+        <p:nvSpPr>
+          <p:cNvPr id="5" name="pole tekstowe 4">
+            <a:extLst>
+              <a:ext uri="{FF2B5EF4-FFF2-40B4-BE49-F238E27FC236}">
+                <a16:creationId xmlns:a16="http://schemas.microsoft.com/office/drawing/2014/main" id="{5682D6B2-EDE0-41E9-A739-D8848ED2616E}"/>
+              </a:ext>
+            </a:extLst>
+          </p:cNvPr>
+          <p:cNvSpPr txBox="1"/>
+          <p:nvPr/>
+        </p:nvSpPr>
+        <p:spPr>
+          <a:xfrm>
+            <a:off x="251678" y="1213766"/>
+            <a:ext cx="1475212" cy="369332"/>
+          </a:xfrm>
+          <a:prstGeom prst="rect">
+            <a:avLst/>
+          </a:prstGeom>
+          <a:noFill/>
+        </p:spPr>
+        <p:txBody>
+          <a:bodyPr wrap="none" rtlCol="0">
+            <a:spAutoFit/>
+          </a:bodyPr>
+          <a:lstStyle/>
+          <a:p>
+            <a:r>
+              <a:rPr lang="pl-PL" dirty="0"/>
+              <a:t>JSX - </a:t>
+            </a:r>
+            <a:r>
+              <a:rPr lang="pl-PL" dirty="0" err="1"/>
+              <a:t>injection</a:t>
+            </a:r>
+            <a:endParaRPr lang="pl-PL" dirty="0"/>
+          </a:p>
+        </p:txBody>
+      </p:sp>
+      <p:sp>
+        <p:nvSpPr>
+          <p:cNvPr id="6" name="pole tekstowe 5">
+            <a:extLst>
+              <a:ext uri="{FF2B5EF4-FFF2-40B4-BE49-F238E27FC236}">
+                <a16:creationId xmlns:a16="http://schemas.microsoft.com/office/drawing/2014/main" id="{1C40C996-C384-438D-B170-EC7E1178758B}"/>
+              </a:ext>
+            </a:extLst>
+          </p:cNvPr>
+          <p:cNvSpPr txBox="1"/>
+          <p:nvPr/>
+        </p:nvSpPr>
+        <p:spPr>
+          <a:xfrm>
+            <a:off x="251678" y="2118566"/>
+            <a:ext cx="2593146" cy="369332"/>
+          </a:xfrm>
+          <a:prstGeom prst="rect">
+            <a:avLst/>
+          </a:prstGeom>
+          <a:noFill/>
+        </p:spPr>
+        <p:txBody>
+          <a:bodyPr wrap="none" rtlCol="0">
+            <a:spAutoFit/>
+          </a:bodyPr>
+          <a:lstStyle/>
+          <a:p>
+            <a:r>
+              <a:rPr lang="pl-PL" dirty="0"/>
+              <a:t>JSX – element </a:t>
+            </a:r>
+            <a:r>
+              <a:rPr lang="pl-PL" dirty="0" err="1"/>
+              <a:t>declaration</a:t>
+            </a:r>
+            <a:endParaRPr lang="pl-PL" dirty="0"/>
+          </a:p>
+        </p:txBody>
+      </p:sp>
+      <p:sp>
+        <p:nvSpPr>
+          <p:cNvPr id="7" name="Prostokąt 6">
+            <a:extLst>
+              <a:ext uri="{FF2B5EF4-FFF2-40B4-BE49-F238E27FC236}">
+                <a16:creationId xmlns:a16="http://schemas.microsoft.com/office/drawing/2014/main" id="{BF75B14D-0F79-4C82-B16F-9469912FE21E}"/>
+              </a:ext>
+            </a:extLst>
+          </p:cNvPr>
+          <p:cNvSpPr/>
+          <p:nvPr/>
+        </p:nvSpPr>
+        <p:spPr>
+          <a:xfrm>
+            <a:off x="3201279" y="2893250"/>
+            <a:ext cx="8328108" cy="1200329"/>
+          </a:xfrm>
+          <a:prstGeom prst="rect">
+            <a:avLst/>
+          </a:prstGeom>
+          <a:solidFill>
+            <a:schemeClr val="tx1"/>
+          </a:solidFill>
+        </p:spPr>
+        <p:txBody>
+          <a:bodyPr wrap="square">
+            <a:spAutoFit/>
+          </a:bodyPr>
+          <a:lstStyle/>
+          <a:p>
+            <a:r>
+              <a:rPr lang="pl-PL" dirty="0">
+                <a:solidFill>
+                  <a:srgbClr val="D4D4D4"/>
+                </a:solidFill>
+                <a:latin typeface="Consolas" panose="020B0609020204030204" pitchFamily="49" charset="0"/>
+              </a:rPr>
+              <a:t>  </a:t>
+            </a:r>
+            <a:r>
+              <a:rPr lang="pl-PL" dirty="0" err="1">
+                <a:solidFill>
+                  <a:srgbClr val="569CD6"/>
+                </a:solidFill>
+                <a:latin typeface="Consolas" panose="020B0609020204030204" pitchFamily="49" charset="0"/>
+              </a:rPr>
+              <a:t>function</a:t>
+            </a:r>
+            <a:r>
+              <a:rPr lang="pl-PL" dirty="0">
+                <a:solidFill>
+                  <a:srgbClr val="D4D4D4"/>
+                </a:solidFill>
+                <a:latin typeface="Consolas" panose="020B0609020204030204" pitchFamily="49" charset="0"/>
+              </a:rPr>
+              <a:t> </a:t>
+            </a:r>
+            <a:r>
+              <a:rPr lang="pl-PL" dirty="0" err="1">
+                <a:solidFill>
+                  <a:srgbClr val="DCDCAA"/>
+                </a:solidFill>
+                <a:latin typeface="Consolas" panose="020B0609020204030204" pitchFamily="49" charset="0"/>
+              </a:rPr>
+              <a:t>addNumbers</a:t>
+            </a:r>
+            <a:r>
+              <a:rPr lang="pl-PL" dirty="0">
+                <a:solidFill>
+                  <a:srgbClr val="D4D4D4"/>
+                </a:solidFill>
+                <a:latin typeface="Consolas" panose="020B0609020204030204" pitchFamily="49" charset="0"/>
+              </a:rPr>
+              <a:t>(</a:t>
+            </a:r>
+            <a:r>
+              <a:rPr lang="pl-PL" dirty="0">
+                <a:solidFill>
+                  <a:srgbClr val="9CDCFE"/>
+                </a:solidFill>
+                <a:latin typeface="Consolas" panose="020B0609020204030204" pitchFamily="49" charset="0"/>
+              </a:rPr>
+              <a:t>x1</a:t>
+            </a:r>
+            <a:r>
+              <a:rPr lang="pl-PL" dirty="0">
+                <a:solidFill>
+                  <a:srgbClr val="D4D4D4"/>
+                </a:solidFill>
+                <a:latin typeface="Consolas" panose="020B0609020204030204" pitchFamily="49" charset="0"/>
+              </a:rPr>
+              <a:t>, </a:t>
+            </a:r>
+            <a:r>
+              <a:rPr lang="pl-PL" dirty="0">
+                <a:solidFill>
+                  <a:srgbClr val="9CDCFE"/>
+                </a:solidFill>
+                <a:latin typeface="Consolas" panose="020B0609020204030204" pitchFamily="49" charset="0"/>
+              </a:rPr>
+              <a:t>x2</a:t>
+            </a:r>
+            <a:r>
+              <a:rPr lang="pl-PL" dirty="0">
+                <a:solidFill>
+                  <a:srgbClr val="D4D4D4"/>
+                </a:solidFill>
+                <a:latin typeface="Consolas" panose="020B0609020204030204" pitchFamily="49" charset="0"/>
+              </a:rPr>
+              <a:t>) {</a:t>
+            </a:r>
+          </a:p>
+          <a:p>
+            <a:r>
+              <a:rPr lang="pl-PL" dirty="0">
+                <a:solidFill>
+                  <a:srgbClr val="D4D4D4"/>
+                </a:solidFill>
+                <a:latin typeface="Consolas" panose="020B0609020204030204" pitchFamily="49" charset="0"/>
+              </a:rPr>
+              <a:t>    </a:t>
+            </a:r>
+            <a:r>
+              <a:rPr lang="pl-PL" dirty="0">
+                <a:solidFill>
+                  <a:srgbClr val="C586C0"/>
+                </a:solidFill>
+                <a:latin typeface="Consolas" panose="020B0609020204030204" pitchFamily="49" charset="0"/>
+              </a:rPr>
+              <a:t>return</a:t>
+            </a:r>
+            <a:r>
+              <a:rPr lang="pl-PL" dirty="0">
+                <a:solidFill>
+                  <a:srgbClr val="D4D4D4"/>
+                </a:solidFill>
+                <a:latin typeface="Consolas" panose="020B0609020204030204" pitchFamily="49" charset="0"/>
+              </a:rPr>
+              <a:t> </a:t>
+            </a:r>
+            <a:r>
+              <a:rPr lang="pl-PL" dirty="0">
+                <a:solidFill>
+                  <a:srgbClr val="9CDCFE"/>
+                </a:solidFill>
+                <a:latin typeface="Consolas" panose="020B0609020204030204" pitchFamily="49" charset="0"/>
+              </a:rPr>
+              <a:t>x1</a:t>
+            </a:r>
+            <a:r>
+              <a:rPr lang="pl-PL" dirty="0">
+                <a:solidFill>
+                  <a:srgbClr val="D4D4D4"/>
+                </a:solidFill>
+                <a:latin typeface="Consolas" panose="020B0609020204030204" pitchFamily="49" charset="0"/>
+              </a:rPr>
+              <a:t> + </a:t>
+            </a:r>
+            <a:r>
+              <a:rPr lang="pl-PL" dirty="0">
+                <a:solidFill>
+                  <a:srgbClr val="9CDCFE"/>
+                </a:solidFill>
+                <a:latin typeface="Consolas" panose="020B0609020204030204" pitchFamily="49" charset="0"/>
+              </a:rPr>
+              <a:t>x2</a:t>
+            </a:r>
+            <a:r>
+              <a:rPr lang="pl-PL" dirty="0">
+                <a:solidFill>
+                  <a:srgbClr val="D4D4D4"/>
+                </a:solidFill>
+                <a:latin typeface="Consolas" panose="020B0609020204030204" pitchFamily="49" charset="0"/>
+              </a:rPr>
+              <a:t>;</a:t>
+            </a:r>
+          </a:p>
+          <a:p>
+            <a:r>
+              <a:rPr lang="pl-PL" dirty="0">
+                <a:solidFill>
+                  <a:srgbClr val="D4D4D4"/>
+                </a:solidFill>
+                <a:latin typeface="Consolas" panose="020B0609020204030204" pitchFamily="49" charset="0"/>
+              </a:rPr>
+              <a:t>  }</a:t>
+            </a:r>
+          </a:p>
+          <a:p>
+            <a:r>
+              <a:rPr lang="pl-PL" dirty="0">
+                <a:solidFill>
+                  <a:srgbClr val="D4D4D4"/>
+                </a:solidFill>
+                <a:latin typeface="Consolas" panose="020B0609020204030204" pitchFamily="49" charset="0"/>
+              </a:rPr>
+              <a:t>  </a:t>
+            </a:r>
+            <a:r>
+              <a:rPr lang="pl-PL" dirty="0" err="1">
+                <a:solidFill>
+                  <a:srgbClr val="569CD6"/>
+                </a:solidFill>
+                <a:latin typeface="Consolas" panose="020B0609020204030204" pitchFamily="49" charset="0"/>
+              </a:rPr>
+              <a:t>const</a:t>
+            </a:r>
+            <a:r>
+              <a:rPr lang="pl-PL" dirty="0">
+                <a:solidFill>
+                  <a:srgbClr val="D4D4D4"/>
+                </a:solidFill>
+                <a:latin typeface="Consolas" panose="020B0609020204030204" pitchFamily="49" charset="0"/>
+              </a:rPr>
+              <a:t> </a:t>
+            </a:r>
+            <a:r>
+              <a:rPr lang="pl-PL" dirty="0">
+                <a:solidFill>
+                  <a:srgbClr val="9CDCFE"/>
+                </a:solidFill>
+                <a:latin typeface="Consolas" panose="020B0609020204030204" pitchFamily="49" charset="0"/>
+              </a:rPr>
+              <a:t>element</a:t>
+            </a:r>
+            <a:r>
+              <a:rPr lang="pl-PL" dirty="0">
+                <a:solidFill>
+                  <a:srgbClr val="D4D4D4"/>
+                </a:solidFill>
+                <a:latin typeface="Consolas" panose="020B0609020204030204" pitchFamily="49" charset="0"/>
+              </a:rPr>
+              <a:t> = </a:t>
+            </a:r>
+            <a:r>
+              <a:rPr lang="pl-PL" dirty="0">
+                <a:solidFill>
+                  <a:srgbClr val="808080"/>
+                </a:solidFill>
+                <a:latin typeface="Consolas" panose="020B0609020204030204" pitchFamily="49" charset="0"/>
+              </a:rPr>
+              <a:t>&lt;</a:t>
+            </a:r>
+            <a:r>
+              <a:rPr lang="pl-PL" dirty="0">
+                <a:solidFill>
+                  <a:srgbClr val="569CD6"/>
+                </a:solidFill>
+                <a:latin typeface="Consolas" panose="020B0609020204030204" pitchFamily="49" charset="0"/>
+              </a:rPr>
+              <a:t>div</a:t>
+            </a:r>
+            <a:r>
+              <a:rPr lang="pl-PL" dirty="0">
+                <a:solidFill>
+                  <a:srgbClr val="D4D4D4"/>
+                </a:solidFill>
+                <a:latin typeface="Consolas" panose="020B0609020204030204" pitchFamily="49" charset="0"/>
+              </a:rPr>
+              <a:t> </a:t>
+            </a:r>
+            <a:r>
+              <a:rPr lang="pl-PL" dirty="0" err="1">
+                <a:solidFill>
+                  <a:srgbClr val="9CDCFE"/>
+                </a:solidFill>
+                <a:latin typeface="Consolas" panose="020B0609020204030204" pitchFamily="49" charset="0"/>
+              </a:rPr>
+              <a:t>className</a:t>
+            </a:r>
+            <a:r>
+              <a:rPr lang="pl-PL" dirty="0">
+                <a:solidFill>
+                  <a:srgbClr val="D4D4D4"/>
+                </a:solidFill>
+                <a:latin typeface="Consolas" panose="020B0609020204030204" pitchFamily="49" charset="0"/>
+              </a:rPr>
+              <a:t>=</a:t>
+            </a:r>
+            <a:r>
+              <a:rPr lang="pl-PL" dirty="0">
+                <a:solidFill>
+                  <a:srgbClr val="CE9178"/>
+                </a:solidFill>
+                <a:latin typeface="Consolas" panose="020B0609020204030204" pitchFamily="49" charset="0"/>
+              </a:rPr>
+              <a:t>"</a:t>
+            </a:r>
+            <a:r>
+              <a:rPr lang="pl-PL" dirty="0" err="1">
+                <a:solidFill>
+                  <a:srgbClr val="CE9178"/>
+                </a:solidFill>
+                <a:latin typeface="Consolas" panose="020B0609020204030204" pitchFamily="49" charset="0"/>
+              </a:rPr>
+              <a:t>App</a:t>
+            </a:r>
+            <a:r>
+              <a:rPr lang="pl-PL" dirty="0">
+                <a:solidFill>
+                  <a:srgbClr val="CE9178"/>
+                </a:solidFill>
+                <a:latin typeface="Consolas" panose="020B0609020204030204" pitchFamily="49" charset="0"/>
+              </a:rPr>
+              <a:t>"</a:t>
+            </a:r>
+            <a:r>
+              <a:rPr lang="pl-PL" dirty="0">
+                <a:solidFill>
+                  <a:srgbClr val="808080"/>
+                </a:solidFill>
+                <a:latin typeface="Consolas" panose="020B0609020204030204" pitchFamily="49" charset="0"/>
+              </a:rPr>
+              <a:t>&gt;</a:t>
+            </a:r>
+            <a:r>
+              <a:rPr lang="pl-PL" dirty="0">
+                <a:solidFill>
+                  <a:srgbClr val="569CD6"/>
+                </a:solidFill>
+                <a:latin typeface="Consolas" panose="020B0609020204030204" pitchFamily="49" charset="0"/>
+              </a:rPr>
+              <a:t>{</a:t>
+            </a:r>
+            <a:r>
+              <a:rPr lang="pl-PL" dirty="0" err="1">
+                <a:solidFill>
+                  <a:srgbClr val="DCDCAA"/>
+                </a:solidFill>
+                <a:latin typeface="Consolas" panose="020B0609020204030204" pitchFamily="49" charset="0"/>
+              </a:rPr>
+              <a:t>addNumbers</a:t>
+            </a:r>
+            <a:r>
+              <a:rPr lang="pl-PL" dirty="0">
+                <a:solidFill>
+                  <a:srgbClr val="D4D4D4"/>
+                </a:solidFill>
+                <a:latin typeface="Consolas" panose="020B0609020204030204" pitchFamily="49" charset="0"/>
+              </a:rPr>
+              <a:t>(</a:t>
+            </a:r>
+            <a:r>
+              <a:rPr lang="pl-PL" dirty="0">
+                <a:solidFill>
+                  <a:srgbClr val="B5CEA8"/>
+                </a:solidFill>
+                <a:latin typeface="Consolas" panose="020B0609020204030204" pitchFamily="49" charset="0"/>
+              </a:rPr>
+              <a:t>2</a:t>
+            </a:r>
+            <a:r>
+              <a:rPr lang="pl-PL" dirty="0">
+                <a:solidFill>
+                  <a:srgbClr val="D4D4D4"/>
+                </a:solidFill>
+                <a:latin typeface="Consolas" panose="020B0609020204030204" pitchFamily="49" charset="0"/>
+              </a:rPr>
+              <a:t>, </a:t>
+            </a:r>
+            <a:r>
+              <a:rPr lang="pl-PL" dirty="0">
+                <a:solidFill>
+                  <a:srgbClr val="B5CEA8"/>
+                </a:solidFill>
+                <a:latin typeface="Consolas" panose="020B0609020204030204" pitchFamily="49" charset="0"/>
+              </a:rPr>
+              <a:t>5</a:t>
+            </a:r>
+            <a:r>
+              <a:rPr lang="pl-PL" dirty="0">
+                <a:solidFill>
+                  <a:srgbClr val="D4D4D4"/>
+                </a:solidFill>
+                <a:latin typeface="Consolas" panose="020B0609020204030204" pitchFamily="49" charset="0"/>
+              </a:rPr>
+              <a:t>)</a:t>
+            </a:r>
+            <a:r>
+              <a:rPr lang="pl-PL" dirty="0">
+                <a:solidFill>
+                  <a:srgbClr val="569CD6"/>
+                </a:solidFill>
+                <a:latin typeface="Consolas" panose="020B0609020204030204" pitchFamily="49" charset="0"/>
+              </a:rPr>
+              <a:t>}</a:t>
+            </a:r>
+            <a:r>
+              <a:rPr lang="pl-PL" dirty="0">
+                <a:solidFill>
+                  <a:srgbClr val="808080"/>
+                </a:solidFill>
+                <a:latin typeface="Consolas" panose="020B0609020204030204" pitchFamily="49" charset="0"/>
+              </a:rPr>
+              <a:t>&lt;/</a:t>
+            </a:r>
+            <a:r>
+              <a:rPr lang="pl-PL" dirty="0">
+                <a:solidFill>
+                  <a:srgbClr val="569CD6"/>
+                </a:solidFill>
+                <a:latin typeface="Consolas" panose="020B0609020204030204" pitchFamily="49" charset="0"/>
+              </a:rPr>
+              <a:t>div</a:t>
+            </a:r>
+            <a:r>
+              <a:rPr lang="pl-PL" dirty="0">
+                <a:solidFill>
+                  <a:srgbClr val="808080"/>
+                </a:solidFill>
+                <a:latin typeface="Consolas" panose="020B0609020204030204" pitchFamily="49" charset="0"/>
+              </a:rPr>
+              <a:t>&gt;</a:t>
+            </a:r>
+            <a:endParaRPr lang="pl-PL" b="0" dirty="0">
+              <a:solidFill>
+                <a:srgbClr val="D4D4D4"/>
+              </a:solidFill>
+              <a:effectLst/>
+              <a:latin typeface="Consolas" panose="020B0609020204030204" pitchFamily="49" charset="0"/>
+            </a:endParaRPr>
+          </a:p>
+        </p:txBody>
+      </p:sp>
+      <p:sp>
+        <p:nvSpPr>
+          <p:cNvPr id="8" name="pole tekstowe 7">
+            <a:extLst>
+              <a:ext uri="{FF2B5EF4-FFF2-40B4-BE49-F238E27FC236}">
+                <a16:creationId xmlns:a16="http://schemas.microsoft.com/office/drawing/2014/main" id="{B89744CF-CE43-4AB3-8641-9087206EAA22}"/>
+              </a:ext>
+            </a:extLst>
+          </p:cNvPr>
+          <p:cNvSpPr txBox="1"/>
+          <p:nvPr/>
+        </p:nvSpPr>
+        <p:spPr>
+          <a:xfrm>
+            <a:off x="271734" y="3124082"/>
+            <a:ext cx="2358466" cy="369332"/>
+          </a:xfrm>
+          <a:prstGeom prst="rect">
+            <a:avLst/>
+          </a:prstGeom>
+          <a:noFill/>
+        </p:spPr>
+        <p:txBody>
+          <a:bodyPr wrap="none" rtlCol="0">
+            <a:spAutoFit/>
+          </a:bodyPr>
+          <a:lstStyle/>
+          <a:p>
+            <a:r>
+              <a:rPr lang="pl-PL" dirty="0"/>
+              <a:t>JSX – </a:t>
+            </a:r>
+            <a:r>
+              <a:rPr lang="pl-PL" dirty="0" err="1"/>
+              <a:t>function</a:t>
+            </a:r>
+            <a:r>
+              <a:rPr lang="pl-PL" dirty="0"/>
+              <a:t> </a:t>
+            </a:r>
+            <a:r>
+              <a:rPr lang="pl-PL" dirty="0" err="1"/>
+              <a:t>injection</a:t>
+            </a:r>
+            <a:endParaRPr lang="pl-PL" dirty="0"/>
+          </a:p>
+        </p:txBody>
+      </p:sp>
+      <p:sp>
+        <p:nvSpPr>
+          <p:cNvPr id="11" name="Prostokąt 10">
+            <a:extLst>
+              <a:ext uri="{FF2B5EF4-FFF2-40B4-BE49-F238E27FC236}">
+                <a16:creationId xmlns:a16="http://schemas.microsoft.com/office/drawing/2014/main" id="{7BF88C29-C405-4E05-A5A6-DDA7EF48F7CA}"/>
+              </a:ext>
+            </a:extLst>
+          </p:cNvPr>
+          <p:cNvSpPr/>
+          <p:nvPr/>
+        </p:nvSpPr>
+        <p:spPr>
+          <a:xfrm>
+            <a:off x="3201279" y="4221932"/>
+            <a:ext cx="8328105" cy="646331"/>
+          </a:xfrm>
+          <a:prstGeom prst="rect">
+            <a:avLst/>
+          </a:prstGeom>
+          <a:solidFill>
+            <a:schemeClr val="tx1"/>
+          </a:solidFill>
+        </p:spPr>
+        <p:txBody>
+          <a:bodyPr wrap="square">
+            <a:spAutoFit/>
+          </a:bodyPr>
+          <a:lstStyle/>
+          <a:p>
+            <a:r>
+              <a:rPr lang="pl-PL" dirty="0">
+                <a:solidFill>
+                  <a:srgbClr val="D4D4D4"/>
+                </a:solidFill>
+                <a:latin typeface="Consolas" panose="020B0609020204030204" pitchFamily="49" charset="0"/>
+              </a:rPr>
+              <a:t>  </a:t>
+            </a:r>
+            <a:r>
+              <a:rPr lang="pl-PL" dirty="0" err="1">
+                <a:solidFill>
+                  <a:srgbClr val="569CD6"/>
+                </a:solidFill>
+                <a:latin typeface="Consolas" panose="020B0609020204030204" pitchFamily="49" charset="0"/>
+              </a:rPr>
+              <a:t>const</a:t>
+            </a:r>
+            <a:r>
+              <a:rPr lang="pl-PL" dirty="0">
+                <a:solidFill>
+                  <a:srgbClr val="D4D4D4"/>
+                </a:solidFill>
+                <a:latin typeface="Consolas" panose="020B0609020204030204" pitchFamily="49" charset="0"/>
+              </a:rPr>
+              <a:t> </a:t>
+            </a:r>
+            <a:r>
+              <a:rPr lang="pl-PL" dirty="0" err="1">
+                <a:solidFill>
+                  <a:srgbClr val="9CDCFE"/>
+                </a:solidFill>
+                <a:latin typeface="Consolas" panose="020B0609020204030204" pitchFamily="49" charset="0"/>
+              </a:rPr>
+              <a:t>avatarUrl</a:t>
+            </a:r>
+            <a:r>
+              <a:rPr lang="pl-PL" dirty="0">
+                <a:solidFill>
+                  <a:srgbClr val="D4D4D4"/>
+                </a:solidFill>
+                <a:latin typeface="Consolas" panose="020B0609020204030204" pitchFamily="49" charset="0"/>
+              </a:rPr>
+              <a:t> = </a:t>
+            </a:r>
+            <a:r>
+              <a:rPr lang="pl-PL" dirty="0">
+                <a:solidFill>
+                  <a:srgbClr val="CE9178"/>
+                </a:solidFill>
+                <a:latin typeface="Consolas" panose="020B0609020204030204" pitchFamily="49" charset="0"/>
+              </a:rPr>
+              <a:t>"</a:t>
+            </a:r>
+            <a:r>
+              <a:rPr lang="pl-PL" dirty="0" err="1">
+                <a:solidFill>
+                  <a:srgbClr val="CE9178"/>
+                </a:solidFill>
+                <a:latin typeface="Consolas" panose="020B0609020204030204" pitchFamily="49" charset="0"/>
+              </a:rPr>
+              <a:t>img</a:t>
+            </a:r>
+            <a:r>
+              <a:rPr lang="pl-PL" dirty="0">
+                <a:solidFill>
+                  <a:srgbClr val="CE9178"/>
+                </a:solidFill>
+                <a:latin typeface="Consolas" panose="020B0609020204030204" pitchFamily="49" charset="0"/>
+              </a:rPr>
+              <a:t>/picture.jpg"</a:t>
+            </a:r>
+            <a:endParaRPr lang="pl-PL" dirty="0">
+              <a:solidFill>
+                <a:srgbClr val="D4D4D4"/>
+              </a:solidFill>
+              <a:latin typeface="Consolas" panose="020B0609020204030204" pitchFamily="49" charset="0"/>
+            </a:endParaRPr>
+          </a:p>
+          <a:p>
+            <a:r>
+              <a:rPr lang="pl-PL" dirty="0">
+                <a:solidFill>
+                  <a:srgbClr val="D4D4D4"/>
+                </a:solidFill>
+                <a:latin typeface="Consolas" panose="020B0609020204030204" pitchFamily="49" charset="0"/>
+              </a:rPr>
+              <a:t>  </a:t>
+            </a:r>
+            <a:r>
+              <a:rPr lang="pl-PL" dirty="0" err="1">
+                <a:solidFill>
+                  <a:srgbClr val="569CD6"/>
+                </a:solidFill>
+                <a:latin typeface="Consolas" panose="020B0609020204030204" pitchFamily="49" charset="0"/>
+              </a:rPr>
+              <a:t>const</a:t>
+            </a:r>
+            <a:r>
+              <a:rPr lang="pl-PL" dirty="0">
+                <a:solidFill>
+                  <a:srgbClr val="D4D4D4"/>
+                </a:solidFill>
+                <a:latin typeface="Consolas" panose="020B0609020204030204" pitchFamily="49" charset="0"/>
+              </a:rPr>
+              <a:t> </a:t>
+            </a:r>
+            <a:r>
+              <a:rPr lang="pl-PL" dirty="0">
+                <a:solidFill>
+                  <a:srgbClr val="9CDCFE"/>
+                </a:solidFill>
+                <a:latin typeface="Consolas" panose="020B0609020204030204" pitchFamily="49" charset="0"/>
+              </a:rPr>
+              <a:t>element</a:t>
+            </a:r>
+            <a:r>
+              <a:rPr lang="pl-PL" dirty="0">
+                <a:solidFill>
+                  <a:srgbClr val="D4D4D4"/>
+                </a:solidFill>
+                <a:latin typeface="Consolas" panose="020B0609020204030204" pitchFamily="49" charset="0"/>
+              </a:rPr>
+              <a:t> = </a:t>
+            </a:r>
+            <a:r>
+              <a:rPr lang="pl-PL" dirty="0">
+                <a:solidFill>
+                  <a:srgbClr val="808080"/>
+                </a:solidFill>
+                <a:latin typeface="Consolas" panose="020B0609020204030204" pitchFamily="49" charset="0"/>
+              </a:rPr>
+              <a:t>&lt;</a:t>
+            </a:r>
+            <a:r>
+              <a:rPr lang="pl-PL" dirty="0" err="1">
+                <a:solidFill>
+                  <a:srgbClr val="569CD6"/>
+                </a:solidFill>
+                <a:latin typeface="Consolas" panose="020B0609020204030204" pitchFamily="49" charset="0"/>
+              </a:rPr>
+              <a:t>img</a:t>
+            </a:r>
+            <a:r>
+              <a:rPr lang="pl-PL" dirty="0">
+                <a:solidFill>
+                  <a:srgbClr val="D4D4D4"/>
+                </a:solidFill>
+                <a:latin typeface="Consolas" panose="020B0609020204030204" pitchFamily="49" charset="0"/>
+              </a:rPr>
+              <a:t> </a:t>
+            </a:r>
+            <a:r>
+              <a:rPr lang="pl-PL" dirty="0" err="1">
+                <a:solidFill>
+                  <a:srgbClr val="9CDCFE"/>
+                </a:solidFill>
+                <a:latin typeface="Consolas" panose="020B0609020204030204" pitchFamily="49" charset="0"/>
+              </a:rPr>
+              <a:t>src</a:t>
+            </a:r>
+            <a:r>
+              <a:rPr lang="pl-PL" dirty="0">
+                <a:solidFill>
+                  <a:srgbClr val="D4D4D4"/>
+                </a:solidFill>
+                <a:latin typeface="Consolas" panose="020B0609020204030204" pitchFamily="49" charset="0"/>
+              </a:rPr>
+              <a:t>=</a:t>
+            </a:r>
+            <a:r>
+              <a:rPr lang="pl-PL" dirty="0">
+                <a:solidFill>
+                  <a:srgbClr val="569CD6"/>
+                </a:solidFill>
+                <a:latin typeface="Consolas" panose="020B0609020204030204" pitchFamily="49" charset="0"/>
+              </a:rPr>
+              <a:t>{</a:t>
+            </a:r>
+            <a:r>
+              <a:rPr lang="pl-PL" dirty="0" err="1">
+                <a:solidFill>
+                  <a:srgbClr val="9CDCFE"/>
+                </a:solidFill>
+                <a:latin typeface="Consolas" panose="020B0609020204030204" pitchFamily="49" charset="0"/>
+              </a:rPr>
+              <a:t>user</a:t>
+            </a:r>
+            <a:r>
+              <a:rPr lang="pl-PL" dirty="0" err="1">
+                <a:solidFill>
+                  <a:srgbClr val="D4D4D4"/>
+                </a:solidFill>
+                <a:latin typeface="Consolas" panose="020B0609020204030204" pitchFamily="49" charset="0"/>
+              </a:rPr>
+              <a:t>.</a:t>
+            </a:r>
+            <a:r>
+              <a:rPr lang="pl-PL" dirty="0" err="1">
+                <a:solidFill>
+                  <a:srgbClr val="9CDCFE"/>
+                </a:solidFill>
+                <a:latin typeface="Consolas" panose="020B0609020204030204" pitchFamily="49" charset="0"/>
+              </a:rPr>
+              <a:t>avatarUrl</a:t>
+            </a:r>
+            <a:r>
+              <a:rPr lang="pl-PL" dirty="0">
+                <a:solidFill>
+                  <a:srgbClr val="569CD6"/>
+                </a:solidFill>
+                <a:latin typeface="Consolas" panose="020B0609020204030204" pitchFamily="49" charset="0"/>
+              </a:rPr>
+              <a:t>}</a:t>
+            </a:r>
+            <a:r>
+              <a:rPr lang="pl-PL" dirty="0">
+                <a:solidFill>
+                  <a:srgbClr val="808080"/>
+                </a:solidFill>
+                <a:latin typeface="Consolas" panose="020B0609020204030204" pitchFamily="49" charset="0"/>
+              </a:rPr>
+              <a:t>&gt;&lt;/</a:t>
+            </a:r>
+            <a:r>
+              <a:rPr lang="pl-PL" dirty="0" err="1">
+                <a:solidFill>
+                  <a:srgbClr val="569CD6"/>
+                </a:solidFill>
+                <a:latin typeface="Consolas" panose="020B0609020204030204" pitchFamily="49" charset="0"/>
+              </a:rPr>
+              <a:t>img</a:t>
+            </a:r>
+            <a:r>
+              <a:rPr lang="pl-PL" dirty="0">
+                <a:solidFill>
+                  <a:srgbClr val="808080"/>
+                </a:solidFill>
+                <a:latin typeface="Consolas" panose="020B0609020204030204" pitchFamily="49" charset="0"/>
+              </a:rPr>
+              <a:t>&gt;</a:t>
+            </a:r>
+            <a:r>
+              <a:rPr lang="pl-PL" dirty="0">
+                <a:solidFill>
+                  <a:srgbClr val="D4D4D4"/>
+                </a:solidFill>
+                <a:latin typeface="Consolas" panose="020B0609020204030204" pitchFamily="49" charset="0"/>
+              </a:rPr>
+              <a:t>;</a:t>
+            </a:r>
+            <a:endParaRPr lang="pl-PL" b="0" dirty="0">
+              <a:solidFill>
+                <a:srgbClr val="D4D4D4"/>
+              </a:solidFill>
+              <a:effectLst/>
+              <a:latin typeface="Consolas" panose="020B0609020204030204" pitchFamily="49" charset="0"/>
+            </a:endParaRPr>
+          </a:p>
+        </p:txBody>
+      </p:sp>
+      <p:sp>
+        <p:nvSpPr>
+          <p:cNvPr id="12" name="pole tekstowe 11">
+            <a:extLst>
+              <a:ext uri="{FF2B5EF4-FFF2-40B4-BE49-F238E27FC236}">
+                <a16:creationId xmlns:a16="http://schemas.microsoft.com/office/drawing/2014/main" id="{DB45978F-0382-486C-A44C-63B9F8E4FB6C}"/>
+              </a:ext>
+            </a:extLst>
+          </p:cNvPr>
+          <p:cNvSpPr txBox="1"/>
+          <p:nvPr/>
+        </p:nvSpPr>
+        <p:spPr>
+          <a:xfrm>
+            <a:off x="372946" y="4360431"/>
+            <a:ext cx="1619611" cy="369332"/>
+          </a:xfrm>
+          <a:prstGeom prst="rect">
+            <a:avLst/>
+          </a:prstGeom>
+          <a:noFill/>
+        </p:spPr>
+        <p:txBody>
+          <a:bodyPr wrap="none" rtlCol="0">
+            <a:spAutoFit/>
+          </a:bodyPr>
+          <a:lstStyle/>
+          <a:p>
+            <a:r>
+              <a:rPr lang="pl-PL" dirty="0"/>
+              <a:t>JSX – </a:t>
+            </a:r>
+            <a:r>
+              <a:rPr lang="pl-PL" dirty="0" err="1"/>
+              <a:t>attributes</a:t>
+            </a:r>
+            <a:endParaRPr lang="pl-PL" dirty="0"/>
+          </a:p>
+        </p:txBody>
+      </p:sp>
     </p:spTree>
     <p:extLst>
       <p:ext uri="{BB962C8B-B14F-4D97-AF65-F5344CB8AC3E}">
         <p14:creationId xmlns:p14="http://schemas.microsoft.com/office/powerpoint/2010/main" val="2486456924"/>
+      </p:ext>
+    </p:extLst>
+  </p:cSld>
+  <p:clrMapOvr>
+    <a:masterClrMapping/>
+  </p:clrMapOvr>
+</p:sld>
+</file>
+
+<file path=ppt/slides/slide8.xml><?xml version="1.0" encoding="utf-8"?>
+<p:sld xmlns:a="http://schemas.openxmlformats.org/drawingml/2006/main" xmlns:r="http://schemas.openxmlformats.org/officeDocument/2006/relationships" xmlns:p="http://schemas.openxmlformats.org/presentationml/2006/main">
+  <p:cSld>
+    <p:spTree>
+      <p:nvGrpSpPr>
+        <p:cNvPr id="1" name=""/>
+        <p:cNvGrpSpPr/>
+        <p:nvPr/>
+      </p:nvGrpSpPr>
+      <p:grpSpPr>
+        <a:xfrm>
+          <a:off x="0" y="0"/>
+          <a:ext cx="0" cy="0"/>
+          <a:chOff x="0" y="0"/>
+          <a:chExt cx="0" cy="0"/>
+        </a:xfrm>
+      </p:grpSpPr>
+      <p:sp>
+        <p:nvSpPr>
+          <p:cNvPr id="4" name="pole tekstowe 3">
+            <a:extLst>
+              <a:ext uri="{FF2B5EF4-FFF2-40B4-BE49-F238E27FC236}">
+                <a16:creationId xmlns:a16="http://schemas.microsoft.com/office/drawing/2014/main" id="{F164A7B3-8808-414C-9401-3B25194E3B5A}"/>
+              </a:ext>
+            </a:extLst>
+          </p:cNvPr>
+          <p:cNvSpPr txBox="1"/>
+          <p:nvPr/>
+        </p:nvSpPr>
+        <p:spPr>
+          <a:xfrm>
+            <a:off x="497840" y="538480"/>
+            <a:ext cx="1783117" cy="369332"/>
+          </a:xfrm>
+          <a:prstGeom prst="rect">
+            <a:avLst/>
+          </a:prstGeom>
+          <a:noFill/>
+        </p:spPr>
+        <p:txBody>
+          <a:bodyPr wrap="none" rtlCol="0">
+            <a:spAutoFit/>
+          </a:bodyPr>
+          <a:lstStyle/>
+          <a:p>
+            <a:r>
+              <a:rPr lang="pl-PL" dirty="0" err="1"/>
+              <a:t>Render</a:t>
+            </a:r>
+            <a:r>
+              <a:rPr lang="pl-PL" dirty="0"/>
+              <a:t> </a:t>
+            </a:r>
+            <a:r>
+              <a:rPr lang="pl-PL" dirty="0" err="1"/>
+              <a:t>elements</a:t>
+            </a:r>
+            <a:endParaRPr lang="pl-PL" dirty="0"/>
+          </a:p>
+        </p:txBody>
+      </p:sp>
+    </p:spTree>
+    <p:extLst>
+      <p:ext uri="{BB962C8B-B14F-4D97-AF65-F5344CB8AC3E}">
+        <p14:creationId xmlns:p14="http://schemas.microsoft.com/office/powerpoint/2010/main" val="2270242214"/>
       </p:ext>
     </p:extLst>
   </p:cSld>

</xml_diff>

<commit_message>
Exercise 3: routing for help, home, list
</commit_message>
<xml_diff>
--- a/tutorial/ReactjsTraining.pptx
+++ b/tutorial/ReactjsTraining.pptx
@@ -5,7 +5,7 @@
     <p:sldMasterId id="2147483648" r:id="rId1"/>
   </p:sldMasterIdLst>
   <p:notesMasterIdLst>
-    <p:notesMasterId r:id="rId10"/>
+    <p:notesMasterId r:id="rId11"/>
   </p:notesMasterIdLst>
   <p:sldIdLst>
     <p:sldId id="256" r:id="rId2"/>
@@ -16,6 +16,7 @@
     <p:sldId id="262" r:id="rId7"/>
     <p:sldId id="261" r:id="rId8"/>
     <p:sldId id="263" r:id="rId9"/>
+    <p:sldId id="264" r:id="rId10"/>
   </p:sldIdLst>
   <p:sldSz cx="12192000" cy="6858000"/>
   <p:notesSz cx="6858000" cy="9144000"/>
@@ -1557,6 +1558,66 @@
             </a:r>
             <a:endParaRPr lang="pl-PL" dirty="0"/>
           </a:p>
+          <a:p>
+            <a:pPr marL="0" indent="0">
+              <a:buFontTx/>
+              <a:buNone/>
+            </a:pPr>
+            <a:endParaRPr lang="pl-PL" dirty="0"/>
+          </a:p>
+          <a:p>
+            <a:pPr marL="0" indent="0">
+              <a:buFontTx/>
+              <a:buNone/>
+            </a:pPr>
+            <a:r>
+              <a:rPr lang="pl-PL" dirty="0"/>
+              <a:t>Pokazać jakby to można było zrobić z </a:t>
+            </a:r>
+            <a:r>
+              <a:rPr lang="pl-PL" dirty="0" err="1"/>
+              <a:t>interval</a:t>
+            </a:r>
+            <a:r>
+              <a:rPr lang="pl-PL" dirty="0"/>
+              <a:t> i z </a:t>
+            </a:r>
+            <a:r>
+              <a:rPr lang="pl-PL" dirty="0" err="1"/>
+              <a:t>ReactDOM</a:t>
+            </a:r>
+            <a:br>
+              <a:rPr lang="pl-PL" dirty="0"/>
+            </a:br>
+            <a:br>
+              <a:rPr lang="pl-PL" dirty="0"/>
+            </a:br>
+            <a:r>
+              <a:rPr lang="pl-PL" dirty="0"/>
+              <a:t>+ </a:t>
+            </a:r>
+            <a:r>
+              <a:rPr lang="pl-PL" dirty="0" err="1"/>
+              <a:t>React</a:t>
+            </a:r>
+            <a:r>
+              <a:rPr lang="pl-PL" dirty="0"/>
+              <a:t> uaktualnia (</a:t>
+            </a:r>
+            <a:r>
+              <a:rPr lang="pl-PL" dirty="0" err="1"/>
+              <a:t>rerenderuje</a:t>
+            </a:r>
+            <a:r>
+              <a:rPr lang="pl-PL" dirty="0"/>
+              <a:t>) tylko to co potrzebne. Można wskazać przewagę nad </a:t>
+            </a:r>
+            <a:r>
+              <a:rPr lang="pl-PL" dirty="0" err="1"/>
+              <a:t>Angularem</a:t>
+            </a:r>
+            <a:endParaRPr lang="pl-PL" dirty="0"/>
+          </a:p>
         </p:txBody>
       </p:sp>
       <p:sp>
@@ -1643,6 +1704,126 @@
               <a:buFontTx/>
               <a:buChar char="-"/>
             </a:pPr>
+            <a:r>
+              <a:rPr lang="pl-PL" dirty="0"/>
+              <a:t>Obydwa podejścia równoważne</a:t>
+            </a:r>
+          </a:p>
+          <a:p>
+            <a:pPr marL="171450" indent="-171450">
+              <a:buFontTx/>
+              <a:buChar char="-"/>
+            </a:pPr>
+            <a:r>
+              <a:rPr lang="pl-PL" dirty="0"/>
+              <a:t>Wszystkie komponenty muszą zachowywać się jak czyste funkcje (nie zmieniać swoich argumentów)</a:t>
+            </a:r>
+          </a:p>
+          <a:p>
+            <a:pPr marL="171450" indent="-171450">
+              <a:buFontTx/>
+              <a:buChar char="-"/>
+            </a:pPr>
+            <a:r>
+              <a:rPr lang="pl-PL" dirty="0"/>
+              <a:t>Funkcja </a:t>
+            </a:r>
+            <a:r>
+              <a:rPr lang="pl-PL" dirty="0" err="1"/>
+              <a:t>render</a:t>
+            </a:r>
+            <a:r>
+              <a:rPr lang="pl-PL" dirty="0"/>
+              <a:t> w </a:t>
+            </a:r>
+            <a:r>
+              <a:rPr lang="pl-PL" dirty="0" err="1"/>
+              <a:t>class</a:t>
+            </a:r>
+            <a:r>
+              <a:rPr lang="pl-PL" dirty="0"/>
+              <a:t> automatycznie przyjmuje argument </a:t>
+            </a:r>
+            <a:r>
+              <a:rPr lang="pl-PL" dirty="0" err="1"/>
+              <a:t>props</a:t>
+            </a:r>
+            <a:endParaRPr lang="pl-PL" dirty="0"/>
+          </a:p>
+          <a:p>
+            <a:pPr marL="171450" indent="-171450">
+              <a:buFontTx/>
+              <a:buChar char="-"/>
+            </a:pPr>
+            <a:r>
+              <a:rPr lang="pl-PL" dirty="0" err="1"/>
+              <a:t>Css</a:t>
+            </a:r>
+            <a:r>
+              <a:rPr lang="pl-PL" dirty="0"/>
+              <a:t> się nie </a:t>
+            </a:r>
+            <a:r>
+              <a:rPr lang="pl-PL" dirty="0" err="1"/>
+              <a:t>enkapsulują</a:t>
+            </a:r>
+            <a:endParaRPr lang="pl-PL" dirty="0"/>
+          </a:p>
+          <a:p>
+            <a:pPr marL="171450" indent="-171450">
+              <a:buFontTx/>
+              <a:buChar char="-"/>
+            </a:pPr>
+            <a:endParaRPr lang="pl-PL" dirty="0"/>
+          </a:p>
+          <a:p>
+            <a:pPr marL="0" indent="0">
+              <a:buFontTx/>
+              <a:buNone/>
+            </a:pPr>
+            <a:r>
+              <a:rPr lang="pl-PL" dirty="0"/>
+              <a:t>Ćwiczenie 2: Dodać menu component z </a:t>
+            </a:r>
+            <a:r>
+              <a:rPr lang="pl-PL" dirty="0" err="1"/>
+              <a:t>itemami</a:t>
+            </a:r>
+            <a:r>
+              <a:rPr lang="pl-PL" dirty="0"/>
+              <a:t>: Home, List, Help. Rozbić menu-</a:t>
+            </a:r>
+            <a:r>
+              <a:rPr lang="pl-PL" dirty="0" err="1"/>
+              <a:t>item</a:t>
+            </a:r>
+            <a:r>
+              <a:rPr lang="pl-PL" dirty="0"/>
+              <a:t> na osobne komponenty. </a:t>
+            </a:r>
+            <a:br>
+              <a:rPr lang="pl-PL" dirty="0"/>
+            </a:br>
+            <a:r>
+              <a:rPr lang="pl-PL" dirty="0"/>
+              <a:t>(</a:t>
+            </a:r>
+            <a:r>
+              <a:rPr lang="pl-PL" dirty="0" err="1"/>
+              <a:t>class</a:t>
+            </a:r>
+            <a:r>
+              <a:rPr lang="pl-PL" dirty="0"/>
+              <a:t> trzeba pozamieniać na </a:t>
+            </a:r>
+            <a:r>
+              <a:rPr lang="pl-PL" dirty="0" err="1"/>
+              <a:t>className</a:t>
+            </a:r>
+            <a:r>
+              <a:rPr lang="pl-PL"/>
+              <a:t>)</a:t>
+            </a:r>
             <a:endParaRPr lang="pl-PL" dirty="0"/>
           </a:p>
         </p:txBody>
@@ -1674,6 +1855,132 @@
     <p:extLst>
       <p:ext uri="{BB962C8B-B14F-4D97-AF65-F5344CB8AC3E}">
         <p14:creationId xmlns:p14="http://schemas.microsoft.com/office/powerpoint/2010/main" val="3273722160"/>
+      </p:ext>
+    </p:extLst>
+  </p:cSld>
+  <p:clrMapOvr>
+    <a:masterClrMapping/>
+  </p:clrMapOvr>
+</p:notes>
+</file>
+
+<file path=ppt/notesSlides/notesSlide9.xml><?xml version="1.0" encoding="utf-8"?>
+<p:notes xmlns:a="http://schemas.openxmlformats.org/drawingml/2006/main" xmlns:r="http://schemas.openxmlformats.org/officeDocument/2006/relationships" xmlns:p="http://schemas.openxmlformats.org/presentationml/2006/main">
+  <p:cSld>
+    <p:spTree>
+      <p:nvGrpSpPr>
+        <p:cNvPr id="1" name=""/>
+        <p:cNvGrpSpPr/>
+        <p:nvPr/>
+      </p:nvGrpSpPr>
+      <p:grpSpPr>
+        <a:xfrm>
+          <a:off x="0" y="0"/>
+          <a:ext cx="0" cy="0"/>
+          <a:chOff x="0" y="0"/>
+          <a:chExt cx="0" cy="0"/>
+        </a:xfrm>
+      </p:grpSpPr>
+      <p:sp>
+        <p:nvSpPr>
+          <p:cNvPr id="2" name="Symbol zastępczy obrazu slajdu 1"/>
+          <p:cNvSpPr>
+            <a:spLocks noGrp="1" noRot="1" noChangeAspect="1"/>
+          </p:cNvSpPr>
+          <p:nvPr>
+            <p:ph type="sldImg"/>
+          </p:nvPr>
+        </p:nvSpPr>
+        <p:spPr/>
+      </p:sp>
+      <p:sp>
+        <p:nvSpPr>
+          <p:cNvPr id="3" name="Symbol zastępczy notatek 2"/>
+          <p:cNvSpPr>
+            <a:spLocks noGrp="1"/>
+          </p:cNvSpPr>
+          <p:nvPr>
+            <p:ph type="body" idx="1"/>
+          </p:nvPr>
+        </p:nvSpPr>
+        <p:spPr/>
+        <p:txBody>
+          <a:bodyPr/>
+          <a:lstStyle/>
+          <a:p>
+            <a:pPr marL="0" indent="0">
+              <a:buFontTx/>
+              <a:buNone/>
+            </a:pPr>
+            <a:r>
+              <a:rPr lang="pl-PL" dirty="0"/>
+              <a:t>Ćwiczenie 3: Dodać komponenty </a:t>
+            </a:r>
+            <a:r>
+              <a:rPr lang="pl-PL" dirty="0" err="1"/>
+              <a:t>help</a:t>
+            </a:r>
+            <a:r>
+              <a:rPr lang="pl-PL" dirty="0"/>
+              <a:t>, list, </a:t>
+            </a:r>
+            <a:r>
+              <a:rPr lang="pl-PL" dirty="0" err="1"/>
+              <a:t>home</a:t>
+            </a:r>
+            <a:r>
+              <a:rPr lang="pl-PL" dirty="0"/>
+              <a:t> oraz obsłużyć to w routing</a:t>
+            </a:r>
+            <a:br>
+              <a:rPr lang="pl-PL" dirty="0"/>
+            </a:br>
+            <a:r>
+              <a:rPr lang="pl-PL" dirty="0" err="1"/>
+              <a:t>Tip</a:t>
+            </a:r>
+            <a:r>
+              <a:rPr lang="pl-PL" dirty="0"/>
+              <a:t>: </a:t>
+            </a:r>
+            <a:r>
+              <a:rPr lang="pl-PL" dirty="0" err="1"/>
+              <a:t>Route</a:t>
+            </a:r>
+            <a:r>
+              <a:rPr lang="pl-PL" dirty="0"/>
+              <a:t> oraz Link muszą być w tym samym Router</a:t>
+            </a:r>
+          </a:p>
+        </p:txBody>
+      </p:sp>
+      <p:sp>
+        <p:nvSpPr>
+          <p:cNvPr id="4" name="Symbol zastępczy numeru slajdu 3"/>
+          <p:cNvSpPr>
+            <a:spLocks noGrp="1"/>
+          </p:cNvSpPr>
+          <p:nvPr>
+            <p:ph type="sldNum" sz="quarter" idx="5"/>
+          </p:nvPr>
+        </p:nvSpPr>
+        <p:spPr/>
+        <p:txBody>
+          <a:bodyPr/>
+          <a:lstStyle/>
+          <a:p>
+            <a:fld id="{810A6612-7A23-4B98-B0E9-4F3C882AD2EF}" type="slidenum">
+              <a:rPr lang="pl-PL" smtClean="0"/>
+              <a:t>9</a:t>
+            </a:fld>
+            <a:endParaRPr lang="pl-PL"/>
+          </a:p>
+        </p:txBody>
+      </p:sp>
+    </p:spTree>
+    <p:extLst>
+      <p:ext uri="{BB962C8B-B14F-4D97-AF65-F5344CB8AC3E}">
+        <p14:creationId xmlns:p14="http://schemas.microsoft.com/office/powerpoint/2010/main" val="631675483"/>
       </p:ext>
     </p:extLst>
   </p:cSld>
@@ -9241,6 +9548,269 @@
           </a:p>
         </p:txBody>
       </p:sp>
+      <p:sp>
+        <p:nvSpPr>
+          <p:cNvPr id="9" name="Prostokąt 8">
+            <a:extLst>
+              <a:ext uri="{FF2B5EF4-FFF2-40B4-BE49-F238E27FC236}">
+                <a16:creationId xmlns:a16="http://schemas.microsoft.com/office/drawing/2014/main" id="{1614F7FC-A6B3-4D93-AE65-49DD62BB233D}"/>
+              </a:ext>
+            </a:extLst>
+          </p:cNvPr>
+          <p:cNvSpPr/>
+          <p:nvPr/>
+        </p:nvSpPr>
+        <p:spPr>
+          <a:xfrm>
+            <a:off x="8432061" y="5416608"/>
+            <a:ext cx="3097323" cy="369332"/>
+          </a:xfrm>
+          <a:prstGeom prst="rect">
+            <a:avLst/>
+          </a:prstGeom>
+          <a:solidFill>
+            <a:schemeClr val="tx1"/>
+          </a:solidFill>
+        </p:spPr>
+        <p:txBody>
+          <a:bodyPr wrap="none">
+            <a:spAutoFit/>
+          </a:bodyPr>
+          <a:lstStyle/>
+          <a:p>
+            <a:r>
+              <a:rPr lang="pl-PL" dirty="0" err="1">
+                <a:solidFill>
+                  <a:srgbClr val="569CD6"/>
+                </a:solidFill>
+                <a:latin typeface="Consolas" panose="020B0609020204030204" pitchFamily="49" charset="0"/>
+              </a:rPr>
+              <a:t>new</a:t>
+            </a:r>
+            <a:r>
+              <a:rPr lang="pl-PL" dirty="0">
+                <a:solidFill>
+                  <a:srgbClr val="D4D4D4"/>
+                </a:solidFill>
+                <a:latin typeface="Consolas" panose="020B0609020204030204" pitchFamily="49" charset="0"/>
+              </a:rPr>
+              <a:t> </a:t>
+            </a:r>
+            <a:r>
+              <a:rPr lang="pl-PL" dirty="0" err="1">
+                <a:solidFill>
+                  <a:srgbClr val="4EC9B0"/>
+                </a:solidFill>
+                <a:latin typeface="Consolas" panose="020B0609020204030204" pitchFamily="49" charset="0"/>
+              </a:rPr>
+              <a:t>Date</a:t>
+            </a:r>
+            <a:r>
+              <a:rPr lang="pl-PL" dirty="0">
+                <a:solidFill>
+                  <a:srgbClr val="D4D4D4"/>
+                </a:solidFill>
+                <a:latin typeface="Consolas" panose="020B0609020204030204" pitchFamily="49" charset="0"/>
+              </a:rPr>
+              <a:t>().</a:t>
+            </a:r>
+            <a:r>
+              <a:rPr lang="pl-PL" dirty="0" err="1">
+                <a:solidFill>
+                  <a:srgbClr val="DCDCAA"/>
+                </a:solidFill>
+                <a:latin typeface="Consolas" panose="020B0609020204030204" pitchFamily="49" charset="0"/>
+              </a:rPr>
+              <a:t>getSeconds</a:t>
+            </a:r>
+            <a:r>
+              <a:rPr lang="pl-PL" dirty="0">
+                <a:solidFill>
+                  <a:srgbClr val="D4D4D4"/>
+                </a:solidFill>
+                <a:latin typeface="Consolas" panose="020B0609020204030204" pitchFamily="49" charset="0"/>
+              </a:rPr>
+              <a:t>()</a:t>
+            </a:r>
+            <a:endParaRPr lang="pl-PL" b="0" dirty="0">
+              <a:solidFill>
+                <a:srgbClr val="D4D4D4"/>
+              </a:solidFill>
+              <a:effectLst/>
+              <a:latin typeface="Consolas" panose="020B0609020204030204" pitchFamily="49" charset="0"/>
+            </a:endParaRPr>
+          </a:p>
+        </p:txBody>
+      </p:sp>
+      <p:sp>
+        <p:nvSpPr>
+          <p:cNvPr id="10" name="Prostokąt 9">
+            <a:extLst>
+              <a:ext uri="{FF2B5EF4-FFF2-40B4-BE49-F238E27FC236}">
+                <a16:creationId xmlns:a16="http://schemas.microsoft.com/office/drawing/2014/main" id="{8AB51DBD-7354-4794-AA3D-B599AB074A42}"/>
+              </a:ext>
+            </a:extLst>
+          </p:cNvPr>
+          <p:cNvSpPr/>
+          <p:nvPr/>
+        </p:nvSpPr>
+        <p:spPr>
+          <a:xfrm>
+            <a:off x="5498592" y="6149619"/>
+            <a:ext cx="6124625" cy="369332"/>
+          </a:xfrm>
+          <a:prstGeom prst="rect">
+            <a:avLst/>
+          </a:prstGeom>
+          <a:solidFill>
+            <a:schemeClr val="tx1"/>
+          </a:solidFill>
+        </p:spPr>
+        <p:txBody>
+          <a:bodyPr wrap="none">
+            <a:spAutoFit/>
+          </a:bodyPr>
+          <a:lstStyle/>
+          <a:p>
+            <a:r>
+              <a:rPr lang="pl-PL" dirty="0" err="1">
+                <a:solidFill>
+                  <a:srgbClr val="FFFFFF"/>
+                </a:solidFill>
+                <a:latin typeface="source-code-pro"/>
+              </a:rPr>
+              <a:t>ReactDOM</a:t>
+            </a:r>
+            <a:r>
+              <a:rPr lang="pl-PL" dirty="0" err="1">
+                <a:solidFill>
+                  <a:srgbClr val="88C6BE"/>
+                </a:solidFill>
+                <a:latin typeface="source-code-pro"/>
+              </a:rPr>
+              <a:t>.</a:t>
+            </a:r>
+            <a:r>
+              <a:rPr lang="pl-PL" dirty="0" err="1">
+                <a:solidFill>
+                  <a:srgbClr val="79B6F2"/>
+                </a:solidFill>
+                <a:latin typeface="source-code-pro"/>
+              </a:rPr>
+              <a:t>render</a:t>
+            </a:r>
+            <a:r>
+              <a:rPr lang="pl-PL" dirty="0">
+                <a:solidFill>
+                  <a:srgbClr val="88C6BE"/>
+                </a:solidFill>
+                <a:latin typeface="source-code-pro"/>
+              </a:rPr>
+              <a:t>(</a:t>
+            </a:r>
+            <a:r>
+              <a:rPr lang="pl-PL" dirty="0">
+                <a:solidFill>
+                  <a:srgbClr val="FFFFFF"/>
+                </a:solidFill>
+                <a:latin typeface="source-code-pro"/>
+              </a:rPr>
+              <a:t>element</a:t>
+            </a:r>
+            <a:r>
+              <a:rPr lang="pl-PL" dirty="0">
+                <a:solidFill>
+                  <a:srgbClr val="88C6BE"/>
+                </a:solidFill>
+                <a:latin typeface="source-code-pro"/>
+              </a:rPr>
+              <a:t>,</a:t>
+            </a:r>
+            <a:r>
+              <a:rPr lang="pl-PL" dirty="0">
+                <a:solidFill>
+                  <a:srgbClr val="FFFFFF"/>
+                </a:solidFill>
+                <a:latin typeface="source-code-pro"/>
+              </a:rPr>
+              <a:t> </a:t>
+            </a:r>
+            <a:r>
+              <a:rPr lang="pl-PL" dirty="0" err="1">
+                <a:solidFill>
+                  <a:srgbClr val="FFFFFF"/>
+                </a:solidFill>
+                <a:latin typeface="source-code-pro"/>
+              </a:rPr>
+              <a:t>document</a:t>
+            </a:r>
+            <a:r>
+              <a:rPr lang="pl-PL" dirty="0" err="1">
+                <a:solidFill>
+                  <a:srgbClr val="88C6BE"/>
+                </a:solidFill>
+                <a:latin typeface="source-code-pro"/>
+              </a:rPr>
+              <a:t>.</a:t>
+            </a:r>
+            <a:r>
+              <a:rPr lang="pl-PL" dirty="0" err="1">
+                <a:solidFill>
+                  <a:srgbClr val="79B6F2"/>
+                </a:solidFill>
+                <a:latin typeface="source-code-pro"/>
+              </a:rPr>
+              <a:t>getElementById</a:t>
+            </a:r>
+            <a:r>
+              <a:rPr lang="pl-PL" dirty="0">
+                <a:solidFill>
+                  <a:srgbClr val="88C6BE"/>
+                </a:solidFill>
+                <a:latin typeface="source-code-pro"/>
+              </a:rPr>
+              <a:t>(</a:t>
+            </a:r>
+            <a:r>
+              <a:rPr lang="pl-PL" dirty="0">
+                <a:solidFill>
+                  <a:srgbClr val="8DC891"/>
+                </a:solidFill>
+                <a:latin typeface="source-code-pro"/>
+              </a:rPr>
+              <a:t>'</a:t>
+            </a:r>
+            <a:r>
+              <a:rPr lang="pl-PL" dirty="0" err="1">
+                <a:solidFill>
+                  <a:srgbClr val="8DC891"/>
+                </a:solidFill>
+                <a:latin typeface="source-code-pro"/>
+              </a:rPr>
+              <a:t>root</a:t>
+            </a:r>
+            <a:r>
+              <a:rPr lang="pl-PL" dirty="0">
+                <a:solidFill>
+                  <a:srgbClr val="8DC891"/>
+                </a:solidFill>
+                <a:latin typeface="source-code-pro"/>
+              </a:rPr>
+              <a:t>'</a:t>
+            </a:r>
+            <a:r>
+              <a:rPr lang="pl-PL" dirty="0">
+                <a:solidFill>
+                  <a:srgbClr val="88C6BE"/>
+                </a:solidFill>
+                <a:latin typeface="source-code-pro"/>
+              </a:rPr>
+              <a:t>));</a:t>
+            </a:r>
+            <a:endParaRPr lang="pl-PL" dirty="0"/>
+          </a:p>
+        </p:txBody>
+      </p:sp>
     </p:spTree>
     <p:extLst>
       <p:ext uri="{BB962C8B-B14F-4D97-AF65-F5344CB8AC3E}">
@@ -9286,7 +9856,7 @@
         <p:spPr>
           <a:xfrm>
             <a:off x="497840" y="538480"/>
-            <a:ext cx="1783117" cy="369332"/>
+            <a:ext cx="3146439" cy="369332"/>
           </a:xfrm>
           <a:prstGeom prst="rect">
             <a:avLst/>
@@ -9311,7 +9881,1549 @@
               <a:rPr lang="pl-PL" dirty="0" err="1"/>
               <a:t>elements</a:t>
             </a:r>
+            <a:r>
+              <a:rPr lang="pl-PL" dirty="0"/>
+              <a:t> (</a:t>
+            </a:r>
+            <a:r>
+              <a:rPr lang="pl-PL" dirty="0" err="1"/>
+              <a:t>components</a:t>
+            </a:r>
+            <a:r>
+              <a:rPr lang="pl-PL" dirty="0"/>
+              <a:t>)</a:t>
+            </a:r>
+          </a:p>
+        </p:txBody>
+      </p:sp>
+      <p:sp>
+        <p:nvSpPr>
+          <p:cNvPr id="5" name="Prostokąt 4">
+            <a:extLst>
+              <a:ext uri="{FF2B5EF4-FFF2-40B4-BE49-F238E27FC236}">
+                <a16:creationId xmlns:a16="http://schemas.microsoft.com/office/drawing/2014/main" id="{836D64F6-385D-425E-8105-4DEF24738280}"/>
+              </a:ext>
+            </a:extLst>
+          </p:cNvPr>
+          <p:cNvSpPr/>
+          <p:nvPr/>
+        </p:nvSpPr>
+        <p:spPr>
+          <a:xfrm>
+            <a:off x="4300329" y="914542"/>
+            <a:ext cx="7593494" cy="1200329"/>
+          </a:xfrm>
+          <a:prstGeom prst="rect">
+            <a:avLst/>
+          </a:prstGeom>
+          <a:solidFill>
+            <a:schemeClr val="tx1"/>
+          </a:solidFill>
+        </p:spPr>
+        <p:txBody>
+          <a:bodyPr wrap="square">
+            <a:spAutoFit/>
+          </a:bodyPr>
+          <a:lstStyle/>
+          <a:p>
+            <a:r>
+              <a:rPr lang="en-US" dirty="0">
+                <a:solidFill>
+                  <a:srgbClr val="569CD6"/>
+                </a:solidFill>
+                <a:latin typeface="Consolas" panose="020B0609020204030204" pitchFamily="49" charset="0"/>
+              </a:rPr>
+              <a:t>function</a:t>
+            </a:r>
+            <a:r>
+              <a:rPr lang="en-US" dirty="0">
+                <a:solidFill>
+                  <a:srgbClr val="D4D4D4"/>
+                </a:solidFill>
+                <a:latin typeface="Consolas" panose="020B0609020204030204" pitchFamily="49" charset="0"/>
+              </a:rPr>
+              <a:t> </a:t>
+            </a:r>
+            <a:r>
+              <a:rPr lang="en-US" dirty="0">
+                <a:solidFill>
+                  <a:srgbClr val="DCDCAA"/>
+                </a:solidFill>
+                <a:latin typeface="Consolas" panose="020B0609020204030204" pitchFamily="49" charset="0"/>
+              </a:rPr>
+              <a:t>App</a:t>
+            </a:r>
+            <a:r>
+              <a:rPr lang="en-US" dirty="0">
+                <a:solidFill>
+                  <a:srgbClr val="D4D4D4"/>
+                </a:solidFill>
+                <a:latin typeface="Consolas" panose="020B0609020204030204" pitchFamily="49" charset="0"/>
+              </a:rPr>
+              <a:t>() {</a:t>
+            </a:r>
+          </a:p>
+          <a:p>
+            <a:r>
+              <a:rPr lang="en-US" dirty="0">
+                <a:solidFill>
+                  <a:srgbClr val="D4D4D4"/>
+                </a:solidFill>
+                <a:latin typeface="Consolas" panose="020B0609020204030204" pitchFamily="49" charset="0"/>
+              </a:rPr>
+              <a:t>  </a:t>
+            </a:r>
+            <a:r>
+              <a:rPr lang="en-US" dirty="0">
+                <a:solidFill>
+                  <a:srgbClr val="C586C0"/>
+                </a:solidFill>
+                <a:latin typeface="Consolas" panose="020B0609020204030204" pitchFamily="49" charset="0"/>
+              </a:rPr>
+              <a:t>return</a:t>
+            </a:r>
+            <a:r>
+              <a:rPr lang="en-US" dirty="0">
+                <a:solidFill>
+                  <a:srgbClr val="D4D4D4"/>
+                </a:solidFill>
+                <a:latin typeface="Consolas" panose="020B0609020204030204" pitchFamily="49" charset="0"/>
+              </a:rPr>
+              <a:t> </a:t>
+            </a:r>
+            <a:r>
+              <a:rPr lang="en-US" dirty="0">
+                <a:solidFill>
+                  <a:srgbClr val="808080"/>
+                </a:solidFill>
+                <a:latin typeface="Consolas" panose="020B0609020204030204" pitchFamily="49" charset="0"/>
+              </a:rPr>
+              <a:t>&lt;</a:t>
+            </a:r>
+            <a:r>
+              <a:rPr lang="en-US" dirty="0">
+                <a:solidFill>
+                  <a:srgbClr val="569CD6"/>
+                </a:solidFill>
+                <a:latin typeface="Consolas" panose="020B0609020204030204" pitchFamily="49" charset="0"/>
+              </a:rPr>
+              <a:t>div</a:t>
+            </a:r>
+            <a:r>
+              <a:rPr lang="en-US" dirty="0">
+                <a:solidFill>
+                  <a:srgbClr val="808080"/>
+                </a:solidFill>
+                <a:latin typeface="Consolas" panose="020B0609020204030204" pitchFamily="49" charset="0"/>
+              </a:rPr>
+              <a:t>&gt;</a:t>
+            </a:r>
+            <a:r>
+              <a:rPr lang="en-US" dirty="0">
+                <a:solidFill>
+                  <a:srgbClr val="D4D4D4"/>
+                </a:solidFill>
+                <a:latin typeface="Consolas" panose="020B0609020204030204" pitchFamily="49" charset="0"/>
+              </a:rPr>
+              <a:t>Hello World</a:t>
+            </a:r>
+            <a:r>
+              <a:rPr lang="en-US" dirty="0">
+                <a:solidFill>
+                  <a:srgbClr val="808080"/>
+                </a:solidFill>
+                <a:latin typeface="Consolas" panose="020B0609020204030204" pitchFamily="49" charset="0"/>
+              </a:rPr>
+              <a:t>&lt;/</a:t>
+            </a:r>
+            <a:r>
+              <a:rPr lang="en-US" dirty="0">
+                <a:solidFill>
+                  <a:srgbClr val="569CD6"/>
+                </a:solidFill>
+                <a:latin typeface="Consolas" panose="020B0609020204030204" pitchFamily="49" charset="0"/>
+              </a:rPr>
+              <a:t>div</a:t>
+            </a:r>
+            <a:r>
+              <a:rPr lang="en-US" dirty="0">
+                <a:solidFill>
+                  <a:srgbClr val="808080"/>
+                </a:solidFill>
+                <a:latin typeface="Consolas" panose="020B0609020204030204" pitchFamily="49" charset="0"/>
+              </a:rPr>
+              <a:t>&gt;</a:t>
+            </a:r>
+            <a:r>
+              <a:rPr lang="en-US" dirty="0">
+                <a:solidFill>
+                  <a:srgbClr val="D4D4D4"/>
+                </a:solidFill>
+                <a:latin typeface="Consolas" panose="020B0609020204030204" pitchFamily="49" charset="0"/>
+              </a:rPr>
+              <a:t>;</a:t>
+            </a:r>
+          </a:p>
+          <a:p>
+            <a:r>
+              <a:rPr lang="en-US" dirty="0">
+                <a:solidFill>
+                  <a:srgbClr val="D4D4D4"/>
+                </a:solidFill>
+                <a:latin typeface="Consolas" panose="020B0609020204030204" pitchFamily="49" charset="0"/>
+              </a:rPr>
+              <a:t>}</a:t>
+            </a:r>
+          </a:p>
+          <a:p>
+            <a:r>
+              <a:rPr lang="en-US" dirty="0">
+                <a:solidFill>
+                  <a:srgbClr val="C586C0"/>
+                </a:solidFill>
+                <a:latin typeface="Consolas" panose="020B0609020204030204" pitchFamily="49" charset="0"/>
+              </a:rPr>
+              <a:t>export</a:t>
+            </a:r>
+            <a:r>
+              <a:rPr lang="en-US" dirty="0">
+                <a:solidFill>
+                  <a:srgbClr val="D4D4D4"/>
+                </a:solidFill>
+                <a:latin typeface="Consolas" panose="020B0609020204030204" pitchFamily="49" charset="0"/>
+              </a:rPr>
+              <a:t> </a:t>
+            </a:r>
+            <a:r>
+              <a:rPr lang="en-US" dirty="0">
+                <a:solidFill>
+                  <a:srgbClr val="C586C0"/>
+                </a:solidFill>
+                <a:latin typeface="Consolas" panose="020B0609020204030204" pitchFamily="49" charset="0"/>
+              </a:rPr>
+              <a:t>default</a:t>
+            </a:r>
+            <a:r>
+              <a:rPr lang="en-US" dirty="0">
+                <a:solidFill>
+                  <a:srgbClr val="D4D4D4"/>
+                </a:solidFill>
+                <a:latin typeface="Consolas" panose="020B0609020204030204" pitchFamily="49" charset="0"/>
+              </a:rPr>
+              <a:t> </a:t>
+            </a:r>
+            <a:r>
+              <a:rPr lang="en-US" dirty="0">
+                <a:solidFill>
+                  <a:srgbClr val="9CDCFE"/>
+                </a:solidFill>
+                <a:latin typeface="Consolas" panose="020B0609020204030204" pitchFamily="49" charset="0"/>
+              </a:rPr>
+              <a:t>App</a:t>
+            </a:r>
+            <a:r>
+              <a:rPr lang="en-US" dirty="0">
+                <a:solidFill>
+                  <a:srgbClr val="D4D4D4"/>
+                </a:solidFill>
+                <a:latin typeface="Consolas" panose="020B0609020204030204" pitchFamily="49" charset="0"/>
+              </a:rPr>
+              <a:t>;</a:t>
+            </a:r>
+            <a:endParaRPr lang="en-US" b="0" dirty="0">
+              <a:solidFill>
+                <a:srgbClr val="D4D4D4"/>
+              </a:solidFill>
+              <a:effectLst/>
+              <a:latin typeface="Consolas" panose="020B0609020204030204" pitchFamily="49" charset="0"/>
+            </a:endParaRPr>
+          </a:p>
+        </p:txBody>
+      </p:sp>
+      <p:sp>
+        <p:nvSpPr>
+          <p:cNvPr id="6" name="Prostokąt 5">
+            <a:extLst>
+              <a:ext uri="{FF2B5EF4-FFF2-40B4-BE49-F238E27FC236}">
+                <a16:creationId xmlns:a16="http://schemas.microsoft.com/office/drawing/2014/main" id="{8888ACB4-E8E7-4C72-9B6A-8FD46DA6D543}"/>
+              </a:ext>
+            </a:extLst>
+          </p:cNvPr>
+          <p:cNvSpPr/>
+          <p:nvPr/>
+        </p:nvSpPr>
+        <p:spPr>
+          <a:xfrm>
+            <a:off x="4300328" y="2234609"/>
+            <a:ext cx="7593495" cy="1754326"/>
+          </a:xfrm>
+          <a:prstGeom prst="rect">
+            <a:avLst/>
+          </a:prstGeom>
+          <a:solidFill>
+            <a:schemeClr val="tx1"/>
+          </a:solidFill>
+        </p:spPr>
+        <p:txBody>
+          <a:bodyPr wrap="square">
+            <a:spAutoFit/>
+          </a:bodyPr>
+          <a:lstStyle/>
+          <a:p>
+            <a:r>
+              <a:rPr lang="en-US" dirty="0">
+                <a:solidFill>
+                  <a:srgbClr val="569CD6"/>
+                </a:solidFill>
+                <a:latin typeface="Consolas" panose="020B0609020204030204" pitchFamily="49" charset="0"/>
+              </a:rPr>
+              <a:t>class</a:t>
+            </a:r>
+            <a:r>
+              <a:rPr lang="en-US" dirty="0">
+                <a:solidFill>
+                  <a:srgbClr val="D4D4D4"/>
+                </a:solidFill>
+                <a:latin typeface="Consolas" panose="020B0609020204030204" pitchFamily="49" charset="0"/>
+              </a:rPr>
+              <a:t> </a:t>
+            </a:r>
+            <a:r>
+              <a:rPr lang="en-US" dirty="0">
+                <a:solidFill>
+                  <a:srgbClr val="4EC9B0"/>
+                </a:solidFill>
+                <a:latin typeface="Consolas" panose="020B0609020204030204" pitchFamily="49" charset="0"/>
+              </a:rPr>
+              <a:t>App</a:t>
+            </a:r>
+            <a:r>
+              <a:rPr lang="en-US" dirty="0">
+                <a:solidFill>
+                  <a:srgbClr val="D4D4D4"/>
+                </a:solidFill>
+                <a:latin typeface="Consolas" panose="020B0609020204030204" pitchFamily="49" charset="0"/>
+              </a:rPr>
+              <a:t> </a:t>
+            </a:r>
+            <a:r>
+              <a:rPr lang="en-US" dirty="0">
+                <a:solidFill>
+                  <a:srgbClr val="569CD6"/>
+                </a:solidFill>
+                <a:latin typeface="Consolas" panose="020B0609020204030204" pitchFamily="49" charset="0"/>
+              </a:rPr>
+              <a:t>extends</a:t>
+            </a:r>
+            <a:r>
+              <a:rPr lang="en-US" dirty="0">
+                <a:solidFill>
+                  <a:srgbClr val="D4D4D4"/>
+                </a:solidFill>
+                <a:latin typeface="Consolas" panose="020B0609020204030204" pitchFamily="49" charset="0"/>
+              </a:rPr>
+              <a:t> </a:t>
+            </a:r>
+            <a:r>
+              <a:rPr lang="en-US" dirty="0" err="1">
+                <a:solidFill>
+                  <a:srgbClr val="4EC9B0"/>
+                </a:solidFill>
+                <a:latin typeface="Consolas" panose="020B0609020204030204" pitchFamily="49" charset="0"/>
+              </a:rPr>
+              <a:t>React</a:t>
+            </a:r>
+            <a:r>
+              <a:rPr lang="en-US" dirty="0" err="1">
+                <a:solidFill>
+                  <a:srgbClr val="D4D4D4"/>
+                </a:solidFill>
+                <a:latin typeface="Consolas" panose="020B0609020204030204" pitchFamily="49" charset="0"/>
+              </a:rPr>
+              <a:t>.</a:t>
+            </a:r>
+            <a:r>
+              <a:rPr lang="en-US" dirty="0" err="1">
+                <a:solidFill>
+                  <a:srgbClr val="4EC9B0"/>
+                </a:solidFill>
+                <a:latin typeface="Consolas" panose="020B0609020204030204" pitchFamily="49" charset="0"/>
+              </a:rPr>
+              <a:t>Component</a:t>
+            </a:r>
+            <a:r>
+              <a:rPr lang="en-US" dirty="0">
+                <a:solidFill>
+                  <a:srgbClr val="D4D4D4"/>
+                </a:solidFill>
+                <a:latin typeface="Consolas" panose="020B0609020204030204" pitchFamily="49" charset="0"/>
+              </a:rPr>
+              <a:t>  {</a:t>
+            </a:r>
+          </a:p>
+          <a:p>
+            <a:r>
+              <a:rPr lang="en-US" dirty="0">
+                <a:solidFill>
+                  <a:srgbClr val="D4D4D4"/>
+                </a:solidFill>
+                <a:latin typeface="Consolas" panose="020B0609020204030204" pitchFamily="49" charset="0"/>
+              </a:rPr>
+              <a:t>  </a:t>
+            </a:r>
+            <a:r>
+              <a:rPr lang="en-US" dirty="0">
+                <a:solidFill>
+                  <a:srgbClr val="DCDCAA"/>
+                </a:solidFill>
+                <a:latin typeface="Consolas" panose="020B0609020204030204" pitchFamily="49" charset="0"/>
+              </a:rPr>
+              <a:t>render</a:t>
+            </a:r>
+            <a:r>
+              <a:rPr lang="en-US" dirty="0">
+                <a:solidFill>
+                  <a:srgbClr val="D4D4D4"/>
+                </a:solidFill>
+                <a:latin typeface="Consolas" panose="020B0609020204030204" pitchFamily="49" charset="0"/>
+              </a:rPr>
+              <a:t>() {</a:t>
+            </a:r>
+          </a:p>
+          <a:p>
+            <a:r>
+              <a:rPr lang="en-US" dirty="0">
+                <a:solidFill>
+                  <a:srgbClr val="D4D4D4"/>
+                </a:solidFill>
+                <a:latin typeface="Consolas" panose="020B0609020204030204" pitchFamily="49" charset="0"/>
+              </a:rPr>
+              <a:t>    </a:t>
+            </a:r>
+            <a:r>
+              <a:rPr lang="en-US" dirty="0">
+                <a:solidFill>
+                  <a:srgbClr val="C586C0"/>
+                </a:solidFill>
+                <a:latin typeface="Consolas" panose="020B0609020204030204" pitchFamily="49" charset="0"/>
+              </a:rPr>
+              <a:t>return</a:t>
+            </a:r>
+            <a:r>
+              <a:rPr lang="en-US" dirty="0">
+                <a:solidFill>
+                  <a:srgbClr val="D4D4D4"/>
+                </a:solidFill>
+                <a:latin typeface="Consolas" panose="020B0609020204030204" pitchFamily="49" charset="0"/>
+              </a:rPr>
+              <a:t> </a:t>
+            </a:r>
+            <a:r>
+              <a:rPr lang="en-US" dirty="0">
+                <a:solidFill>
+                  <a:srgbClr val="808080"/>
+                </a:solidFill>
+                <a:latin typeface="Consolas" panose="020B0609020204030204" pitchFamily="49" charset="0"/>
+              </a:rPr>
+              <a:t>&lt;</a:t>
+            </a:r>
+            <a:r>
+              <a:rPr lang="en-US" dirty="0">
+                <a:solidFill>
+                  <a:srgbClr val="569CD6"/>
+                </a:solidFill>
+                <a:latin typeface="Consolas" panose="020B0609020204030204" pitchFamily="49" charset="0"/>
+              </a:rPr>
+              <a:t>div</a:t>
+            </a:r>
+            <a:r>
+              <a:rPr lang="en-US" dirty="0">
+                <a:solidFill>
+                  <a:srgbClr val="808080"/>
+                </a:solidFill>
+                <a:latin typeface="Consolas" panose="020B0609020204030204" pitchFamily="49" charset="0"/>
+              </a:rPr>
+              <a:t>&gt;</a:t>
+            </a:r>
+            <a:r>
+              <a:rPr lang="en-US" dirty="0">
+                <a:solidFill>
+                  <a:srgbClr val="D4D4D4"/>
+                </a:solidFill>
+                <a:latin typeface="Consolas" panose="020B0609020204030204" pitchFamily="49" charset="0"/>
+              </a:rPr>
+              <a:t>Hello World</a:t>
+            </a:r>
+            <a:r>
+              <a:rPr lang="en-US" dirty="0">
+                <a:solidFill>
+                  <a:srgbClr val="808080"/>
+                </a:solidFill>
+                <a:latin typeface="Consolas" panose="020B0609020204030204" pitchFamily="49" charset="0"/>
+              </a:rPr>
+              <a:t>&lt;/</a:t>
+            </a:r>
+            <a:r>
+              <a:rPr lang="en-US" dirty="0">
+                <a:solidFill>
+                  <a:srgbClr val="569CD6"/>
+                </a:solidFill>
+                <a:latin typeface="Consolas" panose="020B0609020204030204" pitchFamily="49" charset="0"/>
+              </a:rPr>
+              <a:t>div</a:t>
+            </a:r>
+            <a:r>
+              <a:rPr lang="en-US" dirty="0">
+                <a:solidFill>
+                  <a:srgbClr val="808080"/>
+                </a:solidFill>
+                <a:latin typeface="Consolas" panose="020B0609020204030204" pitchFamily="49" charset="0"/>
+              </a:rPr>
+              <a:t>&gt;</a:t>
+            </a:r>
+            <a:r>
+              <a:rPr lang="en-US" dirty="0">
+                <a:solidFill>
+                  <a:srgbClr val="D4D4D4"/>
+                </a:solidFill>
+                <a:latin typeface="Consolas" panose="020B0609020204030204" pitchFamily="49" charset="0"/>
+              </a:rPr>
+              <a:t>;</a:t>
+            </a:r>
+          </a:p>
+          <a:p>
+            <a:r>
+              <a:rPr lang="en-US" dirty="0">
+                <a:solidFill>
+                  <a:srgbClr val="D4D4D4"/>
+                </a:solidFill>
+                <a:latin typeface="Consolas" panose="020B0609020204030204" pitchFamily="49" charset="0"/>
+              </a:rPr>
+              <a:t>  }</a:t>
+            </a:r>
+          </a:p>
+          <a:p>
+            <a:r>
+              <a:rPr lang="en-US" dirty="0">
+                <a:solidFill>
+                  <a:srgbClr val="D4D4D4"/>
+                </a:solidFill>
+                <a:latin typeface="Consolas" panose="020B0609020204030204" pitchFamily="49" charset="0"/>
+              </a:rPr>
+              <a:t>}</a:t>
+            </a:r>
+            <a:endParaRPr lang="pl-PL" dirty="0">
+              <a:solidFill>
+                <a:srgbClr val="D4D4D4"/>
+              </a:solidFill>
+              <a:latin typeface="Consolas" panose="020B0609020204030204" pitchFamily="49" charset="0"/>
+            </a:endParaRPr>
+          </a:p>
+          <a:p>
+            <a:r>
+              <a:rPr lang="en-US" dirty="0">
+                <a:solidFill>
+                  <a:srgbClr val="C586C0"/>
+                </a:solidFill>
+                <a:latin typeface="Consolas" panose="020B0609020204030204" pitchFamily="49" charset="0"/>
+              </a:rPr>
+              <a:t>export</a:t>
+            </a:r>
+            <a:r>
+              <a:rPr lang="en-US" dirty="0">
+                <a:solidFill>
+                  <a:srgbClr val="D4D4D4"/>
+                </a:solidFill>
+                <a:latin typeface="Consolas" panose="020B0609020204030204" pitchFamily="49" charset="0"/>
+              </a:rPr>
+              <a:t> </a:t>
+            </a:r>
+            <a:r>
+              <a:rPr lang="en-US" dirty="0">
+                <a:solidFill>
+                  <a:srgbClr val="C586C0"/>
+                </a:solidFill>
+                <a:latin typeface="Consolas" panose="020B0609020204030204" pitchFamily="49" charset="0"/>
+              </a:rPr>
+              <a:t>default</a:t>
+            </a:r>
+            <a:r>
+              <a:rPr lang="en-US" dirty="0">
+                <a:solidFill>
+                  <a:srgbClr val="D4D4D4"/>
+                </a:solidFill>
+                <a:latin typeface="Consolas" panose="020B0609020204030204" pitchFamily="49" charset="0"/>
+              </a:rPr>
+              <a:t> </a:t>
+            </a:r>
+            <a:r>
+              <a:rPr lang="en-US" dirty="0">
+                <a:solidFill>
+                  <a:srgbClr val="9CDCFE"/>
+                </a:solidFill>
+                <a:latin typeface="Consolas" panose="020B0609020204030204" pitchFamily="49" charset="0"/>
+              </a:rPr>
+              <a:t>App</a:t>
+            </a:r>
+            <a:r>
+              <a:rPr lang="en-US" dirty="0">
+                <a:solidFill>
+                  <a:srgbClr val="D4D4D4"/>
+                </a:solidFill>
+                <a:latin typeface="Consolas" panose="020B0609020204030204" pitchFamily="49" charset="0"/>
+              </a:rPr>
+              <a:t>;</a:t>
+            </a:r>
+          </a:p>
+        </p:txBody>
+      </p:sp>
+      <p:sp>
+        <p:nvSpPr>
+          <p:cNvPr id="7" name="pole tekstowe 6">
+            <a:extLst>
+              <a:ext uri="{FF2B5EF4-FFF2-40B4-BE49-F238E27FC236}">
+                <a16:creationId xmlns:a16="http://schemas.microsoft.com/office/drawing/2014/main" id="{AA56C886-88ED-41EA-93E0-9A8A86600A3C}"/>
+              </a:ext>
+            </a:extLst>
+          </p:cNvPr>
+          <p:cNvSpPr txBox="1"/>
+          <p:nvPr/>
+        </p:nvSpPr>
+        <p:spPr>
+          <a:xfrm>
+            <a:off x="1821376" y="1479646"/>
+            <a:ext cx="2137893" cy="369332"/>
+          </a:xfrm>
+          <a:prstGeom prst="rect">
+            <a:avLst/>
+          </a:prstGeom>
+          <a:noFill/>
+        </p:spPr>
+        <p:txBody>
+          <a:bodyPr wrap="none" rtlCol="0">
+            <a:spAutoFit/>
+          </a:bodyPr>
+          <a:lstStyle/>
+          <a:p>
+            <a:r>
+              <a:rPr lang="pl-PL" dirty="0" err="1"/>
+              <a:t>Function</a:t>
+            </a:r>
+            <a:r>
+              <a:rPr lang="pl-PL" dirty="0"/>
+              <a:t> component</a:t>
+            </a:r>
+          </a:p>
+        </p:txBody>
+      </p:sp>
+      <p:sp>
+        <p:nvSpPr>
+          <p:cNvPr id="8" name="pole tekstowe 7">
+            <a:extLst>
+              <a:ext uri="{FF2B5EF4-FFF2-40B4-BE49-F238E27FC236}">
+                <a16:creationId xmlns:a16="http://schemas.microsoft.com/office/drawing/2014/main" id="{A1E249E1-C45F-45A6-9551-2905A6E0B34E}"/>
+              </a:ext>
+            </a:extLst>
+          </p:cNvPr>
+          <p:cNvSpPr txBox="1"/>
+          <p:nvPr/>
+        </p:nvSpPr>
+        <p:spPr>
+          <a:xfrm>
+            <a:off x="2175639" y="2537292"/>
+            <a:ext cx="1783630" cy="369332"/>
+          </a:xfrm>
+          <a:prstGeom prst="rect">
+            <a:avLst/>
+          </a:prstGeom>
+          <a:noFill/>
+        </p:spPr>
+        <p:txBody>
+          <a:bodyPr wrap="none" rtlCol="0">
+            <a:spAutoFit/>
+          </a:bodyPr>
+          <a:lstStyle/>
+          <a:p>
+            <a:r>
+              <a:rPr lang="pl-PL" dirty="0"/>
+              <a:t>Class component</a:t>
+            </a:r>
+          </a:p>
+        </p:txBody>
+      </p:sp>
+      <p:sp>
+        <p:nvSpPr>
+          <p:cNvPr id="9" name="Prostokąt 8">
+            <a:extLst>
+              <a:ext uri="{FF2B5EF4-FFF2-40B4-BE49-F238E27FC236}">
+                <a16:creationId xmlns:a16="http://schemas.microsoft.com/office/drawing/2014/main" id="{89DAFA29-C4E3-4C64-A4ED-4209A3DA6399}"/>
+              </a:ext>
+            </a:extLst>
+          </p:cNvPr>
+          <p:cNvSpPr/>
+          <p:nvPr/>
+        </p:nvSpPr>
+        <p:spPr>
+          <a:xfrm>
+            <a:off x="4300327" y="4067709"/>
+            <a:ext cx="7593496" cy="923330"/>
+          </a:xfrm>
+          <a:prstGeom prst="rect">
+            <a:avLst/>
+          </a:prstGeom>
+          <a:solidFill>
+            <a:schemeClr val="tx1"/>
+          </a:solidFill>
+        </p:spPr>
+        <p:txBody>
+          <a:bodyPr wrap="square">
+            <a:spAutoFit/>
+          </a:bodyPr>
+          <a:lstStyle/>
+          <a:p>
+            <a:r>
+              <a:rPr lang="pl-PL" dirty="0">
+                <a:solidFill>
+                  <a:srgbClr val="C586C0"/>
+                </a:solidFill>
+                <a:latin typeface="Consolas" panose="020B0609020204030204" pitchFamily="49" charset="0"/>
+              </a:rPr>
+              <a:t>import</a:t>
+            </a:r>
+            <a:r>
+              <a:rPr lang="pl-PL" dirty="0">
+                <a:solidFill>
+                  <a:srgbClr val="D4D4D4"/>
+                </a:solidFill>
+                <a:latin typeface="Consolas" panose="020B0609020204030204" pitchFamily="49" charset="0"/>
+              </a:rPr>
+              <a:t> </a:t>
+            </a:r>
+            <a:r>
+              <a:rPr lang="pl-PL" dirty="0" err="1">
+                <a:solidFill>
+                  <a:srgbClr val="9CDCFE"/>
+                </a:solidFill>
+                <a:latin typeface="Consolas" panose="020B0609020204030204" pitchFamily="49" charset="0"/>
+              </a:rPr>
+              <a:t>App</a:t>
+            </a:r>
+            <a:r>
+              <a:rPr lang="pl-PL" dirty="0">
+                <a:solidFill>
+                  <a:srgbClr val="D4D4D4"/>
+                </a:solidFill>
+                <a:latin typeface="Consolas" panose="020B0609020204030204" pitchFamily="49" charset="0"/>
+              </a:rPr>
+              <a:t> </a:t>
+            </a:r>
+            <a:r>
+              <a:rPr lang="pl-PL" dirty="0">
+                <a:solidFill>
+                  <a:srgbClr val="C586C0"/>
+                </a:solidFill>
+                <a:latin typeface="Consolas" panose="020B0609020204030204" pitchFamily="49" charset="0"/>
+              </a:rPr>
+              <a:t>from</a:t>
+            </a:r>
+            <a:r>
+              <a:rPr lang="pl-PL" dirty="0">
+                <a:solidFill>
+                  <a:srgbClr val="D4D4D4"/>
+                </a:solidFill>
+                <a:latin typeface="Consolas" panose="020B0609020204030204" pitchFamily="49" charset="0"/>
+              </a:rPr>
+              <a:t> </a:t>
+            </a:r>
+            <a:r>
+              <a:rPr lang="pl-PL" dirty="0">
+                <a:solidFill>
+                  <a:srgbClr val="CE9178"/>
+                </a:solidFill>
+                <a:latin typeface="Consolas" panose="020B0609020204030204" pitchFamily="49" charset="0"/>
+              </a:rPr>
+              <a:t>'./</a:t>
+            </a:r>
+            <a:r>
+              <a:rPr lang="pl-PL" dirty="0" err="1">
+                <a:solidFill>
+                  <a:srgbClr val="CE9178"/>
+                </a:solidFill>
+                <a:latin typeface="Consolas" panose="020B0609020204030204" pitchFamily="49" charset="0"/>
+              </a:rPr>
+              <a:t>App</a:t>
+            </a:r>
+            <a:r>
+              <a:rPr lang="pl-PL" dirty="0">
+                <a:solidFill>
+                  <a:srgbClr val="CE9178"/>
+                </a:solidFill>
+                <a:latin typeface="Consolas" panose="020B0609020204030204" pitchFamily="49" charset="0"/>
+              </a:rPr>
+              <a:t>'</a:t>
+            </a:r>
+            <a:r>
+              <a:rPr lang="pl-PL" dirty="0">
+                <a:solidFill>
+                  <a:srgbClr val="D4D4D4"/>
+                </a:solidFill>
+                <a:latin typeface="Consolas" panose="020B0609020204030204" pitchFamily="49" charset="0"/>
+              </a:rPr>
+              <a:t>;</a:t>
+            </a:r>
+          </a:p>
+          <a:p>
+            <a:br>
+              <a:rPr lang="pl-PL" dirty="0">
+                <a:solidFill>
+                  <a:srgbClr val="D4D4D4"/>
+                </a:solidFill>
+                <a:latin typeface="Consolas" panose="020B0609020204030204" pitchFamily="49" charset="0"/>
+              </a:rPr>
+            </a:br>
+            <a:r>
+              <a:rPr lang="pl-PL" dirty="0" err="1">
+                <a:solidFill>
+                  <a:srgbClr val="9CDCFE"/>
+                </a:solidFill>
+                <a:latin typeface="Consolas" panose="020B0609020204030204" pitchFamily="49" charset="0"/>
+              </a:rPr>
+              <a:t>ReactDOM</a:t>
+            </a:r>
+            <a:r>
+              <a:rPr lang="pl-PL" dirty="0" err="1">
+                <a:solidFill>
+                  <a:srgbClr val="D4D4D4"/>
+                </a:solidFill>
+                <a:latin typeface="Consolas" panose="020B0609020204030204" pitchFamily="49" charset="0"/>
+              </a:rPr>
+              <a:t>.</a:t>
+            </a:r>
+            <a:r>
+              <a:rPr lang="pl-PL" dirty="0" err="1">
+                <a:solidFill>
+                  <a:srgbClr val="DCDCAA"/>
+                </a:solidFill>
+                <a:latin typeface="Consolas" panose="020B0609020204030204" pitchFamily="49" charset="0"/>
+              </a:rPr>
+              <a:t>render</a:t>
+            </a:r>
+            <a:r>
+              <a:rPr lang="pl-PL" dirty="0">
+                <a:solidFill>
+                  <a:srgbClr val="D4D4D4"/>
+                </a:solidFill>
+                <a:latin typeface="Consolas" panose="020B0609020204030204" pitchFamily="49" charset="0"/>
+              </a:rPr>
+              <a:t>(</a:t>
+            </a:r>
+            <a:r>
+              <a:rPr lang="pl-PL" dirty="0">
+                <a:solidFill>
+                  <a:srgbClr val="808080"/>
+                </a:solidFill>
+                <a:latin typeface="Consolas" panose="020B0609020204030204" pitchFamily="49" charset="0"/>
+              </a:rPr>
+              <a:t>&lt;</a:t>
+            </a:r>
+            <a:r>
+              <a:rPr lang="pl-PL" dirty="0" err="1">
+                <a:solidFill>
+                  <a:srgbClr val="4EC9B0"/>
+                </a:solidFill>
+                <a:latin typeface="Consolas" panose="020B0609020204030204" pitchFamily="49" charset="0"/>
+              </a:rPr>
+              <a:t>App</a:t>
+            </a:r>
+            <a:r>
+              <a:rPr lang="pl-PL" dirty="0">
+                <a:solidFill>
+                  <a:srgbClr val="D4D4D4"/>
+                </a:solidFill>
+                <a:latin typeface="Consolas" panose="020B0609020204030204" pitchFamily="49" charset="0"/>
+              </a:rPr>
+              <a:t> </a:t>
+            </a:r>
+            <a:r>
+              <a:rPr lang="pl-PL" dirty="0">
+                <a:solidFill>
+                  <a:srgbClr val="808080"/>
+                </a:solidFill>
+                <a:latin typeface="Consolas" panose="020B0609020204030204" pitchFamily="49" charset="0"/>
+              </a:rPr>
+              <a:t>/&gt;</a:t>
+            </a:r>
+            <a:r>
+              <a:rPr lang="pl-PL" dirty="0">
+                <a:solidFill>
+                  <a:srgbClr val="D4D4D4"/>
+                </a:solidFill>
+                <a:latin typeface="Consolas" panose="020B0609020204030204" pitchFamily="49" charset="0"/>
+              </a:rPr>
+              <a:t>, </a:t>
+            </a:r>
+            <a:r>
+              <a:rPr lang="pl-PL" dirty="0" err="1">
+                <a:solidFill>
+                  <a:srgbClr val="9CDCFE"/>
+                </a:solidFill>
+                <a:latin typeface="Consolas" panose="020B0609020204030204" pitchFamily="49" charset="0"/>
+              </a:rPr>
+              <a:t>document</a:t>
+            </a:r>
+            <a:r>
+              <a:rPr lang="pl-PL" dirty="0" err="1">
+                <a:solidFill>
+                  <a:srgbClr val="D4D4D4"/>
+                </a:solidFill>
+                <a:latin typeface="Consolas" panose="020B0609020204030204" pitchFamily="49" charset="0"/>
+              </a:rPr>
+              <a:t>.</a:t>
+            </a:r>
+            <a:r>
+              <a:rPr lang="pl-PL" dirty="0" err="1">
+                <a:solidFill>
+                  <a:srgbClr val="DCDCAA"/>
+                </a:solidFill>
+                <a:latin typeface="Consolas" panose="020B0609020204030204" pitchFamily="49" charset="0"/>
+              </a:rPr>
+              <a:t>getElementById</a:t>
+            </a:r>
+            <a:r>
+              <a:rPr lang="pl-PL" dirty="0">
+                <a:solidFill>
+                  <a:srgbClr val="D4D4D4"/>
+                </a:solidFill>
+                <a:latin typeface="Consolas" panose="020B0609020204030204" pitchFamily="49" charset="0"/>
+              </a:rPr>
+              <a:t>(</a:t>
+            </a:r>
+            <a:r>
+              <a:rPr lang="pl-PL" dirty="0">
+                <a:solidFill>
+                  <a:srgbClr val="CE9178"/>
+                </a:solidFill>
+                <a:latin typeface="Consolas" panose="020B0609020204030204" pitchFamily="49" charset="0"/>
+              </a:rPr>
+              <a:t>'</a:t>
+            </a:r>
+            <a:r>
+              <a:rPr lang="pl-PL" dirty="0" err="1">
+                <a:solidFill>
+                  <a:srgbClr val="CE9178"/>
+                </a:solidFill>
+                <a:latin typeface="Consolas" panose="020B0609020204030204" pitchFamily="49" charset="0"/>
+              </a:rPr>
+              <a:t>root</a:t>
+            </a:r>
+            <a:r>
+              <a:rPr lang="pl-PL" dirty="0">
+                <a:solidFill>
+                  <a:srgbClr val="CE9178"/>
+                </a:solidFill>
+                <a:latin typeface="Consolas" panose="020B0609020204030204" pitchFamily="49" charset="0"/>
+              </a:rPr>
+              <a:t>'</a:t>
+            </a:r>
+            <a:r>
+              <a:rPr lang="pl-PL" dirty="0">
+                <a:solidFill>
+                  <a:srgbClr val="D4D4D4"/>
+                </a:solidFill>
+                <a:latin typeface="Consolas" panose="020B0609020204030204" pitchFamily="49" charset="0"/>
+              </a:rPr>
+              <a:t>));</a:t>
+            </a:r>
+            <a:endParaRPr lang="pl-PL" b="0" dirty="0">
+              <a:solidFill>
+                <a:srgbClr val="D4D4D4"/>
+              </a:solidFill>
+              <a:effectLst/>
+              <a:latin typeface="Consolas" panose="020B0609020204030204" pitchFamily="49" charset="0"/>
+            </a:endParaRPr>
+          </a:p>
+        </p:txBody>
+      </p:sp>
+      <p:sp>
+        <p:nvSpPr>
+          <p:cNvPr id="10" name="pole tekstowe 9">
+            <a:extLst>
+              <a:ext uri="{FF2B5EF4-FFF2-40B4-BE49-F238E27FC236}">
+                <a16:creationId xmlns:a16="http://schemas.microsoft.com/office/drawing/2014/main" id="{A6F92A12-AAE4-4B8B-92D6-3E1D0D7934D7}"/>
+              </a:ext>
+            </a:extLst>
+          </p:cNvPr>
+          <p:cNvSpPr txBox="1"/>
+          <p:nvPr/>
+        </p:nvSpPr>
+        <p:spPr>
+          <a:xfrm>
+            <a:off x="1966479" y="4344708"/>
+            <a:ext cx="1992790" cy="369332"/>
+          </a:xfrm>
+          <a:prstGeom prst="rect">
+            <a:avLst/>
+          </a:prstGeom>
+          <a:noFill/>
+        </p:spPr>
+        <p:txBody>
+          <a:bodyPr wrap="none" rtlCol="0">
+            <a:spAutoFit/>
+          </a:bodyPr>
+          <a:lstStyle/>
+          <a:p>
+            <a:r>
+              <a:rPr lang="pl-PL" dirty="0" err="1"/>
+              <a:t>Render</a:t>
+            </a:r>
+            <a:r>
+              <a:rPr lang="pl-PL" dirty="0"/>
+              <a:t> component</a:t>
+            </a:r>
+          </a:p>
+        </p:txBody>
+      </p:sp>
+      <p:sp>
+        <p:nvSpPr>
+          <p:cNvPr id="12" name="Prostokąt 11">
+            <a:extLst>
+              <a:ext uri="{FF2B5EF4-FFF2-40B4-BE49-F238E27FC236}">
+                <a16:creationId xmlns:a16="http://schemas.microsoft.com/office/drawing/2014/main" id="{632D7AF2-F954-4865-90AE-B40F6B206CE3}"/>
+              </a:ext>
+            </a:extLst>
+          </p:cNvPr>
+          <p:cNvSpPr/>
+          <p:nvPr/>
+        </p:nvSpPr>
+        <p:spPr>
+          <a:xfrm>
+            <a:off x="4300327" y="5069813"/>
+            <a:ext cx="4490332" cy="369332"/>
+          </a:xfrm>
+          <a:prstGeom prst="rect">
+            <a:avLst/>
+          </a:prstGeom>
+          <a:solidFill>
+            <a:schemeClr val="tx1"/>
+          </a:solidFill>
+        </p:spPr>
+        <p:txBody>
+          <a:bodyPr wrap="none">
+            <a:spAutoFit/>
+          </a:bodyPr>
+          <a:lstStyle/>
+          <a:p>
+            <a:r>
+              <a:rPr lang="en-US" dirty="0">
+                <a:solidFill>
+                  <a:srgbClr val="569CD6"/>
+                </a:solidFill>
+                <a:latin typeface="Consolas" panose="020B0609020204030204" pitchFamily="49" charset="0"/>
+              </a:rPr>
+              <a:t>const</a:t>
+            </a:r>
+            <a:r>
+              <a:rPr lang="en-US" dirty="0">
+                <a:solidFill>
+                  <a:srgbClr val="D4D4D4"/>
+                </a:solidFill>
+                <a:latin typeface="Consolas" panose="020B0609020204030204" pitchFamily="49" charset="0"/>
+              </a:rPr>
+              <a:t> </a:t>
+            </a:r>
+            <a:r>
+              <a:rPr lang="en-US" dirty="0">
+                <a:solidFill>
+                  <a:srgbClr val="9CDCFE"/>
+                </a:solidFill>
+                <a:latin typeface="Consolas" panose="020B0609020204030204" pitchFamily="49" charset="0"/>
+              </a:rPr>
+              <a:t>element</a:t>
+            </a:r>
+            <a:r>
+              <a:rPr lang="en-US" dirty="0">
+                <a:solidFill>
+                  <a:srgbClr val="D4D4D4"/>
+                </a:solidFill>
+                <a:latin typeface="Consolas" panose="020B0609020204030204" pitchFamily="49" charset="0"/>
+              </a:rPr>
+              <a:t> = </a:t>
+            </a:r>
+            <a:r>
+              <a:rPr lang="pl-PL" dirty="0">
+                <a:solidFill>
+                  <a:schemeClr val="bg1">
+                    <a:lumMod val="50000"/>
+                  </a:schemeClr>
+                </a:solidFill>
+                <a:latin typeface="Consolas" panose="020B0609020204030204" pitchFamily="49" charset="0"/>
+              </a:rPr>
+              <a:t>&lt;</a:t>
+            </a:r>
+            <a:r>
+              <a:rPr lang="pl-PL" dirty="0">
+                <a:solidFill>
+                  <a:srgbClr val="00B0F0"/>
+                </a:solidFill>
+                <a:latin typeface="Consolas" panose="020B0609020204030204" pitchFamily="49" charset="0"/>
+              </a:rPr>
+              <a:t>div</a:t>
+            </a:r>
+            <a:r>
+              <a:rPr lang="pl-PL" dirty="0">
+                <a:solidFill>
+                  <a:schemeClr val="bg1">
+                    <a:lumMod val="50000"/>
+                  </a:schemeClr>
+                </a:solidFill>
+                <a:latin typeface="Consolas" panose="020B0609020204030204" pitchFamily="49" charset="0"/>
+              </a:rPr>
+              <a:t>&gt;</a:t>
+            </a:r>
+            <a:r>
+              <a:rPr lang="en-US" dirty="0">
+                <a:solidFill>
+                  <a:srgbClr val="808080"/>
+                </a:solidFill>
+                <a:latin typeface="Consolas" panose="020B0609020204030204" pitchFamily="49" charset="0"/>
+              </a:rPr>
+              <a:t>&lt;</a:t>
+            </a:r>
+            <a:r>
+              <a:rPr lang="pl-PL" dirty="0" err="1">
+                <a:solidFill>
+                  <a:srgbClr val="4EC9B0"/>
+                </a:solidFill>
+                <a:latin typeface="Consolas" panose="020B0609020204030204" pitchFamily="49" charset="0"/>
+              </a:rPr>
+              <a:t>App</a:t>
+            </a:r>
+            <a:r>
+              <a:rPr lang="pl-PL" dirty="0">
+                <a:solidFill>
+                  <a:srgbClr val="D4D4D4"/>
+                </a:solidFill>
+                <a:latin typeface="Consolas" panose="020B0609020204030204" pitchFamily="49" charset="0"/>
+              </a:rPr>
+              <a:t>/</a:t>
+            </a:r>
+            <a:r>
+              <a:rPr lang="en-US" dirty="0">
+                <a:solidFill>
+                  <a:srgbClr val="808080"/>
+                </a:solidFill>
+                <a:latin typeface="Consolas" panose="020B0609020204030204" pitchFamily="49" charset="0"/>
+              </a:rPr>
+              <a:t>&gt;</a:t>
+            </a:r>
+            <a:r>
+              <a:rPr lang="pl-PL" dirty="0">
+                <a:solidFill>
+                  <a:srgbClr val="808080"/>
+                </a:solidFill>
+                <a:latin typeface="Consolas" panose="020B0609020204030204" pitchFamily="49" charset="0"/>
+              </a:rPr>
+              <a:t>&lt;/</a:t>
+            </a:r>
+            <a:r>
+              <a:rPr lang="pl-PL" dirty="0">
+                <a:solidFill>
+                  <a:srgbClr val="00B0F0"/>
+                </a:solidFill>
+                <a:latin typeface="Consolas" panose="020B0609020204030204" pitchFamily="49" charset="0"/>
+              </a:rPr>
+              <a:t>div</a:t>
+            </a:r>
+            <a:r>
+              <a:rPr lang="pl-PL" dirty="0">
+                <a:solidFill>
+                  <a:srgbClr val="808080"/>
+                </a:solidFill>
+                <a:latin typeface="Consolas" panose="020B0609020204030204" pitchFamily="49" charset="0"/>
+              </a:rPr>
+              <a:t>&gt;</a:t>
+            </a:r>
+            <a:r>
+              <a:rPr lang="en-US" dirty="0">
+                <a:solidFill>
+                  <a:srgbClr val="D4D4D4"/>
+                </a:solidFill>
+                <a:latin typeface="Consolas" panose="020B0609020204030204" pitchFamily="49" charset="0"/>
+              </a:rPr>
+              <a:t>;</a:t>
+            </a:r>
+            <a:endParaRPr lang="en-US" b="0" dirty="0">
+              <a:solidFill>
+                <a:srgbClr val="D4D4D4"/>
+              </a:solidFill>
+              <a:effectLst/>
+              <a:latin typeface="Consolas" panose="020B0609020204030204" pitchFamily="49" charset="0"/>
+            </a:endParaRPr>
+          </a:p>
+        </p:txBody>
+      </p:sp>
+      <p:sp>
+        <p:nvSpPr>
+          <p:cNvPr id="13" name="pole tekstowe 12">
+            <a:extLst>
+              <a:ext uri="{FF2B5EF4-FFF2-40B4-BE49-F238E27FC236}">
+                <a16:creationId xmlns:a16="http://schemas.microsoft.com/office/drawing/2014/main" id="{8559D0B3-D4EE-4823-AE6E-08756A50CB3C}"/>
+              </a:ext>
+            </a:extLst>
+          </p:cNvPr>
+          <p:cNvSpPr txBox="1"/>
+          <p:nvPr/>
+        </p:nvSpPr>
+        <p:spPr>
+          <a:xfrm>
+            <a:off x="2622359" y="5950188"/>
+            <a:ext cx="1224951" cy="369332"/>
+          </a:xfrm>
+          <a:prstGeom prst="rect">
+            <a:avLst/>
+          </a:prstGeom>
+          <a:noFill/>
+        </p:spPr>
+        <p:txBody>
+          <a:bodyPr wrap="none" rtlCol="0">
+            <a:spAutoFit/>
+          </a:bodyPr>
+          <a:lstStyle/>
+          <a:p>
+            <a:r>
+              <a:rPr lang="pl-PL" dirty="0"/>
+              <a:t>With </a:t>
+            </a:r>
+            <a:r>
+              <a:rPr lang="pl-PL" dirty="0" err="1"/>
+              <a:t>props</a:t>
+            </a:r>
             <a:endParaRPr lang="pl-PL" dirty="0"/>
+          </a:p>
+        </p:txBody>
+      </p:sp>
+      <p:sp>
+        <p:nvSpPr>
+          <p:cNvPr id="14" name="Prostokąt 13">
+            <a:extLst>
+              <a:ext uri="{FF2B5EF4-FFF2-40B4-BE49-F238E27FC236}">
+                <a16:creationId xmlns:a16="http://schemas.microsoft.com/office/drawing/2014/main" id="{C636E9B6-22D7-4196-98B5-3AD39FE2CE07}"/>
+              </a:ext>
+            </a:extLst>
+          </p:cNvPr>
+          <p:cNvSpPr/>
+          <p:nvPr/>
+        </p:nvSpPr>
+        <p:spPr>
+          <a:xfrm>
+            <a:off x="4300327" y="5517919"/>
+            <a:ext cx="7802624" cy="1200329"/>
+          </a:xfrm>
+          <a:prstGeom prst="rect">
+            <a:avLst/>
+          </a:prstGeom>
+          <a:solidFill>
+            <a:schemeClr val="tx1"/>
+          </a:solidFill>
+        </p:spPr>
+        <p:txBody>
+          <a:bodyPr wrap="square">
+            <a:spAutoFit/>
+          </a:bodyPr>
+          <a:lstStyle/>
+          <a:p>
+            <a:r>
+              <a:rPr lang="pl-PL" dirty="0" err="1">
+                <a:solidFill>
+                  <a:srgbClr val="569CD6"/>
+                </a:solidFill>
+                <a:latin typeface="Consolas" panose="020B0609020204030204" pitchFamily="49" charset="0"/>
+              </a:rPr>
+              <a:t>function</a:t>
+            </a:r>
+            <a:r>
+              <a:rPr lang="pl-PL" dirty="0">
+                <a:solidFill>
+                  <a:srgbClr val="D4D4D4"/>
+                </a:solidFill>
+                <a:latin typeface="Consolas" panose="020B0609020204030204" pitchFamily="49" charset="0"/>
+              </a:rPr>
+              <a:t> </a:t>
+            </a:r>
+            <a:r>
+              <a:rPr lang="pl-PL" dirty="0" err="1">
+                <a:solidFill>
+                  <a:srgbClr val="DCDCAA"/>
+                </a:solidFill>
+                <a:latin typeface="Consolas" panose="020B0609020204030204" pitchFamily="49" charset="0"/>
+              </a:rPr>
+              <a:t>Welcome</a:t>
+            </a:r>
+            <a:r>
+              <a:rPr lang="pl-PL" dirty="0">
+                <a:solidFill>
+                  <a:srgbClr val="D4D4D4"/>
+                </a:solidFill>
+                <a:latin typeface="Consolas" panose="020B0609020204030204" pitchFamily="49" charset="0"/>
+              </a:rPr>
+              <a:t>(</a:t>
+            </a:r>
+            <a:r>
+              <a:rPr lang="pl-PL" dirty="0" err="1">
+                <a:solidFill>
+                  <a:srgbClr val="9CDCFE"/>
+                </a:solidFill>
+                <a:latin typeface="Consolas" panose="020B0609020204030204" pitchFamily="49" charset="0"/>
+              </a:rPr>
+              <a:t>props</a:t>
+            </a:r>
+            <a:r>
+              <a:rPr lang="pl-PL" dirty="0">
+                <a:solidFill>
+                  <a:srgbClr val="D4D4D4"/>
+                </a:solidFill>
+                <a:latin typeface="Consolas" panose="020B0609020204030204" pitchFamily="49" charset="0"/>
+              </a:rPr>
+              <a:t>) {</a:t>
+            </a:r>
+          </a:p>
+          <a:p>
+            <a:r>
+              <a:rPr lang="pl-PL" dirty="0">
+                <a:solidFill>
+                  <a:srgbClr val="D4D4D4"/>
+                </a:solidFill>
+                <a:latin typeface="Consolas" panose="020B0609020204030204" pitchFamily="49" charset="0"/>
+              </a:rPr>
+              <a:t>    </a:t>
+            </a:r>
+            <a:r>
+              <a:rPr lang="pl-PL" dirty="0">
+                <a:solidFill>
+                  <a:srgbClr val="C586C0"/>
+                </a:solidFill>
+                <a:latin typeface="Consolas" panose="020B0609020204030204" pitchFamily="49" charset="0"/>
+              </a:rPr>
+              <a:t>return</a:t>
+            </a:r>
+            <a:r>
+              <a:rPr lang="pl-PL" dirty="0">
+                <a:solidFill>
+                  <a:srgbClr val="D4D4D4"/>
+                </a:solidFill>
+                <a:latin typeface="Consolas" panose="020B0609020204030204" pitchFamily="49" charset="0"/>
+              </a:rPr>
+              <a:t> </a:t>
+            </a:r>
+            <a:r>
+              <a:rPr lang="pl-PL" dirty="0">
+                <a:solidFill>
+                  <a:srgbClr val="808080"/>
+                </a:solidFill>
+                <a:latin typeface="Consolas" panose="020B0609020204030204" pitchFamily="49" charset="0"/>
+              </a:rPr>
+              <a:t>&lt;</a:t>
+            </a:r>
+            <a:r>
+              <a:rPr lang="pl-PL" dirty="0">
+                <a:solidFill>
+                  <a:srgbClr val="569CD6"/>
+                </a:solidFill>
+                <a:latin typeface="Consolas" panose="020B0609020204030204" pitchFamily="49" charset="0"/>
+              </a:rPr>
+              <a:t>h1</a:t>
+            </a:r>
+            <a:r>
+              <a:rPr lang="pl-PL" dirty="0">
+                <a:solidFill>
+                  <a:srgbClr val="808080"/>
+                </a:solidFill>
+                <a:latin typeface="Consolas" panose="020B0609020204030204" pitchFamily="49" charset="0"/>
+              </a:rPr>
+              <a:t>&gt;</a:t>
+            </a:r>
+            <a:r>
+              <a:rPr lang="pl-PL" dirty="0">
+                <a:solidFill>
+                  <a:srgbClr val="D4D4D4"/>
+                </a:solidFill>
+                <a:latin typeface="Consolas" panose="020B0609020204030204" pitchFamily="49" charset="0"/>
+              </a:rPr>
+              <a:t>Cześć, </a:t>
+            </a:r>
+            <a:r>
+              <a:rPr lang="pl-PL" dirty="0">
+                <a:solidFill>
+                  <a:srgbClr val="569CD6"/>
+                </a:solidFill>
+                <a:latin typeface="Consolas" panose="020B0609020204030204" pitchFamily="49" charset="0"/>
+              </a:rPr>
+              <a:t>{</a:t>
+            </a:r>
+            <a:r>
+              <a:rPr lang="pl-PL" dirty="0">
+                <a:solidFill>
+                  <a:srgbClr val="9CDCFE"/>
+                </a:solidFill>
+                <a:latin typeface="Consolas" panose="020B0609020204030204" pitchFamily="49" charset="0"/>
+              </a:rPr>
+              <a:t>props</a:t>
+            </a:r>
+            <a:r>
+              <a:rPr lang="pl-PL" dirty="0">
+                <a:solidFill>
+                  <a:srgbClr val="D4D4D4"/>
+                </a:solidFill>
+                <a:latin typeface="Consolas" panose="020B0609020204030204" pitchFamily="49" charset="0"/>
+              </a:rPr>
+              <a:t>.</a:t>
+            </a:r>
+            <a:r>
+              <a:rPr lang="pl-PL" dirty="0">
+                <a:solidFill>
+                  <a:srgbClr val="9CDCFE"/>
+                </a:solidFill>
+                <a:latin typeface="Consolas" panose="020B0609020204030204" pitchFamily="49" charset="0"/>
+              </a:rPr>
+              <a:t>name</a:t>
+            </a:r>
+            <a:r>
+              <a:rPr lang="pl-PL" dirty="0">
+                <a:solidFill>
+                  <a:srgbClr val="569CD6"/>
+                </a:solidFill>
+                <a:latin typeface="Consolas" panose="020B0609020204030204" pitchFamily="49" charset="0"/>
+              </a:rPr>
+              <a:t>}</a:t>
+            </a:r>
+            <a:r>
+              <a:rPr lang="pl-PL" dirty="0">
+                <a:solidFill>
+                  <a:srgbClr val="808080"/>
+                </a:solidFill>
+                <a:latin typeface="Consolas" panose="020B0609020204030204" pitchFamily="49" charset="0"/>
+              </a:rPr>
+              <a:t>&lt;/</a:t>
+            </a:r>
+            <a:r>
+              <a:rPr lang="pl-PL" dirty="0">
+                <a:solidFill>
+                  <a:srgbClr val="569CD6"/>
+                </a:solidFill>
+                <a:latin typeface="Consolas" panose="020B0609020204030204" pitchFamily="49" charset="0"/>
+              </a:rPr>
+              <a:t>h1</a:t>
+            </a:r>
+            <a:r>
+              <a:rPr lang="pl-PL" dirty="0">
+                <a:solidFill>
+                  <a:srgbClr val="808080"/>
+                </a:solidFill>
+                <a:latin typeface="Consolas" panose="020B0609020204030204" pitchFamily="49" charset="0"/>
+              </a:rPr>
+              <a:t>&gt;</a:t>
+            </a:r>
+            <a:r>
+              <a:rPr lang="pl-PL" dirty="0">
+                <a:solidFill>
+                  <a:srgbClr val="D4D4D4"/>
+                </a:solidFill>
+                <a:latin typeface="Consolas" panose="020B0609020204030204" pitchFamily="49" charset="0"/>
+              </a:rPr>
+              <a:t>;</a:t>
+            </a:r>
+          </a:p>
+          <a:p>
+            <a:r>
+              <a:rPr lang="pl-PL" dirty="0">
+                <a:solidFill>
+                  <a:srgbClr val="D4D4D4"/>
+                </a:solidFill>
+                <a:latin typeface="Consolas" panose="020B0609020204030204" pitchFamily="49" charset="0"/>
+              </a:rPr>
+              <a:t>}</a:t>
+            </a:r>
+          </a:p>
+          <a:p>
+            <a:r>
+              <a:rPr lang="pl-PL" dirty="0">
+                <a:solidFill>
+                  <a:srgbClr val="808080"/>
+                </a:solidFill>
+                <a:latin typeface="Consolas" panose="020B0609020204030204" pitchFamily="49" charset="0"/>
+              </a:rPr>
+              <a:t>&lt;</a:t>
+            </a:r>
+            <a:r>
+              <a:rPr lang="pl-PL" dirty="0" err="1">
+                <a:solidFill>
+                  <a:srgbClr val="4EC9B0"/>
+                </a:solidFill>
+                <a:latin typeface="Consolas" panose="020B0609020204030204" pitchFamily="49" charset="0"/>
+              </a:rPr>
+              <a:t>Welcome</a:t>
+            </a:r>
+            <a:r>
+              <a:rPr lang="pl-PL" dirty="0">
+                <a:solidFill>
+                  <a:srgbClr val="D4D4D4"/>
+                </a:solidFill>
+                <a:latin typeface="Consolas" panose="020B0609020204030204" pitchFamily="49" charset="0"/>
+              </a:rPr>
+              <a:t> </a:t>
+            </a:r>
+            <a:r>
+              <a:rPr lang="pl-PL" dirty="0" err="1">
+                <a:solidFill>
+                  <a:srgbClr val="9CDCFE"/>
+                </a:solidFill>
+                <a:latin typeface="Consolas" panose="020B0609020204030204" pitchFamily="49" charset="0"/>
+              </a:rPr>
+              <a:t>name</a:t>
+            </a:r>
+            <a:r>
+              <a:rPr lang="pl-PL" dirty="0">
+                <a:solidFill>
+                  <a:srgbClr val="D4D4D4"/>
+                </a:solidFill>
+                <a:latin typeface="Consolas" panose="020B0609020204030204" pitchFamily="49" charset="0"/>
+              </a:rPr>
+              <a:t>=</a:t>
+            </a:r>
+            <a:r>
+              <a:rPr lang="pl-PL" dirty="0">
+                <a:solidFill>
+                  <a:srgbClr val="CE9178"/>
+                </a:solidFill>
+                <a:latin typeface="Consolas" panose="020B0609020204030204" pitchFamily="49" charset="0"/>
+              </a:rPr>
+              <a:t>"Sara"</a:t>
+            </a:r>
+            <a:r>
+              <a:rPr lang="pl-PL" dirty="0">
+                <a:solidFill>
+                  <a:srgbClr val="D4D4D4"/>
+                </a:solidFill>
+                <a:latin typeface="Consolas" panose="020B0609020204030204" pitchFamily="49" charset="0"/>
+              </a:rPr>
+              <a:t> </a:t>
+            </a:r>
+            <a:r>
+              <a:rPr lang="pl-PL" dirty="0">
+                <a:solidFill>
+                  <a:srgbClr val="808080"/>
+                </a:solidFill>
+                <a:latin typeface="Consolas" panose="020B0609020204030204" pitchFamily="49" charset="0"/>
+              </a:rPr>
+              <a:t>/&gt;</a:t>
+            </a:r>
+            <a:endParaRPr lang="pl-PL" b="0" dirty="0">
+              <a:solidFill>
+                <a:srgbClr val="D4D4D4"/>
+              </a:solidFill>
+              <a:effectLst/>
+              <a:latin typeface="Consolas" panose="020B0609020204030204" pitchFamily="49" charset="0"/>
+            </a:endParaRPr>
           </a:p>
         </p:txBody>
       </p:sp>
@@ -9319,6 +11431,1201 @@
     <p:extLst>
       <p:ext uri="{BB962C8B-B14F-4D97-AF65-F5344CB8AC3E}">
         <p14:creationId xmlns:p14="http://schemas.microsoft.com/office/powerpoint/2010/main" val="2270242214"/>
+      </p:ext>
+    </p:extLst>
+  </p:cSld>
+  <p:clrMapOvr>
+    <a:masterClrMapping/>
+  </p:clrMapOvr>
+</p:sld>
+</file>
+
+<file path=ppt/slides/slide9.xml><?xml version="1.0" encoding="utf-8"?>
+<p:sld xmlns:a="http://schemas.openxmlformats.org/drawingml/2006/main" xmlns:r="http://schemas.openxmlformats.org/officeDocument/2006/relationships" xmlns:p="http://schemas.openxmlformats.org/presentationml/2006/main">
+  <p:cSld>
+    <p:bg>
+      <p:bgPr>
+        <a:noFill/>
+        <a:effectLst/>
+      </p:bgPr>
+    </p:bg>
+    <p:spTree>
+      <p:nvGrpSpPr>
+        <p:cNvPr id="1" name=""/>
+        <p:cNvGrpSpPr/>
+        <p:nvPr/>
+      </p:nvGrpSpPr>
+      <p:grpSpPr>
+        <a:xfrm>
+          <a:off x="0" y="0"/>
+          <a:ext cx="0" cy="0"/>
+          <a:chOff x="0" y="0"/>
+          <a:chExt cx="0" cy="0"/>
+        </a:xfrm>
+      </p:grpSpPr>
+      <p:sp>
+        <p:nvSpPr>
+          <p:cNvPr id="4" name="pole tekstowe 3">
+            <a:extLst>
+              <a:ext uri="{FF2B5EF4-FFF2-40B4-BE49-F238E27FC236}">
+                <a16:creationId xmlns:a16="http://schemas.microsoft.com/office/drawing/2014/main" id="{F164A7B3-8808-414C-9401-3B25194E3B5A}"/>
+              </a:ext>
+            </a:extLst>
+          </p:cNvPr>
+          <p:cNvSpPr txBox="1"/>
+          <p:nvPr/>
+        </p:nvSpPr>
+        <p:spPr>
+          <a:xfrm>
+            <a:off x="497840" y="538480"/>
+            <a:ext cx="1349408" cy="369332"/>
+          </a:xfrm>
+          <a:prstGeom prst="rect">
+            <a:avLst/>
+          </a:prstGeom>
+          <a:noFill/>
+        </p:spPr>
+        <p:txBody>
+          <a:bodyPr wrap="none" rtlCol="0">
+            <a:spAutoFit/>
+          </a:bodyPr>
+          <a:lstStyle/>
+          <a:p>
+            <a:r>
+              <a:rPr lang="pl-PL" dirty="0" err="1"/>
+              <a:t>React</a:t>
+            </a:r>
+            <a:r>
+              <a:rPr lang="pl-PL" dirty="0"/>
+              <a:t> router</a:t>
+            </a:r>
+          </a:p>
+        </p:txBody>
+      </p:sp>
+      <p:sp>
+        <p:nvSpPr>
+          <p:cNvPr id="2" name="Rectangle 2">
+            <a:extLst>
+              <a:ext uri="{FF2B5EF4-FFF2-40B4-BE49-F238E27FC236}">
+                <a16:creationId xmlns:a16="http://schemas.microsoft.com/office/drawing/2014/main" id="{2AB5571D-7C30-4C21-949A-95B2C047941D}"/>
+              </a:ext>
+            </a:extLst>
+          </p:cNvPr>
+          <p:cNvSpPr>
+            <a:spLocks noChangeArrowheads="1"/>
+          </p:cNvSpPr>
+          <p:nvPr/>
+        </p:nvSpPr>
+        <p:spPr bwMode="auto">
+          <a:xfrm>
+            <a:off x="4111350" y="907812"/>
+            <a:ext cx="4393369" cy="369332"/>
+          </a:xfrm>
+          <a:prstGeom prst="rect">
+            <a:avLst/>
+          </a:prstGeom>
+          <a:solidFill>
+            <a:srgbClr val="2D2D2D"/>
+          </a:solidFill>
+          <a:ln>
+            <a:noFill/>
+          </a:ln>
+          <a:effectLst/>
+          <a:extLst>
+            <a:ext uri="{91240B29-F687-4F45-9708-019B960494DF}">
+              <a14:hiddenLine xmlns:a14="http://schemas.microsoft.com/office/drawing/2010/main" w="9525">
+                <a:solidFill>
+                  <a:schemeClr val="tx1"/>
+                </a:solidFill>
+                <a:miter lim="800000"/>
+                <a:headEnd/>
+                <a:tailEnd/>
+              </a14:hiddenLine>
+            </a:ext>
+            <a:ext uri="{AF507438-7753-43E0-B8FC-AC1667EBCBE1}">
+              <a14:hiddenEffects xmlns:a14="http://schemas.microsoft.com/office/drawing/2010/main">
+                <a:effectLst>
+                  <a:outerShdw dist="35921" dir="2700000" algn="ctr" rotWithShape="0">
+                    <a:schemeClr val="bg2"/>
+                  </a:outerShdw>
+                </a:effectLst>
+              </a14:hiddenEffects>
+            </a:ext>
+          </a:extLst>
+        </p:spPr>
+        <p:txBody>
+          <a:bodyPr vert="horz" wrap="square" lIns="91440" tIns="45720" rIns="91440" bIns="45720" numCol="1" anchor="ctr" anchorCtr="0" compatLnSpc="1">
+            <a:prstTxWarp prst="textNoShape">
+              <a:avLst/>
+            </a:prstTxWarp>
+            <a:spAutoFit/>
+          </a:bodyPr>
+          <a:lstStyle/>
+          <a:p>
+            <a:pPr marL="0" marR="0" lvl="0" indent="0" algn="l" defTabSz="914400" rtl="0" eaLnBrk="0" fontAlgn="base" latinLnBrk="0" hangingPunct="0">
+              <a:lnSpc>
+                <a:spcPct val="100000"/>
+              </a:lnSpc>
+              <a:spcBef>
+                <a:spcPct val="0"/>
+              </a:spcBef>
+              <a:spcAft>
+                <a:spcPct val="0"/>
+              </a:spcAft>
+              <a:buClrTx/>
+              <a:buSzTx/>
+              <a:buFontTx/>
+              <a:buNone/>
+              <a:tabLst/>
+            </a:pPr>
+            <a:r>
+              <a:rPr kumimoji="0" lang="pl-PL" altLang="pl-PL" b="0" i="0" u="none" strike="noStrike" cap="none" normalizeH="0" baseline="0" dirty="0" err="1">
+                <a:ln>
+                  <a:noFill/>
+                </a:ln>
+                <a:solidFill>
+                  <a:srgbClr val="F08D49"/>
+                </a:solidFill>
+                <a:effectLst/>
+                <a:latin typeface="Consolas" panose="020B0609020204030204" pitchFamily="49" charset="0"/>
+              </a:rPr>
+              <a:t>npm</a:t>
+            </a:r>
+            <a:r>
+              <a:rPr kumimoji="0" lang="pl-PL" altLang="pl-PL" b="0" i="0" u="none" strike="noStrike" cap="none" normalizeH="0" baseline="0" dirty="0">
+                <a:ln>
+                  <a:noFill/>
+                </a:ln>
+                <a:solidFill>
+                  <a:srgbClr val="CCCCCC"/>
+                </a:solidFill>
+                <a:effectLst/>
+                <a:latin typeface="Consolas" panose="020B0609020204030204" pitchFamily="49" charset="0"/>
+              </a:rPr>
+              <a:t> </a:t>
+            </a:r>
+            <a:r>
+              <a:rPr kumimoji="0" lang="pl-PL" altLang="pl-PL" b="0" i="0" u="none" strike="noStrike" cap="none" normalizeH="0" baseline="0" dirty="0" err="1">
+                <a:ln>
+                  <a:noFill/>
+                </a:ln>
+                <a:solidFill>
+                  <a:srgbClr val="F08D49"/>
+                </a:solidFill>
+                <a:effectLst/>
+                <a:latin typeface="Consolas" panose="020B0609020204030204" pitchFamily="49" charset="0"/>
+              </a:rPr>
+              <a:t>install</a:t>
+            </a:r>
+            <a:r>
+              <a:rPr kumimoji="0" lang="pl-PL" altLang="pl-PL" b="0" i="0" u="none" strike="noStrike" cap="none" normalizeH="0" baseline="0" dirty="0">
+                <a:ln>
+                  <a:noFill/>
+                </a:ln>
+                <a:solidFill>
+                  <a:srgbClr val="CCCCCC"/>
+                </a:solidFill>
+                <a:effectLst/>
+                <a:latin typeface="Consolas" panose="020B0609020204030204" pitchFamily="49" charset="0"/>
+              </a:rPr>
+              <a:t> </a:t>
+            </a:r>
+            <a:r>
+              <a:rPr kumimoji="0" lang="pl-PL" altLang="pl-PL" b="0" i="0" u="none" strike="noStrike" cap="none" normalizeH="0" baseline="0" dirty="0" err="1">
+                <a:ln>
+                  <a:noFill/>
+                </a:ln>
+                <a:solidFill>
+                  <a:srgbClr val="CCCCCC"/>
+                </a:solidFill>
+                <a:effectLst/>
+                <a:latin typeface="Consolas" panose="020B0609020204030204" pitchFamily="49" charset="0"/>
+              </a:rPr>
+              <a:t>react</a:t>
+            </a:r>
+            <a:r>
+              <a:rPr kumimoji="0" lang="pl-PL" altLang="pl-PL" b="0" i="0" u="none" strike="noStrike" cap="none" normalizeH="0" baseline="0" dirty="0">
+                <a:ln>
+                  <a:noFill/>
+                </a:ln>
+                <a:solidFill>
+                  <a:srgbClr val="CCCCCC"/>
+                </a:solidFill>
+                <a:effectLst/>
+                <a:latin typeface="Consolas" panose="020B0609020204030204" pitchFamily="49" charset="0"/>
+              </a:rPr>
+              <a:t>-router-dom </a:t>
+            </a:r>
+            <a:endParaRPr kumimoji="0" lang="pl-PL" altLang="pl-PL" sz="4000" b="0" i="0" u="none" strike="noStrike" cap="none" normalizeH="0" baseline="0" dirty="0">
+              <a:ln>
+                <a:noFill/>
+              </a:ln>
+              <a:solidFill>
+                <a:schemeClr val="tx1"/>
+              </a:solidFill>
+              <a:effectLst/>
+              <a:latin typeface="Arial" panose="020B0604020202020204" pitchFamily="34" charset="0"/>
+            </a:endParaRPr>
+          </a:p>
+        </p:txBody>
+      </p:sp>
+      <p:sp>
+        <p:nvSpPr>
+          <p:cNvPr id="3" name="Prostokąt 2">
+            <a:extLst>
+              <a:ext uri="{FF2B5EF4-FFF2-40B4-BE49-F238E27FC236}">
+                <a16:creationId xmlns:a16="http://schemas.microsoft.com/office/drawing/2014/main" id="{0CCEA609-D902-4EA2-9F01-C4F31B8581EC}"/>
+              </a:ext>
+            </a:extLst>
+          </p:cNvPr>
+          <p:cNvSpPr/>
+          <p:nvPr/>
+        </p:nvSpPr>
+        <p:spPr>
+          <a:xfrm>
+            <a:off x="1232452" y="2136338"/>
+            <a:ext cx="9727096" cy="369332"/>
+          </a:xfrm>
+          <a:prstGeom prst="rect">
+            <a:avLst/>
+          </a:prstGeom>
+          <a:solidFill>
+            <a:schemeClr val="tx1"/>
+          </a:solidFill>
+        </p:spPr>
+        <p:txBody>
+          <a:bodyPr wrap="square">
+            <a:spAutoFit/>
+          </a:bodyPr>
+          <a:lstStyle/>
+          <a:p>
+            <a:r>
+              <a:rPr lang="pl-PL" dirty="0">
+                <a:solidFill>
+                  <a:srgbClr val="C586C0"/>
+                </a:solidFill>
+                <a:latin typeface="Consolas" panose="020B0609020204030204" pitchFamily="49" charset="0"/>
+              </a:rPr>
+              <a:t>import</a:t>
+            </a:r>
+            <a:r>
+              <a:rPr lang="pl-PL" dirty="0">
+                <a:solidFill>
+                  <a:srgbClr val="D4D4D4"/>
+                </a:solidFill>
+                <a:latin typeface="Consolas" panose="020B0609020204030204" pitchFamily="49" charset="0"/>
+              </a:rPr>
+              <a:t> { </a:t>
+            </a:r>
+            <a:r>
+              <a:rPr lang="pl-PL" dirty="0" err="1">
+                <a:solidFill>
+                  <a:srgbClr val="9CDCFE"/>
+                </a:solidFill>
+                <a:latin typeface="Consolas" panose="020B0609020204030204" pitchFamily="49" charset="0"/>
+              </a:rPr>
+              <a:t>BrowserRouter</a:t>
+            </a:r>
+            <a:r>
+              <a:rPr lang="pl-PL" dirty="0">
+                <a:solidFill>
+                  <a:srgbClr val="D4D4D4"/>
+                </a:solidFill>
+                <a:latin typeface="Consolas" panose="020B0609020204030204" pitchFamily="49" charset="0"/>
+              </a:rPr>
+              <a:t> </a:t>
+            </a:r>
+            <a:r>
+              <a:rPr lang="pl-PL" dirty="0">
+                <a:solidFill>
+                  <a:srgbClr val="C586C0"/>
+                </a:solidFill>
+                <a:latin typeface="Consolas" panose="020B0609020204030204" pitchFamily="49" charset="0"/>
+              </a:rPr>
+              <a:t>as</a:t>
+            </a:r>
+            <a:r>
+              <a:rPr lang="pl-PL" dirty="0">
+                <a:solidFill>
+                  <a:srgbClr val="D4D4D4"/>
+                </a:solidFill>
+                <a:latin typeface="Consolas" panose="020B0609020204030204" pitchFamily="49" charset="0"/>
+              </a:rPr>
+              <a:t> </a:t>
+            </a:r>
+            <a:r>
+              <a:rPr lang="pl-PL" dirty="0">
+                <a:solidFill>
+                  <a:srgbClr val="9CDCFE"/>
+                </a:solidFill>
+                <a:latin typeface="Consolas" panose="020B0609020204030204" pitchFamily="49" charset="0"/>
+              </a:rPr>
+              <a:t>Router</a:t>
+            </a:r>
+            <a:r>
+              <a:rPr lang="pl-PL" dirty="0">
+                <a:solidFill>
+                  <a:srgbClr val="D4D4D4"/>
+                </a:solidFill>
+                <a:latin typeface="Consolas" panose="020B0609020204030204" pitchFamily="49" charset="0"/>
+              </a:rPr>
+              <a:t>, </a:t>
+            </a:r>
+            <a:r>
+              <a:rPr lang="pl-PL" dirty="0">
+                <a:solidFill>
+                  <a:srgbClr val="9CDCFE"/>
+                </a:solidFill>
+                <a:latin typeface="Consolas" panose="020B0609020204030204" pitchFamily="49" charset="0"/>
+              </a:rPr>
+              <a:t>Switch</a:t>
+            </a:r>
+            <a:r>
+              <a:rPr lang="pl-PL" dirty="0">
+                <a:solidFill>
+                  <a:srgbClr val="D4D4D4"/>
+                </a:solidFill>
+                <a:latin typeface="Consolas" panose="020B0609020204030204" pitchFamily="49" charset="0"/>
+              </a:rPr>
+              <a:t>, </a:t>
+            </a:r>
+            <a:r>
+              <a:rPr lang="pl-PL" dirty="0" err="1">
+                <a:solidFill>
+                  <a:srgbClr val="9CDCFE"/>
+                </a:solidFill>
+                <a:latin typeface="Consolas" panose="020B0609020204030204" pitchFamily="49" charset="0"/>
+              </a:rPr>
+              <a:t>Route</a:t>
+            </a:r>
+            <a:r>
+              <a:rPr lang="pl-PL" dirty="0">
+                <a:solidFill>
+                  <a:srgbClr val="D4D4D4"/>
+                </a:solidFill>
+                <a:latin typeface="Consolas" panose="020B0609020204030204" pitchFamily="49" charset="0"/>
+              </a:rPr>
+              <a:t> } </a:t>
+            </a:r>
+            <a:r>
+              <a:rPr lang="pl-PL" dirty="0">
+                <a:solidFill>
+                  <a:srgbClr val="C586C0"/>
+                </a:solidFill>
+                <a:latin typeface="Consolas" panose="020B0609020204030204" pitchFamily="49" charset="0"/>
+              </a:rPr>
+              <a:t>from</a:t>
+            </a:r>
+            <a:r>
+              <a:rPr lang="pl-PL" dirty="0">
+                <a:solidFill>
+                  <a:srgbClr val="D4D4D4"/>
+                </a:solidFill>
+                <a:latin typeface="Consolas" panose="020B0609020204030204" pitchFamily="49" charset="0"/>
+              </a:rPr>
+              <a:t> </a:t>
+            </a:r>
+            <a:r>
+              <a:rPr lang="pl-PL" dirty="0">
+                <a:solidFill>
+                  <a:srgbClr val="CE9178"/>
+                </a:solidFill>
+                <a:latin typeface="Consolas" panose="020B0609020204030204" pitchFamily="49" charset="0"/>
+              </a:rPr>
+              <a:t>"</a:t>
+            </a:r>
+            <a:r>
+              <a:rPr lang="pl-PL" dirty="0" err="1">
+                <a:solidFill>
+                  <a:srgbClr val="CE9178"/>
+                </a:solidFill>
+                <a:latin typeface="Consolas" panose="020B0609020204030204" pitchFamily="49" charset="0"/>
+              </a:rPr>
+              <a:t>react</a:t>
+            </a:r>
+            <a:r>
+              <a:rPr lang="pl-PL" dirty="0">
+                <a:solidFill>
+                  <a:srgbClr val="CE9178"/>
+                </a:solidFill>
+                <a:latin typeface="Consolas" panose="020B0609020204030204" pitchFamily="49" charset="0"/>
+              </a:rPr>
+              <a:t>-router-dom"</a:t>
+            </a:r>
+            <a:r>
+              <a:rPr lang="pl-PL" dirty="0">
+                <a:solidFill>
+                  <a:srgbClr val="D4D4D4"/>
+                </a:solidFill>
+                <a:latin typeface="Consolas" panose="020B0609020204030204" pitchFamily="49" charset="0"/>
+              </a:rPr>
+              <a:t>;</a:t>
+            </a:r>
+          </a:p>
+        </p:txBody>
+      </p:sp>
+      <p:sp>
+        <p:nvSpPr>
+          <p:cNvPr id="15" name="Prostokąt 14">
+            <a:extLst>
+              <a:ext uri="{FF2B5EF4-FFF2-40B4-BE49-F238E27FC236}">
+                <a16:creationId xmlns:a16="http://schemas.microsoft.com/office/drawing/2014/main" id="{5873742F-2BEF-4025-89FF-639417B1ED1F}"/>
+              </a:ext>
+            </a:extLst>
+          </p:cNvPr>
+          <p:cNvSpPr/>
+          <p:nvPr/>
+        </p:nvSpPr>
+        <p:spPr>
+          <a:xfrm>
+            <a:off x="1232452" y="2611687"/>
+            <a:ext cx="9727096" cy="2031325"/>
+          </a:xfrm>
+          <a:prstGeom prst="rect">
+            <a:avLst/>
+          </a:prstGeom>
+          <a:solidFill>
+            <a:schemeClr val="tx1"/>
+          </a:solidFill>
+        </p:spPr>
+        <p:txBody>
+          <a:bodyPr wrap="square">
+            <a:spAutoFit/>
+          </a:bodyPr>
+          <a:lstStyle/>
+          <a:p>
+            <a:r>
+              <a:rPr lang="en-US" dirty="0">
+                <a:solidFill>
+                  <a:srgbClr val="D4D4D4"/>
+                </a:solidFill>
+                <a:latin typeface="Consolas" panose="020B0609020204030204" pitchFamily="49" charset="0"/>
+              </a:rPr>
+              <a:t>        </a:t>
+            </a:r>
+            <a:r>
+              <a:rPr lang="en-US" dirty="0">
+                <a:solidFill>
+                  <a:srgbClr val="808080"/>
+                </a:solidFill>
+                <a:latin typeface="Consolas" panose="020B0609020204030204" pitchFamily="49" charset="0"/>
+              </a:rPr>
+              <a:t>&lt;</a:t>
+            </a:r>
+            <a:r>
+              <a:rPr lang="en-US" dirty="0">
+                <a:solidFill>
+                  <a:srgbClr val="4EC9B0"/>
+                </a:solidFill>
+                <a:latin typeface="Consolas" panose="020B0609020204030204" pitchFamily="49" charset="0"/>
+              </a:rPr>
+              <a:t>Router</a:t>
+            </a:r>
+            <a:r>
+              <a:rPr lang="en-US" dirty="0">
+                <a:solidFill>
+                  <a:srgbClr val="808080"/>
+                </a:solidFill>
+                <a:latin typeface="Consolas" panose="020B0609020204030204" pitchFamily="49" charset="0"/>
+              </a:rPr>
+              <a:t>&gt;</a:t>
+            </a:r>
+            <a:endParaRPr lang="en-US" dirty="0">
+              <a:solidFill>
+                <a:srgbClr val="D4D4D4"/>
+              </a:solidFill>
+              <a:latin typeface="Consolas" panose="020B0609020204030204" pitchFamily="49" charset="0"/>
+            </a:endParaRPr>
+          </a:p>
+          <a:p>
+            <a:r>
+              <a:rPr lang="en-US" dirty="0">
+                <a:solidFill>
+                  <a:srgbClr val="D4D4D4"/>
+                </a:solidFill>
+                <a:latin typeface="Consolas" panose="020B0609020204030204" pitchFamily="49" charset="0"/>
+              </a:rPr>
+              <a:t>          </a:t>
+            </a:r>
+            <a:r>
+              <a:rPr lang="en-US" dirty="0">
+                <a:solidFill>
+                  <a:srgbClr val="808080"/>
+                </a:solidFill>
+                <a:latin typeface="Consolas" panose="020B0609020204030204" pitchFamily="49" charset="0"/>
+              </a:rPr>
+              <a:t>&lt;</a:t>
+            </a:r>
+            <a:r>
+              <a:rPr lang="en-US" dirty="0">
+                <a:solidFill>
+                  <a:srgbClr val="4EC9B0"/>
+                </a:solidFill>
+                <a:latin typeface="Consolas" panose="020B0609020204030204" pitchFamily="49" charset="0"/>
+              </a:rPr>
+              <a:t>Switch</a:t>
+            </a:r>
+            <a:r>
+              <a:rPr lang="en-US" dirty="0">
+                <a:solidFill>
+                  <a:srgbClr val="808080"/>
+                </a:solidFill>
+                <a:latin typeface="Consolas" panose="020B0609020204030204" pitchFamily="49" charset="0"/>
+              </a:rPr>
+              <a:t>&gt;</a:t>
+            </a:r>
+            <a:endParaRPr lang="en-US" dirty="0">
+              <a:solidFill>
+                <a:srgbClr val="D4D4D4"/>
+              </a:solidFill>
+              <a:latin typeface="Consolas" panose="020B0609020204030204" pitchFamily="49" charset="0"/>
+            </a:endParaRPr>
+          </a:p>
+          <a:p>
+            <a:r>
+              <a:rPr lang="en-US" dirty="0">
+                <a:solidFill>
+                  <a:srgbClr val="D4D4D4"/>
+                </a:solidFill>
+                <a:latin typeface="Consolas" panose="020B0609020204030204" pitchFamily="49" charset="0"/>
+              </a:rPr>
+              <a:t>            </a:t>
+            </a:r>
+            <a:r>
+              <a:rPr lang="en-US" dirty="0">
+                <a:solidFill>
+                  <a:srgbClr val="808080"/>
+                </a:solidFill>
+                <a:latin typeface="Consolas" panose="020B0609020204030204" pitchFamily="49" charset="0"/>
+              </a:rPr>
+              <a:t>&lt;</a:t>
+            </a:r>
+            <a:r>
+              <a:rPr lang="en-US" dirty="0">
+                <a:solidFill>
+                  <a:srgbClr val="4EC9B0"/>
+                </a:solidFill>
+                <a:latin typeface="Consolas" panose="020B0609020204030204" pitchFamily="49" charset="0"/>
+              </a:rPr>
+              <a:t>Route</a:t>
+            </a:r>
+            <a:r>
+              <a:rPr lang="en-US" dirty="0">
+                <a:solidFill>
+                  <a:srgbClr val="D4D4D4"/>
+                </a:solidFill>
+                <a:latin typeface="Consolas" panose="020B0609020204030204" pitchFamily="49" charset="0"/>
+              </a:rPr>
+              <a:t> </a:t>
+            </a:r>
+            <a:r>
+              <a:rPr lang="en-US" dirty="0">
+                <a:solidFill>
+                  <a:srgbClr val="9CDCFE"/>
+                </a:solidFill>
+                <a:latin typeface="Consolas" panose="020B0609020204030204" pitchFamily="49" charset="0"/>
+              </a:rPr>
+              <a:t>path</a:t>
+            </a:r>
+            <a:r>
+              <a:rPr lang="en-US" dirty="0">
+                <a:solidFill>
+                  <a:srgbClr val="D4D4D4"/>
+                </a:solidFill>
+                <a:latin typeface="Consolas" panose="020B0609020204030204" pitchFamily="49" charset="0"/>
+              </a:rPr>
+              <a:t>=</a:t>
+            </a:r>
+            <a:r>
+              <a:rPr lang="en-US" dirty="0">
+                <a:solidFill>
+                  <a:srgbClr val="CE9178"/>
+                </a:solidFill>
+                <a:latin typeface="Consolas" panose="020B0609020204030204" pitchFamily="49" charset="0"/>
+              </a:rPr>
+              <a:t>"/help"</a:t>
+            </a:r>
+            <a:r>
+              <a:rPr lang="en-US" dirty="0">
+                <a:solidFill>
+                  <a:srgbClr val="808080"/>
+                </a:solidFill>
+                <a:latin typeface="Consolas" panose="020B0609020204030204" pitchFamily="49" charset="0"/>
+              </a:rPr>
+              <a:t>&gt;&lt;</a:t>
+            </a:r>
+            <a:r>
+              <a:rPr lang="en-US" dirty="0">
+                <a:solidFill>
+                  <a:srgbClr val="4EC9B0"/>
+                </a:solidFill>
+                <a:latin typeface="Consolas" panose="020B0609020204030204" pitchFamily="49" charset="0"/>
+              </a:rPr>
+              <a:t>Help</a:t>
+            </a:r>
+            <a:r>
+              <a:rPr lang="en-US" dirty="0">
+                <a:solidFill>
+                  <a:srgbClr val="D4D4D4"/>
+                </a:solidFill>
+                <a:latin typeface="Consolas" panose="020B0609020204030204" pitchFamily="49" charset="0"/>
+              </a:rPr>
+              <a:t> </a:t>
+            </a:r>
+            <a:r>
+              <a:rPr lang="en-US" dirty="0">
+                <a:solidFill>
+                  <a:srgbClr val="808080"/>
+                </a:solidFill>
+                <a:latin typeface="Consolas" panose="020B0609020204030204" pitchFamily="49" charset="0"/>
+              </a:rPr>
+              <a:t>/&gt;&lt;/</a:t>
+            </a:r>
+            <a:r>
+              <a:rPr lang="en-US" dirty="0">
+                <a:solidFill>
+                  <a:srgbClr val="4EC9B0"/>
+                </a:solidFill>
+                <a:latin typeface="Consolas" panose="020B0609020204030204" pitchFamily="49" charset="0"/>
+              </a:rPr>
+              <a:t>Route</a:t>
+            </a:r>
+            <a:r>
+              <a:rPr lang="en-US" dirty="0">
+                <a:solidFill>
+                  <a:srgbClr val="808080"/>
+                </a:solidFill>
+                <a:latin typeface="Consolas" panose="020B0609020204030204" pitchFamily="49" charset="0"/>
+              </a:rPr>
+              <a:t>&gt;</a:t>
+            </a:r>
+            <a:endParaRPr lang="en-US" dirty="0">
+              <a:solidFill>
+                <a:srgbClr val="D4D4D4"/>
+              </a:solidFill>
+              <a:latin typeface="Consolas" panose="020B0609020204030204" pitchFamily="49" charset="0"/>
+            </a:endParaRPr>
+          </a:p>
+          <a:p>
+            <a:r>
+              <a:rPr lang="en-US" dirty="0">
+                <a:solidFill>
+                  <a:srgbClr val="D4D4D4"/>
+                </a:solidFill>
+                <a:latin typeface="Consolas" panose="020B0609020204030204" pitchFamily="49" charset="0"/>
+              </a:rPr>
+              <a:t>            </a:t>
+            </a:r>
+            <a:r>
+              <a:rPr lang="en-US" dirty="0">
+                <a:solidFill>
+                  <a:srgbClr val="808080"/>
+                </a:solidFill>
+                <a:latin typeface="Consolas" panose="020B0609020204030204" pitchFamily="49" charset="0"/>
+              </a:rPr>
+              <a:t>&lt;</a:t>
+            </a:r>
+            <a:r>
+              <a:rPr lang="en-US" dirty="0">
+                <a:solidFill>
+                  <a:srgbClr val="4EC9B0"/>
+                </a:solidFill>
+                <a:latin typeface="Consolas" panose="020B0609020204030204" pitchFamily="49" charset="0"/>
+              </a:rPr>
+              <a:t>Route</a:t>
+            </a:r>
+            <a:r>
+              <a:rPr lang="en-US" dirty="0">
+                <a:solidFill>
+                  <a:srgbClr val="D4D4D4"/>
+                </a:solidFill>
+                <a:latin typeface="Consolas" panose="020B0609020204030204" pitchFamily="49" charset="0"/>
+              </a:rPr>
+              <a:t> </a:t>
+            </a:r>
+            <a:r>
+              <a:rPr lang="en-US" dirty="0">
+                <a:solidFill>
+                  <a:srgbClr val="9CDCFE"/>
+                </a:solidFill>
+                <a:latin typeface="Consolas" panose="020B0609020204030204" pitchFamily="49" charset="0"/>
+              </a:rPr>
+              <a:t>path</a:t>
+            </a:r>
+            <a:r>
+              <a:rPr lang="en-US" dirty="0">
+                <a:solidFill>
+                  <a:srgbClr val="D4D4D4"/>
+                </a:solidFill>
+                <a:latin typeface="Consolas" panose="020B0609020204030204" pitchFamily="49" charset="0"/>
+              </a:rPr>
+              <a:t>=</a:t>
+            </a:r>
+            <a:r>
+              <a:rPr lang="en-US" dirty="0">
+                <a:solidFill>
+                  <a:srgbClr val="CE9178"/>
+                </a:solidFill>
+                <a:latin typeface="Consolas" panose="020B0609020204030204" pitchFamily="49" charset="0"/>
+              </a:rPr>
+              <a:t>"/list"</a:t>
+            </a:r>
+            <a:r>
+              <a:rPr lang="en-US" dirty="0">
+                <a:solidFill>
+                  <a:srgbClr val="808080"/>
+                </a:solidFill>
+                <a:latin typeface="Consolas" panose="020B0609020204030204" pitchFamily="49" charset="0"/>
+              </a:rPr>
+              <a:t>&gt;&lt;</a:t>
+            </a:r>
+            <a:r>
+              <a:rPr lang="en-US" dirty="0">
+                <a:solidFill>
+                  <a:srgbClr val="4EC9B0"/>
+                </a:solidFill>
+                <a:latin typeface="Consolas" panose="020B0609020204030204" pitchFamily="49" charset="0"/>
+              </a:rPr>
+              <a:t>List</a:t>
+            </a:r>
+            <a:r>
+              <a:rPr lang="en-US" dirty="0">
+                <a:solidFill>
+                  <a:srgbClr val="D4D4D4"/>
+                </a:solidFill>
+                <a:latin typeface="Consolas" panose="020B0609020204030204" pitchFamily="49" charset="0"/>
+              </a:rPr>
+              <a:t> </a:t>
+            </a:r>
+            <a:r>
+              <a:rPr lang="en-US" dirty="0">
+                <a:solidFill>
+                  <a:srgbClr val="808080"/>
+                </a:solidFill>
+                <a:latin typeface="Consolas" panose="020B0609020204030204" pitchFamily="49" charset="0"/>
+              </a:rPr>
+              <a:t>/&gt;&lt;/</a:t>
+            </a:r>
+            <a:r>
+              <a:rPr lang="en-US" dirty="0">
+                <a:solidFill>
+                  <a:srgbClr val="4EC9B0"/>
+                </a:solidFill>
+                <a:latin typeface="Consolas" panose="020B0609020204030204" pitchFamily="49" charset="0"/>
+              </a:rPr>
+              <a:t>Route</a:t>
+            </a:r>
+            <a:r>
+              <a:rPr lang="en-US" dirty="0">
+                <a:solidFill>
+                  <a:srgbClr val="808080"/>
+                </a:solidFill>
+                <a:latin typeface="Consolas" panose="020B0609020204030204" pitchFamily="49" charset="0"/>
+              </a:rPr>
+              <a:t>&gt;</a:t>
+            </a:r>
+            <a:endParaRPr lang="en-US" dirty="0">
+              <a:solidFill>
+                <a:srgbClr val="D4D4D4"/>
+              </a:solidFill>
+              <a:latin typeface="Consolas" panose="020B0609020204030204" pitchFamily="49" charset="0"/>
+            </a:endParaRPr>
+          </a:p>
+          <a:p>
+            <a:r>
+              <a:rPr lang="en-US" dirty="0">
+                <a:solidFill>
+                  <a:srgbClr val="D4D4D4"/>
+                </a:solidFill>
+                <a:latin typeface="Consolas" panose="020B0609020204030204" pitchFamily="49" charset="0"/>
+              </a:rPr>
+              <a:t>            </a:t>
+            </a:r>
+            <a:r>
+              <a:rPr lang="en-US" dirty="0">
+                <a:solidFill>
+                  <a:srgbClr val="808080"/>
+                </a:solidFill>
+                <a:latin typeface="Consolas" panose="020B0609020204030204" pitchFamily="49" charset="0"/>
+              </a:rPr>
+              <a:t>&lt;</a:t>
+            </a:r>
+            <a:r>
+              <a:rPr lang="en-US" dirty="0">
+                <a:solidFill>
+                  <a:srgbClr val="4EC9B0"/>
+                </a:solidFill>
+                <a:latin typeface="Consolas" panose="020B0609020204030204" pitchFamily="49" charset="0"/>
+              </a:rPr>
+              <a:t>Route</a:t>
+            </a:r>
+            <a:r>
+              <a:rPr lang="en-US" dirty="0">
+                <a:solidFill>
+                  <a:srgbClr val="D4D4D4"/>
+                </a:solidFill>
+                <a:latin typeface="Consolas" panose="020B0609020204030204" pitchFamily="49" charset="0"/>
+              </a:rPr>
+              <a:t> </a:t>
+            </a:r>
+            <a:r>
+              <a:rPr lang="en-US" dirty="0">
+                <a:solidFill>
+                  <a:srgbClr val="9CDCFE"/>
+                </a:solidFill>
+                <a:latin typeface="Consolas" panose="020B0609020204030204" pitchFamily="49" charset="0"/>
+              </a:rPr>
+              <a:t>path</a:t>
+            </a:r>
+            <a:r>
+              <a:rPr lang="en-US" dirty="0">
+                <a:solidFill>
+                  <a:srgbClr val="D4D4D4"/>
+                </a:solidFill>
+                <a:latin typeface="Consolas" panose="020B0609020204030204" pitchFamily="49" charset="0"/>
+              </a:rPr>
+              <a:t>=</a:t>
+            </a:r>
+            <a:r>
+              <a:rPr lang="en-US" dirty="0">
+                <a:solidFill>
+                  <a:srgbClr val="CE9178"/>
+                </a:solidFill>
+                <a:latin typeface="Consolas" panose="020B0609020204030204" pitchFamily="49" charset="0"/>
+              </a:rPr>
+              <a:t>"/"</a:t>
+            </a:r>
+            <a:r>
+              <a:rPr lang="en-US" dirty="0">
+                <a:solidFill>
+                  <a:srgbClr val="808080"/>
+                </a:solidFill>
+                <a:latin typeface="Consolas" panose="020B0609020204030204" pitchFamily="49" charset="0"/>
+              </a:rPr>
+              <a:t>&gt;&lt;</a:t>
+            </a:r>
+            <a:r>
+              <a:rPr lang="en-US" dirty="0">
+                <a:solidFill>
+                  <a:srgbClr val="4EC9B0"/>
+                </a:solidFill>
+                <a:latin typeface="Consolas" panose="020B0609020204030204" pitchFamily="49" charset="0"/>
+              </a:rPr>
+              <a:t>Home</a:t>
+            </a:r>
+            <a:r>
+              <a:rPr lang="en-US" dirty="0">
+                <a:solidFill>
+                  <a:srgbClr val="D4D4D4"/>
+                </a:solidFill>
+                <a:latin typeface="Consolas" panose="020B0609020204030204" pitchFamily="49" charset="0"/>
+              </a:rPr>
+              <a:t> </a:t>
+            </a:r>
+            <a:r>
+              <a:rPr lang="en-US" dirty="0">
+                <a:solidFill>
+                  <a:srgbClr val="808080"/>
+                </a:solidFill>
+                <a:latin typeface="Consolas" panose="020B0609020204030204" pitchFamily="49" charset="0"/>
+              </a:rPr>
+              <a:t>/&gt;&lt;/</a:t>
+            </a:r>
+            <a:r>
+              <a:rPr lang="en-US" dirty="0">
+                <a:solidFill>
+                  <a:srgbClr val="4EC9B0"/>
+                </a:solidFill>
+                <a:latin typeface="Consolas" panose="020B0609020204030204" pitchFamily="49" charset="0"/>
+              </a:rPr>
+              <a:t>Route</a:t>
+            </a:r>
+            <a:r>
+              <a:rPr lang="en-US" dirty="0">
+                <a:solidFill>
+                  <a:srgbClr val="808080"/>
+                </a:solidFill>
+                <a:latin typeface="Consolas" panose="020B0609020204030204" pitchFamily="49" charset="0"/>
+              </a:rPr>
+              <a:t>&gt;</a:t>
+            </a:r>
+            <a:endParaRPr lang="en-US" dirty="0">
+              <a:solidFill>
+                <a:srgbClr val="D4D4D4"/>
+              </a:solidFill>
+              <a:latin typeface="Consolas" panose="020B0609020204030204" pitchFamily="49" charset="0"/>
+            </a:endParaRPr>
+          </a:p>
+          <a:p>
+            <a:r>
+              <a:rPr lang="en-US" dirty="0">
+                <a:solidFill>
+                  <a:srgbClr val="D4D4D4"/>
+                </a:solidFill>
+                <a:latin typeface="Consolas" panose="020B0609020204030204" pitchFamily="49" charset="0"/>
+              </a:rPr>
+              <a:t>          </a:t>
+            </a:r>
+            <a:r>
+              <a:rPr lang="en-US" dirty="0">
+                <a:solidFill>
+                  <a:srgbClr val="808080"/>
+                </a:solidFill>
+                <a:latin typeface="Consolas" panose="020B0609020204030204" pitchFamily="49" charset="0"/>
+              </a:rPr>
+              <a:t>&lt;/</a:t>
+            </a:r>
+            <a:r>
+              <a:rPr lang="en-US" dirty="0">
+                <a:solidFill>
+                  <a:srgbClr val="4EC9B0"/>
+                </a:solidFill>
+                <a:latin typeface="Consolas" panose="020B0609020204030204" pitchFamily="49" charset="0"/>
+              </a:rPr>
+              <a:t>Switch</a:t>
+            </a:r>
+            <a:r>
+              <a:rPr lang="en-US" dirty="0">
+                <a:solidFill>
+                  <a:srgbClr val="808080"/>
+                </a:solidFill>
+                <a:latin typeface="Consolas" panose="020B0609020204030204" pitchFamily="49" charset="0"/>
+              </a:rPr>
+              <a:t>&gt;</a:t>
+            </a:r>
+            <a:endParaRPr lang="en-US" dirty="0">
+              <a:solidFill>
+                <a:srgbClr val="D4D4D4"/>
+              </a:solidFill>
+              <a:latin typeface="Consolas" panose="020B0609020204030204" pitchFamily="49" charset="0"/>
+            </a:endParaRPr>
+          </a:p>
+          <a:p>
+            <a:r>
+              <a:rPr lang="en-US" dirty="0">
+                <a:solidFill>
+                  <a:srgbClr val="D4D4D4"/>
+                </a:solidFill>
+                <a:latin typeface="Consolas" panose="020B0609020204030204" pitchFamily="49" charset="0"/>
+              </a:rPr>
+              <a:t>        </a:t>
+            </a:r>
+            <a:r>
+              <a:rPr lang="en-US" dirty="0">
+                <a:solidFill>
+                  <a:srgbClr val="808080"/>
+                </a:solidFill>
+                <a:latin typeface="Consolas" panose="020B0609020204030204" pitchFamily="49" charset="0"/>
+              </a:rPr>
+              <a:t>&lt;/</a:t>
+            </a:r>
+            <a:r>
+              <a:rPr lang="en-US" dirty="0">
+                <a:solidFill>
+                  <a:srgbClr val="4EC9B0"/>
+                </a:solidFill>
+                <a:latin typeface="Consolas" panose="020B0609020204030204" pitchFamily="49" charset="0"/>
+              </a:rPr>
+              <a:t>Router</a:t>
+            </a:r>
+            <a:r>
+              <a:rPr lang="en-US" dirty="0">
+                <a:solidFill>
+                  <a:srgbClr val="808080"/>
+                </a:solidFill>
+                <a:latin typeface="Consolas" panose="020B0609020204030204" pitchFamily="49" charset="0"/>
+              </a:rPr>
+              <a:t>&gt;</a:t>
+            </a:r>
+            <a:endParaRPr lang="en-US" b="0" dirty="0">
+              <a:solidFill>
+                <a:srgbClr val="D4D4D4"/>
+              </a:solidFill>
+              <a:effectLst/>
+              <a:latin typeface="Consolas" panose="020B0609020204030204" pitchFamily="49" charset="0"/>
+            </a:endParaRPr>
+          </a:p>
+        </p:txBody>
+      </p:sp>
+      <p:sp>
+        <p:nvSpPr>
+          <p:cNvPr id="16" name="Prostokąt 15">
+            <a:extLst>
+              <a:ext uri="{FF2B5EF4-FFF2-40B4-BE49-F238E27FC236}">
+                <a16:creationId xmlns:a16="http://schemas.microsoft.com/office/drawing/2014/main" id="{3EAFEC5C-A72B-4827-A223-EAD343334574}"/>
+              </a:ext>
+            </a:extLst>
+          </p:cNvPr>
+          <p:cNvSpPr/>
+          <p:nvPr/>
+        </p:nvSpPr>
+        <p:spPr>
+          <a:xfrm>
+            <a:off x="1232450" y="5303857"/>
+            <a:ext cx="9727097" cy="369332"/>
+          </a:xfrm>
+          <a:prstGeom prst="rect">
+            <a:avLst/>
+          </a:prstGeom>
+          <a:solidFill>
+            <a:schemeClr val="tx1"/>
+          </a:solidFill>
+        </p:spPr>
+        <p:txBody>
+          <a:bodyPr wrap="square">
+            <a:spAutoFit/>
+          </a:bodyPr>
+          <a:lstStyle/>
+          <a:p>
+            <a:r>
+              <a:rPr lang="en-US" dirty="0">
+                <a:solidFill>
+                  <a:srgbClr val="808080"/>
+                </a:solidFill>
+                <a:latin typeface="Consolas" panose="020B0609020204030204" pitchFamily="49" charset="0"/>
+              </a:rPr>
+              <a:t>&lt;</a:t>
+            </a:r>
+            <a:r>
+              <a:rPr lang="en-US" dirty="0">
+                <a:solidFill>
+                  <a:srgbClr val="4EC9B0"/>
+                </a:solidFill>
+                <a:latin typeface="Consolas" panose="020B0609020204030204" pitchFamily="49" charset="0"/>
+              </a:rPr>
+              <a:t>Link</a:t>
+            </a:r>
+            <a:r>
+              <a:rPr lang="en-US" dirty="0">
+                <a:solidFill>
+                  <a:srgbClr val="D4D4D4"/>
+                </a:solidFill>
+                <a:latin typeface="Consolas" panose="020B0609020204030204" pitchFamily="49" charset="0"/>
+              </a:rPr>
+              <a:t> </a:t>
+            </a:r>
+            <a:r>
+              <a:rPr lang="en-US" dirty="0" err="1">
+                <a:solidFill>
+                  <a:srgbClr val="9CDCFE"/>
+                </a:solidFill>
+                <a:latin typeface="Consolas" panose="020B0609020204030204" pitchFamily="49" charset="0"/>
+              </a:rPr>
+              <a:t>className</a:t>
+            </a:r>
+            <a:r>
+              <a:rPr lang="en-US" dirty="0">
+                <a:solidFill>
+                  <a:srgbClr val="D4D4D4"/>
+                </a:solidFill>
+                <a:latin typeface="Consolas" panose="020B0609020204030204" pitchFamily="49" charset="0"/>
+              </a:rPr>
+              <a:t>=</a:t>
+            </a:r>
+            <a:r>
+              <a:rPr lang="en-US" dirty="0">
+                <a:solidFill>
+                  <a:srgbClr val="CE9178"/>
+                </a:solidFill>
+                <a:latin typeface="Consolas" panose="020B0609020204030204" pitchFamily="49" charset="0"/>
+              </a:rPr>
+              <a:t>"nav-link"</a:t>
+            </a:r>
+            <a:r>
+              <a:rPr lang="en-US" dirty="0">
+                <a:solidFill>
+                  <a:srgbClr val="D4D4D4"/>
+                </a:solidFill>
+                <a:latin typeface="Consolas" panose="020B0609020204030204" pitchFamily="49" charset="0"/>
+              </a:rPr>
+              <a:t> </a:t>
+            </a:r>
+            <a:r>
+              <a:rPr lang="en-US" dirty="0">
+                <a:solidFill>
+                  <a:srgbClr val="9CDCFE"/>
+                </a:solidFill>
+                <a:latin typeface="Consolas" panose="020B0609020204030204" pitchFamily="49" charset="0"/>
+              </a:rPr>
+              <a:t>to</a:t>
+            </a:r>
+            <a:r>
+              <a:rPr lang="en-US" dirty="0">
+                <a:solidFill>
+                  <a:srgbClr val="D4D4D4"/>
+                </a:solidFill>
+                <a:latin typeface="Consolas" panose="020B0609020204030204" pitchFamily="49" charset="0"/>
+              </a:rPr>
+              <a:t>=</a:t>
+            </a:r>
+            <a:r>
+              <a:rPr lang="en-US" dirty="0">
+                <a:solidFill>
+                  <a:srgbClr val="CE9178"/>
+                </a:solidFill>
+                <a:latin typeface="Consolas" panose="020B0609020204030204" pitchFamily="49" charset="0"/>
+              </a:rPr>
+              <a:t>"/list"</a:t>
+            </a:r>
+            <a:r>
+              <a:rPr lang="en-US" dirty="0">
+                <a:solidFill>
+                  <a:srgbClr val="808080"/>
+                </a:solidFill>
+                <a:latin typeface="Consolas" panose="020B0609020204030204" pitchFamily="49" charset="0"/>
+              </a:rPr>
+              <a:t>&gt;</a:t>
+            </a:r>
+            <a:r>
+              <a:rPr lang="en-US" dirty="0">
+                <a:solidFill>
+                  <a:srgbClr val="D4D4D4"/>
+                </a:solidFill>
+                <a:latin typeface="Consolas" panose="020B0609020204030204" pitchFamily="49" charset="0"/>
+              </a:rPr>
+              <a:t>List</a:t>
+            </a:r>
+            <a:r>
+              <a:rPr lang="en-US" dirty="0">
+                <a:solidFill>
+                  <a:srgbClr val="808080"/>
+                </a:solidFill>
+                <a:latin typeface="Consolas" panose="020B0609020204030204" pitchFamily="49" charset="0"/>
+              </a:rPr>
+              <a:t>&lt;/</a:t>
+            </a:r>
+            <a:r>
+              <a:rPr lang="en-US" dirty="0">
+                <a:solidFill>
+                  <a:srgbClr val="4EC9B0"/>
+                </a:solidFill>
+                <a:latin typeface="Consolas" panose="020B0609020204030204" pitchFamily="49" charset="0"/>
+              </a:rPr>
+              <a:t>Link</a:t>
+            </a:r>
+            <a:r>
+              <a:rPr lang="en-US" dirty="0">
+                <a:solidFill>
+                  <a:srgbClr val="808080"/>
+                </a:solidFill>
+                <a:latin typeface="Consolas" panose="020B0609020204030204" pitchFamily="49" charset="0"/>
+              </a:rPr>
+              <a:t>&gt;</a:t>
+            </a:r>
+            <a:endParaRPr lang="en-US" b="0" dirty="0">
+              <a:solidFill>
+                <a:srgbClr val="D4D4D4"/>
+              </a:solidFill>
+              <a:effectLst/>
+              <a:latin typeface="Consolas" panose="020B0609020204030204" pitchFamily="49" charset="0"/>
+            </a:endParaRPr>
+          </a:p>
+        </p:txBody>
+      </p:sp>
+    </p:spTree>
+    <p:extLst>
+      <p:ext uri="{BB962C8B-B14F-4D97-AF65-F5344CB8AC3E}">
+        <p14:creationId xmlns:p14="http://schemas.microsoft.com/office/powerpoint/2010/main" val="1804496569"/>
       </p:ext>
     </p:extLst>
   </p:cSld>

</xml_diff>

<commit_message>
Exercise 3: Move square to help
</commit_message>
<xml_diff>
--- a/tutorial/ReactjsTraining.pptx
+++ b/tutorial/ReactjsTraining.pptx
@@ -5,7 +5,7 @@
     <p:sldMasterId id="2147483648" r:id="rId1"/>
   </p:sldMasterIdLst>
   <p:notesMasterIdLst>
-    <p:notesMasterId r:id="rId11"/>
+    <p:notesMasterId r:id="rId12"/>
   </p:notesMasterIdLst>
   <p:sldIdLst>
     <p:sldId id="256" r:id="rId2"/>
@@ -17,6 +17,7 @@
     <p:sldId id="261" r:id="rId8"/>
     <p:sldId id="263" r:id="rId9"/>
     <p:sldId id="264" r:id="rId10"/>
+    <p:sldId id="265" r:id="rId11"/>
   </p:sldIdLst>
   <p:sldSz cx="12192000" cy="6858000"/>
   <p:notesSz cx="6858000" cy="9144000"/>
@@ -205,7 +206,7 @@
           <a:p>
             <a:fld id="{D61BAF21-C883-454C-A249-8697E6BEDB6B}" type="datetimeFigureOut">
               <a:rPr lang="pl-PL" smtClean="0"/>
-              <a:t>28.09.2019</a:t>
+              <a:t>29.09.2019</a:t>
             </a:fld>
             <a:endParaRPr lang="pl-PL"/>
           </a:p>
@@ -596,6 +597,134 @@
 </p:notes>
 </file>
 
+<file path=ppt/notesSlides/notesSlide10.xml><?xml version="1.0" encoding="utf-8"?>
+<p:notes xmlns:a="http://schemas.openxmlformats.org/drawingml/2006/main" xmlns:r="http://schemas.openxmlformats.org/officeDocument/2006/relationships" xmlns:p="http://schemas.openxmlformats.org/presentationml/2006/main">
+  <p:cSld>
+    <p:spTree>
+      <p:nvGrpSpPr>
+        <p:cNvPr id="1" name=""/>
+        <p:cNvGrpSpPr/>
+        <p:nvPr/>
+      </p:nvGrpSpPr>
+      <p:grpSpPr>
+        <a:xfrm>
+          <a:off x="0" y="0"/>
+          <a:ext cx="0" cy="0"/>
+          <a:chOff x="0" y="0"/>
+          <a:chExt cx="0" cy="0"/>
+        </a:xfrm>
+      </p:grpSpPr>
+      <p:sp>
+        <p:nvSpPr>
+          <p:cNvPr id="2" name="Symbol zastępczy obrazu slajdu 1"/>
+          <p:cNvSpPr>
+            <a:spLocks noGrp="1" noRot="1" noChangeAspect="1"/>
+          </p:cNvSpPr>
+          <p:nvPr>
+            <p:ph type="sldImg"/>
+          </p:nvPr>
+        </p:nvSpPr>
+        <p:spPr/>
+      </p:sp>
+      <p:sp>
+        <p:nvSpPr>
+          <p:cNvPr id="3" name="Symbol zastępczy notatek 2"/>
+          <p:cNvSpPr>
+            <a:spLocks noGrp="1"/>
+          </p:cNvSpPr>
+          <p:nvPr>
+            <p:ph type="body" idx="1"/>
+          </p:nvPr>
+        </p:nvSpPr>
+        <p:spPr/>
+        <p:txBody>
+          <a:bodyPr/>
+          <a:lstStyle/>
+          <a:p>
+            <a:pPr marL="0" indent="0">
+              <a:buFontTx/>
+              <a:buNone/>
+            </a:pPr>
+            <a:r>
+              <a:rPr lang="pl-PL" dirty="0"/>
+              <a:t>Wcześniej </a:t>
+            </a:r>
+            <a:r>
+              <a:rPr lang="pl-PL" dirty="0" err="1"/>
+              <a:t>nauczylśmy</a:t>
+            </a:r>
+            <a:r>
+              <a:rPr lang="pl-PL" dirty="0"/>
+              <a:t> się by </a:t>
+            </a:r>
+            <a:r>
+              <a:rPr lang="pl-PL" dirty="0" err="1"/>
+              <a:t>przerenderować</a:t>
+            </a:r>
+            <a:r>
+              <a:rPr lang="pl-PL" dirty="0"/>
+              <a:t> aplikację wykonujemy </a:t>
+            </a:r>
+            <a:r>
+              <a:rPr lang="pl-PL" dirty="0" err="1"/>
+              <a:t>ReactDOM.render</a:t>
+            </a:r>
+            <a:r>
+              <a:rPr lang="pl-PL" dirty="0"/>
+              <a:t>()</a:t>
+            </a:r>
+            <a:r>
+              <a:rPr lang="pl-PL" sz="1200" b="0" i="0" kern="1200" dirty="0">
+                <a:solidFill>
+                  <a:schemeClr val="tx1"/>
+                </a:solidFill>
+                <a:effectLst/>
+                <a:latin typeface="+mn-lt"/>
+                <a:ea typeface="+mn-ea"/>
+                <a:cs typeface="+mn-cs"/>
+              </a:rPr>
+              <a:t>:</a:t>
+            </a:r>
+            <a:endParaRPr lang="pl-PL" dirty="0"/>
+          </a:p>
+        </p:txBody>
+      </p:sp>
+      <p:sp>
+        <p:nvSpPr>
+          <p:cNvPr id="4" name="Symbol zastępczy numeru slajdu 3"/>
+          <p:cNvSpPr>
+            <a:spLocks noGrp="1"/>
+          </p:cNvSpPr>
+          <p:nvPr>
+            <p:ph type="sldNum" sz="quarter" idx="5"/>
+          </p:nvPr>
+        </p:nvSpPr>
+        <p:spPr/>
+        <p:txBody>
+          <a:bodyPr/>
+          <a:lstStyle/>
+          <a:p>
+            <a:fld id="{810A6612-7A23-4B98-B0E9-4F3C882AD2EF}" type="slidenum">
+              <a:rPr lang="pl-PL" smtClean="0"/>
+              <a:t>10</a:t>
+            </a:fld>
+            <a:endParaRPr lang="pl-PL"/>
+          </a:p>
+        </p:txBody>
+      </p:sp>
+    </p:spTree>
+    <p:extLst>
+      <p:ext uri="{BB962C8B-B14F-4D97-AF65-F5344CB8AC3E}">
+        <p14:creationId xmlns:p14="http://schemas.microsoft.com/office/powerpoint/2010/main" val="1121643834"/>
+      </p:ext>
+    </p:extLst>
+  </p:cSld>
+  <p:clrMapOvr>
+    <a:masterClrMapping/>
+  </p:clrMapOvr>
+</p:notes>
+</file>
+
 <file path=ppt/notesSlides/notesSlide2.xml><?xml version="1.0" encoding="utf-8"?>
 <p:notes xmlns:a="http://schemas.openxmlformats.org/drawingml/2006/main" xmlns:r="http://schemas.openxmlformats.org/officeDocument/2006/relationships" xmlns:p="http://schemas.openxmlformats.org/presentationml/2006/main">
   <p:cSld>
@@ -1821,10 +1950,9 @@
               <a:t>className</a:t>
             </a:r>
             <a:r>
-              <a:rPr lang="pl-PL"/>
+              <a:rPr lang="pl-PL" dirty="0"/>
               <a:t>)</a:t>
             </a:r>
-            <a:endParaRPr lang="pl-PL" dirty="0"/>
           </a:p>
         </p:txBody>
       </p:sp>
@@ -1930,7 +2058,11 @@
             </a:r>
             <a:r>
               <a:rPr lang="pl-PL" dirty="0"/>
-              <a:t> oraz obsłużyć to w routing</a:t>
+              <a:t> oraz obsłużyć to w routing. Kwadrat wynieść do </a:t>
+            </a:r>
+            <a:r>
+              <a:rPr lang="pl-PL" dirty="0" err="1"/>
+              <a:t>help</a:t>
             </a:r>
             <a:br>
               <a:rPr lang="pl-PL" dirty="0"/>
@@ -2137,7 +2269,7 @@
           <a:p>
             <a:fld id="{95CCC2EB-502C-49A7-9CC4-85002E026034}" type="datetimeFigureOut">
               <a:rPr lang="pl-PL" smtClean="0"/>
-              <a:t>28.09.2019</a:t>
+              <a:t>29.09.2019</a:t>
             </a:fld>
             <a:endParaRPr lang="pl-PL"/>
           </a:p>
@@ -2335,7 +2467,7 @@
           <a:p>
             <a:fld id="{95CCC2EB-502C-49A7-9CC4-85002E026034}" type="datetimeFigureOut">
               <a:rPr lang="pl-PL" smtClean="0"/>
-              <a:t>28.09.2019</a:t>
+              <a:t>29.09.2019</a:t>
             </a:fld>
             <a:endParaRPr lang="pl-PL"/>
           </a:p>
@@ -2543,7 +2675,7 @@
           <a:p>
             <a:fld id="{95CCC2EB-502C-49A7-9CC4-85002E026034}" type="datetimeFigureOut">
               <a:rPr lang="pl-PL" smtClean="0"/>
-              <a:t>28.09.2019</a:t>
+              <a:t>29.09.2019</a:t>
             </a:fld>
             <a:endParaRPr lang="pl-PL"/>
           </a:p>
@@ -2741,7 +2873,7 @@
           <a:p>
             <a:fld id="{95CCC2EB-502C-49A7-9CC4-85002E026034}" type="datetimeFigureOut">
               <a:rPr lang="pl-PL" smtClean="0"/>
-              <a:t>28.09.2019</a:t>
+              <a:t>29.09.2019</a:t>
             </a:fld>
             <a:endParaRPr lang="pl-PL"/>
           </a:p>
@@ -3016,7 +3148,7 @@
           <a:p>
             <a:fld id="{95CCC2EB-502C-49A7-9CC4-85002E026034}" type="datetimeFigureOut">
               <a:rPr lang="pl-PL" smtClean="0"/>
-              <a:t>28.09.2019</a:t>
+              <a:t>29.09.2019</a:t>
             </a:fld>
             <a:endParaRPr lang="pl-PL"/>
           </a:p>
@@ -3281,7 +3413,7 @@
           <a:p>
             <a:fld id="{95CCC2EB-502C-49A7-9CC4-85002E026034}" type="datetimeFigureOut">
               <a:rPr lang="pl-PL" smtClean="0"/>
-              <a:t>28.09.2019</a:t>
+              <a:t>29.09.2019</a:t>
             </a:fld>
             <a:endParaRPr lang="pl-PL"/>
           </a:p>
@@ -3693,7 +3825,7 @@
           <a:p>
             <a:fld id="{95CCC2EB-502C-49A7-9CC4-85002E026034}" type="datetimeFigureOut">
               <a:rPr lang="pl-PL" smtClean="0"/>
-              <a:t>28.09.2019</a:t>
+              <a:t>29.09.2019</a:t>
             </a:fld>
             <a:endParaRPr lang="pl-PL"/>
           </a:p>
@@ -3834,7 +3966,7 @@
           <a:p>
             <a:fld id="{95CCC2EB-502C-49A7-9CC4-85002E026034}" type="datetimeFigureOut">
               <a:rPr lang="pl-PL" smtClean="0"/>
-              <a:t>28.09.2019</a:t>
+              <a:t>29.09.2019</a:t>
             </a:fld>
             <a:endParaRPr lang="pl-PL"/>
           </a:p>
@@ -3947,7 +4079,7 @@
           <a:p>
             <a:fld id="{95CCC2EB-502C-49A7-9CC4-85002E026034}" type="datetimeFigureOut">
               <a:rPr lang="pl-PL" smtClean="0"/>
-              <a:t>28.09.2019</a:t>
+              <a:t>29.09.2019</a:t>
             </a:fld>
             <a:endParaRPr lang="pl-PL"/>
           </a:p>
@@ -4258,7 +4390,7 @@
           <a:p>
             <a:fld id="{95CCC2EB-502C-49A7-9CC4-85002E026034}" type="datetimeFigureOut">
               <a:rPr lang="pl-PL" smtClean="0"/>
-              <a:t>28.09.2019</a:t>
+              <a:t>29.09.2019</a:t>
             </a:fld>
             <a:endParaRPr lang="pl-PL"/>
           </a:p>
@@ -4546,7 +4678,7 @@
           <a:p>
             <a:fld id="{95CCC2EB-502C-49A7-9CC4-85002E026034}" type="datetimeFigureOut">
               <a:rPr lang="pl-PL" smtClean="0"/>
-              <a:t>28.09.2019</a:t>
+              <a:t>29.09.2019</a:t>
             </a:fld>
             <a:endParaRPr lang="pl-PL"/>
           </a:p>
@@ -4787,7 +4919,7 @@
           <a:p>
             <a:fld id="{95CCC2EB-502C-49A7-9CC4-85002E026034}" type="datetimeFigureOut">
               <a:rPr lang="pl-PL" smtClean="0"/>
-              <a:t>28.09.2019</a:t>
+              <a:t>29.09.2019</a:t>
             </a:fld>
             <a:endParaRPr lang="pl-PL"/>
           </a:p>
@@ -5352,6 +5484,80 @@
     <p:extLst>
       <p:ext uri="{BB962C8B-B14F-4D97-AF65-F5344CB8AC3E}">
         <p14:creationId xmlns:p14="http://schemas.microsoft.com/office/powerpoint/2010/main" val="3112060266"/>
+      </p:ext>
+    </p:extLst>
+  </p:cSld>
+  <p:clrMapOvr>
+    <a:masterClrMapping/>
+  </p:clrMapOvr>
+</p:sld>
+</file>
+
+<file path=ppt/slides/slide10.xml><?xml version="1.0" encoding="utf-8"?>
+<p:sld xmlns:a="http://schemas.openxmlformats.org/drawingml/2006/main" xmlns:r="http://schemas.openxmlformats.org/officeDocument/2006/relationships" xmlns:p="http://schemas.openxmlformats.org/presentationml/2006/main">
+  <p:cSld>
+    <p:spTree>
+      <p:nvGrpSpPr>
+        <p:cNvPr id="1" name=""/>
+        <p:cNvGrpSpPr/>
+        <p:nvPr/>
+      </p:nvGrpSpPr>
+      <p:grpSpPr>
+        <a:xfrm>
+          <a:off x="0" y="0"/>
+          <a:ext cx="0" cy="0"/>
+          <a:chOff x="0" y="0"/>
+          <a:chExt cx="0" cy="0"/>
+        </a:xfrm>
+      </p:grpSpPr>
+      <p:sp>
+        <p:nvSpPr>
+          <p:cNvPr id="4" name="pole tekstowe 3">
+            <a:extLst>
+              <a:ext uri="{FF2B5EF4-FFF2-40B4-BE49-F238E27FC236}">
+                <a16:creationId xmlns:a16="http://schemas.microsoft.com/office/drawing/2014/main" id="{F164A7B3-8808-414C-9401-3B25194E3B5A}"/>
+              </a:ext>
+            </a:extLst>
+          </p:cNvPr>
+          <p:cNvSpPr txBox="1"/>
+          <p:nvPr/>
+        </p:nvSpPr>
+        <p:spPr>
+          <a:xfrm>
+            <a:off x="497840" y="538480"/>
+            <a:ext cx="1218988" cy="369332"/>
+          </a:xfrm>
+          <a:prstGeom prst="rect">
+            <a:avLst/>
+          </a:prstGeom>
+          <a:noFill/>
+        </p:spPr>
+        <p:txBody>
+          <a:bodyPr wrap="none" rtlCol="0">
+            <a:spAutoFit/>
+          </a:bodyPr>
+          <a:lstStyle/>
+          <a:p>
+            <a:r>
+              <a:rPr lang="pl-PL" dirty="0" err="1"/>
+              <a:t>React</a:t>
+            </a:r>
+            <a:r>
+              <a:rPr lang="pl-PL" dirty="0"/>
+              <a:t> </a:t>
+            </a:r>
+            <a:r>
+              <a:rPr lang="pl-PL" dirty="0" err="1"/>
+              <a:t>state</a:t>
+            </a:r>
+            <a:endParaRPr lang="pl-PL" dirty="0"/>
+          </a:p>
+        </p:txBody>
+      </p:sp>
+    </p:spTree>
+    <p:extLst>
+      <p:ext uri="{BB962C8B-B14F-4D97-AF65-F5344CB8AC3E}">
+        <p14:creationId xmlns:p14="http://schemas.microsoft.com/office/powerpoint/2010/main" val="2683405511"/>
       </p:ext>
     </p:extLst>
   </p:cSld>

</xml_diff>

<commit_message>
Exercise 4: state management
</commit_message>
<xml_diff>
--- a/tutorial/ReactjsTraining.pptx
+++ b/tutorial/ReactjsTraining.pptx
@@ -684,6 +684,326 @@
                 <a:cs typeface="+mn-cs"/>
               </a:rPr>
               <a:t>:</a:t>
+            </a:r>
+          </a:p>
+          <a:p>
+            <a:pPr marL="0" indent="0">
+              <a:buFontTx/>
+              <a:buNone/>
+            </a:pPr>
+            <a:endParaRPr lang="pl-PL" sz="1200" b="0" i="0" kern="1200" dirty="0">
+              <a:solidFill>
+                <a:schemeClr val="tx1"/>
+              </a:solidFill>
+              <a:effectLst/>
+              <a:latin typeface="+mn-lt"/>
+              <a:ea typeface="+mn-ea"/>
+              <a:cs typeface="+mn-cs"/>
+            </a:endParaRPr>
+          </a:p>
+          <a:p>
+            <a:pPr marL="228600" indent="-228600">
+              <a:buFontTx/>
+              <a:buAutoNum type="arabicPeriod"/>
+            </a:pPr>
+            <a:r>
+              <a:rPr lang="pl-PL" sz="1200" b="0" i="0" kern="1200" dirty="0">
+                <a:solidFill>
+                  <a:schemeClr val="tx1"/>
+                </a:solidFill>
+                <a:effectLst/>
+                <a:latin typeface="+mn-lt"/>
+                <a:ea typeface="+mn-ea"/>
+                <a:cs typeface="+mn-cs"/>
+              </a:rPr>
+              <a:t>Wytłumaczyć, że stan by wszystko mieć w jednym miejscu i by był obiekt na podstawie którego </a:t>
+            </a:r>
+            <a:r>
+              <a:rPr lang="pl-PL" sz="1200" b="0" i="0" kern="1200" dirty="0" err="1">
+                <a:solidFill>
+                  <a:schemeClr val="tx1"/>
+                </a:solidFill>
+                <a:effectLst/>
+                <a:latin typeface="+mn-lt"/>
+                <a:ea typeface="+mn-ea"/>
+                <a:cs typeface="+mn-cs"/>
+              </a:rPr>
+              <a:t>react</a:t>
+            </a:r>
+            <a:r>
+              <a:rPr lang="pl-PL" sz="1200" b="0" i="0" kern="1200" dirty="0">
+                <a:solidFill>
+                  <a:schemeClr val="tx1"/>
+                </a:solidFill>
+                <a:effectLst/>
+                <a:latin typeface="+mn-lt"/>
+                <a:ea typeface="+mn-ea"/>
+                <a:cs typeface="+mn-cs"/>
+              </a:rPr>
+              <a:t> byłby w stanie zarządzać </a:t>
+            </a:r>
+            <a:r>
+              <a:rPr lang="pl-PL" sz="1200" b="0" i="0" kern="1200" dirty="0" err="1">
+                <a:solidFill>
+                  <a:schemeClr val="tx1"/>
+                </a:solidFill>
+                <a:effectLst/>
+                <a:latin typeface="+mn-lt"/>
+                <a:ea typeface="+mn-ea"/>
+                <a:cs typeface="+mn-cs"/>
+              </a:rPr>
+              <a:t>renderowaniem</a:t>
+            </a:r>
+            <a:endParaRPr lang="pl-PL" sz="1200" b="0" i="0" kern="1200" dirty="0">
+              <a:solidFill>
+                <a:schemeClr val="tx1"/>
+              </a:solidFill>
+              <a:effectLst/>
+              <a:latin typeface="+mn-lt"/>
+              <a:ea typeface="+mn-ea"/>
+              <a:cs typeface="+mn-cs"/>
+            </a:endParaRPr>
+          </a:p>
+          <a:p>
+            <a:pPr marL="228600" indent="-228600">
+              <a:buFontTx/>
+              <a:buAutoNum type="arabicPeriod"/>
+            </a:pPr>
+            <a:r>
+              <a:rPr lang="pl-PL" sz="1200" b="0" i="0" kern="1200" dirty="0">
+                <a:solidFill>
+                  <a:schemeClr val="tx1"/>
+                </a:solidFill>
+                <a:effectLst/>
+                <a:latin typeface="+mn-lt"/>
+                <a:ea typeface="+mn-ea"/>
+                <a:cs typeface="+mn-cs"/>
+              </a:rPr>
+              <a:t>Jak </a:t>
+            </a:r>
+            <a:r>
+              <a:rPr lang="pl-PL" sz="1200" b="0" i="0" kern="1200" dirty="0" err="1">
+                <a:solidFill>
+                  <a:schemeClr val="tx1"/>
+                </a:solidFill>
+                <a:effectLst/>
+                <a:latin typeface="+mn-lt"/>
+                <a:ea typeface="+mn-ea"/>
+                <a:cs typeface="+mn-cs"/>
+              </a:rPr>
+              <a:t>setState</a:t>
+            </a:r>
+            <a:r>
+              <a:rPr lang="pl-PL" sz="1200" b="0" i="0" kern="1200" dirty="0">
+                <a:solidFill>
+                  <a:schemeClr val="tx1"/>
+                </a:solidFill>
+                <a:effectLst/>
+                <a:latin typeface="+mn-lt"/>
+                <a:ea typeface="+mn-ea"/>
+                <a:cs typeface="+mn-cs"/>
+              </a:rPr>
+              <a:t> się zmieni to </a:t>
+            </a:r>
+            <a:r>
+              <a:rPr lang="pl-PL" sz="1200" b="0" i="0" kern="1200" dirty="0" err="1">
+                <a:solidFill>
+                  <a:schemeClr val="tx1"/>
+                </a:solidFill>
+                <a:effectLst/>
+                <a:latin typeface="+mn-lt"/>
+                <a:ea typeface="+mn-ea"/>
+                <a:cs typeface="+mn-cs"/>
+              </a:rPr>
+              <a:t>React</a:t>
+            </a:r>
+            <a:r>
+              <a:rPr lang="pl-PL" sz="1200" b="0" i="0" kern="1200" dirty="0">
+                <a:solidFill>
+                  <a:schemeClr val="tx1"/>
+                </a:solidFill>
+                <a:effectLst/>
+                <a:latin typeface="+mn-lt"/>
+                <a:ea typeface="+mn-ea"/>
+                <a:cs typeface="+mn-cs"/>
+              </a:rPr>
+              <a:t> </a:t>
+            </a:r>
+            <a:r>
+              <a:rPr lang="pl-PL" sz="1200" b="0" i="0" kern="1200" dirty="0" err="1">
+                <a:solidFill>
+                  <a:schemeClr val="tx1"/>
+                </a:solidFill>
+                <a:effectLst/>
+                <a:latin typeface="+mn-lt"/>
+                <a:ea typeface="+mn-ea"/>
+                <a:cs typeface="+mn-cs"/>
+              </a:rPr>
+              <a:t>przerenderuje</a:t>
+            </a:r>
+            <a:r>
+              <a:rPr lang="pl-PL" sz="1200" b="0" i="0" kern="1200" dirty="0">
+                <a:solidFill>
+                  <a:schemeClr val="tx1"/>
+                </a:solidFill>
+                <a:effectLst/>
+                <a:latin typeface="+mn-lt"/>
+                <a:ea typeface="+mn-ea"/>
+                <a:cs typeface="+mn-cs"/>
+              </a:rPr>
+              <a:t> nam komponent</a:t>
+            </a:r>
+          </a:p>
+          <a:p>
+            <a:pPr marL="228600" indent="-228600">
+              <a:buFontTx/>
+              <a:buAutoNum type="arabicPeriod"/>
+            </a:pPr>
+            <a:endParaRPr lang="pl-PL" sz="1200" b="0" i="0" kern="1200" dirty="0">
+              <a:solidFill>
+                <a:schemeClr val="tx1"/>
+              </a:solidFill>
+              <a:effectLst/>
+              <a:latin typeface="+mn-lt"/>
+              <a:ea typeface="+mn-ea"/>
+              <a:cs typeface="+mn-cs"/>
+            </a:endParaRPr>
+          </a:p>
+          <a:p>
+            <a:pPr marL="0" indent="0">
+              <a:buFontTx/>
+              <a:buNone/>
+            </a:pPr>
+            <a:r>
+              <a:rPr lang="pl-PL" sz="1200" b="0" i="0" kern="1200" dirty="0" err="1">
+                <a:solidFill>
+                  <a:schemeClr val="tx1"/>
+                </a:solidFill>
+                <a:effectLst/>
+                <a:latin typeface="+mn-lt"/>
+                <a:ea typeface="+mn-ea"/>
+                <a:cs typeface="+mn-cs"/>
+              </a:rPr>
+              <a:t>Exercise</a:t>
+            </a:r>
+            <a:r>
+              <a:rPr lang="pl-PL" sz="1200" b="0" i="0" kern="1200" dirty="0">
+                <a:solidFill>
+                  <a:schemeClr val="tx1"/>
+                </a:solidFill>
+                <a:effectLst/>
+                <a:latin typeface="+mn-lt"/>
+                <a:ea typeface="+mn-ea"/>
+                <a:cs typeface="+mn-cs"/>
+              </a:rPr>
+              <a:t> 4: Sprawić by kwadrat co sekundę zmieniał kolor używając </a:t>
+            </a:r>
+            <a:r>
+              <a:rPr lang="pl-PL" sz="1200" b="0" i="0" kern="1200" dirty="0" err="1">
+                <a:solidFill>
+                  <a:schemeClr val="tx1"/>
+                </a:solidFill>
+                <a:effectLst/>
+                <a:latin typeface="+mn-lt"/>
+                <a:ea typeface="+mn-ea"/>
+                <a:cs typeface="+mn-cs"/>
+              </a:rPr>
+              <a:t>state</a:t>
+            </a:r>
+            <a:r>
+              <a:rPr lang="pl-PL" sz="1200" b="0" i="0" kern="1200" dirty="0">
+                <a:solidFill>
+                  <a:schemeClr val="tx1"/>
+                </a:solidFill>
+                <a:effectLst/>
+                <a:latin typeface="+mn-lt"/>
+                <a:ea typeface="+mn-ea"/>
+                <a:cs typeface="+mn-cs"/>
+              </a:rPr>
+              <a:t>. </a:t>
+            </a:r>
+            <a:br>
+              <a:rPr lang="pl-PL" sz="1200" b="0" i="0" kern="1200" dirty="0">
+                <a:solidFill>
+                  <a:schemeClr val="tx1"/>
+                </a:solidFill>
+                <a:effectLst/>
+                <a:latin typeface="+mn-lt"/>
+                <a:ea typeface="+mn-ea"/>
+                <a:cs typeface="+mn-cs"/>
+              </a:rPr>
+            </a:br>
+            <a:r>
+              <a:rPr lang="pl-PL" sz="1200" b="0" i="0" kern="1200" dirty="0">
+                <a:solidFill>
+                  <a:schemeClr val="tx1"/>
+                </a:solidFill>
+                <a:effectLst/>
+                <a:latin typeface="+mn-lt"/>
+                <a:ea typeface="+mn-ea"/>
+                <a:cs typeface="+mn-cs"/>
+              </a:rPr>
+              <a:t>Tip1: trzeba użyć </a:t>
+            </a:r>
+            <a:r>
+              <a:rPr lang="pl-PL" sz="1200" b="0" i="0" kern="1200" dirty="0" err="1">
+                <a:solidFill>
+                  <a:schemeClr val="tx1"/>
+                </a:solidFill>
+                <a:effectLst/>
+                <a:latin typeface="+mn-lt"/>
+                <a:ea typeface="+mn-ea"/>
+                <a:cs typeface="+mn-cs"/>
+              </a:rPr>
+              <a:t>arrow</a:t>
+            </a:r>
+            <a:r>
+              <a:rPr lang="pl-PL" sz="1200" b="0" i="0" kern="1200" dirty="0">
+                <a:solidFill>
+                  <a:schemeClr val="tx1"/>
+                </a:solidFill>
+                <a:effectLst/>
+                <a:latin typeface="+mn-lt"/>
+                <a:ea typeface="+mn-ea"/>
+                <a:cs typeface="+mn-cs"/>
+              </a:rPr>
+              <a:t> </a:t>
+            </a:r>
+            <a:r>
+              <a:rPr lang="pl-PL" sz="1200" b="0" i="0" kern="1200" dirty="0" err="1">
+                <a:solidFill>
+                  <a:schemeClr val="tx1"/>
+                </a:solidFill>
+                <a:effectLst/>
+                <a:latin typeface="+mn-lt"/>
+                <a:ea typeface="+mn-ea"/>
+                <a:cs typeface="+mn-cs"/>
+              </a:rPr>
+              <a:t>function</a:t>
+            </a:r>
+            <a:r>
+              <a:rPr lang="pl-PL" sz="1200" b="0" i="0" kern="1200" dirty="0">
+                <a:solidFill>
+                  <a:schemeClr val="tx1"/>
+                </a:solidFill>
+                <a:effectLst/>
+                <a:latin typeface="+mn-lt"/>
+                <a:ea typeface="+mn-ea"/>
+                <a:cs typeface="+mn-cs"/>
+              </a:rPr>
+              <a:t> bo zwykła nie sięga do </a:t>
+            </a:r>
+            <a:r>
+              <a:rPr lang="pl-PL" sz="1200" b="0" i="0" kern="1200">
+                <a:solidFill>
+                  <a:schemeClr val="tx1"/>
+                </a:solidFill>
+                <a:effectLst/>
+                <a:latin typeface="+mn-lt"/>
+                <a:ea typeface="+mn-ea"/>
+                <a:cs typeface="+mn-cs"/>
+              </a:rPr>
+              <a:t>this</a:t>
             </a:r>
             <a:endParaRPr lang="pl-PL" dirty="0"/>
           </a:p>
@@ -5551,6 +5871,802 @@
               <a:t>state</a:t>
             </a:r>
             <a:endParaRPr lang="pl-PL" dirty="0"/>
+          </a:p>
+        </p:txBody>
+      </p:sp>
+      <p:sp>
+        <p:nvSpPr>
+          <p:cNvPr id="2" name="Prostokąt 1">
+            <a:extLst>
+              <a:ext uri="{FF2B5EF4-FFF2-40B4-BE49-F238E27FC236}">
+                <a16:creationId xmlns:a16="http://schemas.microsoft.com/office/drawing/2014/main" id="{ECE7B2D4-50B6-4612-9636-DF8C028D4163}"/>
+              </a:ext>
+            </a:extLst>
+          </p:cNvPr>
+          <p:cNvSpPr/>
+          <p:nvPr/>
+        </p:nvSpPr>
+        <p:spPr>
+          <a:xfrm>
+            <a:off x="1895061" y="1557924"/>
+            <a:ext cx="9037983" cy="1200329"/>
+          </a:xfrm>
+          <a:prstGeom prst="rect">
+            <a:avLst/>
+          </a:prstGeom>
+          <a:solidFill>
+            <a:schemeClr val="tx1"/>
+          </a:solidFill>
+        </p:spPr>
+        <p:txBody>
+          <a:bodyPr wrap="square">
+            <a:spAutoFit/>
+          </a:bodyPr>
+          <a:lstStyle/>
+          <a:p>
+            <a:r>
+              <a:rPr lang="en-US" dirty="0">
+                <a:solidFill>
+                  <a:srgbClr val="D4D4D4"/>
+                </a:solidFill>
+                <a:latin typeface="Consolas" panose="020B0609020204030204" pitchFamily="49" charset="0"/>
+              </a:rPr>
+              <a:t>    </a:t>
+            </a:r>
+            <a:r>
+              <a:rPr lang="en-US" dirty="0">
+                <a:solidFill>
+                  <a:srgbClr val="569CD6"/>
+                </a:solidFill>
+                <a:latin typeface="Consolas" panose="020B0609020204030204" pitchFamily="49" charset="0"/>
+              </a:rPr>
+              <a:t>constructor</a:t>
+            </a:r>
+            <a:r>
+              <a:rPr lang="en-US" dirty="0">
+                <a:solidFill>
+                  <a:srgbClr val="D4D4D4"/>
+                </a:solidFill>
+                <a:latin typeface="Consolas" panose="020B0609020204030204" pitchFamily="49" charset="0"/>
+              </a:rPr>
+              <a:t>(</a:t>
+            </a:r>
+            <a:r>
+              <a:rPr lang="en-US" dirty="0">
+                <a:solidFill>
+                  <a:srgbClr val="9CDCFE"/>
+                </a:solidFill>
+                <a:latin typeface="Consolas" panose="020B0609020204030204" pitchFamily="49" charset="0"/>
+              </a:rPr>
+              <a:t>props</a:t>
+            </a:r>
+            <a:r>
+              <a:rPr lang="en-US" dirty="0">
+                <a:solidFill>
+                  <a:srgbClr val="D4D4D4"/>
+                </a:solidFill>
+                <a:latin typeface="Consolas" panose="020B0609020204030204" pitchFamily="49" charset="0"/>
+              </a:rPr>
+              <a:t>) {</a:t>
+            </a:r>
+          </a:p>
+          <a:p>
+            <a:r>
+              <a:rPr lang="en-US" dirty="0">
+                <a:solidFill>
+                  <a:srgbClr val="D4D4D4"/>
+                </a:solidFill>
+                <a:latin typeface="Consolas" panose="020B0609020204030204" pitchFamily="49" charset="0"/>
+              </a:rPr>
+              <a:t>        </a:t>
+            </a:r>
+            <a:r>
+              <a:rPr lang="en-US" dirty="0">
+                <a:solidFill>
+                  <a:srgbClr val="569CD6"/>
+                </a:solidFill>
+                <a:latin typeface="Consolas" panose="020B0609020204030204" pitchFamily="49" charset="0"/>
+              </a:rPr>
+              <a:t>super</a:t>
+            </a:r>
+            <a:r>
+              <a:rPr lang="en-US" dirty="0">
+                <a:solidFill>
+                  <a:srgbClr val="D4D4D4"/>
+                </a:solidFill>
+                <a:latin typeface="Consolas" panose="020B0609020204030204" pitchFamily="49" charset="0"/>
+              </a:rPr>
+              <a:t>(</a:t>
+            </a:r>
+            <a:r>
+              <a:rPr lang="en-US" dirty="0">
+                <a:solidFill>
+                  <a:srgbClr val="9CDCFE"/>
+                </a:solidFill>
+                <a:latin typeface="Consolas" panose="020B0609020204030204" pitchFamily="49" charset="0"/>
+              </a:rPr>
+              <a:t>props</a:t>
+            </a:r>
+            <a:r>
+              <a:rPr lang="en-US" dirty="0">
+                <a:solidFill>
+                  <a:srgbClr val="D4D4D4"/>
+                </a:solidFill>
+                <a:latin typeface="Consolas" panose="020B0609020204030204" pitchFamily="49" charset="0"/>
+              </a:rPr>
+              <a:t>);</a:t>
+            </a:r>
+          </a:p>
+          <a:p>
+            <a:r>
+              <a:rPr lang="en-US" dirty="0">
+                <a:solidFill>
+                  <a:srgbClr val="D4D4D4"/>
+                </a:solidFill>
+                <a:latin typeface="Consolas" panose="020B0609020204030204" pitchFamily="49" charset="0"/>
+              </a:rPr>
+              <a:t>        </a:t>
+            </a:r>
+            <a:r>
+              <a:rPr lang="en-US" dirty="0" err="1">
+                <a:solidFill>
+                  <a:srgbClr val="569CD6"/>
+                </a:solidFill>
+                <a:latin typeface="Consolas" panose="020B0609020204030204" pitchFamily="49" charset="0"/>
+              </a:rPr>
+              <a:t>this</a:t>
+            </a:r>
+            <a:r>
+              <a:rPr lang="en-US" dirty="0" err="1">
+                <a:solidFill>
+                  <a:srgbClr val="D4D4D4"/>
+                </a:solidFill>
+                <a:latin typeface="Consolas" panose="020B0609020204030204" pitchFamily="49" charset="0"/>
+              </a:rPr>
+              <a:t>.</a:t>
+            </a:r>
+            <a:r>
+              <a:rPr lang="en-US" dirty="0" err="1">
+                <a:solidFill>
+                  <a:srgbClr val="9CDCFE"/>
+                </a:solidFill>
+                <a:latin typeface="Consolas" panose="020B0609020204030204" pitchFamily="49" charset="0"/>
+              </a:rPr>
+              <a:t>state</a:t>
+            </a:r>
+            <a:r>
+              <a:rPr lang="en-US" dirty="0">
+                <a:solidFill>
+                  <a:srgbClr val="D4D4D4"/>
+                </a:solidFill>
+                <a:latin typeface="Consolas" panose="020B0609020204030204" pitchFamily="49" charset="0"/>
+              </a:rPr>
+              <a:t> = { </a:t>
+            </a:r>
+            <a:r>
+              <a:rPr lang="pl-PL" dirty="0" err="1">
+                <a:solidFill>
+                  <a:srgbClr val="9CDCFE"/>
+                </a:solidFill>
+                <a:latin typeface="Consolas" panose="020B0609020204030204" pitchFamily="49" charset="0"/>
+              </a:rPr>
+              <a:t>date</a:t>
+            </a:r>
+            <a:r>
+              <a:rPr lang="en-US" dirty="0">
+                <a:solidFill>
+                  <a:srgbClr val="9CDCFE"/>
+                </a:solidFill>
+                <a:latin typeface="Consolas" panose="020B0609020204030204" pitchFamily="49" charset="0"/>
+              </a:rPr>
+              <a:t>:</a:t>
+            </a:r>
+            <a:r>
+              <a:rPr lang="en-US" dirty="0">
+                <a:solidFill>
+                  <a:srgbClr val="D4D4D4"/>
+                </a:solidFill>
+                <a:latin typeface="Consolas" panose="020B0609020204030204" pitchFamily="49" charset="0"/>
+              </a:rPr>
+              <a:t> </a:t>
+            </a:r>
+            <a:r>
+              <a:rPr lang="pl-PL" dirty="0" err="1">
+                <a:solidFill>
+                  <a:schemeClr val="accent1">
+                    <a:lumMod val="60000"/>
+                    <a:lumOff val="40000"/>
+                  </a:schemeClr>
+                </a:solidFill>
+                <a:latin typeface="Consolas" panose="020B0609020204030204" pitchFamily="49" charset="0"/>
+              </a:rPr>
+              <a:t>new</a:t>
+            </a:r>
+            <a:r>
+              <a:rPr lang="pl-PL" dirty="0">
+                <a:solidFill>
+                  <a:schemeClr val="accent1">
+                    <a:lumMod val="60000"/>
+                    <a:lumOff val="40000"/>
+                  </a:schemeClr>
+                </a:solidFill>
+                <a:latin typeface="Consolas" panose="020B0609020204030204" pitchFamily="49" charset="0"/>
+              </a:rPr>
+              <a:t> </a:t>
+            </a:r>
+            <a:r>
+              <a:rPr lang="pl-PL" dirty="0" err="1">
+                <a:solidFill>
+                  <a:schemeClr val="accent1">
+                    <a:lumMod val="60000"/>
+                    <a:lumOff val="40000"/>
+                  </a:schemeClr>
+                </a:solidFill>
+                <a:latin typeface="Consolas" panose="020B0609020204030204" pitchFamily="49" charset="0"/>
+              </a:rPr>
+              <a:t>Date</a:t>
+            </a:r>
+            <a:r>
+              <a:rPr lang="pl-PL" dirty="0">
+                <a:solidFill>
+                  <a:schemeClr val="accent1">
+                    <a:lumMod val="60000"/>
+                    <a:lumOff val="40000"/>
+                  </a:schemeClr>
+                </a:solidFill>
+                <a:latin typeface="Consolas" panose="020B0609020204030204" pitchFamily="49" charset="0"/>
+              </a:rPr>
+              <a:t>()</a:t>
+            </a:r>
+            <a:r>
+              <a:rPr lang="en-US" dirty="0">
+                <a:solidFill>
+                  <a:srgbClr val="D4D4D4"/>
+                </a:solidFill>
+                <a:latin typeface="Consolas" panose="020B0609020204030204" pitchFamily="49" charset="0"/>
+              </a:rPr>
+              <a:t> };</a:t>
+            </a:r>
+          </a:p>
+          <a:p>
+            <a:r>
+              <a:rPr lang="en-US" dirty="0">
+                <a:solidFill>
+                  <a:srgbClr val="D4D4D4"/>
+                </a:solidFill>
+                <a:latin typeface="Consolas" panose="020B0609020204030204" pitchFamily="49" charset="0"/>
+              </a:rPr>
+              <a:t>    }</a:t>
+            </a:r>
+            <a:endParaRPr lang="en-US" b="0" dirty="0">
+              <a:solidFill>
+                <a:srgbClr val="D4D4D4"/>
+              </a:solidFill>
+              <a:effectLst/>
+              <a:latin typeface="Consolas" panose="020B0609020204030204" pitchFamily="49" charset="0"/>
+            </a:endParaRPr>
+          </a:p>
+        </p:txBody>
+      </p:sp>
+      <p:sp>
+        <p:nvSpPr>
+          <p:cNvPr id="3" name="Prostokąt 2">
+            <a:extLst>
+              <a:ext uri="{FF2B5EF4-FFF2-40B4-BE49-F238E27FC236}">
+                <a16:creationId xmlns:a16="http://schemas.microsoft.com/office/drawing/2014/main" id="{3241F00A-5EBF-4200-8D7A-567BA30EDC81}"/>
+              </a:ext>
+            </a:extLst>
+          </p:cNvPr>
+          <p:cNvSpPr/>
+          <p:nvPr/>
+        </p:nvSpPr>
+        <p:spPr>
+          <a:xfrm>
+            <a:off x="1895061" y="3429000"/>
+            <a:ext cx="9037983" cy="369332"/>
+          </a:xfrm>
+          <a:prstGeom prst="rect">
+            <a:avLst/>
+          </a:prstGeom>
+          <a:solidFill>
+            <a:schemeClr val="tx1"/>
+          </a:solidFill>
+        </p:spPr>
+        <p:txBody>
+          <a:bodyPr wrap="square">
+            <a:spAutoFit/>
+          </a:bodyPr>
+          <a:lstStyle/>
+          <a:p>
+            <a:r>
+              <a:rPr lang="pl-PL" dirty="0" err="1">
+                <a:solidFill>
+                  <a:srgbClr val="569CD6"/>
+                </a:solidFill>
+                <a:latin typeface="Consolas" panose="020B0609020204030204" pitchFamily="49" charset="0"/>
+              </a:rPr>
+              <a:t>this</a:t>
+            </a:r>
+            <a:r>
+              <a:rPr lang="pl-PL" dirty="0" err="1">
+                <a:solidFill>
+                  <a:srgbClr val="D4D4D4"/>
+                </a:solidFill>
+                <a:latin typeface="Consolas" panose="020B0609020204030204" pitchFamily="49" charset="0"/>
+              </a:rPr>
+              <a:t>.</a:t>
+            </a:r>
+            <a:r>
+              <a:rPr lang="pl-PL" dirty="0" err="1">
+                <a:solidFill>
+                  <a:srgbClr val="DCDCAA"/>
+                </a:solidFill>
+                <a:latin typeface="Consolas" panose="020B0609020204030204" pitchFamily="49" charset="0"/>
+              </a:rPr>
+              <a:t>setState</a:t>
+            </a:r>
+            <a:r>
+              <a:rPr lang="pl-PL" dirty="0">
+                <a:solidFill>
+                  <a:srgbClr val="D4D4D4"/>
+                </a:solidFill>
+                <a:latin typeface="Consolas" panose="020B0609020204030204" pitchFamily="49" charset="0"/>
+              </a:rPr>
+              <a:t>({ </a:t>
+            </a:r>
+            <a:r>
+              <a:rPr lang="pl-PL" dirty="0" err="1">
+                <a:solidFill>
+                  <a:srgbClr val="9CDCFE"/>
+                </a:solidFill>
+                <a:latin typeface="Consolas" panose="020B0609020204030204" pitchFamily="49" charset="0"/>
+              </a:rPr>
+              <a:t>date</a:t>
+            </a:r>
+            <a:r>
+              <a:rPr lang="pl-PL" dirty="0">
+                <a:solidFill>
+                  <a:srgbClr val="9CDCFE"/>
+                </a:solidFill>
+                <a:latin typeface="Consolas" panose="020B0609020204030204" pitchFamily="49" charset="0"/>
+              </a:rPr>
+              <a:t>:</a:t>
+            </a:r>
+            <a:r>
+              <a:rPr lang="pl-PL" dirty="0">
+                <a:solidFill>
+                  <a:srgbClr val="D4D4D4"/>
+                </a:solidFill>
+                <a:latin typeface="Consolas" panose="020B0609020204030204" pitchFamily="49" charset="0"/>
+              </a:rPr>
+              <a:t> </a:t>
+            </a:r>
+            <a:r>
+              <a:rPr lang="pl-PL" dirty="0" err="1">
+                <a:solidFill>
+                  <a:schemeClr val="accent1">
+                    <a:lumMod val="60000"/>
+                    <a:lumOff val="40000"/>
+                  </a:schemeClr>
+                </a:solidFill>
+                <a:latin typeface="Consolas" panose="020B0609020204030204" pitchFamily="49" charset="0"/>
+              </a:rPr>
+              <a:t>new</a:t>
+            </a:r>
+            <a:r>
+              <a:rPr lang="pl-PL" dirty="0">
+                <a:solidFill>
+                  <a:schemeClr val="accent1">
+                    <a:lumMod val="60000"/>
+                    <a:lumOff val="40000"/>
+                  </a:schemeClr>
+                </a:solidFill>
+                <a:latin typeface="Consolas" panose="020B0609020204030204" pitchFamily="49" charset="0"/>
+              </a:rPr>
+              <a:t> </a:t>
+            </a:r>
+            <a:r>
+              <a:rPr lang="pl-PL" dirty="0" err="1">
+                <a:solidFill>
+                  <a:schemeClr val="accent1">
+                    <a:lumMod val="60000"/>
+                    <a:lumOff val="40000"/>
+                  </a:schemeClr>
+                </a:solidFill>
+                <a:latin typeface="Consolas" panose="020B0609020204030204" pitchFamily="49" charset="0"/>
+              </a:rPr>
+              <a:t>Date</a:t>
+            </a:r>
+            <a:r>
+              <a:rPr lang="pl-PL" dirty="0">
+                <a:solidFill>
+                  <a:schemeClr val="accent1">
+                    <a:lumMod val="60000"/>
+                    <a:lumOff val="40000"/>
+                  </a:schemeClr>
+                </a:solidFill>
+                <a:latin typeface="Consolas" panose="020B0609020204030204" pitchFamily="49" charset="0"/>
+              </a:rPr>
+              <a:t>()</a:t>
+            </a:r>
+            <a:r>
+              <a:rPr lang="pl-PL" dirty="0">
+                <a:solidFill>
+                  <a:srgbClr val="D4D4D4"/>
+                </a:solidFill>
+                <a:latin typeface="Consolas" panose="020B0609020204030204" pitchFamily="49" charset="0"/>
+              </a:rPr>
+              <a:t>});</a:t>
+            </a:r>
+            <a:endParaRPr lang="pl-PL" b="0" dirty="0">
+              <a:solidFill>
+                <a:srgbClr val="D4D4D4"/>
+              </a:solidFill>
+              <a:effectLst/>
+              <a:latin typeface="Consolas" panose="020B0609020204030204" pitchFamily="49" charset="0"/>
+            </a:endParaRPr>
+          </a:p>
+        </p:txBody>
+      </p:sp>
+      <p:sp>
+        <p:nvSpPr>
+          <p:cNvPr id="5" name="pole tekstowe 4">
+            <a:extLst>
+              <a:ext uri="{FF2B5EF4-FFF2-40B4-BE49-F238E27FC236}">
+                <a16:creationId xmlns:a16="http://schemas.microsoft.com/office/drawing/2014/main" id="{865A884B-E399-471E-A865-282164E8F557}"/>
+              </a:ext>
+            </a:extLst>
+          </p:cNvPr>
+          <p:cNvSpPr txBox="1"/>
+          <p:nvPr/>
+        </p:nvSpPr>
+        <p:spPr>
+          <a:xfrm>
+            <a:off x="1895061" y="1139759"/>
+            <a:ext cx="2154372" cy="369332"/>
+          </a:xfrm>
+          <a:prstGeom prst="rect">
+            <a:avLst/>
+          </a:prstGeom>
+          <a:noFill/>
+        </p:spPr>
+        <p:txBody>
+          <a:bodyPr wrap="none" rtlCol="0">
+            <a:spAutoFit/>
+          </a:bodyPr>
+          <a:lstStyle/>
+          <a:p>
+            <a:r>
+              <a:rPr lang="pl-PL" dirty="0" err="1"/>
+              <a:t>Declaring</a:t>
+            </a:r>
+            <a:r>
+              <a:rPr lang="pl-PL" dirty="0"/>
+              <a:t> </a:t>
+            </a:r>
+            <a:r>
+              <a:rPr lang="pl-PL" dirty="0" err="1"/>
+              <a:t>initial</a:t>
+            </a:r>
+            <a:r>
+              <a:rPr lang="pl-PL" dirty="0"/>
+              <a:t> </a:t>
+            </a:r>
+            <a:r>
+              <a:rPr lang="pl-PL" dirty="0" err="1"/>
+              <a:t>state</a:t>
+            </a:r>
+            <a:endParaRPr lang="pl-PL" dirty="0"/>
+          </a:p>
+        </p:txBody>
+      </p:sp>
+      <p:sp>
+        <p:nvSpPr>
+          <p:cNvPr id="6" name="pole tekstowe 5">
+            <a:extLst>
+              <a:ext uri="{FF2B5EF4-FFF2-40B4-BE49-F238E27FC236}">
+                <a16:creationId xmlns:a16="http://schemas.microsoft.com/office/drawing/2014/main" id="{49D10148-84A5-458E-A997-FB466A5D659C}"/>
+              </a:ext>
+            </a:extLst>
+          </p:cNvPr>
+          <p:cNvSpPr txBox="1"/>
+          <p:nvPr/>
+        </p:nvSpPr>
+        <p:spPr>
+          <a:xfrm>
+            <a:off x="1895061" y="3058876"/>
+            <a:ext cx="1567673" cy="369332"/>
+          </a:xfrm>
+          <a:prstGeom prst="rect">
+            <a:avLst/>
+          </a:prstGeom>
+          <a:noFill/>
+        </p:spPr>
+        <p:txBody>
+          <a:bodyPr wrap="none" rtlCol="0">
+            <a:spAutoFit/>
+          </a:bodyPr>
+          <a:lstStyle/>
+          <a:p>
+            <a:r>
+              <a:rPr lang="pl-PL" dirty="0" err="1"/>
+              <a:t>Changing</a:t>
+            </a:r>
+            <a:r>
+              <a:rPr lang="pl-PL" dirty="0"/>
+              <a:t> </a:t>
+            </a:r>
+            <a:r>
+              <a:rPr lang="pl-PL" dirty="0" err="1"/>
+              <a:t>state</a:t>
+            </a:r>
+            <a:endParaRPr lang="pl-PL" dirty="0"/>
+          </a:p>
+        </p:txBody>
+      </p:sp>
+      <p:sp>
+        <p:nvSpPr>
+          <p:cNvPr id="7" name="Prostokąt 6">
+            <a:extLst>
+              <a:ext uri="{FF2B5EF4-FFF2-40B4-BE49-F238E27FC236}">
+                <a16:creationId xmlns:a16="http://schemas.microsoft.com/office/drawing/2014/main" id="{46DB6F23-2E12-415A-9E52-0369B472420C}"/>
+              </a:ext>
+            </a:extLst>
+          </p:cNvPr>
+          <p:cNvSpPr/>
+          <p:nvPr/>
+        </p:nvSpPr>
+        <p:spPr>
+          <a:xfrm>
+            <a:off x="1895061" y="4532099"/>
+            <a:ext cx="3730508" cy="369332"/>
+          </a:xfrm>
+          <a:prstGeom prst="rect">
+            <a:avLst/>
+          </a:prstGeom>
+          <a:solidFill>
+            <a:schemeClr val="tx1"/>
+          </a:solidFill>
+        </p:spPr>
+        <p:txBody>
+          <a:bodyPr wrap="none">
+            <a:spAutoFit/>
+          </a:bodyPr>
+          <a:lstStyle/>
+          <a:p>
+            <a:r>
+              <a:rPr lang="pl-PL" dirty="0">
+                <a:solidFill>
+                  <a:srgbClr val="808080"/>
+                </a:solidFill>
+                <a:latin typeface="Consolas" panose="020B0609020204030204" pitchFamily="49" charset="0"/>
+              </a:rPr>
+              <a:t>&lt;</a:t>
+            </a:r>
+            <a:r>
+              <a:rPr lang="pl-PL" dirty="0">
+                <a:solidFill>
+                  <a:srgbClr val="569CD6"/>
+                </a:solidFill>
+                <a:latin typeface="Consolas" panose="020B0609020204030204" pitchFamily="49" charset="0"/>
+              </a:rPr>
+              <a:t>div</a:t>
+            </a:r>
+            <a:r>
+              <a:rPr lang="pl-PL" dirty="0">
+                <a:solidFill>
+                  <a:schemeClr val="bg2">
+                    <a:lumMod val="50000"/>
+                  </a:schemeClr>
+                </a:solidFill>
+                <a:latin typeface="Consolas" panose="020B0609020204030204" pitchFamily="49" charset="0"/>
+              </a:rPr>
+              <a:t>&gt; </a:t>
+            </a:r>
+            <a:r>
+              <a:rPr lang="pl-PL" dirty="0" err="1">
+                <a:solidFill>
+                  <a:srgbClr val="D4D4D4"/>
+                </a:solidFill>
+                <a:latin typeface="Consolas" panose="020B0609020204030204" pitchFamily="49" charset="0"/>
+              </a:rPr>
+              <a:t>this.state.date</a:t>
+            </a:r>
+            <a:r>
+              <a:rPr lang="pl-PL" dirty="0">
+                <a:solidFill>
+                  <a:srgbClr val="D4D4D4"/>
+                </a:solidFill>
+                <a:latin typeface="Consolas" panose="020B0609020204030204" pitchFamily="49" charset="0"/>
+              </a:rPr>
+              <a:t> </a:t>
+            </a:r>
+            <a:r>
+              <a:rPr lang="pl-PL" dirty="0">
+                <a:solidFill>
+                  <a:srgbClr val="808080"/>
+                </a:solidFill>
+                <a:latin typeface="Consolas" panose="020B0609020204030204" pitchFamily="49" charset="0"/>
+              </a:rPr>
+              <a:t>&lt;/</a:t>
+            </a:r>
+            <a:r>
+              <a:rPr lang="pl-PL" dirty="0">
+                <a:solidFill>
+                  <a:srgbClr val="569CD6"/>
+                </a:solidFill>
+                <a:latin typeface="Consolas" panose="020B0609020204030204" pitchFamily="49" charset="0"/>
+              </a:rPr>
+              <a:t>div</a:t>
+            </a:r>
+            <a:r>
+              <a:rPr lang="pl-PL" dirty="0">
+                <a:solidFill>
+                  <a:srgbClr val="808080"/>
+                </a:solidFill>
+                <a:latin typeface="Consolas" panose="020B0609020204030204" pitchFamily="49" charset="0"/>
+              </a:rPr>
+              <a:t>&gt;</a:t>
+            </a:r>
+            <a:endParaRPr lang="pl-PL" b="0" dirty="0">
+              <a:solidFill>
+                <a:srgbClr val="D4D4D4"/>
+              </a:solidFill>
+              <a:effectLst/>
+              <a:latin typeface="Consolas" panose="020B0609020204030204" pitchFamily="49" charset="0"/>
+            </a:endParaRPr>
+          </a:p>
+        </p:txBody>
+      </p:sp>
+      <p:sp>
+        <p:nvSpPr>
+          <p:cNvPr id="8" name="pole tekstowe 7">
+            <a:extLst>
+              <a:ext uri="{FF2B5EF4-FFF2-40B4-BE49-F238E27FC236}">
+                <a16:creationId xmlns:a16="http://schemas.microsoft.com/office/drawing/2014/main" id="{3E179411-EB48-4B37-AC58-DD818E885D0F}"/>
+              </a:ext>
+            </a:extLst>
+          </p:cNvPr>
+          <p:cNvSpPr txBox="1"/>
+          <p:nvPr/>
+        </p:nvSpPr>
+        <p:spPr>
+          <a:xfrm>
+            <a:off x="1895061" y="4118833"/>
+            <a:ext cx="1218219" cy="369332"/>
+          </a:xfrm>
+          <a:prstGeom prst="rect">
+            <a:avLst/>
+          </a:prstGeom>
+          <a:noFill/>
+        </p:spPr>
+        <p:txBody>
+          <a:bodyPr wrap="none" rtlCol="0">
+            <a:spAutoFit/>
+          </a:bodyPr>
+          <a:lstStyle/>
+          <a:p>
+            <a:r>
+              <a:rPr lang="pl-PL" dirty="0"/>
+              <a:t>Using </a:t>
+            </a:r>
+            <a:r>
+              <a:rPr lang="pl-PL" dirty="0" err="1"/>
+              <a:t>state</a:t>
+            </a:r>
+            <a:endParaRPr lang="pl-PL" dirty="0"/>
+          </a:p>
+        </p:txBody>
+      </p:sp>
+      <p:sp>
+        <p:nvSpPr>
+          <p:cNvPr id="9" name="Prostokąt 8">
+            <a:extLst>
+              <a:ext uri="{FF2B5EF4-FFF2-40B4-BE49-F238E27FC236}">
+                <a16:creationId xmlns:a16="http://schemas.microsoft.com/office/drawing/2014/main" id="{CC345896-3C08-40CA-BB9A-AA99F842D030}"/>
+              </a:ext>
+            </a:extLst>
+          </p:cNvPr>
+          <p:cNvSpPr/>
+          <p:nvPr/>
+        </p:nvSpPr>
+        <p:spPr>
+          <a:xfrm>
+            <a:off x="1895061" y="5635198"/>
+            <a:ext cx="3857146" cy="369332"/>
+          </a:xfrm>
+          <a:prstGeom prst="rect">
+            <a:avLst/>
+          </a:prstGeom>
+          <a:solidFill>
+            <a:schemeClr val="tx1"/>
+          </a:solidFill>
+        </p:spPr>
+        <p:txBody>
+          <a:bodyPr wrap="none">
+            <a:spAutoFit/>
+          </a:bodyPr>
+          <a:lstStyle/>
+          <a:p>
+            <a:r>
+              <a:rPr lang="pl-PL" dirty="0" err="1">
+                <a:solidFill>
+                  <a:srgbClr val="DCDCAA"/>
+                </a:solidFill>
+                <a:latin typeface="Consolas" panose="020B0609020204030204" pitchFamily="49" charset="0"/>
+              </a:rPr>
+              <a:t>setInterval</a:t>
+            </a:r>
+            <a:r>
+              <a:rPr lang="pl-PL" dirty="0">
+                <a:solidFill>
+                  <a:srgbClr val="D4D4D4"/>
+                </a:solidFill>
+                <a:latin typeface="Consolas" panose="020B0609020204030204" pitchFamily="49" charset="0"/>
+              </a:rPr>
+              <a:t>(</a:t>
+            </a:r>
+            <a:r>
+              <a:rPr lang="pl-PL" dirty="0" err="1">
+                <a:solidFill>
+                  <a:srgbClr val="569CD6"/>
+                </a:solidFill>
+                <a:latin typeface="Consolas" panose="020B0609020204030204" pitchFamily="49" charset="0"/>
+              </a:rPr>
+              <a:t>this</a:t>
+            </a:r>
+            <a:r>
+              <a:rPr lang="pl-PL" dirty="0" err="1">
+                <a:solidFill>
+                  <a:srgbClr val="D4D4D4"/>
+                </a:solidFill>
+                <a:latin typeface="Consolas" panose="020B0609020204030204" pitchFamily="49" charset="0"/>
+              </a:rPr>
+              <a:t>.</a:t>
+            </a:r>
+            <a:r>
+              <a:rPr lang="pl-PL" dirty="0" err="1">
+                <a:solidFill>
+                  <a:srgbClr val="9CDCFE"/>
+                </a:solidFill>
+                <a:latin typeface="Consolas" panose="020B0609020204030204" pitchFamily="49" charset="0"/>
+              </a:rPr>
+              <a:t>tick</a:t>
+            </a:r>
+            <a:r>
+              <a:rPr lang="pl-PL" dirty="0">
+                <a:solidFill>
+                  <a:srgbClr val="D4D4D4"/>
+                </a:solidFill>
+                <a:latin typeface="Consolas" panose="020B0609020204030204" pitchFamily="49" charset="0"/>
+              </a:rPr>
+              <a:t>, </a:t>
+            </a:r>
+            <a:r>
+              <a:rPr lang="pl-PL" dirty="0">
+                <a:solidFill>
+                  <a:srgbClr val="B5CEA8"/>
+                </a:solidFill>
+                <a:latin typeface="Consolas" panose="020B0609020204030204" pitchFamily="49" charset="0"/>
+              </a:rPr>
+              <a:t>1000</a:t>
+            </a:r>
+            <a:r>
+              <a:rPr lang="pl-PL" dirty="0">
+                <a:solidFill>
+                  <a:srgbClr val="D4D4D4"/>
+                </a:solidFill>
+                <a:latin typeface="Consolas" panose="020B0609020204030204" pitchFamily="49" charset="0"/>
+              </a:rPr>
+              <a:t>);</a:t>
+            </a:r>
+            <a:endParaRPr lang="pl-PL" b="0" dirty="0">
+              <a:solidFill>
+                <a:srgbClr val="D4D4D4"/>
+              </a:solidFill>
+              <a:effectLst/>
+              <a:latin typeface="Consolas" panose="020B0609020204030204" pitchFamily="49" charset="0"/>
+            </a:endParaRPr>
           </a:p>
         </p:txBody>
       </p:sp>

</xml_diff>

<commit_message>
Exercise 6: pause color changing
</commit_message>
<xml_diff>
--- a/tutorial/ReactjsTraining.pptx
+++ b/tutorial/ReactjsTraining.pptx
@@ -5,7 +5,7 @@
     <p:sldMasterId id="2147483648" r:id="rId1"/>
   </p:sldMasterIdLst>
   <p:notesMasterIdLst>
-    <p:notesMasterId r:id="rId13"/>
+    <p:notesMasterId r:id="rId14"/>
   </p:notesMasterIdLst>
   <p:sldIdLst>
     <p:sldId id="256" r:id="rId2"/>
@@ -19,6 +19,7 @@
     <p:sldId id="264" r:id="rId10"/>
     <p:sldId id="265" r:id="rId11"/>
     <p:sldId id="266" r:id="rId12"/>
+    <p:sldId id="267" r:id="rId13"/>
   </p:sldIdLst>
   <p:sldSz cx="12192000" cy="6858000"/>
   <p:notesSz cx="6858000" cy="9144000"/>
@@ -1406,7 +1407,7 @@
               <a:t>help</a:t>
             </a:r>
             <a:r>
-              <a:rPr lang="pl-PL" sz="1200" b="0" i="0" kern="1200">
+              <a:rPr lang="pl-PL" sz="1200" b="0" i="0" kern="1200" dirty="0">
                 <a:solidFill>
                   <a:schemeClr val="tx1"/>
                 </a:solidFill>
@@ -1417,15 +1418,6 @@
               </a:rPr>
               <a:t> (wytłumaczyć w czym problem)</a:t>
             </a:r>
-            <a:endParaRPr lang="pl-PL" sz="1200" b="0" i="0" kern="1200" dirty="0">
-              <a:solidFill>
-                <a:schemeClr val="tx1"/>
-              </a:solidFill>
-              <a:effectLst/>
-              <a:latin typeface="+mn-lt"/>
-              <a:ea typeface="+mn-ea"/>
-              <a:cs typeface="+mn-cs"/>
-            </a:endParaRPr>
           </a:p>
         </p:txBody>
       </p:sp>
@@ -1456,6 +1448,291 @@
     <p:extLst>
       <p:ext uri="{BB962C8B-B14F-4D97-AF65-F5344CB8AC3E}">
         <p14:creationId xmlns:p14="http://schemas.microsoft.com/office/powerpoint/2010/main" val="617712275"/>
+      </p:ext>
+    </p:extLst>
+  </p:cSld>
+  <p:clrMapOvr>
+    <a:masterClrMapping/>
+  </p:clrMapOvr>
+</p:notes>
+</file>
+
+<file path=ppt/notesSlides/notesSlide12.xml><?xml version="1.0" encoding="utf-8"?>
+<p:notes xmlns:a="http://schemas.openxmlformats.org/drawingml/2006/main" xmlns:r="http://schemas.openxmlformats.org/officeDocument/2006/relationships" xmlns:p="http://schemas.openxmlformats.org/presentationml/2006/main">
+  <p:cSld>
+    <p:spTree>
+      <p:nvGrpSpPr>
+        <p:cNvPr id="1" name=""/>
+        <p:cNvGrpSpPr/>
+        <p:nvPr/>
+      </p:nvGrpSpPr>
+      <p:grpSpPr>
+        <a:xfrm>
+          <a:off x="0" y="0"/>
+          <a:ext cx="0" cy="0"/>
+          <a:chOff x="0" y="0"/>
+          <a:chExt cx="0" cy="0"/>
+        </a:xfrm>
+      </p:grpSpPr>
+      <p:sp>
+        <p:nvSpPr>
+          <p:cNvPr id="2" name="Symbol zastępczy obrazu slajdu 1"/>
+          <p:cNvSpPr>
+            <a:spLocks noGrp="1" noRot="1" noChangeAspect="1"/>
+          </p:cNvSpPr>
+          <p:nvPr>
+            <p:ph type="sldImg"/>
+          </p:nvPr>
+        </p:nvSpPr>
+        <p:spPr/>
+      </p:sp>
+      <p:sp>
+        <p:nvSpPr>
+          <p:cNvPr id="3" name="Symbol zastępczy notatek 2"/>
+          <p:cNvSpPr>
+            <a:spLocks noGrp="1"/>
+          </p:cNvSpPr>
+          <p:nvPr>
+            <p:ph type="body" idx="1"/>
+          </p:nvPr>
+        </p:nvSpPr>
+        <p:spPr/>
+        <p:txBody>
+          <a:bodyPr/>
+          <a:lstStyle/>
+          <a:p>
+            <a:pPr marL="228600" indent="-228600">
+              <a:buFontTx/>
+              <a:buAutoNum type="arabicPeriod"/>
+            </a:pPr>
+            <a:r>
+              <a:rPr lang="pl-PL" sz="1200" b="0" i="0" kern="1200" dirty="0">
+                <a:solidFill>
+                  <a:schemeClr val="tx1"/>
+                </a:solidFill>
+                <a:effectLst/>
+                <a:latin typeface="+mn-lt"/>
+                <a:ea typeface="+mn-ea"/>
+                <a:cs typeface="+mn-cs"/>
+              </a:rPr>
+              <a:t>Return </a:t>
+            </a:r>
+            <a:r>
+              <a:rPr lang="pl-PL" sz="1200" b="0" i="0" kern="1200" dirty="0" err="1">
+                <a:solidFill>
+                  <a:schemeClr val="tx1"/>
+                </a:solidFill>
+                <a:effectLst/>
+                <a:latin typeface="+mn-lt"/>
+                <a:ea typeface="+mn-ea"/>
+                <a:cs typeface="+mn-cs"/>
+              </a:rPr>
+              <a:t>false</a:t>
+            </a:r>
+            <a:r>
+              <a:rPr lang="pl-PL" sz="1200" b="0" i="0" kern="1200" dirty="0">
+                <a:solidFill>
+                  <a:schemeClr val="tx1"/>
+                </a:solidFill>
+                <a:effectLst/>
+                <a:latin typeface="+mn-lt"/>
+                <a:ea typeface="+mn-ea"/>
+                <a:cs typeface="+mn-cs"/>
+              </a:rPr>
+              <a:t> zamiast </a:t>
+            </a:r>
+            <a:r>
+              <a:rPr lang="pl-PL" sz="1200" b="0" i="0" kern="1200" dirty="0" err="1">
+                <a:solidFill>
+                  <a:schemeClr val="tx1"/>
+                </a:solidFill>
+                <a:effectLst/>
+                <a:latin typeface="+mn-lt"/>
+                <a:ea typeface="+mn-ea"/>
+                <a:cs typeface="+mn-cs"/>
+              </a:rPr>
+              <a:t>e.preventDefault</a:t>
+            </a:r>
+            <a:r>
+              <a:rPr lang="pl-PL" sz="1200" b="0" i="0" kern="1200" dirty="0">
+                <a:solidFill>
+                  <a:schemeClr val="tx1"/>
+                </a:solidFill>
+                <a:effectLst/>
+                <a:latin typeface="+mn-lt"/>
+                <a:ea typeface="+mn-ea"/>
+                <a:cs typeface="+mn-cs"/>
+              </a:rPr>
+              <a:t> nie zadziała</a:t>
+            </a:r>
+          </a:p>
+          <a:p>
+            <a:pPr marL="228600" indent="-228600">
+              <a:buFontTx/>
+              <a:buAutoNum type="arabicPeriod"/>
+            </a:pPr>
+            <a:r>
+              <a:rPr lang="pl-PL" sz="1200" b="0" i="0" kern="1200" dirty="0">
+                <a:solidFill>
+                  <a:schemeClr val="tx1"/>
+                </a:solidFill>
+                <a:effectLst/>
+                <a:latin typeface="+mn-lt"/>
+                <a:ea typeface="+mn-ea"/>
+                <a:cs typeface="+mn-cs"/>
+              </a:rPr>
+              <a:t>Problem – w </a:t>
+            </a:r>
+            <a:r>
+              <a:rPr lang="pl-PL" sz="1200" b="0" i="0" kern="1200" dirty="0" err="1">
+                <a:solidFill>
+                  <a:schemeClr val="tx1"/>
+                </a:solidFill>
+                <a:effectLst/>
+                <a:latin typeface="+mn-lt"/>
+                <a:ea typeface="+mn-ea"/>
+                <a:cs typeface="+mn-cs"/>
+              </a:rPr>
+              <a:t>onClick</a:t>
+            </a:r>
+            <a:r>
+              <a:rPr lang="pl-PL" sz="1200" b="0" i="0" kern="1200" dirty="0">
+                <a:solidFill>
+                  <a:schemeClr val="tx1"/>
+                </a:solidFill>
+                <a:effectLst/>
+                <a:latin typeface="+mn-lt"/>
+                <a:ea typeface="+mn-ea"/>
+                <a:cs typeface="+mn-cs"/>
+              </a:rPr>
+              <a:t> nie mamy dostęp do </a:t>
+            </a:r>
+            <a:r>
+              <a:rPr lang="pl-PL" sz="1200" b="0" i="0" kern="1200" dirty="0" err="1">
+                <a:solidFill>
+                  <a:schemeClr val="tx1"/>
+                </a:solidFill>
+                <a:effectLst/>
+                <a:latin typeface="+mn-lt"/>
+                <a:ea typeface="+mn-ea"/>
+                <a:cs typeface="+mn-cs"/>
+              </a:rPr>
+              <a:t>this</a:t>
+            </a:r>
+            <a:endParaRPr lang="pl-PL" sz="1200" b="0" i="0" kern="1200" dirty="0">
+              <a:solidFill>
+                <a:schemeClr val="tx1"/>
+              </a:solidFill>
+              <a:effectLst/>
+              <a:latin typeface="+mn-lt"/>
+              <a:ea typeface="+mn-ea"/>
+              <a:cs typeface="+mn-cs"/>
+            </a:endParaRPr>
+          </a:p>
+          <a:p>
+            <a:pPr marL="228600" indent="-228600">
+              <a:buFontTx/>
+              <a:buAutoNum type="arabicPeriod"/>
+            </a:pPr>
+            <a:endParaRPr lang="pl-PL" sz="1200" b="0" i="0" kern="1200" dirty="0">
+              <a:solidFill>
+                <a:schemeClr val="tx1"/>
+              </a:solidFill>
+              <a:effectLst/>
+              <a:latin typeface="+mn-lt"/>
+              <a:ea typeface="+mn-ea"/>
+              <a:cs typeface="+mn-cs"/>
+            </a:endParaRPr>
+          </a:p>
+          <a:p>
+            <a:pPr marL="0" indent="0">
+              <a:buFontTx/>
+              <a:buNone/>
+            </a:pPr>
+            <a:endParaRPr lang="pl-PL" sz="1200" b="0" i="0" kern="1200" dirty="0">
+              <a:solidFill>
+                <a:schemeClr val="tx1"/>
+              </a:solidFill>
+              <a:effectLst/>
+              <a:latin typeface="+mn-lt"/>
+              <a:ea typeface="+mn-ea"/>
+              <a:cs typeface="+mn-cs"/>
+            </a:endParaRPr>
+          </a:p>
+          <a:p>
+            <a:pPr marL="0" indent="0">
+              <a:buFontTx/>
+              <a:buNone/>
+            </a:pPr>
+            <a:r>
+              <a:rPr lang="pl-PL" sz="1200" b="0" i="0" kern="1200" dirty="0" err="1">
+                <a:solidFill>
+                  <a:schemeClr val="tx1"/>
+                </a:solidFill>
+                <a:effectLst/>
+                <a:latin typeface="+mn-lt"/>
+                <a:ea typeface="+mn-ea"/>
+                <a:cs typeface="+mn-cs"/>
+              </a:rPr>
+              <a:t>Exercise</a:t>
+            </a:r>
+            <a:r>
+              <a:rPr lang="pl-PL" sz="1200" b="0" i="0" kern="1200" dirty="0">
+                <a:solidFill>
+                  <a:schemeClr val="tx1"/>
+                </a:solidFill>
+                <a:effectLst/>
+                <a:latin typeface="+mn-lt"/>
+                <a:ea typeface="+mn-ea"/>
+                <a:cs typeface="+mn-cs"/>
+              </a:rPr>
+              <a:t> 6: przyciskiem pauzować i startować zmianę koloru</a:t>
+            </a:r>
+          </a:p>
+          <a:p>
+            <a:pPr marL="0" indent="0">
+              <a:buFontTx/>
+              <a:buNone/>
+            </a:pPr>
+            <a:endParaRPr lang="pl-PL" sz="1200" b="0" i="0" kern="1200" dirty="0">
+              <a:solidFill>
+                <a:schemeClr val="tx1"/>
+              </a:solidFill>
+              <a:effectLst/>
+              <a:latin typeface="+mn-lt"/>
+              <a:ea typeface="+mn-ea"/>
+              <a:cs typeface="+mn-cs"/>
+            </a:endParaRPr>
+          </a:p>
+        </p:txBody>
+      </p:sp>
+      <p:sp>
+        <p:nvSpPr>
+          <p:cNvPr id="4" name="Symbol zastępczy numeru slajdu 3"/>
+          <p:cNvSpPr>
+            <a:spLocks noGrp="1"/>
+          </p:cNvSpPr>
+          <p:nvPr>
+            <p:ph type="sldNum" sz="quarter" idx="5"/>
+          </p:nvPr>
+        </p:nvSpPr>
+        <p:spPr/>
+        <p:txBody>
+          <a:bodyPr/>
+          <a:lstStyle/>
+          <a:p>
+            <a:fld id="{810A6612-7A23-4B98-B0E9-4F3C882AD2EF}" type="slidenum">
+              <a:rPr lang="pl-PL" smtClean="0"/>
+              <a:t>12</a:t>
+            </a:fld>
+            <a:endParaRPr lang="pl-PL"/>
+          </a:p>
+        </p:txBody>
+      </p:sp>
+    </p:spTree>
+    <p:extLst>
+      <p:ext uri="{BB962C8B-B14F-4D97-AF65-F5344CB8AC3E}">
+        <p14:creationId xmlns:p14="http://schemas.microsoft.com/office/powerpoint/2010/main" val="3210993708"/>
       </p:ext>
     </p:extLst>
   </p:cSld>
@@ -8083,6 +8360,1467 @@
     <p:extLst>
       <p:ext uri="{BB962C8B-B14F-4D97-AF65-F5344CB8AC3E}">
         <p14:creationId xmlns:p14="http://schemas.microsoft.com/office/powerpoint/2010/main" val="3633500804"/>
+      </p:ext>
+    </p:extLst>
+  </p:cSld>
+  <p:clrMapOvr>
+    <a:masterClrMapping/>
+  </p:clrMapOvr>
+</p:sld>
+</file>
+
+<file path=ppt/slides/slide12.xml><?xml version="1.0" encoding="utf-8"?>
+<p:sld xmlns:a="http://schemas.openxmlformats.org/drawingml/2006/main" xmlns:r="http://schemas.openxmlformats.org/officeDocument/2006/relationships" xmlns:p="http://schemas.openxmlformats.org/presentationml/2006/main">
+  <p:cSld>
+    <p:spTree>
+      <p:nvGrpSpPr>
+        <p:cNvPr id="1" name=""/>
+        <p:cNvGrpSpPr/>
+        <p:nvPr/>
+      </p:nvGrpSpPr>
+      <p:grpSpPr>
+        <a:xfrm>
+          <a:off x="0" y="0"/>
+          <a:ext cx="0" cy="0"/>
+          <a:chOff x="0" y="0"/>
+          <a:chExt cx="0" cy="0"/>
+        </a:xfrm>
+      </p:grpSpPr>
+      <p:sp>
+        <p:nvSpPr>
+          <p:cNvPr id="4" name="pole tekstowe 3">
+            <a:extLst>
+              <a:ext uri="{FF2B5EF4-FFF2-40B4-BE49-F238E27FC236}">
+                <a16:creationId xmlns:a16="http://schemas.microsoft.com/office/drawing/2014/main" id="{F164A7B3-8808-414C-9401-3B25194E3B5A}"/>
+              </a:ext>
+            </a:extLst>
+          </p:cNvPr>
+          <p:cNvSpPr txBox="1"/>
+          <p:nvPr/>
+        </p:nvSpPr>
+        <p:spPr>
+          <a:xfrm>
+            <a:off x="497840" y="538480"/>
+            <a:ext cx="1377365" cy="369332"/>
+          </a:xfrm>
+          <a:prstGeom prst="rect">
+            <a:avLst/>
+          </a:prstGeom>
+          <a:noFill/>
+        </p:spPr>
+        <p:txBody>
+          <a:bodyPr wrap="none" rtlCol="0">
+            <a:spAutoFit/>
+          </a:bodyPr>
+          <a:lstStyle/>
+          <a:p>
+            <a:r>
+              <a:rPr lang="pl-PL" dirty="0" err="1"/>
+              <a:t>React</a:t>
+            </a:r>
+            <a:r>
+              <a:rPr lang="pl-PL" dirty="0"/>
+              <a:t> </a:t>
+            </a:r>
+            <a:r>
+              <a:rPr lang="pl-PL" dirty="0" err="1"/>
+              <a:t>events</a:t>
+            </a:r>
+            <a:endParaRPr lang="pl-PL" dirty="0"/>
+          </a:p>
+        </p:txBody>
+      </p:sp>
+      <p:sp>
+        <p:nvSpPr>
+          <p:cNvPr id="3" name="Prostokąt 2">
+            <a:extLst>
+              <a:ext uri="{FF2B5EF4-FFF2-40B4-BE49-F238E27FC236}">
+                <a16:creationId xmlns:a16="http://schemas.microsoft.com/office/drawing/2014/main" id="{5FB737AB-4AFC-4AA5-AA60-262C59FBF5C0}"/>
+              </a:ext>
+            </a:extLst>
+          </p:cNvPr>
+          <p:cNvSpPr/>
+          <p:nvPr/>
+        </p:nvSpPr>
+        <p:spPr>
+          <a:xfrm>
+            <a:off x="4659023" y="1530628"/>
+            <a:ext cx="6480314" cy="369332"/>
+          </a:xfrm>
+          <a:prstGeom prst="rect">
+            <a:avLst/>
+          </a:prstGeom>
+          <a:solidFill>
+            <a:schemeClr val="tx1"/>
+          </a:solidFill>
+        </p:spPr>
+        <p:txBody>
+          <a:bodyPr wrap="square">
+            <a:spAutoFit/>
+          </a:bodyPr>
+          <a:lstStyle/>
+          <a:p>
+            <a:r>
+              <a:rPr lang="en-US" dirty="0">
+                <a:solidFill>
+                  <a:srgbClr val="808080"/>
+                </a:solidFill>
+                <a:latin typeface="Consolas" panose="020B0609020204030204" pitchFamily="49" charset="0"/>
+              </a:rPr>
+              <a:t>&lt;</a:t>
+            </a:r>
+            <a:r>
+              <a:rPr lang="en-US" dirty="0">
+                <a:solidFill>
+                  <a:srgbClr val="569CD6"/>
+                </a:solidFill>
+                <a:latin typeface="Consolas" panose="020B0609020204030204" pitchFamily="49" charset="0"/>
+              </a:rPr>
+              <a:t>a</a:t>
+            </a:r>
+            <a:r>
+              <a:rPr lang="en-US" dirty="0">
+                <a:solidFill>
+                  <a:srgbClr val="D4D4D4"/>
+                </a:solidFill>
+                <a:latin typeface="Consolas" panose="020B0609020204030204" pitchFamily="49" charset="0"/>
+              </a:rPr>
+              <a:t> </a:t>
+            </a:r>
+            <a:r>
+              <a:rPr lang="en-US" dirty="0" err="1">
+                <a:solidFill>
+                  <a:srgbClr val="9CDCFE"/>
+                </a:solidFill>
+                <a:latin typeface="Consolas" panose="020B0609020204030204" pitchFamily="49" charset="0"/>
+              </a:rPr>
+              <a:t>href</a:t>
+            </a:r>
+            <a:r>
+              <a:rPr lang="en-US" dirty="0">
+                <a:solidFill>
+                  <a:srgbClr val="D4D4D4"/>
+                </a:solidFill>
+                <a:latin typeface="Consolas" panose="020B0609020204030204" pitchFamily="49" charset="0"/>
+              </a:rPr>
+              <a:t>=</a:t>
+            </a:r>
+            <a:r>
+              <a:rPr lang="en-US" dirty="0">
+                <a:solidFill>
+                  <a:srgbClr val="CE9178"/>
+                </a:solidFill>
+                <a:latin typeface="Consolas" panose="020B0609020204030204" pitchFamily="49" charset="0"/>
+              </a:rPr>
+              <a:t>"#"</a:t>
+            </a:r>
+            <a:r>
+              <a:rPr lang="en-US" dirty="0">
+                <a:solidFill>
+                  <a:srgbClr val="D4D4D4"/>
+                </a:solidFill>
+                <a:latin typeface="Consolas" panose="020B0609020204030204" pitchFamily="49" charset="0"/>
+              </a:rPr>
+              <a:t> </a:t>
+            </a:r>
+            <a:r>
+              <a:rPr lang="en-US" dirty="0" err="1">
+                <a:solidFill>
+                  <a:srgbClr val="9CDCFE"/>
+                </a:solidFill>
+                <a:latin typeface="Consolas" panose="020B0609020204030204" pitchFamily="49" charset="0"/>
+              </a:rPr>
+              <a:t>onClick</a:t>
+            </a:r>
+            <a:r>
+              <a:rPr lang="en-US" dirty="0">
+                <a:solidFill>
+                  <a:srgbClr val="D4D4D4"/>
+                </a:solidFill>
+                <a:latin typeface="Consolas" panose="020B0609020204030204" pitchFamily="49" charset="0"/>
+              </a:rPr>
+              <a:t>=</a:t>
+            </a:r>
+            <a:r>
+              <a:rPr lang="en-US" dirty="0">
+                <a:solidFill>
+                  <a:srgbClr val="569CD6"/>
+                </a:solidFill>
+                <a:latin typeface="Consolas" panose="020B0609020204030204" pitchFamily="49" charset="0"/>
+              </a:rPr>
+              <a:t>{</a:t>
+            </a:r>
+            <a:r>
+              <a:rPr lang="en-US" dirty="0" err="1">
+                <a:solidFill>
+                  <a:srgbClr val="569CD6"/>
+                </a:solidFill>
+                <a:latin typeface="Consolas" panose="020B0609020204030204" pitchFamily="49" charset="0"/>
+              </a:rPr>
+              <a:t>this</a:t>
+            </a:r>
+            <a:r>
+              <a:rPr lang="en-US" dirty="0" err="1">
+                <a:solidFill>
+                  <a:srgbClr val="D4D4D4"/>
+                </a:solidFill>
+                <a:latin typeface="Consolas" panose="020B0609020204030204" pitchFamily="49" charset="0"/>
+              </a:rPr>
+              <a:t>.</a:t>
+            </a:r>
+            <a:r>
+              <a:rPr lang="en-US" dirty="0" err="1">
+                <a:solidFill>
+                  <a:srgbClr val="9CDCFE"/>
+                </a:solidFill>
+                <a:latin typeface="Consolas" panose="020B0609020204030204" pitchFamily="49" charset="0"/>
+              </a:rPr>
+              <a:t>onClick</a:t>
+            </a:r>
+            <a:r>
+              <a:rPr lang="en-US" dirty="0">
+                <a:solidFill>
+                  <a:srgbClr val="569CD6"/>
+                </a:solidFill>
+                <a:latin typeface="Consolas" panose="020B0609020204030204" pitchFamily="49" charset="0"/>
+              </a:rPr>
+              <a:t>}</a:t>
+            </a:r>
+            <a:r>
+              <a:rPr lang="en-US" dirty="0">
+                <a:solidFill>
+                  <a:srgbClr val="808080"/>
+                </a:solidFill>
+                <a:latin typeface="Consolas" panose="020B0609020204030204" pitchFamily="49" charset="0"/>
+              </a:rPr>
+              <a:t>&gt;</a:t>
+            </a:r>
+            <a:r>
+              <a:rPr lang="en-US" dirty="0">
+                <a:solidFill>
+                  <a:srgbClr val="D4D4D4"/>
+                </a:solidFill>
+                <a:latin typeface="Consolas" panose="020B0609020204030204" pitchFamily="49" charset="0"/>
+              </a:rPr>
+              <a:t> Click me </a:t>
+            </a:r>
+            <a:r>
+              <a:rPr lang="en-US" dirty="0">
+                <a:solidFill>
+                  <a:srgbClr val="808080"/>
+                </a:solidFill>
+                <a:latin typeface="Consolas" panose="020B0609020204030204" pitchFamily="49" charset="0"/>
+              </a:rPr>
+              <a:t>&lt;/</a:t>
+            </a:r>
+            <a:r>
+              <a:rPr lang="en-US" dirty="0">
+                <a:solidFill>
+                  <a:srgbClr val="569CD6"/>
+                </a:solidFill>
+                <a:latin typeface="Consolas" panose="020B0609020204030204" pitchFamily="49" charset="0"/>
+              </a:rPr>
+              <a:t>a</a:t>
+            </a:r>
+            <a:r>
+              <a:rPr lang="en-US" dirty="0">
+                <a:solidFill>
+                  <a:srgbClr val="808080"/>
+                </a:solidFill>
+                <a:latin typeface="Consolas" panose="020B0609020204030204" pitchFamily="49" charset="0"/>
+              </a:rPr>
+              <a:t>&gt;</a:t>
+            </a:r>
+            <a:endParaRPr lang="en-US" b="0" dirty="0">
+              <a:solidFill>
+                <a:srgbClr val="D4D4D4"/>
+              </a:solidFill>
+              <a:effectLst/>
+              <a:latin typeface="Consolas" panose="020B0609020204030204" pitchFamily="49" charset="0"/>
+            </a:endParaRPr>
+          </a:p>
+        </p:txBody>
+      </p:sp>
+      <p:sp>
+        <p:nvSpPr>
+          <p:cNvPr id="5" name="Prostokąt 4">
+            <a:extLst>
+              <a:ext uri="{FF2B5EF4-FFF2-40B4-BE49-F238E27FC236}">
+                <a16:creationId xmlns:a16="http://schemas.microsoft.com/office/drawing/2014/main" id="{D074BFB7-B5BB-4192-9CF3-58E501CC7D02}"/>
+              </a:ext>
+            </a:extLst>
+          </p:cNvPr>
+          <p:cNvSpPr/>
+          <p:nvPr/>
+        </p:nvSpPr>
+        <p:spPr>
+          <a:xfrm>
+            <a:off x="497840" y="1530628"/>
+            <a:ext cx="4108174" cy="1200329"/>
+          </a:xfrm>
+          <a:prstGeom prst="rect">
+            <a:avLst/>
+          </a:prstGeom>
+          <a:solidFill>
+            <a:schemeClr val="tx1"/>
+          </a:solidFill>
+        </p:spPr>
+        <p:txBody>
+          <a:bodyPr wrap="square">
+            <a:spAutoFit/>
+          </a:bodyPr>
+          <a:lstStyle/>
+          <a:p>
+            <a:r>
+              <a:rPr lang="pl-PL" dirty="0">
+                <a:solidFill>
+                  <a:srgbClr val="D4D4D4"/>
+                </a:solidFill>
+                <a:latin typeface="Consolas" panose="020B0609020204030204" pitchFamily="49" charset="0"/>
+              </a:rPr>
+              <a:t>    </a:t>
+            </a:r>
+            <a:r>
+              <a:rPr lang="pl-PL" dirty="0" err="1">
+                <a:solidFill>
+                  <a:srgbClr val="DCDCAA"/>
+                </a:solidFill>
+                <a:latin typeface="Consolas" panose="020B0609020204030204" pitchFamily="49" charset="0"/>
+              </a:rPr>
+              <a:t>onClick</a:t>
+            </a:r>
+            <a:r>
+              <a:rPr lang="pl-PL" dirty="0">
+                <a:solidFill>
+                  <a:srgbClr val="D4D4D4"/>
+                </a:solidFill>
+                <a:latin typeface="Consolas" panose="020B0609020204030204" pitchFamily="49" charset="0"/>
+              </a:rPr>
+              <a:t>(</a:t>
+            </a:r>
+            <a:r>
+              <a:rPr lang="pl-PL" dirty="0">
+                <a:solidFill>
+                  <a:srgbClr val="9CDCFE"/>
+                </a:solidFill>
+                <a:latin typeface="Consolas" panose="020B0609020204030204" pitchFamily="49" charset="0"/>
+              </a:rPr>
+              <a:t>e</a:t>
+            </a:r>
+            <a:r>
+              <a:rPr lang="pl-PL" dirty="0">
+                <a:solidFill>
+                  <a:srgbClr val="D4D4D4"/>
+                </a:solidFill>
+                <a:latin typeface="Consolas" panose="020B0609020204030204" pitchFamily="49" charset="0"/>
+              </a:rPr>
+              <a:t>) {</a:t>
+            </a:r>
+          </a:p>
+          <a:p>
+            <a:r>
+              <a:rPr lang="pl-PL" dirty="0">
+                <a:solidFill>
+                  <a:srgbClr val="D4D4D4"/>
+                </a:solidFill>
+                <a:latin typeface="Consolas" panose="020B0609020204030204" pitchFamily="49" charset="0"/>
+              </a:rPr>
+              <a:t>        </a:t>
+            </a:r>
+            <a:r>
+              <a:rPr lang="pl-PL" dirty="0" err="1">
+                <a:solidFill>
+                  <a:srgbClr val="9CDCFE"/>
+                </a:solidFill>
+                <a:latin typeface="Consolas" panose="020B0609020204030204" pitchFamily="49" charset="0"/>
+              </a:rPr>
+              <a:t>e</a:t>
+            </a:r>
+            <a:r>
+              <a:rPr lang="pl-PL" dirty="0" err="1">
+                <a:solidFill>
+                  <a:srgbClr val="D4D4D4"/>
+                </a:solidFill>
+                <a:latin typeface="Consolas" panose="020B0609020204030204" pitchFamily="49" charset="0"/>
+              </a:rPr>
+              <a:t>.</a:t>
+            </a:r>
+            <a:r>
+              <a:rPr lang="pl-PL" dirty="0" err="1">
+                <a:solidFill>
+                  <a:srgbClr val="DCDCAA"/>
+                </a:solidFill>
+                <a:latin typeface="Consolas" panose="020B0609020204030204" pitchFamily="49" charset="0"/>
+              </a:rPr>
+              <a:t>preventDefault</a:t>
+            </a:r>
+            <a:r>
+              <a:rPr lang="pl-PL" dirty="0">
+                <a:solidFill>
+                  <a:srgbClr val="D4D4D4"/>
+                </a:solidFill>
+                <a:latin typeface="Consolas" panose="020B0609020204030204" pitchFamily="49" charset="0"/>
+              </a:rPr>
+              <a:t>();</a:t>
+            </a:r>
+          </a:p>
+          <a:p>
+            <a:r>
+              <a:rPr lang="pl-PL" dirty="0">
+                <a:solidFill>
+                  <a:srgbClr val="D4D4D4"/>
+                </a:solidFill>
+                <a:latin typeface="Consolas" panose="020B0609020204030204" pitchFamily="49" charset="0"/>
+              </a:rPr>
+              <a:t>        </a:t>
+            </a:r>
+            <a:r>
+              <a:rPr lang="pl-PL" dirty="0">
+                <a:solidFill>
+                  <a:srgbClr val="DCDCAA"/>
+                </a:solidFill>
+                <a:latin typeface="Consolas" panose="020B0609020204030204" pitchFamily="49" charset="0"/>
+              </a:rPr>
+              <a:t>alert</a:t>
+            </a:r>
+            <a:r>
+              <a:rPr lang="pl-PL" dirty="0">
+                <a:solidFill>
+                  <a:srgbClr val="D4D4D4"/>
+                </a:solidFill>
+                <a:latin typeface="Consolas" panose="020B0609020204030204" pitchFamily="49" charset="0"/>
+              </a:rPr>
+              <a:t>(</a:t>
+            </a:r>
+            <a:r>
+              <a:rPr lang="pl-PL" dirty="0">
+                <a:solidFill>
+                  <a:srgbClr val="CE9178"/>
+                </a:solidFill>
+                <a:latin typeface="Consolas" panose="020B0609020204030204" pitchFamily="49" charset="0"/>
+              </a:rPr>
+              <a:t>"</a:t>
+            </a:r>
+            <a:r>
+              <a:rPr lang="pl-PL" dirty="0" err="1">
+                <a:solidFill>
+                  <a:srgbClr val="CE9178"/>
+                </a:solidFill>
+                <a:latin typeface="Consolas" panose="020B0609020204030204" pitchFamily="49" charset="0"/>
+              </a:rPr>
+              <a:t>clicked</a:t>
+            </a:r>
+            <a:r>
+              <a:rPr lang="pl-PL" dirty="0">
+                <a:solidFill>
+                  <a:srgbClr val="CE9178"/>
+                </a:solidFill>
+                <a:latin typeface="Consolas" panose="020B0609020204030204" pitchFamily="49" charset="0"/>
+              </a:rPr>
+              <a:t>"</a:t>
+            </a:r>
+            <a:r>
+              <a:rPr lang="pl-PL" dirty="0">
+                <a:solidFill>
+                  <a:srgbClr val="D4D4D4"/>
+                </a:solidFill>
+                <a:latin typeface="Consolas" panose="020B0609020204030204" pitchFamily="49" charset="0"/>
+              </a:rPr>
+              <a:t>);</a:t>
+            </a:r>
+          </a:p>
+          <a:p>
+            <a:r>
+              <a:rPr lang="pl-PL" dirty="0">
+                <a:solidFill>
+                  <a:srgbClr val="D4D4D4"/>
+                </a:solidFill>
+                <a:latin typeface="Consolas" panose="020B0609020204030204" pitchFamily="49" charset="0"/>
+              </a:rPr>
+              <a:t>    }</a:t>
+            </a:r>
+            <a:endParaRPr lang="pl-PL" b="0" dirty="0">
+              <a:solidFill>
+                <a:srgbClr val="D4D4D4"/>
+              </a:solidFill>
+              <a:effectLst/>
+              <a:latin typeface="Consolas" panose="020B0609020204030204" pitchFamily="49" charset="0"/>
+            </a:endParaRPr>
+          </a:p>
+        </p:txBody>
+      </p:sp>
+      <p:sp>
+        <p:nvSpPr>
+          <p:cNvPr id="6" name="Prostokąt 5">
+            <a:extLst>
+              <a:ext uri="{FF2B5EF4-FFF2-40B4-BE49-F238E27FC236}">
+                <a16:creationId xmlns:a16="http://schemas.microsoft.com/office/drawing/2014/main" id="{0B18B279-4870-42DD-9307-D25BF32A56E2}"/>
+              </a:ext>
+            </a:extLst>
+          </p:cNvPr>
+          <p:cNvSpPr/>
+          <p:nvPr/>
+        </p:nvSpPr>
+        <p:spPr>
+          <a:xfrm>
+            <a:off x="497840" y="3526879"/>
+            <a:ext cx="6221012" cy="1200329"/>
+          </a:xfrm>
+          <a:prstGeom prst="rect">
+            <a:avLst/>
+          </a:prstGeom>
+          <a:solidFill>
+            <a:schemeClr val="tx1"/>
+          </a:solidFill>
+        </p:spPr>
+        <p:txBody>
+          <a:bodyPr wrap="square">
+            <a:spAutoFit/>
+          </a:bodyPr>
+          <a:lstStyle/>
+          <a:p>
+            <a:r>
+              <a:rPr lang="en-US" dirty="0">
+                <a:solidFill>
+                  <a:srgbClr val="D4D4D4"/>
+                </a:solidFill>
+                <a:latin typeface="Consolas" panose="020B0609020204030204" pitchFamily="49" charset="0"/>
+              </a:rPr>
+              <a:t>    </a:t>
+            </a:r>
+            <a:r>
+              <a:rPr lang="en-US" dirty="0">
+                <a:solidFill>
+                  <a:srgbClr val="569CD6"/>
+                </a:solidFill>
+                <a:latin typeface="Consolas" panose="020B0609020204030204" pitchFamily="49" charset="0"/>
+              </a:rPr>
+              <a:t>constructor</a:t>
+            </a:r>
+            <a:r>
+              <a:rPr lang="en-US" dirty="0">
+                <a:solidFill>
+                  <a:srgbClr val="D4D4D4"/>
+                </a:solidFill>
+                <a:latin typeface="Consolas" panose="020B0609020204030204" pitchFamily="49" charset="0"/>
+              </a:rPr>
+              <a:t>(</a:t>
+            </a:r>
+            <a:r>
+              <a:rPr lang="en-US" dirty="0">
+                <a:solidFill>
+                  <a:srgbClr val="9CDCFE"/>
+                </a:solidFill>
+                <a:latin typeface="Consolas" panose="020B0609020204030204" pitchFamily="49" charset="0"/>
+              </a:rPr>
+              <a:t>props</a:t>
+            </a:r>
+            <a:r>
+              <a:rPr lang="en-US" dirty="0">
+                <a:solidFill>
+                  <a:srgbClr val="D4D4D4"/>
+                </a:solidFill>
+                <a:latin typeface="Consolas" panose="020B0609020204030204" pitchFamily="49" charset="0"/>
+              </a:rPr>
+              <a:t>) {</a:t>
+            </a:r>
+          </a:p>
+          <a:p>
+            <a:r>
+              <a:rPr lang="en-US" dirty="0">
+                <a:solidFill>
+                  <a:srgbClr val="D4D4D4"/>
+                </a:solidFill>
+                <a:latin typeface="Consolas" panose="020B0609020204030204" pitchFamily="49" charset="0"/>
+              </a:rPr>
+              <a:t>        </a:t>
+            </a:r>
+            <a:r>
+              <a:rPr lang="en-US" dirty="0">
+                <a:solidFill>
+                  <a:srgbClr val="569CD6"/>
+                </a:solidFill>
+                <a:latin typeface="Consolas" panose="020B0609020204030204" pitchFamily="49" charset="0"/>
+              </a:rPr>
+              <a:t>super</a:t>
+            </a:r>
+            <a:r>
+              <a:rPr lang="en-US" dirty="0">
+                <a:solidFill>
+                  <a:srgbClr val="D4D4D4"/>
+                </a:solidFill>
+                <a:latin typeface="Consolas" panose="020B0609020204030204" pitchFamily="49" charset="0"/>
+              </a:rPr>
+              <a:t>(</a:t>
+            </a:r>
+            <a:r>
+              <a:rPr lang="en-US" dirty="0">
+                <a:solidFill>
+                  <a:srgbClr val="9CDCFE"/>
+                </a:solidFill>
+                <a:latin typeface="Consolas" panose="020B0609020204030204" pitchFamily="49" charset="0"/>
+              </a:rPr>
+              <a:t>props</a:t>
+            </a:r>
+            <a:r>
+              <a:rPr lang="en-US" dirty="0">
+                <a:solidFill>
+                  <a:srgbClr val="D4D4D4"/>
+                </a:solidFill>
+                <a:latin typeface="Consolas" panose="020B0609020204030204" pitchFamily="49" charset="0"/>
+              </a:rPr>
+              <a:t>);</a:t>
+            </a:r>
+          </a:p>
+          <a:p>
+            <a:r>
+              <a:rPr lang="en-US" dirty="0">
+                <a:solidFill>
+                  <a:srgbClr val="D4D4D4"/>
+                </a:solidFill>
+                <a:latin typeface="Consolas" panose="020B0609020204030204" pitchFamily="49" charset="0"/>
+              </a:rPr>
+              <a:t>        </a:t>
+            </a:r>
+            <a:r>
+              <a:rPr lang="en-US" dirty="0" err="1">
+                <a:solidFill>
+                  <a:srgbClr val="569CD6"/>
+                </a:solidFill>
+                <a:latin typeface="Consolas" panose="020B0609020204030204" pitchFamily="49" charset="0"/>
+              </a:rPr>
+              <a:t>this</a:t>
+            </a:r>
+            <a:r>
+              <a:rPr lang="en-US" dirty="0" err="1">
+                <a:solidFill>
+                  <a:srgbClr val="D4D4D4"/>
+                </a:solidFill>
+                <a:latin typeface="Consolas" panose="020B0609020204030204" pitchFamily="49" charset="0"/>
+              </a:rPr>
+              <a:t>.</a:t>
+            </a:r>
+            <a:r>
+              <a:rPr lang="en-US" dirty="0" err="1">
+                <a:solidFill>
+                  <a:srgbClr val="9CDCFE"/>
+                </a:solidFill>
+                <a:latin typeface="Consolas" panose="020B0609020204030204" pitchFamily="49" charset="0"/>
+              </a:rPr>
+              <a:t>onClick</a:t>
+            </a:r>
+            <a:r>
+              <a:rPr lang="en-US" dirty="0">
+                <a:solidFill>
+                  <a:srgbClr val="D4D4D4"/>
+                </a:solidFill>
+                <a:latin typeface="Consolas" panose="020B0609020204030204" pitchFamily="49" charset="0"/>
+              </a:rPr>
+              <a:t> = </a:t>
+            </a:r>
+            <a:r>
+              <a:rPr lang="en-US" dirty="0" err="1">
+                <a:solidFill>
+                  <a:srgbClr val="569CD6"/>
+                </a:solidFill>
+                <a:latin typeface="Consolas" panose="020B0609020204030204" pitchFamily="49" charset="0"/>
+              </a:rPr>
+              <a:t>this</a:t>
+            </a:r>
+            <a:r>
+              <a:rPr lang="en-US" dirty="0" err="1">
+                <a:solidFill>
+                  <a:srgbClr val="D4D4D4"/>
+                </a:solidFill>
+                <a:latin typeface="Consolas" panose="020B0609020204030204" pitchFamily="49" charset="0"/>
+              </a:rPr>
+              <a:t>.</a:t>
+            </a:r>
+            <a:r>
+              <a:rPr lang="en-US" dirty="0" err="1">
+                <a:solidFill>
+                  <a:srgbClr val="9CDCFE"/>
+                </a:solidFill>
+                <a:latin typeface="Consolas" panose="020B0609020204030204" pitchFamily="49" charset="0"/>
+              </a:rPr>
+              <a:t>onClick</a:t>
+            </a:r>
+            <a:r>
+              <a:rPr lang="en-US" dirty="0" err="1">
+                <a:solidFill>
+                  <a:srgbClr val="D4D4D4"/>
+                </a:solidFill>
+                <a:latin typeface="Consolas" panose="020B0609020204030204" pitchFamily="49" charset="0"/>
+              </a:rPr>
+              <a:t>.</a:t>
+            </a:r>
+            <a:r>
+              <a:rPr lang="en-US" dirty="0" err="1">
+                <a:solidFill>
+                  <a:srgbClr val="DCDCAA"/>
+                </a:solidFill>
+                <a:latin typeface="Consolas" panose="020B0609020204030204" pitchFamily="49" charset="0"/>
+              </a:rPr>
+              <a:t>bind</a:t>
+            </a:r>
+            <a:r>
+              <a:rPr lang="en-US" dirty="0">
+                <a:solidFill>
+                  <a:srgbClr val="D4D4D4"/>
+                </a:solidFill>
+                <a:latin typeface="Consolas" panose="020B0609020204030204" pitchFamily="49" charset="0"/>
+              </a:rPr>
+              <a:t>(</a:t>
+            </a:r>
+            <a:r>
+              <a:rPr lang="en-US" dirty="0">
+                <a:solidFill>
+                  <a:srgbClr val="569CD6"/>
+                </a:solidFill>
+                <a:latin typeface="Consolas" panose="020B0609020204030204" pitchFamily="49" charset="0"/>
+              </a:rPr>
+              <a:t>this</a:t>
+            </a:r>
+            <a:r>
+              <a:rPr lang="en-US" dirty="0">
+                <a:solidFill>
+                  <a:srgbClr val="D4D4D4"/>
+                </a:solidFill>
+                <a:latin typeface="Consolas" panose="020B0609020204030204" pitchFamily="49" charset="0"/>
+              </a:rPr>
+              <a:t>);</a:t>
+            </a:r>
+          </a:p>
+          <a:p>
+            <a:r>
+              <a:rPr lang="en-US" dirty="0">
+                <a:solidFill>
+                  <a:srgbClr val="D4D4D4"/>
+                </a:solidFill>
+                <a:latin typeface="Consolas" panose="020B0609020204030204" pitchFamily="49" charset="0"/>
+              </a:rPr>
+              <a:t>    }</a:t>
+            </a:r>
+            <a:endParaRPr lang="en-US" b="0" dirty="0">
+              <a:solidFill>
+                <a:srgbClr val="D4D4D4"/>
+              </a:solidFill>
+              <a:effectLst/>
+              <a:latin typeface="Consolas" panose="020B0609020204030204" pitchFamily="49" charset="0"/>
+            </a:endParaRPr>
+          </a:p>
+        </p:txBody>
+      </p:sp>
+      <p:sp>
+        <p:nvSpPr>
+          <p:cNvPr id="18" name="pole tekstowe 17">
+            <a:extLst>
+              <a:ext uri="{FF2B5EF4-FFF2-40B4-BE49-F238E27FC236}">
+                <a16:creationId xmlns:a16="http://schemas.microsoft.com/office/drawing/2014/main" id="{9A9F47FB-0B9E-4802-A972-50555230406F}"/>
+              </a:ext>
+            </a:extLst>
+          </p:cNvPr>
+          <p:cNvSpPr txBox="1"/>
+          <p:nvPr/>
+        </p:nvSpPr>
+        <p:spPr>
+          <a:xfrm>
+            <a:off x="497840" y="3059668"/>
+            <a:ext cx="5052665" cy="369332"/>
+          </a:xfrm>
+          <a:prstGeom prst="rect">
+            <a:avLst/>
+          </a:prstGeom>
+          <a:noFill/>
+        </p:spPr>
+        <p:txBody>
+          <a:bodyPr wrap="none" rtlCol="0">
+            <a:spAutoFit/>
+          </a:bodyPr>
+          <a:lstStyle/>
+          <a:p>
+            <a:r>
+              <a:rPr lang="pl-PL" dirty="0"/>
+              <a:t>In order to </a:t>
+            </a:r>
+            <a:r>
+              <a:rPr lang="pl-PL" dirty="0" err="1"/>
+              <a:t>have</a:t>
+            </a:r>
+            <a:r>
+              <a:rPr lang="pl-PL" dirty="0"/>
+              <a:t> </a:t>
+            </a:r>
+            <a:r>
+              <a:rPr lang="pl-PL" dirty="0" err="1"/>
+              <a:t>access</a:t>
+            </a:r>
+            <a:r>
+              <a:rPr lang="pl-PL" dirty="0"/>
+              <a:t> to </a:t>
+            </a:r>
+            <a:r>
+              <a:rPr lang="pl-PL" dirty="0" err="1"/>
+              <a:t>this</a:t>
+            </a:r>
+            <a:r>
+              <a:rPr lang="pl-PL" dirty="0"/>
+              <a:t> in </a:t>
+            </a:r>
+            <a:r>
+              <a:rPr lang="pl-PL" dirty="0" err="1"/>
+              <a:t>function</a:t>
+            </a:r>
+            <a:r>
+              <a:rPr lang="pl-PL" dirty="0"/>
+              <a:t> – </a:t>
+            </a:r>
+            <a:r>
+              <a:rPr lang="pl-PL" dirty="0" err="1"/>
+              <a:t>option</a:t>
+            </a:r>
+            <a:r>
+              <a:rPr lang="pl-PL" dirty="0"/>
+              <a:t> 1</a:t>
+            </a:r>
+          </a:p>
+        </p:txBody>
+      </p:sp>
+      <p:sp>
+        <p:nvSpPr>
+          <p:cNvPr id="7" name="Prostokąt 6">
+            <a:extLst>
+              <a:ext uri="{FF2B5EF4-FFF2-40B4-BE49-F238E27FC236}">
+                <a16:creationId xmlns:a16="http://schemas.microsoft.com/office/drawing/2014/main" id="{E5BB61A4-0863-4DA3-844D-CABB88079BEF}"/>
+              </a:ext>
+            </a:extLst>
+          </p:cNvPr>
+          <p:cNvSpPr/>
+          <p:nvPr/>
+        </p:nvSpPr>
+        <p:spPr>
+          <a:xfrm>
+            <a:off x="7150431" y="3526879"/>
+            <a:ext cx="4392213" cy="1200329"/>
+          </a:xfrm>
+          <a:prstGeom prst="rect">
+            <a:avLst/>
+          </a:prstGeom>
+          <a:solidFill>
+            <a:schemeClr val="tx1"/>
+          </a:solidFill>
+        </p:spPr>
+        <p:txBody>
+          <a:bodyPr wrap="square">
+            <a:spAutoFit/>
+          </a:bodyPr>
+          <a:lstStyle/>
+          <a:p>
+            <a:r>
+              <a:rPr lang="pl-PL" dirty="0" err="1">
+                <a:solidFill>
+                  <a:srgbClr val="DCDCAA"/>
+                </a:solidFill>
+                <a:latin typeface="Consolas" panose="020B0609020204030204" pitchFamily="49" charset="0"/>
+              </a:rPr>
+              <a:t>onClick</a:t>
+            </a:r>
+            <a:r>
+              <a:rPr lang="pl-PL" dirty="0">
+                <a:solidFill>
+                  <a:srgbClr val="D4D4D4"/>
+                </a:solidFill>
+                <a:latin typeface="Consolas" panose="020B0609020204030204" pitchFamily="49" charset="0"/>
+              </a:rPr>
+              <a:t> = (</a:t>
+            </a:r>
+            <a:r>
+              <a:rPr lang="pl-PL" dirty="0">
+                <a:solidFill>
+                  <a:srgbClr val="9CDCFE"/>
+                </a:solidFill>
+                <a:latin typeface="Consolas" panose="020B0609020204030204" pitchFamily="49" charset="0"/>
+              </a:rPr>
+              <a:t>e</a:t>
+            </a:r>
+            <a:r>
+              <a:rPr lang="pl-PL" dirty="0">
+                <a:solidFill>
+                  <a:srgbClr val="D4D4D4"/>
+                </a:solidFill>
+                <a:latin typeface="Consolas" panose="020B0609020204030204" pitchFamily="49" charset="0"/>
+              </a:rPr>
+              <a:t>) </a:t>
+            </a:r>
+            <a:r>
+              <a:rPr lang="pl-PL" dirty="0">
+                <a:solidFill>
+                  <a:srgbClr val="569CD6"/>
+                </a:solidFill>
+                <a:latin typeface="Consolas" panose="020B0609020204030204" pitchFamily="49" charset="0"/>
+              </a:rPr>
+              <a:t>=&gt;</a:t>
+            </a:r>
+            <a:r>
+              <a:rPr lang="pl-PL" dirty="0">
+                <a:solidFill>
+                  <a:srgbClr val="D4D4D4"/>
+                </a:solidFill>
+                <a:latin typeface="Consolas" panose="020B0609020204030204" pitchFamily="49" charset="0"/>
+              </a:rPr>
+              <a:t> {</a:t>
+            </a:r>
+          </a:p>
+          <a:p>
+            <a:r>
+              <a:rPr lang="pl-PL" dirty="0">
+                <a:solidFill>
+                  <a:srgbClr val="D4D4D4"/>
+                </a:solidFill>
+                <a:latin typeface="Consolas" panose="020B0609020204030204" pitchFamily="49" charset="0"/>
+              </a:rPr>
+              <a:t>    </a:t>
+            </a:r>
+            <a:r>
+              <a:rPr lang="pl-PL" dirty="0" err="1">
+                <a:solidFill>
+                  <a:srgbClr val="9CDCFE"/>
+                </a:solidFill>
+                <a:latin typeface="Consolas" panose="020B0609020204030204" pitchFamily="49" charset="0"/>
+              </a:rPr>
+              <a:t>e</a:t>
+            </a:r>
+            <a:r>
+              <a:rPr lang="pl-PL" dirty="0" err="1">
+                <a:solidFill>
+                  <a:srgbClr val="D4D4D4"/>
+                </a:solidFill>
+                <a:latin typeface="Consolas" panose="020B0609020204030204" pitchFamily="49" charset="0"/>
+              </a:rPr>
+              <a:t>.</a:t>
+            </a:r>
+            <a:r>
+              <a:rPr lang="pl-PL" dirty="0" err="1">
+                <a:solidFill>
+                  <a:srgbClr val="DCDCAA"/>
+                </a:solidFill>
+                <a:latin typeface="Consolas" panose="020B0609020204030204" pitchFamily="49" charset="0"/>
+              </a:rPr>
+              <a:t>preventDefault</a:t>
+            </a:r>
+            <a:r>
+              <a:rPr lang="pl-PL" dirty="0">
+                <a:solidFill>
+                  <a:srgbClr val="D4D4D4"/>
+                </a:solidFill>
+                <a:latin typeface="Consolas" panose="020B0609020204030204" pitchFamily="49" charset="0"/>
+              </a:rPr>
+              <a:t>();</a:t>
+            </a:r>
+          </a:p>
+          <a:p>
+            <a:r>
+              <a:rPr lang="pl-PL" dirty="0">
+                <a:solidFill>
+                  <a:srgbClr val="D4D4D4"/>
+                </a:solidFill>
+                <a:latin typeface="Consolas" panose="020B0609020204030204" pitchFamily="49" charset="0"/>
+              </a:rPr>
+              <a:t>    </a:t>
+            </a:r>
+            <a:r>
+              <a:rPr lang="pl-PL" dirty="0">
+                <a:solidFill>
+                  <a:srgbClr val="4EC9B0"/>
+                </a:solidFill>
+                <a:latin typeface="Consolas" panose="020B0609020204030204" pitchFamily="49" charset="0"/>
+              </a:rPr>
+              <a:t>console</a:t>
+            </a:r>
+            <a:r>
+              <a:rPr lang="pl-PL" dirty="0">
+                <a:solidFill>
+                  <a:srgbClr val="D4D4D4"/>
+                </a:solidFill>
+                <a:latin typeface="Consolas" panose="020B0609020204030204" pitchFamily="49" charset="0"/>
+              </a:rPr>
+              <a:t>.</a:t>
+            </a:r>
+            <a:r>
+              <a:rPr lang="pl-PL" dirty="0">
+                <a:solidFill>
+                  <a:srgbClr val="DCDCAA"/>
+                </a:solidFill>
+                <a:latin typeface="Consolas" panose="020B0609020204030204" pitchFamily="49" charset="0"/>
+              </a:rPr>
+              <a:t>log</a:t>
+            </a:r>
+            <a:r>
+              <a:rPr lang="pl-PL" dirty="0">
+                <a:solidFill>
+                  <a:srgbClr val="D4D4D4"/>
+                </a:solidFill>
+                <a:latin typeface="Consolas" panose="020B0609020204030204" pitchFamily="49" charset="0"/>
+              </a:rPr>
+              <a:t>(</a:t>
+            </a:r>
+            <a:r>
+              <a:rPr lang="pl-PL" dirty="0" err="1">
+                <a:solidFill>
+                  <a:srgbClr val="569CD6"/>
+                </a:solidFill>
+                <a:latin typeface="Consolas" panose="020B0609020204030204" pitchFamily="49" charset="0"/>
+              </a:rPr>
+              <a:t>this</a:t>
+            </a:r>
+            <a:r>
+              <a:rPr lang="pl-PL" dirty="0">
+                <a:solidFill>
+                  <a:srgbClr val="D4D4D4"/>
+                </a:solidFill>
+                <a:latin typeface="Consolas" panose="020B0609020204030204" pitchFamily="49" charset="0"/>
+              </a:rPr>
+              <a:t>);</a:t>
+            </a:r>
+          </a:p>
+          <a:p>
+            <a:r>
+              <a:rPr lang="pl-PL" dirty="0">
+                <a:solidFill>
+                  <a:srgbClr val="D4D4D4"/>
+                </a:solidFill>
+                <a:latin typeface="Consolas" panose="020B0609020204030204" pitchFamily="49" charset="0"/>
+              </a:rPr>
+              <a:t>}</a:t>
+            </a:r>
+            <a:endParaRPr lang="pl-PL" b="0" dirty="0">
+              <a:solidFill>
+                <a:srgbClr val="D4D4D4"/>
+              </a:solidFill>
+              <a:effectLst/>
+              <a:latin typeface="Consolas" panose="020B0609020204030204" pitchFamily="49" charset="0"/>
+            </a:endParaRPr>
+          </a:p>
+        </p:txBody>
+      </p:sp>
+      <p:sp>
+        <p:nvSpPr>
+          <p:cNvPr id="19" name="pole tekstowe 18">
+            <a:extLst>
+              <a:ext uri="{FF2B5EF4-FFF2-40B4-BE49-F238E27FC236}">
+                <a16:creationId xmlns:a16="http://schemas.microsoft.com/office/drawing/2014/main" id="{46C105B9-37D2-4100-86E8-C2E9FA11F3E0}"/>
+              </a:ext>
+            </a:extLst>
+          </p:cNvPr>
+          <p:cNvSpPr txBox="1"/>
+          <p:nvPr/>
+        </p:nvSpPr>
+        <p:spPr>
+          <a:xfrm>
+            <a:off x="7150431" y="3059668"/>
+            <a:ext cx="1001172" cy="369332"/>
+          </a:xfrm>
+          <a:prstGeom prst="rect">
+            <a:avLst/>
+          </a:prstGeom>
+          <a:noFill/>
+        </p:spPr>
+        <p:txBody>
+          <a:bodyPr wrap="none" rtlCol="0">
+            <a:spAutoFit/>
+          </a:bodyPr>
+          <a:lstStyle/>
+          <a:p>
+            <a:r>
+              <a:rPr lang="pl-PL" dirty="0"/>
+              <a:t>Option 2</a:t>
+            </a:r>
+          </a:p>
+        </p:txBody>
+      </p:sp>
+      <p:sp>
+        <p:nvSpPr>
+          <p:cNvPr id="8" name="Prostokąt 7">
+            <a:extLst>
+              <a:ext uri="{FF2B5EF4-FFF2-40B4-BE49-F238E27FC236}">
+                <a16:creationId xmlns:a16="http://schemas.microsoft.com/office/drawing/2014/main" id="{0AC4213D-A6BF-4E82-BDF6-EE6625C6AEFC}"/>
+              </a:ext>
+            </a:extLst>
+          </p:cNvPr>
+          <p:cNvSpPr/>
+          <p:nvPr/>
+        </p:nvSpPr>
+        <p:spPr>
+          <a:xfrm>
+            <a:off x="497839" y="5512107"/>
+            <a:ext cx="8354613" cy="369332"/>
+          </a:xfrm>
+          <a:prstGeom prst="rect">
+            <a:avLst/>
+          </a:prstGeom>
+          <a:solidFill>
+            <a:schemeClr val="tx1"/>
+          </a:solidFill>
+        </p:spPr>
+        <p:txBody>
+          <a:bodyPr wrap="square">
+            <a:spAutoFit/>
+          </a:bodyPr>
+          <a:lstStyle/>
+          <a:p>
+            <a:r>
+              <a:rPr lang="pl-PL" dirty="0">
+                <a:solidFill>
+                  <a:srgbClr val="D4D4D4"/>
+                </a:solidFill>
+                <a:latin typeface="Consolas" panose="020B0609020204030204" pitchFamily="49" charset="0"/>
+              </a:rPr>
+              <a:t> </a:t>
+            </a:r>
+            <a:r>
+              <a:rPr lang="pl-PL" dirty="0">
+                <a:solidFill>
+                  <a:srgbClr val="808080"/>
+                </a:solidFill>
+                <a:latin typeface="Consolas" panose="020B0609020204030204" pitchFamily="49" charset="0"/>
+              </a:rPr>
+              <a:t>&lt;</a:t>
+            </a:r>
+            <a:r>
+              <a:rPr lang="pl-PL" dirty="0">
+                <a:solidFill>
+                  <a:srgbClr val="569CD6"/>
+                </a:solidFill>
+                <a:latin typeface="Consolas" panose="020B0609020204030204" pitchFamily="49" charset="0"/>
+              </a:rPr>
+              <a:t>a</a:t>
+            </a:r>
+            <a:r>
+              <a:rPr lang="pl-PL" dirty="0">
+                <a:solidFill>
+                  <a:srgbClr val="D4D4D4"/>
+                </a:solidFill>
+                <a:latin typeface="Consolas" panose="020B0609020204030204" pitchFamily="49" charset="0"/>
+              </a:rPr>
+              <a:t> </a:t>
+            </a:r>
+            <a:r>
+              <a:rPr lang="pl-PL" dirty="0" err="1">
+                <a:solidFill>
+                  <a:srgbClr val="9CDCFE"/>
+                </a:solidFill>
+                <a:latin typeface="Consolas" panose="020B0609020204030204" pitchFamily="49" charset="0"/>
+              </a:rPr>
+              <a:t>href</a:t>
+            </a:r>
+            <a:r>
+              <a:rPr lang="pl-PL" dirty="0">
+                <a:solidFill>
+                  <a:srgbClr val="D4D4D4"/>
+                </a:solidFill>
+                <a:latin typeface="Consolas" panose="020B0609020204030204" pitchFamily="49" charset="0"/>
+              </a:rPr>
+              <a:t>=</a:t>
+            </a:r>
+            <a:r>
+              <a:rPr lang="pl-PL" dirty="0">
+                <a:solidFill>
+                  <a:srgbClr val="CE9178"/>
+                </a:solidFill>
+                <a:latin typeface="Consolas" panose="020B0609020204030204" pitchFamily="49" charset="0"/>
+              </a:rPr>
+              <a:t>"#"</a:t>
+            </a:r>
+            <a:r>
+              <a:rPr lang="pl-PL" dirty="0">
+                <a:solidFill>
+                  <a:srgbClr val="D4D4D4"/>
+                </a:solidFill>
+                <a:latin typeface="Consolas" panose="020B0609020204030204" pitchFamily="49" charset="0"/>
+              </a:rPr>
+              <a:t> </a:t>
+            </a:r>
+            <a:r>
+              <a:rPr lang="pl-PL" dirty="0" err="1">
+                <a:solidFill>
+                  <a:srgbClr val="9CDCFE"/>
+                </a:solidFill>
+                <a:latin typeface="Consolas" panose="020B0609020204030204" pitchFamily="49" charset="0"/>
+              </a:rPr>
+              <a:t>onClick</a:t>
+            </a:r>
+            <a:r>
+              <a:rPr lang="pl-PL" dirty="0">
+                <a:solidFill>
+                  <a:srgbClr val="D4D4D4"/>
+                </a:solidFill>
+                <a:latin typeface="Consolas" panose="020B0609020204030204" pitchFamily="49" charset="0"/>
+              </a:rPr>
+              <a:t>=</a:t>
+            </a:r>
+            <a:r>
+              <a:rPr lang="pl-PL" dirty="0">
+                <a:solidFill>
+                  <a:srgbClr val="569CD6"/>
+                </a:solidFill>
+                <a:latin typeface="Consolas" panose="020B0609020204030204" pitchFamily="49" charset="0"/>
+              </a:rPr>
+              <a:t>{</a:t>
+            </a:r>
+            <a:r>
+              <a:rPr lang="pl-PL" dirty="0">
+                <a:solidFill>
+                  <a:srgbClr val="D4D4D4"/>
+                </a:solidFill>
+                <a:latin typeface="Consolas" panose="020B0609020204030204" pitchFamily="49" charset="0"/>
+              </a:rPr>
+              <a:t>(</a:t>
+            </a:r>
+            <a:r>
+              <a:rPr lang="pl-PL" dirty="0">
+                <a:solidFill>
+                  <a:srgbClr val="9CDCFE"/>
+                </a:solidFill>
+                <a:latin typeface="Consolas" panose="020B0609020204030204" pitchFamily="49" charset="0"/>
+              </a:rPr>
+              <a:t>e</a:t>
+            </a:r>
+            <a:r>
+              <a:rPr lang="pl-PL" dirty="0">
+                <a:solidFill>
+                  <a:srgbClr val="D4D4D4"/>
+                </a:solidFill>
+                <a:latin typeface="Consolas" panose="020B0609020204030204" pitchFamily="49" charset="0"/>
+              </a:rPr>
+              <a:t>) </a:t>
+            </a:r>
+            <a:r>
+              <a:rPr lang="pl-PL" dirty="0">
+                <a:solidFill>
+                  <a:srgbClr val="569CD6"/>
+                </a:solidFill>
+                <a:latin typeface="Consolas" panose="020B0609020204030204" pitchFamily="49" charset="0"/>
+              </a:rPr>
+              <a:t>=&gt;</a:t>
+            </a:r>
+            <a:r>
+              <a:rPr lang="pl-PL" dirty="0">
+                <a:solidFill>
+                  <a:srgbClr val="D4D4D4"/>
+                </a:solidFill>
+                <a:latin typeface="Consolas" panose="020B0609020204030204" pitchFamily="49" charset="0"/>
+              </a:rPr>
+              <a:t> </a:t>
+            </a:r>
+            <a:r>
+              <a:rPr lang="pl-PL" dirty="0" err="1">
+                <a:solidFill>
+                  <a:srgbClr val="569CD6"/>
+                </a:solidFill>
+                <a:latin typeface="Consolas" panose="020B0609020204030204" pitchFamily="49" charset="0"/>
+              </a:rPr>
+              <a:t>this</a:t>
+            </a:r>
+            <a:r>
+              <a:rPr lang="pl-PL" dirty="0" err="1">
+                <a:solidFill>
+                  <a:srgbClr val="D4D4D4"/>
+                </a:solidFill>
+                <a:latin typeface="Consolas" panose="020B0609020204030204" pitchFamily="49" charset="0"/>
+              </a:rPr>
+              <a:t>.</a:t>
+            </a:r>
+            <a:r>
+              <a:rPr lang="pl-PL" dirty="0" err="1">
+                <a:solidFill>
+                  <a:srgbClr val="DCDCAA"/>
+                </a:solidFill>
+                <a:latin typeface="Consolas" panose="020B0609020204030204" pitchFamily="49" charset="0"/>
+              </a:rPr>
+              <a:t>onClick</a:t>
+            </a:r>
+            <a:r>
+              <a:rPr lang="pl-PL" dirty="0">
+                <a:solidFill>
+                  <a:srgbClr val="D4D4D4"/>
+                </a:solidFill>
+                <a:latin typeface="Consolas" panose="020B0609020204030204" pitchFamily="49" charset="0"/>
+              </a:rPr>
+              <a:t>(</a:t>
+            </a:r>
+            <a:r>
+              <a:rPr lang="pl-PL" dirty="0">
+                <a:solidFill>
+                  <a:srgbClr val="9CDCFE"/>
+                </a:solidFill>
+                <a:latin typeface="Consolas" panose="020B0609020204030204" pitchFamily="49" charset="0"/>
+              </a:rPr>
+              <a:t>e</a:t>
+            </a:r>
+            <a:r>
+              <a:rPr lang="pl-PL" dirty="0">
+                <a:solidFill>
+                  <a:srgbClr val="D4D4D4"/>
+                </a:solidFill>
+                <a:latin typeface="Consolas" panose="020B0609020204030204" pitchFamily="49" charset="0"/>
+              </a:rPr>
+              <a:t>, </a:t>
+            </a:r>
+            <a:r>
+              <a:rPr lang="pl-PL" dirty="0">
+                <a:solidFill>
+                  <a:srgbClr val="B5CEA8"/>
+                </a:solidFill>
+                <a:latin typeface="Consolas" panose="020B0609020204030204" pitchFamily="49" charset="0"/>
+              </a:rPr>
+              <a:t>2</a:t>
+            </a:r>
+            <a:r>
+              <a:rPr lang="pl-PL" dirty="0">
+                <a:solidFill>
+                  <a:srgbClr val="D4D4D4"/>
+                </a:solidFill>
+                <a:latin typeface="Consolas" panose="020B0609020204030204" pitchFamily="49" charset="0"/>
+              </a:rPr>
+              <a:t>)</a:t>
+            </a:r>
+            <a:r>
+              <a:rPr lang="pl-PL" dirty="0">
+                <a:solidFill>
+                  <a:srgbClr val="569CD6"/>
+                </a:solidFill>
+                <a:latin typeface="Consolas" panose="020B0609020204030204" pitchFamily="49" charset="0"/>
+              </a:rPr>
+              <a:t>}</a:t>
+            </a:r>
+            <a:r>
+              <a:rPr lang="pl-PL" dirty="0">
+                <a:solidFill>
+                  <a:srgbClr val="808080"/>
+                </a:solidFill>
+                <a:latin typeface="Consolas" panose="020B0609020204030204" pitchFamily="49" charset="0"/>
+              </a:rPr>
+              <a:t>&gt;</a:t>
+            </a:r>
+            <a:r>
+              <a:rPr lang="pl-PL" dirty="0">
+                <a:solidFill>
+                  <a:srgbClr val="D4D4D4"/>
+                </a:solidFill>
+                <a:latin typeface="Consolas" panose="020B0609020204030204" pitchFamily="49" charset="0"/>
+              </a:rPr>
+              <a:t> </a:t>
+            </a:r>
+            <a:r>
+              <a:rPr lang="pl-PL" dirty="0" err="1">
+                <a:solidFill>
+                  <a:srgbClr val="D4D4D4"/>
+                </a:solidFill>
+                <a:latin typeface="Consolas" panose="020B0609020204030204" pitchFamily="49" charset="0"/>
+              </a:rPr>
+              <a:t>Click</a:t>
+            </a:r>
+            <a:r>
+              <a:rPr lang="pl-PL" dirty="0">
+                <a:solidFill>
+                  <a:srgbClr val="D4D4D4"/>
+                </a:solidFill>
+                <a:latin typeface="Consolas" panose="020B0609020204030204" pitchFamily="49" charset="0"/>
+              </a:rPr>
+              <a:t> me</a:t>
+            </a:r>
+            <a:r>
+              <a:rPr lang="pl-PL" dirty="0">
+                <a:solidFill>
+                  <a:srgbClr val="808080"/>
+                </a:solidFill>
+                <a:latin typeface="Consolas" panose="020B0609020204030204" pitchFamily="49" charset="0"/>
+              </a:rPr>
+              <a:t>&lt;/</a:t>
+            </a:r>
+            <a:r>
+              <a:rPr lang="pl-PL" dirty="0">
+                <a:solidFill>
+                  <a:srgbClr val="569CD6"/>
+                </a:solidFill>
+                <a:latin typeface="Consolas" panose="020B0609020204030204" pitchFamily="49" charset="0"/>
+              </a:rPr>
+              <a:t>a</a:t>
+            </a:r>
+            <a:r>
+              <a:rPr lang="pl-PL" dirty="0">
+                <a:solidFill>
+                  <a:srgbClr val="808080"/>
+                </a:solidFill>
+                <a:latin typeface="Consolas" panose="020B0609020204030204" pitchFamily="49" charset="0"/>
+              </a:rPr>
+              <a:t>&gt;</a:t>
+            </a:r>
+            <a:endParaRPr lang="pl-PL" b="0" dirty="0">
+              <a:solidFill>
+                <a:srgbClr val="D4D4D4"/>
+              </a:solidFill>
+              <a:effectLst/>
+              <a:latin typeface="Consolas" panose="020B0609020204030204" pitchFamily="49" charset="0"/>
+            </a:endParaRPr>
+          </a:p>
+        </p:txBody>
+      </p:sp>
+      <p:sp>
+        <p:nvSpPr>
+          <p:cNvPr id="20" name="pole tekstowe 19">
+            <a:extLst>
+              <a:ext uri="{FF2B5EF4-FFF2-40B4-BE49-F238E27FC236}">
+                <a16:creationId xmlns:a16="http://schemas.microsoft.com/office/drawing/2014/main" id="{6E275BD9-03AC-4255-9B83-4F8BC532592D}"/>
+              </a:ext>
+            </a:extLst>
+          </p:cNvPr>
+          <p:cNvSpPr txBox="1"/>
+          <p:nvPr/>
+        </p:nvSpPr>
+        <p:spPr>
+          <a:xfrm>
+            <a:off x="497839" y="5083355"/>
+            <a:ext cx="3005310" cy="369332"/>
+          </a:xfrm>
+          <a:prstGeom prst="rect">
+            <a:avLst/>
+          </a:prstGeom>
+          <a:noFill/>
+        </p:spPr>
+        <p:txBody>
+          <a:bodyPr wrap="none" rtlCol="0">
+            <a:spAutoFit/>
+          </a:bodyPr>
+          <a:lstStyle/>
+          <a:p>
+            <a:r>
+              <a:rPr lang="pl-PL" dirty="0"/>
+              <a:t>Option 3 (+ </a:t>
+            </a:r>
+            <a:r>
+              <a:rPr lang="pl-PL" dirty="0" err="1"/>
+              <a:t>other</a:t>
+            </a:r>
+            <a:r>
+              <a:rPr lang="pl-PL" dirty="0"/>
+              <a:t> </a:t>
+            </a:r>
+            <a:r>
+              <a:rPr lang="pl-PL" dirty="0" err="1"/>
+              <a:t>parameters</a:t>
+            </a:r>
+            <a:r>
+              <a:rPr lang="pl-PL" dirty="0"/>
+              <a:t>)</a:t>
+            </a:r>
+          </a:p>
+        </p:txBody>
+      </p:sp>
+    </p:spTree>
+    <p:extLst>
+      <p:ext uri="{BB962C8B-B14F-4D97-AF65-F5344CB8AC3E}">
+        <p14:creationId xmlns:p14="http://schemas.microsoft.com/office/powerpoint/2010/main" val="771983450"/>
       </p:ext>
     </p:extLst>
   </p:cSld>

</xml_diff>

<commit_message>
Exercise 8 - show list
</commit_message>
<xml_diff>
--- a/tutorial/ReactjsTraining.pptx
+++ b/tutorial/ReactjsTraining.pptx
@@ -5,7 +5,7 @@
     <p:sldMasterId id="2147483648" r:id="rId1"/>
   </p:sldMasterIdLst>
   <p:notesMasterIdLst>
-    <p:notesMasterId r:id="rId15"/>
+    <p:notesMasterId r:id="rId16"/>
   </p:notesMasterIdLst>
   <p:sldIdLst>
     <p:sldId id="256" r:id="rId2"/>
@@ -21,6 +21,7 @@
     <p:sldId id="266" r:id="rId12"/>
     <p:sldId id="267" r:id="rId13"/>
     <p:sldId id="268" r:id="rId14"/>
+    <p:sldId id="269" r:id="rId15"/>
   </p:sldIdLst>
   <p:sldSz cx="12192000" cy="6858000"/>
   <p:notesSz cx="6858000" cy="9144000"/>
@@ -2015,10 +2016,10 @@
                 <a:ea typeface="+mn-ea"/>
                 <a:cs typeface="+mn-cs"/>
               </a:rPr>
-              <a:t> 7: Jeżeli </a:t>
-            </a:r>
-            <a:r>
-              <a:rPr lang="pl-PL" sz="1200" b="0" i="0" kern="1200">
+              <a:t> 7: Jeżeli zastopowaliśmy kwadrat to zamiast niego powinniśmy wyświetlać "</a:t>
+            </a:r>
+            <a:r>
+              <a:rPr lang="pl-PL" sz="1200" b="0" i="0" kern="1200" dirty="0" err="1">
                 <a:solidFill>
                   <a:schemeClr val="tx1"/>
                 </a:solidFill>
@@ -2027,7 +2028,7 @@
                 <a:ea typeface="+mn-ea"/>
                 <a:cs typeface="+mn-cs"/>
               </a:rPr>
-              <a:t>zastopowaliśmy kwadrat </a:t>
+              <a:t>Please</a:t>
             </a:r>
             <a:r>
               <a:rPr lang="pl-PL" sz="1200" b="0" i="0" kern="1200" dirty="0">
@@ -2039,7 +2040,7 @@
                 <a:ea typeface="+mn-ea"/>
                 <a:cs typeface="+mn-cs"/>
               </a:rPr>
-              <a:t>to zamiast niego powinniśmy wyświetlać "</a:t>
+              <a:t> </a:t>
             </a:r>
             <a:r>
               <a:rPr lang="pl-PL" sz="1200" b="0" i="0" kern="1200" dirty="0" err="1">
@@ -2051,7 +2052,7 @@
                 <a:ea typeface="+mn-ea"/>
                 <a:cs typeface="+mn-cs"/>
               </a:rPr>
-              <a:t>Please</a:t>
+              <a:t>click</a:t>
             </a:r>
             <a:r>
               <a:rPr lang="pl-PL" sz="1200" b="0" i="0" kern="1200" dirty="0">
@@ -2075,7 +2076,7 @@
                 <a:ea typeface="+mn-ea"/>
                 <a:cs typeface="+mn-cs"/>
               </a:rPr>
-              <a:t>click</a:t>
+              <a:t>button</a:t>
             </a:r>
             <a:r>
               <a:rPr lang="pl-PL" sz="1200" b="0" i="0" kern="1200" dirty="0">
@@ -2087,10 +2088,10 @@
                 <a:ea typeface="+mn-ea"/>
                 <a:cs typeface="+mn-cs"/>
               </a:rPr>
-              <a:t> </a:t>
-            </a:r>
-            <a:r>
-              <a:rPr lang="pl-PL" sz="1200" b="0" i="0" kern="1200" dirty="0" err="1">
+              <a:t>"</a:t>
+            </a:r>
+            <a:br>
+              <a:rPr lang="pl-PL" sz="1200" b="0" i="0" kern="1200" dirty="0">
                 <a:solidFill>
                   <a:schemeClr val="tx1"/>
                 </a:solidFill>
@@ -2099,8 +2100,7 @@
                 <a:ea typeface="+mn-ea"/>
                 <a:cs typeface="+mn-cs"/>
               </a:rPr>
-              <a:t>button</a:t>
-            </a:r>
+            </a:br>
             <a:r>
               <a:rPr lang="pl-PL" sz="1200" b="0" i="0" kern="1200" dirty="0">
                 <a:solidFill>
@@ -2111,8 +2111,105 @@
                 <a:ea typeface="+mn-ea"/>
                 <a:cs typeface="+mn-cs"/>
               </a:rPr>
-              <a:t>"</a:t>
-            </a:r>
+              <a:t>(</a:t>
+            </a:r>
+            <a:r>
+              <a:rPr lang="pl-PL" sz="1200" b="0" i="0" kern="1200" dirty="0" err="1">
+                <a:solidFill>
+                  <a:schemeClr val="tx1"/>
+                </a:solidFill>
+                <a:effectLst/>
+                <a:latin typeface="+mn-lt"/>
+                <a:ea typeface="+mn-ea"/>
+                <a:cs typeface="+mn-cs"/>
+              </a:rPr>
+              <a:t>commit</a:t>
+            </a:r>
+            <a:r>
+              <a:rPr lang="pl-PL" sz="1200" b="0" i="0" kern="1200" dirty="0">
+                <a:solidFill>
+                  <a:schemeClr val="tx1"/>
+                </a:solidFill>
+                <a:effectLst/>
+                <a:latin typeface="+mn-lt"/>
+                <a:ea typeface="+mn-ea"/>
+                <a:cs typeface="+mn-cs"/>
+              </a:rPr>
+              <a:t> jest pod </a:t>
+            </a:r>
+            <a:r>
+              <a:rPr lang="pl-PL" sz="1200" b="1" i="0" u="none" strike="noStrike" kern="1200" dirty="0" err="1">
+                <a:solidFill>
+                  <a:schemeClr val="tx1"/>
+                </a:solidFill>
+                <a:effectLst/>
+                <a:latin typeface="+mn-lt"/>
+                <a:ea typeface="+mn-ea"/>
+                <a:cs typeface="+mn-cs"/>
+                <a:hlinkClick r:id="rId3"/>
+              </a:rPr>
+              <a:t>Exercise</a:t>
+            </a:r>
+            <a:r>
+              <a:rPr lang="pl-PL" sz="1200" b="1" i="0" u="none" strike="noStrike" kern="1200" dirty="0">
+                <a:solidFill>
+                  <a:schemeClr val="tx1"/>
+                </a:solidFill>
+                <a:effectLst/>
+                <a:latin typeface="+mn-lt"/>
+                <a:ea typeface="+mn-ea"/>
+                <a:cs typeface="+mn-cs"/>
+                <a:hlinkClick r:id="rId3"/>
+              </a:rPr>
+              <a:t> 7: </a:t>
+            </a:r>
+            <a:r>
+              <a:rPr lang="pl-PL" sz="1200" b="1" i="0" u="none" strike="noStrike" kern="1200" dirty="0" err="1">
+                <a:solidFill>
+                  <a:schemeClr val="tx1"/>
+                </a:solidFill>
+                <a:effectLst/>
+                <a:latin typeface="+mn-lt"/>
+                <a:ea typeface="+mn-ea"/>
+                <a:cs typeface="+mn-cs"/>
+                <a:hlinkClick r:id="rId3"/>
+              </a:rPr>
+              <a:t>Events</a:t>
+            </a:r>
+            <a:r>
+              <a:rPr lang="pl-PL" sz="1200" b="0" i="0" kern="1200" dirty="0">
+                <a:solidFill>
+                  <a:schemeClr val="tx1"/>
+                </a:solidFill>
+                <a:effectLst/>
+                <a:latin typeface="+mn-lt"/>
+                <a:ea typeface="+mn-ea"/>
+                <a:cs typeface="+mn-cs"/>
+              </a:rPr>
+              <a:t> </a:t>
+            </a:r>
+            <a:r>
+              <a:rPr lang="pl-PL" sz="1200" b="0" i="0" kern="1200" dirty="0">
+                <a:solidFill>
+                  <a:schemeClr val="tx1"/>
+                </a:solidFill>
+                <a:effectLst/>
+                <a:latin typeface="+mn-lt"/>
+                <a:ea typeface="+mn-ea"/>
+                <a:cs typeface="+mn-cs"/>
+                <a:sym typeface="Wingdings" panose="05000000000000000000" pitchFamily="2" charset="2"/>
+              </a:rPr>
+              <a:t> )</a:t>
+            </a:r>
+            <a:endParaRPr lang="pl-PL" sz="1200" b="0" i="0" kern="1200" dirty="0">
+              <a:solidFill>
+                <a:schemeClr val="tx1"/>
+              </a:solidFill>
+              <a:effectLst/>
+              <a:latin typeface="+mn-lt"/>
+              <a:ea typeface="+mn-ea"/>
+              <a:cs typeface="+mn-cs"/>
+            </a:endParaRPr>
           </a:p>
         </p:txBody>
       </p:sp>
@@ -2143,6 +2240,423 @@
     <p:extLst>
       <p:ext uri="{BB962C8B-B14F-4D97-AF65-F5344CB8AC3E}">
         <p14:creationId xmlns:p14="http://schemas.microsoft.com/office/powerpoint/2010/main" val="1557107717"/>
+      </p:ext>
+    </p:extLst>
+  </p:cSld>
+  <p:clrMapOvr>
+    <a:masterClrMapping/>
+  </p:clrMapOvr>
+</p:notes>
+</file>
+
+<file path=ppt/notesSlides/notesSlide14.xml><?xml version="1.0" encoding="utf-8"?>
+<p:notes xmlns:a="http://schemas.openxmlformats.org/drawingml/2006/main" xmlns:r="http://schemas.openxmlformats.org/officeDocument/2006/relationships" xmlns:p="http://schemas.openxmlformats.org/presentationml/2006/main">
+  <p:cSld>
+    <p:spTree>
+      <p:nvGrpSpPr>
+        <p:cNvPr id="1" name=""/>
+        <p:cNvGrpSpPr/>
+        <p:nvPr/>
+      </p:nvGrpSpPr>
+      <p:grpSpPr>
+        <a:xfrm>
+          <a:off x="0" y="0"/>
+          <a:ext cx="0" cy="0"/>
+          <a:chOff x="0" y="0"/>
+          <a:chExt cx="0" cy="0"/>
+        </a:xfrm>
+      </p:grpSpPr>
+      <p:sp>
+        <p:nvSpPr>
+          <p:cNvPr id="2" name="Symbol zastępczy obrazu slajdu 1"/>
+          <p:cNvSpPr>
+            <a:spLocks noGrp="1" noRot="1" noChangeAspect="1"/>
+          </p:cNvSpPr>
+          <p:nvPr>
+            <p:ph type="sldImg"/>
+          </p:nvPr>
+        </p:nvSpPr>
+        <p:spPr/>
+      </p:sp>
+      <p:sp>
+        <p:nvSpPr>
+          <p:cNvPr id="3" name="Symbol zastępczy notatek 2"/>
+          <p:cNvSpPr>
+            <a:spLocks noGrp="1"/>
+          </p:cNvSpPr>
+          <p:nvPr>
+            <p:ph type="body" idx="1"/>
+          </p:nvPr>
+        </p:nvSpPr>
+        <p:spPr/>
+        <p:txBody>
+          <a:bodyPr/>
+          <a:lstStyle/>
+          <a:p>
+            <a:pPr marL="0" indent="0">
+              <a:buFontTx/>
+              <a:buNone/>
+            </a:pPr>
+            <a:r>
+              <a:rPr lang="pl-PL" sz="1200" b="0" i="0" kern="1200" dirty="0">
+                <a:solidFill>
+                  <a:schemeClr val="tx1"/>
+                </a:solidFill>
+                <a:effectLst/>
+                <a:latin typeface="+mn-lt"/>
+                <a:ea typeface="+mn-ea"/>
+                <a:cs typeface="+mn-cs"/>
+              </a:rPr>
+              <a:t>(dodać, że przykład z dokumentacji)</a:t>
+            </a:r>
+            <a:br>
+              <a:rPr lang="pl-PL" sz="1200" b="0" i="0" kern="1200" dirty="0">
+                <a:solidFill>
+                  <a:schemeClr val="tx1"/>
+                </a:solidFill>
+                <a:effectLst/>
+                <a:latin typeface="+mn-lt"/>
+                <a:ea typeface="+mn-ea"/>
+                <a:cs typeface="+mn-cs"/>
+              </a:rPr>
+            </a:br>
+            <a:r>
+              <a:rPr lang="pl-PL" sz="1200" b="0" i="0" kern="1200" dirty="0">
+                <a:solidFill>
+                  <a:schemeClr val="tx1"/>
+                </a:solidFill>
+                <a:effectLst/>
+                <a:latin typeface="+mn-lt"/>
+                <a:ea typeface="+mn-ea"/>
+                <a:cs typeface="+mn-cs"/>
+              </a:rPr>
+              <a:t>1. Wspomnieć o index</a:t>
+            </a:r>
+          </a:p>
+          <a:p>
+            <a:pPr marL="0" indent="0">
+              <a:buFontTx/>
+              <a:buNone/>
+            </a:pPr>
+            <a:r>
+              <a:rPr lang="pl-PL" sz="1200" b="0" i="0" kern="1200" dirty="0">
+                <a:solidFill>
+                  <a:schemeClr val="tx1"/>
+                </a:solidFill>
+                <a:effectLst/>
+                <a:latin typeface="+mn-lt"/>
+                <a:ea typeface="+mn-ea"/>
+                <a:cs typeface="+mn-cs"/>
+              </a:rPr>
+              <a:t>2. Każdy element li czy </a:t>
+            </a:r>
+            <a:r>
+              <a:rPr lang="pl-PL" sz="1200" b="0" i="0" kern="1200" dirty="0" err="1">
+                <a:solidFill>
+                  <a:schemeClr val="tx1"/>
+                </a:solidFill>
+                <a:effectLst/>
+                <a:latin typeface="+mn-lt"/>
+                <a:ea typeface="+mn-ea"/>
+                <a:cs typeface="+mn-cs"/>
+              </a:rPr>
+              <a:t>tr</a:t>
+            </a:r>
+            <a:r>
+              <a:rPr lang="pl-PL" sz="1200" b="0" i="0" kern="1200" dirty="0">
+                <a:solidFill>
+                  <a:schemeClr val="tx1"/>
+                </a:solidFill>
+                <a:effectLst/>
+                <a:latin typeface="+mn-lt"/>
+                <a:ea typeface="+mn-ea"/>
+                <a:cs typeface="+mn-cs"/>
+              </a:rPr>
+              <a:t> powinien mieć </a:t>
+            </a:r>
+            <a:r>
+              <a:rPr lang="pl-PL" sz="1200" b="0" i="0" kern="1200" dirty="0" err="1">
+                <a:solidFill>
+                  <a:schemeClr val="tx1"/>
+                </a:solidFill>
+                <a:effectLst/>
+                <a:latin typeface="+mn-lt"/>
+                <a:ea typeface="+mn-ea"/>
+                <a:cs typeface="+mn-cs"/>
+              </a:rPr>
+              <a:t>key</a:t>
+            </a:r>
+            <a:endParaRPr lang="pl-PL" sz="1200" b="0" i="0" kern="1200" dirty="0">
+              <a:solidFill>
+                <a:schemeClr val="tx1"/>
+              </a:solidFill>
+              <a:effectLst/>
+              <a:latin typeface="+mn-lt"/>
+              <a:ea typeface="+mn-ea"/>
+              <a:cs typeface="+mn-cs"/>
+            </a:endParaRPr>
+          </a:p>
+          <a:p>
+            <a:pPr marL="0" marR="0" lvl="0" indent="0" algn="l" defTabSz="914400" rtl="0" eaLnBrk="1" fontAlgn="auto" latinLnBrk="0" hangingPunct="1">
+              <a:lnSpc>
+                <a:spcPct val="100000"/>
+              </a:lnSpc>
+              <a:spcBef>
+                <a:spcPts val="0"/>
+              </a:spcBef>
+              <a:spcAft>
+                <a:spcPts val="0"/>
+              </a:spcAft>
+              <a:buClrTx/>
+              <a:buSzTx/>
+              <a:buFontTx/>
+              <a:buNone/>
+              <a:tabLst/>
+              <a:defRPr/>
+            </a:pPr>
+            <a:r>
+              <a:rPr lang="pl-PL" sz="1200" b="0" i="0" kern="1200" dirty="0">
+                <a:solidFill>
+                  <a:schemeClr val="tx1"/>
+                </a:solidFill>
+                <a:effectLst/>
+                <a:latin typeface="+mn-lt"/>
+                <a:ea typeface="+mn-ea"/>
+                <a:cs typeface="+mn-cs"/>
+              </a:rPr>
+              <a:t>3. </a:t>
+            </a:r>
+            <a:r>
+              <a:rPr lang="pl-PL" sz="1200" b="1" i="0" kern="1200" dirty="0">
+                <a:solidFill>
+                  <a:schemeClr val="tx1"/>
+                </a:solidFill>
+                <a:effectLst/>
+                <a:latin typeface="+mn-lt"/>
+                <a:ea typeface="+mn-ea"/>
+                <a:cs typeface="+mn-cs"/>
+              </a:rPr>
+              <a:t>Klucze muszą być unikalne tylko wśród rodzeństwa (możemy użyć tych samych dla dwóch </a:t>
+            </a:r>
+            <a:r>
+              <a:rPr lang="pl-PL" sz="1200" b="1" i="0" kern="1200">
+                <a:solidFill>
+                  <a:schemeClr val="tx1"/>
+                </a:solidFill>
+                <a:effectLst/>
+                <a:latin typeface="+mn-lt"/>
+                <a:ea typeface="+mn-ea"/>
+                <a:cs typeface="+mn-cs"/>
+              </a:rPr>
+              <a:t>globalnych tablic)</a:t>
+            </a:r>
+          </a:p>
+          <a:p>
+            <a:pPr marL="0" indent="0">
+              <a:buFontTx/>
+              <a:buNone/>
+            </a:pPr>
+            <a:endParaRPr lang="pl-PL" sz="1200" b="0" i="0" kern="1200" dirty="0">
+              <a:solidFill>
+                <a:schemeClr val="tx1"/>
+              </a:solidFill>
+              <a:effectLst/>
+              <a:latin typeface="+mn-lt"/>
+              <a:ea typeface="+mn-ea"/>
+              <a:cs typeface="+mn-cs"/>
+            </a:endParaRPr>
+          </a:p>
+          <a:p>
+            <a:pPr marL="0" indent="0">
+              <a:buFontTx/>
+              <a:buNone/>
+            </a:pPr>
+            <a:endParaRPr lang="pl-PL" sz="1200" b="0" i="0" kern="1200" dirty="0">
+              <a:solidFill>
+                <a:schemeClr val="tx1"/>
+              </a:solidFill>
+              <a:effectLst/>
+              <a:latin typeface="+mn-lt"/>
+              <a:ea typeface="+mn-ea"/>
+              <a:cs typeface="+mn-cs"/>
+            </a:endParaRPr>
+          </a:p>
+          <a:p>
+            <a:pPr marL="0" indent="0">
+              <a:buFontTx/>
+              <a:buNone/>
+            </a:pPr>
+            <a:r>
+              <a:rPr lang="pl-PL" sz="1200" b="0" i="0" kern="1200" dirty="0" err="1">
+                <a:solidFill>
+                  <a:schemeClr val="tx1"/>
+                </a:solidFill>
+                <a:effectLst/>
+                <a:latin typeface="+mn-lt"/>
+                <a:ea typeface="+mn-ea"/>
+                <a:cs typeface="+mn-cs"/>
+              </a:rPr>
+              <a:t>Exercise</a:t>
+            </a:r>
+            <a:r>
+              <a:rPr lang="pl-PL" sz="1200" b="0" i="0" kern="1200" dirty="0">
+                <a:solidFill>
+                  <a:schemeClr val="tx1"/>
+                </a:solidFill>
+                <a:effectLst/>
+                <a:latin typeface="+mn-lt"/>
+                <a:ea typeface="+mn-ea"/>
+                <a:cs typeface="+mn-cs"/>
+              </a:rPr>
+              <a:t> 8: Wyświetlić listę (</a:t>
+            </a:r>
+            <a:r>
+              <a:rPr lang="pl-PL" sz="1200" b="0" i="0" kern="1200" dirty="0" err="1">
+                <a:solidFill>
+                  <a:schemeClr val="tx1"/>
+                </a:solidFill>
+                <a:effectLst/>
+                <a:latin typeface="+mn-lt"/>
+                <a:ea typeface="+mn-ea"/>
+                <a:cs typeface="+mn-cs"/>
+              </a:rPr>
+              <a:t>json</a:t>
+            </a:r>
+            <a:r>
+              <a:rPr lang="pl-PL" sz="1200" b="0" i="0" kern="1200" dirty="0">
+                <a:solidFill>
+                  <a:schemeClr val="tx1"/>
+                </a:solidFill>
+                <a:effectLst/>
+                <a:latin typeface="+mn-lt"/>
+                <a:ea typeface="+mn-ea"/>
+                <a:cs typeface="+mn-cs"/>
+              </a:rPr>
+              <a:t> w </a:t>
+            </a:r>
+            <a:r>
+              <a:rPr lang="pl-PL" sz="1200" b="0" i="0" kern="1200" dirty="0" err="1">
+                <a:solidFill>
+                  <a:schemeClr val="tx1"/>
+                </a:solidFill>
+                <a:effectLst/>
+                <a:latin typeface="+mn-lt"/>
+                <a:ea typeface="+mn-ea"/>
+                <a:cs typeface="+mn-cs"/>
+              </a:rPr>
+              <a:t>readme</a:t>
+            </a:r>
+            <a:r>
+              <a:rPr lang="pl-PL" sz="1200" b="0" i="0" kern="1200" dirty="0">
+                <a:solidFill>
+                  <a:schemeClr val="tx1"/>
+                </a:solidFill>
+                <a:effectLst/>
+                <a:latin typeface="+mn-lt"/>
+                <a:ea typeface="+mn-ea"/>
+                <a:cs typeface="+mn-cs"/>
+              </a:rPr>
+              <a:t>), przypisać index </a:t>
+            </a:r>
+            <a:r>
+              <a:rPr lang="pl-PL" sz="1200" b="0" i="0" kern="1200" dirty="0" err="1">
+                <a:solidFill>
+                  <a:schemeClr val="tx1"/>
+                </a:solidFill>
+                <a:effectLst/>
+                <a:latin typeface="+mn-lt"/>
+                <a:ea typeface="+mn-ea"/>
+                <a:cs typeface="+mn-cs"/>
+              </a:rPr>
+              <a:t>key</a:t>
+            </a:r>
+            <a:r>
+              <a:rPr lang="pl-PL" sz="1200" b="0" i="0" kern="1200" dirty="0">
+                <a:solidFill>
+                  <a:schemeClr val="tx1"/>
+                </a:solidFill>
+                <a:effectLst/>
+                <a:latin typeface="+mn-lt"/>
+                <a:ea typeface="+mn-ea"/>
+                <a:cs typeface="+mn-cs"/>
+              </a:rPr>
+              <a:t> do id i </a:t>
+            </a:r>
+            <a:r>
+              <a:rPr lang="pl-PL" sz="1200" b="0" i="0" kern="1200" dirty="0" err="1">
+                <a:solidFill>
+                  <a:schemeClr val="tx1"/>
+                </a:solidFill>
+                <a:effectLst/>
+                <a:latin typeface="+mn-lt"/>
+                <a:ea typeface="+mn-ea"/>
+                <a:cs typeface="+mn-cs"/>
+              </a:rPr>
+              <a:t>key</a:t>
+            </a:r>
+            <a:r>
+              <a:rPr lang="pl-PL" sz="1200" b="0" i="0" kern="1200" dirty="0">
+                <a:solidFill>
+                  <a:schemeClr val="tx1"/>
+                </a:solidFill>
+                <a:effectLst/>
+                <a:latin typeface="+mn-lt"/>
+                <a:ea typeface="+mn-ea"/>
+                <a:cs typeface="+mn-cs"/>
+              </a:rPr>
+              <a:t> każdego wiersza. Użyć </a:t>
+            </a:r>
+            <a:r>
+              <a:rPr lang="pl-PL" sz="1200" b="0" i="0" kern="1200" dirty="0" err="1">
+                <a:solidFill>
+                  <a:schemeClr val="tx1"/>
+                </a:solidFill>
+                <a:effectLst/>
+                <a:latin typeface="+mn-lt"/>
+                <a:ea typeface="+mn-ea"/>
+                <a:cs typeface="+mn-cs"/>
+              </a:rPr>
+              <a:t>bootstrapa</a:t>
+            </a:r>
+            <a:endParaRPr lang="pl-PL" sz="1200" b="0" i="0" kern="1200" dirty="0">
+              <a:solidFill>
+                <a:schemeClr val="tx1"/>
+              </a:solidFill>
+              <a:effectLst/>
+              <a:latin typeface="+mn-lt"/>
+              <a:ea typeface="+mn-ea"/>
+              <a:cs typeface="+mn-cs"/>
+            </a:endParaRPr>
+          </a:p>
+        </p:txBody>
+      </p:sp>
+      <p:sp>
+        <p:nvSpPr>
+          <p:cNvPr id="4" name="Symbol zastępczy numeru slajdu 3"/>
+          <p:cNvSpPr>
+            <a:spLocks noGrp="1"/>
+          </p:cNvSpPr>
+          <p:nvPr>
+            <p:ph type="sldNum" sz="quarter" idx="5"/>
+          </p:nvPr>
+        </p:nvSpPr>
+        <p:spPr/>
+        <p:txBody>
+          <a:bodyPr/>
+          <a:lstStyle/>
+          <a:p>
+            <a:fld id="{810A6612-7A23-4B98-B0E9-4F3C882AD2EF}" type="slidenum">
+              <a:rPr lang="pl-PL" smtClean="0"/>
+              <a:t>14</a:t>
+            </a:fld>
+            <a:endParaRPr lang="pl-PL"/>
+          </a:p>
+        </p:txBody>
+      </p:sp>
+    </p:spTree>
+    <p:extLst>
+      <p:ext uri="{BB962C8B-B14F-4D97-AF65-F5344CB8AC3E}">
+        <p14:creationId xmlns:p14="http://schemas.microsoft.com/office/powerpoint/2010/main" val="2248634197"/>
       </p:ext>
     </p:extLst>
   </p:cSld>
@@ -11528,6 +12042,1169 @@
     <p:extLst>
       <p:ext uri="{BB962C8B-B14F-4D97-AF65-F5344CB8AC3E}">
         <p14:creationId xmlns:p14="http://schemas.microsoft.com/office/powerpoint/2010/main" val="1567098157"/>
+      </p:ext>
+    </p:extLst>
+  </p:cSld>
+  <p:clrMapOvr>
+    <a:masterClrMapping/>
+  </p:clrMapOvr>
+</p:sld>
+</file>
+
+<file path=ppt/slides/slide14.xml><?xml version="1.0" encoding="utf-8"?>
+<p:sld xmlns:a="http://schemas.openxmlformats.org/drawingml/2006/main" xmlns:r="http://schemas.openxmlformats.org/officeDocument/2006/relationships" xmlns:p="http://schemas.openxmlformats.org/presentationml/2006/main">
+  <p:cSld>
+    <p:spTree>
+      <p:nvGrpSpPr>
+        <p:cNvPr id="1" name=""/>
+        <p:cNvGrpSpPr/>
+        <p:nvPr/>
+      </p:nvGrpSpPr>
+      <p:grpSpPr>
+        <a:xfrm>
+          <a:off x="0" y="0"/>
+          <a:ext cx="0" cy="0"/>
+          <a:chOff x="0" y="0"/>
+          <a:chExt cx="0" cy="0"/>
+        </a:xfrm>
+      </p:grpSpPr>
+      <p:sp>
+        <p:nvSpPr>
+          <p:cNvPr id="4" name="pole tekstowe 3">
+            <a:extLst>
+              <a:ext uri="{FF2B5EF4-FFF2-40B4-BE49-F238E27FC236}">
+                <a16:creationId xmlns:a16="http://schemas.microsoft.com/office/drawing/2014/main" id="{F164A7B3-8808-414C-9401-3B25194E3B5A}"/>
+              </a:ext>
+            </a:extLst>
+          </p:cNvPr>
+          <p:cNvSpPr txBox="1"/>
+          <p:nvPr/>
+        </p:nvSpPr>
+        <p:spPr>
+          <a:xfrm>
+            <a:off x="497840" y="538480"/>
+            <a:ext cx="1119024" cy="369332"/>
+          </a:xfrm>
+          <a:prstGeom prst="rect">
+            <a:avLst/>
+          </a:prstGeom>
+          <a:noFill/>
+        </p:spPr>
+        <p:txBody>
+          <a:bodyPr wrap="none" rtlCol="0">
+            <a:spAutoFit/>
+          </a:bodyPr>
+          <a:lstStyle/>
+          <a:p>
+            <a:r>
+              <a:rPr lang="pl-PL" dirty="0" err="1"/>
+              <a:t>React</a:t>
+            </a:r>
+            <a:r>
+              <a:rPr lang="pl-PL" dirty="0"/>
+              <a:t> </a:t>
+            </a:r>
+            <a:r>
+              <a:rPr lang="pl-PL" dirty="0" err="1"/>
+              <a:t>lists</a:t>
+            </a:r>
+            <a:endParaRPr lang="pl-PL" dirty="0"/>
+          </a:p>
+        </p:txBody>
+      </p:sp>
+      <p:sp>
+        <p:nvSpPr>
+          <p:cNvPr id="5" name="Prostokąt 4">
+            <a:extLst>
+              <a:ext uri="{FF2B5EF4-FFF2-40B4-BE49-F238E27FC236}">
+                <a16:creationId xmlns:a16="http://schemas.microsoft.com/office/drawing/2014/main" id="{60E0C930-E304-4C36-8245-B134B25A3CFF}"/>
+              </a:ext>
+            </a:extLst>
+          </p:cNvPr>
+          <p:cNvSpPr/>
+          <p:nvPr/>
+        </p:nvSpPr>
+        <p:spPr>
+          <a:xfrm>
+            <a:off x="2650432" y="2551837"/>
+            <a:ext cx="6891131" cy="1754326"/>
+          </a:xfrm>
+          <a:prstGeom prst="rect">
+            <a:avLst/>
+          </a:prstGeom>
+          <a:solidFill>
+            <a:schemeClr val="tx1"/>
+          </a:solidFill>
+        </p:spPr>
+        <p:txBody>
+          <a:bodyPr wrap="square">
+            <a:spAutoFit/>
+          </a:bodyPr>
+          <a:lstStyle/>
+          <a:p>
+            <a:r>
+              <a:rPr lang="en-US" dirty="0">
+                <a:solidFill>
+                  <a:srgbClr val="569CD6"/>
+                </a:solidFill>
+                <a:latin typeface="Consolas" panose="020B0609020204030204" pitchFamily="49" charset="0"/>
+              </a:rPr>
+              <a:t>const</a:t>
+            </a:r>
+            <a:r>
+              <a:rPr lang="en-US" dirty="0">
+                <a:solidFill>
+                  <a:srgbClr val="D4D4D4"/>
+                </a:solidFill>
+                <a:latin typeface="Consolas" panose="020B0609020204030204" pitchFamily="49" charset="0"/>
+              </a:rPr>
+              <a:t> </a:t>
+            </a:r>
+            <a:r>
+              <a:rPr lang="en-US" dirty="0">
+                <a:solidFill>
+                  <a:srgbClr val="9CDCFE"/>
+                </a:solidFill>
+                <a:latin typeface="Consolas" panose="020B0609020204030204" pitchFamily="49" charset="0"/>
+              </a:rPr>
+              <a:t>numbers</a:t>
+            </a:r>
+            <a:r>
+              <a:rPr lang="en-US" dirty="0">
+                <a:solidFill>
+                  <a:srgbClr val="D4D4D4"/>
+                </a:solidFill>
+                <a:latin typeface="Consolas" panose="020B0609020204030204" pitchFamily="49" charset="0"/>
+              </a:rPr>
+              <a:t> = [</a:t>
+            </a:r>
+            <a:r>
+              <a:rPr lang="en-US" dirty="0">
+                <a:solidFill>
+                  <a:srgbClr val="B5CEA8"/>
+                </a:solidFill>
+                <a:latin typeface="Consolas" panose="020B0609020204030204" pitchFamily="49" charset="0"/>
+              </a:rPr>
+              <a:t>1</a:t>
+            </a:r>
+            <a:r>
+              <a:rPr lang="en-US" dirty="0">
+                <a:solidFill>
+                  <a:srgbClr val="D4D4D4"/>
+                </a:solidFill>
+                <a:latin typeface="Consolas" panose="020B0609020204030204" pitchFamily="49" charset="0"/>
+              </a:rPr>
+              <a:t>, </a:t>
+            </a:r>
+            <a:r>
+              <a:rPr lang="en-US" dirty="0">
+                <a:solidFill>
+                  <a:srgbClr val="B5CEA8"/>
+                </a:solidFill>
+                <a:latin typeface="Consolas" panose="020B0609020204030204" pitchFamily="49" charset="0"/>
+              </a:rPr>
+              <a:t>2</a:t>
+            </a:r>
+            <a:r>
+              <a:rPr lang="en-US" dirty="0">
+                <a:solidFill>
+                  <a:srgbClr val="D4D4D4"/>
+                </a:solidFill>
+                <a:latin typeface="Consolas" panose="020B0609020204030204" pitchFamily="49" charset="0"/>
+              </a:rPr>
+              <a:t>, </a:t>
+            </a:r>
+            <a:r>
+              <a:rPr lang="en-US" dirty="0">
+                <a:solidFill>
+                  <a:srgbClr val="B5CEA8"/>
+                </a:solidFill>
+                <a:latin typeface="Consolas" panose="020B0609020204030204" pitchFamily="49" charset="0"/>
+              </a:rPr>
+              <a:t>3</a:t>
+            </a:r>
+            <a:r>
+              <a:rPr lang="en-US" dirty="0">
+                <a:solidFill>
+                  <a:srgbClr val="D4D4D4"/>
+                </a:solidFill>
+                <a:latin typeface="Consolas" panose="020B0609020204030204" pitchFamily="49" charset="0"/>
+              </a:rPr>
+              <a:t>, </a:t>
+            </a:r>
+            <a:r>
+              <a:rPr lang="en-US" dirty="0">
+                <a:solidFill>
+                  <a:srgbClr val="B5CEA8"/>
+                </a:solidFill>
+                <a:latin typeface="Consolas" panose="020B0609020204030204" pitchFamily="49" charset="0"/>
+              </a:rPr>
+              <a:t>4</a:t>
+            </a:r>
+            <a:r>
+              <a:rPr lang="en-US" dirty="0">
+                <a:solidFill>
+                  <a:srgbClr val="D4D4D4"/>
+                </a:solidFill>
+                <a:latin typeface="Consolas" panose="020B0609020204030204" pitchFamily="49" charset="0"/>
+              </a:rPr>
+              <a:t>, </a:t>
+            </a:r>
+            <a:r>
+              <a:rPr lang="en-US" dirty="0">
+                <a:solidFill>
+                  <a:srgbClr val="B5CEA8"/>
+                </a:solidFill>
+                <a:latin typeface="Consolas" panose="020B0609020204030204" pitchFamily="49" charset="0"/>
+              </a:rPr>
+              <a:t>5</a:t>
+            </a:r>
+            <a:r>
+              <a:rPr lang="en-US" dirty="0">
+                <a:solidFill>
+                  <a:srgbClr val="D4D4D4"/>
+                </a:solidFill>
+                <a:latin typeface="Consolas" panose="020B0609020204030204" pitchFamily="49" charset="0"/>
+              </a:rPr>
+              <a:t>];</a:t>
+            </a:r>
+          </a:p>
+          <a:p>
+            <a:r>
+              <a:rPr lang="en-US" dirty="0">
+                <a:solidFill>
+                  <a:srgbClr val="569CD6"/>
+                </a:solidFill>
+                <a:latin typeface="Consolas" panose="020B0609020204030204" pitchFamily="49" charset="0"/>
+              </a:rPr>
+              <a:t>const</a:t>
+            </a:r>
+            <a:r>
+              <a:rPr lang="en-US" dirty="0">
+                <a:solidFill>
+                  <a:srgbClr val="D4D4D4"/>
+                </a:solidFill>
+                <a:latin typeface="Consolas" panose="020B0609020204030204" pitchFamily="49" charset="0"/>
+              </a:rPr>
+              <a:t> </a:t>
+            </a:r>
+            <a:r>
+              <a:rPr lang="en-US" dirty="0" err="1">
+                <a:solidFill>
+                  <a:srgbClr val="9CDCFE"/>
+                </a:solidFill>
+                <a:latin typeface="Consolas" panose="020B0609020204030204" pitchFamily="49" charset="0"/>
+              </a:rPr>
+              <a:t>listItems</a:t>
+            </a:r>
+            <a:r>
+              <a:rPr lang="en-US" dirty="0">
+                <a:solidFill>
+                  <a:srgbClr val="D4D4D4"/>
+                </a:solidFill>
+                <a:latin typeface="Consolas" panose="020B0609020204030204" pitchFamily="49" charset="0"/>
+              </a:rPr>
+              <a:t> = </a:t>
+            </a:r>
+            <a:r>
+              <a:rPr lang="en-US" dirty="0" err="1">
+                <a:solidFill>
+                  <a:srgbClr val="9CDCFE"/>
+                </a:solidFill>
+                <a:latin typeface="Consolas" panose="020B0609020204030204" pitchFamily="49" charset="0"/>
+              </a:rPr>
+              <a:t>numbers</a:t>
+            </a:r>
+            <a:r>
+              <a:rPr lang="en-US" dirty="0" err="1">
+                <a:solidFill>
+                  <a:srgbClr val="D4D4D4"/>
+                </a:solidFill>
+                <a:latin typeface="Consolas" panose="020B0609020204030204" pitchFamily="49" charset="0"/>
+              </a:rPr>
+              <a:t>.</a:t>
+            </a:r>
+            <a:r>
+              <a:rPr lang="en-US" dirty="0" err="1">
+                <a:solidFill>
+                  <a:srgbClr val="DCDCAA"/>
+                </a:solidFill>
+                <a:latin typeface="Consolas" panose="020B0609020204030204" pitchFamily="49" charset="0"/>
+              </a:rPr>
+              <a:t>map</a:t>
+            </a:r>
+            <a:r>
+              <a:rPr lang="en-US" dirty="0">
+                <a:solidFill>
+                  <a:srgbClr val="D4D4D4"/>
+                </a:solidFill>
+                <a:latin typeface="Consolas" panose="020B0609020204030204" pitchFamily="49" charset="0"/>
+              </a:rPr>
+              <a:t>((</a:t>
+            </a:r>
+            <a:r>
+              <a:rPr lang="en-US" dirty="0" err="1">
+                <a:solidFill>
+                  <a:srgbClr val="9CDCFE"/>
+                </a:solidFill>
+                <a:latin typeface="Consolas" panose="020B0609020204030204" pitchFamily="49" charset="0"/>
+              </a:rPr>
+              <a:t>numer</a:t>
+            </a:r>
+            <a:r>
+              <a:rPr lang="pl-PL" dirty="0">
+                <a:solidFill>
+                  <a:srgbClr val="9CDCFE"/>
+                </a:solidFill>
+                <a:latin typeface="Consolas" panose="020B0609020204030204" pitchFamily="49" charset="0"/>
+              </a:rPr>
+              <a:t>, index</a:t>
+            </a:r>
+            <a:r>
+              <a:rPr lang="en-US" dirty="0">
+                <a:solidFill>
+                  <a:srgbClr val="D4D4D4"/>
+                </a:solidFill>
+                <a:latin typeface="Consolas" panose="020B0609020204030204" pitchFamily="49" charset="0"/>
+              </a:rPr>
+              <a:t>) </a:t>
+            </a:r>
+            <a:r>
+              <a:rPr lang="en-US" dirty="0">
+                <a:solidFill>
+                  <a:srgbClr val="569CD6"/>
+                </a:solidFill>
+                <a:latin typeface="Consolas" panose="020B0609020204030204" pitchFamily="49" charset="0"/>
+              </a:rPr>
+              <a:t>=&gt;</a:t>
+            </a:r>
+            <a:endParaRPr lang="en-US" dirty="0">
+              <a:solidFill>
+                <a:srgbClr val="D4D4D4"/>
+              </a:solidFill>
+              <a:latin typeface="Consolas" panose="020B0609020204030204" pitchFamily="49" charset="0"/>
+            </a:endParaRPr>
+          </a:p>
+          <a:p>
+            <a:r>
+              <a:rPr lang="en-US" dirty="0">
+                <a:solidFill>
+                  <a:srgbClr val="D4D4D4"/>
+                </a:solidFill>
+                <a:latin typeface="Consolas" panose="020B0609020204030204" pitchFamily="49" charset="0"/>
+              </a:rPr>
+              <a:t>  </a:t>
+            </a:r>
+            <a:r>
+              <a:rPr lang="en-US" dirty="0">
+                <a:solidFill>
+                  <a:srgbClr val="808080"/>
+                </a:solidFill>
+                <a:latin typeface="Consolas" panose="020B0609020204030204" pitchFamily="49" charset="0"/>
+              </a:rPr>
+              <a:t>&lt;</a:t>
+            </a:r>
+            <a:r>
+              <a:rPr lang="en-US" dirty="0">
+                <a:solidFill>
+                  <a:srgbClr val="569CD6"/>
+                </a:solidFill>
+                <a:latin typeface="Consolas" panose="020B0609020204030204" pitchFamily="49" charset="0"/>
+              </a:rPr>
+              <a:t>li</a:t>
+            </a:r>
+            <a:r>
+              <a:rPr lang="en-US" dirty="0">
+                <a:solidFill>
+                  <a:srgbClr val="D4D4D4"/>
+                </a:solidFill>
+                <a:latin typeface="Consolas" panose="020B0609020204030204" pitchFamily="49" charset="0"/>
+              </a:rPr>
+              <a:t> </a:t>
+            </a:r>
+            <a:r>
+              <a:rPr lang="en-US" dirty="0">
+                <a:solidFill>
+                  <a:srgbClr val="9CDCFE"/>
+                </a:solidFill>
+                <a:latin typeface="Consolas" panose="020B0609020204030204" pitchFamily="49" charset="0"/>
+              </a:rPr>
+              <a:t>key</a:t>
+            </a:r>
+            <a:r>
+              <a:rPr lang="en-US" dirty="0">
+                <a:solidFill>
+                  <a:srgbClr val="D4D4D4"/>
+                </a:solidFill>
+                <a:latin typeface="Consolas" panose="020B0609020204030204" pitchFamily="49" charset="0"/>
+              </a:rPr>
+              <a:t>=</a:t>
+            </a:r>
+            <a:r>
+              <a:rPr lang="en-US" dirty="0">
+                <a:solidFill>
+                  <a:srgbClr val="569CD6"/>
+                </a:solidFill>
+                <a:latin typeface="Consolas" panose="020B0609020204030204" pitchFamily="49" charset="0"/>
+              </a:rPr>
+              <a:t>{</a:t>
+            </a:r>
+            <a:r>
+              <a:rPr lang="en-US" dirty="0" err="1">
+                <a:solidFill>
+                  <a:srgbClr val="9CDCFE"/>
+                </a:solidFill>
+                <a:latin typeface="Consolas" panose="020B0609020204030204" pitchFamily="49" charset="0"/>
+              </a:rPr>
+              <a:t>number</a:t>
+            </a:r>
+            <a:r>
+              <a:rPr lang="en-US" dirty="0" err="1">
+                <a:solidFill>
+                  <a:srgbClr val="D4D4D4"/>
+                </a:solidFill>
+                <a:latin typeface="Consolas" panose="020B0609020204030204" pitchFamily="49" charset="0"/>
+              </a:rPr>
+              <a:t>.</a:t>
+            </a:r>
+            <a:r>
+              <a:rPr lang="en-US" dirty="0" err="1">
+                <a:solidFill>
+                  <a:srgbClr val="DCDCAA"/>
+                </a:solidFill>
+                <a:latin typeface="Consolas" panose="020B0609020204030204" pitchFamily="49" charset="0"/>
+              </a:rPr>
+              <a:t>toString</a:t>
+            </a:r>
+            <a:r>
+              <a:rPr lang="en-US" dirty="0">
+                <a:solidFill>
+                  <a:srgbClr val="D4D4D4"/>
+                </a:solidFill>
+                <a:latin typeface="Consolas" panose="020B0609020204030204" pitchFamily="49" charset="0"/>
+              </a:rPr>
+              <a:t>()</a:t>
+            </a:r>
+            <a:r>
+              <a:rPr lang="en-US" dirty="0">
+                <a:solidFill>
+                  <a:srgbClr val="569CD6"/>
+                </a:solidFill>
+                <a:latin typeface="Consolas" panose="020B0609020204030204" pitchFamily="49" charset="0"/>
+              </a:rPr>
+              <a:t>}</a:t>
+            </a:r>
+            <a:r>
+              <a:rPr lang="en-US" dirty="0">
+                <a:solidFill>
+                  <a:srgbClr val="808080"/>
+                </a:solidFill>
+                <a:latin typeface="Consolas" panose="020B0609020204030204" pitchFamily="49" charset="0"/>
+              </a:rPr>
+              <a:t>&gt;</a:t>
+            </a:r>
+            <a:endParaRPr lang="en-US" dirty="0">
+              <a:solidFill>
+                <a:srgbClr val="D4D4D4"/>
+              </a:solidFill>
+              <a:latin typeface="Consolas" panose="020B0609020204030204" pitchFamily="49" charset="0"/>
+            </a:endParaRPr>
+          </a:p>
+          <a:p>
+            <a:r>
+              <a:rPr lang="en-US" dirty="0">
+                <a:solidFill>
+                  <a:srgbClr val="D4D4D4"/>
+                </a:solidFill>
+                <a:latin typeface="Consolas" panose="020B0609020204030204" pitchFamily="49" charset="0"/>
+              </a:rPr>
+              <a:t>    </a:t>
+            </a:r>
+            <a:r>
+              <a:rPr lang="en-US" dirty="0">
+                <a:solidFill>
+                  <a:srgbClr val="569CD6"/>
+                </a:solidFill>
+                <a:latin typeface="Consolas" panose="020B0609020204030204" pitchFamily="49" charset="0"/>
+              </a:rPr>
+              <a:t>{</a:t>
+            </a:r>
+            <a:r>
+              <a:rPr lang="en-US" dirty="0">
+                <a:solidFill>
+                  <a:srgbClr val="9CDCFE"/>
+                </a:solidFill>
+                <a:latin typeface="Consolas" panose="020B0609020204030204" pitchFamily="49" charset="0"/>
+              </a:rPr>
+              <a:t>number</a:t>
+            </a:r>
+            <a:r>
+              <a:rPr lang="en-US" dirty="0">
+                <a:solidFill>
+                  <a:srgbClr val="569CD6"/>
+                </a:solidFill>
+                <a:latin typeface="Consolas" panose="020B0609020204030204" pitchFamily="49" charset="0"/>
+              </a:rPr>
+              <a:t>}</a:t>
+            </a:r>
+            <a:endParaRPr lang="en-US" dirty="0">
+              <a:solidFill>
+                <a:srgbClr val="D4D4D4"/>
+              </a:solidFill>
+              <a:latin typeface="Consolas" panose="020B0609020204030204" pitchFamily="49" charset="0"/>
+            </a:endParaRPr>
+          </a:p>
+          <a:p>
+            <a:r>
+              <a:rPr lang="en-US" dirty="0">
+                <a:solidFill>
+                  <a:srgbClr val="D4D4D4"/>
+                </a:solidFill>
+                <a:latin typeface="Consolas" panose="020B0609020204030204" pitchFamily="49" charset="0"/>
+              </a:rPr>
+              <a:t>  </a:t>
+            </a:r>
+            <a:r>
+              <a:rPr lang="en-US" dirty="0">
+                <a:solidFill>
+                  <a:srgbClr val="808080"/>
+                </a:solidFill>
+                <a:latin typeface="Consolas" panose="020B0609020204030204" pitchFamily="49" charset="0"/>
+              </a:rPr>
+              <a:t>&lt;/</a:t>
+            </a:r>
+            <a:r>
+              <a:rPr lang="en-US" dirty="0">
+                <a:solidFill>
+                  <a:srgbClr val="569CD6"/>
+                </a:solidFill>
+                <a:latin typeface="Consolas" panose="020B0609020204030204" pitchFamily="49" charset="0"/>
+              </a:rPr>
+              <a:t>li</a:t>
+            </a:r>
+            <a:r>
+              <a:rPr lang="en-US" dirty="0">
+                <a:solidFill>
+                  <a:srgbClr val="808080"/>
+                </a:solidFill>
+                <a:latin typeface="Consolas" panose="020B0609020204030204" pitchFamily="49" charset="0"/>
+              </a:rPr>
+              <a:t>&gt;</a:t>
+            </a:r>
+            <a:endParaRPr lang="en-US" dirty="0">
+              <a:solidFill>
+                <a:srgbClr val="D4D4D4"/>
+              </a:solidFill>
+              <a:latin typeface="Consolas" panose="020B0609020204030204" pitchFamily="49" charset="0"/>
+            </a:endParaRPr>
+          </a:p>
+          <a:p>
+            <a:r>
+              <a:rPr lang="en-US" dirty="0">
+                <a:solidFill>
+                  <a:srgbClr val="D4D4D4"/>
+                </a:solidFill>
+                <a:latin typeface="Consolas" panose="020B0609020204030204" pitchFamily="49" charset="0"/>
+              </a:rPr>
+              <a:t>);</a:t>
+            </a:r>
+            <a:endParaRPr lang="en-US" b="0" dirty="0">
+              <a:solidFill>
+                <a:srgbClr val="D4D4D4"/>
+              </a:solidFill>
+              <a:effectLst/>
+              <a:latin typeface="Consolas" panose="020B0609020204030204" pitchFamily="49" charset="0"/>
+            </a:endParaRPr>
+          </a:p>
+        </p:txBody>
+      </p:sp>
+      <p:sp>
+        <p:nvSpPr>
+          <p:cNvPr id="6" name="Prostokąt 5">
+            <a:extLst>
+              <a:ext uri="{FF2B5EF4-FFF2-40B4-BE49-F238E27FC236}">
+                <a16:creationId xmlns:a16="http://schemas.microsoft.com/office/drawing/2014/main" id="{7FED2BA4-D110-417F-A7E2-53A43A8873B0}"/>
+              </a:ext>
+            </a:extLst>
+          </p:cNvPr>
+          <p:cNvSpPr/>
+          <p:nvPr/>
+        </p:nvSpPr>
+        <p:spPr>
+          <a:xfrm>
+            <a:off x="2650433" y="1390327"/>
+            <a:ext cx="6891131" cy="646331"/>
+          </a:xfrm>
+          <a:prstGeom prst="rect">
+            <a:avLst/>
+          </a:prstGeom>
+          <a:solidFill>
+            <a:schemeClr val="tx1"/>
+          </a:solidFill>
+        </p:spPr>
+        <p:txBody>
+          <a:bodyPr wrap="square">
+            <a:spAutoFit/>
+          </a:bodyPr>
+          <a:lstStyle/>
+          <a:p>
+            <a:r>
+              <a:rPr lang="en-US" dirty="0">
+                <a:solidFill>
+                  <a:srgbClr val="569CD6"/>
+                </a:solidFill>
+                <a:latin typeface="Consolas" panose="020B0609020204030204" pitchFamily="49" charset="0"/>
+              </a:rPr>
+              <a:t>const</a:t>
+            </a:r>
+            <a:r>
+              <a:rPr lang="en-US" dirty="0">
+                <a:solidFill>
+                  <a:srgbClr val="D4D4D4"/>
+                </a:solidFill>
+                <a:latin typeface="Consolas" panose="020B0609020204030204" pitchFamily="49" charset="0"/>
+              </a:rPr>
+              <a:t> </a:t>
+            </a:r>
+            <a:r>
+              <a:rPr lang="en-US" dirty="0">
+                <a:solidFill>
+                  <a:srgbClr val="9CDCFE"/>
+                </a:solidFill>
+                <a:latin typeface="Consolas" panose="020B0609020204030204" pitchFamily="49" charset="0"/>
+              </a:rPr>
+              <a:t>numbers</a:t>
+            </a:r>
+            <a:r>
+              <a:rPr lang="en-US" dirty="0">
+                <a:solidFill>
+                  <a:srgbClr val="D4D4D4"/>
+                </a:solidFill>
+                <a:latin typeface="Consolas" panose="020B0609020204030204" pitchFamily="49" charset="0"/>
+              </a:rPr>
+              <a:t> = [</a:t>
+            </a:r>
+            <a:r>
+              <a:rPr lang="en-US" dirty="0">
+                <a:solidFill>
+                  <a:srgbClr val="B5CEA8"/>
+                </a:solidFill>
+                <a:latin typeface="Consolas" panose="020B0609020204030204" pitchFamily="49" charset="0"/>
+              </a:rPr>
+              <a:t>1</a:t>
+            </a:r>
+            <a:r>
+              <a:rPr lang="en-US" dirty="0">
+                <a:solidFill>
+                  <a:srgbClr val="D4D4D4"/>
+                </a:solidFill>
+                <a:latin typeface="Consolas" panose="020B0609020204030204" pitchFamily="49" charset="0"/>
+              </a:rPr>
+              <a:t>, </a:t>
+            </a:r>
+            <a:r>
+              <a:rPr lang="en-US" dirty="0">
+                <a:solidFill>
+                  <a:srgbClr val="B5CEA8"/>
+                </a:solidFill>
+                <a:latin typeface="Consolas" panose="020B0609020204030204" pitchFamily="49" charset="0"/>
+              </a:rPr>
+              <a:t>2</a:t>
+            </a:r>
+            <a:r>
+              <a:rPr lang="en-US" dirty="0">
+                <a:solidFill>
+                  <a:srgbClr val="D4D4D4"/>
+                </a:solidFill>
+                <a:latin typeface="Consolas" panose="020B0609020204030204" pitchFamily="49" charset="0"/>
+              </a:rPr>
+              <a:t>, </a:t>
+            </a:r>
+            <a:r>
+              <a:rPr lang="en-US" dirty="0">
+                <a:solidFill>
+                  <a:srgbClr val="B5CEA8"/>
+                </a:solidFill>
+                <a:latin typeface="Consolas" panose="020B0609020204030204" pitchFamily="49" charset="0"/>
+              </a:rPr>
+              <a:t>3</a:t>
+            </a:r>
+            <a:r>
+              <a:rPr lang="en-US" dirty="0">
+                <a:solidFill>
+                  <a:srgbClr val="D4D4D4"/>
+                </a:solidFill>
+                <a:latin typeface="Consolas" panose="020B0609020204030204" pitchFamily="49" charset="0"/>
+              </a:rPr>
+              <a:t>, </a:t>
+            </a:r>
+            <a:r>
+              <a:rPr lang="en-US" dirty="0">
+                <a:solidFill>
+                  <a:srgbClr val="B5CEA8"/>
+                </a:solidFill>
+                <a:latin typeface="Consolas" panose="020B0609020204030204" pitchFamily="49" charset="0"/>
+              </a:rPr>
+              <a:t>4</a:t>
+            </a:r>
+            <a:r>
+              <a:rPr lang="en-US" dirty="0">
+                <a:solidFill>
+                  <a:srgbClr val="D4D4D4"/>
+                </a:solidFill>
+                <a:latin typeface="Consolas" panose="020B0609020204030204" pitchFamily="49" charset="0"/>
+              </a:rPr>
+              <a:t>, </a:t>
+            </a:r>
+            <a:r>
+              <a:rPr lang="en-US" dirty="0">
+                <a:solidFill>
+                  <a:srgbClr val="B5CEA8"/>
+                </a:solidFill>
+                <a:latin typeface="Consolas" panose="020B0609020204030204" pitchFamily="49" charset="0"/>
+              </a:rPr>
+              <a:t>5</a:t>
+            </a:r>
+            <a:r>
+              <a:rPr lang="en-US" dirty="0">
+                <a:solidFill>
+                  <a:srgbClr val="D4D4D4"/>
+                </a:solidFill>
+                <a:latin typeface="Consolas" panose="020B0609020204030204" pitchFamily="49" charset="0"/>
+              </a:rPr>
+              <a:t>];</a:t>
+            </a:r>
+          </a:p>
+          <a:p>
+            <a:r>
+              <a:rPr lang="en-US" dirty="0">
+                <a:solidFill>
+                  <a:srgbClr val="569CD6"/>
+                </a:solidFill>
+                <a:latin typeface="Consolas" panose="020B0609020204030204" pitchFamily="49" charset="0"/>
+              </a:rPr>
+              <a:t>const</a:t>
+            </a:r>
+            <a:r>
+              <a:rPr lang="en-US" dirty="0">
+                <a:solidFill>
+                  <a:srgbClr val="D4D4D4"/>
+                </a:solidFill>
+                <a:latin typeface="Consolas" panose="020B0609020204030204" pitchFamily="49" charset="0"/>
+              </a:rPr>
+              <a:t> </a:t>
+            </a:r>
+            <a:r>
+              <a:rPr lang="en-US" dirty="0">
+                <a:solidFill>
+                  <a:srgbClr val="9CDCFE"/>
+                </a:solidFill>
+                <a:latin typeface="Consolas" panose="020B0609020204030204" pitchFamily="49" charset="0"/>
+              </a:rPr>
+              <a:t>doubled</a:t>
+            </a:r>
+            <a:r>
+              <a:rPr lang="en-US" dirty="0">
+                <a:solidFill>
+                  <a:srgbClr val="D4D4D4"/>
+                </a:solidFill>
+                <a:latin typeface="Consolas" panose="020B0609020204030204" pitchFamily="49" charset="0"/>
+              </a:rPr>
+              <a:t> = </a:t>
+            </a:r>
+            <a:r>
+              <a:rPr lang="en-US" dirty="0" err="1">
+                <a:solidFill>
+                  <a:srgbClr val="9CDCFE"/>
+                </a:solidFill>
+                <a:latin typeface="Consolas" panose="020B0609020204030204" pitchFamily="49" charset="0"/>
+              </a:rPr>
+              <a:t>numbers</a:t>
+            </a:r>
+            <a:r>
+              <a:rPr lang="en-US" dirty="0" err="1">
+                <a:solidFill>
+                  <a:srgbClr val="D4D4D4"/>
+                </a:solidFill>
+                <a:latin typeface="Consolas" panose="020B0609020204030204" pitchFamily="49" charset="0"/>
+              </a:rPr>
+              <a:t>.</a:t>
+            </a:r>
+            <a:r>
+              <a:rPr lang="en-US" dirty="0" err="1">
+                <a:solidFill>
+                  <a:srgbClr val="DCDCAA"/>
+                </a:solidFill>
+                <a:latin typeface="Consolas" panose="020B0609020204030204" pitchFamily="49" charset="0"/>
+              </a:rPr>
+              <a:t>map</a:t>
+            </a:r>
+            <a:r>
+              <a:rPr lang="en-US" dirty="0">
+                <a:solidFill>
+                  <a:srgbClr val="D4D4D4"/>
+                </a:solidFill>
+                <a:latin typeface="Consolas" panose="020B0609020204030204" pitchFamily="49" charset="0"/>
+              </a:rPr>
+              <a:t>((</a:t>
+            </a:r>
+            <a:r>
+              <a:rPr lang="en-US" dirty="0">
+                <a:solidFill>
+                  <a:srgbClr val="9CDCFE"/>
+                </a:solidFill>
+                <a:latin typeface="Consolas" panose="020B0609020204030204" pitchFamily="49" charset="0"/>
+              </a:rPr>
+              <a:t>number</a:t>
+            </a:r>
+            <a:r>
+              <a:rPr lang="en-US" dirty="0">
+                <a:solidFill>
+                  <a:srgbClr val="D4D4D4"/>
+                </a:solidFill>
+                <a:latin typeface="Consolas" panose="020B0609020204030204" pitchFamily="49" charset="0"/>
+              </a:rPr>
+              <a:t>) </a:t>
+            </a:r>
+            <a:r>
+              <a:rPr lang="en-US" dirty="0">
+                <a:solidFill>
+                  <a:srgbClr val="569CD6"/>
+                </a:solidFill>
+                <a:latin typeface="Consolas" panose="020B0609020204030204" pitchFamily="49" charset="0"/>
+              </a:rPr>
+              <a:t>=&gt;</a:t>
+            </a:r>
+            <a:r>
+              <a:rPr lang="en-US" dirty="0">
+                <a:solidFill>
+                  <a:srgbClr val="D4D4D4"/>
+                </a:solidFill>
+                <a:latin typeface="Consolas" panose="020B0609020204030204" pitchFamily="49" charset="0"/>
+              </a:rPr>
+              <a:t> </a:t>
+            </a:r>
+            <a:r>
+              <a:rPr lang="en-US" dirty="0">
+                <a:solidFill>
+                  <a:srgbClr val="9CDCFE"/>
+                </a:solidFill>
+                <a:latin typeface="Consolas" panose="020B0609020204030204" pitchFamily="49" charset="0"/>
+              </a:rPr>
+              <a:t>number</a:t>
+            </a:r>
+            <a:r>
+              <a:rPr lang="en-US" dirty="0">
+                <a:solidFill>
+                  <a:srgbClr val="D4D4D4"/>
+                </a:solidFill>
+                <a:latin typeface="Consolas" panose="020B0609020204030204" pitchFamily="49" charset="0"/>
+              </a:rPr>
+              <a:t> * </a:t>
+            </a:r>
+            <a:r>
+              <a:rPr lang="en-US" dirty="0">
+                <a:solidFill>
+                  <a:srgbClr val="B5CEA8"/>
+                </a:solidFill>
+                <a:latin typeface="Consolas" panose="020B0609020204030204" pitchFamily="49" charset="0"/>
+              </a:rPr>
+              <a:t>2</a:t>
+            </a:r>
+            <a:r>
+              <a:rPr lang="en-US" dirty="0">
+                <a:solidFill>
+                  <a:srgbClr val="D4D4D4"/>
+                </a:solidFill>
+                <a:latin typeface="Consolas" panose="020B0609020204030204" pitchFamily="49" charset="0"/>
+              </a:rPr>
+              <a:t>);</a:t>
+            </a:r>
+            <a:endParaRPr lang="en-US" b="0" dirty="0">
+              <a:solidFill>
+                <a:srgbClr val="D4D4D4"/>
+              </a:solidFill>
+              <a:effectLst/>
+              <a:latin typeface="Consolas" panose="020B0609020204030204" pitchFamily="49" charset="0"/>
+            </a:endParaRPr>
+          </a:p>
+        </p:txBody>
+      </p:sp>
+      <p:sp>
+        <p:nvSpPr>
+          <p:cNvPr id="14" name="pole tekstowe 13">
+            <a:extLst>
+              <a:ext uri="{FF2B5EF4-FFF2-40B4-BE49-F238E27FC236}">
+                <a16:creationId xmlns:a16="http://schemas.microsoft.com/office/drawing/2014/main" id="{D1FC234E-10E7-4BD7-89F4-5F72B81539EE}"/>
+              </a:ext>
+            </a:extLst>
+          </p:cNvPr>
+          <p:cNvSpPr txBox="1"/>
+          <p:nvPr/>
+        </p:nvSpPr>
+        <p:spPr>
+          <a:xfrm>
+            <a:off x="2545301" y="902553"/>
+            <a:ext cx="1452642" cy="369332"/>
+          </a:xfrm>
+          <a:prstGeom prst="rect">
+            <a:avLst/>
+          </a:prstGeom>
+          <a:noFill/>
+        </p:spPr>
+        <p:txBody>
+          <a:bodyPr wrap="none" rtlCol="0">
+            <a:spAutoFit/>
+          </a:bodyPr>
+          <a:lstStyle/>
+          <a:p>
+            <a:r>
+              <a:rPr lang="pl-PL" dirty="0"/>
+              <a:t>Map </a:t>
+            </a:r>
+            <a:r>
+              <a:rPr lang="pl-PL" dirty="0" err="1"/>
+              <a:t>function</a:t>
+            </a:r>
+            <a:endParaRPr lang="pl-PL" dirty="0"/>
+          </a:p>
+        </p:txBody>
+      </p:sp>
+      <p:sp>
+        <p:nvSpPr>
+          <p:cNvPr id="15" name="pole tekstowe 14">
+            <a:extLst>
+              <a:ext uri="{FF2B5EF4-FFF2-40B4-BE49-F238E27FC236}">
+                <a16:creationId xmlns:a16="http://schemas.microsoft.com/office/drawing/2014/main" id="{EFBE48F9-6E1C-4E85-A82D-46744FC4662C}"/>
+              </a:ext>
+            </a:extLst>
+          </p:cNvPr>
+          <p:cNvSpPr txBox="1"/>
+          <p:nvPr/>
+        </p:nvSpPr>
+        <p:spPr>
+          <a:xfrm>
+            <a:off x="2545301" y="2221324"/>
+            <a:ext cx="4889544" cy="369332"/>
+          </a:xfrm>
+          <a:prstGeom prst="rect">
+            <a:avLst/>
+          </a:prstGeom>
+          <a:noFill/>
+        </p:spPr>
+        <p:txBody>
+          <a:bodyPr wrap="none" rtlCol="0">
+            <a:spAutoFit/>
+          </a:bodyPr>
+          <a:lstStyle/>
+          <a:p>
+            <a:r>
+              <a:rPr lang="pl-PL" dirty="0"/>
+              <a:t>Using map to </a:t>
+            </a:r>
+            <a:r>
+              <a:rPr lang="pl-PL" dirty="0" err="1"/>
+              <a:t>create</a:t>
+            </a:r>
+            <a:r>
+              <a:rPr lang="pl-PL" dirty="0"/>
+              <a:t> </a:t>
+            </a:r>
+            <a:r>
+              <a:rPr lang="pl-PL" dirty="0" err="1"/>
+              <a:t>function</a:t>
+            </a:r>
+            <a:r>
+              <a:rPr lang="pl-PL" dirty="0"/>
+              <a:t> </a:t>
+            </a:r>
+            <a:r>
+              <a:rPr lang="pl-PL" dirty="0" err="1"/>
+              <a:t>that</a:t>
+            </a:r>
+            <a:r>
+              <a:rPr lang="pl-PL" dirty="0"/>
+              <a:t> </a:t>
+            </a:r>
+            <a:r>
+              <a:rPr lang="pl-PL" dirty="0" err="1"/>
+              <a:t>will</a:t>
+            </a:r>
+            <a:r>
+              <a:rPr lang="pl-PL" dirty="0"/>
+              <a:t> </a:t>
+            </a:r>
+            <a:r>
+              <a:rPr lang="pl-PL" dirty="0" err="1"/>
+              <a:t>render</a:t>
+            </a:r>
+            <a:r>
+              <a:rPr lang="pl-PL" dirty="0"/>
+              <a:t> a list</a:t>
+            </a:r>
+          </a:p>
+        </p:txBody>
+      </p:sp>
+      <p:sp>
+        <p:nvSpPr>
+          <p:cNvPr id="17" name="pole tekstowe 16">
+            <a:extLst>
+              <a:ext uri="{FF2B5EF4-FFF2-40B4-BE49-F238E27FC236}">
+                <a16:creationId xmlns:a16="http://schemas.microsoft.com/office/drawing/2014/main" id="{9F59FAA9-4E0D-4C9B-8127-C771F4472FA7}"/>
+              </a:ext>
+            </a:extLst>
+          </p:cNvPr>
+          <p:cNvSpPr txBox="1"/>
+          <p:nvPr/>
+        </p:nvSpPr>
+        <p:spPr>
+          <a:xfrm>
+            <a:off x="2545301" y="4636676"/>
+            <a:ext cx="1021177" cy="369332"/>
+          </a:xfrm>
+          <a:prstGeom prst="rect">
+            <a:avLst/>
+          </a:prstGeom>
+          <a:noFill/>
+        </p:spPr>
+        <p:txBody>
+          <a:bodyPr wrap="none" rtlCol="0">
+            <a:spAutoFit/>
+          </a:bodyPr>
+          <a:lstStyle/>
+          <a:p>
+            <a:r>
+              <a:rPr lang="pl-PL" dirty="0"/>
+              <a:t>Show list</a:t>
+            </a:r>
+          </a:p>
+        </p:txBody>
+      </p:sp>
+      <p:sp>
+        <p:nvSpPr>
+          <p:cNvPr id="7" name="Prostokąt 6">
+            <a:extLst>
+              <a:ext uri="{FF2B5EF4-FFF2-40B4-BE49-F238E27FC236}">
+                <a16:creationId xmlns:a16="http://schemas.microsoft.com/office/drawing/2014/main" id="{054E2DC1-5179-446E-B994-C9BC93A49CF7}"/>
+              </a:ext>
+            </a:extLst>
+          </p:cNvPr>
+          <p:cNvSpPr/>
+          <p:nvPr/>
+        </p:nvSpPr>
+        <p:spPr>
+          <a:xfrm>
+            <a:off x="2545301" y="5098341"/>
+            <a:ext cx="2717411" cy="369332"/>
+          </a:xfrm>
+          <a:prstGeom prst="rect">
+            <a:avLst/>
+          </a:prstGeom>
+          <a:solidFill>
+            <a:schemeClr val="tx1"/>
+          </a:solidFill>
+        </p:spPr>
+        <p:txBody>
+          <a:bodyPr wrap="none">
+            <a:spAutoFit/>
+          </a:bodyPr>
+          <a:lstStyle/>
+          <a:p>
+            <a:r>
+              <a:rPr lang="pl-PL" dirty="0">
+                <a:solidFill>
+                  <a:srgbClr val="808080"/>
+                </a:solidFill>
+                <a:latin typeface="Consolas" panose="020B0609020204030204" pitchFamily="49" charset="0"/>
+              </a:rPr>
+              <a:t>&lt;</a:t>
+            </a:r>
+            <a:r>
+              <a:rPr lang="pl-PL" dirty="0">
+                <a:solidFill>
+                  <a:srgbClr val="569CD6"/>
+                </a:solidFill>
+                <a:latin typeface="Consolas" panose="020B0609020204030204" pitchFamily="49" charset="0"/>
+              </a:rPr>
+              <a:t>ul</a:t>
+            </a:r>
+            <a:r>
+              <a:rPr lang="pl-PL" dirty="0">
+                <a:solidFill>
+                  <a:srgbClr val="808080"/>
+                </a:solidFill>
+                <a:latin typeface="Consolas" panose="020B0609020204030204" pitchFamily="49" charset="0"/>
+              </a:rPr>
+              <a:t>&gt;</a:t>
+            </a:r>
+            <a:r>
+              <a:rPr lang="pl-PL" dirty="0">
+                <a:solidFill>
+                  <a:srgbClr val="569CD6"/>
+                </a:solidFill>
+                <a:latin typeface="Consolas" panose="020B0609020204030204" pitchFamily="49" charset="0"/>
+              </a:rPr>
+              <a:t>{</a:t>
+            </a:r>
+            <a:r>
+              <a:rPr lang="pl-PL" dirty="0" err="1">
+                <a:solidFill>
+                  <a:srgbClr val="9CDCFE"/>
+                </a:solidFill>
+                <a:latin typeface="Consolas" panose="020B0609020204030204" pitchFamily="49" charset="0"/>
+              </a:rPr>
+              <a:t>listItems</a:t>
+            </a:r>
+            <a:r>
+              <a:rPr lang="pl-PL" dirty="0">
+                <a:solidFill>
+                  <a:srgbClr val="569CD6"/>
+                </a:solidFill>
+                <a:latin typeface="Consolas" panose="020B0609020204030204" pitchFamily="49" charset="0"/>
+              </a:rPr>
+              <a:t>}</a:t>
+            </a:r>
+            <a:r>
+              <a:rPr lang="pl-PL" dirty="0">
+                <a:solidFill>
+                  <a:srgbClr val="808080"/>
+                </a:solidFill>
+                <a:latin typeface="Consolas" panose="020B0609020204030204" pitchFamily="49" charset="0"/>
+              </a:rPr>
+              <a:t>&lt;/</a:t>
+            </a:r>
+            <a:r>
+              <a:rPr lang="pl-PL" dirty="0">
+                <a:solidFill>
+                  <a:srgbClr val="569CD6"/>
+                </a:solidFill>
+                <a:latin typeface="Consolas" panose="020B0609020204030204" pitchFamily="49" charset="0"/>
+              </a:rPr>
+              <a:t>ul</a:t>
+            </a:r>
+            <a:r>
+              <a:rPr lang="pl-PL" dirty="0">
+                <a:solidFill>
+                  <a:srgbClr val="808080"/>
+                </a:solidFill>
+                <a:latin typeface="Consolas" panose="020B0609020204030204" pitchFamily="49" charset="0"/>
+              </a:rPr>
+              <a:t>&gt;</a:t>
+            </a:r>
+            <a:endParaRPr lang="pl-PL" b="0" dirty="0">
+              <a:solidFill>
+                <a:srgbClr val="D4D4D4"/>
+              </a:solidFill>
+              <a:effectLst/>
+              <a:latin typeface="Consolas" panose="020B0609020204030204" pitchFamily="49" charset="0"/>
+            </a:endParaRPr>
+          </a:p>
+        </p:txBody>
+      </p:sp>
+    </p:spTree>
+    <p:extLst>
+      <p:ext uri="{BB962C8B-B14F-4D97-AF65-F5344CB8AC3E}">
+        <p14:creationId xmlns:p14="http://schemas.microsoft.com/office/powerpoint/2010/main" val="1506854622"/>
       </p:ext>
     </p:extLst>
   </p:cSld>

</xml_diff>

<commit_message>
Exercise 9: Remove button
</commit_message>
<xml_diff>
--- a/tutorial/ReactjsTraining.pptx
+++ b/tutorial/ReactjsTraining.pptx
@@ -5,7 +5,7 @@
     <p:sldMasterId id="2147483648" r:id="rId1"/>
   </p:sldMasterIdLst>
   <p:notesMasterIdLst>
-    <p:notesMasterId r:id="rId16"/>
+    <p:notesMasterId r:id="rId22"/>
   </p:notesMasterIdLst>
   <p:sldIdLst>
     <p:sldId id="256" r:id="rId2"/>
@@ -22,6 +22,12 @@
     <p:sldId id="267" r:id="rId13"/>
     <p:sldId id="268" r:id="rId14"/>
     <p:sldId id="269" r:id="rId15"/>
+    <p:sldId id="270" r:id="rId16"/>
+    <p:sldId id="271" r:id="rId17"/>
+    <p:sldId id="272" r:id="rId18"/>
+    <p:sldId id="273" r:id="rId19"/>
+    <p:sldId id="274" r:id="rId20"/>
+    <p:sldId id="275" r:id="rId21"/>
   </p:sldIdLst>
   <p:sldSz cx="12192000" cy="6858000"/>
   <p:notesSz cx="6858000" cy="9144000"/>
@@ -2436,19 +2442,7 @@
                 <a:ea typeface="+mn-ea"/>
                 <a:cs typeface="+mn-cs"/>
               </a:rPr>
-              <a:t>Klucze muszą być unikalne tylko wśród rodzeństwa (możemy użyć tych samych dla dwóch </a:t>
-            </a:r>
-            <a:r>
-              <a:rPr lang="pl-PL" sz="1200" b="1" i="0" kern="1200">
-                <a:solidFill>
-                  <a:schemeClr val="tx1"/>
-                </a:solidFill>
-                <a:effectLst/>
-                <a:latin typeface="+mn-lt"/>
-                <a:ea typeface="+mn-ea"/>
-                <a:cs typeface="+mn-cs"/>
-              </a:rPr>
-              <a:t>globalnych tablic)</a:t>
+              <a:t>Klucze muszą być unikalne tylko wśród rodzeństwa (możemy użyć tych samych dla dwóch globalnych tablic)</a:t>
             </a:r>
           </a:p>
           <a:p>
@@ -2617,6 +2611,72 @@
                 <a:cs typeface="+mn-cs"/>
               </a:rPr>
               <a:t>bootstrapa</a:t>
+            </a:r>
+            <a:endParaRPr lang="pl-PL" sz="1200" b="0" i="0" kern="1200" dirty="0">
+              <a:solidFill>
+                <a:schemeClr val="tx1"/>
+              </a:solidFill>
+              <a:effectLst/>
+              <a:latin typeface="+mn-lt"/>
+              <a:ea typeface="+mn-ea"/>
+              <a:cs typeface="+mn-cs"/>
+            </a:endParaRPr>
+          </a:p>
+          <a:p>
+            <a:pPr marL="0" indent="0">
+              <a:buFontTx/>
+              <a:buNone/>
+            </a:pPr>
+            <a:endParaRPr lang="pl-PL" sz="1200" b="0" i="0" kern="1200" dirty="0">
+              <a:solidFill>
+                <a:schemeClr val="tx1"/>
+              </a:solidFill>
+              <a:effectLst/>
+              <a:latin typeface="+mn-lt"/>
+              <a:ea typeface="+mn-ea"/>
+              <a:cs typeface="+mn-cs"/>
+            </a:endParaRPr>
+          </a:p>
+          <a:p>
+            <a:pPr marL="0" indent="0">
+              <a:buFontTx/>
+              <a:buNone/>
+            </a:pPr>
+            <a:r>
+              <a:rPr lang="pl-PL" sz="1200" b="0" i="0" kern="1200" dirty="0" err="1">
+                <a:solidFill>
+                  <a:schemeClr val="tx1"/>
+                </a:solidFill>
+                <a:effectLst/>
+                <a:latin typeface="+mn-lt"/>
+                <a:ea typeface="+mn-ea"/>
+                <a:cs typeface="+mn-cs"/>
+              </a:rPr>
+              <a:t>Exercise</a:t>
+            </a:r>
+            <a:r>
+              <a:rPr lang="pl-PL" sz="1200" b="0" i="0" kern="1200" dirty="0">
+                <a:solidFill>
+                  <a:schemeClr val="tx1"/>
+                </a:solidFill>
+                <a:effectLst/>
+                <a:latin typeface="+mn-lt"/>
+                <a:ea typeface="+mn-ea"/>
+                <a:cs typeface="+mn-cs"/>
+              </a:rPr>
+              <a:t> 9: Dodać przycisk usuń </a:t>
+            </a:r>
+            <a:r>
+              <a:rPr lang="pl-PL" sz="1200" b="0" i="0" kern="1200">
+                <a:solidFill>
+                  <a:schemeClr val="tx1"/>
+                </a:solidFill>
+                <a:effectLst/>
+                <a:latin typeface="+mn-lt"/>
+                <a:ea typeface="+mn-ea"/>
+                <a:cs typeface="+mn-cs"/>
+              </a:rPr>
+              <a:t>i oprogramować</a:t>
             </a:r>
             <a:endParaRPr lang="pl-PL" sz="1200" b="0" i="0" kern="1200" dirty="0">
               <a:solidFill>
@@ -2657,6 +2717,486 @@
     <p:extLst>
       <p:ext uri="{BB962C8B-B14F-4D97-AF65-F5344CB8AC3E}">
         <p14:creationId xmlns:p14="http://schemas.microsoft.com/office/powerpoint/2010/main" val="2248634197"/>
+      </p:ext>
+    </p:extLst>
+  </p:cSld>
+  <p:clrMapOvr>
+    <a:masterClrMapping/>
+  </p:clrMapOvr>
+</p:notes>
+</file>
+
+<file path=ppt/notesSlides/notesSlide15.xml><?xml version="1.0" encoding="utf-8"?>
+<p:notes xmlns:a="http://schemas.openxmlformats.org/drawingml/2006/main" xmlns:r="http://schemas.openxmlformats.org/officeDocument/2006/relationships" xmlns:p="http://schemas.openxmlformats.org/presentationml/2006/main">
+  <p:cSld>
+    <p:spTree>
+      <p:nvGrpSpPr>
+        <p:cNvPr id="1" name=""/>
+        <p:cNvGrpSpPr/>
+        <p:nvPr/>
+      </p:nvGrpSpPr>
+      <p:grpSpPr>
+        <a:xfrm>
+          <a:off x="0" y="0"/>
+          <a:ext cx="0" cy="0"/>
+          <a:chOff x="0" y="0"/>
+          <a:chExt cx="0" cy="0"/>
+        </a:xfrm>
+      </p:grpSpPr>
+      <p:sp>
+        <p:nvSpPr>
+          <p:cNvPr id="2" name="Symbol zastępczy obrazu slajdu 1"/>
+          <p:cNvSpPr>
+            <a:spLocks noGrp="1" noRot="1" noChangeAspect="1"/>
+          </p:cNvSpPr>
+          <p:nvPr>
+            <p:ph type="sldImg"/>
+          </p:nvPr>
+        </p:nvSpPr>
+        <p:spPr/>
+      </p:sp>
+      <p:sp>
+        <p:nvSpPr>
+          <p:cNvPr id="3" name="Symbol zastępczy notatek 2"/>
+          <p:cNvSpPr>
+            <a:spLocks noGrp="1"/>
+          </p:cNvSpPr>
+          <p:nvPr>
+            <p:ph type="body" idx="1"/>
+          </p:nvPr>
+        </p:nvSpPr>
+        <p:spPr/>
+        <p:txBody>
+          <a:bodyPr/>
+          <a:lstStyle/>
+          <a:p>
+            <a:pPr marL="0" indent="0">
+              <a:buFontTx/>
+              <a:buNone/>
+            </a:pPr>
+            <a:endParaRPr lang="pl-PL" sz="1200" b="0" i="0" kern="1200" dirty="0">
+              <a:solidFill>
+                <a:schemeClr val="tx1"/>
+              </a:solidFill>
+              <a:effectLst/>
+              <a:latin typeface="+mn-lt"/>
+              <a:ea typeface="+mn-ea"/>
+              <a:cs typeface="+mn-cs"/>
+            </a:endParaRPr>
+          </a:p>
+        </p:txBody>
+      </p:sp>
+      <p:sp>
+        <p:nvSpPr>
+          <p:cNvPr id="4" name="Symbol zastępczy numeru slajdu 3"/>
+          <p:cNvSpPr>
+            <a:spLocks noGrp="1"/>
+          </p:cNvSpPr>
+          <p:nvPr>
+            <p:ph type="sldNum" sz="quarter" idx="5"/>
+          </p:nvPr>
+        </p:nvSpPr>
+        <p:spPr/>
+        <p:txBody>
+          <a:bodyPr/>
+          <a:lstStyle/>
+          <a:p>
+            <a:fld id="{810A6612-7A23-4B98-B0E9-4F3C882AD2EF}" type="slidenum">
+              <a:rPr lang="pl-PL" smtClean="0"/>
+              <a:t>15</a:t>
+            </a:fld>
+            <a:endParaRPr lang="pl-PL"/>
+          </a:p>
+        </p:txBody>
+      </p:sp>
+    </p:spTree>
+    <p:extLst>
+      <p:ext uri="{BB962C8B-B14F-4D97-AF65-F5344CB8AC3E}">
+        <p14:creationId xmlns:p14="http://schemas.microsoft.com/office/powerpoint/2010/main" val="87558754"/>
+      </p:ext>
+    </p:extLst>
+  </p:cSld>
+  <p:clrMapOvr>
+    <a:masterClrMapping/>
+  </p:clrMapOvr>
+</p:notes>
+</file>
+
+<file path=ppt/notesSlides/notesSlide16.xml><?xml version="1.0" encoding="utf-8"?>
+<p:notes xmlns:a="http://schemas.openxmlformats.org/drawingml/2006/main" xmlns:r="http://schemas.openxmlformats.org/officeDocument/2006/relationships" xmlns:p="http://schemas.openxmlformats.org/presentationml/2006/main">
+  <p:cSld>
+    <p:spTree>
+      <p:nvGrpSpPr>
+        <p:cNvPr id="1" name=""/>
+        <p:cNvGrpSpPr/>
+        <p:nvPr/>
+      </p:nvGrpSpPr>
+      <p:grpSpPr>
+        <a:xfrm>
+          <a:off x="0" y="0"/>
+          <a:ext cx="0" cy="0"/>
+          <a:chOff x="0" y="0"/>
+          <a:chExt cx="0" cy="0"/>
+        </a:xfrm>
+      </p:grpSpPr>
+      <p:sp>
+        <p:nvSpPr>
+          <p:cNvPr id="2" name="Symbol zastępczy obrazu slajdu 1"/>
+          <p:cNvSpPr>
+            <a:spLocks noGrp="1" noRot="1" noChangeAspect="1"/>
+          </p:cNvSpPr>
+          <p:nvPr>
+            <p:ph type="sldImg"/>
+          </p:nvPr>
+        </p:nvSpPr>
+        <p:spPr/>
+      </p:sp>
+      <p:sp>
+        <p:nvSpPr>
+          <p:cNvPr id="3" name="Symbol zastępczy notatek 2"/>
+          <p:cNvSpPr>
+            <a:spLocks noGrp="1"/>
+          </p:cNvSpPr>
+          <p:nvPr>
+            <p:ph type="body" idx="1"/>
+          </p:nvPr>
+        </p:nvSpPr>
+        <p:spPr/>
+        <p:txBody>
+          <a:bodyPr/>
+          <a:lstStyle/>
+          <a:p>
+            <a:pPr marL="0" indent="0">
+              <a:buFontTx/>
+              <a:buNone/>
+            </a:pPr>
+            <a:endParaRPr lang="pl-PL" sz="1200" b="0" i="0" kern="1200" dirty="0">
+              <a:solidFill>
+                <a:schemeClr val="tx1"/>
+              </a:solidFill>
+              <a:effectLst/>
+              <a:latin typeface="+mn-lt"/>
+              <a:ea typeface="+mn-ea"/>
+              <a:cs typeface="+mn-cs"/>
+            </a:endParaRPr>
+          </a:p>
+        </p:txBody>
+      </p:sp>
+      <p:sp>
+        <p:nvSpPr>
+          <p:cNvPr id="4" name="Symbol zastępczy numeru slajdu 3"/>
+          <p:cNvSpPr>
+            <a:spLocks noGrp="1"/>
+          </p:cNvSpPr>
+          <p:nvPr>
+            <p:ph type="sldNum" sz="quarter" idx="5"/>
+          </p:nvPr>
+        </p:nvSpPr>
+        <p:spPr/>
+        <p:txBody>
+          <a:bodyPr/>
+          <a:lstStyle/>
+          <a:p>
+            <a:fld id="{810A6612-7A23-4B98-B0E9-4F3C882AD2EF}" type="slidenum">
+              <a:rPr lang="pl-PL" smtClean="0"/>
+              <a:t>16</a:t>
+            </a:fld>
+            <a:endParaRPr lang="pl-PL"/>
+          </a:p>
+        </p:txBody>
+      </p:sp>
+    </p:spTree>
+    <p:extLst>
+      <p:ext uri="{BB962C8B-B14F-4D97-AF65-F5344CB8AC3E}">
+        <p14:creationId xmlns:p14="http://schemas.microsoft.com/office/powerpoint/2010/main" val="3195938086"/>
+      </p:ext>
+    </p:extLst>
+  </p:cSld>
+  <p:clrMapOvr>
+    <a:masterClrMapping/>
+  </p:clrMapOvr>
+</p:notes>
+</file>
+
+<file path=ppt/notesSlides/notesSlide17.xml><?xml version="1.0" encoding="utf-8"?>
+<p:notes xmlns:a="http://schemas.openxmlformats.org/drawingml/2006/main" xmlns:r="http://schemas.openxmlformats.org/officeDocument/2006/relationships" xmlns:p="http://schemas.openxmlformats.org/presentationml/2006/main">
+  <p:cSld>
+    <p:spTree>
+      <p:nvGrpSpPr>
+        <p:cNvPr id="1" name=""/>
+        <p:cNvGrpSpPr/>
+        <p:nvPr/>
+      </p:nvGrpSpPr>
+      <p:grpSpPr>
+        <a:xfrm>
+          <a:off x="0" y="0"/>
+          <a:ext cx="0" cy="0"/>
+          <a:chOff x="0" y="0"/>
+          <a:chExt cx="0" cy="0"/>
+        </a:xfrm>
+      </p:grpSpPr>
+      <p:sp>
+        <p:nvSpPr>
+          <p:cNvPr id="2" name="Symbol zastępczy obrazu slajdu 1"/>
+          <p:cNvSpPr>
+            <a:spLocks noGrp="1" noRot="1" noChangeAspect="1"/>
+          </p:cNvSpPr>
+          <p:nvPr>
+            <p:ph type="sldImg"/>
+          </p:nvPr>
+        </p:nvSpPr>
+        <p:spPr/>
+      </p:sp>
+      <p:sp>
+        <p:nvSpPr>
+          <p:cNvPr id="3" name="Symbol zastępczy notatek 2"/>
+          <p:cNvSpPr>
+            <a:spLocks noGrp="1"/>
+          </p:cNvSpPr>
+          <p:nvPr>
+            <p:ph type="body" idx="1"/>
+          </p:nvPr>
+        </p:nvSpPr>
+        <p:spPr/>
+        <p:txBody>
+          <a:bodyPr/>
+          <a:lstStyle/>
+          <a:p>
+            <a:pPr marL="0" indent="0">
+              <a:buFontTx/>
+              <a:buNone/>
+            </a:pPr>
+            <a:endParaRPr lang="pl-PL" sz="1200" b="0" i="0" kern="1200" dirty="0">
+              <a:solidFill>
+                <a:schemeClr val="tx1"/>
+              </a:solidFill>
+              <a:effectLst/>
+              <a:latin typeface="+mn-lt"/>
+              <a:ea typeface="+mn-ea"/>
+              <a:cs typeface="+mn-cs"/>
+            </a:endParaRPr>
+          </a:p>
+        </p:txBody>
+      </p:sp>
+      <p:sp>
+        <p:nvSpPr>
+          <p:cNvPr id="4" name="Symbol zastępczy numeru slajdu 3"/>
+          <p:cNvSpPr>
+            <a:spLocks noGrp="1"/>
+          </p:cNvSpPr>
+          <p:nvPr>
+            <p:ph type="sldNum" sz="quarter" idx="5"/>
+          </p:nvPr>
+        </p:nvSpPr>
+        <p:spPr/>
+        <p:txBody>
+          <a:bodyPr/>
+          <a:lstStyle/>
+          <a:p>
+            <a:fld id="{810A6612-7A23-4B98-B0E9-4F3C882AD2EF}" type="slidenum">
+              <a:rPr lang="pl-PL" smtClean="0"/>
+              <a:t>17</a:t>
+            </a:fld>
+            <a:endParaRPr lang="pl-PL"/>
+          </a:p>
+        </p:txBody>
+      </p:sp>
+    </p:spTree>
+    <p:extLst>
+      <p:ext uri="{BB962C8B-B14F-4D97-AF65-F5344CB8AC3E}">
+        <p14:creationId xmlns:p14="http://schemas.microsoft.com/office/powerpoint/2010/main" val="111034076"/>
+      </p:ext>
+    </p:extLst>
+  </p:cSld>
+  <p:clrMapOvr>
+    <a:masterClrMapping/>
+  </p:clrMapOvr>
+</p:notes>
+</file>
+
+<file path=ppt/notesSlides/notesSlide18.xml><?xml version="1.0" encoding="utf-8"?>
+<p:notes xmlns:a="http://schemas.openxmlformats.org/drawingml/2006/main" xmlns:r="http://schemas.openxmlformats.org/officeDocument/2006/relationships" xmlns:p="http://schemas.openxmlformats.org/presentationml/2006/main">
+  <p:cSld>
+    <p:spTree>
+      <p:nvGrpSpPr>
+        <p:cNvPr id="1" name=""/>
+        <p:cNvGrpSpPr/>
+        <p:nvPr/>
+      </p:nvGrpSpPr>
+      <p:grpSpPr>
+        <a:xfrm>
+          <a:off x="0" y="0"/>
+          <a:ext cx="0" cy="0"/>
+          <a:chOff x="0" y="0"/>
+          <a:chExt cx="0" cy="0"/>
+        </a:xfrm>
+      </p:grpSpPr>
+      <p:sp>
+        <p:nvSpPr>
+          <p:cNvPr id="2" name="Symbol zastępczy obrazu slajdu 1"/>
+          <p:cNvSpPr>
+            <a:spLocks noGrp="1" noRot="1" noChangeAspect="1"/>
+          </p:cNvSpPr>
+          <p:nvPr>
+            <p:ph type="sldImg"/>
+          </p:nvPr>
+        </p:nvSpPr>
+        <p:spPr/>
+      </p:sp>
+      <p:sp>
+        <p:nvSpPr>
+          <p:cNvPr id="3" name="Symbol zastępczy notatek 2"/>
+          <p:cNvSpPr>
+            <a:spLocks noGrp="1"/>
+          </p:cNvSpPr>
+          <p:nvPr>
+            <p:ph type="body" idx="1"/>
+          </p:nvPr>
+        </p:nvSpPr>
+        <p:spPr/>
+        <p:txBody>
+          <a:bodyPr/>
+          <a:lstStyle/>
+          <a:p>
+            <a:pPr marL="0" indent="0">
+              <a:buFontTx/>
+              <a:buNone/>
+            </a:pPr>
+            <a:endParaRPr lang="pl-PL" sz="1200" b="0" i="0" kern="1200" dirty="0">
+              <a:solidFill>
+                <a:schemeClr val="tx1"/>
+              </a:solidFill>
+              <a:effectLst/>
+              <a:latin typeface="+mn-lt"/>
+              <a:ea typeface="+mn-ea"/>
+              <a:cs typeface="+mn-cs"/>
+            </a:endParaRPr>
+          </a:p>
+        </p:txBody>
+      </p:sp>
+      <p:sp>
+        <p:nvSpPr>
+          <p:cNvPr id="4" name="Symbol zastępczy numeru slajdu 3"/>
+          <p:cNvSpPr>
+            <a:spLocks noGrp="1"/>
+          </p:cNvSpPr>
+          <p:nvPr>
+            <p:ph type="sldNum" sz="quarter" idx="5"/>
+          </p:nvPr>
+        </p:nvSpPr>
+        <p:spPr/>
+        <p:txBody>
+          <a:bodyPr/>
+          <a:lstStyle/>
+          <a:p>
+            <a:fld id="{810A6612-7A23-4B98-B0E9-4F3C882AD2EF}" type="slidenum">
+              <a:rPr lang="pl-PL" smtClean="0"/>
+              <a:t>18</a:t>
+            </a:fld>
+            <a:endParaRPr lang="pl-PL"/>
+          </a:p>
+        </p:txBody>
+      </p:sp>
+    </p:spTree>
+    <p:extLst>
+      <p:ext uri="{BB962C8B-B14F-4D97-AF65-F5344CB8AC3E}">
+        <p14:creationId xmlns:p14="http://schemas.microsoft.com/office/powerpoint/2010/main" val="3151434336"/>
+      </p:ext>
+    </p:extLst>
+  </p:cSld>
+  <p:clrMapOvr>
+    <a:masterClrMapping/>
+  </p:clrMapOvr>
+</p:notes>
+</file>
+
+<file path=ppt/notesSlides/notesSlide19.xml><?xml version="1.0" encoding="utf-8"?>
+<p:notes xmlns:a="http://schemas.openxmlformats.org/drawingml/2006/main" xmlns:r="http://schemas.openxmlformats.org/officeDocument/2006/relationships" xmlns:p="http://schemas.openxmlformats.org/presentationml/2006/main">
+  <p:cSld>
+    <p:spTree>
+      <p:nvGrpSpPr>
+        <p:cNvPr id="1" name=""/>
+        <p:cNvGrpSpPr/>
+        <p:nvPr/>
+      </p:nvGrpSpPr>
+      <p:grpSpPr>
+        <a:xfrm>
+          <a:off x="0" y="0"/>
+          <a:ext cx="0" cy="0"/>
+          <a:chOff x="0" y="0"/>
+          <a:chExt cx="0" cy="0"/>
+        </a:xfrm>
+      </p:grpSpPr>
+      <p:sp>
+        <p:nvSpPr>
+          <p:cNvPr id="2" name="Symbol zastępczy obrazu slajdu 1"/>
+          <p:cNvSpPr>
+            <a:spLocks noGrp="1" noRot="1" noChangeAspect="1"/>
+          </p:cNvSpPr>
+          <p:nvPr>
+            <p:ph type="sldImg"/>
+          </p:nvPr>
+        </p:nvSpPr>
+        <p:spPr/>
+      </p:sp>
+      <p:sp>
+        <p:nvSpPr>
+          <p:cNvPr id="3" name="Symbol zastępczy notatek 2"/>
+          <p:cNvSpPr>
+            <a:spLocks noGrp="1"/>
+          </p:cNvSpPr>
+          <p:nvPr>
+            <p:ph type="body" idx="1"/>
+          </p:nvPr>
+        </p:nvSpPr>
+        <p:spPr/>
+        <p:txBody>
+          <a:bodyPr/>
+          <a:lstStyle/>
+          <a:p>
+            <a:pPr marL="0" indent="0">
+              <a:buFontTx/>
+              <a:buNone/>
+            </a:pPr>
+            <a:endParaRPr lang="pl-PL" sz="1200" b="0" i="0" kern="1200" dirty="0">
+              <a:solidFill>
+                <a:schemeClr val="tx1"/>
+              </a:solidFill>
+              <a:effectLst/>
+              <a:latin typeface="+mn-lt"/>
+              <a:ea typeface="+mn-ea"/>
+              <a:cs typeface="+mn-cs"/>
+            </a:endParaRPr>
+          </a:p>
+        </p:txBody>
+      </p:sp>
+      <p:sp>
+        <p:nvSpPr>
+          <p:cNvPr id="4" name="Symbol zastępczy numeru slajdu 3"/>
+          <p:cNvSpPr>
+            <a:spLocks noGrp="1"/>
+          </p:cNvSpPr>
+          <p:nvPr>
+            <p:ph type="sldNum" sz="quarter" idx="5"/>
+          </p:nvPr>
+        </p:nvSpPr>
+        <p:spPr/>
+        <p:txBody>
+          <a:bodyPr/>
+          <a:lstStyle/>
+          <a:p>
+            <a:fld id="{810A6612-7A23-4B98-B0E9-4F3C882AD2EF}" type="slidenum">
+              <a:rPr lang="pl-PL" smtClean="0"/>
+              <a:t>19</a:t>
+            </a:fld>
+            <a:endParaRPr lang="pl-PL"/>
+          </a:p>
+        </p:txBody>
+      </p:sp>
+    </p:spTree>
+    <p:extLst>
+      <p:ext uri="{BB962C8B-B14F-4D97-AF65-F5344CB8AC3E}">
+        <p14:creationId xmlns:p14="http://schemas.microsoft.com/office/powerpoint/2010/main" val="1754730863"/>
       </p:ext>
     </p:extLst>
   </p:cSld>
@@ -2741,6 +3281,102 @@
     <p:extLst>
       <p:ext uri="{BB962C8B-B14F-4D97-AF65-F5344CB8AC3E}">
         <p14:creationId xmlns:p14="http://schemas.microsoft.com/office/powerpoint/2010/main" val="1360449021"/>
+      </p:ext>
+    </p:extLst>
+  </p:cSld>
+  <p:clrMapOvr>
+    <a:masterClrMapping/>
+  </p:clrMapOvr>
+</p:notes>
+</file>
+
+<file path=ppt/notesSlides/notesSlide20.xml><?xml version="1.0" encoding="utf-8"?>
+<p:notes xmlns:a="http://schemas.openxmlformats.org/drawingml/2006/main" xmlns:r="http://schemas.openxmlformats.org/officeDocument/2006/relationships" xmlns:p="http://schemas.openxmlformats.org/presentationml/2006/main">
+  <p:cSld>
+    <p:spTree>
+      <p:nvGrpSpPr>
+        <p:cNvPr id="1" name=""/>
+        <p:cNvGrpSpPr/>
+        <p:nvPr/>
+      </p:nvGrpSpPr>
+      <p:grpSpPr>
+        <a:xfrm>
+          <a:off x="0" y="0"/>
+          <a:ext cx="0" cy="0"/>
+          <a:chOff x="0" y="0"/>
+          <a:chExt cx="0" cy="0"/>
+        </a:xfrm>
+      </p:grpSpPr>
+      <p:sp>
+        <p:nvSpPr>
+          <p:cNvPr id="2" name="Symbol zastępczy obrazu slajdu 1"/>
+          <p:cNvSpPr>
+            <a:spLocks noGrp="1" noRot="1" noChangeAspect="1"/>
+          </p:cNvSpPr>
+          <p:nvPr>
+            <p:ph type="sldImg"/>
+          </p:nvPr>
+        </p:nvSpPr>
+        <p:spPr/>
+      </p:sp>
+      <p:sp>
+        <p:nvSpPr>
+          <p:cNvPr id="3" name="Symbol zastępczy notatek 2"/>
+          <p:cNvSpPr>
+            <a:spLocks noGrp="1"/>
+          </p:cNvSpPr>
+          <p:nvPr>
+            <p:ph type="body" idx="1"/>
+          </p:nvPr>
+        </p:nvSpPr>
+        <p:spPr/>
+        <p:txBody>
+          <a:bodyPr/>
+          <a:lstStyle/>
+          <a:p>
+            <a:pPr marL="0" indent="0">
+              <a:buFontTx/>
+              <a:buNone/>
+            </a:pPr>
+            <a:endParaRPr lang="pl-PL" sz="1200" b="0" i="0" kern="1200" dirty="0">
+              <a:solidFill>
+                <a:schemeClr val="tx1"/>
+              </a:solidFill>
+              <a:effectLst/>
+              <a:latin typeface="+mn-lt"/>
+              <a:ea typeface="+mn-ea"/>
+              <a:cs typeface="+mn-cs"/>
+            </a:endParaRPr>
+          </a:p>
+        </p:txBody>
+      </p:sp>
+      <p:sp>
+        <p:nvSpPr>
+          <p:cNvPr id="4" name="Symbol zastępczy numeru slajdu 3"/>
+          <p:cNvSpPr>
+            <a:spLocks noGrp="1"/>
+          </p:cNvSpPr>
+          <p:nvPr>
+            <p:ph type="sldNum" sz="quarter" idx="5"/>
+          </p:nvPr>
+        </p:nvSpPr>
+        <p:spPr/>
+        <p:txBody>
+          <a:bodyPr/>
+          <a:lstStyle/>
+          <a:p>
+            <a:fld id="{810A6612-7A23-4B98-B0E9-4F3C882AD2EF}" type="slidenum">
+              <a:rPr lang="pl-PL" smtClean="0"/>
+              <a:t>20</a:t>
+            </a:fld>
+            <a:endParaRPr lang="pl-PL"/>
+          </a:p>
+        </p:txBody>
+      </p:sp>
+    </p:spTree>
+    <p:extLst>
+      <p:ext uri="{BB962C8B-B14F-4D97-AF65-F5344CB8AC3E}">
+        <p14:creationId xmlns:p14="http://schemas.microsoft.com/office/powerpoint/2010/main" val="390827826"/>
       </p:ext>
     </p:extLst>
   </p:cSld>
@@ -13214,6 +13850,376 @@
 </p:sld>
 </file>
 
+<file path=ppt/slides/slide15.xml><?xml version="1.0" encoding="utf-8"?>
+<p:sld xmlns:a="http://schemas.openxmlformats.org/drawingml/2006/main" xmlns:r="http://schemas.openxmlformats.org/officeDocument/2006/relationships" xmlns:p="http://schemas.openxmlformats.org/presentationml/2006/main">
+  <p:cSld>
+    <p:spTree>
+      <p:nvGrpSpPr>
+        <p:cNvPr id="1" name=""/>
+        <p:cNvGrpSpPr/>
+        <p:nvPr/>
+      </p:nvGrpSpPr>
+      <p:grpSpPr>
+        <a:xfrm>
+          <a:off x="0" y="0"/>
+          <a:ext cx="0" cy="0"/>
+          <a:chOff x="0" y="0"/>
+          <a:chExt cx="0" cy="0"/>
+        </a:xfrm>
+      </p:grpSpPr>
+      <p:sp>
+        <p:nvSpPr>
+          <p:cNvPr id="4" name="pole tekstowe 3">
+            <a:extLst>
+              <a:ext uri="{FF2B5EF4-FFF2-40B4-BE49-F238E27FC236}">
+                <a16:creationId xmlns:a16="http://schemas.microsoft.com/office/drawing/2014/main" id="{F164A7B3-8808-414C-9401-3B25194E3B5A}"/>
+              </a:ext>
+            </a:extLst>
+          </p:cNvPr>
+          <p:cNvSpPr txBox="1"/>
+          <p:nvPr/>
+        </p:nvSpPr>
+        <p:spPr>
+          <a:xfrm>
+            <a:off x="497840" y="538480"/>
+            <a:ext cx="1301062" cy="369332"/>
+          </a:xfrm>
+          <a:prstGeom prst="rect">
+            <a:avLst/>
+          </a:prstGeom>
+          <a:noFill/>
+        </p:spPr>
+        <p:txBody>
+          <a:bodyPr wrap="none" rtlCol="0">
+            <a:spAutoFit/>
+          </a:bodyPr>
+          <a:lstStyle/>
+          <a:p>
+            <a:r>
+              <a:rPr lang="pl-PL" dirty="0" err="1"/>
+              <a:t>React</a:t>
+            </a:r>
+            <a:r>
+              <a:rPr lang="pl-PL" dirty="0"/>
+              <a:t> </a:t>
+            </a:r>
+            <a:r>
+              <a:rPr lang="pl-PL" dirty="0" err="1"/>
+              <a:t>forms</a:t>
+            </a:r>
+            <a:endParaRPr lang="pl-PL" dirty="0"/>
+          </a:p>
+        </p:txBody>
+      </p:sp>
+    </p:spTree>
+    <p:extLst>
+      <p:ext uri="{BB962C8B-B14F-4D97-AF65-F5344CB8AC3E}">
+        <p14:creationId xmlns:p14="http://schemas.microsoft.com/office/powerpoint/2010/main" val="32585017"/>
+      </p:ext>
+    </p:extLst>
+  </p:cSld>
+  <p:clrMapOvr>
+    <a:masterClrMapping/>
+  </p:clrMapOvr>
+</p:sld>
+</file>
+
+<file path=ppt/slides/slide16.xml><?xml version="1.0" encoding="utf-8"?>
+<p:sld xmlns:a="http://schemas.openxmlformats.org/drawingml/2006/main" xmlns:r="http://schemas.openxmlformats.org/officeDocument/2006/relationships" xmlns:p="http://schemas.openxmlformats.org/presentationml/2006/main">
+  <p:cSld>
+    <p:spTree>
+      <p:nvGrpSpPr>
+        <p:cNvPr id="1" name=""/>
+        <p:cNvGrpSpPr/>
+        <p:nvPr/>
+      </p:nvGrpSpPr>
+      <p:grpSpPr>
+        <a:xfrm>
+          <a:off x="0" y="0"/>
+          <a:ext cx="0" cy="0"/>
+          <a:chOff x="0" y="0"/>
+          <a:chExt cx="0" cy="0"/>
+        </a:xfrm>
+      </p:grpSpPr>
+      <p:sp>
+        <p:nvSpPr>
+          <p:cNvPr id="4" name="pole tekstowe 3">
+            <a:extLst>
+              <a:ext uri="{FF2B5EF4-FFF2-40B4-BE49-F238E27FC236}">
+                <a16:creationId xmlns:a16="http://schemas.microsoft.com/office/drawing/2014/main" id="{F164A7B3-8808-414C-9401-3B25194E3B5A}"/>
+              </a:ext>
+            </a:extLst>
+          </p:cNvPr>
+          <p:cNvSpPr txBox="1"/>
+          <p:nvPr/>
+        </p:nvSpPr>
+        <p:spPr>
+          <a:xfrm>
+            <a:off x="497840" y="538480"/>
+            <a:ext cx="1301062" cy="369332"/>
+          </a:xfrm>
+          <a:prstGeom prst="rect">
+            <a:avLst/>
+          </a:prstGeom>
+          <a:noFill/>
+        </p:spPr>
+        <p:txBody>
+          <a:bodyPr wrap="none" rtlCol="0">
+            <a:spAutoFit/>
+          </a:bodyPr>
+          <a:lstStyle/>
+          <a:p>
+            <a:r>
+              <a:rPr lang="pl-PL" dirty="0" err="1"/>
+              <a:t>React</a:t>
+            </a:r>
+            <a:r>
+              <a:rPr lang="pl-PL" dirty="0"/>
+              <a:t> </a:t>
+            </a:r>
+            <a:r>
+              <a:rPr lang="pl-PL" dirty="0" err="1"/>
+              <a:t>forms</a:t>
+            </a:r>
+            <a:endParaRPr lang="pl-PL" dirty="0"/>
+          </a:p>
+        </p:txBody>
+      </p:sp>
+    </p:spTree>
+    <p:extLst>
+      <p:ext uri="{BB962C8B-B14F-4D97-AF65-F5344CB8AC3E}">
+        <p14:creationId xmlns:p14="http://schemas.microsoft.com/office/powerpoint/2010/main" val="1618893417"/>
+      </p:ext>
+    </p:extLst>
+  </p:cSld>
+  <p:clrMapOvr>
+    <a:masterClrMapping/>
+  </p:clrMapOvr>
+</p:sld>
+</file>
+
+<file path=ppt/slides/slide17.xml><?xml version="1.0" encoding="utf-8"?>
+<p:sld xmlns:a="http://schemas.openxmlformats.org/drawingml/2006/main" xmlns:r="http://schemas.openxmlformats.org/officeDocument/2006/relationships" xmlns:p="http://schemas.openxmlformats.org/presentationml/2006/main">
+  <p:cSld>
+    <p:spTree>
+      <p:nvGrpSpPr>
+        <p:cNvPr id="1" name=""/>
+        <p:cNvGrpSpPr/>
+        <p:nvPr/>
+      </p:nvGrpSpPr>
+      <p:grpSpPr>
+        <a:xfrm>
+          <a:off x="0" y="0"/>
+          <a:ext cx="0" cy="0"/>
+          <a:chOff x="0" y="0"/>
+          <a:chExt cx="0" cy="0"/>
+        </a:xfrm>
+      </p:grpSpPr>
+      <p:sp>
+        <p:nvSpPr>
+          <p:cNvPr id="4" name="pole tekstowe 3">
+            <a:extLst>
+              <a:ext uri="{FF2B5EF4-FFF2-40B4-BE49-F238E27FC236}">
+                <a16:creationId xmlns:a16="http://schemas.microsoft.com/office/drawing/2014/main" id="{F164A7B3-8808-414C-9401-3B25194E3B5A}"/>
+              </a:ext>
+            </a:extLst>
+          </p:cNvPr>
+          <p:cNvSpPr txBox="1"/>
+          <p:nvPr/>
+        </p:nvSpPr>
+        <p:spPr>
+          <a:xfrm>
+            <a:off x="497840" y="538480"/>
+            <a:ext cx="1301062" cy="369332"/>
+          </a:xfrm>
+          <a:prstGeom prst="rect">
+            <a:avLst/>
+          </a:prstGeom>
+          <a:noFill/>
+        </p:spPr>
+        <p:txBody>
+          <a:bodyPr wrap="none" rtlCol="0">
+            <a:spAutoFit/>
+          </a:bodyPr>
+          <a:lstStyle/>
+          <a:p>
+            <a:r>
+              <a:rPr lang="pl-PL" dirty="0" err="1"/>
+              <a:t>React</a:t>
+            </a:r>
+            <a:r>
+              <a:rPr lang="pl-PL" dirty="0"/>
+              <a:t> </a:t>
+            </a:r>
+            <a:r>
+              <a:rPr lang="pl-PL" dirty="0" err="1"/>
+              <a:t>forms</a:t>
+            </a:r>
+            <a:endParaRPr lang="pl-PL" dirty="0"/>
+          </a:p>
+        </p:txBody>
+      </p:sp>
+    </p:spTree>
+    <p:extLst>
+      <p:ext uri="{BB962C8B-B14F-4D97-AF65-F5344CB8AC3E}">
+        <p14:creationId xmlns:p14="http://schemas.microsoft.com/office/powerpoint/2010/main" val="3123341144"/>
+      </p:ext>
+    </p:extLst>
+  </p:cSld>
+  <p:clrMapOvr>
+    <a:masterClrMapping/>
+  </p:clrMapOvr>
+</p:sld>
+</file>
+
+<file path=ppt/slides/slide18.xml><?xml version="1.0" encoding="utf-8"?>
+<p:sld xmlns:a="http://schemas.openxmlformats.org/drawingml/2006/main" xmlns:r="http://schemas.openxmlformats.org/officeDocument/2006/relationships" xmlns:p="http://schemas.openxmlformats.org/presentationml/2006/main">
+  <p:cSld>
+    <p:spTree>
+      <p:nvGrpSpPr>
+        <p:cNvPr id="1" name=""/>
+        <p:cNvGrpSpPr/>
+        <p:nvPr/>
+      </p:nvGrpSpPr>
+      <p:grpSpPr>
+        <a:xfrm>
+          <a:off x="0" y="0"/>
+          <a:ext cx="0" cy="0"/>
+          <a:chOff x="0" y="0"/>
+          <a:chExt cx="0" cy="0"/>
+        </a:xfrm>
+      </p:grpSpPr>
+      <p:sp>
+        <p:nvSpPr>
+          <p:cNvPr id="4" name="pole tekstowe 3">
+            <a:extLst>
+              <a:ext uri="{FF2B5EF4-FFF2-40B4-BE49-F238E27FC236}">
+                <a16:creationId xmlns:a16="http://schemas.microsoft.com/office/drawing/2014/main" id="{F164A7B3-8808-414C-9401-3B25194E3B5A}"/>
+              </a:ext>
+            </a:extLst>
+          </p:cNvPr>
+          <p:cNvSpPr txBox="1"/>
+          <p:nvPr/>
+        </p:nvSpPr>
+        <p:spPr>
+          <a:xfrm>
+            <a:off x="497840" y="538480"/>
+            <a:ext cx="1301062" cy="369332"/>
+          </a:xfrm>
+          <a:prstGeom prst="rect">
+            <a:avLst/>
+          </a:prstGeom>
+          <a:noFill/>
+        </p:spPr>
+        <p:txBody>
+          <a:bodyPr wrap="none" rtlCol="0">
+            <a:spAutoFit/>
+          </a:bodyPr>
+          <a:lstStyle/>
+          <a:p>
+            <a:r>
+              <a:rPr lang="pl-PL" dirty="0" err="1"/>
+              <a:t>React</a:t>
+            </a:r>
+            <a:r>
+              <a:rPr lang="pl-PL" dirty="0"/>
+              <a:t> </a:t>
+            </a:r>
+            <a:r>
+              <a:rPr lang="pl-PL" dirty="0" err="1"/>
+              <a:t>forms</a:t>
+            </a:r>
+            <a:endParaRPr lang="pl-PL" dirty="0"/>
+          </a:p>
+        </p:txBody>
+      </p:sp>
+    </p:spTree>
+    <p:extLst>
+      <p:ext uri="{BB962C8B-B14F-4D97-AF65-F5344CB8AC3E}">
+        <p14:creationId xmlns:p14="http://schemas.microsoft.com/office/powerpoint/2010/main" val="2902186921"/>
+      </p:ext>
+    </p:extLst>
+  </p:cSld>
+  <p:clrMapOvr>
+    <a:masterClrMapping/>
+  </p:clrMapOvr>
+</p:sld>
+</file>
+
+<file path=ppt/slides/slide19.xml><?xml version="1.0" encoding="utf-8"?>
+<p:sld xmlns:a="http://schemas.openxmlformats.org/drawingml/2006/main" xmlns:r="http://schemas.openxmlformats.org/officeDocument/2006/relationships" xmlns:p="http://schemas.openxmlformats.org/presentationml/2006/main">
+  <p:cSld>
+    <p:spTree>
+      <p:nvGrpSpPr>
+        <p:cNvPr id="1" name=""/>
+        <p:cNvGrpSpPr/>
+        <p:nvPr/>
+      </p:nvGrpSpPr>
+      <p:grpSpPr>
+        <a:xfrm>
+          <a:off x="0" y="0"/>
+          <a:ext cx="0" cy="0"/>
+          <a:chOff x="0" y="0"/>
+          <a:chExt cx="0" cy="0"/>
+        </a:xfrm>
+      </p:grpSpPr>
+      <p:sp>
+        <p:nvSpPr>
+          <p:cNvPr id="4" name="pole tekstowe 3">
+            <a:extLst>
+              <a:ext uri="{FF2B5EF4-FFF2-40B4-BE49-F238E27FC236}">
+                <a16:creationId xmlns:a16="http://schemas.microsoft.com/office/drawing/2014/main" id="{F164A7B3-8808-414C-9401-3B25194E3B5A}"/>
+              </a:ext>
+            </a:extLst>
+          </p:cNvPr>
+          <p:cNvSpPr txBox="1"/>
+          <p:nvPr/>
+        </p:nvSpPr>
+        <p:spPr>
+          <a:xfrm>
+            <a:off x="497840" y="538480"/>
+            <a:ext cx="1301062" cy="369332"/>
+          </a:xfrm>
+          <a:prstGeom prst="rect">
+            <a:avLst/>
+          </a:prstGeom>
+          <a:noFill/>
+        </p:spPr>
+        <p:txBody>
+          <a:bodyPr wrap="none" rtlCol="0">
+            <a:spAutoFit/>
+          </a:bodyPr>
+          <a:lstStyle/>
+          <a:p>
+            <a:r>
+              <a:rPr lang="pl-PL" dirty="0" err="1"/>
+              <a:t>React</a:t>
+            </a:r>
+            <a:r>
+              <a:rPr lang="pl-PL" dirty="0"/>
+              <a:t> </a:t>
+            </a:r>
+            <a:r>
+              <a:rPr lang="pl-PL" dirty="0" err="1"/>
+              <a:t>forms</a:t>
+            </a:r>
+            <a:endParaRPr lang="pl-PL" dirty="0"/>
+          </a:p>
+        </p:txBody>
+      </p:sp>
+    </p:spTree>
+    <p:extLst>
+      <p:ext uri="{BB962C8B-B14F-4D97-AF65-F5344CB8AC3E}">
+        <p14:creationId xmlns:p14="http://schemas.microsoft.com/office/powerpoint/2010/main" val="258218015"/>
+      </p:ext>
+    </p:extLst>
+  </p:cSld>
+  <p:clrMapOvr>
+    <a:masterClrMapping/>
+  </p:clrMapOvr>
+</p:sld>
+</file>
+
 <file path=ppt/slides/slide2.xml><?xml version="1.0" encoding="utf-8"?>
 <p:sld xmlns:a="http://schemas.openxmlformats.org/drawingml/2006/main" xmlns:r="http://schemas.openxmlformats.org/officeDocument/2006/relationships" xmlns:p="http://schemas.openxmlformats.org/presentationml/2006/main">
   <p:cSld>
@@ -13360,6 +14366,80 @@
     <p:extLst>
       <p:ext uri="{BB962C8B-B14F-4D97-AF65-F5344CB8AC3E}">
         <p14:creationId xmlns:p14="http://schemas.microsoft.com/office/powerpoint/2010/main" val="1541691614"/>
+      </p:ext>
+    </p:extLst>
+  </p:cSld>
+  <p:clrMapOvr>
+    <a:masterClrMapping/>
+  </p:clrMapOvr>
+</p:sld>
+</file>
+
+<file path=ppt/slides/slide20.xml><?xml version="1.0" encoding="utf-8"?>
+<p:sld xmlns:a="http://schemas.openxmlformats.org/drawingml/2006/main" xmlns:r="http://schemas.openxmlformats.org/officeDocument/2006/relationships" xmlns:p="http://schemas.openxmlformats.org/presentationml/2006/main">
+  <p:cSld>
+    <p:spTree>
+      <p:nvGrpSpPr>
+        <p:cNvPr id="1" name=""/>
+        <p:cNvGrpSpPr/>
+        <p:nvPr/>
+      </p:nvGrpSpPr>
+      <p:grpSpPr>
+        <a:xfrm>
+          <a:off x="0" y="0"/>
+          <a:ext cx="0" cy="0"/>
+          <a:chOff x="0" y="0"/>
+          <a:chExt cx="0" cy="0"/>
+        </a:xfrm>
+      </p:grpSpPr>
+      <p:sp>
+        <p:nvSpPr>
+          <p:cNvPr id="4" name="pole tekstowe 3">
+            <a:extLst>
+              <a:ext uri="{FF2B5EF4-FFF2-40B4-BE49-F238E27FC236}">
+                <a16:creationId xmlns:a16="http://schemas.microsoft.com/office/drawing/2014/main" id="{F164A7B3-8808-414C-9401-3B25194E3B5A}"/>
+              </a:ext>
+            </a:extLst>
+          </p:cNvPr>
+          <p:cNvSpPr txBox="1"/>
+          <p:nvPr/>
+        </p:nvSpPr>
+        <p:spPr>
+          <a:xfrm>
+            <a:off x="497840" y="538480"/>
+            <a:ext cx="1301062" cy="369332"/>
+          </a:xfrm>
+          <a:prstGeom prst="rect">
+            <a:avLst/>
+          </a:prstGeom>
+          <a:noFill/>
+        </p:spPr>
+        <p:txBody>
+          <a:bodyPr wrap="none" rtlCol="0">
+            <a:spAutoFit/>
+          </a:bodyPr>
+          <a:lstStyle/>
+          <a:p>
+            <a:r>
+              <a:rPr lang="pl-PL" dirty="0" err="1"/>
+              <a:t>React</a:t>
+            </a:r>
+            <a:r>
+              <a:rPr lang="pl-PL" dirty="0"/>
+              <a:t> </a:t>
+            </a:r>
+            <a:r>
+              <a:rPr lang="pl-PL" dirty="0" err="1"/>
+              <a:t>forms</a:t>
+            </a:r>
+            <a:endParaRPr lang="pl-PL" dirty="0"/>
+          </a:p>
+        </p:txBody>
+      </p:sp>
+    </p:spTree>
+    <p:extLst>
+      <p:ext uri="{BB962C8B-B14F-4D97-AF65-F5344CB8AC3E}">
+        <p14:creationId xmlns:p14="http://schemas.microsoft.com/office/powerpoint/2010/main" val="2072663024"/>
       </p:ext>
     </p:extLst>
   </p:cSld>

</xml_diff>

<commit_message>
Exercise 10: Add edit mode for user
</commit_message>
<xml_diff>
--- a/tutorial/ReactjsTraining.pptx
+++ b/tutorial/ReactjsTraining.pptx
@@ -2774,6 +2774,48 @@
               <a:buFontTx/>
               <a:buNone/>
             </a:pPr>
+            <a:r>
+              <a:rPr lang="pl-PL" sz="1200" b="0" i="0" kern="1200" dirty="0">
+                <a:solidFill>
+                  <a:schemeClr val="tx1"/>
+                </a:solidFill>
+                <a:effectLst/>
+                <a:latin typeface="+mn-lt"/>
+                <a:ea typeface="+mn-ea"/>
+                <a:cs typeface="+mn-cs"/>
+              </a:rPr>
+              <a:t>(Pokazać jak zrobić </a:t>
+            </a:r>
+            <a:r>
+              <a:rPr lang="pl-PL" sz="1200" b="0" i="0" kern="1200" dirty="0" err="1">
+                <a:solidFill>
+                  <a:schemeClr val="tx1"/>
+                </a:solidFill>
+                <a:effectLst/>
+                <a:latin typeface="+mn-lt"/>
+                <a:ea typeface="+mn-ea"/>
+                <a:cs typeface="+mn-cs"/>
+              </a:rPr>
+              <a:t>select</a:t>
+            </a:r>
+            <a:r>
+              <a:rPr lang="pl-PL" sz="1200" b="0" i="0" kern="1200" dirty="0">
+                <a:solidFill>
+                  <a:schemeClr val="tx1"/>
+                </a:solidFill>
+                <a:effectLst/>
+                <a:latin typeface="+mn-lt"/>
+                <a:ea typeface="+mn-ea"/>
+                <a:cs typeface="+mn-cs"/>
+              </a:rPr>
+              <a:t> z dokumentacji)</a:t>
+            </a:r>
+          </a:p>
+          <a:p>
+            <a:pPr marL="0" indent="0">
+              <a:buFontTx/>
+              <a:buNone/>
+            </a:pPr>
             <a:endParaRPr lang="pl-PL" sz="1200" b="0" i="0" kern="1200" dirty="0">
               <a:solidFill>
                 <a:schemeClr val="tx1"/>
@@ -2783,6 +2825,36 @@
               <a:ea typeface="+mn-ea"/>
               <a:cs typeface="+mn-cs"/>
             </a:endParaRPr>
+          </a:p>
+          <a:p>
+            <a:pPr marL="0" indent="0">
+              <a:buFontTx/>
+              <a:buNone/>
+            </a:pPr>
+            <a:r>
+              <a:rPr lang="pl-PL" sz="1200" b="0" i="0" kern="1200" dirty="0" err="1">
+                <a:solidFill>
+                  <a:schemeClr val="tx1"/>
+                </a:solidFill>
+                <a:effectLst/>
+                <a:latin typeface="+mn-lt"/>
+                <a:ea typeface="+mn-ea"/>
+                <a:cs typeface="+mn-cs"/>
+              </a:rPr>
+              <a:t>Exercise</a:t>
+            </a:r>
+            <a:r>
+              <a:rPr lang="pl-PL" sz="1200" b="0" i="0" kern="1200" dirty="0">
+                <a:solidFill>
+                  <a:schemeClr val="tx1"/>
+                </a:solidFill>
+                <a:effectLst/>
+                <a:latin typeface="+mn-lt"/>
+                <a:ea typeface="+mn-ea"/>
+                <a:cs typeface="+mn-cs"/>
+              </a:rPr>
+              <a:t> 9: Dodać tryb edycji dla użytkownika dla tych trzech pól</a:t>
+            </a:r>
           </a:p>
         </p:txBody>
       </p:sp>
@@ -13908,6 +13980,1119 @@
               <a:t>forms</a:t>
             </a:r>
             <a:endParaRPr lang="pl-PL" dirty="0"/>
+          </a:p>
+        </p:txBody>
+      </p:sp>
+      <p:sp>
+        <p:nvSpPr>
+          <p:cNvPr id="5" name="Prostokąt 4">
+            <a:extLst>
+              <a:ext uri="{FF2B5EF4-FFF2-40B4-BE49-F238E27FC236}">
+                <a16:creationId xmlns:a16="http://schemas.microsoft.com/office/drawing/2014/main" id="{192D78AA-0AE3-408C-8FB7-E5ECB263964E}"/>
+              </a:ext>
+            </a:extLst>
+          </p:cNvPr>
+          <p:cNvSpPr/>
+          <p:nvPr/>
+        </p:nvSpPr>
+        <p:spPr>
+          <a:xfrm>
+            <a:off x="2438397" y="3773558"/>
+            <a:ext cx="8110331" cy="923330"/>
+          </a:xfrm>
+          <a:prstGeom prst="rect">
+            <a:avLst/>
+          </a:prstGeom>
+          <a:solidFill>
+            <a:schemeClr val="tx1"/>
+          </a:solidFill>
+        </p:spPr>
+        <p:txBody>
+          <a:bodyPr wrap="square">
+            <a:spAutoFit/>
+          </a:bodyPr>
+          <a:lstStyle/>
+          <a:p>
+            <a:r>
+              <a:rPr lang="pl-PL" dirty="0" err="1">
+                <a:solidFill>
+                  <a:srgbClr val="9CDCFE"/>
+                </a:solidFill>
+                <a:latin typeface="Consolas" panose="020B0609020204030204" pitchFamily="49" charset="0"/>
+              </a:rPr>
+              <a:t>onValueChange</a:t>
+            </a:r>
+            <a:r>
+              <a:rPr lang="pl-PL" dirty="0">
+                <a:solidFill>
+                  <a:srgbClr val="9CDCFE"/>
+                </a:solidFill>
+                <a:latin typeface="Consolas" panose="020B0609020204030204" pitchFamily="49" charset="0"/>
+              </a:rPr>
+              <a:t> </a:t>
+            </a:r>
+            <a:r>
+              <a:rPr lang="pl-PL" dirty="0">
+                <a:solidFill>
+                  <a:srgbClr val="D4D4D4"/>
+                </a:solidFill>
+                <a:latin typeface="Consolas" panose="020B0609020204030204" pitchFamily="49" charset="0"/>
+              </a:rPr>
+              <a:t> = (</a:t>
+            </a:r>
+            <a:r>
+              <a:rPr lang="pl-PL" dirty="0">
+                <a:solidFill>
+                  <a:srgbClr val="9CDCFE"/>
+                </a:solidFill>
+                <a:latin typeface="Consolas" panose="020B0609020204030204" pitchFamily="49" charset="0"/>
+              </a:rPr>
+              <a:t>event</a:t>
+            </a:r>
+            <a:r>
+              <a:rPr lang="pl-PL" dirty="0">
+                <a:solidFill>
+                  <a:srgbClr val="D4D4D4"/>
+                </a:solidFill>
+                <a:latin typeface="Consolas" panose="020B0609020204030204" pitchFamily="49" charset="0"/>
+              </a:rPr>
+              <a:t>) </a:t>
+            </a:r>
+            <a:r>
+              <a:rPr lang="pl-PL" dirty="0">
+                <a:solidFill>
+                  <a:srgbClr val="569CD6"/>
+                </a:solidFill>
+                <a:latin typeface="Consolas" panose="020B0609020204030204" pitchFamily="49" charset="0"/>
+              </a:rPr>
+              <a:t>=&gt;</a:t>
+            </a:r>
+            <a:r>
+              <a:rPr lang="pl-PL" dirty="0">
+                <a:solidFill>
+                  <a:srgbClr val="D4D4D4"/>
+                </a:solidFill>
+                <a:latin typeface="Consolas" panose="020B0609020204030204" pitchFamily="49" charset="0"/>
+              </a:rPr>
+              <a:t> {</a:t>
+            </a:r>
+          </a:p>
+          <a:p>
+            <a:r>
+              <a:rPr lang="pl-PL" dirty="0">
+                <a:solidFill>
+                  <a:srgbClr val="D4D4D4"/>
+                </a:solidFill>
+                <a:latin typeface="Consolas" panose="020B0609020204030204" pitchFamily="49" charset="0"/>
+              </a:rPr>
+              <a:t>    </a:t>
+            </a:r>
+            <a:r>
+              <a:rPr lang="pl-PL" dirty="0" err="1">
+                <a:solidFill>
+                  <a:srgbClr val="569CD6"/>
+                </a:solidFill>
+                <a:latin typeface="Consolas" panose="020B0609020204030204" pitchFamily="49" charset="0"/>
+              </a:rPr>
+              <a:t>this</a:t>
+            </a:r>
+            <a:r>
+              <a:rPr lang="pl-PL" dirty="0" err="1">
+                <a:solidFill>
+                  <a:srgbClr val="D4D4D4"/>
+                </a:solidFill>
+                <a:latin typeface="Consolas" panose="020B0609020204030204" pitchFamily="49" charset="0"/>
+              </a:rPr>
+              <a:t>.</a:t>
+            </a:r>
+            <a:r>
+              <a:rPr lang="pl-PL" dirty="0" err="1">
+                <a:solidFill>
+                  <a:srgbClr val="DCDCAA"/>
+                </a:solidFill>
+                <a:latin typeface="Consolas" panose="020B0609020204030204" pitchFamily="49" charset="0"/>
+              </a:rPr>
+              <a:t>setState</a:t>
+            </a:r>
+            <a:r>
+              <a:rPr lang="pl-PL" dirty="0">
+                <a:solidFill>
+                  <a:srgbClr val="D4D4D4"/>
+                </a:solidFill>
+                <a:latin typeface="Consolas" panose="020B0609020204030204" pitchFamily="49" charset="0"/>
+              </a:rPr>
+              <a:t>({ </a:t>
+            </a:r>
+            <a:r>
+              <a:rPr lang="pl-PL" dirty="0" err="1">
+                <a:solidFill>
+                  <a:srgbClr val="9CDCFE"/>
+                </a:solidFill>
+                <a:latin typeface="Consolas" panose="020B0609020204030204" pitchFamily="49" charset="0"/>
+              </a:rPr>
+              <a:t>value</a:t>
+            </a:r>
+            <a:r>
+              <a:rPr lang="pl-PL" dirty="0">
+                <a:solidFill>
+                  <a:srgbClr val="9CDCFE"/>
+                </a:solidFill>
+                <a:latin typeface="Consolas" panose="020B0609020204030204" pitchFamily="49" charset="0"/>
+              </a:rPr>
+              <a:t>:</a:t>
+            </a:r>
+            <a:r>
+              <a:rPr lang="pl-PL" dirty="0">
+                <a:solidFill>
+                  <a:srgbClr val="D4D4D4"/>
+                </a:solidFill>
+                <a:latin typeface="Consolas" panose="020B0609020204030204" pitchFamily="49" charset="0"/>
+              </a:rPr>
+              <a:t> </a:t>
+            </a:r>
+            <a:r>
+              <a:rPr lang="pl-PL" dirty="0">
+                <a:solidFill>
+                  <a:srgbClr val="9CDCFE"/>
+                </a:solidFill>
+                <a:latin typeface="Consolas" panose="020B0609020204030204" pitchFamily="49" charset="0"/>
+              </a:rPr>
+              <a:t> </a:t>
+            </a:r>
+            <a:r>
+              <a:rPr lang="pl-PL" dirty="0" err="1">
+                <a:solidFill>
+                  <a:srgbClr val="9CDCFE"/>
+                </a:solidFill>
+                <a:latin typeface="Consolas" panose="020B0609020204030204" pitchFamily="49" charset="0"/>
+              </a:rPr>
+              <a:t>event</a:t>
+            </a:r>
+            <a:r>
+              <a:rPr lang="pl-PL" dirty="0" err="1">
+                <a:solidFill>
+                  <a:srgbClr val="D4D4D4"/>
+                </a:solidFill>
+                <a:latin typeface="Consolas" panose="020B0609020204030204" pitchFamily="49" charset="0"/>
+              </a:rPr>
+              <a:t>.</a:t>
+            </a:r>
+            <a:r>
+              <a:rPr lang="pl-PL" dirty="0" err="1">
+                <a:solidFill>
+                  <a:srgbClr val="9CDCFE"/>
+                </a:solidFill>
+                <a:latin typeface="Consolas" panose="020B0609020204030204" pitchFamily="49" charset="0"/>
+              </a:rPr>
+              <a:t>target</a:t>
+            </a:r>
+            <a:r>
+              <a:rPr lang="pl-PL" dirty="0" err="1">
+                <a:solidFill>
+                  <a:srgbClr val="D4D4D4"/>
+                </a:solidFill>
+                <a:latin typeface="Consolas" panose="020B0609020204030204" pitchFamily="49" charset="0"/>
+              </a:rPr>
+              <a:t>.</a:t>
+            </a:r>
+            <a:r>
+              <a:rPr lang="pl-PL" dirty="0" err="1">
+                <a:solidFill>
+                  <a:srgbClr val="9CDCFE"/>
+                </a:solidFill>
+                <a:latin typeface="Consolas" panose="020B0609020204030204" pitchFamily="49" charset="0"/>
+              </a:rPr>
+              <a:t>value</a:t>
+            </a:r>
+            <a:r>
+              <a:rPr lang="pl-PL" dirty="0">
+                <a:solidFill>
+                  <a:srgbClr val="9CDCFE"/>
+                </a:solidFill>
+                <a:latin typeface="Consolas" panose="020B0609020204030204" pitchFamily="49" charset="0"/>
+              </a:rPr>
+              <a:t> </a:t>
+            </a:r>
+            <a:r>
+              <a:rPr lang="pl-PL" dirty="0">
+                <a:solidFill>
+                  <a:srgbClr val="D4D4D4"/>
+                </a:solidFill>
+                <a:latin typeface="Consolas" panose="020B0609020204030204" pitchFamily="49" charset="0"/>
+              </a:rPr>
+              <a:t> });</a:t>
+            </a:r>
+          </a:p>
+          <a:p>
+            <a:r>
+              <a:rPr lang="pl-PL" dirty="0">
+                <a:solidFill>
+                  <a:srgbClr val="D4D4D4"/>
+                </a:solidFill>
+                <a:latin typeface="Consolas" panose="020B0609020204030204" pitchFamily="49" charset="0"/>
+              </a:rPr>
+              <a:t>}</a:t>
+            </a:r>
+            <a:endParaRPr lang="pl-PL" b="0" dirty="0">
+              <a:solidFill>
+                <a:srgbClr val="D4D4D4"/>
+              </a:solidFill>
+              <a:effectLst/>
+              <a:latin typeface="Consolas" panose="020B0609020204030204" pitchFamily="49" charset="0"/>
+            </a:endParaRPr>
+          </a:p>
+        </p:txBody>
+      </p:sp>
+      <p:sp>
+        <p:nvSpPr>
+          <p:cNvPr id="6" name="Prostokąt 5">
+            <a:extLst>
+              <a:ext uri="{FF2B5EF4-FFF2-40B4-BE49-F238E27FC236}">
+                <a16:creationId xmlns:a16="http://schemas.microsoft.com/office/drawing/2014/main" id="{7569E2A8-0727-42A9-A759-0F8FF8BBBC48}"/>
+              </a:ext>
+            </a:extLst>
+          </p:cNvPr>
+          <p:cNvSpPr/>
+          <p:nvPr/>
+        </p:nvSpPr>
+        <p:spPr>
+          <a:xfrm>
+            <a:off x="2438399" y="1305378"/>
+            <a:ext cx="8110331" cy="2308324"/>
+          </a:xfrm>
+          <a:prstGeom prst="rect">
+            <a:avLst/>
+          </a:prstGeom>
+          <a:solidFill>
+            <a:schemeClr val="tx1"/>
+          </a:solidFill>
+        </p:spPr>
+        <p:txBody>
+          <a:bodyPr wrap="square">
+            <a:spAutoFit/>
+          </a:bodyPr>
+          <a:lstStyle/>
+          <a:p>
+            <a:r>
+              <a:rPr lang="pl-PL" dirty="0">
+                <a:solidFill>
+                  <a:srgbClr val="808080"/>
+                </a:solidFill>
+                <a:latin typeface="Consolas" panose="020B0609020204030204" pitchFamily="49" charset="0"/>
+              </a:rPr>
+              <a:t>&lt;</a:t>
+            </a:r>
+            <a:r>
+              <a:rPr lang="pl-PL" dirty="0">
+                <a:solidFill>
+                  <a:srgbClr val="569CD6"/>
+                </a:solidFill>
+                <a:latin typeface="Consolas" panose="020B0609020204030204" pitchFamily="49" charset="0"/>
+              </a:rPr>
+              <a:t>form</a:t>
+            </a:r>
+            <a:r>
+              <a:rPr lang="pl-PL" dirty="0">
+                <a:solidFill>
+                  <a:srgbClr val="D4D4D4"/>
+                </a:solidFill>
+                <a:latin typeface="Consolas" panose="020B0609020204030204" pitchFamily="49" charset="0"/>
+              </a:rPr>
+              <a:t> </a:t>
+            </a:r>
+            <a:r>
+              <a:rPr lang="pl-PL" dirty="0" err="1">
+                <a:solidFill>
+                  <a:srgbClr val="9CDCFE"/>
+                </a:solidFill>
+                <a:latin typeface="Consolas" panose="020B0609020204030204" pitchFamily="49" charset="0"/>
+              </a:rPr>
+              <a:t>onSubmit</a:t>
+            </a:r>
+            <a:r>
+              <a:rPr lang="pl-PL" dirty="0">
+                <a:solidFill>
+                  <a:srgbClr val="D4D4D4"/>
+                </a:solidFill>
+                <a:latin typeface="Consolas" panose="020B0609020204030204" pitchFamily="49" charset="0"/>
+              </a:rPr>
+              <a:t>=</a:t>
+            </a:r>
+            <a:r>
+              <a:rPr lang="pl-PL" dirty="0">
+                <a:solidFill>
+                  <a:srgbClr val="569CD6"/>
+                </a:solidFill>
+                <a:latin typeface="Consolas" panose="020B0609020204030204" pitchFamily="49" charset="0"/>
+              </a:rPr>
+              <a:t>{</a:t>
+            </a:r>
+            <a:r>
+              <a:rPr lang="pl-PL" dirty="0" err="1">
+                <a:solidFill>
+                  <a:srgbClr val="569CD6"/>
+                </a:solidFill>
+                <a:latin typeface="Consolas" panose="020B0609020204030204" pitchFamily="49" charset="0"/>
+              </a:rPr>
+              <a:t>this</a:t>
+            </a:r>
+            <a:r>
+              <a:rPr lang="pl-PL" dirty="0" err="1">
+                <a:solidFill>
+                  <a:srgbClr val="D4D4D4"/>
+                </a:solidFill>
+                <a:latin typeface="Consolas" panose="020B0609020204030204" pitchFamily="49" charset="0"/>
+              </a:rPr>
+              <a:t>.</a:t>
+            </a:r>
+            <a:r>
+              <a:rPr lang="pl-PL" dirty="0" err="1">
+                <a:solidFill>
+                  <a:srgbClr val="9CDCFE"/>
+                </a:solidFill>
+                <a:latin typeface="Consolas" panose="020B0609020204030204" pitchFamily="49" charset="0"/>
+              </a:rPr>
+              <a:t>handleSubmit</a:t>
+            </a:r>
+            <a:r>
+              <a:rPr lang="pl-PL" dirty="0">
+                <a:solidFill>
+                  <a:srgbClr val="569CD6"/>
+                </a:solidFill>
+                <a:latin typeface="Consolas" panose="020B0609020204030204" pitchFamily="49" charset="0"/>
+              </a:rPr>
+              <a:t>}</a:t>
+            </a:r>
+            <a:r>
+              <a:rPr lang="pl-PL" dirty="0">
+                <a:solidFill>
+                  <a:srgbClr val="808080"/>
+                </a:solidFill>
+                <a:latin typeface="Consolas" panose="020B0609020204030204" pitchFamily="49" charset="0"/>
+              </a:rPr>
+              <a:t>&gt;</a:t>
+            </a:r>
+            <a:endParaRPr lang="pl-PL" dirty="0">
+              <a:solidFill>
+                <a:srgbClr val="D4D4D4"/>
+              </a:solidFill>
+              <a:latin typeface="Consolas" panose="020B0609020204030204" pitchFamily="49" charset="0"/>
+            </a:endParaRPr>
+          </a:p>
+          <a:p>
+            <a:r>
+              <a:rPr lang="pl-PL" dirty="0">
+                <a:solidFill>
+                  <a:srgbClr val="D4D4D4"/>
+                </a:solidFill>
+                <a:latin typeface="Consolas" panose="020B0609020204030204" pitchFamily="49" charset="0"/>
+              </a:rPr>
+              <a:t>    </a:t>
+            </a:r>
+            <a:r>
+              <a:rPr lang="pl-PL" dirty="0">
+                <a:solidFill>
+                  <a:srgbClr val="808080"/>
+                </a:solidFill>
+                <a:latin typeface="Consolas" panose="020B0609020204030204" pitchFamily="49" charset="0"/>
+              </a:rPr>
+              <a:t>&lt;</a:t>
+            </a:r>
+            <a:r>
+              <a:rPr lang="pl-PL" dirty="0" err="1">
+                <a:solidFill>
+                  <a:srgbClr val="569CD6"/>
+                </a:solidFill>
+                <a:latin typeface="Consolas" panose="020B0609020204030204" pitchFamily="49" charset="0"/>
+              </a:rPr>
+              <a:t>input</a:t>
+            </a:r>
+            <a:r>
+              <a:rPr lang="pl-PL" dirty="0">
+                <a:solidFill>
+                  <a:srgbClr val="D4D4D4"/>
+                </a:solidFill>
+                <a:latin typeface="Consolas" panose="020B0609020204030204" pitchFamily="49" charset="0"/>
+              </a:rPr>
+              <a:t> </a:t>
+            </a:r>
+            <a:r>
+              <a:rPr lang="pl-PL" dirty="0" err="1">
+                <a:solidFill>
+                  <a:srgbClr val="9CDCFE"/>
+                </a:solidFill>
+                <a:latin typeface="Consolas" panose="020B0609020204030204" pitchFamily="49" charset="0"/>
+              </a:rPr>
+              <a:t>type</a:t>
+            </a:r>
+            <a:r>
+              <a:rPr lang="pl-PL" dirty="0">
+                <a:solidFill>
+                  <a:srgbClr val="D4D4D4"/>
+                </a:solidFill>
+                <a:latin typeface="Consolas" panose="020B0609020204030204" pitchFamily="49" charset="0"/>
+              </a:rPr>
+              <a:t>=</a:t>
+            </a:r>
+            <a:r>
+              <a:rPr lang="pl-PL" dirty="0">
+                <a:solidFill>
+                  <a:srgbClr val="CE9178"/>
+                </a:solidFill>
+                <a:latin typeface="Consolas" panose="020B0609020204030204" pitchFamily="49" charset="0"/>
+              </a:rPr>
+              <a:t>"</a:t>
+            </a:r>
+            <a:r>
+              <a:rPr lang="pl-PL" dirty="0" err="1">
+                <a:solidFill>
+                  <a:srgbClr val="CE9178"/>
+                </a:solidFill>
+                <a:latin typeface="Consolas" panose="020B0609020204030204" pitchFamily="49" charset="0"/>
+              </a:rPr>
+              <a:t>text</a:t>
+            </a:r>
+            <a:r>
+              <a:rPr lang="pl-PL" dirty="0">
+                <a:solidFill>
+                  <a:srgbClr val="CE9178"/>
+                </a:solidFill>
+                <a:latin typeface="Consolas" panose="020B0609020204030204" pitchFamily="49" charset="0"/>
+              </a:rPr>
+              <a:t>"</a:t>
+            </a:r>
+            <a:endParaRPr lang="pl-PL" dirty="0">
+              <a:solidFill>
+                <a:srgbClr val="D4D4D4"/>
+              </a:solidFill>
+              <a:latin typeface="Consolas" panose="020B0609020204030204" pitchFamily="49" charset="0"/>
+            </a:endParaRPr>
+          </a:p>
+          <a:p>
+            <a:r>
+              <a:rPr lang="pl-PL" dirty="0">
+                <a:solidFill>
+                  <a:srgbClr val="D4D4D4"/>
+                </a:solidFill>
+                <a:latin typeface="Consolas" panose="020B0609020204030204" pitchFamily="49" charset="0"/>
+              </a:rPr>
+              <a:t>        </a:t>
+            </a:r>
+            <a:r>
+              <a:rPr lang="pl-PL" dirty="0" err="1">
+                <a:solidFill>
+                  <a:srgbClr val="9CDCFE"/>
+                </a:solidFill>
+                <a:latin typeface="Consolas" panose="020B0609020204030204" pitchFamily="49" charset="0"/>
+              </a:rPr>
+              <a:t>value</a:t>
+            </a:r>
+            <a:r>
+              <a:rPr lang="pl-PL" dirty="0">
+                <a:solidFill>
+                  <a:srgbClr val="D4D4D4"/>
+                </a:solidFill>
+                <a:latin typeface="Consolas" panose="020B0609020204030204" pitchFamily="49" charset="0"/>
+              </a:rPr>
+              <a:t>=</a:t>
+            </a:r>
+            <a:r>
+              <a:rPr lang="pl-PL" dirty="0">
+                <a:solidFill>
+                  <a:srgbClr val="569CD6"/>
+                </a:solidFill>
+                <a:latin typeface="Consolas" panose="020B0609020204030204" pitchFamily="49" charset="0"/>
+              </a:rPr>
+              <a:t>{</a:t>
+            </a:r>
+            <a:r>
+              <a:rPr lang="pl-PL" dirty="0" err="1">
+                <a:solidFill>
+                  <a:srgbClr val="569CD6"/>
+                </a:solidFill>
+                <a:latin typeface="Consolas" panose="020B0609020204030204" pitchFamily="49" charset="0"/>
+              </a:rPr>
+              <a:t>this</a:t>
+            </a:r>
+            <a:r>
+              <a:rPr lang="pl-PL" dirty="0" err="1">
+                <a:solidFill>
+                  <a:srgbClr val="D4D4D4"/>
+                </a:solidFill>
+                <a:latin typeface="Consolas" panose="020B0609020204030204" pitchFamily="49" charset="0"/>
+              </a:rPr>
+              <a:t>.</a:t>
+            </a:r>
+            <a:r>
+              <a:rPr lang="pl-PL" dirty="0" err="1">
+                <a:solidFill>
+                  <a:srgbClr val="9CDCFE"/>
+                </a:solidFill>
+                <a:latin typeface="Consolas" panose="020B0609020204030204" pitchFamily="49" charset="0"/>
+              </a:rPr>
+              <a:t>state</a:t>
+            </a:r>
+            <a:r>
+              <a:rPr lang="pl-PL" dirty="0" err="1">
+                <a:solidFill>
+                  <a:srgbClr val="D4D4D4"/>
+                </a:solidFill>
+                <a:latin typeface="Consolas" panose="020B0609020204030204" pitchFamily="49" charset="0"/>
+              </a:rPr>
+              <a:t>.</a:t>
+            </a:r>
+            <a:r>
+              <a:rPr lang="pl-PL" dirty="0" err="1">
+                <a:solidFill>
+                  <a:srgbClr val="9CDCFE"/>
+                </a:solidFill>
+                <a:latin typeface="Consolas" panose="020B0609020204030204" pitchFamily="49" charset="0"/>
+              </a:rPr>
+              <a:t>value</a:t>
+            </a:r>
+            <a:r>
+              <a:rPr lang="pl-PL" dirty="0">
+                <a:solidFill>
+                  <a:srgbClr val="569CD6"/>
+                </a:solidFill>
+                <a:latin typeface="Consolas" panose="020B0609020204030204" pitchFamily="49" charset="0"/>
+              </a:rPr>
+              <a:t>}</a:t>
+            </a:r>
+            <a:endParaRPr lang="pl-PL" dirty="0">
+              <a:solidFill>
+                <a:srgbClr val="D4D4D4"/>
+              </a:solidFill>
+              <a:latin typeface="Consolas" panose="020B0609020204030204" pitchFamily="49" charset="0"/>
+            </a:endParaRPr>
+          </a:p>
+          <a:p>
+            <a:r>
+              <a:rPr lang="pl-PL" dirty="0">
+                <a:solidFill>
+                  <a:srgbClr val="D4D4D4"/>
+                </a:solidFill>
+                <a:latin typeface="Consolas" panose="020B0609020204030204" pitchFamily="49" charset="0"/>
+              </a:rPr>
+              <a:t>        </a:t>
+            </a:r>
+            <a:r>
+              <a:rPr lang="pl-PL" dirty="0" err="1">
+                <a:solidFill>
+                  <a:srgbClr val="9CDCFE"/>
+                </a:solidFill>
+                <a:latin typeface="Consolas" panose="020B0609020204030204" pitchFamily="49" charset="0"/>
+              </a:rPr>
+              <a:t>onChange</a:t>
+            </a:r>
+            <a:r>
+              <a:rPr lang="pl-PL" dirty="0">
+                <a:solidFill>
+                  <a:srgbClr val="D4D4D4"/>
+                </a:solidFill>
+                <a:latin typeface="Consolas" panose="020B0609020204030204" pitchFamily="49" charset="0"/>
+              </a:rPr>
+              <a:t>=</a:t>
+            </a:r>
+            <a:r>
+              <a:rPr lang="pl-PL" dirty="0">
+                <a:solidFill>
+                  <a:srgbClr val="569CD6"/>
+                </a:solidFill>
+                <a:latin typeface="Consolas" panose="020B0609020204030204" pitchFamily="49" charset="0"/>
+              </a:rPr>
+              <a:t>{</a:t>
+            </a:r>
+            <a:r>
+              <a:rPr lang="pl-PL" dirty="0" err="1">
+                <a:solidFill>
+                  <a:srgbClr val="569CD6"/>
+                </a:solidFill>
+                <a:latin typeface="Consolas" panose="020B0609020204030204" pitchFamily="49" charset="0"/>
+              </a:rPr>
+              <a:t>this</a:t>
+            </a:r>
+            <a:r>
+              <a:rPr lang="pl-PL" dirty="0" err="1">
+                <a:solidFill>
+                  <a:srgbClr val="D4D4D4"/>
+                </a:solidFill>
+                <a:latin typeface="Consolas" panose="020B0609020204030204" pitchFamily="49" charset="0"/>
+              </a:rPr>
+              <a:t>.</a:t>
+            </a:r>
+            <a:r>
+              <a:rPr lang="pl-PL" dirty="0" err="1">
+                <a:solidFill>
+                  <a:srgbClr val="9CDCFE"/>
+                </a:solidFill>
+                <a:latin typeface="Consolas" panose="020B0609020204030204" pitchFamily="49" charset="0"/>
+              </a:rPr>
+              <a:t>onValueChange</a:t>
+            </a:r>
+            <a:r>
+              <a:rPr lang="pl-PL" dirty="0">
+                <a:solidFill>
+                  <a:srgbClr val="569CD6"/>
+                </a:solidFill>
+                <a:latin typeface="Consolas" panose="020B0609020204030204" pitchFamily="49" charset="0"/>
+              </a:rPr>
+              <a:t>}</a:t>
+            </a:r>
+            <a:endParaRPr lang="pl-PL" dirty="0">
+              <a:solidFill>
+                <a:srgbClr val="D4D4D4"/>
+              </a:solidFill>
+              <a:latin typeface="Consolas" panose="020B0609020204030204" pitchFamily="49" charset="0"/>
+            </a:endParaRPr>
+          </a:p>
+          <a:p>
+            <a:r>
+              <a:rPr lang="pl-PL" dirty="0">
+                <a:solidFill>
+                  <a:srgbClr val="D4D4D4"/>
+                </a:solidFill>
+                <a:latin typeface="Consolas" panose="020B0609020204030204" pitchFamily="49" charset="0"/>
+              </a:rPr>
+              <a:t>    </a:t>
+            </a:r>
+            <a:r>
+              <a:rPr lang="pl-PL" dirty="0">
+                <a:solidFill>
+                  <a:srgbClr val="808080"/>
+                </a:solidFill>
+                <a:latin typeface="Consolas" panose="020B0609020204030204" pitchFamily="49" charset="0"/>
+              </a:rPr>
+              <a:t>/&gt;</a:t>
+            </a:r>
+            <a:endParaRPr lang="pl-PL" dirty="0">
+              <a:solidFill>
+                <a:srgbClr val="D4D4D4"/>
+              </a:solidFill>
+              <a:latin typeface="Consolas" panose="020B0609020204030204" pitchFamily="49" charset="0"/>
+            </a:endParaRPr>
+          </a:p>
+          <a:p>
+            <a:r>
+              <a:rPr lang="pl-PL" dirty="0">
+                <a:solidFill>
+                  <a:srgbClr val="D4D4D4"/>
+                </a:solidFill>
+                <a:latin typeface="Consolas" panose="020B0609020204030204" pitchFamily="49" charset="0"/>
+              </a:rPr>
+              <a:t>    </a:t>
+            </a:r>
+          </a:p>
+          <a:p>
+            <a:r>
+              <a:rPr lang="pl-PL" dirty="0">
+                <a:solidFill>
+                  <a:srgbClr val="D4D4D4"/>
+                </a:solidFill>
+                <a:latin typeface="Consolas" panose="020B0609020204030204" pitchFamily="49" charset="0"/>
+              </a:rPr>
+              <a:t>    </a:t>
+            </a:r>
+            <a:r>
+              <a:rPr lang="pl-PL" dirty="0">
+                <a:solidFill>
+                  <a:srgbClr val="808080"/>
+                </a:solidFill>
+                <a:latin typeface="Consolas" panose="020B0609020204030204" pitchFamily="49" charset="0"/>
+              </a:rPr>
+              <a:t>&lt;</a:t>
+            </a:r>
+            <a:r>
+              <a:rPr lang="pl-PL" dirty="0" err="1">
+                <a:solidFill>
+                  <a:srgbClr val="569CD6"/>
+                </a:solidFill>
+                <a:latin typeface="Consolas" panose="020B0609020204030204" pitchFamily="49" charset="0"/>
+              </a:rPr>
+              <a:t>input</a:t>
+            </a:r>
+            <a:r>
+              <a:rPr lang="pl-PL" dirty="0">
+                <a:solidFill>
+                  <a:srgbClr val="D4D4D4"/>
+                </a:solidFill>
+                <a:latin typeface="Consolas" panose="020B0609020204030204" pitchFamily="49" charset="0"/>
+              </a:rPr>
+              <a:t> </a:t>
+            </a:r>
+            <a:r>
+              <a:rPr lang="pl-PL" dirty="0" err="1">
+                <a:solidFill>
+                  <a:srgbClr val="9CDCFE"/>
+                </a:solidFill>
+                <a:latin typeface="Consolas" panose="020B0609020204030204" pitchFamily="49" charset="0"/>
+              </a:rPr>
+              <a:t>type</a:t>
+            </a:r>
+            <a:r>
+              <a:rPr lang="pl-PL" dirty="0">
+                <a:solidFill>
+                  <a:srgbClr val="D4D4D4"/>
+                </a:solidFill>
+                <a:latin typeface="Consolas" panose="020B0609020204030204" pitchFamily="49" charset="0"/>
+              </a:rPr>
+              <a:t>=</a:t>
+            </a:r>
+            <a:r>
+              <a:rPr lang="pl-PL" dirty="0">
+                <a:solidFill>
+                  <a:srgbClr val="CE9178"/>
+                </a:solidFill>
+                <a:latin typeface="Consolas" panose="020B0609020204030204" pitchFamily="49" charset="0"/>
+              </a:rPr>
+              <a:t>"</a:t>
+            </a:r>
+            <a:r>
+              <a:rPr lang="pl-PL" dirty="0" err="1">
+                <a:solidFill>
+                  <a:srgbClr val="CE9178"/>
+                </a:solidFill>
+                <a:latin typeface="Consolas" panose="020B0609020204030204" pitchFamily="49" charset="0"/>
+              </a:rPr>
+              <a:t>submit</a:t>
+            </a:r>
+            <a:r>
+              <a:rPr lang="pl-PL" dirty="0">
+                <a:solidFill>
+                  <a:srgbClr val="CE9178"/>
+                </a:solidFill>
+                <a:latin typeface="Consolas" panose="020B0609020204030204" pitchFamily="49" charset="0"/>
+              </a:rPr>
+              <a:t>"</a:t>
+            </a:r>
+            <a:r>
+              <a:rPr lang="pl-PL" dirty="0">
+                <a:solidFill>
+                  <a:srgbClr val="D4D4D4"/>
+                </a:solidFill>
+                <a:latin typeface="Consolas" panose="020B0609020204030204" pitchFamily="49" charset="0"/>
+              </a:rPr>
+              <a:t> </a:t>
+            </a:r>
+            <a:r>
+              <a:rPr lang="pl-PL" dirty="0" err="1">
+                <a:solidFill>
+                  <a:srgbClr val="9CDCFE"/>
+                </a:solidFill>
+                <a:latin typeface="Consolas" panose="020B0609020204030204" pitchFamily="49" charset="0"/>
+              </a:rPr>
+              <a:t>value</a:t>
+            </a:r>
+            <a:r>
+              <a:rPr lang="pl-PL" dirty="0">
+                <a:solidFill>
+                  <a:srgbClr val="D4D4D4"/>
+                </a:solidFill>
+                <a:latin typeface="Consolas" panose="020B0609020204030204" pitchFamily="49" charset="0"/>
+              </a:rPr>
+              <a:t>=</a:t>
+            </a:r>
+            <a:r>
+              <a:rPr lang="pl-PL" dirty="0">
+                <a:solidFill>
+                  <a:srgbClr val="CE9178"/>
+                </a:solidFill>
+                <a:latin typeface="Consolas" panose="020B0609020204030204" pitchFamily="49" charset="0"/>
+              </a:rPr>
+              <a:t>"</a:t>
+            </a:r>
+            <a:r>
+              <a:rPr lang="pl-PL" dirty="0" err="1">
+                <a:solidFill>
+                  <a:srgbClr val="CE9178"/>
+                </a:solidFill>
+                <a:latin typeface="Consolas" panose="020B0609020204030204" pitchFamily="49" charset="0"/>
+              </a:rPr>
+              <a:t>Send</a:t>
+            </a:r>
+            <a:r>
+              <a:rPr lang="pl-PL" dirty="0">
+                <a:solidFill>
+                  <a:srgbClr val="CE9178"/>
+                </a:solidFill>
+                <a:latin typeface="Consolas" panose="020B0609020204030204" pitchFamily="49" charset="0"/>
+              </a:rPr>
+              <a:t>"</a:t>
+            </a:r>
+            <a:r>
+              <a:rPr lang="pl-PL" dirty="0">
+                <a:solidFill>
+                  <a:srgbClr val="D4D4D4"/>
+                </a:solidFill>
+                <a:latin typeface="Consolas" panose="020B0609020204030204" pitchFamily="49" charset="0"/>
+              </a:rPr>
+              <a:t> </a:t>
+            </a:r>
+            <a:r>
+              <a:rPr lang="pl-PL" dirty="0">
+                <a:solidFill>
+                  <a:srgbClr val="808080"/>
+                </a:solidFill>
+                <a:latin typeface="Consolas" panose="020B0609020204030204" pitchFamily="49" charset="0"/>
+              </a:rPr>
+              <a:t>/&gt;</a:t>
+            </a:r>
+            <a:endParaRPr lang="pl-PL" dirty="0">
+              <a:solidFill>
+                <a:srgbClr val="D4D4D4"/>
+              </a:solidFill>
+              <a:latin typeface="Consolas" panose="020B0609020204030204" pitchFamily="49" charset="0"/>
+            </a:endParaRPr>
+          </a:p>
+          <a:p>
+            <a:r>
+              <a:rPr lang="pl-PL" dirty="0">
+                <a:solidFill>
+                  <a:srgbClr val="808080"/>
+                </a:solidFill>
+                <a:latin typeface="Consolas" panose="020B0609020204030204" pitchFamily="49" charset="0"/>
+              </a:rPr>
+              <a:t>&lt;/</a:t>
+            </a:r>
+            <a:r>
+              <a:rPr lang="pl-PL" dirty="0">
+                <a:solidFill>
+                  <a:srgbClr val="569CD6"/>
+                </a:solidFill>
+                <a:latin typeface="Consolas" panose="020B0609020204030204" pitchFamily="49" charset="0"/>
+              </a:rPr>
+              <a:t>form</a:t>
+            </a:r>
+            <a:r>
+              <a:rPr lang="pl-PL" dirty="0">
+                <a:solidFill>
+                  <a:srgbClr val="808080"/>
+                </a:solidFill>
+                <a:latin typeface="Consolas" panose="020B0609020204030204" pitchFamily="49" charset="0"/>
+              </a:rPr>
+              <a:t>&gt;</a:t>
+            </a:r>
+            <a:endParaRPr lang="pl-PL" b="0" dirty="0">
+              <a:solidFill>
+                <a:srgbClr val="D4D4D4"/>
+              </a:solidFill>
+              <a:effectLst/>
+              <a:latin typeface="Consolas" panose="020B0609020204030204" pitchFamily="49" charset="0"/>
+            </a:endParaRPr>
+          </a:p>
+        </p:txBody>
+      </p:sp>
+      <p:sp>
+        <p:nvSpPr>
+          <p:cNvPr id="7" name="Prostokąt 6">
+            <a:extLst>
+              <a:ext uri="{FF2B5EF4-FFF2-40B4-BE49-F238E27FC236}">
+                <a16:creationId xmlns:a16="http://schemas.microsoft.com/office/drawing/2014/main" id="{07A21401-C97B-4573-A5A8-E8BE58B69E5D}"/>
+              </a:ext>
+            </a:extLst>
+          </p:cNvPr>
+          <p:cNvSpPr/>
+          <p:nvPr/>
+        </p:nvSpPr>
+        <p:spPr>
+          <a:xfrm>
+            <a:off x="2438396" y="4856744"/>
+            <a:ext cx="8110331" cy="1200329"/>
+          </a:xfrm>
+          <a:prstGeom prst="rect">
+            <a:avLst/>
+          </a:prstGeom>
+          <a:solidFill>
+            <a:schemeClr val="tx1"/>
+          </a:solidFill>
+        </p:spPr>
+        <p:txBody>
+          <a:bodyPr wrap="square">
+            <a:spAutoFit/>
+          </a:bodyPr>
+          <a:lstStyle/>
+          <a:p>
+            <a:r>
+              <a:rPr lang="pl-PL" dirty="0">
+                <a:solidFill>
+                  <a:srgbClr val="D4D4D4"/>
+                </a:solidFill>
+                <a:latin typeface="Consolas" panose="020B0609020204030204" pitchFamily="49" charset="0"/>
+              </a:rPr>
+              <a:t>    </a:t>
+            </a:r>
+            <a:r>
+              <a:rPr lang="pl-PL" dirty="0" err="1">
+                <a:solidFill>
+                  <a:srgbClr val="DCDCAA"/>
+                </a:solidFill>
+                <a:latin typeface="Consolas" panose="020B0609020204030204" pitchFamily="49" charset="0"/>
+              </a:rPr>
+              <a:t>onSubmit</a:t>
+            </a:r>
+            <a:r>
+              <a:rPr lang="pl-PL" dirty="0">
+                <a:solidFill>
+                  <a:srgbClr val="D4D4D4"/>
+                </a:solidFill>
+                <a:latin typeface="Consolas" panose="020B0609020204030204" pitchFamily="49" charset="0"/>
+              </a:rPr>
+              <a:t> = (</a:t>
+            </a:r>
+            <a:r>
+              <a:rPr lang="pl-PL" dirty="0">
+                <a:solidFill>
+                  <a:srgbClr val="9CDCFE"/>
+                </a:solidFill>
+                <a:latin typeface="Consolas" panose="020B0609020204030204" pitchFamily="49" charset="0"/>
+              </a:rPr>
+              <a:t>e</a:t>
+            </a:r>
+            <a:r>
+              <a:rPr lang="pl-PL" dirty="0">
+                <a:solidFill>
+                  <a:srgbClr val="D4D4D4"/>
+                </a:solidFill>
+                <a:latin typeface="Consolas" panose="020B0609020204030204" pitchFamily="49" charset="0"/>
+              </a:rPr>
+              <a:t>) </a:t>
+            </a:r>
+            <a:r>
+              <a:rPr lang="pl-PL" dirty="0">
+                <a:solidFill>
+                  <a:srgbClr val="569CD6"/>
+                </a:solidFill>
+                <a:latin typeface="Consolas" panose="020B0609020204030204" pitchFamily="49" charset="0"/>
+              </a:rPr>
+              <a:t>=&gt;</a:t>
+            </a:r>
+            <a:r>
+              <a:rPr lang="pl-PL" dirty="0">
+                <a:solidFill>
+                  <a:srgbClr val="D4D4D4"/>
+                </a:solidFill>
+                <a:latin typeface="Consolas" panose="020B0609020204030204" pitchFamily="49" charset="0"/>
+              </a:rPr>
+              <a:t> {</a:t>
+            </a:r>
+          </a:p>
+          <a:p>
+            <a:r>
+              <a:rPr lang="pl-PL" dirty="0">
+                <a:solidFill>
+                  <a:srgbClr val="D4D4D4"/>
+                </a:solidFill>
+                <a:latin typeface="Consolas" panose="020B0609020204030204" pitchFamily="49" charset="0"/>
+              </a:rPr>
+              <a:t>        </a:t>
+            </a:r>
+            <a:r>
+              <a:rPr lang="pl-PL" dirty="0" err="1">
+                <a:solidFill>
+                  <a:srgbClr val="9CDCFE"/>
+                </a:solidFill>
+                <a:latin typeface="Consolas" panose="020B0609020204030204" pitchFamily="49" charset="0"/>
+              </a:rPr>
+              <a:t>e</a:t>
+            </a:r>
+            <a:r>
+              <a:rPr lang="pl-PL" dirty="0" err="1">
+                <a:solidFill>
+                  <a:srgbClr val="D4D4D4"/>
+                </a:solidFill>
+                <a:latin typeface="Consolas" panose="020B0609020204030204" pitchFamily="49" charset="0"/>
+              </a:rPr>
+              <a:t>.</a:t>
+            </a:r>
+            <a:r>
+              <a:rPr lang="pl-PL" dirty="0" err="1">
+                <a:solidFill>
+                  <a:srgbClr val="DCDCAA"/>
+                </a:solidFill>
+                <a:latin typeface="Consolas" panose="020B0609020204030204" pitchFamily="49" charset="0"/>
+              </a:rPr>
+              <a:t>preventDefault</a:t>
+            </a:r>
+            <a:r>
+              <a:rPr lang="pl-PL" dirty="0">
+                <a:solidFill>
+                  <a:srgbClr val="D4D4D4"/>
+                </a:solidFill>
+                <a:latin typeface="Consolas" panose="020B0609020204030204" pitchFamily="49" charset="0"/>
+              </a:rPr>
+              <a:t>();</a:t>
+            </a:r>
+          </a:p>
+          <a:p>
+            <a:r>
+              <a:rPr lang="pl-PL" dirty="0">
+                <a:solidFill>
+                  <a:srgbClr val="D4D4D4"/>
+                </a:solidFill>
+                <a:latin typeface="Consolas" panose="020B0609020204030204" pitchFamily="49" charset="0"/>
+              </a:rPr>
+              <a:t>        </a:t>
+            </a:r>
+            <a:r>
+              <a:rPr lang="pl-PL" dirty="0">
+                <a:solidFill>
+                  <a:srgbClr val="00B050"/>
+                </a:solidFill>
+                <a:latin typeface="Consolas" panose="020B0609020204030204" pitchFamily="49" charset="0"/>
+              </a:rPr>
+              <a:t>// </a:t>
+            </a:r>
+            <a:r>
+              <a:rPr lang="pl-PL" dirty="0" err="1">
+                <a:solidFill>
+                  <a:srgbClr val="00B050"/>
+                </a:solidFill>
+                <a:latin typeface="Consolas" panose="020B0609020204030204" pitchFamily="49" charset="0"/>
+              </a:rPr>
+              <a:t>Submit</a:t>
+            </a:r>
+            <a:r>
+              <a:rPr lang="pl-PL" dirty="0">
+                <a:solidFill>
+                  <a:srgbClr val="00B050"/>
+                </a:solidFill>
+                <a:latin typeface="Consolas" panose="020B0609020204030204" pitchFamily="49" charset="0"/>
+              </a:rPr>
+              <a:t> </a:t>
+            </a:r>
+            <a:r>
+              <a:rPr lang="pl-PL" dirty="0" err="1">
+                <a:solidFill>
+                  <a:srgbClr val="00B050"/>
+                </a:solidFill>
+                <a:latin typeface="Consolas" panose="020B0609020204030204" pitchFamily="49" charset="0"/>
+              </a:rPr>
+              <a:t>logic</a:t>
+            </a:r>
+            <a:endParaRPr lang="pl-PL" dirty="0">
+              <a:solidFill>
+                <a:srgbClr val="00B050"/>
+              </a:solidFill>
+              <a:latin typeface="Consolas" panose="020B0609020204030204" pitchFamily="49" charset="0"/>
+            </a:endParaRPr>
+          </a:p>
+          <a:p>
+            <a:r>
+              <a:rPr lang="pl-PL" dirty="0">
+                <a:solidFill>
+                  <a:srgbClr val="D4D4D4"/>
+                </a:solidFill>
+                <a:latin typeface="Consolas" panose="020B0609020204030204" pitchFamily="49" charset="0"/>
+              </a:rPr>
+              <a:t>    }</a:t>
+            </a:r>
+            <a:endParaRPr lang="pl-PL" b="0" dirty="0">
+              <a:solidFill>
+                <a:srgbClr val="D4D4D4"/>
+              </a:solidFill>
+              <a:effectLst/>
+              <a:latin typeface="Consolas" panose="020B0609020204030204" pitchFamily="49" charset="0"/>
+            </a:endParaRPr>
           </a:p>
         </p:txBody>
       </p:sp>

</xml_diff>

<commit_message>
Exercise 11: State propagation - separate form component
</commit_message>
<xml_diff>
--- a/tutorial/ReactjsTraining.pptx
+++ b/tutorial/ReactjsTraining.pptx
@@ -2664,29 +2664,8 @@
                 <a:ea typeface="+mn-ea"/>
                 <a:cs typeface="+mn-cs"/>
               </a:rPr>
-              <a:t> 9: Dodać przycisk usuń </a:t>
-            </a:r>
-            <a:r>
-              <a:rPr lang="pl-PL" sz="1200" b="0" i="0" kern="1200">
-                <a:solidFill>
-                  <a:schemeClr val="tx1"/>
-                </a:solidFill>
-                <a:effectLst/>
-                <a:latin typeface="+mn-lt"/>
-                <a:ea typeface="+mn-ea"/>
-                <a:cs typeface="+mn-cs"/>
-              </a:rPr>
-              <a:t>i oprogramować</a:t>
-            </a:r>
-            <a:endParaRPr lang="pl-PL" sz="1200" b="0" i="0" kern="1200" dirty="0">
-              <a:solidFill>
-                <a:schemeClr val="tx1"/>
-              </a:solidFill>
-              <a:effectLst/>
-              <a:latin typeface="+mn-lt"/>
-              <a:ea typeface="+mn-ea"/>
-              <a:cs typeface="+mn-cs"/>
-            </a:endParaRPr>
+              <a:t> 9: Dodać przycisk usuń i oprogramować</a:t>
+            </a:r>
           </a:p>
         </p:txBody>
       </p:sp>
@@ -2853,7 +2832,7 @@
                 <a:ea typeface="+mn-ea"/>
                 <a:cs typeface="+mn-cs"/>
               </a:rPr>
-              <a:t> 9: Dodać tryb edycji dla użytkownika dla tych trzech pól</a:t>
+              <a:t> 10: Dodać tryb edycji dla użytkownika dla tych trzech pól</a:t>
             </a:r>
           </a:p>
         </p:txBody>
@@ -2942,15 +2921,54 @@
               <a:buFontTx/>
               <a:buNone/>
             </a:pPr>
-            <a:endParaRPr lang="pl-PL" sz="1200" b="0" i="0" kern="1200" dirty="0">
-              <a:solidFill>
-                <a:schemeClr val="tx1"/>
-              </a:solidFill>
-              <a:effectLst/>
-              <a:latin typeface="+mn-lt"/>
-              <a:ea typeface="+mn-ea"/>
-              <a:cs typeface="+mn-cs"/>
-            </a:endParaRPr>
+            <a:r>
+              <a:rPr lang="pl-PL" sz="1200" b="0" i="0" kern="1200" dirty="0" err="1">
+                <a:solidFill>
+                  <a:schemeClr val="tx1"/>
+                </a:solidFill>
+                <a:effectLst/>
+                <a:latin typeface="+mn-lt"/>
+                <a:ea typeface="+mn-ea"/>
+                <a:cs typeface="+mn-cs"/>
+              </a:rPr>
+              <a:t>Exercise</a:t>
+            </a:r>
+            <a:r>
+              <a:rPr lang="pl-PL" sz="1200" b="0" i="0" kern="1200" dirty="0">
+                <a:solidFill>
+                  <a:schemeClr val="tx1"/>
+                </a:solidFill>
+                <a:effectLst/>
+                <a:latin typeface="+mn-lt"/>
+                <a:ea typeface="+mn-ea"/>
+                <a:cs typeface="+mn-cs"/>
+              </a:rPr>
+              <a:t> 11: Stworzyć </a:t>
+            </a:r>
+            <a:r>
+              <a:rPr lang="pl-PL" sz="1200" b="0" i="0" kern="1200" dirty="0" err="1">
+                <a:solidFill>
+                  <a:schemeClr val="tx1"/>
+                </a:solidFill>
+                <a:effectLst/>
+                <a:latin typeface="+mn-lt"/>
+                <a:ea typeface="+mn-ea"/>
+                <a:cs typeface="+mn-cs"/>
+              </a:rPr>
+              <a:t>ListForm</a:t>
+            </a:r>
+            <a:r>
+              <a:rPr lang="pl-PL" sz="1200" b="0" i="0" kern="1200" dirty="0">
+                <a:solidFill>
+                  <a:schemeClr val="tx1"/>
+                </a:solidFill>
+                <a:effectLst/>
+                <a:latin typeface="+mn-lt"/>
+                <a:ea typeface="+mn-ea"/>
+                <a:cs typeface="+mn-cs"/>
+              </a:rPr>
+              <a:t> component, w którym będziemy obsługiwali edycję. Nie powinien on nic wiedzieć o liście użytkowników a jedynie operować na jednym danym użytkowniku</a:t>
+            </a:r>
           </a:p>
         </p:txBody>
       </p:sp>
@@ -15141,7 +15159,7 @@
         <p:spPr>
           <a:xfrm>
             <a:off x="497840" y="538480"/>
-            <a:ext cx="1301062" cy="369332"/>
+            <a:ext cx="2411109" cy="369332"/>
           </a:xfrm>
           <a:prstGeom prst="rect">
             <a:avLst/>
@@ -15164,9 +15182,672 @@
             </a:r>
             <a:r>
               <a:rPr lang="pl-PL" dirty="0" err="1"/>
-              <a:t>forms</a:t>
+              <a:t>state</a:t>
+            </a:r>
+            <a:r>
+              <a:rPr lang="pl-PL" dirty="0"/>
+              <a:t> </a:t>
+            </a:r>
+            <a:r>
+              <a:rPr lang="pl-PL" dirty="0" err="1"/>
+              <a:t>propagation</a:t>
             </a:r>
             <a:endParaRPr lang="pl-PL" dirty="0"/>
+          </a:p>
+        </p:txBody>
+      </p:sp>
+      <p:sp>
+        <p:nvSpPr>
+          <p:cNvPr id="2" name="Prostokąt 1">
+            <a:extLst>
+              <a:ext uri="{FF2B5EF4-FFF2-40B4-BE49-F238E27FC236}">
+                <a16:creationId xmlns:a16="http://schemas.microsoft.com/office/drawing/2014/main" id="{1F46DE75-D54B-4E73-B542-AF19E6C56519}"/>
+              </a:ext>
+            </a:extLst>
+          </p:cNvPr>
+          <p:cNvSpPr/>
+          <p:nvPr/>
+        </p:nvSpPr>
+        <p:spPr>
+          <a:xfrm>
+            <a:off x="1179444" y="1886093"/>
+            <a:ext cx="4743606" cy="369332"/>
+          </a:xfrm>
+          <a:prstGeom prst="rect">
+            <a:avLst/>
+          </a:prstGeom>
+          <a:solidFill>
+            <a:schemeClr val="tx1"/>
+          </a:solidFill>
+        </p:spPr>
+        <p:txBody>
+          <a:bodyPr wrap="none">
+            <a:spAutoFit/>
+          </a:bodyPr>
+          <a:lstStyle/>
+          <a:p>
+            <a:r>
+              <a:rPr lang="pl-PL" dirty="0" err="1">
+                <a:solidFill>
+                  <a:srgbClr val="569CD6"/>
+                </a:solidFill>
+                <a:latin typeface="Consolas" panose="020B0609020204030204" pitchFamily="49" charset="0"/>
+              </a:rPr>
+              <a:t>this</a:t>
+            </a:r>
+            <a:r>
+              <a:rPr lang="pl-PL" dirty="0" err="1">
+                <a:solidFill>
+                  <a:srgbClr val="D4D4D4"/>
+                </a:solidFill>
+                <a:latin typeface="Consolas" panose="020B0609020204030204" pitchFamily="49" charset="0"/>
+              </a:rPr>
+              <a:t>.</a:t>
+            </a:r>
+            <a:r>
+              <a:rPr lang="pl-PL" dirty="0" err="1">
+                <a:solidFill>
+                  <a:srgbClr val="9CDCFE"/>
+                </a:solidFill>
+                <a:latin typeface="Consolas" panose="020B0609020204030204" pitchFamily="49" charset="0"/>
+              </a:rPr>
+              <a:t>props</a:t>
+            </a:r>
+            <a:r>
+              <a:rPr lang="pl-PL" dirty="0" err="1">
+                <a:solidFill>
+                  <a:srgbClr val="D4D4D4"/>
+                </a:solidFill>
+                <a:latin typeface="Consolas" panose="020B0609020204030204" pitchFamily="49" charset="0"/>
+              </a:rPr>
+              <a:t>.</a:t>
+            </a:r>
+            <a:r>
+              <a:rPr lang="pl-PL" dirty="0" err="1">
+                <a:solidFill>
+                  <a:srgbClr val="DCDCAA"/>
+                </a:solidFill>
+                <a:latin typeface="Consolas" panose="020B0609020204030204" pitchFamily="49" charset="0"/>
+              </a:rPr>
+              <a:t>onValueChanged</a:t>
+            </a:r>
+            <a:r>
+              <a:rPr lang="pl-PL" dirty="0">
+                <a:solidFill>
+                  <a:srgbClr val="D4D4D4"/>
+                </a:solidFill>
+                <a:latin typeface="Consolas" panose="020B0609020204030204" pitchFamily="49" charset="0"/>
+              </a:rPr>
+              <a:t>(</a:t>
+            </a:r>
+            <a:r>
+              <a:rPr lang="pl-PL" dirty="0" err="1">
+                <a:solidFill>
+                  <a:srgbClr val="9CDCFE"/>
+                </a:solidFill>
+                <a:latin typeface="Consolas" panose="020B0609020204030204" pitchFamily="49" charset="0"/>
+              </a:rPr>
+              <a:t>newValue</a:t>
+            </a:r>
+            <a:r>
+              <a:rPr lang="pl-PL" dirty="0">
+                <a:solidFill>
+                  <a:srgbClr val="D4D4D4"/>
+                </a:solidFill>
+                <a:latin typeface="Consolas" panose="020B0609020204030204" pitchFamily="49" charset="0"/>
+              </a:rPr>
+              <a:t>);</a:t>
+            </a:r>
+            <a:endParaRPr lang="pl-PL" b="0" dirty="0">
+              <a:solidFill>
+                <a:srgbClr val="D4D4D4"/>
+              </a:solidFill>
+              <a:effectLst/>
+              <a:latin typeface="Consolas" panose="020B0609020204030204" pitchFamily="49" charset="0"/>
+            </a:endParaRPr>
+          </a:p>
+        </p:txBody>
+      </p:sp>
+      <p:sp>
+        <p:nvSpPr>
+          <p:cNvPr id="5" name="pole tekstowe 4">
+            <a:extLst>
+              <a:ext uri="{FF2B5EF4-FFF2-40B4-BE49-F238E27FC236}">
+                <a16:creationId xmlns:a16="http://schemas.microsoft.com/office/drawing/2014/main" id="{D1ABB2D6-553B-481E-B474-7B70EC8AEF1D}"/>
+              </a:ext>
+            </a:extLst>
+          </p:cNvPr>
+          <p:cNvSpPr txBox="1"/>
+          <p:nvPr/>
+        </p:nvSpPr>
+        <p:spPr>
+          <a:xfrm>
+            <a:off x="1179444" y="1353489"/>
+            <a:ext cx="1790042" cy="369332"/>
+          </a:xfrm>
+          <a:prstGeom prst="rect">
+            <a:avLst/>
+          </a:prstGeom>
+          <a:noFill/>
+        </p:spPr>
+        <p:txBody>
+          <a:bodyPr wrap="none" rtlCol="0">
+            <a:spAutoFit/>
+          </a:bodyPr>
+          <a:lstStyle/>
+          <a:p>
+            <a:r>
+              <a:rPr lang="pl-PL" dirty="0"/>
+              <a:t>Child component</a:t>
+            </a:r>
+          </a:p>
+        </p:txBody>
+      </p:sp>
+      <p:sp>
+        <p:nvSpPr>
+          <p:cNvPr id="6" name="pole tekstowe 5">
+            <a:extLst>
+              <a:ext uri="{FF2B5EF4-FFF2-40B4-BE49-F238E27FC236}">
+                <a16:creationId xmlns:a16="http://schemas.microsoft.com/office/drawing/2014/main" id="{5EA02256-9E83-47F9-B854-48FC5B3D4CB3}"/>
+              </a:ext>
+            </a:extLst>
+          </p:cNvPr>
+          <p:cNvSpPr txBox="1"/>
+          <p:nvPr/>
+        </p:nvSpPr>
+        <p:spPr>
+          <a:xfrm>
+            <a:off x="1179444" y="2609094"/>
+            <a:ext cx="1930657" cy="369332"/>
+          </a:xfrm>
+          <a:prstGeom prst="rect">
+            <a:avLst/>
+          </a:prstGeom>
+          <a:noFill/>
+        </p:spPr>
+        <p:txBody>
+          <a:bodyPr wrap="none" rtlCol="0">
+            <a:spAutoFit/>
+          </a:bodyPr>
+          <a:lstStyle/>
+          <a:p>
+            <a:r>
+              <a:rPr lang="pl-PL" dirty="0" err="1"/>
+              <a:t>Parent</a:t>
+            </a:r>
+            <a:r>
+              <a:rPr lang="pl-PL" dirty="0"/>
+              <a:t> component</a:t>
+            </a:r>
+          </a:p>
+        </p:txBody>
+      </p:sp>
+      <p:sp>
+        <p:nvSpPr>
+          <p:cNvPr id="3" name="Prostokąt 2">
+            <a:extLst>
+              <a:ext uri="{FF2B5EF4-FFF2-40B4-BE49-F238E27FC236}">
+                <a16:creationId xmlns:a16="http://schemas.microsoft.com/office/drawing/2014/main" id="{120E36CD-D77E-49A4-949A-8C313688274C}"/>
+              </a:ext>
+            </a:extLst>
+          </p:cNvPr>
+          <p:cNvSpPr/>
+          <p:nvPr/>
+        </p:nvSpPr>
+        <p:spPr>
+          <a:xfrm>
+            <a:off x="1179444" y="2984225"/>
+            <a:ext cx="6811617" cy="1200329"/>
+          </a:xfrm>
+          <a:prstGeom prst="rect">
+            <a:avLst/>
+          </a:prstGeom>
+          <a:solidFill>
+            <a:schemeClr val="tx1"/>
+          </a:solidFill>
+        </p:spPr>
+        <p:txBody>
+          <a:bodyPr wrap="square">
+            <a:spAutoFit/>
+          </a:bodyPr>
+          <a:lstStyle/>
+          <a:p>
+            <a:r>
+              <a:rPr lang="pl-PL" dirty="0">
+                <a:solidFill>
+                  <a:srgbClr val="808080"/>
+                </a:solidFill>
+                <a:latin typeface="Consolas" panose="020B0609020204030204" pitchFamily="49" charset="0"/>
+              </a:rPr>
+              <a:t>&lt;</a:t>
+            </a:r>
+            <a:r>
+              <a:rPr lang="pl-PL" dirty="0" err="1">
+                <a:solidFill>
+                  <a:srgbClr val="4EC9B0"/>
+                </a:solidFill>
+                <a:latin typeface="Consolas" panose="020B0609020204030204" pitchFamily="49" charset="0"/>
+              </a:rPr>
+              <a:t>ListForm</a:t>
+            </a:r>
+            <a:endParaRPr lang="pl-PL" dirty="0">
+              <a:solidFill>
+                <a:srgbClr val="D4D4D4"/>
+              </a:solidFill>
+              <a:latin typeface="Consolas" panose="020B0609020204030204" pitchFamily="49" charset="0"/>
+            </a:endParaRPr>
+          </a:p>
+          <a:p>
+            <a:r>
+              <a:rPr lang="pl-PL" dirty="0">
+                <a:solidFill>
+                  <a:srgbClr val="D4D4D4"/>
+                </a:solidFill>
+                <a:latin typeface="Consolas" panose="020B0609020204030204" pitchFamily="49" charset="0"/>
+              </a:rPr>
+              <a:t>     </a:t>
+            </a:r>
+            <a:r>
+              <a:rPr lang="pl-PL" dirty="0" err="1">
+                <a:solidFill>
+                  <a:srgbClr val="9CDCFE"/>
+                </a:solidFill>
+                <a:latin typeface="Consolas" panose="020B0609020204030204" pitchFamily="49" charset="0"/>
+              </a:rPr>
+              <a:t>value</a:t>
+            </a:r>
+            <a:r>
+              <a:rPr lang="pl-PL" dirty="0">
+                <a:solidFill>
+                  <a:srgbClr val="D4D4D4"/>
+                </a:solidFill>
+                <a:latin typeface="Consolas" panose="020B0609020204030204" pitchFamily="49" charset="0"/>
+              </a:rPr>
+              <a:t>=</a:t>
+            </a:r>
+            <a:r>
+              <a:rPr lang="pl-PL" dirty="0">
+                <a:solidFill>
+                  <a:srgbClr val="569CD6"/>
+                </a:solidFill>
+                <a:latin typeface="Consolas" panose="020B0609020204030204" pitchFamily="49" charset="0"/>
+              </a:rPr>
+              <a:t>{</a:t>
+            </a:r>
+            <a:r>
+              <a:rPr lang="pl-PL" dirty="0" err="1">
+                <a:solidFill>
+                  <a:srgbClr val="569CD6"/>
+                </a:solidFill>
+                <a:latin typeface="Consolas" panose="020B0609020204030204" pitchFamily="49" charset="0"/>
+              </a:rPr>
+              <a:t>this</a:t>
+            </a:r>
+            <a:r>
+              <a:rPr lang="pl-PL" dirty="0" err="1">
+                <a:solidFill>
+                  <a:srgbClr val="D4D4D4"/>
+                </a:solidFill>
+                <a:latin typeface="Consolas" panose="020B0609020204030204" pitchFamily="49" charset="0"/>
+              </a:rPr>
+              <a:t>.</a:t>
+            </a:r>
+            <a:r>
+              <a:rPr lang="pl-PL" dirty="0" err="1">
+                <a:solidFill>
+                  <a:srgbClr val="9CDCFE"/>
+                </a:solidFill>
+                <a:latin typeface="Consolas" panose="020B0609020204030204" pitchFamily="49" charset="0"/>
+              </a:rPr>
+              <a:t>state</a:t>
+            </a:r>
+            <a:r>
+              <a:rPr lang="pl-PL" dirty="0" err="1">
+                <a:solidFill>
+                  <a:srgbClr val="D4D4D4"/>
+                </a:solidFill>
+                <a:latin typeface="Consolas" panose="020B0609020204030204" pitchFamily="49" charset="0"/>
+              </a:rPr>
+              <a:t>.</a:t>
+            </a:r>
+            <a:r>
+              <a:rPr lang="pl-PL" dirty="0" err="1">
+                <a:solidFill>
+                  <a:srgbClr val="9CDCFE"/>
+                </a:solidFill>
+                <a:latin typeface="Consolas" panose="020B0609020204030204" pitchFamily="49" charset="0"/>
+              </a:rPr>
+              <a:t>value</a:t>
+            </a:r>
+            <a:r>
+              <a:rPr lang="pl-PL" dirty="0">
+                <a:solidFill>
+                  <a:srgbClr val="569CD6"/>
+                </a:solidFill>
+                <a:latin typeface="Consolas" panose="020B0609020204030204" pitchFamily="49" charset="0"/>
+              </a:rPr>
+              <a:t>}</a:t>
+            </a:r>
+            <a:endParaRPr lang="pl-PL" dirty="0">
+              <a:solidFill>
+                <a:srgbClr val="D4D4D4"/>
+              </a:solidFill>
+              <a:latin typeface="Consolas" panose="020B0609020204030204" pitchFamily="49" charset="0"/>
+            </a:endParaRPr>
+          </a:p>
+          <a:p>
+            <a:r>
+              <a:rPr lang="pl-PL" dirty="0">
+                <a:solidFill>
+                  <a:srgbClr val="D4D4D4"/>
+                </a:solidFill>
+                <a:latin typeface="Consolas" panose="020B0609020204030204" pitchFamily="49" charset="0"/>
+              </a:rPr>
+              <a:t>     </a:t>
+            </a:r>
+            <a:r>
+              <a:rPr lang="pl-PL" dirty="0" err="1">
+                <a:solidFill>
+                  <a:srgbClr val="9CDCFE"/>
+                </a:solidFill>
+                <a:latin typeface="Consolas" panose="020B0609020204030204" pitchFamily="49" charset="0"/>
+              </a:rPr>
+              <a:t>onValueChanged</a:t>
+            </a:r>
+            <a:r>
+              <a:rPr lang="pl-PL" dirty="0">
+                <a:solidFill>
+                  <a:srgbClr val="D4D4D4"/>
+                </a:solidFill>
+                <a:latin typeface="Consolas" panose="020B0609020204030204" pitchFamily="49" charset="0"/>
+              </a:rPr>
+              <a:t> = </a:t>
+            </a:r>
+            <a:r>
+              <a:rPr lang="pl-PL" dirty="0">
+                <a:solidFill>
+                  <a:srgbClr val="569CD6"/>
+                </a:solidFill>
+                <a:latin typeface="Consolas" panose="020B0609020204030204" pitchFamily="49" charset="0"/>
+              </a:rPr>
+              <a:t>{</a:t>
+            </a:r>
+            <a:r>
+              <a:rPr lang="pl-PL" dirty="0" err="1">
+                <a:solidFill>
+                  <a:srgbClr val="569CD6"/>
+                </a:solidFill>
+                <a:latin typeface="Consolas" panose="020B0609020204030204" pitchFamily="49" charset="0"/>
+              </a:rPr>
+              <a:t>this</a:t>
+            </a:r>
+            <a:r>
+              <a:rPr lang="pl-PL" dirty="0" err="1">
+                <a:solidFill>
+                  <a:srgbClr val="D4D4D4"/>
+                </a:solidFill>
+                <a:latin typeface="Consolas" panose="020B0609020204030204" pitchFamily="49" charset="0"/>
+              </a:rPr>
+              <a:t>.</a:t>
+            </a:r>
+            <a:r>
+              <a:rPr lang="pl-PL" dirty="0" err="1">
+                <a:solidFill>
+                  <a:srgbClr val="9CDCFE"/>
+                </a:solidFill>
+                <a:latin typeface="Consolas" panose="020B0609020204030204" pitchFamily="49" charset="0"/>
+              </a:rPr>
+              <a:t>handleOnValueChanged</a:t>
+            </a:r>
+            <a:r>
+              <a:rPr lang="pl-PL" dirty="0">
+                <a:solidFill>
+                  <a:srgbClr val="569CD6"/>
+                </a:solidFill>
+                <a:latin typeface="Consolas" panose="020B0609020204030204" pitchFamily="49" charset="0"/>
+              </a:rPr>
+              <a:t>}</a:t>
+            </a:r>
+            <a:endParaRPr lang="pl-PL" dirty="0">
+              <a:solidFill>
+                <a:srgbClr val="D4D4D4"/>
+              </a:solidFill>
+              <a:latin typeface="Consolas" panose="020B0609020204030204" pitchFamily="49" charset="0"/>
+            </a:endParaRPr>
+          </a:p>
+          <a:p>
+            <a:r>
+              <a:rPr lang="pl-PL" dirty="0">
+                <a:solidFill>
+                  <a:srgbClr val="808080"/>
+                </a:solidFill>
+                <a:latin typeface="Consolas" panose="020B0609020204030204" pitchFamily="49" charset="0"/>
+              </a:rPr>
+              <a:t>/&gt;</a:t>
+            </a:r>
+            <a:endParaRPr lang="pl-PL" b="0" dirty="0">
+              <a:solidFill>
+                <a:srgbClr val="D4D4D4"/>
+              </a:solidFill>
+              <a:effectLst/>
+              <a:latin typeface="Consolas" panose="020B0609020204030204" pitchFamily="49" charset="0"/>
+            </a:endParaRPr>
+          </a:p>
+        </p:txBody>
+      </p:sp>
+      <p:sp>
+        <p:nvSpPr>
+          <p:cNvPr id="7" name="Prostokąt 6">
+            <a:extLst>
+              <a:ext uri="{FF2B5EF4-FFF2-40B4-BE49-F238E27FC236}">
+                <a16:creationId xmlns:a16="http://schemas.microsoft.com/office/drawing/2014/main" id="{1F244443-0C92-45EE-AEA2-2EDFBE6EE7B9}"/>
+              </a:ext>
+            </a:extLst>
+          </p:cNvPr>
+          <p:cNvSpPr/>
+          <p:nvPr/>
+        </p:nvSpPr>
+        <p:spPr>
+          <a:xfrm>
+            <a:off x="1179444" y="4391618"/>
+            <a:ext cx="6811616" cy="1477328"/>
+          </a:xfrm>
+          <a:prstGeom prst="rect">
+            <a:avLst/>
+          </a:prstGeom>
+          <a:solidFill>
+            <a:schemeClr val="tx1"/>
+          </a:solidFill>
+        </p:spPr>
+        <p:txBody>
+          <a:bodyPr wrap="square">
+            <a:spAutoFit/>
+          </a:bodyPr>
+          <a:lstStyle/>
+          <a:p>
+            <a:r>
+              <a:rPr lang="pl-PL" dirty="0" err="1">
+                <a:solidFill>
+                  <a:srgbClr val="DCDCAA"/>
+                </a:solidFill>
+                <a:latin typeface="Consolas" panose="020B0609020204030204" pitchFamily="49" charset="0"/>
+              </a:rPr>
+              <a:t>handleOnValueChanged</a:t>
+            </a:r>
+            <a:r>
+              <a:rPr lang="pl-PL" dirty="0">
+                <a:solidFill>
+                  <a:srgbClr val="D4D4D4"/>
+                </a:solidFill>
+                <a:latin typeface="Consolas" panose="020B0609020204030204" pitchFamily="49" charset="0"/>
+              </a:rPr>
+              <a:t>= (</a:t>
+            </a:r>
+            <a:r>
+              <a:rPr lang="pl-PL" dirty="0" err="1">
+                <a:solidFill>
+                  <a:srgbClr val="9CDCFE"/>
+                </a:solidFill>
+                <a:latin typeface="Consolas" panose="020B0609020204030204" pitchFamily="49" charset="0"/>
+              </a:rPr>
+              <a:t>value</a:t>
+            </a:r>
+            <a:r>
+              <a:rPr lang="pl-PL" dirty="0">
+                <a:solidFill>
+                  <a:srgbClr val="D4D4D4"/>
+                </a:solidFill>
+                <a:latin typeface="Consolas" panose="020B0609020204030204" pitchFamily="49" charset="0"/>
+              </a:rPr>
+              <a:t>) </a:t>
+            </a:r>
+            <a:r>
+              <a:rPr lang="pl-PL" dirty="0">
+                <a:solidFill>
+                  <a:srgbClr val="569CD6"/>
+                </a:solidFill>
+                <a:latin typeface="Consolas" panose="020B0609020204030204" pitchFamily="49" charset="0"/>
+              </a:rPr>
+              <a:t>=&gt;</a:t>
+            </a:r>
+            <a:r>
+              <a:rPr lang="pl-PL" dirty="0">
+                <a:solidFill>
+                  <a:srgbClr val="D4D4D4"/>
+                </a:solidFill>
+                <a:latin typeface="Consolas" panose="020B0609020204030204" pitchFamily="49" charset="0"/>
+              </a:rPr>
+              <a:t> {</a:t>
+            </a:r>
+          </a:p>
+          <a:p>
+            <a:r>
+              <a:rPr lang="pl-PL" dirty="0">
+                <a:solidFill>
+                  <a:srgbClr val="D4D4D4"/>
+                </a:solidFill>
+                <a:latin typeface="Consolas" panose="020B0609020204030204" pitchFamily="49" charset="0"/>
+              </a:rPr>
+              <a:t>    </a:t>
+            </a:r>
+            <a:r>
+              <a:rPr lang="pl-PL" dirty="0" err="1">
+                <a:solidFill>
+                  <a:srgbClr val="569CD6"/>
+                </a:solidFill>
+                <a:latin typeface="Consolas" panose="020B0609020204030204" pitchFamily="49" charset="0"/>
+              </a:rPr>
+              <a:t>this</a:t>
+            </a:r>
+            <a:r>
+              <a:rPr lang="pl-PL" dirty="0" err="1">
+                <a:solidFill>
+                  <a:srgbClr val="D4D4D4"/>
+                </a:solidFill>
+                <a:latin typeface="Consolas" panose="020B0609020204030204" pitchFamily="49" charset="0"/>
+              </a:rPr>
+              <a:t>.</a:t>
+            </a:r>
+            <a:r>
+              <a:rPr lang="pl-PL" dirty="0" err="1">
+                <a:solidFill>
+                  <a:srgbClr val="DCDCAA"/>
+                </a:solidFill>
+                <a:latin typeface="Consolas" panose="020B0609020204030204" pitchFamily="49" charset="0"/>
+              </a:rPr>
+              <a:t>setState</a:t>
+            </a:r>
+            <a:r>
+              <a:rPr lang="pl-PL" dirty="0">
+                <a:solidFill>
+                  <a:srgbClr val="D4D4D4"/>
+                </a:solidFill>
+                <a:latin typeface="Consolas" panose="020B0609020204030204" pitchFamily="49" charset="0"/>
+              </a:rPr>
+              <a:t>({</a:t>
+            </a:r>
+          </a:p>
+          <a:p>
+            <a:r>
+              <a:rPr lang="pl-PL" dirty="0">
+                <a:solidFill>
+                  <a:srgbClr val="D4D4D4"/>
+                </a:solidFill>
+                <a:latin typeface="Consolas" panose="020B0609020204030204" pitchFamily="49" charset="0"/>
+              </a:rPr>
+              <a:t>        </a:t>
+            </a:r>
+            <a:r>
+              <a:rPr lang="pl-PL" dirty="0" err="1">
+                <a:solidFill>
+                  <a:srgbClr val="9CDCFE"/>
+                </a:solidFill>
+                <a:latin typeface="Consolas" panose="020B0609020204030204" pitchFamily="49" charset="0"/>
+              </a:rPr>
+              <a:t>value</a:t>
+            </a:r>
+            <a:r>
+              <a:rPr lang="pl-PL" dirty="0">
+                <a:solidFill>
+                  <a:srgbClr val="9CDCFE"/>
+                </a:solidFill>
+                <a:latin typeface="Consolas" panose="020B0609020204030204" pitchFamily="49" charset="0"/>
+              </a:rPr>
+              <a:t>:</a:t>
+            </a:r>
+            <a:r>
+              <a:rPr lang="pl-PL" dirty="0">
+                <a:solidFill>
+                  <a:srgbClr val="D4D4D4"/>
+                </a:solidFill>
+                <a:latin typeface="Consolas" panose="020B0609020204030204" pitchFamily="49" charset="0"/>
+              </a:rPr>
+              <a:t> </a:t>
+            </a:r>
+            <a:r>
+              <a:rPr lang="pl-PL" dirty="0" err="1">
+                <a:solidFill>
+                  <a:srgbClr val="9CDCFE"/>
+                </a:solidFill>
+                <a:latin typeface="Consolas" panose="020B0609020204030204" pitchFamily="49" charset="0"/>
+              </a:rPr>
+              <a:t>value</a:t>
+            </a:r>
+            <a:endParaRPr lang="pl-PL" dirty="0">
+              <a:solidFill>
+                <a:srgbClr val="D4D4D4"/>
+              </a:solidFill>
+              <a:latin typeface="Consolas" panose="020B0609020204030204" pitchFamily="49" charset="0"/>
+            </a:endParaRPr>
+          </a:p>
+          <a:p>
+            <a:r>
+              <a:rPr lang="pl-PL" dirty="0">
+                <a:solidFill>
+                  <a:srgbClr val="D4D4D4"/>
+                </a:solidFill>
+                <a:latin typeface="Consolas" panose="020B0609020204030204" pitchFamily="49" charset="0"/>
+              </a:rPr>
+              <a:t>    })</a:t>
+            </a:r>
+          </a:p>
+          <a:p>
+            <a:r>
+              <a:rPr lang="pl-PL" dirty="0">
+                <a:solidFill>
+                  <a:srgbClr val="D4D4D4"/>
+                </a:solidFill>
+                <a:latin typeface="Consolas" panose="020B0609020204030204" pitchFamily="49" charset="0"/>
+              </a:rPr>
+              <a:t>}</a:t>
+            </a:r>
+            <a:endParaRPr lang="pl-PL" b="0" dirty="0">
+              <a:solidFill>
+                <a:srgbClr val="D4D4D4"/>
+              </a:solidFill>
+              <a:effectLst/>
+              <a:latin typeface="Consolas" panose="020B0609020204030204" pitchFamily="49" charset="0"/>
+            </a:endParaRPr>
           </a:p>
         </p:txBody>
       </p:sp>

</xml_diff>

<commit_message>
Exercise 12: content projection, play with colorful square
</commit_message>
<xml_diff>
--- a/tutorial/ReactjsTraining.pptx
+++ b/tutorial/ReactjsTraining.pptx
@@ -3056,15 +3056,136 @@
               <a:buFontTx/>
               <a:buNone/>
             </a:pPr>
-            <a:endParaRPr lang="pl-PL" sz="1200" b="0" i="0" kern="1200" dirty="0">
-              <a:solidFill>
-                <a:schemeClr val="tx1"/>
-              </a:solidFill>
-              <a:effectLst/>
-              <a:latin typeface="+mn-lt"/>
-              <a:ea typeface="+mn-ea"/>
-              <a:cs typeface="+mn-cs"/>
-            </a:endParaRPr>
+            <a:r>
+              <a:rPr lang="pl-PL" sz="1200" b="0" i="0" kern="1200" dirty="0">
+                <a:solidFill>
+                  <a:schemeClr val="tx1"/>
+                </a:solidFill>
+                <a:effectLst/>
+                <a:latin typeface="+mn-lt"/>
+                <a:ea typeface="+mn-ea"/>
+                <a:cs typeface="+mn-cs"/>
+              </a:rPr>
+              <a:t>Dodać do czego to potrzebne: </a:t>
+            </a:r>
+            <a:r>
+              <a:rPr lang="pl-PL" sz="1200" b="0" i="0" kern="1200" dirty="0" err="1">
+                <a:solidFill>
+                  <a:schemeClr val="tx1"/>
+                </a:solidFill>
+                <a:effectLst/>
+                <a:latin typeface="+mn-lt"/>
+                <a:ea typeface="+mn-ea"/>
+                <a:cs typeface="+mn-cs"/>
+              </a:rPr>
+              <a:t>modale</a:t>
+            </a:r>
+            <a:r>
+              <a:rPr lang="pl-PL" sz="1200" b="0" i="0" kern="1200" dirty="0">
+                <a:solidFill>
+                  <a:schemeClr val="tx1"/>
+                </a:solidFill>
+                <a:effectLst/>
+                <a:latin typeface="+mn-lt"/>
+                <a:ea typeface="+mn-ea"/>
+                <a:cs typeface="+mn-cs"/>
+              </a:rPr>
+              <a:t> itp.</a:t>
+            </a:r>
+            <a:br>
+              <a:rPr lang="pl-PL" sz="1200" b="0" i="0" kern="1200" dirty="0">
+                <a:solidFill>
+                  <a:schemeClr val="tx1"/>
+                </a:solidFill>
+                <a:effectLst/>
+                <a:latin typeface="+mn-lt"/>
+                <a:ea typeface="+mn-ea"/>
+                <a:cs typeface="+mn-cs"/>
+              </a:rPr>
+            </a:br>
+            <a:br>
+              <a:rPr lang="pl-PL" sz="1200" b="0" i="0" kern="1200" dirty="0">
+                <a:solidFill>
+                  <a:schemeClr val="tx1"/>
+                </a:solidFill>
+                <a:effectLst/>
+                <a:latin typeface="+mn-lt"/>
+                <a:ea typeface="+mn-ea"/>
+                <a:cs typeface="+mn-cs"/>
+              </a:rPr>
+            </a:br>
+            <a:r>
+              <a:rPr lang="pl-PL" sz="1200" b="0" i="0" kern="1200" dirty="0" err="1">
+                <a:solidFill>
+                  <a:schemeClr val="tx1"/>
+                </a:solidFill>
+                <a:effectLst/>
+                <a:latin typeface="+mn-lt"/>
+                <a:ea typeface="+mn-ea"/>
+                <a:cs typeface="+mn-cs"/>
+              </a:rPr>
+              <a:t>Exercise</a:t>
+            </a:r>
+            <a:r>
+              <a:rPr lang="pl-PL" sz="1200" b="0" i="0" kern="1200" dirty="0">
+                <a:solidFill>
+                  <a:schemeClr val="tx1"/>
+                </a:solidFill>
+                <a:effectLst/>
+                <a:latin typeface="+mn-lt"/>
+                <a:ea typeface="+mn-ea"/>
+                <a:cs typeface="+mn-cs"/>
+              </a:rPr>
+              <a:t> 12: Sprawić by w kolorowym kwadracie nie była </a:t>
+            </a:r>
+            <a:r>
+              <a:rPr lang="pl-PL" sz="1200" b="0" i="0" kern="1200" dirty="0" err="1">
+                <a:solidFill>
+                  <a:schemeClr val="tx1"/>
+                </a:solidFill>
+                <a:effectLst/>
+                <a:latin typeface="+mn-lt"/>
+                <a:ea typeface="+mn-ea"/>
+                <a:cs typeface="+mn-cs"/>
+              </a:rPr>
+              <a:t>zahardcodowana</a:t>
+            </a:r>
+            <a:r>
+              <a:rPr lang="pl-PL" sz="1200" b="0" i="0" kern="1200" dirty="0">
+                <a:solidFill>
+                  <a:schemeClr val="tx1"/>
+                </a:solidFill>
+                <a:effectLst/>
+                <a:latin typeface="+mn-lt"/>
+                <a:ea typeface="+mn-ea"/>
+                <a:cs typeface="+mn-cs"/>
+              </a:rPr>
+              <a:t> wartość tylko </a:t>
+            </a:r>
+            <a:r>
+              <a:rPr lang="pl-PL" sz="1200" b="0" i="0" kern="1200" dirty="0" err="1">
+                <a:solidFill>
+                  <a:schemeClr val="tx1"/>
+                </a:solidFill>
+                <a:effectLst/>
+                <a:latin typeface="+mn-lt"/>
+                <a:ea typeface="+mn-ea"/>
+                <a:cs typeface="+mn-cs"/>
+              </a:rPr>
+              <a:t>content</a:t>
+            </a:r>
+            <a:r>
+              <a:rPr lang="pl-PL" sz="1200" b="0" i="0" kern="1200" dirty="0">
+                <a:solidFill>
+                  <a:schemeClr val="tx1"/>
+                </a:solidFill>
+                <a:effectLst/>
+                <a:latin typeface="+mn-lt"/>
+                <a:ea typeface="+mn-ea"/>
+                <a:cs typeface="+mn-cs"/>
+              </a:rPr>
+              <a:t> który wstrzykniemy</a:t>
+            </a:r>
           </a:p>
         </p:txBody>
       </p:sp>
@@ -15896,7 +16017,7 @@
         <p:spPr>
           <a:xfrm>
             <a:off x="497840" y="538480"/>
-            <a:ext cx="1301062" cy="369332"/>
+            <a:ext cx="2497415" cy="369332"/>
           </a:xfrm>
           <a:prstGeom prst="rect">
             <a:avLst/>
@@ -15919,7 +16040,348 @@
             </a:r>
             <a:r>
               <a:rPr lang="pl-PL" dirty="0" err="1"/>
-              <a:t>forms</a:t>
+              <a:t>content</a:t>
+            </a:r>
+            <a:r>
+              <a:rPr lang="pl-PL" dirty="0"/>
+              <a:t> </a:t>
+            </a:r>
+            <a:r>
+              <a:rPr lang="pl-PL" dirty="0" err="1"/>
+              <a:t>projection</a:t>
+            </a:r>
+            <a:endParaRPr lang="pl-PL" dirty="0"/>
+          </a:p>
+        </p:txBody>
+      </p:sp>
+      <p:sp>
+        <p:nvSpPr>
+          <p:cNvPr id="2" name="Prostokąt 1">
+            <a:extLst>
+              <a:ext uri="{FF2B5EF4-FFF2-40B4-BE49-F238E27FC236}">
+                <a16:creationId xmlns:a16="http://schemas.microsoft.com/office/drawing/2014/main" id="{E58C05DC-544D-4DE9-A0B7-39C93AA11D9D}"/>
+              </a:ext>
+            </a:extLst>
+          </p:cNvPr>
+          <p:cNvSpPr/>
+          <p:nvPr/>
+        </p:nvSpPr>
+        <p:spPr>
+          <a:xfrm>
+            <a:off x="2565105" y="2197412"/>
+            <a:ext cx="2844048" cy="369332"/>
+          </a:xfrm>
+          <a:prstGeom prst="rect">
+            <a:avLst/>
+          </a:prstGeom>
+          <a:solidFill>
+            <a:schemeClr val="tx1"/>
+          </a:solidFill>
+        </p:spPr>
+        <p:txBody>
+          <a:bodyPr wrap="none">
+            <a:spAutoFit/>
+          </a:bodyPr>
+          <a:lstStyle/>
+          <a:p>
+            <a:r>
+              <a:rPr lang="pl-PL" dirty="0">
+                <a:solidFill>
+                  <a:srgbClr val="569CD6"/>
+                </a:solidFill>
+                <a:latin typeface="Consolas" panose="020B0609020204030204" pitchFamily="49" charset="0"/>
+              </a:rPr>
+              <a:t>{</a:t>
+            </a:r>
+            <a:r>
+              <a:rPr lang="pl-PL" dirty="0" err="1">
+                <a:solidFill>
+                  <a:srgbClr val="569CD6"/>
+                </a:solidFill>
+                <a:latin typeface="Consolas" panose="020B0609020204030204" pitchFamily="49" charset="0"/>
+              </a:rPr>
+              <a:t>this</a:t>
+            </a:r>
+            <a:r>
+              <a:rPr lang="pl-PL" dirty="0" err="1">
+                <a:solidFill>
+                  <a:srgbClr val="D4D4D4"/>
+                </a:solidFill>
+                <a:latin typeface="Consolas" panose="020B0609020204030204" pitchFamily="49" charset="0"/>
+              </a:rPr>
+              <a:t>.</a:t>
+            </a:r>
+            <a:r>
+              <a:rPr lang="pl-PL" dirty="0" err="1">
+                <a:solidFill>
+                  <a:srgbClr val="9CDCFE"/>
+                </a:solidFill>
+                <a:latin typeface="Consolas" panose="020B0609020204030204" pitchFamily="49" charset="0"/>
+              </a:rPr>
+              <a:t>props</a:t>
+            </a:r>
+            <a:r>
+              <a:rPr lang="pl-PL" dirty="0" err="1">
+                <a:solidFill>
+                  <a:srgbClr val="D4D4D4"/>
+                </a:solidFill>
+                <a:latin typeface="Consolas" panose="020B0609020204030204" pitchFamily="49" charset="0"/>
+              </a:rPr>
+              <a:t>.</a:t>
+            </a:r>
+            <a:r>
+              <a:rPr lang="pl-PL" dirty="0" err="1">
+                <a:solidFill>
+                  <a:srgbClr val="9CDCFE"/>
+                </a:solidFill>
+                <a:latin typeface="Consolas" panose="020B0609020204030204" pitchFamily="49" charset="0"/>
+              </a:rPr>
+              <a:t>children</a:t>
+            </a:r>
+            <a:r>
+              <a:rPr lang="pl-PL" dirty="0">
+                <a:solidFill>
+                  <a:srgbClr val="569CD6"/>
+                </a:solidFill>
+                <a:latin typeface="Consolas" panose="020B0609020204030204" pitchFamily="49" charset="0"/>
+              </a:rPr>
+              <a:t>}</a:t>
+            </a:r>
+            <a:endParaRPr lang="pl-PL" b="0" dirty="0">
+              <a:solidFill>
+                <a:srgbClr val="D4D4D4"/>
+              </a:solidFill>
+              <a:effectLst/>
+              <a:latin typeface="Consolas" panose="020B0609020204030204" pitchFamily="49" charset="0"/>
+            </a:endParaRPr>
+          </a:p>
+        </p:txBody>
+      </p:sp>
+      <p:sp>
+        <p:nvSpPr>
+          <p:cNvPr id="5" name="pole tekstowe 4">
+            <a:extLst>
+              <a:ext uri="{FF2B5EF4-FFF2-40B4-BE49-F238E27FC236}">
+                <a16:creationId xmlns:a16="http://schemas.microsoft.com/office/drawing/2014/main" id="{C164AB1C-6AA8-48C5-806B-D08340240449}"/>
+              </a:ext>
+            </a:extLst>
+          </p:cNvPr>
+          <p:cNvSpPr txBox="1"/>
+          <p:nvPr/>
+        </p:nvSpPr>
+        <p:spPr>
+          <a:xfrm>
+            <a:off x="2565105" y="1708811"/>
+            <a:ext cx="3351623" cy="369332"/>
+          </a:xfrm>
+          <a:prstGeom prst="rect">
+            <a:avLst/>
+          </a:prstGeom>
+          <a:noFill/>
+        </p:spPr>
+        <p:txBody>
+          <a:bodyPr wrap="none" rtlCol="0">
+            <a:spAutoFit/>
+          </a:bodyPr>
+          <a:lstStyle/>
+          <a:p>
+            <a:r>
+              <a:rPr lang="pl-PL" dirty="0" err="1"/>
+              <a:t>Render</a:t>
+            </a:r>
+            <a:r>
+              <a:rPr lang="pl-PL" dirty="0"/>
+              <a:t> in </a:t>
+            </a:r>
+            <a:r>
+              <a:rPr lang="pl-PL" dirty="0" err="1"/>
+              <a:t>MyElement</a:t>
+            </a:r>
+            <a:r>
+              <a:rPr lang="pl-PL" dirty="0"/>
+              <a:t> component</a:t>
+            </a:r>
+          </a:p>
+        </p:txBody>
+      </p:sp>
+      <p:sp>
+        <p:nvSpPr>
+          <p:cNvPr id="3" name="Prostokąt 2">
+            <a:extLst>
+              <a:ext uri="{FF2B5EF4-FFF2-40B4-BE49-F238E27FC236}">
+                <a16:creationId xmlns:a16="http://schemas.microsoft.com/office/drawing/2014/main" id="{90B6AEDB-9B2B-4640-8935-4F41972DF0E3}"/>
+              </a:ext>
+            </a:extLst>
+          </p:cNvPr>
+          <p:cNvSpPr/>
+          <p:nvPr/>
+        </p:nvSpPr>
+        <p:spPr>
+          <a:xfrm>
+            <a:off x="2565105" y="3549134"/>
+            <a:ext cx="5630067" cy="369332"/>
+          </a:xfrm>
+          <a:prstGeom prst="rect">
+            <a:avLst/>
+          </a:prstGeom>
+          <a:solidFill>
+            <a:schemeClr val="tx1"/>
+          </a:solidFill>
+        </p:spPr>
+        <p:txBody>
+          <a:bodyPr wrap="none">
+            <a:spAutoFit/>
+          </a:bodyPr>
+          <a:lstStyle/>
+          <a:p>
+            <a:r>
+              <a:rPr lang="en-US" dirty="0">
+                <a:solidFill>
+                  <a:srgbClr val="808080"/>
+                </a:solidFill>
+                <a:latin typeface="Consolas" panose="020B0609020204030204" pitchFamily="49" charset="0"/>
+              </a:rPr>
+              <a:t>&lt;</a:t>
+            </a:r>
+            <a:r>
+              <a:rPr lang="pl-PL" dirty="0" err="1">
+                <a:solidFill>
+                  <a:srgbClr val="4EC9B0"/>
+                </a:solidFill>
+                <a:latin typeface="Consolas" panose="020B0609020204030204" pitchFamily="49" charset="0"/>
+              </a:rPr>
+              <a:t>MyElement</a:t>
+            </a:r>
+            <a:r>
+              <a:rPr lang="en-US" dirty="0">
+                <a:solidFill>
+                  <a:srgbClr val="808080"/>
+                </a:solidFill>
+                <a:latin typeface="Consolas" panose="020B0609020204030204" pitchFamily="49" charset="0"/>
+              </a:rPr>
+              <a:t>&gt;&lt;</a:t>
+            </a:r>
+            <a:r>
+              <a:rPr lang="en-US" dirty="0">
+                <a:solidFill>
+                  <a:srgbClr val="569CD6"/>
+                </a:solidFill>
+                <a:latin typeface="Consolas" panose="020B0609020204030204" pitchFamily="49" charset="0"/>
+              </a:rPr>
+              <a:t>h1</a:t>
+            </a:r>
+            <a:r>
+              <a:rPr lang="en-US" dirty="0">
+                <a:solidFill>
+                  <a:srgbClr val="808080"/>
+                </a:solidFill>
+                <a:latin typeface="Consolas" panose="020B0609020204030204" pitchFamily="49" charset="0"/>
+              </a:rPr>
+              <a:t>&gt;</a:t>
+            </a:r>
+            <a:r>
+              <a:rPr lang="en-US" dirty="0">
+                <a:solidFill>
+                  <a:srgbClr val="D4D4D4"/>
+                </a:solidFill>
+                <a:latin typeface="Consolas" panose="020B0609020204030204" pitchFamily="49" charset="0"/>
+              </a:rPr>
+              <a:t>Hello world</a:t>
+            </a:r>
+            <a:r>
+              <a:rPr lang="en-US" dirty="0">
+                <a:solidFill>
+                  <a:srgbClr val="808080"/>
+                </a:solidFill>
+                <a:latin typeface="Consolas" panose="020B0609020204030204" pitchFamily="49" charset="0"/>
+              </a:rPr>
+              <a:t>&lt;/</a:t>
+            </a:r>
+            <a:r>
+              <a:rPr lang="en-US" dirty="0">
+                <a:solidFill>
+                  <a:srgbClr val="569CD6"/>
+                </a:solidFill>
+                <a:latin typeface="Consolas" panose="020B0609020204030204" pitchFamily="49" charset="0"/>
+              </a:rPr>
+              <a:t>h1</a:t>
+            </a:r>
+            <a:r>
+              <a:rPr lang="en-US" dirty="0">
+                <a:solidFill>
+                  <a:srgbClr val="808080"/>
+                </a:solidFill>
+                <a:latin typeface="Consolas" panose="020B0609020204030204" pitchFamily="49" charset="0"/>
+              </a:rPr>
+              <a:t>&gt;&lt;/</a:t>
+            </a:r>
+            <a:r>
+              <a:rPr lang="pl-PL" dirty="0" err="1">
+                <a:solidFill>
+                  <a:srgbClr val="4EC9B0"/>
+                </a:solidFill>
+                <a:latin typeface="Consolas" panose="020B0609020204030204" pitchFamily="49" charset="0"/>
+              </a:rPr>
+              <a:t>MyElement</a:t>
+            </a:r>
+            <a:r>
+              <a:rPr lang="en-US" dirty="0">
+                <a:solidFill>
+                  <a:srgbClr val="808080"/>
+                </a:solidFill>
+                <a:latin typeface="Consolas" panose="020B0609020204030204" pitchFamily="49" charset="0"/>
+              </a:rPr>
+              <a:t>&gt;</a:t>
+            </a:r>
+            <a:endParaRPr lang="en-US" b="0" dirty="0">
+              <a:solidFill>
+                <a:srgbClr val="D4D4D4"/>
+              </a:solidFill>
+              <a:effectLst/>
+              <a:latin typeface="Consolas" panose="020B0609020204030204" pitchFamily="49" charset="0"/>
+            </a:endParaRPr>
+          </a:p>
+        </p:txBody>
+      </p:sp>
+      <p:sp>
+        <p:nvSpPr>
+          <p:cNvPr id="6" name="pole tekstowe 5">
+            <a:extLst>
+              <a:ext uri="{FF2B5EF4-FFF2-40B4-BE49-F238E27FC236}">
+                <a16:creationId xmlns:a16="http://schemas.microsoft.com/office/drawing/2014/main" id="{985D123B-E2DD-4B72-B227-3D465C21B182}"/>
+              </a:ext>
+            </a:extLst>
+          </p:cNvPr>
+          <p:cNvSpPr txBox="1"/>
+          <p:nvPr/>
+        </p:nvSpPr>
+        <p:spPr>
+          <a:xfrm>
+            <a:off x="2565105" y="3124200"/>
+            <a:ext cx="2093522" cy="369332"/>
+          </a:xfrm>
+          <a:prstGeom prst="rect">
+            <a:avLst/>
+          </a:prstGeom>
+          <a:noFill/>
+        </p:spPr>
+        <p:txBody>
+          <a:bodyPr wrap="none" rtlCol="0">
+            <a:spAutoFit/>
+          </a:bodyPr>
+          <a:lstStyle/>
+          <a:p>
+            <a:r>
+              <a:rPr lang="pl-PL" dirty="0" err="1"/>
+              <a:t>Usage</a:t>
+            </a:r>
+            <a:r>
+              <a:rPr lang="pl-PL" dirty="0"/>
+              <a:t> with </a:t>
+            </a:r>
+            <a:r>
+              <a:rPr lang="pl-PL" dirty="0" err="1"/>
+              <a:t>injection</a:t>
             </a:r>
             <a:endParaRPr lang="pl-PL" dirty="0"/>
           </a:p>

</xml_diff>

<commit_message>
Exercise 13: Add form validation
</commit_message>
<xml_diff>
--- a/tutorial/ReactjsTraining.pptx
+++ b/tutorial/ReactjsTraining.pptx
@@ -216,7 +216,7 @@
           <a:p>
             <a:fld id="{D61BAF21-C883-454C-A249-8697E6BEDB6B}" type="datetimeFigureOut">
               <a:rPr lang="pl-PL" smtClean="0"/>
-              <a:t>29.09.2019</a:t>
+              <a:t>03.10.2019</a:t>
             </a:fld>
             <a:endParaRPr lang="pl-PL"/>
           </a:p>
@@ -3187,6 +3187,153 @@
               <a:t> który wstrzykniemy</a:t>
             </a:r>
           </a:p>
+          <a:p>
+            <a:pPr marL="0" indent="0">
+              <a:buFontTx/>
+              <a:buNone/>
+            </a:pPr>
+            <a:r>
+              <a:rPr lang="pl-PL" sz="1200" b="0" i="0" kern="1200" dirty="0" err="1">
+                <a:solidFill>
+                  <a:schemeClr val="tx1"/>
+                </a:solidFill>
+                <a:effectLst/>
+                <a:latin typeface="+mn-lt"/>
+                <a:ea typeface="+mn-ea"/>
+                <a:cs typeface="+mn-cs"/>
+              </a:rPr>
+              <a:t>Exercise</a:t>
+            </a:r>
+            <a:r>
+              <a:rPr lang="pl-PL" sz="1200" b="0" i="0" kern="1200" dirty="0">
+                <a:solidFill>
+                  <a:schemeClr val="tx1"/>
+                </a:solidFill>
+                <a:effectLst/>
+                <a:latin typeface="+mn-lt"/>
+                <a:ea typeface="+mn-ea"/>
+                <a:cs typeface="+mn-cs"/>
+              </a:rPr>
+              <a:t> 13: Dodać walidację do </a:t>
+            </a:r>
+            <a:r>
+              <a:rPr lang="pl-PL" sz="1200" b="0" i="0" kern="1200" dirty="0" err="1">
+                <a:solidFill>
+                  <a:schemeClr val="tx1"/>
+                </a:solidFill>
+                <a:effectLst/>
+                <a:latin typeface="+mn-lt"/>
+                <a:ea typeface="+mn-ea"/>
+                <a:cs typeface="+mn-cs"/>
+              </a:rPr>
+              <a:t>FirstName</a:t>
+            </a:r>
+            <a:r>
+              <a:rPr lang="pl-PL" sz="1200" b="0" i="0" kern="1200" dirty="0">
+                <a:solidFill>
+                  <a:schemeClr val="tx1"/>
+                </a:solidFill>
+                <a:effectLst/>
+                <a:latin typeface="+mn-lt"/>
+                <a:ea typeface="+mn-ea"/>
+                <a:cs typeface="+mn-cs"/>
+              </a:rPr>
+              <a:t> i </a:t>
+            </a:r>
+            <a:r>
+              <a:rPr lang="pl-PL" sz="1200" b="0" i="0" kern="1200" dirty="0" err="1">
+                <a:solidFill>
+                  <a:schemeClr val="tx1"/>
+                </a:solidFill>
+                <a:effectLst/>
+                <a:latin typeface="+mn-lt"/>
+                <a:ea typeface="+mn-ea"/>
+                <a:cs typeface="+mn-cs"/>
+              </a:rPr>
+              <a:t>LastName</a:t>
+            </a:r>
+            <a:r>
+              <a:rPr lang="pl-PL" sz="1200" b="0" i="0" kern="1200" dirty="0">
+                <a:solidFill>
+                  <a:schemeClr val="tx1"/>
+                </a:solidFill>
+                <a:effectLst/>
+                <a:latin typeface="+mn-lt"/>
+                <a:ea typeface="+mn-ea"/>
+                <a:cs typeface="+mn-cs"/>
+              </a:rPr>
+              <a:t> (nie mogą być puste). Ma </a:t>
+            </a:r>
+            <a:r>
+              <a:rPr lang="pl-PL" sz="1200" b="0" i="0" kern="1200" dirty="0" err="1">
+                <a:solidFill>
+                  <a:schemeClr val="tx1"/>
+                </a:solidFill>
+                <a:effectLst/>
+                <a:latin typeface="+mn-lt"/>
+                <a:ea typeface="+mn-ea"/>
+                <a:cs typeface="+mn-cs"/>
+              </a:rPr>
+              <a:t>Save</a:t>
+            </a:r>
+            <a:r>
+              <a:rPr lang="pl-PL" sz="1200" b="0" i="0" kern="1200" dirty="0">
+                <a:solidFill>
+                  <a:schemeClr val="tx1"/>
+                </a:solidFill>
+                <a:effectLst/>
+                <a:latin typeface="+mn-lt"/>
+                <a:ea typeface="+mn-ea"/>
+                <a:cs typeface="+mn-cs"/>
+              </a:rPr>
+              <a:t> być </a:t>
+            </a:r>
+            <a:r>
+              <a:rPr lang="pl-PL" sz="1200" b="0" i="0" kern="1200" dirty="0" err="1">
+                <a:solidFill>
+                  <a:schemeClr val="tx1"/>
+                </a:solidFill>
+                <a:effectLst/>
+                <a:latin typeface="+mn-lt"/>
+                <a:ea typeface="+mn-ea"/>
+                <a:cs typeface="+mn-cs"/>
+              </a:rPr>
+              <a:t>disabled</a:t>
+            </a:r>
+            <a:r>
+              <a:rPr lang="pl-PL" sz="1200" b="0" i="0" kern="1200" dirty="0">
+                <a:solidFill>
+                  <a:schemeClr val="tx1"/>
+                </a:solidFill>
+                <a:effectLst/>
+                <a:latin typeface="+mn-lt"/>
+                <a:ea typeface="+mn-ea"/>
+                <a:cs typeface="+mn-cs"/>
+              </a:rPr>
+              <a:t>, zaznaczać się na czerwono pole i wyświetlać informacja </a:t>
+            </a:r>
+            <a:r>
+              <a:rPr lang="pl-PL" sz="1200" b="0" i="0" kern="1200">
+                <a:solidFill>
+                  <a:schemeClr val="tx1"/>
+                </a:solidFill>
+                <a:effectLst/>
+                <a:latin typeface="+mn-lt"/>
+                <a:ea typeface="+mn-ea"/>
+                <a:cs typeface="+mn-cs"/>
+              </a:rPr>
+              <a:t>o błędzie pod polem</a:t>
+            </a:r>
+            <a:endParaRPr lang="pl-PL" sz="1200" b="0" i="0" kern="1200" dirty="0">
+              <a:solidFill>
+                <a:schemeClr val="tx1"/>
+              </a:solidFill>
+              <a:effectLst/>
+              <a:latin typeface="+mn-lt"/>
+              <a:ea typeface="+mn-ea"/>
+              <a:cs typeface="+mn-cs"/>
+            </a:endParaRPr>
+          </a:p>
         </p:txBody>
       </p:sp>
       <p:sp>
@@ -5057,7 +5204,7 @@
           <a:p>
             <a:fld id="{95CCC2EB-502C-49A7-9CC4-85002E026034}" type="datetimeFigureOut">
               <a:rPr lang="pl-PL" smtClean="0"/>
-              <a:t>29.09.2019</a:t>
+              <a:t>03.10.2019</a:t>
             </a:fld>
             <a:endParaRPr lang="pl-PL"/>
           </a:p>
@@ -5255,7 +5402,7 @@
           <a:p>
             <a:fld id="{95CCC2EB-502C-49A7-9CC4-85002E026034}" type="datetimeFigureOut">
               <a:rPr lang="pl-PL" smtClean="0"/>
-              <a:t>29.09.2019</a:t>
+              <a:t>03.10.2019</a:t>
             </a:fld>
             <a:endParaRPr lang="pl-PL"/>
           </a:p>
@@ -5463,7 +5610,7 @@
           <a:p>
             <a:fld id="{95CCC2EB-502C-49A7-9CC4-85002E026034}" type="datetimeFigureOut">
               <a:rPr lang="pl-PL" smtClean="0"/>
-              <a:t>29.09.2019</a:t>
+              <a:t>03.10.2019</a:t>
             </a:fld>
             <a:endParaRPr lang="pl-PL"/>
           </a:p>
@@ -5661,7 +5808,7 @@
           <a:p>
             <a:fld id="{95CCC2EB-502C-49A7-9CC4-85002E026034}" type="datetimeFigureOut">
               <a:rPr lang="pl-PL" smtClean="0"/>
-              <a:t>29.09.2019</a:t>
+              <a:t>03.10.2019</a:t>
             </a:fld>
             <a:endParaRPr lang="pl-PL"/>
           </a:p>
@@ -5936,7 +6083,7 @@
           <a:p>
             <a:fld id="{95CCC2EB-502C-49A7-9CC4-85002E026034}" type="datetimeFigureOut">
               <a:rPr lang="pl-PL" smtClean="0"/>
-              <a:t>29.09.2019</a:t>
+              <a:t>03.10.2019</a:t>
             </a:fld>
             <a:endParaRPr lang="pl-PL"/>
           </a:p>
@@ -6201,7 +6348,7 @@
           <a:p>
             <a:fld id="{95CCC2EB-502C-49A7-9CC4-85002E026034}" type="datetimeFigureOut">
               <a:rPr lang="pl-PL" smtClean="0"/>
-              <a:t>29.09.2019</a:t>
+              <a:t>03.10.2019</a:t>
             </a:fld>
             <a:endParaRPr lang="pl-PL"/>
           </a:p>
@@ -6613,7 +6760,7 @@
           <a:p>
             <a:fld id="{95CCC2EB-502C-49A7-9CC4-85002E026034}" type="datetimeFigureOut">
               <a:rPr lang="pl-PL" smtClean="0"/>
-              <a:t>29.09.2019</a:t>
+              <a:t>03.10.2019</a:t>
             </a:fld>
             <a:endParaRPr lang="pl-PL"/>
           </a:p>
@@ -6754,7 +6901,7 @@
           <a:p>
             <a:fld id="{95CCC2EB-502C-49A7-9CC4-85002E026034}" type="datetimeFigureOut">
               <a:rPr lang="pl-PL" smtClean="0"/>
-              <a:t>29.09.2019</a:t>
+              <a:t>03.10.2019</a:t>
             </a:fld>
             <a:endParaRPr lang="pl-PL"/>
           </a:p>
@@ -6867,7 +7014,7 @@
           <a:p>
             <a:fld id="{95CCC2EB-502C-49A7-9CC4-85002E026034}" type="datetimeFigureOut">
               <a:rPr lang="pl-PL" smtClean="0"/>
-              <a:t>29.09.2019</a:t>
+              <a:t>03.10.2019</a:t>
             </a:fld>
             <a:endParaRPr lang="pl-PL"/>
           </a:p>
@@ -7178,7 +7325,7 @@
           <a:p>
             <a:fld id="{95CCC2EB-502C-49A7-9CC4-85002E026034}" type="datetimeFigureOut">
               <a:rPr lang="pl-PL" smtClean="0"/>
-              <a:t>29.09.2019</a:t>
+              <a:t>03.10.2019</a:t>
             </a:fld>
             <a:endParaRPr lang="pl-PL"/>
           </a:p>
@@ -7466,7 +7613,7 @@
           <a:p>
             <a:fld id="{95CCC2EB-502C-49A7-9CC4-85002E026034}" type="datetimeFigureOut">
               <a:rPr lang="pl-PL" smtClean="0"/>
-              <a:t>29.09.2019</a:t>
+              <a:t>03.10.2019</a:t>
             </a:fld>
             <a:endParaRPr lang="pl-PL"/>
           </a:p>
@@ -7707,7 +7854,7 @@
           <a:p>
             <a:fld id="{95CCC2EB-502C-49A7-9CC4-85002E026034}" type="datetimeFigureOut">
               <a:rPr lang="pl-PL" smtClean="0"/>
-              <a:t>29.09.2019</a:t>
+              <a:t>03.10.2019</a:t>
             </a:fld>
             <a:endParaRPr lang="pl-PL"/>
           </a:p>
@@ -16432,7 +16579,7 @@
         <p:spPr>
           <a:xfrm>
             <a:off x="497840" y="538480"/>
-            <a:ext cx="1301062" cy="369332"/>
+            <a:ext cx="2398413" cy="369332"/>
           </a:xfrm>
           <a:prstGeom prst="rect">
             <a:avLst/>
@@ -16456,6 +16603,14 @@
             <a:r>
               <a:rPr lang="pl-PL" dirty="0" err="1"/>
               <a:t>forms</a:t>
+            </a:r>
+            <a:r>
+              <a:rPr lang="pl-PL" dirty="0"/>
+              <a:t> - </a:t>
+            </a:r>
+            <a:r>
+              <a:rPr lang="pl-PL" dirty="0" err="1"/>
+              <a:t>validation</a:t>
             </a:r>
             <a:endParaRPr lang="pl-PL" dirty="0"/>
           </a:p>

</xml_diff>

<commit_message>
Exercise 14: Common textInput component with validation
</commit_message>
<xml_diff>
--- a/tutorial/ReactjsTraining.pptx
+++ b/tutorial/ReactjsTraining.pptx
@@ -3310,10 +3310,16 @@
                 <a:ea typeface="+mn-ea"/>
                 <a:cs typeface="+mn-cs"/>
               </a:rPr>
-              <a:t>, zaznaczać się na czerwono pole i wyświetlać informacja </a:t>
-            </a:r>
-            <a:r>
-              <a:rPr lang="pl-PL" sz="1200" b="0" i="0" kern="1200">
+              <a:t>, zaznaczać się na czerwono pole i wyświetlać informacja o błędzie pod polem</a:t>
+            </a:r>
+          </a:p>
+          <a:p>
+            <a:pPr marL="0" indent="0">
+              <a:buFontTx/>
+              <a:buNone/>
+            </a:pPr>
+            <a:r>
+              <a:rPr lang="pl-PL" sz="1200" b="0" i="0" kern="1200" dirty="0" err="1">
                 <a:solidFill>
                   <a:schemeClr val="tx1"/>
                 </a:solidFill>
@@ -3322,17 +3328,92 @@
                 <a:ea typeface="+mn-ea"/>
                 <a:cs typeface="+mn-cs"/>
               </a:rPr>
-              <a:t>o błędzie pod polem</a:t>
-            </a:r>
-            <a:endParaRPr lang="pl-PL" sz="1200" b="0" i="0" kern="1200" dirty="0">
-              <a:solidFill>
-                <a:schemeClr val="tx1"/>
-              </a:solidFill>
-              <a:effectLst/>
-              <a:latin typeface="+mn-lt"/>
-              <a:ea typeface="+mn-ea"/>
-              <a:cs typeface="+mn-cs"/>
-            </a:endParaRPr>
+              <a:t>Exercise</a:t>
+            </a:r>
+            <a:r>
+              <a:rPr lang="pl-PL" sz="1200" b="0" i="0" kern="1200" dirty="0">
+                <a:solidFill>
+                  <a:schemeClr val="tx1"/>
+                </a:solidFill>
+                <a:effectLst/>
+                <a:latin typeface="+mn-lt"/>
+                <a:ea typeface="+mn-ea"/>
+                <a:cs typeface="+mn-cs"/>
+              </a:rPr>
+              <a:t> 14: Stworzyć </a:t>
+            </a:r>
+            <a:r>
+              <a:rPr lang="pl-PL" sz="1200" b="0" i="0" kern="1200" dirty="0" err="1">
+                <a:solidFill>
+                  <a:schemeClr val="tx1"/>
+                </a:solidFill>
+                <a:effectLst/>
+                <a:latin typeface="+mn-lt"/>
+                <a:ea typeface="+mn-ea"/>
+                <a:cs typeface="+mn-cs"/>
+              </a:rPr>
+              <a:t>common</a:t>
+            </a:r>
+            <a:r>
+              <a:rPr lang="pl-PL" sz="1200" b="0" i="0" kern="1200" dirty="0">
+                <a:solidFill>
+                  <a:schemeClr val="tx1"/>
+                </a:solidFill>
+                <a:effectLst/>
+                <a:latin typeface="+mn-lt"/>
+                <a:ea typeface="+mn-ea"/>
+                <a:cs typeface="+mn-cs"/>
+              </a:rPr>
+              <a:t> </a:t>
+            </a:r>
+            <a:r>
+              <a:rPr lang="pl-PL" sz="1200" b="0" i="0" kern="1200" dirty="0" err="1">
+                <a:solidFill>
+                  <a:schemeClr val="tx1"/>
+                </a:solidFill>
+                <a:effectLst/>
+                <a:latin typeface="+mn-lt"/>
+                <a:ea typeface="+mn-ea"/>
+                <a:cs typeface="+mn-cs"/>
+              </a:rPr>
+              <a:t>TextInput</a:t>
+            </a:r>
+            <a:r>
+              <a:rPr lang="pl-PL" sz="1200" b="0" i="0" kern="1200" dirty="0">
+                <a:solidFill>
+                  <a:schemeClr val="tx1"/>
+                </a:solidFill>
+                <a:effectLst/>
+                <a:latin typeface="+mn-lt"/>
+                <a:ea typeface="+mn-ea"/>
+                <a:cs typeface="+mn-cs"/>
+              </a:rPr>
+              <a:t> gdzie przeniesiemy logikę walidacyjną i użyjemy w </a:t>
+            </a:r>
+            <a:r>
+              <a:rPr lang="pl-PL" sz="1200" b="0" i="0" kern="1200" dirty="0" err="1">
+                <a:solidFill>
+                  <a:schemeClr val="tx1"/>
+                </a:solidFill>
+                <a:effectLst/>
+                <a:latin typeface="+mn-lt"/>
+                <a:ea typeface="+mn-ea"/>
+                <a:cs typeface="+mn-cs"/>
+              </a:rPr>
+              <a:t>ListForm</a:t>
+            </a:r>
+            <a:r>
+              <a:rPr lang="pl-PL" sz="1200" b="0" i="0" kern="1200" dirty="0">
+                <a:solidFill>
+                  <a:schemeClr val="tx1"/>
+                </a:solidFill>
+                <a:effectLst/>
+                <a:latin typeface="+mn-lt"/>
+                <a:ea typeface="+mn-ea"/>
+                <a:cs typeface="+mn-cs"/>
+              </a:rPr>
+              <a:t>. (Rozwiązujemy problem tego, że kiedyś to się może jeszcze przydać oraz dublowania kodu)</a:t>
+            </a:r>
           </a:p>
         </p:txBody>
       </p:sp>

</xml_diff>

<commit_message>
Exercise 15: login form with local storage
</commit_message>
<xml_diff>
--- a/tutorial/ReactjsTraining.pptx
+++ b/tutorial/ReactjsTraining.pptx
@@ -25,8 +25,8 @@
     <p:sldId id="270" r:id="rId16"/>
     <p:sldId id="271" r:id="rId17"/>
     <p:sldId id="272" r:id="rId18"/>
-    <p:sldId id="273" r:id="rId19"/>
-    <p:sldId id="274" r:id="rId20"/>
+    <p:sldId id="274" r:id="rId19"/>
+    <p:sldId id="273" r:id="rId20"/>
     <p:sldId id="275" r:id="rId21"/>
   </p:sldIdLst>
   <p:sldSz cx="12192000" cy="6858000"/>
@@ -216,7 +216,7 @@
           <a:p>
             <a:fld id="{D61BAF21-C883-454C-A249-8697E6BEDB6B}" type="datetimeFigureOut">
               <a:rPr lang="pl-PL" smtClean="0"/>
-              <a:t>03.10.2019</a:t>
+              <a:t>04.10.2019</a:t>
             </a:fld>
             <a:endParaRPr lang="pl-PL"/>
           </a:p>
@@ -3501,6 +3501,110 @@
               <a:buFontTx/>
               <a:buNone/>
             </a:pPr>
+            <a:r>
+              <a:rPr lang="pl-PL" sz="1200" b="0" i="0" kern="1200">
+                <a:solidFill>
+                  <a:schemeClr val="tx1"/>
+                </a:solidFill>
+                <a:effectLst/>
+                <a:latin typeface="+mn-lt"/>
+                <a:ea typeface="+mn-ea"/>
+                <a:cs typeface="+mn-cs"/>
+              </a:rPr>
+              <a:t>Exercise 15:</a:t>
+            </a:r>
+            <a:br>
+              <a:rPr lang="pl-PL" sz="1200" b="0" i="0" kern="1200">
+                <a:solidFill>
+                  <a:schemeClr val="tx1"/>
+                </a:solidFill>
+                <a:effectLst/>
+                <a:latin typeface="+mn-lt"/>
+                <a:ea typeface="+mn-ea"/>
+                <a:cs typeface="+mn-cs"/>
+              </a:rPr>
+            </a:br>
+            <a:r>
+              <a:rPr lang="pl-PL" sz="1200" b="0" i="0" kern="1200">
+                <a:solidFill>
+                  <a:schemeClr val="tx1"/>
+                </a:solidFill>
+                <a:effectLst/>
+                <a:latin typeface="+mn-lt"/>
+                <a:ea typeface="+mn-ea"/>
+                <a:cs typeface="+mn-cs"/>
+              </a:rPr>
+              <a:t>- stworzyć okienko do logowania</a:t>
+            </a:r>
+            <a:br>
+              <a:rPr lang="pl-PL" sz="1200" b="0" i="0" kern="1200">
+                <a:solidFill>
+                  <a:schemeClr val="tx1"/>
+                </a:solidFill>
+                <a:effectLst/>
+                <a:latin typeface="+mn-lt"/>
+                <a:ea typeface="+mn-ea"/>
+                <a:cs typeface="+mn-cs"/>
+              </a:rPr>
+            </a:br>
+            <a:r>
+              <a:rPr lang="pl-PL" sz="1200" b="0" i="0" kern="1200">
+                <a:solidFill>
+                  <a:schemeClr val="tx1"/>
+                </a:solidFill>
+                <a:effectLst/>
+                <a:latin typeface="+mn-lt"/>
+                <a:ea typeface="+mn-ea"/>
+                <a:cs typeface="+mn-cs"/>
+              </a:rPr>
+              <a:t>- jak użytkownik się zaloguje to token do localStorage</a:t>
+            </a:r>
+            <a:br>
+              <a:rPr lang="pl-PL" sz="1200" b="0" i="0" kern="1200">
+                <a:solidFill>
+                  <a:schemeClr val="tx1"/>
+                </a:solidFill>
+                <a:effectLst/>
+                <a:latin typeface="+mn-lt"/>
+                <a:ea typeface="+mn-ea"/>
+                <a:cs typeface="+mn-cs"/>
+              </a:rPr>
+            </a:br>
+            <a:r>
+              <a:rPr lang="pl-PL" sz="1200" b="0" i="0" kern="1200">
+                <a:solidFill>
+                  <a:schemeClr val="tx1"/>
+                </a:solidFill>
+                <a:effectLst/>
+                <a:latin typeface="+mn-lt"/>
+                <a:ea typeface="+mn-ea"/>
+                <a:cs typeface="+mn-cs"/>
+              </a:rPr>
+              <a:t>- użytkownik niezalogowany nie może podejrzeć listy</a:t>
+            </a:r>
+            <a:br>
+              <a:rPr lang="pl-PL" sz="1200" b="0" i="0" kern="1200">
+                <a:solidFill>
+                  <a:schemeClr val="tx1"/>
+                </a:solidFill>
+                <a:effectLst/>
+                <a:latin typeface="+mn-lt"/>
+                <a:ea typeface="+mn-ea"/>
+                <a:cs typeface="+mn-cs"/>
+              </a:rPr>
+            </a:br>
+            <a:r>
+              <a:rPr lang="pl-PL" sz="1200" b="0" i="0" kern="1200">
+                <a:solidFill>
+                  <a:schemeClr val="tx1"/>
+                </a:solidFill>
+                <a:effectLst/>
+                <a:latin typeface="+mn-lt"/>
+                <a:ea typeface="+mn-ea"/>
+                <a:cs typeface="+mn-cs"/>
+              </a:rPr>
+              <a:t>- zalogowany użytkownik może się wylogować</a:t>
+            </a:r>
             <a:endParaRPr lang="pl-PL" sz="1200" b="0" i="0" kern="1200" dirty="0">
               <a:solidFill>
                 <a:schemeClr val="tx1"/>
@@ -3539,7 +3643,7 @@
     </p:spTree>
     <p:extLst>
       <p:ext uri="{BB962C8B-B14F-4D97-AF65-F5344CB8AC3E}">
-        <p14:creationId xmlns:p14="http://schemas.microsoft.com/office/powerpoint/2010/main" val="3151434336"/>
+        <p14:creationId xmlns:p14="http://schemas.microsoft.com/office/powerpoint/2010/main" val="1754730863"/>
       </p:ext>
     </p:extLst>
   </p:cSld>
@@ -3635,7 +3739,7 @@
     </p:spTree>
     <p:extLst>
       <p:ext uri="{BB962C8B-B14F-4D97-AF65-F5344CB8AC3E}">
-        <p14:creationId xmlns:p14="http://schemas.microsoft.com/office/powerpoint/2010/main" val="1754730863"/>
+        <p14:creationId xmlns:p14="http://schemas.microsoft.com/office/powerpoint/2010/main" val="3151434336"/>
       </p:ext>
     </p:extLst>
   </p:cSld>
@@ -5285,7 +5389,7 @@
           <a:p>
             <a:fld id="{95CCC2EB-502C-49A7-9CC4-85002E026034}" type="datetimeFigureOut">
               <a:rPr lang="pl-PL" smtClean="0"/>
-              <a:t>03.10.2019</a:t>
+              <a:t>04.10.2019</a:t>
             </a:fld>
             <a:endParaRPr lang="pl-PL"/>
           </a:p>
@@ -5483,7 +5587,7 @@
           <a:p>
             <a:fld id="{95CCC2EB-502C-49A7-9CC4-85002E026034}" type="datetimeFigureOut">
               <a:rPr lang="pl-PL" smtClean="0"/>
-              <a:t>03.10.2019</a:t>
+              <a:t>04.10.2019</a:t>
             </a:fld>
             <a:endParaRPr lang="pl-PL"/>
           </a:p>
@@ -5691,7 +5795,7 @@
           <a:p>
             <a:fld id="{95CCC2EB-502C-49A7-9CC4-85002E026034}" type="datetimeFigureOut">
               <a:rPr lang="pl-PL" smtClean="0"/>
-              <a:t>03.10.2019</a:t>
+              <a:t>04.10.2019</a:t>
             </a:fld>
             <a:endParaRPr lang="pl-PL"/>
           </a:p>
@@ -5889,7 +5993,7 @@
           <a:p>
             <a:fld id="{95CCC2EB-502C-49A7-9CC4-85002E026034}" type="datetimeFigureOut">
               <a:rPr lang="pl-PL" smtClean="0"/>
-              <a:t>03.10.2019</a:t>
+              <a:t>04.10.2019</a:t>
             </a:fld>
             <a:endParaRPr lang="pl-PL"/>
           </a:p>
@@ -6164,7 +6268,7 @@
           <a:p>
             <a:fld id="{95CCC2EB-502C-49A7-9CC4-85002E026034}" type="datetimeFigureOut">
               <a:rPr lang="pl-PL" smtClean="0"/>
-              <a:t>03.10.2019</a:t>
+              <a:t>04.10.2019</a:t>
             </a:fld>
             <a:endParaRPr lang="pl-PL"/>
           </a:p>
@@ -6429,7 +6533,7 @@
           <a:p>
             <a:fld id="{95CCC2EB-502C-49A7-9CC4-85002E026034}" type="datetimeFigureOut">
               <a:rPr lang="pl-PL" smtClean="0"/>
-              <a:t>03.10.2019</a:t>
+              <a:t>04.10.2019</a:t>
             </a:fld>
             <a:endParaRPr lang="pl-PL"/>
           </a:p>
@@ -6841,7 +6945,7 @@
           <a:p>
             <a:fld id="{95CCC2EB-502C-49A7-9CC4-85002E026034}" type="datetimeFigureOut">
               <a:rPr lang="pl-PL" smtClean="0"/>
-              <a:t>03.10.2019</a:t>
+              <a:t>04.10.2019</a:t>
             </a:fld>
             <a:endParaRPr lang="pl-PL"/>
           </a:p>
@@ -6982,7 +7086,7 @@
           <a:p>
             <a:fld id="{95CCC2EB-502C-49A7-9CC4-85002E026034}" type="datetimeFigureOut">
               <a:rPr lang="pl-PL" smtClean="0"/>
-              <a:t>03.10.2019</a:t>
+              <a:t>04.10.2019</a:t>
             </a:fld>
             <a:endParaRPr lang="pl-PL"/>
           </a:p>
@@ -7095,7 +7199,7 @@
           <a:p>
             <a:fld id="{95CCC2EB-502C-49A7-9CC4-85002E026034}" type="datetimeFigureOut">
               <a:rPr lang="pl-PL" smtClean="0"/>
-              <a:t>03.10.2019</a:t>
+              <a:t>04.10.2019</a:t>
             </a:fld>
             <a:endParaRPr lang="pl-PL"/>
           </a:p>
@@ -7406,7 +7510,7 @@
           <a:p>
             <a:fld id="{95CCC2EB-502C-49A7-9CC4-85002E026034}" type="datetimeFigureOut">
               <a:rPr lang="pl-PL" smtClean="0"/>
-              <a:t>03.10.2019</a:t>
+              <a:t>04.10.2019</a:t>
             </a:fld>
             <a:endParaRPr lang="pl-PL"/>
           </a:p>
@@ -7694,7 +7798,7 @@
           <a:p>
             <a:fld id="{95CCC2EB-502C-49A7-9CC4-85002E026034}" type="datetimeFigureOut">
               <a:rPr lang="pl-PL" smtClean="0"/>
-              <a:t>03.10.2019</a:t>
+              <a:t>04.10.2019</a:t>
             </a:fld>
             <a:endParaRPr lang="pl-PL"/>
           </a:p>
@@ -7935,7 +8039,7 @@
           <a:p>
             <a:fld id="{95CCC2EB-502C-49A7-9CC4-85002E026034}" type="datetimeFigureOut">
               <a:rPr lang="pl-PL" smtClean="0"/>
-              <a:t>03.10.2019</a:t>
+              <a:t>04.10.2019</a:t>
             </a:fld>
             <a:endParaRPr lang="pl-PL"/>
           </a:p>
@@ -8028,6 +8132,54 @@
               <a:t>‹#›</a:t>
             </a:fld>
             <a:endParaRPr lang="pl-PL"/>
+          </a:p>
+        </p:txBody>
+      </p:sp>
+      <p:sp>
+        <p:nvSpPr>
+          <p:cNvPr id="7" name="MSIPCMContentMarking" descr="{&quot;HashCode&quot;:100097502,&quot;Placement&quot;:&quot;Footer&quot;}">
+            <a:extLst>
+              <a:ext uri="{FF2B5EF4-FFF2-40B4-BE49-F238E27FC236}">
+                <a16:creationId xmlns:a16="http://schemas.microsoft.com/office/drawing/2014/main" id="{E1B4FCCE-3C4B-4173-9B92-97B3499AC4E7}"/>
+              </a:ext>
+            </a:extLst>
+          </p:cNvPr>
+          <p:cNvSpPr txBox="1"/>
+          <p:nvPr userDrawn="1"/>
+        </p:nvSpPr>
+        <p:spPr>
+          <a:xfrm>
+            <a:off x="0" y="6595656"/>
+            <a:ext cx="1253767" cy="262344"/>
+          </a:xfrm>
+          <a:prstGeom prst="rect">
+            <a:avLst/>
+          </a:prstGeom>
+          <a:noFill/>
+        </p:spPr>
+        <p:txBody>
+          <a:bodyPr vert="horz" wrap="square" lIns="0" tIns="0" rIns="0" bIns="0" rtlCol="0" anchor="ctr" anchorCtr="1">
+            <a:noAutofit/>
+          </a:bodyPr>
+          <a:lstStyle/>
+          <a:p>
+            <a:pPr algn="l">
+              <a:spcBef>
+                <a:spcPts val="0"/>
+              </a:spcBef>
+              <a:spcAft>
+                <a:spcPts val="0"/>
+              </a:spcAft>
+            </a:pPr>
+            <a:r>
+              <a:rPr lang="en-GB" sz="1000">
+                <a:solidFill>
+                  <a:srgbClr val="000000"/>
+                </a:solidFill>
+                <a:latin typeface="Calibri" panose="020F0502020204030204" pitchFamily="34" charset="0"/>
+              </a:rPr>
+              <a:t>Internal - KMD A/S</a:t>
+            </a:r>
           </a:p>
         </p:txBody>
       </p:sp>
@@ -16660,7 +16812,7 @@
         <p:spPr>
           <a:xfrm>
             <a:off x="497840" y="538480"/>
-            <a:ext cx="2398413" cy="369332"/>
+            <a:ext cx="2701509" cy="369332"/>
           </a:xfrm>
           <a:prstGeom prst="rect">
             <a:avLst/>
@@ -16674,33 +16826,316 @@
           <a:lstStyle/>
           <a:p>
             <a:r>
-              <a:rPr lang="pl-PL" dirty="0" err="1"/>
-              <a:t>React</a:t>
-            </a:r>
-            <a:r>
               <a:rPr lang="pl-PL" dirty="0"/>
-              <a:t> </a:t>
-            </a:r>
-            <a:r>
-              <a:rPr lang="pl-PL" dirty="0" err="1"/>
-              <a:t>forms</a:t>
-            </a:r>
-            <a:r>
-              <a:rPr lang="pl-PL" dirty="0"/>
-              <a:t> - </a:t>
-            </a:r>
-            <a:r>
-              <a:rPr lang="pl-PL" dirty="0" err="1"/>
-              <a:t>validation</a:t>
-            </a:r>
-            <a:endParaRPr lang="pl-PL" dirty="0"/>
+              <a:t>React forms – local storage</a:t>
+            </a:r>
+          </a:p>
+        </p:txBody>
+      </p:sp>
+      <p:sp>
+        <p:nvSpPr>
+          <p:cNvPr id="2" name="Rectangle 1">
+            <a:extLst>
+              <a:ext uri="{FF2B5EF4-FFF2-40B4-BE49-F238E27FC236}">
+                <a16:creationId xmlns:a16="http://schemas.microsoft.com/office/drawing/2014/main" id="{171A784F-76EE-4B74-B668-4A6B32630FC7}"/>
+              </a:ext>
+            </a:extLst>
+          </p:cNvPr>
+          <p:cNvSpPr/>
+          <p:nvPr/>
+        </p:nvSpPr>
+        <p:spPr>
+          <a:xfrm>
+            <a:off x="3534240" y="3059668"/>
+            <a:ext cx="4490332" cy="369332"/>
+          </a:xfrm>
+          <a:prstGeom prst="rect">
+            <a:avLst/>
+          </a:prstGeom>
+          <a:solidFill>
+            <a:schemeClr val="tx1"/>
+          </a:solidFill>
+        </p:spPr>
+        <p:txBody>
+          <a:bodyPr wrap="square">
+            <a:spAutoFit/>
+          </a:bodyPr>
+          <a:lstStyle/>
+          <a:p>
+            <a:r>
+              <a:rPr lang="pl-PL" dirty="0">
+                <a:solidFill>
+                  <a:srgbClr val="9CDCFE"/>
+                </a:solidFill>
+                <a:latin typeface="Consolas" panose="020B0609020204030204" pitchFamily="49" charset="0"/>
+              </a:rPr>
+              <a:t>localStorage</a:t>
+            </a:r>
+            <a:r>
+              <a:rPr lang="pl-PL" dirty="0">
+                <a:solidFill>
+                  <a:srgbClr val="D4D4D4"/>
+                </a:solidFill>
+                <a:latin typeface="Consolas" panose="020B0609020204030204" pitchFamily="49" charset="0"/>
+              </a:rPr>
+              <a:t>.</a:t>
+            </a:r>
+            <a:r>
+              <a:rPr lang="pl-PL" dirty="0">
+                <a:solidFill>
+                  <a:srgbClr val="DCDCAA"/>
+                </a:solidFill>
+                <a:latin typeface="Consolas" panose="020B0609020204030204" pitchFamily="49" charset="0"/>
+              </a:rPr>
+              <a:t>getItem</a:t>
+            </a:r>
+            <a:r>
+              <a:rPr lang="pl-PL" dirty="0">
+                <a:solidFill>
+                  <a:srgbClr val="D4D4D4"/>
+                </a:solidFill>
+                <a:latin typeface="Consolas" panose="020B0609020204030204" pitchFamily="49" charset="0"/>
+              </a:rPr>
+              <a:t>(</a:t>
+            </a:r>
+            <a:r>
+              <a:rPr lang="pl-PL" dirty="0">
+                <a:solidFill>
+                  <a:srgbClr val="CE9178"/>
+                </a:solidFill>
+                <a:latin typeface="Consolas" panose="020B0609020204030204" pitchFamily="49" charset="0"/>
+              </a:rPr>
+              <a:t>'key'</a:t>
+            </a:r>
+            <a:r>
+              <a:rPr lang="pl-PL" dirty="0">
+                <a:solidFill>
+                  <a:srgbClr val="D4D4D4"/>
+                </a:solidFill>
+                <a:latin typeface="Consolas" panose="020B0609020204030204" pitchFamily="49" charset="0"/>
+              </a:rPr>
+              <a:t>))</a:t>
+            </a:r>
+            <a:endParaRPr lang="pl-PL" b="0" dirty="0">
+              <a:solidFill>
+                <a:srgbClr val="D4D4D4"/>
+              </a:solidFill>
+              <a:effectLst/>
+              <a:latin typeface="Consolas" panose="020B0609020204030204" pitchFamily="49" charset="0"/>
+            </a:endParaRPr>
+          </a:p>
+        </p:txBody>
+      </p:sp>
+      <p:sp>
+        <p:nvSpPr>
+          <p:cNvPr id="3" name="Rectangle 2">
+            <a:extLst>
+              <a:ext uri="{FF2B5EF4-FFF2-40B4-BE49-F238E27FC236}">
+                <a16:creationId xmlns:a16="http://schemas.microsoft.com/office/drawing/2014/main" id="{99085FDD-19DB-47BF-9512-F84E7F39334C}"/>
+              </a:ext>
+            </a:extLst>
+          </p:cNvPr>
+          <p:cNvSpPr/>
+          <p:nvPr/>
+        </p:nvSpPr>
+        <p:spPr>
+          <a:xfrm>
+            <a:off x="3534240" y="2512814"/>
+            <a:ext cx="4490332" cy="369332"/>
+          </a:xfrm>
+          <a:prstGeom prst="rect">
+            <a:avLst/>
+          </a:prstGeom>
+          <a:solidFill>
+            <a:schemeClr val="tx1"/>
+          </a:solidFill>
+        </p:spPr>
+        <p:txBody>
+          <a:bodyPr wrap="none">
+            <a:spAutoFit/>
+          </a:bodyPr>
+          <a:lstStyle/>
+          <a:p>
+            <a:r>
+              <a:rPr lang="pl-PL" dirty="0">
+                <a:solidFill>
+                  <a:srgbClr val="9CDCFE"/>
+                </a:solidFill>
+                <a:latin typeface="Consolas" panose="020B0609020204030204" pitchFamily="49" charset="0"/>
+              </a:rPr>
+              <a:t>localStorage</a:t>
+            </a:r>
+            <a:r>
+              <a:rPr lang="pl-PL" dirty="0">
+                <a:solidFill>
+                  <a:srgbClr val="D4D4D4"/>
+                </a:solidFill>
+                <a:latin typeface="Consolas" panose="020B0609020204030204" pitchFamily="49" charset="0"/>
+              </a:rPr>
+              <a:t>.</a:t>
+            </a:r>
+            <a:r>
+              <a:rPr lang="pl-PL" dirty="0">
+                <a:solidFill>
+                  <a:srgbClr val="DCDCAA"/>
+                </a:solidFill>
+                <a:latin typeface="Consolas" panose="020B0609020204030204" pitchFamily="49" charset="0"/>
+              </a:rPr>
+              <a:t>setItem</a:t>
+            </a:r>
+            <a:r>
+              <a:rPr lang="pl-PL" dirty="0">
+                <a:solidFill>
+                  <a:srgbClr val="D4D4D4"/>
+                </a:solidFill>
+                <a:latin typeface="Consolas" panose="020B0609020204030204" pitchFamily="49" charset="0"/>
+              </a:rPr>
+              <a:t>(</a:t>
+            </a:r>
+            <a:r>
+              <a:rPr lang="pl-PL" dirty="0">
+                <a:solidFill>
+                  <a:srgbClr val="CE9178"/>
+                </a:solidFill>
+                <a:latin typeface="Consolas" panose="020B0609020204030204" pitchFamily="49" charset="0"/>
+              </a:rPr>
+              <a:t>key'</a:t>
+            </a:r>
+            <a:r>
+              <a:rPr lang="pl-PL" dirty="0">
+                <a:solidFill>
+                  <a:srgbClr val="D4D4D4"/>
+                </a:solidFill>
+                <a:latin typeface="Consolas" panose="020B0609020204030204" pitchFamily="49" charset="0"/>
+              </a:rPr>
+              <a:t>, </a:t>
+            </a:r>
+            <a:r>
+              <a:rPr lang="pl-PL" dirty="0">
+                <a:solidFill>
+                  <a:srgbClr val="9CDCFE"/>
+                </a:solidFill>
+                <a:latin typeface="Consolas" panose="020B0609020204030204" pitchFamily="49" charset="0"/>
+              </a:rPr>
+              <a:t>value</a:t>
+            </a:r>
+            <a:r>
+              <a:rPr lang="pl-PL" dirty="0">
+                <a:solidFill>
+                  <a:srgbClr val="D4D4D4"/>
+                </a:solidFill>
+                <a:latin typeface="Consolas" panose="020B0609020204030204" pitchFamily="49" charset="0"/>
+              </a:rPr>
+              <a:t>);</a:t>
+            </a:r>
+            <a:endParaRPr lang="pl-PL" b="0" dirty="0">
+              <a:solidFill>
+                <a:srgbClr val="D4D4D4"/>
+              </a:solidFill>
+              <a:effectLst/>
+              <a:latin typeface="Consolas" panose="020B0609020204030204" pitchFamily="49" charset="0"/>
+            </a:endParaRPr>
+          </a:p>
+        </p:txBody>
+      </p:sp>
+      <p:sp>
+        <p:nvSpPr>
+          <p:cNvPr id="5" name="Rectangle 4">
+            <a:extLst>
+              <a:ext uri="{FF2B5EF4-FFF2-40B4-BE49-F238E27FC236}">
+                <a16:creationId xmlns:a16="http://schemas.microsoft.com/office/drawing/2014/main" id="{6ACC76DB-1551-4BA0-A344-EE7CF4255806}"/>
+              </a:ext>
+            </a:extLst>
+          </p:cNvPr>
+          <p:cNvSpPr/>
+          <p:nvPr/>
+        </p:nvSpPr>
+        <p:spPr>
+          <a:xfrm>
+            <a:off x="3534240" y="3606522"/>
+            <a:ext cx="4490332" cy="369332"/>
+          </a:xfrm>
+          <a:prstGeom prst="rect">
+            <a:avLst/>
+          </a:prstGeom>
+          <a:solidFill>
+            <a:schemeClr val="tx1"/>
+          </a:solidFill>
+        </p:spPr>
+        <p:txBody>
+          <a:bodyPr wrap="square">
+            <a:spAutoFit/>
+          </a:bodyPr>
+          <a:lstStyle/>
+          <a:p>
+            <a:r>
+              <a:rPr lang="pl-PL" dirty="0">
+                <a:solidFill>
+                  <a:srgbClr val="9CDCFE"/>
+                </a:solidFill>
+                <a:latin typeface="Consolas" panose="020B0609020204030204" pitchFamily="49" charset="0"/>
+              </a:rPr>
+              <a:t>localStorage</a:t>
+            </a:r>
+            <a:r>
+              <a:rPr lang="pl-PL" dirty="0">
+                <a:solidFill>
+                  <a:srgbClr val="D4D4D4"/>
+                </a:solidFill>
+                <a:latin typeface="Consolas" panose="020B0609020204030204" pitchFamily="49" charset="0"/>
+              </a:rPr>
+              <a:t>.</a:t>
+            </a:r>
+            <a:r>
+              <a:rPr lang="pl-PL" dirty="0">
+                <a:solidFill>
+                  <a:srgbClr val="DCDCAA"/>
+                </a:solidFill>
+                <a:latin typeface="Consolas" panose="020B0609020204030204" pitchFamily="49" charset="0"/>
+              </a:rPr>
+              <a:t>removeItem</a:t>
+            </a:r>
+            <a:r>
+              <a:rPr lang="pl-PL" dirty="0">
+                <a:solidFill>
+                  <a:srgbClr val="D4D4D4"/>
+                </a:solidFill>
+                <a:latin typeface="Consolas" panose="020B0609020204030204" pitchFamily="49" charset="0"/>
+              </a:rPr>
+              <a:t>(</a:t>
+            </a:r>
+            <a:r>
+              <a:rPr lang="pl-PL" dirty="0">
+                <a:solidFill>
+                  <a:srgbClr val="CE9178"/>
+                </a:solidFill>
+                <a:latin typeface="Consolas" panose="020B0609020204030204" pitchFamily="49" charset="0"/>
+              </a:rPr>
+              <a:t>'token'</a:t>
+            </a:r>
+            <a:r>
+              <a:rPr lang="pl-PL" dirty="0">
+                <a:solidFill>
+                  <a:srgbClr val="D4D4D4"/>
+                </a:solidFill>
+                <a:latin typeface="Consolas" panose="020B0609020204030204" pitchFamily="49" charset="0"/>
+              </a:rPr>
+              <a:t>);</a:t>
+            </a:r>
+            <a:endParaRPr lang="pl-PL" b="0" dirty="0">
+              <a:solidFill>
+                <a:srgbClr val="D4D4D4"/>
+              </a:solidFill>
+              <a:effectLst/>
+              <a:latin typeface="Consolas" panose="020B0609020204030204" pitchFamily="49" charset="0"/>
+            </a:endParaRPr>
           </a:p>
         </p:txBody>
       </p:sp>
     </p:spTree>
     <p:extLst>
       <p:ext uri="{BB962C8B-B14F-4D97-AF65-F5344CB8AC3E}">
-        <p14:creationId xmlns:p14="http://schemas.microsoft.com/office/powerpoint/2010/main" val="2902186921"/>
+        <p14:creationId xmlns:p14="http://schemas.microsoft.com/office/powerpoint/2010/main" val="258218015"/>
       </p:ext>
     </p:extLst>
   </p:cSld>
@@ -16742,7 +17177,7 @@
         <p:spPr>
           <a:xfrm>
             <a:off x="497840" y="538480"/>
-            <a:ext cx="1301062" cy="369332"/>
+            <a:ext cx="2507546" cy="369332"/>
           </a:xfrm>
           <a:prstGeom prst="rect">
             <a:avLst/>
@@ -16756,25 +17191,130 @@
           <a:lstStyle/>
           <a:p>
             <a:r>
-              <a:rPr lang="pl-PL" dirty="0" err="1"/>
-              <a:t>React</a:t>
-            </a:r>
-            <a:r>
               <a:rPr lang="pl-PL" dirty="0"/>
+              <a:t>React forms – Http client</a:t>
+            </a:r>
+          </a:p>
+        </p:txBody>
+      </p:sp>
+      <p:sp>
+        <p:nvSpPr>
+          <p:cNvPr id="2" name="Rectangle 1">
+            <a:extLst>
+              <a:ext uri="{FF2B5EF4-FFF2-40B4-BE49-F238E27FC236}">
+                <a16:creationId xmlns:a16="http://schemas.microsoft.com/office/drawing/2014/main" id="{467B2B72-D831-46C9-A1CD-C7F4D068F749}"/>
+              </a:ext>
+            </a:extLst>
+          </p:cNvPr>
+          <p:cNvSpPr>
+            <a:spLocks noChangeArrowheads="1"/>
+          </p:cNvSpPr>
+          <p:nvPr/>
+        </p:nvSpPr>
+        <p:spPr bwMode="auto">
+          <a:xfrm>
+            <a:off x="5082032" y="1879130"/>
+            <a:ext cx="2507546" cy="307777"/>
+          </a:xfrm>
+          <a:prstGeom prst="rect">
+            <a:avLst/>
+          </a:prstGeom>
+          <a:solidFill>
+            <a:srgbClr val="F6F8FA"/>
+          </a:solidFill>
+          <a:ln>
+            <a:noFill/>
+          </a:ln>
+          <a:effectLst/>
+          <a:extLst>
+            <a:ext uri="{91240B29-F687-4F45-9708-019B960494DF}">
+              <a14:hiddenLine xmlns:a14="http://schemas.microsoft.com/office/drawing/2010/main" w="9525">
+                <a:solidFill>
+                  <a:schemeClr val="tx1"/>
+                </a:solidFill>
+                <a:miter lim="800000"/>
+                <a:headEnd/>
+                <a:tailEnd/>
+              </a14:hiddenLine>
+            </a:ext>
+            <a:ext uri="{AF507438-7753-43E0-B8FC-AC1667EBCBE1}">
+              <a14:hiddenEffects xmlns:a14="http://schemas.microsoft.com/office/drawing/2010/main">
+                <a:effectLst>
+                  <a:outerShdw dist="35921" dir="2700000" algn="ctr" rotWithShape="0">
+                    <a:schemeClr val="bg2"/>
+                  </a:outerShdw>
+                </a:effectLst>
+              </a14:hiddenEffects>
+            </a:ext>
+          </a:extLst>
+        </p:spPr>
+        <p:txBody>
+          <a:bodyPr vert="horz" wrap="square" lIns="91440" tIns="0" rIns="91440" bIns="0" numCol="1" anchor="ctr" anchorCtr="0" compatLnSpc="1">
+            <a:prstTxWarp prst="textNoShape">
+              <a:avLst/>
+            </a:prstTxWarp>
+            <a:spAutoFit/>
+          </a:bodyPr>
+          <a:lstStyle/>
+          <a:p>
+            <a:pPr marL="0" marR="0" lvl="0" indent="0" algn="l" defTabSz="914400" rtl="0" eaLnBrk="0" fontAlgn="base" latinLnBrk="0" hangingPunct="0">
+              <a:lnSpc>
+                <a:spcPct val="100000"/>
+              </a:lnSpc>
+              <a:spcBef>
+                <a:spcPct val="0"/>
+              </a:spcBef>
+              <a:spcAft>
+                <a:spcPct val="0"/>
+              </a:spcAft>
+              <a:buClrTx/>
+              <a:buSzTx/>
+              <a:buFontTx/>
+              <a:buNone/>
+              <a:tabLst/>
+            </a:pPr>
+            <a:r>
+              <a:rPr kumimoji="0" lang="pl-PL" altLang="pl-PL" sz="2000" b="0" i="0" u="none" strike="noStrike" cap="none" normalizeH="0" baseline="0" dirty="0">
+                <a:ln>
+                  <a:noFill/>
+                </a:ln>
+                <a:solidFill>
+                  <a:srgbClr val="24292E"/>
+                </a:solidFill>
+                <a:effectLst/>
+                <a:latin typeface="SFMono-Regular"/>
+              </a:rPr>
+              <a:t>npm install axios</a:t>
+            </a:r>
+            <a:r>
+              <a:rPr kumimoji="0" lang="pl-PL" altLang="pl-PL" b="0" i="0" u="none" strike="noStrike" cap="none" normalizeH="0" baseline="0" dirty="0">
+                <a:ln>
+                  <a:noFill/>
+                </a:ln>
+                <a:solidFill>
+                  <a:schemeClr val="tx1"/>
+                </a:solidFill>
+                <a:effectLst/>
+              </a:rPr>
               <a:t> </a:t>
             </a:r>
-            <a:r>
-              <a:rPr lang="pl-PL" dirty="0" err="1"/>
-              <a:t>forms</a:t>
-            </a:r>
-            <a:endParaRPr lang="pl-PL" dirty="0"/>
+            <a:endParaRPr kumimoji="0" lang="pl-PL" altLang="pl-PL" sz="4800" b="0" i="0" u="none" strike="noStrike" cap="none" normalizeH="0" baseline="0" dirty="0">
+              <a:ln>
+                <a:noFill/>
+              </a:ln>
+              <a:solidFill>
+                <a:schemeClr val="tx1"/>
+              </a:solidFill>
+              <a:effectLst/>
+              <a:latin typeface="Arial" panose="020B0604020202020204" pitchFamily="34" charset="0"/>
+            </a:endParaRPr>
           </a:p>
         </p:txBody>
       </p:sp>
     </p:spTree>
     <p:extLst>
       <p:ext uri="{BB962C8B-B14F-4D97-AF65-F5344CB8AC3E}">
-        <p14:creationId xmlns:p14="http://schemas.microsoft.com/office/powerpoint/2010/main" val="258218015"/>
+        <p14:creationId xmlns:p14="http://schemas.microsoft.com/office/powerpoint/2010/main" val="2902186921"/>
       </p:ext>
     </p:extLst>
   </p:cSld>

</xml_diff>

<commit_message>
Exercise 16: HttpClient for account login
</commit_message>
<xml_diff>
--- a/tutorial/ReactjsTraining.pptx
+++ b/tutorial/ReactjsTraining.pptx
@@ -3701,6 +3701,30 @@
               <a:buFontTx/>
               <a:buNone/>
             </a:pPr>
+            <a:r>
+              <a:rPr lang="pl-PL" sz="1200" b="0" i="0" kern="1200" dirty="0">
+                <a:solidFill>
+                  <a:schemeClr val="tx1"/>
+                </a:solidFill>
+                <a:effectLst/>
+                <a:latin typeface="+mn-lt"/>
+                <a:ea typeface="+mn-ea"/>
+                <a:cs typeface="+mn-cs"/>
+              </a:rPr>
+              <a:t>Exercise 16: Odpytaj reqres api w momencie logowania użytkownika. </a:t>
+            </a:r>
+            <a:r>
+              <a:rPr lang="pl-PL" sz="1200" b="0" i="0" kern="1200">
+                <a:solidFill>
+                  <a:schemeClr val="tx1"/>
+                </a:solidFill>
+                <a:effectLst/>
+                <a:latin typeface="+mn-lt"/>
+                <a:ea typeface="+mn-ea"/>
+                <a:cs typeface="+mn-cs"/>
+              </a:rPr>
+              <a:t>Jak zaloguje to przypisz otrzymany token w przeciwnym wypadku wyswietl alert to zlym hasle lub email</a:t>
+            </a:r>
             <a:endParaRPr lang="pl-PL" sz="1200" b="0" i="0" kern="1200" dirty="0">
               <a:solidFill>
                 <a:schemeClr val="tx1"/>
@@ -17213,7 +17237,7 @@
         </p:nvSpPr>
         <p:spPr bwMode="auto">
           <a:xfrm>
-            <a:off x="5082032" y="1879130"/>
+            <a:off x="4541578" y="1028129"/>
             <a:ext cx="2507546" cy="307777"/>
           </a:xfrm>
           <a:prstGeom prst="rect">
@@ -17311,6 +17335,1105 @@
           </a:p>
         </p:txBody>
       </p:sp>
+      <p:sp>
+        <p:nvSpPr>
+          <p:cNvPr id="3" name="Rectangle 2">
+            <a:extLst>
+              <a:ext uri="{FF2B5EF4-FFF2-40B4-BE49-F238E27FC236}">
+                <a16:creationId xmlns:a16="http://schemas.microsoft.com/office/drawing/2014/main" id="{74F58EF7-2263-4A35-9669-975626A88BD1}"/>
+              </a:ext>
+            </a:extLst>
+          </p:cNvPr>
+          <p:cNvSpPr/>
+          <p:nvPr/>
+        </p:nvSpPr>
+        <p:spPr>
+          <a:xfrm>
+            <a:off x="1317868" y="2980336"/>
+            <a:ext cx="8954966" cy="1754326"/>
+          </a:xfrm>
+          <a:prstGeom prst="rect">
+            <a:avLst/>
+          </a:prstGeom>
+          <a:solidFill>
+            <a:schemeClr val="tx1"/>
+          </a:solidFill>
+        </p:spPr>
+        <p:txBody>
+          <a:bodyPr wrap="square">
+            <a:spAutoFit/>
+          </a:bodyPr>
+          <a:lstStyle/>
+          <a:p>
+            <a:r>
+              <a:rPr lang="pl-PL" dirty="0">
+                <a:solidFill>
+                  <a:srgbClr val="9CDCFE"/>
+                </a:solidFill>
+                <a:latin typeface="Consolas" panose="020B0609020204030204" pitchFamily="49" charset="0"/>
+              </a:rPr>
+              <a:t>axios</a:t>
+            </a:r>
+            <a:r>
+              <a:rPr lang="pl-PL" dirty="0">
+                <a:solidFill>
+                  <a:srgbClr val="D4D4D4"/>
+                </a:solidFill>
+                <a:latin typeface="Consolas" panose="020B0609020204030204" pitchFamily="49" charset="0"/>
+              </a:rPr>
+              <a:t>.</a:t>
+            </a:r>
+            <a:r>
+              <a:rPr lang="pl-PL" dirty="0">
+                <a:solidFill>
+                  <a:srgbClr val="DCDCAA"/>
+                </a:solidFill>
+                <a:latin typeface="Consolas" panose="020B0609020204030204" pitchFamily="49" charset="0"/>
+              </a:rPr>
+              <a:t>post</a:t>
+            </a:r>
+            <a:r>
+              <a:rPr lang="pl-PL" dirty="0">
+                <a:solidFill>
+                  <a:srgbClr val="D4D4D4"/>
+                </a:solidFill>
+                <a:latin typeface="Consolas" panose="020B0609020204030204" pitchFamily="49" charset="0"/>
+              </a:rPr>
+              <a:t>(</a:t>
+            </a:r>
+            <a:r>
+              <a:rPr lang="pl-PL" dirty="0">
+                <a:solidFill>
+                  <a:srgbClr val="CE9178"/>
+                </a:solidFill>
+                <a:latin typeface="Consolas" panose="020B0609020204030204" pitchFamily="49" charset="0"/>
+              </a:rPr>
+              <a:t>'/user'</a:t>
+            </a:r>
+            <a:r>
+              <a:rPr lang="pl-PL" dirty="0">
+                <a:solidFill>
+                  <a:srgbClr val="D4D4D4"/>
+                </a:solidFill>
+                <a:latin typeface="Consolas" panose="020B0609020204030204" pitchFamily="49" charset="0"/>
+              </a:rPr>
+              <a:t>, {</a:t>
+            </a:r>
+          </a:p>
+          <a:p>
+            <a:r>
+              <a:rPr lang="pl-PL" dirty="0">
+                <a:solidFill>
+                  <a:srgbClr val="D4D4D4"/>
+                </a:solidFill>
+                <a:latin typeface="Consolas" panose="020B0609020204030204" pitchFamily="49" charset="0"/>
+              </a:rPr>
+              <a:t>    </a:t>
+            </a:r>
+            <a:r>
+              <a:rPr lang="pl-PL" dirty="0">
+                <a:solidFill>
+                  <a:srgbClr val="9CDCFE"/>
+                </a:solidFill>
+                <a:latin typeface="Consolas" panose="020B0609020204030204" pitchFamily="49" charset="0"/>
+              </a:rPr>
+              <a:t>firstName:</a:t>
+            </a:r>
+            <a:r>
+              <a:rPr lang="pl-PL" dirty="0">
+                <a:solidFill>
+                  <a:srgbClr val="D4D4D4"/>
+                </a:solidFill>
+                <a:latin typeface="Consolas" panose="020B0609020204030204" pitchFamily="49" charset="0"/>
+              </a:rPr>
+              <a:t> </a:t>
+            </a:r>
+            <a:r>
+              <a:rPr lang="pl-PL" dirty="0">
+                <a:solidFill>
+                  <a:srgbClr val="CE9178"/>
+                </a:solidFill>
+                <a:latin typeface="Consolas" panose="020B0609020204030204" pitchFamily="49" charset="0"/>
+              </a:rPr>
+              <a:t>'Fred'</a:t>
+            </a:r>
+            <a:r>
+              <a:rPr lang="pl-PL" dirty="0">
+                <a:solidFill>
+                  <a:srgbClr val="D4D4D4"/>
+                </a:solidFill>
+                <a:latin typeface="Consolas" panose="020B0609020204030204" pitchFamily="49" charset="0"/>
+              </a:rPr>
+              <a:t>,</a:t>
+            </a:r>
+          </a:p>
+          <a:p>
+            <a:r>
+              <a:rPr lang="pl-PL" dirty="0">
+                <a:solidFill>
+                  <a:srgbClr val="D4D4D4"/>
+                </a:solidFill>
+                <a:latin typeface="Consolas" panose="020B0609020204030204" pitchFamily="49" charset="0"/>
+              </a:rPr>
+              <a:t>    </a:t>
+            </a:r>
+            <a:r>
+              <a:rPr lang="pl-PL" dirty="0">
+                <a:solidFill>
+                  <a:srgbClr val="9CDCFE"/>
+                </a:solidFill>
+                <a:latin typeface="Consolas" panose="020B0609020204030204" pitchFamily="49" charset="0"/>
+              </a:rPr>
+              <a:t>lastName:</a:t>
+            </a:r>
+            <a:r>
+              <a:rPr lang="pl-PL" dirty="0">
+                <a:solidFill>
+                  <a:srgbClr val="D4D4D4"/>
+                </a:solidFill>
+                <a:latin typeface="Consolas" panose="020B0609020204030204" pitchFamily="49" charset="0"/>
+              </a:rPr>
+              <a:t> </a:t>
+            </a:r>
+            <a:r>
+              <a:rPr lang="pl-PL" dirty="0">
+                <a:solidFill>
+                  <a:srgbClr val="CE9178"/>
+                </a:solidFill>
+                <a:latin typeface="Consolas" panose="020B0609020204030204" pitchFamily="49" charset="0"/>
+              </a:rPr>
+              <a:t>'Flintstone'</a:t>
+            </a:r>
+            <a:endParaRPr lang="pl-PL" dirty="0">
+              <a:solidFill>
+                <a:srgbClr val="D4D4D4"/>
+              </a:solidFill>
+              <a:latin typeface="Consolas" panose="020B0609020204030204" pitchFamily="49" charset="0"/>
+            </a:endParaRPr>
+          </a:p>
+          <a:p>
+            <a:r>
+              <a:rPr lang="pl-PL" dirty="0">
+                <a:solidFill>
+                  <a:srgbClr val="D4D4D4"/>
+                </a:solidFill>
+                <a:latin typeface="Consolas" panose="020B0609020204030204" pitchFamily="49" charset="0"/>
+              </a:rPr>
+              <a:t>  })</a:t>
+            </a:r>
+          </a:p>
+          <a:p>
+            <a:r>
+              <a:rPr lang="pl-PL" dirty="0">
+                <a:solidFill>
+                  <a:srgbClr val="D4D4D4"/>
+                </a:solidFill>
+                <a:latin typeface="Consolas" panose="020B0609020204030204" pitchFamily="49" charset="0"/>
+              </a:rPr>
+              <a:t>  .</a:t>
+            </a:r>
+            <a:r>
+              <a:rPr lang="pl-PL" dirty="0">
+                <a:solidFill>
+                  <a:srgbClr val="DCDCAA"/>
+                </a:solidFill>
+                <a:latin typeface="Consolas" panose="020B0609020204030204" pitchFamily="49" charset="0"/>
+              </a:rPr>
+              <a:t>then</a:t>
+            </a:r>
+            <a:r>
+              <a:rPr lang="pl-PL" dirty="0">
+                <a:solidFill>
+                  <a:srgbClr val="D4D4D4"/>
+                </a:solidFill>
+                <a:latin typeface="Consolas" panose="020B0609020204030204" pitchFamily="49" charset="0"/>
+              </a:rPr>
+              <a:t>(</a:t>
+            </a:r>
+            <a:r>
+              <a:rPr lang="pl-PL" dirty="0">
+                <a:solidFill>
+                  <a:srgbClr val="569CD6"/>
+                </a:solidFill>
+                <a:latin typeface="Consolas" panose="020B0609020204030204" pitchFamily="49" charset="0"/>
+              </a:rPr>
+              <a:t>function</a:t>
+            </a:r>
+            <a:r>
+              <a:rPr lang="pl-PL" dirty="0">
+                <a:solidFill>
+                  <a:srgbClr val="D4D4D4"/>
+                </a:solidFill>
+                <a:latin typeface="Consolas" panose="020B0609020204030204" pitchFamily="49" charset="0"/>
+              </a:rPr>
+              <a:t> (</a:t>
+            </a:r>
+            <a:r>
+              <a:rPr lang="pl-PL" dirty="0">
+                <a:solidFill>
+                  <a:srgbClr val="9CDCFE"/>
+                </a:solidFill>
+                <a:latin typeface="Consolas" panose="020B0609020204030204" pitchFamily="49" charset="0"/>
+              </a:rPr>
+              <a:t>response</a:t>
+            </a:r>
+            <a:r>
+              <a:rPr lang="pl-PL" dirty="0">
+                <a:solidFill>
+                  <a:srgbClr val="D4D4D4"/>
+                </a:solidFill>
+                <a:latin typeface="Consolas" panose="020B0609020204030204" pitchFamily="49" charset="0"/>
+              </a:rPr>
+              <a:t>) {</a:t>
+            </a:r>
+            <a:r>
+              <a:rPr lang="pl-PL" dirty="0">
+                <a:solidFill>
+                  <a:srgbClr val="4EC9B0"/>
+                </a:solidFill>
+                <a:latin typeface="Consolas" panose="020B0609020204030204" pitchFamily="49" charset="0"/>
+              </a:rPr>
+              <a:t>console</a:t>
+            </a:r>
+            <a:r>
+              <a:rPr lang="pl-PL" dirty="0">
+                <a:solidFill>
+                  <a:srgbClr val="D4D4D4"/>
+                </a:solidFill>
+                <a:latin typeface="Consolas" panose="020B0609020204030204" pitchFamily="49" charset="0"/>
+              </a:rPr>
+              <a:t>.</a:t>
+            </a:r>
+            <a:r>
+              <a:rPr lang="pl-PL" dirty="0">
+                <a:solidFill>
+                  <a:srgbClr val="DCDCAA"/>
+                </a:solidFill>
+                <a:latin typeface="Consolas" panose="020B0609020204030204" pitchFamily="49" charset="0"/>
+              </a:rPr>
+              <a:t>log</a:t>
+            </a:r>
+            <a:r>
+              <a:rPr lang="pl-PL" dirty="0">
+                <a:solidFill>
+                  <a:srgbClr val="D4D4D4"/>
+                </a:solidFill>
+                <a:latin typeface="Consolas" panose="020B0609020204030204" pitchFamily="49" charset="0"/>
+              </a:rPr>
+              <a:t>(</a:t>
+            </a:r>
+            <a:r>
+              <a:rPr lang="pl-PL" dirty="0">
+                <a:solidFill>
+                  <a:srgbClr val="9CDCFE"/>
+                </a:solidFill>
+                <a:latin typeface="Consolas" panose="020B0609020204030204" pitchFamily="49" charset="0"/>
+              </a:rPr>
+              <a:t>response</a:t>
+            </a:r>
+            <a:r>
+              <a:rPr lang="pl-PL" dirty="0">
+                <a:solidFill>
+                  <a:srgbClr val="D4D4D4"/>
+                </a:solidFill>
+                <a:latin typeface="Consolas" panose="020B0609020204030204" pitchFamily="49" charset="0"/>
+              </a:rPr>
+              <a:t>);})</a:t>
+            </a:r>
+          </a:p>
+          <a:p>
+            <a:r>
+              <a:rPr lang="pl-PL" dirty="0">
+                <a:solidFill>
+                  <a:srgbClr val="D4D4D4"/>
+                </a:solidFill>
+                <a:latin typeface="Consolas" panose="020B0609020204030204" pitchFamily="49" charset="0"/>
+              </a:rPr>
+              <a:t>  .</a:t>
+            </a:r>
+            <a:r>
+              <a:rPr lang="pl-PL" dirty="0">
+                <a:solidFill>
+                  <a:srgbClr val="DCDCAA"/>
+                </a:solidFill>
+                <a:latin typeface="Consolas" panose="020B0609020204030204" pitchFamily="49" charset="0"/>
+              </a:rPr>
+              <a:t>catch</a:t>
+            </a:r>
+            <a:r>
+              <a:rPr lang="pl-PL" dirty="0">
+                <a:solidFill>
+                  <a:srgbClr val="D4D4D4"/>
+                </a:solidFill>
+                <a:latin typeface="Consolas" panose="020B0609020204030204" pitchFamily="49" charset="0"/>
+              </a:rPr>
+              <a:t>(</a:t>
+            </a:r>
+            <a:r>
+              <a:rPr lang="pl-PL" dirty="0">
+                <a:solidFill>
+                  <a:srgbClr val="569CD6"/>
+                </a:solidFill>
+                <a:latin typeface="Consolas" panose="020B0609020204030204" pitchFamily="49" charset="0"/>
+              </a:rPr>
+              <a:t>function</a:t>
+            </a:r>
+            <a:r>
+              <a:rPr lang="pl-PL" dirty="0">
+                <a:solidFill>
+                  <a:srgbClr val="D4D4D4"/>
+                </a:solidFill>
+                <a:latin typeface="Consolas" panose="020B0609020204030204" pitchFamily="49" charset="0"/>
+              </a:rPr>
+              <a:t> (</a:t>
+            </a:r>
+            <a:r>
+              <a:rPr lang="pl-PL" dirty="0">
+                <a:solidFill>
+                  <a:srgbClr val="9CDCFE"/>
+                </a:solidFill>
+                <a:latin typeface="Consolas" panose="020B0609020204030204" pitchFamily="49" charset="0"/>
+              </a:rPr>
+              <a:t>error</a:t>
+            </a:r>
+            <a:r>
+              <a:rPr lang="pl-PL" dirty="0">
+                <a:solidFill>
+                  <a:srgbClr val="D4D4D4"/>
+                </a:solidFill>
+                <a:latin typeface="Consolas" panose="020B0609020204030204" pitchFamily="49" charset="0"/>
+              </a:rPr>
+              <a:t>) {</a:t>
+            </a:r>
+            <a:r>
+              <a:rPr lang="pl-PL" dirty="0">
+                <a:solidFill>
+                  <a:srgbClr val="4EC9B0"/>
+                </a:solidFill>
+                <a:latin typeface="Consolas" panose="020B0609020204030204" pitchFamily="49" charset="0"/>
+              </a:rPr>
+              <a:t>console</a:t>
+            </a:r>
+            <a:r>
+              <a:rPr lang="pl-PL" dirty="0">
+                <a:solidFill>
+                  <a:srgbClr val="D4D4D4"/>
+                </a:solidFill>
+                <a:latin typeface="Consolas" panose="020B0609020204030204" pitchFamily="49" charset="0"/>
+              </a:rPr>
+              <a:t>.</a:t>
+            </a:r>
+            <a:r>
+              <a:rPr lang="pl-PL" dirty="0">
+                <a:solidFill>
+                  <a:srgbClr val="DCDCAA"/>
+                </a:solidFill>
+                <a:latin typeface="Consolas" panose="020B0609020204030204" pitchFamily="49" charset="0"/>
+              </a:rPr>
+              <a:t>log</a:t>
+            </a:r>
+            <a:r>
+              <a:rPr lang="pl-PL" dirty="0">
+                <a:solidFill>
+                  <a:srgbClr val="D4D4D4"/>
+                </a:solidFill>
+                <a:latin typeface="Consolas" panose="020B0609020204030204" pitchFamily="49" charset="0"/>
+              </a:rPr>
+              <a:t>(</a:t>
+            </a:r>
+            <a:r>
+              <a:rPr lang="pl-PL" dirty="0">
+                <a:solidFill>
+                  <a:srgbClr val="9CDCFE"/>
+                </a:solidFill>
+                <a:latin typeface="Consolas" panose="020B0609020204030204" pitchFamily="49" charset="0"/>
+              </a:rPr>
+              <a:t>error</a:t>
+            </a:r>
+            <a:r>
+              <a:rPr lang="pl-PL" dirty="0">
+                <a:solidFill>
+                  <a:srgbClr val="D4D4D4"/>
+                </a:solidFill>
+                <a:latin typeface="Consolas" panose="020B0609020204030204" pitchFamily="49" charset="0"/>
+              </a:rPr>
+              <a:t>);});</a:t>
+            </a:r>
+            <a:endParaRPr lang="pl-PL" b="0" dirty="0">
+              <a:solidFill>
+                <a:srgbClr val="D4D4D4"/>
+              </a:solidFill>
+              <a:effectLst/>
+              <a:latin typeface="Consolas" panose="020B0609020204030204" pitchFamily="49" charset="0"/>
+            </a:endParaRPr>
+          </a:p>
+        </p:txBody>
+      </p:sp>
+      <p:sp>
+        <p:nvSpPr>
+          <p:cNvPr id="5" name="Rectangle 4">
+            <a:extLst>
+              <a:ext uri="{FF2B5EF4-FFF2-40B4-BE49-F238E27FC236}">
+                <a16:creationId xmlns:a16="http://schemas.microsoft.com/office/drawing/2014/main" id="{7FB721F0-8652-45DD-86F3-B9B561D705B6}"/>
+              </a:ext>
+            </a:extLst>
+          </p:cNvPr>
+          <p:cNvSpPr/>
+          <p:nvPr/>
+        </p:nvSpPr>
+        <p:spPr>
+          <a:xfrm>
+            <a:off x="1317868" y="1463085"/>
+            <a:ext cx="8954966" cy="1477328"/>
+          </a:xfrm>
+          <a:prstGeom prst="rect">
+            <a:avLst/>
+          </a:prstGeom>
+          <a:solidFill>
+            <a:schemeClr val="tx1"/>
+          </a:solidFill>
+        </p:spPr>
+        <p:txBody>
+          <a:bodyPr wrap="square">
+            <a:spAutoFit/>
+          </a:bodyPr>
+          <a:lstStyle/>
+          <a:p>
+            <a:r>
+              <a:rPr lang="pl-PL" dirty="0">
+                <a:solidFill>
+                  <a:srgbClr val="9CDCFE"/>
+                </a:solidFill>
+                <a:latin typeface="Consolas" panose="020B0609020204030204" pitchFamily="49" charset="0"/>
+              </a:rPr>
+              <a:t>axios</a:t>
+            </a:r>
+            <a:r>
+              <a:rPr lang="pl-PL" dirty="0">
+                <a:solidFill>
+                  <a:srgbClr val="D4D4D4"/>
+                </a:solidFill>
+                <a:latin typeface="Consolas" panose="020B0609020204030204" pitchFamily="49" charset="0"/>
+              </a:rPr>
+              <a:t>.</a:t>
+            </a:r>
+            <a:r>
+              <a:rPr lang="pl-PL" dirty="0">
+                <a:solidFill>
+                  <a:srgbClr val="DCDCAA"/>
+                </a:solidFill>
+                <a:latin typeface="Consolas" panose="020B0609020204030204" pitchFamily="49" charset="0"/>
+              </a:rPr>
+              <a:t>get</a:t>
+            </a:r>
+            <a:r>
+              <a:rPr lang="pl-PL" dirty="0">
+                <a:solidFill>
+                  <a:srgbClr val="D4D4D4"/>
+                </a:solidFill>
+                <a:latin typeface="Consolas" panose="020B0609020204030204" pitchFamily="49" charset="0"/>
+              </a:rPr>
+              <a:t>(</a:t>
+            </a:r>
+            <a:r>
+              <a:rPr lang="pl-PL" dirty="0">
+                <a:solidFill>
+                  <a:srgbClr val="CE9178"/>
+                </a:solidFill>
+                <a:latin typeface="Consolas" panose="020B0609020204030204" pitchFamily="49" charset="0"/>
+              </a:rPr>
+              <a:t>'/user'</a:t>
+            </a:r>
+            <a:r>
+              <a:rPr lang="pl-PL" dirty="0">
+                <a:solidFill>
+                  <a:srgbClr val="D4D4D4"/>
+                </a:solidFill>
+                <a:latin typeface="Consolas" panose="020B0609020204030204" pitchFamily="49" charset="0"/>
+              </a:rPr>
+              <a:t>, {</a:t>
+            </a:r>
+          </a:p>
+          <a:p>
+            <a:r>
+              <a:rPr lang="pl-PL" dirty="0">
+                <a:solidFill>
+                  <a:srgbClr val="D4D4D4"/>
+                </a:solidFill>
+                <a:latin typeface="Consolas" panose="020B0609020204030204" pitchFamily="49" charset="0"/>
+              </a:rPr>
+              <a:t>    </a:t>
+            </a:r>
+            <a:r>
+              <a:rPr lang="pl-PL" dirty="0">
+                <a:solidFill>
+                  <a:srgbClr val="9CDCFE"/>
+                </a:solidFill>
+                <a:latin typeface="Consolas" panose="020B0609020204030204" pitchFamily="49" charset="0"/>
+              </a:rPr>
+              <a:t>params:</a:t>
+            </a:r>
+            <a:r>
+              <a:rPr lang="pl-PL" dirty="0">
+                <a:solidFill>
+                  <a:srgbClr val="D4D4D4"/>
+                </a:solidFill>
+                <a:latin typeface="Consolas" panose="020B0609020204030204" pitchFamily="49" charset="0"/>
+              </a:rPr>
+              <a:t> {</a:t>
+            </a:r>
+            <a:r>
+              <a:rPr lang="pl-PL" dirty="0">
+                <a:solidFill>
+                  <a:srgbClr val="9CDCFE"/>
+                </a:solidFill>
+                <a:latin typeface="Consolas" panose="020B0609020204030204" pitchFamily="49" charset="0"/>
+              </a:rPr>
+              <a:t>ID:</a:t>
+            </a:r>
+            <a:r>
+              <a:rPr lang="pl-PL" dirty="0">
+                <a:solidFill>
+                  <a:srgbClr val="D4D4D4"/>
+                </a:solidFill>
+                <a:latin typeface="Consolas" panose="020B0609020204030204" pitchFamily="49" charset="0"/>
+              </a:rPr>
+              <a:t> </a:t>
+            </a:r>
+            <a:r>
+              <a:rPr lang="pl-PL" dirty="0">
+                <a:solidFill>
+                  <a:srgbClr val="B5CEA8"/>
+                </a:solidFill>
+                <a:latin typeface="Consolas" panose="020B0609020204030204" pitchFamily="49" charset="0"/>
+              </a:rPr>
+              <a:t>12345</a:t>
+            </a:r>
+            <a:r>
+              <a:rPr lang="pl-PL" dirty="0">
+                <a:solidFill>
+                  <a:srgbClr val="D4D4D4"/>
+                </a:solidFill>
+                <a:latin typeface="Consolas" panose="020B0609020204030204" pitchFamily="49" charset="0"/>
+              </a:rPr>
+              <a:t>}</a:t>
+            </a:r>
+          </a:p>
+          <a:p>
+            <a:r>
+              <a:rPr lang="pl-PL" dirty="0">
+                <a:solidFill>
+                  <a:srgbClr val="D4D4D4"/>
+                </a:solidFill>
+                <a:latin typeface="Consolas" panose="020B0609020204030204" pitchFamily="49" charset="0"/>
+              </a:rPr>
+              <a:t>  }).</a:t>
+            </a:r>
+            <a:r>
+              <a:rPr lang="pl-PL" dirty="0">
+                <a:solidFill>
+                  <a:srgbClr val="DCDCAA"/>
+                </a:solidFill>
+                <a:latin typeface="Consolas" panose="020B0609020204030204" pitchFamily="49" charset="0"/>
+              </a:rPr>
+              <a:t>then</a:t>
+            </a:r>
+            <a:r>
+              <a:rPr lang="pl-PL" dirty="0">
+                <a:solidFill>
+                  <a:srgbClr val="D4D4D4"/>
+                </a:solidFill>
+                <a:latin typeface="Consolas" panose="020B0609020204030204" pitchFamily="49" charset="0"/>
+              </a:rPr>
+              <a:t>(</a:t>
+            </a:r>
+            <a:r>
+              <a:rPr lang="pl-PL" dirty="0">
+                <a:solidFill>
+                  <a:srgbClr val="569CD6"/>
+                </a:solidFill>
+                <a:latin typeface="Consolas" panose="020B0609020204030204" pitchFamily="49" charset="0"/>
+              </a:rPr>
+              <a:t>function</a:t>
+            </a:r>
+            <a:r>
+              <a:rPr lang="pl-PL" dirty="0">
+                <a:solidFill>
+                  <a:srgbClr val="D4D4D4"/>
+                </a:solidFill>
+                <a:latin typeface="Consolas" panose="020B0609020204030204" pitchFamily="49" charset="0"/>
+              </a:rPr>
+              <a:t> (</a:t>
+            </a:r>
+            <a:r>
+              <a:rPr lang="pl-PL" dirty="0">
+                <a:solidFill>
+                  <a:srgbClr val="9CDCFE"/>
+                </a:solidFill>
+                <a:latin typeface="Consolas" panose="020B0609020204030204" pitchFamily="49" charset="0"/>
+              </a:rPr>
+              <a:t>response</a:t>
+            </a:r>
+            <a:r>
+              <a:rPr lang="pl-PL" dirty="0">
+                <a:solidFill>
+                  <a:srgbClr val="D4D4D4"/>
+                </a:solidFill>
+                <a:latin typeface="Consolas" panose="020B0609020204030204" pitchFamily="49" charset="0"/>
+              </a:rPr>
+              <a:t>) {</a:t>
+            </a:r>
+            <a:r>
+              <a:rPr lang="pl-PL" dirty="0">
+                <a:solidFill>
+                  <a:srgbClr val="4EC9B0"/>
+                </a:solidFill>
+                <a:latin typeface="Consolas" panose="020B0609020204030204" pitchFamily="49" charset="0"/>
+              </a:rPr>
+              <a:t>console</a:t>
+            </a:r>
+            <a:r>
+              <a:rPr lang="pl-PL" dirty="0">
+                <a:solidFill>
+                  <a:srgbClr val="D4D4D4"/>
+                </a:solidFill>
+                <a:latin typeface="Consolas" panose="020B0609020204030204" pitchFamily="49" charset="0"/>
+              </a:rPr>
+              <a:t>.</a:t>
+            </a:r>
+            <a:r>
+              <a:rPr lang="pl-PL" dirty="0">
+                <a:solidFill>
+                  <a:srgbClr val="DCDCAA"/>
+                </a:solidFill>
+                <a:latin typeface="Consolas" panose="020B0609020204030204" pitchFamily="49" charset="0"/>
+              </a:rPr>
+              <a:t>log</a:t>
+            </a:r>
+            <a:r>
+              <a:rPr lang="pl-PL" dirty="0">
+                <a:solidFill>
+                  <a:srgbClr val="D4D4D4"/>
+                </a:solidFill>
+                <a:latin typeface="Consolas" panose="020B0609020204030204" pitchFamily="49" charset="0"/>
+              </a:rPr>
+              <a:t>(</a:t>
+            </a:r>
+            <a:r>
+              <a:rPr lang="pl-PL" dirty="0">
+                <a:solidFill>
+                  <a:srgbClr val="9CDCFE"/>
+                </a:solidFill>
+                <a:latin typeface="Consolas" panose="020B0609020204030204" pitchFamily="49" charset="0"/>
+              </a:rPr>
+              <a:t>response</a:t>
+            </a:r>
+            <a:r>
+              <a:rPr lang="pl-PL" dirty="0">
+                <a:solidFill>
+                  <a:srgbClr val="D4D4D4"/>
+                </a:solidFill>
+                <a:latin typeface="Consolas" panose="020B0609020204030204" pitchFamily="49" charset="0"/>
+              </a:rPr>
+              <a:t>);})</a:t>
+            </a:r>
+          </a:p>
+          <a:p>
+            <a:r>
+              <a:rPr lang="pl-PL" dirty="0">
+                <a:solidFill>
+                  <a:srgbClr val="D4D4D4"/>
+                </a:solidFill>
+                <a:latin typeface="Consolas" panose="020B0609020204030204" pitchFamily="49" charset="0"/>
+              </a:rPr>
+              <a:t>    .</a:t>
+            </a:r>
+            <a:r>
+              <a:rPr lang="pl-PL" dirty="0">
+                <a:solidFill>
+                  <a:srgbClr val="DCDCAA"/>
+                </a:solidFill>
+                <a:latin typeface="Consolas" panose="020B0609020204030204" pitchFamily="49" charset="0"/>
+              </a:rPr>
+              <a:t>catch</a:t>
+            </a:r>
+            <a:r>
+              <a:rPr lang="pl-PL" dirty="0">
+                <a:solidFill>
+                  <a:srgbClr val="D4D4D4"/>
+                </a:solidFill>
+                <a:latin typeface="Consolas" panose="020B0609020204030204" pitchFamily="49" charset="0"/>
+              </a:rPr>
+              <a:t>(</a:t>
+            </a:r>
+            <a:r>
+              <a:rPr lang="pl-PL" dirty="0">
+                <a:solidFill>
+                  <a:srgbClr val="569CD6"/>
+                </a:solidFill>
+                <a:latin typeface="Consolas" panose="020B0609020204030204" pitchFamily="49" charset="0"/>
+              </a:rPr>
+              <a:t>function</a:t>
+            </a:r>
+            <a:r>
+              <a:rPr lang="pl-PL" dirty="0">
+                <a:solidFill>
+                  <a:srgbClr val="D4D4D4"/>
+                </a:solidFill>
+                <a:latin typeface="Consolas" panose="020B0609020204030204" pitchFamily="49" charset="0"/>
+              </a:rPr>
+              <a:t> (</a:t>
+            </a:r>
+            <a:r>
+              <a:rPr lang="pl-PL" dirty="0">
+                <a:solidFill>
+                  <a:srgbClr val="9CDCFE"/>
+                </a:solidFill>
+                <a:latin typeface="Consolas" panose="020B0609020204030204" pitchFamily="49" charset="0"/>
+              </a:rPr>
+              <a:t>error</a:t>
+            </a:r>
+            <a:r>
+              <a:rPr lang="pl-PL" dirty="0">
+                <a:solidFill>
+                  <a:srgbClr val="D4D4D4"/>
+                </a:solidFill>
+                <a:latin typeface="Consolas" panose="020B0609020204030204" pitchFamily="49" charset="0"/>
+              </a:rPr>
+              <a:t>) {</a:t>
+            </a:r>
+            <a:r>
+              <a:rPr lang="pl-PL" dirty="0">
+                <a:solidFill>
+                  <a:srgbClr val="4EC9B0"/>
+                </a:solidFill>
+                <a:latin typeface="Consolas" panose="020B0609020204030204" pitchFamily="49" charset="0"/>
+              </a:rPr>
+              <a:t>console</a:t>
+            </a:r>
+            <a:r>
+              <a:rPr lang="pl-PL" dirty="0">
+                <a:solidFill>
+                  <a:srgbClr val="D4D4D4"/>
+                </a:solidFill>
+                <a:latin typeface="Consolas" panose="020B0609020204030204" pitchFamily="49" charset="0"/>
+              </a:rPr>
+              <a:t>.</a:t>
+            </a:r>
+            <a:r>
+              <a:rPr lang="pl-PL" dirty="0">
+                <a:solidFill>
+                  <a:srgbClr val="DCDCAA"/>
+                </a:solidFill>
+                <a:latin typeface="Consolas" panose="020B0609020204030204" pitchFamily="49" charset="0"/>
+              </a:rPr>
+              <a:t>log</a:t>
+            </a:r>
+            <a:r>
+              <a:rPr lang="pl-PL" dirty="0">
+                <a:solidFill>
+                  <a:srgbClr val="D4D4D4"/>
+                </a:solidFill>
+                <a:latin typeface="Consolas" panose="020B0609020204030204" pitchFamily="49" charset="0"/>
+              </a:rPr>
+              <a:t>(</a:t>
+            </a:r>
+            <a:r>
+              <a:rPr lang="pl-PL" dirty="0">
+                <a:solidFill>
+                  <a:srgbClr val="9CDCFE"/>
+                </a:solidFill>
+                <a:latin typeface="Consolas" panose="020B0609020204030204" pitchFamily="49" charset="0"/>
+              </a:rPr>
+              <a:t>error</a:t>
+            </a:r>
+            <a:r>
+              <a:rPr lang="pl-PL" dirty="0">
+                <a:solidFill>
+                  <a:srgbClr val="D4D4D4"/>
+                </a:solidFill>
+                <a:latin typeface="Consolas" panose="020B0609020204030204" pitchFamily="49" charset="0"/>
+              </a:rPr>
+              <a:t>);})</a:t>
+            </a:r>
+          </a:p>
+          <a:p>
+            <a:r>
+              <a:rPr lang="pl-PL" dirty="0">
+                <a:solidFill>
+                  <a:srgbClr val="D4D4D4"/>
+                </a:solidFill>
+                <a:latin typeface="Consolas" panose="020B0609020204030204" pitchFamily="49" charset="0"/>
+              </a:rPr>
+              <a:t>  .</a:t>
+            </a:r>
+            <a:r>
+              <a:rPr lang="pl-PL" dirty="0">
+                <a:solidFill>
+                  <a:srgbClr val="DCDCAA"/>
+                </a:solidFill>
+                <a:latin typeface="Consolas" panose="020B0609020204030204" pitchFamily="49" charset="0"/>
+              </a:rPr>
+              <a:t>finally</a:t>
+            </a:r>
+            <a:r>
+              <a:rPr lang="pl-PL" dirty="0">
+                <a:solidFill>
+                  <a:srgbClr val="D4D4D4"/>
+                </a:solidFill>
+                <a:latin typeface="Consolas" panose="020B0609020204030204" pitchFamily="49" charset="0"/>
+              </a:rPr>
+              <a:t>(</a:t>
+            </a:r>
+            <a:r>
+              <a:rPr lang="pl-PL" dirty="0">
+                <a:solidFill>
+                  <a:srgbClr val="569CD6"/>
+                </a:solidFill>
+                <a:latin typeface="Consolas" panose="020B0609020204030204" pitchFamily="49" charset="0"/>
+              </a:rPr>
+              <a:t>function</a:t>
+            </a:r>
+            <a:r>
+              <a:rPr lang="pl-PL" dirty="0">
+                <a:solidFill>
+                  <a:srgbClr val="D4D4D4"/>
+                </a:solidFill>
+                <a:latin typeface="Consolas" panose="020B0609020204030204" pitchFamily="49" charset="0"/>
+              </a:rPr>
+              <a:t> () {});  </a:t>
+            </a:r>
+            <a:endParaRPr lang="pl-PL" b="0" dirty="0">
+              <a:solidFill>
+                <a:srgbClr val="D4D4D4"/>
+              </a:solidFill>
+              <a:effectLst/>
+              <a:latin typeface="Consolas" panose="020B0609020204030204" pitchFamily="49" charset="0"/>
+            </a:endParaRPr>
+          </a:p>
+        </p:txBody>
+      </p:sp>
+      <p:sp>
+        <p:nvSpPr>
+          <p:cNvPr id="6" name="Rectangle 5">
+            <a:extLst>
+              <a:ext uri="{FF2B5EF4-FFF2-40B4-BE49-F238E27FC236}">
+                <a16:creationId xmlns:a16="http://schemas.microsoft.com/office/drawing/2014/main" id="{06DB71F8-53C9-4340-8721-4089B7E2C614}"/>
+              </a:ext>
+            </a:extLst>
+          </p:cNvPr>
+          <p:cNvSpPr/>
+          <p:nvPr/>
+        </p:nvSpPr>
+        <p:spPr>
+          <a:xfrm>
+            <a:off x="1317868" y="4804539"/>
+            <a:ext cx="8954966" cy="369332"/>
+          </a:xfrm>
+          <a:prstGeom prst="rect">
+            <a:avLst/>
+          </a:prstGeom>
+          <a:solidFill>
+            <a:schemeClr val="tx1"/>
+          </a:solidFill>
+        </p:spPr>
+        <p:txBody>
+          <a:bodyPr wrap="square">
+            <a:spAutoFit/>
+          </a:bodyPr>
+          <a:lstStyle/>
+          <a:p>
+            <a:r>
+              <a:rPr lang="pl-PL" dirty="0">
+                <a:solidFill>
+                  <a:srgbClr val="569CD6"/>
+                </a:solidFill>
+                <a:latin typeface="Consolas" panose="020B0609020204030204" pitchFamily="49" charset="0"/>
+              </a:rPr>
+              <a:t>const</a:t>
+            </a:r>
+            <a:r>
+              <a:rPr lang="pl-PL" dirty="0">
+                <a:solidFill>
+                  <a:srgbClr val="D4D4D4"/>
+                </a:solidFill>
+                <a:latin typeface="Consolas" panose="020B0609020204030204" pitchFamily="49" charset="0"/>
+              </a:rPr>
+              <a:t> </a:t>
+            </a:r>
+            <a:r>
+              <a:rPr lang="pl-PL" dirty="0">
+                <a:solidFill>
+                  <a:srgbClr val="9CDCFE"/>
+                </a:solidFill>
+                <a:latin typeface="Consolas" panose="020B0609020204030204" pitchFamily="49" charset="0"/>
+              </a:rPr>
+              <a:t>response</a:t>
+            </a:r>
+            <a:r>
+              <a:rPr lang="pl-PL" dirty="0">
+                <a:solidFill>
+                  <a:srgbClr val="D4D4D4"/>
+                </a:solidFill>
+                <a:latin typeface="Consolas" panose="020B0609020204030204" pitchFamily="49" charset="0"/>
+              </a:rPr>
+              <a:t> = </a:t>
+            </a:r>
+            <a:r>
+              <a:rPr lang="pl-PL" dirty="0">
+                <a:solidFill>
+                  <a:srgbClr val="C586C0"/>
+                </a:solidFill>
+                <a:latin typeface="Consolas" panose="020B0609020204030204" pitchFamily="49" charset="0"/>
+              </a:rPr>
+              <a:t>await</a:t>
+            </a:r>
+            <a:r>
+              <a:rPr lang="pl-PL" dirty="0">
+                <a:solidFill>
+                  <a:srgbClr val="D4D4D4"/>
+                </a:solidFill>
+                <a:latin typeface="Consolas" panose="020B0609020204030204" pitchFamily="49" charset="0"/>
+              </a:rPr>
+              <a:t> </a:t>
+            </a:r>
+            <a:r>
+              <a:rPr lang="pl-PL" dirty="0">
+                <a:solidFill>
+                  <a:srgbClr val="9CDCFE"/>
+                </a:solidFill>
+                <a:latin typeface="Consolas" panose="020B0609020204030204" pitchFamily="49" charset="0"/>
+              </a:rPr>
+              <a:t>axios</a:t>
+            </a:r>
+            <a:r>
+              <a:rPr lang="pl-PL" dirty="0">
+                <a:solidFill>
+                  <a:srgbClr val="D4D4D4"/>
+                </a:solidFill>
+                <a:latin typeface="Consolas" panose="020B0609020204030204" pitchFamily="49" charset="0"/>
+              </a:rPr>
+              <a:t>.</a:t>
+            </a:r>
+            <a:r>
+              <a:rPr lang="pl-PL" dirty="0">
+                <a:solidFill>
+                  <a:srgbClr val="DCDCAA"/>
+                </a:solidFill>
+                <a:latin typeface="Consolas" panose="020B0609020204030204" pitchFamily="49" charset="0"/>
+              </a:rPr>
+              <a:t>get</a:t>
+            </a:r>
+            <a:r>
+              <a:rPr lang="pl-PL" dirty="0">
+                <a:solidFill>
+                  <a:srgbClr val="D4D4D4"/>
+                </a:solidFill>
+                <a:latin typeface="Consolas" panose="020B0609020204030204" pitchFamily="49" charset="0"/>
+              </a:rPr>
+              <a:t>(</a:t>
+            </a:r>
+            <a:r>
+              <a:rPr lang="pl-PL" dirty="0">
+                <a:solidFill>
+                  <a:srgbClr val="CE9178"/>
+                </a:solidFill>
+                <a:latin typeface="Consolas" panose="020B0609020204030204" pitchFamily="49" charset="0"/>
+              </a:rPr>
+              <a:t>'/user?ID=12345'</a:t>
+            </a:r>
+            <a:r>
+              <a:rPr lang="pl-PL" dirty="0">
+                <a:solidFill>
+                  <a:srgbClr val="D4D4D4"/>
+                </a:solidFill>
+                <a:latin typeface="Consolas" panose="020B0609020204030204" pitchFamily="49" charset="0"/>
+              </a:rPr>
+              <a:t>);</a:t>
+            </a:r>
+            <a:endParaRPr lang="pl-PL" b="0" dirty="0">
+              <a:solidFill>
+                <a:srgbClr val="D4D4D4"/>
+              </a:solidFill>
+              <a:effectLst/>
+              <a:latin typeface="Consolas" panose="020B0609020204030204" pitchFamily="49" charset="0"/>
+            </a:endParaRPr>
+          </a:p>
+        </p:txBody>
+      </p:sp>
+      <p:sp>
+        <p:nvSpPr>
+          <p:cNvPr id="7" name="Rectangle 6">
+            <a:extLst>
+              <a:ext uri="{FF2B5EF4-FFF2-40B4-BE49-F238E27FC236}">
+                <a16:creationId xmlns:a16="http://schemas.microsoft.com/office/drawing/2014/main" id="{F36B75CF-6BC2-4D79-B7E5-C15E3124B02C}"/>
+              </a:ext>
+            </a:extLst>
+          </p:cNvPr>
+          <p:cNvSpPr/>
+          <p:nvPr/>
+        </p:nvSpPr>
+        <p:spPr>
+          <a:xfrm>
+            <a:off x="1178989" y="5982412"/>
+            <a:ext cx="1826397" cy="369332"/>
+          </a:xfrm>
+          <a:prstGeom prst="rect">
+            <a:avLst/>
+          </a:prstGeom>
+        </p:spPr>
+        <p:txBody>
+          <a:bodyPr wrap="none">
+            <a:spAutoFit/>
+          </a:bodyPr>
+          <a:lstStyle/>
+          <a:p>
+            <a:r>
+              <a:rPr lang="pl-PL" dirty="0">
+                <a:hlinkClick r:id="rId3">
+                  <a:extLst>
+                    <a:ext uri="{A12FA001-AC4F-418D-AE19-62706E023703}">
+                      <ahyp:hlinkClr xmlns:ahyp="http://schemas.microsoft.com/office/drawing/2018/hyperlinkcolor" val="tx"/>
+                    </a:ext>
+                  </a:extLst>
+                </a:hlinkClick>
+              </a:rPr>
+              <a:t>https://reqres.in/</a:t>
+            </a:r>
+            <a:endParaRPr lang="en-GB" dirty="0"/>
+          </a:p>
+        </p:txBody>
+      </p:sp>
+      <p:pic>
+        <p:nvPicPr>
+          <p:cNvPr id="8" name="Picture 7">
+            <a:extLst>
+              <a:ext uri="{FF2B5EF4-FFF2-40B4-BE49-F238E27FC236}">
+                <a16:creationId xmlns:a16="http://schemas.microsoft.com/office/drawing/2014/main" id="{27B635DE-2B1A-4771-BF60-74E109C83565}"/>
+              </a:ext>
+            </a:extLst>
+          </p:cNvPr>
+          <p:cNvPicPr>
+            <a:picLocks noChangeAspect="1"/>
+          </p:cNvPicPr>
+          <p:nvPr/>
+        </p:nvPicPr>
+        <p:blipFill>
+          <a:blip r:embed="rId4"/>
+          <a:stretch>
+            <a:fillRect/>
+          </a:stretch>
+        </p:blipFill>
+        <p:spPr>
+          <a:xfrm>
+            <a:off x="3239643" y="5362575"/>
+            <a:ext cx="4591050" cy="1495425"/>
+          </a:xfrm>
+          <a:prstGeom prst="rect">
+            <a:avLst/>
+          </a:prstGeom>
+        </p:spPr>
+      </p:pic>
     </p:spTree>
     <p:extLst>
       <p:ext uri="{BB962C8B-B14F-4D97-AF65-F5344CB8AC3E}">

</xml_diff>

<commit_message>
Exercise 17: nested routing + params
</commit_message>
<xml_diff>
--- a/tutorial/ReactjsTraining.pptx
+++ b/tutorial/ReactjsTraining.pptx
@@ -3905,15 +3905,18 @@
               <a:buFontTx/>
               <a:buNone/>
             </a:pPr>
-            <a:endParaRPr lang="pl-PL" sz="1200" b="0" i="0" kern="1200" dirty="0">
-              <a:solidFill>
-                <a:schemeClr val="tx1"/>
-              </a:solidFill>
-              <a:effectLst/>
-              <a:latin typeface="+mn-lt"/>
-              <a:ea typeface="+mn-ea"/>
-              <a:cs typeface="+mn-cs"/>
-            </a:endParaRPr>
+            <a:r>
+              <a:rPr lang="pl-PL" sz="1200" b="0" i="0" kern="1200" dirty="0">
+                <a:solidFill>
+                  <a:schemeClr val="tx1"/>
+                </a:solidFill>
+                <a:effectLst/>
+                <a:latin typeface="+mn-lt"/>
+                <a:ea typeface="+mn-ea"/>
+                <a:cs typeface="+mn-cs"/>
+              </a:rPr>
+              <a:t>Exercise 17: Dodać komponent details który będzie childem dla help. Dodatkowo do help przekazać id, które wyświetlimy na górze (w zależności od url będzie inne id)</a:t>
+            </a:r>
           </a:p>
         </p:txBody>
       </p:sp>
@@ -18634,7 +18637,7 @@
         <p:spPr>
           <a:xfrm>
             <a:off x="497840" y="538480"/>
-            <a:ext cx="1301062" cy="369332"/>
+            <a:ext cx="3414076" cy="369332"/>
           </a:xfrm>
           <a:prstGeom prst="rect">
             <a:avLst/>
@@ -18648,18 +18651,1249 @@
           <a:lstStyle/>
           <a:p>
             <a:r>
-              <a:rPr lang="pl-PL" dirty="0" err="1"/>
-              <a:t>React</a:t>
-            </a:r>
-            <a:r>
               <a:rPr lang="pl-PL" dirty="0"/>
-              <a:t> </a:t>
-            </a:r>
-            <a:r>
-              <a:rPr lang="pl-PL" dirty="0" err="1"/>
-              <a:t>forms</a:t>
-            </a:r>
-            <a:endParaRPr lang="pl-PL" dirty="0"/>
+              <a:t>Routing – nested routing + params</a:t>
+            </a:r>
+          </a:p>
+        </p:txBody>
+      </p:sp>
+      <p:sp>
+        <p:nvSpPr>
+          <p:cNvPr id="2" name="Rectangle 1">
+            <a:extLst>
+              <a:ext uri="{FF2B5EF4-FFF2-40B4-BE49-F238E27FC236}">
+                <a16:creationId xmlns:a16="http://schemas.microsoft.com/office/drawing/2014/main" id="{CCFCDB0A-526E-464D-A9E7-B4F88932195C}"/>
+              </a:ext>
+            </a:extLst>
+          </p:cNvPr>
+          <p:cNvSpPr/>
+          <p:nvPr/>
+        </p:nvSpPr>
+        <p:spPr>
+          <a:xfrm>
+            <a:off x="1264811" y="1233733"/>
+            <a:ext cx="7023076" cy="369332"/>
+          </a:xfrm>
+          <a:prstGeom prst="rect">
+            <a:avLst/>
+          </a:prstGeom>
+          <a:solidFill>
+            <a:schemeClr val="tx1"/>
+          </a:solidFill>
+        </p:spPr>
+        <p:txBody>
+          <a:bodyPr wrap="none">
+            <a:spAutoFit/>
+          </a:bodyPr>
+          <a:lstStyle/>
+          <a:p>
+            <a:r>
+              <a:rPr lang="en-US" dirty="0">
+                <a:solidFill>
+                  <a:srgbClr val="808080"/>
+                </a:solidFill>
+                <a:latin typeface="Consolas" panose="020B0609020204030204" pitchFamily="49" charset="0"/>
+              </a:rPr>
+              <a:t>&lt;</a:t>
+            </a:r>
+            <a:r>
+              <a:rPr lang="en-US" dirty="0">
+                <a:solidFill>
+                  <a:srgbClr val="4EC9B0"/>
+                </a:solidFill>
+                <a:latin typeface="Consolas" panose="020B0609020204030204" pitchFamily="49" charset="0"/>
+              </a:rPr>
+              <a:t>Route</a:t>
+            </a:r>
+            <a:r>
+              <a:rPr lang="en-US" dirty="0">
+                <a:solidFill>
+                  <a:srgbClr val="D4D4D4"/>
+                </a:solidFill>
+                <a:latin typeface="Consolas" panose="020B0609020204030204" pitchFamily="49" charset="0"/>
+              </a:rPr>
+              <a:t> </a:t>
+            </a:r>
+            <a:r>
+              <a:rPr lang="en-US" dirty="0">
+                <a:solidFill>
+                  <a:srgbClr val="9CDCFE"/>
+                </a:solidFill>
+                <a:latin typeface="Consolas" panose="020B0609020204030204" pitchFamily="49" charset="0"/>
+              </a:rPr>
+              <a:t>path</a:t>
+            </a:r>
+            <a:r>
+              <a:rPr lang="en-US" dirty="0">
+                <a:solidFill>
+                  <a:srgbClr val="D4D4D4"/>
+                </a:solidFill>
+                <a:latin typeface="Consolas" panose="020B0609020204030204" pitchFamily="49" charset="0"/>
+              </a:rPr>
+              <a:t>=</a:t>
+            </a:r>
+            <a:r>
+              <a:rPr lang="en-US" dirty="0">
+                <a:solidFill>
+                  <a:srgbClr val="CE9178"/>
+                </a:solidFill>
+                <a:latin typeface="Consolas" panose="020B0609020204030204" pitchFamily="49" charset="0"/>
+              </a:rPr>
+              <a:t>"/</a:t>
+            </a:r>
+            <a:r>
+              <a:rPr lang="pl-PL" dirty="0">
+                <a:solidFill>
+                  <a:srgbClr val="CE9178"/>
+                </a:solidFill>
+                <a:latin typeface="Consolas" panose="020B0609020204030204" pitchFamily="49" charset="0"/>
+              </a:rPr>
+              <a:t>some</a:t>
+            </a:r>
+            <a:r>
+              <a:rPr lang="en-US" dirty="0">
+                <a:solidFill>
+                  <a:srgbClr val="CE9178"/>
+                </a:solidFill>
+                <a:latin typeface="Consolas" panose="020B0609020204030204" pitchFamily="49" charset="0"/>
+              </a:rPr>
+              <a:t>"</a:t>
+            </a:r>
+            <a:r>
+              <a:rPr lang="en-US" dirty="0">
+                <a:solidFill>
+                  <a:srgbClr val="D4D4D4"/>
+                </a:solidFill>
+                <a:latin typeface="Consolas" panose="020B0609020204030204" pitchFamily="49" charset="0"/>
+              </a:rPr>
+              <a:t> </a:t>
+            </a:r>
+            <a:r>
+              <a:rPr lang="en-US" dirty="0">
+                <a:solidFill>
+                  <a:srgbClr val="9CDCFE"/>
+                </a:solidFill>
+                <a:latin typeface="Consolas" panose="020B0609020204030204" pitchFamily="49" charset="0"/>
+              </a:rPr>
+              <a:t>component</a:t>
+            </a:r>
+            <a:r>
+              <a:rPr lang="en-US" dirty="0">
+                <a:solidFill>
+                  <a:srgbClr val="D4D4D4"/>
+                </a:solidFill>
+                <a:latin typeface="Consolas" panose="020B0609020204030204" pitchFamily="49" charset="0"/>
+              </a:rPr>
+              <a:t>=</a:t>
+            </a:r>
+            <a:r>
+              <a:rPr lang="en-US" dirty="0">
+                <a:solidFill>
+                  <a:srgbClr val="569CD6"/>
+                </a:solidFill>
+                <a:latin typeface="Consolas" panose="020B0609020204030204" pitchFamily="49" charset="0"/>
+              </a:rPr>
+              <a:t>{</a:t>
+            </a:r>
+            <a:r>
+              <a:rPr lang="pl-PL" dirty="0">
+                <a:solidFill>
+                  <a:srgbClr val="9CDCFE"/>
+                </a:solidFill>
+                <a:latin typeface="Consolas" panose="020B0609020204030204" pitchFamily="49" charset="0"/>
+              </a:rPr>
+              <a:t>SomeComponent</a:t>
+            </a:r>
+            <a:r>
+              <a:rPr lang="en-US" dirty="0">
+                <a:solidFill>
+                  <a:srgbClr val="569CD6"/>
+                </a:solidFill>
+                <a:latin typeface="Consolas" panose="020B0609020204030204" pitchFamily="49" charset="0"/>
+              </a:rPr>
+              <a:t>}</a:t>
+            </a:r>
+            <a:r>
+              <a:rPr lang="en-US" dirty="0">
+                <a:solidFill>
+                  <a:srgbClr val="808080"/>
+                </a:solidFill>
+                <a:latin typeface="Consolas" panose="020B0609020204030204" pitchFamily="49" charset="0"/>
+              </a:rPr>
+              <a:t>&gt;&lt;/</a:t>
+            </a:r>
+            <a:r>
+              <a:rPr lang="en-US" dirty="0">
+                <a:solidFill>
+                  <a:srgbClr val="4EC9B0"/>
+                </a:solidFill>
+                <a:latin typeface="Consolas" panose="020B0609020204030204" pitchFamily="49" charset="0"/>
+              </a:rPr>
+              <a:t>Route</a:t>
+            </a:r>
+            <a:r>
+              <a:rPr lang="en-US" dirty="0">
+                <a:solidFill>
+                  <a:srgbClr val="808080"/>
+                </a:solidFill>
+                <a:latin typeface="Consolas" panose="020B0609020204030204" pitchFamily="49" charset="0"/>
+              </a:rPr>
+              <a:t>&gt;</a:t>
+            </a:r>
+            <a:endParaRPr lang="en-US" b="0" dirty="0">
+              <a:solidFill>
+                <a:srgbClr val="D4D4D4"/>
+              </a:solidFill>
+              <a:effectLst/>
+              <a:latin typeface="Consolas" panose="020B0609020204030204" pitchFamily="49" charset="0"/>
+            </a:endParaRPr>
+          </a:p>
+        </p:txBody>
+      </p:sp>
+      <p:sp>
+        <p:nvSpPr>
+          <p:cNvPr id="3" name="Rectangle 2">
+            <a:extLst>
+              <a:ext uri="{FF2B5EF4-FFF2-40B4-BE49-F238E27FC236}">
+                <a16:creationId xmlns:a16="http://schemas.microsoft.com/office/drawing/2014/main" id="{176D4AF7-5548-4B24-8558-279154844915}"/>
+              </a:ext>
+            </a:extLst>
+          </p:cNvPr>
+          <p:cNvSpPr/>
+          <p:nvPr/>
+        </p:nvSpPr>
+        <p:spPr>
+          <a:xfrm>
+            <a:off x="1264810" y="1624717"/>
+            <a:ext cx="10021824" cy="2585323"/>
+          </a:xfrm>
+          <a:prstGeom prst="rect">
+            <a:avLst/>
+          </a:prstGeom>
+          <a:solidFill>
+            <a:schemeClr val="tx1"/>
+          </a:solidFill>
+        </p:spPr>
+        <p:txBody>
+          <a:bodyPr wrap="square">
+            <a:spAutoFit/>
+          </a:bodyPr>
+          <a:lstStyle/>
+          <a:p>
+            <a:r>
+              <a:rPr lang="pl-PL" dirty="0">
+                <a:solidFill>
+                  <a:srgbClr val="569CD6"/>
+                </a:solidFill>
+                <a:latin typeface="Consolas" panose="020B0609020204030204" pitchFamily="49" charset="0"/>
+              </a:rPr>
+              <a:t>function</a:t>
+            </a:r>
+            <a:r>
+              <a:rPr lang="pl-PL" dirty="0">
+                <a:solidFill>
+                  <a:srgbClr val="D4D4D4"/>
+                </a:solidFill>
+                <a:latin typeface="Consolas" panose="020B0609020204030204" pitchFamily="49" charset="0"/>
+              </a:rPr>
+              <a:t> </a:t>
+            </a:r>
+            <a:r>
+              <a:rPr lang="pl-PL" dirty="0">
+                <a:solidFill>
+                  <a:srgbClr val="9CDCFE"/>
+                </a:solidFill>
+                <a:latin typeface="Consolas" panose="020B0609020204030204" pitchFamily="49" charset="0"/>
+              </a:rPr>
+              <a:t> SomeComponent</a:t>
+            </a:r>
+            <a:r>
+              <a:rPr lang="pl-PL" dirty="0">
+                <a:solidFill>
+                  <a:srgbClr val="D4D4D4"/>
+                </a:solidFill>
+                <a:latin typeface="Consolas" panose="020B0609020204030204" pitchFamily="49" charset="0"/>
+              </a:rPr>
+              <a:t>({ </a:t>
+            </a:r>
+            <a:r>
+              <a:rPr lang="pl-PL" dirty="0">
+                <a:solidFill>
+                  <a:srgbClr val="9CDCFE"/>
+                </a:solidFill>
+                <a:latin typeface="Consolas" panose="020B0609020204030204" pitchFamily="49" charset="0"/>
+              </a:rPr>
+              <a:t>match</a:t>
+            </a:r>
+            <a:r>
+              <a:rPr lang="pl-PL" dirty="0">
+                <a:solidFill>
+                  <a:srgbClr val="D4D4D4"/>
+                </a:solidFill>
+                <a:latin typeface="Consolas" panose="020B0609020204030204" pitchFamily="49" charset="0"/>
+              </a:rPr>
+              <a:t> }) {</a:t>
+            </a:r>
+          </a:p>
+          <a:p>
+            <a:r>
+              <a:rPr lang="pl-PL" dirty="0">
+                <a:solidFill>
+                  <a:srgbClr val="D4D4D4"/>
+                </a:solidFill>
+                <a:latin typeface="Consolas" panose="020B0609020204030204" pitchFamily="49" charset="0"/>
+              </a:rPr>
+              <a:t>    </a:t>
+            </a:r>
+            <a:r>
+              <a:rPr lang="pl-PL" dirty="0">
+                <a:solidFill>
+                  <a:srgbClr val="C586C0"/>
+                </a:solidFill>
+                <a:latin typeface="Consolas" panose="020B0609020204030204" pitchFamily="49" charset="0"/>
+              </a:rPr>
+              <a:t>return</a:t>
+            </a:r>
+            <a:r>
+              <a:rPr lang="pl-PL" dirty="0">
+                <a:solidFill>
+                  <a:srgbClr val="D4D4D4"/>
+                </a:solidFill>
+                <a:latin typeface="Consolas" panose="020B0609020204030204" pitchFamily="49" charset="0"/>
+              </a:rPr>
+              <a:t> (</a:t>
+            </a:r>
+          </a:p>
+          <a:p>
+            <a:r>
+              <a:rPr lang="pl-PL" dirty="0">
+                <a:solidFill>
+                  <a:srgbClr val="D4D4D4"/>
+                </a:solidFill>
+                <a:latin typeface="Consolas" panose="020B0609020204030204" pitchFamily="49" charset="0"/>
+              </a:rPr>
+              <a:t>        </a:t>
+            </a:r>
+            <a:r>
+              <a:rPr lang="pl-PL" dirty="0">
+                <a:solidFill>
+                  <a:srgbClr val="808080"/>
+                </a:solidFill>
+                <a:latin typeface="Consolas" panose="020B0609020204030204" pitchFamily="49" charset="0"/>
+              </a:rPr>
+              <a:t>&lt;</a:t>
+            </a:r>
+            <a:r>
+              <a:rPr lang="pl-PL" dirty="0">
+                <a:solidFill>
+                  <a:srgbClr val="4EC9B0"/>
+                </a:solidFill>
+                <a:latin typeface="Consolas" panose="020B0609020204030204" pitchFamily="49" charset="0"/>
+              </a:rPr>
+              <a:t>Router</a:t>
+            </a:r>
+            <a:r>
+              <a:rPr lang="pl-PL" dirty="0">
+                <a:solidFill>
+                  <a:srgbClr val="808080"/>
+                </a:solidFill>
+                <a:latin typeface="Consolas" panose="020B0609020204030204" pitchFamily="49" charset="0"/>
+              </a:rPr>
+              <a:t>&gt;</a:t>
+            </a:r>
+            <a:endParaRPr lang="pl-PL" dirty="0">
+              <a:solidFill>
+                <a:srgbClr val="D4D4D4"/>
+              </a:solidFill>
+              <a:latin typeface="Consolas" panose="020B0609020204030204" pitchFamily="49" charset="0"/>
+            </a:endParaRPr>
+          </a:p>
+          <a:p>
+            <a:r>
+              <a:rPr lang="pl-PL" dirty="0">
+                <a:solidFill>
+                  <a:srgbClr val="D4D4D4"/>
+                </a:solidFill>
+                <a:latin typeface="Consolas" panose="020B0609020204030204" pitchFamily="49" charset="0"/>
+              </a:rPr>
+              <a:t>            </a:t>
+            </a:r>
+            <a:r>
+              <a:rPr lang="pl-PL" dirty="0">
+                <a:solidFill>
+                  <a:srgbClr val="808080"/>
+                </a:solidFill>
+                <a:latin typeface="Consolas" panose="020B0609020204030204" pitchFamily="49" charset="0"/>
+              </a:rPr>
+              <a:t>&lt;</a:t>
+            </a:r>
+            <a:r>
+              <a:rPr lang="pl-PL" dirty="0">
+                <a:solidFill>
+                  <a:srgbClr val="4EC9B0"/>
+                </a:solidFill>
+                <a:latin typeface="Consolas" panose="020B0609020204030204" pitchFamily="49" charset="0"/>
+              </a:rPr>
+              <a:t>Switch</a:t>
+            </a:r>
+            <a:r>
+              <a:rPr lang="pl-PL" dirty="0">
+                <a:solidFill>
+                  <a:srgbClr val="808080"/>
+                </a:solidFill>
+                <a:latin typeface="Consolas" panose="020B0609020204030204" pitchFamily="49" charset="0"/>
+              </a:rPr>
+              <a:t>&gt;</a:t>
+            </a:r>
+            <a:endParaRPr lang="pl-PL" dirty="0">
+              <a:solidFill>
+                <a:srgbClr val="D4D4D4"/>
+              </a:solidFill>
+              <a:latin typeface="Consolas" panose="020B0609020204030204" pitchFamily="49" charset="0"/>
+            </a:endParaRPr>
+          </a:p>
+          <a:p>
+            <a:r>
+              <a:rPr lang="pl-PL" dirty="0">
+                <a:solidFill>
+                  <a:srgbClr val="D4D4D4"/>
+                </a:solidFill>
+                <a:latin typeface="Consolas" panose="020B0609020204030204" pitchFamily="49" charset="0"/>
+              </a:rPr>
+              <a:t>                </a:t>
+            </a:r>
+            <a:r>
+              <a:rPr lang="pl-PL" dirty="0">
+                <a:solidFill>
+                  <a:srgbClr val="808080"/>
+                </a:solidFill>
+                <a:latin typeface="Consolas" panose="020B0609020204030204" pitchFamily="49" charset="0"/>
+              </a:rPr>
+              <a:t>&lt;</a:t>
+            </a:r>
+            <a:r>
+              <a:rPr lang="pl-PL" dirty="0">
+                <a:solidFill>
+                  <a:srgbClr val="4EC9B0"/>
+                </a:solidFill>
+                <a:latin typeface="Consolas" panose="020B0609020204030204" pitchFamily="49" charset="0"/>
+              </a:rPr>
+              <a:t>Route</a:t>
+            </a:r>
+            <a:r>
+              <a:rPr lang="pl-PL" dirty="0">
+                <a:solidFill>
+                  <a:srgbClr val="D4D4D4"/>
+                </a:solidFill>
+                <a:latin typeface="Consolas" panose="020B0609020204030204" pitchFamily="49" charset="0"/>
+              </a:rPr>
+              <a:t> </a:t>
+            </a:r>
+            <a:r>
+              <a:rPr lang="pl-PL" dirty="0">
+                <a:solidFill>
+                  <a:srgbClr val="9CDCFE"/>
+                </a:solidFill>
+                <a:latin typeface="Consolas" panose="020B0609020204030204" pitchFamily="49" charset="0"/>
+              </a:rPr>
+              <a:t>path</a:t>
+            </a:r>
+            <a:r>
+              <a:rPr lang="pl-PL" dirty="0">
+                <a:solidFill>
+                  <a:srgbClr val="D4D4D4"/>
+                </a:solidFill>
+                <a:latin typeface="Consolas" panose="020B0609020204030204" pitchFamily="49" charset="0"/>
+              </a:rPr>
+              <a:t>=</a:t>
+            </a:r>
+            <a:r>
+              <a:rPr lang="pl-PL" dirty="0">
+                <a:solidFill>
+                  <a:srgbClr val="569CD6"/>
+                </a:solidFill>
+                <a:latin typeface="Consolas" panose="020B0609020204030204" pitchFamily="49" charset="0"/>
+              </a:rPr>
+              <a:t>{</a:t>
+            </a:r>
+            <a:r>
+              <a:rPr lang="pl-PL" dirty="0">
+                <a:solidFill>
+                  <a:srgbClr val="CE9178"/>
+                </a:solidFill>
+                <a:latin typeface="Consolas" panose="020B0609020204030204" pitchFamily="49" charset="0"/>
+              </a:rPr>
+              <a:t>`</a:t>
+            </a:r>
+            <a:r>
+              <a:rPr lang="pl-PL" dirty="0">
+                <a:solidFill>
+                  <a:srgbClr val="569CD6"/>
+                </a:solidFill>
+                <a:latin typeface="Consolas" panose="020B0609020204030204" pitchFamily="49" charset="0"/>
+              </a:rPr>
+              <a:t>${</a:t>
+            </a:r>
+            <a:r>
+              <a:rPr lang="pl-PL" dirty="0">
+                <a:solidFill>
+                  <a:srgbClr val="9CDCFE"/>
+                </a:solidFill>
+                <a:latin typeface="Consolas" panose="020B0609020204030204" pitchFamily="49" charset="0"/>
+              </a:rPr>
+              <a:t>match</a:t>
+            </a:r>
+            <a:r>
+              <a:rPr lang="pl-PL" dirty="0">
+                <a:solidFill>
+                  <a:srgbClr val="D4D4D4"/>
+                </a:solidFill>
+                <a:latin typeface="Consolas" panose="020B0609020204030204" pitchFamily="49" charset="0"/>
+              </a:rPr>
+              <a:t>.</a:t>
+            </a:r>
+            <a:r>
+              <a:rPr lang="pl-PL" dirty="0">
+                <a:solidFill>
+                  <a:srgbClr val="9CDCFE"/>
+                </a:solidFill>
+                <a:latin typeface="Consolas" panose="020B0609020204030204" pitchFamily="49" charset="0"/>
+              </a:rPr>
+              <a:t>path</a:t>
+            </a:r>
+            <a:r>
+              <a:rPr lang="pl-PL" dirty="0">
+                <a:solidFill>
+                  <a:srgbClr val="569CD6"/>
+                </a:solidFill>
+                <a:latin typeface="Consolas" panose="020B0609020204030204" pitchFamily="49" charset="0"/>
+              </a:rPr>
+              <a:t>}</a:t>
+            </a:r>
+            <a:r>
+              <a:rPr lang="pl-PL" dirty="0">
+                <a:solidFill>
+                  <a:srgbClr val="CE9178"/>
+                </a:solidFill>
+                <a:latin typeface="Consolas" panose="020B0609020204030204" pitchFamily="49" charset="0"/>
+              </a:rPr>
+              <a:t>/child`</a:t>
+            </a:r>
+            <a:r>
+              <a:rPr lang="pl-PL" dirty="0">
+                <a:solidFill>
+                  <a:srgbClr val="569CD6"/>
+                </a:solidFill>
+                <a:latin typeface="Consolas" panose="020B0609020204030204" pitchFamily="49" charset="0"/>
+              </a:rPr>
+              <a:t>}</a:t>
+            </a:r>
+            <a:r>
+              <a:rPr lang="pl-PL" dirty="0">
+                <a:solidFill>
+                  <a:srgbClr val="808080"/>
+                </a:solidFill>
+                <a:latin typeface="Consolas" panose="020B0609020204030204" pitchFamily="49" charset="0"/>
+              </a:rPr>
+              <a:t>&gt;&lt;</a:t>
+            </a:r>
+            <a:r>
+              <a:rPr lang="pl-PL" dirty="0">
+                <a:solidFill>
+                  <a:srgbClr val="4EC9B0"/>
+                </a:solidFill>
+                <a:latin typeface="Consolas" panose="020B0609020204030204" pitchFamily="49" charset="0"/>
+              </a:rPr>
+              <a:t>Child</a:t>
+            </a:r>
+            <a:r>
+              <a:rPr lang="pl-PL" dirty="0">
+                <a:solidFill>
+                  <a:srgbClr val="D4D4D4"/>
+                </a:solidFill>
+                <a:latin typeface="Consolas" panose="020B0609020204030204" pitchFamily="49" charset="0"/>
+              </a:rPr>
+              <a:t> </a:t>
+            </a:r>
+            <a:r>
+              <a:rPr lang="pl-PL" dirty="0">
+                <a:solidFill>
+                  <a:srgbClr val="808080"/>
+                </a:solidFill>
+                <a:latin typeface="Consolas" panose="020B0609020204030204" pitchFamily="49" charset="0"/>
+              </a:rPr>
+              <a:t>/&gt;&lt;/</a:t>
+            </a:r>
+            <a:r>
+              <a:rPr lang="pl-PL" dirty="0">
+                <a:solidFill>
+                  <a:srgbClr val="4EC9B0"/>
+                </a:solidFill>
+                <a:latin typeface="Consolas" panose="020B0609020204030204" pitchFamily="49" charset="0"/>
+              </a:rPr>
+              <a:t>Route</a:t>
+            </a:r>
+            <a:r>
+              <a:rPr lang="pl-PL" dirty="0">
+                <a:solidFill>
+                  <a:srgbClr val="808080"/>
+                </a:solidFill>
+                <a:latin typeface="Consolas" panose="020B0609020204030204" pitchFamily="49" charset="0"/>
+              </a:rPr>
+              <a:t>&gt;</a:t>
+            </a:r>
+            <a:endParaRPr lang="pl-PL" dirty="0">
+              <a:solidFill>
+                <a:srgbClr val="D4D4D4"/>
+              </a:solidFill>
+              <a:latin typeface="Consolas" panose="020B0609020204030204" pitchFamily="49" charset="0"/>
+            </a:endParaRPr>
+          </a:p>
+          <a:p>
+            <a:r>
+              <a:rPr lang="pl-PL" dirty="0">
+                <a:solidFill>
+                  <a:srgbClr val="D4D4D4"/>
+                </a:solidFill>
+                <a:latin typeface="Consolas" panose="020B0609020204030204" pitchFamily="49" charset="0"/>
+              </a:rPr>
+              <a:t>            </a:t>
+            </a:r>
+            <a:r>
+              <a:rPr lang="pl-PL" dirty="0">
+                <a:solidFill>
+                  <a:srgbClr val="808080"/>
+                </a:solidFill>
+                <a:latin typeface="Consolas" panose="020B0609020204030204" pitchFamily="49" charset="0"/>
+              </a:rPr>
+              <a:t>&lt;/</a:t>
+            </a:r>
+            <a:r>
+              <a:rPr lang="pl-PL" dirty="0">
+                <a:solidFill>
+                  <a:srgbClr val="4EC9B0"/>
+                </a:solidFill>
+                <a:latin typeface="Consolas" panose="020B0609020204030204" pitchFamily="49" charset="0"/>
+              </a:rPr>
+              <a:t>Switch</a:t>
+            </a:r>
+            <a:r>
+              <a:rPr lang="pl-PL" dirty="0">
+                <a:solidFill>
+                  <a:srgbClr val="808080"/>
+                </a:solidFill>
+                <a:latin typeface="Consolas" panose="020B0609020204030204" pitchFamily="49" charset="0"/>
+              </a:rPr>
+              <a:t>&gt;</a:t>
+            </a:r>
+            <a:endParaRPr lang="pl-PL" dirty="0">
+              <a:solidFill>
+                <a:srgbClr val="D4D4D4"/>
+              </a:solidFill>
+              <a:latin typeface="Consolas" panose="020B0609020204030204" pitchFamily="49" charset="0"/>
+            </a:endParaRPr>
+          </a:p>
+          <a:p>
+            <a:r>
+              <a:rPr lang="pl-PL" dirty="0">
+                <a:solidFill>
+                  <a:srgbClr val="D4D4D4"/>
+                </a:solidFill>
+                <a:latin typeface="Consolas" panose="020B0609020204030204" pitchFamily="49" charset="0"/>
+              </a:rPr>
+              <a:t>        </a:t>
+            </a:r>
+            <a:r>
+              <a:rPr lang="pl-PL" dirty="0">
+                <a:solidFill>
+                  <a:srgbClr val="808080"/>
+                </a:solidFill>
+                <a:latin typeface="Consolas" panose="020B0609020204030204" pitchFamily="49" charset="0"/>
+              </a:rPr>
+              <a:t>&lt;/</a:t>
+            </a:r>
+            <a:r>
+              <a:rPr lang="pl-PL" dirty="0">
+                <a:solidFill>
+                  <a:srgbClr val="4EC9B0"/>
+                </a:solidFill>
+                <a:latin typeface="Consolas" panose="020B0609020204030204" pitchFamily="49" charset="0"/>
+              </a:rPr>
+              <a:t>Router</a:t>
+            </a:r>
+            <a:r>
+              <a:rPr lang="pl-PL" dirty="0">
+                <a:solidFill>
+                  <a:srgbClr val="808080"/>
+                </a:solidFill>
+                <a:latin typeface="Consolas" panose="020B0609020204030204" pitchFamily="49" charset="0"/>
+              </a:rPr>
+              <a:t>&gt;</a:t>
+            </a:r>
+            <a:endParaRPr lang="pl-PL" dirty="0">
+              <a:solidFill>
+                <a:srgbClr val="D4D4D4"/>
+              </a:solidFill>
+              <a:latin typeface="Consolas" panose="020B0609020204030204" pitchFamily="49" charset="0"/>
+            </a:endParaRPr>
+          </a:p>
+          <a:p>
+            <a:r>
+              <a:rPr lang="pl-PL" dirty="0">
+                <a:solidFill>
+                  <a:srgbClr val="D4D4D4"/>
+                </a:solidFill>
+                <a:latin typeface="Consolas" panose="020B0609020204030204" pitchFamily="49" charset="0"/>
+              </a:rPr>
+              <a:t>    )</a:t>
+            </a:r>
+          </a:p>
+          <a:p>
+            <a:r>
+              <a:rPr lang="pl-PL" dirty="0">
+                <a:solidFill>
+                  <a:srgbClr val="D4D4D4"/>
+                </a:solidFill>
+                <a:latin typeface="Consolas" panose="020B0609020204030204" pitchFamily="49" charset="0"/>
+              </a:rPr>
+              <a:t>}</a:t>
+            </a:r>
+            <a:endParaRPr lang="pl-PL" b="0" dirty="0">
+              <a:solidFill>
+                <a:srgbClr val="D4D4D4"/>
+              </a:solidFill>
+              <a:effectLst/>
+              <a:latin typeface="Consolas" panose="020B0609020204030204" pitchFamily="49" charset="0"/>
+            </a:endParaRPr>
+          </a:p>
+        </p:txBody>
+      </p:sp>
+      <p:sp>
+        <p:nvSpPr>
+          <p:cNvPr id="6" name="Rectangle 5">
+            <a:extLst>
+              <a:ext uri="{FF2B5EF4-FFF2-40B4-BE49-F238E27FC236}">
+                <a16:creationId xmlns:a16="http://schemas.microsoft.com/office/drawing/2014/main" id="{7D6022C8-31AE-4DB0-AFBB-6342B645CDA7}"/>
+              </a:ext>
+            </a:extLst>
+          </p:cNvPr>
+          <p:cNvSpPr/>
+          <p:nvPr/>
+        </p:nvSpPr>
+        <p:spPr>
+          <a:xfrm>
+            <a:off x="1264811" y="4616360"/>
+            <a:ext cx="7529625" cy="369332"/>
+          </a:xfrm>
+          <a:prstGeom prst="rect">
+            <a:avLst/>
+          </a:prstGeom>
+          <a:solidFill>
+            <a:schemeClr val="tx1"/>
+          </a:solidFill>
+        </p:spPr>
+        <p:txBody>
+          <a:bodyPr wrap="none">
+            <a:spAutoFit/>
+          </a:bodyPr>
+          <a:lstStyle/>
+          <a:p>
+            <a:r>
+              <a:rPr lang="en-US" dirty="0">
+                <a:solidFill>
+                  <a:srgbClr val="808080"/>
+                </a:solidFill>
+                <a:latin typeface="Consolas" panose="020B0609020204030204" pitchFamily="49" charset="0"/>
+              </a:rPr>
+              <a:t>&lt;</a:t>
+            </a:r>
+            <a:r>
+              <a:rPr lang="en-US" dirty="0">
+                <a:solidFill>
+                  <a:srgbClr val="4EC9B0"/>
+                </a:solidFill>
+                <a:latin typeface="Consolas" panose="020B0609020204030204" pitchFamily="49" charset="0"/>
+              </a:rPr>
+              <a:t>Route</a:t>
+            </a:r>
+            <a:r>
+              <a:rPr lang="en-US" dirty="0">
+                <a:solidFill>
+                  <a:srgbClr val="D4D4D4"/>
+                </a:solidFill>
+                <a:latin typeface="Consolas" panose="020B0609020204030204" pitchFamily="49" charset="0"/>
+              </a:rPr>
+              <a:t> </a:t>
+            </a:r>
+            <a:r>
+              <a:rPr lang="en-US" dirty="0">
+                <a:solidFill>
+                  <a:srgbClr val="9CDCFE"/>
+                </a:solidFill>
+                <a:latin typeface="Consolas" panose="020B0609020204030204" pitchFamily="49" charset="0"/>
+              </a:rPr>
+              <a:t>path</a:t>
+            </a:r>
+            <a:r>
+              <a:rPr lang="en-US" dirty="0">
+                <a:solidFill>
+                  <a:srgbClr val="D4D4D4"/>
+                </a:solidFill>
+                <a:latin typeface="Consolas" panose="020B0609020204030204" pitchFamily="49" charset="0"/>
+              </a:rPr>
+              <a:t>=</a:t>
+            </a:r>
+            <a:r>
+              <a:rPr lang="en-US" dirty="0">
+                <a:solidFill>
+                  <a:srgbClr val="CE9178"/>
+                </a:solidFill>
+                <a:latin typeface="Consolas" panose="020B0609020204030204" pitchFamily="49" charset="0"/>
+              </a:rPr>
+              <a:t>"/</a:t>
+            </a:r>
+            <a:r>
+              <a:rPr lang="pl-PL" dirty="0">
+                <a:solidFill>
+                  <a:srgbClr val="CE9178"/>
+                </a:solidFill>
+                <a:latin typeface="Consolas" panose="020B0609020204030204" pitchFamily="49" charset="0"/>
+              </a:rPr>
+              <a:t>some/:id</a:t>
+            </a:r>
+            <a:r>
+              <a:rPr lang="en-US" dirty="0">
+                <a:solidFill>
+                  <a:srgbClr val="CE9178"/>
+                </a:solidFill>
+                <a:latin typeface="Consolas" panose="020B0609020204030204" pitchFamily="49" charset="0"/>
+              </a:rPr>
+              <a:t>"</a:t>
+            </a:r>
+            <a:r>
+              <a:rPr lang="en-US" dirty="0">
+                <a:solidFill>
+                  <a:srgbClr val="D4D4D4"/>
+                </a:solidFill>
+                <a:latin typeface="Consolas" panose="020B0609020204030204" pitchFamily="49" charset="0"/>
+              </a:rPr>
+              <a:t> </a:t>
+            </a:r>
+            <a:r>
+              <a:rPr lang="en-US" dirty="0">
+                <a:solidFill>
+                  <a:srgbClr val="9CDCFE"/>
+                </a:solidFill>
+                <a:latin typeface="Consolas" panose="020B0609020204030204" pitchFamily="49" charset="0"/>
+              </a:rPr>
+              <a:t>component</a:t>
+            </a:r>
+            <a:r>
+              <a:rPr lang="en-US" dirty="0">
+                <a:solidFill>
+                  <a:srgbClr val="D4D4D4"/>
+                </a:solidFill>
+                <a:latin typeface="Consolas" panose="020B0609020204030204" pitchFamily="49" charset="0"/>
+              </a:rPr>
+              <a:t>=</a:t>
+            </a:r>
+            <a:r>
+              <a:rPr lang="en-US" dirty="0">
+                <a:solidFill>
+                  <a:srgbClr val="569CD6"/>
+                </a:solidFill>
+                <a:latin typeface="Consolas" panose="020B0609020204030204" pitchFamily="49" charset="0"/>
+              </a:rPr>
+              <a:t>{</a:t>
+            </a:r>
+            <a:r>
+              <a:rPr lang="pl-PL" dirty="0">
+                <a:solidFill>
+                  <a:srgbClr val="9CDCFE"/>
+                </a:solidFill>
+                <a:latin typeface="Consolas" panose="020B0609020204030204" pitchFamily="49" charset="0"/>
+              </a:rPr>
+              <a:t>SomeComponent</a:t>
+            </a:r>
+            <a:r>
+              <a:rPr lang="en-US" dirty="0">
+                <a:solidFill>
+                  <a:srgbClr val="569CD6"/>
+                </a:solidFill>
+                <a:latin typeface="Consolas" panose="020B0609020204030204" pitchFamily="49" charset="0"/>
+              </a:rPr>
+              <a:t>}</a:t>
+            </a:r>
+            <a:r>
+              <a:rPr lang="en-US" dirty="0">
+                <a:solidFill>
+                  <a:srgbClr val="808080"/>
+                </a:solidFill>
+                <a:latin typeface="Consolas" panose="020B0609020204030204" pitchFamily="49" charset="0"/>
+              </a:rPr>
+              <a:t>&gt;&lt;/</a:t>
+            </a:r>
+            <a:r>
+              <a:rPr lang="en-US" dirty="0">
+                <a:solidFill>
+                  <a:srgbClr val="4EC9B0"/>
+                </a:solidFill>
+                <a:latin typeface="Consolas" panose="020B0609020204030204" pitchFamily="49" charset="0"/>
+              </a:rPr>
+              <a:t>Route</a:t>
+            </a:r>
+            <a:r>
+              <a:rPr lang="en-US" dirty="0">
+                <a:solidFill>
+                  <a:srgbClr val="808080"/>
+                </a:solidFill>
+                <a:latin typeface="Consolas" panose="020B0609020204030204" pitchFamily="49" charset="0"/>
+              </a:rPr>
+              <a:t>&gt;</a:t>
+            </a:r>
+            <a:endParaRPr lang="en-US" b="0" dirty="0">
+              <a:solidFill>
+                <a:srgbClr val="D4D4D4"/>
+              </a:solidFill>
+              <a:effectLst/>
+              <a:latin typeface="Consolas" panose="020B0609020204030204" pitchFamily="49" charset="0"/>
+            </a:endParaRPr>
+          </a:p>
+        </p:txBody>
+      </p:sp>
+      <p:sp>
+        <p:nvSpPr>
+          <p:cNvPr id="7" name="Rectangle 6">
+            <a:extLst>
+              <a:ext uri="{FF2B5EF4-FFF2-40B4-BE49-F238E27FC236}">
+                <a16:creationId xmlns:a16="http://schemas.microsoft.com/office/drawing/2014/main" id="{3B283B05-4AC6-4B0E-9EB9-39810E5DB833}"/>
+              </a:ext>
+            </a:extLst>
+          </p:cNvPr>
+          <p:cNvSpPr/>
+          <p:nvPr/>
+        </p:nvSpPr>
+        <p:spPr>
+          <a:xfrm>
+            <a:off x="1264811" y="5414615"/>
+            <a:ext cx="2337499" cy="369332"/>
+          </a:xfrm>
+          <a:prstGeom prst="rect">
+            <a:avLst/>
+          </a:prstGeom>
+          <a:solidFill>
+            <a:schemeClr val="tx1"/>
+          </a:solidFill>
+        </p:spPr>
+        <p:txBody>
+          <a:bodyPr wrap="none">
+            <a:spAutoFit/>
+          </a:bodyPr>
+          <a:lstStyle/>
+          <a:p>
+            <a:r>
+              <a:rPr lang="pt-BR">
+                <a:solidFill>
+                  <a:srgbClr val="569CD6"/>
+                </a:solidFill>
+                <a:latin typeface="Consolas" panose="020B0609020204030204" pitchFamily="49" charset="0"/>
+              </a:rPr>
+              <a:t>{</a:t>
+            </a:r>
+            <a:r>
+              <a:rPr lang="pt-BR">
+                <a:solidFill>
+                  <a:srgbClr val="9CDCFE"/>
+                </a:solidFill>
+                <a:latin typeface="Consolas" panose="020B0609020204030204" pitchFamily="49" charset="0"/>
+              </a:rPr>
+              <a:t>match</a:t>
+            </a:r>
+            <a:r>
+              <a:rPr lang="pt-BR">
+                <a:solidFill>
+                  <a:srgbClr val="D4D4D4"/>
+                </a:solidFill>
+                <a:latin typeface="Consolas" panose="020B0609020204030204" pitchFamily="49" charset="0"/>
+              </a:rPr>
+              <a:t>.</a:t>
+            </a:r>
+            <a:r>
+              <a:rPr lang="pt-BR">
+                <a:solidFill>
+                  <a:srgbClr val="9CDCFE"/>
+                </a:solidFill>
+                <a:latin typeface="Consolas" panose="020B0609020204030204" pitchFamily="49" charset="0"/>
+              </a:rPr>
+              <a:t>params</a:t>
+            </a:r>
+            <a:r>
+              <a:rPr lang="pt-BR">
+                <a:solidFill>
+                  <a:srgbClr val="D4D4D4"/>
+                </a:solidFill>
+                <a:latin typeface="Consolas" panose="020B0609020204030204" pitchFamily="49" charset="0"/>
+              </a:rPr>
+              <a:t>.</a:t>
+            </a:r>
+            <a:r>
+              <a:rPr lang="pt-BR">
+                <a:solidFill>
+                  <a:srgbClr val="9CDCFE"/>
+                </a:solidFill>
+                <a:latin typeface="Consolas" panose="020B0609020204030204" pitchFamily="49" charset="0"/>
+              </a:rPr>
+              <a:t>id</a:t>
+            </a:r>
+            <a:r>
+              <a:rPr lang="pt-BR">
+                <a:solidFill>
+                  <a:srgbClr val="569CD6"/>
+                </a:solidFill>
+                <a:latin typeface="Consolas" panose="020B0609020204030204" pitchFamily="49" charset="0"/>
+              </a:rPr>
+              <a:t>}</a:t>
+            </a:r>
+            <a:endParaRPr lang="pt-BR" b="0" dirty="0">
+              <a:solidFill>
+                <a:srgbClr val="D4D4D4"/>
+              </a:solidFill>
+              <a:effectLst/>
+              <a:latin typeface="Consolas" panose="020B0609020204030204" pitchFamily="49" charset="0"/>
+            </a:endParaRPr>
+          </a:p>
+        </p:txBody>
+      </p:sp>
+      <p:sp>
+        <p:nvSpPr>
+          <p:cNvPr id="8" name="pole tekstowe 3">
+            <a:extLst>
+              <a:ext uri="{FF2B5EF4-FFF2-40B4-BE49-F238E27FC236}">
+                <a16:creationId xmlns:a16="http://schemas.microsoft.com/office/drawing/2014/main" id="{A05D5F0B-9688-4F8B-8643-E70277DED324}"/>
+              </a:ext>
+            </a:extLst>
+          </p:cNvPr>
+          <p:cNvSpPr txBox="1"/>
+          <p:nvPr/>
+        </p:nvSpPr>
+        <p:spPr>
+          <a:xfrm>
+            <a:off x="1264811" y="5045283"/>
+            <a:ext cx="1819216" cy="369332"/>
+          </a:xfrm>
+          <a:prstGeom prst="rect">
+            <a:avLst/>
+          </a:prstGeom>
+          <a:noFill/>
+        </p:spPr>
+        <p:txBody>
+          <a:bodyPr wrap="none" rtlCol="0">
+            <a:spAutoFit/>
+          </a:bodyPr>
+          <a:lstStyle/>
+          <a:p>
+            <a:r>
+              <a:rPr lang="pl-PL" dirty="0"/>
+              <a:t>SomeComponent</a:t>
+            </a:r>
+          </a:p>
+        </p:txBody>
+      </p:sp>
+      <p:sp>
+        <p:nvSpPr>
+          <p:cNvPr id="9" name="pole tekstowe 3">
+            <a:extLst>
+              <a:ext uri="{FF2B5EF4-FFF2-40B4-BE49-F238E27FC236}">
+                <a16:creationId xmlns:a16="http://schemas.microsoft.com/office/drawing/2014/main" id="{91BBD189-AB20-48F3-B341-7A7E27CDFFF8}"/>
+              </a:ext>
+            </a:extLst>
+          </p:cNvPr>
+          <p:cNvSpPr txBox="1"/>
+          <p:nvPr/>
+        </p:nvSpPr>
+        <p:spPr>
+          <a:xfrm>
+            <a:off x="1264811" y="4286048"/>
+            <a:ext cx="2124428" cy="369332"/>
+          </a:xfrm>
+          <a:prstGeom prst="rect">
+            <a:avLst/>
+          </a:prstGeom>
+          <a:noFill/>
+        </p:spPr>
+        <p:txBody>
+          <a:bodyPr wrap="none" rtlCol="0">
+            <a:spAutoFit/>
+          </a:bodyPr>
+          <a:lstStyle/>
+          <a:p>
+            <a:r>
+              <a:rPr lang="pl-PL" dirty="0"/>
+              <a:t>Routing with params</a:t>
+            </a:r>
+          </a:p>
+        </p:txBody>
+      </p:sp>
+      <p:sp>
+        <p:nvSpPr>
+          <p:cNvPr id="10" name="Rectangle 9">
+            <a:extLst>
+              <a:ext uri="{FF2B5EF4-FFF2-40B4-BE49-F238E27FC236}">
+                <a16:creationId xmlns:a16="http://schemas.microsoft.com/office/drawing/2014/main" id="{964F60B8-4F01-458E-BA7F-40A7878FD1F3}"/>
+              </a:ext>
+            </a:extLst>
+          </p:cNvPr>
+          <p:cNvSpPr/>
+          <p:nvPr/>
+        </p:nvSpPr>
+        <p:spPr>
+          <a:xfrm>
+            <a:off x="9687351" y="5989306"/>
+            <a:ext cx="1599284" cy="369332"/>
+          </a:xfrm>
+          <a:prstGeom prst="rect">
+            <a:avLst/>
+          </a:prstGeom>
+        </p:spPr>
+        <p:txBody>
+          <a:bodyPr wrap="none">
+            <a:spAutoFit/>
+          </a:bodyPr>
+          <a:lstStyle/>
+          <a:p>
+            <a:r>
+              <a:rPr lang="en-GB" dirty="0"/>
+              <a:t>/help/4/details</a:t>
+            </a:r>
+          </a:p>
+        </p:txBody>
+      </p:sp>
+      <p:sp>
+        <p:nvSpPr>
+          <p:cNvPr id="13" name="pole tekstowe 3">
+            <a:extLst>
+              <a:ext uri="{FF2B5EF4-FFF2-40B4-BE49-F238E27FC236}">
+                <a16:creationId xmlns:a16="http://schemas.microsoft.com/office/drawing/2014/main" id="{537DF380-1A8F-4902-BFCE-7758F3D1AE69}"/>
+              </a:ext>
+            </a:extLst>
+          </p:cNvPr>
+          <p:cNvSpPr txBox="1"/>
+          <p:nvPr/>
+        </p:nvSpPr>
+        <p:spPr>
+          <a:xfrm>
+            <a:off x="1264810" y="5883267"/>
+            <a:ext cx="4999574" cy="369332"/>
+          </a:xfrm>
+          <a:prstGeom prst="rect">
+            <a:avLst/>
+          </a:prstGeom>
+          <a:noFill/>
+        </p:spPr>
+        <p:txBody>
+          <a:bodyPr wrap="none" rtlCol="0">
+            <a:spAutoFit/>
+          </a:bodyPr>
+          <a:lstStyle/>
+          <a:p>
+            <a:r>
+              <a:rPr lang="pl-PL" dirty="0"/>
+              <a:t>Object in parameter – it will be available in location</a:t>
+            </a:r>
+          </a:p>
+        </p:txBody>
+      </p:sp>
+      <p:sp>
+        <p:nvSpPr>
+          <p:cNvPr id="14" name="Rectangle 13">
+            <a:extLst>
+              <a:ext uri="{FF2B5EF4-FFF2-40B4-BE49-F238E27FC236}">
+                <a16:creationId xmlns:a16="http://schemas.microsoft.com/office/drawing/2014/main" id="{6627E3EB-481E-40D8-BD1A-C57D227C4200}"/>
+              </a:ext>
+            </a:extLst>
+          </p:cNvPr>
+          <p:cNvSpPr/>
+          <p:nvPr/>
+        </p:nvSpPr>
+        <p:spPr>
+          <a:xfrm>
+            <a:off x="1264810" y="6319520"/>
+            <a:ext cx="4490332" cy="369332"/>
+          </a:xfrm>
+          <a:prstGeom prst="rect">
+            <a:avLst/>
+          </a:prstGeom>
+          <a:solidFill>
+            <a:schemeClr val="tx1"/>
+          </a:solidFill>
+        </p:spPr>
+        <p:txBody>
+          <a:bodyPr wrap="none">
+            <a:spAutoFit/>
+          </a:bodyPr>
+          <a:lstStyle/>
+          <a:p>
+            <a:r>
+              <a:rPr lang="pl-PL" dirty="0">
+                <a:solidFill>
+                  <a:srgbClr val="9CDCFE"/>
+                </a:solidFill>
+                <a:latin typeface="Consolas" panose="020B0609020204030204" pitchFamily="49" charset="0"/>
+              </a:rPr>
+              <a:t>SomeComponent</a:t>
+            </a:r>
+            <a:r>
+              <a:rPr lang="pl-PL" dirty="0">
+                <a:solidFill>
+                  <a:srgbClr val="D4D4D4"/>
+                </a:solidFill>
+                <a:latin typeface="Consolas" panose="020B0609020204030204" pitchFamily="49" charset="0"/>
+              </a:rPr>
+              <a:t>({ </a:t>
+            </a:r>
+            <a:r>
+              <a:rPr lang="pl-PL" dirty="0">
+                <a:solidFill>
+                  <a:srgbClr val="9CDCFE"/>
+                </a:solidFill>
+                <a:latin typeface="Consolas" panose="020B0609020204030204" pitchFamily="49" charset="0"/>
+              </a:rPr>
+              <a:t>match</a:t>
+            </a:r>
+            <a:r>
+              <a:rPr lang="pl-PL" dirty="0">
+                <a:solidFill>
+                  <a:srgbClr val="D4D4D4"/>
+                </a:solidFill>
+                <a:latin typeface="Consolas" panose="020B0609020204030204" pitchFamily="49" charset="0"/>
+              </a:rPr>
+              <a:t>, </a:t>
+            </a:r>
+            <a:r>
+              <a:rPr lang="pl-PL" dirty="0">
+                <a:solidFill>
+                  <a:srgbClr val="9CDCFE"/>
+                </a:solidFill>
+                <a:latin typeface="Consolas" panose="020B0609020204030204" pitchFamily="49" charset="0"/>
+              </a:rPr>
+              <a:t>location</a:t>
+            </a:r>
+            <a:r>
+              <a:rPr lang="pl-PL" dirty="0">
+                <a:solidFill>
+                  <a:srgbClr val="D4D4D4"/>
+                </a:solidFill>
+                <a:latin typeface="Consolas" panose="020B0609020204030204" pitchFamily="49" charset="0"/>
+              </a:rPr>
+              <a:t> })</a:t>
+            </a:r>
+            <a:endParaRPr lang="pl-PL" b="0" dirty="0">
+              <a:solidFill>
+                <a:srgbClr val="D4D4D4"/>
+              </a:solidFill>
+              <a:effectLst/>
+              <a:latin typeface="Consolas" panose="020B0609020204030204" pitchFamily="49" charset="0"/>
+            </a:endParaRPr>
           </a:p>
         </p:txBody>
       </p:sp>

</xml_diff>

<commit_message>
Exercise 18: List authentication with router-dom
</commit_message>
<xml_diff>
--- a/tutorial/ReactjsTraining.pptx
+++ b/tutorial/ReactjsTraining.pptx
@@ -5,7 +5,7 @@
     <p:sldMasterId id="2147483648" r:id="rId1"/>
   </p:sldMasterIdLst>
   <p:notesMasterIdLst>
-    <p:notesMasterId r:id="rId22"/>
+    <p:notesMasterId r:id="rId23"/>
   </p:notesMasterIdLst>
   <p:sldIdLst>
     <p:sldId id="256" r:id="rId2"/>
@@ -28,6 +28,7 @@
     <p:sldId id="274" r:id="rId19"/>
     <p:sldId id="273" r:id="rId20"/>
     <p:sldId id="275" r:id="rId21"/>
+    <p:sldId id="276" r:id="rId22"/>
   </p:sldIdLst>
   <p:sldSz cx="12192000" cy="6858000"/>
   <p:notesSz cx="6858000" cy="9144000"/>
@@ -216,7 +217,7 @@
           <a:p>
             <a:fld id="{D61BAF21-C883-454C-A249-8697E6BEDB6B}" type="datetimeFigureOut">
               <a:rPr lang="pl-PL" smtClean="0"/>
-              <a:t>04.10.2019</a:t>
+              <a:t>05.10.2019</a:t>
             </a:fld>
             <a:endParaRPr lang="pl-PL"/>
           </a:p>
@@ -3956,6 +3957,117 @@
 </p:notes>
 </file>
 
+<file path=ppt/notesSlides/notesSlide21.xml><?xml version="1.0" encoding="utf-8"?>
+<p:notes xmlns:a="http://schemas.openxmlformats.org/drawingml/2006/main" xmlns:r="http://schemas.openxmlformats.org/officeDocument/2006/relationships" xmlns:p="http://schemas.openxmlformats.org/presentationml/2006/main">
+  <p:cSld>
+    <p:spTree>
+      <p:nvGrpSpPr>
+        <p:cNvPr id="1" name=""/>
+        <p:cNvGrpSpPr/>
+        <p:nvPr/>
+      </p:nvGrpSpPr>
+      <p:grpSpPr>
+        <a:xfrm>
+          <a:off x="0" y="0"/>
+          <a:ext cx="0" cy="0"/>
+          <a:chOff x="0" y="0"/>
+          <a:chExt cx="0" cy="0"/>
+        </a:xfrm>
+      </p:grpSpPr>
+      <p:sp>
+        <p:nvSpPr>
+          <p:cNvPr id="2" name="Symbol zastępczy obrazu slajdu 1"/>
+          <p:cNvSpPr>
+            <a:spLocks noGrp="1" noRot="1" noChangeAspect="1"/>
+          </p:cNvSpPr>
+          <p:nvPr>
+            <p:ph type="sldImg"/>
+          </p:nvPr>
+        </p:nvSpPr>
+        <p:spPr/>
+      </p:sp>
+      <p:sp>
+        <p:nvSpPr>
+          <p:cNvPr id="3" name="Symbol zastępczy notatek 2"/>
+          <p:cNvSpPr>
+            <a:spLocks noGrp="1"/>
+          </p:cNvSpPr>
+          <p:nvPr>
+            <p:ph type="body" idx="1"/>
+          </p:nvPr>
+        </p:nvSpPr>
+        <p:spPr/>
+        <p:txBody>
+          <a:bodyPr/>
+          <a:lstStyle/>
+          <a:p>
+            <a:pPr marL="0" indent="0">
+              <a:buFontTx/>
+              <a:buNone/>
+            </a:pPr>
+            <a:r>
+              <a:rPr lang="pl-PL" sz="1200" b="0" i="0" kern="1200" dirty="0" err="1">
+                <a:solidFill>
+                  <a:schemeClr val="tx1"/>
+                </a:solidFill>
+                <a:effectLst/>
+                <a:latin typeface="+mn-lt"/>
+                <a:ea typeface="+mn-ea"/>
+                <a:cs typeface="+mn-cs"/>
+              </a:rPr>
+              <a:t>Exercise</a:t>
+            </a:r>
+            <a:r>
+              <a:rPr lang="pl-PL" sz="1200" b="0" i="0" kern="1200" dirty="0">
+                <a:solidFill>
+                  <a:schemeClr val="tx1"/>
+                </a:solidFill>
+                <a:effectLst/>
+                <a:latin typeface="+mn-lt"/>
+                <a:ea typeface="+mn-ea"/>
+                <a:cs typeface="+mn-cs"/>
+              </a:rPr>
+              <a:t> 18: Przerobić autentykację listy tak by było zrobione tym sposobem (logika poza komponentem)</a:t>
+            </a:r>
+          </a:p>
+        </p:txBody>
+      </p:sp>
+      <p:sp>
+        <p:nvSpPr>
+          <p:cNvPr id="4" name="Symbol zastępczy numeru slajdu 3"/>
+          <p:cNvSpPr>
+            <a:spLocks noGrp="1"/>
+          </p:cNvSpPr>
+          <p:nvPr>
+            <p:ph type="sldNum" sz="quarter" idx="5"/>
+          </p:nvPr>
+        </p:nvSpPr>
+        <p:spPr/>
+        <p:txBody>
+          <a:bodyPr/>
+          <a:lstStyle/>
+          <a:p>
+            <a:fld id="{810A6612-7A23-4B98-B0E9-4F3C882AD2EF}" type="slidenum">
+              <a:rPr lang="pl-PL" smtClean="0"/>
+              <a:t>21</a:t>
+            </a:fld>
+            <a:endParaRPr lang="pl-PL"/>
+          </a:p>
+        </p:txBody>
+      </p:sp>
+    </p:spTree>
+    <p:extLst>
+      <p:ext uri="{BB962C8B-B14F-4D97-AF65-F5344CB8AC3E}">
+        <p14:creationId xmlns:p14="http://schemas.microsoft.com/office/powerpoint/2010/main" val="4282621687"/>
+      </p:ext>
+    </p:extLst>
+  </p:cSld>
+  <p:clrMapOvr>
+    <a:masterClrMapping/>
+  </p:clrMapOvr>
+</p:notes>
+</file>
+
 <file path=ppt/notesSlides/notesSlide3.xml><?xml version="1.0" encoding="utf-8"?>
 <p:notes xmlns:a="http://schemas.openxmlformats.org/drawingml/2006/main" xmlns:r="http://schemas.openxmlformats.org/officeDocument/2006/relationships" xmlns:p="http://schemas.openxmlformats.org/presentationml/2006/main">
   <p:cSld>
@@ -5416,7 +5528,7 @@
           <a:p>
             <a:fld id="{95CCC2EB-502C-49A7-9CC4-85002E026034}" type="datetimeFigureOut">
               <a:rPr lang="pl-PL" smtClean="0"/>
-              <a:t>04.10.2019</a:t>
+              <a:t>05.10.2019</a:t>
             </a:fld>
             <a:endParaRPr lang="pl-PL"/>
           </a:p>
@@ -5614,7 +5726,7 @@
           <a:p>
             <a:fld id="{95CCC2EB-502C-49A7-9CC4-85002E026034}" type="datetimeFigureOut">
               <a:rPr lang="pl-PL" smtClean="0"/>
-              <a:t>04.10.2019</a:t>
+              <a:t>05.10.2019</a:t>
             </a:fld>
             <a:endParaRPr lang="pl-PL"/>
           </a:p>
@@ -5822,7 +5934,7 @@
           <a:p>
             <a:fld id="{95CCC2EB-502C-49A7-9CC4-85002E026034}" type="datetimeFigureOut">
               <a:rPr lang="pl-PL" smtClean="0"/>
-              <a:t>04.10.2019</a:t>
+              <a:t>05.10.2019</a:t>
             </a:fld>
             <a:endParaRPr lang="pl-PL"/>
           </a:p>
@@ -6020,7 +6132,7 @@
           <a:p>
             <a:fld id="{95CCC2EB-502C-49A7-9CC4-85002E026034}" type="datetimeFigureOut">
               <a:rPr lang="pl-PL" smtClean="0"/>
-              <a:t>04.10.2019</a:t>
+              <a:t>05.10.2019</a:t>
             </a:fld>
             <a:endParaRPr lang="pl-PL"/>
           </a:p>
@@ -6295,7 +6407,7 @@
           <a:p>
             <a:fld id="{95CCC2EB-502C-49A7-9CC4-85002E026034}" type="datetimeFigureOut">
               <a:rPr lang="pl-PL" smtClean="0"/>
-              <a:t>04.10.2019</a:t>
+              <a:t>05.10.2019</a:t>
             </a:fld>
             <a:endParaRPr lang="pl-PL"/>
           </a:p>
@@ -6560,7 +6672,7 @@
           <a:p>
             <a:fld id="{95CCC2EB-502C-49A7-9CC4-85002E026034}" type="datetimeFigureOut">
               <a:rPr lang="pl-PL" smtClean="0"/>
-              <a:t>04.10.2019</a:t>
+              <a:t>05.10.2019</a:t>
             </a:fld>
             <a:endParaRPr lang="pl-PL"/>
           </a:p>
@@ -6972,7 +7084,7 @@
           <a:p>
             <a:fld id="{95CCC2EB-502C-49A7-9CC4-85002E026034}" type="datetimeFigureOut">
               <a:rPr lang="pl-PL" smtClean="0"/>
-              <a:t>04.10.2019</a:t>
+              <a:t>05.10.2019</a:t>
             </a:fld>
             <a:endParaRPr lang="pl-PL"/>
           </a:p>
@@ -7113,7 +7225,7 @@
           <a:p>
             <a:fld id="{95CCC2EB-502C-49A7-9CC4-85002E026034}" type="datetimeFigureOut">
               <a:rPr lang="pl-PL" smtClean="0"/>
-              <a:t>04.10.2019</a:t>
+              <a:t>05.10.2019</a:t>
             </a:fld>
             <a:endParaRPr lang="pl-PL"/>
           </a:p>
@@ -7226,7 +7338,7 @@
           <a:p>
             <a:fld id="{95CCC2EB-502C-49A7-9CC4-85002E026034}" type="datetimeFigureOut">
               <a:rPr lang="pl-PL" smtClean="0"/>
-              <a:t>04.10.2019</a:t>
+              <a:t>05.10.2019</a:t>
             </a:fld>
             <a:endParaRPr lang="pl-PL"/>
           </a:p>
@@ -7537,7 +7649,7 @@
           <a:p>
             <a:fld id="{95CCC2EB-502C-49A7-9CC4-85002E026034}" type="datetimeFigureOut">
               <a:rPr lang="pl-PL" smtClean="0"/>
-              <a:t>04.10.2019</a:t>
+              <a:t>05.10.2019</a:t>
             </a:fld>
             <a:endParaRPr lang="pl-PL"/>
           </a:p>
@@ -7825,7 +7937,7 @@
           <a:p>
             <a:fld id="{95CCC2EB-502C-49A7-9CC4-85002E026034}" type="datetimeFigureOut">
               <a:rPr lang="pl-PL" smtClean="0"/>
-              <a:t>04.10.2019</a:t>
+              <a:t>05.10.2019</a:t>
             </a:fld>
             <a:endParaRPr lang="pl-PL"/>
           </a:p>
@@ -8066,7 +8178,7 @@
           <a:p>
             <a:fld id="{95CCC2EB-502C-49A7-9CC4-85002E026034}" type="datetimeFigureOut">
               <a:rPr lang="pl-PL" smtClean="0"/>
-              <a:t>04.10.2019</a:t>
+              <a:t>05.10.2019</a:t>
             </a:fld>
             <a:endParaRPr lang="pl-PL"/>
           </a:p>
@@ -19901,6 +20013,1143 @@
     <p:extLst>
       <p:ext uri="{BB962C8B-B14F-4D97-AF65-F5344CB8AC3E}">
         <p14:creationId xmlns:p14="http://schemas.microsoft.com/office/powerpoint/2010/main" val="2072663024"/>
+      </p:ext>
+    </p:extLst>
+  </p:cSld>
+  <p:clrMapOvr>
+    <a:masterClrMapping/>
+  </p:clrMapOvr>
+</p:sld>
+</file>
+
+<file path=ppt/slides/slide21.xml><?xml version="1.0" encoding="utf-8"?>
+<p:sld xmlns:a="http://schemas.openxmlformats.org/drawingml/2006/main" xmlns:r="http://schemas.openxmlformats.org/officeDocument/2006/relationships" xmlns:p="http://schemas.openxmlformats.org/presentationml/2006/main">
+  <p:cSld>
+    <p:spTree>
+      <p:nvGrpSpPr>
+        <p:cNvPr id="1" name=""/>
+        <p:cNvGrpSpPr/>
+        <p:nvPr/>
+      </p:nvGrpSpPr>
+      <p:grpSpPr>
+        <a:xfrm>
+          <a:off x="0" y="0"/>
+          <a:ext cx="0" cy="0"/>
+          <a:chOff x="0" y="0"/>
+          <a:chExt cx="0" cy="0"/>
+        </a:xfrm>
+      </p:grpSpPr>
+      <p:sp>
+        <p:nvSpPr>
+          <p:cNvPr id="4" name="pole tekstowe 3">
+            <a:extLst>
+              <a:ext uri="{FF2B5EF4-FFF2-40B4-BE49-F238E27FC236}">
+                <a16:creationId xmlns:a16="http://schemas.microsoft.com/office/drawing/2014/main" id="{F164A7B3-8808-414C-9401-3B25194E3B5A}"/>
+              </a:ext>
+            </a:extLst>
+          </p:cNvPr>
+          <p:cNvSpPr txBox="1"/>
+          <p:nvPr/>
+        </p:nvSpPr>
+        <p:spPr>
+          <a:xfrm>
+            <a:off x="497840" y="538480"/>
+            <a:ext cx="2368982" cy="369332"/>
+          </a:xfrm>
+          <a:prstGeom prst="rect">
+            <a:avLst/>
+          </a:prstGeom>
+          <a:noFill/>
+        </p:spPr>
+        <p:txBody>
+          <a:bodyPr wrap="none" rtlCol="0">
+            <a:spAutoFit/>
+          </a:bodyPr>
+          <a:lstStyle/>
+          <a:p>
+            <a:r>
+              <a:rPr lang="pl-PL" dirty="0"/>
+              <a:t>Router - </a:t>
+            </a:r>
+            <a:r>
+              <a:rPr lang="pl-PL" dirty="0" err="1"/>
+              <a:t>authentication</a:t>
+            </a:r>
+            <a:endParaRPr lang="pl-PL" dirty="0"/>
+          </a:p>
+        </p:txBody>
+      </p:sp>
+      <p:sp>
+        <p:nvSpPr>
+          <p:cNvPr id="6" name="Prostokąt 5">
+            <a:extLst>
+              <a:ext uri="{FF2B5EF4-FFF2-40B4-BE49-F238E27FC236}">
+                <a16:creationId xmlns:a16="http://schemas.microsoft.com/office/drawing/2014/main" id="{753EBEB0-65AA-48E7-A654-75BD34D5E9F5}"/>
+              </a:ext>
+            </a:extLst>
+          </p:cNvPr>
+          <p:cNvSpPr/>
+          <p:nvPr/>
+        </p:nvSpPr>
+        <p:spPr>
+          <a:xfrm>
+            <a:off x="248920" y="1601571"/>
+            <a:ext cx="11694160" cy="2585323"/>
+          </a:xfrm>
+          <a:prstGeom prst="rect">
+            <a:avLst/>
+          </a:prstGeom>
+          <a:solidFill>
+            <a:schemeClr val="tx1"/>
+          </a:solidFill>
+        </p:spPr>
+        <p:txBody>
+          <a:bodyPr wrap="square">
+            <a:spAutoFit/>
+          </a:bodyPr>
+          <a:lstStyle/>
+          <a:p>
+            <a:r>
+              <a:rPr lang="pl-PL" dirty="0" err="1">
+                <a:solidFill>
+                  <a:srgbClr val="569CD6"/>
+                </a:solidFill>
+                <a:latin typeface="Consolas" panose="020B0609020204030204" pitchFamily="49" charset="0"/>
+              </a:rPr>
+              <a:t>function</a:t>
+            </a:r>
+            <a:r>
+              <a:rPr lang="pl-PL" dirty="0">
+                <a:solidFill>
+                  <a:srgbClr val="D4D4D4"/>
+                </a:solidFill>
+                <a:latin typeface="Consolas" panose="020B0609020204030204" pitchFamily="49" charset="0"/>
+              </a:rPr>
+              <a:t> </a:t>
+            </a:r>
+            <a:r>
+              <a:rPr lang="pl-PL" dirty="0" err="1">
+                <a:solidFill>
+                  <a:srgbClr val="DCDCAA"/>
+                </a:solidFill>
+                <a:latin typeface="Consolas" panose="020B0609020204030204" pitchFamily="49" charset="0"/>
+              </a:rPr>
+              <a:t>PrivateRoute</a:t>
+            </a:r>
+            <a:r>
+              <a:rPr lang="pl-PL" dirty="0">
+                <a:solidFill>
+                  <a:srgbClr val="D4D4D4"/>
+                </a:solidFill>
+                <a:latin typeface="Consolas" panose="020B0609020204030204" pitchFamily="49" charset="0"/>
+              </a:rPr>
+              <a:t>({ </a:t>
+            </a:r>
+            <a:r>
+              <a:rPr lang="pl-PL" dirty="0">
+                <a:solidFill>
+                  <a:srgbClr val="9CDCFE"/>
+                </a:solidFill>
+                <a:latin typeface="Consolas" panose="020B0609020204030204" pitchFamily="49" charset="0"/>
+              </a:rPr>
+              <a:t>component</a:t>
+            </a:r>
+            <a:r>
+              <a:rPr lang="pl-PL" dirty="0">
+                <a:solidFill>
+                  <a:srgbClr val="D4D4D4"/>
+                </a:solidFill>
+                <a:latin typeface="Consolas" panose="020B0609020204030204" pitchFamily="49" charset="0"/>
+              </a:rPr>
+              <a:t>: </a:t>
+            </a:r>
+            <a:r>
+              <a:rPr lang="pl-PL" dirty="0">
+                <a:solidFill>
+                  <a:srgbClr val="9CDCFE"/>
+                </a:solidFill>
+                <a:latin typeface="Consolas" panose="020B0609020204030204" pitchFamily="49" charset="0"/>
+              </a:rPr>
+              <a:t>Component</a:t>
+            </a:r>
+            <a:r>
+              <a:rPr lang="pl-PL" dirty="0">
+                <a:solidFill>
+                  <a:srgbClr val="D4D4D4"/>
+                </a:solidFill>
+                <a:latin typeface="Consolas" panose="020B0609020204030204" pitchFamily="49" charset="0"/>
+              </a:rPr>
+              <a:t>, ...</a:t>
+            </a:r>
+            <a:r>
+              <a:rPr lang="pl-PL" dirty="0" err="1">
+                <a:solidFill>
+                  <a:srgbClr val="9CDCFE"/>
+                </a:solidFill>
+                <a:latin typeface="Consolas" panose="020B0609020204030204" pitchFamily="49" charset="0"/>
+              </a:rPr>
+              <a:t>rest</a:t>
+            </a:r>
+            <a:r>
+              <a:rPr lang="pl-PL" dirty="0">
+                <a:solidFill>
+                  <a:srgbClr val="D4D4D4"/>
+                </a:solidFill>
+                <a:latin typeface="Consolas" panose="020B0609020204030204" pitchFamily="49" charset="0"/>
+              </a:rPr>
+              <a:t> }) {</a:t>
+            </a:r>
+          </a:p>
+          <a:p>
+            <a:r>
+              <a:rPr lang="pl-PL" dirty="0">
+                <a:solidFill>
+                  <a:srgbClr val="D4D4D4"/>
+                </a:solidFill>
+                <a:latin typeface="Consolas" panose="020B0609020204030204" pitchFamily="49" charset="0"/>
+              </a:rPr>
+              <a:t>    </a:t>
+            </a:r>
+            <a:r>
+              <a:rPr lang="pl-PL" dirty="0">
+                <a:solidFill>
+                  <a:srgbClr val="C586C0"/>
+                </a:solidFill>
+                <a:latin typeface="Consolas" panose="020B0609020204030204" pitchFamily="49" charset="0"/>
+              </a:rPr>
+              <a:t>return</a:t>
+            </a:r>
+            <a:r>
+              <a:rPr lang="pl-PL" dirty="0">
+                <a:solidFill>
+                  <a:srgbClr val="D4D4D4"/>
+                </a:solidFill>
+                <a:latin typeface="Consolas" panose="020B0609020204030204" pitchFamily="49" charset="0"/>
+              </a:rPr>
+              <a:t> (</a:t>
+            </a:r>
+          </a:p>
+          <a:p>
+            <a:r>
+              <a:rPr lang="pl-PL" dirty="0">
+                <a:solidFill>
+                  <a:srgbClr val="D4D4D4"/>
+                </a:solidFill>
+                <a:latin typeface="Consolas" panose="020B0609020204030204" pitchFamily="49" charset="0"/>
+              </a:rPr>
+              <a:t>        </a:t>
+            </a:r>
+            <a:r>
+              <a:rPr lang="pl-PL" dirty="0">
+                <a:solidFill>
+                  <a:srgbClr val="808080"/>
+                </a:solidFill>
+                <a:latin typeface="Consolas" panose="020B0609020204030204" pitchFamily="49" charset="0"/>
+              </a:rPr>
+              <a:t>&lt;</a:t>
+            </a:r>
+            <a:r>
+              <a:rPr lang="pl-PL" dirty="0" err="1">
+                <a:solidFill>
+                  <a:srgbClr val="4EC9B0"/>
+                </a:solidFill>
+                <a:latin typeface="Consolas" panose="020B0609020204030204" pitchFamily="49" charset="0"/>
+              </a:rPr>
+              <a:t>Route</a:t>
+            </a:r>
+            <a:r>
+              <a:rPr lang="pl-PL" dirty="0">
+                <a:solidFill>
+                  <a:srgbClr val="D4D4D4"/>
+                </a:solidFill>
+                <a:latin typeface="Consolas" panose="020B0609020204030204" pitchFamily="49" charset="0"/>
+              </a:rPr>
+              <a:t> </a:t>
+            </a:r>
+            <a:r>
+              <a:rPr lang="pl-PL" dirty="0">
+                <a:solidFill>
+                  <a:srgbClr val="569CD6"/>
+                </a:solidFill>
+                <a:latin typeface="Consolas" panose="020B0609020204030204" pitchFamily="49" charset="0"/>
+              </a:rPr>
+              <a:t>{</a:t>
+            </a:r>
+            <a:r>
+              <a:rPr lang="pl-PL" dirty="0">
+                <a:solidFill>
+                  <a:srgbClr val="D4D4D4"/>
+                </a:solidFill>
+                <a:latin typeface="Consolas" panose="020B0609020204030204" pitchFamily="49" charset="0"/>
+              </a:rPr>
+              <a:t>...</a:t>
+            </a:r>
+            <a:r>
+              <a:rPr lang="pl-PL" dirty="0" err="1">
+                <a:solidFill>
+                  <a:srgbClr val="9CDCFE"/>
+                </a:solidFill>
+                <a:latin typeface="Consolas" panose="020B0609020204030204" pitchFamily="49" charset="0"/>
+              </a:rPr>
+              <a:t>rest</a:t>
+            </a:r>
+            <a:r>
+              <a:rPr lang="pl-PL" dirty="0">
+                <a:solidFill>
+                  <a:srgbClr val="569CD6"/>
+                </a:solidFill>
+                <a:latin typeface="Consolas" panose="020B0609020204030204" pitchFamily="49" charset="0"/>
+              </a:rPr>
+              <a:t>}</a:t>
+            </a:r>
+            <a:r>
+              <a:rPr lang="pl-PL" dirty="0">
+                <a:solidFill>
+                  <a:srgbClr val="D4D4D4"/>
+                </a:solidFill>
+                <a:latin typeface="Consolas" panose="020B0609020204030204" pitchFamily="49" charset="0"/>
+              </a:rPr>
+              <a:t> </a:t>
+            </a:r>
+            <a:r>
+              <a:rPr lang="pl-PL" dirty="0" err="1">
+                <a:solidFill>
+                  <a:srgbClr val="9CDCFE"/>
+                </a:solidFill>
+                <a:latin typeface="Consolas" panose="020B0609020204030204" pitchFamily="49" charset="0"/>
+              </a:rPr>
+              <a:t>render</a:t>
+            </a:r>
+            <a:r>
+              <a:rPr lang="pl-PL" dirty="0">
+                <a:solidFill>
+                  <a:srgbClr val="D4D4D4"/>
+                </a:solidFill>
+                <a:latin typeface="Consolas" panose="020B0609020204030204" pitchFamily="49" charset="0"/>
+              </a:rPr>
+              <a:t>=</a:t>
+            </a:r>
+            <a:r>
+              <a:rPr lang="pl-PL" dirty="0">
+                <a:solidFill>
+                  <a:srgbClr val="569CD6"/>
+                </a:solidFill>
+                <a:latin typeface="Consolas" panose="020B0609020204030204" pitchFamily="49" charset="0"/>
+              </a:rPr>
+              <a:t>{</a:t>
+            </a:r>
+            <a:r>
+              <a:rPr lang="pl-PL" dirty="0">
+                <a:solidFill>
+                  <a:srgbClr val="D4D4D4"/>
+                </a:solidFill>
+                <a:latin typeface="Consolas" panose="020B0609020204030204" pitchFamily="49" charset="0"/>
+              </a:rPr>
+              <a:t>(</a:t>
+            </a:r>
+            <a:r>
+              <a:rPr lang="pl-PL" dirty="0" err="1">
+                <a:solidFill>
+                  <a:srgbClr val="9CDCFE"/>
+                </a:solidFill>
+                <a:latin typeface="Consolas" panose="020B0609020204030204" pitchFamily="49" charset="0"/>
+              </a:rPr>
+              <a:t>props</a:t>
+            </a:r>
+            <a:r>
+              <a:rPr lang="pl-PL" dirty="0">
+                <a:solidFill>
+                  <a:srgbClr val="D4D4D4"/>
+                </a:solidFill>
+                <a:latin typeface="Consolas" panose="020B0609020204030204" pitchFamily="49" charset="0"/>
+              </a:rPr>
+              <a:t>) </a:t>
+            </a:r>
+            <a:r>
+              <a:rPr lang="pl-PL" dirty="0">
+                <a:solidFill>
+                  <a:srgbClr val="569CD6"/>
+                </a:solidFill>
+                <a:latin typeface="Consolas" panose="020B0609020204030204" pitchFamily="49" charset="0"/>
+              </a:rPr>
+              <a:t>=&gt;</a:t>
+            </a:r>
+            <a:r>
+              <a:rPr lang="pl-PL" dirty="0">
+                <a:solidFill>
+                  <a:srgbClr val="D4D4D4"/>
+                </a:solidFill>
+                <a:latin typeface="Consolas" panose="020B0609020204030204" pitchFamily="49" charset="0"/>
+              </a:rPr>
+              <a:t> (</a:t>
+            </a:r>
+            <a:r>
+              <a:rPr lang="pl-PL" dirty="0" err="1">
+                <a:solidFill>
+                  <a:srgbClr val="9CDCFE"/>
+                </a:solidFill>
+                <a:latin typeface="Consolas" panose="020B0609020204030204" pitchFamily="49" charset="0"/>
+              </a:rPr>
+              <a:t>isAuthentictedLogic</a:t>
+            </a:r>
+            <a:r>
+              <a:rPr lang="pl-PL" dirty="0">
+                <a:solidFill>
+                  <a:srgbClr val="D4D4D4"/>
+                </a:solidFill>
+                <a:latin typeface="Consolas" panose="020B0609020204030204" pitchFamily="49" charset="0"/>
+              </a:rPr>
+              <a:t>) ?</a:t>
+            </a:r>
+          </a:p>
+          <a:p>
+            <a:r>
+              <a:rPr lang="pl-PL" dirty="0">
+                <a:solidFill>
+                  <a:srgbClr val="D4D4D4"/>
+                </a:solidFill>
+                <a:latin typeface="Consolas" panose="020B0609020204030204" pitchFamily="49" charset="0"/>
+              </a:rPr>
+              <a:t>            (</a:t>
+            </a:r>
+            <a:r>
+              <a:rPr lang="pl-PL" dirty="0">
+                <a:solidFill>
+                  <a:srgbClr val="808080"/>
+                </a:solidFill>
+                <a:latin typeface="Consolas" panose="020B0609020204030204" pitchFamily="49" charset="0"/>
+              </a:rPr>
+              <a:t>&lt;</a:t>
+            </a:r>
+            <a:r>
+              <a:rPr lang="pl-PL" dirty="0">
+                <a:solidFill>
+                  <a:srgbClr val="4EC9B0"/>
+                </a:solidFill>
+                <a:latin typeface="Consolas" panose="020B0609020204030204" pitchFamily="49" charset="0"/>
+              </a:rPr>
+              <a:t>Component</a:t>
+            </a:r>
+            <a:r>
+              <a:rPr lang="pl-PL" dirty="0">
+                <a:solidFill>
+                  <a:srgbClr val="D4D4D4"/>
+                </a:solidFill>
+                <a:latin typeface="Consolas" panose="020B0609020204030204" pitchFamily="49" charset="0"/>
+              </a:rPr>
+              <a:t> </a:t>
+            </a:r>
+            <a:r>
+              <a:rPr lang="pl-PL" dirty="0">
+                <a:solidFill>
+                  <a:srgbClr val="569CD6"/>
+                </a:solidFill>
+                <a:latin typeface="Consolas" panose="020B0609020204030204" pitchFamily="49" charset="0"/>
+              </a:rPr>
+              <a:t>{</a:t>
+            </a:r>
+            <a:r>
+              <a:rPr lang="pl-PL" dirty="0">
+                <a:solidFill>
+                  <a:srgbClr val="D4D4D4"/>
+                </a:solidFill>
+                <a:latin typeface="Consolas" panose="020B0609020204030204" pitchFamily="49" charset="0"/>
+              </a:rPr>
+              <a:t>...</a:t>
+            </a:r>
+            <a:r>
+              <a:rPr lang="pl-PL" dirty="0" err="1">
+                <a:solidFill>
+                  <a:srgbClr val="9CDCFE"/>
+                </a:solidFill>
+                <a:latin typeface="Consolas" panose="020B0609020204030204" pitchFamily="49" charset="0"/>
+              </a:rPr>
+              <a:t>props</a:t>
+            </a:r>
+            <a:r>
+              <a:rPr lang="pl-PL" dirty="0">
+                <a:solidFill>
+                  <a:srgbClr val="569CD6"/>
+                </a:solidFill>
+                <a:latin typeface="Consolas" panose="020B0609020204030204" pitchFamily="49" charset="0"/>
+              </a:rPr>
+              <a:t>}</a:t>
+            </a:r>
+            <a:r>
+              <a:rPr lang="pl-PL" dirty="0">
+                <a:solidFill>
+                  <a:srgbClr val="D4D4D4"/>
+                </a:solidFill>
+                <a:latin typeface="Consolas" panose="020B0609020204030204" pitchFamily="49" charset="0"/>
+              </a:rPr>
+              <a:t> </a:t>
+            </a:r>
+            <a:r>
+              <a:rPr lang="pl-PL" dirty="0">
+                <a:solidFill>
+                  <a:srgbClr val="808080"/>
+                </a:solidFill>
+                <a:latin typeface="Consolas" panose="020B0609020204030204" pitchFamily="49" charset="0"/>
+              </a:rPr>
+              <a:t>/&gt;</a:t>
+            </a:r>
+            <a:r>
+              <a:rPr lang="pl-PL" dirty="0">
+                <a:solidFill>
+                  <a:srgbClr val="D4D4D4"/>
+                </a:solidFill>
+                <a:latin typeface="Consolas" panose="020B0609020204030204" pitchFamily="49" charset="0"/>
+              </a:rPr>
+              <a:t>) :</a:t>
+            </a:r>
+          </a:p>
+          <a:p>
+            <a:r>
+              <a:rPr lang="pl-PL" dirty="0">
+                <a:solidFill>
+                  <a:srgbClr val="D4D4D4"/>
+                </a:solidFill>
+                <a:latin typeface="Consolas" panose="020B0609020204030204" pitchFamily="49" charset="0"/>
+              </a:rPr>
+              <a:t>            (</a:t>
+            </a:r>
+            <a:r>
+              <a:rPr lang="pl-PL" dirty="0">
+                <a:solidFill>
+                  <a:srgbClr val="808080"/>
+                </a:solidFill>
+                <a:latin typeface="Consolas" panose="020B0609020204030204" pitchFamily="49" charset="0"/>
+              </a:rPr>
+              <a:t>&lt;</a:t>
+            </a:r>
+            <a:r>
+              <a:rPr lang="pl-PL" dirty="0" err="1">
+                <a:solidFill>
+                  <a:srgbClr val="4EC9B0"/>
+                </a:solidFill>
+                <a:latin typeface="Consolas" panose="020B0609020204030204" pitchFamily="49" charset="0"/>
+              </a:rPr>
+              <a:t>Redirect</a:t>
+            </a:r>
+            <a:r>
+              <a:rPr lang="pl-PL" dirty="0">
+                <a:solidFill>
+                  <a:srgbClr val="D4D4D4"/>
+                </a:solidFill>
+                <a:latin typeface="Consolas" panose="020B0609020204030204" pitchFamily="49" charset="0"/>
+              </a:rPr>
+              <a:t> </a:t>
+            </a:r>
+            <a:r>
+              <a:rPr lang="pl-PL" dirty="0">
+                <a:solidFill>
+                  <a:srgbClr val="9CDCFE"/>
+                </a:solidFill>
+                <a:latin typeface="Consolas" panose="020B0609020204030204" pitchFamily="49" charset="0"/>
+              </a:rPr>
+              <a:t>to</a:t>
+            </a:r>
+            <a:r>
+              <a:rPr lang="pl-PL" dirty="0">
+                <a:solidFill>
+                  <a:srgbClr val="D4D4D4"/>
+                </a:solidFill>
+                <a:latin typeface="Consolas" panose="020B0609020204030204" pitchFamily="49" charset="0"/>
+              </a:rPr>
+              <a:t>=</a:t>
+            </a:r>
+            <a:r>
+              <a:rPr lang="pl-PL" dirty="0">
+                <a:solidFill>
+                  <a:srgbClr val="569CD6"/>
+                </a:solidFill>
+                <a:latin typeface="Consolas" panose="020B0609020204030204" pitchFamily="49" charset="0"/>
+              </a:rPr>
+              <a:t>{</a:t>
+            </a:r>
+            <a:r>
+              <a:rPr lang="pl-PL" dirty="0">
+                <a:solidFill>
+                  <a:srgbClr val="D4D4D4"/>
+                </a:solidFill>
+                <a:latin typeface="Consolas" panose="020B0609020204030204" pitchFamily="49" charset="0"/>
+              </a:rPr>
+              <a:t>{ </a:t>
+            </a:r>
+            <a:r>
+              <a:rPr lang="pl-PL" dirty="0" err="1">
+                <a:solidFill>
+                  <a:srgbClr val="9CDCFE"/>
+                </a:solidFill>
+                <a:latin typeface="Consolas" panose="020B0609020204030204" pitchFamily="49" charset="0"/>
+              </a:rPr>
+              <a:t>pathname</a:t>
+            </a:r>
+            <a:r>
+              <a:rPr lang="pl-PL" dirty="0">
+                <a:solidFill>
+                  <a:srgbClr val="9CDCFE"/>
+                </a:solidFill>
+                <a:latin typeface="Consolas" panose="020B0609020204030204" pitchFamily="49" charset="0"/>
+              </a:rPr>
+              <a:t>:</a:t>
+            </a:r>
+            <a:r>
+              <a:rPr lang="pl-PL" dirty="0">
+                <a:solidFill>
+                  <a:srgbClr val="D4D4D4"/>
+                </a:solidFill>
+                <a:latin typeface="Consolas" panose="020B0609020204030204" pitchFamily="49" charset="0"/>
+              </a:rPr>
+              <a:t> </a:t>
+            </a:r>
+            <a:r>
+              <a:rPr lang="pl-PL" dirty="0">
+                <a:solidFill>
+                  <a:srgbClr val="CE9178"/>
+                </a:solidFill>
+                <a:latin typeface="Consolas" panose="020B0609020204030204" pitchFamily="49" charset="0"/>
+              </a:rPr>
+              <a:t>"/</a:t>
+            </a:r>
+            <a:r>
+              <a:rPr lang="pl-PL" dirty="0" err="1">
+                <a:solidFill>
+                  <a:srgbClr val="CE9178"/>
+                </a:solidFill>
+                <a:latin typeface="Consolas" panose="020B0609020204030204" pitchFamily="49" charset="0"/>
+              </a:rPr>
+              <a:t>noAccess</a:t>
+            </a:r>
+            <a:r>
+              <a:rPr lang="pl-PL" dirty="0">
+                <a:solidFill>
+                  <a:srgbClr val="CE9178"/>
+                </a:solidFill>
+                <a:latin typeface="Consolas" panose="020B0609020204030204" pitchFamily="49" charset="0"/>
+              </a:rPr>
+              <a:t>"</a:t>
+            </a:r>
+            <a:r>
+              <a:rPr lang="pl-PL" dirty="0">
+                <a:solidFill>
+                  <a:srgbClr val="D4D4D4"/>
+                </a:solidFill>
+                <a:latin typeface="Consolas" panose="020B0609020204030204" pitchFamily="49" charset="0"/>
+              </a:rPr>
+              <a:t>, </a:t>
+            </a:r>
+            <a:r>
+              <a:rPr lang="pl-PL" dirty="0" err="1">
+                <a:solidFill>
+                  <a:srgbClr val="9CDCFE"/>
+                </a:solidFill>
+                <a:latin typeface="Consolas" panose="020B0609020204030204" pitchFamily="49" charset="0"/>
+              </a:rPr>
+              <a:t>state</a:t>
+            </a:r>
+            <a:r>
+              <a:rPr lang="pl-PL" dirty="0">
+                <a:solidFill>
+                  <a:srgbClr val="9CDCFE"/>
+                </a:solidFill>
+                <a:latin typeface="Consolas" panose="020B0609020204030204" pitchFamily="49" charset="0"/>
+              </a:rPr>
+              <a:t>:</a:t>
+            </a:r>
+            <a:r>
+              <a:rPr lang="pl-PL" dirty="0">
+                <a:solidFill>
+                  <a:srgbClr val="D4D4D4"/>
+                </a:solidFill>
+                <a:latin typeface="Consolas" panose="020B0609020204030204" pitchFamily="49" charset="0"/>
+              </a:rPr>
+              <a:t> { </a:t>
+            </a:r>
+            <a:r>
+              <a:rPr lang="pl-PL" dirty="0">
+                <a:solidFill>
+                  <a:srgbClr val="9CDCFE"/>
+                </a:solidFill>
+                <a:latin typeface="Consolas" panose="020B0609020204030204" pitchFamily="49" charset="0"/>
+              </a:rPr>
+              <a:t>from:</a:t>
+            </a:r>
+            <a:r>
+              <a:rPr lang="pl-PL" dirty="0">
+                <a:solidFill>
+                  <a:srgbClr val="D4D4D4"/>
+                </a:solidFill>
+                <a:latin typeface="Consolas" panose="020B0609020204030204" pitchFamily="49" charset="0"/>
+              </a:rPr>
+              <a:t> </a:t>
+            </a:r>
+            <a:r>
+              <a:rPr lang="pl-PL" dirty="0" err="1">
+                <a:solidFill>
+                  <a:srgbClr val="9CDCFE"/>
+                </a:solidFill>
+                <a:latin typeface="Consolas" panose="020B0609020204030204" pitchFamily="49" charset="0"/>
+              </a:rPr>
+              <a:t>props</a:t>
+            </a:r>
+            <a:r>
+              <a:rPr lang="pl-PL" dirty="0" err="1">
+                <a:solidFill>
+                  <a:srgbClr val="D4D4D4"/>
+                </a:solidFill>
+                <a:latin typeface="Consolas" panose="020B0609020204030204" pitchFamily="49" charset="0"/>
+              </a:rPr>
+              <a:t>.</a:t>
+            </a:r>
+            <a:r>
+              <a:rPr lang="pl-PL" dirty="0" err="1">
+                <a:solidFill>
+                  <a:srgbClr val="9CDCFE"/>
+                </a:solidFill>
+                <a:latin typeface="Consolas" panose="020B0609020204030204" pitchFamily="49" charset="0"/>
+              </a:rPr>
+              <a:t>location</a:t>
+            </a:r>
+            <a:r>
+              <a:rPr lang="pl-PL" dirty="0">
+                <a:solidFill>
+                  <a:srgbClr val="D4D4D4"/>
+                </a:solidFill>
+                <a:latin typeface="Consolas" panose="020B0609020204030204" pitchFamily="49" charset="0"/>
+              </a:rPr>
+              <a:t> } }</a:t>
+            </a:r>
+            <a:r>
+              <a:rPr lang="pl-PL" dirty="0">
+                <a:solidFill>
+                  <a:srgbClr val="569CD6"/>
+                </a:solidFill>
+                <a:latin typeface="Consolas" panose="020B0609020204030204" pitchFamily="49" charset="0"/>
+              </a:rPr>
+              <a:t>}</a:t>
+            </a:r>
+            <a:r>
+              <a:rPr lang="pl-PL" dirty="0">
+                <a:solidFill>
+                  <a:srgbClr val="D4D4D4"/>
+                </a:solidFill>
+                <a:latin typeface="Consolas" panose="020B0609020204030204" pitchFamily="49" charset="0"/>
+              </a:rPr>
+              <a:t> </a:t>
+            </a:r>
+            <a:r>
+              <a:rPr lang="pl-PL" dirty="0">
+                <a:solidFill>
+                  <a:srgbClr val="808080"/>
+                </a:solidFill>
+                <a:latin typeface="Consolas" panose="020B0609020204030204" pitchFamily="49" charset="0"/>
+              </a:rPr>
+              <a:t>/&gt;</a:t>
+            </a:r>
+            <a:endParaRPr lang="pl-PL" dirty="0">
+              <a:solidFill>
+                <a:srgbClr val="D4D4D4"/>
+              </a:solidFill>
+              <a:latin typeface="Consolas" panose="020B0609020204030204" pitchFamily="49" charset="0"/>
+            </a:endParaRPr>
+          </a:p>
+          <a:p>
+            <a:r>
+              <a:rPr lang="pl-PL" dirty="0">
+                <a:solidFill>
+                  <a:srgbClr val="D4D4D4"/>
+                </a:solidFill>
+                <a:latin typeface="Consolas" panose="020B0609020204030204" pitchFamily="49" charset="0"/>
+              </a:rPr>
+              <a:t>            )</a:t>
+            </a:r>
+            <a:r>
+              <a:rPr lang="pl-PL" dirty="0">
+                <a:solidFill>
+                  <a:srgbClr val="569CD6"/>
+                </a:solidFill>
+                <a:latin typeface="Consolas" panose="020B0609020204030204" pitchFamily="49" charset="0"/>
+              </a:rPr>
+              <a:t>}</a:t>
+            </a:r>
+            <a:endParaRPr lang="pl-PL" dirty="0">
+              <a:solidFill>
+                <a:srgbClr val="D4D4D4"/>
+              </a:solidFill>
+              <a:latin typeface="Consolas" panose="020B0609020204030204" pitchFamily="49" charset="0"/>
+            </a:endParaRPr>
+          </a:p>
+          <a:p>
+            <a:r>
+              <a:rPr lang="pl-PL" dirty="0">
+                <a:solidFill>
+                  <a:srgbClr val="D4D4D4"/>
+                </a:solidFill>
+                <a:latin typeface="Consolas" panose="020B0609020204030204" pitchFamily="49" charset="0"/>
+              </a:rPr>
+              <a:t>        </a:t>
+            </a:r>
+            <a:r>
+              <a:rPr lang="pl-PL" dirty="0">
+                <a:solidFill>
+                  <a:srgbClr val="808080"/>
+                </a:solidFill>
+                <a:latin typeface="Consolas" panose="020B0609020204030204" pitchFamily="49" charset="0"/>
+              </a:rPr>
+              <a:t>/&gt;</a:t>
+            </a:r>
+            <a:endParaRPr lang="pl-PL" dirty="0">
+              <a:solidFill>
+                <a:srgbClr val="D4D4D4"/>
+              </a:solidFill>
+              <a:latin typeface="Consolas" panose="020B0609020204030204" pitchFamily="49" charset="0"/>
+            </a:endParaRPr>
+          </a:p>
+          <a:p>
+            <a:r>
+              <a:rPr lang="pl-PL" dirty="0">
+                <a:solidFill>
+                  <a:srgbClr val="D4D4D4"/>
+                </a:solidFill>
+                <a:latin typeface="Consolas" panose="020B0609020204030204" pitchFamily="49" charset="0"/>
+              </a:rPr>
+              <a:t>    );</a:t>
+            </a:r>
+          </a:p>
+          <a:p>
+            <a:r>
+              <a:rPr lang="pl-PL" dirty="0">
+                <a:solidFill>
+                  <a:srgbClr val="D4D4D4"/>
+                </a:solidFill>
+                <a:latin typeface="Consolas" panose="020B0609020204030204" pitchFamily="49" charset="0"/>
+              </a:rPr>
+              <a:t>}</a:t>
+            </a:r>
+            <a:endParaRPr lang="pl-PL" b="0" dirty="0">
+              <a:solidFill>
+                <a:srgbClr val="D4D4D4"/>
+              </a:solidFill>
+              <a:effectLst/>
+              <a:latin typeface="Consolas" panose="020B0609020204030204" pitchFamily="49" charset="0"/>
+            </a:endParaRPr>
+          </a:p>
+        </p:txBody>
+      </p:sp>
+      <p:sp>
+        <p:nvSpPr>
+          <p:cNvPr id="8" name="Prostokąt 7">
+            <a:extLst>
+              <a:ext uri="{FF2B5EF4-FFF2-40B4-BE49-F238E27FC236}">
+                <a16:creationId xmlns:a16="http://schemas.microsoft.com/office/drawing/2014/main" id="{CFC2D025-EC66-467C-8F77-245B7C2C1D59}"/>
+              </a:ext>
+            </a:extLst>
+          </p:cNvPr>
+          <p:cNvSpPr/>
+          <p:nvPr/>
+        </p:nvSpPr>
+        <p:spPr>
+          <a:xfrm>
+            <a:off x="1113181" y="4656264"/>
+            <a:ext cx="9753601" cy="646331"/>
+          </a:xfrm>
+          <a:prstGeom prst="rect">
+            <a:avLst/>
+          </a:prstGeom>
+          <a:solidFill>
+            <a:schemeClr val="tx1"/>
+          </a:solidFill>
+        </p:spPr>
+        <p:txBody>
+          <a:bodyPr wrap="square">
+            <a:spAutoFit/>
+          </a:bodyPr>
+          <a:lstStyle/>
+          <a:p>
+            <a:r>
+              <a:rPr lang="pl-PL" dirty="0">
+                <a:solidFill>
+                  <a:srgbClr val="808080"/>
+                </a:solidFill>
+                <a:latin typeface="Consolas" panose="020B0609020204030204" pitchFamily="49" charset="0"/>
+              </a:rPr>
+              <a:t>&lt;</a:t>
+            </a:r>
+            <a:r>
+              <a:rPr lang="pl-PL" dirty="0" err="1">
+                <a:solidFill>
+                  <a:srgbClr val="4EC9B0"/>
+                </a:solidFill>
+                <a:latin typeface="Consolas" panose="020B0609020204030204" pitchFamily="49" charset="0"/>
+              </a:rPr>
+              <a:t>PrivateRoute</a:t>
+            </a:r>
+            <a:r>
+              <a:rPr lang="pl-PL" dirty="0">
+                <a:solidFill>
+                  <a:srgbClr val="D4D4D4"/>
+                </a:solidFill>
+                <a:latin typeface="Consolas" panose="020B0609020204030204" pitchFamily="49" charset="0"/>
+              </a:rPr>
+              <a:t> </a:t>
+            </a:r>
+            <a:r>
+              <a:rPr lang="pl-PL" dirty="0" err="1">
+                <a:solidFill>
+                  <a:srgbClr val="9CDCFE"/>
+                </a:solidFill>
+                <a:latin typeface="Consolas" panose="020B0609020204030204" pitchFamily="49" charset="0"/>
+              </a:rPr>
+              <a:t>path</a:t>
+            </a:r>
+            <a:r>
+              <a:rPr lang="pl-PL" dirty="0">
+                <a:solidFill>
+                  <a:srgbClr val="D4D4D4"/>
+                </a:solidFill>
+                <a:latin typeface="Consolas" panose="020B0609020204030204" pitchFamily="49" charset="0"/>
+              </a:rPr>
+              <a:t>=</a:t>
+            </a:r>
+            <a:r>
+              <a:rPr lang="pl-PL" dirty="0">
+                <a:solidFill>
+                  <a:srgbClr val="CE9178"/>
+                </a:solidFill>
+                <a:latin typeface="Consolas" panose="020B0609020204030204" pitchFamily="49" charset="0"/>
+              </a:rPr>
+              <a:t>"/list"</a:t>
+            </a:r>
+            <a:r>
+              <a:rPr lang="pl-PL" dirty="0">
+                <a:solidFill>
+                  <a:srgbClr val="D4D4D4"/>
+                </a:solidFill>
+                <a:latin typeface="Consolas" panose="020B0609020204030204" pitchFamily="49" charset="0"/>
+              </a:rPr>
+              <a:t> </a:t>
+            </a:r>
+            <a:r>
+              <a:rPr lang="pl-PL" dirty="0">
+                <a:solidFill>
+                  <a:srgbClr val="9CDCFE"/>
+                </a:solidFill>
+                <a:latin typeface="Consolas" panose="020B0609020204030204" pitchFamily="49" charset="0"/>
+              </a:rPr>
+              <a:t>component</a:t>
+            </a:r>
+            <a:r>
+              <a:rPr lang="pl-PL" dirty="0">
+                <a:solidFill>
+                  <a:srgbClr val="D4D4D4"/>
+                </a:solidFill>
+                <a:latin typeface="Consolas" panose="020B0609020204030204" pitchFamily="49" charset="0"/>
+              </a:rPr>
+              <a:t>=</a:t>
+            </a:r>
+            <a:r>
+              <a:rPr lang="pl-PL" dirty="0">
+                <a:solidFill>
+                  <a:srgbClr val="569CD6"/>
+                </a:solidFill>
+                <a:latin typeface="Consolas" panose="020B0609020204030204" pitchFamily="49" charset="0"/>
+              </a:rPr>
+              <a:t>{</a:t>
+            </a:r>
+            <a:r>
+              <a:rPr lang="pl-PL" dirty="0">
+                <a:solidFill>
+                  <a:srgbClr val="9CDCFE"/>
+                </a:solidFill>
+                <a:latin typeface="Consolas" panose="020B0609020204030204" pitchFamily="49" charset="0"/>
+              </a:rPr>
+              <a:t>List</a:t>
+            </a:r>
+            <a:r>
+              <a:rPr lang="pl-PL" dirty="0">
+                <a:solidFill>
+                  <a:srgbClr val="569CD6"/>
+                </a:solidFill>
+                <a:latin typeface="Consolas" panose="020B0609020204030204" pitchFamily="49" charset="0"/>
+              </a:rPr>
+              <a:t>}</a:t>
+            </a:r>
+            <a:r>
+              <a:rPr lang="pl-PL" dirty="0">
+                <a:solidFill>
+                  <a:srgbClr val="808080"/>
+                </a:solidFill>
+                <a:latin typeface="Consolas" panose="020B0609020204030204" pitchFamily="49" charset="0"/>
+              </a:rPr>
+              <a:t>&gt;&lt;/</a:t>
+            </a:r>
+            <a:r>
+              <a:rPr lang="pl-PL" dirty="0" err="1">
+                <a:solidFill>
+                  <a:srgbClr val="4EC9B0"/>
+                </a:solidFill>
+                <a:latin typeface="Consolas" panose="020B0609020204030204" pitchFamily="49" charset="0"/>
+              </a:rPr>
+              <a:t>PrivateRoute</a:t>
+            </a:r>
+            <a:r>
+              <a:rPr lang="pl-PL" dirty="0">
+                <a:solidFill>
+                  <a:srgbClr val="808080"/>
+                </a:solidFill>
+                <a:latin typeface="Consolas" panose="020B0609020204030204" pitchFamily="49" charset="0"/>
+              </a:rPr>
+              <a:t>&gt;</a:t>
+            </a:r>
+            <a:endParaRPr lang="pl-PL" dirty="0">
+              <a:solidFill>
+                <a:srgbClr val="D4D4D4"/>
+              </a:solidFill>
+              <a:latin typeface="Consolas" panose="020B0609020204030204" pitchFamily="49" charset="0"/>
+            </a:endParaRPr>
+          </a:p>
+          <a:p>
+            <a:r>
+              <a:rPr lang="pl-PL" dirty="0">
+                <a:solidFill>
+                  <a:srgbClr val="808080"/>
+                </a:solidFill>
+                <a:latin typeface="Consolas" panose="020B0609020204030204" pitchFamily="49" charset="0"/>
+              </a:rPr>
+              <a:t>&lt;</a:t>
+            </a:r>
+            <a:r>
+              <a:rPr lang="pl-PL" dirty="0" err="1">
+                <a:solidFill>
+                  <a:srgbClr val="4EC9B0"/>
+                </a:solidFill>
+                <a:latin typeface="Consolas" panose="020B0609020204030204" pitchFamily="49" charset="0"/>
+              </a:rPr>
+              <a:t>Route</a:t>
+            </a:r>
+            <a:r>
+              <a:rPr lang="pl-PL" dirty="0">
+                <a:solidFill>
+                  <a:srgbClr val="D4D4D4"/>
+                </a:solidFill>
+                <a:latin typeface="Consolas" panose="020B0609020204030204" pitchFamily="49" charset="0"/>
+              </a:rPr>
+              <a:t> </a:t>
+            </a:r>
+            <a:r>
+              <a:rPr lang="pl-PL" dirty="0" err="1">
+                <a:solidFill>
+                  <a:srgbClr val="9CDCFE"/>
+                </a:solidFill>
+                <a:latin typeface="Consolas" panose="020B0609020204030204" pitchFamily="49" charset="0"/>
+              </a:rPr>
+              <a:t>path</a:t>
+            </a:r>
+            <a:r>
+              <a:rPr lang="pl-PL" dirty="0">
+                <a:solidFill>
+                  <a:srgbClr val="D4D4D4"/>
+                </a:solidFill>
+                <a:latin typeface="Consolas" panose="020B0609020204030204" pitchFamily="49" charset="0"/>
+              </a:rPr>
+              <a:t>=</a:t>
+            </a:r>
+            <a:r>
+              <a:rPr lang="pl-PL" dirty="0">
+                <a:solidFill>
+                  <a:srgbClr val="CE9178"/>
+                </a:solidFill>
+                <a:latin typeface="Consolas" panose="020B0609020204030204" pitchFamily="49" charset="0"/>
+              </a:rPr>
+              <a:t>"/</a:t>
+            </a:r>
+            <a:r>
+              <a:rPr lang="pl-PL" dirty="0" err="1">
+                <a:solidFill>
+                  <a:srgbClr val="CE9178"/>
+                </a:solidFill>
+                <a:latin typeface="Consolas" panose="020B0609020204030204" pitchFamily="49" charset="0"/>
+              </a:rPr>
+              <a:t>noAccess</a:t>
+            </a:r>
+            <a:r>
+              <a:rPr lang="pl-PL" dirty="0">
+                <a:solidFill>
+                  <a:srgbClr val="CE9178"/>
+                </a:solidFill>
+                <a:latin typeface="Consolas" panose="020B0609020204030204" pitchFamily="49" charset="0"/>
+              </a:rPr>
+              <a:t>"</a:t>
+            </a:r>
+            <a:r>
+              <a:rPr lang="pl-PL" dirty="0">
+                <a:solidFill>
+                  <a:srgbClr val="808080"/>
+                </a:solidFill>
+                <a:latin typeface="Consolas" panose="020B0609020204030204" pitchFamily="49" charset="0"/>
+              </a:rPr>
+              <a:t>&gt;&lt;</a:t>
+            </a:r>
+            <a:r>
+              <a:rPr lang="pl-PL" dirty="0" err="1">
+                <a:solidFill>
+                  <a:srgbClr val="4EC9B0"/>
+                </a:solidFill>
+                <a:latin typeface="Consolas" panose="020B0609020204030204" pitchFamily="49" charset="0"/>
+              </a:rPr>
+              <a:t>NoAccess</a:t>
+            </a:r>
+            <a:r>
+              <a:rPr lang="pl-PL" dirty="0">
+                <a:solidFill>
+                  <a:srgbClr val="D4D4D4"/>
+                </a:solidFill>
+                <a:latin typeface="Consolas" panose="020B0609020204030204" pitchFamily="49" charset="0"/>
+              </a:rPr>
+              <a:t> </a:t>
+            </a:r>
+            <a:r>
+              <a:rPr lang="pl-PL" dirty="0">
+                <a:solidFill>
+                  <a:srgbClr val="808080"/>
+                </a:solidFill>
+                <a:latin typeface="Consolas" panose="020B0609020204030204" pitchFamily="49" charset="0"/>
+              </a:rPr>
+              <a:t>/&gt;&lt;/</a:t>
+            </a:r>
+            <a:r>
+              <a:rPr lang="pl-PL" dirty="0" err="1">
+                <a:solidFill>
+                  <a:srgbClr val="4EC9B0"/>
+                </a:solidFill>
+                <a:latin typeface="Consolas" panose="020B0609020204030204" pitchFamily="49" charset="0"/>
+              </a:rPr>
+              <a:t>Route</a:t>
+            </a:r>
+            <a:r>
+              <a:rPr lang="pl-PL" dirty="0">
+                <a:solidFill>
+                  <a:srgbClr val="808080"/>
+                </a:solidFill>
+                <a:latin typeface="Consolas" panose="020B0609020204030204" pitchFamily="49" charset="0"/>
+              </a:rPr>
+              <a:t>&gt;</a:t>
+            </a:r>
+            <a:endParaRPr lang="pl-PL" b="0" dirty="0">
+              <a:solidFill>
+                <a:srgbClr val="D4D4D4"/>
+              </a:solidFill>
+              <a:effectLst/>
+              <a:latin typeface="Consolas" panose="020B0609020204030204" pitchFamily="49" charset="0"/>
+            </a:endParaRPr>
+          </a:p>
+        </p:txBody>
+      </p:sp>
+    </p:spTree>
+    <p:extLst>
+      <p:ext uri="{BB962C8B-B14F-4D97-AF65-F5344CB8AC3E}">
+        <p14:creationId xmlns:p14="http://schemas.microsoft.com/office/powerpoint/2010/main" val="3139442367"/>
       </p:ext>
     </p:extLst>
   </p:cSld>

</xml_diff>

<commit_message>
Exercise 19: First unit tests for Menu
</commit_message>
<xml_diff>
--- a/tutorial/ReactjsTraining.pptx
+++ b/tutorial/ReactjsTraining.pptx
@@ -5,7 +5,7 @@
     <p:sldMasterId id="2147483648" r:id="rId1"/>
   </p:sldMasterIdLst>
   <p:notesMasterIdLst>
-    <p:notesMasterId r:id="rId23"/>
+    <p:notesMasterId r:id="rId27"/>
   </p:notesMasterIdLst>
   <p:sldIdLst>
     <p:sldId id="256" r:id="rId2"/>
@@ -29,6 +29,10 @@
     <p:sldId id="273" r:id="rId20"/>
     <p:sldId id="275" r:id="rId21"/>
     <p:sldId id="276" r:id="rId22"/>
+    <p:sldId id="277" r:id="rId23"/>
+    <p:sldId id="278" r:id="rId24"/>
+    <p:sldId id="279" r:id="rId25"/>
+    <p:sldId id="280" r:id="rId26"/>
   </p:sldIdLst>
   <p:sldSz cx="12192000" cy="6858000"/>
   <p:notesSz cx="6858000" cy="9144000"/>
@@ -4059,6 +4063,450 @@
     <p:extLst>
       <p:ext uri="{BB962C8B-B14F-4D97-AF65-F5344CB8AC3E}">
         <p14:creationId xmlns:p14="http://schemas.microsoft.com/office/powerpoint/2010/main" val="4282621687"/>
+      </p:ext>
+    </p:extLst>
+  </p:cSld>
+  <p:clrMapOvr>
+    <a:masterClrMapping/>
+  </p:clrMapOvr>
+</p:notes>
+</file>
+
+<file path=ppt/notesSlides/notesSlide22.xml><?xml version="1.0" encoding="utf-8"?>
+<p:notes xmlns:a="http://schemas.openxmlformats.org/drawingml/2006/main" xmlns:r="http://schemas.openxmlformats.org/officeDocument/2006/relationships" xmlns:p="http://schemas.openxmlformats.org/presentationml/2006/main">
+  <p:cSld>
+    <p:spTree>
+      <p:nvGrpSpPr>
+        <p:cNvPr id="1" name=""/>
+        <p:cNvGrpSpPr/>
+        <p:nvPr/>
+      </p:nvGrpSpPr>
+      <p:grpSpPr>
+        <a:xfrm>
+          <a:off x="0" y="0"/>
+          <a:ext cx="0" cy="0"/>
+          <a:chOff x="0" y="0"/>
+          <a:chExt cx="0" cy="0"/>
+        </a:xfrm>
+      </p:grpSpPr>
+      <p:sp>
+        <p:nvSpPr>
+          <p:cNvPr id="2" name="Symbol zastępczy obrazu slajdu 1"/>
+          <p:cNvSpPr>
+            <a:spLocks noGrp="1" noRot="1" noChangeAspect="1"/>
+          </p:cNvSpPr>
+          <p:nvPr>
+            <p:ph type="sldImg"/>
+          </p:nvPr>
+        </p:nvSpPr>
+        <p:spPr/>
+      </p:sp>
+      <p:sp>
+        <p:nvSpPr>
+          <p:cNvPr id="3" name="Symbol zastępczy notatek 2"/>
+          <p:cNvSpPr>
+            <a:spLocks noGrp="1"/>
+          </p:cNvSpPr>
+          <p:nvPr>
+            <p:ph type="body" idx="1"/>
+          </p:nvPr>
+        </p:nvSpPr>
+        <p:spPr/>
+        <p:txBody>
+          <a:bodyPr/>
+          <a:lstStyle/>
+          <a:p>
+            <a:pPr marL="0" indent="0">
+              <a:buFontTx/>
+              <a:buNone/>
+            </a:pPr>
+            <a:r>
+              <a:rPr lang="pl-PL" sz="1200" b="0" i="0" kern="1200" dirty="0" err="1">
+                <a:solidFill>
+                  <a:schemeClr val="tx1"/>
+                </a:solidFill>
+                <a:effectLst/>
+                <a:latin typeface="+mn-lt"/>
+                <a:ea typeface="+mn-ea"/>
+                <a:cs typeface="+mn-cs"/>
+              </a:rPr>
+              <a:t>Exercise</a:t>
+            </a:r>
+            <a:r>
+              <a:rPr lang="pl-PL" sz="1200" b="0" i="0" kern="1200" dirty="0">
+                <a:solidFill>
+                  <a:schemeClr val="tx1"/>
+                </a:solidFill>
+                <a:effectLst/>
+                <a:latin typeface="+mn-lt"/>
+                <a:ea typeface="+mn-ea"/>
+                <a:cs typeface="+mn-cs"/>
+              </a:rPr>
+              <a:t> 19: Napisać test do Menu, który sprawdzi czy menu w stanie pierwotnym zawiera wszystkie menu </a:t>
+            </a:r>
+            <a:r>
+              <a:rPr lang="pl-PL" sz="1200" b="0" i="0" kern="1200" dirty="0" err="1">
+                <a:solidFill>
+                  <a:schemeClr val="tx1"/>
+                </a:solidFill>
+                <a:effectLst/>
+                <a:latin typeface="+mn-lt"/>
+                <a:ea typeface="+mn-ea"/>
+                <a:cs typeface="+mn-cs"/>
+              </a:rPr>
+              <a:t>items</a:t>
+            </a:r>
+            <a:r>
+              <a:rPr lang="pl-PL" sz="1200" b="0" i="0" kern="1200" dirty="0">
+                <a:solidFill>
+                  <a:schemeClr val="tx1"/>
+                </a:solidFill>
+                <a:effectLst/>
+                <a:latin typeface="+mn-lt"/>
+                <a:ea typeface="+mn-ea"/>
+                <a:cs typeface="+mn-cs"/>
+              </a:rPr>
+              <a:t> oraz nie zawiera "</a:t>
+            </a:r>
+            <a:r>
+              <a:rPr lang="pl-PL" sz="1200" b="0" i="0" kern="1200">
+                <a:solidFill>
+                  <a:schemeClr val="tx1"/>
+                </a:solidFill>
+                <a:effectLst/>
+                <a:latin typeface="+mn-lt"/>
+                <a:ea typeface="+mn-ea"/>
+                <a:cs typeface="+mn-cs"/>
+              </a:rPr>
+              <a:t>Log out" oraz "Hello"</a:t>
+            </a:r>
+            <a:endParaRPr lang="pl-PL" sz="1200" b="0" i="0" kern="1200" dirty="0">
+              <a:solidFill>
+                <a:schemeClr val="tx1"/>
+              </a:solidFill>
+              <a:effectLst/>
+              <a:latin typeface="+mn-lt"/>
+              <a:ea typeface="+mn-ea"/>
+              <a:cs typeface="+mn-cs"/>
+            </a:endParaRPr>
+          </a:p>
+        </p:txBody>
+      </p:sp>
+      <p:sp>
+        <p:nvSpPr>
+          <p:cNvPr id="4" name="Symbol zastępczy numeru slajdu 3"/>
+          <p:cNvSpPr>
+            <a:spLocks noGrp="1"/>
+          </p:cNvSpPr>
+          <p:nvPr>
+            <p:ph type="sldNum" sz="quarter" idx="5"/>
+          </p:nvPr>
+        </p:nvSpPr>
+        <p:spPr/>
+        <p:txBody>
+          <a:bodyPr/>
+          <a:lstStyle/>
+          <a:p>
+            <a:fld id="{810A6612-7A23-4B98-B0E9-4F3C882AD2EF}" type="slidenum">
+              <a:rPr lang="pl-PL" smtClean="0"/>
+              <a:t>22</a:t>
+            </a:fld>
+            <a:endParaRPr lang="pl-PL"/>
+          </a:p>
+        </p:txBody>
+      </p:sp>
+    </p:spTree>
+    <p:extLst>
+      <p:ext uri="{BB962C8B-B14F-4D97-AF65-F5344CB8AC3E}">
+        <p14:creationId xmlns:p14="http://schemas.microsoft.com/office/powerpoint/2010/main" val="2408912903"/>
+      </p:ext>
+    </p:extLst>
+  </p:cSld>
+  <p:clrMapOvr>
+    <a:masterClrMapping/>
+  </p:clrMapOvr>
+</p:notes>
+</file>
+
+<file path=ppt/notesSlides/notesSlide23.xml><?xml version="1.0" encoding="utf-8"?>
+<p:notes xmlns:a="http://schemas.openxmlformats.org/drawingml/2006/main" xmlns:r="http://schemas.openxmlformats.org/officeDocument/2006/relationships" xmlns:p="http://schemas.openxmlformats.org/presentationml/2006/main">
+  <p:cSld>
+    <p:spTree>
+      <p:nvGrpSpPr>
+        <p:cNvPr id="1" name=""/>
+        <p:cNvGrpSpPr/>
+        <p:nvPr/>
+      </p:nvGrpSpPr>
+      <p:grpSpPr>
+        <a:xfrm>
+          <a:off x="0" y="0"/>
+          <a:ext cx="0" cy="0"/>
+          <a:chOff x="0" y="0"/>
+          <a:chExt cx="0" cy="0"/>
+        </a:xfrm>
+      </p:grpSpPr>
+      <p:sp>
+        <p:nvSpPr>
+          <p:cNvPr id="2" name="Symbol zastępczy obrazu slajdu 1"/>
+          <p:cNvSpPr>
+            <a:spLocks noGrp="1" noRot="1" noChangeAspect="1"/>
+          </p:cNvSpPr>
+          <p:nvPr>
+            <p:ph type="sldImg"/>
+          </p:nvPr>
+        </p:nvSpPr>
+        <p:spPr/>
+      </p:sp>
+      <p:sp>
+        <p:nvSpPr>
+          <p:cNvPr id="3" name="Symbol zastępczy notatek 2"/>
+          <p:cNvSpPr>
+            <a:spLocks noGrp="1"/>
+          </p:cNvSpPr>
+          <p:nvPr>
+            <p:ph type="body" idx="1"/>
+          </p:nvPr>
+        </p:nvSpPr>
+        <p:spPr/>
+        <p:txBody>
+          <a:bodyPr/>
+          <a:lstStyle/>
+          <a:p>
+            <a:pPr marL="0" indent="0">
+              <a:buFontTx/>
+              <a:buNone/>
+            </a:pPr>
+            <a:endParaRPr lang="pl-PL" sz="1200" b="0" i="0" kern="1200" dirty="0">
+              <a:solidFill>
+                <a:schemeClr val="tx1"/>
+              </a:solidFill>
+              <a:effectLst/>
+              <a:latin typeface="+mn-lt"/>
+              <a:ea typeface="+mn-ea"/>
+              <a:cs typeface="+mn-cs"/>
+            </a:endParaRPr>
+          </a:p>
+        </p:txBody>
+      </p:sp>
+      <p:sp>
+        <p:nvSpPr>
+          <p:cNvPr id="4" name="Symbol zastępczy numeru slajdu 3"/>
+          <p:cNvSpPr>
+            <a:spLocks noGrp="1"/>
+          </p:cNvSpPr>
+          <p:nvPr>
+            <p:ph type="sldNum" sz="quarter" idx="5"/>
+          </p:nvPr>
+        </p:nvSpPr>
+        <p:spPr/>
+        <p:txBody>
+          <a:bodyPr/>
+          <a:lstStyle/>
+          <a:p>
+            <a:fld id="{810A6612-7A23-4B98-B0E9-4F3C882AD2EF}" type="slidenum">
+              <a:rPr lang="pl-PL" smtClean="0"/>
+              <a:t>23</a:t>
+            </a:fld>
+            <a:endParaRPr lang="pl-PL"/>
+          </a:p>
+        </p:txBody>
+      </p:sp>
+    </p:spTree>
+    <p:extLst>
+      <p:ext uri="{BB962C8B-B14F-4D97-AF65-F5344CB8AC3E}">
+        <p14:creationId xmlns:p14="http://schemas.microsoft.com/office/powerpoint/2010/main" val="531511798"/>
+      </p:ext>
+    </p:extLst>
+  </p:cSld>
+  <p:clrMapOvr>
+    <a:masterClrMapping/>
+  </p:clrMapOvr>
+</p:notes>
+</file>
+
+<file path=ppt/notesSlides/notesSlide24.xml><?xml version="1.0" encoding="utf-8"?>
+<p:notes xmlns:a="http://schemas.openxmlformats.org/drawingml/2006/main" xmlns:r="http://schemas.openxmlformats.org/officeDocument/2006/relationships" xmlns:p="http://schemas.openxmlformats.org/presentationml/2006/main">
+  <p:cSld>
+    <p:spTree>
+      <p:nvGrpSpPr>
+        <p:cNvPr id="1" name=""/>
+        <p:cNvGrpSpPr/>
+        <p:nvPr/>
+      </p:nvGrpSpPr>
+      <p:grpSpPr>
+        <a:xfrm>
+          <a:off x="0" y="0"/>
+          <a:ext cx="0" cy="0"/>
+          <a:chOff x="0" y="0"/>
+          <a:chExt cx="0" cy="0"/>
+        </a:xfrm>
+      </p:grpSpPr>
+      <p:sp>
+        <p:nvSpPr>
+          <p:cNvPr id="2" name="Symbol zastępczy obrazu slajdu 1"/>
+          <p:cNvSpPr>
+            <a:spLocks noGrp="1" noRot="1" noChangeAspect="1"/>
+          </p:cNvSpPr>
+          <p:nvPr>
+            <p:ph type="sldImg"/>
+          </p:nvPr>
+        </p:nvSpPr>
+        <p:spPr/>
+      </p:sp>
+      <p:sp>
+        <p:nvSpPr>
+          <p:cNvPr id="3" name="Symbol zastępczy notatek 2"/>
+          <p:cNvSpPr>
+            <a:spLocks noGrp="1"/>
+          </p:cNvSpPr>
+          <p:nvPr>
+            <p:ph type="body" idx="1"/>
+          </p:nvPr>
+        </p:nvSpPr>
+        <p:spPr/>
+        <p:txBody>
+          <a:bodyPr/>
+          <a:lstStyle/>
+          <a:p>
+            <a:pPr marL="0" indent="0">
+              <a:buFontTx/>
+              <a:buNone/>
+            </a:pPr>
+            <a:endParaRPr lang="pl-PL" sz="1200" b="0" i="0" kern="1200" dirty="0">
+              <a:solidFill>
+                <a:schemeClr val="tx1"/>
+              </a:solidFill>
+              <a:effectLst/>
+              <a:latin typeface="+mn-lt"/>
+              <a:ea typeface="+mn-ea"/>
+              <a:cs typeface="+mn-cs"/>
+            </a:endParaRPr>
+          </a:p>
+        </p:txBody>
+      </p:sp>
+      <p:sp>
+        <p:nvSpPr>
+          <p:cNvPr id="4" name="Symbol zastępczy numeru slajdu 3"/>
+          <p:cNvSpPr>
+            <a:spLocks noGrp="1"/>
+          </p:cNvSpPr>
+          <p:nvPr>
+            <p:ph type="sldNum" sz="quarter" idx="5"/>
+          </p:nvPr>
+        </p:nvSpPr>
+        <p:spPr/>
+        <p:txBody>
+          <a:bodyPr/>
+          <a:lstStyle/>
+          <a:p>
+            <a:fld id="{810A6612-7A23-4B98-B0E9-4F3C882AD2EF}" type="slidenum">
+              <a:rPr lang="pl-PL" smtClean="0"/>
+              <a:t>24</a:t>
+            </a:fld>
+            <a:endParaRPr lang="pl-PL"/>
+          </a:p>
+        </p:txBody>
+      </p:sp>
+    </p:spTree>
+    <p:extLst>
+      <p:ext uri="{BB962C8B-B14F-4D97-AF65-F5344CB8AC3E}">
+        <p14:creationId xmlns:p14="http://schemas.microsoft.com/office/powerpoint/2010/main" val="2942987176"/>
+      </p:ext>
+    </p:extLst>
+  </p:cSld>
+  <p:clrMapOvr>
+    <a:masterClrMapping/>
+  </p:clrMapOvr>
+</p:notes>
+</file>
+
+<file path=ppt/notesSlides/notesSlide25.xml><?xml version="1.0" encoding="utf-8"?>
+<p:notes xmlns:a="http://schemas.openxmlformats.org/drawingml/2006/main" xmlns:r="http://schemas.openxmlformats.org/officeDocument/2006/relationships" xmlns:p="http://schemas.openxmlformats.org/presentationml/2006/main">
+  <p:cSld>
+    <p:spTree>
+      <p:nvGrpSpPr>
+        <p:cNvPr id="1" name=""/>
+        <p:cNvGrpSpPr/>
+        <p:nvPr/>
+      </p:nvGrpSpPr>
+      <p:grpSpPr>
+        <a:xfrm>
+          <a:off x="0" y="0"/>
+          <a:ext cx="0" cy="0"/>
+          <a:chOff x="0" y="0"/>
+          <a:chExt cx="0" cy="0"/>
+        </a:xfrm>
+      </p:grpSpPr>
+      <p:sp>
+        <p:nvSpPr>
+          <p:cNvPr id="2" name="Symbol zastępczy obrazu slajdu 1"/>
+          <p:cNvSpPr>
+            <a:spLocks noGrp="1" noRot="1" noChangeAspect="1"/>
+          </p:cNvSpPr>
+          <p:nvPr>
+            <p:ph type="sldImg"/>
+          </p:nvPr>
+        </p:nvSpPr>
+        <p:spPr/>
+      </p:sp>
+      <p:sp>
+        <p:nvSpPr>
+          <p:cNvPr id="3" name="Symbol zastępczy notatek 2"/>
+          <p:cNvSpPr>
+            <a:spLocks noGrp="1"/>
+          </p:cNvSpPr>
+          <p:nvPr>
+            <p:ph type="body" idx="1"/>
+          </p:nvPr>
+        </p:nvSpPr>
+        <p:spPr/>
+        <p:txBody>
+          <a:bodyPr/>
+          <a:lstStyle/>
+          <a:p>
+            <a:pPr marL="0" indent="0">
+              <a:buFontTx/>
+              <a:buNone/>
+            </a:pPr>
+            <a:endParaRPr lang="pl-PL" sz="1200" b="0" i="0" kern="1200" dirty="0">
+              <a:solidFill>
+                <a:schemeClr val="tx1"/>
+              </a:solidFill>
+              <a:effectLst/>
+              <a:latin typeface="+mn-lt"/>
+              <a:ea typeface="+mn-ea"/>
+              <a:cs typeface="+mn-cs"/>
+            </a:endParaRPr>
+          </a:p>
+        </p:txBody>
+      </p:sp>
+      <p:sp>
+        <p:nvSpPr>
+          <p:cNvPr id="4" name="Symbol zastępczy numeru slajdu 3"/>
+          <p:cNvSpPr>
+            <a:spLocks noGrp="1"/>
+          </p:cNvSpPr>
+          <p:nvPr>
+            <p:ph type="sldNum" sz="quarter" idx="5"/>
+          </p:nvPr>
+        </p:nvSpPr>
+        <p:spPr/>
+        <p:txBody>
+          <a:bodyPr/>
+          <a:lstStyle/>
+          <a:p>
+            <a:fld id="{810A6612-7A23-4B98-B0E9-4F3C882AD2EF}" type="slidenum">
+              <a:rPr lang="pl-PL" smtClean="0"/>
+              <a:t>25</a:t>
+            </a:fld>
+            <a:endParaRPr lang="pl-PL"/>
+          </a:p>
+        </p:txBody>
+      </p:sp>
+    </p:spTree>
+    <p:extLst>
+      <p:ext uri="{BB962C8B-B14F-4D97-AF65-F5344CB8AC3E}">
+        <p14:creationId xmlns:p14="http://schemas.microsoft.com/office/powerpoint/2010/main" val="2711687546"/>
       </p:ext>
     </p:extLst>
   </p:cSld>
@@ -21150,6 +21598,1571 @@
     <p:extLst>
       <p:ext uri="{BB962C8B-B14F-4D97-AF65-F5344CB8AC3E}">
         <p14:creationId xmlns:p14="http://schemas.microsoft.com/office/powerpoint/2010/main" val="3139442367"/>
+      </p:ext>
+    </p:extLst>
+  </p:cSld>
+  <p:clrMapOvr>
+    <a:masterClrMapping/>
+  </p:clrMapOvr>
+</p:sld>
+</file>
+
+<file path=ppt/slides/slide22.xml><?xml version="1.0" encoding="utf-8"?>
+<p:sld xmlns:a="http://schemas.openxmlformats.org/drawingml/2006/main" xmlns:r="http://schemas.openxmlformats.org/officeDocument/2006/relationships" xmlns:p="http://schemas.openxmlformats.org/presentationml/2006/main">
+  <p:cSld>
+    <p:spTree>
+      <p:nvGrpSpPr>
+        <p:cNvPr id="1" name=""/>
+        <p:cNvGrpSpPr/>
+        <p:nvPr/>
+      </p:nvGrpSpPr>
+      <p:grpSpPr>
+        <a:xfrm>
+          <a:off x="0" y="0"/>
+          <a:ext cx="0" cy="0"/>
+          <a:chOff x="0" y="0"/>
+          <a:chExt cx="0" cy="0"/>
+        </a:xfrm>
+      </p:grpSpPr>
+      <p:sp>
+        <p:nvSpPr>
+          <p:cNvPr id="4" name="pole tekstowe 3">
+            <a:extLst>
+              <a:ext uri="{FF2B5EF4-FFF2-40B4-BE49-F238E27FC236}">
+                <a16:creationId xmlns:a16="http://schemas.microsoft.com/office/drawing/2014/main" id="{F164A7B3-8808-414C-9401-3B25194E3B5A}"/>
+              </a:ext>
+            </a:extLst>
+          </p:cNvPr>
+          <p:cNvSpPr txBox="1"/>
+          <p:nvPr/>
+        </p:nvSpPr>
+        <p:spPr>
+          <a:xfrm>
+            <a:off x="497840" y="538480"/>
+            <a:ext cx="645690" cy="369332"/>
+          </a:xfrm>
+          <a:prstGeom prst="rect">
+            <a:avLst/>
+          </a:prstGeom>
+          <a:noFill/>
+        </p:spPr>
+        <p:txBody>
+          <a:bodyPr wrap="none" rtlCol="0">
+            <a:spAutoFit/>
+          </a:bodyPr>
+          <a:lstStyle/>
+          <a:p>
+            <a:r>
+              <a:rPr lang="pl-PL" dirty="0" err="1"/>
+              <a:t>Tests</a:t>
+            </a:r>
+            <a:endParaRPr lang="pl-PL" dirty="0"/>
+          </a:p>
+        </p:txBody>
+      </p:sp>
+      <p:sp>
+        <p:nvSpPr>
+          <p:cNvPr id="6" name="Prostokąt 5">
+            <a:extLst>
+              <a:ext uri="{FF2B5EF4-FFF2-40B4-BE49-F238E27FC236}">
+                <a16:creationId xmlns:a16="http://schemas.microsoft.com/office/drawing/2014/main" id="{51F99E8D-0E8C-48AD-A29F-DCA7C6F5430D}"/>
+              </a:ext>
+            </a:extLst>
+          </p:cNvPr>
+          <p:cNvSpPr/>
+          <p:nvPr/>
+        </p:nvSpPr>
+        <p:spPr>
+          <a:xfrm>
+            <a:off x="5686586" y="1299615"/>
+            <a:ext cx="4371453" cy="369332"/>
+          </a:xfrm>
+          <a:prstGeom prst="rect">
+            <a:avLst/>
+          </a:prstGeom>
+          <a:solidFill>
+            <a:schemeClr val="bg2"/>
+          </a:solidFill>
+        </p:spPr>
+        <p:txBody>
+          <a:bodyPr wrap="none">
+            <a:spAutoFit/>
+          </a:bodyPr>
+          <a:lstStyle/>
+          <a:p>
+            <a:r>
+              <a:rPr lang="pl-PL" dirty="0" err="1">
+                <a:solidFill>
+                  <a:srgbClr val="444444"/>
+                </a:solidFill>
+                <a:latin typeface="IBM Plex Mono"/>
+              </a:rPr>
+              <a:t>npm</a:t>
+            </a:r>
+            <a:r>
+              <a:rPr lang="pl-PL" dirty="0">
+                <a:solidFill>
+                  <a:srgbClr val="444444"/>
+                </a:solidFill>
+                <a:latin typeface="IBM Plex Mono"/>
+              </a:rPr>
+              <a:t> </a:t>
+            </a:r>
+            <a:r>
+              <a:rPr lang="pl-PL" dirty="0" err="1">
+                <a:solidFill>
+                  <a:srgbClr val="444444"/>
+                </a:solidFill>
+                <a:latin typeface="IBM Plex Mono"/>
+              </a:rPr>
+              <a:t>install</a:t>
+            </a:r>
+            <a:r>
+              <a:rPr lang="pl-PL" dirty="0">
+                <a:solidFill>
+                  <a:srgbClr val="444444"/>
+                </a:solidFill>
+                <a:latin typeface="IBM Plex Mono"/>
+              </a:rPr>
+              <a:t> </a:t>
+            </a:r>
+            <a:r>
+              <a:rPr lang="pl-PL" dirty="0">
+                <a:solidFill>
+                  <a:srgbClr val="9A6E3A"/>
+                </a:solidFill>
+                <a:latin typeface="IBM Plex Mono"/>
+              </a:rPr>
+              <a:t>--</a:t>
+            </a:r>
+            <a:r>
+              <a:rPr lang="pl-PL" dirty="0" err="1">
+                <a:solidFill>
+                  <a:srgbClr val="444444"/>
+                </a:solidFill>
+                <a:latin typeface="IBM Plex Mono"/>
+              </a:rPr>
+              <a:t>save</a:t>
+            </a:r>
+            <a:r>
+              <a:rPr lang="pl-PL" dirty="0" err="1">
+                <a:solidFill>
+                  <a:srgbClr val="9A6E3A"/>
+                </a:solidFill>
+                <a:latin typeface="IBM Plex Mono"/>
+              </a:rPr>
+              <a:t>-</a:t>
+            </a:r>
+            <a:r>
+              <a:rPr lang="pl-PL" dirty="0" err="1">
+                <a:solidFill>
+                  <a:srgbClr val="444444"/>
+                </a:solidFill>
+                <a:latin typeface="IBM Plex Mono"/>
+              </a:rPr>
+              <a:t>dev</a:t>
+            </a:r>
+            <a:r>
+              <a:rPr lang="pl-PL" dirty="0">
+                <a:solidFill>
+                  <a:srgbClr val="444444"/>
+                </a:solidFill>
+                <a:latin typeface="IBM Plex Mono"/>
+              </a:rPr>
+              <a:t> @</a:t>
+            </a:r>
+            <a:r>
+              <a:rPr lang="pl-PL" dirty="0" err="1">
+                <a:solidFill>
+                  <a:srgbClr val="444444"/>
+                </a:solidFill>
+                <a:latin typeface="IBM Plex Mono"/>
+              </a:rPr>
+              <a:t>testing</a:t>
+            </a:r>
+            <a:r>
+              <a:rPr lang="pl-PL" dirty="0" err="1">
+                <a:solidFill>
+                  <a:srgbClr val="9A6E3A"/>
+                </a:solidFill>
+                <a:latin typeface="IBM Plex Mono"/>
+              </a:rPr>
+              <a:t>-</a:t>
+            </a:r>
+            <a:r>
+              <a:rPr lang="pl-PL" dirty="0" err="1">
+                <a:solidFill>
+                  <a:srgbClr val="444444"/>
+                </a:solidFill>
+                <a:latin typeface="IBM Plex Mono"/>
+              </a:rPr>
+              <a:t>library</a:t>
+            </a:r>
+            <a:r>
+              <a:rPr lang="pl-PL" dirty="0">
+                <a:solidFill>
+                  <a:srgbClr val="9A6E3A"/>
+                </a:solidFill>
+                <a:latin typeface="IBM Plex Mono"/>
+              </a:rPr>
+              <a:t>/</a:t>
+            </a:r>
+            <a:r>
+              <a:rPr lang="pl-PL" dirty="0" err="1">
+                <a:solidFill>
+                  <a:srgbClr val="444444"/>
+                </a:solidFill>
+                <a:latin typeface="IBM Plex Mono"/>
+              </a:rPr>
+              <a:t>react</a:t>
+            </a:r>
+            <a:endParaRPr lang="pl-PL" dirty="0"/>
+          </a:p>
+        </p:txBody>
+      </p:sp>
+      <p:sp>
+        <p:nvSpPr>
+          <p:cNvPr id="7" name="Prostokąt 6">
+            <a:extLst>
+              <a:ext uri="{FF2B5EF4-FFF2-40B4-BE49-F238E27FC236}">
+                <a16:creationId xmlns:a16="http://schemas.microsoft.com/office/drawing/2014/main" id="{FAD86750-ADB2-4332-955C-B0C129DCF75A}"/>
+              </a:ext>
+            </a:extLst>
+          </p:cNvPr>
+          <p:cNvSpPr/>
+          <p:nvPr/>
+        </p:nvSpPr>
+        <p:spPr>
+          <a:xfrm>
+            <a:off x="5688382" y="832438"/>
+            <a:ext cx="2623667" cy="369332"/>
+          </a:xfrm>
+          <a:prstGeom prst="rect">
+            <a:avLst/>
+          </a:prstGeom>
+          <a:solidFill>
+            <a:schemeClr val="bg2"/>
+          </a:solidFill>
+        </p:spPr>
+        <p:txBody>
+          <a:bodyPr wrap="none">
+            <a:spAutoFit/>
+          </a:bodyPr>
+          <a:lstStyle/>
+          <a:p>
+            <a:r>
+              <a:rPr lang="pl-PL" dirty="0" err="1">
+                <a:solidFill>
+                  <a:srgbClr val="000000"/>
+                </a:solidFill>
+                <a:latin typeface="SFMono-Regular"/>
+              </a:rPr>
+              <a:t>npm</a:t>
+            </a:r>
+            <a:r>
+              <a:rPr lang="pl-PL" dirty="0">
+                <a:solidFill>
+                  <a:srgbClr val="000000"/>
+                </a:solidFill>
+                <a:latin typeface="SFMono-Regular"/>
+              </a:rPr>
+              <a:t> </a:t>
+            </a:r>
+            <a:r>
+              <a:rPr lang="pl-PL" dirty="0" err="1">
+                <a:solidFill>
+                  <a:srgbClr val="000000"/>
+                </a:solidFill>
+                <a:latin typeface="SFMono-Regular"/>
+              </a:rPr>
+              <a:t>install</a:t>
+            </a:r>
+            <a:r>
+              <a:rPr lang="pl-PL" dirty="0">
+                <a:solidFill>
+                  <a:srgbClr val="000000"/>
+                </a:solidFill>
+                <a:latin typeface="SFMono-Regular"/>
+              </a:rPr>
+              <a:t> --</a:t>
+            </a:r>
+            <a:r>
+              <a:rPr lang="pl-PL" dirty="0" err="1">
+                <a:solidFill>
+                  <a:srgbClr val="000000"/>
+                </a:solidFill>
+                <a:latin typeface="SFMono-Regular"/>
+              </a:rPr>
+              <a:t>save-dev</a:t>
+            </a:r>
+            <a:r>
+              <a:rPr lang="pl-PL" dirty="0">
+                <a:solidFill>
+                  <a:srgbClr val="000000"/>
+                </a:solidFill>
+                <a:latin typeface="SFMono-Regular"/>
+              </a:rPr>
+              <a:t> jest</a:t>
+            </a:r>
+            <a:endParaRPr lang="pl-PL" dirty="0"/>
+          </a:p>
+        </p:txBody>
+      </p:sp>
+      <p:sp>
+        <p:nvSpPr>
+          <p:cNvPr id="8" name="pole tekstowe 7">
+            <a:extLst>
+              <a:ext uri="{FF2B5EF4-FFF2-40B4-BE49-F238E27FC236}">
+                <a16:creationId xmlns:a16="http://schemas.microsoft.com/office/drawing/2014/main" id="{9E66A301-D4F4-4905-AED7-BA7A6B16BD00}"/>
+              </a:ext>
+            </a:extLst>
+          </p:cNvPr>
+          <p:cNvSpPr txBox="1"/>
+          <p:nvPr/>
+        </p:nvSpPr>
+        <p:spPr>
+          <a:xfrm>
+            <a:off x="3592221" y="746337"/>
+            <a:ext cx="1812612" cy="369332"/>
+          </a:xfrm>
+          <a:prstGeom prst="rect">
+            <a:avLst/>
+          </a:prstGeom>
+          <a:noFill/>
+        </p:spPr>
+        <p:txBody>
+          <a:bodyPr wrap="none" rtlCol="0">
+            <a:spAutoFit/>
+          </a:bodyPr>
+          <a:lstStyle/>
+          <a:p>
+            <a:r>
+              <a:rPr lang="pl-PL" dirty="0"/>
+              <a:t>Jest – to run </a:t>
+            </a:r>
+            <a:r>
+              <a:rPr lang="pl-PL" dirty="0" err="1"/>
+              <a:t>tests</a:t>
+            </a:r>
+            <a:endParaRPr lang="pl-PL" dirty="0"/>
+          </a:p>
+        </p:txBody>
+      </p:sp>
+      <p:sp>
+        <p:nvSpPr>
+          <p:cNvPr id="9" name="pole tekstowe 8">
+            <a:extLst>
+              <a:ext uri="{FF2B5EF4-FFF2-40B4-BE49-F238E27FC236}">
+                <a16:creationId xmlns:a16="http://schemas.microsoft.com/office/drawing/2014/main" id="{9D4902EB-F3BD-4761-BA19-94B0BA1F9E2F}"/>
+              </a:ext>
+            </a:extLst>
+          </p:cNvPr>
+          <p:cNvSpPr txBox="1"/>
+          <p:nvPr/>
+        </p:nvSpPr>
+        <p:spPr>
+          <a:xfrm>
+            <a:off x="1132701" y="1299615"/>
+            <a:ext cx="4270336" cy="369332"/>
+          </a:xfrm>
+          <a:prstGeom prst="rect">
+            <a:avLst/>
+          </a:prstGeom>
+          <a:noFill/>
+        </p:spPr>
+        <p:txBody>
+          <a:bodyPr wrap="none" rtlCol="0">
+            <a:spAutoFit/>
+          </a:bodyPr>
+          <a:lstStyle/>
+          <a:p>
+            <a:r>
+              <a:rPr lang="pl-PL" dirty="0"/>
+              <a:t>Set of </a:t>
+            </a:r>
+            <a:r>
+              <a:rPr lang="pl-PL" dirty="0" err="1"/>
+              <a:t>functions</a:t>
+            </a:r>
+            <a:r>
+              <a:rPr lang="pl-PL" dirty="0"/>
+              <a:t> </a:t>
+            </a:r>
+            <a:r>
+              <a:rPr lang="pl-PL" dirty="0" err="1"/>
+              <a:t>that</a:t>
+            </a:r>
+            <a:r>
+              <a:rPr lang="pl-PL" dirty="0"/>
+              <a:t> </a:t>
+            </a:r>
+            <a:r>
+              <a:rPr lang="pl-PL" dirty="0" err="1"/>
+              <a:t>may</a:t>
+            </a:r>
+            <a:r>
+              <a:rPr lang="pl-PL" dirty="0"/>
+              <a:t> be </a:t>
+            </a:r>
+            <a:r>
+              <a:rPr lang="pl-PL" dirty="0" err="1"/>
+              <a:t>useful</a:t>
+            </a:r>
+            <a:r>
+              <a:rPr lang="pl-PL" dirty="0"/>
+              <a:t> for </a:t>
+            </a:r>
+            <a:r>
+              <a:rPr lang="pl-PL" dirty="0" err="1"/>
+              <a:t>tests</a:t>
+            </a:r>
+            <a:endParaRPr lang="pl-PL" dirty="0"/>
+          </a:p>
+        </p:txBody>
+      </p:sp>
+      <p:sp>
+        <p:nvSpPr>
+          <p:cNvPr id="10" name="Prostokąt 9">
+            <a:extLst>
+              <a:ext uri="{FF2B5EF4-FFF2-40B4-BE49-F238E27FC236}">
+                <a16:creationId xmlns:a16="http://schemas.microsoft.com/office/drawing/2014/main" id="{B44D6886-182B-4EC3-93D1-D50F8A51509D}"/>
+              </a:ext>
+            </a:extLst>
+          </p:cNvPr>
+          <p:cNvSpPr/>
+          <p:nvPr/>
+        </p:nvSpPr>
+        <p:spPr>
+          <a:xfrm>
+            <a:off x="1524000" y="1852893"/>
+            <a:ext cx="9144000" cy="4647426"/>
+          </a:xfrm>
+          <a:prstGeom prst="rect">
+            <a:avLst/>
+          </a:prstGeom>
+          <a:solidFill>
+            <a:schemeClr val="tx1"/>
+          </a:solidFill>
+        </p:spPr>
+        <p:txBody>
+          <a:bodyPr wrap="square">
+            <a:spAutoFit/>
+          </a:bodyPr>
+          <a:lstStyle/>
+          <a:p>
+            <a:r>
+              <a:rPr lang="pl-PL" sz="1600" dirty="0" err="1">
+                <a:solidFill>
+                  <a:srgbClr val="569CD6"/>
+                </a:solidFill>
+                <a:latin typeface="Consolas" panose="020B0609020204030204" pitchFamily="49" charset="0"/>
+              </a:rPr>
+              <a:t>let</a:t>
+            </a:r>
+            <a:r>
+              <a:rPr lang="pl-PL" sz="1600" dirty="0">
+                <a:solidFill>
+                  <a:srgbClr val="D4D4D4"/>
+                </a:solidFill>
+                <a:latin typeface="Consolas" panose="020B0609020204030204" pitchFamily="49" charset="0"/>
+              </a:rPr>
+              <a:t> </a:t>
+            </a:r>
+            <a:r>
+              <a:rPr lang="pl-PL" sz="1600" dirty="0" err="1">
+                <a:solidFill>
+                  <a:srgbClr val="9CDCFE"/>
+                </a:solidFill>
+                <a:latin typeface="Consolas" panose="020B0609020204030204" pitchFamily="49" charset="0"/>
+              </a:rPr>
+              <a:t>container</a:t>
+            </a:r>
+            <a:r>
+              <a:rPr lang="pl-PL" sz="1600" dirty="0">
+                <a:solidFill>
+                  <a:srgbClr val="D4D4D4"/>
+                </a:solidFill>
+                <a:latin typeface="Consolas" panose="020B0609020204030204" pitchFamily="49" charset="0"/>
+              </a:rPr>
+              <a:t> = </a:t>
+            </a:r>
+            <a:r>
+              <a:rPr lang="pl-PL" sz="1600" dirty="0" err="1">
+                <a:solidFill>
+                  <a:srgbClr val="569CD6"/>
+                </a:solidFill>
+                <a:latin typeface="Consolas" panose="020B0609020204030204" pitchFamily="49" charset="0"/>
+              </a:rPr>
+              <a:t>null</a:t>
+            </a:r>
+            <a:r>
+              <a:rPr lang="pl-PL" sz="1600" dirty="0">
+                <a:solidFill>
+                  <a:srgbClr val="D4D4D4"/>
+                </a:solidFill>
+                <a:latin typeface="Consolas" panose="020B0609020204030204" pitchFamily="49" charset="0"/>
+              </a:rPr>
+              <a:t>;</a:t>
+            </a:r>
+          </a:p>
+          <a:p>
+            <a:r>
+              <a:rPr lang="pl-PL" sz="1600" dirty="0" err="1">
+                <a:solidFill>
+                  <a:srgbClr val="DCDCAA"/>
+                </a:solidFill>
+                <a:latin typeface="Consolas" panose="020B0609020204030204" pitchFamily="49" charset="0"/>
+              </a:rPr>
+              <a:t>beforeEach</a:t>
+            </a:r>
+            <a:r>
+              <a:rPr lang="pl-PL" sz="1600" dirty="0">
+                <a:solidFill>
+                  <a:srgbClr val="D4D4D4"/>
+                </a:solidFill>
+                <a:latin typeface="Consolas" panose="020B0609020204030204" pitchFamily="49" charset="0"/>
+              </a:rPr>
+              <a:t>(() </a:t>
+            </a:r>
+            <a:r>
+              <a:rPr lang="pl-PL" sz="1600" dirty="0">
+                <a:solidFill>
+                  <a:srgbClr val="569CD6"/>
+                </a:solidFill>
+                <a:latin typeface="Consolas" panose="020B0609020204030204" pitchFamily="49" charset="0"/>
+              </a:rPr>
+              <a:t>=&gt;</a:t>
+            </a:r>
+            <a:r>
+              <a:rPr lang="pl-PL" sz="1600" dirty="0">
+                <a:solidFill>
+                  <a:srgbClr val="D4D4D4"/>
+                </a:solidFill>
+                <a:latin typeface="Consolas" panose="020B0609020204030204" pitchFamily="49" charset="0"/>
+              </a:rPr>
+              <a:t> {</a:t>
+            </a:r>
+          </a:p>
+          <a:p>
+            <a:r>
+              <a:rPr lang="pl-PL" sz="1600" dirty="0">
+                <a:solidFill>
+                  <a:srgbClr val="D4D4D4"/>
+                </a:solidFill>
+                <a:latin typeface="Consolas" panose="020B0609020204030204" pitchFamily="49" charset="0"/>
+              </a:rPr>
+              <a:t>  </a:t>
+            </a:r>
+            <a:r>
+              <a:rPr lang="pl-PL" sz="1600" dirty="0" err="1">
+                <a:solidFill>
+                  <a:srgbClr val="9CDCFE"/>
+                </a:solidFill>
+                <a:latin typeface="Consolas" panose="020B0609020204030204" pitchFamily="49" charset="0"/>
+              </a:rPr>
+              <a:t>container</a:t>
+            </a:r>
+            <a:r>
+              <a:rPr lang="pl-PL" sz="1600" dirty="0">
+                <a:solidFill>
+                  <a:srgbClr val="D4D4D4"/>
+                </a:solidFill>
+                <a:latin typeface="Consolas" panose="020B0609020204030204" pitchFamily="49" charset="0"/>
+              </a:rPr>
+              <a:t> = </a:t>
+            </a:r>
+            <a:r>
+              <a:rPr lang="pl-PL" sz="1600" dirty="0" err="1">
+                <a:solidFill>
+                  <a:srgbClr val="9CDCFE"/>
+                </a:solidFill>
+                <a:latin typeface="Consolas" panose="020B0609020204030204" pitchFamily="49" charset="0"/>
+              </a:rPr>
+              <a:t>document</a:t>
+            </a:r>
+            <a:r>
+              <a:rPr lang="pl-PL" sz="1600" dirty="0" err="1">
+                <a:solidFill>
+                  <a:srgbClr val="D4D4D4"/>
+                </a:solidFill>
+                <a:latin typeface="Consolas" panose="020B0609020204030204" pitchFamily="49" charset="0"/>
+              </a:rPr>
+              <a:t>.</a:t>
+            </a:r>
+            <a:r>
+              <a:rPr lang="pl-PL" sz="1600" dirty="0" err="1">
+                <a:solidFill>
+                  <a:srgbClr val="DCDCAA"/>
+                </a:solidFill>
+                <a:latin typeface="Consolas" panose="020B0609020204030204" pitchFamily="49" charset="0"/>
+              </a:rPr>
+              <a:t>createElement</a:t>
+            </a:r>
+            <a:r>
+              <a:rPr lang="pl-PL" sz="1600" dirty="0">
+                <a:solidFill>
+                  <a:srgbClr val="D4D4D4"/>
+                </a:solidFill>
+                <a:latin typeface="Consolas" panose="020B0609020204030204" pitchFamily="49" charset="0"/>
+              </a:rPr>
+              <a:t>(</a:t>
+            </a:r>
+            <a:r>
+              <a:rPr lang="pl-PL" sz="1600" dirty="0">
+                <a:solidFill>
+                  <a:srgbClr val="CE9178"/>
+                </a:solidFill>
+                <a:latin typeface="Consolas" panose="020B0609020204030204" pitchFamily="49" charset="0"/>
+              </a:rPr>
+              <a:t>"div"</a:t>
+            </a:r>
+            <a:r>
+              <a:rPr lang="pl-PL" sz="1600" dirty="0">
+                <a:solidFill>
+                  <a:srgbClr val="D4D4D4"/>
+                </a:solidFill>
+                <a:latin typeface="Consolas" panose="020B0609020204030204" pitchFamily="49" charset="0"/>
+              </a:rPr>
+              <a:t>);</a:t>
+            </a:r>
+          </a:p>
+          <a:p>
+            <a:r>
+              <a:rPr lang="pl-PL" sz="1600" dirty="0">
+                <a:solidFill>
+                  <a:srgbClr val="D4D4D4"/>
+                </a:solidFill>
+                <a:latin typeface="Consolas" panose="020B0609020204030204" pitchFamily="49" charset="0"/>
+              </a:rPr>
+              <a:t>  </a:t>
+            </a:r>
+            <a:r>
+              <a:rPr lang="pl-PL" sz="1600" dirty="0" err="1">
+                <a:solidFill>
+                  <a:srgbClr val="9CDCFE"/>
+                </a:solidFill>
+                <a:latin typeface="Consolas" panose="020B0609020204030204" pitchFamily="49" charset="0"/>
+              </a:rPr>
+              <a:t>document</a:t>
+            </a:r>
+            <a:r>
+              <a:rPr lang="pl-PL" sz="1600" dirty="0" err="1">
+                <a:solidFill>
+                  <a:srgbClr val="D4D4D4"/>
+                </a:solidFill>
+                <a:latin typeface="Consolas" panose="020B0609020204030204" pitchFamily="49" charset="0"/>
+              </a:rPr>
+              <a:t>.</a:t>
+            </a:r>
+            <a:r>
+              <a:rPr lang="pl-PL" sz="1600" dirty="0" err="1">
+                <a:solidFill>
+                  <a:srgbClr val="9CDCFE"/>
+                </a:solidFill>
+                <a:latin typeface="Consolas" panose="020B0609020204030204" pitchFamily="49" charset="0"/>
+              </a:rPr>
+              <a:t>body</a:t>
+            </a:r>
+            <a:r>
+              <a:rPr lang="pl-PL" sz="1600" dirty="0" err="1">
+                <a:solidFill>
+                  <a:srgbClr val="D4D4D4"/>
+                </a:solidFill>
+                <a:latin typeface="Consolas" panose="020B0609020204030204" pitchFamily="49" charset="0"/>
+              </a:rPr>
+              <a:t>.</a:t>
+            </a:r>
+            <a:r>
+              <a:rPr lang="pl-PL" sz="1600" dirty="0" err="1">
+                <a:solidFill>
+                  <a:srgbClr val="DCDCAA"/>
+                </a:solidFill>
+                <a:latin typeface="Consolas" panose="020B0609020204030204" pitchFamily="49" charset="0"/>
+              </a:rPr>
+              <a:t>appendChild</a:t>
+            </a:r>
+            <a:r>
+              <a:rPr lang="pl-PL" sz="1600" dirty="0">
+                <a:solidFill>
+                  <a:srgbClr val="D4D4D4"/>
+                </a:solidFill>
+                <a:latin typeface="Consolas" panose="020B0609020204030204" pitchFamily="49" charset="0"/>
+              </a:rPr>
+              <a:t>(</a:t>
+            </a:r>
+            <a:r>
+              <a:rPr lang="pl-PL" sz="1600" dirty="0" err="1">
+                <a:solidFill>
+                  <a:srgbClr val="9CDCFE"/>
+                </a:solidFill>
+                <a:latin typeface="Consolas" panose="020B0609020204030204" pitchFamily="49" charset="0"/>
+              </a:rPr>
+              <a:t>container</a:t>
+            </a:r>
+            <a:r>
+              <a:rPr lang="pl-PL" sz="1600" dirty="0">
+                <a:solidFill>
+                  <a:srgbClr val="D4D4D4"/>
+                </a:solidFill>
+                <a:latin typeface="Consolas" panose="020B0609020204030204" pitchFamily="49" charset="0"/>
+              </a:rPr>
+              <a:t>);</a:t>
+            </a:r>
+          </a:p>
+          <a:p>
+            <a:r>
+              <a:rPr lang="pl-PL" sz="1600" dirty="0">
+                <a:solidFill>
+                  <a:srgbClr val="D4D4D4"/>
+                </a:solidFill>
+                <a:latin typeface="Consolas" panose="020B0609020204030204" pitchFamily="49" charset="0"/>
+              </a:rPr>
+              <a:t>});</a:t>
+            </a:r>
+          </a:p>
+          <a:p>
+            <a:br>
+              <a:rPr lang="pl-PL" sz="1600" dirty="0">
+                <a:solidFill>
+                  <a:srgbClr val="D4D4D4"/>
+                </a:solidFill>
+                <a:latin typeface="Consolas" panose="020B0609020204030204" pitchFamily="49" charset="0"/>
+              </a:rPr>
+            </a:br>
+            <a:r>
+              <a:rPr lang="pl-PL" sz="1600" dirty="0" err="1">
+                <a:solidFill>
+                  <a:srgbClr val="DCDCAA"/>
+                </a:solidFill>
+                <a:latin typeface="Consolas" panose="020B0609020204030204" pitchFamily="49" charset="0"/>
+              </a:rPr>
+              <a:t>afterEach</a:t>
+            </a:r>
+            <a:r>
+              <a:rPr lang="pl-PL" sz="1600" dirty="0">
+                <a:solidFill>
+                  <a:srgbClr val="D4D4D4"/>
+                </a:solidFill>
+                <a:latin typeface="Consolas" panose="020B0609020204030204" pitchFamily="49" charset="0"/>
+              </a:rPr>
+              <a:t>(() </a:t>
+            </a:r>
+            <a:r>
+              <a:rPr lang="pl-PL" sz="1600" dirty="0">
+                <a:solidFill>
+                  <a:srgbClr val="569CD6"/>
+                </a:solidFill>
+                <a:latin typeface="Consolas" panose="020B0609020204030204" pitchFamily="49" charset="0"/>
+              </a:rPr>
+              <a:t>=&gt;</a:t>
+            </a:r>
+            <a:r>
+              <a:rPr lang="pl-PL" sz="1600" dirty="0">
+                <a:solidFill>
+                  <a:srgbClr val="D4D4D4"/>
+                </a:solidFill>
+                <a:latin typeface="Consolas" panose="020B0609020204030204" pitchFamily="49" charset="0"/>
+              </a:rPr>
+              <a:t> {</a:t>
+            </a:r>
+          </a:p>
+          <a:p>
+            <a:r>
+              <a:rPr lang="pl-PL" sz="1600" dirty="0">
+                <a:solidFill>
+                  <a:srgbClr val="D4D4D4"/>
+                </a:solidFill>
+                <a:latin typeface="Consolas" panose="020B0609020204030204" pitchFamily="49" charset="0"/>
+              </a:rPr>
+              <a:t>  </a:t>
+            </a:r>
+            <a:r>
+              <a:rPr lang="pl-PL" sz="1600" dirty="0" err="1">
+                <a:solidFill>
+                  <a:srgbClr val="DCDCAA"/>
+                </a:solidFill>
+                <a:latin typeface="Consolas" panose="020B0609020204030204" pitchFamily="49" charset="0"/>
+              </a:rPr>
+              <a:t>unmountComponentAtNode</a:t>
+            </a:r>
+            <a:r>
+              <a:rPr lang="pl-PL" sz="1600" dirty="0">
+                <a:solidFill>
+                  <a:srgbClr val="D4D4D4"/>
+                </a:solidFill>
+                <a:latin typeface="Consolas" panose="020B0609020204030204" pitchFamily="49" charset="0"/>
+              </a:rPr>
+              <a:t>(</a:t>
+            </a:r>
+            <a:r>
+              <a:rPr lang="pl-PL" sz="1600" dirty="0" err="1">
+                <a:solidFill>
+                  <a:srgbClr val="9CDCFE"/>
+                </a:solidFill>
+                <a:latin typeface="Consolas" panose="020B0609020204030204" pitchFamily="49" charset="0"/>
+              </a:rPr>
+              <a:t>container</a:t>
+            </a:r>
+            <a:r>
+              <a:rPr lang="pl-PL" sz="1600" dirty="0">
+                <a:solidFill>
+                  <a:srgbClr val="D4D4D4"/>
+                </a:solidFill>
+                <a:latin typeface="Consolas" panose="020B0609020204030204" pitchFamily="49" charset="0"/>
+              </a:rPr>
+              <a:t>);</a:t>
+            </a:r>
+          </a:p>
+          <a:p>
+            <a:r>
+              <a:rPr lang="pl-PL" sz="1600" dirty="0">
+                <a:solidFill>
+                  <a:srgbClr val="D4D4D4"/>
+                </a:solidFill>
+                <a:latin typeface="Consolas" panose="020B0609020204030204" pitchFamily="49" charset="0"/>
+              </a:rPr>
+              <a:t>  </a:t>
+            </a:r>
+            <a:r>
+              <a:rPr lang="pl-PL" sz="1600" dirty="0" err="1">
+                <a:solidFill>
+                  <a:srgbClr val="9CDCFE"/>
+                </a:solidFill>
+                <a:latin typeface="Consolas" panose="020B0609020204030204" pitchFamily="49" charset="0"/>
+              </a:rPr>
+              <a:t>container</a:t>
+            </a:r>
+            <a:r>
+              <a:rPr lang="pl-PL" sz="1600" dirty="0" err="1">
+                <a:solidFill>
+                  <a:srgbClr val="D4D4D4"/>
+                </a:solidFill>
+                <a:latin typeface="Consolas" panose="020B0609020204030204" pitchFamily="49" charset="0"/>
+              </a:rPr>
+              <a:t>.</a:t>
+            </a:r>
+            <a:r>
+              <a:rPr lang="pl-PL" sz="1600" dirty="0" err="1">
+                <a:solidFill>
+                  <a:srgbClr val="DCDCAA"/>
+                </a:solidFill>
+                <a:latin typeface="Consolas" panose="020B0609020204030204" pitchFamily="49" charset="0"/>
+              </a:rPr>
+              <a:t>remove</a:t>
+            </a:r>
+            <a:r>
+              <a:rPr lang="pl-PL" sz="1600" dirty="0">
+                <a:solidFill>
+                  <a:srgbClr val="D4D4D4"/>
+                </a:solidFill>
+                <a:latin typeface="Consolas" panose="020B0609020204030204" pitchFamily="49" charset="0"/>
+              </a:rPr>
+              <a:t>();</a:t>
+            </a:r>
+          </a:p>
+          <a:p>
+            <a:r>
+              <a:rPr lang="pl-PL" sz="1600" dirty="0">
+                <a:solidFill>
+                  <a:srgbClr val="D4D4D4"/>
+                </a:solidFill>
+                <a:latin typeface="Consolas" panose="020B0609020204030204" pitchFamily="49" charset="0"/>
+              </a:rPr>
+              <a:t>  </a:t>
+            </a:r>
+            <a:r>
+              <a:rPr lang="pl-PL" sz="1600" dirty="0" err="1">
+                <a:solidFill>
+                  <a:srgbClr val="9CDCFE"/>
+                </a:solidFill>
+                <a:latin typeface="Consolas" panose="020B0609020204030204" pitchFamily="49" charset="0"/>
+              </a:rPr>
+              <a:t>container</a:t>
+            </a:r>
+            <a:r>
+              <a:rPr lang="pl-PL" sz="1600" dirty="0">
+                <a:solidFill>
+                  <a:srgbClr val="D4D4D4"/>
+                </a:solidFill>
+                <a:latin typeface="Consolas" panose="020B0609020204030204" pitchFamily="49" charset="0"/>
+              </a:rPr>
+              <a:t> = </a:t>
+            </a:r>
+            <a:r>
+              <a:rPr lang="pl-PL" sz="1600" dirty="0" err="1">
+                <a:solidFill>
+                  <a:srgbClr val="569CD6"/>
+                </a:solidFill>
+                <a:latin typeface="Consolas" panose="020B0609020204030204" pitchFamily="49" charset="0"/>
+              </a:rPr>
+              <a:t>null</a:t>
+            </a:r>
+            <a:r>
+              <a:rPr lang="pl-PL" sz="1600" dirty="0">
+                <a:solidFill>
+                  <a:srgbClr val="D4D4D4"/>
+                </a:solidFill>
+                <a:latin typeface="Consolas" panose="020B0609020204030204" pitchFamily="49" charset="0"/>
+              </a:rPr>
+              <a:t>;</a:t>
+            </a:r>
+          </a:p>
+          <a:p>
+            <a:r>
+              <a:rPr lang="pl-PL" sz="1600" dirty="0">
+                <a:solidFill>
+                  <a:srgbClr val="D4D4D4"/>
+                </a:solidFill>
+                <a:latin typeface="Consolas" panose="020B0609020204030204" pitchFamily="49" charset="0"/>
+              </a:rPr>
+              <a:t>});</a:t>
+            </a:r>
+          </a:p>
+          <a:p>
+            <a:br>
+              <a:rPr lang="pl-PL" sz="1600" dirty="0">
+                <a:solidFill>
+                  <a:srgbClr val="D4D4D4"/>
+                </a:solidFill>
+                <a:latin typeface="Consolas" panose="020B0609020204030204" pitchFamily="49" charset="0"/>
+              </a:rPr>
+            </a:br>
+            <a:r>
+              <a:rPr lang="pl-PL" sz="1600" dirty="0" err="1">
+                <a:solidFill>
+                  <a:srgbClr val="DCDCAA"/>
+                </a:solidFill>
+                <a:latin typeface="Consolas" panose="020B0609020204030204" pitchFamily="49" charset="0"/>
+              </a:rPr>
+              <a:t>it</a:t>
+            </a:r>
+            <a:r>
+              <a:rPr lang="pl-PL" sz="1600" dirty="0">
+                <a:solidFill>
+                  <a:srgbClr val="D4D4D4"/>
+                </a:solidFill>
+                <a:latin typeface="Consolas" panose="020B0609020204030204" pitchFamily="49" charset="0"/>
+              </a:rPr>
+              <a:t>(</a:t>
+            </a:r>
+            <a:r>
+              <a:rPr lang="pl-PL" sz="1600" dirty="0">
+                <a:solidFill>
+                  <a:srgbClr val="CE9178"/>
+                </a:solidFill>
+                <a:latin typeface="Consolas" panose="020B0609020204030204" pitchFamily="49" charset="0"/>
+              </a:rPr>
+              <a:t>"</a:t>
+            </a:r>
+            <a:r>
+              <a:rPr lang="pl-PL" sz="1600" dirty="0" err="1">
+                <a:solidFill>
+                  <a:srgbClr val="CE9178"/>
+                </a:solidFill>
+                <a:latin typeface="Consolas" panose="020B0609020204030204" pitchFamily="49" charset="0"/>
+              </a:rPr>
+              <a:t>renders</a:t>
+            </a:r>
+            <a:r>
+              <a:rPr lang="pl-PL" sz="1600" dirty="0">
+                <a:solidFill>
+                  <a:srgbClr val="CE9178"/>
+                </a:solidFill>
+                <a:latin typeface="Consolas" panose="020B0609020204030204" pitchFamily="49" charset="0"/>
+              </a:rPr>
+              <a:t> menu with Help"</a:t>
+            </a:r>
+            <a:r>
+              <a:rPr lang="pl-PL" sz="1600" dirty="0">
+                <a:solidFill>
+                  <a:srgbClr val="D4D4D4"/>
+                </a:solidFill>
+                <a:latin typeface="Consolas" panose="020B0609020204030204" pitchFamily="49" charset="0"/>
+              </a:rPr>
+              <a:t>, () </a:t>
+            </a:r>
+            <a:r>
+              <a:rPr lang="pl-PL" sz="1600" dirty="0">
+                <a:solidFill>
+                  <a:srgbClr val="569CD6"/>
+                </a:solidFill>
+                <a:latin typeface="Consolas" panose="020B0609020204030204" pitchFamily="49" charset="0"/>
+              </a:rPr>
+              <a:t>=&gt;</a:t>
+            </a:r>
+            <a:r>
+              <a:rPr lang="pl-PL" sz="1600" dirty="0">
+                <a:solidFill>
+                  <a:srgbClr val="D4D4D4"/>
+                </a:solidFill>
+                <a:latin typeface="Consolas" panose="020B0609020204030204" pitchFamily="49" charset="0"/>
+              </a:rPr>
+              <a:t> {</a:t>
+            </a:r>
+          </a:p>
+          <a:p>
+            <a:r>
+              <a:rPr lang="pl-PL" sz="1600" dirty="0">
+                <a:solidFill>
+                  <a:srgbClr val="D4D4D4"/>
+                </a:solidFill>
+                <a:latin typeface="Consolas" panose="020B0609020204030204" pitchFamily="49" charset="0"/>
+              </a:rPr>
+              <a:t>  </a:t>
+            </a:r>
+            <a:r>
+              <a:rPr lang="pl-PL" sz="1600" dirty="0" err="1">
+                <a:solidFill>
+                  <a:srgbClr val="DCDCAA"/>
+                </a:solidFill>
+                <a:latin typeface="Consolas" panose="020B0609020204030204" pitchFamily="49" charset="0"/>
+              </a:rPr>
+              <a:t>act</a:t>
+            </a:r>
+            <a:r>
+              <a:rPr lang="pl-PL" sz="1600" dirty="0">
+                <a:solidFill>
+                  <a:srgbClr val="D4D4D4"/>
+                </a:solidFill>
+                <a:latin typeface="Consolas" panose="020B0609020204030204" pitchFamily="49" charset="0"/>
+              </a:rPr>
+              <a:t>(() </a:t>
+            </a:r>
+            <a:r>
+              <a:rPr lang="pl-PL" sz="1600" dirty="0">
+                <a:solidFill>
+                  <a:srgbClr val="569CD6"/>
+                </a:solidFill>
+                <a:latin typeface="Consolas" panose="020B0609020204030204" pitchFamily="49" charset="0"/>
+              </a:rPr>
+              <a:t>=&gt;</a:t>
+            </a:r>
+            <a:r>
+              <a:rPr lang="pl-PL" sz="1600" dirty="0">
+                <a:solidFill>
+                  <a:srgbClr val="D4D4D4"/>
+                </a:solidFill>
+                <a:latin typeface="Consolas" panose="020B0609020204030204" pitchFamily="49" charset="0"/>
+              </a:rPr>
+              <a:t> {</a:t>
+            </a:r>
+          </a:p>
+          <a:p>
+            <a:r>
+              <a:rPr lang="pl-PL" sz="1600" dirty="0">
+                <a:solidFill>
+                  <a:srgbClr val="D4D4D4"/>
+                </a:solidFill>
+                <a:latin typeface="Consolas" panose="020B0609020204030204" pitchFamily="49" charset="0"/>
+              </a:rPr>
+              <a:t>    </a:t>
+            </a:r>
+            <a:r>
+              <a:rPr lang="pl-PL" sz="1600" dirty="0" err="1">
+                <a:solidFill>
+                  <a:srgbClr val="DCDCAA"/>
+                </a:solidFill>
+                <a:latin typeface="Consolas" panose="020B0609020204030204" pitchFamily="49" charset="0"/>
+              </a:rPr>
+              <a:t>render</a:t>
+            </a:r>
+            <a:r>
+              <a:rPr lang="pl-PL" sz="1600" dirty="0">
+                <a:solidFill>
+                  <a:srgbClr val="D4D4D4"/>
+                </a:solidFill>
+                <a:latin typeface="Consolas" panose="020B0609020204030204" pitchFamily="49" charset="0"/>
+              </a:rPr>
+              <a:t>(</a:t>
+            </a:r>
+            <a:r>
+              <a:rPr lang="pl-PL" sz="1600" dirty="0">
+                <a:solidFill>
+                  <a:srgbClr val="808080"/>
+                </a:solidFill>
+                <a:latin typeface="Consolas" panose="020B0609020204030204" pitchFamily="49" charset="0"/>
+              </a:rPr>
+              <a:t>&lt;</a:t>
+            </a:r>
+            <a:r>
+              <a:rPr lang="pl-PL" sz="1600" dirty="0">
+                <a:solidFill>
+                  <a:srgbClr val="4EC9B0"/>
+                </a:solidFill>
+                <a:latin typeface="Consolas" panose="020B0609020204030204" pitchFamily="49" charset="0"/>
+              </a:rPr>
+              <a:t>Router</a:t>
+            </a:r>
+            <a:r>
+              <a:rPr lang="pl-PL" sz="1600" dirty="0">
+                <a:solidFill>
+                  <a:srgbClr val="808080"/>
+                </a:solidFill>
+                <a:latin typeface="Consolas" panose="020B0609020204030204" pitchFamily="49" charset="0"/>
+              </a:rPr>
+              <a:t>&gt;&lt;</a:t>
+            </a:r>
+            <a:r>
+              <a:rPr lang="pl-PL" sz="1600" dirty="0" err="1">
+                <a:solidFill>
+                  <a:srgbClr val="4EC9B0"/>
+                </a:solidFill>
+                <a:latin typeface="Consolas" panose="020B0609020204030204" pitchFamily="49" charset="0"/>
+              </a:rPr>
+              <a:t>SomeComponent</a:t>
+            </a:r>
+            <a:r>
+              <a:rPr lang="pl-PL" sz="1600" dirty="0">
+                <a:solidFill>
+                  <a:srgbClr val="D4D4D4"/>
+                </a:solidFill>
+                <a:latin typeface="Consolas" panose="020B0609020204030204" pitchFamily="49" charset="0"/>
+              </a:rPr>
+              <a:t> </a:t>
+            </a:r>
+            <a:r>
+              <a:rPr lang="pl-PL" sz="1600" dirty="0">
+                <a:solidFill>
+                  <a:srgbClr val="808080"/>
+                </a:solidFill>
+                <a:latin typeface="Consolas" panose="020B0609020204030204" pitchFamily="49" charset="0"/>
+              </a:rPr>
+              <a:t>/&gt;&lt;/</a:t>
+            </a:r>
+            <a:r>
+              <a:rPr lang="pl-PL" sz="1600" dirty="0">
+                <a:solidFill>
+                  <a:srgbClr val="4EC9B0"/>
+                </a:solidFill>
+                <a:latin typeface="Consolas" panose="020B0609020204030204" pitchFamily="49" charset="0"/>
+              </a:rPr>
+              <a:t>Router</a:t>
+            </a:r>
+            <a:r>
+              <a:rPr lang="pl-PL" sz="1600" dirty="0">
+                <a:solidFill>
+                  <a:srgbClr val="808080"/>
+                </a:solidFill>
+                <a:latin typeface="Consolas" panose="020B0609020204030204" pitchFamily="49" charset="0"/>
+              </a:rPr>
+              <a:t>&gt;</a:t>
+            </a:r>
+            <a:r>
+              <a:rPr lang="pl-PL" sz="1600" dirty="0">
+                <a:solidFill>
+                  <a:srgbClr val="D4D4D4"/>
+                </a:solidFill>
+                <a:latin typeface="Consolas" panose="020B0609020204030204" pitchFamily="49" charset="0"/>
+              </a:rPr>
+              <a:t>, </a:t>
+            </a:r>
+            <a:r>
+              <a:rPr lang="pl-PL" sz="1600" dirty="0" err="1">
+                <a:solidFill>
+                  <a:srgbClr val="9CDCFE"/>
+                </a:solidFill>
+                <a:latin typeface="Consolas" panose="020B0609020204030204" pitchFamily="49" charset="0"/>
+              </a:rPr>
+              <a:t>container</a:t>
+            </a:r>
+            <a:r>
+              <a:rPr lang="pl-PL" sz="1600" dirty="0">
+                <a:solidFill>
+                  <a:srgbClr val="D4D4D4"/>
+                </a:solidFill>
+                <a:latin typeface="Consolas" panose="020B0609020204030204" pitchFamily="49" charset="0"/>
+              </a:rPr>
+              <a:t>);</a:t>
+            </a:r>
+          </a:p>
+          <a:p>
+            <a:r>
+              <a:rPr lang="pl-PL" sz="1600" dirty="0">
+                <a:solidFill>
+                  <a:srgbClr val="D4D4D4"/>
+                </a:solidFill>
+                <a:latin typeface="Consolas" panose="020B0609020204030204" pitchFamily="49" charset="0"/>
+              </a:rPr>
+              <a:t>  });</a:t>
+            </a:r>
+          </a:p>
+          <a:p>
+            <a:r>
+              <a:rPr lang="pl-PL" sz="1600" dirty="0">
+                <a:solidFill>
+                  <a:srgbClr val="D4D4D4"/>
+                </a:solidFill>
+                <a:latin typeface="Consolas" panose="020B0609020204030204" pitchFamily="49" charset="0"/>
+              </a:rPr>
+              <a:t>  </a:t>
+            </a:r>
+            <a:r>
+              <a:rPr lang="pl-PL" sz="1600" dirty="0" err="1">
+                <a:solidFill>
+                  <a:srgbClr val="DCDCAA"/>
+                </a:solidFill>
+                <a:latin typeface="Consolas" panose="020B0609020204030204" pitchFamily="49" charset="0"/>
+              </a:rPr>
+              <a:t>expect</a:t>
+            </a:r>
+            <a:r>
+              <a:rPr lang="pl-PL" sz="1600" dirty="0">
+                <a:solidFill>
+                  <a:srgbClr val="D4D4D4"/>
+                </a:solidFill>
+                <a:latin typeface="Consolas" panose="020B0609020204030204" pitchFamily="49" charset="0"/>
+              </a:rPr>
+              <a:t>(</a:t>
+            </a:r>
+            <a:r>
+              <a:rPr lang="pl-PL" sz="1600" dirty="0" err="1">
+                <a:solidFill>
+                  <a:srgbClr val="9CDCFE"/>
+                </a:solidFill>
+                <a:latin typeface="Consolas" panose="020B0609020204030204" pitchFamily="49" charset="0"/>
+              </a:rPr>
+              <a:t>container</a:t>
+            </a:r>
+            <a:r>
+              <a:rPr lang="pl-PL" sz="1600" dirty="0" err="1">
+                <a:solidFill>
+                  <a:srgbClr val="D4D4D4"/>
+                </a:solidFill>
+                <a:latin typeface="Consolas" panose="020B0609020204030204" pitchFamily="49" charset="0"/>
+              </a:rPr>
+              <a:t>.</a:t>
+            </a:r>
+            <a:r>
+              <a:rPr lang="pl-PL" sz="1600" dirty="0" err="1">
+                <a:solidFill>
+                  <a:srgbClr val="9CDCFE"/>
+                </a:solidFill>
+                <a:latin typeface="Consolas" panose="020B0609020204030204" pitchFamily="49" charset="0"/>
+              </a:rPr>
+              <a:t>textContent</a:t>
+            </a:r>
+            <a:r>
+              <a:rPr lang="pl-PL" sz="1600" dirty="0">
+                <a:solidFill>
+                  <a:srgbClr val="D4D4D4"/>
+                </a:solidFill>
+                <a:latin typeface="Consolas" panose="020B0609020204030204" pitchFamily="49" charset="0"/>
+              </a:rPr>
+              <a:t>).</a:t>
+            </a:r>
+            <a:r>
+              <a:rPr lang="pl-PL" sz="1600" dirty="0" err="1">
+                <a:solidFill>
+                  <a:srgbClr val="DCDCAA"/>
+                </a:solidFill>
+                <a:latin typeface="Consolas" panose="020B0609020204030204" pitchFamily="49" charset="0"/>
+              </a:rPr>
+              <a:t>toBe</a:t>
+            </a:r>
+            <a:r>
+              <a:rPr lang="pl-PL" sz="1600" dirty="0">
+                <a:solidFill>
+                  <a:srgbClr val="D4D4D4"/>
+                </a:solidFill>
+                <a:latin typeface="Consolas" panose="020B0609020204030204" pitchFamily="49" charset="0"/>
+              </a:rPr>
+              <a:t>(</a:t>
+            </a:r>
+            <a:r>
+              <a:rPr lang="pl-PL" sz="1600" dirty="0">
+                <a:solidFill>
+                  <a:srgbClr val="CE9178"/>
+                </a:solidFill>
+                <a:latin typeface="Consolas" panose="020B0609020204030204" pitchFamily="49" charset="0"/>
+              </a:rPr>
+              <a:t>"</a:t>
+            </a:r>
+            <a:r>
+              <a:rPr lang="pl-PL" sz="1600" dirty="0" err="1">
+                <a:solidFill>
+                  <a:srgbClr val="CE9178"/>
+                </a:solidFill>
+                <a:latin typeface="Consolas" panose="020B0609020204030204" pitchFamily="49" charset="0"/>
+              </a:rPr>
+              <a:t>Some</a:t>
+            </a:r>
+            <a:r>
+              <a:rPr lang="pl-PL" sz="1600" dirty="0">
+                <a:solidFill>
+                  <a:srgbClr val="CE9178"/>
+                </a:solidFill>
+                <a:latin typeface="Consolas" panose="020B0609020204030204" pitchFamily="49" charset="0"/>
+              </a:rPr>
+              <a:t> </a:t>
+            </a:r>
+            <a:r>
+              <a:rPr lang="pl-PL" sz="1600" dirty="0" err="1">
+                <a:solidFill>
+                  <a:srgbClr val="CE9178"/>
+                </a:solidFill>
+                <a:latin typeface="Consolas" panose="020B0609020204030204" pitchFamily="49" charset="0"/>
+              </a:rPr>
+              <a:t>text</a:t>
+            </a:r>
+            <a:r>
+              <a:rPr lang="pl-PL" sz="1600" dirty="0">
+                <a:solidFill>
+                  <a:srgbClr val="CE9178"/>
+                </a:solidFill>
+                <a:latin typeface="Consolas" panose="020B0609020204030204" pitchFamily="49" charset="0"/>
+              </a:rPr>
+              <a:t> </a:t>
+            </a:r>
+            <a:r>
+              <a:rPr lang="pl-PL" sz="1600" dirty="0" err="1">
+                <a:solidFill>
+                  <a:srgbClr val="CE9178"/>
+                </a:solidFill>
+                <a:latin typeface="Consolas" panose="020B0609020204030204" pitchFamily="49" charset="0"/>
+              </a:rPr>
+              <a:t>inside</a:t>
+            </a:r>
+            <a:r>
+              <a:rPr lang="pl-PL" sz="1600" dirty="0">
+                <a:solidFill>
+                  <a:srgbClr val="CE9178"/>
+                </a:solidFill>
+                <a:latin typeface="Consolas" panose="020B0609020204030204" pitchFamily="49" charset="0"/>
+              </a:rPr>
+              <a:t>"</a:t>
+            </a:r>
+            <a:r>
+              <a:rPr lang="pl-PL" sz="1600" dirty="0">
+                <a:solidFill>
+                  <a:srgbClr val="D4D4D4"/>
+                </a:solidFill>
+                <a:latin typeface="Consolas" panose="020B0609020204030204" pitchFamily="49" charset="0"/>
+              </a:rPr>
+              <a:t>);</a:t>
+            </a:r>
+          </a:p>
+          <a:p>
+            <a:r>
+              <a:rPr lang="pl-PL" sz="1600" dirty="0">
+                <a:solidFill>
+                  <a:srgbClr val="D4D4D4"/>
+                </a:solidFill>
+                <a:latin typeface="Consolas" panose="020B0609020204030204" pitchFamily="49" charset="0"/>
+              </a:rPr>
+              <a:t>});</a:t>
+            </a:r>
+            <a:endParaRPr lang="pl-PL" sz="1600" b="0" dirty="0">
+              <a:solidFill>
+                <a:srgbClr val="D4D4D4"/>
+              </a:solidFill>
+              <a:effectLst/>
+              <a:latin typeface="Consolas" panose="020B0609020204030204" pitchFamily="49" charset="0"/>
+            </a:endParaRPr>
+          </a:p>
+        </p:txBody>
+      </p:sp>
+    </p:spTree>
+    <p:extLst>
+      <p:ext uri="{BB962C8B-B14F-4D97-AF65-F5344CB8AC3E}">
+        <p14:creationId xmlns:p14="http://schemas.microsoft.com/office/powerpoint/2010/main" val="3044748738"/>
+      </p:ext>
+    </p:extLst>
+  </p:cSld>
+  <p:clrMapOvr>
+    <a:masterClrMapping/>
+  </p:clrMapOvr>
+</p:sld>
+</file>
+
+<file path=ppt/slides/slide23.xml><?xml version="1.0" encoding="utf-8"?>
+<p:sld xmlns:a="http://schemas.openxmlformats.org/drawingml/2006/main" xmlns:r="http://schemas.openxmlformats.org/officeDocument/2006/relationships" xmlns:p="http://schemas.openxmlformats.org/presentationml/2006/main">
+  <p:cSld>
+    <p:spTree>
+      <p:nvGrpSpPr>
+        <p:cNvPr id="1" name=""/>
+        <p:cNvGrpSpPr/>
+        <p:nvPr/>
+      </p:nvGrpSpPr>
+      <p:grpSpPr>
+        <a:xfrm>
+          <a:off x="0" y="0"/>
+          <a:ext cx="0" cy="0"/>
+          <a:chOff x="0" y="0"/>
+          <a:chExt cx="0" cy="0"/>
+        </a:xfrm>
+      </p:grpSpPr>
+      <p:sp>
+        <p:nvSpPr>
+          <p:cNvPr id="4" name="pole tekstowe 3">
+            <a:extLst>
+              <a:ext uri="{FF2B5EF4-FFF2-40B4-BE49-F238E27FC236}">
+                <a16:creationId xmlns:a16="http://schemas.microsoft.com/office/drawing/2014/main" id="{F164A7B3-8808-414C-9401-3B25194E3B5A}"/>
+              </a:ext>
+            </a:extLst>
+          </p:cNvPr>
+          <p:cNvSpPr txBox="1"/>
+          <p:nvPr/>
+        </p:nvSpPr>
+        <p:spPr>
+          <a:xfrm>
+            <a:off x="497840" y="538480"/>
+            <a:ext cx="645690" cy="369332"/>
+          </a:xfrm>
+          <a:prstGeom prst="rect">
+            <a:avLst/>
+          </a:prstGeom>
+          <a:noFill/>
+        </p:spPr>
+        <p:txBody>
+          <a:bodyPr wrap="none" rtlCol="0">
+            <a:spAutoFit/>
+          </a:bodyPr>
+          <a:lstStyle/>
+          <a:p>
+            <a:r>
+              <a:rPr lang="pl-PL" dirty="0" err="1"/>
+              <a:t>Tests</a:t>
+            </a:r>
+            <a:endParaRPr lang="pl-PL" dirty="0"/>
+          </a:p>
+        </p:txBody>
+      </p:sp>
+    </p:spTree>
+    <p:extLst>
+      <p:ext uri="{BB962C8B-B14F-4D97-AF65-F5344CB8AC3E}">
+        <p14:creationId xmlns:p14="http://schemas.microsoft.com/office/powerpoint/2010/main" val="249972549"/>
+      </p:ext>
+    </p:extLst>
+  </p:cSld>
+  <p:clrMapOvr>
+    <a:masterClrMapping/>
+  </p:clrMapOvr>
+</p:sld>
+</file>
+
+<file path=ppt/slides/slide24.xml><?xml version="1.0" encoding="utf-8"?>
+<p:sld xmlns:a="http://schemas.openxmlformats.org/drawingml/2006/main" xmlns:r="http://schemas.openxmlformats.org/officeDocument/2006/relationships" xmlns:p="http://schemas.openxmlformats.org/presentationml/2006/main">
+  <p:cSld>
+    <p:spTree>
+      <p:nvGrpSpPr>
+        <p:cNvPr id="1" name=""/>
+        <p:cNvGrpSpPr/>
+        <p:nvPr/>
+      </p:nvGrpSpPr>
+      <p:grpSpPr>
+        <a:xfrm>
+          <a:off x="0" y="0"/>
+          <a:ext cx="0" cy="0"/>
+          <a:chOff x="0" y="0"/>
+          <a:chExt cx="0" cy="0"/>
+        </a:xfrm>
+      </p:grpSpPr>
+      <p:sp>
+        <p:nvSpPr>
+          <p:cNvPr id="4" name="pole tekstowe 3">
+            <a:extLst>
+              <a:ext uri="{FF2B5EF4-FFF2-40B4-BE49-F238E27FC236}">
+                <a16:creationId xmlns:a16="http://schemas.microsoft.com/office/drawing/2014/main" id="{F164A7B3-8808-414C-9401-3B25194E3B5A}"/>
+              </a:ext>
+            </a:extLst>
+          </p:cNvPr>
+          <p:cNvSpPr txBox="1"/>
+          <p:nvPr/>
+        </p:nvSpPr>
+        <p:spPr>
+          <a:xfrm>
+            <a:off x="497840" y="538480"/>
+            <a:ext cx="645690" cy="369332"/>
+          </a:xfrm>
+          <a:prstGeom prst="rect">
+            <a:avLst/>
+          </a:prstGeom>
+          <a:noFill/>
+        </p:spPr>
+        <p:txBody>
+          <a:bodyPr wrap="none" rtlCol="0">
+            <a:spAutoFit/>
+          </a:bodyPr>
+          <a:lstStyle/>
+          <a:p>
+            <a:r>
+              <a:rPr lang="pl-PL" dirty="0" err="1"/>
+              <a:t>Tests</a:t>
+            </a:r>
+            <a:endParaRPr lang="pl-PL" dirty="0"/>
+          </a:p>
+        </p:txBody>
+      </p:sp>
+    </p:spTree>
+    <p:extLst>
+      <p:ext uri="{BB962C8B-B14F-4D97-AF65-F5344CB8AC3E}">
+        <p14:creationId xmlns:p14="http://schemas.microsoft.com/office/powerpoint/2010/main" val="3103880284"/>
+      </p:ext>
+    </p:extLst>
+  </p:cSld>
+  <p:clrMapOvr>
+    <a:masterClrMapping/>
+  </p:clrMapOvr>
+</p:sld>
+</file>
+
+<file path=ppt/slides/slide25.xml><?xml version="1.0" encoding="utf-8"?>
+<p:sld xmlns:a="http://schemas.openxmlformats.org/drawingml/2006/main" xmlns:r="http://schemas.openxmlformats.org/officeDocument/2006/relationships" xmlns:p="http://schemas.openxmlformats.org/presentationml/2006/main">
+  <p:cSld>
+    <p:spTree>
+      <p:nvGrpSpPr>
+        <p:cNvPr id="1" name=""/>
+        <p:cNvGrpSpPr/>
+        <p:nvPr/>
+      </p:nvGrpSpPr>
+      <p:grpSpPr>
+        <a:xfrm>
+          <a:off x="0" y="0"/>
+          <a:ext cx="0" cy="0"/>
+          <a:chOff x="0" y="0"/>
+          <a:chExt cx="0" cy="0"/>
+        </a:xfrm>
+      </p:grpSpPr>
+      <p:sp>
+        <p:nvSpPr>
+          <p:cNvPr id="4" name="pole tekstowe 3">
+            <a:extLst>
+              <a:ext uri="{FF2B5EF4-FFF2-40B4-BE49-F238E27FC236}">
+                <a16:creationId xmlns:a16="http://schemas.microsoft.com/office/drawing/2014/main" id="{F164A7B3-8808-414C-9401-3B25194E3B5A}"/>
+              </a:ext>
+            </a:extLst>
+          </p:cNvPr>
+          <p:cNvSpPr txBox="1"/>
+          <p:nvPr/>
+        </p:nvSpPr>
+        <p:spPr>
+          <a:xfrm>
+            <a:off x="497840" y="538480"/>
+            <a:ext cx="645690" cy="369332"/>
+          </a:xfrm>
+          <a:prstGeom prst="rect">
+            <a:avLst/>
+          </a:prstGeom>
+          <a:noFill/>
+        </p:spPr>
+        <p:txBody>
+          <a:bodyPr wrap="none" rtlCol="0">
+            <a:spAutoFit/>
+          </a:bodyPr>
+          <a:lstStyle/>
+          <a:p>
+            <a:r>
+              <a:rPr lang="pl-PL" dirty="0" err="1"/>
+              <a:t>Tests</a:t>
+            </a:r>
+            <a:endParaRPr lang="pl-PL" dirty="0"/>
+          </a:p>
+        </p:txBody>
+      </p:sp>
+    </p:spTree>
+    <p:extLst>
+      <p:ext uri="{BB962C8B-B14F-4D97-AF65-F5344CB8AC3E}">
+        <p14:creationId xmlns:p14="http://schemas.microsoft.com/office/powerpoint/2010/main" val="395038899"/>
       </p:ext>
     </p:extLst>
   </p:cSld>

</xml_diff>

<commit_message>
Exercise 20: test interaction with account dropdown
</commit_message>
<xml_diff>
--- a/tutorial/ReactjsTraining.pptx
+++ b/tutorial/ReactjsTraining.pptx
@@ -30,8 +30,8 @@
     <p:sldId id="275" r:id="rId21"/>
     <p:sldId id="276" r:id="rId22"/>
     <p:sldId id="277" r:id="rId23"/>
-    <p:sldId id="278" r:id="rId24"/>
-    <p:sldId id="279" r:id="rId25"/>
+    <p:sldId id="279" r:id="rId24"/>
+    <p:sldId id="278" r:id="rId25"/>
     <p:sldId id="280" r:id="rId26"/>
   </p:sldIdLst>
   <p:sldSz cx="12192000" cy="6858000"/>
@@ -4276,15 +4276,167 @@
               <a:buFontTx/>
               <a:buNone/>
             </a:pPr>
-            <a:endParaRPr lang="pl-PL" sz="1200" b="0" i="0" kern="1200" dirty="0">
-              <a:solidFill>
-                <a:schemeClr val="tx1"/>
-              </a:solidFill>
-              <a:effectLst/>
-              <a:latin typeface="+mn-lt"/>
-              <a:ea typeface="+mn-ea"/>
-              <a:cs typeface="+mn-cs"/>
-            </a:endParaRPr>
+            <a:r>
+              <a:rPr lang="pl-PL" sz="1200" b="0" i="0" kern="1200" dirty="0" err="1">
+                <a:solidFill>
+                  <a:schemeClr val="tx1"/>
+                </a:solidFill>
+                <a:effectLst/>
+                <a:latin typeface="+mn-lt"/>
+                <a:ea typeface="+mn-ea"/>
+                <a:cs typeface="+mn-cs"/>
+              </a:rPr>
+              <a:t>Exercise</a:t>
+            </a:r>
+            <a:r>
+              <a:rPr lang="pl-PL" sz="1200" b="0" i="0" kern="1200" dirty="0">
+                <a:solidFill>
+                  <a:schemeClr val="tx1"/>
+                </a:solidFill>
+                <a:effectLst/>
+                <a:latin typeface="+mn-lt"/>
+                <a:ea typeface="+mn-ea"/>
+                <a:cs typeface="+mn-cs"/>
+              </a:rPr>
+              <a:t> 20: Dodać test który:</a:t>
+            </a:r>
+            <a:br>
+              <a:rPr lang="pl-PL" sz="1200" b="0" i="0" kern="1200" dirty="0">
+                <a:solidFill>
+                  <a:schemeClr val="tx1"/>
+                </a:solidFill>
+                <a:effectLst/>
+                <a:latin typeface="+mn-lt"/>
+                <a:ea typeface="+mn-ea"/>
+                <a:cs typeface="+mn-cs"/>
+              </a:rPr>
+            </a:br>
+            <a:r>
+              <a:rPr lang="pl-PL" sz="1200" b="0" i="0" kern="1200" dirty="0">
+                <a:solidFill>
+                  <a:schemeClr val="tx1"/>
+                </a:solidFill>
+                <a:effectLst/>
+                <a:latin typeface="+mn-lt"/>
+                <a:ea typeface="+mn-ea"/>
+                <a:cs typeface="+mn-cs"/>
+              </a:rPr>
+              <a:t>1. Uzupełni email i </a:t>
+            </a:r>
+            <a:r>
+              <a:rPr lang="pl-PL" sz="1200" b="0" i="0" kern="1200" dirty="0" err="1">
+                <a:solidFill>
+                  <a:schemeClr val="tx1"/>
+                </a:solidFill>
+                <a:effectLst/>
+                <a:latin typeface="+mn-lt"/>
+                <a:ea typeface="+mn-ea"/>
+                <a:cs typeface="+mn-cs"/>
+              </a:rPr>
+              <a:t>password</a:t>
+            </a:r>
+            <a:r>
+              <a:rPr lang="pl-PL" sz="1200" b="0" i="0" kern="1200" dirty="0">
+                <a:solidFill>
+                  <a:schemeClr val="tx1"/>
+                </a:solidFill>
+                <a:effectLst/>
+                <a:latin typeface="+mn-lt"/>
+                <a:ea typeface="+mn-ea"/>
+                <a:cs typeface="+mn-cs"/>
+              </a:rPr>
+              <a:t> i sprawdzi czy przycisk jest </a:t>
+            </a:r>
+            <a:r>
+              <a:rPr lang="pl-PL" sz="1200" b="0" i="0" kern="1200" dirty="0" err="1">
+                <a:solidFill>
+                  <a:schemeClr val="tx1"/>
+                </a:solidFill>
+                <a:effectLst/>
+                <a:latin typeface="+mn-lt"/>
+                <a:ea typeface="+mn-ea"/>
+                <a:cs typeface="+mn-cs"/>
+              </a:rPr>
+              <a:t>disabled</a:t>
+            </a:r>
+            <a:r>
+              <a:rPr lang="pl-PL" sz="1200" b="0" i="0" kern="1200" dirty="0">
+                <a:solidFill>
+                  <a:schemeClr val="tx1"/>
+                </a:solidFill>
+                <a:effectLst/>
+                <a:latin typeface="+mn-lt"/>
+                <a:ea typeface="+mn-ea"/>
+                <a:cs typeface="+mn-cs"/>
+              </a:rPr>
+              <a:t> oraz walidacja się nie odpaliła</a:t>
+            </a:r>
+          </a:p>
+          <a:p>
+            <a:pPr marL="0" indent="0">
+              <a:buFontTx/>
+              <a:buNone/>
+            </a:pPr>
+            <a:r>
+              <a:rPr lang="pl-PL" sz="1200" b="0" i="0" kern="1200" dirty="0">
+                <a:solidFill>
+                  <a:schemeClr val="tx1"/>
+                </a:solidFill>
+                <a:effectLst/>
+                <a:latin typeface="+mn-lt"/>
+                <a:ea typeface="+mn-ea"/>
+                <a:cs typeface="+mn-cs"/>
+              </a:rPr>
+              <a:t>2. Potem od razu wpisze email i </a:t>
+            </a:r>
+            <a:r>
+              <a:rPr lang="pl-PL" sz="1200" b="0" i="0" kern="1200" dirty="0" err="1">
+                <a:solidFill>
+                  <a:schemeClr val="tx1"/>
+                </a:solidFill>
+                <a:effectLst/>
+                <a:latin typeface="+mn-lt"/>
+                <a:ea typeface="+mn-ea"/>
+                <a:cs typeface="+mn-cs"/>
+              </a:rPr>
+              <a:t>password</a:t>
+            </a:r>
+            <a:r>
+              <a:rPr lang="pl-PL" sz="1200" b="0" i="0" kern="1200" dirty="0">
+                <a:solidFill>
+                  <a:schemeClr val="tx1"/>
+                </a:solidFill>
+                <a:effectLst/>
+                <a:latin typeface="+mn-lt"/>
+                <a:ea typeface="+mn-ea"/>
+                <a:cs typeface="+mn-cs"/>
+              </a:rPr>
+              <a:t> i sprawdzi czy </a:t>
+            </a:r>
+            <a:r>
+              <a:rPr lang="pl-PL" sz="1200" b="0" i="0" kern="1200" dirty="0" err="1">
+                <a:solidFill>
+                  <a:schemeClr val="tx1"/>
+                </a:solidFill>
+                <a:effectLst/>
+                <a:latin typeface="+mn-lt"/>
+                <a:ea typeface="+mn-ea"/>
+                <a:cs typeface="+mn-cs"/>
+              </a:rPr>
+              <a:t>disabled</a:t>
+            </a:r>
+            <a:r>
+              <a:rPr lang="pl-PL" sz="1200" b="0" i="0" kern="1200" dirty="0">
+                <a:solidFill>
+                  <a:schemeClr val="tx1"/>
+                </a:solidFill>
+                <a:effectLst/>
+                <a:latin typeface="+mn-lt"/>
+                <a:ea typeface="+mn-ea"/>
+                <a:cs typeface="+mn-cs"/>
+              </a:rPr>
+              <a:t> się zmieniło (klasa) i czy walidacja się odpaliła</a:t>
+            </a:r>
           </a:p>
         </p:txBody>
       </p:sp>
@@ -4314,7 +4466,7 @@
     </p:spTree>
     <p:extLst>
       <p:ext uri="{BB962C8B-B14F-4D97-AF65-F5344CB8AC3E}">
-        <p14:creationId xmlns:p14="http://schemas.microsoft.com/office/powerpoint/2010/main" val="531511798"/>
+        <p14:creationId xmlns:p14="http://schemas.microsoft.com/office/powerpoint/2010/main" val="2942987176"/>
       </p:ext>
     </p:extLst>
   </p:cSld>
@@ -4410,7 +4562,7 @@
     </p:spTree>
     <p:extLst>
       <p:ext uri="{BB962C8B-B14F-4D97-AF65-F5344CB8AC3E}">
-        <p14:creationId xmlns:p14="http://schemas.microsoft.com/office/powerpoint/2010/main" val="2942987176"/>
+        <p14:creationId xmlns:p14="http://schemas.microsoft.com/office/powerpoint/2010/main" val="531511798"/>
       </p:ext>
     </p:extLst>
   </p:cSld>
@@ -23006,7 +23158,7 @@
         <p:spPr>
           <a:xfrm>
             <a:off x="497840" y="538480"/>
-            <a:ext cx="645690" cy="369332"/>
+            <a:ext cx="1841786" cy="369332"/>
           </a:xfrm>
           <a:prstGeom prst="rect">
             <a:avLst/>
@@ -23023,6 +23175,842 @@
               <a:rPr lang="pl-PL" dirty="0" err="1"/>
               <a:t>Tests</a:t>
             </a:r>
+            <a:r>
+              <a:rPr lang="pl-PL" dirty="0"/>
+              <a:t> - </a:t>
+            </a:r>
+            <a:r>
+              <a:rPr lang="pl-PL" dirty="0" err="1"/>
+              <a:t>interaction</a:t>
+            </a:r>
+            <a:endParaRPr lang="pl-PL" dirty="0"/>
+          </a:p>
+        </p:txBody>
+      </p:sp>
+      <p:sp>
+        <p:nvSpPr>
+          <p:cNvPr id="2" name="Prostokąt 1">
+            <a:extLst>
+              <a:ext uri="{FF2B5EF4-FFF2-40B4-BE49-F238E27FC236}">
+                <a16:creationId xmlns:a16="http://schemas.microsoft.com/office/drawing/2014/main" id="{7B49E0FB-64C1-4B81-BEFA-0C1AF5B6D948}"/>
+              </a:ext>
+            </a:extLst>
+          </p:cNvPr>
+          <p:cNvSpPr/>
+          <p:nvPr/>
+        </p:nvSpPr>
+        <p:spPr>
+          <a:xfrm>
+            <a:off x="2531166" y="1528825"/>
+            <a:ext cx="6665844" cy="366234"/>
+          </a:xfrm>
+          <a:prstGeom prst="rect">
+            <a:avLst/>
+          </a:prstGeom>
+          <a:solidFill>
+            <a:schemeClr val="tx1"/>
+          </a:solidFill>
+        </p:spPr>
+        <p:txBody>
+          <a:bodyPr wrap="square">
+            <a:spAutoFit/>
+          </a:bodyPr>
+          <a:lstStyle/>
+          <a:p>
+            <a:r>
+              <a:rPr lang="pl-PL" dirty="0">
+                <a:solidFill>
+                  <a:srgbClr val="C586C0"/>
+                </a:solidFill>
+                <a:latin typeface="Consolas" panose="020B0609020204030204" pitchFamily="49" charset="0"/>
+              </a:rPr>
+              <a:t>import</a:t>
+            </a:r>
+            <a:r>
+              <a:rPr lang="pl-PL" dirty="0">
+                <a:solidFill>
+                  <a:srgbClr val="D4D4D4"/>
+                </a:solidFill>
+                <a:latin typeface="Consolas" panose="020B0609020204030204" pitchFamily="49" charset="0"/>
+              </a:rPr>
+              <a:t> { </a:t>
+            </a:r>
+            <a:r>
+              <a:rPr lang="pl-PL" dirty="0" err="1">
+                <a:solidFill>
+                  <a:srgbClr val="9CDCFE"/>
+                </a:solidFill>
+                <a:latin typeface="Consolas" panose="020B0609020204030204" pitchFamily="49" charset="0"/>
+              </a:rPr>
+              <a:t>fireEvent</a:t>
+            </a:r>
+            <a:r>
+              <a:rPr lang="pl-PL" dirty="0">
+                <a:solidFill>
+                  <a:srgbClr val="D4D4D4"/>
+                </a:solidFill>
+                <a:latin typeface="Consolas" panose="020B0609020204030204" pitchFamily="49" charset="0"/>
+              </a:rPr>
+              <a:t> } </a:t>
+            </a:r>
+            <a:r>
+              <a:rPr lang="pl-PL" dirty="0">
+                <a:solidFill>
+                  <a:srgbClr val="C586C0"/>
+                </a:solidFill>
+                <a:latin typeface="Consolas" panose="020B0609020204030204" pitchFamily="49" charset="0"/>
+              </a:rPr>
+              <a:t>from</a:t>
+            </a:r>
+            <a:r>
+              <a:rPr lang="pl-PL" dirty="0">
+                <a:solidFill>
+                  <a:srgbClr val="D4D4D4"/>
+                </a:solidFill>
+                <a:latin typeface="Consolas" panose="020B0609020204030204" pitchFamily="49" charset="0"/>
+              </a:rPr>
+              <a:t> </a:t>
+            </a:r>
+            <a:r>
+              <a:rPr lang="pl-PL" dirty="0">
+                <a:solidFill>
+                  <a:srgbClr val="CE9178"/>
+                </a:solidFill>
+                <a:latin typeface="Consolas" panose="020B0609020204030204" pitchFamily="49" charset="0"/>
+              </a:rPr>
+              <a:t>'@</a:t>
+            </a:r>
+            <a:r>
+              <a:rPr lang="pl-PL" dirty="0" err="1">
+                <a:solidFill>
+                  <a:srgbClr val="CE9178"/>
+                </a:solidFill>
+                <a:latin typeface="Consolas" panose="020B0609020204030204" pitchFamily="49" charset="0"/>
+              </a:rPr>
+              <a:t>testing-library</a:t>
+            </a:r>
+            <a:r>
+              <a:rPr lang="pl-PL" dirty="0">
+                <a:solidFill>
+                  <a:srgbClr val="CE9178"/>
+                </a:solidFill>
+                <a:latin typeface="Consolas" panose="020B0609020204030204" pitchFamily="49" charset="0"/>
+              </a:rPr>
+              <a:t>/</a:t>
+            </a:r>
+            <a:r>
+              <a:rPr lang="pl-PL" dirty="0" err="1">
+                <a:solidFill>
+                  <a:srgbClr val="CE9178"/>
+                </a:solidFill>
+                <a:latin typeface="Consolas" panose="020B0609020204030204" pitchFamily="49" charset="0"/>
+              </a:rPr>
+              <a:t>react</a:t>
+            </a:r>
+            <a:r>
+              <a:rPr lang="pl-PL" dirty="0">
+                <a:solidFill>
+                  <a:srgbClr val="CE9178"/>
+                </a:solidFill>
+                <a:latin typeface="Consolas" panose="020B0609020204030204" pitchFamily="49" charset="0"/>
+              </a:rPr>
+              <a:t>'</a:t>
+            </a:r>
+            <a:endParaRPr lang="pl-PL" b="0" dirty="0">
+              <a:solidFill>
+                <a:srgbClr val="D4D4D4"/>
+              </a:solidFill>
+              <a:effectLst/>
+              <a:latin typeface="Consolas" panose="020B0609020204030204" pitchFamily="49" charset="0"/>
+            </a:endParaRPr>
+          </a:p>
+        </p:txBody>
+      </p:sp>
+      <p:sp>
+        <p:nvSpPr>
+          <p:cNvPr id="3" name="Prostokąt 2">
+            <a:extLst>
+              <a:ext uri="{FF2B5EF4-FFF2-40B4-BE49-F238E27FC236}">
+                <a16:creationId xmlns:a16="http://schemas.microsoft.com/office/drawing/2014/main" id="{E97B0CD6-1362-4C40-ACED-CF8C48A4099E}"/>
+              </a:ext>
+            </a:extLst>
+          </p:cNvPr>
+          <p:cNvSpPr/>
+          <p:nvPr/>
+        </p:nvSpPr>
+        <p:spPr>
+          <a:xfrm>
+            <a:off x="2531166" y="2040724"/>
+            <a:ext cx="7474228" cy="369332"/>
+          </a:xfrm>
+          <a:prstGeom prst="rect">
+            <a:avLst/>
+          </a:prstGeom>
+          <a:solidFill>
+            <a:schemeClr val="tx1"/>
+          </a:solidFill>
+        </p:spPr>
+        <p:txBody>
+          <a:bodyPr wrap="square">
+            <a:spAutoFit/>
+          </a:bodyPr>
+          <a:lstStyle/>
+          <a:p>
+            <a:r>
+              <a:rPr lang="en-US" dirty="0" err="1">
+                <a:solidFill>
+                  <a:srgbClr val="9CDCFE"/>
+                </a:solidFill>
+                <a:latin typeface="Consolas" panose="020B0609020204030204" pitchFamily="49" charset="0"/>
+              </a:rPr>
+              <a:t>fireEvent</a:t>
+            </a:r>
+            <a:r>
+              <a:rPr lang="en-US" dirty="0" err="1">
+                <a:solidFill>
+                  <a:srgbClr val="D4D4D4"/>
+                </a:solidFill>
+                <a:latin typeface="Consolas" panose="020B0609020204030204" pitchFamily="49" charset="0"/>
+              </a:rPr>
+              <a:t>.</a:t>
+            </a:r>
+            <a:r>
+              <a:rPr lang="en-US" dirty="0" err="1">
+                <a:solidFill>
+                  <a:srgbClr val="DCDCAA"/>
+                </a:solidFill>
+                <a:latin typeface="Consolas" panose="020B0609020204030204" pitchFamily="49" charset="0"/>
+              </a:rPr>
+              <a:t>click</a:t>
+            </a:r>
+            <a:r>
+              <a:rPr lang="en-US" dirty="0">
+                <a:solidFill>
+                  <a:srgbClr val="D4D4D4"/>
+                </a:solidFill>
+                <a:latin typeface="Consolas" panose="020B0609020204030204" pitchFamily="49" charset="0"/>
+              </a:rPr>
+              <a:t>(</a:t>
+            </a:r>
+            <a:r>
+              <a:rPr lang="en-US" dirty="0" err="1">
+                <a:solidFill>
+                  <a:srgbClr val="9CDCFE"/>
+                </a:solidFill>
+                <a:latin typeface="Consolas" panose="020B0609020204030204" pitchFamily="49" charset="0"/>
+              </a:rPr>
+              <a:t>container</a:t>
+            </a:r>
+            <a:r>
+              <a:rPr lang="en-US" dirty="0" err="1">
+                <a:solidFill>
+                  <a:srgbClr val="D4D4D4"/>
+                </a:solidFill>
+                <a:latin typeface="Consolas" panose="020B0609020204030204" pitchFamily="49" charset="0"/>
+              </a:rPr>
+              <a:t>.</a:t>
+            </a:r>
+            <a:r>
+              <a:rPr lang="en-US" dirty="0" err="1">
+                <a:solidFill>
+                  <a:srgbClr val="DCDCAA"/>
+                </a:solidFill>
+                <a:latin typeface="Consolas" panose="020B0609020204030204" pitchFamily="49" charset="0"/>
+              </a:rPr>
+              <a:t>querySelector</a:t>
+            </a:r>
+            <a:r>
+              <a:rPr lang="en-US" dirty="0">
+                <a:solidFill>
+                  <a:srgbClr val="D4D4D4"/>
+                </a:solidFill>
+                <a:latin typeface="Consolas" panose="020B0609020204030204" pitchFamily="49" charset="0"/>
+              </a:rPr>
+              <a:t>(</a:t>
+            </a:r>
+            <a:r>
+              <a:rPr lang="en-US" dirty="0">
+                <a:solidFill>
+                  <a:srgbClr val="CE9178"/>
+                </a:solidFill>
+                <a:latin typeface="Consolas" panose="020B0609020204030204" pitchFamily="49" charset="0"/>
+              </a:rPr>
+              <a:t>'.some-class))</a:t>
+            </a:r>
+            <a:r>
+              <a:rPr lang="en-US" dirty="0">
+                <a:solidFill>
+                  <a:srgbClr val="F44747"/>
+                </a:solidFill>
+                <a:latin typeface="Consolas" panose="020B0609020204030204" pitchFamily="49" charset="0"/>
+              </a:rPr>
+              <a:t>;</a:t>
+            </a:r>
+            <a:endParaRPr lang="en-US" b="0" dirty="0">
+              <a:solidFill>
+                <a:srgbClr val="D4D4D4"/>
+              </a:solidFill>
+              <a:effectLst/>
+              <a:latin typeface="Consolas" panose="020B0609020204030204" pitchFamily="49" charset="0"/>
+            </a:endParaRPr>
+          </a:p>
+        </p:txBody>
+      </p:sp>
+      <p:sp>
+        <p:nvSpPr>
+          <p:cNvPr id="5" name="pole tekstowe 4">
+            <a:extLst>
+              <a:ext uri="{FF2B5EF4-FFF2-40B4-BE49-F238E27FC236}">
+                <a16:creationId xmlns:a16="http://schemas.microsoft.com/office/drawing/2014/main" id="{DB5D8446-CB9B-437E-ABB8-BE9D5E166D8A}"/>
+              </a:ext>
+            </a:extLst>
+          </p:cNvPr>
+          <p:cNvSpPr txBox="1"/>
+          <p:nvPr/>
+        </p:nvSpPr>
+        <p:spPr>
+          <a:xfrm>
+            <a:off x="2476110" y="1114912"/>
+            <a:ext cx="1448923" cy="369332"/>
+          </a:xfrm>
+          <a:prstGeom prst="rect">
+            <a:avLst/>
+          </a:prstGeom>
+          <a:noFill/>
+        </p:spPr>
+        <p:txBody>
+          <a:bodyPr wrap="none" rtlCol="0">
+            <a:spAutoFit/>
+          </a:bodyPr>
+          <a:lstStyle/>
+          <a:p>
+            <a:r>
+              <a:rPr lang="pl-PL" dirty="0" err="1"/>
+              <a:t>Click</a:t>
+            </a:r>
+            <a:r>
+              <a:rPr lang="pl-PL" dirty="0"/>
+              <a:t> element</a:t>
+            </a:r>
+          </a:p>
+        </p:txBody>
+      </p:sp>
+      <p:sp>
+        <p:nvSpPr>
+          <p:cNvPr id="6" name="Prostokąt 5">
+            <a:extLst>
+              <a:ext uri="{FF2B5EF4-FFF2-40B4-BE49-F238E27FC236}">
+                <a16:creationId xmlns:a16="http://schemas.microsoft.com/office/drawing/2014/main" id="{5422EC9A-A62A-4326-8119-F2F955730777}"/>
+              </a:ext>
+            </a:extLst>
+          </p:cNvPr>
+          <p:cNvSpPr/>
+          <p:nvPr/>
+        </p:nvSpPr>
+        <p:spPr>
+          <a:xfrm>
+            <a:off x="2476110" y="3114799"/>
+            <a:ext cx="8057321" cy="923330"/>
+          </a:xfrm>
+          <a:prstGeom prst="rect">
+            <a:avLst/>
+          </a:prstGeom>
+          <a:solidFill>
+            <a:schemeClr val="tx1"/>
+          </a:solidFill>
+        </p:spPr>
+        <p:txBody>
+          <a:bodyPr wrap="square">
+            <a:spAutoFit/>
+          </a:bodyPr>
+          <a:lstStyle/>
+          <a:p>
+            <a:r>
+              <a:rPr lang="pl-PL" dirty="0" err="1">
+                <a:solidFill>
+                  <a:srgbClr val="9CDCFE"/>
+                </a:solidFill>
+                <a:latin typeface="Consolas" panose="020B0609020204030204" pitchFamily="49" charset="0"/>
+              </a:rPr>
+              <a:t>fireEvent</a:t>
+            </a:r>
+            <a:r>
+              <a:rPr lang="pl-PL" dirty="0" err="1">
+                <a:solidFill>
+                  <a:srgbClr val="D4D4D4"/>
+                </a:solidFill>
+                <a:latin typeface="Consolas" panose="020B0609020204030204" pitchFamily="49" charset="0"/>
+              </a:rPr>
+              <a:t>.</a:t>
+            </a:r>
+            <a:r>
+              <a:rPr lang="pl-PL" dirty="0" err="1">
+                <a:solidFill>
+                  <a:srgbClr val="DCDCAA"/>
+                </a:solidFill>
+                <a:latin typeface="Consolas" panose="020B0609020204030204" pitchFamily="49" charset="0"/>
+              </a:rPr>
+              <a:t>change</a:t>
+            </a:r>
+            <a:r>
+              <a:rPr lang="pl-PL" dirty="0">
+                <a:solidFill>
+                  <a:srgbClr val="D4D4D4"/>
+                </a:solidFill>
+                <a:latin typeface="Consolas" panose="020B0609020204030204" pitchFamily="49" charset="0"/>
+              </a:rPr>
+              <a:t>(</a:t>
+            </a:r>
+            <a:r>
+              <a:rPr lang="en-US" dirty="0" err="1">
+                <a:solidFill>
+                  <a:srgbClr val="9CDCFE"/>
+                </a:solidFill>
+                <a:latin typeface="Consolas" panose="020B0609020204030204" pitchFamily="49" charset="0"/>
+              </a:rPr>
+              <a:t>container</a:t>
+            </a:r>
+            <a:r>
+              <a:rPr lang="en-US" dirty="0" err="1">
+                <a:solidFill>
+                  <a:srgbClr val="D4D4D4"/>
+                </a:solidFill>
+                <a:latin typeface="Consolas" panose="020B0609020204030204" pitchFamily="49" charset="0"/>
+              </a:rPr>
+              <a:t>.</a:t>
+            </a:r>
+            <a:r>
+              <a:rPr lang="en-US" dirty="0" err="1">
+                <a:solidFill>
+                  <a:srgbClr val="DCDCAA"/>
+                </a:solidFill>
+                <a:latin typeface="Consolas" panose="020B0609020204030204" pitchFamily="49" charset="0"/>
+              </a:rPr>
+              <a:t>querySelector</a:t>
+            </a:r>
+            <a:r>
+              <a:rPr lang="en-US" dirty="0">
+                <a:solidFill>
+                  <a:srgbClr val="D4D4D4"/>
+                </a:solidFill>
+                <a:latin typeface="Consolas" panose="020B0609020204030204" pitchFamily="49" charset="0"/>
+              </a:rPr>
+              <a:t>(</a:t>
+            </a:r>
+            <a:r>
+              <a:rPr lang="en-US" dirty="0">
+                <a:solidFill>
+                  <a:srgbClr val="CE9178"/>
+                </a:solidFill>
+                <a:latin typeface="Consolas" panose="020B0609020204030204" pitchFamily="49" charset="0"/>
+              </a:rPr>
+              <a:t>'.some-class)</a:t>
+            </a:r>
+            <a:r>
+              <a:rPr lang="en-US" dirty="0">
+                <a:solidFill>
+                  <a:schemeClr val="bg2"/>
+                </a:solidFill>
+                <a:latin typeface="Consolas" panose="020B0609020204030204" pitchFamily="49" charset="0"/>
+              </a:rPr>
+              <a:t>)</a:t>
+            </a:r>
+            <a:r>
+              <a:rPr lang="pl-PL" dirty="0">
+                <a:solidFill>
+                  <a:srgbClr val="D4D4D4"/>
+                </a:solidFill>
+                <a:latin typeface="Consolas" panose="020B0609020204030204" pitchFamily="49" charset="0"/>
+              </a:rPr>
+              <a:t>, {</a:t>
+            </a:r>
+          </a:p>
+          <a:p>
+            <a:r>
+              <a:rPr lang="pl-PL" dirty="0">
+                <a:solidFill>
+                  <a:srgbClr val="D4D4D4"/>
+                </a:solidFill>
+                <a:latin typeface="Consolas" panose="020B0609020204030204" pitchFamily="49" charset="0"/>
+              </a:rPr>
+              <a:t>    </a:t>
+            </a:r>
+            <a:r>
+              <a:rPr lang="pl-PL" dirty="0">
+                <a:solidFill>
+                  <a:srgbClr val="9CDCFE"/>
+                </a:solidFill>
+                <a:latin typeface="Consolas" panose="020B0609020204030204" pitchFamily="49" charset="0"/>
+              </a:rPr>
+              <a:t>target:</a:t>
+            </a:r>
+            <a:r>
+              <a:rPr lang="pl-PL" dirty="0">
+                <a:solidFill>
+                  <a:srgbClr val="D4D4D4"/>
+                </a:solidFill>
+                <a:latin typeface="Consolas" panose="020B0609020204030204" pitchFamily="49" charset="0"/>
+              </a:rPr>
+              <a:t> { </a:t>
+            </a:r>
+            <a:r>
+              <a:rPr lang="pl-PL" dirty="0" err="1">
+                <a:solidFill>
+                  <a:srgbClr val="9CDCFE"/>
+                </a:solidFill>
+                <a:latin typeface="Consolas" panose="020B0609020204030204" pitchFamily="49" charset="0"/>
+              </a:rPr>
+              <a:t>value</a:t>
+            </a:r>
+            <a:r>
+              <a:rPr lang="pl-PL" dirty="0">
+                <a:solidFill>
+                  <a:srgbClr val="9CDCFE"/>
+                </a:solidFill>
+                <a:latin typeface="Consolas" panose="020B0609020204030204" pitchFamily="49" charset="0"/>
+              </a:rPr>
+              <a:t>:</a:t>
+            </a:r>
+            <a:r>
+              <a:rPr lang="pl-PL" dirty="0">
+                <a:solidFill>
+                  <a:srgbClr val="D4D4D4"/>
+                </a:solidFill>
+                <a:latin typeface="Consolas" panose="020B0609020204030204" pitchFamily="49" charset="0"/>
+              </a:rPr>
+              <a:t> </a:t>
+            </a:r>
+            <a:r>
+              <a:rPr lang="pl-PL" dirty="0">
+                <a:solidFill>
+                  <a:srgbClr val="CE9178"/>
+                </a:solidFill>
+                <a:latin typeface="Consolas" panose="020B0609020204030204" pitchFamily="49" charset="0"/>
+              </a:rPr>
+              <a:t>"12345"</a:t>
+            </a:r>
+            <a:r>
+              <a:rPr lang="pl-PL" dirty="0">
+                <a:solidFill>
+                  <a:srgbClr val="D4D4D4"/>
+                </a:solidFill>
+                <a:latin typeface="Consolas" panose="020B0609020204030204" pitchFamily="49" charset="0"/>
+              </a:rPr>
+              <a:t> }</a:t>
+            </a:r>
+          </a:p>
+          <a:p>
+            <a:r>
+              <a:rPr lang="pl-PL" dirty="0">
+                <a:solidFill>
+                  <a:srgbClr val="D4D4D4"/>
+                </a:solidFill>
+                <a:latin typeface="Consolas" panose="020B0609020204030204" pitchFamily="49" charset="0"/>
+              </a:rPr>
+              <a:t>  });</a:t>
+            </a:r>
+            <a:endParaRPr lang="pl-PL" b="0" dirty="0">
+              <a:solidFill>
+                <a:srgbClr val="D4D4D4"/>
+              </a:solidFill>
+              <a:effectLst/>
+              <a:latin typeface="Consolas" panose="020B0609020204030204" pitchFamily="49" charset="0"/>
+            </a:endParaRPr>
+          </a:p>
+        </p:txBody>
+      </p:sp>
+      <p:sp>
+        <p:nvSpPr>
+          <p:cNvPr id="7" name="pole tekstowe 6">
+            <a:extLst>
+              <a:ext uri="{FF2B5EF4-FFF2-40B4-BE49-F238E27FC236}">
+                <a16:creationId xmlns:a16="http://schemas.microsoft.com/office/drawing/2014/main" id="{3B5D612A-333A-4610-A566-EA34BE64E46E}"/>
+              </a:ext>
+            </a:extLst>
+          </p:cNvPr>
+          <p:cNvSpPr txBox="1"/>
+          <p:nvPr/>
+        </p:nvSpPr>
+        <p:spPr>
+          <a:xfrm>
+            <a:off x="2476110" y="2689757"/>
+            <a:ext cx="2215158" cy="369332"/>
+          </a:xfrm>
+          <a:prstGeom prst="rect">
+            <a:avLst/>
+          </a:prstGeom>
+          <a:noFill/>
+        </p:spPr>
+        <p:txBody>
+          <a:bodyPr wrap="none" rtlCol="0">
+            <a:spAutoFit/>
+          </a:bodyPr>
+          <a:lstStyle/>
+          <a:p>
+            <a:r>
+              <a:rPr lang="pl-PL" dirty="0" err="1"/>
+              <a:t>Change</a:t>
+            </a:r>
+            <a:r>
+              <a:rPr lang="pl-PL" dirty="0"/>
+              <a:t> </a:t>
+            </a:r>
+            <a:r>
+              <a:rPr lang="pl-PL" dirty="0" err="1"/>
+              <a:t>value</a:t>
+            </a:r>
+            <a:r>
+              <a:rPr lang="pl-PL" dirty="0"/>
+              <a:t> in </a:t>
+            </a:r>
+            <a:r>
+              <a:rPr lang="pl-PL" dirty="0" err="1"/>
+              <a:t>input</a:t>
+            </a:r>
+            <a:endParaRPr lang="pl-PL" dirty="0"/>
+          </a:p>
+        </p:txBody>
+      </p:sp>
+      <p:sp>
+        <p:nvSpPr>
+          <p:cNvPr id="8" name="Prostokąt 7">
+            <a:extLst>
+              <a:ext uri="{FF2B5EF4-FFF2-40B4-BE49-F238E27FC236}">
+                <a16:creationId xmlns:a16="http://schemas.microsoft.com/office/drawing/2014/main" id="{326C8ADD-3BDB-42AC-8E50-38DABB93938B}"/>
+              </a:ext>
+            </a:extLst>
+          </p:cNvPr>
+          <p:cNvSpPr/>
+          <p:nvPr/>
+        </p:nvSpPr>
+        <p:spPr>
+          <a:xfrm>
+            <a:off x="2531165" y="4558206"/>
+            <a:ext cx="8002266" cy="369332"/>
+          </a:xfrm>
+          <a:prstGeom prst="rect">
+            <a:avLst/>
+          </a:prstGeom>
+          <a:solidFill>
+            <a:schemeClr val="tx1"/>
+          </a:solidFill>
+        </p:spPr>
+        <p:txBody>
+          <a:bodyPr wrap="square">
+            <a:spAutoFit/>
+          </a:bodyPr>
+          <a:lstStyle/>
+          <a:p>
+            <a:r>
+              <a:rPr lang="pl-PL" dirty="0" err="1">
+                <a:solidFill>
+                  <a:srgbClr val="DCDCAA"/>
+                </a:solidFill>
+                <a:latin typeface="Consolas" panose="020B0609020204030204" pitchFamily="49" charset="0"/>
+              </a:rPr>
+              <a:t>expect</a:t>
+            </a:r>
+            <a:r>
+              <a:rPr lang="pl-PL" dirty="0">
+                <a:solidFill>
+                  <a:srgbClr val="D4D4D4"/>
+                </a:solidFill>
+                <a:latin typeface="Consolas" panose="020B0609020204030204" pitchFamily="49" charset="0"/>
+              </a:rPr>
+              <a:t>(</a:t>
+            </a:r>
+            <a:r>
+              <a:rPr lang="pl-PL" dirty="0" err="1">
+                <a:solidFill>
+                  <a:srgbClr val="9CDCFE"/>
+                </a:solidFill>
+                <a:latin typeface="Consolas" panose="020B0609020204030204" pitchFamily="49" charset="0"/>
+              </a:rPr>
+              <a:t>someEl</a:t>
+            </a:r>
+            <a:r>
+              <a:rPr lang="pl-PL" dirty="0" err="1">
+                <a:solidFill>
+                  <a:srgbClr val="D4D4D4"/>
+                </a:solidFill>
+                <a:latin typeface="Consolas" panose="020B0609020204030204" pitchFamily="49" charset="0"/>
+              </a:rPr>
+              <a:t>.</a:t>
+            </a:r>
+            <a:r>
+              <a:rPr lang="pl-PL" dirty="0" err="1">
+                <a:solidFill>
+                  <a:srgbClr val="9CDCFE"/>
+                </a:solidFill>
+                <a:latin typeface="Consolas" panose="020B0609020204030204" pitchFamily="49" charset="0"/>
+              </a:rPr>
+              <a:t>classList</a:t>
+            </a:r>
+            <a:r>
+              <a:rPr lang="pl-PL" dirty="0" err="1">
+                <a:solidFill>
+                  <a:srgbClr val="D4D4D4"/>
+                </a:solidFill>
+                <a:latin typeface="Consolas" panose="020B0609020204030204" pitchFamily="49" charset="0"/>
+              </a:rPr>
+              <a:t>.</a:t>
+            </a:r>
+            <a:r>
+              <a:rPr lang="pl-PL" dirty="0" err="1">
+                <a:solidFill>
+                  <a:srgbClr val="DCDCAA"/>
+                </a:solidFill>
+                <a:latin typeface="Consolas" panose="020B0609020204030204" pitchFamily="49" charset="0"/>
+              </a:rPr>
+              <a:t>contains</a:t>
+            </a:r>
+            <a:r>
+              <a:rPr lang="pl-PL" dirty="0">
+                <a:solidFill>
+                  <a:srgbClr val="D4D4D4"/>
+                </a:solidFill>
+                <a:latin typeface="Consolas" panose="020B0609020204030204" pitchFamily="49" charset="0"/>
+              </a:rPr>
+              <a:t>(</a:t>
+            </a:r>
+            <a:r>
+              <a:rPr lang="pl-PL" dirty="0">
+                <a:solidFill>
+                  <a:srgbClr val="CE9178"/>
+                </a:solidFill>
+                <a:latin typeface="Consolas" panose="020B0609020204030204" pitchFamily="49" charset="0"/>
+              </a:rPr>
+              <a:t>'</a:t>
+            </a:r>
+            <a:r>
+              <a:rPr lang="pl-PL" dirty="0" err="1">
+                <a:solidFill>
+                  <a:srgbClr val="CE9178"/>
+                </a:solidFill>
+                <a:latin typeface="Consolas" panose="020B0609020204030204" pitchFamily="49" charset="0"/>
+              </a:rPr>
+              <a:t>disabled</a:t>
+            </a:r>
+            <a:r>
+              <a:rPr lang="pl-PL" dirty="0">
+                <a:solidFill>
+                  <a:srgbClr val="CE9178"/>
+                </a:solidFill>
+                <a:latin typeface="Consolas" panose="020B0609020204030204" pitchFamily="49" charset="0"/>
+              </a:rPr>
+              <a:t>'</a:t>
+            </a:r>
+            <a:r>
+              <a:rPr lang="pl-PL" dirty="0">
+                <a:solidFill>
+                  <a:srgbClr val="D4D4D4"/>
+                </a:solidFill>
+                <a:latin typeface="Consolas" panose="020B0609020204030204" pitchFamily="49" charset="0"/>
+              </a:rPr>
+              <a:t>)).</a:t>
+            </a:r>
+            <a:r>
+              <a:rPr lang="pl-PL" dirty="0" err="1">
+                <a:solidFill>
+                  <a:srgbClr val="DCDCAA"/>
+                </a:solidFill>
+                <a:latin typeface="Consolas" panose="020B0609020204030204" pitchFamily="49" charset="0"/>
+              </a:rPr>
+              <a:t>toBe</a:t>
+            </a:r>
+            <a:r>
+              <a:rPr lang="pl-PL" dirty="0">
+                <a:solidFill>
+                  <a:srgbClr val="D4D4D4"/>
+                </a:solidFill>
+                <a:latin typeface="Consolas" panose="020B0609020204030204" pitchFamily="49" charset="0"/>
+              </a:rPr>
+              <a:t>(</a:t>
+            </a:r>
+            <a:r>
+              <a:rPr lang="pl-PL" dirty="0" err="1">
+                <a:solidFill>
+                  <a:srgbClr val="569CD6"/>
+                </a:solidFill>
+                <a:latin typeface="Consolas" panose="020B0609020204030204" pitchFamily="49" charset="0"/>
+              </a:rPr>
+              <a:t>false</a:t>
+            </a:r>
+            <a:r>
+              <a:rPr lang="pl-PL" dirty="0">
+                <a:solidFill>
+                  <a:srgbClr val="D4D4D4"/>
+                </a:solidFill>
+                <a:latin typeface="Consolas" panose="020B0609020204030204" pitchFamily="49" charset="0"/>
+              </a:rPr>
+              <a:t>);</a:t>
+            </a:r>
+            <a:endParaRPr lang="pl-PL" b="0" dirty="0">
+              <a:solidFill>
+                <a:srgbClr val="D4D4D4"/>
+              </a:solidFill>
+              <a:effectLst/>
+              <a:latin typeface="Consolas" panose="020B0609020204030204" pitchFamily="49" charset="0"/>
+            </a:endParaRPr>
+          </a:p>
+        </p:txBody>
+      </p:sp>
+      <p:sp>
+        <p:nvSpPr>
+          <p:cNvPr id="9" name="pole tekstowe 8">
+            <a:extLst>
+              <a:ext uri="{FF2B5EF4-FFF2-40B4-BE49-F238E27FC236}">
+                <a16:creationId xmlns:a16="http://schemas.microsoft.com/office/drawing/2014/main" id="{D31ED360-6F34-4604-85E3-FB8D1DAC8401}"/>
+              </a:ext>
+            </a:extLst>
+          </p:cNvPr>
+          <p:cNvSpPr txBox="1"/>
+          <p:nvPr/>
+        </p:nvSpPr>
+        <p:spPr>
+          <a:xfrm>
+            <a:off x="2476110" y="4196077"/>
+            <a:ext cx="3089948" cy="369332"/>
+          </a:xfrm>
+          <a:prstGeom prst="rect">
+            <a:avLst/>
+          </a:prstGeom>
+          <a:noFill/>
+        </p:spPr>
+        <p:txBody>
+          <a:bodyPr wrap="none" rtlCol="0">
+            <a:spAutoFit/>
+          </a:bodyPr>
+          <a:lstStyle/>
+          <a:p>
+            <a:r>
+              <a:rPr lang="pl-PL" dirty="0" err="1"/>
+              <a:t>Check</a:t>
+            </a:r>
+            <a:r>
+              <a:rPr lang="pl-PL" dirty="0"/>
+              <a:t> </a:t>
+            </a:r>
+            <a:r>
+              <a:rPr lang="pl-PL" dirty="0" err="1"/>
+              <a:t>if</a:t>
+            </a:r>
+            <a:r>
+              <a:rPr lang="pl-PL" dirty="0"/>
+              <a:t> element </a:t>
+            </a:r>
+            <a:r>
+              <a:rPr lang="pl-PL" dirty="0" err="1"/>
+              <a:t>contains</a:t>
+            </a:r>
+            <a:r>
+              <a:rPr lang="pl-PL" dirty="0"/>
+              <a:t> </a:t>
+            </a:r>
+            <a:r>
+              <a:rPr lang="pl-PL" dirty="0" err="1"/>
+              <a:t>class</a:t>
+            </a:r>
             <a:endParaRPr lang="pl-PL" dirty="0"/>
           </a:p>
         </p:txBody>
@@ -23030,7 +24018,7 @@
     </p:spTree>
     <p:extLst>
       <p:ext uri="{BB962C8B-B14F-4D97-AF65-F5344CB8AC3E}">
-        <p14:creationId xmlns:p14="http://schemas.microsoft.com/office/powerpoint/2010/main" val="249972549"/>
+        <p14:creationId xmlns:p14="http://schemas.microsoft.com/office/powerpoint/2010/main" val="3103880284"/>
       </p:ext>
     </p:extLst>
   </p:cSld>
@@ -23072,7 +24060,7 @@
         <p:spPr>
           <a:xfrm>
             <a:off x="497840" y="538480"/>
-            <a:ext cx="645690" cy="369332"/>
+            <a:ext cx="2116670" cy="369332"/>
           </a:xfrm>
           <a:prstGeom prst="rect">
             <a:avLst/>
@@ -23089,6 +24077,1031 @@
               <a:rPr lang="pl-PL" dirty="0" err="1"/>
               <a:t>Tests</a:t>
             </a:r>
+            <a:r>
+              <a:rPr lang="pl-PL" dirty="0"/>
+              <a:t> – </a:t>
+            </a:r>
+            <a:r>
+              <a:rPr lang="pl-PL" dirty="0" err="1"/>
+              <a:t>Mocking</a:t>
+            </a:r>
+            <a:r>
+              <a:rPr lang="pl-PL" dirty="0"/>
+              <a:t> http</a:t>
+            </a:r>
+          </a:p>
+        </p:txBody>
+      </p:sp>
+      <p:sp>
+        <p:nvSpPr>
+          <p:cNvPr id="2" name="Prostokąt 1">
+            <a:extLst>
+              <a:ext uri="{FF2B5EF4-FFF2-40B4-BE49-F238E27FC236}">
+                <a16:creationId xmlns:a16="http://schemas.microsoft.com/office/drawing/2014/main" id="{F11127F1-1F14-4BF6-812B-961DD76F857E}"/>
+              </a:ext>
+            </a:extLst>
+          </p:cNvPr>
+          <p:cNvSpPr/>
+          <p:nvPr/>
+        </p:nvSpPr>
+        <p:spPr>
+          <a:xfrm>
+            <a:off x="4023476" y="1442039"/>
+            <a:ext cx="4145045" cy="369332"/>
+          </a:xfrm>
+          <a:prstGeom prst="rect">
+            <a:avLst/>
+          </a:prstGeom>
+        </p:spPr>
+        <p:txBody>
+          <a:bodyPr wrap="none">
+            <a:spAutoFit/>
+          </a:bodyPr>
+          <a:lstStyle/>
+          <a:p>
+            <a:r>
+              <a:rPr lang="pl-PL" dirty="0" err="1">
+                <a:solidFill>
+                  <a:srgbClr val="24292E"/>
+                </a:solidFill>
+                <a:latin typeface="SFMono-Regular"/>
+              </a:rPr>
+              <a:t>npm</a:t>
+            </a:r>
+            <a:r>
+              <a:rPr lang="pl-PL" dirty="0">
+                <a:solidFill>
+                  <a:srgbClr val="24292E"/>
+                </a:solidFill>
+                <a:latin typeface="SFMono-Regular"/>
+              </a:rPr>
+              <a:t> </a:t>
+            </a:r>
+            <a:r>
+              <a:rPr lang="pl-PL" dirty="0" err="1">
+                <a:solidFill>
+                  <a:srgbClr val="24292E"/>
+                </a:solidFill>
+                <a:latin typeface="SFMono-Regular"/>
+              </a:rPr>
+              <a:t>install</a:t>
+            </a:r>
+            <a:r>
+              <a:rPr lang="pl-PL" dirty="0">
+                <a:solidFill>
+                  <a:srgbClr val="24292E"/>
+                </a:solidFill>
+                <a:latin typeface="SFMono-Regular"/>
+              </a:rPr>
+              <a:t> </a:t>
+            </a:r>
+            <a:r>
+              <a:rPr lang="pl-PL" dirty="0" err="1">
+                <a:solidFill>
+                  <a:srgbClr val="24292E"/>
+                </a:solidFill>
+                <a:latin typeface="SFMono-Regular"/>
+              </a:rPr>
+              <a:t>axios</a:t>
+            </a:r>
+            <a:r>
+              <a:rPr lang="pl-PL" dirty="0">
+                <a:solidFill>
+                  <a:srgbClr val="24292E"/>
+                </a:solidFill>
+                <a:latin typeface="SFMono-Regular"/>
+              </a:rPr>
+              <a:t>-</a:t>
+            </a:r>
+            <a:r>
+              <a:rPr lang="pl-PL" dirty="0" err="1">
+                <a:solidFill>
+                  <a:srgbClr val="24292E"/>
+                </a:solidFill>
+                <a:latin typeface="SFMono-Regular"/>
+              </a:rPr>
+              <a:t>mock</a:t>
+            </a:r>
+            <a:r>
+              <a:rPr lang="pl-PL" dirty="0">
+                <a:solidFill>
+                  <a:srgbClr val="24292E"/>
+                </a:solidFill>
+                <a:latin typeface="SFMono-Regular"/>
+              </a:rPr>
+              <a:t>-adapter --</a:t>
+            </a:r>
+            <a:r>
+              <a:rPr lang="pl-PL" dirty="0" err="1">
+                <a:solidFill>
+                  <a:srgbClr val="24292E"/>
+                </a:solidFill>
+                <a:latin typeface="SFMono-Regular"/>
+              </a:rPr>
+              <a:t>save-dev</a:t>
+            </a:r>
+            <a:endParaRPr lang="pl-PL" dirty="0"/>
+          </a:p>
+        </p:txBody>
+      </p:sp>
+      <p:sp>
+        <p:nvSpPr>
+          <p:cNvPr id="3" name="Prostokąt 2">
+            <a:extLst>
+              <a:ext uri="{FF2B5EF4-FFF2-40B4-BE49-F238E27FC236}">
+                <a16:creationId xmlns:a16="http://schemas.microsoft.com/office/drawing/2014/main" id="{4C33ECF1-7D04-47C9-BC00-2D396F0EC126}"/>
+              </a:ext>
+            </a:extLst>
+          </p:cNvPr>
+          <p:cNvSpPr/>
+          <p:nvPr/>
+        </p:nvSpPr>
+        <p:spPr>
+          <a:xfrm>
+            <a:off x="2630555" y="1951672"/>
+            <a:ext cx="6930888" cy="923330"/>
+          </a:xfrm>
+          <a:prstGeom prst="rect">
+            <a:avLst/>
+          </a:prstGeom>
+          <a:solidFill>
+            <a:schemeClr val="tx1"/>
+          </a:solidFill>
+        </p:spPr>
+        <p:txBody>
+          <a:bodyPr wrap="square">
+            <a:spAutoFit/>
+          </a:bodyPr>
+          <a:lstStyle/>
+          <a:p>
+            <a:r>
+              <a:rPr lang="pl-PL" dirty="0" err="1">
+                <a:solidFill>
+                  <a:srgbClr val="569CD6"/>
+                </a:solidFill>
+                <a:latin typeface="Consolas" panose="020B0609020204030204" pitchFamily="49" charset="0"/>
+              </a:rPr>
+              <a:t>var</a:t>
+            </a:r>
+            <a:r>
+              <a:rPr lang="pl-PL" dirty="0">
+                <a:solidFill>
+                  <a:srgbClr val="D4D4D4"/>
+                </a:solidFill>
+                <a:latin typeface="Consolas" panose="020B0609020204030204" pitchFamily="49" charset="0"/>
+              </a:rPr>
+              <a:t> </a:t>
+            </a:r>
+            <a:r>
+              <a:rPr lang="pl-PL" dirty="0" err="1">
+                <a:solidFill>
+                  <a:srgbClr val="9CDCFE"/>
+                </a:solidFill>
+                <a:latin typeface="Consolas" panose="020B0609020204030204" pitchFamily="49" charset="0"/>
+              </a:rPr>
+              <a:t>axios</a:t>
+            </a:r>
+            <a:r>
+              <a:rPr lang="pl-PL" dirty="0">
+                <a:solidFill>
+                  <a:srgbClr val="D4D4D4"/>
+                </a:solidFill>
+                <a:latin typeface="Consolas" panose="020B0609020204030204" pitchFamily="49" charset="0"/>
+              </a:rPr>
+              <a:t> = </a:t>
+            </a:r>
+            <a:r>
+              <a:rPr lang="pl-PL" dirty="0" err="1">
+                <a:solidFill>
+                  <a:srgbClr val="DCDCAA"/>
+                </a:solidFill>
+                <a:latin typeface="Consolas" panose="020B0609020204030204" pitchFamily="49" charset="0"/>
+              </a:rPr>
+              <a:t>require</a:t>
+            </a:r>
+            <a:r>
+              <a:rPr lang="pl-PL" dirty="0">
+                <a:solidFill>
+                  <a:srgbClr val="D4D4D4"/>
+                </a:solidFill>
+                <a:latin typeface="Consolas" panose="020B0609020204030204" pitchFamily="49" charset="0"/>
+              </a:rPr>
+              <a:t>(</a:t>
+            </a:r>
+            <a:r>
+              <a:rPr lang="pl-PL" dirty="0">
+                <a:solidFill>
+                  <a:srgbClr val="CE9178"/>
+                </a:solidFill>
+                <a:latin typeface="Consolas" panose="020B0609020204030204" pitchFamily="49" charset="0"/>
+              </a:rPr>
+              <a:t>'</a:t>
+            </a:r>
+            <a:r>
+              <a:rPr lang="pl-PL" dirty="0" err="1">
+                <a:solidFill>
+                  <a:srgbClr val="CE9178"/>
+                </a:solidFill>
+                <a:latin typeface="Consolas" panose="020B0609020204030204" pitchFamily="49" charset="0"/>
+              </a:rPr>
+              <a:t>axios</a:t>
+            </a:r>
+            <a:r>
+              <a:rPr lang="pl-PL" dirty="0">
+                <a:solidFill>
+                  <a:srgbClr val="CE9178"/>
+                </a:solidFill>
+                <a:latin typeface="Consolas" panose="020B0609020204030204" pitchFamily="49" charset="0"/>
+              </a:rPr>
+              <a:t>'</a:t>
+            </a:r>
+            <a:r>
+              <a:rPr lang="pl-PL" dirty="0">
+                <a:solidFill>
+                  <a:srgbClr val="D4D4D4"/>
+                </a:solidFill>
+                <a:latin typeface="Consolas" panose="020B0609020204030204" pitchFamily="49" charset="0"/>
+              </a:rPr>
+              <a:t>);</a:t>
+            </a:r>
+          </a:p>
+          <a:p>
+            <a:r>
+              <a:rPr lang="pl-PL" dirty="0" err="1">
+                <a:solidFill>
+                  <a:srgbClr val="569CD6"/>
+                </a:solidFill>
+                <a:latin typeface="Consolas" panose="020B0609020204030204" pitchFamily="49" charset="0"/>
+              </a:rPr>
+              <a:t>var</a:t>
+            </a:r>
+            <a:r>
+              <a:rPr lang="pl-PL" dirty="0">
+                <a:solidFill>
+                  <a:srgbClr val="D4D4D4"/>
+                </a:solidFill>
+                <a:latin typeface="Consolas" panose="020B0609020204030204" pitchFamily="49" charset="0"/>
+              </a:rPr>
+              <a:t> </a:t>
+            </a:r>
+            <a:r>
+              <a:rPr lang="pl-PL" dirty="0" err="1">
+                <a:solidFill>
+                  <a:srgbClr val="9CDCFE"/>
+                </a:solidFill>
+                <a:latin typeface="Consolas" panose="020B0609020204030204" pitchFamily="49" charset="0"/>
+              </a:rPr>
+              <a:t>MockAdapter</a:t>
+            </a:r>
+            <a:r>
+              <a:rPr lang="pl-PL" dirty="0">
+                <a:solidFill>
+                  <a:srgbClr val="D4D4D4"/>
+                </a:solidFill>
+                <a:latin typeface="Consolas" panose="020B0609020204030204" pitchFamily="49" charset="0"/>
+              </a:rPr>
+              <a:t> = </a:t>
+            </a:r>
+            <a:r>
+              <a:rPr lang="pl-PL" dirty="0" err="1">
+                <a:solidFill>
+                  <a:srgbClr val="DCDCAA"/>
+                </a:solidFill>
+                <a:latin typeface="Consolas" panose="020B0609020204030204" pitchFamily="49" charset="0"/>
+              </a:rPr>
+              <a:t>require</a:t>
+            </a:r>
+            <a:r>
+              <a:rPr lang="pl-PL" dirty="0">
+                <a:solidFill>
+                  <a:srgbClr val="D4D4D4"/>
+                </a:solidFill>
+                <a:latin typeface="Consolas" panose="020B0609020204030204" pitchFamily="49" charset="0"/>
+              </a:rPr>
+              <a:t>(</a:t>
+            </a:r>
+            <a:r>
+              <a:rPr lang="pl-PL" dirty="0">
+                <a:solidFill>
+                  <a:srgbClr val="CE9178"/>
+                </a:solidFill>
+                <a:latin typeface="Consolas" panose="020B0609020204030204" pitchFamily="49" charset="0"/>
+              </a:rPr>
+              <a:t>'</a:t>
+            </a:r>
+            <a:r>
+              <a:rPr lang="pl-PL" dirty="0" err="1">
+                <a:solidFill>
+                  <a:srgbClr val="CE9178"/>
+                </a:solidFill>
+                <a:latin typeface="Consolas" panose="020B0609020204030204" pitchFamily="49" charset="0"/>
+              </a:rPr>
+              <a:t>axios</a:t>
+            </a:r>
+            <a:r>
+              <a:rPr lang="pl-PL" dirty="0">
+                <a:solidFill>
+                  <a:srgbClr val="CE9178"/>
+                </a:solidFill>
+                <a:latin typeface="Consolas" panose="020B0609020204030204" pitchFamily="49" charset="0"/>
+              </a:rPr>
+              <a:t>-</a:t>
+            </a:r>
+            <a:r>
+              <a:rPr lang="pl-PL" dirty="0" err="1">
+                <a:solidFill>
+                  <a:srgbClr val="CE9178"/>
+                </a:solidFill>
+                <a:latin typeface="Consolas" panose="020B0609020204030204" pitchFamily="49" charset="0"/>
+              </a:rPr>
+              <a:t>mock</a:t>
+            </a:r>
+            <a:r>
+              <a:rPr lang="pl-PL" dirty="0">
+                <a:solidFill>
+                  <a:srgbClr val="CE9178"/>
+                </a:solidFill>
+                <a:latin typeface="Consolas" panose="020B0609020204030204" pitchFamily="49" charset="0"/>
+              </a:rPr>
+              <a:t>-adapter'</a:t>
+            </a:r>
+            <a:r>
+              <a:rPr lang="pl-PL" dirty="0">
+                <a:solidFill>
+                  <a:srgbClr val="D4D4D4"/>
+                </a:solidFill>
+                <a:latin typeface="Consolas" panose="020B0609020204030204" pitchFamily="49" charset="0"/>
+              </a:rPr>
+              <a:t>);</a:t>
+            </a:r>
+          </a:p>
+          <a:p>
+            <a:r>
+              <a:rPr lang="pl-PL" dirty="0" err="1">
+                <a:solidFill>
+                  <a:srgbClr val="569CD6"/>
+                </a:solidFill>
+                <a:latin typeface="Consolas" panose="020B0609020204030204" pitchFamily="49" charset="0"/>
+              </a:rPr>
+              <a:t>var</a:t>
+            </a:r>
+            <a:r>
+              <a:rPr lang="pl-PL" dirty="0">
+                <a:solidFill>
+                  <a:srgbClr val="D4D4D4"/>
+                </a:solidFill>
+                <a:latin typeface="Consolas" panose="020B0609020204030204" pitchFamily="49" charset="0"/>
+              </a:rPr>
+              <a:t> </a:t>
+            </a:r>
+            <a:r>
+              <a:rPr lang="pl-PL" dirty="0" err="1">
+                <a:solidFill>
+                  <a:srgbClr val="9CDCFE"/>
+                </a:solidFill>
+                <a:latin typeface="Consolas" panose="020B0609020204030204" pitchFamily="49" charset="0"/>
+              </a:rPr>
+              <a:t>mock</a:t>
+            </a:r>
+            <a:r>
+              <a:rPr lang="pl-PL" dirty="0">
+                <a:solidFill>
+                  <a:srgbClr val="D4D4D4"/>
+                </a:solidFill>
+                <a:latin typeface="Consolas" panose="020B0609020204030204" pitchFamily="49" charset="0"/>
+              </a:rPr>
+              <a:t> = </a:t>
+            </a:r>
+            <a:r>
+              <a:rPr lang="pl-PL" dirty="0" err="1">
+                <a:solidFill>
+                  <a:srgbClr val="569CD6"/>
+                </a:solidFill>
+                <a:latin typeface="Consolas" panose="020B0609020204030204" pitchFamily="49" charset="0"/>
+              </a:rPr>
+              <a:t>new</a:t>
+            </a:r>
+            <a:r>
+              <a:rPr lang="pl-PL" dirty="0">
+                <a:solidFill>
+                  <a:srgbClr val="D4D4D4"/>
+                </a:solidFill>
+                <a:latin typeface="Consolas" panose="020B0609020204030204" pitchFamily="49" charset="0"/>
+              </a:rPr>
+              <a:t> </a:t>
+            </a:r>
+            <a:r>
+              <a:rPr lang="pl-PL" dirty="0" err="1">
+                <a:solidFill>
+                  <a:srgbClr val="4EC9B0"/>
+                </a:solidFill>
+                <a:latin typeface="Consolas" panose="020B0609020204030204" pitchFamily="49" charset="0"/>
+              </a:rPr>
+              <a:t>MockAdapter</a:t>
+            </a:r>
+            <a:r>
+              <a:rPr lang="pl-PL" dirty="0">
+                <a:solidFill>
+                  <a:srgbClr val="D4D4D4"/>
+                </a:solidFill>
+                <a:latin typeface="Consolas" panose="020B0609020204030204" pitchFamily="49" charset="0"/>
+              </a:rPr>
+              <a:t>(</a:t>
+            </a:r>
+            <a:r>
+              <a:rPr lang="pl-PL" dirty="0" err="1">
+                <a:solidFill>
+                  <a:srgbClr val="9CDCFE"/>
+                </a:solidFill>
+                <a:latin typeface="Consolas" panose="020B0609020204030204" pitchFamily="49" charset="0"/>
+              </a:rPr>
+              <a:t>axios</a:t>
+            </a:r>
+            <a:r>
+              <a:rPr lang="pl-PL" dirty="0">
+                <a:solidFill>
+                  <a:srgbClr val="D4D4D4"/>
+                </a:solidFill>
+                <a:latin typeface="Consolas" panose="020B0609020204030204" pitchFamily="49" charset="0"/>
+              </a:rPr>
+              <a:t>);</a:t>
+            </a:r>
+            <a:endParaRPr lang="pl-PL" b="0" dirty="0">
+              <a:solidFill>
+                <a:srgbClr val="D4D4D4"/>
+              </a:solidFill>
+              <a:effectLst/>
+              <a:latin typeface="Consolas" panose="020B0609020204030204" pitchFamily="49" charset="0"/>
+            </a:endParaRPr>
+          </a:p>
+        </p:txBody>
+      </p:sp>
+      <p:sp>
+        <p:nvSpPr>
+          <p:cNvPr id="5" name="Prostokąt 4">
+            <a:extLst>
+              <a:ext uri="{FF2B5EF4-FFF2-40B4-BE49-F238E27FC236}">
+                <a16:creationId xmlns:a16="http://schemas.microsoft.com/office/drawing/2014/main" id="{D282DF31-0011-4332-8C15-C9F1C45D3765}"/>
+              </a:ext>
+            </a:extLst>
+          </p:cNvPr>
+          <p:cNvSpPr/>
+          <p:nvPr/>
+        </p:nvSpPr>
+        <p:spPr>
+          <a:xfrm>
+            <a:off x="2614510" y="3015303"/>
+            <a:ext cx="6946933" cy="1477328"/>
+          </a:xfrm>
+          <a:prstGeom prst="rect">
+            <a:avLst/>
+          </a:prstGeom>
+          <a:solidFill>
+            <a:schemeClr val="tx1"/>
+          </a:solidFill>
+        </p:spPr>
+        <p:txBody>
+          <a:bodyPr wrap="square">
+            <a:spAutoFit/>
+          </a:bodyPr>
+          <a:lstStyle/>
+          <a:p>
+            <a:r>
+              <a:rPr lang="pl-PL">
+                <a:solidFill>
+                  <a:srgbClr val="9CDCFE"/>
+                </a:solidFill>
+                <a:latin typeface="Consolas" panose="020B0609020204030204" pitchFamily="49" charset="0"/>
+              </a:rPr>
+              <a:t>mock</a:t>
+            </a:r>
+            <a:r>
+              <a:rPr lang="pl-PL">
+                <a:solidFill>
+                  <a:srgbClr val="D4D4D4"/>
+                </a:solidFill>
+                <a:latin typeface="Consolas" panose="020B0609020204030204" pitchFamily="49" charset="0"/>
+              </a:rPr>
+              <a:t>.</a:t>
+            </a:r>
+            <a:r>
+              <a:rPr lang="pl-PL">
+                <a:solidFill>
+                  <a:srgbClr val="DCDCAA"/>
+                </a:solidFill>
+                <a:latin typeface="Consolas" panose="020B0609020204030204" pitchFamily="49" charset="0"/>
+              </a:rPr>
+              <a:t>onGet</a:t>
+            </a:r>
+            <a:r>
+              <a:rPr lang="pl-PL">
+                <a:solidFill>
+                  <a:srgbClr val="D4D4D4"/>
+                </a:solidFill>
+                <a:latin typeface="Consolas" panose="020B0609020204030204" pitchFamily="49" charset="0"/>
+              </a:rPr>
+              <a:t>(</a:t>
+            </a:r>
+            <a:r>
+              <a:rPr lang="pl-PL">
+                <a:solidFill>
+                  <a:srgbClr val="CE9178"/>
+                </a:solidFill>
+                <a:latin typeface="Consolas" panose="020B0609020204030204" pitchFamily="49" charset="0"/>
+              </a:rPr>
+              <a:t>'/users'</a:t>
+            </a:r>
+            <a:r>
+              <a:rPr lang="pl-PL">
+                <a:solidFill>
+                  <a:srgbClr val="D4D4D4"/>
+                </a:solidFill>
+                <a:latin typeface="Consolas" panose="020B0609020204030204" pitchFamily="49" charset="0"/>
+              </a:rPr>
+              <a:t>).</a:t>
+            </a:r>
+            <a:r>
+              <a:rPr lang="pl-PL">
+                <a:solidFill>
+                  <a:srgbClr val="DCDCAA"/>
+                </a:solidFill>
+                <a:latin typeface="Consolas" panose="020B0609020204030204" pitchFamily="49" charset="0"/>
+              </a:rPr>
+              <a:t>reply</a:t>
+            </a:r>
+            <a:r>
+              <a:rPr lang="pl-PL">
+                <a:solidFill>
+                  <a:srgbClr val="D4D4D4"/>
+                </a:solidFill>
+                <a:latin typeface="Consolas" panose="020B0609020204030204" pitchFamily="49" charset="0"/>
+              </a:rPr>
+              <a:t>(</a:t>
+            </a:r>
+            <a:r>
+              <a:rPr lang="pl-PL">
+                <a:solidFill>
+                  <a:srgbClr val="B5CEA8"/>
+                </a:solidFill>
+                <a:latin typeface="Consolas" panose="020B0609020204030204" pitchFamily="49" charset="0"/>
+              </a:rPr>
+              <a:t>200</a:t>
+            </a:r>
+            <a:r>
+              <a:rPr lang="pl-PL">
+                <a:solidFill>
+                  <a:srgbClr val="D4D4D4"/>
+                </a:solidFill>
+                <a:latin typeface="Consolas" panose="020B0609020204030204" pitchFamily="49" charset="0"/>
+              </a:rPr>
+              <a:t>, {</a:t>
+            </a:r>
+          </a:p>
+          <a:p>
+            <a:r>
+              <a:rPr lang="pl-PL">
+                <a:solidFill>
+                  <a:srgbClr val="D4D4D4"/>
+                </a:solidFill>
+                <a:latin typeface="Consolas" panose="020B0609020204030204" pitchFamily="49" charset="0"/>
+              </a:rPr>
+              <a:t>  </a:t>
+            </a:r>
+            <a:r>
+              <a:rPr lang="pl-PL">
+                <a:solidFill>
+                  <a:srgbClr val="9CDCFE"/>
+                </a:solidFill>
+                <a:latin typeface="Consolas" panose="020B0609020204030204" pitchFamily="49" charset="0"/>
+              </a:rPr>
+              <a:t>users:</a:t>
+            </a:r>
+            <a:r>
+              <a:rPr lang="pl-PL">
+                <a:solidFill>
+                  <a:srgbClr val="D4D4D4"/>
+                </a:solidFill>
+                <a:latin typeface="Consolas" panose="020B0609020204030204" pitchFamily="49" charset="0"/>
+              </a:rPr>
+              <a:t> [</a:t>
+            </a:r>
+          </a:p>
+          <a:p>
+            <a:r>
+              <a:rPr lang="pl-PL">
+                <a:solidFill>
+                  <a:srgbClr val="D4D4D4"/>
+                </a:solidFill>
+                <a:latin typeface="Consolas" panose="020B0609020204030204" pitchFamily="49" charset="0"/>
+              </a:rPr>
+              <a:t>    { </a:t>
+            </a:r>
+            <a:r>
+              <a:rPr lang="pl-PL">
+                <a:solidFill>
+                  <a:srgbClr val="9CDCFE"/>
+                </a:solidFill>
+                <a:latin typeface="Consolas" panose="020B0609020204030204" pitchFamily="49" charset="0"/>
+              </a:rPr>
+              <a:t>id:</a:t>
+            </a:r>
+            <a:r>
+              <a:rPr lang="pl-PL">
+                <a:solidFill>
+                  <a:srgbClr val="D4D4D4"/>
+                </a:solidFill>
+                <a:latin typeface="Consolas" panose="020B0609020204030204" pitchFamily="49" charset="0"/>
+              </a:rPr>
+              <a:t> </a:t>
+            </a:r>
+            <a:r>
+              <a:rPr lang="pl-PL">
+                <a:solidFill>
+                  <a:srgbClr val="B5CEA8"/>
+                </a:solidFill>
+                <a:latin typeface="Consolas" panose="020B0609020204030204" pitchFamily="49" charset="0"/>
+              </a:rPr>
+              <a:t>1</a:t>
+            </a:r>
+            <a:r>
+              <a:rPr lang="pl-PL">
+                <a:solidFill>
+                  <a:srgbClr val="D4D4D4"/>
+                </a:solidFill>
+                <a:latin typeface="Consolas" panose="020B0609020204030204" pitchFamily="49" charset="0"/>
+              </a:rPr>
+              <a:t>, </a:t>
+            </a:r>
+            <a:r>
+              <a:rPr lang="pl-PL">
+                <a:solidFill>
+                  <a:srgbClr val="9CDCFE"/>
+                </a:solidFill>
+                <a:latin typeface="Consolas" panose="020B0609020204030204" pitchFamily="49" charset="0"/>
+              </a:rPr>
+              <a:t>name:</a:t>
+            </a:r>
+            <a:r>
+              <a:rPr lang="pl-PL">
+                <a:solidFill>
+                  <a:srgbClr val="D4D4D4"/>
+                </a:solidFill>
+                <a:latin typeface="Consolas" panose="020B0609020204030204" pitchFamily="49" charset="0"/>
+              </a:rPr>
+              <a:t> </a:t>
+            </a:r>
+            <a:r>
+              <a:rPr lang="pl-PL">
+                <a:solidFill>
+                  <a:srgbClr val="CE9178"/>
+                </a:solidFill>
+                <a:latin typeface="Consolas" panose="020B0609020204030204" pitchFamily="49" charset="0"/>
+              </a:rPr>
+              <a:t>'John Smith'</a:t>
+            </a:r>
+            <a:r>
+              <a:rPr lang="pl-PL">
+                <a:solidFill>
+                  <a:srgbClr val="D4D4D4"/>
+                </a:solidFill>
+                <a:latin typeface="Consolas" panose="020B0609020204030204" pitchFamily="49" charset="0"/>
+              </a:rPr>
+              <a:t> }</a:t>
+            </a:r>
+          </a:p>
+          <a:p>
+            <a:r>
+              <a:rPr lang="pl-PL">
+                <a:solidFill>
+                  <a:srgbClr val="D4D4D4"/>
+                </a:solidFill>
+                <a:latin typeface="Consolas" panose="020B0609020204030204" pitchFamily="49" charset="0"/>
+              </a:rPr>
+              <a:t>  ]</a:t>
+            </a:r>
+          </a:p>
+          <a:p>
+            <a:r>
+              <a:rPr lang="pl-PL">
+                <a:solidFill>
+                  <a:srgbClr val="D4D4D4"/>
+                </a:solidFill>
+                <a:latin typeface="Consolas" panose="020B0609020204030204" pitchFamily="49" charset="0"/>
+              </a:rPr>
+              <a:t>});</a:t>
+            </a:r>
+            <a:endParaRPr lang="pl-PL" b="0" dirty="0">
+              <a:solidFill>
+                <a:srgbClr val="D4D4D4"/>
+              </a:solidFill>
+              <a:effectLst/>
+              <a:latin typeface="Consolas" panose="020B0609020204030204" pitchFamily="49" charset="0"/>
+            </a:endParaRPr>
+          </a:p>
+        </p:txBody>
+      </p:sp>
+      <p:sp>
+        <p:nvSpPr>
+          <p:cNvPr id="6" name="Prostokąt 5">
+            <a:extLst>
+              <a:ext uri="{FF2B5EF4-FFF2-40B4-BE49-F238E27FC236}">
+                <a16:creationId xmlns:a16="http://schemas.microsoft.com/office/drawing/2014/main" id="{1B75AF30-924B-4D27-8663-DB5B623A1BC6}"/>
+              </a:ext>
+            </a:extLst>
+          </p:cNvPr>
+          <p:cNvSpPr/>
+          <p:nvPr/>
+        </p:nvSpPr>
+        <p:spPr>
+          <a:xfrm>
+            <a:off x="1921565" y="5167159"/>
+            <a:ext cx="8309113" cy="369332"/>
+          </a:xfrm>
+          <a:prstGeom prst="rect">
+            <a:avLst/>
+          </a:prstGeom>
+          <a:solidFill>
+            <a:schemeClr val="tx1"/>
+          </a:solidFill>
+        </p:spPr>
+        <p:txBody>
+          <a:bodyPr wrap="square">
+            <a:spAutoFit/>
+          </a:bodyPr>
+          <a:lstStyle/>
+          <a:p>
+            <a:r>
+              <a:rPr lang="pl-PL" dirty="0" err="1">
+                <a:solidFill>
+                  <a:srgbClr val="9CDCFE"/>
+                </a:solidFill>
+                <a:latin typeface="Consolas" panose="020B0609020204030204" pitchFamily="49" charset="0"/>
+              </a:rPr>
+              <a:t>mock</a:t>
+            </a:r>
+            <a:r>
+              <a:rPr lang="pl-PL" dirty="0" err="1">
+                <a:solidFill>
+                  <a:srgbClr val="D4D4D4"/>
+                </a:solidFill>
+                <a:latin typeface="Consolas" panose="020B0609020204030204" pitchFamily="49" charset="0"/>
+              </a:rPr>
+              <a:t>.</a:t>
+            </a:r>
+            <a:r>
+              <a:rPr lang="pl-PL" dirty="0" err="1">
+                <a:solidFill>
+                  <a:srgbClr val="DCDCAA"/>
+                </a:solidFill>
+                <a:latin typeface="Consolas" panose="020B0609020204030204" pitchFamily="49" charset="0"/>
+              </a:rPr>
+              <a:t>onGet</a:t>
+            </a:r>
+            <a:r>
+              <a:rPr lang="pl-PL" dirty="0">
+                <a:solidFill>
+                  <a:srgbClr val="D4D4D4"/>
+                </a:solidFill>
+                <a:latin typeface="Consolas" panose="020B0609020204030204" pitchFamily="49" charset="0"/>
+              </a:rPr>
+              <a:t>(</a:t>
+            </a:r>
+            <a:r>
+              <a:rPr lang="pl-PL" dirty="0">
+                <a:solidFill>
+                  <a:srgbClr val="CE9178"/>
+                </a:solidFill>
+                <a:latin typeface="Consolas" panose="020B0609020204030204" pitchFamily="49" charset="0"/>
+              </a:rPr>
+              <a:t>'/</a:t>
+            </a:r>
+            <a:r>
+              <a:rPr lang="pl-PL" dirty="0" err="1">
+                <a:solidFill>
+                  <a:srgbClr val="CE9178"/>
+                </a:solidFill>
+                <a:latin typeface="Consolas" panose="020B0609020204030204" pitchFamily="49" charset="0"/>
+              </a:rPr>
+              <a:t>users</a:t>
+            </a:r>
+            <a:r>
+              <a:rPr lang="pl-PL" dirty="0">
+                <a:solidFill>
+                  <a:srgbClr val="CE9178"/>
+                </a:solidFill>
+                <a:latin typeface="Consolas" panose="020B0609020204030204" pitchFamily="49" charset="0"/>
+              </a:rPr>
+              <a:t>'</a:t>
+            </a:r>
+            <a:r>
+              <a:rPr lang="pl-PL" dirty="0">
+                <a:solidFill>
+                  <a:srgbClr val="D4D4D4"/>
+                </a:solidFill>
+                <a:latin typeface="Consolas" panose="020B0609020204030204" pitchFamily="49" charset="0"/>
+              </a:rPr>
+              <a:t>, { </a:t>
+            </a:r>
+            <a:r>
+              <a:rPr lang="pl-PL" dirty="0" err="1">
+                <a:solidFill>
+                  <a:srgbClr val="9CDCFE"/>
+                </a:solidFill>
+                <a:latin typeface="Consolas" panose="020B0609020204030204" pitchFamily="49" charset="0"/>
+              </a:rPr>
+              <a:t>params</a:t>
+            </a:r>
+            <a:r>
+              <a:rPr lang="pl-PL" dirty="0">
+                <a:solidFill>
+                  <a:srgbClr val="9CDCFE"/>
+                </a:solidFill>
+                <a:latin typeface="Consolas" panose="020B0609020204030204" pitchFamily="49" charset="0"/>
+              </a:rPr>
+              <a:t>:</a:t>
+            </a:r>
+            <a:r>
+              <a:rPr lang="pl-PL" dirty="0">
+                <a:solidFill>
+                  <a:srgbClr val="D4D4D4"/>
+                </a:solidFill>
+                <a:latin typeface="Consolas" panose="020B0609020204030204" pitchFamily="49" charset="0"/>
+              </a:rPr>
+              <a:t> { </a:t>
+            </a:r>
+            <a:r>
+              <a:rPr lang="pl-PL" dirty="0" err="1">
+                <a:solidFill>
+                  <a:srgbClr val="9CDCFE"/>
+                </a:solidFill>
+                <a:latin typeface="Consolas" panose="020B0609020204030204" pitchFamily="49" charset="0"/>
+              </a:rPr>
+              <a:t>searchText</a:t>
+            </a:r>
+            <a:r>
+              <a:rPr lang="pl-PL" dirty="0">
+                <a:solidFill>
+                  <a:srgbClr val="9CDCFE"/>
+                </a:solidFill>
+                <a:latin typeface="Consolas" panose="020B0609020204030204" pitchFamily="49" charset="0"/>
+              </a:rPr>
+              <a:t>:</a:t>
+            </a:r>
+            <a:r>
+              <a:rPr lang="pl-PL" dirty="0">
+                <a:solidFill>
+                  <a:srgbClr val="D4D4D4"/>
+                </a:solidFill>
+                <a:latin typeface="Consolas" panose="020B0609020204030204" pitchFamily="49" charset="0"/>
+              </a:rPr>
+              <a:t> </a:t>
+            </a:r>
+            <a:r>
+              <a:rPr lang="pl-PL" dirty="0">
+                <a:solidFill>
+                  <a:srgbClr val="CE9178"/>
+                </a:solidFill>
+                <a:latin typeface="Consolas" panose="020B0609020204030204" pitchFamily="49" charset="0"/>
+              </a:rPr>
+              <a:t>'John'</a:t>
+            </a:r>
+            <a:r>
+              <a:rPr lang="pl-PL" dirty="0">
+                <a:solidFill>
+                  <a:srgbClr val="D4D4D4"/>
+                </a:solidFill>
+                <a:latin typeface="Consolas" panose="020B0609020204030204" pitchFamily="49" charset="0"/>
+              </a:rPr>
+              <a:t> } }).</a:t>
+            </a:r>
+            <a:r>
+              <a:rPr lang="pl-PL" dirty="0" err="1">
+                <a:solidFill>
+                  <a:srgbClr val="DCDCAA"/>
+                </a:solidFill>
+                <a:latin typeface="Consolas" panose="020B0609020204030204" pitchFamily="49" charset="0"/>
+              </a:rPr>
+              <a:t>reply</a:t>
+            </a:r>
+            <a:r>
+              <a:rPr lang="pl-PL" dirty="0">
+                <a:solidFill>
+                  <a:srgbClr val="D4D4D4"/>
+                </a:solidFill>
+                <a:latin typeface="Consolas" panose="020B0609020204030204" pitchFamily="49" charset="0"/>
+              </a:rPr>
+              <a:t>()</a:t>
+            </a:r>
+            <a:endParaRPr lang="pl-PL" b="0" dirty="0">
+              <a:solidFill>
+                <a:srgbClr val="D4D4D4"/>
+              </a:solidFill>
+              <a:effectLst/>
+              <a:latin typeface="Consolas" panose="020B0609020204030204" pitchFamily="49" charset="0"/>
+            </a:endParaRPr>
+          </a:p>
+        </p:txBody>
+      </p:sp>
+      <p:sp>
+        <p:nvSpPr>
+          <p:cNvPr id="7" name="Prostokąt 6">
+            <a:extLst>
+              <a:ext uri="{FF2B5EF4-FFF2-40B4-BE49-F238E27FC236}">
+                <a16:creationId xmlns:a16="http://schemas.microsoft.com/office/drawing/2014/main" id="{8467E77E-09B3-4398-9226-8BCE85760025}"/>
+              </a:ext>
+            </a:extLst>
+          </p:cNvPr>
+          <p:cNvSpPr/>
+          <p:nvPr/>
+        </p:nvSpPr>
+        <p:spPr>
+          <a:xfrm>
+            <a:off x="1921565" y="4797827"/>
+            <a:ext cx="2433230" cy="369332"/>
+          </a:xfrm>
+          <a:prstGeom prst="rect">
+            <a:avLst/>
+          </a:prstGeom>
+        </p:spPr>
+        <p:txBody>
+          <a:bodyPr wrap="none">
+            <a:spAutoFit/>
+          </a:bodyPr>
+          <a:lstStyle/>
+          <a:p>
+            <a:r>
+              <a:rPr lang="pl-PL" dirty="0">
+                <a:solidFill>
+                  <a:srgbClr val="24292E"/>
+                </a:solidFill>
+                <a:latin typeface="SFMono-Regular"/>
+              </a:rPr>
+              <a:t>With </a:t>
+            </a:r>
+            <a:r>
+              <a:rPr lang="pl-PL" dirty="0" err="1">
+                <a:solidFill>
+                  <a:srgbClr val="24292E"/>
+                </a:solidFill>
+                <a:latin typeface="SFMono-Regular"/>
+              </a:rPr>
+              <a:t>specific</a:t>
+            </a:r>
+            <a:r>
+              <a:rPr lang="pl-PL" dirty="0">
+                <a:solidFill>
+                  <a:srgbClr val="24292E"/>
+                </a:solidFill>
+                <a:latin typeface="SFMono-Regular"/>
+              </a:rPr>
+              <a:t> </a:t>
+            </a:r>
+            <a:r>
+              <a:rPr lang="pl-PL" dirty="0" err="1">
+                <a:solidFill>
+                  <a:srgbClr val="24292E"/>
+                </a:solidFill>
+                <a:latin typeface="SFMono-Regular"/>
+              </a:rPr>
+              <a:t>parameter</a:t>
+            </a:r>
+            <a:endParaRPr lang="pl-PL" dirty="0"/>
+          </a:p>
+        </p:txBody>
+      </p:sp>
+      <p:sp>
+        <p:nvSpPr>
+          <p:cNvPr id="8" name="Prostokąt 7">
+            <a:extLst>
+              <a:ext uri="{FF2B5EF4-FFF2-40B4-BE49-F238E27FC236}">
+                <a16:creationId xmlns:a16="http://schemas.microsoft.com/office/drawing/2014/main" id="{85D17675-9C0C-4173-B699-CA8A8D1299E4}"/>
+              </a:ext>
+            </a:extLst>
+          </p:cNvPr>
+          <p:cNvSpPr/>
+          <p:nvPr/>
+        </p:nvSpPr>
+        <p:spPr>
+          <a:xfrm>
+            <a:off x="4710699" y="5905823"/>
+            <a:ext cx="4970463" cy="369332"/>
+          </a:xfrm>
+          <a:prstGeom prst="rect">
+            <a:avLst/>
+          </a:prstGeom>
+        </p:spPr>
+        <p:txBody>
+          <a:bodyPr wrap="none">
+            <a:spAutoFit/>
+          </a:bodyPr>
+          <a:lstStyle/>
+          <a:p>
+            <a:r>
+              <a:rPr lang="pl-PL" dirty="0">
+                <a:hlinkClick r:id="rId3"/>
+              </a:rPr>
+              <a:t>https://github.com/ctimmerm/axios-mock-adapter</a:t>
+            </a:r>
             <a:endParaRPr lang="pl-PL" dirty="0"/>
           </a:p>
         </p:txBody>
@@ -23096,7 +25109,7 @@
     </p:spTree>
     <p:extLst>
       <p:ext uri="{BB962C8B-B14F-4D97-AF65-F5344CB8AC3E}">
-        <p14:creationId xmlns:p14="http://schemas.microsoft.com/office/powerpoint/2010/main" val="3103880284"/>
+        <p14:creationId xmlns:p14="http://schemas.microsoft.com/office/powerpoint/2010/main" val="249972549"/>
       </p:ext>
     </p:extLst>
   </p:cSld>

</xml_diff>

<commit_message>
Exercise 21: tests - mocked http - log in user
</commit_message>
<xml_diff>
--- a/tutorial/ReactjsTraining.pptx
+++ b/tutorial/ReactjsTraining.pptx
@@ -4524,6 +4524,210 @@
               <a:buFontTx/>
               <a:buNone/>
             </a:pPr>
+            <a:r>
+              <a:rPr lang="pl-PL" sz="1200" b="0" i="0" kern="1200" dirty="0" err="1">
+                <a:solidFill>
+                  <a:schemeClr val="tx1"/>
+                </a:solidFill>
+                <a:effectLst/>
+                <a:latin typeface="+mn-lt"/>
+                <a:ea typeface="+mn-ea"/>
+                <a:cs typeface="+mn-cs"/>
+              </a:rPr>
+              <a:t>Exercise</a:t>
+            </a:r>
+            <a:r>
+              <a:rPr lang="pl-PL" sz="1200" b="0" i="0" kern="1200" dirty="0">
+                <a:solidFill>
+                  <a:schemeClr val="tx1"/>
+                </a:solidFill>
+                <a:effectLst/>
+                <a:latin typeface="+mn-lt"/>
+                <a:ea typeface="+mn-ea"/>
+                <a:cs typeface="+mn-cs"/>
+              </a:rPr>
+              <a:t> 21: </a:t>
+            </a:r>
+            <a:r>
+              <a:rPr lang="pl-PL" sz="1200" b="0" i="0" kern="1200" dirty="0" err="1">
+                <a:solidFill>
+                  <a:schemeClr val="tx1"/>
+                </a:solidFill>
+                <a:effectLst/>
+                <a:latin typeface="+mn-lt"/>
+                <a:ea typeface="+mn-ea"/>
+                <a:cs typeface="+mn-cs"/>
+              </a:rPr>
+              <a:t>Create</a:t>
+            </a:r>
+            <a:r>
+              <a:rPr lang="pl-PL" sz="1200" b="0" i="0" kern="1200" dirty="0">
+                <a:solidFill>
+                  <a:schemeClr val="tx1"/>
+                </a:solidFill>
+                <a:effectLst/>
+                <a:latin typeface="+mn-lt"/>
+                <a:ea typeface="+mn-ea"/>
+                <a:cs typeface="+mn-cs"/>
+              </a:rPr>
+              <a:t> test </a:t>
+            </a:r>
+            <a:r>
+              <a:rPr lang="pl-PL" sz="1200" b="0" i="0" kern="1200" dirty="0" err="1">
+                <a:solidFill>
+                  <a:schemeClr val="tx1"/>
+                </a:solidFill>
+                <a:effectLst/>
+                <a:latin typeface="+mn-lt"/>
+                <a:ea typeface="+mn-ea"/>
+                <a:cs typeface="+mn-cs"/>
+              </a:rPr>
+              <a:t>which</a:t>
+            </a:r>
+            <a:r>
+              <a:rPr lang="pl-PL" sz="1200" b="0" i="0" kern="1200" dirty="0">
+                <a:solidFill>
+                  <a:schemeClr val="tx1"/>
+                </a:solidFill>
+                <a:effectLst/>
+                <a:latin typeface="+mn-lt"/>
+                <a:ea typeface="+mn-ea"/>
+                <a:cs typeface="+mn-cs"/>
+              </a:rPr>
+              <a:t> </a:t>
+            </a:r>
+            <a:r>
+              <a:rPr lang="pl-PL" sz="1200" b="0" i="0" kern="1200" dirty="0" err="1">
+                <a:solidFill>
+                  <a:schemeClr val="tx1"/>
+                </a:solidFill>
+                <a:effectLst/>
+                <a:latin typeface="+mn-lt"/>
+                <a:ea typeface="+mn-ea"/>
+                <a:cs typeface="+mn-cs"/>
+              </a:rPr>
+              <a:t>will</a:t>
+            </a:r>
+            <a:r>
+              <a:rPr lang="pl-PL" sz="1200" b="0" i="0" kern="1200" dirty="0">
+                <a:solidFill>
+                  <a:schemeClr val="tx1"/>
+                </a:solidFill>
+                <a:effectLst/>
+                <a:latin typeface="+mn-lt"/>
+                <a:ea typeface="+mn-ea"/>
+                <a:cs typeface="+mn-cs"/>
+              </a:rPr>
+              <a:t> log in </a:t>
+            </a:r>
+            <a:r>
+              <a:rPr lang="pl-PL" sz="1200" b="0" i="0" kern="1200" dirty="0" err="1">
+                <a:solidFill>
+                  <a:schemeClr val="tx1"/>
+                </a:solidFill>
+                <a:effectLst/>
+                <a:latin typeface="+mn-lt"/>
+                <a:ea typeface="+mn-ea"/>
+                <a:cs typeface="+mn-cs"/>
+              </a:rPr>
+              <a:t>user</a:t>
+            </a:r>
+            <a:r>
+              <a:rPr lang="pl-PL" sz="1200" b="0" i="0" kern="1200" dirty="0">
+                <a:solidFill>
+                  <a:schemeClr val="tx1"/>
+                </a:solidFill>
+                <a:effectLst/>
+                <a:latin typeface="+mn-lt"/>
+                <a:ea typeface="+mn-ea"/>
+                <a:cs typeface="+mn-cs"/>
+              </a:rPr>
+              <a:t> and </a:t>
+            </a:r>
+            <a:r>
+              <a:rPr lang="pl-PL" sz="1200" b="0" i="0" kern="1200" dirty="0" err="1">
+                <a:solidFill>
+                  <a:schemeClr val="tx1"/>
+                </a:solidFill>
+                <a:effectLst/>
+                <a:latin typeface="+mn-lt"/>
+                <a:ea typeface="+mn-ea"/>
+                <a:cs typeface="+mn-cs"/>
+              </a:rPr>
+              <a:t>check</a:t>
+            </a:r>
+            <a:r>
+              <a:rPr lang="pl-PL" sz="1200" b="0" i="0" kern="1200" dirty="0">
+                <a:solidFill>
+                  <a:schemeClr val="tx1"/>
+                </a:solidFill>
+                <a:effectLst/>
+                <a:latin typeface="+mn-lt"/>
+                <a:ea typeface="+mn-ea"/>
+                <a:cs typeface="+mn-cs"/>
+              </a:rPr>
+              <a:t> </a:t>
+            </a:r>
+            <a:r>
+              <a:rPr lang="pl-PL" sz="1200" b="0" i="0" kern="1200" dirty="0" err="1">
+                <a:solidFill>
+                  <a:schemeClr val="tx1"/>
+                </a:solidFill>
+                <a:effectLst/>
+                <a:latin typeface="+mn-lt"/>
+                <a:ea typeface="+mn-ea"/>
+                <a:cs typeface="+mn-cs"/>
+              </a:rPr>
+              <a:t>if</a:t>
+            </a:r>
+            <a:r>
+              <a:rPr lang="pl-PL" sz="1200" b="0" i="0" kern="1200" dirty="0">
+                <a:solidFill>
+                  <a:schemeClr val="tx1"/>
+                </a:solidFill>
+                <a:effectLst/>
+                <a:latin typeface="+mn-lt"/>
+                <a:ea typeface="+mn-ea"/>
+                <a:cs typeface="+mn-cs"/>
+              </a:rPr>
+              <a:t> "Hello " </a:t>
+            </a:r>
+            <a:r>
+              <a:rPr lang="pl-PL" sz="1200" b="0" i="0" kern="1200" dirty="0" err="1">
+                <a:solidFill>
+                  <a:schemeClr val="tx1"/>
+                </a:solidFill>
+                <a:effectLst/>
+                <a:latin typeface="+mn-lt"/>
+                <a:ea typeface="+mn-ea"/>
+                <a:cs typeface="+mn-cs"/>
+              </a:rPr>
+              <a:t>is</a:t>
+            </a:r>
+            <a:r>
+              <a:rPr lang="pl-PL" sz="1200" b="0" i="0" kern="1200" dirty="0">
+                <a:solidFill>
+                  <a:schemeClr val="tx1"/>
+                </a:solidFill>
+                <a:effectLst/>
+                <a:latin typeface="+mn-lt"/>
+                <a:ea typeface="+mn-ea"/>
+                <a:cs typeface="+mn-cs"/>
+              </a:rPr>
+              <a:t> </a:t>
+            </a:r>
+            <a:r>
+              <a:rPr lang="pl-PL" sz="1200" b="0" i="0" kern="1200">
+                <a:solidFill>
+                  <a:schemeClr val="tx1"/>
+                </a:solidFill>
+                <a:effectLst/>
+                <a:latin typeface="+mn-lt"/>
+                <a:ea typeface="+mn-ea"/>
+                <a:cs typeface="+mn-cs"/>
+              </a:rPr>
+              <a:t>visible</a:t>
+            </a:r>
             <a:endParaRPr lang="pl-PL" sz="1200" b="0" i="0" kern="1200" dirty="0">
               <a:solidFill>
                 <a:schemeClr val="tx1"/>
@@ -24106,7 +24310,7 @@
         </p:nvSpPr>
         <p:spPr>
           <a:xfrm>
-            <a:off x="4023476" y="1442039"/>
+            <a:off x="4023476" y="855290"/>
             <a:ext cx="4145045" cy="369332"/>
           </a:xfrm>
           <a:prstGeom prst="rect">
@@ -24218,7 +24422,7 @@
         </p:nvSpPr>
         <p:spPr>
           <a:xfrm>
-            <a:off x="2630555" y="1951672"/>
+            <a:off x="2630555" y="1364923"/>
             <a:ext cx="6930888" cy="923330"/>
           </a:xfrm>
           <a:prstGeom prst="rect">
@@ -24550,7 +24754,7 @@
         </p:nvSpPr>
         <p:spPr>
           <a:xfrm>
-            <a:off x="2614510" y="3015303"/>
+            <a:off x="2614510" y="2428554"/>
             <a:ext cx="6946933" cy="1477328"/>
           </a:xfrm>
           <a:prstGeom prst="rect">
@@ -24567,7 +24771,7 @@
           <a:lstStyle/>
           <a:p>
             <a:r>
-              <a:rPr lang="pl-PL">
+              <a:rPr lang="pl-PL" dirty="0" err="1">
                 <a:solidFill>
                   <a:srgbClr val="9CDCFE"/>
                 </a:solidFill>
@@ -24576,7 +24780,7 @@
               <a:t>mock</a:t>
             </a:r>
             <a:r>
-              <a:rPr lang="pl-PL">
+              <a:rPr lang="pl-PL" dirty="0" err="1">
                 <a:solidFill>
                   <a:srgbClr val="D4D4D4"/>
                 </a:solidFill>
@@ -24585,7 +24789,7 @@
               <a:t>.</a:t>
             </a:r>
             <a:r>
-              <a:rPr lang="pl-PL">
+              <a:rPr lang="pl-PL" dirty="0" err="1">
                 <a:solidFill>
                   <a:srgbClr val="DCDCAA"/>
                 </a:solidFill>
@@ -24594,7 +24798,7 @@
               <a:t>onGet</a:t>
             </a:r>
             <a:r>
-              <a:rPr lang="pl-PL">
+              <a:rPr lang="pl-PL" dirty="0">
                 <a:solidFill>
                   <a:srgbClr val="D4D4D4"/>
                 </a:solidFill>
@@ -24603,16 +24807,34 @@
               <a:t>(</a:t>
             </a:r>
             <a:r>
-              <a:rPr lang="pl-PL">
+              <a:rPr lang="pl-PL" dirty="0">
                 <a:solidFill>
                   <a:srgbClr val="CE9178"/>
                 </a:solidFill>
                 <a:latin typeface="Consolas" panose="020B0609020204030204" pitchFamily="49" charset="0"/>
               </a:rPr>
-              <a:t>'/users'</a:t>
-            </a:r>
-            <a:r>
-              <a:rPr lang="pl-PL">
+              <a:t>'/</a:t>
+            </a:r>
+            <a:r>
+              <a:rPr lang="pl-PL" dirty="0" err="1">
+                <a:solidFill>
+                  <a:srgbClr val="CE9178"/>
+                </a:solidFill>
+                <a:latin typeface="Consolas" panose="020B0609020204030204" pitchFamily="49" charset="0"/>
+              </a:rPr>
+              <a:t>users</a:t>
+            </a:r>
+            <a:r>
+              <a:rPr lang="pl-PL" dirty="0">
+                <a:solidFill>
+                  <a:srgbClr val="CE9178"/>
+                </a:solidFill>
+                <a:latin typeface="Consolas" panose="020B0609020204030204" pitchFamily="49" charset="0"/>
+              </a:rPr>
+              <a:t>'</a:t>
+            </a:r>
+            <a:r>
+              <a:rPr lang="pl-PL" dirty="0">
                 <a:solidFill>
                   <a:srgbClr val="D4D4D4"/>
                 </a:solidFill>
@@ -24621,7 +24843,7 @@
               <a:t>).</a:t>
             </a:r>
             <a:r>
-              <a:rPr lang="pl-PL">
+              <a:rPr lang="pl-PL" dirty="0" err="1">
                 <a:solidFill>
                   <a:srgbClr val="DCDCAA"/>
                 </a:solidFill>
@@ -24630,7 +24852,7 @@
               <a:t>reply</a:t>
             </a:r>
             <a:r>
-              <a:rPr lang="pl-PL">
+              <a:rPr lang="pl-PL" dirty="0">
                 <a:solidFill>
                   <a:srgbClr val="D4D4D4"/>
                 </a:solidFill>
@@ -24639,7 +24861,7 @@
               <a:t>(</a:t>
             </a:r>
             <a:r>
-              <a:rPr lang="pl-PL">
+              <a:rPr lang="pl-PL" dirty="0">
                 <a:solidFill>
                   <a:srgbClr val="B5CEA8"/>
                 </a:solidFill>
@@ -24648,7 +24870,7 @@
               <a:t>200</a:t>
             </a:r>
             <a:r>
-              <a:rPr lang="pl-PL">
+              <a:rPr lang="pl-PL" dirty="0">
                 <a:solidFill>
                   <a:srgbClr val="D4D4D4"/>
                 </a:solidFill>
@@ -24659,7 +24881,7 @@
           </a:p>
           <a:p>
             <a:r>
-              <a:rPr lang="pl-PL">
+              <a:rPr lang="pl-PL" dirty="0">
                 <a:solidFill>
                   <a:srgbClr val="D4D4D4"/>
                 </a:solidFill>
@@ -24668,16 +24890,25 @@
               <a:t>  </a:t>
             </a:r>
             <a:r>
-              <a:rPr lang="pl-PL">
+              <a:rPr lang="pl-PL" dirty="0" err="1">
                 <a:solidFill>
                   <a:srgbClr val="9CDCFE"/>
                 </a:solidFill>
                 <a:latin typeface="Consolas" panose="020B0609020204030204" pitchFamily="49" charset="0"/>
               </a:rPr>
-              <a:t>users:</a:t>
-            </a:r>
-            <a:r>
-              <a:rPr lang="pl-PL">
+              <a:t>users</a:t>
+            </a:r>
+            <a:r>
+              <a:rPr lang="pl-PL" dirty="0">
+                <a:solidFill>
+                  <a:srgbClr val="9CDCFE"/>
+                </a:solidFill>
+                <a:latin typeface="Consolas" panose="020B0609020204030204" pitchFamily="49" charset="0"/>
+              </a:rPr>
+              <a:t>:</a:t>
+            </a:r>
+            <a:r>
+              <a:rPr lang="pl-PL" dirty="0">
                 <a:solidFill>
                   <a:srgbClr val="D4D4D4"/>
                 </a:solidFill>
@@ -24688,7 +24919,7 @@
           </a:p>
           <a:p>
             <a:r>
-              <a:rPr lang="pl-PL">
+              <a:rPr lang="pl-PL" dirty="0">
                 <a:solidFill>
                   <a:srgbClr val="D4D4D4"/>
                 </a:solidFill>
@@ -24697,7 +24928,7 @@
               <a:t>    { </a:t>
             </a:r>
             <a:r>
-              <a:rPr lang="pl-PL">
+              <a:rPr lang="pl-PL" dirty="0">
                 <a:solidFill>
                   <a:srgbClr val="9CDCFE"/>
                 </a:solidFill>
@@ -24706,7 +24937,7 @@
               <a:t>id:</a:t>
             </a:r>
             <a:r>
-              <a:rPr lang="pl-PL">
+              <a:rPr lang="pl-PL" dirty="0">
                 <a:solidFill>
                   <a:srgbClr val="D4D4D4"/>
                 </a:solidFill>
@@ -24715,7 +24946,7 @@
               <a:t> </a:t>
             </a:r>
             <a:r>
-              <a:rPr lang="pl-PL">
+              <a:rPr lang="pl-PL" dirty="0">
                 <a:solidFill>
                   <a:srgbClr val="B5CEA8"/>
                 </a:solidFill>
@@ -24724,7 +24955,7 @@
               <a:t>1</a:t>
             </a:r>
             <a:r>
-              <a:rPr lang="pl-PL">
+              <a:rPr lang="pl-PL" dirty="0">
                 <a:solidFill>
                   <a:srgbClr val="D4D4D4"/>
                 </a:solidFill>
@@ -24733,16 +24964,25 @@
               <a:t>, </a:t>
             </a:r>
             <a:r>
-              <a:rPr lang="pl-PL">
+              <a:rPr lang="pl-PL" dirty="0" err="1">
                 <a:solidFill>
                   <a:srgbClr val="9CDCFE"/>
                 </a:solidFill>
                 <a:latin typeface="Consolas" panose="020B0609020204030204" pitchFamily="49" charset="0"/>
               </a:rPr>
-              <a:t>name:</a:t>
-            </a:r>
-            <a:r>
-              <a:rPr lang="pl-PL">
+              <a:t>name</a:t>
+            </a:r>
+            <a:r>
+              <a:rPr lang="pl-PL" dirty="0">
+                <a:solidFill>
+                  <a:srgbClr val="9CDCFE"/>
+                </a:solidFill>
+                <a:latin typeface="Consolas" panose="020B0609020204030204" pitchFamily="49" charset="0"/>
+              </a:rPr>
+              <a:t>:</a:t>
+            </a:r>
+            <a:r>
+              <a:rPr lang="pl-PL" dirty="0">
                 <a:solidFill>
                   <a:srgbClr val="D4D4D4"/>
                 </a:solidFill>
@@ -24751,16 +24991,34 @@
               <a:t> </a:t>
             </a:r>
             <a:r>
-              <a:rPr lang="pl-PL">
+              <a:rPr lang="pl-PL" dirty="0">
                 <a:solidFill>
                   <a:srgbClr val="CE9178"/>
                 </a:solidFill>
                 <a:latin typeface="Consolas" panose="020B0609020204030204" pitchFamily="49" charset="0"/>
               </a:rPr>
-              <a:t>'John Smith'</a:t>
-            </a:r>
-            <a:r>
-              <a:rPr lang="pl-PL">
+              <a:t>'John </a:t>
+            </a:r>
+            <a:r>
+              <a:rPr lang="pl-PL" dirty="0" err="1">
+                <a:solidFill>
+                  <a:srgbClr val="CE9178"/>
+                </a:solidFill>
+                <a:latin typeface="Consolas" panose="020B0609020204030204" pitchFamily="49" charset="0"/>
+              </a:rPr>
+              <a:t>Smith</a:t>
+            </a:r>
+            <a:r>
+              <a:rPr lang="pl-PL" dirty="0">
+                <a:solidFill>
+                  <a:srgbClr val="CE9178"/>
+                </a:solidFill>
+                <a:latin typeface="Consolas" panose="020B0609020204030204" pitchFamily="49" charset="0"/>
+              </a:rPr>
+              <a:t>'</a:t>
+            </a:r>
+            <a:r>
+              <a:rPr lang="pl-PL" dirty="0">
                 <a:solidFill>
                   <a:srgbClr val="D4D4D4"/>
                 </a:solidFill>
@@ -24771,7 +25029,7 @@
           </a:p>
           <a:p>
             <a:r>
-              <a:rPr lang="pl-PL">
+              <a:rPr lang="pl-PL" dirty="0">
                 <a:solidFill>
                   <a:srgbClr val="D4D4D4"/>
                 </a:solidFill>
@@ -24782,7 +25040,7 @@
           </a:p>
           <a:p>
             <a:r>
-              <a:rPr lang="pl-PL">
+              <a:rPr lang="pl-PL" dirty="0">
                 <a:solidFill>
                   <a:srgbClr val="D4D4D4"/>
                 </a:solidFill>
@@ -24814,7 +25072,7 @@
         </p:nvSpPr>
         <p:spPr>
           <a:xfrm>
-            <a:off x="1921565" y="5167159"/>
+            <a:off x="1941443" y="4360148"/>
             <a:ext cx="8309113" cy="369332"/>
           </a:xfrm>
           <a:prstGeom prst="rect">
@@ -25016,7 +25274,7 @@
         </p:nvSpPr>
         <p:spPr>
           <a:xfrm>
-            <a:off x="1921565" y="4797827"/>
+            <a:off x="1881360" y="3990816"/>
             <a:ext cx="2433230" cy="369332"/>
           </a:xfrm>
           <a:prstGeom prst="rect">
@@ -25083,7 +25341,7 @@
         </p:nvSpPr>
         <p:spPr>
           <a:xfrm>
-            <a:off x="4710699" y="5905823"/>
+            <a:off x="7221537" y="169148"/>
             <a:ext cx="4970463" cy="369332"/>
           </a:xfrm>
           <a:prstGeom prst="rect">
@@ -25103,6 +25361,408 @@
               <a:t>https://github.com/ctimmerm/axios-mock-adapter</a:t>
             </a:r>
             <a:endParaRPr lang="pl-PL" dirty="0"/>
+          </a:p>
+        </p:txBody>
+      </p:sp>
+      <p:sp>
+        <p:nvSpPr>
+          <p:cNvPr id="9" name="Prostokąt 8">
+            <a:extLst>
+              <a:ext uri="{FF2B5EF4-FFF2-40B4-BE49-F238E27FC236}">
+                <a16:creationId xmlns:a16="http://schemas.microsoft.com/office/drawing/2014/main" id="{9448EB04-B670-4B28-8730-162684175643}"/>
+              </a:ext>
+            </a:extLst>
+          </p:cNvPr>
+          <p:cNvSpPr/>
+          <p:nvPr/>
+        </p:nvSpPr>
+        <p:spPr>
+          <a:xfrm>
+            <a:off x="906376" y="5520666"/>
+            <a:ext cx="10363200" cy="369332"/>
+          </a:xfrm>
+          <a:prstGeom prst="rect">
+            <a:avLst/>
+          </a:prstGeom>
+          <a:solidFill>
+            <a:schemeClr val="tx1"/>
+          </a:solidFill>
+        </p:spPr>
+        <p:txBody>
+          <a:bodyPr wrap="square">
+            <a:spAutoFit/>
+          </a:bodyPr>
+          <a:lstStyle/>
+          <a:p>
+            <a:r>
+              <a:rPr lang="pl-PL" dirty="0" err="1">
+                <a:solidFill>
+                  <a:srgbClr val="569CD6"/>
+                </a:solidFill>
+                <a:latin typeface="Consolas" panose="020B0609020204030204" pitchFamily="49" charset="0"/>
+              </a:rPr>
+              <a:t>const</a:t>
+            </a:r>
+            <a:r>
+              <a:rPr lang="pl-PL" dirty="0">
+                <a:solidFill>
+                  <a:srgbClr val="D4D4D4"/>
+                </a:solidFill>
+                <a:latin typeface="Consolas" panose="020B0609020204030204" pitchFamily="49" charset="0"/>
+              </a:rPr>
+              <a:t> { </a:t>
+            </a:r>
+            <a:r>
+              <a:rPr lang="pl-PL" dirty="0" err="1">
+                <a:solidFill>
+                  <a:srgbClr val="9CDCFE"/>
+                </a:solidFill>
+                <a:latin typeface="Consolas" panose="020B0609020204030204" pitchFamily="49" charset="0"/>
+              </a:rPr>
+              <a:t>getByText</a:t>
+            </a:r>
+            <a:r>
+              <a:rPr lang="pl-PL" dirty="0">
+                <a:solidFill>
+                  <a:srgbClr val="D4D4D4"/>
+                </a:solidFill>
+                <a:latin typeface="Consolas" panose="020B0609020204030204" pitchFamily="49" charset="0"/>
+              </a:rPr>
+              <a:t>, </a:t>
+            </a:r>
+            <a:r>
+              <a:rPr lang="pl-PL" dirty="0" err="1">
+                <a:solidFill>
+                  <a:srgbClr val="9CDCFE"/>
+                </a:solidFill>
+                <a:latin typeface="Consolas" panose="020B0609020204030204" pitchFamily="49" charset="0"/>
+              </a:rPr>
+              <a:t>findByText</a:t>
+            </a:r>
+            <a:r>
+              <a:rPr lang="pl-PL" dirty="0">
+                <a:solidFill>
+                  <a:srgbClr val="D4D4D4"/>
+                </a:solidFill>
+                <a:latin typeface="Consolas" panose="020B0609020204030204" pitchFamily="49" charset="0"/>
+              </a:rPr>
+              <a:t>, </a:t>
+            </a:r>
+            <a:r>
+              <a:rPr lang="pl-PL" dirty="0" err="1">
+                <a:solidFill>
+                  <a:srgbClr val="9CDCFE"/>
+                </a:solidFill>
+                <a:latin typeface="Consolas" panose="020B0609020204030204" pitchFamily="49" charset="0"/>
+              </a:rPr>
+              <a:t>container</a:t>
+            </a:r>
+            <a:r>
+              <a:rPr lang="pl-PL" dirty="0">
+                <a:solidFill>
+                  <a:srgbClr val="D4D4D4"/>
+                </a:solidFill>
+                <a:latin typeface="Consolas" panose="020B0609020204030204" pitchFamily="49" charset="0"/>
+              </a:rPr>
+              <a:t> } = </a:t>
+            </a:r>
+            <a:r>
+              <a:rPr lang="pl-PL" dirty="0" err="1">
+                <a:solidFill>
+                  <a:srgbClr val="DCDCAA"/>
+                </a:solidFill>
+                <a:latin typeface="Consolas" panose="020B0609020204030204" pitchFamily="49" charset="0"/>
+              </a:rPr>
+              <a:t>render</a:t>
+            </a:r>
+            <a:r>
+              <a:rPr lang="pl-PL" dirty="0">
+                <a:solidFill>
+                  <a:srgbClr val="D4D4D4"/>
+                </a:solidFill>
+                <a:latin typeface="Consolas" panose="020B0609020204030204" pitchFamily="49" charset="0"/>
+              </a:rPr>
+              <a:t>(</a:t>
+            </a:r>
+            <a:r>
+              <a:rPr lang="pl-PL" dirty="0">
+                <a:solidFill>
+                  <a:srgbClr val="808080"/>
+                </a:solidFill>
+                <a:latin typeface="Consolas" panose="020B0609020204030204" pitchFamily="49" charset="0"/>
+              </a:rPr>
+              <a:t>&lt;</a:t>
+            </a:r>
+            <a:r>
+              <a:rPr lang="pl-PL" dirty="0">
+                <a:solidFill>
+                  <a:srgbClr val="4EC9B0"/>
+                </a:solidFill>
+                <a:latin typeface="Consolas" panose="020B0609020204030204" pitchFamily="49" charset="0"/>
+              </a:rPr>
+              <a:t>Component/</a:t>
+            </a:r>
+            <a:r>
+              <a:rPr lang="pl-PL" dirty="0">
+                <a:solidFill>
+                  <a:srgbClr val="808080"/>
+                </a:solidFill>
+                <a:latin typeface="Consolas" panose="020B0609020204030204" pitchFamily="49" charset="0"/>
+              </a:rPr>
+              <a:t>&gt;</a:t>
+            </a:r>
+            <a:r>
+              <a:rPr lang="pl-PL" dirty="0">
+                <a:solidFill>
+                  <a:srgbClr val="D4D4D4"/>
+                </a:solidFill>
+                <a:latin typeface="Consolas" panose="020B0609020204030204" pitchFamily="49" charset="0"/>
+              </a:rPr>
+              <a:t>);</a:t>
+            </a:r>
+            <a:endParaRPr lang="pl-PL" b="0" dirty="0">
+              <a:solidFill>
+                <a:srgbClr val="D4D4D4"/>
+              </a:solidFill>
+              <a:effectLst/>
+              <a:latin typeface="Consolas" panose="020B0609020204030204" pitchFamily="49" charset="0"/>
+            </a:endParaRPr>
+          </a:p>
+        </p:txBody>
+      </p:sp>
+      <p:sp>
+        <p:nvSpPr>
+          <p:cNvPr id="10" name="Prostokąt 9">
+            <a:extLst>
+              <a:ext uri="{FF2B5EF4-FFF2-40B4-BE49-F238E27FC236}">
+                <a16:creationId xmlns:a16="http://schemas.microsoft.com/office/drawing/2014/main" id="{7BC1F180-E3EE-46CF-992D-7DED5CA58D1F}"/>
+              </a:ext>
+            </a:extLst>
+          </p:cNvPr>
+          <p:cNvSpPr/>
+          <p:nvPr/>
+        </p:nvSpPr>
+        <p:spPr>
+          <a:xfrm>
+            <a:off x="906376" y="5098812"/>
+            <a:ext cx="4996881" cy="369332"/>
+          </a:xfrm>
+          <a:prstGeom prst="rect">
+            <a:avLst/>
+          </a:prstGeom>
+        </p:spPr>
+        <p:txBody>
+          <a:bodyPr wrap="none">
+            <a:spAutoFit/>
+          </a:bodyPr>
+          <a:lstStyle/>
+          <a:p>
+            <a:r>
+              <a:rPr lang="pl-PL" dirty="0">
+                <a:latin typeface="Consolas" panose="020B0609020204030204" pitchFamily="49" charset="0"/>
+              </a:rPr>
+              <a:t>User </a:t>
+            </a:r>
+            <a:r>
+              <a:rPr lang="pl-PL" dirty="0" err="1">
+                <a:latin typeface="Consolas" panose="020B0609020204030204" pitchFamily="49" charset="0"/>
+              </a:rPr>
+              <a:t>render</a:t>
+            </a:r>
+            <a:r>
+              <a:rPr lang="pl-PL" dirty="0">
+                <a:latin typeface="Consolas" panose="020B0609020204030204" pitchFamily="49" charset="0"/>
+              </a:rPr>
+              <a:t> </a:t>
+            </a:r>
+            <a:r>
+              <a:rPr lang="pl-PL" dirty="0" err="1">
+                <a:latin typeface="Consolas" panose="020B0609020204030204" pitchFamily="49" charset="0"/>
+              </a:rPr>
+              <a:t>from@testing-library</a:t>
+            </a:r>
+            <a:r>
+              <a:rPr lang="pl-PL" dirty="0">
+                <a:latin typeface="Consolas" panose="020B0609020204030204" pitchFamily="49" charset="0"/>
+              </a:rPr>
+              <a:t>/</a:t>
+            </a:r>
+            <a:r>
+              <a:rPr lang="pl-PL" dirty="0" err="1">
+                <a:latin typeface="Consolas" panose="020B0609020204030204" pitchFamily="49" charset="0"/>
+              </a:rPr>
+              <a:t>react</a:t>
+            </a:r>
+            <a:endParaRPr lang="pl-PL" b="0" dirty="0">
+              <a:effectLst/>
+              <a:latin typeface="Consolas" panose="020B0609020204030204" pitchFamily="49" charset="0"/>
+            </a:endParaRPr>
+          </a:p>
+        </p:txBody>
+      </p:sp>
+      <p:sp>
+        <p:nvSpPr>
+          <p:cNvPr id="11" name="Prostokąt 10">
+            <a:extLst>
+              <a:ext uri="{FF2B5EF4-FFF2-40B4-BE49-F238E27FC236}">
+                <a16:creationId xmlns:a16="http://schemas.microsoft.com/office/drawing/2014/main" id="{B58DD073-002C-42BA-A57B-14C0062F8489}"/>
+              </a:ext>
+            </a:extLst>
+          </p:cNvPr>
+          <p:cNvSpPr/>
+          <p:nvPr/>
+        </p:nvSpPr>
+        <p:spPr>
+          <a:xfrm>
+            <a:off x="908781" y="6088155"/>
+            <a:ext cx="6811618" cy="369332"/>
+          </a:xfrm>
+          <a:prstGeom prst="rect">
+            <a:avLst/>
+          </a:prstGeom>
+          <a:solidFill>
+            <a:schemeClr val="tx1"/>
+          </a:solidFill>
+        </p:spPr>
+        <p:txBody>
+          <a:bodyPr wrap="square">
+            <a:spAutoFit/>
+          </a:bodyPr>
+          <a:lstStyle/>
+          <a:p>
+            <a:r>
+              <a:rPr lang="pl-PL" dirty="0" err="1">
+                <a:solidFill>
+                  <a:srgbClr val="569CD6"/>
+                </a:solidFill>
+                <a:latin typeface="Consolas" panose="020B0609020204030204" pitchFamily="49" charset="0"/>
+              </a:rPr>
+              <a:t>const</a:t>
+            </a:r>
+            <a:r>
+              <a:rPr lang="pl-PL" dirty="0">
+                <a:solidFill>
+                  <a:srgbClr val="D4D4D4"/>
+                </a:solidFill>
+                <a:latin typeface="Consolas" panose="020B0609020204030204" pitchFamily="49" charset="0"/>
+              </a:rPr>
+              <a:t> </a:t>
+            </a:r>
+            <a:r>
+              <a:rPr lang="pl-PL" dirty="0" err="1">
+                <a:solidFill>
+                  <a:srgbClr val="9CDCFE"/>
+                </a:solidFill>
+                <a:latin typeface="Consolas" panose="020B0609020204030204" pitchFamily="49" charset="0"/>
+              </a:rPr>
+              <a:t>logOutButton</a:t>
+            </a:r>
+            <a:r>
+              <a:rPr lang="pl-PL" dirty="0">
+                <a:solidFill>
+                  <a:srgbClr val="D4D4D4"/>
+                </a:solidFill>
+                <a:latin typeface="Consolas" panose="020B0609020204030204" pitchFamily="49" charset="0"/>
+              </a:rPr>
+              <a:t> = </a:t>
+            </a:r>
+            <a:r>
+              <a:rPr lang="pl-PL" dirty="0" err="1">
+                <a:solidFill>
+                  <a:srgbClr val="C586C0"/>
+                </a:solidFill>
+                <a:latin typeface="Consolas" panose="020B0609020204030204" pitchFamily="49" charset="0"/>
+              </a:rPr>
+              <a:t>await</a:t>
+            </a:r>
+            <a:r>
+              <a:rPr lang="pl-PL" dirty="0">
+                <a:solidFill>
+                  <a:srgbClr val="D4D4D4"/>
+                </a:solidFill>
+                <a:latin typeface="Consolas" panose="020B0609020204030204" pitchFamily="49" charset="0"/>
+              </a:rPr>
+              <a:t> </a:t>
+            </a:r>
+            <a:r>
+              <a:rPr lang="pl-PL" dirty="0" err="1">
+                <a:solidFill>
+                  <a:srgbClr val="DCDCAA"/>
+                </a:solidFill>
+                <a:latin typeface="Consolas" panose="020B0609020204030204" pitchFamily="49" charset="0"/>
+              </a:rPr>
+              <a:t>findByText</a:t>
+            </a:r>
+            <a:r>
+              <a:rPr lang="pl-PL" dirty="0">
+                <a:solidFill>
+                  <a:srgbClr val="D4D4D4"/>
+                </a:solidFill>
+                <a:latin typeface="Consolas" panose="020B0609020204030204" pitchFamily="49" charset="0"/>
+              </a:rPr>
+              <a:t>(</a:t>
+            </a:r>
+            <a:r>
+              <a:rPr lang="pl-PL" dirty="0">
+                <a:solidFill>
+                  <a:srgbClr val="CE9178"/>
+                </a:solidFill>
+                <a:latin typeface="Consolas" panose="020B0609020204030204" pitchFamily="49" charset="0"/>
+              </a:rPr>
+              <a:t>'</a:t>
+            </a:r>
+            <a:r>
+              <a:rPr lang="pl-PL" dirty="0" err="1">
+                <a:solidFill>
+                  <a:srgbClr val="CE9178"/>
+                </a:solidFill>
+                <a:latin typeface="Consolas" panose="020B0609020204030204" pitchFamily="49" charset="0"/>
+              </a:rPr>
+              <a:t>some</a:t>
+            </a:r>
+            <a:r>
+              <a:rPr lang="pl-PL" dirty="0">
+                <a:solidFill>
+                  <a:srgbClr val="CE9178"/>
+                </a:solidFill>
+                <a:latin typeface="Consolas" panose="020B0609020204030204" pitchFamily="49" charset="0"/>
+              </a:rPr>
+              <a:t> </a:t>
+            </a:r>
+            <a:r>
+              <a:rPr lang="pl-PL" dirty="0" err="1">
+                <a:solidFill>
+                  <a:srgbClr val="CE9178"/>
+                </a:solidFill>
+                <a:latin typeface="Consolas" panose="020B0609020204030204" pitchFamily="49" charset="0"/>
+              </a:rPr>
+              <a:t>text</a:t>
+            </a:r>
+            <a:r>
+              <a:rPr lang="pl-PL" dirty="0">
+                <a:solidFill>
+                  <a:srgbClr val="CE9178"/>
+                </a:solidFill>
+                <a:latin typeface="Consolas" panose="020B0609020204030204" pitchFamily="49" charset="0"/>
+              </a:rPr>
+              <a:t>'</a:t>
+            </a:r>
+            <a:r>
+              <a:rPr lang="pl-PL" dirty="0">
+                <a:solidFill>
+                  <a:srgbClr val="D4D4D4"/>
+                </a:solidFill>
+                <a:latin typeface="Consolas" panose="020B0609020204030204" pitchFamily="49" charset="0"/>
+              </a:rPr>
+              <a:t>);</a:t>
+            </a:r>
+            <a:endParaRPr lang="pl-PL" b="0" dirty="0">
+              <a:solidFill>
+                <a:srgbClr val="D4D4D4"/>
+              </a:solidFill>
+              <a:effectLst/>
+              <a:latin typeface="Consolas" panose="020B0609020204030204" pitchFamily="49" charset="0"/>
+            </a:endParaRPr>
           </a:p>
         </p:txBody>
       </p:sp>

</xml_diff>

<commit_message>
Exercise 22: mock module - help tests
</commit_message>
<xml_diff>
--- a/tutorial/ReactjsTraining.pptx
+++ b/tutorial/ReactjsTraining.pptx
@@ -4824,15 +4824,54 @@
               <a:buFontTx/>
               <a:buNone/>
             </a:pPr>
-            <a:endParaRPr lang="pl-PL" sz="1200" b="0" i="0" kern="1200" dirty="0">
-              <a:solidFill>
-                <a:schemeClr val="tx1"/>
-              </a:solidFill>
-              <a:effectLst/>
-              <a:latin typeface="+mn-lt"/>
-              <a:ea typeface="+mn-ea"/>
-              <a:cs typeface="+mn-cs"/>
-            </a:endParaRPr>
+            <a:r>
+              <a:rPr lang="pl-PL" sz="1200" b="0" i="0" kern="1200" dirty="0" err="1">
+                <a:solidFill>
+                  <a:schemeClr val="tx1"/>
+                </a:solidFill>
+                <a:effectLst/>
+                <a:latin typeface="+mn-lt"/>
+                <a:ea typeface="+mn-ea"/>
+                <a:cs typeface="+mn-cs"/>
+              </a:rPr>
+              <a:t>Exercise</a:t>
+            </a:r>
+            <a:r>
+              <a:rPr lang="pl-PL" sz="1200" b="0" i="0" kern="1200" dirty="0">
+                <a:solidFill>
+                  <a:schemeClr val="tx1"/>
+                </a:solidFill>
+                <a:effectLst/>
+                <a:latin typeface="+mn-lt"/>
+                <a:ea typeface="+mn-ea"/>
+                <a:cs typeface="+mn-cs"/>
+              </a:rPr>
+              <a:t> 22: Napisać prosty test do Help.js gdzie </a:t>
+            </a:r>
+            <a:r>
+              <a:rPr lang="pl-PL" sz="1200" b="0" i="0" kern="1200" dirty="0" err="1">
+                <a:solidFill>
+                  <a:schemeClr val="tx1"/>
+                </a:solidFill>
+                <a:effectLst/>
+                <a:latin typeface="+mn-lt"/>
+                <a:ea typeface="+mn-ea"/>
+                <a:cs typeface="+mn-cs"/>
+              </a:rPr>
+              <a:t>Square</a:t>
+            </a:r>
+            <a:r>
+              <a:rPr lang="pl-PL" sz="1200" b="0" i="0" kern="1200" dirty="0">
+                <a:solidFill>
+                  <a:schemeClr val="tx1"/>
+                </a:solidFill>
+                <a:effectLst/>
+                <a:latin typeface="+mn-lt"/>
+                <a:ea typeface="+mn-ea"/>
+                <a:cs typeface="+mn-cs"/>
+              </a:rPr>
+              <a:t> zastąpimy innym elementem i to sprawdzimy (dodać, że używa się tego najczęściej do zewnętrznych bibliotek albo problematycznych)</a:t>
+            </a:r>
           </a:p>
         </p:txBody>
       </p:sp>
@@ -25811,7 +25850,7 @@
         <p:spPr>
           <a:xfrm>
             <a:off x="497840" y="538480"/>
-            <a:ext cx="645690" cy="369332"/>
+            <a:ext cx="2532425" cy="369332"/>
           </a:xfrm>
           <a:prstGeom prst="rect">
             <a:avLst/>
@@ -25828,7 +25867,459 @@
               <a:rPr lang="pl-PL" dirty="0" err="1"/>
               <a:t>Tests</a:t>
             </a:r>
+            <a:r>
+              <a:rPr lang="pl-PL" dirty="0"/>
+              <a:t> – </a:t>
+            </a:r>
+            <a:r>
+              <a:rPr lang="pl-PL" dirty="0" err="1"/>
+              <a:t>Mocking</a:t>
+            </a:r>
+            <a:r>
+              <a:rPr lang="pl-PL" dirty="0"/>
+              <a:t> </a:t>
+            </a:r>
+            <a:r>
+              <a:rPr lang="pl-PL" dirty="0" err="1"/>
+              <a:t>modules</a:t>
+            </a:r>
             <a:endParaRPr lang="pl-PL" dirty="0"/>
+          </a:p>
+        </p:txBody>
+      </p:sp>
+      <p:sp>
+        <p:nvSpPr>
+          <p:cNvPr id="2" name="Prostokąt 1">
+            <a:extLst>
+              <a:ext uri="{FF2B5EF4-FFF2-40B4-BE49-F238E27FC236}">
+                <a16:creationId xmlns:a16="http://schemas.microsoft.com/office/drawing/2014/main" id="{089662BC-DD47-4CA4-87F5-EEC1E0934252}"/>
+              </a:ext>
+            </a:extLst>
+          </p:cNvPr>
+          <p:cNvSpPr/>
+          <p:nvPr/>
+        </p:nvSpPr>
+        <p:spPr>
+          <a:xfrm>
+            <a:off x="3180522" y="1997839"/>
+            <a:ext cx="6096000" cy="2862322"/>
+          </a:xfrm>
+          <a:prstGeom prst="rect">
+            <a:avLst/>
+          </a:prstGeom>
+          <a:solidFill>
+            <a:schemeClr val="tx1"/>
+          </a:solidFill>
+        </p:spPr>
+        <p:txBody>
+          <a:bodyPr>
+            <a:spAutoFit/>
+          </a:bodyPr>
+          <a:lstStyle/>
+          <a:p>
+            <a:br>
+              <a:rPr lang="en-US" dirty="0">
+                <a:solidFill>
+                  <a:srgbClr val="D4D4D4"/>
+                </a:solidFill>
+                <a:latin typeface="Consolas" panose="020B0609020204030204" pitchFamily="49" charset="0"/>
+              </a:rPr>
+            </a:br>
+            <a:r>
+              <a:rPr lang="en-US" dirty="0" err="1">
+                <a:solidFill>
+                  <a:srgbClr val="9CDCFE"/>
+                </a:solidFill>
+                <a:latin typeface="Consolas" panose="020B0609020204030204" pitchFamily="49" charset="0"/>
+              </a:rPr>
+              <a:t>jest</a:t>
+            </a:r>
+            <a:r>
+              <a:rPr lang="en-US" dirty="0" err="1">
+                <a:solidFill>
+                  <a:srgbClr val="D4D4D4"/>
+                </a:solidFill>
+                <a:latin typeface="Consolas" panose="020B0609020204030204" pitchFamily="49" charset="0"/>
+              </a:rPr>
+              <a:t>.</a:t>
+            </a:r>
+            <a:r>
+              <a:rPr lang="en-US" dirty="0" err="1">
+                <a:solidFill>
+                  <a:srgbClr val="DCDCAA"/>
+                </a:solidFill>
+                <a:latin typeface="Consolas" panose="020B0609020204030204" pitchFamily="49" charset="0"/>
+              </a:rPr>
+              <a:t>mock</a:t>
+            </a:r>
+            <a:r>
+              <a:rPr lang="en-US" dirty="0">
+                <a:solidFill>
+                  <a:srgbClr val="D4D4D4"/>
+                </a:solidFill>
+                <a:latin typeface="Consolas" panose="020B0609020204030204" pitchFamily="49" charset="0"/>
+              </a:rPr>
+              <a:t>(</a:t>
+            </a:r>
+            <a:r>
+              <a:rPr lang="en-US" dirty="0">
+                <a:solidFill>
+                  <a:srgbClr val="CE9178"/>
+                </a:solidFill>
+                <a:latin typeface="Consolas" panose="020B0609020204030204" pitchFamily="49" charset="0"/>
+              </a:rPr>
+              <a:t>"./</a:t>
+            </a:r>
+            <a:r>
+              <a:rPr lang="pl-PL" dirty="0" err="1">
+                <a:solidFill>
+                  <a:srgbClr val="CE9178"/>
+                </a:solidFill>
+                <a:latin typeface="Consolas" panose="020B0609020204030204" pitchFamily="49" charset="0"/>
+              </a:rPr>
+              <a:t>SomeComponent</a:t>
+            </a:r>
+            <a:r>
+              <a:rPr lang="en-US" dirty="0">
+                <a:solidFill>
+                  <a:srgbClr val="CE9178"/>
+                </a:solidFill>
+                <a:latin typeface="Consolas" panose="020B0609020204030204" pitchFamily="49" charset="0"/>
+              </a:rPr>
+              <a:t>"</a:t>
+            </a:r>
+            <a:r>
+              <a:rPr lang="en-US" dirty="0">
+                <a:solidFill>
+                  <a:srgbClr val="D4D4D4"/>
+                </a:solidFill>
+                <a:latin typeface="Consolas" panose="020B0609020204030204" pitchFamily="49" charset="0"/>
+              </a:rPr>
+              <a:t>, () </a:t>
+            </a:r>
+            <a:r>
+              <a:rPr lang="en-US" dirty="0">
+                <a:solidFill>
+                  <a:srgbClr val="569CD6"/>
+                </a:solidFill>
+                <a:latin typeface="Consolas" panose="020B0609020204030204" pitchFamily="49" charset="0"/>
+              </a:rPr>
+              <a:t>=&gt;</a:t>
+            </a:r>
+            <a:r>
+              <a:rPr lang="en-US" dirty="0">
+                <a:solidFill>
+                  <a:srgbClr val="D4D4D4"/>
+                </a:solidFill>
+                <a:latin typeface="Consolas" panose="020B0609020204030204" pitchFamily="49" charset="0"/>
+              </a:rPr>
+              <a:t> {</a:t>
+            </a:r>
+          </a:p>
+          <a:p>
+            <a:r>
+              <a:rPr lang="en-US" dirty="0">
+                <a:solidFill>
+                  <a:srgbClr val="D4D4D4"/>
+                </a:solidFill>
+                <a:latin typeface="Consolas" panose="020B0609020204030204" pitchFamily="49" charset="0"/>
+              </a:rPr>
+              <a:t>  </a:t>
+            </a:r>
+            <a:r>
+              <a:rPr lang="en-US" dirty="0">
+                <a:solidFill>
+                  <a:srgbClr val="C586C0"/>
+                </a:solidFill>
+                <a:latin typeface="Consolas" panose="020B0609020204030204" pitchFamily="49" charset="0"/>
+              </a:rPr>
+              <a:t>return</a:t>
+            </a:r>
+            <a:r>
+              <a:rPr lang="en-US" dirty="0">
+                <a:solidFill>
+                  <a:srgbClr val="D4D4D4"/>
+                </a:solidFill>
+                <a:latin typeface="Consolas" panose="020B0609020204030204" pitchFamily="49" charset="0"/>
+              </a:rPr>
+              <a:t> </a:t>
+            </a:r>
+            <a:r>
+              <a:rPr lang="en-US" dirty="0">
+                <a:solidFill>
+                  <a:srgbClr val="569CD6"/>
+                </a:solidFill>
+                <a:latin typeface="Consolas" panose="020B0609020204030204" pitchFamily="49" charset="0"/>
+              </a:rPr>
+              <a:t>function</a:t>
+            </a:r>
+            <a:r>
+              <a:rPr lang="en-US" dirty="0">
+                <a:solidFill>
+                  <a:srgbClr val="D4D4D4"/>
+                </a:solidFill>
+                <a:latin typeface="Consolas" panose="020B0609020204030204" pitchFamily="49" charset="0"/>
+              </a:rPr>
+              <a:t> </a:t>
+            </a:r>
+            <a:r>
+              <a:rPr lang="en-US" dirty="0">
+                <a:solidFill>
+                  <a:srgbClr val="DCDCAA"/>
+                </a:solidFill>
+                <a:latin typeface="Consolas" panose="020B0609020204030204" pitchFamily="49" charset="0"/>
+              </a:rPr>
+              <a:t>Dummy</a:t>
+            </a:r>
+            <a:r>
+              <a:rPr lang="pl-PL" dirty="0">
+                <a:solidFill>
+                  <a:srgbClr val="DCDCAA"/>
+                </a:solidFill>
+                <a:latin typeface="Consolas" panose="020B0609020204030204" pitchFamily="49" charset="0"/>
+              </a:rPr>
+              <a:t>Component</a:t>
+            </a:r>
+            <a:r>
+              <a:rPr lang="en-US" dirty="0">
+                <a:solidFill>
+                  <a:srgbClr val="D4D4D4"/>
+                </a:solidFill>
+                <a:latin typeface="Consolas" panose="020B0609020204030204" pitchFamily="49" charset="0"/>
+              </a:rPr>
+              <a:t>(</a:t>
+            </a:r>
+            <a:r>
+              <a:rPr lang="en-US" dirty="0">
+                <a:solidFill>
+                  <a:srgbClr val="9CDCFE"/>
+                </a:solidFill>
+                <a:latin typeface="Consolas" panose="020B0609020204030204" pitchFamily="49" charset="0"/>
+              </a:rPr>
+              <a:t>props</a:t>
+            </a:r>
+            <a:r>
+              <a:rPr lang="en-US" dirty="0">
+                <a:solidFill>
+                  <a:srgbClr val="D4D4D4"/>
+                </a:solidFill>
+                <a:latin typeface="Consolas" panose="020B0609020204030204" pitchFamily="49" charset="0"/>
+              </a:rPr>
+              <a:t>) {</a:t>
+            </a:r>
+          </a:p>
+          <a:p>
+            <a:r>
+              <a:rPr lang="en-US" dirty="0">
+                <a:solidFill>
+                  <a:srgbClr val="D4D4D4"/>
+                </a:solidFill>
+                <a:latin typeface="Consolas" panose="020B0609020204030204" pitchFamily="49" charset="0"/>
+              </a:rPr>
+              <a:t>    </a:t>
+            </a:r>
+            <a:r>
+              <a:rPr lang="en-US" dirty="0">
+                <a:solidFill>
+                  <a:srgbClr val="C586C0"/>
+                </a:solidFill>
+                <a:latin typeface="Consolas" panose="020B0609020204030204" pitchFamily="49" charset="0"/>
+              </a:rPr>
+              <a:t>return</a:t>
+            </a:r>
+            <a:r>
+              <a:rPr lang="en-US" dirty="0">
+                <a:solidFill>
+                  <a:srgbClr val="D4D4D4"/>
+                </a:solidFill>
+                <a:latin typeface="Consolas" panose="020B0609020204030204" pitchFamily="49" charset="0"/>
+              </a:rPr>
+              <a:t> (</a:t>
+            </a:r>
+          </a:p>
+          <a:p>
+            <a:r>
+              <a:rPr lang="en-US" dirty="0">
+                <a:solidFill>
+                  <a:srgbClr val="D4D4D4"/>
+                </a:solidFill>
+                <a:latin typeface="Consolas" panose="020B0609020204030204" pitchFamily="49" charset="0"/>
+              </a:rPr>
+              <a:t>      </a:t>
+            </a:r>
+            <a:r>
+              <a:rPr lang="en-US" dirty="0">
+                <a:solidFill>
+                  <a:srgbClr val="808080"/>
+                </a:solidFill>
+                <a:latin typeface="Consolas" panose="020B0609020204030204" pitchFamily="49" charset="0"/>
+              </a:rPr>
+              <a:t>&lt;</a:t>
+            </a:r>
+            <a:r>
+              <a:rPr lang="en-US" dirty="0">
+                <a:solidFill>
+                  <a:srgbClr val="569CD6"/>
+                </a:solidFill>
+                <a:latin typeface="Consolas" panose="020B0609020204030204" pitchFamily="49" charset="0"/>
+              </a:rPr>
+              <a:t>div</a:t>
+            </a:r>
+            <a:r>
+              <a:rPr lang="en-US" dirty="0">
+                <a:solidFill>
+                  <a:srgbClr val="D4D4D4"/>
+                </a:solidFill>
+                <a:latin typeface="Consolas" panose="020B0609020204030204" pitchFamily="49" charset="0"/>
+              </a:rPr>
+              <a:t> </a:t>
+            </a:r>
+            <a:r>
+              <a:rPr lang="en-US" dirty="0">
+                <a:solidFill>
+                  <a:srgbClr val="9CDCFE"/>
+                </a:solidFill>
+                <a:latin typeface="Consolas" panose="020B0609020204030204" pitchFamily="49" charset="0"/>
+              </a:rPr>
+              <a:t>data-</a:t>
+            </a:r>
+            <a:r>
+              <a:rPr lang="en-US" dirty="0" err="1">
+                <a:solidFill>
+                  <a:srgbClr val="9CDCFE"/>
+                </a:solidFill>
+                <a:latin typeface="Consolas" panose="020B0609020204030204" pitchFamily="49" charset="0"/>
+              </a:rPr>
+              <a:t>testid</a:t>
+            </a:r>
+            <a:r>
+              <a:rPr lang="en-US" dirty="0">
+                <a:solidFill>
+                  <a:srgbClr val="D4D4D4"/>
+                </a:solidFill>
+                <a:latin typeface="Consolas" panose="020B0609020204030204" pitchFamily="49" charset="0"/>
+              </a:rPr>
+              <a:t>=</a:t>
+            </a:r>
+            <a:r>
+              <a:rPr lang="en-US" dirty="0">
+                <a:solidFill>
+                  <a:srgbClr val="CE9178"/>
+                </a:solidFill>
+                <a:latin typeface="Consolas" panose="020B0609020204030204" pitchFamily="49" charset="0"/>
+              </a:rPr>
+              <a:t>"square"</a:t>
+            </a:r>
+            <a:r>
+              <a:rPr lang="en-US" dirty="0">
+                <a:solidFill>
+                  <a:srgbClr val="808080"/>
+                </a:solidFill>
+                <a:latin typeface="Consolas" panose="020B0609020204030204" pitchFamily="49" charset="0"/>
+              </a:rPr>
+              <a:t>&gt;</a:t>
+            </a:r>
+            <a:endParaRPr lang="en-US" dirty="0">
+              <a:solidFill>
+                <a:srgbClr val="D4D4D4"/>
+              </a:solidFill>
+              <a:latin typeface="Consolas" panose="020B0609020204030204" pitchFamily="49" charset="0"/>
+            </a:endParaRPr>
+          </a:p>
+          <a:p>
+            <a:r>
+              <a:rPr lang="en-US" dirty="0">
+                <a:solidFill>
+                  <a:srgbClr val="D4D4D4"/>
+                </a:solidFill>
+                <a:latin typeface="Consolas" panose="020B0609020204030204" pitchFamily="49" charset="0"/>
+              </a:rPr>
+              <a:t>        here is square</a:t>
+            </a:r>
+          </a:p>
+          <a:p>
+            <a:r>
+              <a:rPr lang="en-US" dirty="0">
+                <a:solidFill>
+                  <a:srgbClr val="D4D4D4"/>
+                </a:solidFill>
+                <a:latin typeface="Consolas" panose="020B0609020204030204" pitchFamily="49" charset="0"/>
+              </a:rPr>
+              <a:t>      </a:t>
+            </a:r>
+            <a:r>
+              <a:rPr lang="en-US" dirty="0">
+                <a:solidFill>
+                  <a:srgbClr val="808080"/>
+                </a:solidFill>
+                <a:latin typeface="Consolas" panose="020B0609020204030204" pitchFamily="49" charset="0"/>
+              </a:rPr>
+              <a:t>&lt;/</a:t>
+            </a:r>
+            <a:r>
+              <a:rPr lang="en-US" dirty="0">
+                <a:solidFill>
+                  <a:srgbClr val="569CD6"/>
+                </a:solidFill>
+                <a:latin typeface="Consolas" panose="020B0609020204030204" pitchFamily="49" charset="0"/>
+              </a:rPr>
+              <a:t>div</a:t>
+            </a:r>
+            <a:r>
+              <a:rPr lang="en-US" dirty="0">
+                <a:solidFill>
+                  <a:srgbClr val="808080"/>
+                </a:solidFill>
+                <a:latin typeface="Consolas" panose="020B0609020204030204" pitchFamily="49" charset="0"/>
+              </a:rPr>
+              <a:t>&gt;</a:t>
+            </a:r>
+            <a:endParaRPr lang="en-US" dirty="0">
+              <a:solidFill>
+                <a:srgbClr val="D4D4D4"/>
+              </a:solidFill>
+              <a:latin typeface="Consolas" panose="020B0609020204030204" pitchFamily="49" charset="0"/>
+            </a:endParaRPr>
+          </a:p>
+          <a:p>
+            <a:r>
+              <a:rPr lang="en-US" dirty="0">
+                <a:solidFill>
+                  <a:srgbClr val="D4D4D4"/>
+                </a:solidFill>
+                <a:latin typeface="Consolas" panose="020B0609020204030204" pitchFamily="49" charset="0"/>
+              </a:rPr>
+              <a:t>    );</a:t>
+            </a:r>
+          </a:p>
+          <a:p>
+            <a:r>
+              <a:rPr lang="en-US" dirty="0">
+                <a:solidFill>
+                  <a:srgbClr val="D4D4D4"/>
+                </a:solidFill>
+                <a:latin typeface="Consolas" panose="020B0609020204030204" pitchFamily="49" charset="0"/>
+              </a:rPr>
+              <a:t>  };</a:t>
+            </a:r>
+          </a:p>
+          <a:p>
+            <a:r>
+              <a:rPr lang="en-US" dirty="0">
+                <a:solidFill>
+                  <a:srgbClr val="D4D4D4"/>
+                </a:solidFill>
+                <a:latin typeface="Consolas" panose="020B0609020204030204" pitchFamily="49" charset="0"/>
+              </a:rPr>
+              <a:t>});</a:t>
+            </a:r>
+            <a:endParaRPr lang="en-US" b="0" dirty="0">
+              <a:solidFill>
+                <a:srgbClr val="D4D4D4"/>
+              </a:solidFill>
+              <a:effectLst/>
+              <a:latin typeface="Consolas" panose="020B0609020204030204" pitchFamily="49" charset="0"/>
+            </a:endParaRPr>
           </a:p>
         </p:txBody>
       </p:sp>

</xml_diff>

<commit_message>
Exercise 1a - component lazy loading
</commit_message>
<xml_diff>
--- a/tutorial/ReactjsTraining.pptx
+++ b/tutorial/ReactjsTraining.pptx
@@ -5,7 +5,7 @@
     <p:sldMasterId id="2147483648" r:id="rId1"/>
   </p:sldMasterIdLst>
   <p:notesMasterIdLst>
-    <p:notesMasterId r:id="rId27"/>
+    <p:notesMasterId r:id="rId31"/>
   </p:notesMasterIdLst>
   <p:sldIdLst>
     <p:sldId id="256" r:id="rId2"/>
@@ -33,6 +33,10 @@
     <p:sldId id="279" r:id="rId24"/>
     <p:sldId id="278" r:id="rId25"/>
     <p:sldId id="280" r:id="rId26"/>
+    <p:sldId id="284" r:id="rId27"/>
+    <p:sldId id="282" r:id="rId28"/>
+    <p:sldId id="283" r:id="rId29"/>
+    <p:sldId id="281" r:id="rId30"/>
   </p:sldIdLst>
   <p:sldSz cx="12192000" cy="6858000"/>
   <p:notesSz cx="6858000" cy="9144000"/>
@@ -221,7 +225,7 @@
           <a:p>
             <a:fld id="{D61BAF21-C883-454C-A249-8697E6BEDB6B}" type="datetimeFigureOut">
               <a:rPr lang="pl-PL" smtClean="0"/>
-              <a:t>05.10.2019</a:t>
+              <a:t>06.10.2019</a:t>
             </a:fld>
             <a:endParaRPr lang="pl-PL"/>
           </a:p>
@@ -4911,6 +4915,477 @@
 </p:notes>
 </file>
 
+<file path=ppt/notesSlides/notesSlide26.xml><?xml version="1.0" encoding="utf-8"?>
+<p:notes xmlns:a="http://schemas.openxmlformats.org/drawingml/2006/main" xmlns:r="http://schemas.openxmlformats.org/officeDocument/2006/relationships" xmlns:p="http://schemas.openxmlformats.org/presentationml/2006/main">
+  <p:cSld>
+    <p:spTree>
+      <p:nvGrpSpPr>
+        <p:cNvPr id="1" name=""/>
+        <p:cNvGrpSpPr/>
+        <p:nvPr/>
+      </p:nvGrpSpPr>
+      <p:grpSpPr>
+        <a:xfrm>
+          <a:off x="0" y="0"/>
+          <a:ext cx="0" cy="0"/>
+          <a:chOff x="0" y="0"/>
+          <a:chExt cx="0" cy="0"/>
+        </a:xfrm>
+      </p:grpSpPr>
+      <p:sp>
+        <p:nvSpPr>
+          <p:cNvPr id="2" name="Symbol zastępczy obrazu slajdu 1"/>
+          <p:cNvSpPr>
+            <a:spLocks noGrp="1" noRot="1" noChangeAspect="1"/>
+          </p:cNvSpPr>
+          <p:nvPr>
+            <p:ph type="sldImg"/>
+          </p:nvPr>
+        </p:nvSpPr>
+        <p:spPr/>
+      </p:sp>
+      <p:sp>
+        <p:nvSpPr>
+          <p:cNvPr id="3" name="Symbol zastępczy notatek 2"/>
+          <p:cNvSpPr>
+            <a:spLocks noGrp="1"/>
+          </p:cNvSpPr>
+          <p:nvPr>
+            <p:ph type="body" idx="1"/>
+          </p:nvPr>
+        </p:nvSpPr>
+        <p:spPr/>
+        <p:txBody>
+          <a:bodyPr/>
+          <a:lstStyle/>
+          <a:p>
+            <a:pPr marL="171450" indent="-171450">
+              <a:buFontTx/>
+              <a:buChar char="-"/>
+            </a:pPr>
+            <a:r>
+              <a:rPr lang="pl-PL" sz="1200" b="0" i="0" kern="1200" dirty="0" err="1">
+                <a:solidFill>
+                  <a:schemeClr val="tx1"/>
+                </a:solidFill>
+                <a:effectLst/>
+                <a:latin typeface="+mn-lt"/>
+                <a:ea typeface="+mn-ea"/>
+                <a:cs typeface="+mn-cs"/>
+              </a:rPr>
+              <a:t>Exercise</a:t>
+            </a:r>
+            <a:r>
+              <a:rPr lang="pl-PL" sz="1200" b="0" i="0" kern="1200" dirty="0">
+                <a:solidFill>
+                  <a:schemeClr val="tx1"/>
+                </a:solidFill>
+                <a:effectLst/>
+                <a:latin typeface="+mn-lt"/>
+                <a:ea typeface="+mn-ea"/>
+                <a:cs typeface="+mn-cs"/>
+              </a:rPr>
+              <a:t> 23: Help routing zamienić na </a:t>
+            </a:r>
+            <a:r>
+              <a:rPr lang="pl-PL" sz="1200" b="0" i="0" kern="1200" dirty="0" err="1">
+                <a:solidFill>
+                  <a:schemeClr val="tx1"/>
+                </a:solidFill>
+                <a:effectLst/>
+                <a:latin typeface="+mn-lt"/>
+                <a:ea typeface="+mn-ea"/>
+                <a:cs typeface="+mn-cs"/>
+              </a:rPr>
+              <a:t>lazy</a:t>
+            </a:r>
+            <a:r>
+              <a:rPr lang="pl-PL" sz="1200" b="0" i="0" kern="1200" dirty="0">
+                <a:solidFill>
+                  <a:schemeClr val="tx1"/>
+                </a:solidFill>
+                <a:effectLst/>
+                <a:latin typeface="+mn-lt"/>
+                <a:ea typeface="+mn-ea"/>
+                <a:cs typeface="+mn-cs"/>
+              </a:rPr>
+              <a:t> </a:t>
+            </a:r>
+            <a:r>
+              <a:rPr lang="pl-PL" sz="1200" b="0" i="0" kern="1200" dirty="0" err="1">
+                <a:solidFill>
+                  <a:schemeClr val="tx1"/>
+                </a:solidFill>
+                <a:effectLst/>
+                <a:latin typeface="+mn-lt"/>
+                <a:ea typeface="+mn-ea"/>
+                <a:cs typeface="+mn-cs"/>
+              </a:rPr>
+              <a:t>loading</a:t>
+            </a:r>
+            <a:r>
+              <a:rPr lang="pl-PL" sz="1200" b="0" i="0" kern="1200" dirty="0">
+                <a:solidFill>
+                  <a:schemeClr val="tx1"/>
+                </a:solidFill>
+                <a:effectLst/>
+                <a:latin typeface="+mn-lt"/>
+                <a:ea typeface="+mn-ea"/>
+                <a:cs typeface="+mn-cs"/>
+              </a:rPr>
+              <a:t>, czyli Help dociągany jest w </a:t>
+            </a:r>
+            <a:r>
+              <a:rPr lang="pl-PL" sz="1200" b="0" i="0" kern="1200">
+                <a:solidFill>
+                  <a:schemeClr val="tx1"/>
+                </a:solidFill>
+                <a:effectLst/>
+                <a:latin typeface="+mn-lt"/>
+                <a:ea typeface="+mn-ea"/>
+                <a:cs typeface="+mn-cs"/>
+              </a:rPr>
+              <a:t>momencie naciśnięcia na link do Help</a:t>
+            </a:r>
+            <a:endParaRPr lang="pl-PL" sz="1200" b="0" i="0" kern="1200" dirty="0">
+              <a:solidFill>
+                <a:schemeClr val="tx1"/>
+              </a:solidFill>
+              <a:effectLst/>
+              <a:latin typeface="+mn-lt"/>
+              <a:ea typeface="+mn-ea"/>
+              <a:cs typeface="+mn-cs"/>
+            </a:endParaRPr>
+          </a:p>
+        </p:txBody>
+      </p:sp>
+      <p:sp>
+        <p:nvSpPr>
+          <p:cNvPr id="4" name="Symbol zastępczy numeru slajdu 3"/>
+          <p:cNvSpPr>
+            <a:spLocks noGrp="1"/>
+          </p:cNvSpPr>
+          <p:nvPr>
+            <p:ph type="sldNum" sz="quarter" idx="5"/>
+          </p:nvPr>
+        </p:nvSpPr>
+        <p:spPr/>
+        <p:txBody>
+          <a:bodyPr/>
+          <a:lstStyle/>
+          <a:p>
+            <a:fld id="{810A6612-7A23-4B98-B0E9-4F3C882AD2EF}" type="slidenum">
+              <a:rPr lang="pl-PL" smtClean="0"/>
+              <a:t>26</a:t>
+            </a:fld>
+            <a:endParaRPr lang="pl-PL"/>
+          </a:p>
+        </p:txBody>
+      </p:sp>
+    </p:spTree>
+    <p:extLst>
+      <p:ext uri="{BB962C8B-B14F-4D97-AF65-F5344CB8AC3E}">
+        <p14:creationId xmlns:p14="http://schemas.microsoft.com/office/powerpoint/2010/main" val="4040687511"/>
+      </p:ext>
+    </p:extLst>
+  </p:cSld>
+  <p:clrMapOvr>
+    <a:masterClrMapping/>
+  </p:clrMapOvr>
+</p:notes>
+</file>
+
+<file path=ppt/notesSlides/notesSlide27.xml><?xml version="1.0" encoding="utf-8"?>
+<p:notes xmlns:a="http://schemas.openxmlformats.org/drawingml/2006/main" xmlns:r="http://schemas.openxmlformats.org/officeDocument/2006/relationships" xmlns:p="http://schemas.openxmlformats.org/presentationml/2006/main">
+  <p:cSld>
+    <p:spTree>
+      <p:nvGrpSpPr>
+        <p:cNvPr id="1" name=""/>
+        <p:cNvGrpSpPr/>
+        <p:nvPr/>
+      </p:nvGrpSpPr>
+      <p:grpSpPr>
+        <a:xfrm>
+          <a:off x="0" y="0"/>
+          <a:ext cx="0" cy="0"/>
+          <a:chOff x="0" y="0"/>
+          <a:chExt cx="0" cy="0"/>
+        </a:xfrm>
+      </p:grpSpPr>
+      <p:sp>
+        <p:nvSpPr>
+          <p:cNvPr id="2" name="Symbol zastępczy obrazu slajdu 1"/>
+          <p:cNvSpPr>
+            <a:spLocks noGrp="1" noRot="1" noChangeAspect="1"/>
+          </p:cNvSpPr>
+          <p:nvPr>
+            <p:ph type="sldImg"/>
+          </p:nvPr>
+        </p:nvSpPr>
+        <p:spPr/>
+      </p:sp>
+      <p:sp>
+        <p:nvSpPr>
+          <p:cNvPr id="3" name="Symbol zastępczy notatek 2"/>
+          <p:cNvSpPr>
+            <a:spLocks noGrp="1"/>
+          </p:cNvSpPr>
+          <p:nvPr>
+            <p:ph type="body" idx="1"/>
+          </p:nvPr>
+        </p:nvSpPr>
+        <p:spPr/>
+        <p:txBody>
+          <a:bodyPr/>
+          <a:lstStyle/>
+          <a:p>
+            <a:pPr marL="0" indent="0">
+              <a:buFontTx/>
+              <a:buNone/>
+            </a:pPr>
+            <a:endParaRPr lang="pl-PL" sz="1200" b="0" i="0" kern="1200" dirty="0">
+              <a:solidFill>
+                <a:schemeClr val="tx1"/>
+              </a:solidFill>
+              <a:effectLst/>
+              <a:latin typeface="+mn-lt"/>
+              <a:ea typeface="+mn-ea"/>
+              <a:cs typeface="+mn-cs"/>
+            </a:endParaRPr>
+          </a:p>
+        </p:txBody>
+      </p:sp>
+      <p:sp>
+        <p:nvSpPr>
+          <p:cNvPr id="4" name="Symbol zastępczy numeru slajdu 3"/>
+          <p:cNvSpPr>
+            <a:spLocks noGrp="1"/>
+          </p:cNvSpPr>
+          <p:nvPr>
+            <p:ph type="sldNum" sz="quarter" idx="5"/>
+          </p:nvPr>
+        </p:nvSpPr>
+        <p:spPr/>
+        <p:txBody>
+          <a:bodyPr/>
+          <a:lstStyle/>
+          <a:p>
+            <a:fld id="{810A6612-7A23-4B98-B0E9-4F3C882AD2EF}" type="slidenum">
+              <a:rPr lang="pl-PL" smtClean="0"/>
+              <a:t>27</a:t>
+            </a:fld>
+            <a:endParaRPr lang="pl-PL"/>
+          </a:p>
+        </p:txBody>
+      </p:sp>
+    </p:spTree>
+    <p:extLst>
+      <p:ext uri="{BB962C8B-B14F-4D97-AF65-F5344CB8AC3E}">
+        <p14:creationId xmlns:p14="http://schemas.microsoft.com/office/powerpoint/2010/main" val="3365077152"/>
+      </p:ext>
+    </p:extLst>
+  </p:cSld>
+  <p:clrMapOvr>
+    <a:masterClrMapping/>
+  </p:clrMapOvr>
+</p:notes>
+</file>
+
+<file path=ppt/notesSlides/notesSlide28.xml><?xml version="1.0" encoding="utf-8"?>
+<p:notes xmlns:a="http://schemas.openxmlformats.org/drawingml/2006/main" xmlns:r="http://schemas.openxmlformats.org/officeDocument/2006/relationships" xmlns:p="http://schemas.openxmlformats.org/presentationml/2006/main">
+  <p:cSld>
+    <p:spTree>
+      <p:nvGrpSpPr>
+        <p:cNvPr id="1" name=""/>
+        <p:cNvGrpSpPr/>
+        <p:nvPr/>
+      </p:nvGrpSpPr>
+      <p:grpSpPr>
+        <a:xfrm>
+          <a:off x="0" y="0"/>
+          <a:ext cx="0" cy="0"/>
+          <a:chOff x="0" y="0"/>
+          <a:chExt cx="0" cy="0"/>
+        </a:xfrm>
+      </p:grpSpPr>
+      <p:sp>
+        <p:nvSpPr>
+          <p:cNvPr id="2" name="Symbol zastępczy obrazu slajdu 1"/>
+          <p:cNvSpPr>
+            <a:spLocks noGrp="1" noRot="1" noChangeAspect="1"/>
+          </p:cNvSpPr>
+          <p:nvPr>
+            <p:ph type="sldImg"/>
+          </p:nvPr>
+        </p:nvSpPr>
+        <p:spPr/>
+      </p:sp>
+      <p:sp>
+        <p:nvSpPr>
+          <p:cNvPr id="3" name="Symbol zastępczy notatek 2"/>
+          <p:cNvSpPr>
+            <a:spLocks noGrp="1"/>
+          </p:cNvSpPr>
+          <p:nvPr>
+            <p:ph type="body" idx="1"/>
+          </p:nvPr>
+        </p:nvSpPr>
+        <p:spPr/>
+        <p:txBody>
+          <a:bodyPr/>
+          <a:lstStyle/>
+          <a:p>
+            <a:pPr marL="0" indent="0">
+              <a:buFontTx/>
+              <a:buNone/>
+            </a:pPr>
+            <a:endParaRPr lang="pl-PL" sz="1200" b="0" i="0" kern="1200" dirty="0">
+              <a:solidFill>
+                <a:schemeClr val="tx1"/>
+              </a:solidFill>
+              <a:effectLst/>
+              <a:latin typeface="+mn-lt"/>
+              <a:ea typeface="+mn-ea"/>
+              <a:cs typeface="+mn-cs"/>
+            </a:endParaRPr>
+          </a:p>
+        </p:txBody>
+      </p:sp>
+      <p:sp>
+        <p:nvSpPr>
+          <p:cNvPr id="4" name="Symbol zastępczy numeru slajdu 3"/>
+          <p:cNvSpPr>
+            <a:spLocks noGrp="1"/>
+          </p:cNvSpPr>
+          <p:nvPr>
+            <p:ph type="sldNum" sz="quarter" idx="5"/>
+          </p:nvPr>
+        </p:nvSpPr>
+        <p:spPr/>
+        <p:txBody>
+          <a:bodyPr/>
+          <a:lstStyle/>
+          <a:p>
+            <a:fld id="{810A6612-7A23-4B98-B0E9-4F3C882AD2EF}" type="slidenum">
+              <a:rPr lang="pl-PL" smtClean="0"/>
+              <a:t>28</a:t>
+            </a:fld>
+            <a:endParaRPr lang="pl-PL"/>
+          </a:p>
+        </p:txBody>
+      </p:sp>
+    </p:spTree>
+    <p:extLst>
+      <p:ext uri="{BB962C8B-B14F-4D97-AF65-F5344CB8AC3E}">
+        <p14:creationId xmlns:p14="http://schemas.microsoft.com/office/powerpoint/2010/main" val="2873150729"/>
+      </p:ext>
+    </p:extLst>
+  </p:cSld>
+  <p:clrMapOvr>
+    <a:masterClrMapping/>
+  </p:clrMapOvr>
+</p:notes>
+</file>
+
+<file path=ppt/notesSlides/notesSlide29.xml><?xml version="1.0" encoding="utf-8"?>
+<p:notes xmlns:a="http://schemas.openxmlformats.org/drawingml/2006/main" xmlns:r="http://schemas.openxmlformats.org/officeDocument/2006/relationships" xmlns:p="http://schemas.openxmlformats.org/presentationml/2006/main">
+  <p:cSld>
+    <p:spTree>
+      <p:nvGrpSpPr>
+        <p:cNvPr id="1" name=""/>
+        <p:cNvGrpSpPr/>
+        <p:nvPr/>
+      </p:nvGrpSpPr>
+      <p:grpSpPr>
+        <a:xfrm>
+          <a:off x="0" y="0"/>
+          <a:ext cx="0" cy="0"/>
+          <a:chOff x="0" y="0"/>
+          <a:chExt cx="0" cy="0"/>
+        </a:xfrm>
+      </p:grpSpPr>
+      <p:sp>
+        <p:nvSpPr>
+          <p:cNvPr id="2" name="Symbol zastępczy obrazu slajdu 1"/>
+          <p:cNvSpPr>
+            <a:spLocks noGrp="1" noRot="1" noChangeAspect="1"/>
+          </p:cNvSpPr>
+          <p:nvPr>
+            <p:ph type="sldImg"/>
+          </p:nvPr>
+        </p:nvSpPr>
+        <p:spPr/>
+      </p:sp>
+      <p:sp>
+        <p:nvSpPr>
+          <p:cNvPr id="3" name="Symbol zastępczy notatek 2"/>
+          <p:cNvSpPr>
+            <a:spLocks noGrp="1"/>
+          </p:cNvSpPr>
+          <p:nvPr>
+            <p:ph type="body" idx="1"/>
+          </p:nvPr>
+        </p:nvSpPr>
+        <p:spPr/>
+        <p:txBody>
+          <a:bodyPr/>
+          <a:lstStyle/>
+          <a:p>
+            <a:pPr marL="0" indent="0">
+              <a:buFontTx/>
+              <a:buNone/>
+            </a:pPr>
+            <a:r>
+              <a:rPr lang="pl-PL" sz="1200" b="0" i="0" kern="1200" dirty="0">
+                <a:solidFill>
+                  <a:schemeClr val="tx1"/>
+                </a:solidFill>
+                <a:effectLst/>
+                <a:latin typeface="+mn-lt"/>
+                <a:ea typeface="+mn-ea"/>
+                <a:cs typeface="+mn-cs"/>
+              </a:rPr>
+              <a:t>- Zamiana klas na funkcje z możliwością zarządzania stanem</a:t>
+            </a:r>
+          </a:p>
+        </p:txBody>
+      </p:sp>
+      <p:sp>
+        <p:nvSpPr>
+          <p:cNvPr id="4" name="Symbol zastępczy numeru slajdu 3"/>
+          <p:cNvSpPr>
+            <a:spLocks noGrp="1"/>
+          </p:cNvSpPr>
+          <p:nvPr>
+            <p:ph type="sldNum" sz="quarter" idx="5"/>
+          </p:nvPr>
+        </p:nvSpPr>
+        <p:spPr/>
+        <p:txBody>
+          <a:bodyPr/>
+          <a:lstStyle/>
+          <a:p>
+            <a:fld id="{810A6612-7A23-4B98-B0E9-4F3C882AD2EF}" type="slidenum">
+              <a:rPr lang="pl-PL" smtClean="0"/>
+              <a:t>29</a:t>
+            </a:fld>
+            <a:endParaRPr lang="pl-PL"/>
+          </a:p>
+        </p:txBody>
+      </p:sp>
+    </p:spTree>
+    <p:extLst>
+      <p:ext uri="{BB962C8B-B14F-4D97-AF65-F5344CB8AC3E}">
+        <p14:creationId xmlns:p14="http://schemas.microsoft.com/office/powerpoint/2010/main" val="3886764673"/>
+      </p:ext>
+    </p:extLst>
+  </p:cSld>
+  <p:clrMapOvr>
+    <a:masterClrMapping/>
+  </p:clrMapOvr>
+</p:notes>
+</file>
+
 <file path=ppt/notesSlides/notesSlide3.xml><?xml version="1.0" encoding="utf-8"?>
 <p:notes xmlns:a="http://schemas.openxmlformats.org/drawingml/2006/main" xmlns:r="http://schemas.openxmlformats.org/officeDocument/2006/relationships" xmlns:p="http://schemas.openxmlformats.org/presentationml/2006/main">
   <p:cSld>
@@ -6371,7 +6846,7 @@
           <a:p>
             <a:fld id="{95CCC2EB-502C-49A7-9CC4-85002E026034}" type="datetimeFigureOut">
               <a:rPr lang="pl-PL" smtClean="0"/>
-              <a:t>05.10.2019</a:t>
+              <a:t>06.10.2019</a:t>
             </a:fld>
             <a:endParaRPr lang="pl-PL"/>
           </a:p>
@@ -6569,7 +7044,7 @@
           <a:p>
             <a:fld id="{95CCC2EB-502C-49A7-9CC4-85002E026034}" type="datetimeFigureOut">
               <a:rPr lang="pl-PL" smtClean="0"/>
-              <a:t>05.10.2019</a:t>
+              <a:t>06.10.2019</a:t>
             </a:fld>
             <a:endParaRPr lang="pl-PL"/>
           </a:p>
@@ -6777,7 +7252,7 @@
           <a:p>
             <a:fld id="{95CCC2EB-502C-49A7-9CC4-85002E026034}" type="datetimeFigureOut">
               <a:rPr lang="pl-PL" smtClean="0"/>
-              <a:t>05.10.2019</a:t>
+              <a:t>06.10.2019</a:t>
             </a:fld>
             <a:endParaRPr lang="pl-PL"/>
           </a:p>
@@ -6975,7 +7450,7 @@
           <a:p>
             <a:fld id="{95CCC2EB-502C-49A7-9CC4-85002E026034}" type="datetimeFigureOut">
               <a:rPr lang="pl-PL" smtClean="0"/>
-              <a:t>05.10.2019</a:t>
+              <a:t>06.10.2019</a:t>
             </a:fld>
             <a:endParaRPr lang="pl-PL"/>
           </a:p>
@@ -7250,7 +7725,7 @@
           <a:p>
             <a:fld id="{95CCC2EB-502C-49A7-9CC4-85002E026034}" type="datetimeFigureOut">
               <a:rPr lang="pl-PL" smtClean="0"/>
-              <a:t>05.10.2019</a:t>
+              <a:t>06.10.2019</a:t>
             </a:fld>
             <a:endParaRPr lang="pl-PL"/>
           </a:p>
@@ -7515,7 +7990,7 @@
           <a:p>
             <a:fld id="{95CCC2EB-502C-49A7-9CC4-85002E026034}" type="datetimeFigureOut">
               <a:rPr lang="pl-PL" smtClean="0"/>
-              <a:t>05.10.2019</a:t>
+              <a:t>06.10.2019</a:t>
             </a:fld>
             <a:endParaRPr lang="pl-PL"/>
           </a:p>
@@ -7927,7 +8402,7 @@
           <a:p>
             <a:fld id="{95CCC2EB-502C-49A7-9CC4-85002E026034}" type="datetimeFigureOut">
               <a:rPr lang="pl-PL" smtClean="0"/>
-              <a:t>05.10.2019</a:t>
+              <a:t>06.10.2019</a:t>
             </a:fld>
             <a:endParaRPr lang="pl-PL"/>
           </a:p>
@@ -8068,7 +8543,7 @@
           <a:p>
             <a:fld id="{95CCC2EB-502C-49A7-9CC4-85002E026034}" type="datetimeFigureOut">
               <a:rPr lang="pl-PL" smtClean="0"/>
-              <a:t>05.10.2019</a:t>
+              <a:t>06.10.2019</a:t>
             </a:fld>
             <a:endParaRPr lang="pl-PL"/>
           </a:p>
@@ -8181,7 +8656,7 @@
           <a:p>
             <a:fld id="{95CCC2EB-502C-49A7-9CC4-85002E026034}" type="datetimeFigureOut">
               <a:rPr lang="pl-PL" smtClean="0"/>
-              <a:t>05.10.2019</a:t>
+              <a:t>06.10.2019</a:t>
             </a:fld>
             <a:endParaRPr lang="pl-PL"/>
           </a:p>
@@ -8492,7 +8967,7 @@
           <a:p>
             <a:fld id="{95CCC2EB-502C-49A7-9CC4-85002E026034}" type="datetimeFigureOut">
               <a:rPr lang="pl-PL" smtClean="0"/>
-              <a:t>05.10.2019</a:t>
+              <a:t>06.10.2019</a:t>
             </a:fld>
             <a:endParaRPr lang="pl-PL"/>
           </a:p>
@@ -8780,7 +9255,7 @@
           <a:p>
             <a:fld id="{95CCC2EB-502C-49A7-9CC4-85002E026034}" type="datetimeFigureOut">
               <a:rPr lang="pl-PL" smtClean="0"/>
-              <a:t>05.10.2019</a:t>
+              <a:t>06.10.2019</a:t>
             </a:fld>
             <a:endParaRPr lang="pl-PL"/>
           </a:p>
@@ -9021,7 +9496,7 @@
           <a:p>
             <a:fld id="{95CCC2EB-502C-49A7-9CC4-85002E026034}" type="datetimeFigureOut">
               <a:rPr lang="pl-PL" smtClean="0"/>
-              <a:t>05.10.2019</a:t>
+              <a:t>06.10.2019</a:t>
             </a:fld>
             <a:endParaRPr lang="pl-PL"/>
           </a:p>
@@ -26327,6 +26802,1609 @@
     <p:extLst>
       <p:ext uri="{BB962C8B-B14F-4D97-AF65-F5344CB8AC3E}">
         <p14:creationId xmlns:p14="http://schemas.microsoft.com/office/powerpoint/2010/main" val="395038899"/>
+      </p:ext>
+    </p:extLst>
+  </p:cSld>
+  <p:clrMapOvr>
+    <a:masterClrMapping/>
+  </p:clrMapOvr>
+</p:sld>
+</file>
+
+<file path=ppt/slides/slide26.xml><?xml version="1.0" encoding="utf-8"?>
+<p:sld xmlns:a="http://schemas.openxmlformats.org/drawingml/2006/main" xmlns:r="http://schemas.openxmlformats.org/officeDocument/2006/relationships" xmlns:p="http://schemas.openxmlformats.org/presentationml/2006/main">
+  <p:cSld>
+    <p:spTree>
+      <p:nvGrpSpPr>
+        <p:cNvPr id="1" name=""/>
+        <p:cNvGrpSpPr/>
+        <p:nvPr/>
+      </p:nvGrpSpPr>
+      <p:grpSpPr>
+        <a:xfrm>
+          <a:off x="0" y="0"/>
+          <a:ext cx="0" cy="0"/>
+          <a:chOff x="0" y="0"/>
+          <a:chExt cx="0" cy="0"/>
+        </a:xfrm>
+      </p:grpSpPr>
+      <p:sp>
+        <p:nvSpPr>
+          <p:cNvPr id="4" name="pole tekstowe 3">
+            <a:extLst>
+              <a:ext uri="{FF2B5EF4-FFF2-40B4-BE49-F238E27FC236}">
+                <a16:creationId xmlns:a16="http://schemas.microsoft.com/office/drawing/2014/main" id="{F164A7B3-8808-414C-9401-3B25194E3B5A}"/>
+              </a:ext>
+            </a:extLst>
+          </p:cNvPr>
+          <p:cNvSpPr txBox="1"/>
+          <p:nvPr/>
+        </p:nvSpPr>
+        <p:spPr>
+          <a:xfrm>
+            <a:off x="497840" y="538480"/>
+            <a:ext cx="2102627" cy="369332"/>
+          </a:xfrm>
+          <a:prstGeom prst="rect">
+            <a:avLst/>
+          </a:prstGeom>
+          <a:noFill/>
+        </p:spPr>
+        <p:txBody>
+          <a:bodyPr wrap="none" rtlCol="0">
+            <a:spAutoFit/>
+          </a:bodyPr>
+          <a:lstStyle/>
+          <a:p>
+            <a:r>
+              <a:rPr lang="pl-PL" dirty="0" err="1"/>
+              <a:t>Redux</a:t>
+            </a:r>
+            <a:r>
+              <a:rPr lang="pl-PL" dirty="0"/>
+              <a:t> – </a:t>
+            </a:r>
+            <a:r>
+              <a:rPr lang="pl-PL" i="1" dirty="0" err="1"/>
+              <a:t>lazy</a:t>
+            </a:r>
+            <a:r>
+              <a:rPr lang="pl-PL" i="1" dirty="0"/>
+              <a:t> </a:t>
+            </a:r>
+            <a:r>
+              <a:rPr lang="pl-PL" i="1" dirty="0" err="1"/>
+              <a:t>loading</a:t>
+            </a:r>
+            <a:endParaRPr lang="pl-PL" dirty="0"/>
+          </a:p>
+        </p:txBody>
+      </p:sp>
+      <p:sp>
+        <p:nvSpPr>
+          <p:cNvPr id="3" name="Prostokąt 2">
+            <a:extLst>
+              <a:ext uri="{FF2B5EF4-FFF2-40B4-BE49-F238E27FC236}">
+                <a16:creationId xmlns:a16="http://schemas.microsoft.com/office/drawing/2014/main" id="{C21B87DB-2F85-4A8A-A7CD-C684EAC316E7}"/>
+              </a:ext>
+            </a:extLst>
+          </p:cNvPr>
+          <p:cNvSpPr/>
+          <p:nvPr/>
+        </p:nvSpPr>
+        <p:spPr>
+          <a:xfrm>
+            <a:off x="3048000" y="2284308"/>
+            <a:ext cx="6096000" cy="923330"/>
+          </a:xfrm>
+          <a:prstGeom prst="rect">
+            <a:avLst/>
+          </a:prstGeom>
+          <a:solidFill>
+            <a:schemeClr val="tx1"/>
+          </a:solidFill>
+        </p:spPr>
+        <p:txBody>
+          <a:bodyPr>
+            <a:spAutoFit/>
+          </a:bodyPr>
+          <a:lstStyle/>
+          <a:p>
+            <a:r>
+              <a:rPr lang="pl-PL" dirty="0">
+                <a:solidFill>
+                  <a:srgbClr val="569CD6"/>
+                </a:solidFill>
+                <a:latin typeface="Consolas" panose="020B0609020204030204" pitchFamily="49" charset="0"/>
+              </a:rPr>
+              <a:t>import</a:t>
+            </a:r>
+            <a:r>
+              <a:rPr lang="pl-PL" dirty="0">
+                <a:solidFill>
+                  <a:srgbClr val="D4D4D4"/>
+                </a:solidFill>
+                <a:latin typeface="Consolas" panose="020B0609020204030204" pitchFamily="49" charset="0"/>
+              </a:rPr>
+              <a:t>(</a:t>
+            </a:r>
+            <a:r>
+              <a:rPr lang="pl-PL" dirty="0">
+                <a:solidFill>
+                  <a:srgbClr val="CE9178"/>
+                </a:solidFill>
+                <a:latin typeface="Consolas" panose="020B0609020204030204" pitchFamily="49" charset="0"/>
+              </a:rPr>
+              <a:t>"./</a:t>
+            </a:r>
+            <a:r>
+              <a:rPr lang="pl-PL" dirty="0" err="1">
+                <a:solidFill>
+                  <a:srgbClr val="CE9178"/>
+                </a:solidFill>
+                <a:latin typeface="Consolas" panose="020B0609020204030204" pitchFamily="49" charset="0"/>
+              </a:rPr>
+              <a:t>math</a:t>
+            </a:r>
+            <a:r>
+              <a:rPr lang="pl-PL" dirty="0">
+                <a:solidFill>
+                  <a:srgbClr val="CE9178"/>
+                </a:solidFill>
+                <a:latin typeface="Consolas" panose="020B0609020204030204" pitchFamily="49" charset="0"/>
+              </a:rPr>
+              <a:t>"</a:t>
+            </a:r>
+            <a:r>
+              <a:rPr lang="pl-PL" dirty="0">
+                <a:solidFill>
+                  <a:srgbClr val="D4D4D4"/>
+                </a:solidFill>
+                <a:latin typeface="Consolas" panose="020B0609020204030204" pitchFamily="49" charset="0"/>
+              </a:rPr>
+              <a:t>).</a:t>
+            </a:r>
+            <a:r>
+              <a:rPr lang="pl-PL" dirty="0" err="1">
+                <a:solidFill>
+                  <a:srgbClr val="DCDCAA"/>
+                </a:solidFill>
+                <a:latin typeface="Consolas" panose="020B0609020204030204" pitchFamily="49" charset="0"/>
+              </a:rPr>
+              <a:t>then</a:t>
+            </a:r>
+            <a:r>
+              <a:rPr lang="pl-PL" dirty="0">
+                <a:solidFill>
+                  <a:srgbClr val="D4D4D4"/>
+                </a:solidFill>
+                <a:latin typeface="Consolas" panose="020B0609020204030204" pitchFamily="49" charset="0"/>
+              </a:rPr>
+              <a:t>(</a:t>
+            </a:r>
+            <a:r>
+              <a:rPr lang="pl-PL" dirty="0" err="1">
+                <a:solidFill>
+                  <a:srgbClr val="9CDCFE"/>
+                </a:solidFill>
+                <a:latin typeface="Consolas" panose="020B0609020204030204" pitchFamily="49" charset="0"/>
+              </a:rPr>
+              <a:t>math</a:t>
+            </a:r>
+            <a:r>
+              <a:rPr lang="pl-PL" dirty="0">
+                <a:solidFill>
+                  <a:srgbClr val="D4D4D4"/>
+                </a:solidFill>
+                <a:latin typeface="Consolas" panose="020B0609020204030204" pitchFamily="49" charset="0"/>
+              </a:rPr>
+              <a:t> </a:t>
+            </a:r>
+            <a:r>
+              <a:rPr lang="pl-PL" dirty="0">
+                <a:solidFill>
+                  <a:srgbClr val="569CD6"/>
+                </a:solidFill>
+                <a:latin typeface="Consolas" panose="020B0609020204030204" pitchFamily="49" charset="0"/>
+              </a:rPr>
+              <a:t>=&gt;</a:t>
+            </a:r>
+            <a:r>
+              <a:rPr lang="pl-PL" dirty="0">
+                <a:solidFill>
+                  <a:srgbClr val="D4D4D4"/>
+                </a:solidFill>
+                <a:latin typeface="Consolas" panose="020B0609020204030204" pitchFamily="49" charset="0"/>
+              </a:rPr>
+              <a:t> {</a:t>
+            </a:r>
+          </a:p>
+          <a:p>
+            <a:r>
+              <a:rPr lang="pl-PL" dirty="0">
+                <a:solidFill>
+                  <a:srgbClr val="D4D4D4"/>
+                </a:solidFill>
+                <a:latin typeface="Consolas" panose="020B0609020204030204" pitchFamily="49" charset="0"/>
+              </a:rPr>
+              <a:t>    </a:t>
+            </a:r>
+            <a:r>
+              <a:rPr lang="pl-PL" dirty="0">
+                <a:solidFill>
+                  <a:srgbClr val="4EC9B0"/>
+                </a:solidFill>
+                <a:latin typeface="Consolas" panose="020B0609020204030204" pitchFamily="49" charset="0"/>
+              </a:rPr>
+              <a:t>console</a:t>
+            </a:r>
+            <a:r>
+              <a:rPr lang="pl-PL" dirty="0">
+                <a:solidFill>
+                  <a:srgbClr val="D4D4D4"/>
+                </a:solidFill>
+                <a:latin typeface="Consolas" panose="020B0609020204030204" pitchFamily="49" charset="0"/>
+              </a:rPr>
+              <a:t>.</a:t>
+            </a:r>
+            <a:r>
+              <a:rPr lang="pl-PL" dirty="0">
+                <a:solidFill>
+                  <a:srgbClr val="DCDCAA"/>
+                </a:solidFill>
+                <a:latin typeface="Consolas" panose="020B0609020204030204" pitchFamily="49" charset="0"/>
+              </a:rPr>
+              <a:t>log</a:t>
+            </a:r>
+            <a:r>
+              <a:rPr lang="pl-PL" dirty="0">
+                <a:solidFill>
+                  <a:srgbClr val="D4D4D4"/>
+                </a:solidFill>
+                <a:latin typeface="Consolas" panose="020B0609020204030204" pitchFamily="49" charset="0"/>
+              </a:rPr>
+              <a:t>(</a:t>
+            </a:r>
+            <a:r>
+              <a:rPr lang="pl-PL" dirty="0" err="1">
+                <a:solidFill>
+                  <a:srgbClr val="9CDCFE"/>
+                </a:solidFill>
+                <a:latin typeface="Consolas" panose="020B0609020204030204" pitchFamily="49" charset="0"/>
+              </a:rPr>
+              <a:t>math</a:t>
+            </a:r>
+            <a:r>
+              <a:rPr lang="pl-PL" dirty="0" err="1">
+                <a:solidFill>
+                  <a:srgbClr val="D4D4D4"/>
+                </a:solidFill>
+                <a:latin typeface="Consolas" panose="020B0609020204030204" pitchFamily="49" charset="0"/>
+              </a:rPr>
+              <a:t>.</a:t>
+            </a:r>
+            <a:r>
+              <a:rPr lang="pl-PL" dirty="0" err="1">
+                <a:solidFill>
+                  <a:srgbClr val="DCDCAA"/>
+                </a:solidFill>
+                <a:latin typeface="Consolas" panose="020B0609020204030204" pitchFamily="49" charset="0"/>
+              </a:rPr>
+              <a:t>add</a:t>
+            </a:r>
+            <a:r>
+              <a:rPr lang="pl-PL" dirty="0">
+                <a:solidFill>
+                  <a:srgbClr val="D4D4D4"/>
+                </a:solidFill>
+                <a:latin typeface="Consolas" panose="020B0609020204030204" pitchFamily="49" charset="0"/>
+              </a:rPr>
+              <a:t>(</a:t>
+            </a:r>
+            <a:r>
+              <a:rPr lang="pl-PL" dirty="0">
+                <a:solidFill>
+                  <a:srgbClr val="B5CEA8"/>
+                </a:solidFill>
+                <a:latin typeface="Consolas" panose="020B0609020204030204" pitchFamily="49" charset="0"/>
+              </a:rPr>
+              <a:t>16</a:t>
+            </a:r>
+            <a:r>
+              <a:rPr lang="pl-PL" dirty="0">
+                <a:solidFill>
+                  <a:srgbClr val="D4D4D4"/>
+                </a:solidFill>
+                <a:latin typeface="Consolas" panose="020B0609020204030204" pitchFamily="49" charset="0"/>
+              </a:rPr>
+              <a:t>, </a:t>
+            </a:r>
+            <a:r>
+              <a:rPr lang="pl-PL" dirty="0">
+                <a:solidFill>
+                  <a:srgbClr val="B5CEA8"/>
+                </a:solidFill>
+                <a:latin typeface="Consolas" panose="020B0609020204030204" pitchFamily="49" charset="0"/>
+              </a:rPr>
+              <a:t>26</a:t>
+            </a:r>
+            <a:r>
+              <a:rPr lang="pl-PL" dirty="0">
+                <a:solidFill>
+                  <a:srgbClr val="D4D4D4"/>
+                </a:solidFill>
+                <a:latin typeface="Consolas" panose="020B0609020204030204" pitchFamily="49" charset="0"/>
+              </a:rPr>
+              <a:t>));</a:t>
+            </a:r>
+          </a:p>
+          <a:p>
+            <a:r>
+              <a:rPr lang="pl-PL" dirty="0">
+                <a:solidFill>
+                  <a:srgbClr val="D4D4D4"/>
+                </a:solidFill>
+                <a:latin typeface="Consolas" panose="020B0609020204030204" pitchFamily="49" charset="0"/>
+              </a:rPr>
+              <a:t>});</a:t>
+            </a:r>
+            <a:endParaRPr lang="pl-PL" b="0" dirty="0">
+              <a:solidFill>
+                <a:srgbClr val="D4D4D4"/>
+              </a:solidFill>
+              <a:effectLst/>
+              <a:latin typeface="Consolas" panose="020B0609020204030204" pitchFamily="49" charset="0"/>
+            </a:endParaRPr>
+          </a:p>
+        </p:txBody>
+      </p:sp>
+      <p:sp>
+        <p:nvSpPr>
+          <p:cNvPr id="5" name="Prostokąt 4">
+            <a:extLst>
+              <a:ext uri="{FF2B5EF4-FFF2-40B4-BE49-F238E27FC236}">
+                <a16:creationId xmlns:a16="http://schemas.microsoft.com/office/drawing/2014/main" id="{3B87306A-A2F0-401F-895E-C7BC7395EC2D}"/>
+              </a:ext>
+            </a:extLst>
+          </p:cNvPr>
+          <p:cNvSpPr/>
+          <p:nvPr/>
+        </p:nvSpPr>
+        <p:spPr>
+          <a:xfrm>
+            <a:off x="3015841" y="1248788"/>
+            <a:ext cx="6096000" cy="646331"/>
+          </a:xfrm>
+          <a:prstGeom prst="rect">
+            <a:avLst/>
+          </a:prstGeom>
+          <a:solidFill>
+            <a:schemeClr val="tx1"/>
+          </a:solidFill>
+        </p:spPr>
+        <p:txBody>
+          <a:bodyPr>
+            <a:spAutoFit/>
+          </a:bodyPr>
+          <a:lstStyle/>
+          <a:p>
+            <a:r>
+              <a:rPr lang="pl-PL" dirty="0">
+                <a:solidFill>
+                  <a:srgbClr val="C586C0"/>
+                </a:solidFill>
+                <a:latin typeface="Consolas" panose="020B0609020204030204" pitchFamily="49" charset="0"/>
+              </a:rPr>
+              <a:t>import</a:t>
+            </a:r>
+            <a:r>
+              <a:rPr lang="pl-PL" dirty="0">
+                <a:solidFill>
+                  <a:srgbClr val="D4D4D4"/>
+                </a:solidFill>
+                <a:latin typeface="Consolas" panose="020B0609020204030204" pitchFamily="49" charset="0"/>
+              </a:rPr>
+              <a:t> { </a:t>
+            </a:r>
+            <a:r>
+              <a:rPr lang="pl-PL" dirty="0" err="1">
+                <a:solidFill>
+                  <a:srgbClr val="9CDCFE"/>
+                </a:solidFill>
+                <a:latin typeface="Consolas" panose="020B0609020204030204" pitchFamily="49" charset="0"/>
+              </a:rPr>
+              <a:t>add</a:t>
+            </a:r>
+            <a:r>
+              <a:rPr lang="pl-PL" dirty="0">
+                <a:solidFill>
+                  <a:srgbClr val="D4D4D4"/>
+                </a:solidFill>
+                <a:latin typeface="Consolas" panose="020B0609020204030204" pitchFamily="49" charset="0"/>
+              </a:rPr>
+              <a:t> } </a:t>
+            </a:r>
+            <a:r>
+              <a:rPr lang="pl-PL" dirty="0">
+                <a:solidFill>
+                  <a:srgbClr val="C586C0"/>
+                </a:solidFill>
+                <a:latin typeface="Consolas" panose="020B0609020204030204" pitchFamily="49" charset="0"/>
+              </a:rPr>
+              <a:t>from</a:t>
+            </a:r>
+            <a:r>
+              <a:rPr lang="pl-PL" dirty="0">
+                <a:solidFill>
+                  <a:srgbClr val="D4D4D4"/>
+                </a:solidFill>
+                <a:latin typeface="Consolas" panose="020B0609020204030204" pitchFamily="49" charset="0"/>
+              </a:rPr>
+              <a:t> </a:t>
+            </a:r>
+            <a:r>
+              <a:rPr lang="pl-PL" dirty="0">
+                <a:solidFill>
+                  <a:srgbClr val="CE9178"/>
+                </a:solidFill>
+                <a:latin typeface="Consolas" panose="020B0609020204030204" pitchFamily="49" charset="0"/>
+              </a:rPr>
+              <a:t>'./</a:t>
+            </a:r>
+            <a:r>
+              <a:rPr lang="pl-PL" dirty="0" err="1">
+                <a:solidFill>
+                  <a:srgbClr val="CE9178"/>
+                </a:solidFill>
+                <a:latin typeface="Consolas" panose="020B0609020204030204" pitchFamily="49" charset="0"/>
+              </a:rPr>
+              <a:t>math</a:t>
+            </a:r>
+            <a:r>
+              <a:rPr lang="pl-PL" dirty="0">
+                <a:solidFill>
+                  <a:srgbClr val="CE9178"/>
+                </a:solidFill>
+                <a:latin typeface="Consolas" panose="020B0609020204030204" pitchFamily="49" charset="0"/>
+              </a:rPr>
+              <a:t>'</a:t>
+            </a:r>
+            <a:r>
+              <a:rPr lang="pl-PL" dirty="0">
+                <a:solidFill>
+                  <a:srgbClr val="D4D4D4"/>
+                </a:solidFill>
+                <a:latin typeface="Consolas" panose="020B0609020204030204" pitchFamily="49" charset="0"/>
+              </a:rPr>
+              <a:t>;</a:t>
+            </a:r>
+          </a:p>
+          <a:p>
+            <a:r>
+              <a:rPr lang="pl-PL" dirty="0">
+                <a:solidFill>
+                  <a:srgbClr val="4EC9B0"/>
+                </a:solidFill>
+                <a:latin typeface="Consolas" panose="020B0609020204030204" pitchFamily="49" charset="0"/>
+              </a:rPr>
+              <a:t>console</a:t>
+            </a:r>
+            <a:r>
+              <a:rPr lang="pl-PL" dirty="0">
+                <a:solidFill>
+                  <a:srgbClr val="D4D4D4"/>
+                </a:solidFill>
+                <a:latin typeface="Consolas" panose="020B0609020204030204" pitchFamily="49" charset="0"/>
+              </a:rPr>
+              <a:t>.</a:t>
+            </a:r>
+            <a:r>
+              <a:rPr lang="pl-PL" dirty="0">
+                <a:solidFill>
+                  <a:srgbClr val="DCDCAA"/>
+                </a:solidFill>
+                <a:latin typeface="Consolas" panose="020B0609020204030204" pitchFamily="49" charset="0"/>
+              </a:rPr>
+              <a:t>log</a:t>
+            </a:r>
+            <a:r>
+              <a:rPr lang="pl-PL" dirty="0">
+                <a:solidFill>
+                  <a:srgbClr val="D4D4D4"/>
+                </a:solidFill>
+                <a:latin typeface="Consolas" panose="020B0609020204030204" pitchFamily="49" charset="0"/>
+              </a:rPr>
+              <a:t>(</a:t>
+            </a:r>
+            <a:r>
+              <a:rPr lang="pl-PL" dirty="0" err="1">
+                <a:solidFill>
+                  <a:srgbClr val="DCDCAA"/>
+                </a:solidFill>
+                <a:latin typeface="Consolas" panose="020B0609020204030204" pitchFamily="49" charset="0"/>
+              </a:rPr>
+              <a:t>add</a:t>
+            </a:r>
+            <a:r>
+              <a:rPr lang="pl-PL" dirty="0">
+                <a:solidFill>
+                  <a:srgbClr val="D4D4D4"/>
+                </a:solidFill>
+                <a:latin typeface="Consolas" panose="020B0609020204030204" pitchFamily="49" charset="0"/>
+              </a:rPr>
+              <a:t>(</a:t>
+            </a:r>
+            <a:r>
+              <a:rPr lang="pl-PL" dirty="0">
+                <a:solidFill>
+                  <a:srgbClr val="B5CEA8"/>
+                </a:solidFill>
+                <a:latin typeface="Consolas" panose="020B0609020204030204" pitchFamily="49" charset="0"/>
+              </a:rPr>
+              <a:t>16</a:t>
+            </a:r>
+            <a:r>
+              <a:rPr lang="pl-PL" dirty="0">
+                <a:solidFill>
+                  <a:srgbClr val="D4D4D4"/>
+                </a:solidFill>
+                <a:latin typeface="Consolas" panose="020B0609020204030204" pitchFamily="49" charset="0"/>
+              </a:rPr>
+              <a:t>, </a:t>
+            </a:r>
+            <a:r>
+              <a:rPr lang="pl-PL" dirty="0">
+                <a:solidFill>
+                  <a:srgbClr val="B5CEA8"/>
+                </a:solidFill>
+                <a:latin typeface="Consolas" panose="020B0609020204030204" pitchFamily="49" charset="0"/>
+              </a:rPr>
+              <a:t>26</a:t>
+            </a:r>
+            <a:r>
+              <a:rPr lang="pl-PL" dirty="0">
+                <a:solidFill>
+                  <a:srgbClr val="D4D4D4"/>
+                </a:solidFill>
+                <a:latin typeface="Consolas" panose="020B0609020204030204" pitchFamily="49" charset="0"/>
+              </a:rPr>
+              <a:t>));</a:t>
+            </a:r>
+            <a:endParaRPr lang="pl-PL" b="0" dirty="0">
+              <a:solidFill>
+                <a:srgbClr val="D4D4D4"/>
+              </a:solidFill>
+              <a:effectLst/>
+              <a:latin typeface="Consolas" panose="020B0609020204030204" pitchFamily="49" charset="0"/>
+            </a:endParaRPr>
+          </a:p>
+        </p:txBody>
+      </p:sp>
+      <p:sp>
+        <p:nvSpPr>
+          <p:cNvPr id="8" name="Prostokąt 7">
+            <a:extLst>
+              <a:ext uri="{FF2B5EF4-FFF2-40B4-BE49-F238E27FC236}">
+                <a16:creationId xmlns:a16="http://schemas.microsoft.com/office/drawing/2014/main" id="{FF56C460-0ABE-41E7-85A8-25CD3C346872}"/>
+              </a:ext>
+            </a:extLst>
+          </p:cNvPr>
+          <p:cNvSpPr/>
+          <p:nvPr/>
+        </p:nvSpPr>
+        <p:spPr>
+          <a:xfrm>
+            <a:off x="1041647" y="3596827"/>
+            <a:ext cx="8839200" cy="369332"/>
+          </a:xfrm>
+          <a:prstGeom prst="rect">
+            <a:avLst/>
+          </a:prstGeom>
+          <a:solidFill>
+            <a:schemeClr val="tx1"/>
+          </a:solidFill>
+        </p:spPr>
+        <p:txBody>
+          <a:bodyPr wrap="square">
+            <a:spAutoFit/>
+          </a:bodyPr>
+          <a:lstStyle/>
+          <a:p>
+            <a:r>
+              <a:rPr lang="en-US" dirty="0">
+                <a:solidFill>
+                  <a:srgbClr val="569CD6"/>
+                </a:solidFill>
+                <a:latin typeface="Consolas" panose="020B0609020204030204" pitchFamily="49" charset="0"/>
+              </a:rPr>
+              <a:t>const</a:t>
+            </a:r>
+            <a:r>
+              <a:rPr lang="en-US" dirty="0">
+                <a:solidFill>
+                  <a:srgbClr val="D4D4D4"/>
+                </a:solidFill>
+                <a:latin typeface="Consolas" panose="020B0609020204030204" pitchFamily="49" charset="0"/>
+              </a:rPr>
+              <a:t> </a:t>
+            </a:r>
+            <a:r>
+              <a:rPr lang="en-US" dirty="0" err="1">
+                <a:solidFill>
+                  <a:srgbClr val="9CDCFE"/>
+                </a:solidFill>
+                <a:latin typeface="Consolas" panose="020B0609020204030204" pitchFamily="49" charset="0"/>
+              </a:rPr>
+              <a:t>OtherComponent</a:t>
+            </a:r>
+            <a:r>
+              <a:rPr lang="en-US" dirty="0">
+                <a:solidFill>
+                  <a:srgbClr val="D4D4D4"/>
+                </a:solidFill>
+                <a:latin typeface="Consolas" panose="020B0609020204030204" pitchFamily="49" charset="0"/>
+              </a:rPr>
+              <a:t> = </a:t>
+            </a:r>
+            <a:r>
+              <a:rPr lang="en-US" dirty="0" err="1">
+                <a:solidFill>
+                  <a:srgbClr val="9CDCFE"/>
+                </a:solidFill>
+                <a:latin typeface="Consolas" panose="020B0609020204030204" pitchFamily="49" charset="0"/>
+              </a:rPr>
+              <a:t>React</a:t>
+            </a:r>
+            <a:r>
+              <a:rPr lang="en-US" dirty="0" err="1">
+                <a:solidFill>
+                  <a:srgbClr val="D4D4D4"/>
+                </a:solidFill>
+                <a:latin typeface="Consolas" panose="020B0609020204030204" pitchFamily="49" charset="0"/>
+              </a:rPr>
+              <a:t>.</a:t>
+            </a:r>
+            <a:r>
+              <a:rPr lang="en-US" dirty="0" err="1">
+                <a:solidFill>
+                  <a:srgbClr val="DCDCAA"/>
+                </a:solidFill>
+                <a:latin typeface="Consolas" panose="020B0609020204030204" pitchFamily="49" charset="0"/>
+              </a:rPr>
+              <a:t>lazy</a:t>
+            </a:r>
+            <a:r>
+              <a:rPr lang="en-US" dirty="0">
+                <a:solidFill>
+                  <a:srgbClr val="D4D4D4"/>
+                </a:solidFill>
+                <a:latin typeface="Consolas" panose="020B0609020204030204" pitchFamily="49" charset="0"/>
+              </a:rPr>
+              <a:t>(() </a:t>
+            </a:r>
+            <a:r>
+              <a:rPr lang="en-US" dirty="0">
+                <a:solidFill>
+                  <a:srgbClr val="569CD6"/>
+                </a:solidFill>
+                <a:latin typeface="Consolas" panose="020B0609020204030204" pitchFamily="49" charset="0"/>
+              </a:rPr>
+              <a:t>=&gt;</a:t>
+            </a:r>
+            <a:r>
+              <a:rPr lang="en-US" dirty="0">
+                <a:solidFill>
+                  <a:srgbClr val="D4D4D4"/>
+                </a:solidFill>
+                <a:latin typeface="Consolas" panose="020B0609020204030204" pitchFamily="49" charset="0"/>
+              </a:rPr>
+              <a:t> </a:t>
+            </a:r>
+            <a:r>
+              <a:rPr lang="en-US" dirty="0">
+                <a:solidFill>
+                  <a:srgbClr val="569CD6"/>
+                </a:solidFill>
+                <a:latin typeface="Consolas" panose="020B0609020204030204" pitchFamily="49" charset="0"/>
+              </a:rPr>
+              <a:t>import</a:t>
+            </a:r>
+            <a:r>
+              <a:rPr lang="en-US" dirty="0">
+                <a:solidFill>
+                  <a:srgbClr val="D4D4D4"/>
+                </a:solidFill>
+                <a:latin typeface="Consolas" panose="020B0609020204030204" pitchFamily="49" charset="0"/>
+              </a:rPr>
+              <a:t>(</a:t>
+            </a:r>
+            <a:r>
+              <a:rPr lang="en-US" dirty="0">
+                <a:solidFill>
+                  <a:srgbClr val="CE9178"/>
+                </a:solidFill>
+                <a:latin typeface="Consolas" panose="020B0609020204030204" pitchFamily="49" charset="0"/>
+              </a:rPr>
+              <a:t>'./</a:t>
+            </a:r>
+            <a:r>
+              <a:rPr lang="en-US" dirty="0" err="1">
+                <a:solidFill>
+                  <a:srgbClr val="CE9178"/>
+                </a:solidFill>
+                <a:latin typeface="Consolas" panose="020B0609020204030204" pitchFamily="49" charset="0"/>
+              </a:rPr>
+              <a:t>OtherComponent</a:t>
+            </a:r>
+            <a:r>
+              <a:rPr lang="en-US" dirty="0">
+                <a:solidFill>
+                  <a:srgbClr val="CE9178"/>
+                </a:solidFill>
+                <a:latin typeface="Consolas" panose="020B0609020204030204" pitchFamily="49" charset="0"/>
+              </a:rPr>
+              <a:t>'</a:t>
+            </a:r>
+            <a:r>
+              <a:rPr lang="en-US" dirty="0">
+                <a:solidFill>
+                  <a:srgbClr val="D4D4D4"/>
+                </a:solidFill>
+                <a:latin typeface="Consolas" panose="020B0609020204030204" pitchFamily="49" charset="0"/>
+              </a:rPr>
+              <a:t>));</a:t>
+            </a:r>
+            <a:endParaRPr lang="en-US" b="0" dirty="0">
+              <a:solidFill>
+                <a:srgbClr val="D4D4D4"/>
+              </a:solidFill>
+              <a:effectLst/>
+              <a:latin typeface="Consolas" panose="020B0609020204030204" pitchFamily="49" charset="0"/>
+            </a:endParaRPr>
+          </a:p>
+        </p:txBody>
+      </p:sp>
+      <p:sp>
+        <p:nvSpPr>
+          <p:cNvPr id="9" name="pole tekstowe 8">
+            <a:extLst>
+              <a:ext uri="{FF2B5EF4-FFF2-40B4-BE49-F238E27FC236}">
+                <a16:creationId xmlns:a16="http://schemas.microsoft.com/office/drawing/2014/main" id="{A594E28A-F2E6-4AB1-86CB-659BE8178BE3}"/>
+              </a:ext>
+            </a:extLst>
+          </p:cNvPr>
+          <p:cNvSpPr txBox="1"/>
+          <p:nvPr/>
+        </p:nvSpPr>
+        <p:spPr>
+          <a:xfrm>
+            <a:off x="3015841" y="879456"/>
+            <a:ext cx="1574470" cy="369332"/>
+          </a:xfrm>
+          <a:prstGeom prst="rect">
+            <a:avLst/>
+          </a:prstGeom>
+          <a:noFill/>
+        </p:spPr>
+        <p:txBody>
+          <a:bodyPr wrap="none" rtlCol="0">
+            <a:spAutoFit/>
+          </a:bodyPr>
+          <a:lstStyle/>
+          <a:p>
+            <a:r>
+              <a:rPr lang="pl-PL" dirty="0" err="1"/>
+              <a:t>Normal</a:t>
+            </a:r>
+            <a:r>
+              <a:rPr lang="pl-PL" dirty="0"/>
+              <a:t> import</a:t>
+            </a:r>
+          </a:p>
+        </p:txBody>
+      </p:sp>
+      <p:sp>
+        <p:nvSpPr>
+          <p:cNvPr id="10" name="pole tekstowe 9">
+            <a:extLst>
+              <a:ext uri="{FF2B5EF4-FFF2-40B4-BE49-F238E27FC236}">
+                <a16:creationId xmlns:a16="http://schemas.microsoft.com/office/drawing/2014/main" id="{9938AA82-9F41-47A6-A120-CE17AB055A5E}"/>
+              </a:ext>
+            </a:extLst>
+          </p:cNvPr>
+          <p:cNvSpPr txBox="1"/>
+          <p:nvPr/>
+        </p:nvSpPr>
+        <p:spPr>
+          <a:xfrm>
+            <a:off x="3048000" y="1941194"/>
+            <a:ext cx="1277466" cy="369332"/>
+          </a:xfrm>
+          <a:prstGeom prst="rect">
+            <a:avLst/>
+          </a:prstGeom>
+          <a:noFill/>
+        </p:spPr>
+        <p:txBody>
+          <a:bodyPr wrap="none" rtlCol="0">
+            <a:spAutoFit/>
+          </a:bodyPr>
+          <a:lstStyle/>
+          <a:p>
+            <a:r>
+              <a:rPr lang="pl-PL" dirty="0" err="1"/>
+              <a:t>Lazy</a:t>
+            </a:r>
+            <a:r>
+              <a:rPr lang="pl-PL" dirty="0"/>
+              <a:t> import</a:t>
+            </a:r>
+          </a:p>
+        </p:txBody>
+      </p:sp>
+      <p:sp>
+        <p:nvSpPr>
+          <p:cNvPr id="11" name="pole tekstowe 10">
+            <a:extLst>
+              <a:ext uri="{FF2B5EF4-FFF2-40B4-BE49-F238E27FC236}">
+                <a16:creationId xmlns:a16="http://schemas.microsoft.com/office/drawing/2014/main" id="{005DB816-D9E1-4EFF-8FB0-22BCC0707EFC}"/>
+              </a:ext>
+            </a:extLst>
+          </p:cNvPr>
+          <p:cNvSpPr txBox="1"/>
+          <p:nvPr/>
+        </p:nvSpPr>
+        <p:spPr>
+          <a:xfrm>
+            <a:off x="925114" y="3213362"/>
+            <a:ext cx="3625480" cy="369332"/>
+          </a:xfrm>
+          <a:prstGeom prst="rect">
+            <a:avLst/>
+          </a:prstGeom>
+          <a:noFill/>
+        </p:spPr>
+        <p:txBody>
+          <a:bodyPr wrap="none" rtlCol="0">
+            <a:spAutoFit/>
+          </a:bodyPr>
+          <a:lstStyle/>
+          <a:p>
+            <a:r>
+              <a:rPr lang="pl-PL" dirty="0"/>
+              <a:t>Import component </a:t>
+            </a:r>
+            <a:r>
+              <a:rPr lang="pl-PL" dirty="0" err="1"/>
+              <a:t>when</a:t>
+            </a:r>
+            <a:r>
+              <a:rPr lang="pl-PL" dirty="0"/>
+              <a:t> </a:t>
+            </a:r>
+            <a:r>
+              <a:rPr lang="pl-PL" dirty="0" err="1"/>
+              <a:t>it's</a:t>
+            </a:r>
+            <a:r>
+              <a:rPr lang="pl-PL" dirty="0"/>
+              <a:t> </a:t>
+            </a:r>
+            <a:r>
+              <a:rPr lang="pl-PL" dirty="0" err="1"/>
+              <a:t>needed</a:t>
+            </a:r>
+            <a:endParaRPr lang="pl-PL" dirty="0"/>
+          </a:p>
+        </p:txBody>
+      </p:sp>
+      <p:sp>
+        <p:nvSpPr>
+          <p:cNvPr id="12" name="Prostokąt 11">
+            <a:extLst>
+              <a:ext uri="{FF2B5EF4-FFF2-40B4-BE49-F238E27FC236}">
+                <a16:creationId xmlns:a16="http://schemas.microsoft.com/office/drawing/2014/main" id="{43E09D28-C513-4110-909D-60FE8F151A53}"/>
+              </a:ext>
+            </a:extLst>
+          </p:cNvPr>
+          <p:cNvSpPr/>
+          <p:nvPr/>
+        </p:nvSpPr>
+        <p:spPr>
+          <a:xfrm>
+            <a:off x="925114" y="4355348"/>
+            <a:ext cx="6096000" cy="923330"/>
+          </a:xfrm>
+          <a:prstGeom prst="rect">
+            <a:avLst/>
+          </a:prstGeom>
+          <a:solidFill>
+            <a:schemeClr val="tx1"/>
+          </a:solidFill>
+        </p:spPr>
+        <p:txBody>
+          <a:bodyPr>
+            <a:spAutoFit/>
+          </a:bodyPr>
+          <a:lstStyle/>
+          <a:p>
+            <a:r>
+              <a:rPr lang="pl-PL" dirty="0">
+                <a:solidFill>
+                  <a:srgbClr val="808080"/>
+                </a:solidFill>
+                <a:latin typeface="Consolas" panose="020B0609020204030204" pitchFamily="49" charset="0"/>
+              </a:rPr>
+              <a:t>&lt;</a:t>
+            </a:r>
+            <a:r>
+              <a:rPr lang="pl-PL" dirty="0" err="1">
+                <a:solidFill>
+                  <a:srgbClr val="4EC9B0"/>
+                </a:solidFill>
+                <a:latin typeface="Consolas" panose="020B0609020204030204" pitchFamily="49" charset="0"/>
+              </a:rPr>
+              <a:t>Suspense</a:t>
+            </a:r>
+            <a:r>
+              <a:rPr lang="pl-PL" dirty="0">
+                <a:solidFill>
+                  <a:srgbClr val="D4D4D4"/>
+                </a:solidFill>
+                <a:latin typeface="Consolas" panose="020B0609020204030204" pitchFamily="49" charset="0"/>
+              </a:rPr>
+              <a:t> </a:t>
+            </a:r>
+            <a:r>
+              <a:rPr lang="pl-PL" dirty="0" err="1">
+                <a:solidFill>
+                  <a:srgbClr val="9CDCFE"/>
+                </a:solidFill>
+                <a:latin typeface="Consolas" panose="020B0609020204030204" pitchFamily="49" charset="0"/>
+              </a:rPr>
+              <a:t>fallback</a:t>
+            </a:r>
+            <a:r>
+              <a:rPr lang="pl-PL" dirty="0">
+                <a:solidFill>
+                  <a:srgbClr val="D4D4D4"/>
+                </a:solidFill>
+                <a:latin typeface="Consolas" panose="020B0609020204030204" pitchFamily="49" charset="0"/>
+              </a:rPr>
+              <a:t>=</a:t>
+            </a:r>
+            <a:r>
+              <a:rPr lang="pl-PL" dirty="0">
+                <a:solidFill>
+                  <a:srgbClr val="569CD6"/>
+                </a:solidFill>
+                <a:latin typeface="Consolas" panose="020B0609020204030204" pitchFamily="49" charset="0"/>
+              </a:rPr>
+              <a:t>{</a:t>
+            </a:r>
+            <a:r>
+              <a:rPr lang="pl-PL" dirty="0">
+                <a:solidFill>
+                  <a:srgbClr val="808080"/>
+                </a:solidFill>
+                <a:latin typeface="Consolas" panose="020B0609020204030204" pitchFamily="49" charset="0"/>
+              </a:rPr>
+              <a:t>&lt;</a:t>
+            </a:r>
+            <a:r>
+              <a:rPr lang="pl-PL" dirty="0">
+                <a:solidFill>
+                  <a:srgbClr val="569CD6"/>
+                </a:solidFill>
+                <a:latin typeface="Consolas" panose="020B0609020204030204" pitchFamily="49" charset="0"/>
+              </a:rPr>
+              <a:t>div</a:t>
+            </a:r>
+            <a:r>
+              <a:rPr lang="pl-PL" dirty="0">
+                <a:solidFill>
+                  <a:srgbClr val="808080"/>
+                </a:solidFill>
+                <a:latin typeface="Consolas" panose="020B0609020204030204" pitchFamily="49" charset="0"/>
+              </a:rPr>
+              <a:t>&gt;</a:t>
+            </a:r>
+            <a:r>
+              <a:rPr lang="pl-PL" dirty="0" err="1">
+                <a:solidFill>
+                  <a:srgbClr val="D4D4D4"/>
+                </a:solidFill>
+                <a:latin typeface="Consolas" panose="020B0609020204030204" pitchFamily="49" charset="0"/>
+              </a:rPr>
+              <a:t>Loading</a:t>
+            </a:r>
+            <a:r>
+              <a:rPr lang="pl-PL" dirty="0">
+                <a:solidFill>
+                  <a:srgbClr val="D4D4D4"/>
+                </a:solidFill>
+                <a:latin typeface="Consolas" panose="020B0609020204030204" pitchFamily="49" charset="0"/>
+              </a:rPr>
+              <a:t>...</a:t>
+            </a:r>
+            <a:r>
+              <a:rPr lang="pl-PL" dirty="0">
+                <a:solidFill>
+                  <a:srgbClr val="808080"/>
+                </a:solidFill>
+                <a:latin typeface="Consolas" panose="020B0609020204030204" pitchFamily="49" charset="0"/>
+              </a:rPr>
+              <a:t>&lt;/</a:t>
+            </a:r>
+            <a:r>
+              <a:rPr lang="pl-PL" dirty="0">
+                <a:solidFill>
+                  <a:srgbClr val="569CD6"/>
+                </a:solidFill>
+                <a:latin typeface="Consolas" panose="020B0609020204030204" pitchFamily="49" charset="0"/>
+              </a:rPr>
+              <a:t>div</a:t>
+            </a:r>
+            <a:r>
+              <a:rPr lang="pl-PL" dirty="0">
+                <a:solidFill>
+                  <a:srgbClr val="808080"/>
+                </a:solidFill>
+                <a:latin typeface="Consolas" panose="020B0609020204030204" pitchFamily="49" charset="0"/>
+              </a:rPr>
+              <a:t>&gt;</a:t>
+            </a:r>
+            <a:r>
+              <a:rPr lang="pl-PL" dirty="0">
+                <a:solidFill>
+                  <a:srgbClr val="569CD6"/>
+                </a:solidFill>
+                <a:latin typeface="Consolas" panose="020B0609020204030204" pitchFamily="49" charset="0"/>
+              </a:rPr>
+              <a:t>}</a:t>
+            </a:r>
+            <a:r>
+              <a:rPr lang="pl-PL" dirty="0">
+                <a:solidFill>
+                  <a:srgbClr val="808080"/>
+                </a:solidFill>
+                <a:latin typeface="Consolas" panose="020B0609020204030204" pitchFamily="49" charset="0"/>
+              </a:rPr>
+              <a:t>&gt;</a:t>
+            </a:r>
+            <a:endParaRPr lang="pl-PL" dirty="0">
+              <a:solidFill>
+                <a:srgbClr val="D4D4D4"/>
+              </a:solidFill>
+              <a:latin typeface="Consolas" panose="020B0609020204030204" pitchFamily="49" charset="0"/>
+            </a:endParaRPr>
+          </a:p>
+          <a:p>
+            <a:r>
+              <a:rPr lang="pl-PL" dirty="0">
+                <a:solidFill>
+                  <a:srgbClr val="D4D4D4"/>
+                </a:solidFill>
+                <a:latin typeface="Consolas" panose="020B0609020204030204" pitchFamily="49" charset="0"/>
+              </a:rPr>
+              <a:t>    </a:t>
+            </a:r>
+            <a:r>
+              <a:rPr lang="pl-PL" dirty="0">
+                <a:solidFill>
+                  <a:srgbClr val="808080"/>
+                </a:solidFill>
+                <a:latin typeface="Consolas" panose="020B0609020204030204" pitchFamily="49" charset="0"/>
+              </a:rPr>
+              <a:t>&lt;</a:t>
+            </a:r>
+            <a:r>
+              <a:rPr lang="pl-PL" dirty="0" err="1">
+                <a:solidFill>
+                  <a:srgbClr val="4EC9B0"/>
+                </a:solidFill>
+                <a:latin typeface="Consolas" panose="020B0609020204030204" pitchFamily="49" charset="0"/>
+              </a:rPr>
+              <a:t>OtherComponent</a:t>
+            </a:r>
+            <a:r>
+              <a:rPr lang="pl-PL" dirty="0">
+                <a:solidFill>
+                  <a:srgbClr val="D4D4D4"/>
+                </a:solidFill>
+                <a:latin typeface="Consolas" panose="020B0609020204030204" pitchFamily="49" charset="0"/>
+              </a:rPr>
+              <a:t> </a:t>
+            </a:r>
+            <a:r>
+              <a:rPr lang="pl-PL" dirty="0">
+                <a:solidFill>
+                  <a:srgbClr val="808080"/>
+                </a:solidFill>
+                <a:latin typeface="Consolas" panose="020B0609020204030204" pitchFamily="49" charset="0"/>
+              </a:rPr>
+              <a:t>/&gt;</a:t>
+            </a:r>
+            <a:endParaRPr lang="pl-PL" dirty="0">
+              <a:solidFill>
+                <a:srgbClr val="D4D4D4"/>
+              </a:solidFill>
+              <a:latin typeface="Consolas" panose="020B0609020204030204" pitchFamily="49" charset="0"/>
+            </a:endParaRPr>
+          </a:p>
+          <a:p>
+            <a:r>
+              <a:rPr lang="pl-PL" dirty="0">
+                <a:solidFill>
+                  <a:srgbClr val="808080"/>
+                </a:solidFill>
+                <a:latin typeface="Consolas" panose="020B0609020204030204" pitchFamily="49" charset="0"/>
+              </a:rPr>
+              <a:t>&lt;/</a:t>
+            </a:r>
+            <a:r>
+              <a:rPr lang="pl-PL" dirty="0" err="1">
+                <a:solidFill>
+                  <a:srgbClr val="4EC9B0"/>
+                </a:solidFill>
+                <a:latin typeface="Consolas" panose="020B0609020204030204" pitchFamily="49" charset="0"/>
+              </a:rPr>
+              <a:t>Suspense</a:t>
+            </a:r>
+            <a:r>
+              <a:rPr lang="pl-PL" dirty="0">
+                <a:solidFill>
+                  <a:srgbClr val="808080"/>
+                </a:solidFill>
+                <a:latin typeface="Consolas" panose="020B0609020204030204" pitchFamily="49" charset="0"/>
+              </a:rPr>
+              <a:t>&gt;</a:t>
+            </a:r>
+            <a:endParaRPr lang="pl-PL" b="0" dirty="0">
+              <a:solidFill>
+                <a:srgbClr val="D4D4D4"/>
+              </a:solidFill>
+              <a:effectLst/>
+              <a:latin typeface="Consolas" panose="020B0609020204030204" pitchFamily="49" charset="0"/>
+            </a:endParaRPr>
+          </a:p>
+        </p:txBody>
+      </p:sp>
+      <p:sp>
+        <p:nvSpPr>
+          <p:cNvPr id="13" name="pole tekstowe 12">
+            <a:extLst>
+              <a:ext uri="{FF2B5EF4-FFF2-40B4-BE49-F238E27FC236}">
+                <a16:creationId xmlns:a16="http://schemas.microsoft.com/office/drawing/2014/main" id="{1BC1F7CE-0D0C-4852-BE4D-0D8ED16B455A}"/>
+              </a:ext>
+            </a:extLst>
+          </p:cNvPr>
+          <p:cNvSpPr txBox="1"/>
+          <p:nvPr/>
+        </p:nvSpPr>
+        <p:spPr>
+          <a:xfrm>
+            <a:off x="925114" y="3985078"/>
+            <a:ext cx="4489371" cy="369332"/>
+          </a:xfrm>
+          <a:prstGeom prst="rect">
+            <a:avLst/>
+          </a:prstGeom>
+          <a:noFill/>
+        </p:spPr>
+        <p:txBody>
+          <a:bodyPr wrap="none" rtlCol="0">
+            <a:spAutoFit/>
+          </a:bodyPr>
+          <a:lstStyle/>
+          <a:p>
+            <a:r>
+              <a:rPr lang="pl-PL" dirty="0" err="1"/>
+              <a:t>Placeholder</a:t>
+            </a:r>
+            <a:r>
+              <a:rPr lang="pl-PL" dirty="0"/>
+              <a:t> </a:t>
+            </a:r>
+            <a:r>
+              <a:rPr lang="pl-PL" dirty="0" err="1"/>
+              <a:t>until</a:t>
+            </a:r>
+            <a:r>
+              <a:rPr lang="pl-PL" dirty="0"/>
+              <a:t> component </a:t>
+            </a:r>
+            <a:r>
+              <a:rPr lang="pl-PL" dirty="0" err="1"/>
+              <a:t>will</a:t>
+            </a:r>
+            <a:r>
+              <a:rPr lang="pl-PL" dirty="0"/>
+              <a:t> be </a:t>
+            </a:r>
+            <a:r>
+              <a:rPr lang="pl-PL" dirty="0" err="1"/>
+              <a:t>rendered</a:t>
+            </a:r>
+            <a:endParaRPr lang="pl-PL" dirty="0"/>
+          </a:p>
+        </p:txBody>
+      </p:sp>
+    </p:spTree>
+    <p:extLst>
+      <p:ext uri="{BB962C8B-B14F-4D97-AF65-F5344CB8AC3E}">
+        <p14:creationId xmlns:p14="http://schemas.microsoft.com/office/powerpoint/2010/main" val="3120688917"/>
+      </p:ext>
+    </p:extLst>
+  </p:cSld>
+  <p:clrMapOvr>
+    <a:masterClrMapping/>
+  </p:clrMapOvr>
+</p:sld>
+</file>
+
+<file path=ppt/slides/slide27.xml><?xml version="1.0" encoding="utf-8"?>
+<p:sld xmlns:a="http://schemas.openxmlformats.org/drawingml/2006/main" xmlns:r="http://schemas.openxmlformats.org/officeDocument/2006/relationships" xmlns:p="http://schemas.openxmlformats.org/presentationml/2006/main">
+  <p:cSld>
+    <p:spTree>
+      <p:nvGrpSpPr>
+        <p:cNvPr id="1" name=""/>
+        <p:cNvGrpSpPr/>
+        <p:nvPr/>
+      </p:nvGrpSpPr>
+      <p:grpSpPr>
+        <a:xfrm>
+          <a:off x="0" y="0"/>
+          <a:ext cx="0" cy="0"/>
+          <a:chOff x="0" y="0"/>
+          <a:chExt cx="0" cy="0"/>
+        </a:xfrm>
+      </p:grpSpPr>
+      <p:sp>
+        <p:nvSpPr>
+          <p:cNvPr id="4" name="pole tekstowe 3">
+            <a:extLst>
+              <a:ext uri="{FF2B5EF4-FFF2-40B4-BE49-F238E27FC236}">
+                <a16:creationId xmlns:a16="http://schemas.microsoft.com/office/drawing/2014/main" id="{F164A7B3-8808-414C-9401-3B25194E3B5A}"/>
+              </a:ext>
+            </a:extLst>
+          </p:cNvPr>
+          <p:cNvSpPr txBox="1"/>
+          <p:nvPr/>
+        </p:nvSpPr>
+        <p:spPr>
+          <a:xfrm>
+            <a:off x="497840" y="538480"/>
+            <a:ext cx="2103204" cy="369332"/>
+          </a:xfrm>
+          <a:prstGeom prst="rect">
+            <a:avLst/>
+          </a:prstGeom>
+          <a:noFill/>
+        </p:spPr>
+        <p:txBody>
+          <a:bodyPr wrap="none" rtlCol="0">
+            <a:spAutoFit/>
+          </a:bodyPr>
+          <a:lstStyle/>
+          <a:p>
+            <a:r>
+              <a:rPr lang="pl-PL" dirty="0" err="1"/>
+              <a:t>Redux</a:t>
+            </a:r>
+            <a:r>
+              <a:rPr lang="pl-PL" dirty="0"/>
+              <a:t> - </a:t>
+            </a:r>
+            <a:r>
+              <a:rPr lang="pl-PL" dirty="0" err="1"/>
+              <a:t>introduction</a:t>
+            </a:r>
+            <a:endParaRPr lang="pl-PL" dirty="0"/>
+          </a:p>
+        </p:txBody>
+      </p:sp>
+      <p:sp>
+        <p:nvSpPr>
+          <p:cNvPr id="6" name="Prostokąt 5">
+            <a:extLst>
+              <a:ext uri="{FF2B5EF4-FFF2-40B4-BE49-F238E27FC236}">
+                <a16:creationId xmlns:a16="http://schemas.microsoft.com/office/drawing/2014/main" id="{02CB4B36-132E-4A3A-AAF5-A1E25F7ADBC0}"/>
+              </a:ext>
+            </a:extLst>
+          </p:cNvPr>
+          <p:cNvSpPr/>
+          <p:nvPr/>
+        </p:nvSpPr>
+        <p:spPr>
+          <a:xfrm>
+            <a:off x="4482078" y="1415534"/>
+            <a:ext cx="2962799" cy="369332"/>
+          </a:xfrm>
+          <a:prstGeom prst="rect">
+            <a:avLst/>
+          </a:prstGeom>
+        </p:spPr>
+        <p:txBody>
+          <a:bodyPr wrap="none">
+            <a:spAutoFit/>
+          </a:bodyPr>
+          <a:lstStyle/>
+          <a:p>
+            <a:r>
+              <a:rPr lang="pl-PL" dirty="0" err="1">
+                <a:latin typeface="SFMono-Regular"/>
+              </a:rPr>
+              <a:t>npm</a:t>
+            </a:r>
+            <a:r>
+              <a:rPr lang="pl-PL" dirty="0">
+                <a:latin typeface="SFMono-Regular"/>
+              </a:rPr>
+              <a:t> </a:t>
+            </a:r>
+            <a:r>
+              <a:rPr lang="pl-PL" dirty="0" err="1">
+                <a:latin typeface="SFMono-Regular"/>
+              </a:rPr>
+              <a:t>install</a:t>
+            </a:r>
+            <a:r>
+              <a:rPr lang="pl-PL" dirty="0">
+                <a:latin typeface="SFMono-Regular"/>
+              </a:rPr>
+              <a:t> --</a:t>
+            </a:r>
+            <a:r>
+              <a:rPr lang="pl-PL" dirty="0" err="1">
+                <a:latin typeface="SFMono-Regular"/>
+              </a:rPr>
+              <a:t>save</a:t>
+            </a:r>
+            <a:r>
+              <a:rPr lang="pl-PL" dirty="0">
+                <a:latin typeface="SFMono-Regular"/>
+              </a:rPr>
+              <a:t> </a:t>
+            </a:r>
+            <a:r>
+              <a:rPr lang="pl-PL" dirty="0" err="1">
+                <a:latin typeface="SFMono-Regular"/>
+              </a:rPr>
+              <a:t>react-redux</a:t>
+            </a:r>
+            <a:endParaRPr lang="pl-PL" dirty="0"/>
+          </a:p>
+        </p:txBody>
+      </p:sp>
+      <p:sp>
+        <p:nvSpPr>
+          <p:cNvPr id="7" name="Prostokąt 6">
+            <a:extLst>
+              <a:ext uri="{FF2B5EF4-FFF2-40B4-BE49-F238E27FC236}">
+                <a16:creationId xmlns:a16="http://schemas.microsoft.com/office/drawing/2014/main" id="{8BF58E04-F447-4CA1-AC77-99E7122E8C0C}"/>
+              </a:ext>
+            </a:extLst>
+          </p:cNvPr>
+          <p:cNvSpPr/>
+          <p:nvPr/>
+        </p:nvSpPr>
+        <p:spPr>
+          <a:xfrm>
+            <a:off x="4482077" y="1784866"/>
+            <a:ext cx="2962799" cy="369332"/>
+          </a:xfrm>
+          <a:prstGeom prst="rect">
+            <a:avLst/>
+          </a:prstGeom>
+        </p:spPr>
+        <p:txBody>
+          <a:bodyPr wrap="square">
+            <a:spAutoFit/>
+          </a:bodyPr>
+          <a:lstStyle/>
+          <a:p>
+            <a:r>
+              <a:rPr lang="pl-PL" dirty="0" err="1">
+                <a:solidFill>
+                  <a:srgbClr val="000000"/>
+                </a:solidFill>
+                <a:latin typeface="inherit"/>
+              </a:rPr>
+              <a:t>npm</a:t>
+            </a:r>
+            <a:r>
+              <a:rPr lang="pl-PL" dirty="0">
+                <a:solidFill>
+                  <a:srgbClr val="000000"/>
+                </a:solidFill>
+                <a:latin typeface="inherit"/>
+              </a:rPr>
+              <a:t> i </a:t>
+            </a:r>
+            <a:r>
+              <a:rPr lang="pl-PL" dirty="0" err="1">
+                <a:solidFill>
+                  <a:srgbClr val="000000"/>
+                </a:solidFill>
+                <a:latin typeface="inherit"/>
+              </a:rPr>
+              <a:t>redux</a:t>
+            </a:r>
+            <a:r>
+              <a:rPr lang="pl-PL" dirty="0">
+                <a:solidFill>
+                  <a:srgbClr val="000000"/>
+                </a:solidFill>
+                <a:latin typeface="inherit"/>
+              </a:rPr>
+              <a:t> --</a:t>
+            </a:r>
+            <a:r>
+              <a:rPr lang="pl-PL" dirty="0" err="1">
+                <a:solidFill>
+                  <a:srgbClr val="000000"/>
+                </a:solidFill>
+                <a:latin typeface="inherit"/>
+              </a:rPr>
+              <a:t>save-dev</a:t>
+            </a:r>
+            <a:endParaRPr lang="pl-PL" dirty="0">
+              <a:solidFill>
+                <a:srgbClr val="444444"/>
+              </a:solidFill>
+              <a:latin typeface="Source Code Pro"/>
+            </a:endParaRPr>
+          </a:p>
+        </p:txBody>
+      </p:sp>
+    </p:spTree>
+    <p:extLst>
+      <p:ext uri="{BB962C8B-B14F-4D97-AF65-F5344CB8AC3E}">
+        <p14:creationId xmlns:p14="http://schemas.microsoft.com/office/powerpoint/2010/main" val="1976532068"/>
+      </p:ext>
+    </p:extLst>
+  </p:cSld>
+  <p:clrMapOvr>
+    <a:masterClrMapping/>
+  </p:clrMapOvr>
+</p:sld>
+</file>
+
+<file path=ppt/slides/slide28.xml><?xml version="1.0" encoding="utf-8"?>
+<p:sld xmlns:a="http://schemas.openxmlformats.org/drawingml/2006/main" xmlns:r="http://schemas.openxmlformats.org/officeDocument/2006/relationships" xmlns:p="http://schemas.openxmlformats.org/presentationml/2006/main">
+  <p:cSld>
+    <p:spTree>
+      <p:nvGrpSpPr>
+        <p:cNvPr id="1" name=""/>
+        <p:cNvGrpSpPr/>
+        <p:nvPr/>
+      </p:nvGrpSpPr>
+      <p:grpSpPr>
+        <a:xfrm>
+          <a:off x="0" y="0"/>
+          <a:ext cx="0" cy="0"/>
+          <a:chOff x="0" y="0"/>
+          <a:chExt cx="0" cy="0"/>
+        </a:xfrm>
+      </p:grpSpPr>
+      <p:sp>
+        <p:nvSpPr>
+          <p:cNvPr id="4" name="pole tekstowe 3">
+            <a:extLst>
+              <a:ext uri="{FF2B5EF4-FFF2-40B4-BE49-F238E27FC236}">
+                <a16:creationId xmlns:a16="http://schemas.microsoft.com/office/drawing/2014/main" id="{F164A7B3-8808-414C-9401-3B25194E3B5A}"/>
+              </a:ext>
+            </a:extLst>
+          </p:cNvPr>
+          <p:cNvSpPr txBox="1"/>
+          <p:nvPr/>
+        </p:nvSpPr>
+        <p:spPr>
+          <a:xfrm>
+            <a:off x="497840" y="538480"/>
+            <a:ext cx="940450" cy="369332"/>
+          </a:xfrm>
+          <a:prstGeom prst="rect">
+            <a:avLst/>
+          </a:prstGeom>
+          <a:noFill/>
+        </p:spPr>
+        <p:txBody>
+          <a:bodyPr wrap="none" rtlCol="0">
+            <a:spAutoFit/>
+          </a:bodyPr>
+          <a:lstStyle/>
+          <a:p>
+            <a:r>
+              <a:rPr lang="pl-PL" dirty="0" err="1"/>
+              <a:t>Redux</a:t>
+            </a:r>
+            <a:r>
+              <a:rPr lang="pl-PL" dirty="0"/>
+              <a:t> - </a:t>
+            </a:r>
+          </a:p>
+        </p:txBody>
+      </p:sp>
+    </p:spTree>
+    <p:extLst>
+      <p:ext uri="{BB962C8B-B14F-4D97-AF65-F5344CB8AC3E}">
+        <p14:creationId xmlns:p14="http://schemas.microsoft.com/office/powerpoint/2010/main" val="2495166907"/>
+      </p:ext>
+    </p:extLst>
+  </p:cSld>
+  <p:clrMapOvr>
+    <a:masterClrMapping/>
+  </p:clrMapOvr>
+</p:sld>
+</file>
+
+<file path=ppt/slides/slide29.xml><?xml version="1.0" encoding="utf-8"?>
+<p:sld xmlns:a="http://schemas.openxmlformats.org/drawingml/2006/main" xmlns:r="http://schemas.openxmlformats.org/officeDocument/2006/relationships" xmlns:p="http://schemas.openxmlformats.org/presentationml/2006/main">
+  <p:cSld>
+    <p:spTree>
+      <p:nvGrpSpPr>
+        <p:cNvPr id="1" name=""/>
+        <p:cNvGrpSpPr/>
+        <p:nvPr/>
+      </p:nvGrpSpPr>
+      <p:grpSpPr>
+        <a:xfrm>
+          <a:off x="0" y="0"/>
+          <a:ext cx="0" cy="0"/>
+          <a:chOff x="0" y="0"/>
+          <a:chExt cx="0" cy="0"/>
+        </a:xfrm>
+      </p:grpSpPr>
+      <p:sp>
+        <p:nvSpPr>
+          <p:cNvPr id="4" name="pole tekstowe 3">
+            <a:extLst>
+              <a:ext uri="{FF2B5EF4-FFF2-40B4-BE49-F238E27FC236}">
+                <a16:creationId xmlns:a16="http://schemas.microsoft.com/office/drawing/2014/main" id="{F164A7B3-8808-414C-9401-3B25194E3B5A}"/>
+              </a:ext>
+            </a:extLst>
+          </p:cNvPr>
+          <p:cNvSpPr txBox="1"/>
+          <p:nvPr/>
+        </p:nvSpPr>
+        <p:spPr>
+          <a:xfrm>
+            <a:off x="497840" y="538480"/>
+            <a:ext cx="2103525" cy="369332"/>
+          </a:xfrm>
+          <a:prstGeom prst="rect">
+            <a:avLst/>
+          </a:prstGeom>
+          <a:noFill/>
+        </p:spPr>
+        <p:txBody>
+          <a:bodyPr wrap="none" rtlCol="0">
+            <a:spAutoFit/>
+          </a:bodyPr>
+          <a:lstStyle/>
+          <a:p>
+            <a:r>
+              <a:rPr lang="pl-PL" dirty="0" err="1"/>
+              <a:t>Hooks</a:t>
+            </a:r>
+            <a:r>
+              <a:rPr lang="pl-PL" dirty="0"/>
+              <a:t> - </a:t>
+            </a:r>
+            <a:r>
+              <a:rPr lang="pl-PL" dirty="0" err="1"/>
+              <a:t>introduction</a:t>
+            </a:r>
+            <a:endParaRPr lang="pl-PL" dirty="0"/>
+          </a:p>
+        </p:txBody>
+      </p:sp>
+    </p:spTree>
+    <p:extLst>
+      <p:ext uri="{BB962C8B-B14F-4D97-AF65-F5344CB8AC3E}">
+        <p14:creationId xmlns:p14="http://schemas.microsoft.com/office/powerpoint/2010/main" val="4263742158"/>
       </p:ext>
     </p:extLst>
   </p:cSld>

</xml_diff>

<commit_message>
Exercise 2a: component composition
</commit_message>
<xml_diff>
--- a/tutorial/ReactjsTraining.pptx
+++ b/tutorial/ReactjsTraining.pptx
@@ -5,7 +5,7 @@
     <p:sldMasterId id="2147483648" r:id="rId1"/>
   </p:sldMasterIdLst>
   <p:notesMasterIdLst>
-    <p:notesMasterId r:id="rId31"/>
+    <p:notesMasterId r:id="rId36"/>
   </p:notesMasterIdLst>
   <p:sldIdLst>
     <p:sldId id="256" r:id="rId2"/>
@@ -34,9 +34,14 @@
     <p:sldId id="278" r:id="rId25"/>
     <p:sldId id="280" r:id="rId26"/>
     <p:sldId id="284" r:id="rId27"/>
-    <p:sldId id="282" r:id="rId28"/>
-    <p:sldId id="283" r:id="rId29"/>
-    <p:sldId id="281" r:id="rId30"/>
+    <p:sldId id="285" r:id="rId28"/>
+    <p:sldId id="289" r:id="rId29"/>
+    <p:sldId id="286" r:id="rId30"/>
+    <p:sldId id="287" r:id="rId31"/>
+    <p:sldId id="288" r:id="rId32"/>
+    <p:sldId id="282" r:id="rId33"/>
+    <p:sldId id="283" r:id="rId34"/>
+    <p:sldId id="281" r:id="rId35"/>
   </p:sldIdLst>
   <p:sldSz cx="12192000" cy="6858000"/>
   <p:notesSz cx="6858000" cy="9144000"/>
@@ -4985,7 +4990,7 @@
                 <a:ea typeface="+mn-ea"/>
                 <a:cs typeface="+mn-cs"/>
               </a:rPr>
-              <a:t> 23: Help routing zamienić na </a:t>
+              <a:t> 1a: Help routing zamienić na </a:t>
             </a:r>
             <a:r>
               <a:rPr lang="pl-PL" sz="1200" b="0" i="0" kern="1200" dirty="0" err="1">
@@ -5033,29 +5038,8 @@
                 <a:ea typeface="+mn-ea"/>
                 <a:cs typeface="+mn-cs"/>
               </a:rPr>
-              <a:t>, czyli Help dociągany jest w </a:t>
-            </a:r>
-            <a:r>
-              <a:rPr lang="pl-PL" sz="1200" b="0" i="0" kern="1200">
-                <a:solidFill>
-                  <a:schemeClr val="tx1"/>
-                </a:solidFill>
-                <a:effectLst/>
-                <a:latin typeface="+mn-lt"/>
-                <a:ea typeface="+mn-ea"/>
-                <a:cs typeface="+mn-cs"/>
-              </a:rPr>
-              <a:t>momencie naciśnięcia na link do Help</a:t>
-            </a:r>
-            <a:endParaRPr lang="pl-PL" sz="1200" b="0" i="0" kern="1200" dirty="0">
-              <a:solidFill>
-                <a:schemeClr val="tx1"/>
-              </a:solidFill>
-              <a:effectLst/>
-              <a:latin typeface="+mn-lt"/>
-              <a:ea typeface="+mn-ea"/>
-              <a:cs typeface="+mn-cs"/>
-            </a:endParaRPr>
+              <a:t>, czyli Help dociągany jest w momencie naciśnięcia na link do Help</a:t>
+            </a:r>
           </a:p>
         </p:txBody>
       </p:sp>
@@ -5143,6 +5127,102 @@
               <a:buFontTx/>
               <a:buNone/>
             </a:pPr>
+            <a:r>
+              <a:rPr lang="pl-PL" sz="1200" b="0" i="0" kern="1200" dirty="0" err="1">
+                <a:solidFill>
+                  <a:schemeClr val="tx1"/>
+                </a:solidFill>
+                <a:effectLst/>
+                <a:latin typeface="+mn-lt"/>
+                <a:ea typeface="+mn-ea"/>
+                <a:cs typeface="+mn-cs"/>
+              </a:rPr>
+              <a:t>Exercise</a:t>
+            </a:r>
+            <a:r>
+              <a:rPr lang="pl-PL" sz="1200" b="0" i="0" kern="1200" dirty="0">
+                <a:solidFill>
+                  <a:schemeClr val="tx1"/>
+                </a:solidFill>
+                <a:effectLst/>
+                <a:latin typeface="+mn-lt"/>
+                <a:ea typeface="+mn-ea"/>
+                <a:cs typeface="+mn-cs"/>
+              </a:rPr>
+              <a:t> 2a: Poprzez kompozycje przekazywać </a:t>
+            </a:r>
+            <a:r>
+              <a:rPr lang="pl-PL" sz="1200" b="0" i="0" kern="1200" dirty="0" err="1">
+                <a:solidFill>
+                  <a:schemeClr val="tx1"/>
+                </a:solidFill>
+                <a:effectLst/>
+                <a:latin typeface="+mn-lt"/>
+                <a:ea typeface="+mn-ea"/>
+                <a:cs typeface="+mn-cs"/>
+              </a:rPr>
+              <a:t>url</a:t>
+            </a:r>
+            <a:r>
+              <a:rPr lang="pl-PL" sz="1200" b="0" i="0" kern="1200" dirty="0">
+                <a:solidFill>
+                  <a:schemeClr val="tx1"/>
+                </a:solidFill>
+                <a:effectLst/>
+                <a:latin typeface="+mn-lt"/>
+                <a:ea typeface="+mn-ea"/>
+                <a:cs typeface="+mn-cs"/>
+              </a:rPr>
+              <a:t> </a:t>
+            </a:r>
+            <a:r>
+              <a:rPr lang="pl-PL" sz="1200" b="0" i="0" kern="1200" dirty="0" err="1">
+                <a:solidFill>
+                  <a:schemeClr val="tx1"/>
+                </a:solidFill>
+                <a:effectLst/>
+                <a:latin typeface="+mn-lt"/>
+                <a:ea typeface="+mn-ea"/>
+                <a:cs typeface="+mn-cs"/>
+              </a:rPr>
+              <a:t>avatara</a:t>
+            </a:r>
+            <a:r>
+              <a:rPr lang="pl-PL" sz="1200" b="0" i="0" kern="1200" dirty="0">
+                <a:solidFill>
+                  <a:schemeClr val="tx1"/>
+                </a:solidFill>
+                <a:effectLst/>
+                <a:latin typeface="+mn-lt"/>
+                <a:ea typeface="+mn-ea"/>
+                <a:cs typeface="+mn-cs"/>
+              </a:rPr>
+              <a:t> z </a:t>
+            </a:r>
+            <a:r>
+              <a:rPr lang="pl-PL" sz="1200" b="0" i="0" kern="1200" err="1">
+                <a:solidFill>
+                  <a:schemeClr val="tx1"/>
+                </a:solidFill>
+                <a:effectLst/>
+                <a:latin typeface="+mn-lt"/>
+                <a:ea typeface="+mn-ea"/>
+                <a:cs typeface="+mn-cs"/>
+              </a:rPr>
+              <a:t>app</a:t>
+            </a:r>
+            <a:r>
+              <a:rPr lang="pl-PL" sz="1200" b="0" i="0" kern="1200">
+                <a:solidFill>
+                  <a:schemeClr val="tx1"/>
+                </a:solidFill>
+                <a:effectLst/>
+                <a:latin typeface="+mn-lt"/>
+                <a:ea typeface="+mn-ea"/>
+                <a:cs typeface="+mn-cs"/>
+              </a:rPr>
+              <a:t>.js</a:t>
+            </a:r>
             <a:endParaRPr lang="pl-PL" sz="1200" b="0" i="0" kern="1200" dirty="0">
               <a:solidFill>
                 <a:schemeClr val="tx1"/>
@@ -5181,7 +5261,7 @@
     </p:spTree>
     <p:extLst>
       <p:ext uri="{BB962C8B-B14F-4D97-AF65-F5344CB8AC3E}">
-        <p14:creationId xmlns:p14="http://schemas.microsoft.com/office/powerpoint/2010/main" val="3365077152"/>
+        <p14:creationId xmlns:p14="http://schemas.microsoft.com/office/powerpoint/2010/main" val="3714308766"/>
       </p:ext>
     </p:extLst>
   </p:cSld>
@@ -5239,15 +5319,42 @@
               <a:buFontTx/>
               <a:buNone/>
             </a:pPr>
-            <a:endParaRPr lang="pl-PL" sz="1200" b="0" i="0" kern="1200" dirty="0">
-              <a:solidFill>
-                <a:schemeClr val="tx1"/>
-              </a:solidFill>
-              <a:effectLst/>
-              <a:latin typeface="+mn-lt"/>
-              <a:ea typeface="+mn-ea"/>
-              <a:cs typeface="+mn-cs"/>
-            </a:endParaRPr>
+            <a:r>
+              <a:rPr lang="pl-PL" sz="1200" b="0" i="0" kern="1200" dirty="0">
+                <a:solidFill>
+                  <a:schemeClr val="tx1"/>
+                </a:solidFill>
+                <a:effectLst/>
+                <a:latin typeface="+mn-lt"/>
+                <a:ea typeface="+mn-ea"/>
+                <a:cs typeface="+mn-cs"/>
+              </a:rPr>
+              <a:t>- Dane </a:t>
+            </a:r>
+            <a:r>
+              <a:rPr lang="pl-PL" sz="1200" b="0" i="0" kern="1200" dirty="0" err="1">
+                <a:solidFill>
+                  <a:schemeClr val="tx1"/>
+                </a:solidFill>
+                <a:effectLst/>
+                <a:latin typeface="+mn-lt"/>
+                <a:ea typeface="+mn-ea"/>
+                <a:cs typeface="+mn-cs"/>
+              </a:rPr>
+              <a:t>globable</a:t>
+            </a:r>
+            <a:r>
+              <a:rPr lang="pl-PL" sz="1200" b="0" i="0" kern="1200" dirty="0">
+                <a:solidFill>
+                  <a:schemeClr val="tx1"/>
+                </a:solidFill>
+                <a:effectLst/>
+                <a:latin typeface="+mn-lt"/>
+                <a:ea typeface="+mn-ea"/>
+                <a:cs typeface="+mn-cs"/>
+              </a:rPr>
+              <a:t>, bo przekazywanie w drzewku może być uciążliwe, np. preferowany język</a:t>
+            </a:r>
           </a:p>
         </p:txBody>
       </p:sp>
@@ -5277,7 +5384,7 @@
     </p:spTree>
     <p:extLst>
       <p:ext uri="{BB962C8B-B14F-4D97-AF65-F5344CB8AC3E}">
-        <p14:creationId xmlns:p14="http://schemas.microsoft.com/office/powerpoint/2010/main" val="2873150729"/>
+        <p14:creationId xmlns:p14="http://schemas.microsoft.com/office/powerpoint/2010/main" val="3916393442"/>
       </p:ext>
     </p:extLst>
   </p:cSld>
@@ -5335,18 +5442,15 @@
               <a:buFontTx/>
               <a:buNone/>
             </a:pPr>
-            <a:r>
-              <a:rPr lang="pl-PL" sz="1200" b="0" i="0" kern="1200" dirty="0">
-                <a:solidFill>
-                  <a:schemeClr val="tx1"/>
-                </a:solidFill>
-                <a:effectLst/>
-                <a:latin typeface="+mn-lt"/>
-                <a:ea typeface="+mn-ea"/>
-                <a:cs typeface="+mn-cs"/>
-              </a:rPr>
-              <a:t>- Zamiana klas na funkcje z możliwością zarządzania stanem</a:t>
-            </a:r>
+            <a:endParaRPr lang="pl-PL" sz="1200" b="0" i="0" kern="1200" dirty="0">
+              <a:solidFill>
+                <a:schemeClr val="tx1"/>
+              </a:solidFill>
+              <a:effectLst/>
+              <a:latin typeface="+mn-lt"/>
+              <a:ea typeface="+mn-ea"/>
+              <a:cs typeface="+mn-cs"/>
+            </a:endParaRPr>
           </a:p>
         </p:txBody>
       </p:sp>
@@ -5376,7 +5480,7 @@
     </p:spTree>
     <p:extLst>
       <p:ext uri="{BB962C8B-B14F-4D97-AF65-F5344CB8AC3E}">
-        <p14:creationId xmlns:p14="http://schemas.microsoft.com/office/powerpoint/2010/main" val="3886764673"/>
+        <p14:creationId xmlns:p14="http://schemas.microsoft.com/office/powerpoint/2010/main" val="1602898016"/>
       </p:ext>
     </p:extLst>
   </p:cSld>
@@ -5688,6 +5792,489 @@
     <p:extLst>
       <p:ext uri="{BB962C8B-B14F-4D97-AF65-F5344CB8AC3E}">
         <p14:creationId xmlns:p14="http://schemas.microsoft.com/office/powerpoint/2010/main" val="3844498564"/>
+      </p:ext>
+    </p:extLst>
+  </p:cSld>
+  <p:clrMapOvr>
+    <a:masterClrMapping/>
+  </p:clrMapOvr>
+</p:notes>
+</file>
+
+<file path=ppt/notesSlides/notesSlide30.xml><?xml version="1.0" encoding="utf-8"?>
+<p:notes xmlns:a="http://schemas.openxmlformats.org/drawingml/2006/main" xmlns:r="http://schemas.openxmlformats.org/officeDocument/2006/relationships" xmlns:p="http://schemas.openxmlformats.org/presentationml/2006/main">
+  <p:cSld>
+    <p:spTree>
+      <p:nvGrpSpPr>
+        <p:cNvPr id="1" name=""/>
+        <p:cNvGrpSpPr/>
+        <p:nvPr/>
+      </p:nvGrpSpPr>
+      <p:grpSpPr>
+        <a:xfrm>
+          <a:off x="0" y="0"/>
+          <a:ext cx="0" cy="0"/>
+          <a:chOff x="0" y="0"/>
+          <a:chExt cx="0" cy="0"/>
+        </a:xfrm>
+      </p:grpSpPr>
+      <p:sp>
+        <p:nvSpPr>
+          <p:cNvPr id="2" name="Symbol zastępczy obrazu slajdu 1"/>
+          <p:cNvSpPr>
+            <a:spLocks noGrp="1" noRot="1" noChangeAspect="1"/>
+          </p:cNvSpPr>
+          <p:nvPr>
+            <p:ph type="sldImg"/>
+          </p:nvPr>
+        </p:nvSpPr>
+        <p:spPr/>
+      </p:sp>
+      <p:sp>
+        <p:nvSpPr>
+          <p:cNvPr id="3" name="Symbol zastępczy notatek 2"/>
+          <p:cNvSpPr>
+            <a:spLocks noGrp="1"/>
+          </p:cNvSpPr>
+          <p:nvPr>
+            <p:ph type="body" idx="1"/>
+          </p:nvPr>
+        </p:nvSpPr>
+        <p:spPr/>
+        <p:txBody>
+          <a:bodyPr/>
+          <a:lstStyle/>
+          <a:p>
+            <a:pPr marL="0" indent="0">
+              <a:buFontTx/>
+              <a:buNone/>
+            </a:pPr>
+            <a:endParaRPr lang="pl-PL" sz="1200" b="0" i="0" kern="1200" dirty="0">
+              <a:solidFill>
+                <a:schemeClr val="tx1"/>
+              </a:solidFill>
+              <a:effectLst/>
+              <a:latin typeface="+mn-lt"/>
+              <a:ea typeface="+mn-ea"/>
+              <a:cs typeface="+mn-cs"/>
+            </a:endParaRPr>
+          </a:p>
+        </p:txBody>
+      </p:sp>
+      <p:sp>
+        <p:nvSpPr>
+          <p:cNvPr id="4" name="Symbol zastępczy numeru slajdu 3"/>
+          <p:cNvSpPr>
+            <a:spLocks noGrp="1"/>
+          </p:cNvSpPr>
+          <p:nvPr>
+            <p:ph type="sldNum" sz="quarter" idx="5"/>
+          </p:nvPr>
+        </p:nvSpPr>
+        <p:spPr/>
+        <p:txBody>
+          <a:bodyPr/>
+          <a:lstStyle/>
+          <a:p>
+            <a:fld id="{810A6612-7A23-4B98-B0E9-4F3C882AD2EF}" type="slidenum">
+              <a:rPr lang="pl-PL" smtClean="0"/>
+              <a:t>30</a:t>
+            </a:fld>
+            <a:endParaRPr lang="pl-PL"/>
+          </a:p>
+        </p:txBody>
+      </p:sp>
+    </p:spTree>
+    <p:extLst>
+      <p:ext uri="{BB962C8B-B14F-4D97-AF65-F5344CB8AC3E}">
+        <p14:creationId xmlns:p14="http://schemas.microsoft.com/office/powerpoint/2010/main" val="1837245820"/>
+      </p:ext>
+    </p:extLst>
+  </p:cSld>
+  <p:clrMapOvr>
+    <a:masterClrMapping/>
+  </p:clrMapOvr>
+</p:notes>
+</file>
+
+<file path=ppt/notesSlides/notesSlide31.xml><?xml version="1.0" encoding="utf-8"?>
+<p:notes xmlns:a="http://schemas.openxmlformats.org/drawingml/2006/main" xmlns:r="http://schemas.openxmlformats.org/officeDocument/2006/relationships" xmlns:p="http://schemas.openxmlformats.org/presentationml/2006/main">
+  <p:cSld>
+    <p:spTree>
+      <p:nvGrpSpPr>
+        <p:cNvPr id="1" name=""/>
+        <p:cNvGrpSpPr/>
+        <p:nvPr/>
+      </p:nvGrpSpPr>
+      <p:grpSpPr>
+        <a:xfrm>
+          <a:off x="0" y="0"/>
+          <a:ext cx="0" cy="0"/>
+          <a:chOff x="0" y="0"/>
+          <a:chExt cx="0" cy="0"/>
+        </a:xfrm>
+      </p:grpSpPr>
+      <p:sp>
+        <p:nvSpPr>
+          <p:cNvPr id="2" name="Symbol zastępczy obrazu slajdu 1"/>
+          <p:cNvSpPr>
+            <a:spLocks noGrp="1" noRot="1" noChangeAspect="1"/>
+          </p:cNvSpPr>
+          <p:nvPr>
+            <p:ph type="sldImg"/>
+          </p:nvPr>
+        </p:nvSpPr>
+        <p:spPr/>
+      </p:sp>
+      <p:sp>
+        <p:nvSpPr>
+          <p:cNvPr id="3" name="Symbol zastępczy notatek 2"/>
+          <p:cNvSpPr>
+            <a:spLocks noGrp="1"/>
+          </p:cNvSpPr>
+          <p:nvPr>
+            <p:ph type="body" idx="1"/>
+          </p:nvPr>
+        </p:nvSpPr>
+        <p:spPr/>
+        <p:txBody>
+          <a:bodyPr/>
+          <a:lstStyle/>
+          <a:p>
+            <a:pPr marL="0" indent="0">
+              <a:buFontTx/>
+              <a:buNone/>
+            </a:pPr>
+            <a:endParaRPr lang="pl-PL" sz="1200" b="0" i="0" kern="1200" dirty="0">
+              <a:solidFill>
+                <a:schemeClr val="tx1"/>
+              </a:solidFill>
+              <a:effectLst/>
+              <a:latin typeface="+mn-lt"/>
+              <a:ea typeface="+mn-ea"/>
+              <a:cs typeface="+mn-cs"/>
+            </a:endParaRPr>
+          </a:p>
+        </p:txBody>
+      </p:sp>
+      <p:sp>
+        <p:nvSpPr>
+          <p:cNvPr id="4" name="Symbol zastępczy numeru slajdu 3"/>
+          <p:cNvSpPr>
+            <a:spLocks noGrp="1"/>
+          </p:cNvSpPr>
+          <p:nvPr>
+            <p:ph type="sldNum" sz="quarter" idx="5"/>
+          </p:nvPr>
+        </p:nvSpPr>
+        <p:spPr/>
+        <p:txBody>
+          <a:bodyPr/>
+          <a:lstStyle/>
+          <a:p>
+            <a:fld id="{810A6612-7A23-4B98-B0E9-4F3C882AD2EF}" type="slidenum">
+              <a:rPr lang="pl-PL" smtClean="0"/>
+              <a:t>31</a:t>
+            </a:fld>
+            <a:endParaRPr lang="pl-PL"/>
+          </a:p>
+        </p:txBody>
+      </p:sp>
+    </p:spTree>
+    <p:extLst>
+      <p:ext uri="{BB962C8B-B14F-4D97-AF65-F5344CB8AC3E}">
+        <p14:creationId xmlns:p14="http://schemas.microsoft.com/office/powerpoint/2010/main" val="635396464"/>
+      </p:ext>
+    </p:extLst>
+  </p:cSld>
+  <p:clrMapOvr>
+    <a:masterClrMapping/>
+  </p:clrMapOvr>
+</p:notes>
+</file>
+
+<file path=ppt/notesSlides/notesSlide32.xml><?xml version="1.0" encoding="utf-8"?>
+<p:notes xmlns:a="http://schemas.openxmlformats.org/drawingml/2006/main" xmlns:r="http://schemas.openxmlformats.org/officeDocument/2006/relationships" xmlns:p="http://schemas.openxmlformats.org/presentationml/2006/main">
+  <p:cSld>
+    <p:spTree>
+      <p:nvGrpSpPr>
+        <p:cNvPr id="1" name=""/>
+        <p:cNvGrpSpPr/>
+        <p:nvPr/>
+      </p:nvGrpSpPr>
+      <p:grpSpPr>
+        <a:xfrm>
+          <a:off x="0" y="0"/>
+          <a:ext cx="0" cy="0"/>
+          <a:chOff x="0" y="0"/>
+          <a:chExt cx="0" cy="0"/>
+        </a:xfrm>
+      </p:grpSpPr>
+      <p:sp>
+        <p:nvSpPr>
+          <p:cNvPr id="2" name="Symbol zastępczy obrazu slajdu 1"/>
+          <p:cNvSpPr>
+            <a:spLocks noGrp="1" noRot="1" noChangeAspect="1"/>
+          </p:cNvSpPr>
+          <p:nvPr>
+            <p:ph type="sldImg"/>
+          </p:nvPr>
+        </p:nvSpPr>
+        <p:spPr/>
+      </p:sp>
+      <p:sp>
+        <p:nvSpPr>
+          <p:cNvPr id="3" name="Symbol zastępczy notatek 2"/>
+          <p:cNvSpPr>
+            <a:spLocks noGrp="1"/>
+          </p:cNvSpPr>
+          <p:nvPr>
+            <p:ph type="body" idx="1"/>
+          </p:nvPr>
+        </p:nvSpPr>
+        <p:spPr/>
+        <p:txBody>
+          <a:bodyPr/>
+          <a:lstStyle/>
+          <a:p>
+            <a:pPr marL="0" indent="0">
+              <a:buFontTx/>
+              <a:buNone/>
+            </a:pPr>
+            <a:endParaRPr lang="pl-PL" sz="1200" b="0" i="0" kern="1200" dirty="0">
+              <a:solidFill>
+                <a:schemeClr val="tx1"/>
+              </a:solidFill>
+              <a:effectLst/>
+              <a:latin typeface="+mn-lt"/>
+              <a:ea typeface="+mn-ea"/>
+              <a:cs typeface="+mn-cs"/>
+            </a:endParaRPr>
+          </a:p>
+        </p:txBody>
+      </p:sp>
+      <p:sp>
+        <p:nvSpPr>
+          <p:cNvPr id="4" name="Symbol zastępczy numeru slajdu 3"/>
+          <p:cNvSpPr>
+            <a:spLocks noGrp="1"/>
+          </p:cNvSpPr>
+          <p:nvPr>
+            <p:ph type="sldNum" sz="quarter" idx="5"/>
+          </p:nvPr>
+        </p:nvSpPr>
+        <p:spPr/>
+        <p:txBody>
+          <a:bodyPr/>
+          <a:lstStyle/>
+          <a:p>
+            <a:fld id="{810A6612-7A23-4B98-B0E9-4F3C882AD2EF}" type="slidenum">
+              <a:rPr lang="pl-PL" smtClean="0"/>
+              <a:t>32</a:t>
+            </a:fld>
+            <a:endParaRPr lang="pl-PL"/>
+          </a:p>
+        </p:txBody>
+      </p:sp>
+    </p:spTree>
+    <p:extLst>
+      <p:ext uri="{BB962C8B-B14F-4D97-AF65-F5344CB8AC3E}">
+        <p14:creationId xmlns:p14="http://schemas.microsoft.com/office/powerpoint/2010/main" val="3365077152"/>
+      </p:ext>
+    </p:extLst>
+  </p:cSld>
+  <p:clrMapOvr>
+    <a:masterClrMapping/>
+  </p:clrMapOvr>
+</p:notes>
+</file>
+
+<file path=ppt/notesSlides/notesSlide33.xml><?xml version="1.0" encoding="utf-8"?>
+<p:notes xmlns:a="http://schemas.openxmlformats.org/drawingml/2006/main" xmlns:r="http://schemas.openxmlformats.org/officeDocument/2006/relationships" xmlns:p="http://schemas.openxmlformats.org/presentationml/2006/main">
+  <p:cSld>
+    <p:spTree>
+      <p:nvGrpSpPr>
+        <p:cNvPr id="1" name=""/>
+        <p:cNvGrpSpPr/>
+        <p:nvPr/>
+      </p:nvGrpSpPr>
+      <p:grpSpPr>
+        <a:xfrm>
+          <a:off x="0" y="0"/>
+          <a:ext cx="0" cy="0"/>
+          <a:chOff x="0" y="0"/>
+          <a:chExt cx="0" cy="0"/>
+        </a:xfrm>
+      </p:grpSpPr>
+      <p:sp>
+        <p:nvSpPr>
+          <p:cNvPr id="2" name="Symbol zastępczy obrazu slajdu 1"/>
+          <p:cNvSpPr>
+            <a:spLocks noGrp="1" noRot="1" noChangeAspect="1"/>
+          </p:cNvSpPr>
+          <p:nvPr>
+            <p:ph type="sldImg"/>
+          </p:nvPr>
+        </p:nvSpPr>
+        <p:spPr/>
+      </p:sp>
+      <p:sp>
+        <p:nvSpPr>
+          <p:cNvPr id="3" name="Symbol zastępczy notatek 2"/>
+          <p:cNvSpPr>
+            <a:spLocks noGrp="1"/>
+          </p:cNvSpPr>
+          <p:nvPr>
+            <p:ph type="body" idx="1"/>
+          </p:nvPr>
+        </p:nvSpPr>
+        <p:spPr/>
+        <p:txBody>
+          <a:bodyPr/>
+          <a:lstStyle/>
+          <a:p>
+            <a:pPr marL="0" indent="0">
+              <a:buFontTx/>
+              <a:buNone/>
+            </a:pPr>
+            <a:endParaRPr lang="pl-PL" sz="1200" b="0" i="0" kern="1200" dirty="0">
+              <a:solidFill>
+                <a:schemeClr val="tx1"/>
+              </a:solidFill>
+              <a:effectLst/>
+              <a:latin typeface="+mn-lt"/>
+              <a:ea typeface="+mn-ea"/>
+              <a:cs typeface="+mn-cs"/>
+            </a:endParaRPr>
+          </a:p>
+        </p:txBody>
+      </p:sp>
+      <p:sp>
+        <p:nvSpPr>
+          <p:cNvPr id="4" name="Symbol zastępczy numeru slajdu 3"/>
+          <p:cNvSpPr>
+            <a:spLocks noGrp="1"/>
+          </p:cNvSpPr>
+          <p:nvPr>
+            <p:ph type="sldNum" sz="quarter" idx="5"/>
+          </p:nvPr>
+        </p:nvSpPr>
+        <p:spPr/>
+        <p:txBody>
+          <a:bodyPr/>
+          <a:lstStyle/>
+          <a:p>
+            <a:fld id="{810A6612-7A23-4B98-B0E9-4F3C882AD2EF}" type="slidenum">
+              <a:rPr lang="pl-PL" smtClean="0"/>
+              <a:t>33</a:t>
+            </a:fld>
+            <a:endParaRPr lang="pl-PL"/>
+          </a:p>
+        </p:txBody>
+      </p:sp>
+    </p:spTree>
+    <p:extLst>
+      <p:ext uri="{BB962C8B-B14F-4D97-AF65-F5344CB8AC3E}">
+        <p14:creationId xmlns:p14="http://schemas.microsoft.com/office/powerpoint/2010/main" val="2873150729"/>
+      </p:ext>
+    </p:extLst>
+  </p:cSld>
+  <p:clrMapOvr>
+    <a:masterClrMapping/>
+  </p:clrMapOvr>
+</p:notes>
+</file>
+
+<file path=ppt/notesSlides/notesSlide34.xml><?xml version="1.0" encoding="utf-8"?>
+<p:notes xmlns:a="http://schemas.openxmlformats.org/drawingml/2006/main" xmlns:r="http://schemas.openxmlformats.org/officeDocument/2006/relationships" xmlns:p="http://schemas.openxmlformats.org/presentationml/2006/main">
+  <p:cSld>
+    <p:spTree>
+      <p:nvGrpSpPr>
+        <p:cNvPr id="1" name=""/>
+        <p:cNvGrpSpPr/>
+        <p:nvPr/>
+      </p:nvGrpSpPr>
+      <p:grpSpPr>
+        <a:xfrm>
+          <a:off x="0" y="0"/>
+          <a:ext cx="0" cy="0"/>
+          <a:chOff x="0" y="0"/>
+          <a:chExt cx="0" cy="0"/>
+        </a:xfrm>
+      </p:grpSpPr>
+      <p:sp>
+        <p:nvSpPr>
+          <p:cNvPr id="2" name="Symbol zastępczy obrazu slajdu 1"/>
+          <p:cNvSpPr>
+            <a:spLocks noGrp="1" noRot="1" noChangeAspect="1"/>
+          </p:cNvSpPr>
+          <p:nvPr>
+            <p:ph type="sldImg"/>
+          </p:nvPr>
+        </p:nvSpPr>
+        <p:spPr/>
+      </p:sp>
+      <p:sp>
+        <p:nvSpPr>
+          <p:cNvPr id="3" name="Symbol zastępczy notatek 2"/>
+          <p:cNvSpPr>
+            <a:spLocks noGrp="1"/>
+          </p:cNvSpPr>
+          <p:nvPr>
+            <p:ph type="body" idx="1"/>
+          </p:nvPr>
+        </p:nvSpPr>
+        <p:spPr/>
+        <p:txBody>
+          <a:bodyPr/>
+          <a:lstStyle/>
+          <a:p>
+            <a:pPr marL="0" indent="0">
+              <a:buFontTx/>
+              <a:buNone/>
+            </a:pPr>
+            <a:r>
+              <a:rPr lang="pl-PL" sz="1200" b="0" i="0" kern="1200" dirty="0">
+                <a:solidFill>
+                  <a:schemeClr val="tx1"/>
+                </a:solidFill>
+                <a:effectLst/>
+                <a:latin typeface="+mn-lt"/>
+                <a:ea typeface="+mn-ea"/>
+                <a:cs typeface="+mn-cs"/>
+              </a:rPr>
+              <a:t>- Zamiana klas na funkcje z możliwością zarządzania stanem</a:t>
+            </a:r>
+          </a:p>
+        </p:txBody>
+      </p:sp>
+      <p:sp>
+        <p:nvSpPr>
+          <p:cNvPr id="4" name="Symbol zastępczy numeru slajdu 3"/>
+          <p:cNvSpPr>
+            <a:spLocks noGrp="1"/>
+          </p:cNvSpPr>
+          <p:nvPr>
+            <p:ph type="sldNum" sz="quarter" idx="5"/>
+          </p:nvPr>
+        </p:nvSpPr>
+        <p:spPr/>
+        <p:txBody>
+          <a:bodyPr/>
+          <a:lstStyle/>
+          <a:p>
+            <a:fld id="{810A6612-7A23-4B98-B0E9-4F3C882AD2EF}" type="slidenum">
+              <a:rPr lang="pl-PL" smtClean="0"/>
+              <a:t>34</a:t>
+            </a:fld>
+            <a:endParaRPr lang="pl-PL"/>
+          </a:p>
+        </p:txBody>
+      </p:sp>
+    </p:spTree>
+    <p:extLst>
+      <p:ext uri="{BB962C8B-B14F-4D97-AF65-F5344CB8AC3E}">
+        <p14:creationId xmlns:p14="http://schemas.microsoft.com/office/powerpoint/2010/main" val="3886764673"/>
       </p:ext>
     </p:extLst>
   </p:cSld>
@@ -28075,7 +28662,7 @@
         <p:spPr>
           <a:xfrm>
             <a:off x="497840" y="538480"/>
-            <a:ext cx="2103204" cy="369332"/>
+            <a:ext cx="2506584" cy="369332"/>
           </a:xfrm>
           <a:prstGeom prst="rect">
             <a:avLst/>
@@ -28089,16 +28676,12 @@
           <a:lstStyle/>
           <a:p>
             <a:r>
+              <a:rPr lang="pl-PL" dirty="0"/>
+              <a:t>Component </a:t>
+            </a:r>
+            <a:r>
               <a:rPr lang="pl-PL" dirty="0" err="1"/>
-              <a:t>Redux</a:t>
-            </a:r>
-            <a:r>
-              <a:rPr lang="pl-PL" dirty="0"/>
-              <a:t> - </a:t>
-            </a:r>
-            <a:r>
-              <a:rPr lang="pl-PL" dirty="0" err="1"/>
-              <a:t>introduction</a:t>
+              <a:t>composition</a:t>
             </a:r>
             <a:endParaRPr lang="pl-PL" dirty="0"/>
           </a:p>
@@ -28106,10 +28689,10 @@
       </p:sp>
       <p:sp>
         <p:nvSpPr>
-          <p:cNvPr id="6" name="Prostokąt 5">
+          <p:cNvPr id="2" name="Prostokąt 1">
             <a:extLst>
               <a:ext uri="{FF2B5EF4-FFF2-40B4-BE49-F238E27FC236}">
-                <a16:creationId xmlns:a16="http://schemas.microsoft.com/office/drawing/2014/main" id="{02CB4B36-132E-4A3A-AAF5-A1E25F7ADBC0}"/>
+                <a16:creationId xmlns:a16="http://schemas.microsoft.com/office/drawing/2014/main" id="{BD21C8F1-B87C-4A2A-8541-31EFB5B3C573}"/>
               </a:ext>
             </a:extLst>
           </p:cNvPr>
@@ -28118,71 +28701,789 @@
         </p:nvSpPr>
         <p:spPr>
           <a:xfrm>
-            <a:off x="4482078" y="1415534"/>
-            <a:ext cx="2962799" cy="369332"/>
+            <a:off x="2252868" y="1028343"/>
+            <a:ext cx="7686261" cy="1754326"/>
           </a:xfrm>
           <a:prstGeom prst="rect">
             <a:avLst/>
           </a:prstGeom>
+          <a:solidFill>
+            <a:schemeClr val="tx1"/>
+          </a:solidFill>
         </p:spPr>
         <p:txBody>
-          <a:bodyPr wrap="none">
+          <a:bodyPr wrap="square">
             <a:spAutoFit/>
           </a:bodyPr>
           <a:lstStyle/>
           <a:p>
             <a:r>
+              <a:rPr lang="pl-PL" dirty="0">
+                <a:solidFill>
+                  <a:srgbClr val="808080"/>
+                </a:solidFill>
+                <a:latin typeface="Consolas" panose="020B0609020204030204" pitchFamily="49" charset="0"/>
+              </a:rPr>
+              <a:t>&lt;</a:t>
+            </a:r>
+            <a:r>
               <a:rPr lang="pl-PL" dirty="0" err="1">
-                <a:latin typeface="SFMono-Regular"/>
-              </a:rPr>
-              <a:t>npm</a:t>
-            </a:r>
-            <a:r>
-              <a:rPr lang="pl-PL" dirty="0">
-                <a:latin typeface="SFMono-Regular"/>
-              </a:rPr>
-              <a:t> </a:t>
+                <a:solidFill>
+                  <a:srgbClr val="4EC9B0"/>
+                </a:solidFill>
+                <a:latin typeface="Consolas" panose="020B0609020204030204" pitchFamily="49" charset="0"/>
+              </a:rPr>
+              <a:t>Page</a:t>
+            </a:r>
+            <a:r>
+              <a:rPr lang="pl-PL" dirty="0">
+                <a:solidFill>
+                  <a:srgbClr val="D4D4D4"/>
+                </a:solidFill>
+                <a:latin typeface="Consolas" panose="020B0609020204030204" pitchFamily="49" charset="0"/>
+              </a:rPr>
+              <a:t> </a:t>
             </a:r>
             <a:r>
               <a:rPr lang="pl-PL" dirty="0" err="1">
-                <a:latin typeface="SFMono-Regular"/>
-              </a:rPr>
-              <a:t>install</a:t>
-            </a:r>
-            <a:r>
-              <a:rPr lang="pl-PL" dirty="0">
-                <a:latin typeface="SFMono-Regular"/>
-              </a:rPr>
-              <a:t> --</a:t>
+                <a:solidFill>
+                  <a:srgbClr val="9CDCFE"/>
+                </a:solidFill>
+                <a:latin typeface="Consolas" panose="020B0609020204030204" pitchFamily="49" charset="0"/>
+              </a:rPr>
+              <a:t>user</a:t>
+            </a:r>
+            <a:r>
+              <a:rPr lang="pl-PL" dirty="0">
+                <a:solidFill>
+                  <a:srgbClr val="D4D4D4"/>
+                </a:solidFill>
+                <a:latin typeface="Consolas" panose="020B0609020204030204" pitchFamily="49" charset="0"/>
+              </a:rPr>
+              <a:t>=</a:t>
+            </a:r>
+            <a:r>
+              <a:rPr lang="pl-PL" dirty="0">
+                <a:solidFill>
+                  <a:srgbClr val="569CD6"/>
+                </a:solidFill>
+                <a:latin typeface="Consolas" panose="020B0609020204030204" pitchFamily="49" charset="0"/>
+              </a:rPr>
+              <a:t>{</a:t>
             </a:r>
             <a:r>
               <a:rPr lang="pl-PL" dirty="0" err="1">
-                <a:latin typeface="SFMono-Regular"/>
-              </a:rPr>
-              <a:t>save</a:t>
-            </a:r>
-            <a:r>
-              <a:rPr lang="pl-PL" dirty="0">
-                <a:latin typeface="SFMono-Regular"/>
-              </a:rPr>
-              <a:t> </a:t>
+                <a:solidFill>
+                  <a:srgbClr val="9CDCFE"/>
+                </a:solidFill>
+                <a:latin typeface="Consolas" panose="020B0609020204030204" pitchFamily="49" charset="0"/>
+              </a:rPr>
+              <a:t>user</a:t>
+            </a:r>
+            <a:r>
+              <a:rPr lang="pl-PL" dirty="0">
+                <a:solidFill>
+                  <a:srgbClr val="569CD6"/>
+                </a:solidFill>
+                <a:latin typeface="Consolas" panose="020B0609020204030204" pitchFamily="49" charset="0"/>
+              </a:rPr>
+              <a:t>}</a:t>
+            </a:r>
+            <a:r>
+              <a:rPr lang="pl-PL" dirty="0">
+                <a:solidFill>
+                  <a:srgbClr val="D4D4D4"/>
+                </a:solidFill>
+                <a:latin typeface="Consolas" panose="020B0609020204030204" pitchFamily="49" charset="0"/>
+              </a:rPr>
+              <a:t> </a:t>
             </a:r>
             <a:r>
               <a:rPr lang="pl-PL" dirty="0" err="1">
-                <a:latin typeface="SFMono-Regular"/>
-              </a:rPr>
-              <a:t>react-redux</a:t>
-            </a:r>
-            <a:endParaRPr lang="pl-PL" dirty="0"/>
+                <a:solidFill>
+                  <a:srgbClr val="9CDCFE"/>
+                </a:solidFill>
+                <a:latin typeface="Consolas" panose="020B0609020204030204" pitchFamily="49" charset="0"/>
+              </a:rPr>
+              <a:t>avatarSize</a:t>
+            </a:r>
+            <a:r>
+              <a:rPr lang="pl-PL" dirty="0">
+                <a:solidFill>
+                  <a:srgbClr val="D4D4D4"/>
+                </a:solidFill>
+                <a:latin typeface="Consolas" panose="020B0609020204030204" pitchFamily="49" charset="0"/>
+              </a:rPr>
+              <a:t>=</a:t>
+            </a:r>
+            <a:r>
+              <a:rPr lang="pl-PL" dirty="0">
+                <a:solidFill>
+                  <a:srgbClr val="569CD6"/>
+                </a:solidFill>
+                <a:latin typeface="Consolas" panose="020B0609020204030204" pitchFamily="49" charset="0"/>
+              </a:rPr>
+              <a:t>{</a:t>
+            </a:r>
+            <a:r>
+              <a:rPr lang="pl-PL" dirty="0" err="1">
+                <a:solidFill>
+                  <a:srgbClr val="9CDCFE"/>
+                </a:solidFill>
+                <a:latin typeface="Consolas" panose="020B0609020204030204" pitchFamily="49" charset="0"/>
+              </a:rPr>
+              <a:t>avatarSize</a:t>
+            </a:r>
+            <a:r>
+              <a:rPr lang="pl-PL" dirty="0">
+                <a:solidFill>
+                  <a:srgbClr val="569CD6"/>
+                </a:solidFill>
+                <a:latin typeface="Consolas" panose="020B0609020204030204" pitchFamily="49" charset="0"/>
+              </a:rPr>
+              <a:t>}</a:t>
+            </a:r>
+            <a:r>
+              <a:rPr lang="pl-PL" dirty="0">
+                <a:solidFill>
+                  <a:srgbClr val="D4D4D4"/>
+                </a:solidFill>
+                <a:latin typeface="Consolas" panose="020B0609020204030204" pitchFamily="49" charset="0"/>
+              </a:rPr>
+              <a:t> </a:t>
+            </a:r>
+            <a:r>
+              <a:rPr lang="pl-PL" dirty="0">
+                <a:solidFill>
+                  <a:srgbClr val="808080"/>
+                </a:solidFill>
+                <a:latin typeface="Consolas" panose="020B0609020204030204" pitchFamily="49" charset="0"/>
+              </a:rPr>
+              <a:t>/&gt;</a:t>
+            </a:r>
+            <a:br>
+              <a:rPr lang="pl-PL" dirty="0">
+                <a:solidFill>
+                  <a:srgbClr val="D4D4D4"/>
+                </a:solidFill>
+                <a:latin typeface="Consolas" panose="020B0609020204030204" pitchFamily="49" charset="0"/>
+              </a:rPr>
+            </a:br>
+            <a:r>
+              <a:rPr lang="pl-PL" dirty="0">
+                <a:solidFill>
+                  <a:srgbClr val="808080"/>
+                </a:solidFill>
+                <a:latin typeface="Consolas" panose="020B0609020204030204" pitchFamily="49" charset="0"/>
+              </a:rPr>
+              <a:t>&lt;</a:t>
+            </a:r>
+            <a:r>
+              <a:rPr lang="pl-PL" dirty="0" err="1">
+                <a:solidFill>
+                  <a:srgbClr val="4EC9B0"/>
+                </a:solidFill>
+                <a:latin typeface="Consolas" panose="020B0609020204030204" pitchFamily="49" charset="0"/>
+              </a:rPr>
+              <a:t>PageLayout</a:t>
+            </a:r>
+            <a:r>
+              <a:rPr lang="pl-PL" dirty="0">
+                <a:solidFill>
+                  <a:srgbClr val="D4D4D4"/>
+                </a:solidFill>
+                <a:latin typeface="Consolas" panose="020B0609020204030204" pitchFamily="49" charset="0"/>
+              </a:rPr>
+              <a:t> </a:t>
+            </a:r>
+            <a:r>
+              <a:rPr lang="pl-PL" dirty="0" err="1">
+                <a:solidFill>
+                  <a:srgbClr val="9CDCFE"/>
+                </a:solidFill>
+                <a:latin typeface="Consolas" panose="020B0609020204030204" pitchFamily="49" charset="0"/>
+              </a:rPr>
+              <a:t>user</a:t>
+            </a:r>
+            <a:r>
+              <a:rPr lang="pl-PL" dirty="0">
+                <a:solidFill>
+                  <a:srgbClr val="D4D4D4"/>
+                </a:solidFill>
+                <a:latin typeface="Consolas" panose="020B0609020204030204" pitchFamily="49" charset="0"/>
+              </a:rPr>
+              <a:t>=</a:t>
+            </a:r>
+            <a:r>
+              <a:rPr lang="pl-PL" dirty="0">
+                <a:solidFill>
+                  <a:srgbClr val="569CD6"/>
+                </a:solidFill>
+                <a:latin typeface="Consolas" panose="020B0609020204030204" pitchFamily="49" charset="0"/>
+              </a:rPr>
+              <a:t>{</a:t>
+            </a:r>
+            <a:r>
+              <a:rPr lang="pl-PL" dirty="0" err="1">
+                <a:solidFill>
+                  <a:srgbClr val="9CDCFE"/>
+                </a:solidFill>
+                <a:latin typeface="Consolas" panose="020B0609020204030204" pitchFamily="49" charset="0"/>
+              </a:rPr>
+              <a:t>user</a:t>
+            </a:r>
+            <a:r>
+              <a:rPr lang="pl-PL" dirty="0">
+                <a:solidFill>
+                  <a:srgbClr val="569CD6"/>
+                </a:solidFill>
+                <a:latin typeface="Consolas" panose="020B0609020204030204" pitchFamily="49" charset="0"/>
+              </a:rPr>
+              <a:t>}</a:t>
+            </a:r>
+            <a:r>
+              <a:rPr lang="pl-PL" dirty="0">
+                <a:solidFill>
+                  <a:srgbClr val="D4D4D4"/>
+                </a:solidFill>
+                <a:latin typeface="Consolas" panose="020B0609020204030204" pitchFamily="49" charset="0"/>
+              </a:rPr>
+              <a:t> </a:t>
+            </a:r>
+            <a:r>
+              <a:rPr lang="pl-PL" dirty="0" err="1">
+                <a:solidFill>
+                  <a:srgbClr val="9CDCFE"/>
+                </a:solidFill>
+                <a:latin typeface="Consolas" panose="020B0609020204030204" pitchFamily="49" charset="0"/>
+              </a:rPr>
+              <a:t>avatarSize</a:t>
+            </a:r>
+            <a:r>
+              <a:rPr lang="pl-PL" dirty="0">
+                <a:solidFill>
+                  <a:srgbClr val="D4D4D4"/>
+                </a:solidFill>
+                <a:latin typeface="Consolas" panose="020B0609020204030204" pitchFamily="49" charset="0"/>
+              </a:rPr>
+              <a:t>=</a:t>
+            </a:r>
+            <a:r>
+              <a:rPr lang="pl-PL" dirty="0">
+                <a:solidFill>
+                  <a:srgbClr val="569CD6"/>
+                </a:solidFill>
+                <a:latin typeface="Consolas" panose="020B0609020204030204" pitchFamily="49" charset="0"/>
+              </a:rPr>
+              <a:t>{</a:t>
+            </a:r>
+            <a:r>
+              <a:rPr lang="pl-PL" dirty="0" err="1">
+                <a:solidFill>
+                  <a:srgbClr val="9CDCFE"/>
+                </a:solidFill>
+                <a:latin typeface="Consolas" panose="020B0609020204030204" pitchFamily="49" charset="0"/>
+              </a:rPr>
+              <a:t>avatarSize</a:t>
+            </a:r>
+            <a:r>
+              <a:rPr lang="pl-PL" dirty="0">
+                <a:solidFill>
+                  <a:srgbClr val="569CD6"/>
+                </a:solidFill>
+                <a:latin typeface="Consolas" panose="020B0609020204030204" pitchFamily="49" charset="0"/>
+              </a:rPr>
+              <a:t>}</a:t>
+            </a:r>
+            <a:r>
+              <a:rPr lang="pl-PL" dirty="0">
+                <a:solidFill>
+                  <a:srgbClr val="D4D4D4"/>
+                </a:solidFill>
+                <a:latin typeface="Consolas" panose="020B0609020204030204" pitchFamily="49" charset="0"/>
+              </a:rPr>
+              <a:t> </a:t>
+            </a:r>
+            <a:r>
+              <a:rPr lang="pl-PL" dirty="0">
+                <a:solidFill>
+                  <a:srgbClr val="808080"/>
+                </a:solidFill>
+                <a:latin typeface="Consolas" panose="020B0609020204030204" pitchFamily="49" charset="0"/>
+              </a:rPr>
+              <a:t>/&gt;</a:t>
+            </a:r>
+            <a:br>
+              <a:rPr lang="pl-PL" dirty="0">
+                <a:solidFill>
+                  <a:srgbClr val="D4D4D4"/>
+                </a:solidFill>
+                <a:latin typeface="Consolas" panose="020B0609020204030204" pitchFamily="49" charset="0"/>
+              </a:rPr>
+            </a:br>
+            <a:r>
+              <a:rPr lang="pl-PL" dirty="0">
+                <a:solidFill>
+                  <a:srgbClr val="808080"/>
+                </a:solidFill>
+                <a:latin typeface="Consolas" panose="020B0609020204030204" pitchFamily="49" charset="0"/>
+              </a:rPr>
+              <a:t>&lt;</a:t>
+            </a:r>
+            <a:r>
+              <a:rPr lang="pl-PL" dirty="0" err="1">
+                <a:solidFill>
+                  <a:srgbClr val="4EC9B0"/>
+                </a:solidFill>
+                <a:latin typeface="Consolas" panose="020B0609020204030204" pitchFamily="49" charset="0"/>
+              </a:rPr>
+              <a:t>NavigationBar</a:t>
+            </a:r>
+            <a:r>
+              <a:rPr lang="pl-PL" dirty="0">
+                <a:solidFill>
+                  <a:srgbClr val="D4D4D4"/>
+                </a:solidFill>
+                <a:latin typeface="Consolas" panose="020B0609020204030204" pitchFamily="49" charset="0"/>
+              </a:rPr>
+              <a:t> </a:t>
+            </a:r>
+            <a:r>
+              <a:rPr lang="pl-PL" dirty="0" err="1">
+                <a:solidFill>
+                  <a:srgbClr val="9CDCFE"/>
+                </a:solidFill>
+                <a:latin typeface="Consolas" panose="020B0609020204030204" pitchFamily="49" charset="0"/>
+              </a:rPr>
+              <a:t>user</a:t>
+            </a:r>
+            <a:r>
+              <a:rPr lang="pl-PL" dirty="0">
+                <a:solidFill>
+                  <a:srgbClr val="D4D4D4"/>
+                </a:solidFill>
+                <a:latin typeface="Consolas" panose="020B0609020204030204" pitchFamily="49" charset="0"/>
+              </a:rPr>
+              <a:t>=</a:t>
+            </a:r>
+            <a:r>
+              <a:rPr lang="pl-PL" dirty="0">
+                <a:solidFill>
+                  <a:srgbClr val="569CD6"/>
+                </a:solidFill>
+                <a:latin typeface="Consolas" panose="020B0609020204030204" pitchFamily="49" charset="0"/>
+              </a:rPr>
+              <a:t>{</a:t>
+            </a:r>
+            <a:r>
+              <a:rPr lang="pl-PL" dirty="0" err="1">
+                <a:solidFill>
+                  <a:srgbClr val="9CDCFE"/>
+                </a:solidFill>
+                <a:latin typeface="Consolas" panose="020B0609020204030204" pitchFamily="49" charset="0"/>
+              </a:rPr>
+              <a:t>user</a:t>
+            </a:r>
+            <a:r>
+              <a:rPr lang="pl-PL" dirty="0">
+                <a:solidFill>
+                  <a:srgbClr val="569CD6"/>
+                </a:solidFill>
+                <a:latin typeface="Consolas" panose="020B0609020204030204" pitchFamily="49" charset="0"/>
+              </a:rPr>
+              <a:t>}</a:t>
+            </a:r>
+            <a:r>
+              <a:rPr lang="pl-PL" dirty="0">
+                <a:solidFill>
+                  <a:srgbClr val="D4D4D4"/>
+                </a:solidFill>
+                <a:latin typeface="Consolas" panose="020B0609020204030204" pitchFamily="49" charset="0"/>
+              </a:rPr>
+              <a:t> </a:t>
+            </a:r>
+            <a:r>
+              <a:rPr lang="pl-PL" dirty="0" err="1">
+                <a:solidFill>
+                  <a:srgbClr val="9CDCFE"/>
+                </a:solidFill>
+                <a:latin typeface="Consolas" panose="020B0609020204030204" pitchFamily="49" charset="0"/>
+              </a:rPr>
+              <a:t>avatarSize</a:t>
+            </a:r>
+            <a:r>
+              <a:rPr lang="pl-PL" dirty="0">
+                <a:solidFill>
+                  <a:srgbClr val="D4D4D4"/>
+                </a:solidFill>
+                <a:latin typeface="Consolas" panose="020B0609020204030204" pitchFamily="49" charset="0"/>
+              </a:rPr>
+              <a:t>=</a:t>
+            </a:r>
+            <a:r>
+              <a:rPr lang="pl-PL" dirty="0">
+                <a:solidFill>
+                  <a:srgbClr val="569CD6"/>
+                </a:solidFill>
+                <a:latin typeface="Consolas" panose="020B0609020204030204" pitchFamily="49" charset="0"/>
+              </a:rPr>
+              <a:t>{</a:t>
+            </a:r>
+            <a:r>
+              <a:rPr lang="pl-PL" dirty="0" err="1">
+                <a:solidFill>
+                  <a:srgbClr val="9CDCFE"/>
+                </a:solidFill>
+                <a:latin typeface="Consolas" panose="020B0609020204030204" pitchFamily="49" charset="0"/>
+              </a:rPr>
+              <a:t>avatarSize</a:t>
+            </a:r>
+            <a:r>
+              <a:rPr lang="pl-PL" dirty="0">
+                <a:solidFill>
+                  <a:srgbClr val="569CD6"/>
+                </a:solidFill>
+                <a:latin typeface="Consolas" panose="020B0609020204030204" pitchFamily="49" charset="0"/>
+              </a:rPr>
+              <a:t>}</a:t>
+            </a:r>
+            <a:r>
+              <a:rPr lang="pl-PL" dirty="0">
+                <a:solidFill>
+                  <a:srgbClr val="D4D4D4"/>
+                </a:solidFill>
+                <a:latin typeface="Consolas" panose="020B0609020204030204" pitchFamily="49" charset="0"/>
+              </a:rPr>
+              <a:t> </a:t>
+            </a:r>
+            <a:r>
+              <a:rPr lang="pl-PL" dirty="0">
+                <a:solidFill>
+                  <a:srgbClr val="808080"/>
+                </a:solidFill>
+                <a:latin typeface="Consolas" panose="020B0609020204030204" pitchFamily="49" charset="0"/>
+              </a:rPr>
+              <a:t>/&gt;</a:t>
+            </a:r>
+            <a:br>
+              <a:rPr lang="pl-PL" dirty="0">
+                <a:solidFill>
+                  <a:srgbClr val="D4D4D4"/>
+                </a:solidFill>
+                <a:latin typeface="Consolas" panose="020B0609020204030204" pitchFamily="49" charset="0"/>
+              </a:rPr>
+            </a:br>
+            <a:r>
+              <a:rPr lang="pl-PL" dirty="0">
+                <a:solidFill>
+                  <a:srgbClr val="808080"/>
+                </a:solidFill>
+                <a:latin typeface="Consolas" panose="020B0609020204030204" pitchFamily="49" charset="0"/>
+              </a:rPr>
+              <a:t>&lt;</a:t>
+            </a:r>
+            <a:r>
+              <a:rPr lang="pl-PL" dirty="0">
+                <a:solidFill>
+                  <a:srgbClr val="4EC9B0"/>
+                </a:solidFill>
+                <a:latin typeface="Consolas" panose="020B0609020204030204" pitchFamily="49" charset="0"/>
+              </a:rPr>
+              <a:t>Link</a:t>
+            </a:r>
+            <a:r>
+              <a:rPr lang="pl-PL" dirty="0">
+                <a:solidFill>
+                  <a:srgbClr val="D4D4D4"/>
+                </a:solidFill>
+                <a:latin typeface="Consolas" panose="020B0609020204030204" pitchFamily="49" charset="0"/>
+              </a:rPr>
+              <a:t> </a:t>
+            </a:r>
+            <a:r>
+              <a:rPr lang="pl-PL" dirty="0" err="1">
+                <a:solidFill>
+                  <a:srgbClr val="9CDCFE"/>
+                </a:solidFill>
+                <a:latin typeface="Consolas" panose="020B0609020204030204" pitchFamily="49" charset="0"/>
+              </a:rPr>
+              <a:t>href</a:t>
+            </a:r>
+            <a:r>
+              <a:rPr lang="pl-PL" dirty="0">
+                <a:solidFill>
+                  <a:srgbClr val="D4D4D4"/>
+                </a:solidFill>
+                <a:latin typeface="Consolas" panose="020B0609020204030204" pitchFamily="49" charset="0"/>
+              </a:rPr>
+              <a:t>=</a:t>
+            </a:r>
+            <a:r>
+              <a:rPr lang="pl-PL" dirty="0">
+                <a:solidFill>
+                  <a:srgbClr val="569CD6"/>
+                </a:solidFill>
+                <a:latin typeface="Consolas" panose="020B0609020204030204" pitchFamily="49" charset="0"/>
+              </a:rPr>
+              <a:t>{</a:t>
+            </a:r>
+            <a:r>
+              <a:rPr lang="pl-PL" dirty="0" err="1">
+                <a:solidFill>
+                  <a:srgbClr val="9CDCFE"/>
+                </a:solidFill>
+                <a:latin typeface="Consolas" panose="020B0609020204030204" pitchFamily="49" charset="0"/>
+              </a:rPr>
+              <a:t>user</a:t>
+            </a:r>
+            <a:r>
+              <a:rPr lang="pl-PL" dirty="0" err="1">
+                <a:solidFill>
+                  <a:srgbClr val="D4D4D4"/>
+                </a:solidFill>
+                <a:latin typeface="Consolas" panose="020B0609020204030204" pitchFamily="49" charset="0"/>
+              </a:rPr>
+              <a:t>.</a:t>
+            </a:r>
+            <a:r>
+              <a:rPr lang="pl-PL" dirty="0" err="1">
+                <a:solidFill>
+                  <a:srgbClr val="9CDCFE"/>
+                </a:solidFill>
+                <a:latin typeface="Consolas" panose="020B0609020204030204" pitchFamily="49" charset="0"/>
+              </a:rPr>
+              <a:t>permalink</a:t>
+            </a:r>
+            <a:r>
+              <a:rPr lang="pl-PL" dirty="0">
+                <a:solidFill>
+                  <a:srgbClr val="569CD6"/>
+                </a:solidFill>
+                <a:latin typeface="Consolas" panose="020B0609020204030204" pitchFamily="49" charset="0"/>
+              </a:rPr>
+              <a:t>}</a:t>
+            </a:r>
+            <a:r>
+              <a:rPr lang="pl-PL" dirty="0">
+                <a:solidFill>
+                  <a:srgbClr val="808080"/>
+                </a:solidFill>
+                <a:latin typeface="Consolas" panose="020B0609020204030204" pitchFamily="49" charset="0"/>
+              </a:rPr>
+              <a:t>&gt;</a:t>
+            </a:r>
+            <a:endParaRPr lang="pl-PL" dirty="0">
+              <a:solidFill>
+                <a:srgbClr val="D4D4D4"/>
+              </a:solidFill>
+              <a:latin typeface="Consolas" panose="020B0609020204030204" pitchFamily="49" charset="0"/>
+            </a:endParaRPr>
+          </a:p>
+          <a:p>
+            <a:r>
+              <a:rPr lang="pl-PL" dirty="0">
+                <a:solidFill>
+                  <a:srgbClr val="D4D4D4"/>
+                </a:solidFill>
+                <a:latin typeface="Consolas" panose="020B0609020204030204" pitchFamily="49" charset="0"/>
+              </a:rPr>
+              <a:t>  </a:t>
+            </a:r>
+            <a:r>
+              <a:rPr lang="pl-PL" dirty="0">
+                <a:solidFill>
+                  <a:srgbClr val="808080"/>
+                </a:solidFill>
+                <a:latin typeface="Consolas" panose="020B0609020204030204" pitchFamily="49" charset="0"/>
+              </a:rPr>
+              <a:t>&lt;</a:t>
+            </a:r>
+            <a:r>
+              <a:rPr lang="pl-PL" dirty="0">
+                <a:solidFill>
+                  <a:srgbClr val="4EC9B0"/>
+                </a:solidFill>
+                <a:latin typeface="Consolas" panose="020B0609020204030204" pitchFamily="49" charset="0"/>
+              </a:rPr>
+              <a:t>Avatar</a:t>
+            </a:r>
+            <a:r>
+              <a:rPr lang="pl-PL" dirty="0">
+                <a:solidFill>
+                  <a:srgbClr val="D4D4D4"/>
+                </a:solidFill>
+                <a:latin typeface="Consolas" panose="020B0609020204030204" pitchFamily="49" charset="0"/>
+              </a:rPr>
+              <a:t> </a:t>
+            </a:r>
+            <a:r>
+              <a:rPr lang="pl-PL" dirty="0" err="1">
+                <a:solidFill>
+                  <a:srgbClr val="9CDCFE"/>
+                </a:solidFill>
+                <a:latin typeface="Consolas" panose="020B0609020204030204" pitchFamily="49" charset="0"/>
+              </a:rPr>
+              <a:t>user</a:t>
+            </a:r>
+            <a:r>
+              <a:rPr lang="pl-PL" dirty="0">
+                <a:solidFill>
+                  <a:srgbClr val="D4D4D4"/>
+                </a:solidFill>
+                <a:latin typeface="Consolas" panose="020B0609020204030204" pitchFamily="49" charset="0"/>
+              </a:rPr>
+              <a:t>=</a:t>
+            </a:r>
+            <a:r>
+              <a:rPr lang="pl-PL" dirty="0">
+                <a:solidFill>
+                  <a:srgbClr val="569CD6"/>
+                </a:solidFill>
+                <a:latin typeface="Consolas" panose="020B0609020204030204" pitchFamily="49" charset="0"/>
+              </a:rPr>
+              <a:t>{</a:t>
+            </a:r>
+            <a:r>
+              <a:rPr lang="pl-PL" dirty="0" err="1">
+                <a:solidFill>
+                  <a:srgbClr val="9CDCFE"/>
+                </a:solidFill>
+                <a:latin typeface="Consolas" panose="020B0609020204030204" pitchFamily="49" charset="0"/>
+              </a:rPr>
+              <a:t>user</a:t>
+            </a:r>
+            <a:r>
+              <a:rPr lang="pl-PL" dirty="0">
+                <a:solidFill>
+                  <a:srgbClr val="569CD6"/>
+                </a:solidFill>
+                <a:latin typeface="Consolas" panose="020B0609020204030204" pitchFamily="49" charset="0"/>
+              </a:rPr>
+              <a:t>}</a:t>
+            </a:r>
+            <a:r>
+              <a:rPr lang="pl-PL" dirty="0">
+                <a:solidFill>
+                  <a:srgbClr val="D4D4D4"/>
+                </a:solidFill>
+                <a:latin typeface="Consolas" panose="020B0609020204030204" pitchFamily="49" charset="0"/>
+              </a:rPr>
+              <a:t> </a:t>
+            </a:r>
+            <a:r>
+              <a:rPr lang="pl-PL" dirty="0" err="1">
+                <a:solidFill>
+                  <a:srgbClr val="9CDCFE"/>
+                </a:solidFill>
+                <a:latin typeface="Consolas" panose="020B0609020204030204" pitchFamily="49" charset="0"/>
+              </a:rPr>
+              <a:t>size</a:t>
+            </a:r>
+            <a:r>
+              <a:rPr lang="pl-PL" dirty="0">
+                <a:solidFill>
+                  <a:srgbClr val="D4D4D4"/>
+                </a:solidFill>
+                <a:latin typeface="Consolas" panose="020B0609020204030204" pitchFamily="49" charset="0"/>
+              </a:rPr>
+              <a:t>=</a:t>
+            </a:r>
+            <a:r>
+              <a:rPr lang="pl-PL" dirty="0">
+                <a:solidFill>
+                  <a:srgbClr val="569CD6"/>
+                </a:solidFill>
+                <a:latin typeface="Consolas" panose="020B0609020204030204" pitchFamily="49" charset="0"/>
+              </a:rPr>
+              <a:t>{</a:t>
+            </a:r>
+            <a:r>
+              <a:rPr lang="pl-PL" dirty="0" err="1">
+                <a:solidFill>
+                  <a:srgbClr val="9CDCFE"/>
+                </a:solidFill>
+                <a:latin typeface="Consolas" panose="020B0609020204030204" pitchFamily="49" charset="0"/>
+              </a:rPr>
+              <a:t>avatarSize</a:t>
+            </a:r>
+            <a:r>
+              <a:rPr lang="pl-PL" dirty="0">
+                <a:solidFill>
+                  <a:srgbClr val="569CD6"/>
+                </a:solidFill>
+                <a:latin typeface="Consolas" panose="020B0609020204030204" pitchFamily="49" charset="0"/>
+              </a:rPr>
+              <a:t>}</a:t>
+            </a:r>
+            <a:r>
+              <a:rPr lang="pl-PL" dirty="0">
+                <a:solidFill>
+                  <a:srgbClr val="D4D4D4"/>
+                </a:solidFill>
+                <a:latin typeface="Consolas" panose="020B0609020204030204" pitchFamily="49" charset="0"/>
+              </a:rPr>
+              <a:t> </a:t>
+            </a:r>
+            <a:r>
+              <a:rPr lang="pl-PL" dirty="0">
+                <a:solidFill>
+                  <a:srgbClr val="808080"/>
+                </a:solidFill>
+                <a:latin typeface="Consolas" panose="020B0609020204030204" pitchFamily="49" charset="0"/>
+              </a:rPr>
+              <a:t>/&gt;</a:t>
+            </a:r>
+            <a:endParaRPr lang="pl-PL" dirty="0">
+              <a:solidFill>
+                <a:srgbClr val="D4D4D4"/>
+              </a:solidFill>
+              <a:latin typeface="Consolas" panose="020B0609020204030204" pitchFamily="49" charset="0"/>
+            </a:endParaRPr>
+          </a:p>
+          <a:p>
+            <a:r>
+              <a:rPr lang="pl-PL" dirty="0">
+                <a:solidFill>
+                  <a:srgbClr val="808080"/>
+                </a:solidFill>
+                <a:latin typeface="Consolas" panose="020B0609020204030204" pitchFamily="49" charset="0"/>
+              </a:rPr>
+              <a:t>&lt;/</a:t>
+            </a:r>
+            <a:r>
+              <a:rPr lang="pl-PL" dirty="0">
+                <a:solidFill>
+                  <a:srgbClr val="4EC9B0"/>
+                </a:solidFill>
+                <a:latin typeface="Consolas" panose="020B0609020204030204" pitchFamily="49" charset="0"/>
+              </a:rPr>
+              <a:t>Link</a:t>
+            </a:r>
+            <a:r>
+              <a:rPr lang="pl-PL" dirty="0">
+                <a:solidFill>
+                  <a:srgbClr val="808080"/>
+                </a:solidFill>
+                <a:latin typeface="Consolas" panose="020B0609020204030204" pitchFamily="49" charset="0"/>
+              </a:rPr>
+              <a:t>&gt;</a:t>
+            </a:r>
+            <a:endParaRPr lang="pl-PL" b="0" dirty="0">
+              <a:solidFill>
+                <a:srgbClr val="D4D4D4"/>
+              </a:solidFill>
+              <a:effectLst/>
+              <a:latin typeface="Consolas" panose="020B0609020204030204" pitchFamily="49" charset="0"/>
+            </a:endParaRPr>
           </a:p>
         </p:txBody>
       </p:sp>
       <p:sp>
         <p:nvSpPr>
-          <p:cNvPr id="7" name="Prostokąt 6">
+          <p:cNvPr id="3" name="Prostokąt 2">
             <a:extLst>
               <a:ext uri="{FF2B5EF4-FFF2-40B4-BE49-F238E27FC236}">
-                <a16:creationId xmlns:a16="http://schemas.microsoft.com/office/drawing/2014/main" id="{8BF58E04-F447-4CA1-AC77-99E7122E8C0C}"/>
+                <a16:creationId xmlns:a16="http://schemas.microsoft.com/office/drawing/2014/main" id="{8D519BB6-E878-4624-BDDA-A767B260BCE2}"/>
               </a:ext>
             </a:extLst>
           </p:cNvPr>
@@ -28191,12 +29492,15 @@
         </p:nvSpPr>
         <p:spPr>
           <a:xfrm>
-            <a:off x="4482077" y="1784866"/>
-            <a:ext cx="2962799" cy="369332"/>
+            <a:off x="159948" y="2903200"/>
+            <a:ext cx="11872103" cy="3416320"/>
           </a:xfrm>
           <a:prstGeom prst="rect">
             <a:avLst/>
           </a:prstGeom>
+          <a:solidFill>
+            <a:schemeClr val="tx1"/>
+          </a:solidFill>
         </p:spPr>
         <p:txBody>
           <a:bodyPr wrap="square">
@@ -28207,53 +29511,1063 @@
             <a:r>
               <a:rPr lang="pl-PL" dirty="0" err="1">
                 <a:solidFill>
-                  <a:srgbClr val="000000"/>
-                </a:solidFill>
-                <a:latin typeface="inherit"/>
-              </a:rPr>
-              <a:t>npm</a:t>
-            </a:r>
-            <a:r>
-              <a:rPr lang="pl-PL" dirty="0">
-                <a:solidFill>
-                  <a:srgbClr val="000000"/>
-                </a:solidFill>
-                <a:latin typeface="inherit"/>
-              </a:rPr>
-              <a:t> i </a:t>
+                  <a:srgbClr val="569CD6"/>
+                </a:solidFill>
+                <a:latin typeface="Consolas" panose="020B0609020204030204" pitchFamily="49" charset="0"/>
+              </a:rPr>
+              <a:t>function</a:t>
+            </a:r>
+            <a:r>
+              <a:rPr lang="pl-PL" dirty="0">
+                <a:solidFill>
+                  <a:srgbClr val="D4D4D4"/>
+                </a:solidFill>
+                <a:latin typeface="Consolas" panose="020B0609020204030204" pitchFamily="49" charset="0"/>
+              </a:rPr>
+              <a:t> </a:t>
             </a:r>
             <a:r>
               <a:rPr lang="pl-PL" dirty="0" err="1">
                 <a:solidFill>
-                  <a:srgbClr val="000000"/>
-                </a:solidFill>
-                <a:latin typeface="inherit"/>
-              </a:rPr>
-              <a:t>redux</a:t>
-            </a:r>
-            <a:r>
-              <a:rPr lang="pl-PL" dirty="0">
-                <a:solidFill>
-                  <a:srgbClr val="000000"/>
-                </a:solidFill>
-                <a:latin typeface="inherit"/>
-              </a:rPr>
-              <a:t> --</a:t>
+                  <a:srgbClr val="DCDCAA"/>
+                </a:solidFill>
+                <a:latin typeface="Consolas" panose="020B0609020204030204" pitchFamily="49" charset="0"/>
+              </a:rPr>
+              <a:t>Page</a:t>
+            </a:r>
+            <a:r>
+              <a:rPr lang="pl-PL" dirty="0">
+                <a:solidFill>
+                  <a:srgbClr val="D4D4D4"/>
+                </a:solidFill>
+                <a:latin typeface="Consolas" panose="020B0609020204030204" pitchFamily="49" charset="0"/>
+              </a:rPr>
+              <a:t>(</a:t>
             </a:r>
             <a:r>
               <a:rPr lang="pl-PL" dirty="0" err="1">
                 <a:solidFill>
-                  <a:srgbClr val="000000"/>
-                </a:solidFill>
-                <a:latin typeface="inherit"/>
-              </a:rPr>
-              <a:t>save-dev</a:t>
+                  <a:srgbClr val="9CDCFE"/>
+                </a:solidFill>
+                <a:latin typeface="Consolas" panose="020B0609020204030204" pitchFamily="49" charset="0"/>
+              </a:rPr>
+              <a:t>props</a:t>
+            </a:r>
+            <a:r>
+              <a:rPr lang="pl-PL" dirty="0">
+                <a:solidFill>
+                  <a:srgbClr val="D4D4D4"/>
+                </a:solidFill>
+                <a:latin typeface="Consolas" panose="020B0609020204030204" pitchFamily="49" charset="0"/>
+              </a:rPr>
+              <a:t>) {</a:t>
+            </a:r>
+          </a:p>
+          <a:p>
+            <a:r>
+              <a:rPr lang="pl-PL" dirty="0">
+                <a:solidFill>
+                  <a:srgbClr val="D4D4D4"/>
+                </a:solidFill>
+                <a:latin typeface="Consolas" panose="020B0609020204030204" pitchFamily="49" charset="0"/>
+              </a:rPr>
+              <a:t>    </a:t>
+            </a:r>
+            <a:r>
+              <a:rPr lang="pl-PL" dirty="0" err="1">
+                <a:solidFill>
+                  <a:srgbClr val="569CD6"/>
+                </a:solidFill>
+                <a:latin typeface="Consolas" panose="020B0609020204030204" pitchFamily="49" charset="0"/>
+              </a:rPr>
+              <a:t>const</a:t>
+            </a:r>
+            <a:r>
+              <a:rPr lang="pl-PL" dirty="0">
+                <a:solidFill>
+                  <a:srgbClr val="D4D4D4"/>
+                </a:solidFill>
+                <a:latin typeface="Consolas" panose="020B0609020204030204" pitchFamily="49" charset="0"/>
+              </a:rPr>
+              <a:t> </a:t>
+            </a:r>
+            <a:r>
+              <a:rPr lang="pl-PL" dirty="0" err="1">
+                <a:solidFill>
+                  <a:srgbClr val="9CDCFE"/>
+                </a:solidFill>
+                <a:latin typeface="Consolas" panose="020B0609020204030204" pitchFamily="49" charset="0"/>
+              </a:rPr>
+              <a:t>user</a:t>
+            </a:r>
+            <a:r>
+              <a:rPr lang="pl-PL" dirty="0">
+                <a:solidFill>
+                  <a:srgbClr val="D4D4D4"/>
+                </a:solidFill>
+                <a:latin typeface="Consolas" panose="020B0609020204030204" pitchFamily="49" charset="0"/>
+              </a:rPr>
+              <a:t> = </a:t>
+            </a:r>
+            <a:r>
+              <a:rPr lang="pl-PL" dirty="0" err="1">
+                <a:solidFill>
+                  <a:srgbClr val="9CDCFE"/>
+                </a:solidFill>
+                <a:latin typeface="Consolas" panose="020B0609020204030204" pitchFamily="49" charset="0"/>
+              </a:rPr>
+              <a:t>props</a:t>
+            </a:r>
+            <a:r>
+              <a:rPr lang="pl-PL" dirty="0" err="1">
+                <a:solidFill>
+                  <a:srgbClr val="D4D4D4"/>
+                </a:solidFill>
+                <a:latin typeface="Consolas" panose="020B0609020204030204" pitchFamily="49" charset="0"/>
+              </a:rPr>
+              <a:t>.</a:t>
+            </a:r>
+            <a:r>
+              <a:rPr lang="pl-PL" dirty="0" err="1">
+                <a:solidFill>
+                  <a:srgbClr val="9CDCFE"/>
+                </a:solidFill>
+                <a:latin typeface="Consolas" panose="020B0609020204030204" pitchFamily="49" charset="0"/>
+              </a:rPr>
+              <a:t>user</a:t>
+            </a:r>
+            <a:r>
+              <a:rPr lang="pl-PL" dirty="0">
+                <a:solidFill>
+                  <a:srgbClr val="D4D4D4"/>
+                </a:solidFill>
+                <a:latin typeface="Consolas" panose="020B0609020204030204" pitchFamily="49" charset="0"/>
+              </a:rPr>
+              <a:t>;</a:t>
+            </a:r>
+          </a:p>
+          <a:p>
+            <a:r>
+              <a:rPr lang="pl-PL" dirty="0">
+                <a:solidFill>
+                  <a:srgbClr val="D4D4D4"/>
+                </a:solidFill>
+                <a:latin typeface="Consolas" panose="020B0609020204030204" pitchFamily="49" charset="0"/>
+              </a:rPr>
+              <a:t>    </a:t>
+            </a:r>
+            <a:r>
+              <a:rPr lang="pl-PL" dirty="0" err="1">
+                <a:solidFill>
+                  <a:srgbClr val="569CD6"/>
+                </a:solidFill>
+                <a:latin typeface="Consolas" panose="020B0609020204030204" pitchFamily="49" charset="0"/>
+              </a:rPr>
+              <a:t>const</a:t>
+            </a:r>
+            <a:r>
+              <a:rPr lang="pl-PL" dirty="0">
+                <a:solidFill>
+                  <a:srgbClr val="D4D4D4"/>
+                </a:solidFill>
+                <a:latin typeface="Consolas" panose="020B0609020204030204" pitchFamily="49" charset="0"/>
+              </a:rPr>
+              <a:t> </a:t>
+            </a:r>
+            <a:r>
+              <a:rPr lang="pl-PL" dirty="0" err="1">
+                <a:solidFill>
+                  <a:srgbClr val="DCDCAA"/>
+                </a:solidFill>
+                <a:latin typeface="Consolas" panose="020B0609020204030204" pitchFamily="49" charset="0"/>
+              </a:rPr>
+              <a:t>userLink</a:t>
+            </a:r>
+            <a:r>
+              <a:rPr lang="pl-PL" dirty="0">
+                <a:solidFill>
+                  <a:srgbClr val="D4D4D4"/>
+                </a:solidFill>
+                <a:latin typeface="Consolas" panose="020B0609020204030204" pitchFamily="49" charset="0"/>
+              </a:rPr>
+              <a:t> = (</a:t>
+            </a:r>
+          </a:p>
+          <a:p>
+            <a:r>
+              <a:rPr lang="pl-PL" dirty="0">
+                <a:solidFill>
+                  <a:srgbClr val="D4D4D4"/>
+                </a:solidFill>
+                <a:latin typeface="Consolas" panose="020B0609020204030204" pitchFamily="49" charset="0"/>
+              </a:rPr>
+              <a:t>      </a:t>
+            </a:r>
+            <a:r>
+              <a:rPr lang="pl-PL" dirty="0">
+                <a:solidFill>
+                  <a:srgbClr val="808080"/>
+                </a:solidFill>
+                <a:latin typeface="Consolas" panose="020B0609020204030204" pitchFamily="49" charset="0"/>
+              </a:rPr>
+              <a:t>&lt;</a:t>
+            </a:r>
+            <a:r>
+              <a:rPr lang="pl-PL" dirty="0">
+                <a:solidFill>
+                  <a:srgbClr val="4EC9B0"/>
+                </a:solidFill>
+                <a:latin typeface="Consolas" panose="020B0609020204030204" pitchFamily="49" charset="0"/>
+              </a:rPr>
+              <a:t>Link</a:t>
+            </a:r>
+            <a:r>
+              <a:rPr lang="pl-PL" dirty="0">
+                <a:solidFill>
+                  <a:srgbClr val="D4D4D4"/>
+                </a:solidFill>
+                <a:latin typeface="Consolas" panose="020B0609020204030204" pitchFamily="49" charset="0"/>
+              </a:rPr>
+              <a:t> </a:t>
+            </a:r>
+            <a:r>
+              <a:rPr lang="pl-PL" dirty="0" err="1">
+                <a:solidFill>
+                  <a:srgbClr val="9CDCFE"/>
+                </a:solidFill>
+                <a:latin typeface="Consolas" panose="020B0609020204030204" pitchFamily="49" charset="0"/>
+              </a:rPr>
+              <a:t>href</a:t>
+            </a:r>
+            <a:r>
+              <a:rPr lang="pl-PL" dirty="0">
+                <a:solidFill>
+                  <a:srgbClr val="D4D4D4"/>
+                </a:solidFill>
+                <a:latin typeface="Consolas" panose="020B0609020204030204" pitchFamily="49" charset="0"/>
+              </a:rPr>
+              <a:t>=</a:t>
+            </a:r>
+            <a:r>
+              <a:rPr lang="pl-PL" dirty="0">
+                <a:solidFill>
+                  <a:srgbClr val="569CD6"/>
+                </a:solidFill>
+                <a:latin typeface="Consolas" panose="020B0609020204030204" pitchFamily="49" charset="0"/>
+              </a:rPr>
+              <a:t>{</a:t>
+            </a:r>
+            <a:r>
+              <a:rPr lang="pl-PL" dirty="0" err="1">
+                <a:solidFill>
+                  <a:srgbClr val="9CDCFE"/>
+                </a:solidFill>
+                <a:latin typeface="Consolas" panose="020B0609020204030204" pitchFamily="49" charset="0"/>
+              </a:rPr>
+              <a:t>user</a:t>
+            </a:r>
+            <a:r>
+              <a:rPr lang="pl-PL" dirty="0" err="1">
+                <a:solidFill>
+                  <a:srgbClr val="D4D4D4"/>
+                </a:solidFill>
+                <a:latin typeface="Consolas" panose="020B0609020204030204" pitchFamily="49" charset="0"/>
+              </a:rPr>
+              <a:t>.</a:t>
+            </a:r>
+            <a:r>
+              <a:rPr lang="pl-PL" dirty="0" err="1">
+                <a:solidFill>
+                  <a:srgbClr val="9CDCFE"/>
+                </a:solidFill>
+                <a:latin typeface="Consolas" panose="020B0609020204030204" pitchFamily="49" charset="0"/>
+              </a:rPr>
+              <a:t>permalink</a:t>
+            </a:r>
+            <a:r>
+              <a:rPr lang="pl-PL" dirty="0">
+                <a:solidFill>
+                  <a:srgbClr val="569CD6"/>
+                </a:solidFill>
+                <a:latin typeface="Consolas" panose="020B0609020204030204" pitchFamily="49" charset="0"/>
+              </a:rPr>
+              <a:t>}</a:t>
+            </a:r>
+            <a:r>
+              <a:rPr lang="pl-PL" dirty="0">
+                <a:solidFill>
+                  <a:srgbClr val="808080"/>
+                </a:solidFill>
+                <a:latin typeface="Consolas" panose="020B0609020204030204" pitchFamily="49" charset="0"/>
+              </a:rPr>
+              <a:t>&gt;&lt;</a:t>
+            </a:r>
+            <a:r>
+              <a:rPr lang="pl-PL" dirty="0">
+                <a:solidFill>
+                  <a:srgbClr val="4EC9B0"/>
+                </a:solidFill>
+                <a:latin typeface="Consolas" panose="020B0609020204030204" pitchFamily="49" charset="0"/>
+              </a:rPr>
+              <a:t>Avatar</a:t>
+            </a:r>
+            <a:r>
+              <a:rPr lang="pl-PL" dirty="0">
+                <a:solidFill>
+                  <a:srgbClr val="D4D4D4"/>
+                </a:solidFill>
+                <a:latin typeface="Consolas" panose="020B0609020204030204" pitchFamily="49" charset="0"/>
+              </a:rPr>
+              <a:t> </a:t>
+            </a:r>
+            <a:r>
+              <a:rPr lang="pl-PL" dirty="0" err="1">
+                <a:solidFill>
+                  <a:srgbClr val="9CDCFE"/>
+                </a:solidFill>
+                <a:latin typeface="Consolas" panose="020B0609020204030204" pitchFamily="49" charset="0"/>
+              </a:rPr>
+              <a:t>user</a:t>
+            </a:r>
+            <a:r>
+              <a:rPr lang="pl-PL" dirty="0">
+                <a:solidFill>
+                  <a:srgbClr val="D4D4D4"/>
+                </a:solidFill>
+                <a:latin typeface="Consolas" panose="020B0609020204030204" pitchFamily="49" charset="0"/>
+              </a:rPr>
+              <a:t>=</a:t>
+            </a:r>
+            <a:r>
+              <a:rPr lang="pl-PL" dirty="0">
+                <a:solidFill>
+                  <a:srgbClr val="569CD6"/>
+                </a:solidFill>
+                <a:latin typeface="Consolas" panose="020B0609020204030204" pitchFamily="49" charset="0"/>
+              </a:rPr>
+              <a:t>{</a:t>
+            </a:r>
+            <a:r>
+              <a:rPr lang="pl-PL" dirty="0" err="1">
+                <a:solidFill>
+                  <a:srgbClr val="9CDCFE"/>
+                </a:solidFill>
+                <a:latin typeface="Consolas" panose="020B0609020204030204" pitchFamily="49" charset="0"/>
+              </a:rPr>
+              <a:t>user</a:t>
+            </a:r>
+            <a:r>
+              <a:rPr lang="pl-PL" dirty="0">
+                <a:solidFill>
+                  <a:srgbClr val="569CD6"/>
+                </a:solidFill>
+                <a:latin typeface="Consolas" panose="020B0609020204030204" pitchFamily="49" charset="0"/>
+              </a:rPr>
+              <a:t>}</a:t>
+            </a:r>
+            <a:r>
+              <a:rPr lang="pl-PL" dirty="0">
+                <a:solidFill>
+                  <a:srgbClr val="D4D4D4"/>
+                </a:solidFill>
+                <a:latin typeface="Consolas" panose="020B0609020204030204" pitchFamily="49" charset="0"/>
+              </a:rPr>
+              <a:t> </a:t>
+            </a:r>
+            <a:r>
+              <a:rPr lang="pl-PL" dirty="0" err="1">
+                <a:solidFill>
+                  <a:srgbClr val="9CDCFE"/>
+                </a:solidFill>
+                <a:latin typeface="Consolas" panose="020B0609020204030204" pitchFamily="49" charset="0"/>
+              </a:rPr>
+              <a:t>size</a:t>
+            </a:r>
+            <a:r>
+              <a:rPr lang="pl-PL" dirty="0">
+                <a:solidFill>
+                  <a:srgbClr val="D4D4D4"/>
+                </a:solidFill>
+                <a:latin typeface="Consolas" panose="020B0609020204030204" pitchFamily="49" charset="0"/>
+              </a:rPr>
+              <a:t>=</a:t>
+            </a:r>
+            <a:r>
+              <a:rPr lang="pl-PL" dirty="0">
+                <a:solidFill>
+                  <a:srgbClr val="569CD6"/>
+                </a:solidFill>
+                <a:latin typeface="Consolas" panose="020B0609020204030204" pitchFamily="49" charset="0"/>
+              </a:rPr>
+              <a:t>{</a:t>
+            </a:r>
+            <a:r>
+              <a:rPr lang="pl-PL" dirty="0" err="1">
+                <a:solidFill>
+                  <a:srgbClr val="9CDCFE"/>
+                </a:solidFill>
+                <a:latin typeface="Consolas" panose="020B0609020204030204" pitchFamily="49" charset="0"/>
+              </a:rPr>
+              <a:t>props</a:t>
+            </a:r>
+            <a:r>
+              <a:rPr lang="pl-PL" dirty="0" err="1">
+                <a:solidFill>
+                  <a:srgbClr val="D4D4D4"/>
+                </a:solidFill>
+                <a:latin typeface="Consolas" panose="020B0609020204030204" pitchFamily="49" charset="0"/>
+              </a:rPr>
+              <a:t>.</a:t>
+            </a:r>
+            <a:r>
+              <a:rPr lang="pl-PL" dirty="0" err="1">
+                <a:solidFill>
+                  <a:srgbClr val="9CDCFE"/>
+                </a:solidFill>
+                <a:latin typeface="Consolas" panose="020B0609020204030204" pitchFamily="49" charset="0"/>
+              </a:rPr>
+              <a:t>avatarSize</a:t>
+            </a:r>
+            <a:r>
+              <a:rPr lang="pl-PL" dirty="0">
+                <a:solidFill>
+                  <a:srgbClr val="569CD6"/>
+                </a:solidFill>
+                <a:latin typeface="Consolas" panose="020B0609020204030204" pitchFamily="49" charset="0"/>
+              </a:rPr>
+              <a:t>}</a:t>
+            </a:r>
+            <a:r>
+              <a:rPr lang="pl-PL" dirty="0">
+                <a:solidFill>
+                  <a:srgbClr val="D4D4D4"/>
+                </a:solidFill>
+                <a:latin typeface="Consolas" panose="020B0609020204030204" pitchFamily="49" charset="0"/>
+              </a:rPr>
+              <a:t> </a:t>
+            </a:r>
+            <a:r>
+              <a:rPr lang="pl-PL" dirty="0">
+                <a:solidFill>
+                  <a:srgbClr val="808080"/>
+                </a:solidFill>
+                <a:latin typeface="Consolas" panose="020B0609020204030204" pitchFamily="49" charset="0"/>
+              </a:rPr>
+              <a:t>/&gt;&lt;/</a:t>
+            </a:r>
+            <a:r>
+              <a:rPr lang="pl-PL" dirty="0">
+                <a:solidFill>
+                  <a:srgbClr val="4EC9B0"/>
+                </a:solidFill>
+                <a:latin typeface="Consolas" panose="020B0609020204030204" pitchFamily="49" charset="0"/>
+              </a:rPr>
+              <a:t>Link</a:t>
+            </a:r>
+            <a:r>
+              <a:rPr lang="pl-PL" dirty="0">
+                <a:solidFill>
+                  <a:srgbClr val="808080"/>
+                </a:solidFill>
+                <a:latin typeface="Consolas" panose="020B0609020204030204" pitchFamily="49" charset="0"/>
+              </a:rPr>
+              <a:t>&gt;</a:t>
             </a:r>
             <a:endParaRPr lang="pl-PL" dirty="0">
               <a:solidFill>
-                <a:srgbClr val="444444"/>
+                <a:srgbClr val="D4D4D4"/>
               </a:solidFill>
-              <a:latin typeface="Source Code Pro"/>
+              <a:latin typeface="Consolas" panose="020B0609020204030204" pitchFamily="49" charset="0"/>
+            </a:endParaRPr>
+          </a:p>
+          <a:p>
+            <a:r>
+              <a:rPr lang="pl-PL" dirty="0">
+                <a:solidFill>
+                  <a:srgbClr val="D4D4D4"/>
+                </a:solidFill>
+                <a:latin typeface="Consolas" panose="020B0609020204030204" pitchFamily="49" charset="0"/>
+              </a:rPr>
+              <a:t>    );</a:t>
+            </a:r>
+          </a:p>
+          <a:p>
+            <a:r>
+              <a:rPr lang="pl-PL" dirty="0">
+                <a:solidFill>
+                  <a:srgbClr val="D4D4D4"/>
+                </a:solidFill>
+                <a:latin typeface="Consolas" panose="020B0609020204030204" pitchFamily="49" charset="0"/>
+              </a:rPr>
+              <a:t>    </a:t>
+            </a:r>
+            <a:r>
+              <a:rPr lang="pl-PL" dirty="0">
+                <a:solidFill>
+                  <a:srgbClr val="C586C0"/>
+                </a:solidFill>
+                <a:latin typeface="Consolas" panose="020B0609020204030204" pitchFamily="49" charset="0"/>
+              </a:rPr>
+              <a:t>return</a:t>
+            </a:r>
+            <a:r>
+              <a:rPr lang="pl-PL" dirty="0">
+                <a:solidFill>
+                  <a:srgbClr val="D4D4D4"/>
+                </a:solidFill>
+                <a:latin typeface="Consolas" panose="020B0609020204030204" pitchFamily="49" charset="0"/>
+              </a:rPr>
+              <a:t> </a:t>
+            </a:r>
+            <a:r>
+              <a:rPr lang="pl-PL" dirty="0">
+                <a:solidFill>
+                  <a:srgbClr val="808080"/>
+                </a:solidFill>
+                <a:latin typeface="Consolas" panose="020B0609020204030204" pitchFamily="49" charset="0"/>
+              </a:rPr>
+              <a:t>&lt;</a:t>
+            </a:r>
+            <a:r>
+              <a:rPr lang="pl-PL" dirty="0" err="1">
+                <a:solidFill>
+                  <a:srgbClr val="4EC9B0"/>
+                </a:solidFill>
+                <a:latin typeface="Consolas" panose="020B0609020204030204" pitchFamily="49" charset="0"/>
+              </a:rPr>
+              <a:t>PageLayout</a:t>
+            </a:r>
+            <a:r>
+              <a:rPr lang="pl-PL" dirty="0">
+                <a:solidFill>
+                  <a:srgbClr val="D4D4D4"/>
+                </a:solidFill>
+                <a:latin typeface="Consolas" panose="020B0609020204030204" pitchFamily="49" charset="0"/>
+              </a:rPr>
+              <a:t> </a:t>
+            </a:r>
+            <a:r>
+              <a:rPr lang="pl-PL" dirty="0" err="1">
+                <a:solidFill>
+                  <a:srgbClr val="9CDCFE"/>
+                </a:solidFill>
+                <a:latin typeface="Consolas" panose="020B0609020204030204" pitchFamily="49" charset="0"/>
+              </a:rPr>
+              <a:t>userLink</a:t>
+            </a:r>
+            <a:r>
+              <a:rPr lang="pl-PL" dirty="0">
+                <a:solidFill>
+                  <a:srgbClr val="D4D4D4"/>
+                </a:solidFill>
+                <a:latin typeface="Consolas" panose="020B0609020204030204" pitchFamily="49" charset="0"/>
+              </a:rPr>
+              <a:t>=</a:t>
+            </a:r>
+            <a:r>
+              <a:rPr lang="pl-PL" dirty="0">
+                <a:solidFill>
+                  <a:srgbClr val="569CD6"/>
+                </a:solidFill>
+                <a:latin typeface="Consolas" panose="020B0609020204030204" pitchFamily="49" charset="0"/>
+              </a:rPr>
+              <a:t>{</a:t>
+            </a:r>
+            <a:r>
+              <a:rPr lang="pl-PL" dirty="0" err="1">
+                <a:solidFill>
+                  <a:srgbClr val="9CDCFE"/>
+                </a:solidFill>
+                <a:latin typeface="Consolas" panose="020B0609020204030204" pitchFamily="49" charset="0"/>
+              </a:rPr>
+              <a:t>userLink</a:t>
+            </a:r>
+            <a:r>
+              <a:rPr lang="pl-PL" dirty="0">
+                <a:solidFill>
+                  <a:srgbClr val="569CD6"/>
+                </a:solidFill>
+                <a:latin typeface="Consolas" panose="020B0609020204030204" pitchFamily="49" charset="0"/>
+              </a:rPr>
+              <a:t>}</a:t>
+            </a:r>
+            <a:r>
+              <a:rPr lang="pl-PL" dirty="0">
+                <a:solidFill>
+                  <a:srgbClr val="D4D4D4"/>
+                </a:solidFill>
+                <a:latin typeface="Consolas" panose="020B0609020204030204" pitchFamily="49" charset="0"/>
+              </a:rPr>
+              <a:t> </a:t>
+            </a:r>
+            <a:r>
+              <a:rPr lang="pl-PL" dirty="0">
+                <a:solidFill>
+                  <a:srgbClr val="808080"/>
+                </a:solidFill>
+                <a:latin typeface="Consolas" panose="020B0609020204030204" pitchFamily="49" charset="0"/>
+              </a:rPr>
+              <a:t>/&gt;</a:t>
+            </a:r>
+            <a:r>
+              <a:rPr lang="pl-PL" dirty="0">
+                <a:solidFill>
+                  <a:srgbClr val="D4D4D4"/>
+                </a:solidFill>
+                <a:latin typeface="Consolas" panose="020B0609020204030204" pitchFamily="49" charset="0"/>
+              </a:rPr>
+              <a:t>;</a:t>
+            </a:r>
+          </a:p>
+          <a:p>
+            <a:r>
+              <a:rPr lang="pl-PL" dirty="0">
+                <a:solidFill>
+                  <a:srgbClr val="D4D4D4"/>
+                </a:solidFill>
+                <a:latin typeface="Consolas" panose="020B0609020204030204" pitchFamily="49" charset="0"/>
+              </a:rPr>
+              <a:t>  }</a:t>
+            </a:r>
+          </a:p>
+          <a:p>
+            <a:r>
+              <a:rPr lang="pl-PL" dirty="0">
+                <a:solidFill>
+                  <a:srgbClr val="D4D4D4"/>
+                </a:solidFill>
+                <a:latin typeface="Consolas" panose="020B0609020204030204" pitchFamily="49" charset="0"/>
+              </a:rPr>
+              <a:t>  </a:t>
+            </a:r>
+          </a:p>
+          <a:p>
+            <a:r>
+              <a:rPr lang="pl-PL" dirty="0">
+                <a:solidFill>
+                  <a:srgbClr val="D4D4D4"/>
+                </a:solidFill>
+                <a:latin typeface="Consolas" panose="020B0609020204030204" pitchFamily="49" charset="0"/>
+              </a:rPr>
+              <a:t>  </a:t>
+            </a:r>
+            <a:r>
+              <a:rPr lang="pl-PL" dirty="0">
+                <a:solidFill>
+                  <a:srgbClr val="808080"/>
+                </a:solidFill>
+                <a:latin typeface="Consolas" panose="020B0609020204030204" pitchFamily="49" charset="0"/>
+              </a:rPr>
+              <a:t>&lt;</a:t>
+            </a:r>
+            <a:r>
+              <a:rPr lang="pl-PL" dirty="0" err="1">
+                <a:solidFill>
+                  <a:srgbClr val="4EC9B0"/>
+                </a:solidFill>
+                <a:latin typeface="Consolas" panose="020B0609020204030204" pitchFamily="49" charset="0"/>
+              </a:rPr>
+              <a:t>Page</a:t>
+            </a:r>
+            <a:r>
+              <a:rPr lang="pl-PL" dirty="0">
+                <a:solidFill>
+                  <a:srgbClr val="D4D4D4"/>
+                </a:solidFill>
+                <a:latin typeface="Consolas" panose="020B0609020204030204" pitchFamily="49" charset="0"/>
+              </a:rPr>
+              <a:t> </a:t>
+            </a:r>
+            <a:r>
+              <a:rPr lang="pl-PL" dirty="0" err="1">
+                <a:solidFill>
+                  <a:srgbClr val="9CDCFE"/>
+                </a:solidFill>
+                <a:latin typeface="Consolas" panose="020B0609020204030204" pitchFamily="49" charset="0"/>
+              </a:rPr>
+              <a:t>user</a:t>
+            </a:r>
+            <a:r>
+              <a:rPr lang="pl-PL" dirty="0">
+                <a:solidFill>
+                  <a:srgbClr val="D4D4D4"/>
+                </a:solidFill>
+                <a:latin typeface="Consolas" panose="020B0609020204030204" pitchFamily="49" charset="0"/>
+              </a:rPr>
+              <a:t>=</a:t>
+            </a:r>
+            <a:r>
+              <a:rPr lang="pl-PL" dirty="0">
+                <a:solidFill>
+                  <a:srgbClr val="569CD6"/>
+                </a:solidFill>
+                <a:latin typeface="Consolas" panose="020B0609020204030204" pitchFamily="49" charset="0"/>
+              </a:rPr>
+              <a:t>{</a:t>
+            </a:r>
+            <a:r>
+              <a:rPr lang="pl-PL" dirty="0" err="1">
+                <a:solidFill>
+                  <a:srgbClr val="9CDCFE"/>
+                </a:solidFill>
+                <a:latin typeface="Consolas" panose="020B0609020204030204" pitchFamily="49" charset="0"/>
+              </a:rPr>
+              <a:t>user</a:t>
+            </a:r>
+            <a:r>
+              <a:rPr lang="pl-PL" dirty="0">
+                <a:solidFill>
+                  <a:srgbClr val="569CD6"/>
+                </a:solidFill>
+                <a:latin typeface="Consolas" panose="020B0609020204030204" pitchFamily="49" charset="0"/>
+              </a:rPr>
+              <a:t>}</a:t>
+            </a:r>
+            <a:r>
+              <a:rPr lang="pl-PL" dirty="0">
+                <a:solidFill>
+                  <a:srgbClr val="D4D4D4"/>
+                </a:solidFill>
+                <a:latin typeface="Consolas" panose="020B0609020204030204" pitchFamily="49" charset="0"/>
+              </a:rPr>
+              <a:t> </a:t>
+            </a:r>
+            <a:r>
+              <a:rPr lang="pl-PL" dirty="0" err="1">
+                <a:solidFill>
+                  <a:srgbClr val="9CDCFE"/>
+                </a:solidFill>
+                <a:latin typeface="Consolas" panose="020B0609020204030204" pitchFamily="49" charset="0"/>
+              </a:rPr>
+              <a:t>avatarSize</a:t>
+            </a:r>
+            <a:r>
+              <a:rPr lang="pl-PL" dirty="0">
+                <a:solidFill>
+                  <a:srgbClr val="D4D4D4"/>
+                </a:solidFill>
+                <a:latin typeface="Consolas" panose="020B0609020204030204" pitchFamily="49" charset="0"/>
+              </a:rPr>
+              <a:t>=</a:t>
+            </a:r>
+            <a:r>
+              <a:rPr lang="pl-PL" dirty="0">
+                <a:solidFill>
+                  <a:srgbClr val="569CD6"/>
+                </a:solidFill>
+                <a:latin typeface="Consolas" panose="020B0609020204030204" pitchFamily="49" charset="0"/>
+              </a:rPr>
+              <a:t>{</a:t>
+            </a:r>
+            <a:r>
+              <a:rPr lang="pl-PL" dirty="0" err="1">
+                <a:solidFill>
+                  <a:srgbClr val="9CDCFE"/>
+                </a:solidFill>
+                <a:latin typeface="Consolas" panose="020B0609020204030204" pitchFamily="49" charset="0"/>
+              </a:rPr>
+              <a:t>avatarSize</a:t>
+            </a:r>
+            <a:r>
+              <a:rPr lang="pl-PL" dirty="0">
+                <a:solidFill>
+                  <a:srgbClr val="569CD6"/>
+                </a:solidFill>
+                <a:latin typeface="Consolas" panose="020B0609020204030204" pitchFamily="49" charset="0"/>
+              </a:rPr>
+              <a:t>}</a:t>
+            </a:r>
+            <a:r>
+              <a:rPr lang="pl-PL" dirty="0">
+                <a:solidFill>
+                  <a:srgbClr val="D4D4D4"/>
+                </a:solidFill>
+                <a:latin typeface="Consolas" panose="020B0609020204030204" pitchFamily="49" charset="0"/>
+              </a:rPr>
+              <a:t> </a:t>
+            </a:r>
+            <a:r>
+              <a:rPr lang="pl-PL" dirty="0">
+                <a:solidFill>
+                  <a:srgbClr val="808080"/>
+                </a:solidFill>
+                <a:latin typeface="Consolas" panose="020B0609020204030204" pitchFamily="49" charset="0"/>
+              </a:rPr>
+              <a:t>/&gt;</a:t>
+            </a:r>
+            <a:endParaRPr lang="pl-PL" dirty="0">
+              <a:solidFill>
+                <a:srgbClr val="D4D4D4"/>
+              </a:solidFill>
+              <a:latin typeface="Consolas" panose="020B0609020204030204" pitchFamily="49" charset="0"/>
+            </a:endParaRPr>
+          </a:p>
+          <a:p>
+            <a:r>
+              <a:rPr lang="pl-PL" dirty="0">
+                <a:solidFill>
+                  <a:srgbClr val="D4D4D4"/>
+                </a:solidFill>
+                <a:latin typeface="Consolas" panose="020B0609020204030204" pitchFamily="49" charset="0"/>
+              </a:rPr>
+              <a:t>  </a:t>
+            </a:r>
+            <a:r>
+              <a:rPr lang="pl-PL" dirty="0">
+                <a:solidFill>
+                  <a:srgbClr val="808080"/>
+                </a:solidFill>
+                <a:latin typeface="Consolas" panose="020B0609020204030204" pitchFamily="49" charset="0"/>
+              </a:rPr>
+              <a:t>&lt;</a:t>
+            </a:r>
+            <a:r>
+              <a:rPr lang="pl-PL" dirty="0" err="1">
+                <a:solidFill>
+                  <a:srgbClr val="4EC9B0"/>
+                </a:solidFill>
+                <a:latin typeface="Consolas" panose="020B0609020204030204" pitchFamily="49" charset="0"/>
+              </a:rPr>
+              <a:t>PageLayout</a:t>
+            </a:r>
+            <a:r>
+              <a:rPr lang="pl-PL" dirty="0">
+                <a:solidFill>
+                  <a:srgbClr val="D4D4D4"/>
+                </a:solidFill>
+                <a:latin typeface="Consolas" panose="020B0609020204030204" pitchFamily="49" charset="0"/>
+              </a:rPr>
+              <a:t> </a:t>
+            </a:r>
+            <a:r>
+              <a:rPr lang="pl-PL" dirty="0" err="1">
+                <a:solidFill>
+                  <a:srgbClr val="9CDCFE"/>
+                </a:solidFill>
+                <a:latin typeface="Consolas" panose="020B0609020204030204" pitchFamily="49" charset="0"/>
+              </a:rPr>
+              <a:t>userLink</a:t>
+            </a:r>
+            <a:r>
+              <a:rPr lang="pl-PL" dirty="0">
+                <a:solidFill>
+                  <a:srgbClr val="D4D4D4"/>
+                </a:solidFill>
+                <a:latin typeface="Consolas" panose="020B0609020204030204" pitchFamily="49" charset="0"/>
+              </a:rPr>
+              <a:t>=</a:t>
+            </a:r>
+            <a:r>
+              <a:rPr lang="pl-PL" dirty="0">
+                <a:solidFill>
+                  <a:srgbClr val="569CD6"/>
+                </a:solidFill>
+                <a:latin typeface="Consolas" panose="020B0609020204030204" pitchFamily="49" charset="0"/>
+              </a:rPr>
+              <a:t>{</a:t>
+            </a:r>
+            <a:r>
+              <a:rPr lang="pl-PL" dirty="0">
+                <a:solidFill>
+                  <a:srgbClr val="D4D4D4"/>
+                </a:solidFill>
+                <a:latin typeface="Consolas" panose="020B0609020204030204" pitchFamily="49" charset="0"/>
+              </a:rPr>
+              <a:t>...</a:t>
+            </a:r>
+            <a:r>
+              <a:rPr lang="pl-PL" dirty="0">
+                <a:solidFill>
+                  <a:srgbClr val="569CD6"/>
+                </a:solidFill>
+                <a:latin typeface="Consolas" panose="020B0609020204030204" pitchFamily="49" charset="0"/>
+              </a:rPr>
+              <a:t>}</a:t>
+            </a:r>
+            <a:r>
+              <a:rPr lang="pl-PL" dirty="0">
+                <a:solidFill>
+                  <a:srgbClr val="D4D4D4"/>
+                </a:solidFill>
+                <a:latin typeface="Consolas" panose="020B0609020204030204" pitchFamily="49" charset="0"/>
+              </a:rPr>
+              <a:t> </a:t>
+            </a:r>
+            <a:r>
+              <a:rPr lang="pl-PL" dirty="0">
+                <a:solidFill>
+                  <a:srgbClr val="808080"/>
+                </a:solidFill>
+                <a:latin typeface="Consolas" panose="020B0609020204030204" pitchFamily="49" charset="0"/>
+              </a:rPr>
+              <a:t>/&gt;</a:t>
+            </a:r>
+            <a:endParaRPr lang="pl-PL" dirty="0">
+              <a:solidFill>
+                <a:srgbClr val="D4D4D4"/>
+              </a:solidFill>
+              <a:latin typeface="Consolas" panose="020B0609020204030204" pitchFamily="49" charset="0"/>
+            </a:endParaRPr>
+          </a:p>
+          <a:p>
+            <a:r>
+              <a:rPr lang="pl-PL" dirty="0">
+                <a:solidFill>
+                  <a:srgbClr val="D4D4D4"/>
+                </a:solidFill>
+                <a:latin typeface="Consolas" panose="020B0609020204030204" pitchFamily="49" charset="0"/>
+              </a:rPr>
+              <a:t>  </a:t>
+            </a:r>
+            <a:r>
+              <a:rPr lang="pl-PL" dirty="0">
+                <a:solidFill>
+                  <a:srgbClr val="808080"/>
+                </a:solidFill>
+                <a:latin typeface="Consolas" panose="020B0609020204030204" pitchFamily="49" charset="0"/>
+              </a:rPr>
+              <a:t>&lt;</a:t>
+            </a:r>
+            <a:r>
+              <a:rPr lang="pl-PL" dirty="0" err="1">
+                <a:solidFill>
+                  <a:srgbClr val="4EC9B0"/>
+                </a:solidFill>
+                <a:latin typeface="Consolas" panose="020B0609020204030204" pitchFamily="49" charset="0"/>
+              </a:rPr>
+              <a:t>NavigationBar</a:t>
+            </a:r>
+            <a:r>
+              <a:rPr lang="pl-PL" dirty="0">
+                <a:solidFill>
+                  <a:srgbClr val="D4D4D4"/>
+                </a:solidFill>
+                <a:latin typeface="Consolas" panose="020B0609020204030204" pitchFamily="49" charset="0"/>
+              </a:rPr>
+              <a:t> </a:t>
+            </a:r>
+            <a:r>
+              <a:rPr lang="pl-PL" dirty="0" err="1">
+                <a:solidFill>
+                  <a:srgbClr val="9CDCFE"/>
+                </a:solidFill>
+                <a:latin typeface="Consolas" panose="020B0609020204030204" pitchFamily="49" charset="0"/>
+              </a:rPr>
+              <a:t>userLink</a:t>
+            </a:r>
+            <a:r>
+              <a:rPr lang="pl-PL" dirty="0">
+                <a:solidFill>
+                  <a:srgbClr val="D4D4D4"/>
+                </a:solidFill>
+                <a:latin typeface="Consolas" panose="020B0609020204030204" pitchFamily="49" charset="0"/>
+              </a:rPr>
+              <a:t>=</a:t>
+            </a:r>
+            <a:r>
+              <a:rPr lang="pl-PL" dirty="0">
+                <a:solidFill>
+                  <a:srgbClr val="569CD6"/>
+                </a:solidFill>
+                <a:latin typeface="Consolas" panose="020B0609020204030204" pitchFamily="49" charset="0"/>
+              </a:rPr>
+              <a:t>{</a:t>
+            </a:r>
+            <a:r>
+              <a:rPr lang="pl-PL" dirty="0">
+                <a:solidFill>
+                  <a:srgbClr val="D4D4D4"/>
+                </a:solidFill>
+                <a:latin typeface="Consolas" panose="020B0609020204030204" pitchFamily="49" charset="0"/>
+              </a:rPr>
+              <a:t>...</a:t>
+            </a:r>
+            <a:r>
+              <a:rPr lang="pl-PL" dirty="0">
+                <a:solidFill>
+                  <a:srgbClr val="569CD6"/>
+                </a:solidFill>
+                <a:latin typeface="Consolas" panose="020B0609020204030204" pitchFamily="49" charset="0"/>
+              </a:rPr>
+              <a:t>}</a:t>
+            </a:r>
+            <a:r>
+              <a:rPr lang="pl-PL" dirty="0">
+                <a:solidFill>
+                  <a:srgbClr val="D4D4D4"/>
+                </a:solidFill>
+                <a:latin typeface="Consolas" panose="020B0609020204030204" pitchFamily="49" charset="0"/>
+              </a:rPr>
+              <a:t> </a:t>
+            </a:r>
+            <a:r>
+              <a:rPr lang="pl-PL" dirty="0">
+                <a:solidFill>
+                  <a:srgbClr val="808080"/>
+                </a:solidFill>
+                <a:latin typeface="Consolas" panose="020B0609020204030204" pitchFamily="49" charset="0"/>
+              </a:rPr>
+              <a:t>/&gt;</a:t>
+            </a:r>
+            <a:endParaRPr lang="pl-PL" dirty="0">
+              <a:solidFill>
+                <a:srgbClr val="D4D4D4"/>
+              </a:solidFill>
+              <a:latin typeface="Consolas" panose="020B0609020204030204" pitchFamily="49" charset="0"/>
+            </a:endParaRPr>
+          </a:p>
+          <a:p>
+            <a:r>
+              <a:rPr lang="pl-PL" dirty="0">
+                <a:solidFill>
+                  <a:srgbClr val="D4D4D4"/>
+                </a:solidFill>
+                <a:latin typeface="Consolas" panose="020B0609020204030204" pitchFamily="49" charset="0"/>
+              </a:rPr>
+              <a:t>  {</a:t>
+            </a:r>
+            <a:r>
+              <a:rPr lang="pl-PL" dirty="0" err="1">
+                <a:solidFill>
+                  <a:srgbClr val="9CDCFE"/>
+                </a:solidFill>
+                <a:latin typeface="Consolas" panose="020B0609020204030204" pitchFamily="49" charset="0"/>
+              </a:rPr>
+              <a:t>props</a:t>
+            </a:r>
+            <a:r>
+              <a:rPr lang="pl-PL" dirty="0" err="1">
+                <a:solidFill>
+                  <a:srgbClr val="D4D4D4"/>
+                </a:solidFill>
+                <a:latin typeface="Consolas" panose="020B0609020204030204" pitchFamily="49" charset="0"/>
+              </a:rPr>
+              <a:t>.</a:t>
+            </a:r>
+            <a:r>
+              <a:rPr lang="pl-PL" dirty="0" err="1">
+                <a:solidFill>
+                  <a:srgbClr val="9CDCFE"/>
+                </a:solidFill>
+                <a:latin typeface="Consolas" panose="020B0609020204030204" pitchFamily="49" charset="0"/>
+              </a:rPr>
+              <a:t>userLink</a:t>
+            </a:r>
+            <a:r>
+              <a:rPr lang="pl-PL" dirty="0">
+                <a:solidFill>
+                  <a:srgbClr val="D4D4D4"/>
+                </a:solidFill>
+                <a:latin typeface="Consolas" panose="020B0609020204030204" pitchFamily="49" charset="0"/>
+              </a:rPr>
+              <a:t>}</a:t>
+            </a:r>
+            <a:endParaRPr lang="pl-PL" b="0" dirty="0">
+              <a:solidFill>
+                <a:srgbClr val="D4D4D4"/>
+              </a:solidFill>
+              <a:effectLst/>
+              <a:latin typeface="Consolas" panose="020B0609020204030204" pitchFamily="49" charset="0"/>
             </a:endParaRPr>
           </a:p>
         </p:txBody>
@@ -28261,7 +30575,7 @@
     </p:spTree>
     <p:extLst>
       <p:ext uri="{BB962C8B-B14F-4D97-AF65-F5344CB8AC3E}">
-        <p14:creationId xmlns:p14="http://schemas.microsoft.com/office/powerpoint/2010/main" val="1976532068"/>
+        <p14:creationId xmlns:p14="http://schemas.microsoft.com/office/powerpoint/2010/main" val="3889691247"/>
       </p:ext>
     </p:extLst>
   </p:cSld>
@@ -28303,7 +30617,7 @@
         <p:spPr>
           <a:xfrm>
             <a:off x="497840" y="538480"/>
-            <a:ext cx="940450" cy="369332"/>
+            <a:ext cx="913070" cy="369332"/>
           </a:xfrm>
           <a:prstGeom prst="rect">
             <a:avLst/>
@@ -28318,19 +30632,16 @@
           <a:p>
             <a:r>
               <a:rPr lang="pl-PL" dirty="0" err="1"/>
-              <a:t>Redux</a:t>
-            </a:r>
-            <a:r>
-              <a:rPr lang="pl-PL" dirty="0"/>
-              <a:t> - </a:t>
-            </a:r>
+              <a:t>Context</a:t>
+            </a:r>
+            <a:endParaRPr lang="pl-PL" dirty="0"/>
           </a:p>
         </p:txBody>
       </p:sp>
     </p:spTree>
     <p:extLst>
       <p:ext uri="{BB962C8B-B14F-4D97-AF65-F5344CB8AC3E}">
-        <p14:creationId xmlns:p14="http://schemas.microsoft.com/office/powerpoint/2010/main" val="2495166907"/>
+        <p14:creationId xmlns:p14="http://schemas.microsoft.com/office/powerpoint/2010/main" val="3086437207"/>
       </p:ext>
     </p:extLst>
   </p:cSld>
@@ -28372,7 +30683,7 @@
         <p:spPr>
           <a:xfrm>
             <a:off x="497840" y="538480"/>
-            <a:ext cx="2103525" cy="369332"/>
+            <a:ext cx="1641283" cy="369332"/>
           </a:xfrm>
           <a:prstGeom prst="rect">
             <a:avLst/>
@@ -28387,7 +30698,7 @@
           <a:p>
             <a:r>
               <a:rPr lang="pl-PL" dirty="0" err="1"/>
-              <a:t>Hooks</a:t>
+              <a:t>Redux</a:t>
             </a:r>
             <a:r>
               <a:rPr lang="pl-PL" dirty="0"/>
@@ -28395,7 +30706,7 @@
             </a:r>
             <a:r>
               <a:rPr lang="pl-PL" dirty="0" err="1"/>
-              <a:t>introduction</a:t>
+              <a:t>context</a:t>
             </a:r>
             <a:endParaRPr lang="pl-PL" dirty="0"/>
           </a:p>
@@ -28404,7 +30715,7 @@
     </p:spTree>
     <p:extLst>
       <p:ext uri="{BB962C8B-B14F-4D97-AF65-F5344CB8AC3E}">
-        <p14:creationId xmlns:p14="http://schemas.microsoft.com/office/powerpoint/2010/main" val="4263742158"/>
+        <p14:creationId xmlns:p14="http://schemas.microsoft.com/office/powerpoint/2010/main" val="2793677145"/>
       </p:ext>
     </p:extLst>
   </p:cSld>
@@ -28808,6 +31119,525 @@
     <p:extLst>
       <p:ext uri="{BB962C8B-B14F-4D97-AF65-F5344CB8AC3E}">
         <p14:creationId xmlns:p14="http://schemas.microsoft.com/office/powerpoint/2010/main" val="3337891046"/>
+      </p:ext>
+    </p:extLst>
+  </p:cSld>
+  <p:clrMapOvr>
+    <a:masterClrMapping/>
+  </p:clrMapOvr>
+</p:sld>
+</file>
+
+<file path=ppt/slides/slide30.xml><?xml version="1.0" encoding="utf-8"?>
+<p:sld xmlns:a="http://schemas.openxmlformats.org/drawingml/2006/main" xmlns:r="http://schemas.openxmlformats.org/officeDocument/2006/relationships" xmlns:p="http://schemas.openxmlformats.org/presentationml/2006/main">
+  <p:cSld>
+    <p:spTree>
+      <p:nvGrpSpPr>
+        <p:cNvPr id="1" name=""/>
+        <p:cNvGrpSpPr/>
+        <p:nvPr/>
+      </p:nvGrpSpPr>
+      <p:grpSpPr>
+        <a:xfrm>
+          <a:off x="0" y="0"/>
+          <a:ext cx="0" cy="0"/>
+          <a:chOff x="0" y="0"/>
+          <a:chExt cx="0" cy="0"/>
+        </a:xfrm>
+      </p:grpSpPr>
+      <p:sp>
+        <p:nvSpPr>
+          <p:cNvPr id="4" name="pole tekstowe 3">
+            <a:extLst>
+              <a:ext uri="{FF2B5EF4-FFF2-40B4-BE49-F238E27FC236}">
+                <a16:creationId xmlns:a16="http://schemas.microsoft.com/office/drawing/2014/main" id="{F164A7B3-8808-414C-9401-3B25194E3B5A}"/>
+              </a:ext>
+            </a:extLst>
+          </p:cNvPr>
+          <p:cNvSpPr txBox="1"/>
+          <p:nvPr/>
+        </p:nvSpPr>
+        <p:spPr>
+          <a:xfrm>
+            <a:off x="497840" y="538480"/>
+            <a:ext cx="1641283" cy="369332"/>
+          </a:xfrm>
+          <a:prstGeom prst="rect">
+            <a:avLst/>
+          </a:prstGeom>
+          <a:noFill/>
+        </p:spPr>
+        <p:txBody>
+          <a:bodyPr wrap="none" rtlCol="0">
+            <a:spAutoFit/>
+          </a:bodyPr>
+          <a:lstStyle/>
+          <a:p>
+            <a:r>
+              <a:rPr lang="pl-PL" dirty="0" err="1"/>
+              <a:t>Redux</a:t>
+            </a:r>
+            <a:r>
+              <a:rPr lang="pl-PL" dirty="0"/>
+              <a:t> - </a:t>
+            </a:r>
+            <a:r>
+              <a:rPr lang="pl-PL" dirty="0" err="1"/>
+              <a:t>context</a:t>
+            </a:r>
+            <a:endParaRPr lang="pl-PL" dirty="0"/>
+          </a:p>
+        </p:txBody>
+      </p:sp>
+    </p:spTree>
+    <p:extLst>
+      <p:ext uri="{BB962C8B-B14F-4D97-AF65-F5344CB8AC3E}">
+        <p14:creationId xmlns:p14="http://schemas.microsoft.com/office/powerpoint/2010/main" val="3207122868"/>
+      </p:ext>
+    </p:extLst>
+  </p:cSld>
+  <p:clrMapOvr>
+    <a:masterClrMapping/>
+  </p:clrMapOvr>
+</p:sld>
+</file>
+
+<file path=ppt/slides/slide31.xml><?xml version="1.0" encoding="utf-8"?>
+<p:sld xmlns:a="http://schemas.openxmlformats.org/drawingml/2006/main" xmlns:r="http://schemas.openxmlformats.org/officeDocument/2006/relationships" xmlns:p="http://schemas.openxmlformats.org/presentationml/2006/main">
+  <p:cSld>
+    <p:spTree>
+      <p:nvGrpSpPr>
+        <p:cNvPr id="1" name=""/>
+        <p:cNvGrpSpPr/>
+        <p:nvPr/>
+      </p:nvGrpSpPr>
+      <p:grpSpPr>
+        <a:xfrm>
+          <a:off x="0" y="0"/>
+          <a:ext cx="0" cy="0"/>
+          <a:chOff x="0" y="0"/>
+          <a:chExt cx="0" cy="0"/>
+        </a:xfrm>
+      </p:grpSpPr>
+      <p:sp>
+        <p:nvSpPr>
+          <p:cNvPr id="4" name="pole tekstowe 3">
+            <a:extLst>
+              <a:ext uri="{FF2B5EF4-FFF2-40B4-BE49-F238E27FC236}">
+                <a16:creationId xmlns:a16="http://schemas.microsoft.com/office/drawing/2014/main" id="{F164A7B3-8808-414C-9401-3B25194E3B5A}"/>
+              </a:ext>
+            </a:extLst>
+          </p:cNvPr>
+          <p:cNvSpPr txBox="1"/>
+          <p:nvPr/>
+        </p:nvSpPr>
+        <p:spPr>
+          <a:xfrm>
+            <a:off x="497840" y="538480"/>
+            <a:ext cx="1641283" cy="369332"/>
+          </a:xfrm>
+          <a:prstGeom prst="rect">
+            <a:avLst/>
+          </a:prstGeom>
+          <a:noFill/>
+        </p:spPr>
+        <p:txBody>
+          <a:bodyPr wrap="none" rtlCol="0">
+            <a:spAutoFit/>
+          </a:bodyPr>
+          <a:lstStyle/>
+          <a:p>
+            <a:r>
+              <a:rPr lang="pl-PL" dirty="0" err="1"/>
+              <a:t>Redux</a:t>
+            </a:r>
+            <a:r>
+              <a:rPr lang="pl-PL" dirty="0"/>
+              <a:t> - </a:t>
+            </a:r>
+            <a:r>
+              <a:rPr lang="pl-PL" dirty="0" err="1"/>
+              <a:t>context</a:t>
+            </a:r>
+            <a:endParaRPr lang="pl-PL" dirty="0"/>
+          </a:p>
+        </p:txBody>
+      </p:sp>
+    </p:spTree>
+    <p:extLst>
+      <p:ext uri="{BB962C8B-B14F-4D97-AF65-F5344CB8AC3E}">
+        <p14:creationId xmlns:p14="http://schemas.microsoft.com/office/powerpoint/2010/main" val="2093020411"/>
+      </p:ext>
+    </p:extLst>
+  </p:cSld>
+  <p:clrMapOvr>
+    <a:masterClrMapping/>
+  </p:clrMapOvr>
+</p:sld>
+</file>
+
+<file path=ppt/slides/slide32.xml><?xml version="1.0" encoding="utf-8"?>
+<p:sld xmlns:a="http://schemas.openxmlformats.org/drawingml/2006/main" xmlns:r="http://schemas.openxmlformats.org/officeDocument/2006/relationships" xmlns:p="http://schemas.openxmlformats.org/presentationml/2006/main">
+  <p:cSld>
+    <p:spTree>
+      <p:nvGrpSpPr>
+        <p:cNvPr id="1" name=""/>
+        <p:cNvGrpSpPr/>
+        <p:nvPr/>
+      </p:nvGrpSpPr>
+      <p:grpSpPr>
+        <a:xfrm>
+          <a:off x="0" y="0"/>
+          <a:ext cx="0" cy="0"/>
+          <a:chOff x="0" y="0"/>
+          <a:chExt cx="0" cy="0"/>
+        </a:xfrm>
+      </p:grpSpPr>
+      <p:sp>
+        <p:nvSpPr>
+          <p:cNvPr id="4" name="pole tekstowe 3">
+            <a:extLst>
+              <a:ext uri="{FF2B5EF4-FFF2-40B4-BE49-F238E27FC236}">
+                <a16:creationId xmlns:a16="http://schemas.microsoft.com/office/drawing/2014/main" id="{F164A7B3-8808-414C-9401-3B25194E3B5A}"/>
+              </a:ext>
+            </a:extLst>
+          </p:cNvPr>
+          <p:cNvSpPr txBox="1"/>
+          <p:nvPr/>
+        </p:nvSpPr>
+        <p:spPr>
+          <a:xfrm>
+            <a:off x="497840" y="538480"/>
+            <a:ext cx="2103204" cy="369332"/>
+          </a:xfrm>
+          <a:prstGeom prst="rect">
+            <a:avLst/>
+          </a:prstGeom>
+          <a:noFill/>
+        </p:spPr>
+        <p:txBody>
+          <a:bodyPr wrap="none" rtlCol="0">
+            <a:spAutoFit/>
+          </a:bodyPr>
+          <a:lstStyle/>
+          <a:p>
+            <a:r>
+              <a:rPr lang="pl-PL" dirty="0" err="1"/>
+              <a:t>Redux</a:t>
+            </a:r>
+            <a:r>
+              <a:rPr lang="pl-PL" dirty="0"/>
+              <a:t> - </a:t>
+            </a:r>
+            <a:r>
+              <a:rPr lang="pl-PL" dirty="0" err="1"/>
+              <a:t>introduction</a:t>
+            </a:r>
+            <a:endParaRPr lang="pl-PL" dirty="0"/>
+          </a:p>
+        </p:txBody>
+      </p:sp>
+      <p:sp>
+        <p:nvSpPr>
+          <p:cNvPr id="6" name="Prostokąt 5">
+            <a:extLst>
+              <a:ext uri="{FF2B5EF4-FFF2-40B4-BE49-F238E27FC236}">
+                <a16:creationId xmlns:a16="http://schemas.microsoft.com/office/drawing/2014/main" id="{02CB4B36-132E-4A3A-AAF5-A1E25F7ADBC0}"/>
+              </a:ext>
+            </a:extLst>
+          </p:cNvPr>
+          <p:cNvSpPr/>
+          <p:nvPr/>
+        </p:nvSpPr>
+        <p:spPr>
+          <a:xfrm>
+            <a:off x="4482078" y="1415534"/>
+            <a:ext cx="2962799" cy="369332"/>
+          </a:xfrm>
+          <a:prstGeom prst="rect">
+            <a:avLst/>
+          </a:prstGeom>
+        </p:spPr>
+        <p:txBody>
+          <a:bodyPr wrap="none">
+            <a:spAutoFit/>
+          </a:bodyPr>
+          <a:lstStyle/>
+          <a:p>
+            <a:r>
+              <a:rPr lang="pl-PL" dirty="0" err="1">
+                <a:latin typeface="SFMono-Regular"/>
+              </a:rPr>
+              <a:t>npm</a:t>
+            </a:r>
+            <a:r>
+              <a:rPr lang="pl-PL" dirty="0">
+                <a:latin typeface="SFMono-Regular"/>
+              </a:rPr>
+              <a:t> </a:t>
+            </a:r>
+            <a:r>
+              <a:rPr lang="pl-PL" dirty="0" err="1">
+                <a:latin typeface="SFMono-Regular"/>
+              </a:rPr>
+              <a:t>install</a:t>
+            </a:r>
+            <a:r>
+              <a:rPr lang="pl-PL" dirty="0">
+                <a:latin typeface="SFMono-Regular"/>
+              </a:rPr>
+              <a:t> --</a:t>
+            </a:r>
+            <a:r>
+              <a:rPr lang="pl-PL" dirty="0" err="1">
+                <a:latin typeface="SFMono-Regular"/>
+              </a:rPr>
+              <a:t>save</a:t>
+            </a:r>
+            <a:r>
+              <a:rPr lang="pl-PL" dirty="0">
+                <a:latin typeface="SFMono-Regular"/>
+              </a:rPr>
+              <a:t> </a:t>
+            </a:r>
+            <a:r>
+              <a:rPr lang="pl-PL" dirty="0" err="1">
+                <a:latin typeface="SFMono-Regular"/>
+              </a:rPr>
+              <a:t>react-redux</a:t>
+            </a:r>
+            <a:endParaRPr lang="pl-PL" dirty="0"/>
+          </a:p>
+        </p:txBody>
+      </p:sp>
+      <p:sp>
+        <p:nvSpPr>
+          <p:cNvPr id="7" name="Prostokąt 6">
+            <a:extLst>
+              <a:ext uri="{FF2B5EF4-FFF2-40B4-BE49-F238E27FC236}">
+                <a16:creationId xmlns:a16="http://schemas.microsoft.com/office/drawing/2014/main" id="{8BF58E04-F447-4CA1-AC77-99E7122E8C0C}"/>
+              </a:ext>
+            </a:extLst>
+          </p:cNvPr>
+          <p:cNvSpPr/>
+          <p:nvPr/>
+        </p:nvSpPr>
+        <p:spPr>
+          <a:xfrm>
+            <a:off x="4482077" y="1784866"/>
+            <a:ext cx="2962799" cy="369332"/>
+          </a:xfrm>
+          <a:prstGeom prst="rect">
+            <a:avLst/>
+          </a:prstGeom>
+        </p:spPr>
+        <p:txBody>
+          <a:bodyPr wrap="square">
+            <a:spAutoFit/>
+          </a:bodyPr>
+          <a:lstStyle/>
+          <a:p>
+            <a:r>
+              <a:rPr lang="pl-PL" dirty="0" err="1">
+                <a:solidFill>
+                  <a:srgbClr val="000000"/>
+                </a:solidFill>
+                <a:latin typeface="inherit"/>
+              </a:rPr>
+              <a:t>npm</a:t>
+            </a:r>
+            <a:r>
+              <a:rPr lang="pl-PL" dirty="0">
+                <a:solidFill>
+                  <a:srgbClr val="000000"/>
+                </a:solidFill>
+                <a:latin typeface="inherit"/>
+              </a:rPr>
+              <a:t> i </a:t>
+            </a:r>
+            <a:r>
+              <a:rPr lang="pl-PL" dirty="0" err="1">
+                <a:solidFill>
+                  <a:srgbClr val="000000"/>
+                </a:solidFill>
+                <a:latin typeface="inherit"/>
+              </a:rPr>
+              <a:t>redux</a:t>
+            </a:r>
+            <a:r>
+              <a:rPr lang="pl-PL" dirty="0">
+                <a:solidFill>
+                  <a:srgbClr val="000000"/>
+                </a:solidFill>
+                <a:latin typeface="inherit"/>
+              </a:rPr>
+              <a:t> --</a:t>
+            </a:r>
+            <a:r>
+              <a:rPr lang="pl-PL" dirty="0" err="1">
+                <a:solidFill>
+                  <a:srgbClr val="000000"/>
+                </a:solidFill>
+                <a:latin typeface="inherit"/>
+              </a:rPr>
+              <a:t>save-dev</a:t>
+            </a:r>
+            <a:endParaRPr lang="pl-PL" dirty="0">
+              <a:solidFill>
+                <a:srgbClr val="444444"/>
+              </a:solidFill>
+              <a:latin typeface="Source Code Pro"/>
+            </a:endParaRPr>
+          </a:p>
+        </p:txBody>
+      </p:sp>
+    </p:spTree>
+    <p:extLst>
+      <p:ext uri="{BB962C8B-B14F-4D97-AF65-F5344CB8AC3E}">
+        <p14:creationId xmlns:p14="http://schemas.microsoft.com/office/powerpoint/2010/main" val="1976532068"/>
+      </p:ext>
+    </p:extLst>
+  </p:cSld>
+  <p:clrMapOvr>
+    <a:masterClrMapping/>
+  </p:clrMapOvr>
+</p:sld>
+</file>
+
+<file path=ppt/slides/slide33.xml><?xml version="1.0" encoding="utf-8"?>
+<p:sld xmlns:a="http://schemas.openxmlformats.org/drawingml/2006/main" xmlns:r="http://schemas.openxmlformats.org/officeDocument/2006/relationships" xmlns:p="http://schemas.openxmlformats.org/presentationml/2006/main">
+  <p:cSld>
+    <p:spTree>
+      <p:nvGrpSpPr>
+        <p:cNvPr id="1" name=""/>
+        <p:cNvGrpSpPr/>
+        <p:nvPr/>
+      </p:nvGrpSpPr>
+      <p:grpSpPr>
+        <a:xfrm>
+          <a:off x="0" y="0"/>
+          <a:ext cx="0" cy="0"/>
+          <a:chOff x="0" y="0"/>
+          <a:chExt cx="0" cy="0"/>
+        </a:xfrm>
+      </p:grpSpPr>
+      <p:sp>
+        <p:nvSpPr>
+          <p:cNvPr id="4" name="pole tekstowe 3">
+            <a:extLst>
+              <a:ext uri="{FF2B5EF4-FFF2-40B4-BE49-F238E27FC236}">
+                <a16:creationId xmlns:a16="http://schemas.microsoft.com/office/drawing/2014/main" id="{F164A7B3-8808-414C-9401-3B25194E3B5A}"/>
+              </a:ext>
+            </a:extLst>
+          </p:cNvPr>
+          <p:cNvSpPr txBox="1"/>
+          <p:nvPr/>
+        </p:nvSpPr>
+        <p:spPr>
+          <a:xfrm>
+            <a:off x="497840" y="538480"/>
+            <a:ext cx="940450" cy="369332"/>
+          </a:xfrm>
+          <a:prstGeom prst="rect">
+            <a:avLst/>
+          </a:prstGeom>
+          <a:noFill/>
+        </p:spPr>
+        <p:txBody>
+          <a:bodyPr wrap="none" rtlCol="0">
+            <a:spAutoFit/>
+          </a:bodyPr>
+          <a:lstStyle/>
+          <a:p>
+            <a:r>
+              <a:rPr lang="pl-PL" dirty="0" err="1"/>
+              <a:t>Redux</a:t>
+            </a:r>
+            <a:r>
+              <a:rPr lang="pl-PL" dirty="0"/>
+              <a:t> - </a:t>
+            </a:r>
+          </a:p>
+        </p:txBody>
+      </p:sp>
+    </p:spTree>
+    <p:extLst>
+      <p:ext uri="{BB962C8B-B14F-4D97-AF65-F5344CB8AC3E}">
+        <p14:creationId xmlns:p14="http://schemas.microsoft.com/office/powerpoint/2010/main" val="2495166907"/>
+      </p:ext>
+    </p:extLst>
+  </p:cSld>
+  <p:clrMapOvr>
+    <a:masterClrMapping/>
+  </p:clrMapOvr>
+</p:sld>
+</file>
+
+<file path=ppt/slides/slide34.xml><?xml version="1.0" encoding="utf-8"?>
+<p:sld xmlns:a="http://schemas.openxmlformats.org/drawingml/2006/main" xmlns:r="http://schemas.openxmlformats.org/officeDocument/2006/relationships" xmlns:p="http://schemas.openxmlformats.org/presentationml/2006/main">
+  <p:cSld>
+    <p:spTree>
+      <p:nvGrpSpPr>
+        <p:cNvPr id="1" name=""/>
+        <p:cNvGrpSpPr/>
+        <p:nvPr/>
+      </p:nvGrpSpPr>
+      <p:grpSpPr>
+        <a:xfrm>
+          <a:off x="0" y="0"/>
+          <a:ext cx="0" cy="0"/>
+          <a:chOff x="0" y="0"/>
+          <a:chExt cx="0" cy="0"/>
+        </a:xfrm>
+      </p:grpSpPr>
+      <p:sp>
+        <p:nvSpPr>
+          <p:cNvPr id="4" name="pole tekstowe 3">
+            <a:extLst>
+              <a:ext uri="{FF2B5EF4-FFF2-40B4-BE49-F238E27FC236}">
+                <a16:creationId xmlns:a16="http://schemas.microsoft.com/office/drawing/2014/main" id="{F164A7B3-8808-414C-9401-3B25194E3B5A}"/>
+              </a:ext>
+            </a:extLst>
+          </p:cNvPr>
+          <p:cNvSpPr txBox="1"/>
+          <p:nvPr/>
+        </p:nvSpPr>
+        <p:spPr>
+          <a:xfrm>
+            <a:off x="497840" y="538480"/>
+            <a:ext cx="2103525" cy="369332"/>
+          </a:xfrm>
+          <a:prstGeom prst="rect">
+            <a:avLst/>
+          </a:prstGeom>
+          <a:noFill/>
+        </p:spPr>
+        <p:txBody>
+          <a:bodyPr wrap="none" rtlCol="0">
+            <a:spAutoFit/>
+          </a:bodyPr>
+          <a:lstStyle/>
+          <a:p>
+            <a:r>
+              <a:rPr lang="pl-PL" dirty="0" err="1"/>
+              <a:t>Hooks</a:t>
+            </a:r>
+            <a:r>
+              <a:rPr lang="pl-PL" dirty="0"/>
+              <a:t> - </a:t>
+            </a:r>
+            <a:r>
+              <a:rPr lang="pl-PL" dirty="0" err="1"/>
+              <a:t>introduction</a:t>
+            </a:r>
+            <a:endParaRPr lang="pl-PL" dirty="0"/>
+          </a:p>
+        </p:txBody>
+      </p:sp>
+    </p:spTree>
+    <p:extLst>
+      <p:ext uri="{BB962C8B-B14F-4D97-AF65-F5344CB8AC3E}">
+        <p14:creationId xmlns:p14="http://schemas.microsoft.com/office/powerpoint/2010/main" val="4263742158"/>
       </p:ext>
     </p:extLst>
   </p:cSld>

</xml_diff>

<commit_message>
Exercise 3a: use context for square color
</commit_message>
<xml_diff>
--- a/tutorial/ReactjsTraining.pptx
+++ b/tutorial/ReactjsTraining.pptx
@@ -5315,12 +5315,69 @@
           <a:bodyPr/>
           <a:lstStyle/>
           <a:p>
+            <a:pPr marL="171450" indent="-171450">
+              <a:buFontTx/>
+              <a:buChar char="-"/>
+            </a:pPr>
+            <a:r>
+              <a:rPr lang="pl-PL" sz="1200" b="0" i="0" kern="1200" dirty="0">
+                <a:solidFill>
+                  <a:schemeClr val="tx1"/>
+                </a:solidFill>
+                <a:effectLst/>
+                <a:latin typeface="+mn-lt"/>
+                <a:ea typeface="+mn-ea"/>
+                <a:cs typeface="+mn-cs"/>
+              </a:rPr>
+              <a:t>Dane </a:t>
+            </a:r>
+            <a:r>
+              <a:rPr lang="pl-PL" sz="1200" b="0" i="0" kern="1200" dirty="0" err="1">
+                <a:solidFill>
+                  <a:schemeClr val="tx1"/>
+                </a:solidFill>
+                <a:effectLst/>
+                <a:latin typeface="+mn-lt"/>
+                <a:ea typeface="+mn-ea"/>
+                <a:cs typeface="+mn-cs"/>
+              </a:rPr>
+              <a:t>globable</a:t>
+            </a:r>
+            <a:r>
+              <a:rPr lang="pl-PL" sz="1200" b="0" i="0" kern="1200" dirty="0">
+                <a:solidFill>
+                  <a:schemeClr val="tx1"/>
+                </a:solidFill>
+                <a:effectLst/>
+                <a:latin typeface="+mn-lt"/>
+                <a:ea typeface="+mn-ea"/>
+                <a:cs typeface="+mn-cs"/>
+              </a:rPr>
+              <a:t>, bo przekazywanie w drzewku może być uciążliwe, np. preferowany język</a:t>
+            </a:r>
+          </a:p>
+          <a:p>
+            <a:pPr marL="171450" indent="-171450">
+              <a:buFontTx/>
+              <a:buChar char="-"/>
+            </a:pPr>
+            <a:endParaRPr lang="pl-PL" sz="1200" b="0" i="0" kern="1200" dirty="0">
+              <a:solidFill>
+                <a:schemeClr val="tx1"/>
+              </a:solidFill>
+              <a:effectLst/>
+              <a:latin typeface="+mn-lt"/>
+              <a:ea typeface="+mn-ea"/>
+              <a:cs typeface="+mn-cs"/>
+            </a:endParaRPr>
+          </a:p>
+          <a:p>
             <a:pPr marL="0" indent="0">
               <a:buFontTx/>
               <a:buNone/>
             </a:pPr>
             <a:r>
-              <a:rPr lang="pl-PL" sz="1200" b="0" i="0" kern="1200" dirty="0">
+              <a:rPr lang="pl-PL" sz="1200" b="0" i="0" kern="1200" dirty="0" err="1">
                 <a:solidFill>
                   <a:schemeClr val="tx1"/>
                 </a:solidFill>
@@ -5329,10 +5386,10 @@
                 <a:ea typeface="+mn-ea"/>
                 <a:cs typeface="+mn-cs"/>
               </a:rPr>
-              <a:t>- Dane </a:t>
-            </a:r>
-            <a:r>
-              <a:rPr lang="pl-PL" sz="1200" b="0" i="0" kern="1200" dirty="0" err="1">
+              <a:t>Exercise</a:t>
+            </a:r>
+            <a:r>
+              <a:rPr lang="pl-PL" sz="1200" b="0" i="0" kern="1200" dirty="0">
                 <a:solidFill>
                   <a:schemeClr val="tx1"/>
                 </a:solidFill>
@@ -5341,10 +5398,10 @@
                 <a:ea typeface="+mn-ea"/>
                 <a:cs typeface="+mn-cs"/>
               </a:rPr>
-              <a:t>globable</a:t>
-            </a:r>
-            <a:r>
-              <a:rPr lang="pl-PL" sz="1200" b="0" i="0" kern="1200" dirty="0">
+              <a:t> 3a: Stwórz kontekst w App.js w którym przekażesz klasy dla </a:t>
+            </a:r>
+            <a:r>
+              <a:rPr lang="pl-PL" sz="1200" b="0" i="0" kern="1200" dirty="0" err="1">
                 <a:solidFill>
                   <a:schemeClr val="tx1"/>
                 </a:solidFill>
@@ -5353,7 +5410,91 @@
                 <a:ea typeface="+mn-ea"/>
                 <a:cs typeface="+mn-cs"/>
               </a:rPr>
-              <a:t>, bo przekazywanie w drzewku może być uciążliwe, np. preferowany język</a:t>
+              <a:t>Square</a:t>
+            </a:r>
+            <a:r>
+              <a:rPr lang="pl-PL" sz="1200" b="0" i="0" kern="1200" dirty="0">
+                <a:solidFill>
+                  <a:schemeClr val="tx1"/>
+                </a:solidFill>
+                <a:effectLst/>
+                <a:latin typeface="+mn-lt"/>
+                <a:ea typeface="+mn-ea"/>
+                <a:cs typeface="+mn-cs"/>
+              </a:rPr>
+              <a:t> z różnymi kolorami (np. </a:t>
+            </a:r>
+            <a:r>
+              <a:rPr lang="pl-PL" sz="1200" b="0" i="0" kern="1200" dirty="0" err="1">
+                <a:solidFill>
+                  <a:schemeClr val="tx1"/>
+                </a:solidFill>
+                <a:effectLst/>
+                <a:latin typeface="+mn-lt"/>
+                <a:ea typeface="+mn-ea"/>
+                <a:cs typeface="+mn-cs"/>
+              </a:rPr>
+              <a:t>blue</a:t>
+            </a:r>
+            <a:r>
+              <a:rPr lang="pl-PL" sz="1200" b="0" i="0" kern="1200" dirty="0">
+                <a:solidFill>
+                  <a:schemeClr val="tx1"/>
+                </a:solidFill>
+                <a:effectLst/>
+                <a:latin typeface="+mn-lt"/>
+                <a:ea typeface="+mn-ea"/>
+                <a:cs typeface="+mn-cs"/>
+              </a:rPr>
+              <a:t> i </a:t>
+            </a:r>
+            <a:r>
+              <a:rPr lang="pl-PL" sz="1200" b="0" i="0" kern="1200" dirty="0" err="1">
+                <a:solidFill>
+                  <a:schemeClr val="tx1"/>
+                </a:solidFill>
+                <a:effectLst/>
+                <a:latin typeface="+mn-lt"/>
+                <a:ea typeface="+mn-ea"/>
+                <a:cs typeface="+mn-cs"/>
+              </a:rPr>
+              <a:t>yellow</a:t>
+            </a:r>
+            <a:r>
+              <a:rPr lang="pl-PL" sz="1200" b="0" i="0" kern="1200" dirty="0">
+                <a:solidFill>
+                  <a:schemeClr val="tx1"/>
+                </a:solidFill>
+                <a:effectLst/>
+                <a:latin typeface="+mn-lt"/>
+                <a:ea typeface="+mn-ea"/>
+                <a:cs typeface="+mn-cs"/>
+              </a:rPr>
+              <a:t> zamiast red i </a:t>
+            </a:r>
+            <a:r>
+              <a:rPr lang="pl-PL" sz="1200" b="0" i="0" kern="1200" dirty="0" err="1">
+                <a:solidFill>
+                  <a:schemeClr val="tx1"/>
+                </a:solidFill>
+                <a:effectLst/>
+                <a:latin typeface="+mn-lt"/>
+                <a:ea typeface="+mn-ea"/>
+                <a:cs typeface="+mn-cs"/>
+              </a:rPr>
+              <a:t>green</a:t>
+            </a:r>
+            <a:r>
+              <a:rPr lang="pl-PL" sz="1200" b="0" i="0" kern="1200" dirty="0">
+                <a:solidFill>
+                  <a:schemeClr val="tx1"/>
+                </a:solidFill>
+                <a:effectLst/>
+                <a:latin typeface="+mn-lt"/>
+                <a:ea typeface="+mn-ea"/>
+                <a:cs typeface="+mn-cs"/>
+              </a:rPr>
+              <a:t>)</a:t>
             </a:r>
           </a:p>
         </p:txBody>
@@ -30633,6 +30774,1690 @@
             <a:r>
               <a:rPr lang="pl-PL" dirty="0" err="1"/>
               <a:t>Context</a:t>
+            </a:r>
+            <a:endParaRPr lang="pl-PL" dirty="0"/>
+          </a:p>
+        </p:txBody>
+      </p:sp>
+      <p:sp>
+        <p:nvSpPr>
+          <p:cNvPr id="3" name="Prostokąt 2">
+            <a:extLst>
+              <a:ext uri="{FF2B5EF4-FFF2-40B4-BE49-F238E27FC236}">
+                <a16:creationId xmlns:a16="http://schemas.microsoft.com/office/drawing/2014/main" id="{3ED9AABA-7705-48EF-B3F6-A45B2DF93E45}"/>
+              </a:ext>
+            </a:extLst>
+          </p:cNvPr>
+          <p:cNvSpPr/>
+          <p:nvPr/>
+        </p:nvSpPr>
+        <p:spPr>
+          <a:xfrm>
+            <a:off x="2557669" y="1324067"/>
+            <a:ext cx="7646504" cy="646331"/>
+          </a:xfrm>
+          <a:prstGeom prst="rect">
+            <a:avLst/>
+          </a:prstGeom>
+          <a:solidFill>
+            <a:schemeClr val="tx1"/>
+          </a:solidFill>
+        </p:spPr>
+        <p:txBody>
+          <a:bodyPr wrap="square">
+            <a:spAutoFit/>
+          </a:bodyPr>
+          <a:lstStyle/>
+          <a:p>
+            <a:r>
+              <a:rPr lang="en-US" dirty="0">
+                <a:solidFill>
+                  <a:srgbClr val="C586C0"/>
+                </a:solidFill>
+                <a:latin typeface="Consolas" panose="020B0609020204030204" pitchFamily="49" charset="0"/>
+              </a:rPr>
+              <a:t>import</a:t>
+            </a:r>
+            <a:r>
+              <a:rPr lang="en-US" dirty="0">
+                <a:solidFill>
+                  <a:srgbClr val="D4D4D4"/>
+                </a:solidFill>
+                <a:latin typeface="Consolas" panose="020B0609020204030204" pitchFamily="49" charset="0"/>
+              </a:rPr>
+              <a:t> </a:t>
+            </a:r>
+            <a:r>
+              <a:rPr lang="en-US" dirty="0">
+                <a:solidFill>
+                  <a:srgbClr val="9CDCFE"/>
+                </a:solidFill>
+                <a:latin typeface="Consolas" panose="020B0609020204030204" pitchFamily="49" charset="0"/>
+              </a:rPr>
+              <a:t>React</a:t>
+            </a:r>
+            <a:r>
+              <a:rPr lang="en-US" dirty="0">
+                <a:solidFill>
+                  <a:srgbClr val="D4D4D4"/>
+                </a:solidFill>
+                <a:latin typeface="Consolas" panose="020B0609020204030204" pitchFamily="49" charset="0"/>
+              </a:rPr>
+              <a:t> </a:t>
+            </a:r>
+            <a:r>
+              <a:rPr lang="en-US" dirty="0">
+                <a:solidFill>
+                  <a:srgbClr val="C586C0"/>
+                </a:solidFill>
+                <a:latin typeface="Consolas" panose="020B0609020204030204" pitchFamily="49" charset="0"/>
+              </a:rPr>
+              <a:t>from</a:t>
+            </a:r>
+            <a:r>
+              <a:rPr lang="en-US" dirty="0">
+                <a:solidFill>
+                  <a:srgbClr val="D4D4D4"/>
+                </a:solidFill>
+                <a:latin typeface="Consolas" panose="020B0609020204030204" pitchFamily="49" charset="0"/>
+              </a:rPr>
+              <a:t> </a:t>
+            </a:r>
+            <a:r>
+              <a:rPr lang="en-US" dirty="0">
+                <a:solidFill>
+                  <a:srgbClr val="CE9178"/>
+                </a:solidFill>
+                <a:latin typeface="Consolas" panose="020B0609020204030204" pitchFamily="49" charset="0"/>
+              </a:rPr>
+              <a:t>'react'</a:t>
+            </a:r>
+            <a:r>
+              <a:rPr lang="en-US" dirty="0">
+                <a:solidFill>
+                  <a:srgbClr val="D4D4D4"/>
+                </a:solidFill>
+                <a:latin typeface="Consolas" panose="020B0609020204030204" pitchFamily="49" charset="0"/>
+              </a:rPr>
+              <a:t>;</a:t>
+            </a:r>
+          </a:p>
+          <a:p>
+            <a:r>
+              <a:rPr lang="en-US" dirty="0">
+                <a:solidFill>
+                  <a:srgbClr val="C586C0"/>
+                </a:solidFill>
+                <a:latin typeface="Consolas" panose="020B0609020204030204" pitchFamily="49" charset="0"/>
+              </a:rPr>
+              <a:t>export</a:t>
+            </a:r>
+            <a:r>
+              <a:rPr lang="en-US" dirty="0">
+                <a:solidFill>
+                  <a:srgbClr val="D4D4D4"/>
+                </a:solidFill>
+                <a:latin typeface="Consolas" panose="020B0609020204030204" pitchFamily="49" charset="0"/>
+              </a:rPr>
+              <a:t> </a:t>
+            </a:r>
+            <a:r>
+              <a:rPr lang="en-US" dirty="0">
+                <a:solidFill>
+                  <a:srgbClr val="569CD6"/>
+                </a:solidFill>
+                <a:latin typeface="Consolas" panose="020B0609020204030204" pitchFamily="49" charset="0"/>
+              </a:rPr>
+              <a:t>const</a:t>
+            </a:r>
+            <a:r>
+              <a:rPr lang="en-US" dirty="0">
+                <a:solidFill>
+                  <a:srgbClr val="D4D4D4"/>
+                </a:solidFill>
+                <a:latin typeface="Consolas" panose="020B0609020204030204" pitchFamily="49" charset="0"/>
+              </a:rPr>
+              <a:t> </a:t>
+            </a:r>
+            <a:r>
+              <a:rPr lang="en-US" dirty="0" err="1">
+                <a:solidFill>
+                  <a:srgbClr val="9CDCFE"/>
+                </a:solidFill>
+                <a:latin typeface="Consolas" panose="020B0609020204030204" pitchFamily="49" charset="0"/>
+              </a:rPr>
+              <a:t>ColorContext</a:t>
+            </a:r>
+            <a:r>
+              <a:rPr lang="en-US" dirty="0">
+                <a:solidFill>
+                  <a:srgbClr val="D4D4D4"/>
+                </a:solidFill>
+                <a:latin typeface="Consolas" panose="020B0609020204030204" pitchFamily="49" charset="0"/>
+              </a:rPr>
+              <a:t> = </a:t>
+            </a:r>
+            <a:r>
+              <a:rPr lang="en-US" dirty="0" err="1">
+                <a:solidFill>
+                  <a:srgbClr val="9CDCFE"/>
+                </a:solidFill>
+                <a:latin typeface="Consolas" panose="020B0609020204030204" pitchFamily="49" charset="0"/>
+              </a:rPr>
+              <a:t>React</a:t>
+            </a:r>
+            <a:r>
+              <a:rPr lang="en-US" dirty="0" err="1">
+                <a:solidFill>
+                  <a:srgbClr val="D4D4D4"/>
+                </a:solidFill>
+                <a:latin typeface="Consolas" panose="020B0609020204030204" pitchFamily="49" charset="0"/>
+              </a:rPr>
+              <a:t>.</a:t>
+            </a:r>
+            <a:r>
+              <a:rPr lang="en-US" dirty="0" err="1">
+                <a:solidFill>
+                  <a:srgbClr val="DCDCAA"/>
+                </a:solidFill>
+                <a:latin typeface="Consolas" panose="020B0609020204030204" pitchFamily="49" charset="0"/>
+              </a:rPr>
+              <a:t>createContext</a:t>
+            </a:r>
+            <a:r>
+              <a:rPr lang="en-US" dirty="0">
+                <a:solidFill>
+                  <a:srgbClr val="D4D4D4"/>
+                </a:solidFill>
+                <a:latin typeface="Consolas" panose="020B0609020204030204" pitchFamily="49" charset="0"/>
+              </a:rPr>
+              <a:t>(</a:t>
+            </a:r>
+            <a:r>
+              <a:rPr lang="en-US" dirty="0">
+                <a:solidFill>
+                  <a:srgbClr val="CE9178"/>
+                </a:solidFill>
+                <a:latin typeface="Consolas" panose="020B0609020204030204" pitchFamily="49" charset="0"/>
+              </a:rPr>
+              <a:t>'red'</a:t>
+            </a:r>
+            <a:r>
+              <a:rPr lang="en-US" dirty="0">
+                <a:solidFill>
+                  <a:srgbClr val="D4D4D4"/>
+                </a:solidFill>
+                <a:latin typeface="Consolas" panose="020B0609020204030204" pitchFamily="49" charset="0"/>
+              </a:rPr>
+              <a:t>);</a:t>
+            </a:r>
+            <a:endParaRPr lang="en-US" b="0" dirty="0">
+              <a:solidFill>
+                <a:srgbClr val="D4D4D4"/>
+              </a:solidFill>
+              <a:effectLst/>
+              <a:latin typeface="Consolas" panose="020B0609020204030204" pitchFamily="49" charset="0"/>
+            </a:endParaRPr>
+          </a:p>
+        </p:txBody>
+      </p:sp>
+      <p:sp>
+        <p:nvSpPr>
+          <p:cNvPr id="5" name="pole tekstowe 4">
+            <a:extLst>
+              <a:ext uri="{FF2B5EF4-FFF2-40B4-BE49-F238E27FC236}">
+                <a16:creationId xmlns:a16="http://schemas.microsoft.com/office/drawing/2014/main" id="{A3D4C87E-89A8-4C9D-BDA8-D731CBB0A9F7}"/>
+              </a:ext>
+            </a:extLst>
+          </p:cNvPr>
+          <p:cNvSpPr txBox="1"/>
+          <p:nvPr/>
+        </p:nvSpPr>
+        <p:spPr>
+          <a:xfrm>
+            <a:off x="2557669" y="940981"/>
+            <a:ext cx="1650324" cy="369332"/>
+          </a:xfrm>
+          <a:prstGeom prst="rect">
+            <a:avLst/>
+          </a:prstGeom>
+          <a:noFill/>
+        </p:spPr>
+        <p:txBody>
+          <a:bodyPr wrap="none" rtlCol="0">
+            <a:spAutoFit/>
+          </a:bodyPr>
+          <a:lstStyle/>
+          <a:p>
+            <a:r>
+              <a:rPr lang="pl-PL" dirty="0" err="1"/>
+              <a:t>Declare</a:t>
+            </a:r>
+            <a:r>
+              <a:rPr lang="pl-PL" dirty="0"/>
+              <a:t> </a:t>
+            </a:r>
+            <a:r>
+              <a:rPr lang="pl-PL" dirty="0" err="1"/>
+              <a:t>context</a:t>
+            </a:r>
+            <a:endParaRPr lang="pl-PL" dirty="0"/>
+          </a:p>
+        </p:txBody>
+      </p:sp>
+      <p:sp>
+        <p:nvSpPr>
+          <p:cNvPr id="6" name="Prostokąt 5">
+            <a:extLst>
+              <a:ext uri="{FF2B5EF4-FFF2-40B4-BE49-F238E27FC236}">
+                <a16:creationId xmlns:a16="http://schemas.microsoft.com/office/drawing/2014/main" id="{09F5D755-1E8B-4DB5-8929-8E4AA4404171}"/>
+              </a:ext>
+            </a:extLst>
+          </p:cNvPr>
+          <p:cNvSpPr/>
+          <p:nvPr/>
+        </p:nvSpPr>
+        <p:spPr>
+          <a:xfrm>
+            <a:off x="1948068" y="2350461"/>
+            <a:ext cx="8574158" cy="369332"/>
+          </a:xfrm>
+          <a:prstGeom prst="rect">
+            <a:avLst/>
+          </a:prstGeom>
+          <a:solidFill>
+            <a:schemeClr val="tx1"/>
+          </a:solidFill>
+        </p:spPr>
+        <p:txBody>
+          <a:bodyPr wrap="square">
+            <a:spAutoFit/>
+          </a:bodyPr>
+          <a:lstStyle/>
+          <a:p>
+            <a:r>
+              <a:rPr lang="pl-PL" dirty="0" err="1">
+                <a:solidFill>
+                  <a:srgbClr val="569CD6"/>
+                </a:solidFill>
+                <a:latin typeface="Consolas" panose="020B0609020204030204" pitchFamily="49" charset="0"/>
+              </a:rPr>
+              <a:t>const</a:t>
+            </a:r>
+            <a:r>
+              <a:rPr lang="pl-PL" dirty="0">
+                <a:solidFill>
+                  <a:srgbClr val="D4D4D4"/>
+                </a:solidFill>
+                <a:latin typeface="Consolas" panose="020B0609020204030204" pitchFamily="49" charset="0"/>
+              </a:rPr>
+              <a:t> { </a:t>
+            </a:r>
+            <a:r>
+              <a:rPr lang="pl-PL" dirty="0">
+                <a:solidFill>
+                  <a:srgbClr val="9CDCFE"/>
+                </a:solidFill>
+                <a:latin typeface="Consolas" panose="020B0609020204030204" pitchFamily="49" charset="0"/>
+              </a:rPr>
+              <a:t>Provider</a:t>
+            </a:r>
+            <a:r>
+              <a:rPr lang="pl-PL" dirty="0">
+                <a:solidFill>
+                  <a:srgbClr val="D4D4D4"/>
+                </a:solidFill>
+                <a:latin typeface="Consolas" panose="020B0609020204030204" pitchFamily="49" charset="0"/>
+              </a:rPr>
+              <a:t>, </a:t>
+            </a:r>
+            <a:r>
+              <a:rPr lang="pl-PL" dirty="0">
+                <a:solidFill>
+                  <a:srgbClr val="9CDCFE"/>
+                </a:solidFill>
+                <a:latin typeface="Consolas" panose="020B0609020204030204" pitchFamily="49" charset="0"/>
+              </a:rPr>
+              <a:t>Consumer</a:t>
+            </a:r>
+            <a:r>
+              <a:rPr lang="pl-PL" dirty="0">
+                <a:solidFill>
+                  <a:srgbClr val="D4D4D4"/>
+                </a:solidFill>
+                <a:latin typeface="Consolas" panose="020B0609020204030204" pitchFamily="49" charset="0"/>
+              </a:rPr>
+              <a:t> } = </a:t>
+            </a:r>
+            <a:r>
+              <a:rPr lang="pl-PL" dirty="0" err="1">
+                <a:solidFill>
+                  <a:srgbClr val="9CDCFE"/>
+                </a:solidFill>
+                <a:latin typeface="Consolas" panose="020B0609020204030204" pitchFamily="49" charset="0"/>
+              </a:rPr>
+              <a:t>React</a:t>
+            </a:r>
+            <a:r>
+              <a:rPr lang="pl-PL" dirty="0" err="1">
+                <a:solidFill>
+                  <a:srgbClr val="D4D4D4"/>
+                </a:solidFill>
+                <a:latin typeface="Consolas" panose="020B0609020204030204" pitchFamily="49" charset="0"/>
+              </a:rPr>
+              <a:t>.</a:t>
+            </a:r>
+            <a:r>
+              <a:rPr lang="pl-PL" dirty="0" err="1">
+                <a:solidFill>
+                  <a:srgbClr val="DCDCAA"/>
+                </a:solidFill>
+                <a:latin typeface="Consolas" panose="020B0609020204030204" pitchFamily="49" charset="0"/>
+              </a:rPr>
+              <a:t>createContext</a:t>
+            </a:r>
+            <a:r>
+              <a:rPr lang="pl-PL" dirty="0">
+                <a:solidFill>
+                  <a:srgbClr val="D4D4D4"/>
+                </a:solidFill>
+                <a:latin typeface="Consolas" panose="020B0609020204030204" pitchFamily="49" charset="0"/>
+              </a:rPr>
+              <a:t>(</a:t>
+            </a:r>
+            <a:r>
+              <a:rPr lang="pl-PL" dirty="0" err="1">
+                <a:solidFill>
+                  <a:srgbClr val="9CDCFE"/>
+                </a:solidFill>
+                <a:latin typeface="Consolas" panose="020B0609020204030204" pitchFamily="49" charset="0"/>
+              </a:rPr>
+              <a:t>defaultValue</a:t>
+            </a:r>
+            <a:r>
+              <a:rPr lang="pl-PL" dirty="0">
+                <a:solidFill>
+                  <a:srgbClr val="D4D4D4"/>
+                </a:solidFill>
+                <a:latin typeface="Consolas" panose="020B0609020204030204" pitchFamily="49" charset="0"/>
+              </a:rPr>
+              <a:t>);</a:t>
+            </a:r>
+            <a:endParaRPr lang="pl-PL" b="0" dirty="0">
+              <a:solidFill>
+                <a:srgbClr val="D4D4D4"/>
+              </a:solidFill>
+              <a:effectLst/>
+              <a:latin typeface="Consolas" panose="020B0609020204030204" pitchFamily="49" charset="0"/>
+            </a:endParaRPr>
+          </a:p>
+        </p:txBody>
+      </p:sp>
+      <p:sp>
+        <p:nvSpPr>
+          <p:cNvPr id="7" name="pole tekstowe 6">
+            <a:extLst>
+              <a:ext uri="{FF2B5EF4-FFF2-40B4-BE49-F238E27FC236}">
+                <a16:creationId xmlns:a16="http://schemas.microsoft.com/office/drawing/2014/main" id="{6AFBFF6E-D528-41FC-B304-E1790889608C}"/>
+              </a:ext>
+            </a:extLst>
+          </p:cNvPr>
+          <p:cNvSpPr txBox="1"/>
+          <p:nvPr/>
+        </p:nvSpPr>
+        <p:spPr>
+          <a:xfrm>
+            <a:off x="1848678" y="1984152"/>
+            <a:ext cx="494046" cy="369332"/>
+          </a:xfrm>
+          <a:prstGeom prst="rect">
+            <a:avLst/>
+          </a:prstGeom>
+          <a:noFill/>
+        </p:spPr>
+        <p:txBody>
+          <a:bodyPr wrap="none" rtlCol="0">
+            <a:spAutoFit/>
+          </a:bodyPr>
+          <a:lstStyle/>
+          <a:p>
+            <a:r>
+              <a:rPr lang="pl-PL" dirty="0"/>
+              <a:t>API</a:t>
+            </a:r>
+          </a:p>
+        </p:txBody>
+      </p:sp>
+      <p:sp>
+        <p:nvSpPr>
+          <p:cNvPr id="8" name="Prostokąt 7">
+            <a:extLst>
+              <a:ext uri="{FF2B5EF4-FFF2-40B4-BE49-F238E27FC236}">
+                <a16:creationId xmlns:a16="http://schemas.microsoft.com/office/drawing/2014/main" id="{B3708224-F77D-4D19-899A-4100042ABA84}"/>
+              </a:ext>
+            </a:extLst>
+          </p:cNvPr>
+          <p:cNvSpPr/>
+          <p:nvPr/>
+        </p:nvSpPr>
+        <p:spPr>
+          <a:xfrm>
+            <a:off x="304798" y="3261045"/>
+            <a:ext cx="5314123" cy="1754326"/>
+          </a:xfrm>
+          <a:prstGeom prst="rect">
+            <a:avLst/>
+          </a:prstGeom>
+          <a:solidFill>
+            <a:schemeClr val="tx1"/>
+          </a:solidFill>
+        </p:spPr>
+        <p:txBody>
+          <a:bodyPr wrap="square">
+            <a:spAutoFit/>
+          </a:bodyPr>
+          <a:lstStyle/>
+          <a:p>
+            <a:r>
+              <a:rPr lang="pl-PL" dirty="0" err="1">
+                <a:solidFill>
+                  <a:srgbClr val="569CD6"/>
+                </a:solidFill>
+                <a:latin typeface="Consolas" panose="020B0609020204030204" pitchFamily="49" charset="0"/>
+              </a:rPr>
+              <a:t>const</a:t>
+            </a:r>
+            <a:r>
+              <a:rPr lang="pl-PL" dirty="0">
+                <a:solidFill>
+                  <a:srgbClr val="D4D4D4"/>
+                </a:solidFill>
+                <a:latin typeface="Consolas" panose="020B0609020204030204" pitchFamily="49" charset="0"/>
+              </a:rPr>
+              <a:t> { </a:t>
+            </a:r>
+            <a:r>
+              <a:rPr lang="pl-PL" dirty="0">
+                <a:solidFill>
+                  <a:srgbClr val="9CDCFE"/>
+                </a:solidFill>
+                <a:latin typeface="Consolas" panose="020B0609020204030204" pitchFamily="49" charset="0"/>
+              </a:rPr>
+              <a:t>Provider</a:t>
+            </a:r>
+            <a:r>
+              <a:rPr lang="pl-PL" dirty="0">
+                <a:solidFill>
+                  <a:srgbClr val="D4D4D4"/>
+                </a:solidFill>
+                <a:latin typeface="Consolas" panose="020B0609020204030204" pitchFamily="49" charset="0"/>
+              </a:rPr>
+              <a:t> } = </a:t>
+            </a:r>
+            <a:r>
+              <a:rPr lang="pl-PL" dirty="0" err="1">
+                <a:solidFill>
+                  <a:srgbClr val="9CDCFE"/>
+                </a:solidFill>
+                <a:latin typeface="Consolas" panose="020B0609020204030204" pitchFamily="49" charset="0"/>
+              </a:rPr>
+              <a:t>ColorContext</a:t>
+            </a:r>
+            <a:r>
+              <a:rPr lang="pl-PL" dirty="0">
+                <a:solidFill>
+                  <a:srgbClr val="D4D4D4"/>
+                </a:solidFill>
+                <a:latin typeface="Consolas" panose="020B0609020204030204" pitchFamily="49" charset="0"/>
+              </a:rPr>
+              <a:t>;</a:t>
+            </a:r>
+          </a:p>
+          <a:p>
+            <a:r>
+              <a:rPr lang="pl-PL" dirty="0">
+                <a:solidFill>
+                  <a:srgbClr val="C586C0"/>
+                </a:solidFill>
+                <a:latin typeface="Consolas" panose="020B0609020204030204" pitchFamily="49" charset="0"/>
+              </a:rPr>
+              <a:t>return</a:t>
+            </a:r>
+            <a:r>
+              <a:rPr lang="pl-PL" dirty="0">
+                <a:solidFill>
+                  <a:srgbClr val="D4D4D4"/>
+                </a:solidFill>
+                <a:latin typeface="Consolas" panose="020B0609020204030204" pitchFamily="49" charset="0"/>
+              </a:rPr>
+              <a:t> (</a:t>
+            </a:r>
+          </a:p>
+          <a:p>
+            <a:r>
+              <a:rPr lang="pl-PL" dirty="0">
+                <a:solidFill>
+                  <a:srgbClr val="D4D4D4"/>
+                </a:solidFill>
+                <a:latin typeface="Consolas" panose="020B0609020204030204" pitchFamily="49" charset="0"/>
+              </a:rPr>
+              <a:t>    </a:t>
+            </a:r>
+            <a:r>
+              <a:rPr lang="pl-PL" dirty="0">
+                <a:solidFill>
+                  <a:srgbClr val="808080"/>
+                </a:solidFill>
+                <a:latin typeface="Consolas" panose="020B0609020204030204" pitchFamily="49" charset="0"/>
+              </a:rPr>
+              <a:t>&lt;</a:t>
+            </a:r>
+            <a:r>
+              <a:rPr lang="pl-PL" dirty="0">
+                <a:solidFill>
+                  <a:srgbClr val="4EC9B0"/>
+                </a:solidFill>
+                <a:latin typeface="Consolas" panose="020B0609020204030204" pitchFamily="49" charset="0"/>
+              </a:rPr>
+              <a:t>Provider</a:t>
+            </a:r>
+            <a:r>
+              <a:rPr lang="pl-PL" dirty="0">
+                <a:solidFill>
+                  <a:srgbClr val="D4D4D4"/>
+                </a:solidFill>
+                <a:latin typeface="Consolas" panose="020B0609020204030204" pitchFamily="49" charset="0"/>
+              </a:rPr>
+              <a:t> </a:t>
+            </a:r>
+            <a:r>
+              <a:rPr lang="pl-PL" dirty="0" err="1">
+                <a:solidFill>
+                  <a:srgbClr val="9CDCFE"/>
+                </a:solidFill>
+                <a:latin typeface="Consolas" panose="020B0609020204030204" pitchFamily="49" charset="0"/>
+              </a:rPr>
+              <a:t>value</a:t>
+            </a:r>
+            <a:r>
+              <a:rPr lang="pl-PL" dirty="0">
+                <a:solidFill>
+                  <a:srgbClr val="D4D4D4"/>
+                </a:solidFill>
+                <a:latin typeface="Consolas" panose="020B0609020204030204" pitchFamily="49" charset="0"/>
+              </a:rPr>
+              <a:t>=</a:t>
+            </a:r>
+            <a:r>
+              <a:rPr lang="pl-PL" dirty="0">
+                <a:solidFill>
+                  <a:srgbClr val="569CD6"/>
+                </a:solidFill>
+                <a:latin typeface="Consolas" panose="020B0609020204030204" pitchFamily="49" charset="0"/>
+              </a:rPr>
+              <a:t>{</a:t>
+            </a:r>
+            <a:r>
+              <a:rPr lang="pl-PL" dirty="0" err="1">
+                <a:solidFill>
+                  <a:srgbClr val="569CD6"/>
+                </a:solidFill>
+                <a:latin typeface="Consolas" panose="020B0609020204030204" pitchFamily="49" charset="0"/>
+              </a:rPr>
+              <a:t>this</a:t>
+            </a:r>
+            <a:r>
+              <a:rPr lang="pl-PL" dirty="0" err="1">
+                <a:solidFill>
+                  <a:srgbClr val="D4D4D4"/>
+                </a:solidFill>
+                <a:latin typeface="Consolas" panose="020B0609020204030204" pitchFamily="49" charset="0"/>
+              </a:rPr>
+              <a:t>.</a:t>
+            </a:r>
+            <a:r>
+              <a:rPr lang="pl-PL" dirty="0" err="1">
+                <a:solidFill>
+                  <a:srgbClr val="9CDCFE"/>
+                </a:solidFill>
+                <a:latin typeface="Consolas" panose="020B0609020204030204" pitchFamily="49" charset="0"/>
+              </a:rPr>
+              <a:t>state</a:t>
+            </a:r>
+            <a:r>
+              <a:rPr lang="pl-PL" dirty="0" err="1">
+                <a:solidFill>
+                  <a:srgbClr val="D4D4D4"/>
+                </a:solidFill>
+                <a:latin typeface="Consolas" panose="020B0609020204030204" pitchFamily="49" charset="0"/>
+              </a:rPr>
+              <a:t>.</a:t>
+            </a:r>
+            <a:r>
+              <a:rPr lang="pl-PL" dirty="0" err="1">
+                <a:solidFill>
+                  <a:srgbClr val="9CDCFE"/>
+                </a:solidFill>
+                <a:latin typeface="Consolas" panose="020B0609020204030204" pitchFamily="49" charset="0"/>
+              </a:rPr>
+              <a:t>color</a:t>
+            </a:r>
+            <a:r>
+              <a:rPr lang="pl-PL" dirty="0">
+                <a:solidFill>
+                  <a:srgbClr val="569CD6"/>
+                </a:solidFill>
+                <a:latin typeface="Consolas" panose="020B0609020204030204" pitchFamily="49" charset="0"/>
+              </a:rPr>
+              <a:t>}</a:t>
+            </a:r>
+            <a:r>
+              <a:rPr lang="pl-PL" dirty="0">
+                <a:solidFill>
+                  <a:srgbClr val="808080"/>
+                </a:solidFill>
+                <a:latin typeface="Consolas" panose="020B0609020204030204" pitchFamily="49" charset="0"/>
+              </a:rPr>
+              <a:t>&gt;</a:t>
+            </a:r>
+            <a:endParaRPr lang="pl-PL" dirty="0">
+              <a:solidFill>
+                <a:srgbClr val="D4D4D4"/>
+              </a:solidFill>
+              <a:latin typeface="Consolas" panose="020B0609020204030204" pitchFamily="49" charset="0"/>
+            </a:endParaRPr>
+          </a:p>
+          <a:p>
+            <a:r>
+              <a:rPr lang="pl-PL" dirty="0">
+                <a:solidFill>
+                  <a:srgbClr val="D4D4D4"/>
+                </a:solidFill>
+                <a:latin typeface="Consolas" panose="020B0609020204030204" pitchFamily="49" charset="0"/>
+              </a:rPr>
+              <a:t>    </a:t>
+            </a:r>
+            <a:r>
+              <a:rPr lang="pl-PL" dirty="0">
+                <a:solidFill>
+                  <a:srgbClr val="808080"/>
+                </a:solidFill>
+                <a:latin typeface="Consolas" panose="020B0609020204030204" pitchFamily="49" charset="0"/>
+              </a:rPr>
+              <a:t>&lt;</a:t>
+            </a:r>
+            <a:r>
+              <a:rPr lang="pl-PL" dirty="0" err="1">
+                <a:solidFill>
+                  <a:srgbClr val="4EC9B0"/>
+                </a:solidFill>
+                <a:latin typeface="Consolas" panose="020B0609020204030204" pitchFamily="49" charset="0"/>
+              </a:rPr>
+              <a:t>SomeComponent</a:t>
+            </a:r>
+            <a:r>
+              <a:rPr lang="pl-PL" dirty="0">
+                <a:solidFill>
+                  <a:srgbClr val="D4D4D4"/>
+                </a:solidFill>
+                <a:latin typeface="Consolas" panose="020B0609020204030204" pitchFamily="49" charset="0"/>
+              </a:rPr>
+              <a:t> </a:t>
+            </a:r>
+            <a:r>
+              <a:rPr lang="pl-PL" dirty="0">
+                <a:solidFill>
+                  <a:srgbClr val="808080"/>
+                </a:solidFill>
+                <a:latin typeface="Consolas" panose="020B0609020204030204" pitchFamily="49" charset="0"/>
+              </a:rPr>
+              <a:t>/&gt;</a:t>
+            </a:r>
+            <a:endParaRPr lang="pl-PL" dirty="0">
+              <a:solidFill>
+                <a:srgbClr val="D4D4D4"/>
+              </a:solidFill>
+              <a:latin typeface="Consolas" panose="020B0609020204030204" pitchFamily="49" charset="0"/>
+            </a:endParaRPr>
+          </a:p>
+          <a:p>
+            <a:r>
+              <a:rPr lang="pl-PL" dirty="0">
+                <a:solidFill>
+                  <a:srgbClr val="D4D4D4"/>
+                </a:solidFill>
+                <a:latin typeface="Consolas" panose="020B0609020204030204" pitchFamily="49" charset="0"/>
+              </a:rPr>
+              <a:t>    </a:t>
+            </a:r>
+            <a:r>
+              <a:rPr lang="pl-PL" dirty="0">
+                <a:solidFill>
+                  <a:srgbClr val="808080"/>
+                </a:solidFill>
+                <a:latin typeface="Consolas" panose="020B0609020204030204" pitchFamily="49" charset="0"/>
+              </a:rPr>
+              <a:t>&lt;/</a:t>
+            </a:r>
+            <a:r>
+              <a:rPr lang="pl-PL" dirty="0">
+                <a:solidFill>
+                  <a:srgbClr val="4EC9B0"/>
+                </a:solidFill>
+                <a:latin typeface="Consolas" panose="020B0609020204030204" pitchFamily="49" charset="0"/>
+              </a:rPr>
+              <a:t>Provider</a:t>
+            </a:r>
+            <a:r>
+              <a:rPr lang="pl-PL" dirty="0">
+                <a:solidFill>
+                  <a:srgbClr val="808080"/>
+                </a:solidFill>
+                <a:latin typeface="Consolas" panose="020B0609020204030204" pitchFamily="49" charset="0"/>
+              </a:rPr>
+              <a:t>&gt;</a:t>
+            </a:r>
+            <a:endParaRPr lang="pl-PL" dirty="0">
+              <a:solidFill>
+                <a:srgbClr val="D4D4D4"/>
+              </a:solidFill>
+              <a:latin typeface="Consolas" panose="020B0609020204030204" pitchFamily="49" charset="0"/>
+            </a:endParaRPr>
+          </a:p>
+          <a:p>
+            <a:r>
+              <a:rPr lang="pl-PL" dirty="0">
+                <a:solidFill>
+                  <a:srgbClr val="D4D4D4"/>
+                </a:solidFill>
+                <a:latin typeface="Consolas" panose="020B0609020204030204" pitchFamily="49" charset="0"/>
+              </a:rPr>
+              <a:t>);</a:t>
+            </a:r>
+            <a:endParaRPr lang="pl-PL" b="0" dirty="0">
+              <a:solidFill>
+                <a:srgbClr val="D4D4D4"/>
+              </a:solidFill>
+              <a:effectLst/>
+              <a:latin typeface="Consolas" panose="020B0609020204030204" pitchFamily="49" charset="0"/>
+            </a:endParaRPr>
+          </a:p>
+        </p:txBody>
+      </p:sp>
+      <p:sp>
+        <p:nvSpPr>
+          <p:cNvPr id="9" name="pole tekstowe 8">
+            <a:extLst>
+              <a:ext uri="{FF2B5EF4-FFF2-40B4-BE49-F238E27FC236}">
+                <a16:creationId xmlns:a16="http://schemas.microsoft.com/office/drawing/2014/main" id="{A2AEA798-8AAF-4721-A6BA-BA1FAA3647A5}"/>
+              </a:ext>
+            </a:extLst>
+          </p:cNvPr>
+          <p:cNvSpPr txBox="1"/>
+          <p:nvPr/>
+        </p:nvSpPr>
+        <p:spPr>
+          <a:xfrm>
+            <a:off x="250817" y="2891713"/>
+            <a:ext cx="3686330" cy="369332"/>
+          </a:xfrm>
+          <a:prstGeom prst="rect">
+            <a:avLst/>
+          </a:prstGeom>
+          <a:noFill/>
+        </p:spPr>
+        <p:txBody>
+          <a:bodyPr wrap="none" rtlCol="0">
+            <a:spAutoFit/>
+          </a:bodyPr>
+          <a:lstStyle/>
+          <a:p>
+            <a:r>
+              <a:rPr lang="pl-PL" dirty="0" err="1"/>
+              <a:t>Create</a:t>
+            </a:r>
+            <a:r>
+              <a:rPr lang="pl-PL" dirty="0"/>
+              <a:t> </a:t>
+            </a:r>
+            <a:r>
+              <a:rPr lang="pl-PL" dirty="0" err="1"/>
+              <a:t>context</a:t>
+            </a:r>
+            <a:r>
+              <a:rPr lang="pl-PL" dirty="0"/>
+              <a:t> and </a:t>
+            </a:r>
+            <a:r>
+              <a:rPr lang="pl-PL" dirty="0" err="1"/>
+              <a:t>distribute</a:t>
+            </a:r>
+            <a:r>
+              <a:rPr lang="pl-PL" dirty="0"/>
+              <a:t> </a:t>
+            </a:r>
+            <a:r>
+              <a:rPr lang="pl-PL" dirty="0" err="1"/>
+              <a:t>it</a:t>
+            </a:r>
+            <a:r>
+              <a:rPr lang="pl-PL" dirty="0"/>
+              <a:t> </a:t>
+            </a:r>
+            <a:r>
+              <a:rPr lang="pl-PL" dirty="0" err="1"/>
+              <a:t>lower</a:t>
+            </a:r>
+            <a:endParaRPr lang="pl-PL" dirty="0"/>
+          </a:p>
+        </p:txBody>
+      </p:sp>
+      <p:sp>
+        <p:nvSpPr>
+          <p:cNvPr id="10" name="Prostokąt 9">
+            <a:extLst>
+              <a:ext uri="{FF2B5EF4-FFF2-40B4-BE49-F238E27FC236}">
+                <a16:creationId xmlns:a16="http://schemas.microsoft.com/office/drawing/2014/main" id="{3CA8F0AD-1751-4CA4-BC68-6036F396EA31}"/>
+              </a:ext>
+            </a:extLst>
+          </p:cNvPr>
+          <p:cNvSpPr/>
+          <p:nvPr/>
+        </p:nvSpPr>
+        <p:spPr>
+          <a:xfrm>
+            <a:off x="5777947" y="3261045"/>
+            <a:ext cx="5870714" cy="1754326"/>
+          </a:xfrm>
+          <a:prstGeom prst="rect">
+            <a:avLst/>
+          </a:prstGeom>
+          <a:solidFill>
+            <a:schemeClr val="tx1"/>
+          </a:solidFill>
+        </p:spPr>
+        <p:txBody>
+          <a:bodyPr wrap="square">
+            <a:spAutoFit/>
+          </a:bodyPr>
+          <a:lstStyle/>
+          <a:p>
+            <a:r>
+              <a:rPr lang="pl-PL" dirty="0" err="1">
+                <a:solidFill>
+                  <a:srgbClr val="569CD6"/>
+                </a:solidFill>
+                <a:latin typeface="Consolas" panose="020B0609020204030204" pitchFamily="49" charset="0"/>
+              </a:rPr>
+              <a:t>const</a:t>
+            </a:r>
+            <a:r>
+              <a:rPr lang="pl-PL" dirty="0">
+                <a:solidFill>
+                  <a:srgbClr val="D4D4D4"/>
+                </a:solidFill>
+                <a:latin typeface="Consolas" panose="020B0609020204030204" pitchFamily="49" charset="0"/>
+              </a:rPr>
+              <a:t> { </a:t>
+            </a:r>
+            <a:r>
+              <a:rPr lang="pl-PL" dirty="0">
+                <a:solidFill>
+                  <a:srgbClr val="9CDCFE"/>
+                </a:solidFill>
+                <a:latin typeface="Consolas" panose="020B0609020204030204" pitchFamily="49" charset="0"/>
+              </a:rPr>
+              <a:t>Consumer</a:t>
+            </a:r>
+            <a:r>
+              <a:rPr lang="pl-PL" dirty="0">
+                <a:solidFill>
+                  <a:srgbClr val="D4D4D4"/>
+                </a:solidFill>
+                <a:latin typeface="Consolas" panose="020B0609020204030204" pitchFamily="49" charset="0"/>
+              </a:rPr>
+              <a:t> } = </a:t>
+            </a:r>
+            <a:r>
+              <a:rPr lang="pl-PL" dirty="0" err="1">
+                <a:solidFill>
+                  <a:srgbClr val="9CDCFE"/>
+                </a:solidFill>
+                <a:latin typeface="Consolas" panose="020B0609020204030204" pitchFamily="49" charset="0"/>
+              </a:rPr>
+              <a:t>ColorContext</a:t>
+            </a:r>
+            <a:r>
+              <a:rPr lang="pl-PL" dirty="0">
+                <a:solidFill>
+                  <a:srgbClr val="D4D4D4"/>
+                </a:solidFill>
+                <a:latin typeface="Consolas" panose="020B0609020204030204" pitchFamily="49" charset="0"/>
+              </a:rPr>
+              <a:t>;</a:t>
+            </a:r>
+          </a:p>
+          <a:p>
+            <a:r>
+              <a:rPr lang="pl-PL" dirty="0">
+                <a:solidFill>
+                  <a:srgbClr val="C586C0"/>
+                </a:solidFill>
+                <a:latin typeface="Consolas" panose="020B0609020204030204" pitchFamily="49" charset="0"/>
+              </a:rPr>
+              <a:t>return</a:t>
+            </a:r>
+            <a:r>
+              <a:rPr lang="pl-PL" dirty="0">
+                <a:solidFill>
+                  <a:srgbClr val="D4D4D4"/>
+                </a:solidFill>
+                <a:latin typeface="Consolas" panose="020B0609020204030204" pitchFamily="49" charset="0"/>
+              </a:rPr>
+              <a:t> (</a:t>
+            </a:r>
+          </a:p>
+          <a:p>
+            <a:r>
+              <a:rPr lang="pl-PL" dirty="0">
+                <a:solidFill>
+                  <a:srgbClr val="D4D4D4"/>
+                </a:solidFill>
+                <a:latin typeface="Consolas" panose="020B0609020204030204" pitchFamily="49" charset="0"/>
+              </a:rPr>
+              <a:t>    </a:t>
+            </a:r>
+            <a:r>
+              <a:rPr lang="pl-PL" dirty="0">
+                <a:solidFill>
+                  <a:srgbClr val="808080"/>
+                </a:solidFill>
+                <a:latin typeface="Consolas" panose="020B0609020204030204" pitchFamily="49" charset="0"/>
+              </a:rPr>
+              <a:t>&lt;</a:t>
+            </a:r>
+            <a:r>
+              <a:rPr lang="pl-PL" dirty="0">
+                <a:solidFill>
+                  <a:srgbClr val="4EC9B0"/>
+                </a:solidFill>
+                <a:latin typeface="Consolas" panose="020B0609020204030204" pitchFamily="49" charset="0"/>
+              </a:rPr>
+              <a:t>Consumer</a:t>
+            </a:r>
+            <a:r>
+              <a:rPr lang="pl-PL" dirty="0">
+                <a:solidFill>
+                  <a:srgbClr val="808080"/>
+                </a:solidFill>
+                <a:latin typeface="Consolas" panose="020B0609020204030204" pitchFamily="49" charset="0"/>
+              </a:rPr>
+              <a:t>&gt;</a:t>
+            </a:r>
+            <a:endParaRPr lang="pl-PL" dirty="0">
+              <a:solidFill>
+                <a:srgbClr val="D4D4D4"/>
+              </a:solidFill>
+              <a:latin typeface="Consolas" panose="020B0609020204030204" pitchFamily="49" charset="0"/>
+            </a:endParaRPr>
+          </a:p>
+          <a:p>
+            <a:r>
+              <a:rPr lang="pl-PL" dirty="0">
+                <a:solidFill>
+                  <a:srgbClr val="D4D4D4"/>
+                </a:solidFill>
+                <a:latin typeface="Consolas" panose="020B0609020204030204" pitchFamily="49" charset="0"/>
+              </a:rPr>
+              <a:t>        </a:t>
+            </a:r>
+            <a:r>
+              <a:rPr lang="pl-PL" dirty="0">
+                <a:solidFill>
+                  <a:srgbClr val="569CD6"/>
+                </a:solidFill>
+                <a:latin typeface="Consolas" panose="020B0609020204030204" pitchFamily="49" charset="0"/>
+              </a:rPr>
+              <a:t>{</a:t>
+            </a:r>
+            <a:r>
+              <a:rPr lang="pl-PL" dirty="0" err="1">
+                <a:solidFill>
+                  <a:srgbClr val="9CDCFE"/>
+                </a:solidFill>
+                <a:latin typeface="Consolas" panose="020B0609020204030204" pitchFamily="49" charset="0"/>
+              </a:rPr>
+              <a:t>value</a:t>
+            </a:r>
+            <a:r>
+              <a:rPr lang="pl-PL" dirty="0">
+                <a:solidFill>
+                  <a:srgbClr val="D4D4D4"/>
+                </a:solidFill>
+                <a:latin typeface="Consolas" panose="020B0609020204030204" pitchFamily="49" charset="0"/>
+              </a:rPr>
+              <a:t> </a:t>
+            </a:r>
+            <a:r>
+              <a:rPr lang="pl-PL" dirty="0">
+                <a:solidFill>
+                  <a:srgbClr val="569CD6"/>
+                </a:solidFill>
+                <a:latin typeface="Consolas" panose="020B0609020204030204" pitchFamily="49" charset="0"/>
+              </a:rPr>
+              <a:t>=&gt;</a:t>
+            </a:r>
+            <a:r>
+              <a:rPr lang="pl-PL" dirty="0">
+                <a:solidFill>
+                  <a:srgbClr val="D4D4D4"/>
+                </a:solidFill>
+                <a:latin typeface="Consolas" panose="020B0609020204030204" pitchFamily="49" charset="0"/>
+              </a:rPr>
+              <a:t> </a:t>
+            </a:r>
+            <a:r>
+              <a:rPr lang="pl-PL" dirty="0">
+                <a:solidFill>
+                  <a:srgbClr val="808080"/>
+                </a:solidFill>
+                <a:latin typeface="Consolas" panose="020B0609020204030204" pitchFamily="49" charset="0"/>
+              </a:rPr>
+              <a:t>&lt;</a:t>
+            </a:r>
+            <a:r>
+              <a:rPr lang="pl-PL" dirty="0">
+                <a:solidFill>
+                  <a:srgbClr val="569CD6"/>
+                </a:solidFill>
+                <a:latin typeface="Consolas" panose="020B0609020204030204" pitchFamily="49" charset="0"/>
+              </a:rPr>
+              <a:t>div</a:t>
+            </a:r>
+            <a:r>
+              <a:rPr lang="pl-PL" dirty="0">
+                <a:solidFill>
+                  <a:srgbClr val="808080"/>
+                </a:solidFill>
+                <a:latin typeface="Consolas" panose="020B0609020204030204" pitchFamily="49" charset="0"/>
+              </a:rPr>
+              <a:t>&gt;</a:t>
+            </a:r>
+            <a:r>
+              <a:rPr lang="pl-PL" dirty="0">
+                <a:solidFill>
+                  <a:srgbClr val="569CD6"/>
+                </a:solidFill>
+                <a:latin typeface="Consolas" panose="020B0609020204030204" pitchFamily="49" charset="0"/>
+              </a:rPr>
+              <a:t>{</a:t>
+            </a:r>
+            <a:r>
+              <a:rPr lang="pl-PL" dirty="0" err="1">
+                <a:solidFill>
+                  <a:srgbClr val="9CDCFE"/>
+                </a:solidFill>
+                <a:latin typeface="Consolas" panose="020B0609020204030204" pitchFamily="49" charset="0"/>
+              </a:rPr>
+              <a:t>value</a:t>
+            </a:r>
+            <a:r>
+              <a:rPr lang="pl-PL" dirty="0">
+                <a:solidFill>
+                  <a:srgbClr val="569CD6"/>
+                </a:solidFill>
+                <a:latin typeface="Consolas" panose="020B0609020204030204" pitchFamily="49" charset="0"/>
+              </a:rPr>
+              <a:t>}</a:t>
+            </a:r>
+            <a:r>
+              <a:rPr lang="pl-PL" dirty="0">
+                <a:solidFill>
+                  <a:srgbClr val="808080"/>
+                </a:solidFill>
+                <a:latin typeface="Consolas" panose="020B0609020204030204" pitchFamily="49" charset="0"/>
+              </a:rPr>
+              <a:t>&lt;/</a:t>
+            </a:r>
+            <a:r>
+              <a:rPr lang="pl-PL" dirty="0">
+                <a:solidFill>
+                  <a:srgbClr val="569CD6"/>
+                </a:solidFill>
+                <a:latin typeface="Consolas" panose="020B0609020204030204" pitchFamily="49" charset="0"/>
+              </a:rPr>
+              <a:t>div</a:t>
+            </a:r>
+            <a:r>
+              <a:rPr lang="pl-PL" dirty="0">
+                <a:solidFill>
+                  <a:srgbClr val="808080"/>
+                </a:solidFill>
+                <a:latin typeface="Consolas" panose="020B0609020204030204" pitchFamily="49" charset="0"/>
+              </a:rPr>
+              <a:t>&gt;</a:t>
+            </a:r>
+            <a:r>
+              <a:rPr lang="pl-PL" dirty="0">
+                <a:solidFill>
+                  <a:srgbClr val="569CD6"/>
+                </a:solidFill>
+                <a:latin typeface="Consolas" panose="020B0609020204030204" pitchFamily="49" charset="0"/>
+              </a:rPr>
+              <a:t>}</a:t>
+            </a:r>
+            <a:endParaRPr lang="pl-PL" dirty="0">
+              <a:solidFill>
+                <a:srgbClr val="D4D4D4"/>
+              </a:solidFill>
+              <a:latin typeface="Consolas" panose="020B0609020204030204" pitchFamily="49" charset="0"/>
+            </a:endParaRPr>
+          </a:p>
+          <a:p>
+            <a:r>
+              <a:rPr lang="pl-PL" dirty="0">
+                <a:solidFill>
+                  <a:srgbClr val="D4D4D4"/>
+                </a:solidFill>
+                <a:latin typeface="Consolas" panose="020B0609020204030204" pitchFamily="49" charset="0"/>
+              </a:rPr>
+              <a:t>    </a:t>
+            </a:r>
+            <a:r>
+              <a:rPr lang="pl-PL" dirty="0">
+                <a:solidFill>
+                  <a:srgbClr val="808080"/>
+                </a:solidFill>
+                <a:latin typeface="Consolas" panose="020B0609020204030204" pitchFamily="49" charset="0"/>
+              </a:rPr>
+              <a:t>&lt;/</a:t>
+            </a:r>
+            <a:r>
+              <a:rPr lang="pl-PL" dirty="0">
+                <a:solidFill>
+                  <a:srgbClr val="4EC9B0"/>
+                </a:solidFill>
+                <a:latin typeface="Consolas" panose="020B0609020204030204" pitchFamily="49" charset="0"/>
+              </a:rPr>
+              <a:t>Consumer</a:t>
+            </a:r>
+            <a:r>
+              <a:rPr lang="pl-PL" dirty="0">
+                <a:solidFill>
+                  <a:srgbClr val="808080"/>
+                </a:solidFill>
+                <a:latin typeface="Consolas" panose="020B0609020204030204" pitchFamily="49" charset="0"/>
+              </a:rPr>
+              <a:t>&gt;</a:t>
+            </a:r>
+            <a:r>
+              <a:rPr lang="pl-PL" dirty="0">
+                <a:solidFill>
+                  <a:srgbClr val="D4D4D4"/>
+                </a:solidFill>
+                <a:latin typeface="Consolas" panose="020B0609020204030204" pitchFamily="49" charset="0"/>
+              </a:rPr>
+              <a:t>)</a:t>
+            </a:r>
+          </a:p>
+          <a:p>
+            <a:endParaRPr lang="pl-PL" b="0" dirty="0">
+              <a:solidFill>
+                <a:srgbClr val="D4D4D4"/>
+              </a:solidFill>
+              <a:effectLst/>
+              <a:latin typeface="Consolas" panose="020B0609020204030204" pitchFamily="49" charset="0"/>
+            </a:endParaRPr>
+          </a:p>
+        </p:txBody>
+      </p:sp>
+      <p:sp>
+        <p:nvSpPr>
+          <p:cNvPr id="11" name="pole tekstowe 10">
+            <a:extLst>
+              <a:ext uri="{FF2B5EF4-FFF2-40B4-BE49-F238E27FC236}">
+                <a16:creationId xmlns:a16="http://schemas.microsoft.com/office/drawing/2014/main" id="{4AA447AA-121C-460D-9A40-67693DDC23EC}"/>
+              </a:ext>
+            </a:extLst>
+          </p:cNvPr>
+          <p:cNvSpPr txBox="1"/>
+          <p:nvPr/>
+        </p:nvSpPr>
+        <p:spPr>
+          <a:xfrm>
+            <a:off x="5777947" y="2825880"/>
+            <a:ext cx="3375732" cy="369332"/>
+          </a:xfrm>
+          <a:prstGeom prst="rect">
+            <a:avLst/>
+          </a:prstGeom>
+          <a:noFill/>
+        </p:spPr>
+        <p:txBody>
+          <a:bodyPr wrap="none" rtlCol="0">
+            <a:spAutoFit/>
+          </a:bodyPr>
+          <a:lstStyle/>
+          <a:p>
+            <a:r>
+              <a:rPr lang="pl-PL" dirty="0" err="1"/>
+              <a:t>Use</a:t>
+            </a:r>
+            <a:r>
+              <a:rPr lang="pl-PL" dirty="0"/>
+              <a:t> </a:t>
+            </a:r>
+            <a:r>
+              <a:rPr lang="pl-PL" dirty="0" err="1"/>
+              <a:t>it</a:t>
+            </a:r>
+            <a:r>
+              <a:rPr lang="pl-PL" dirty="0"/>
+              <a:t> </a:t>
+            </a:r>
+            <a:r>
+              <a:rPr lang="pl-PL" dirty="0" err="1"/>
+              <a:t>somewhere</a:t>
+            </a:r>
+            <a:r>
+              <a:rPr lang="pl-PL" dirty="0"/>
+              <a:t> </a:t>
+            </a:r>
+            <a:r>
+              <a:rPr lang="pl-PL" dirty="0" err="1"/>
+              <a:t>lower</a:t>
+            </a:r>
+            <a:r>
+              <a:rPr lang="pl-PL" dirty="0"/>
+              <a:t> in </a:t>
+            </a:r>
+            <a:r>
+              <a:rPr lang="pl-PL" dirty="0" err="1"/>
+              <a:t>render</a:t>
+            </a:r>
+            <a:endParaRPr lang="pl-PL" dirty="0"/>
+          </a:p>
+        </p:txBody>
+      </p:sp>
+      <p:sp>
+        <p:nvSpPr>
+          <p:cNvPr id="12" name="Prostokąt 11">
+            <a:extLst>
+              <a:ext uri="{FF2B5EF4-FFF2-40B4-BE49-F238E27FC236}">
+                <a16:creationId xmlns:a16="http://schemas.microsoft.com/office/drawing/2014/main" id="{65EC9C16-9F5A-4956-AFCE-AFB5963B02B6}"/>
+              </a:ext>
+            </a:extLst>
+          </p:cNvPr>
+          <p:cNvSpPr/>
+          <p:nvPr/>
+        </p:nvSpPr>
+        <p:spPr>
+          <a:xfrm>
+            <a:off x="2729947" y="5533933"/>
+            <a:ext cx="6096000" cy="1200329"/>
+          </a:xfrm>
+          <a:prstGeom prst="rect">
+            <a:avLst/>
+          </a:prstGeom>
+          <a:solidFill>
+            <a:schemeClr val="tx1"/>
+          </a:solidFill>
+        </p:spPr>
+        <p:txBody>
+          <a:bodyPr>
+            <a:spAutoFit/>
+          </a:bodyPr>
+          <a:lstStyle/>
+          <a:p>
+            <a:r>
+              <a:rPr lang="en-US" dirty="0">
+                <a:solidFill>
+                  <a:srgbClr val="C586C0"/>
+                </a:solidFill>
+                <a:latin typeface="Consolas" panose="020B0609020204030204" pitchFamily="49" charset="0"/>
+              </a:rPr>
+              <a:t>export</a:t>
+            </a:r>
+            <a:r>
+              <a:rPr lang="en-US" dirty="0">
+                <a:solidFill>
+                  <a:srgbClr val="D4D4D4"/>
+                </a:solidFill>
+                <a:latin typeface="Consolas" panose="020B0609020204030204" pitchFamily="49" charset="0"/>
+              </a:rPr>
+              <a:t> </a:t>
+            </a:r>
+            <a:r>
+              <a:rPr lang="en-US" dirty="0">
+                <a:solidFill>
+                  <a:srgbClr val="C586C0"/>
+                </a:solidFill>
+                <a:latin typeface="Consolas" panose="020B0609020204030204" pitchFamily="49" charset="0"/>
+              </a:rPr>
+              <a:t>default</a:t>
+            </a:r>
+            <a:r>
+              <a:rPr lang="en-US" dirty="0">
+                <a:solidFill>
+                  <a:srgbClr val="D4D4D4"/>
+                </a:solidFill>
+                <a:latin typeface="Consolas" panose="020B0609020204030204" pitchFamily="49" charset="0"/>
+              </a:rPr>
+              <a:t> </a:t>
+            </a:r>
+            <a:r>
+              <a:rPr lang="en-US" dirty="0">
+                <a:solidFill>
+                  <a:srgbClr val="569CD6"/>
+                </a:solidFill>
+                <a:latin typeface="Consolas" panose="020B0609020204030204" pitchFamily="49" charset="0"/>
+              </a:rPr>
+              <a:t>class</a:t>
+            </a:r>
+            <a:r>
+              <a:rPr lang="en-US" dirty="0">
+                <a:solidFill>
+                  <a:srgbClr val="D4D4D4"/>
+                </a:solidFill>
+                <a:latin typeface="Consolas" panose="020B0609020204030204" pitchFamily="49" charset="0"/>
+              </a:rPr>
+              <a:t> </a:t>
+            </a:r>
+            <a:r>
+              <a:rPr lang="en-US" dirty="0">
+                <a:solidFill>
+                  <a:srgbClr val="4EC9B0"/>
+                </a:solidFill>
+                <a:latin typeface="Consolas" panose="020B0609020204030204" pitchFamily="49" charset="0"/>
+              </a:rPr>
+              <a:t>Square</a:t>
+            </a:r>
+            <a:r>
+              <a:rPr lang="en-US" dirty="0">
+                <a:solidFill>
+                  <a:srgbClr val="D4D4D4"/>
+                </a:solidFill>
+                <a:latin typeface="Consolas" panose="020B0609020204030204" pitchFamily="49" charset="0"/>
+              </a:rPr>
+              <a:t> </a:t>
+            </a:r>
+            <a:r>
+              <a:rPr lang="en-US" dirty="0">
+                <a:solidFill>
+                  <a:srgbClr val="569CD6"/>
+                </a:solidFill>
+                <a:latin typeface="Consolas" panose="020B0609020204030204" pitchFamily="49" charset="0"/>
+              </a:rPr>
+              <a:t>extends</a:t>
+            </a:r>
+            <a:r>
+              <a:rPr lang="en-US" dirty="0">
+                <a:solidFill>
+                  <a:srgbClr val="D4D4D4"/>
+                </a:solidFill>
+                <a:latin typeface="Consolas" panose="020B0609020204030204" pitchFamily="49" charset="0"/>
+              </a:rPr>
+              <a:t> </a:t>
+            </a:r>
+            <a:r>
+              <a:rPr lang="en-US" dirty="0">
+                <a:solidFill>
+                  <a:srgbClr val="4EC9B0"/>
+                </a:solidFill>
+                <a:latin typeface="Consolas" panose="020B0609020204030204" pitchFamily="49" charset="0"/>
+              </a:rPr>
+              <a:t>Component</a:t>
+            </a:r>
+            <a:r>
+              <a:rPr lang="en-US" dirty="0">
+                <a:solidFill>
+                  <a:srgbClr val="D4D4D4"/>
+                </a:solidFill>
+                <a:latin typeface="Consolas" panose="020B0609020204030204" pitchFamily="49" charset="0"/>
+              </a:rPr>
+              <a:t> {</a:t>
+            </a:r>
+          </a:p>
+          <a:p>
+            <a:r>
+              <a:rPr lang="en-US" dirty="0">
+                <a:solidFill>
+                  <a:srgbClr val="D4D4D4"/>
+                </a:solidFill>
+                <a:latin typeface="Consolas" panose="020B0609020204030204" pitchFamily="49" charset="0"/>
+              </a:rPr>
+              <a:t>    </a:t>
+            </a:r>
+            <a:r>
+              <a:rPr lang="en-US" dirty="0">
+                <a:solidFill>
+                  <a:srgbClr val="569CD6"/>
+                </a:solidFill>
+                <a:latin typeface="Consolas" panose="020B0609020204030204" pitchFamily="49" charset="0"/>
+              </a:rPr>
+              <a:t>static</a:t>
+            </a:r>
+            <a:r>
+              <a:rPr lang="en-US" dirty="0">
+                <a:solidFill>
+                  <a:srgbClr val="D4D4D4"/>
+                </a:solidFill>
+                <a:latin typeface="Consolas" panose="020B0609020204030204" pitchFamily="49" charset="0"/>
+              </a:rPr>
+              <a:t> </a:t>
+            </a:r>
+            <a:r>
+              <a:rPr lang="en-US" dirty="0" err="1">
+                <a:solidFill>
+                  <a:srgbClr val="9CDCFE"/>
+                </a:solidFill>
+                <a:latin typeface="Consolas" panose="020B0609020204030204" pitchFamily="49" charset="0"/>
+              </a:rPr>
+              <a:t>contextType</a:t>
+            </a:r>
+            <a:r>
+              <a:rPr lang="en-US" dirty="0">
+                <a:solidFill>
+                  <a:srgbClr val="D4D4D4"/>
+                </a:solidFill>
+                <a:latin typeface="Consolas" panose="020B0609020204030204" pitchFamily="49" charset="0"/>
+              </a:rPr>
+              <a:t> = </a:t>
+            </a:r>
+            <a:r>
+              <a:rPr lang="en-US" dirty="0" err="1">
+                <a:solidFill>
+                  <a:srgbClr val="9CDCFE"/>
+                </a:solidFill>
+                <a:latin typeface="Consolas" panose="020B0609020204030204" pitchFamily="49" charset="0"/>
+              </a:rPr>
+              <a:t>ColorContext</a:t>
+            </a:r>
+            <a:r>
+              <a:rPr lang="en-US" dirty="0">
+                <a:solidFill>
+                  <a:srgbClr val="D4D4D4"/>
+                </a:solidFill>
+                <a:latin typeface="Consolas" panose="020B0609020204030204" pitchFamily="49" charset="0"/>
+              </a:rPr>
+              <a:t>;</a:t>
+            </a:r>
+          </a:p>
+          <a:p>
+            <a:r>
+              <a:rPr lang="en-US" dirty="0">
+                <a:solidFill>
+                  <a:srgbClr val="D4D4D4"/>
+                </a:solidFill>
+                <a:latin typeface="Consolas" panose="020B0609020204030204" pitchFamily="49" charset="0"/>
+              </a:rPr>
+              <a:t>    ...</a:t>
+            </a:r>
+          </a:p>
+          <a:p>
+            <a:r>
+              <a:rPr lang="en-US" dirty="0">
+                <a:solidFill>
+                  <a:srgbClr val="D4D4D4"/>
+                </a:solidFill>
+                <a:latin typeface="Consolas" panose="020B0609020204030204" pitchFamily="49" charset="0"/>
+              </a:rPr>
+              <a:t>    </a:t>
+            </a:r>
+            <a:r>
+              <a:rPr lang="en-US" dirty="0">
+                <a:solidFill>
+                  <a:srgbClr val="9CDCFE"/>
+                </a:solidFill>
+                <a:latin typeface="Consolas" panose="020B0609020204030204" pitchFamily="49" charset="0"/>
+              </a:rPr>
+              <a:t>let</a:t>
+            </a:r>
+            <a:r>
+              <a:rPr lang="en-US" dirty="0">
+                <a:solidFill>
+                  <a:srgbClr val="D4D4D4"/>
+                </a:solidFill>
+                <a:latin typeface="Consolas" panose="020B0609020204030204" pitchFamily="49" charset="0"/>
+              </a:rPr>
+              <a:t> </a:t>
+            </a:r>
+            <a:r>
+              <a:rPr lang="en-US" dirty="0">
+                <a:solidFill>
+                  <a:srgbClr val="9CDCFE"/>
+                </a:solidFill>
+                <a:latin typeface="Consolas" panose="020B0609020204030204" pitchFamily="49" charset="0"/>
+              </a:rPr>
+              <a:t>value</a:t>
+            </a:r>
+            <a:r>
+              <a:rPr lang="en-US" dirty="0">
+                <a:solidFill>
+                  <a:srgbClr val="D4D4D4"/>
+                </a:solidFill>
+                <a:latin typeface="Consolas" panose="020B0609020204030204" pitchFamily="49" charset="0"/>
+              </a:rPr>
+              <a:t> = </a:t>
+            </a:r>
+            <a:r>
+              <a:rPr lang="en-US" dirty="0" err="1">
+                <a:solidFill>
+                  <a:srgbClr val="569CD6"/>
+                </a:solidFill>
+                <a:latin typeface="Consolas" panose="020B0609020204030204" pitchFamily="49" charset="0"/>
+              </a:rPr>
+              <a:t>this</a:t>
+            </a:r>
+            <a:r>
+              <a:rPr lang="en-US" dirty="0" err="1">
+                <a:solidFill>
+                  <a:srgbClr val="D4D4D4"/>
+                </a:solidFill>
+                <a:latin typeface="Consolas" panose="020B0609020204030204" pitchFamily="49" charset="0"/>
+              </a:rPr>
+              <a:t>.</a:t>
+            </a:r>
+            <a:r>
+              <a:rPr lang="en-US" dirty="0" err="1">
+                <a:solidFill>
+                  <a:srgbClr val="9CDCFE"/>
+                </a:solidFill>
+                <a:latin typeface="Consolas" panose="020B0609020204030204" pitchFamily="49" charset="0"/>
+              </a:rPr>
+              <a:t>context</a:t>
+            </a:r>
+            <a:r>
+              <a:rPr lang="en-US" dirty="0" err="1">
+                <a:solidFill>
+                  <a:srgbClr val="D4D4D4"/>
+                </a:solidFill>
+                <a:latin typeface="Consolas" panose="020B0609020204030204" pitchFamily="49" charset="0"/>
+              </a:rPr>
+              <a:t>.</a:t>
+            </a:r>
+            <a:r>
+              <a:rPr lang="en-US" dirty="0" err="1">
+                <a:solidFill>
+                  <a:srgbClr val="9CDCFE"/>
+                </a:solidFill>
+                <a:latin typeface="Consolas" panose="020B0609020204030204" pitchFamily="49" charset="0"/>
+              </a:rPr>
+              <a:t>value</a:t>
+            </a:r>
+            <a:endParaRPr lang="en-US" b="0" dirty="0">
+              <a:solidFill>
+                <a:srgbClr val="D4D4D4"/>
+              </a:solidFill>
+              <a:effectLst/>
+              <a:latin typeface="Consolas" panose="020B0609020204030204" pitchFamily="49" charset="0"/>
+            </a:endParaRPr>
+          </a:p>
+        </p:txBody>
+      </p:sp>
+      <p:sp>
+        <p:nvSpPr>
+          <p:cNvPr id="13" name="pole tekstowe 12">
+            <a:extLst>
+              <a:ext uri="{FF2B5EF4-FFF2-40B4-BE49-F238E27FC236}">
+                <a16:creationId xmlns:a16="http://schemas.microsoft.com/office/drawing/2014/main" id="{54A378F5-86E5-4CF8-93CE-7BA7E4674FE4}"/>
+              </a:ext>
+            </a:extLst>
+          </p:cNvPr>
+          <p:cNvSpPr txBox="1"/>
+          <p:nvPr/>
+        </p:nvSpPr>
+        <p:spPr>
+          <a:xfrm>
+            <a:off x="2720268" y="5132260"/>
+            <a:ext cx="2996526" cy="369332"/>
+          </a:xfrm>
+          <a:prstGeom prst="rect">
+            <a:avLst/>
+          </a:prstGeom>
+          <a:noFill/>
+        </p:spPr>
+        <p:txBody>
+          <a:bodyPr wrap="none" rtlCol="0">
+            <a:spAutoFit/>
+          </a:bodyPr>
+          <a:lstStyle/>
+          <a:p>
+            <a:r>
+              <a:rPr lang="pl-PL" dirty="0" err="1"/>
+              <a:t>Use</a:t>
+            </a:r>
+            <a:r>
+              <a:rPr lang="pl-PL" dirty="0"/>
+              <a:t> </a:t>
+            </a:r>
+            <a:r>
+              <a:rPr lang="pl-PL" dirty="0" err="1"/>
+              <a:t>it</a:t>
+            </a:r>
+            <a:r>
+              <a:rPr lang="pl-PL" dirty="0"/>
+              <a:t> </a:t>
+            </a:r>
+            <a:r>
+              <a:rPr lang="pl-PL" dirty="0" err="1"/>
+              <a:t>outside</a:t>
+            </a:r>
+            <a:r>
+              <a:rPr lang="pl-PL" dirty="0"/>
+              <a:t> </a:t>
+            </a:r>
+            <a:r>
+              <a:rPr lang="pl-PL" dirty="0" err="1"/>
+              <a:t>render</a:t>
+            </a:r>
+            <a:r>
+              <a:rPr lang="pl-PL" dirty="0"/>
+              <a:t> </a:t>
+            </a:r>
+            <a:r>
+              <a:rPr lang="pl-PL" dirty="0" err="1"/>
+              <a:t>function</a:t>
             </a:r>
             <a:endParaRPr lang="pl-PL" dirty="0"/>
           </a:p>

</xml_diff>

<commit_message>
Exercise 4a - error handler
</commit_message>
<xml_diff>
--- a/tutorial/ReactjsTraining.pptx
+++ b/tutorial/ReactjsTraining.pptx
@@ -230,7 +230,7 @@
           <a:p>
             <a:fld id="{D61BAF21-C883-454C-A249-8697E6BEDB6B}" type="datetimeFigureOut">
               <a:rPr lang="pl-PL" smtClean="0"/>
-              <a:t>06.10.2019</a:t>
+              <a:t>07.10.2019</a:t>
             </a:fld>
             <a:endParaRPr lang="pl-PL"/>
           </a:p>
@@ -5583,6 +5583,494 @@
               <a:buFontTx/>
               <a:buNone/>
             </a:pPr>
+            <a:r>
+              <a:rPr lang="pl-PL" sz="1200" b="0" i="0" kern="1200" dirty="0">
+                <a:solidFill>
+                  <a:schemeClr val="tx1"/>
+                </a:solidFill>
+                <a:effectLst/>
+                <a:latin typeface="+mn-lt"/>
+                <a:ea typeface="+mn-ea"/>
+                <a:cs typeface="+mn-cs"/>
+              </a:rPr>
+              <a:t>Granice błędów to komponenty </a:t>
+            </a:r>
+            <a:r>
+              <a:rPr lang="pl-PL" sz="1200" b="0" i="0" kern="1200" dirty="0" err="1">
+                <a:solidFill>
+                  <a:schemeClr val="tx1"/>
+                </a:solidFill>
+                <a:effectLst/>
+                <a:latin typeface="+mn-lt"/>
+                <a:ea typeface="+mn-ea"/>
+                <a:cs typeface="+mn-cs"/>
+              </a:rPr>
+              <a:t>reactowe</a:t>
+            </a:r>
+            <a:r>
+              <a:rPr lang="pl-PL" sz="1200" b="0" i="0" kern="1200" dirty="0">
+                <a:solidFill>
+                  <a:schemeClr val="tx1"/>
+                </a:solidFill>
+                <a:effectLst/>
+                <a:latin typeface="+mn-lt"/>
+                <a:ea typeface="+mn-ea"/>
+                <a:cs typeface="+mn-cs"/>
+              </a:rPr>
+              <a:t>, które </a:t>
+            </a:r>
+            <a:r>
+              <a:rPr lang="pl-PL" sz="1200" b="1" i="0" kern="1200" dirty="0">
+                <a:solidFill>
+                  <a:schemeClr val="tx1"/>
+                </a:solidFill>
+                <a:effectLst/>
+                <a:latin typeface="+mn-lt"/>
+                <a:ea typeface="+mn-ea"/>
+                <a:cs typeface="+mn-cs"/>
+              </a:rPr>
+              <a:t>przechwytują błędy </a:t>
+            </a:r>
+            <a:r>
+              <a:rPr lang="pl-PL" sz="1200" b="1" i="0" kern="1200" dirty="0" err="1">
+                <a:solidFill>
+                  <a:schemeClr val="tx1"/>
+                </a:solidFill>
+                <a:effectLst/>
+                <a:latin typeface="+mn-lt"/>
+                <a:ea typeface="+mn-ea"/>
+                <a:cs typeface="+mn-cs"/>
+              </a:rPr>
+              <a:t>javascriptowe</a:t>
+            </a:r>
+            <a:r>
+              <a:rPr lang="pl-PL" sz="1200" b="1" i="0" kern="1200" dirty="0">
+                <a:solidFill>
+                  <a:schemeClr val="tx1"/>
+                </a:solidFill>
+                <a:effectLst/>
+                <a:latin typeface="+mn-lt"/>
+                <a:ea typeface="+mn-ea"/>
+                <a:cs typeface="+mn-cs"/>
+              </a:rPr>
+              <a:t> występujące gdziekolwiek wewnątrz drzewa komponentów ich potomków, a następnie logują je i wyświetlają zastępczy interfejs UI</a:t>
+            </a:r>
+            <a:r>
+              <a:rPr lang="pl-PL" sz="1200" b="0" i="0" kern="1200" dirty="0">
+                <a:solidFill>
+                  <a:schemeClr val="tx1"/>
+                </a:solidFill>
+                <a:effectLst/>
+                <a:latin typeface="+mn-lt"/>
+                <a:ea typeface="+mn-ea"/>
+                <a:cs typeface="+mn-cs"/>
+              </a:rPr>
+              <a:t>,</a:t>
+            </a:r>
+          </a:p>
+          <a:p>
+            <a:pPr marL="0" indent="0">
+              <a:buFontTx/>
+              <a:buNone/>
+            </a:pPr>
+            <a:endParaRPr lang="pl-PL" sz="1200" b="0" i="0" kern="1200" dirty="0">
+              <a:solidFill>
+                <a:schemeClr val="tx1"/>
+              </a:solidFill>
+              <a:effectLst/>
+              <a:latin typeface="+mn-lt"/>
+              <a:ea typeface="+mn-ea"/>
+              <a:cs typeface="+mn-cs"/>
+            </a:endParaRPr>
+          </a:p>
+          <a:p>
+            <a:r>
+              <a:rPr lang="pl-PL" sz="1200" b="0" i="0" kern="1200" dirty="0">
+                <a:solidFill>
+                  <a:schemeClr val="tx1"/>
+                </a:solidFill>
+                <a:effectLst/>
+                <a:latin typeface="+mn-lt"/>
+                <a:ea typeface="+mn-ea"/>
+                <a:cs typeface="+mn-cs"/>
+              </a:rPr>
+              <a:t>Granice błędów </a:t>
+            </a:r>
+            <a:r>
+              <a:rPr lang="pl-PL" sz="1200" b="1" i="0" kern="1200" dirty="0">
+                <a:solidFill>
+                  <a:schemeClr val="tx1"/>
+                </a:solidFill>
+                <a:effectLst/>
+                <a:latin typeface="+mn-lt"/>
+                <a:ea typeface="+mn-ea"/>
+                <a:cs typeface="+mn-cs"/>
+              </a:rPr>
+              <a:t>nie obsługują</a:t>
+            </a:r>
+            <a:r>
+              <a:rPr lang="pl-PL" sz="1200" b="0" i="0" kern="1200" dirty="0">
+                <a:solidFill>
+                  <a:schemeClr val="tx1"/>
+                </a:solidFill>
+                <a:effectLst/>
+                <a:latin typeface="+mn-lt"/>
+                <a:ea typeface="+mn-ea"/>
+                <a:cs typeface="+mn-cs"/>
+              </a:rPr>
+              <a:t> błędów w:</a:t>
+            </a:r>
+          </a:p>
+          <a:p>
+            <a:pPr marL="171450" indent="-171450">
+              <a:buFontTx/>
+              <a:buChar char="-"/>
+            </a:pPr>
+            <a:r>
+              <a:rPr lang="pl-PL" sz="1200" b="0" i="0" kern="1200" dirty="0">
+                <a:solidFill>
+                  <a:schemeClr val="tx1"/>
+                </a:solidFill>
+                <a:effectLst/>
+                <a:latin typeface="+mn-lt"/>
+                <a:ea typeface="+mn-ea"/>
+                <a:cs typeface="+mn-cs"/>
+              </a:rPr>
+              <a:t>Procedurach obsługi zdarzeń (ang. event </a:t>
+            </a:r>
+            <a:r>
+              <a:rPr lang="pl-PL" sz="1200" b="0" i="0" kern="1200" dirty="0" err="1">
+                <a:solidFill>
+                  <a:schemeClr val="tx1"/>
+                </a:solidFill>
+                <a:effectLst/>
+                <a:latin typeface="+mn-lt"/>
+                <a:ea typeface="+mn-ea"/>
+                <a:cs typeface="+mn-cs"/>
+              </a:rPr>
+              <a:t>handlers</a:t>
+            </a:r>
+            <a:r>
+              <a:rPr lang="pl-PL" sz="1200" b="0" i="0" kern="1200" dirty="0">
+                <a:solidFill>
+                  <a:schemeClr val="tx1"/>
+                </a:solidFill>
+                <a:effectLst/>
+                <a:latin typeface="+mn-lt"/>
+                <a:ea typeface="+mn-ea"/>
+                <a:cs typeface="+mn-cs"/>
+              </a:rPr>
+              <a:t>) – dlatego mi nie działało z </a:t>
+            </a:r>
+            <a:r>
+              <a:rPr lang="pl-PL" sz="1200" b="0" i="0" kern="1200" dirty="0" err="1">
+                <a:solidFill>
+                  <a:schemeClr val="tx1"/>
+                </a:solidFill>
+                <a:effectLst/>
+                <a:latin typeface="+mn-lt"/>
+                <a:ea typeface="+mn-ea"/>
+                <a:cs typeface="+mn-cs"/>
+              </a:rPr>
+              <a:t>buttonem</a:t>
+            </a:r>
+            <a:r>
+              <a:rPr lang="pl-PL" sz="1200" b="0" i="0" kern="1200" dirty="0">
+                <a:solidFill>
+                  <a:schemeClr val="tx1"/>
+                </a:solidFill>
+                <a:effectLst/>
+                <a:latin typeface="+mn-lt"/>
+                <a:ea typeface="+mn-ea"/>
+                <a:cs typeface="+mn-cs"/>
+              </a:rPr>
+              <a:t> który wywalał błąd</a:t>
+            </a:r>
+          </a:p>
+          <a:p>
+            <a:pPr marL="171450" indent="-171450">
+              <a:buFontTx/>
+              <a:buChar char="-"/>
+            </a:pPr>
+            <a:r>
+              <a:rPr lang="pl-PL" sz="1200" b="0" i="0" kern="1200" dirty="0">
+                <a:solidFill>
+                  <a:schemeClr val="tx1"/>
+                </a:solidFill>
+                <a:effectLst/>
+                <a:latin typeface="+mn-lt"/>
+                <a:ea typeface="+mn-ea"/>
+                <a:cs typeface="+mn-cs"/>
+              </a:rPr>
+              <a:t>Asynchronicznym kodzie (np. w metodach: </a:t>
+            </a:r>
+            <a:r>
+              <a:rPr lang="pl-PL" sz="1200" b="0" i="0" kern="1200" dirty="0" err="1">
+                <a:solidFill>
+                  <a:schemeClr val="tx1"/>
+                </a:solidFill>
+                <a:effectLst/>
+                <a:latin typeface="+mn-lt"/>
+                <a:ea typeface="+mn-ea"/>
+                <a:cs typeface="+mn-cs"/>
+              </a:rPr>
+              <a:t>setTimeout</a:t>
+            </a:r>
+            <a:r>
+              <a:rPr lang="pl-PL" sz="1200" b="0" i="0" kern="1200" dirty="0">
+                <a:solidFill>
+                  <a:schemeClr val="tx1"/>
+                </a:solidFill>
+                <a:effectLst/>
+                <a:latin typeface="+mn-lt"/>
+                <a:ea typeface="+mn-ea"/>
+                <a:cs typeface="+mn-cs"/>
+              </a:rPr>
+              <a:t>)</a:t>
+            </a:r>
+          </a:p>
+          <a:p>
+            <a:pPr marL="171450" indent="-171450">
+              <a:buFontTx/>
+              <a:buChar char="-"/>
+            </a:pPr>
+            <a:r>
+              <a:rPr lang="pl-PL" sz="1200" b="0" i="0" kern="1200" dirty="0">
+                <a:solidFill>
+                  <a:schemeClr val="tx1"/>
+                </a:solidFill>
+                <a:effectLst/>
+                <a:latin typeface="+mn-lt"/>
+                <a:ea typeface="+mn-ea"/>
+                <a:cs typeface="+mn-cs"/>
+              </a:rPr>
+              <a:t>Komponentach </a:t>
+            </a:r>
+            <a:r>
+              <a:rPr lang="pl-PL" sz="1200" b="0" i="0" kern="1200" dirty="0" err="1">
+                <a:solidFill>
+                  <a:schemeClr val="tx1"/>
+                </a:solidFill>
+                <a:effectLst/>
+                <a:latin typeface="+mn-lt"/>
+                <a:ea typeface="+mn-ea"/>
+                <a:cs typeface="+mn-cs"/>
+              </a:rPr>
+              <a:t>renderowanych</a:t>
+            </a:r>
+            <a:r>
+              <a:rPr lang="pl-PL" sz="1200" b="0" i="0" kern="1200" dirty="0">
+                <a:solidFill>
+                  <a:schemeClr val="tx1"/>
+                </a:solidFill>
+                <a:effectLst/>
+                <a:latin typeface="+mn-lt"/>
+                <a:ea typeface="+mn-ea"/>
+                <a:cs typeface="+mn-cs"/>
+              </a:rPr>
+              <a:t> po stronie serwera</a:t>
+            </a:r>
+          </a:p>
+          <a:p>
+            <a:pPr marL="171450" indent="-171450">
+              <a:buFontTx/>
+              <a:buChar char="-"/>
+            </a:pPr>
+            <a:r>
+              <a:rPr lang="pl-PL" sz="1200" b="0" i="0" kern="1200" dirty="0">
+                <a:solidFill>
+                  <a:schemeClr val="tx1"/>
+                </a:solidFill>
+                <a:effectLst/>
+                <a:latin typeface="+mn-lt"/>
+                <a:ea typeface="+mn-ea"/>
+                <a:cs typeface="+mn-cs"/>
+              </a:rPr>
+              <a:t>Błędach rzuconych w samych granicach błędów (a nie w ich podrzędnych komponentach)</a:t>
+            </a:r>
+          </a:p>
+          <a:p>
+            <a:pPr marL="171450" indent="-171450">
+              <a:buFontTx/>
+              <a:buChar char="-"/>
+            </a:pPr>
+            <a:endParaRPr lang="pl-PL" sz="1200" b="0" i="0" kern="1200" dirty="0">
+              <a:solidFill>
+                <a:schemeClr val="tx1"/>
+              </a:solidFill>
+              <a:effectLst/>
+              <a:latin typeface="+mn-lt"/>
+              <a:ea typeface="+mn-ea"/>
+              <a:cs typeface="+mn-cs"/>
+            </a:endParaRPr>
+          </a:p>
+          <a:p>
+            <a:pPr marL="171450" indent="-171450">
+              <a:buFontTx/>
+              <a:buChar char="-"/>
+            </a:pPr>
+            <a:endParaRPr lang="pl-PL" sz="1200" b="0" i="0" kern="1200" dirty="0">
+              <a:solidFill>
+                <a:schemeClr val="tx1"/>
+              </a:solidFill>
+              <a:effectLst/>
+              <a:latin typeface="+mn-lt"/>
+              <a:ea typeface="+mn-ea"/>
+              <a:cs typeface="+mn-cs"/>
+            </a:endParaRPr>
+          </a:p>
+          <a:p>
+            <a:pPr marL="0" indent="0">
+              <a:buFontTx/>
+              <a:buNone/>
+            </a:pPr>
+            <a:r>
+              <a:rPr lang="pl-PL" sz="1200" b="0" i="0" kern="1200" dirty="0" err="1">
+                <a:solidFill>
+                  <a:schemeClr val="tx1"/>
+                </a:solidFill>
+                <a:effectLst/>
+                <a:latin typeface="+mn-lt"/>
+                <a:ea typeface="+mn-ea"/>
+                <a:cs typeface="+mn-cs"/>
+              </a:rPr>
+              <a:t>Exercise</a:t>
+            </a:r>
+            <a:r>
+              <a:rPr lang="pl-PL" sz="1200" b="0" i="0" kern="1200" dirty="0">
+                <a:solidFill>
+                  <a:schemeClr val="tx1"/>
+                </a:solidFill>
+                <a:effectLst/>
+                <a:latin typeface="+mn-lt"/>
+                <a:ea typeface="+mn-ea"/>
+                <a:cs typeface="+mn-cs"/>
+              </a:rPr>
+              <a:t> 4a: Dodaj component </a:t>
+            </a:r>
+            <a:r>
+              <a:rPr lang="pl-PL" sz="1200" b="0" i="0" kern="1200" dirty="0" err="1">
+                <a:solidFill>
+                  <a:schemeClr val="tx1"/>
+                </a:solidFill>
+                <a:effectLst/>
+                <a:latin typeface="+mn-lt"/>
+                <a:ea typeface="+mn-ea"/>
+                <a:cs typeface="+mn-cs"/>
+              </a:rPr>
+              <a:t>ErrorHandler</a:t>
+            </a:r>
+            <a:r>
+              <a:rPr lang="pl-PL" sz="1200" b="0" i="0" kern="1200" dirty="0">
+                <a:solidFill>
+                  <a:schemeClr val="tx1"/>
+                </a:solidFill>
+                <a:effectLst/>
+                <a:latin typeface="+mn-lt"/>
+                <a:ea typeface="+mn-ea"/>
+                <a:cs typeface="+mn-cs"/>
+              </a:rPr>
+              <a:t>, który będzie opakowaniem dla dowolnego </a:t>
+            </a:r>
+            <a:r>
+              <a:rPr lang="pl-PL" sz="1200" b="0" i="0" kern="1200" dirty="0" err="1">
+                <a:solidFill>
+                  <a:schemeClr val="tx1"/>
+                </a:solidFill>
+                <a:effectLst/>
+                <a:latin typeface="+mn-lt"/>
+                <a:ea typeface="+mn-ea"/>
+                <a:cs typeface="+mn-cs"/>
+              </a:rPr>
+              <a:t>componentu</a:t>
+            </a:r>
+            <a:r>
+              <a:rPr lang="pl-PL" sz="1200" b="0" i="0" kern="1200" dirty="0">
+                <a:solidFill>
+                  <a:schemeClr val="tx1"/>
+                </a:solidFill>
+                <a:effectLst/>
+                <a:latin typeface="+mn-lt"/>
+                <a:ea typeface="+mn-ea"/>
+                <a:cs typeface="+mn-cs"/>
+              </a:rPr>
+              <a:t>, w którym jak wyrzucimy wyjątek to </a:t>
+            </a:r>
+            <a:r>
+              <a:rPr lang="pl-PL" sz="1200" b="0" i="0" kern="1200" dirty="0" err="1">
+                <a:solidFill>
+                  <a:schemeClr val="tx1"/>
+                </a:solidFill>
+                <a:effectLst/>
+                <a:latin typeface="+mn-lt"/>
+                <a:ea typeface="+mn-ea"/>
+                <a:cs typeface="+mn-cs"/>
+              </a:rPr>
+              <a:t>ErrorHandler</a:t>
+            </a:r>
+            <a:r>
+              <a:rPr lang="pl-PL" sz="1200" b="0" i="0" kern="1200" dirty="0">
+                <a:solidFill>
+                  <a:schemeClr val="tx1"/>
+                </a:solidFill>
+                <a:effectLst/>
+                <a:latin typeface="+mn-lt"/>
+                <a:ea typeface="+mn-ea"/>
+                <a:cs typeface="+mn-cs"/>
+              </a:rPr>
+              <a:t> zastąpi komponent informacją o błędzie</a:t>
+            </a:r>
+          </a:p>
+          <a:p>
+            <a:pPr marL="171450" indent="-171450">
+              <a:buFontTx/>
+              <a:buChar char="-"/>
+            </a:pPr>
+            <a:endParaRPr lang="pl-PL" sz="1200" b="0" i="0" kern="1200" dirty="0">
+              <a:solidFill>
+                <a:schemeClr val="tx1"/>
+              </a:solidFill>
+              <a:effectLst/>
+              <a:latin typeface="+mn-lt"/>
+              <a:ea typeface="+mn-ea"/>
+              <a:cs typeface="+mn-cs"/>
+            </a:endParaRPr>
+          </a:p>
+          <a:p>
+            <a:pPr marL="171450" indent="-171450">
+              <a:buFontTx/>
+              <a:buChar char="-"/>
+            </a:pPr>
+            <a:endParaRPr lang="pl-PL" sz="1200" b="0" i="0" kern="1200" dirty="0">
+              <a:solidFill>
+                <a:schemeClr val="tx1"/>
+              </a:solidFill>
+              <a:effectLst/>
+              <a:latin typeface="+mn-lt"/>
+              <a:ea typeface="+mn-ea"/>
+              <a:cs typeface="+mn-cs"/>
+            </a:endParaRPr>
+          </a:p>
+          <a:p>
+            <a:pPr marL="171450" indent="-171450">
+              <a:buFontTx/>
+              <a:buChar char="-"/>
+            </a:pPr>
+            <a:endParaRPr lang="pl-PL" sz="1200" b="0" i="0" kern="1200" dirty="0">
+              <a:solidFill>
+                <a:schemeClr val="tx1"/>
+              </a:solidFill>
+              <a:effectLst/>
+              <a:latin typeface="+mn-lt"/>
+              <a:ea typeface="+mn-ea"/>
+              <a:cs typeface="+mn-cs"/>
+            </a:endParaRPr>
+          </a:p>
+          <a:p>
+            <a:pPr marL="0" indent="0">
+              <a:buFontTx/>
+              <a:buNone/>
+            </a:pPr>
             <a:endParaRPr lang="pl-PL" sz="1200" b="0" i="0" kern="1200" dirty="0">
               <a:solidFill>
                 <a:schemeClr val="tx1"/>
@@ -7574,7 +8062,7 @@
           <a:p>
             <a:fld id="{95CCC2EB-502C-49A7-9CC4-85002E026034}" type="datetimeFigureOut">
               <a:rPr lang="pl-PL" smtClean="0"/>
-              <a:t>06.10.2019</a:t>
+              <a:t>07.10.2019</a:t>
             </a:fld>
             <a:endParaRPr lang="pl-PL"/>
           </a:p>
@@ -7772,7 +8260,7 @@
           <a:p>
             <a:fld id="{95CCC2EB-502C-49A7-9CC4-85002E026034}" type="datetimeFigureOut">
               <a:rPr lang="pl-PL" smtClean="0"/>
-              <a:t>06.10.2019</a:t>
+              <a:t>07.10.2019</a:t>
             </a:fld>
             <a:endParaRPr lang="pl-PL"/>
           </a:p>
@@ -7980,7 +8468,7 @@
           <a:p>
             <a:fld id="{95CCC2EB-502C-49A7-9CC4-85002E026034}" type="datetimeFigureOut">
               <a:rPr lang="pl-PL" smtClean="0"/>
-              <a:t>06.10.2019</a:t>
+              <a:t>07.10.2019</a:t>
             </a:fld>
             <a:endParaRPr lang="pl-PL"/>
           </a:p>
@@ -8178,7 +8666,7 @@
           <a:p>
             <a:fld id="{95CCC2EB-502C-49A7-9CC4-85002E026034}" type="datetimeFigureOut">
               <a:rPr lang="pl-PL" smtClean="0"/>
-              <a:t>06.10.2019</a:t>
+              <a:t>07.10.2019</a:t>
             </a:fld>
             <a:endParaRPr lang="pl-PL"/>
           </a:p>
@@ -8453,7 +8941,7 @@
           <a:p>
             <a:fld id="{95CCC2EB-502C-49A7-9CC4-85002E026034}" type="datetimeFigureOut">
               <a:rPr lang="pl-PL" smtClean="0"/>
-              <a:t>06.10.2019</a:t>
+              <a:t>07.10.2019</a:t>
             </a:fld>
             <a:endParaRPr lang="pl-PL"/>
           </a:p>
@@ -8718,7 +9206,7 @@
           <a:p>
             <a:fld id="{95CCC2EB-502C-49A7-9CC4-85002E026034}" type="datetimeFigureOut">
               <a:rPr lang="pl-PL" smtClean="0"/>
-              <a:t>06.10.2019</a:t>
+              <a:t>07.10.2019</a:t>
             </a:fld>
             <a:endParaRPr lang="pl-PL"/>
           </a:p>
@@ -9130,7 +9618,7 @@
           <a:p>
             <a:fld id="{95CCC2EB-502C-49A7-9CC4-85002E026034}" type="datetimeFigureOut">
               <a:rPr lang="pl-PL" smtClean="0"/>
-              <a:t>06.10.2019</a:t>
+              <a:t>07.10.2019</a:t>
             </a:fld>
             <a:endParaRPr lang="pl-PL"/>
           </a:p>
@@ -9271,7 +9759,7 @@
           <a:p>
             <a:fld id="{95CCC2EB-502C-49A7-9CC4-85002E026034}" type="datetimeFigureOut">
               <a:rPr lang="pl-PL" smtClean="0"/>
-              <a:t>06.10.2019</a:t>
+              <a:t>07.10.2019</a:t>
             </a:fld>
             <a:endParaRPr lang="pl-PL"/>
           </a:p>
@@ -9384,7 +9872,7 @@
           <a:p>
             <a:fld id="{95CCC2EB-502C-49A7-9CC4-85002E026034}" type="datetimeFigureOut">
               <a:rPr lang="pl-PL" smtClean="0"/>
-              <a:t>06.10.2019</a:t>
+              <a:t>07.10.2019</a:t>
             </a:fld>
             <a:endParaRPr lang="pl-PL"/>
           </a:p>
@@ -9695,7 +10183,7 @@
           <a:p>
             <a:fld id="{95CCC2EB-502C-49A7-9CC4-85002E026034}" type="datetimeFigureOut">
               <a:rPr lang="pl-PL" smtClean="0"/>
-              <a:t>06.10.2019</a:t>
+              <a:t>07.10.2019</a:t>
             </a:fld>
             <a:endParaRPr lang="pl-PL"/>
           </a:p>
@@ -9983,7 +10471,7 @@
           <a:p>
             <a:fld id="{95CCC2EB-502C-49A7-9CC4-85002E026034}" type="datetimeFigureOut">
               <a:rPr lang="pl-PL" smtClean="0"/>
-              <a:t>06.10.2019</a:t>
+              <a:t>07.10.2019</a:t>
             </a:fld>
             <a:endParaRPr lang="pl-PL"/>
           </a:p>
@@ -10224,7 +10712,7 @@
           <a:p>
             <a:fld id="{95CCC2EB-502C-49A7-9CC4-85002E026034}" type="datetimeFigureOut">
               <a:rPr lang="pl-PL" smtClean="0"/>
-              <a:t>06.10.2019</a:t>
+              <a:t>07.10.2019</a:t>
             </a:fld>
             <a:endParaRPr lang="pl-PL"/>
           </a:p>
@@ -32508,7 +32996,7 @@
         <p:spPr>
           <a:xfrm>
             <a:off x="497840" y="538480"/>
-            <a:ext cx="1641283" cy="369332"/>
+            <a:ext cx="2019207" cy="369332"/>
           </a:xfrm>
           <a:prstGeom prst="rect">
             <a:avLst/>
@@ -32522,18 +33010,665 @@
           <a:lstStyle/>
           <a:p>
             <a:r>
+              <a:rPr lang="pl-PL" dirty="0"/>
+              <a:t>Error </a:t>
+            </a:r>
+            <a:r>
               <a:rPr lang="pl-PL" dirty="0" err="1"/>
-              <a:t>Redux</a:t>
-            </a:r>
-            <a:r>
-              <a:rPr lang="pl-PL" dirty="0"/>
-              <a:t> - </a:t>
-            </a:r>
-            <a:r>
-              <a:rPr lang="pl-PL" dirty="0" err="1"/>
-              <a:t>context</a:t>
+              <a:t>encapsulation</a:t>
             </a:r>
             <a:endParaRPr lang="pl-PL" dirty="0"/>
+          </a:p>
+        </p:txBody>
+      </p:sp>
+      <p:sp>
+        <p:nvSpPr>
+          <p:cNvPr id="3" name="Prostokąt 2">
+            <a:extLst>
+              <a:ext uri="{FF2B5EF4-FFF2-40B4-BE49-F238E27FC236}">
+                <a16:creationId xmlns:a16="http://schemas.microsoft.com/office/drawing/2014/main" id="{47A92A86-0030-4834-8A5E-269BFE65D96D}"/>
+              </a:ext>
+            </a:extLst>
+          </p:cNvPr>
+          <p:cNvSpPr/>
+          <p:nvPr/>
+        </p:nvSpPr>
+        <p:spPr>
+          <a:xfrm>
+            <a:off x="2902226" y="1407469"/>
+            <a:ext cx="6096000" cy="2585323"/>
+          </a:xfrm>
+          <a:prstGeom prst="rect">
+            <a:avLst/>
+          </a:prstGeom>
+          <a:solidFill>
+            <a:schemeClr val="tx1"/>
+          </a:solidFill>
+        </p:spPr>
+        <p:txBody>
+          <a:bodyPr>
+            <a:spAutoFit/>
+          </a:bodyPr>
+          <a:lstStyle/>
+          <a:p>
+            <a:r>
+              <a:rPr lang="pl-PL" dirty="0">
+                <a:solidFill>
+                  <a:srgbClr val="D4D4D4"/>
+                </a:solidFill>
+                <a:latin typeface="Consolas" panose="020B0609020204030204" pitchFamily="49" charset="0"/>
+              </a:rPr>
+              <a:t>    </a:t>
+            </a:r>
+            <a:r>
+              <a:rPr lang="pl-PL" dirty="0">
+                <a:solidFill>
+                  <a:srgbClr val="6A9955"/>
+                </a:solidFill>
+                <a:latin typeface="Consolas" panose="020B0609020204030204" pitchFamily="49" charset="0"/>
+              </a:rPr>
+              <a:t>// </a:t>
+            </a:r>
+            <a:r>
+              <a:rPr lang="pl-PL" dirty="0" err="1">
+                <a:solidFill>
+                  <a:srgbClr val="6A9955"/>
+                </a:solidFill>
+                <a:latin typeface="Consolas" panose="020B0609020204030204" pitchFamily="49" charset="0"/>
+              </a:rPr>
+              <a:t>change</a:t>
+            </a:r>
+            <a:r>
+              <a:rPr lang="pl-PL" dirty="0">
+                <a:solidFill>
+                  <a:srgbClr val="6A9955"/>
+                </a:solidFill>
+                <a:latin typeface="Consolas" panose="020B0609020204030204" pitchFamily="49" charset="0"/>
+              </a:rPr>
+              <a:t> </a:t>
+            </a:r>
+            <a:r>
+              <a:rPr lang="pl-PL" dirty="0" err="1">
+                <a:solidFill>
+                  <a:srgbClr val="6A9955"/>
+                </a:solidFill>
+                <a:latin typeface="Consolas" panose="020B0609020204030204" pitchFamily="49" charset="0"/>
+              </a:rPr>
+              <a:t>state</a:t>
+            </a:r>
+            <a:r>
+              <a:rPr lang="pl-PL" dirty="0">
+                <a:solidFill>
+                  <a:srgbClr val="6A9955"/>
+                </a:solidFill>
+                <a:latin typeface="Consolas" panose="020B0609020204030204" pitchFamily="49" charset="0"/>
+              </a:rPr>
+              <a:t> of error</a:t>
+            </a:r>
+            <a:endParaRPr lang="pl-PL" dirty="0">
+              <a:solidFill>
+                <a:srgbClr val="D4D4D4"/>
+              </a:solidFill>
+              <a:latin typeface="Consolas" panose="020B0609020204030204" pitchFamily="49" charset="0"/>
+            </a:endParaRPr>
+          </a:p>
+          <a:p>
+            <a:r>
+              <a:rPr lang="pl-PL" dirty="0">
+                <a:solidFill>
+                  <a:srgbClr val="D4D4D4"/>
+                </a:solidFill>
+                <a:latin typeface="Consolas" panose="020B0609020204030204" pitchFamily="49" charset="0"/>
+              </a:rPr>
+              <a:t>    </a:t>
+            </a:r>
+            <a:r>
+              <a:rPr lang="pl-PL" dirty="0" err="1">
+                <a:solidFill>
+                  <a:srgbClr val="569CD6"/>
+                </a:solidFill>
+                <a:latin typeface="Consolas" panose="020B0609020204030204" pitchFamily="49" charset="0"/>
+              </a:rPr>
+              <a:t>static</a:t>
+            </a:r>
+            <a:r>
+              <a:rPr lang="pl-PL" dirty="0">
+                <a:solidFill>
+                  <a:srgbClr val="D4D4D4"/>
+                </a:solidFill>
+                <a:latin typeface="Consolas" panose="020B0609020204030204" pitchFamily="49" charset="0"/>
+              </a:rPr>
+              <a:t> </a:t>
+            </a:r>
+            <a:r>
+              <a:rPr lang="pl-PL" dirty="0" err="1">
+                <a:solidFill>
+                  <a:srgbClr val="DCDCAA"/>
+                </a:solidFill>
+                <a:latin typeface="Consolas" panose="020B0609020204030204" pitchFamily="49" charset="0"/>
+              </a:rPr>
+              <a:t>getDerivedStateFromError</a:t>
+            </a:r>
+            <a:r>
+              <a:rPr lang="pl-PL" dirty="0">
+                <a:solidFill>
+                  <a:srgbClr val="D4D4D4"/>
+                </a:solidFill>
+                <a:latin typeface="Consolas" panose="020B0609020204030204" pitchFamily="49" charset="0"/>
+              </a:rPr>
+              <a:t>(</a:t>
+            </a:r>
+            <a:r>
+              <a:rPr lang="pl-PL" dirty="0">
+                <a:solidFill>
+                  <a:srgbClr val="9CDCFE"/>
+                </a:solidFill>
+                <a:latin typeface="Consolas" panose="020B0609020204030204" pitchFamily="49" charset="0"/>
+              </a:rPr>
+              <a:t>error</a:t>
+            </a:r>
+            <a:r>
+              <a:rPr lang="pl-PL" dirty="0">
+                <a:solidFill>
+                  <a:srgbClr val="D4D4D4"/>
+                </a:solidFill>
+                <a:latin typeface="Consolas" panose="020B0609020204030204" pitchFamily="49" charset="0"/>
+              </a:rPr>
+              <a:t>) {</a:t>
+            </a:r>
+          </a:p>
+          <a:p>
+            <a:r>
+              <a:rPr lang="pl-PL" dirty="0">
+                <a:solidFill>
+                  <a:srgbClr val="D4D4D4"/>
+                </a:solidFill>
+                <a:latin typeface="Consolas" panose="020B0609020204030204" pitchFamily="49" charset="0"/>
+              </a:rPr>
+              <a:t>        </a:t>
+            </a:r>
+            <a:r>
+              <a:rPr lang="pl-PL" dirty="0">
+                <a:solidFill>
+                  <a:srgbClr val="C586C0"/>
+                </a:solidFill>
+                <a:latin typeface="Consolas" panose="020B0609020204030204" pitchFamily="49" charset="0"/>
+              </a:rPr>
+              <a:t>return</a:t>
+            </a:r>
+            <a:r>
+              <a:rPr lang="pl-PL" dirty="0">
+                <a:solidFill>
+                  <a:srgbClr val="D4D4D4"/>
+                </a:solidFill>
+                <a:latin typeface="Consolas" panose="020B0609020204030204" pitchFamily="49" charset="0"/>
+              </a:rPr>
+              <a:t> { </a:t>
+            </a:r>
+            <a:r>
+              <a:rPr lang="pl-PL" dirty="0" err="1">
+                <a:solidFill>
+                  <a:srgbClr val="9CDCFE"/>
+                </a:solidFill>
+                <a:latin typeface="Consolas" panose="020B0609020204030204" pitchFamily="49" charset="0"/>
+              </a:rPr>
+              <a:t>hasError</a:t>
+            </a:r>
+            <a:r>
+              <a:rPr lang="pl-PL" dirty="0">
+                <a:solidFill>
+                  <a:srgbClr val="9CDCFE"/>
+                </a:solidFill>
+                <a:latin typeface="Consolas" panose="020B0609020204030204" pitchFamily="49" charset="0"/>
+              </a:rPr>
+              <a:t>:</a:t>
+            </a:r>
+            <a:r>
+              <a:rPr lang="pl-PL" dirty="0">
+                <a:solidFill>
+                  <a:srgbClr val="D4D4D4"/>
+                </a:solidFill>
+                <a:latin typeface="Consolas" panose="020B0609020204030204" pitchFamily="49" charset="0"/>
+              </a:rPr>
+              <a:t> </a:t>
+            </a:r>
+            <a:r>
+              <a:rPr lang="pl-PL" dirty="0" err="1">
+                <a:solidFill>
+                  <a:srgbClr val="569CD6"/>
+                </a:solidFill>
+                <a:latin typeface="Consolas" panose="020B0609020204030204" pitchFamily="49" charset="0"/>
+              </a:rPr>
+              <a:t>true</a:t>
+            </a:r>
+            <a:r>
+              <a:rPr lang="pl-PL" dirty="0">
+                <a:solidFill>
+                  <a:srgbClr val="D4D4D4"/>
+                </a:solidFill>
+                <a:latin typeface="Consolas" panose="020B0609020204030204" pitchFamily="49" charset="0"/>
+              </a:rPr>
+              <a:t> };</a:t>
+            </a:r>
+          </a:p>
+          <a:p>
+            <a:r>
+              <a:rPr lang="pl-PL" dirty="0">
+                <a:solidFill>
+                  <a:srgbClr val="D4D4D4"/>
+                </a:solidFill>
+                <a:latin typeface="Consolas" panose="020B0609020204030204" pitchFamily="49" charset="0"/>
+              </a:rPr>
+              <a:t>    }</a:t>
+            </a:r>
+          </a:p>
+          <a:p>
+            <a:br>
+              <a:rPr lang="pl-PL" dirty="0">
+                <a:solidFill>
+                  <a:srgbClr val="D4D4D4"/>
+                </a:solidFill>
+                <a:latin typeface="Consolas" panose="020B0609020204030204" pitchFamily="49" charset="0"/>
+              </a:rPr>
+            </a:br>
+            <a:r>
+              <a:rPr lang="pl-PL" dirty="0">
+                <a:solidFill>
+                  <a:srgbClr val="D4D4D4"/>
+                </a:solidFill>
+                <a:latin typeface="Consolas" panose="020B0609020204030204" pitchFamily="49" charset="0"/>
+              </a:rPr>
+              <a:t>    </a:t>
+            </a:r>
+            <a:r>
+              <a:rPr lang="pl-PL" dirty="0">
+                <a:solidFill>
+                  <a:srgbClr val="6A9955"/>
+                </a:solidFill>
+                <a:latin typeface="Consolas" panose="020B0609020204030204" pitchFamily="49" charset="0"/>
+              </a:rPr>
+              <a:t>// log error</a:t>
+            </a:r>
+            <a:endParaRPr lang="pl-PL" dirty="0">
+              <a:solidFill>
+                <a:srgbClr val="D4D4D4"/>
+              </a:solidFill>
+              <a:latin typeface="Consolas" panose="020B0609020204030204" pitchFamily="49" charset="0"/>
+            </a:endParaRPr>
+          </a:p>
+          <a:p>
+            <a:r>
+              <a:rPr lang="pl-PL" dirty="0">
+                <a:solidFill>
+                  <a:srgbClr val="D4D4D4"/>
+                </a:solidFill>
+                <a:latin typeface="Consolas" panose="020B0609020204030204" pitchFamily="49" charset="0"/>
+              </a:rPr>
+              <a:t>    </a:t>
+            </a:r>
+            <a:r>
+              <a:rPr lang="pl-PL" dirty="0" err="1">
+                <a:solidFill>
+                  <a:srgbClr val="DCDCAA"/>
+                </a:solidFill>
+                <a:latin typeface="Consolas" panose="020B0609020204030204" pitchFamily="49" charset="0"/>
+              </a:rPr>
+              <a:t>componentDidCatch</a:t>
+            </a:r>
+            <a:r>
+              <a:rPr lang="pl-PL" dirty="0">
+                <a:solidFill>
+                  <a:srgbClr val="D4D4D4"/>
+                </a:solidFill>
+                <a:latin typeface="Consolas" panose="020B0609020204030204" pitchFamily="49" charset="0"/>
+              </a:rPr>
+              <a:t>(</a:t>
+            </a:r>
+            <a:r>
+              <a:rPr lang="pl-PL" dirty="0">
+                <a:solidFill>
+                  <a:srgbClr val="9CDCFE"/>
+                </a:solidFill>
+                <a:latin typeface="Consolas" panose="020B0609020204030204" pitchFamily="49" charset="0"/>
+              </a:rPr>
+              <a:t>error</a:t>
+            </a:r>
+            <a:r>
+              <a:rPr lang="pl-PL" dirty="0">
+                <a:solidFill>
+                  <a:srgbClr val="D4D4D4"/>
+                </a:solidFill>
+                <a:latin typeface="Consolas" panose="020B0609020204030204" pitchFamily="49" charset="0"/>
+              </a:rPr>
+              <a:t>, </a:t>
+            </a:r>
+            <a:r>
+              <a:rPr lang="pl-PL" dirty="0" err="1">
+                <a:solidFill>
+                  <a:srgbClr val="9CDCFE"/>
+                </a:solidFill>
+                <a:latin typeface="Consolas" panose="020B0609020204030204" pitchFamily="49" charset="0"/>
+              </a:rPr>
+              <a:t>errorInfo</a:t>
+            </a:r>
+            <a:r>
+              <a:rPr lang="pl-PL" dirty="0">
+                <a:solidFill>
+                  <a:srgbClr val="D4D4D4"/>
+                </a:solidFill>
+                <a:latin typeface="Consolas" panose="020B0609020204030204" pitchFamily="49" charset="0"/>
+              </a:rPr>
+              <a:t>) {</a:t>
+            </a:r>
+          </a:p>
+          <a:p>
+            <a:r>
+              <a:rPr lang="pl-PL" dirty="0">
+                <a:solidFill>
+                  <a:srgbClr val="D4D4D4"/>
+                </a:solidFill>
+                <a:latin typeface="Consolas" panose="020B0609020204030204" pitchFamily="49" charset="0"/>
+              </a:rPr>
+              <a:t>        </a:t>
+            </a:r>
+            <a:r>
+              <a:rPr lang="pl-PL" dirty="0">
+                <a:solidFill>
+                  <a:srgbClr val="4EC9B0"/>
+                </a:solidFill>
+                <a:latin typeface="Consolas" panose="020B0609020204030204" pitchFamily="49" charset="0"/>
+              </a:rPr>
+              <a:t>console</a:t>
+            </a:r>
+            <a:r>
+              <a:rPr lang="pl-PL" dirty="0">
+                <a:solidFill>
+                  <a:srgbClr val="D4D4D4"/>
+                </a:solidFill>
+                <a:latin typeface="Consolas" panose="020B0609020204030204" pitchFamily="49" charset="0"/>
+              </a:rPr>
+              <a:t>.</a:t>
+            </a:r>
+            <a:r>
+              <a:rPr lang="pl-PL" dirty="0">
+                <a:solidFill>
+                  <a:srgbClr val="DCDCAA"/>
+                </a:solidFill>
+                <a:latin typeface="Consolas" panose="020B0609020204030204" pitchFamily="49" charset="0"/>
+              </a:rPr>
+              <a:t>log</a:t>
+            </a:r>
+            <a:r>
+              <a:rPr lang="pl-PL" dirty="0">
+                <a:solidFill>
+                  <a:srgbClr val="D4D4D4"/>
+                </a:solidFill>
+                <a:latin typeface="Consolas" panose="020B0609020204030204" pitchFamily="49" charset="0"/>
+              </a:rPr>
+              <a:t>(</a:t>
+            </a:r>
+            <a:r>
+              <a:rPr lang="pl-PL" dirty="0">
+                <a:solidFill>
+                  <a:srgbClr val="9CDCFE"/>
+                </a:solidFill>
+                <a:latin typeface="Consolas" panose="020B0609020204030204" pitchFamily="49" charset="0"/>
+              </a:rPr>
+              <a:t>error</a:t>
+            </a:r>
+            <a:r>
+              <a:rPr lang="pl-PL" dirty="0">
+                <a:solidFill>
+                  <a:srgbClr val="D4D4D4"/>
+                </a:solidFill>
+                <a:latin typeface="Consolas" panose="020B0609020204030204" pitchFamily="49" charset="0"/>
+              </a:rPr>
+              <a:t>);</a:t>
+            </a:r>
+          </a:p>
+          <a:p>
+            <a:r>
+              <a:rPr lang="pl-PL" dirty="0">
+                <a:solidFill>
+                  <a:srgbClr val="D4D4D4"/>
+                </a:solidFill>
+                <a:latin typeface="Consolas" panose="020B0609020204030204" pitchFamily="49" charset="0"/>
+              </a:rPr>
+              <a:t>    }</a:t>
+            </a:r>
+            <a:endParaRPr lang="pl-PL" b="0" dirty="0">
+              <a:solidFill>
+                <a:srgbClr val="D4D4D4"/>
+              </a:solidFill>
+              <a:effectLst/>
+              <a:latin typeface="Consolas" panose="020B0609020204030204" pitchFamily="49" charset="0"/>
+            </a:endParaRPr>
+          </a:p>
+        </p:txBody>
+      </p:sp>
+      <p:sp>
+        <p:nvSpPr>
+          <p:cNvPr id="5" name="Prostokąt 4">
+            <a:extLst>
+              <a:ext uri="{FF2B5EF4-FFF2-40B4-BE49-F238E27FC236}">
+                <a16:creationId xmlns:a16="http://schemas.microsoft.com/office/drawing/2014/main" id="{15E1B194-C6ED-4ABA-B002-46C4A9394AB9}"/>
+              </a:ext>
+            </a:extLst>
+          </p:cNvPr>
+          <p:cNvSpPr/>
+          <p:nvPr/>
+        </p:nvSpPr>
+        <p:spPr>
+          <a:xfrm>
+            <a:off x="2902226" y="4386540"/>
+            <a:ext cx="6096000" cy="1200329"/>
+          </a:xfrm>
+          <a:prstGeom prst="rect">
+            <a:avLst/>
+          </a:prstGeom>
+          <a:solidFill>
+            <a:schemeClr val="tx1"/>
+          </a:solidFill>
+        </p:spPr>
+        <p:txBody>
+          <a:bodyPr>
+            <a:spAutoFit/>
+          </a:bodyPr>
+          <a:lstStyle/>
+          <a:p>
+            <a:r>
+              <a:rPr lang="en-US" dirty="0">
+                <a:solidFill>
+                  <a:srgbClr val="569CD6"/>
+                </a:solidFill>
+                <a:latin typeface="Consolas" panose="020B0609020204030204" pitchFamily="49" charset="0"/>
+              </a:rPr>
+              <a:t>constructor</a:t>
+            </a:r>
+            <a:r>
+              <a:rPr lang="en-US" dirty="0">
+                <a:solidFill>
+                  <a:srgbClr val="D4D4D4"/>
+                </a:solidFill>
+                <a:latin typeface="Consolas" panose="020B0609020204030204" pitchFamily="49" charset="0"/>
+              </a:rPr>
+              <a:t>(</a:t>
+            </a:r>
+            <a:r>
+              <a:rPr lang="en-US" dirty="0">
+                <a:solidFill>
+                  <a:srgbClr val="9CDCFE"/>
+                </a:solidFill>
+                <a:latin typeface="Consolas" panose="020B0609020204030204" pitchFamily="49" charset="0"/>
+              </a:rPr>
+              <a:t>props</a:t>
+            </a:r>
+            <a:r>
+              <a:rPr lang="en-US" dirty="0">
+                <a:solidFill>
+                  <a:srgbClr val="D4D4D4"/>
+                </a:solidFill>
+                <a:latin typeface="Consolas" panose="020B0609020204030204" pitchFamily="49" charset="0"/>
+              </a:rPr>
+              <a:t>) {</a:t>
+            </a:r>
+          </a:p>
+          <a:p>
+            <a:r>
+              <a:rPr lang="en-US" dirty="0">
+                <a:solidFill>
+                  <a:srgbClr val="D4D4D4"/>
+                </a:solidFill>
+                <a:latin typeface="Consolas" panose="020B0609020204030204" pitchFamily="49" charset="0"/>
+              </a:rPr>
+              <a:t>   </a:t>
+            </a:r>
+            <a:r>
+              <a:rPr lang="en-US" dirty="0">
+                <a:solidFill>
+                  <a:srgbClr val="569CD6"/>
+                </a:solidFill>
+                <a:latin typeface="Consolas" panose="020B0609020204030204" pitchFamily="49" charset="0"/>
+              </a:rPr>
+              <a:t>super</a:t>
+            </a:r>
+            <a:r>
+              <a:rPr lang="en-US" dirty="0">
+                <a:solidFill>
+                  <a:srgbClr val="D4D4D4"/>
+                </a:solidFill>
+                <a:latin typeface="Consolas" panose="020B0609020204030204" pitchFamily="49" charset="0"/>
+              </a:rPr>
+              <a:t>(</a:t>
+            </a:r>
+            <a:r>
+              <a:rPr lang="en-US" dirty="0">
+                <a:solidFill>
+                  <a:srgbClr val="9CDCFE"/>
+                </a:solidFill>
+                <a:latin typeface="Consolas" panose="020B0609020204030204" pitchFamily="49" charset="0"/>
+              </a:rPr>
+              <a:t>props</a:t>
+            </a:r>
+            <a:r>
+              <a:rPr lang="en-US" dirty="0">
+                <a:solidFill>
+                  <a:srgbClr val="D4D4D4"/>
+                </a:solidFill>
+                <a:latin typeface="Consolas" panose="020B0609020204030204" pitchFamily="49" charset="0"/>
+              </a:rPr>
+              <a:t>);</a:t>
+            </a:r>
+          </a:p>
+          <a:p>
+            <a:r>
+              <a:rPr lang="en-US" dirty="0">
+                <a:solidFill>
+                  <a:srgbClr val="D4D4D4"/>
+                </a:solidFill>
+                <a:latin typeface="Consolas" panose="020B0609020204030204" pitchFamily="49" charset="0"/>
+              </a:rPr>
+              <a:t>   </a:t>
+            </a:r>
+            <a:r>
+              <a:rPr lang="en-US" dirty="0" err="1">
+                <a:solidFill>
+                  <a:srgbClr val="569CD6"/>
+                </a:solidFill>
+                <a:latin typeface="Consolas" panose="020B0609020204030204" pitchFamily="49" charset="0"/>
+              </a:rPr>
+              <a:t>this</a:t>
+            </a:r>
+            <a:r>
+              <a:rPr lang="en-US" dirty="0" err="1">
+                <a:solidFill>
+                  <a:srgbClr val="D4D4D4"/>
+                </a:solidFill>
+                <a:latin typeface="Consolas" panose="020B0609020204030204" pitchFamily="49" charset="0"/>
+              </a:rPr>
+              <a:t>.</a:t>
+            </a:r>
+            <a:r>
+              <a:rPr lang="en-US" dirty="0" err="1">
+                <a:solidFill>
+                  <a:srgbClr val="9CDCFE"/>
+                </a:solidFill>
+                <a:latin typeface="Consolas" panose="020B0609020204030204" pitchFamily="49" charset="0"/>
+              </a:rPr>
+              <a:t>state</a:t>
+            </a:r>
+            <a:r>
+              <a:rPr lang="en-US" dirty="0">
+                <a:solidFill>
+                  <a:srgbClr val="D4D4D4"/>
+                </a:solidFill>
+                <a:latin typeface="Consolas" panose="020B0609020204030204" pitchFamily="49" charset="0"/>
+              </a:rPr>
+              <a:t> = { </a:t>
+            </a:r>
+            <a:r>
+              <a:rPr lang="en-US" dirty="0" err="1">
+                <a:solidFill>
+                  <a:srgbClr val="9CDCFE"/>
+                </a:solidFill>
+                <a:latin typeface="Consolas" panose="020B0609020204030204" pitchFamily="49" charset="0"/>
+              </a:rPr>
+              <a:t>hasError</a:t>
+            </a:r>
+            <a:r>
+              <a:rPr lang="en-US" dirty="0">
+                <a:solidFill>
+                  <a:srgbClr val="9CDCFE"/>
+                </a:solidFill>
+                <a:latin typeface="Consolas" panose="020B0609020204030204" pitchFamily="49" charset="0"/>
+              </a:rPr>
+              <a:t>:</a:t>
+            </a:r>
+            <a:r>
+              <a:rPr lang="en-US" dirty="0">
+                <a:solidFill>
+                  <a:srgbClr val="D4D4D4"/>
+                </a:solidFill>
+                <a:latin typeface="Consolas" panose="020B0609020204030204" pitchFamily="49" charset="0"/>
+              </a:rPr>
+              <a:t> </a:t>
+            </a:r>
+            <a:r>
+              <a:rPr lang="en-US" dirty="0">
+                <a:solidFill>
+                  <a:srgbClr val="569CD6"/>
+                </a:solidFill>
+                <a:latin typeface="Consolas" panose="020B0609020204030204" pitchFamily="49" charset="0"/>
+              </a:rPr>
+              <a:t>false</a:t>
+            </a:r>
+            <a:r>
+              <a:rPr lang="en-US" dirty="0">
+                <a:solidFill>
+                  <a:srgbClr val="D4D4D4"/>
+                </a:solidFill>
+                <a:latin typeface="Consolas" panose="020B0609020204030204" pitchFamily="49" charset="0"/>
+              </a:rPr>
+              <a:t> };</a:t>
+            </a:r>
+          </a:p>
+          <a:p>
+            <a:r>
+              <a:rPr lang="en-US" dirty="0">
+                <a:solidFill>
+                  <a:srgbClr val="D4D4D4"/>
+                </a:solidFill>
+                <a:latin typeface="Consolas" panose="020B0609020204030204" pitchFamily="49" charset="0"/>
+              </a:rPr>
+              <a:t>}</a:t>
+            </a:r>
+            <a:endParaRPr lang="en-US" b="0" dirty="0">
+              <a:solidFill>
+                <a:srgbClr val="D4D4D4"/>
+              </a:solidFill>
+              <a:effectLst/>
+              <a:latin typeface="Consolas" panose="020B0609020204030204" pitchFamily="49" charset="0"/>
+            </a:endParaRPr>
           </a:p>
         </p:txBody>
       </p:sp>
@@ -32985,7 +34120,7 @@
         <p:spPr>
           <a:xfrm>
             <a:off x="497840" y="538480"/>
-            <a:ext cx="1641283" cy="369332"/>
+            <a:ext cx="1171667" cy="369332"/>
           </a:xfrm>
           <a:prstGeom prst="rect">
             <a:avLst/>
@@ -33000,17 +34135,1002 @@
           <a:p>
             <a:r>
               <a:rPr lang="pl-PL" dirty="0" err="1"/>
-              <a:t>Redux</a:t>
-            </a:r>
-            <a:r>
-              <a:rPr lang="pl-PL" dirty="0"/>
-              <a:t> - </a:t>
-            </a:r>
-            <a:r>
-              <a:rPr lang="pl-PL" dirty="0" err="1"/>
-              <a:t>context</a:t>
+              <a:t>Fragments</a:t>
             </a:r>
             <a:endParaRPr lang="pl-PL" dirty="0"/>
+          </a:p>
+        </p:txBody>
+      </p:sp>
+      <p:sp>
+        <p:nvSpPr>
+          <p:cNvPr id="2" name="Prostokąt 1">
+            <a:extLst>
+              <a:ext uri="{FF2B5EF4-FFF2-40B4-BE49-F238E27FC236}">
+                <a16:creationId xmlns:a16="http://schemas.microsoft.com/office/drawing/2014/main" id="{F03F2BA2-BFB3-443D-A116-3DBB37F12780}"/>
+              </a:ext>
+            </a:extLst>
+          </p:cNvPr>
+          <p:cNvSpPr/>
+          <p:nvPr/>
+        </p:nvSpPr>
+        <p:spPr>
+          <a:xfrm>
+            <a:off x="2782956" y="907812"/>
+            <a:ext cx="6096000" cy="2862322"/>
+          </a:xfrm>
+          <a:prstGeom prst="rect">
+            <a:avLst/>
+          </a:prstGeom>
+          <a:solidFill>
+            <a:schemeClr val="tx1"/>
+          </a:solidFill>
+        </p:spPr>
+        <p:txBody>
+          <a:bodyPr>
+            <a:spAutoFit/>
+          </a:bodyPr>
+          <a:lstStyle/>
+          <a:p>
+            <a:r>
+              <a:rPr lang="pl-PL" dirty="0" err="1">
+                <a:solidFill>
+                  <a:srgbClr val="569CD6"/>
+                </a:solidFill>
+                <a:latin typeface="Consolas" panose="020B0609020204030204" pitchFamily="49" charset="0"/>
+              </a:rPr>
+              <a:t>class</a:t>
+            </a:r>
+            <a:r>
+              <a:rPr lang="pl-PL" dirty="0">
+                <a:solidFill>
+                  <a:srgbClr val="D4D4D4"/>
+                </a:solidFill>
+                <a:latin typeface="Consolas" panose="020B0609020204030204" pitchFamily="49" charset="0"/>
+              </a:rPr>
+              <a:t> </a:t>
+            </a:r>
+            <a:r>
+              <a:rPr lang="pl-PL" dirty="0" err="1">
+                <a:solidFill>
+                  <a:srgbClr val="4EC9B0"/>
+                </a:solidFill>
+                <a:latin typeface="Consolas" panose="020B0609020204030204" pitchFamily="49" charset="0"/>
+              </a:rPr>
+              <a:t>Columns</a:t>
+            </a:r>
+            <a:r>
+              <a:rPr lang="pl-PL" dirty="0">
+                <a:solidFill>
+                  <a:srgbClr val="D4D4D4"/>
+                </a:solidFill>
+                <a:latin typeface="Consolas" panose="020B0609020204030204" pitchFamily="49" charset="0"/>
+              </a:rPr>
+              <a:t> </a:t>
+            </a:r>
+            <a:r>
+              <a:rPr lang="pl-PL" dirty="0" err="1">
+                <a:solidFill>
+                  <a:srgbClr val="569CD6"/>
+                </a:solidFill>
+                <a:latin typeface="Consolas" panose="020B0609020204030204" pitchFamily="49" charset="0"/>
+              </a:rPr>
+              <a:t>extends</a:t>
+            </a:r>
+            <a:r>
+              <a:rPr lang="pl-PL" dirty="0">
+                <a:solidFill>
+                  <a:srgbClr val="D4D4D4"/>
+                </a:solidFill>
+                <a:latin typeface="Consolas" panose="020B0609020204030204" pitchFamily="49" charset="0"/>
+              </a:rPr>
+              <a:t> </a:t>
+            </a:r>
+            <a:r>
+              <a:rPr lang="pl-PL" dirty="0" err="1">
+                <a:solidFill>
+                  <a:srgbClr val="4EC9B0"/>
+                </a:solidFill>
+                <a:latin typeface="Consolas" panose="020B0609020204030204" pitchFamily="49" charset="0"/>
+              </a:rPr>
+              <a:t>React</a:t>
+            </a:r>
+            <a:r>
+              <a:rPr lang="pl-PL" dirty="0" err="1">
+                <a:solidFill>
+                  <a:srgbClr val="D4D4D4"/>
+                </a:solidFill>
+                <a:latin typeface="Consolas" panose="020B0609020204030204" pitchFamily="49" charset="0"/>
+              </a:rPr>
+              <a:t>.</a:t>
+            </a:r>
+            <a:r>
+              <a:rPr lang="pl-PL" dirty="0" err="1">
+                <a:solidFill>
+                  <a:srgbClr val="4EC9B0"/>
+                </a:solidFill>
+                <a:latin typeface="Consolas" panose="020B0609020204030204" pitchFamily="49" charset="0"/>
+              </a:rPr>
+              <a:t>Component</a:t>
+            </a:r>
+            <a:r>
+              <a:rPr lang="pl-PL" dirty="0">
+                <a:solidFill>
+                  <a:srgbClr val="D4D4D4"/>
+                </a:solidFill>
+                <a:latin typeface="Consolas" panose="020B0609020204030204" pitchFamily="49" charset="0"/>
+              </a:rPr>
+              <a:t> {</a:t>
+            </a:r>
+          </a:p>
+          <a:p>
+            <a:r>
+              <a:rPr lang="pl-PL" dirty="0">
+                <a:solidFill>
+                  <a:srgbClr val="D4D4D4"/>
+                </a:solidFill>
+                <a:latin typeface="Consolas" panose="020B0609020204030204" pitchFamily="49" charset="0"/>
+              </a:rPr>
+              <a:t>    </a:t>
+            </a:r>
+            <a:r>
+              <a:rPr lang="pl-PL" dirty="0" err="1">
+                <a:solidFill>
+                  <a:srgbClr val="DCDCAA"/>
+                </a:solidFill>
+                <a:latin typeface="Consolas" panose="020B0609020204030204" pitchFamily="49" charset="0"/>
+              </a:rPr>
+              <a:t>render</a:t>
+            </a:r>
+            <a:r>
+              <a:rPr lang="pl-PL" dirty="0">
+                <a:solidFill>
+                  <a:srgbClr val="D4D4D4"/>
+                </a:solidFill>
+                <a:latin typeface="Consolas" panose="020B0609020204030204" pitchFamily="49" charset="0"/>
+              </a:rPr>
+              <a:t>() {</a:t>
+            </a:r>
+          </a:p>
+          <a:p>
+            <a:r>
+              <a:rPr lang="pl-PL" dirty="0">
+                <a:solidFill>
+                  <a:srgbClr val="D4D4D4"/>
+                </a:solidFill>
+                <a:latin typeface="Consolas" panose="020B0609020204030204" pitchFamily="49" charset="0"/>
+              </a:rPr>
+              <a:t>      </a:t>
+            </a:r>
+            <a:r>
+              <a:rPr lang="pl-PL" dirty="0">
+                <a:solidFill>
+                  <a:srgbClr val="C586C0"/>
+                </a:solidFill>
+                <a:latin typeface="Consolas" panose="020B0609020204030204" pitchFamily="49" charset="0"/>
+              </a:rPr>
+              <a:t>return</a:t>
+            </a:r>
+            <a:r>
+              <a:rPr lang="pl-PL" dirty="0">
+                <a:solidFill>
+                  <a:srgbClr val="D4D4D4"/>
+                </a:solidFill>
+                <a:latin typeface="Consolas" panose="020B0609020204030204" pitchFamily="49" charset="0"/>
+              </a:rPr>
+              <a:t> (</a:t>
+            </a:r>
+          </a:p>
+          <a:p>
+            <a:r>
+              <a:rPr lang="pl-PL" dirty="0">
+                <a:solidFill>
+                  <a:srgbClr val="D4D4D4"/>
+                </a:solidFill>
+                <a:latin typeface="Consolas" panose="020B0609020204030204" pitchFamily="49" charset="0"/>
+              </a:rPr>
+              <a:t>        </a:t>
+            </a:r>
+            <a:r>
+              <a:rPr lang="pl-PL" dirty="0">
+                <a:solidFill>
+                  <a:srgbClr val="808080"/>
+                </a:solidFill>
+                <a:latin typeface="Consolas" panose="020B0609020204030204" pitchFamily="49" charset="0"/>
+              </a:rPr>
+              <a:t>&lt;</a:t>
+            </a:r>
+            <a:r>
+              <a:rPr lang="pl-PL" dirty="0">
+                <a:solidFill>
+                  <a:srgbClr val="4EC9B0"/>
+                </a:solidFill>
+                <a:latin typeface="Consolas" panose="020B0609020204030204" pitchFamily="49" charset="0"/>
+              </a:rPr>
+              <a:t>div</a:t>
+            </a:r>
+            <a:r>
+              <a:rPr lang="pl-PL" dirty="0">
+                <a:solidFill>
+                  <a:srgbClr val="808080"/>
+                </a:solidFill>
+                <a:latin typeface="Consolas" panose="020B0609020204030204" pitchFamily="49" charset="0"/>
+              </a:rPr>
+              <a:t>&gt;</a:t>
+            </a:r>
+            <a:endParaRPr lang="pl-PL" dirty="0">
+              <a:solidFill>
+                <a:srgbClr val="D4D4D4"/>
+              </a:solidFill>
+              <a:latin typeface="Consolas" panose="020B0609020204030204" pitchFamily="49" charset="0"/>
+            </a:endParaRPr>
+          </a:p>
+          <a:p>
+            <a:r>
+              <a:rPr lang="pl-PL" dirty="0">
+                <a:solidFill>
+                  <a:srgbClr val="D4D4D4"/>
+                </a:solidFill>
+                <a:latin typeface="Consolas" panose="020B0609020204030204" pitchFamily="49" charset="0"/>
+              </a:rPr>
+              <a:t>          </a:t>
+            </a:r>
+            <a:r>
+              <a:rPr lang="pl-PL" dirty="0">
+                <a:solidFill>
+                  <a:srgbClr val="808080"/>
+                </a:solidFill>
+                <a:latin typeface="Consolas" panose="020B0609020204030204" pitchFamily="49" charset="0"/>
+              </a:rPr>
+              <a:t>&lt;</a:t>
+            </a:r>
+            <a:r>
+              <a:rPr lang="pl-PL" dirty="0" err="1">
+                <a:solidFill>
+                  <a:srgbClr val="569CD6"/>
+                </a:solidFill>
+                <a:latin typeface="Consolas" panose="020B0609020204030204" pitchFamily="49" charset="0"/>
+              </a:rPr>
+              <a:t>td</a:t>
+            </a:r>
+            <a:r>
+              <a:rPr lang="pl-PL" dirty="0">
+                <a:solidFill>
+                  <a:srgbClr val="808080"/>
+                </a:solidFill>
+                <a:latin typeface="Consolas" panose="020B0609020204030204" pitchFamily="49" charset="0"/>
+              </a:rPr>
+              <a:t>&gt;</a:t>
+            </a:r>
+            <a:r>
+              <a:rPr lang="pl-PL" dirty="0">
+                <a:solidFill>
+                  <a:srgbClr val="D4D4D4"/>
+                </a:solidFill>
+                <a:latin typeface="Consolas" panose="020B0609020204030204" pitchFamily="49" charset="0"/>
+              </a:rPr>
+              <a:t>val1</a:t>
+            </a:r>
+            <a:r>
+              <a:rPr lang="pl-PL" dirty="0">
+                <a:solidFill>
+                  <a:srgbClr val="808080"/>
+                </a:solidFill>
+                <a:latin typeface="Consolas" panose="020B0609020204030204" pitchFamily="49" charset="0"/>
+              </a:rPr>
+              <a:t>&lt;/</a:t>
+            </a:r>
+            <a:r>
+              <a:rPr lang="pl-PL" dirty="0" err="1">
+                <a:solidFill>
+                  <a:srgbClr val="569CD6"/>
+                </a:solidFill>
+                <a:latin typeface="Consolas" panose="020B0609020204030204" pitchFamily="49" charset="0"/>
+              </a:rPr>
+              <a:t>td</a:t>
+            </a:r>
+            <a:r>
+              <a:rPr lang="pl-PL" dirty="0">
+                <a:solidFill>
+                  <a:srgbClr val="808080"/>
+                </a:solidFill>
+                <a:latin typeface="Consolas" panose="020B0609020204030204" pitchFamily="49" charset="0"/>
+              </a:rPr>
+              <a:t>&gt;</a:t>
+            </a:r>
+            <a:endParaRPr lang="pl-PL" dirty="0">
+              <a:solidFill>
+                <a:srgbClr val="D4D4D4"/>
+              </a:solidFill>
+              <a:latin typeface="Consolas" panose="020B0609020204030204" pitchFamily="49" charset="0"/>
+            </a:endParaRPr>
+          </a:p>
+          <a:p>
+            <a:r>
+              <a:rPr lang="pl-PL" dirty="0">
+                <a:solidFill>
+                  <a:srgbClr val="D4D4D4"/>
+                </a:solidFill>
+                <a:latin typeface="Consolas" panose="020B0609020204030204" pitchFamily="49" charset="0"/>
+              </a:rPr>
+              <a:t>          </a:t>
+            </a:r>
+            <a:r>
+              <a:rPr lang="pl-PL" dirty="0">
+                <a:solidFill>
+                  <a:srgbClr val="808080"/>
+                </a:solidFill>
+                <a:latin typeface="Consolas" panose="020B0609020204030204" pitchFamily="49" charset="0"/>
+              </a:rPr>
+              <a:t>&lt;</a:t>
+            </a:r>
+            <a:r>
+              <a:rPr lang="pl-PL" dirty="0" err="1">
+                <a:solidFill>
+                  <a:srgbClr val="569CD6"/>
+                </a:solidFill>
+                <a:latin typeface="Consolas" panose="020B0609020204030204" pitchFamily="49" charset="0"/>
+              </a:rPr>
+              <a:t>td</a:t>
+            </a:r>
+            <a:r>
+              <a:rPr lang="pl-PL" dirty="0">
+                <a:solidFill>
+                  <a:srgbClr val="808080"/>
+                </a:solidFill>
+                <a:latin typeface="Consolas" panose="020B0609020204030204" pitchFamily="49" charset="0"/>
+              </a:rPr>
+              <a:t>&gt;</a:t>
+            </a:r>
+            <a:r>
+              <a:rPr lang="pl-PL" dirty="0">
+                <a:solidFill>
+                  <a:srgbClr val="D4D4D4"/>
+                </a:solidFill>
+                <a:latin typeface="Consolas" panose="020B0609020204030204" pitchFamily="49" charset="0"/>
+              </a:rPr>
+              <a:t>val2</a:t>
+            </a:r>
+            <a:r>
+              <a:rPr lang="pl-PL" dirty="0">
+                <a:solidFill>
+                  <a:srgbClr val="808080"/>
+                </a:solidFill>
+                <a:latin typeface="Consolas" panose="020B0609020204030204" pitchFamily="49" charset="0"/>
+              </a:rPr>
+              <a:t>&lt;/</a:t>
+            </a:r>
+            <a:r>
+              <a:rPr lang="pl-PL" dirty="0" err="1">
+                <a:solidFill>
+                  <a:srgbClr val="569CD6"/>
+                </a:solidFill>
+                <a:latin typeface="Consolas" panose="020B0609020204030204" pitchFamily="49" charset="0"/>
+              </a:rPr>
+              <a:t>td</a:t>
+            </a:r>
+            <a:r>
+              <a:rPr lang="pl-PL" dirty="0">
+                <a:solidFill>
+                  <a:srgbClr val="808080"/>
+                </a:solidFill>
+                <a:latin typeface="Consolas" panose="020B0609020204030204" pitchFamily="49" charset="0"/>
+              </a:rPr>
+              <a:t>&gt;</a:t>
+            </a:r>
+            <a:endParaRPr lang="pl-PL" dirty="0">
+              <a:solidFill>
+                <a:srgbClr val="D4D4D4"/>
+              </a:solidFill>
+              <a:latin typeface="Consolas" panose="020B0609020204030204" pitchFamily="49" charset="0"/>
+            </a:endParaRPr>
+          </a:p>
+          <a:p>
+            <a:r>
+              <a:rPr lang="pl-PL" dirty="0">
+                <a:solidFill>
+                  <a:srgbClr val="D4D4D4"/>
+                </a:solidFill>
+                <a:latin typeface="Consolas" panose="020B0609020204030204" pitchFamily="49" charset="0"/>
+              </a:rPr>
+              <a:t>        </a:t>
+            </a:r>
+            <a:r>
+              <a:rPr lang="pl-PL" dirty="0">
+                <a:solidFill>
+                  <a:srgbClr val="808080"/>
+                </a:solidFill>
+                <a:latin typeface="Consolas" panose="020B0609020204030204" pitchFamily="49" charset="0"/>
+              </a:rPr>
+              <a:t>&lt;/</a:t>
+            </a:r>
+            <a:r>
+              <a:rPr lang="pl-PL" dirty="0">
+                <a:solidFill>
+                  <a:srgbClr val="4EC9B0"/>
+                </a:solidFill>
+                <a:latin typeface="Consolas" panose="020B0609020204030204" pitchFamily="49" charset="0"/>
+              </a:rPr>
+              <a:t>div</a:t>
+            </a:r>
+            <a:r>
+              <a:rPr lang="pl-PL" dirty="0">
+                <a:solidFill>
+                  <a:srgbClr val="808080"/>
+                </a:solidFill>
+                <a:latin typeface="Consolas" panose="020B0609020204030204" pitchFamily="49" charset="0"/>
+              </a:rPr>
+              <a:t>&gt;</a:t>
+            </a:r>
+            <a:endParaRPr lang="pl-PL" dirty="0">
+              <a:solidFill>
+                <a:srgbClr val="D4D4D4"/>
+              </a:solidFill>
+              <a:latin typeface="Consolas" panose="020B0609020204030204" pitchFamily="49" charset="0"/>
+            </a:endParaRPr>
+          </a:p>
+          <a:p>
+            <a:r>
+              <a:rPr lang="pl-PL" dirty="0">
+                <a:solidFill>
+                  <a:srgbClr val="D4D4D4"/>
+                </a:solidFill>
+                <a:latin typeface="Consolas" panose="020B0609020204030204" pitchFamily="49" charset="0"/>
+              </a:rPr>
+              <a:t>      );</a:t>
+            </a:r>
+          </a:p>
+          <a:p>
+            <a:r>
+              <a:rPr lang="pl-PL" dirty="0">
+                <a:solidFill>
+                  <a:srgbClr val="D4D4D4"/>
+                </a:solidFill>
+                <a:latin typeface="Consolas" panose="020B0609020204030204" pitchFamily="49" charset="0"/>
+              </a:rPr>
+              <a:t>    }</a:t>
+            </a:r>
+          </a:p>
+          <a:p>
+            <a:r>
+              <a:rPr lang="pl-PL" dirty="0">
+                <a:solidFill>
+                  <a:srgbClr val="D4D4D4"/>
+                </a:solidFill>
+                <a:latin typeface="Consolas" panose="020B0609020204030204" pitchFamily="49" charset="0"/>
+              </a:rPr>
+              <a:t>  }</a:t>
+            </a:r>
+            <a:endParaRPr lang="pl-PL" b="0" dirty="0">
+              <a:solidFill>
+                <a:srgbClr val="D4D4D4"/>
+              </a:solidFill>
+              <a:effectLst/>
+              <a:latin typeface="Consolas" panose="020B0609020204030204" pitchFamily="49" charset="0"/>
+            </a:endParaRPr>
+          </a:p>
+        </p:txBody>
+      </p:sp>
+      <p:sp>
+        <p:nvSpPr>
+          <p:cNvPr id="3" name="Prostokąt 2">
+            <a:extLst>
+              <a:ext uri="{FF2B5EF4-FFF2-40B4-BE49-F238E27FC236}">
+                <a16:creationId xmlns:a16="http://schemas.microsoft.com/office/drawing/2014/main" id="{1D52F609-E980-4463-9598-1C4AC567D549}"/>
+              </a:ext>
+            </a:extLst>
+          </p:cNvPr>
+          <p:cNvSpPr/>
+          <p:nvPr/>
+        </p:nvSpPr>
+        <p:spPr>
+          <a:xfrm>
+            <a:off x="2782956" y="3928766"/>
+            <a:ext cx="6096000" cy="1200329"/>
+          </a:xfrm>
+          <a:prstGeom prst="rect">
+            <a:avLst/>
+          </a:prstGeom>
+          <a:solidFill>
+            <a:schemeClr val="tx1"/>
+          </a:solidFill>
+        </p:spPr>
+        <p:txBody>
+          <a:bodyPr>
+            <a:spAutoFit/>
+          </a:bodyPr>
+          <a:lstStyle/>
+          <a:p>
+            <a:r>
+              <a:rPr lang="pl-PL" dirty="0">
+                <a:solidFill>
+                  <a:srgbClr val="D4D4D4"/>
+                </a:solidFill>
+                <a:latin typeface="Consolas" panose="020B0609020204030204" pitchFamily="49" charset="0"/>
+              </a:rPr>
+              <a:t>        </a:t>
+            </a:r>
+            <a:r>
+              <a:rPr lang="pl-PL" dirty="0">
+                <a:solidFill>
+                  <a:srgbClr val="808080"/>
+                </a:solidFill>
+                <a:latin typeface="Consolas" panose="020B0609020204030204" pitchFamily="49" charset="0"/>
+              </a:rPr>
+              <a:t>&lt;</a:t>
+            </a:r>
+            <a:r>
+              <a:rPr lang="pl-PL" dirty="0" err="1">
+                <a:solidFill>
+                  <a:srgbClr val="4EC9B0"/>
+                </a:solidFill>
+                <a:latin typeface="Consolas" panose="020B0609020204030204" pitchFamily="49" charset="0"/>
+              </a:rPr>
+              <a:t>React.Fragment</a:t>
+            </a:r>
+            <a:r>
+              <a:rPr lang="pl-PL" dirty="0">
+                <a:solidFill>
+                  <a:srgbClr val="808080"/>
+                </a:solidFill>
+                <a:latin typeface="Consolas" panose="020B0609020204030204" pitchFamily="49" charset="0"/>
+              </a:rPr>
+              <a:t>&gt;</a:t>
+            </a:r>
+            <a:endParaRPr lang="pl-PL" dirty="0">
+              <a:solidFill>
+                <a:srgbClr val="D4D4D4"/>
+              </a:solidFill>
+              <a:latin typeface="Consolas" panose="020B0609020204030204" pitchFamily="49" charset="0"/>
+            </a:endParaRPr>
+          </a:p>
+          <a:p>
+            <a:r>
+              <a:rPr lang="pl-PL" dirty="0">
+                <a:solidFill>
+                  <a:srgbClr val="D4D4D4"/>
+                </a:solidFill>
+                <a:latin typeface="Consolas" panose="020B0609020204030204" pitchFamily="49" charset="0"/>
+              </a:rPr>
+              <a:t>          </a:t>
+            </a:r>
+            <a:r>
+              <a:rPr lang="pl-PL" dirty="0">
+                <a:solidFill>
+                  <a:srgbClr val="808080"/>
+                </a:solidFill>
+                <a:latin typeface="Consolas" panose="020B0609020204030204" pitchFamily="49" charset="0"/>
+              </a:rPr>
+              <a:t>&lt;</a:t>
+            </a:r>
+            <a:r>
+              <a:rPr lang="pl-PL" dirty="0" err="1">
+                <a:solidFill>
+                  <a:srgbClr val="569CD6"/>
+                </a:solidFill>
+                <a:latin typeface="Consolas" panose="020B0609020204030204" pitchFamily="49" charset="0"/>
+              </a:rPr>
+              <a:t>td</a:t>
+            </a:r>
+            <a:r>
+              <a:rPr lang="pl-PL" dirty="0">
+                <a:solidFill>
+                  <a:srgbClr val="808080"/>
+                </a:solidFill>
+                <a:latin typeface="Consolas" panose="020B0609020204030204" pitchFamily="49" charset="0"/>
+              </a:rPr>
+              <a:t>&gt;</a:t>
+            </a:r>
+            <a:r>
+              <a:rPr lang="pl-PL" dirty="0">
+                <a:solidFill>
+                  <a:srgbClr val="D4D4D4"/>
+                </a:solidFill>
+                <a:latin typeface="Consolas" panose="020B0609020204030204" pitchFamily="49" charset="0"/>
+              </a:rPr>
+              <a:t>val1</a:t>
+            </a:r>
+            <a:r>
+              <a:rPr lang="pl-PL" dirty="0">
+                <a:solidFill>
+                  <a:srgbClr val="808080"/>
+                </a:solidFill>
+                <a:latin typeface="Consolas" panose="020B0609020204030204" pitchFamily="49" charset="0"/>
+              </a:rPr>
+              <a:t>&lt;/</a:t>
+            </a:r>
+            <a:r>
+              <a:rPr lang="pl-PL" dirty="0" err="1">
+                <a:solidFill>
+                  <a:srgbClr val="569CD6"/>
+                </a:solidFill>
+                <a:latin typeface="Consolas" panose="020B0609020204030204" pitchFamily="49" charset="0"/>
+              </a:rPr>
+              <a:t>td</a:t>
+            </a:r>
+            <a:r>
+              <a:rPr lang="pl-PL" dirty="0">
+                <a:solidFill>
+                  <a:srgbClr val="808080"/>
+                </a:solidFill>
+                <a:latin typeface="Consolas" panose="020B0609020204030204" pitchFamily="49" charset="0"/>
+              </a:rPr>
+              <a:t>&gt;</a:t>
+            </a:r>
+            <a:endParaRPr lang="pl-PL" dirty="0">
+              <a:solidFill>
+                <a:srgbClr val="D4D4D4"/>
+              </a:solidFill>
+              <a:latin typeface="Consolas" panose="020B0609020204030204" pitchFamily="49" charset="0"/>
+            </a:endParaRPr>
+          </a:p>
+          <a:p>
+            <a:r>
+              <a:rPr lang="pl-PL" dirty="0">
+                <a:solidFill>
+                  <a:srgbClr val="D4D4D4"/>
+                </a:solidFill>
+                <a:latin typeface="Consolas" panose="020B0609020204030204" pitchFamily="49" charset="0"/>
+              </a:rPr>
+              <a:t>          </a:t>
+            </a:r>
+            <a:r>
+              <a:rPr lang="pl-PL" dirty="0">
+                <a:solidFill>
+                  <a:srgbClr val="808080"/>
+                </a:solidFill>
+                <a:latin typeface="Consolas" panose="020B0609020204030204" pitchFamily="49" charset="0"/>
+              </a:rPr>
+              <a:t>&lt;</a:t>
+            </a:r>
+            <a:r>
+              <a:rPr lang="pl-PL" dirty="0" err="1">
+                <a:solidFill>
+                  <a:srgbClr val="569CD6"/>
+                </a:solidFill>
+                <a:latin typeface="Consolas" panose="020B0609020204030204" pitchFamily="49" charset="0"/>
+              </a:rPr>
+              <a:t>td</a:t>
+            </a:r>
+            <a:r>
+              <a:rPr lang="pl-PL" dirty="0">
+                <a:solidFill>
+                  <a:srgbClr val="808080"/>
+                </a:solidFill>
+                <a:latin typeface="Consolas" panose="020B0609020204030204" pitchFamily="49" charset="0"/>
+              </a:rPr>
+              <a:t>&gt;</a:t>
+            </a:r>
+            <a:r>
+              <a:rPr lang="pl-PL" dirty="0">
+                <a:solidFill>
+                  <a:srgbClr val="D4D4D4"/>
+                </a:solidFill>
+                <a:latin typeface="Consolas" panose="020B0609020204030204" pitchFamily="49" charset="0"/>
+              </a:rPr>
+              <a:t>val2</a:t>
+            </a:r>
+            <a:r>
+              <a:rPr lang="pl-PL" dirty="0">
+                <a:solidFill>
+                  <a:srgbClr val="808080"/>
+                </a:solidFill>
+                <a:latin typeface="Consolas" panose="020B0609020204030204" pitchFamily="49" charset="0"/>
+              </a:rPr>
+              <a:t>&lt;/</a:t>
+            </a:r>
+            <a:r>
+              <a:rPr lang="pl-PL" dirty="0" err="1">
+                <a:solidFill>
+                  <a:srgbClr val="569CD6"/>
+                </a:solidFill>
+                <a:latin typeface="Consolas" panose="020B0609020204030204" pitchFamily="49" charset="0"/>
+              </a:rPr>
+              <a:t>td</a:t>
+            </a:r>
+            <a:r>
+              <a:rPr lang="pl-PL" dirty="0">
+                <a:solidFill>
+                  <a:srgbClr val="808080"/>
+                </a:solidFill>
+                <a:latin typeface="Consolas" panose="020B0609020204030204" pitchFamily="49" charset="0"/>
+              </a:rPr>
+              <a:t>&gt;</a:t>
+            </a:r>
+            <a:endParaRPr lang="pl-PL" dirty="0">
+              <a:solidFill>
+                <a:srgbClr val="D4D4D4"/>
+              </a:solidFill>
+              <a:latin typeface="Consolas" panose="020B0609020204030204" pitchFamily="49" charset="0"/>
+            </a:endParaRPr>
+          </a:p>
+          <a:p>
+            <a:r>
+              <a:rPr lang="pl-PL" dirty="0">
+                <a:solidFill>
+                  <a:srgbClr val="D4D4D4"/>
+                </a:solidFill>
+                <a:latin typeface="Consolas" panose="020B0609020204030204" pitchFamily="49" charset="0"/>
+              </a:rPr>
+              <a:t>        </a:t>
+            </a:r>
+            <a:r>
+              <a:rPr lang="pl-PL" dirty="0">
+                <a:solidFill>
+                  <a:srgbClr val="808080"/>
+                </a:solidFill>
+                <a:latin typeface="Consolas" panose="020B0609020204030204" pitchFamily="49" charset="0"/>
+              </a:rPr>
+              <a:t>&lt;/</a:t>
+            </a:r>
+            <a:r>
+              <a:rPr lang="pl-PL" dirty="0" err="1">
+                <a:solidFill>
+                  <a:srgbClr val="4EC9B0"/>
+                </a:solidFill>
+                <a:latin typeface="Consolas" panose="020B0609020204030204" pitchFamily="49" charset="0"/>
+              </a:rPr>
+              <a:t>React.Fragment</a:t>
+            </a:r>
+            <a:r>
+              <a:rPr lang="pl-PL" dirty="0">
+                <a:solidFill>
+                  <a:srgbClr val="808080"/>
+                </a:solidFill>
+                <a:latin typeface="Consolas" panose="020B0609020204030204" pitchFamily="49" charset="0"/>
+              </a:rPr>
+              <a:t>&gt;</a:t>
+            </a:r>
+            <a:endParaRPr lang="pl-PL" b="0" dirty="0">
+              <a:solidFill>
+                <a:srgbClr val="D4D4D4"/>
+              </a:solidFill>
+              <a:effectLst/>
+              <a:latin typeface="Consolas" panose="020B0609020204030204" pitchFamily="49" charset="0"/>
+            </a:endParaRPr>
+          </a:p>
+        </p:txBody>
+      </p:sp>
+      <p:sp>
+        <p:nvSpPr>
+          <p:cNvPr id="6" name="Prostokąt 5">
+            <a:extLst>
+              <a:ext uri="{FF2B5EF4-FFF2-40B4-BE49-F238E27FC236}">
+                <a16:creationId xmlns:a16="http://schemas.microsoft.com/office/drawing/2014/main" id="{A347261E-F5C8-49FD-B876-889BF461B457}"/>
+              </a:ext>
+            </a:extLst>
+          </p:cNvPr>
+          <p:cNvSpPr/>
+          <p:nvPr/>
+        </p:nvSpPr>
+        <p:spPr>
+          <a:xfrm>
+            <a:off x="2782956" y="5248474"/>
+            <a:ext cx="6096000" cy="1200329"/>
+          </a:xfrm>
+          <a:prstGeom prst="rect">
+            <a:avLst/>
+          </a:prstGeom>
+          <a:solidFill>
+            <a:schemeClr val="tx1"/>
+          </a:solidFill>
+        </p:spPr>
+        <p:txBody>
+          <a:bodyPr>
+            <a:spAutoFit/>
+          </a:bodyPr>
+          <a:lstStyle/>
+          <a:p>
+            <a:r>
+              <a:rPr lang="pl-PL" dirty="0">
+                <a:solidFill>
+                  <a:srgbClr val="D4D4D4"/>
+                </a:solidFill>
+                <a:latin typeface="Consolas" panose="020B0609020204030204" pitchFamily="49" charset="0"/>
+              </a:rPr>
+              <a:t>        </a:t>
+            </a:r>
+            <a:r>
+              <a:rPr lang="pl-PL" dirty="0">
+                <a:solidFill>
+                  <a:srgbClr val="808080"/>
+                </a:solidFill>
+                <a:latin typeface="Consolas" panose="020B0609020204030204" pitchFamily="49" charset="0"/>
+              </a:rPr>
+              <a:t>&lt;&gt;</a:t>
+            </a:r>
+            <a:endParaRPr lang="pl-PL" dirty="0">
+              <a:solidFill>
+                <a:srgbClr val="D4D4D4"/>
+              </a:solidFill>
+              <a:latin typeface="Consolas" panose="020B0609020204030204" pitchFamily="49" charset="0"/>
+            </a:endParaRPr>
+          </a:p>
+          <a:p>
+            <a:r>
+              <a:rPr lang="pl-PL" dirty="0">
+                <a:solidFill>
+                  <a:srgbClr val="D4D4D4"/>
+                </a:solidFill>
+                <a:latin typeface="Consolas" panose="020B0609020204030204" pitchFamily="49" charset="0"/>
+              </a:rPr>
+              <a:t>          </a:t>
+            </a:r>
+            <a:r>
+              <a:rPr lang="pl-PL" dirty="0">
+                <a:solidFill>
+                  <a:srgbClr val="808080"/>
+                </a:solidFill>
+                <a:latin typeface="Consolas" panose="020B0609020204030204" pitchFamily="49" charset="0"/>
+              </a:rPr>
+              <a:t>&lt;</a:t>
+            </a:r>
+            <a:r>
+              <a:rPr lang="pl-PL" dirty="0" err="1">
+                <a:solidFill>
+                  <a:srgbClr val="569CD6"/>
+                </a:solidFill>
+                <a:latin typeface="Consolas" panose="020B0609020204030204" pitchFamily="49" charset="0"/>
+              </a:rPr>
+              <a:t>td</a:t>
+            </a:r>
+            <a:r>
+              <a:rPr lang="pl-PL" dirty="0">
+                <a:solidFill>
+                  <a:srgbClr val="808080"/>
+                </a:solidFill>
+                <a:latin typeface="Consolas" panose="020B0609020204030204" pitchFamily="49" charset="0"/>
+              </a:rPr>
+              <a:t>&gt;</a:t>
+            </a:r>
+            <a:r>
+              <a:rPr lang="pl-PL" dirty="0">
+                <a:solidFill>
+                  <a:srgbClr val="D4D4D4"/>
+                </a:solidFill>
+                <a:latin typeface="Consolas" panose="020B0609020204030204" pitchFamily="49" charset="0"/>
+              </a:rPr>
+              <a:t>val1</a:t>
+            </a:r>
+            <a:r>
+              <a:rPr lang="pl-PL" dirty="0">
+                <a:solidFill>
+                  <a:srgbClr val="808080"/>
+                </a:solidFill>
+                <a:latin typeface="Consolas" panose="020B0609020204030204" pitchFamily="49" charset="0"/>
+              </a:rPr>
+              <a:t>&lt;/</a:t>
+            </a:r>
+            <a:r>
+              <a:rPr lang="pl-PL" dirty="0" err="1">
+                <a:solidFill>
+                  <a:srgbClr val="569CD6"/>
+                </a:solidFill>
+                <a:latin typeface="Consolas" panose="020B0609020204030204" pitchFamily="49" charset="0"/>
+              </a:rPr>
+              <a:t>td</a:t>
+            </a:r>
+            <a:r>
+              <a:rPr lang="pl-PL" dirty="0">
+                <a:solidFill>
+                  <a:srgbClr val="808080"/>
+                </a:solidFill>
+                <a:latin typeface="Consolas" panose="020B0609020204030204" pitchFamily="49" charset="0"/>
+              </a:rPr>
+              <a:t>&gt;</a:t>
+            </a:r>
+            <a:endParaRPr lang="pl-PL" dirty="0">
+              <a:solidFill>
+                <a:srgbClr val="D4D4D4"/>
+              </a:solidFill>
+              <a:latin typeface="Consolas" panose="020B0609020204030204" pitchFamily="49" charset="0"/>
+            </a:endParaRPr>
+          </a:p>
+          <a:p>
+            <a:r>
+              <a:rPr lang="pl-PL" dirty="0">
+                <a:solidFill>
+                  <a:srgbClr val="D4D4D4"/>
+                </a:solidFill>
+                <a:latin typeface="Consolas" panose="020B0609020204030204" pitchFamily="49" charset="0"/>
+              </a:rPr>
+              <a:t>          </a:t>
+            </a:r>
+            <a:r>
+              <a:rPr lang="pl-PL" dirty="0">
+                <a:solidFill>
+                  <a:srgbClr val="808080"/>
+                </a:solidFill>
+                <a:latin typeface="Consolas" panose="020B0609020204030204" pitchFamily="49" charset="0"/>
+              </a:rPr>
+              <a:t>&lt;</a:t>
+            </a:r>
+            <a:r>
+              <a:rPr lang="pl-PL" dirty="0" err="1">
+                <a:solidFill>
+                  <a:srgbClr val="569CD6"/>
+                </a:solidFill>
+                <a:latin typeface="Consolas" panose="020B0609020204030204" pitchFamily="49" charset="0"/>
+              </a:rPr>
+              <a:t>td</a:t>
+            </a:r>
+            <a:r>
+              <a:rPr lang="pl-PL" dirty="0">
+                <a:solidFill>
+                  <a:srgbClr val="808080"/>
+                </a:solidFill>
+                <a:latin typeface="Consolas" panose="020B0609020204030204" pitchFamily="49" charset="0"/>
+              </a:rPr>
+              <a:t>&gt;</a:t>
+            </a:r>
+            <a:r>
+              <a:rPr lang="pl-PL" dirty="0">
+                <a:solidFill>
+                  <a:srgbClr val="D4D4D4"/>
+                </a:solidFill>
+                <a:latin typeface="Consolas" panose="020B0609020204030204" pitchFamily="49" charset="0"/>
+              </a:rPr>
+              <a:t>val2</a:t>
+            </a:r>
+            <a:r>
+              <a:rPr lang="pl-PL" dirty="0">
+                <a:solidFill>
+                  <a:srgbClr val="808080"/>
+                </a:solidFill>
+                <a:latin typeface="Consolas" panose="020B0609020204030204" pitchFamily="49" charset="0"/>
+              </a:rPr>
+              <a:t>&lt;/</a:t>
+            </a:r>
+            <a:r>
+              <a:rPr lang="pl-PL" dirty="0" err="1">
+                <a:solidFill>
+                  <a:srgbClr val="569CD6"/>
+                </a:solidFill>
+                <a:latin typeface="Consolas" panose="020B0609020204030204" pitchFamily="49" charset="0"/>
+              </a:rPr>
+              <a:t>td</a:t>
+            </a:r>
+            <a:r>
+              <a:rPr lang="pl-PL" dirty="0">
+                <a:solidFill>
+                  <a:srgbClr val="808080"/>
+                </a:solidFill>
+                <a:latin typeface="Consolas" panose="020B0609020204030204" pitchFamily="49" charset="0"/>
+              </a:rPr>
+              <a:t>&gt;</a:t>
+            </a:r>
+            <a:endParaRPr lang="pl-PL" dirty="0">
+              <a:solidFill>
+                <a:srgbClr val="D4D4D4"/>
+              </a:solidFill>
+              <a:latin typeface="Consolas" panose="020B0609020204030204" pitchFamily="49" charset="0"/>
+            </a:endParaRPr>
+          </a:p>
+          <a:p>
+            <a:r>
+              <a:rPr lang="pl-PL" dirty="0">
+                <a:solidFill>
+                  <a:srgbClr val="D4D4D4"/>
+                </a:solidFill>
+                <a:latin typeface="Consolas" panose="020B0609020204030204" pitchFamily="49" charset="0"/>
+              </a:rPr>
+              <a:t>        </a:t>
+            </a:r>
+            <a:r>
+              <a:rPr lang="pl-PL" dirty="0">
+                <a:solidFill>
+                  <a:srgbClr val="808080"/>
+                </a:solidFill>
+                <a:latin typeface="Consolas" panose="020B0609020204030204" pitchFamily="49" charset="0"/>
+              </a:rPr>
+              <a:t>&lt;/&gt;</a:t>
+            </a:r>
+            <a:endParaRPr lang="pl-PL" b="0" dirty="0">
+              <a:solidFill>
+                <a:srgbClr val="D4D4D4"/>
+              </a:solidFill>
+              <a:effectLst/>
+              <a:latin typeface="Consolas" panose="020B0609020204030204" pitchFamily="49" charset="0"/>
+            </a:endParaRPr>
           </a:p>
         </p:txBody>
       </p:sp>
@@ -33059,7 +35179,7 @@
         <p:spPr>
           <a:xfrm>
             <a:off x="497840" y="538480"/>
-            <a:ext cx="1641283" cy="369332"/>
+            <a:ext cx="3128613" cy="369332"/>
           </a:xfrm>
           <a:prstGeom prst="rect">
             <a:avLst/>
@@ -33073,18 +35193,17 @@
           <a:lstStyle/>
           <a:p>
             <a:r>
+              <a:rPr lang="pl-PL" dirty="0"/>
+              <a:t>HOC – </a:t>
+            </a:r>
+            <a:r>
               <a:rPr lang="pl-PL" dirty="0" err="1"/>
-              <a:t>Redux</a:t>
+              <a:t>higher</a:t>
             </a:r>
             <a:r>
               <a:rPr lang="pl-PL" dirty="0"/>
-              <a:t> - </a:t>
-            </a:r>
-            <a:r>
-              <a:rPr lang="pl-PL" dirty="0" err="1"/>
-              <a:t>context</a:t>
-            </a:r>
-            <a:endParaRPr lang="pl-PL" dirty="0"/>
+              <a:t> order component</a:t>
+            </a:r>
           </a:p>
         </p:txBody>
       </p:sp>

</xml_diff>

<commit_message>
Exercise 5a: Error boundary with Higher Order Component (HOC)
</commit_message>
<xml_diff>
--- a/tutorial/ReactjsTraining.pptx
+++ b/tutorial/ReactjsTraining.pptx
@@ -6574,15 +6574,66 @@
               <a:buFontTx/>
               <a:buNone/>
             </a:pPr>
-            <a:endParaRPr lang="pl-PL" sz="1200" b="0" i="0" kern="1200" dirty="0">
-              <a:solidFill>
-                <a:schemeClr val="tx1"/>
-              </a:solidFill>
-              <a:effectLst/>
-              <a:latin typeface="+mn-lt"/>
-              <a:ea typeface="+mn-ea"/>
-              <a:cs typeface="+mn-cs"/>
-            </a:endParaRPr>
+            <a:r>
+              <a:rPr lang="pl-PL" sz="1200" b="0" i="0" kern="1200" dirty="0" err="1">
+                <a:solidFill>
+                  <a:schemeClr val="tx1"/>
+                </a:solidFill>
+                <a:effectLst/>
+                <a:latin typeface="+mn-lt"/>
+                <a:ea typeface="+mn-ea"/>
+                <a:cs typeface="+mn-cs"/>
+              </a:rPr>
+              <a:t>Exercise</a:t>
+            </a:r>
+            <a:r>
+              <a:rPr lang="pl-PL" sz="1200" b="0" i="0" kern="1200">
+                <a:solidFill>
+                  <a:schemeClr val="tx1"/>
+                </a:solidFill>
+                <a:effectLst/>
+                <a:latin typeface="+mn-lt"/>
+                <a:ea typeface="+mn-ea"/>
+                <a:cs typeface="+mn-cs"/>
+              </a:rPr>
+              <a:t> 5a: </a:t>
+            </a:r>
+            <a:r>
+              <a:rPr lang="pl-PL" sz="1200" b="0" i="0" kern="1200" dirty="0">
+                <a:solidFill>
+                  <a:schemeClr val="tx1"/>
+                </a:solidFill>
+                <a:effectLst/>
+                <a:latin typeface="+mn-lt"/>
+                <a:ea typeface="+mn-ea"/>
+                <a:cs typeface="+mn-cs"/>
+              </a:rPr>
+              <a:t>Przerobić error </a:t>
+            </a:r>
+            <a:r>
+              <a:rPr lang="pl-PL" sz="1200" b="0" i="0" kern="1200" dirty="0" err="1">
+                <a:solidFill>
+                  <a:schemeClr val="tx1"/>
+                </a:solidFill>
+                <a:effectLst/>
+                <a:latin typeface="+mn-lt"/>
+                <a:ea typeface="+mn-ea"/>
+                <a:cs typeface="+mn-cs"/>
+              </a:rPr>
+              <a:t>boundary</a:t>
+            </a:r>
+            <a:r>
+              <a:rPr lang="pl-PL" sz="1200" b="0" i="0" kern="1200" dirty="0">
+                <a:solidFill>
+                  <a:schemeClr val="tx1"/>
+                </a:solidFill>
+                <a:effectLst/>
+                <a:latin typeface="+mn-lt"/>
+                <a:ea typeface="+mn-ea"/>
+                <a:cs typeface="+mn-cs"/>
+              </a:rPr>
+              <a:t> na HOC</a:t>
+            </a:r>
           </a:p>
         </p:txBody>
       </p:sp>
@@ -35204,6 +35255,828 @@
               <a:rPr lang="pl-PL" dirty="0"/>
               <a:t> order component</a:t>
             </a:r>
+          </a:p>
+        </p:txBody>
+      </p:sp>
+      <p:sp>
+        <p:nvSpPr>
+          <p:cNvPr id="3" name="Prostokąt 2">
+            <a:extLst>
+              <a:ext uri="{FF2B5EF4-FFF2-40B4-BE49-F238E27FC236}">
+                <a16:creationId xmlns:a16="http://schemas.microsoft.com/office/drawing/2014/main" id="{662EB359-F5C3-458A-A85E-FF1B953C863D}"/>
+              </a:ext>
+            </a:extLst>
+          </p:cNvPr>
+          <p:cNvSpPr/>
+          <p:nvPr/>
+        </p:nvSpPr>
+        <p:spPr>
+          <a:xfrm>
+            <a:off x="497840" y="1856746"/>
+            <a:ext cx="11542644" cy="2031325"/>
+          </a:xfrm>
+          <a:prstGeom prst="rect">
+            <a:avLst/>
+          </a:prstGeom>
+          <a:solidFill>
+            <a:schemeClr val="tx1"/>
+          </a:solidFill>
+        </p:spPr>
+        <p:txBody>
+          <a:bodyPr wrap="square">
+            <a:spAutoFit/>
+          </a:bodyPr>
+          <a:lstStyle/>
+          <a:p>
+            <a:r>
+              <a:rPr lang="pl-PL" dirty="0" err="1">
+                <a:solidFill>
+                  <a:srgbClr val="569CD6"/>
+                </a:solidFill>
+                <a:latin typeface="Consolas" panose="020B0609020204030204" pitchFamily="49" charset="0"/>
+              </a:rPr>
+              <a:t>const</a:t>
+            </a:r>
+            <a:r>
+              <a:rPr lang="pl-PL" dirty="0">
+                <a:solidFill>
+                  <a:srgbClr val="D4D4D4"/>
+                </a:solidFill>
+                <a:latin typeface="Consolas" panose="020B0609020204030204" pitchFamily="49" charset="0"/>
+              </a:rPr>
+              <a:t> </a:t>
+            </a:r>
+            <a:r>
+              <a:rPr lang="pl-PL" dirty="0" err="1">
+                <a:solidFill>
+                  <a:srgbClr val="DCDCAA"/>
+                </a:solidFill>
+                <a:latin typeface="Consolas" panose="020B0609020204030204" pitchFamily="49" charset="0"/>
+              </a:rPr>
+              <a:t>myHoc</a:t>
+            </a:r>
+            <a:r>
+              <a:rPr lang="pl-PL" dirty="0">
+                <a:solidFill>
+                  <a:srgbClr val="D4D4D4"/>
+                </a:solidFill>
+                <a:latin typeface="Consolas" panose="020B0609020204030204" pitchFamily="49" charset="0"/>
+              </a:rPr>
+              <a:t> = </a:t>
+            </a:r>
+            <a:r>
+              <a:rPr lang="pl-PL" dirty="0" err="1">
+                <a:solidFill>
+                  <a:srgbClr val="9CDCFE"/>
+                </a:solidFill>
+                <a:latin typeface="Consolas" panose="020B0609020204030204" pitchFamily="49" charset="0"/>
+              </a:rPr>
+              <a:t>settings</a:t>
+            </a:r>
+            <a:r>
+              <a:rPr lang="pl-PL" dirty="0">
+                <a:solidFill>
+                  <a:srgbClr val="D4D4D4"/>
+                </a:solidFill>
+                <a:latin typeface="Consolas" panose="020B0609020204030204" pitchFamily="49" charset="0"/>
+              </a:rPr>
+              <a:t> </a:t>
+            </a:r>
+            <a:r>
+              <a:rPr lang="pl-PL" dirty="0">
+                <a:solidFill>
+                  <a:srgbClr val="569CD6"/>
+                </a:solidFill>
+                <a:latin typeface="Consolas" panose="020B0609020204030204" pitchFamily="49" charset="0"/>
+              </a:rPr>
+              <a:t>=&gt;</a:t>
+            </a:r>
+            <a:r>
+              <a:rPr lang="pl-PL" dirty="0">
+                <a:solidFill>
+                  <a:srgbClr val="D4D4D4"/>
+                </a:solidFill>
+                <a:latin typeface="Consolas" panose="020B0609020204030204" pitchFamily="49" charset="0"/>
+              </a:rPr>
+              <a:t> </a:t>
+            </a:r>
+            <a:r>
+              <a:rPr lang="pl-PL" dirty="0" err="1">
+                <a:solidFill>
+                  <a:srgbClr val="9CDCFE"/>
+                </a:solidFill>
+                <a:latin typeface="Consolas" panose="020B0609020204030204" pitchFamily="49" charset="0"/>
+              </a:rPr>
+              <a:t>WrappedComponent</a:t>
+            </a:r>
+            <a:r>
+              <a:rPr lang="pl-PL" dirty="0">
+                <a:solidFill>
+                  <a:srgbClr val="D4D4D4"/>
+                </a:solidFill>
+                <a:latin typeface="Consolas" panose="020B0609020204030204" pitchFamily="49" charset="0"/>
+              </a:rPr>
+              <a:t> </a:t>
+            </a:r>
+            <a:r>
+              <a:rPr lang="pl-PL" dirty="0">
+                <a:solidFill>
+                  <a:srgbClr val="569CD6"/>
+                </a:solidFill>
+                <a:latin typeface="Consolas" panose="020B0609020204030204" pitchFamily="49" charset="0"/>
+              </a:rPr>
+              <a:t>=&gt;</a:t>
+            </a:r>
+            <a:r>
+              <a:rPr lang="pl-PL" dirty="0">
+                <a:solidFill>
+                  <a:srgbClr val="D4D4D4"/>
+                </a:solidFill>
+                <a:latin typeface="Consolas" panose="020B0609020204030204" pitchFamily="49" charset="0"/>
+              </a:rPr>
+              <a:t> {</a:t>
+            </a:r>
+          </a:p>
+          <a:p>
+            <a:r>
+              <a:rPr lang="pl-PL" dirty="0">
+                <a:solidFill>
+                  <a:srgbClr val="D4D4D4"/>
+                </a:solidFill>
+                <a:latin typeface="Consolas" panose="020B0609020204030204" pitchFamily="49" charset="0"/>
+              </a:rPr>
+              <a:t>    </a:t>
+            </a:r>
+            <a:r>
+              <a:rPr lang="pl-PL" dirty="0">
+                <a:solidFill>
+                  <a:srgbClr val="C586C0"/>
+                </a:solidFill>
+                <a:latin typeface="Consolas" panose="020B0609020204030204" pitchFamily="49" charset="0"/>
+              </a:rPr>
+              <a:t>return</a:t>
+            </a:r>
+            <a:r>
+              <a:rPr lang="pl-PL" dirty="0">
+                <a:solidFill>
+                  <a:srgbClr val="D4D4D4"/>
+                </a:solidFill>
+                <a:latin typeface="Consolas" panose="020B0609020204030204" pitchFamily="49" charset="0"/>
+              </a:rPr>
+              <a:t> </a:t>
+            </a:r>
+            <a:r>
+              <a:rPr lang="pl-PL" dirty="0" err="1">
+                <a:solidFill>
+                  <a:srgbClr val="569CD6"/>
+                </a:solidFill>
+                <a:latin typeface="Consolas" panose="020B0609020204030204" pitchFamily="49" charset="0"/>
+              </a:rPr>
+              <a:t>class</a:t>
+            </a:r>
+            <a:r>
+              <a:rPr lang="pl-PL" dirty="0">
+                <a:solidFill>
+                  <a:srgbClr val="D4D4D4"/>
+                </a:solidFill>
+                <a:latin typeface="Consolas" panose="020B0609020204030204" pitchFamily="49" charset="0"/>
+              </a:rPr>
+              <a:t> </a:t>
+            </a:r>
+            <a:r>
+              <a:rPr lang="pl-PL" dirty="0" err="1">
+                <a:solidFill>
+                  <a:srgbClr val="4EC9B0"/>
+                </a:solidFill>
+                <a:latin typeface="Consolas" panose="020B0609020204030204" pitchFamily="49" charset="0"/>
+              </a:rPr>
+              <a:t>DecoratingComponent</a:t>
+            </a:r>
+            <a:r>
+              <a:rPr lang="pl-PL" dirty="0">
+                <a:solidFill>
+                  <a:srgbClr val="D4D4D4"/>
+                </a:solidFill>
+                <a:latin typeface="Consolas" panose="020B0609020204030204" pitchFamily="49" charset="0"/>
+              </a:rPr>
+              <a:t> </a:t>
+            </a:r>
+            <a:r>
+              <a:rPr lang="pl-PL" dirty="0" err="1">
+                <a:solidFill>
+                  <a:srgbClr val="569CD6"/>
+                </a:solidFill>
+                <a:latin typeface="Consolas" panose="020B0609020204030204" pitchFamily="49" charset="0"/>
+              </a:rPr>
+              <a:t>extends</a:t>
+            </a:r>
+            <a:r>
+              <a:rPr lang="pl-PL" dirty="0">
+                <a:solidFill>
+                  <a:srgbClr val="D4D4D4"/>
+                </a:solidFill>
+                <a:latin typeface="Consolas" panose="020B0609020204030204" pitchFamily="49" charset="0"/>
+              </a:rPr>
+              <a:t> </a:t>
+            </a:r>
+            <a:r>
+              <a:rPr lang="pl-PL" dirty="0" err="1">
+                <a:solidFill>
+                  <a:srgbClr val="4EC9B0"/>
+                </a:solidFill>
+                <a:latin typeface="Consolas" panose="020B0609020204030204" pitchFamily="49" charset="0"/>
+              </a:rPr>
+              <a:t>React</a:t>
+            </a:r>
+            <a:r>
+              <a:rPr lang="pl-PL" dirty="0" err="1">
+                <a:solidFill>
+                  <a:srgbClr val="D4D4D4"/>
+                </a:solidFill>
+                <a:latin typeface="Consolas" panose="020B0609020204030204" pitchFamily="49" charset="0"/>
+              </a:rPr>
+              <a:t>.</a:t>
+            </a:r>
+            <a:r>
+              <a:rPr lang="pl-PL" dirty="0" err="1">
+                <a:solidFill>
+                  <a:srgbClr val="4EC9B0"/>
+                </a:solidFill>
+                <a:latin typeface="Consolas" panose="020B0609020204030204" pitchFamily="49" charset="0"/>
+              </a:rPr>
+              <a:t>Component</a:t>
+            </a:r>
+            <a:r>
+              <a:rPr lang="pl-PL" dirty="0">
+                <a:solidFill>
+                  <a:srgbClr val="D4D4D4"/>
+                </a:solidFill>
+                <a:latin typeface="Consolas" panose="020B0609020204030204" pitchFamily="49" charset="0"/>
+              </a:rPr>
+              <a:t> {</a:t>
+            </a:r>
+          </a:p>
+          <a:p>
+            <a:r>
+              <a:rPr lang="pl-PL" dirty="0">
+                <a:solidFill>
+                  <a:srgbClr val="D4D4D4"/>
+                </a:solidFill>
+                <a:latin typeface="Consolas" panose="020B0609020204030204" pitchFamily="49" charset="0"/>
+              </a:rPr>
+              <a:t>        </a:t>
+            </a:r>
+            <a:r>
+              <a:rPr lang="pl-PL" dirty="0" err="1">
+                <a:solidFill>
+                  <a:srgbClr val="DCDCAA"/>
+                </a:solidFill>
+                <a:latin typeface="Consolas" panose="020B0609020204030204" pitchFamily="49" charset="0"/>
+              </a:rPr>
+              <a:t>render</a:t>
+            </a:r>
+            <a:r>
+              <a:rPr lang="pl-PL" dirty="0">
+                <a:solidFill>
+                  <a:srgbClr val="D4D4D4"/>
+                </a:solidFill>
+                <a:latin typeface="Consolas" panose="020B0609020204030204" pitchFamily="49" charset="0"/>
+              </a:rPr>
+              <a:t>() {</a:t>
+            </a:r>
+          </a:p>
+          <a:p>
+            <a:r>
+              <a:rPr lang="pl-PL" dirty="0">
+                <a:solidFill>
+                  <a:srgbClr val="D4D4D4"/>
+                </a:solidFill>
+                <a:latin typeface="Consolas" panose="020B0609020204030204" pitchFamily="49" charset="0"/>
+              </a:rPr>
+              <a:t>            </a:t>
+            </a:r>
+            <a:r>
+              <a:rPr lang="pl-PL" dirty="0">
+                <a:solidFill>
+                  <a:srgbClr val="C586C0"/>
+                </a:solidFill>
+                <a:latin typeface="Consolas" panose="020B0609020204030204" pitchFamily="49" charset="0"/>
+              </a:rPr>
+              <a:t>return</a:t>
+            </a:r>
+            <a:r>
+              <a:rPr lang="pl-PL" dirty="0">
+                <a:solidFill>
+                  <a:srgbClr val="D4D4D4"/>
+                </a:solidFill>
+                <a:latin typeface="Consolas" panose="020B0609020204030204" pitchFamily="49" charset="0"/>
+              </a:rPr>
+              <a:t> (</a:t>
+            </a:r>
+            <a:r>
+              <a:rPr lang="pl-PL" dirty="0">
+                <a:solidFill>
+                  <a:srgbClr val="808080"/>
+                </a:solidFill>
+                <a:latin typeface="Consolas" panose="020B0609020204030204" pitchFamily="49" charset="0"/>
+              </a:rPr>
+              <a:t>&lt;</a:t>
+            </a:r>
+            <a:r>
+              <a:rPr lang="pl-PL" dirty="0">
+                <a:solidFill>
+                  <a:srgbClr val="569CD6"/>
+                </a:solidFill>
+                <a:latin typeface="Consolas" panose="020B0609020204030204" pitchFamily="49" charset="0"/>
+              </a:rPr>
+              <a:t>div</a:t>
+            </a:r>
+            <a:r>
+              <a:rPr lang="pl-PL" dirty="0">
+                <a:solidFill>
+                  <a:srgbClr val="D4D4D4"/>
+                </a:solidFill>
+                <a:latin typeface="Consolas" panose="020B0609020204030204" pitchFamily="49" charset="0"/>
+              </a:rPr>
+              <a:t> </a:t>
+            </a:r>
+            <a:r>
+              <a:rPr lang="pl-PL" dirty="0" err="1">
+                <a:solidFill>
+                  <a:srgbClr val="9CDCFE"/>
+                </a:solidFill>
+                <a:latin typeface="Consolas" panose="020B0609020204030204" pitchFamily="49" charset="0"/>
+              </a:rPr>
+              <a:t>className</a:t>
+            </a:r>
+            <a:r>
+              <a:rPr lang="pl-PL" dirty="0">
+                <a:solidFill>
+                  <a:srgbClr val="D4D4D4"/>
+                </a:solidFill>
+                <a:latin typeface="Consolas" panose="020B0609020204030204" pitchFamily="49" charset="0"/>
+              </a:rPr>
+              <a:t>=</a:t>
+            </a:r>
+            <a:r>
+              <a:rPr lang="pl-PL" dirty="0">
+                <a:solidFill>
+                  <a:srgbClr val="569CD6"/>
+                </a:solidFill>
+                <a:latin typeface="Consolas" panose="020B0609020204030204" pitchFamily="49" charset="0"/>
+              </a:rPr>
+              <a:t>{</a:t>
+            </a:r>
+            <a:r>
+              <a:rPr lang="pl-PL" dirty="0" err="1">
+                <a:solidFill>
+                  <a:srgbClr val="9CDCFE"/>
+                </a:solidFill>
+                <a:latin typeface="Consolas" panose="020B0609020204030204" pitchFamily="49" charset="0"/>
+              </a:rPr>
+              <a:t>settings</a:t>
+            </a:r>
+            <a:r>
+              <a:rPr lang="pl-PL" dirty="0">
+                <a:solidFill>
+                  <a:srgbClr val="569CD6"/>
+                </a:solidFill>
+                <a:latin typeface="Consolas" panose="020B0609020204030204" pitchFamily="49" charset="0"/>
+              </a:rPr>
+              <a:t>}</a:t>
+            </a:r>
+            <a:r>
+              <a:rPr lang="pl-PL" dirty="0">
+                <a:solidFill>
+                  <a:srgbClr val="808080"/>
+                </a:solidFill>
+                <a:latin typeface="Consolas" panose="020B0609020204030204" pitchFamily="49" charset="0"/>
+              </a:rPr>
+              <a:t>&gt;&lt;</a:t>
+            </a:r>
+            <a:r>
+              <a:rPr lang="pl-PL" dirty="0" err="1">
+                <a:solidFill>
+                  <a:srgbClr val="4EC9B0"/>
+                </a:solidFill>
+                <a:latin typeface="Consolas" panose="020B0609020204030204" pitchFamily="49" charset="0"/>
+              </a:rPr>
+              <a:t>WrappedComponent</a:t>
+            </a:r>
+            <a:r>
+              <a:rPr lang="pl-PL" dirty="0">
+                <a:solidFill>
+                  <a:srgbClr val="D4D4D4"/>
+                </a:solidFill>
+                <a:latin typeface="Consolas" panose="020B0609020204030204" pitchFamily="49" charset="0"/>
+              </a:rPr>
+              <a:t> </a:t>
+            </a:r>
+            <a:r>
+              <a:rPr lang="pl-PL" dirty="0">
+                <a:solidFill>
+                  <a:srgbClr val="569CD6"/>
+                </a:solidFill>
+                <a:latin typeface="Consolas" panose="020B0609020204030204" pitchFamily="49" charset="0"/>
+              </a:rPr>
+              <a:t>{</a:t>
+            </a:r>
+            <a:r>
+              <a:rPr lang="pl-PL" dirty="0">
+                <a:solidFill>
+                  <a:srgbClr val="D4D4D4"/>
+                </a:solidFill>
+                <a:latin typeface="Consolas" panose="020B0609020204030204" pitchFamily="49" charset="0"/>
+              </a:rPr>
+              <a:t>...</a:t>
+            </a:r>
+            <a:r>
+              <a:rPr lang="pl-PL" dirty="0" err="1">
+                <a:solidFill>
+                  <a:srgbClr val="569CD6"/>
+                </a:solidFill>
+                <a:latin typeface="Consolas" panose="020B0609020204030204" pitchFamily="49" charset="0"/>
+              </a:rPr>
+              <a:t>this</a:t>
+            </a:r>
+            <a:r>
+              <a:rPr lang="pl-PL" dirty="0" err="1">
+                <a:solidFill>
+                  <a:srgbClr val="D4D4D4"/>
+                </a:solidFill>
+                <a:latin typeface="Consolas" panose="020B0609020204030204" pitchFamily="49" charset="0"/>
+              </a:rPr>
+              <a:t>.</a:t>
+            </a:r>
+            <a:r>
+              <a:rPr lang="pl-PL" dirty="0" err="1">
+                <a:solidFill>
+                  <a:srgbClr val="9CDCFE"/>
+                </a:solidFill>
+                <a:latin typeface="Consolas" panose="020B0609020204030204" pitchFamily="49" charset="0"/>
+              </a:rPr>
+              <a:t>props</a:t>
+            </a:r>
+            <a:r>
+              <a:rPr lang="pl-PL" dirty="0">
+                <a:solidFill>
+                  <a:srgbClr val="569CD6"/>
+                </a:solidFill>
+                <a:latin typeface="Consolas" panose="020B0609020204030204" pitchFamily="49" charset="0"/>
+              </a:rPr>
+              <a:t>}</a:t>
+            </a:r>
+            <a:r>
+              <a:rPr lang="pl-PL" dirty="0">
+                <a:solidFill>
+                  <a:srgbClr val="D4D4D4"/>
+                </a:solidFill>
+                <a:latin typeface="Consolas" panose="020B0609020204030204" pitchFamily="49" charset="0"/>
+              </a:rPr>
+              <a:t> </a:t>
+            </a:r>
+            <a:r>
+              <a:rPr lang="pl-PL" dirty="0">
+                <a:solidFill>
+                  <a:srgbClr val="808080"/>
+                </a:solidFill>
+                <a:latin typeface="Consolas" panose="020B0609020204030204" pitchFamily="49" charset="0"/>
+              </a:rPr>
+              <a:t>/&gt;&lt;/</a:t>
+            </a:r>
+            <a:r>
+              <a:rPr lang="pl-PL" dirty="0">
+                <a:solidFill>
+                  <a:srgbClr val="569CD6"/>
+                </a:solidFill>
+                <a:latin typeface="Consolas" panose="020B0609020204030204" pitchFamily="49" charset="0"/>
+              </a:rPr>
+              <a:t>div</a:t>
+            </a:r>
+            <a:r>
+              <a:rPr lang="pl-PL" dirty="0">
+                <a:solidFill>
+                  <a:srgbClr val="808080"/>
+                </a:solidFill>
+                <a:latin typeface="Consolas" panose="020B0609020204030204" pitchFamily="49" charset="0"/>
+              </a:rPr>
+              <a:t>&gt;</a:t>
+            </a:r>
+            <a:r>
+              <a:rPr lang="pl-PL" dirty="0">
+                <a:solidFill>
+                  <a:srgbClr val="D4D4D4"/>
+                </a:solidFill>
+                <a:latin typeface="Consolas" panose="020B0609020204030204" pitchFamily="49" charset="0"/>
+              </a:rPr>
+              <a:t>)</a:t>
+            </a:r>
+          </a:p>
+          <a:p>
+            <a:r>
+              <a:rPr lang="pl-PL" dirty="0">
+                <a:solidFill>
+                  <a:srgbClr val="D4D4D4"/>
+                </a:solidFill>
+                <a:latin typeface="Consolas" panose="020B0609020204030204" pitchFamily="49" charset="0"/>
+              </a:rPr>
+              <a:t>        }</a:t>
+            </a:r>
+          </a:p>
+          <a:p>
+            <a:r>
+              <a:rPr lang="pl-PL" dirty="0">
+                <a:solidFill>
+                  <a:srgbClr val="D4D4D4"/>
+                </a:solidFill>
+                <a:latin typeface="Consolas" panose="020B0609020204030204" pitchFamily="49" charset="0"/>
+              </a:rPr>
+              <a:t>    }</a:t>
+            </a:r>
+          </a:p>
+          <a:p>
+            <a:r>
+              <a:rPr lang="pl-PL" dirty="0">
+                <a:solidFill>
+                  <a:srgbClr val="D4D4D4"/>
+                </a:solidFill>
+                <a:latin typeface="Consolas" panose="020B0609020204030204" pitchFamily="49" charset="0"/>
+              </a:rPr>
+              <a:t>}</a:t>
+            </a:r>
+            <a:endParaRPr lang="pl-PL" b="0" dirty="0">
+              <a:solidFill>
+                <a:srgbClr val="D4D4D4"/>
+              </a:solidFill>
+              <a:effectLst/>
+              <a:latin typeface="Consolas" panose="020B0609020204030204" pitchFamily="49" charset="0"/>
+            </a:endParaRPr>
+          </a:p>
+        </p:txBody>
+      </p:sp>
+      <p:sp>
+        <p:nvSpPr>
+          <p:cNvPr id="5" name="Prostokąt 4">
+            <a:extLst>
+              <a:ext uri="{FF2B5EF4-FFF2-40B4-BE49-F238E27FC236}">
+                <a16:creationId xmlns:a16="http://schemas.microsoft.com/office/drawing/2014/main" id="{5B773708-F535-4438-BDEA-5A02515F42A6}"/>
+              </a:ext>
+            </a:extLst>
+          </p:cNvPr>
+          <p:cNvSpPr/>
+          <p:nvPr/>
+        </p:nvSpPr>
+        <p:spPr>
+          <a:xfrm>
+            <a:off x="497841" y="4704666"/>
+            <a:ext cx="8256105" cy="1200329"/>
+          </a:xfrm>
+          <a:prstGeom prst="rect">
+            <a:avLst/>
+          </a:prstGeom>
+          <a:solidFill>
+            <a:schemeClr val="tx1"/>
+          </a:solidFill>
+        </p:spPr>
+        <p:txBody>
+          <a:bodyPr wrap="square">
+            <a:spAutoFit/>
+          </a:bodyPr>
+          <a:lstStyle/>
+          <a:p>
+            <a:br>
+              <a:rPr lang="en-US" dirty="0">
+                <a:solidFill>
+                  <a:srgbClr val="D4D4D4"/>
+                </a:solidFill>
+                <a:latin typeface="Consolas" panose="020B0609020204030204" pitchFamily="49" charset="0"/>
+              </a:rPr>
+            </a:br>
+            <a:r>
+              <a:rPr lang="en-US" dirty="0">
+                <a:solidFill>
+                  <a:srgbClr val="569CD6"/>
+                </a:solidFill>
+                <a:latin typeface="Consolas" panose="020B0609020204030204" pitchFamily="49" charset="0"/>
+              </a:rPr>
+              <a:t>const</a:t>
+            </a:r>
+            <a:r>
+              <a:rPr lang="en-US" dirty="0">
+                <a:solidFill>
+                  <a:srgbClr val="D4D4D4"/>
+                </a:solidFill>
+                <a:latin typeface="Consolas" panose="020B0609020204030204" pitchFamily="49" charset="0"/>
+              </a:rPr>
+              <a:t> </a:t>
+            </a:r>
+            <a:r>
+              <a:rPr lang="en-US" dirty="0" err="1">
+                <a:solidFill>
+                  <a:srgbClr val="9CDCFE"/>
+                </a:solidFill>
+                <a:latin typeface="Consolas" panose="020B0609020204030204" pitchFamily="49" charset="0"/>
+              </a:rPr>
+              <a:t>MyWrappedComponent</a:t>
+            </a:r>
+            <a:r>
+              <a:rPr lang="en-US" dirty="0">
+                <a:solidFill>
+                  <a:srgbClr val="D4D4D4"/>
+                </a:solidFill>
+                <a:latin typeface="Consolas" panose="020B0609020204030204" pitchFamily="49" charset="0"/>
+              </a:rPr>
+              <a:t> = </a:t>
+            </a:r>
+            <a:r>
+              <a:rPr lang="en-US" dirty="0" err="1">
+                <a:solidFill>
+                  <a:srgbClr val="DCDCAA"/>
+                </a:solidFill>
+                <a:latin typeface="Consolas" panose="020B0609020204030204" pitchFamily="49" charset="0"/>
+              </a:rPr>
+              <a:t>myHoc</a:t>
+            </a:r>
+            <a:r>
+              <a:rPr lang="en-US" dirty="0">
+                <a:solidFill>
+                  <a:srgbClr val="D4D4D4"/>
+                </a:solidFill>
+                <a:latin typeface="Consolas" panose="020B0609020204030204" pitchFamily="49" charset="0"/>
+              </a:rPr>
+              <a:t>(</a:t>
+            </a:r>
+            <a:r>
+              <a:rPr lang="en-US" dirty="0">
+                <a:solidFill>
+                  <a:srgbClr val="CE9178"/>
+                </a:solidFill>
+                <a:latin typeface="Consolas" panose="020B0609020204030204" pitchFamily="49" charset="0"/>
+              </a:rPr>
+              <a:t>'test'</a:t>
+            </a:r>
+            <a:r>
+              <a:rPr lang="en-US" dirty="0">
+                <a:solidFill>
+                  <a:srgbClr val="D4D4D4"/>
+                </a:solidFill>
+                <a:latin typeface="Consolas" panose="020B0609020204030204" pitchFamily="49" charset="0"/>
+              </a:rPr>
+              <a:t>)(</a:t>
+            </a:r>
+            <a:r>
+              <a:rPr lang="en-US" dirty="0" err="1">
+                <a:solidFill>
+                  <a:srgbClr val="9CDCFE"/>
+                </a:solidFill>
+                <a:latin typeface="Consolas" panose="020B0609020204030204" pitchFamily="49" charset="0"/>
+              </a:rPr>
+              <a:t>SomeComponent</a:t>
+            </a:r>
+            <a:r>
+              <a:rPr lang="en-US" dirty="0">
+                <a:solidFill>
+                  <a:srgbClr val="D4D4D4"/>
+                </a:solidFill>
+                <a:latin typeface="Consolas" panose="020B0609020204030204" pitchFamily="49" charset="0"/>
+              </a:rPr>
+              <a:t>);</a:t>
+            </a:r>
+          </a:p>
+          <a:p>
+            <a:br>
+              <a:rPr lang="en-US" dirty="0">
+                <a:solidFill>
+                  <a:srgbClr val="D4D4D4"/>
+                </a:solidFill>
+                <a:latin typeface="Consolas" panose="020B0609020204030204" pitchFamily="49" charset="0"/>
+              </a:rPr>
+            </a:br>
+            <a:r>
+              <a:rPr lang="en-US" dirty="0">
+                <a:solidFill>
+                  <a:srgbClr val="808080"/>
+                </a:solidFill>
+                <a:latin typeface="Consolas" panose="020B0609020204030204" pitchFamily="49" charset="0"/>
+              </a:rPr>
+              <a:t>&lt;</a:t>
+            </a:r>
+            <a:r>
+              <a:rPr lang="en-US" dirty="0" err="1">
+                <a:solidFill>
+                  <a:srgbClr val="4EC9B0"/>
+                </a:solidFill>
+                <a:latin typeface="Consolas" panose="020B0609020204030204" pitchFamily="49" charset="0"/>
+              </a:rPr>
+              <a:t>MyWrappedComponent</a:t>
+            </a:r>
+            <a:r>
+              <a:rPr lang="en-US" dirty="0">
+                <a:solidFill>
+                  <a:srgbClr val="808080"/>
+                </a:solidFill>
+                <a:latin typeface="Consolas" panose="020B0609020204030204" pitchFamily="49" charset="0"/>
+              </a:rPr>
+              <a:t>/&gt;</a:t>
+            </a:r>
+            <a:endParaRPr lang="en-US" b="0" dirty="0">
+              <a:solidFill>
+                <a:srgbClr val="D4D4D4"/>
+              </a:solidFill>
+              <a:effectLst/>
+              <a:latin typeface="Consolas" panose="020B0609020204030204" pitchFamily="49" charset="0"/>
+            </a:endParaRPr>
+          </a:p>
+        </p:txBody>
+      </p:sp>
+      <p:sp>
+        <p:nvSpPr>
+          <p:cNvPr id="6" name="pole tekstowe 5">
+            <a:extLst>
+              <a:ext uri="{FF2B5EF4-FFF2-40B4-BE49-F238E27FC236}">
+                <a16:creationId xmlns:a16="http://schemas.microsoft.com/office/drawing/2014/main" id="{ED31629A-EF1C-4DAF-9B63-C0E9B0266DBC}"/>
+              </a:ext>
+            </a:extLst>
+          </p:cNvPr>
+          <p:cNvSpPr txBox="1"/>
+          <p:nvPr/>
+        </p:nvSpPr>
+        <p:spPr>
+          <a:xfrm>
+            <a:off x="497839" y="1411212"/>
+            <a:ext cx="2822247" cy="369332"/>
+          </a:xfrm>
+          <a:prstGeom prst="rect">
+            <a:avLst/>
+          </a:prstGeom>
+          <a:noFill/>
+        </p:spPr>
+        <p:txBody>
+          <a:bodyPr wrap="none" rtlCol="0">
+            <a:spAutoFit/>
+          </a:bodyPr>
+          <a:lstStyle/>
+          <a:p>
+            <a:r>
+              <a:rPr lang="pl-PL" dirty="0" err="1"/>
+              <a:t>Add</a:t>
+            </a:r>
+            <a:r>
+              <a:rPr lang="pl-PL" dirty="0"/>
+              <a:t> </a:t>
+            </a:r>
+            <a:r>
+              <a:rPr lang="pl-PL" dirty="0" err="1"/>
+              <a:t>class</a:t>
+            </a:r>
+            <a:r>
+              <a:rPr lang="pl-PL" dirty="0"/>
+              <a:t> to </a:t>
+            </a:r>
+            <a:r>
+              <a:rPr lang="pl-PL" dirty="0" err="1"/>
+              <a:t>any</a:t>
+            </a:r>
+            <a:r>
+              <a:rPr lang="pl-PL" dirty="0"/>
+              <a:t> component</a:t>
+            </a:r>
+          </a:p>
+        </p:txBody>
+      </p:sp>
+      <p:sp>
+        <p:nvSpPr>
+          <p:cNvPr id="7" name="pole tekstowe 6">
+            <a:extLst>
+              <a:ext uri="{FF2B5EF4-FFF2-40B4-BE49-F238E27FC236}">
+                <a16:creationId xmlns:a16="http://schemas.microsoft.com/office/drawing/2014/main" id="{7D0FD36A-AC71-47A0-80C2-2E2E71187588}"/>
+              </a:ext>
+            </a:extLst>
+          </p:cNvPr>
+          <p:cNvSpPr txBox="1"/>
+          <p:nvPr/>
+        </p:nvSpPr>
+        <p:spPr>
+          <a:xfrm>
+            <a:off x="497839" y="4335334"/>
+            <a:ext cx="755015" cy="369332"/>
+          </a:xfrm>
+          <a:prstGeom prst="rect">
+            <a:avLst/>
+          </a:prstGeom>
+          <a:noFill/>
+        </p:spPr>
+        <p:txBody>
+          <a:bodyPr wrap="none" rtlCol="0">
+            <a:spAutoFit/>
+          </a:bodyPr>
+          <a:lstStyle/>
+          <a:p>
+            <a:r>
+              <a:rPr lang="pl-PL" dirty="0" err="1"/>
+              <a:t>Usage</a:t>
+            </a:r>
+            <a:endParaRPr lang="pl-PL" dirty="0"/>
           </a:p>
         </p:txBody>
       </p:sp>

</xml_diff>

<commit_message>
Exercise 6a: Login form - reference
</commit_message>
<xml_diff>
--- a/tutorial/ReactjsTraining.pptx
+++ b/tutorial/ReactjsTraining.pptx
@@ -5,7 +5,7 @@
     <p:sldMasterId id="2147483648" r:id="rId1"/>
   </p:sldMasterIdLst>
   <p:notesMasterIdLst>
-    <p:notesMasterId r:id="rId36"/>
+    <p:notesMasterId r:id="rId37"/>
   </p:notesMasterIdLst>
   <p:sldIdLst>
     <p:sldId id="256" r:id="rId2"/>
@@ -39,9 +39,10 @@
     <p:sldId id="286" r:id="rId30"/>
     <p:sldId id="287" r:id="rId31"/>
     <p:sldId id="288" r:id="rId32"/>
-    <p:sldId id="282" r:id="rId33"/>
-    <p:sldId id="283" r:id="rId34"/>
-    <p:sldId id="281" r:id="rId35"/>
+    <p:sldId id="290" r:id="rId33"/>
+    <p:sldId id="282" r:id="rId34"/>
+    <p:sldId id="283" r:id="rId35"/>
+    <p:sldId id="281" r:id="rId36"/>
   </p:sldIdLst>
   <p:sldSz cx="12192000" cy="6858000"/>
   <p:notesSz cx="6858000" cy="9144000"/>
@@ -230,7 +231,7 @@
           <a:p>
             <a:fld id="{D61BAF21-C883-454C-A249-8697E6BEDB6B}" type="datetimeFigureOut">
               <a:rPr lang="pl-PL" smtClean="0"/>
-              <a:t>07.10.2019</a:t>
+              <a:t>12.10.2019</a:t>
             </a:fld>
             <a:endParaRPr lang="pl-PL"/>
           </a:p>
@@ -6721,6 +6722,162 @@
               <a:buFontTx/>
               <a:buNone/>
             </a:pPr>
+            <a:r>
+              <a:rPr lang="pl-PL" sz="1200" b="0" i="0" kern="1200" dirty="0" err="1">
+                <a:solidFill>
+                  <a:schemeClr val="tx1"/>
+                </a:solidFill>
+                <a:effectLst/>
+                <a:latin typeface="+mn-lt"/>
+                <a:ea typeface="+mn-ea"/>
+                <a:cs typeface="+mn-cs"/>
+              </a:rPr>
+              <a:t>Exercie</a:t>
+            </a:r>
+            <a:r>
+              <a:rPr lang="pl-PL" sz="1200" b="0" i="0" kern="1200" dirty="0">
+                <a:solidFill>
+                  <a:schemeClr val="tx1"/>
+                </a:solidFill>
+                <a:effectLst/>
+                <a:latin typeface="+mn-lt"/>
+                <a:ea typeface="+mn-ea"/>
+                <a:cs typeface="+mn-cs"/>
+              </a:rPr>
+              <a:t> 6a: W </a:t>
+            </a:r>
+            <a:r>
+              <a:rPr lang="pl-PL" sz="1200" b="0" i="0" kern="1200" dirty="0" err="1">
+                <a:solidFill>
+                  <a:schemeClr val="tx1"/>
+                </a:solidFill>
+                <a:effectLst/>
+                <a:latin typeface="+mn-lt"/>
+                <a:ea typeface="+mn-ea"/>
+                <a:cs typeface="+mn-cs"/>
+              </a:rPr>
+              <a:t>Account</a:t>
+            </a:r>
+            <a:r>
+              <a:rPr lang="pl-PL" sz="1200" b="0" i="0" kern="1200" dirty="0">
+                <a:solidFill>
+                  <a:schemeClr val="tx1"/>
+                </a:solidFill>
+                <a:effectLst/>
+                <a:latin typeface="+mn-lt"/>
+                <a:ea typeface="+mn-ea"/>
+                <a:cs typeface="+mn-cs"/>
+              </a:rPr>
+              <a:t> (login form) jak się naciśnie </a:t>
+            </a:r>
+            <a:r>
+              <a:rPr lang="pl-PL" sz="1200" b="0" i="0" kern="1200" dirty="0" err="1">
+                <a:solidFill>
+                  <a:schemeClr val="tx1"/>
+                </a:solidFill>
+                <a:effectLst/>
+                <a:latin typeface="+mn-lt"/>
+                <a:ea typeface="+mn-ea"/>
+                <a:cs typeface="+mn-cs"/>
+              </a:rPr>
+              <a:t>Submit</a:t>
+            </a:r>
+            <a:r>
+              <a:rPr lang="pl-PL" sz="1200" b="0" i="0" kern="1200" dirty="0">
+                <a:solidFill>
+                  <a:schemeClr val="tx1"/>
+                </a:solidFill>
+                <a:effectLst/>
+                <a:latin typeface="+mn-lt"/>
+                <a:ea typeface="+mn-ea"/>
+                <a:cs typeface="+mn-cs"/>
+              </a:rPr>
+              <a:t> (wyłączyć </a:t>
+            </a:r>
+            <a:r>
+              <a:rPr lang="pl-PL" sz="1200" b="0" i="0" kern="1200" dirty="0" err="1">
+                <a:solidFill>
+                  <a:schemeClr val="tx1"/>
+                </a:solidFill>
+                <a:effectLst/>
+                <a:latin typeface="+mn-lt"/>
+                <a:ea typeface="+mn-ea"/>
+                <a:cs typeface="+mn-cs"/>
+              </a:rPr>
+              <a:t>disabled</a:t>
+            </a:r>
+            <a:r>
+              <a:rPr lang="pl-PL" sz="1200" b="0" i="0" kern="1200" dirty="0">
+                <a:solidFill>
+                  <a:schemeClr val="tx1"/>
+                </a:solidFill>
+                <a:effectLst/>
+                <a:latin typeface="+mn-lt"/>
+                <a:ea typeface="+mn-ea"/>
+                <a:cs typeface="+mn-cs"/>
+              </a:rPr>
+              <a:t>) to ma się </a:t>
+            </a:r>
+            <a:r>
+              <a:rPr lang="pl-PL" sz="1200" b="0" i="0" kern="1200" dirty="0" err="1">
+                <a:solidFill>
+                  <a:schemeClr val="tx1"/>
+                </a:solidFill>
+                <a:effectLst/>
+                <a:latin typeface="+mn-lt"/>
+                <a:ea typeface="+mn-ea"/>
+                <a:cs typeface="+mn-cs"/>
+              </a:rPr>
+              <a:t>sfokusować</a:t>
+            </a:r>
+            <a:r>
+              <a:rPr lang="pl-PL" sz="1200" b="0" i="0" kern="1200" dirty="0">
+                <a:solidFill>
+                  <a:schemeClr val="tx1"/>
+                </a:solidFill>
+                <a:effectLst/>
+                <a:latin typeface="+mn-lt"/>
+                <a:ea typeface="+mn-ea"/>
+                <a:cs typeface="+mn-cs"/>
+              </a:rPr>
+              <a:t> na email/</a:t>
+            </a:r>
+            <a:r>
+              <a:rPr lang="pl-PL" sz="1200" b="0" i="0" kern="1200" dirty="0" err="1">
+                <a:solidFill>
+                  <a:schemeClr val="tx1"/>
+                </a:solidFill>
+                <a:effectLst/>
+                <a:latin typeface="+mn-lt"/>
+                <a:ea typeface="+mn-ea"/>
+                <a:cs typeface="+mn-cs"/>
+              </a:rPr>
+              <a:t>password</a:t>
+            </a:r>
+            <a:r>
+              <a:rPr lang="pl-PL" sz="1200" b="0" i="0" kern="1200" dirty="0">
+                <a:solidFill>
+                  <a:schemeClr val="tx1"/>
+                </a:solidFill>
+                <a:effectLst/>
+                <a:latin typeface="+mn-lt"/>
+                <a:ea typeface="+mn-ea"/>
+                <a:cs typeface="+mn-cs"/>
+              </a:rPr>
+              <a:t> jeżeli dla </a:t>
+            </a:r>
+            <a:r>
+              <a:rPr lang="pl-PL" sz="1200" b="0" i="0" kern="1200">
+                <a:solidFill>
+                  <a:schemeClr val="tx1"/>
+                </a:solidFill>
+                <a:effectLst/>
+                <a:latin typeface="+mn-lt"/>
+                <a:ea typeface="+mn-ea"/>
+                <a:cs typeface="+mn-cs"/>
+              </a:rPr>
+              <a:t>któregoś odpaliła się walidacja</a:t>
+            </a:r>
             <a:endParaRPr lang="pl-PL" sz="1200" b="0" i="0" kern="1200" dirty="0">
               <a:solidFill>
                 <a:schemeClr val="tx1"/>
@@ -6759,7 +6916,7 @@
     </p:spTree>
     <p:extLst>
       <p:ext uri="{BB962C8B-B14F-4D97-AF65-F5344CB8AC3E}">
-        <p14:creationId xmlns:p14="http://schemas.microsoft.com/office/powerpoint/2010/main" val="3365077152"/>
+        <p14:creationId xmlns:p14="http://schemas.microsoft.com/office/powerpoint/2010/main" val="4159575472"/>
       </p:ext>
     </p:extLst>
   </p:cSld>
@@ -6855,7 +7012,7 @@
     </p:spTree>
     <p:extLst>
       <p:ext uri="{BB962C8B-B14F-4D97-AF65-F5344CB8AC3E}">
-        <p14:creationId xmlns:p14="http://schemas.microsoft.com/office/powerpoint/2010/main" val="2873150729"/>
+        <p14:creationId xmlns:p14="http://schemas.microsoft.com/office/powerpoint/2010/main" val="3365077152"/>
       </p:ext>
     </p:extLst>
   </p:cSld>
@@ -6913,18 +7070,15 @@
               <a:buFontTx/>
               <a:buNone/>
             </a:pPr>
-            <a:r>
-              <a:rPr lang="pl-PL" sz="1200" b="0" i="0" kern="1200" dirty="0">
-                <a:solidFill>
-                  <a:schemeClr val="tx1"/>
-                </a:solidFill>
-                <a:effectLst/>
-                <a:latin typeface="+mn-lt"/>
-                <a:ea typeface="+mn-ea"/>
-                <a:cs typeface="+mn-cs"/>
-              </a:rPr>
-              <a:t>- Zamiana klas na funkcje z możliwością zarządzania stanem</a:t>
-            </a:r>
+            <a:endParaRPr lang="pl-PL" sz="1200" b="0" i="0" kern="1200" dirty="0">
+              <a:solidFill>
+                <a:schemeClr val="tx1"/>
+              </a:solidFill>
+              <a:effectLst/>
+              <a:latin typeface="+mn-lt"/>
+              <a:ea typeface="+mn-ea"/>
+              <a:cs typeface="+mn-cs"/>
+            </a:endParaRPr>
           </a:p>
         </p:txBody>
       </p:sp>
@@ -6946,6 +7100,105 @@
             <a:fld id="{810A6612-7A23-4B98-B0E9-4F3C882AD2EF}" type="slidenum">
               <a:rPr lang="pl-PL" smtClean="0"/>
               <a:t>34</a:t>
+            </a:fld>
+            <a:endParaRPr lang="pl-PL"/>
+          </a:p>
+        </p:txBody>
+      </p:sp>
+    </p:spTree>
+    <p:extLst>
+      <p:ext uri="{BB962C8B-B14F-4D97-AF65-F5344CB8AC3E}">
+        <p14:creationId xmlns:p14="http://schemas.microsoft.com/office/powerpoint/2010/main" val="2873150729"/>
+      </p:ext>
+    </p:extLst>
+  </p:cSld>
+  <p:clrMapOvr>
+    <a:masterClrMapping/>
+  </p:clrMapOvr>
+</p:notes>
+</file>
+
+<file path=ppt/notesSlides/notesSlide35.xml><?xml version="1.0" encoding="utf-8"?>
+<p:notes xmlns:a="http://schemas.openxmlformats.org/drawingml/2006/main" xmlns:r="http://schemas.openxmlformats.org/officeDocument/2006/relationships" xmlns:p="http://schemas.openxmlformats.org/presentationml/2006/main">
+  <p:cSld>
+    <p:spTree>
+      <p:nvGrpSpPr>
+        <p:cNvPr id="1" name=""/>
+        <p:cNvGrpSpPr/>
+        <p:nvPr/>
+      </p:nvGrpSpPr>
+      <p:grpSpPr>
+        <a:xfrm>
+          <a:off x="0" y="0"/>
+          <a:ext cx="0" cy="0"/>
+          <a:chOff x="0" y="0"/>
+          <a:chExt cx="0" cy="0"/>
+        </a:xfrm>
+      </p:grpSpPr>
+      <p:sp>
+        <p:nvSpPr>
+          <p:cNvPr id="2" name="Symbol zastępczy obrazu slajdu 1"/>
+          <p:cNvSpPr>
+            <a:spLocks noGrp="1" noRot="1" noChangeAspect="1"/>
+          </p:cNvSpPr>
+          <p:nvPr>
+            <p:ph type="sldImg"/>
+          </p:nvPr>
+        </p:nvSpPr>
+        <p:spPr/>
+      </p:sp>
+      <p:sp>
+        <p:nvSpPr>
+          <p:cNvPr id="3" name="Symbol zastępczy notatek 2"/>
+          <p:cNvSpPr>
+            <a:spLocks noGrp="1"/>
+          </p:cNvSpPr>
+          <p:nvPr>
+            <p:ph type="body" idx="1"/>
+          </p:nvPr>
+        </p:nvSpPr>
+        <p:spPr/>
+        <p:txBody>
+          <a:bodyPr/>
+          <a:lstStyle/>
+          <a:p>
+            <a:pPr marL="0" indent="0">
+              <a:buFontTx/>
+              <a:buNone/>
+            </a:pPr>
+            <a:r>
+              <a:rPr lang="pl-PL" sz="1200" b="0" i="0" kern="1200" dirty="0">
+                <a:solidFill>
+                  <a:schemeClr val="tx1"/>
+                </a:solidFill>
+                <a:effectLst/>
+                <a:latin typeface="+mn-lt"/>
+                <a:ea typeface="+mn-ea"/>
+                <a:cs typeface="+mn-cs"/>
+              </a:rPr>
+              <a:t>- Zamiana klas na funkcje z możliwością zarządzania stanem</a:t>
+            </a:r>
+          </a:p>
+        </p:txBody>
+      </p:sp>
+      <p:sp>
+        <p:nvSpPr>
+          <p:cNvPr id="4" name="Symbol zastępczy numeru slajdu 3"/>
+          <p:cNvSpPr>
+            <a:spLocks noGrp="1"/>
+          </p:cNvSpPr>
+          <p:nvPr>
+            <p:ph type="sldNum" sz="quarter" idx="5"/>
+          </p:nvPr>
+        </p:nvSpPr>
+        <p:spPr/>
+        <p:txBody>
+          <a:bodyPr/>
+          <a:lstStyle/>
+          <a:p>
+            <a:fld id="{810A6612-7A23-4B98-B0E9-4F3C882AD2EF}" type="slidenum">
+              <a:rPr lang="pl-PL" smtClean="0"/>
+              <a:t>35</a:t>
             </a:fld>
             <a:endParaRPr lang="pl-PL"/>
           </a:p>
@@ -8113,7 +8366,7 @@
           <a:p>
             <a:fld id="{95CCC2EB-502C-49A7-9CC4-85002E026034}" type="datetimeFigureOut">
               <a:rPr lang="pl-PL" smtClean="0"/>
-              <a:t>07.10.2019</a:t>
+              <a:t>12.10.2019</a:t>
             </a:fld>
             <a:endParaRPr lang="pl-PL"/>
           </a:p>
@@ -8311,7 +8564,7 @@
           <a:p>
             <a:fld id="{95CCC2EB-502C-49A7-9CC4-85002E026034}" type="datetimeFigureOut">
               <a:rPr lang="pl-PL" smtClean="0"/>
-              <a:t>07.10.2019</a:t>
+              <a:t>12.10.2019</a:t>
             </a:fld>
             <a:endParaRPr lang="pl-PL"/>
           </a:p>
@@ -8519,7 +8772,7 @@
           <a:p>
             <a:fld id="{95CCC2EB-502C-49A7-9CC4-85002E026034}" type="datetimeFigureOut">
               <a:rPr lang="pl-PL" smtClean="0"/>
-              <a:t>07.10.2019</a:t>
+              <a:t>12.10.2019</a:t>
             </a:fld>
             <a:endParaRPr lang="pl-PL"/>
           </a:p>
@@ -8717,7 +8970,7 @@
           <a:p>
             <a:fld id="{95CCC2EB-502C-49A7-9CC4-85002E026034}" type="datetimeFigureOut">
               <a:rPr lang="pl-PL" smtClean="0"/>
-              <a:t>07.10.2019</a:t>
+              <a:t>12.10.2019</a:t>
             </a:fld>
             <a:endParaRPr lang="pl-PL"/>
           </a:p>
@@ -8992,7 +9245,7 @@
           <a:p>
             <a:fld id="{95CCC2EB-502C-49A7-9CC4-85002E026034}" type="datetimeFigureOut">
               <a:rPr lang="pl-PL" smtClean="0"/>
-              <a:t>07.10.2019</a:t>
+              <a:t>12.10.2019</a:t>
             </a:fld>
             <a:endParaRPr lang="pl-PL"/>
           </a:p>
@@ -9257,7 +9510,7 @@
           <a:p>
             <a:fld id="{95CCC2EB-502C-49A7-9CC4-85002E026034}" type="datetimeFigureOut">
               <a:rPr lang="pl-PL" smtClean="0"/>
-              <a:t>07.10.2019</a:t>
+              <a:t>12.10.2019</a:t>
             </a:fld>
             <a:endParaRPr lang="pl-PL"/>
           </a:p>
@@ -9669,7 +9922,7 @@
           <a:p>
             <a:fld id="{95CCC2EB-502C-49A7-9CC4-85002E026034}" type="datetimeFigureOut">
               <a:rPr lang="pl-PL" smtClean="0"/>
-              <a:t>07.10.2019</a:t>
+              <a:t>12.10.2019</a:t>
             </a:fld>
             <a:endParaRPr lang="pl-PL"/>
           </a:p>
@@ -9810,7 +10063,7 @@
           <a:p>
             <a:fld id="{95CCC2EB-502C-49A7-9CC4-85002E026034}" type="datetimeFigureOut">
               <a:rPr lang="pl-PL" smtClean="0"/>
-              <a:t>07.10.2019</a:t>
+              <a:t>12.10.2019</a:t>
             </a:fld>
             <a:endParaRPr lang="pl-PL"/>
           </a:p>
@@ -9923,7 +10176,7 @@
           <a:p>
             <a:fld id="{95CCC2EB-502C-49A7-9CC4-85002E026034}" type="datetimeFigureOut">
               <a:rPr lang="pl-PL" smtClean="0"/>
-              <a:t>07.10.2019</a:t>
+              <a:t>12.10.2019</a:t>
             </a:fld>
             <a:endParaRPr lang="pl-PL"/>
           </a:p>
@@ -10234,7 +10487,7 @@
           <a:p>
             <a:fld id="{95CCC2EB-502C-49A7-9CC4-85002E026034}" type="datetimeFigureOut">
               <a:rPr lang="pl-PL" smtClean="0"/>
-              <a:t>07.10.2019</a:t>
+              <a:t>12.10.2019</a:t>
             </a:fld>
             <a:endParaRPr lang="pl-PL"/>
           </a:p>
@@ -10522,7 +10775,7 @@
           <a:p>
             <a:fld id="{95CCC2EB-502C-49A7-9CC4-85002E026034}" type="datetimeFigureOut">
               <a:rPr lang="pl-PL" smtClean="0"/>
-              <a:t>07.10.2019</a:t>
+              <a:t>12.10.2019</a:t>
             </a:fld>
             <a:endParaRPr lang="pl-PL"/>
           </a:p>
@@ -10763,7 +11016,7 @@
           <a:p>
             <a:fld id="{95CCC2EB-502C-49A7-9CC4-85002E026034}" type="datetimeFigureOut">
               <a:rPr lang="pl-PL" smtClean="0"/>
-              <a:t>07.10.2019</a:t>
+              <a:t>12.10.2019</a:t>
             </a:fld>
             <a:endParaRPr lang="pl-PL"/>
           </a:p>
@@ -36125,6 +36378,781 @@
         <p:spPr>
           <a:xfrm>
             <a:off x="497840" y="538480"/>
+            <a:ext cx="576312" cy="369332"/>
+          </a:xfrm>
+          <a:prstGeom prst="rect">
+            <a:avLst/>
+          </a:prstGeom>
+          <a:noFill/>
+        </p:spPr>
+        <p:txBody>
+          <a:bodyPr wrap="none" rtlCol="0">
+            <a:spAutoFit/>
+          </a:bodyPr>
+          <a:lstStyle/>
+          <a:p>
+            <a:r>
+              <a:rPr lang="pl-PL" dirty="0" err="1"/>
+              <a:t>Refs</a:t>
+            </a:r>
+            <a:endParaRPr lang="pl-PL" dirty="0"/>
+          </a:p>
+        </p:txBody>
+      </p:sp>
+      <p:sp>
+        <p:nvSpPr>
+          <p:cNvPr id="2" name="Prostokąt 1">
+            <a:extLst>
+              <a:ext uri="{FF2B5EF4-FFF2-40B4-BE49-F238E27FC236}">
+                <a16:creationId xmlns:a16="http://schemas.microsoft.com/office/drawing/2014/main" id="{34521698-43E0-4E50-B448-C2B909EAFAEB}"/>
+              </a:ext>
+            </a:extLst>
+          </p:cNvPr>
+          <p:cNvSpPr/>
+          <p:nvPr/>
+        </p:nvSpPr>
+        <p:spPr>
+          <a:xfrm>
+            <a:off x="3761010" y="1162827"/>
+            <a:ext cx="4363695" cy="369332"/>
+          </a:xfrm>
+          <a:prstGeom prst="rect">
+            <a:avLst/>
+          </a:prstGeom>
+          <a:solidFill>
+            <a:schemeClr val="tx1"/>
+          </a:solidFill>
+        </p:spPr>
+        <p:txBody>
+          <a:bodyPr wrap="none">
+            <a:spAutoFit/>
+          </a:bodyPr>
+          <a:lstStyle/>
+          <a:p>
+            <a:r>
+              <a:rPr lang="pl-PL" dirty="0" err="1">
+                <a:solidFill>
+                  <a:srgbClr val="569CD6"/>
+                </a:solidFill>
+                <a:latin typeface="Consolas" panose="020B0609020204030204" pitchFamily="49" charset="0"/>
+              </a:rPr>
+              <a:t>this</a:t>
+            </a:r>
+            <a:r>
+              <a:rPr lang="pl-PL" dirty="0" err="1">
+                <a:solidFill>
+                  <a:srgbClr val="D4D4D4"/>
+                </a:solidFill>
+                <a:latin typeface="Consolas" panose="020B0609020204030204" pitchFamily="49" charset="0"/>
+              </a:rPr>
+              <a:t>.</a:t>
+            </a:r>
+            <a:r>
+              <a:rPr lang="pl-PL" dirty="0" err="1">
+                <a:solidFill>
+                  <a:srgbClr val="9CDCFE"/>
+                </a:solidFill>
+                <a:latin typeface="Consolas" panose="020B0609020204030204" pitchFamily="49" charset="0"/>
+              </a:rPr>
+              <a:t>element</a:t>
+            </a:r>
+            <a:r>
+              <a:rPr lang="pl-PL" dirty="0">
+                <a:solidFill>
+                  <a:srgbClr val="D4D4D4"/>
+                </a:solidFill>
+                <a:latin typeface="Consolas" panose="020B0609020204030204" pitchFamily="49" charset="0"/>
+              </a:rPr>
+              <a:t> = </a:t>
+            </a:r>
+            <a:r>
+              <a:rPr lang="pl-PL" dirty="0" err="1">
+                <a:solidFill>
+                  <a:srgbClr val="9CDCFE"/>
+                </a:solidFill>
+                <a:latin typeface="Consolas" panose="020B0609020204030204" pitchFamily="49" charset="0"/>
+              </a:rPr>
+              <a:t>React</a:t>
+            </a:r>
+            <a:r>
+              <a:rPr lang="pl-PL" dirty="0" err="1">
+                <a:solidFill>
+                  <a:srgbClr val="D4D4D4"/>
+                </a:solidFill>
+                <a:latin typeface="Consolas" panose="020B0609020204030204" pitchFamily="49" charset="0"/>
+              </a:rPr>
+              <a:t>.</a:t>
+            </a:r>
+            <a:r>
+              <a:rPr lang="pl-PL" dirty="0" err="1">
+                <a:solidFill>
+                  <a:srgbClr val="DCDCAA"/>
+                </a:solidFill>
+                <a:latin typeface="Consolas" panose="020B0609020204030204" pitchFamily="49" charset="0"/>
+              </a:rPr>
+              <a:t>createRef</a:t>
+            </a:r>
+            <a:r>
+              <a:rPr lang="pl-PL" dirty="0">
+                <a:solidFill>
+                  <a:srgbClr val="D4D4D4"/>
+                </a:solidFill>
+                <a:latin typeface="Consolas" panose="020B0609020204030204" pitchFamily="49" charset="0"/>
+              </a:rPr>
+              <a:t>();</a:t>
+            </a:r>
+            <a:endParaRPr lang="pl-PL" b="0" dirty="0">
+              <a:solidFill>
+                <a:srgbClr val="D4D4D4"/>
+              </a:solidFill>
+              <a:effectLst/>
+              <a:latin typeface="Consolas" panose="020B0609020204030204" pitchFamily="49" charset="0"/>
+            </a:endParaRPr>
+          </a:p>
+        </p:txBody>
+      </p:sp>
+      <p:sp>
+        <p:nvSpPr>
+          <p:cNvPr id="3" name="Prostokąt 2">
+            <a:extLst>
+              <a:ext uri="{FF2B5EF4-FFF2-40B4-BE49-F238E27FC236}">
+                <a16:creationId xmlns:a16="http://schemas.microsoft.com/office/drawing/2014/main" id="{696B1A45-E172-4B28-B293-061E8342D21E}"/>
+              </a:ext>
+            </a:extLst>
+          </p:cNvPr>
+          <p:cNvSpPr/>
+          <p:nvPr/>
+        </p:nvSpPr>
+        <p:spPr>
+          <a:xfrm>
+            <a:off x="3761010" y="2026625"/>
+            <a:ext cx="3983783" cy="369332"/>
+          </a:xfrm>
+          <a:prstGeom prst="rect">
+            <a:avLst/>
+          </a:prstGeom>
+          <a:solidFill>
+            <a:schemeClr val="tx1"/>
+          </a:solidFill>
+        </p:spPr>
+        <p:txBody>
+          <a:bodyPr wrap="none">
+            <a:spAutoFit/>
+          </a:bodyPr>
+          <a:lstStyle/>
+          <a:p>
+            <a:r>
+              <a:rPr lang="pl-PL" dirty="0">
+                <a:solidFill>
+                  <a:srgbClr val="808080"/>
+                </a:solidFill>
+                <a:latin typeface="Consolas" panose="020B0609020204030204" pitchFamily="49" charset="0"/>
+              </a:rPr>
+              <a:t>&lt;</a:t>
+            </a:r>
+            <a:r>
+              <a:rPr lang="pl-PL" dirty="0">
+                <a:solidFill>
+                  <a:srgbClr val="569CD6"/>
+                </a:solidFill>
+                <a:latin typeface="Consolas" panose="020B0609020204030204" pitchFamily="49" charset="0"/>
+              </a:rPr>
+              <a:t>div</a:t>
+            </a:r>
+            <a:r>
+              <a:rPr lang="pl-PL" dirty="0">
+                <a:solidFill>
+                  <a:srgbClr val="D4D4D4"/>
+                </a:solidFill>
+                <a:latin typeface="Consolas" panose="020B0609020204030204" pitchFamily="49" charset="0"/>
+              </a:rPr>
+              <a:t> </a:t>
+            </a:r>
+            <a:r>
+              <a:rPr lang="pl-PL" dirty="0">
+                <a:solidFill>
+                  <a:srgbClr val="9CDCFE"/>
+                </a:solidFill>
+                <a:latin typeface="Consolas" panose="020B0609020204030204" pitchFamily="49" charset="0"/>
+              </a:rPr>
+              <a:t>ref</a:t>
+            </a:r>
+            <a:r>
+              <a:rPr lang="pl-PL" dirty="0">
+                <a:solidFill>
+                  <a:srgbClr val="D4D4D4"/>
+                </a:solidFill>
+                <a:latin typeface="Consolas" panose="020B0609020204030204" pitchFamily="49" charset="0"/>
+              </a:rPr>
+              <a:t>=</a:t>
+            </a:r>
+            <a:r>
+              <a:rPr lang="pl-PL" dirty="0">
+                <a:solidFill>
+                  <a:srgbClr val="569CD6"/>
+                </a:solidFill>
+                <a:latin typeface="Consolas" panose="020B0609020204030204" pitchFamily="49" charset="0"/>
+              </a:rPr>
+              <a:t>{</a:t>
+            </a:r>
+            <a:r>
+              <a:rPr lang="pl-PL" dirty="0" err="1">
+                <a:solidFill>
+                  <a:srgbClr val="569CD6"/>
+                </a:solidFill>
+                <a:latin typeface="Consolas" panose="020B0609020204030204" pitchFamily="49" charset="0"/>
+              </a:rPr>
+              <a:t>this</a:t>
+            </a:r>
+            <a:r>
+              <a:rPr lang="pl-PL" dirty="0" err="1">
+                <a:solidFill>
+                  <a:srgbClr val="D4D4D4"/>
+                </a:solidFill>
+                <a:latin typeface="Consolas" panose="020B0609020204030204" pitchFamily="49" charset="0"/>
+              </a:rPr>
+              <a:t>.</a:t>
+            </a:r>
+            <a:r>
+              <a:rPr lang="pl-PL" dirty="0" err="1">
+                <a:solidFill>
+                  <a:srgbClr val="9CDCFE"/>
+                </a:solidFill>
+                <a:latin typeface="Consolas" panose="020B0609020204030204" pitchFamily="49" charset="0"/>
+              </a:rPr>
+              <a:t>element</a:t>
+            </a:r>
+            <a:r>
+              <a:rPr lang="pl-PL" dirty="0">
+                <a:solidFill>
+                  <a:srgbClr val="569CD6"/>
+                </a:solidFill>
+                <a:latin typeface="Consolas" panose="020B0609020204030204" pitchFamily="49" charset="0"/>
+              </a:rPr>
+              <a:t>}</a:t>
+            </a:r>
+            <a:r>
+              <a:rPr lang="pl-PL" dirty="0">
+                <a:solidFill>
+                  <a:srgbClr val="808080"/>
+                </a:solidFill>
+                <a:latin typeface="Consolas" panose="020B0609020204030204" pitchFamily="49" charset="0"/>
+              </a:rPr>
+              <a:t>&gt;&lt;/</a:t>
+            </a:r>
+            <a:r>
+              <a:rPr lang="pl-PL" dirty="0">
+                <a:solidFill>
+                  <a:srgbClr val="569CD6"/>
+                </a:solidFill>
+                <a:latin typeface="Consolas" panose="020B0609020204030204" pitchFamily="49" charset="0"/>
+              </a:rPr>
+              <a:t>div</a:t>
+            </a:r>
+            <a:r>
+              <a:rPr lang="pl-PL" dirty="0">
+                <a:solidFill>
+                  <a:srgbClr val="808080"/>
+                </a:solidFill>
+                <a:latin typeface="Consolas" panose="020B0609020204030204" pitchFamily="49" charset="0"/>
+              </a:rPr>
+              <a:t>&gt;</a:t>
+            </a:r>
+            <a:endParaRPr lang="pl-PL" b="0" dirty="0">
+              <a:solidFill>
+                <a:srgbClr val="D4D4D4"/>
+              </a:solidFill>
+              <a:effectLst/>
+              <a:latin typeface="Consolas" panose="020B0609020204030204" pitchFamily="49" charset="0"/>
+            </a:endParaRPr>
+          </a:p>
+        </p:txBody>
+      </p:sp>
+      <p:sp>
+        <p:nvSpPr>
+          <p:cNvPr id="8" name="pole tekstowe 7">
+            <a:extLst>
+              <a:ext uri="{FF2B5EF4-FFF2-40B4-BE49-F238E27FC236}">
+                <a16:creationId xmlns:a16="http://schemas.microsoft.com/office/drawing/2014/main" id="{D74BAB07-5CE5-44BF-A35C-58E7940201EC}"/>
+              </a:ext>
+            </a:extLst>
+          </p:cNvPr>
+          <p:cNvSpPr txBox="1"/>
+          <p:nvPr/>
+        </p:nvSpPr>
+        <p:spPr>
+          <a:xfrm>
+            <a:off x="3761010" y="3966820"/>
+            <a:ext cx="3275833" cy="523220"/>
+          </a:xfrm>
+          <a:prstGeom prst="rect">
+            <a:avLst/>
+          </a:prstGeom>
+          <a:noFill/>
+        </p:spPr>
+        <p:txBody>
+          <a:bodyPr wrap="none" rtlCol="0">
+            <a:spAutoFit/>
+          </a:bodyPr>
+          <a:lstStyle/>
+          <a:p>
+            <a:r>
+              <a:rPr lang="pl-PL" sz="2800" dirty="0" err="1"/>
+              <a:t>Custom</a:t>
+            </a:r>
+            <a:r>
+              <a:rPr lang="pl-PL" sz="2800" dirty="0"/>
+              <a:t> </a:t>
+            </a:r>
+            <a:r>
+              <a:rPr lang="pl-PL" sz="2800" dirty="0" err="1"/>
+              <a:t>components</a:t>
+            </a:r>
+            <a:endParaRPr lang="pl-PL" sz="2800" dirty="0"/>
+          </a:p>
+        </p:txBody>
+      </p:sp>
+      <p:sp>
+        <p:nvSpPr>
+          <p:cNvPr id="10" name="pole tekstowe 9">
+            <a:extLst>
+              <a:ext uri="{FF2B5EF4-FFF2-40B4-BE49-F238E27FC236}">
+                <a16:creationId xmlns:a16="http://schemas.microsoft.com/office/drawing/2014/main" id="{E83D696A-E993-4AC7-9F47-466B36BAC6D1}"/>
+              </a:ext>
+            </a:extLst>
+          </p:cNvPr>
+          <p:cNvSpPr txBox="1"/>
+          <p:nvPr/>
+        </p:nvSpPr>
+        <p:spPr>
+          <a:xfrm>
+            <a:off x="1355740" y="5004789"/>
+            <a:ext cx="2710870" cy="523220"/>
+          </a:xfrm>
+          <a:prstGeom prst="rect">
+            <a:avLst/>
+          </a:prstGeom>
+          <a:noFill/>
+        </p:spPr>
+        <p:txBody>
+          <a:bodyPr wrap="none" rtlCol="0">
+            <a:spAutoFit/>
+          </a:bodyPr>
+          <a:lstStyle/>
+          <a:p>
+            <a:r>
+              <a:rPr lang="pl-PL" sz="2800" dirty="0"/>
+              <a:t>Class Component</a:t>
+            </a:r>
+          </a:p>
+        </p:txBody>
+      </p:sp>
+      <p:sp>
+        <p:nvSpPr>
+          <p:cNvPr id="11" name="pole tekstowe 10">
+            <a:extLst>
+              <a:ext uri="{FF2B5EF4-FFF2-40B4-BE49-F238E27FC236}">
+                <a16:creationId xmlns:a16="http://schemas.microsoft.com/office/drawing/2014/main" id="{71734450-3C1A-4747-85C0-5C86B5659369}"/>
+              </a:ext>
+            </a:extLst>
+          </p:cNvPr>
+          <p:cNvSpPr txBox="1"/>
+          <p:nvPr/>
+        </p:nvSpPr>
+        <p:spPr>
+          <a:xfrm>
+            <a:off x="6747166" y="4983571"/>
+            <a:ext cx="3260701" cy="523220"/>
+          </a:xfrm>
+          <a:prstGeom prst="rect">
+            <a:avLst/>
+          </a:prstGeom>
+          <a:noFill/>
+        </p:spPr>
+        <p:txBody>
+          <a:bodyPr wrap="none" rtlCol="0">
+            <a:spAutoFit/>
+          </a:bodyPr>
+          <a:lstStyle/>
+          <a:p>
+            <a:r>
+              <a:rPr lang="pl-PL" sz="2800" dirty="0" err="1"/>
+              <a:t>Function</a:t>
+            </a:r>
+            <a:r>
+              <a:rPr lang="pl-PL" sz="2800" dirty="0"/>
+              <a:t> Component</a:t>
+            </a:r>
+          </a:p>
+        </p:txBody>
+      </p:sp>
+      <p:pic>
+        <p:nvPicPr>
+          <p:cNvPr id="12" name="Grafika 11" descr="Znacznik wyboru">
+            <a:extLst>
+              <a:ext uri="{FF2B5EF4-FFF2-40B4-BE49-F238E27FC236}">
+                <a16:creationId xmlns:a16="http://schemas.microsoft.com/office/drawing/2014/main" id="{077DDB89-5A15-41E9-9F7C-0C63E784DBA3}"/>
+              </a:ext>
+            </a:extLst>
+          </p:cNvPr>
+          <p:cNvPicPr>
+            <a:picLocks noChangeAspect="1"/>
+          </p:cNvPicPr>
+          <p:nvPr/>
+        </p:nvPicPr>
+        <p:blipFill>
+          <a:blip r:embed="rId3">
+            <a:extLst>
+              <a:ext uri="{28A0092B-C50C-407E-A947-70E740481C1C}">
+                <a14:useLocalDpi xmlns:a14="http://schemas.microsoft.com/office/drawing/2010/main" val="0"/>
+              </a:ext>
+              <a:ext uri="{96DAC541-7B7A-43D3-8B79-37D633B846F1}">
+                <asvg:svgBlip xmlns:asvg="http://schemas.microsoft.com/office/drawing/2016/SVG/main" r:embed="rId4"/>
+              </a:ext>
+            </a:extLst>
+          </a:blip>
+          <a:stretch>
+            <a:fillRect/>
+          </a:stretch>
+        </p:blipFill>
+        <p:spPr>
+          <a:xfrm>
+            <a:off x="2020956" y="5585558"/>
+            <a:ext cx="914400" cy="914400"/>
+          </a:xfrm>
+          <a:prstGeom prst="rect">
+            <a:avLst/>
+          </a:prstGeom>
+        </p:spPr>
+      </p:pic>
+      <p:pic>
+        <p:nvPicPr>
+          <p:cNvPr id="14" name="Grafika 13" descr="Zamykać">
+            <a:extLst>
+              <a:ext uri="{FF2B5EF4-FFF2-40B4-BE49-F238E27FC236}">
+                <a16:creationId xmlns:a16="http://schemas.microsoft.com/office/drawing/2014/main" id="{15DD43EB-C2FF-4049-A8FB-63B49D94BA31}"/>
+              </a:ext>
+            </a:extLst>
+          </p:cNvPr>
+          <p:cNvPicPr>
+            <a:picLocks noChangeAspect="1"/>
+          </p:cNvPicPr>
+          <p:nvPr/>
+        </p:nvPicPr>
+        <p:blipFill>
+          <a:blip r:embed="rId5">
+            <a:extLst>
+              <a:ext uri="{28A0092B-C50C-407E-A947-70E740481C1C}">
+                <a14:useLocalDpi xmlns:a14="http://schemas.microsoft.com/office/drawing/2010/main" val="0"/>
+              </a:ext>
+              <a:ext uri="{96DAC541-7B7A-43D3-8B79-37D633B846F1}">
+                <asvg:svgBlip xmlns:asvg="http://schemas.microsoft.com/office/drawing/2016/SVG/main" r:embed="rId6"/>
+              </a:ext>
+            </a:extLst>
+          </a:blip>
+          <a:stretch>
+            <a:fillRect/>
+          </a:stretch>
+        </p:blipFill>
+        <p:spPr>
+          <a:xfrm>
+            <a:off x="8124705" y="5585558"/>
+            <a:ext cx="914400" cy="914400"/>
+          </a:xfrm>
+          <a:prstGeom prst="rect">
+            <a:avLst/>
+          </a:prstGeom>
+        </p:spPr>
+      </p:pic>
+      <p:sp>
+        <p:nvSpPr>
+          <p:cNvPr id="15" name="Prostokąt 14">
+            <a:extLst>
+              <a:ext uri="{FF2B5EF4-FFF2-40B4-BE49-F238E27FC236}">
+                <a16:creationId xmlns:a16="http://schemas.microsoft.com/office/drawing/2014/main" id="{59908596-1031-4FCD-951D-C6D5A6DBD4C7}"/>
+              </a:ext>
+            </a:extLst>
+          </p:cNvPr>
+          <p:cNvSpPr/>
+          <p:nvPr/>
+        </p:nvSpPr>
+        <p:spPr>
+          <a:xfrm>
+            <a:off x="3761010" y="2899142"/>
+            <a:ext cx="3857146" cy="369332"/>
+          </a:xfrm>
+          <a:prstGeom prst="rect">
+            <a:avLst/>
+          </a:prstGeom>
+          <a:solidFill>
+            <a:schemeClr val="tx1"/>
+          </a:solidFill>
+        </p:spPr>
+        <p:txBody>
+          <a:bodyPr wrap="none">
+            <a:spAutoFit/>
+          </a:bodyPr>
+          <a:lstStyle/>
+          <a:p>
+            <a:r>
+              <a:rPr lang="pl-PL" dirty="0" err="1">
+                <a:solidFill>
+                  <a:srgbClr val="569CD6"/>
+                </a:solidFill>
+                <a:latin typeface="Consolas" panose="020B0609020204030204" pitchFamily="49" charset="0"/>
+              </a:rPr>
+              <a:t>this</a:t>
+            </a:r>
+            <a:r>
+              <a:rPr lang="pl-PL" dirty="0" err="1">
+                <a:solidFill>
+                  <a:srgbClr val="D4D4D4"/>
+                </a:solidFill>
+                <a:latin typeface="Consolas" panose="020B0609020204030204" pitchFamily="49" charset="0"/>
+              </a:rPr>
+              <a:t>.</a:t>
+            </a:r>
+            <a:r>
+              <a:rPr lang="pl-PL" dirty="0" err="1">
+                <a:solidFill>
+                  <a:srgbClr val="9CDCFE"/>
+                </a:solidFill>
+                <a:latin typeface="Consolas" panose="020B0609020204030204" pitchFamily="49" charset="0"/>
+              </a:rPr>
+              <a:t>element</a:t>
+            </a:r>
+            <a:r>
+              <a:rPr lang="pl-PL" dirty="0" err="1">
+                <a:solidFill>
+                  <a:srgbClr val="D4D4D4"/>
+                </a:solidFill>
+                <a:latin typeface="Consolas" panose="020B0609020204030204" pitchFamily="49" charset="0"/>
+              </a:rPr>
+              <a:t>.</a:t>
+            </a:r>
+            <a:r>
+              <a:rPr lang="pl-PL" dirty="0" err="1">
+                <a:solidFill>
+                  <a:srgbClr val="9CDCFE"/>
+                </a:solidFill>
+                <a:latin typeface="Consolas" panose="020B0609020204030204" pitchFamily="49" charset="0"/>
+              </a:rPr>
+              <a:t>current</a:t>
+            </a:r>
+            <a:r>
+              <a:rPr lang="pl-PL" dirty="0" err="1">
+                <a:solidFill>
+                  <a:srgbClr val="D4D4D4"/>
+                </a:solidFill>
+                <a:latin typeface="Consolas" panose="020B0609020204030204" pitchFamily="49" charset="0"/>
+              </a:rPr>
+              <a:t>.</a:t>
+            </a:r>
+            <a:r>
+              <a:rPr lang="pl-PL" dirty="0" err="1">
+                <a:solidFill>
+                  <a:srgbClr val="DCDCAA"/>
+                </a:solidFill>
+                <a:latin typeface="Consolas" panose="020B0609020204030204" pitchFamily="49" charset="0"/>
+              </a:rPr>
+              <a:t>focus</a:t>
+            </a:r>
+            <a:r>
+              <a:rPr lang="pl-PL" dirty="0">
+                <a:solidFill>
+                  <a:srgbClr val="D4D4D4"/>
+                </a:solidFill>
+                <a:latin typeface="Consolas" panose="020B0609020204030204" pitchFamily="49" charset="0"/>
+              </a:rPr>
+              <a:t>();</a:t>
+            </a:r>
+            <a:endParaRPr lang="pl-PL" b="0" dirty="0">
+              <a:solidFill>
+                <a:srgbClr val="D4D4D4"/>
+              </a:solidFill>
+              <a:effectLst/>
+              <a:latin typeface="Consolas" panose="020B0609020204030204" pitchFamily="49" charset="0"/>
+            </a:endParaRPr>
+          </a:p>
+        </p:txBody>
+      </p:sp>
+      <p:sp>
+        <p:nvSpPr>
+          <p:cNvPr id="16" name="pole tekstowe 15">
+            <a:extLst>
+              <a:ext uri="{FF2B5EF4-FFF2-40B4-BE49-F238E27FC236}">
+                <a16:creationId xmlns:a16="http://schemas.microsoft.com/office/drawing/2014/main" id="{8895093A-2AEA-4E0B-B990-B63B341E99EA}"/>
+              </a:ext>
+            </a:extLst>
+          </p:cNvPr>
+          <p:cNvSpPr txBox="1"/>
+          <p:nvPr/>
+        </p:nvSpPr>
+        <p:spPr>
+          <a:xfrm>
+            <a:off x="3683859" y="824273"/>
+            <a:ext cx="1662058" cy="338554"/>
+          </a:xfrm>
+          <a:prstGeom prst="rect">
+            <a:avLst/>
+          </a:prstGeom>
+          <a:noFill/>
+        </p:spPr>
+        <p:txBody>
+          <a:bodyPr wrap="none" rtlCol="0">
+            <a:spAutoFit/>
+          </a:bodyPr>
+          <a:lstStyle/>
+          <a:p>
+            <a:r>
+              <a:rPr lang="pl-PL" sz="1600" dirty="0" err="1"/>
+              <a:t>Declare</a:t>
+            </a:r>
+            <a:r>
+              <a:rPr lang="pl-PL" sz="1600" dirty="0"/>
+              <a:t> </a:t>
+            </a:r>
+            <a:r>
+              <a:rPr lang="pl-PL" sz="1600" dirty="0" err="1"/>
+              <a:t>reference</a:t>
+            </a:r>
+            <a:endParaRPr lang="pl-PL" sz="1600" dirty="0"/>
+          </a:p>
+        </p:txBody>
+      </p:sp>
+      <p:sp>
+        <p:nvSpPr>
+          <p:cNvPr id="17" name="pole tekstowe 16">
+            <a:extLst>
+              <a:ext uri="{FF2B5EF4-FFF2-40B4-BE49-F238E27FC236}">
+                <a16:creationId xmlns:a16="http://schemas.microsoft.com/office/drawing/2014/main" id="{72ECD05E-EB9D-497D-B648-AD39F170F778}"/>
+              </a:ext>
+            </a:extLst>
+          </p:cNvPr>
+          <p:cNvSpPr txBox="1"/>
+          <p:nvPr/>
+        </p:nvSpPr>
+        <p:spPr>
+          <a:xfrm>
+            <a:off x="3736868" y="1677576"/>
+            <a:ext cx="1558953" cy="338554"/>
+          </a:xfrm>
+          <a:prstGeom prst="rect">
+            <a:avLst/>
+          </a:prstGeom>
+          <a:noFill/>
+        </p:spPr>
+        <p:txBody>
+          <a:bodyPr wrap="none" rtlCol="0">
+            <a:spAutoFit/>
+          </a:bodyPr>
+          <a:lstStyle/>
+          <a:p>
+            <a:r>
+              <a:rPr lang="pl-PL" sz="1600" dirty="0" err="1"/>
+              <a:t>Assign</a:t>
+            </a:r>
+            <a:r>
+              <a:rPr lang="pl-PL" sz="1600" dirty="0"/>
+              <a:t> </a:t>
+            </a:r>
+            <a:r>
+              <a:rPr lang="pl-PL" sz="1600" dirty="0" err="1"/>
+              <a:t>reference</a:t>
+            </a:r>
+            <a:endParaRPr lang="pl-PL" sz="1600" dirty="0"/>
+          </a:p>
+        </p:txBody>
+      </p:sp>
+      <p:sp>
+        <p:nvSpPr>
+          <p:cNvPr id="18" name="pole tekstowe 17">
+            <a:extLst>
+              <a:ext uri="{FF2B5EF4-FFF2-40B4-BE49-F238E27FC236}">
+                <a16:creationId xmlns:a16="http://schemas.microsoft.com/office/drawing/2014/main" id="{F7B9826B-1D2E-4E2E-8EB5-B89788543B71}"/>
+              </a:ext>
+            </a:extLst>
+          </p:cNvPr>
+          <p:cNvSpPr txBox="1"/>
+          <p:nvPr/>
+        </p:nvSpPr>
+        <p:spPr>
+          <a:xfrm>
+            <a:off x="3735411" y="2572152"/>
+            <a:ext cx="1390637" cy="338554"/>
+          </a:xfrm>
+          <a:prstGeom prst="rect">
+            <a:avLst/>
+          </a:prstGeom>
+          <a:noFill/>
+        </p:spPr>
+        <p:txBody>
+          <a:bodyPr wrap="none" rtlCol="0">
+            <a:spAutoFit/>
+          </a:bodyPr>
+          <a:lstStyle/>
+          <a:p>
+            <a:r>
+              <a:rPr lang="pl-PL" sz="1600" dirty="0" err="1"/>
+              <a:t>Use</a:t>
+            </a:r>
+            <a:r>
+              <a:rPr lang="pl-PL" sz="1600" dirty="0"/>
+              <a:t> </a:t>
+            </a:r>
+            <a:r>
+              <a:rPr lang="pl-PL" sz="1600" dirty="0" err="1"/>
+              <a:t>reference</a:t>
+            </a:r>
+            <a:endParaRPr lang="pl-PL" sz="1600" dirty="0"/>
+          </a:p>
+        </p:txBody>
+      </p:sp>
+    </p:spTree>
+    <p:extLst>
+      <p:ext uri="{BB962C8B-B14F-4D97-AF65-F5344CB8AC3E}">
+        <p14:creationId xmlns:p14="http://schemas.microsoft.com/office/powerpoint/2010/main" val="1524776513"/>
+      </p:ext>
+    </p:extLst>
+  </p:cSld>
+  <p:clrMapOvr>
+    <a:masterClrMapping/>
+  </p:clrMapOvr>
+</p:sld>
+</file>
+
+<file path=ppt/slides/slide33.xml><?xml version="1.0" encoding="utf-8"?>
+<p:sld xmlns:a="http://schemas.openxmlformats.org/drawingml/2006/main" xmlns:r="http://schemas.openxmlformats.org/officeDocument/2006/relationships" xmlns:p="http://schemas.openxmlformats.org/presentationml/2006/main">
+  <p:cSld>
+    <p:spTree>
+      <p:nvGrpSpPr>
+        <p:cNvPr id="1" name=""/>
+        <p:cNvGrpSpPr/>
+        <p:nvPr/>
+      </p:nvGrpSpPr>
+      <p:grpSpPr>
+        <a:xfrm>
+          <a:off x="0" y="0"/>
+          <a:ext cx="0" cy="0"/>
+          <a:chOff x="0" y="0"/>
+          <a:chExt cx="0" cy="0"/>
+        </a:xfrm>
+      </p:grpSpPr>
+      <p:sp>
+        <p:nvSpPr>
+          <p:cNvPr id="4" name="pole tekstowe 3">
+            <a:extLst>
+              <a:ext uri="{FF2B5EF4-FFF2-40B4-BE49-F238E27FC236}">
+                <a16:creationId xmlns:a16="http://schemas.microsoft.com/office/drawing/2014/main" id="{F164A7B3-8808-414C-9401-3B25194E3B5A}"/>
+              </a:ext>
+            </a:extLst>
+          </p:cNvPr>
+          <p:cNvSpPr txBox="1"/>
+          <p:nvPr/>
+        </p:nvSpPr>
+        <p:spPr>
+          <a:xfrm>
+            <a:off x="497840" y="538480"/>
             <a:ext cx="2103204" cy="369332"/>
           </a:xfrm>
           <a:prstGeom prst="rect">
@@ -36321,7 +37349,7 @@
 </p:sld>
 </file>
 
-<file path=ppt/slides/slide33.xml><?xml version="1.0" encoding="utf-8"?>
+<file path=ppt/slides/slide34.xml><?xml version="1.0" encoding="utf-8"?>
 <p:sld xmlns:a="http://schemas.openxmlformats.org/drawingml/2006/main" xmlns:r="http://schemas.openxmlformats.org/officeDocument/2006/relationships" xmlns:p="http://schemas.openxmlformats.org/presentationml/2006/main">
   <p:cSld>
     <p:spTree>
@@ -36390,7 +37418,7 @@
 </p:sld>
 </file>
 
-<file path=ppt/slides/slide34.xml><?xml version="1.0" encoding="utf-8"?>
+<file path=ppt/slides/slide35.xml><?xml version="1.0" encoding="utf-8"?>
 <p:sld xmlns:a="http://schemas.openxmlformats.org/drawingml/2006/main" xmlns:r="http://schemas.openxmlformats.org/officeDocument/2006/relationships" xmlns:p="http://schemas.openxmlformats.org/presentationml/2006/main">
   <p:cSld>
     <p:spTree>

</xml_diff>

<commit_message>
Exercise 24: Use hooks in whole app
</commit_message>
<xml_diff>
--- a/tutorial/ReactjsTraining.pptx
+++ b/tutorial/ReactjsTraining.pptx
@@ -7646,7 +7646,7 @@
               <a:buNone/>
             </a:pPr>
             <a:r>
-              <a:rPr lang="pl-PL" sz="1200" b="0" i="0" kern="1200" dirty="0">
+              <a:rPr lang="pl-PL" sz="1200" b="0" i="0" kern="1200" dirty="0" err="1">
                 <a:solidFill>
                   <a:schemeClr val="tx1"/>
                 </a:solidFill>
@@ -7655,8 +7655,137 @@
                 <a:ea typeface="+mn-ea"/>
                 <a:cs typeface="+mn-cs"/>
               </a:rPr>
-              <a:t>- Zamiana klas na funkcje z możliwością zarządzania stanem</a:t>
-            </a:r>
+              <a:t>Exercise</a:t>
+            </a:r>
+            <a:r>
+              <a:rPr lang="pl-PL" sz="1200" b="0" i="0" kern="1200" dirty="0">
+                <a:solidFill>
+                  <a:schemeClr val="tx1"/>
+                </a:solidFill>
+                <a:effectLst/>
+                <a:latin typeface="+mn-lt"/>
+                <a:ea typeface="+mn-ea"/>
+                <a:cs typeface="+mn-cs"/>
+              </a:rPr>
+              <a:t> 24: </a:t>
+            </a:r>
+            <a:r>
+              <a:rPr lang="pl-PL" sz="1200" b="0" i="0" kern="1200" dirty="0" err="1">
+                <a:solidFill>
+                  <a:schemeClr val="tx1"/>
+                </a:solidFill>
+                <a:effectLst/>
+                <a:latin typeface="+mn-lt"/>
+                <a:ea typeface="+mn-ea"/>
+                <a:cs typeface="+mn-cs"/>
+              </a:rPr>
+              <a:t>Change</a:t>
+            </a:r>
+            <a:r>
+              <a:rPr lang="pl-PL" sz="1200" b="0" i="0" kern="1200" dirty="0">
+                <a:solidFill>
+                  <a:schemeClr val="tx1"/>
+                </a:solidFill>
+                <a:effectLst/>
+                <a:latin typeface="+mn-lt"/>
+                <a:ea typeface="+mn-ea"/>
+                <a:cs typeface="+mn-cs"/>
+              </a:rPr>
+              <a:t> </a:t>
+            </a:r>
+            <a:r>
+              <a:rPr lang="pl-PL" sz="1200" b="0" i="0" kern="1200" dirty="0" err="1">
+                <a:solidFill>
+                  <a:schemeClr val="tx1"/>
+                </a:solidFill>
+                <a:effectLst/>
+                <a:latin typeface="+mn-lt"/>
+                <a:ea typeface="+mn-ea"/>
+                <a:cs typeface="+mn-cs"/>
+              </a:rPr>
+              <a:t>whole</a:t>
+            </a:r>
+            <a:r>
+              <a:rPr lang="pl-PL" sz="1200" b="0" i="0" kern="1200" dirty="0">
+                <a:solidFill>
+                  <a:schemeClr val="tx1"/>
+                </a:solidFill>
+                <a:effectLst/>
+                <a:latin typeface="+mn-lt"/>
+                <a:ea typeface="+mn-ea"/>
+                <a:cs typeface="+mn-cs"/>
+              </a:rPr>
+              <a:t> </a:t>
+            </a:r>
+            <a:r>
+              <a:rPr lang="pl-PL" sz="1200" b="0" i="0" kern="1200" dirty="0" err="1">
+                <a:solidFill>
+                  <a:schemeClr val="tx1"/>
+                </a:solidFill>
+                <a:effectLst/>
+                <a:latin typeface="+mn-lt"/>
+                <a:ea typeface="+mn-ea"/>
+                <a:cs typeface="+mn-cs"/>
+              </a:rPr>
+              <a:t>app</a:t>
+            </a:r>
+            <a:r>
+              <a:rPr lang="pl-PL" sz="1200" b="0" i="0" kern="1200" dirty="0">
+                <a:solidFill>
+                  <a:schemeClr val="tx1"/>
+                </a:solidFill>
+                <a:effectLst/>
+                <a:latin typeface="+mn-lt"/>
+                <a:ea typeface="+mn-ea"/>
+                <a:cs typeface="+mn-cs"/>
+              </a:rPr>
+              <a:t> to </a:t>
+            </a:r>
+            <a:r>
+              <a:rPr lang="pl-PL" sz="1200" b="0" i="0" kern="1200" dirty="0" err="1">
+                <a:solidFill>
+                  <a:schemeClr val="tx1"/>
+                </a:solidFill>
+                <a:effectLst/>
+                <a:latin typeface="+mn-lt"/>
+                <a:ea typeface="+mn-ea"/>
+                <a:cs typeface="+mn-cs"/>
+              </a:rPr>
+              <a:t>use</a:t>
+            </a:r>
+            <a:r>
+              <a:rPr lang="pl-PL" sz="1200" b="0" i="0" kern="1200" dirty="0">
+                <a:solidFill>
+                  <a:schemeClr val="tx1"/>
+                </a:solidFill>
+                <a:effectLst/>
+                <a:latin typeface="+mn-lt"/>
+                <a:ea typeface="+mn-ea"/>
+                <a:cs typeface="+mn-cs"/>
+              </a:rPr>
+              <a:t> </a:t>
+            </a:r>
+            <a:r>
+              <a:rPr lang="pl-PL" sz="1200" b="0" i="0" kern="1200" dirty="0" err="1">
+                <a:solidFill>
+                  <a:schemeClr val="tx1"/>
+                </a:solidFill>
+                <a:effectLst/>
+                <a:latin typeface="+mn-lt"/>
+                <a:ea typeface="+mn-ea"/>
+                <a:cs typeface="+mn-cs"/>
+              </a:rPr>
+              <a:t>hooks</a:t>
+            </a:r>
+            <a:endParaRPr lang="pl-PL" sz="1200" b="0" i="0" kern="1200" dirty="0">
+              <a:solidFill>
+                <a:schemeClr val="tx1"/>
+              </a:solidFill>
+              <a:effectLst/>
+              <a:latin typeface="+mn-lt"/>
+              <a:ea typeface="+mn-ea"/>
+              <a:cs typeface="+mn-cs"/>
+            </a:endParaRPr>
           </a:p>
         </p:txBody>
       </p:sp>
@@ -41099,7 +41228,7 @@
         <p:spPr>
           <a:xfrm>
             <a:off x="497840" y="538480"/>
-            <a:ext cx="2103525" cy="369332"/>
+            <a:ext cx="2195922" cy="369332"/>
           </a:xfrm>
           <a:prstGeom prst="rect">
             <a:avLst/>
@@ -41118,13 +41247,590 @@
             </a:r>
             <a:r>
               <a:rPr lang="pl-PL" dirty="0"/>
-              <a:t> - </a:t>
+              <a:t> – </a:t>
             </a:r>
             <a:r>
               <a:rPr lang="pl-PL" dirty="0" err="1"/>
-              <a:t>introduction</a:t>
+              <a:t>custom</a:t>
+            </a:r>
+            <a:r>
+              <a:rPr lang="pl-PL" dirty="0"/>
+              <a:t> </a:t>
+            </a:r>
+            <a:r>
+              <a:rPr lang="pl-PL" dirty="0" err="1"/>
+              <a:t>hook</a:t>
             </a:r>
             <a:endParaRPr lang="pl-PL" dirty="0"/>
+          </a:p>
+        </p:txBody>
+      </p:sp>
+      <p:sp>
+        <p:nvSpPr>
+          <p:cNvPr id="2" name="Prostokąt 1">
+            <a:extLst>
+              <a:ext uri="{FF2B5EF4-FFF2-40B4-BE49-F238E27FC236}">
+                <a16:creationId xmlns:a16="http://schemas.microsoft.com/office/drawing/2014/main" id="{EAD48096-1084-46E2-A2D5-A90DC972E10A}"/>
+              </a:ext>
+            </a:extLst>
+          </p:cNvPr>
+          <p:cNvSpPr/>
+          <p:nvPr/>
+        </p:nvSpPr>
+        <p:spPr>
+          <a:xfrm>
+            <a:off x="2107095" y="1482301"/>
+            <a:ext cx="7977809" cy="3416320"/>
+          </a:xfrm>
+          <a:prstGeom prst="rect">
+            <a:avLst/>
+          </a:prstGeom>
+          <a:solidFill>
+            <a:schemeClr val="tx1"/>
+          </a:solidFill>
+        </p:spPr>
+        <p:txBody>
+          <a:bodyPr wrap="square">
+            <a:spAutoFit/>
+          </a:bodyPr>
+          <a:lstStyle/>
+          <a:p>
+            <a:r>
+              <a:rPr lang="pl-PL" dirty="0" err="1">
+                <a:solidFill>
+                  <a:srgbClr val="569CD6"/>
+                </a:solidFill>
+                <a:latin typeface="Consolas" panose="020B0609020204030204" pitchFamily="49" charset="0"/>
+              </a:rPr>
+              <a:t>function</a:t>
+            </a:r>
+            <a:r>
+              <a:rPr lang="pl-PL" dirty="0">
+                <a:solidFill>
+                  <a:srgbClr val="D4D4D4"/>
+                </a:solidFill>
+                <a:latin typeface="Consolas" panose="020B0609020204030204" pitchFamily="49" charset="0"/>
+              </a:rPr>
+              <a:t> </a:t>
+            </a:r>
+            <a:r>
+              <a:rPr lang="pl-PL" dirty="0" err="1">
+                <a:solidFill>
+                  <a:srgbClr val="DCDCAA"/>
+                </a:solidFill>
+                <a:latin typeface="Consolas" panose="020B0609020204030204" pitchFamily="49" charset="0"/>
+              </a:rPr>
+              <a:t>useColor</a:t>
+            </a:r>
+            <a:r>
+              <a:rPr lang="pl-PL" dirty="0">
+                <a:solidFill>
+                  <a:srgbClr val="D4D4D4"/>
+                </a:solidFill>
+                <a:latin typeface="Consolas" panose="020B0609020204030204" pitchFamily="49" charset="0"/>
+              </a:rPr>
+              <a:t>(</a:t>
+            </a:r>
+            <a:r>
+              <a:rPr lang="pl-PL" dirty="0" err="1">
+                <a:solidFill>
+                  <a:srgbClr val="9CDCFE"/>
+                </a:solidFill>
+                <a:latin typeface="Consolas" panose="020B0609020204030204" pitchFamily="49" charset="0"/>
+              </a:rPr>
+              <a:t>initialColor</a:t>
+            </a:r>
+            <a:r>
+              <a:rPr lang="pl-PL" dirty="0">
+                <a:solidFill>
+                  <a:srgbClr val="D4D4D4"/>
+                </a:solidFill>
+                <a:latin typeface="Consolas" panose="020B0609020204030204" pitchFamily="49" charset="0"/>
+              </a:rPr>
+              <a:t>) {</a:t>
+            </a:r>
+          </a:p>
+          <a:p>
+            <a:r>
+              <a:rPr lang="pl-PL" dirty="0">
+                <a:solidFill>
+                  <a:srgbClr val="D4D4D4"/>
+                </a:solidFill>
+                <a:latin typeface="Consolas" panose="020B0609020204030204" pitchFamily="49" charset="0"/>
+              </a:rPr>
+              <a:t>    </a:t>
+            </a:r>
+            <a:r>
+              <a:rPr lang="pl-PL" dirty="0" err="1">
+                <a:solidFill>
+                  <a:srgbClr val="569CD6"/>
+                </a:solidFill>
+                <a:latin typeface="Consolas" panose="020B0609020204030204" pitchFamily="49" charset="0"/>
+              </a:rPr>
+              <a:t>const</a:t>
+            </a:r>
+            <a:r>
+              <a:rPr lang="pl-PL" dirty="0">
+                <a:solidFill>
+                  <a:srgbClr val="D4D4D4"/>
+                </a:solidFill>
+                <a:latin typeface="Consolas" panose="020B0609020204030204" pitchFamily="49" charset="0"/>
+              </a:rPr>
+              <a:t> [</a:t>
+            </a:r>
+            <a:r>
+              <a:rPr lang="pl-PL" dirty="0" err="1">
+                <a:solidFill>
+                  <a:srgbClr val="9CDCFE"/>
+                </a:solidFill>
+                <a:latin typeface="Consolas" panose="020B0609020204030204" pitchFamily="49" charset="0"/>
+              </a:rPr>
+              <a:t>color</a:t>
+            </a:r>
+            <a:r>
+              <a:rPr lang="pl-PL" dirty="0">
+                <a:solidFill>
+                  <a:srgbClr val="D4D4D4"/>
+                </a:solidFill>
+                <a:latin typeface="Consolas" panose="020B0609020204030204" pitchFamily="49" charset="0"/>
+              </a:rPr>
+              <a:t>, </a:t>
+            </a:r>
+            <a:r>
+              <a:rPr lang="pl-PL" dirty="0" err="1">
+                <a:solidFill>
+                  <a:srgbClr val="9CDCFE"/>
+                </a:solidFill>
+                <a:latin typeface="Consolas" panose="020B0609020204030204" pitchFamily="49" charset="0"/>
+              </a:rPr>
+              <a:t>changeColor</a:t>
+            </a:r>
+            <a:r>
+              <a:rPr lang="pl-PL" dirty="0">
+                <a:solidFill>
+                  <a:srgbClr val="D4D4D4"/>
+                </a:solidFill>
+                <a:latin typeface="Consolas" panose="020B0609020204030204" pitchFamily="49" charset="0"/>
+              </a:rPr>
+              <a:t>] = </a:t>
+            </a:r>
+            <a:r>
+              <a:rPr lang="pl-PL" dirty="0" err="1">
+                <a:solidFill>
+                  <a:srgbClr val="DCDCAA"/>
+                </a:solidFill>
+                <a:latin typeface="Consolas" panose="020B0609020204030204" pitchFamily="49" charset="0"/>
+              </a:rPr>
+              <a:t>useState</a:t>
+            </a:r>
+            <a:r>
+              <a:rPr lang="pl-PL" dirty="0">
+                <a:solidFill>
+                  <a:srgbClr val="D4D4D4"/>
+                </a:solidFill>
+                <a:latin typeface="Consolas" panose="020B0609020204030204" pitchFamily="49" charset="0"/>
+              </a:rPr>
+              <a:t>(</a:t>
+            </a:r>
+            <a:r>
+              <a:rPr lang="pl-PL" dirty="0" err="1">
+                <a:solidFill>
+                  <a:srgbClr val="9CDCFE"/>
+                </a:solidFill>
+                <a:latin typeface="Consolas" panose="020B0609020204030204" pitchFamily="49" charset="0"/>
+              </a:rPr>
+              <a:t>initialColor</a:t>
+            </a:r>
+            <a:r>
+              <a:rPr lang="pl-PL" dirty="0">
+                <a:solidFill>
+                  <a:srgbClr val="D4D4D4"/>
+                </a:solidFill>
+                <a:latin typeface="Consolas" panose="020B0609020204030204" pitchFamily="49" charset="0"/>
+              </a:rPr>
+              <a:t>);</a:t>
+            </a:r>
+          </a:p>
+          <a:p>
+            <a:r>
+              <a:rPr lang="pl-PL" dirty="0">
+                <a:solidFill>
+                  <a:srgbClr val="D4D4D4"/>
+                </a:solidFill>
+                <a:latin typeface="Consolas" panose="020B0609020204030204" pitchFamily="49" charset="0"/>
+              </a:rPr>
+              <a:t>    </a:t>
+            </a:r>
+            <a:r>
+              <a:rPr lang="pl-PL" dirty="0" err="1">
+                <a:solidFill>
+                  <a:srgbClr val="569CD6"/>
+                </a:solidFill>
+                <a:latin typeface="Consolas" panose="020B0609020204030204" pitchFamily="49" charset="0"/>
+              </a:rPr>
+              <a:t>function</a:t>
+            </a:r>
+            <a:r>
+              <a:rPr lang="pl-PL" dirty="0">
+                <a:solidFill>
+                  <a:srgbClr val="D4D4D4"/>
+                </a:solidFill>
+                <a:latin typeface="Consolas" panose="020B0609020204030204" pitchFamily="49" charset="0"/>
+              </a:rPr>
+              <a:t> </a:t>
+            </a:r>
+            <a:r>
+              <a:rPr lang="pl-PL" dirty="0" err="1">
+                <a:solidFill>
+                  <a:srgbClr val="DCDCAA"/>
+                </a:solidFill>
+                <a:latin typeface="Consolas" panose="020B0609020204030204" pitchFamily="49" charset="0"/>
+              </a:rPr>
+              <a:t>change</a:t>
+            </a:r>
+            <a:r>
+              <a:rPr lang="pl-PL" dirty="0">
+                <a:solidFill>
+                  <a:srgbClr val="D4D4D4"/>
+                </a:solidFill>
+                <a:latin typeface="Consolas" panose="020B0609020204030204" pitchFamily="49" charset="0"/>
+              </a:rPr>
+              <a:t>(</a:t>
+            </a:r>
+            <a:r>
+              <a:rPr lang="pl-PL" dirty="0" err="1">
+                <a:solidFill>
+                  <a:srgbClr val="9CDCFE"/>
+                </a:solidFill>
+                <a:latin typeface="Consolas" panose="020B0609020204030204" pitchFamily="49" charset="0"/>
+              </a:rPr>
+              <a:t>color</a:t>
+            </a:r>
+            <a:r>
+              <a:rPr lang="pl-PL" dirty="0">
+                <a:solidFill>
+                  <a:srgbClr val="D4D4D4"/>
+                </a:solidFill>
+                <a:latin typeface="Consolas" panose="020B0609020204030204" pitchFamily="49" charset="0"/>
+              </a:rPr>
+              <a:t>) {</a:t>
+            </a:r>
+          </a:p>
+          <a:p>
+            <a:r>
+              <a:rPr lang="pl-PL" dirty="0">
+                <a:solidFill>
+                  <a:srgbClr val="D4D4D4"/>
+                </a:solidFill>
+                <a:latin typeface="Consolas" panose="020B0609020204030204" pitchFamily="49" charset="0"/>
+              </a:rPr>
+              <a:t>        </a:t>
+            </a:r>
+            <a:r>
+              <a:rPr lang="pl-PL" dirty="0" err="1">
+                <a:solidFill>
+                  <a:srgbClr val="DCDCAA"/>
+                </a:solidFill>
+                <a:latin typeface="Consolas" panose="020B0609020204030204" pitchFamily="49" charset="0"/>
+              </a:rPr>
+              <a:t>changeColor</a:t>
+            </a:r>
+            <a:r>
+              <a:rPr lang="pl-PL" dirty="0">
+                <a:solidFill>
+                  <a:srgbClr val="D4D4D4"/>
+                </a:solidFill>
+                <a:latin typeface="Consolas" panose="020B0609020204030204" pitchFamily="49" charset="0"/>
+              </a:rPr>
+              <a:t>(</a:t>
+            </a:r>
+            <a:r>
+              <a:rPr lang="pl-PL" dirty="0" err="1">
+                <a:solidFill>
+                  <a:srgbClr val="9CDCFE"/>
+                </a:solidFill>
+                <a:latin typeface="Consolas" panose="020B0609020204030204" pitchFamily="49" charset="0"/>
+              </a:rPr>
+              <a:t>color</a:t>
+            </a:r>
+            <a:r>
+              <a:rPr lang="pl-PL" dirty="0">
+                <a:solidFill>
+                  <a:srgbClr val="D4D4D4"/>
+                </a:solidFill>
+                <a:latin typeface="Consolas" panose="020B0609020204030204" pitchFamily="49" charset="0"/>
+              </a:rPr>
+              <a:t>);</a:t>
+            </a:r>
+          </a:p>
+          <a:p>
+            <a:r>
+              <a:rPr lang="pl-PL" dirty="0">
+                <a:solidFill>
+                  <a:srgbClr val="D4D4D4"/>
+                </a:solidFill>
+                <a:latin typeface="Consolas" panose="020B0609020204030204" pitchFamily="49" charset="0"/>
+              </a:rPr>
+              <a:t>    }</a:t>
+            </a:r>
+          </a:p>
+          <a:p>
+            <a:br>
+              <a:rPr lang="pl-PL" dirty="0">
+                <a:solidFill>
+                  <a:srgbClr val="D4D4D4"/>
+                </a:solidFill>
+                <a:latin typeface="Consolas" panose="020B0609020204030204" pitchFamily="49" charset="0"/>
+              </a:rPr>
+            </a:br>
+            <a:r>
+              <a:rPr lang="pl-PL" dirty="0">
+                <a:solidFill>
+                  <a:srgbClr val="D4D4D4"/>
+                </a:solidFill>
+                <a:latin typeface="Consolas" panose="020B0609020204030204" pitchFamily="49" charset="0"/>
+              </a:rPr>
+              <a:t>    </a:t>
+            </a:r>
+            <a:r>
+              <a:rPr lang="pl-PL" dirty="0" err="1">
+                <a:solidFill>
+                  <a:srgbClr val="DCDCAA"/>
+                </a:solidFill>
+                <a:latin typeface="Consolas" panose="020B0609020204030204" pitchFamily="49" charset="0"/>
+              </a:rPr>
+              <a:t>useEffect</a:t>
+            </a:r>
+            <a:r>
+              <a:rPr lang="pl-PL" dirty="0">
+                <a:solidFill>
+                  <a:srgbClr val="D4D4D4"/>
+                </a:solidFill>
+                <a:latin typeface="Consolas" panose="020B0609020204030204" pitchFamily="49" charset="0"/>
+              </a:rPr>
+              <a:t>(() </a:t>
+            </a:r>
+            <a:r>
+              <a:rPr lang="pl-PL" dirty="0">
+                <a:solidFill>
+                  <a:srgbClr val="569CD6"/>
+                </a:solidFill>
+                <a:latin typeface="Consolas" panose="020B0609020204030204" pitchFamily="49" charset="0"/>
+              </a:rPr>
+              <a:t>=&gt;</a:t>
+            </a:r>
+            <a:r>
+              <a:rPr lang="pl-PL" dirty="0">
+                <a:solidFill>
+                  <a:srgbClr val="D4D4D4"/>
+                </a:solidFill>
+                <a:latin typeface="Consolas" panose="020B0609020204030204" pitchFamily="49" charset="0"/>
+              </a:rPr>
+              <a:t> {</a:t>
+            </a:r>
+          </a:p>
+          <a:p>
+            <a:r>
+              <a:rPr lang="pl-PL" dirty="0">
+                <a:solidFill>
+                  <a:srgbClr val="D4D4D4"/>
+                </a:solidFill>
+                <a:latin typeface="Consolas" panose="020B0609020204030204" pitchFamily="49" charset="0"/>
+              </a:rPr>
+              <a:t>        </a:t>
+            </a:r>
+            <a:r>
+              <a:rPr lang="pl-PL" dirty="0">
+                <a:solidFill>
+                  <a:srgbClr val="4EC9B0"/>
+                </a:solidFill>
+                <a:latin typeface="Consolas" panose="020B0609020204030204" pitchFamily="49" charset="0"/>
+              </a:rPr>
+              <a:t>console</a:t>
+            </a:r>
+            <a:r>
+              <a:rPr lang="pl-PL" dirty="0">
+                <a:solidFill>
+                  <a:srgbClr val="D4D4D4"/>
+                </a:solidFill>
+                <a:latin typeface="Consolas" panose="020B0609020204030204" pitchFamily="49" charset="0"/>
+              </a:rPr>
+              <a:t>.</a:t>
+            </a:r>
+            <a:r>
+              <a:rPr lang="pl-PL" dirty="0">
+                <a:solidFill>
+                  <a:srgbClr val="DCDCAA"/>
+                </a:solidFill>
+                <a:latin typeface="Consolas" panose="020B0609020204030204" pitchFamily="49" charset="0"/>
+              </a:rPr>
+              <a:t>log</a:t>
+            </a:r>
+            <a:r>
+              <a:rPr lang="pl-PL" dirty="0">
+                <a:solidFill>
+                  <a:srgbClr val="D4D4D4"/>
+                </a:solidFill>
+                <a:latin typeface="Consolas" panose="020B0609020204030204" pitchFamily="49" charset="0"/>
+              </a:rPr>
+              <a:t>(</a:t>
+            </a:r>
+            <a:r>
+              <a:rPr lang="pl-PL" dirty="0">
+                <a:solidFill>
+                  <a:srgbClr val="CE9178"/>
+                </a:solidFill>
+                <a:latin typeface="Consolas" panose="020B0609020204030204" pitchFamily="49" charset="0"/>
+              </a:rPr>
+              <a:t>'</a:t>
+            </a:r>
+            <a:r>
+              <a:rPr lang="pl-PL" dirty="0" err="1">
+                <a:solidFill>
+                  <a:srgbClr val="CE9178"/>
+                </a:solidFill>
+                <a:latin typeface="Consolas" panose="020B0609020204030204" pitchFamily="49" charset="0"/>
+              </a:rPr>
+              <a:t>Color</a:t>
+            </a:r>
+            <a:r>
+              <a:rPr lang="pl-PL" dirty="0">
+                <a:solidFill>
+                  <a:srgbClr val="CE9178"/>
+                </a:solidFill>
+                <a:latin typeface="Consolas" panose="020B0609020204030204" pitchFamily="49" charset="0"/>
+              </a:rPr>
+              <a:t> </a:t>
+            </a:r>
+            <a:r>
+              <a:rPr lang="pl-PL" dirty="0" err="1">
+                <a:solidFill>
+                  <a:srgbClr val="CE9178"/>
+                </a:solidFill>
+                <a:latin typeface="Consolas" panose="020B0609020204030204" pitchFamily="49" charset="0"/>
+              </a:rPr>
+              <a:t>changed</a:t>
+            </a:r>
+            <a:r>
+              <a:rPr lang="pl-PL" dirty="0">
+                <a:solidFill>
+                  <a:srgbClr val="CE9178"/>
+                </a:solidFill>
+                <a:latin typeface="Consolas" panose="020B0609020204030204" pitchFamily="49" charset="0"/>
+              </a:rPr>
+              <a:t>'</a:t>
+            </a:r>
+            <a:r>
+              <a:rPr lang="pl-PL" dirty="0">
+                <a:solidFill>
+                  <a:srgbClr val="D4D4D4"/>
+                </a:solidFill>
+                <a:latin typeface="Consolas" panose="020B0609020204030204" pitchFamily="49" charset="0"/>
+              </a:rPr>
+              <a:t>);</a:t>
+            </a:r>
+          </a:p>
+          <a:p>
+            <a:r>
+              <a:rPr lang="pl-PL" dirty="0">
+                <a:solidFill>
+                  <a:srgbClr val="D4D4D4"/>
+                </a:solidFill>
+                <a:latin typeface="Consolas" panose="020B0609020204030204" pitchFamily="49" charset="0"/>
+              </a:rPr>
+              <a:t>    });</a:t>
+            </a:r>
+          </a:p>
+          <a:p>
+            <a:br>
+              <a:rPr lang="pl-PL" dirty="0">
+                <a:solidFill>
+                  <a:srgbClr val="D4D4D4"/>
+                </a:solidFill>
+                <a:latin typeface="Consolas" panose="020B0609020204030204" pitchFamily="49" charset="0"/>
+              </a:rPr>
+            </a:br>
+            <a:r>
+              <a:rPr lang="pl-PL" dirty="0">
+                <a:solidFill>
+                  <a:srgbClr val="D4D4D4"/>
+                </a:solidFill>
+                <a:latin typeface="Consolas" panose="020B0609020204030204" pitchFamily="49" charset="0"/>
+              </a:rPr>
+              <a:t>    </a:t>
+            </a:r>
+            <a:r>
+              <a:rPr lang="pl-PL" dirty="0">
+                <a:solidFill>
+                  <a:srgbClr val="C586C0"/>
+                </a:solidFill>
+                <a:latin typeface="Consolas" panose="020B0609020204030204" pitchFamily="49" charset="0"/>
+              </a:rPr>
+              <a:t>return</a:t>
+            </a:r>
+            <a:r>
+              <a:rPr lang="pl-PL" dirty="0">
+                <a:solidFill>
+                  <a:srgbClr val="D4D4D4"/>
+                </a:solidFill>
+                <a:latin typeface="Consolas" panose="020B0609020204030204" pitchFamily="49" charset="0"/>
+              </a:rPr>
+              <a:t> [</a:t>
+            </a:r>
+            <a:r>
+              <a:rPr lang="pl-PL" dirty="0" err="1">
+                <a:solidFill>
+                  <a:srgbClr val="9CDCFE"/>
+                </a:solidFill>
+                <a:latin typeface="Consolas" panose="020B0609020204030204" pitchFamily="49" charset="0"/>
+              </a:rPr>
+              <a:t>color</a:t>
+            </a:r>
+            <a:r>
+              <a:rPr lang="pl-PL" dirty="0">
+                <a:solidFill>
+                  <a:srgbClr val="D4D4D4"/>
+                </a:solidFill>
+                <a:latin typeface="Consolas" panose="020B0609020204030204" pitchFamily="49" charset="0"/>
+              </a:rPr>
+              <a:t>, </a:t>
+            </a:r>
+            <a:r>
+              <a:rPr lang="pl-PL" dirty="0" err="1">
+                <a:solidFill>
+                  <a:srgbClr val="9CDCFE"/>
+                </a:solidFill>
+                <a:latin typeface="Consolas" panose="020B0609020204030204" pitchFamily="49" charset="0"/>
+              </a:rPr>
+              <a:t>change</a:t>
+            </a:r>
+            <a:r>
+              <a:rPr lang="pl-PL" dirty="0">
+                <a:solidFill>
+                  <a:srgbClr val="D4D4D4"/>
+                </a:solidFill>
+                <a:latin typeface="Consolas" panose="020B0609020204030204" pitchFamily="49" charset="0"/>
+              </a:rPr>
+              <a:t>];</a:t>
+            </a:r>
+          </a:p>
+          <a:p>
+            <a:r>
+              <a:rPr lang="pl-PL" dirty="0">
+                <a:solidFill>
+                  <a:srgbClr val="D4D4D4"/>
+                </a:solidFill>
+                <a:latin typeface="Consolas" panose="020B0609020204030204" pitchFamily="49" charset="0"/>
+              </a:rPr>
+              <a:t>}</a:t>
+            </a:r>
+            <a:endParaRPr lang="pl-PL" b="0" dirty="0">
+              <a:solidFill>
+                <a:srgbClr val="D4D4D4"/>
+              </a:solidFill>
+              <a:effectLst/>
+              <a:latin typeface="Consolas" panose="020B0609020204030204" pitchFamily="49" charset="0"/>
+            </a:endParaRPr>
           </a:p>
         </p:txBody>
       </p:sp>

</xml_diff>

<commit_message>
Exercise 25: Redux - change account management to use state
</commit_message>
<xml_diff>
--- a/tutorial/ReactjsTraining.pptx
+++ b/tutorial/ReactjsTraining.pptx
@@ -5,7 +5,7 @@
     <p:sldMasterId id="2147483648" r:id="rId1"/>
   </p:sldMasterIdLst>
   <p:notesMasterIdLst>
-    <p:notesMasterId r:id="rId42"/>
+    <p:notesMasterId r:id="rId39"/>
   </p:notesMasterIdLst>
   <p:sldIdLst>
     <p:sldId id="256" r:id="rId2"/>
@@ -43,11 +43,8 @@
     <p:sldId id="291" r:id="rId34"/>
     <p:sldId id="281" r:id="rId35"/>
     <p:sldId id="292" r:id="rId36"/>
-    <p:sldId id="293" r:id="rId37"/>
-    <p:sldId id="294" r:id="rId38"/>
-    <p:sldId id="295" r:id="rId39"/>
-    <p:sldId id="296" r:id="rId40"/>
-    <p:sldId id="282" r:id="rId41"/>
+    <p:sldId id="294" r:id="rId37"/>
+    <p:sldId id="282" r:id="rId38"/>
   </p:sldIdLst>
   <p:sldSz cx="12192000" cy="6858000"/>
   <p:notesSz cx="6858000" cy="9144000"/>
@@ -7905,7 +7902,7 @@
           <a:p>
             <a:fld id="{810A6612-7A23-4B98-B0E9-4F3C882AD2EF}" type="slidenum">
               <a:rPr lang="pl-PL" smtClean="0"/>
-              <a:t>37</a:t>
+              <a:t>36</a:t>
             </a:fld>
             <a:endParaRPr lang="pl-PL"/>
           </a:p>
@@ -7973,7 +7970,7 @@
               <a:buNone/>
             </a:pPr>
             <a:r>
-              <a:rPr lang="pl-PL" sz="1200" b="0" i="0" kern="1200" dirty="0">
+              <a:rPr lang="pl-PL" sz="1200" b="0" i="0" kern="1200" dirty="0" err="1">
                 <a:solidFill>
                   <a:schemeClr val="tx1"/>
                 </a:solidFill>
@@ -7982,8 +7979,209 @@
                 <a:ea typeface="+mn-ea"/>
                 <a:cs typeface="+mn-cs"/>
               </a:rPr>
-              <a:t>- Zamiana klas na funkcje z możliwością zarządzania stanem</a:t>
-            </a:r>
+              <a:t>Exercise</a:t>
+            </a:r>
+            <a:r>
+              <a:rPr lang="pl-PL" sz="1200" b="0" i="0" kern="1200" dirty="0">
+                <a:solidFill>
+                  <a:schemeClr val="tx1"/>
+                </a:solidFill>
+                <a:effectLst/>
+                <a:latin typeface="+mn-lt"/>
+                <a:ea typeface="+mn-ea"/>
+                <a:cs typeface="+mn-cs"/>
+              </a:rPr>
+              <a:t> 25: </a:t>
+            </a:r>
+          </a:p>
+          <a:p>
+            <a:pPr marL="228600" indent="-228600">
+              <a:buFontTx/>
+              <a:buAutoNum type="arabicPeriod"/>
+            </a:pPr>
+            <a:r>
+              <a:rPr lang="pl-PL" sz="1200" b="0" i="0" kern="1200" dirty="0">
+                <a:solidFill>
+                  <a:schemeClr val="tx1"/>
+                </a:solidFill>
+                <a:effectLst/>
+                <a:latin typeface="+mn-lt"/>
+                <a:ea typeface="+mn-ea"/>
+                <a:cs typeface="+mn-cs"/>
+              </a:rPr>
+              <a:t>Stworzenie akcji</a:t>
+            </a:r>
+          </a:p>
+          <a:p>
+            <a:pPr marL="228600" indent="-228600">
+              <a:buFontTx/>
+              <a:buAutoNum type="arabicPeriod"/>
+            </a:pPr>
+            <a:r>
+              <a:rPr lang="pl-PL" sz="1200" b="0" i="0" kern="1200" dirty="0">
+                <a:solidFill>
+                  <a:schemeClr val="tx1"/>
+                </a:solidFill>
+                <a:effectLst/>
+                <a:latin typeface="+mn-lt"/>
+                <a:ea typeface="+mn-ea"/>
+                <a:cs typeface="+mn-cs"/>
+              </a:rPr>
+              <a:t>Stworzenie </a:t>
+            </a:r>
+            <a:r>
+              <a:rPr lang="pl-PL" sz="1200" b="0" i="0" kern="1200" dirty="0" err="1">
+                <a:solidFill>
+                  <a:schemeClr val="tx1"/>
+                </a:solidFill>
+                <a:effectLst/>
+                <a:latin typeface="+mn-lt"/>
+                <a:ea typeface="+mn-ea"/>
+                <a:cs typeface="+mn-cs"/>
+              </a:rPr>
+              <a:t>reducer</a:t>
+            </a:r>
+            <a:r>
+              <a:rPr lang="pl-PL" sz="1200" b="0" i="0" kern="1200" dirty="0">
+                <a:solidFill>
+                  <a:schemeClr val="tx1"/>
+                </a:solidFill>
+                <a:effectLst/>
+                <a:latin typeface="+mn-lt"/>
+                <a:ea typeface="+mn-ea"/>
+                <a:cs typeface="+mn-cs"/>
+              </a:rPr>
+              <a:t> i wstrzyknięcie go do index</a:t>
+            </a:r>
+          </a:p>
+          <a:p>
+            <a:pPr marL="228600" indent="-228600">
+              <a:buFontTx/>
+              <a:buAutoNum type="arabicPeriod"/>
+            </a:pPr>
+            <a:r>
+              <a:rPr lang="pl-PL" sz="1200" b="0" i="0" kern="1200" dirty="0">
+                <a:solidFill>
+                  <a:schemeClr val="tx1"/>
+                </a:solidFill>
+                <a:effectLst/>
+                <a:latin typeface="+mn-lt"/>
+                <a:ea typeface="+mn-ea"/>
+                <a:cs typeface="+mn-cs"/>
+              </a:rPr>
+              <a:t>Użycie </a:t>
+            </a:r>
+            <a:r>
+              <a:rPr lang="pl-PL" sz="1200" b="0" i="0" kern="1200" dirty="0" err="1">
+                <a:solidFill>
+                  <a:schemeClr val="tx1"/>
+                </a:solidFill>
+                <a:effectLst/>
+                <a:latin typeface="+mn-lt"/>
+                <a:ea typeface="+mn-ea"/>
+                <a:cs typeface="+mn-cs"/>
+              </a:rPr>
+              <a:t>redux</a:t>
+            </a:r>
+            <a:r>
+              <a:rPr lang="pl-PL" sz="1200" b="0" i="0" kern="1200" dirty="0">
+                <a:solidFill>
+                  <a:schemeClr val="tx1"/>
+                </a:solidFill>
+                <a:effectLst/>
+                <a:latin typeface="+mn-lt"/>
+                <a:ea typeface="+mn-ea"/>
+                <a:cs typeface="+mn-cs"/>
+              </a:rPr>
+              <a:t>-a do zarządzania stanem zalogowanego użytkownika (Account.js)</a:t>
+            </a:r>
+          </a:p>
+          <a:p>
+            <a:pPr marL="228600" indent="-228600">
+              <a:buFontTx/>
+              <a:buAutoNum type="arabicPeriod"/>
+            </a:pPr>
+            <a:r>
+              <a:rPr lang="pl-PL" sz="1200" b="0" i="0" kern="1200" dirty="0">
+                <a:solidFill>
+                  <a:schemeClr val="tx1"/>
+                </a:solidFill>
+                <a:effectLst/>
+                <a:latin typeface="+mn-lt"/>
+                <a:ea typeface="+mn-ea"/>
+                <a:cs typeface="+mn-cs"/>
+              </a:rPr>
+              <a:t>Stworzenia drzewka stanu i </a:t>
+            </a:r>
+            <a:r>
+              <a:rPr lang="pl-PL" sz="1200" b="0" i="0" kern="1200" dirty="0" err="1">
+                <a:solidFill>
+                  <a:schemeClr val="tx1"/>
+                </a:solidFill>
+                <a:effectLst/>
+                <a:latin typeface="+mn-lt"/>
+                <a:ea typeface="+mn-ea"/>
+                <a:cs typeface="+mn-cs"/>
+              </a:rPr>
+              <a:t>wyniesiene</a:t>
+            </a:r>
+            <a:r>
+              <a:rPr lang="pl-PL" sz="1200" b="0" i="0" kern="1200" dirty="0">
+                <a:solidFill>
+                  <a:schemeClr val="tx1"/>
+                </a:solidFill>
+                <a:effectLst/>
+                <a:latin typeface="+mn-lt"/>
+                <a:ea typeface="+mn-ea"/>
+                <a:cs typeface="+mn-cs"/>
+              </a:rPr>
+              <a:t> </a:t>
+            </a:r>
+            <a:r>
+              <a:rPr lang="pl-PL" sz="1200" b="0" i="0" kern="1200" dirty="0" err="1">
+                <a:solidFill>
+                  <a:schemeClr val="tx1"/>
+                </a:solidFill>
+                <a:effectLst/>
+                <a:latin typeface="+mn-lt"/>
+                <a:ea typeface="+mn-ea"/>
+                <a:cs typeface="+mn-cs"/>
+              </a:rPr>
+              <a:t>account.reducer</a:t>
+            </a:r>
+            <a:r>
+              <a:rPr lang="pl-PL" sz="1200" b="0" i="0" kern="1200" dirty="0">
+                <a:solidFill>
+                  <a:schemeClr val="tx1"/>
+                </a:solidFill>
+                <a:effectLst/>
+                <a:latin typeface="+mn-lt"/>
+                <a:ea typeface="+mn-ea"/>
+                <a:cs typeface="+mn-cs"/>
+              </a:rPr>
+              <a:t> do </a:t>
+            </a:r>
+            <a:r>
+              <a:rPr lang="pl-PL" sz="1200" b="0" i="0" kern="1200" dirty="0" err="1">
+                <a:solidFill>
+                  <a:schemeClr val="tx1"/>
+                </a:solidFill>
+                <a:effectLst/>
+                <a:latin typeface="+mn-lt"/>
+                <a:ea typeface="+mn-ea"/>
+                <a:cs typeface="+mn-cs"/>
+              </a:rPr>
+              <a:t>root.reducer</a:t>
+            </a:r>
+            <a:endParaRPr lang="pl-PL" sz="1200" b="0" i="0" kern="1200" dirty="0">
+              <a:solidFill>
+                <a:schemeClr val="tx1"/>
+              </a:solidFill>
+              <a:effectLst/>
+              <a:latin typeface="+mn-lt"/>
+              <a:ea typeface="+mn-ea"/>
+              <a:cs typeface="+mn-cs"/>
+            </a:endParaRPr>
           </a:p>
         </p:txBody>
       </p:sp>
@@ -8004,202 +8202,7 @@
           <a:p>
             <a:fld id="{810A6612-7A23-4B98-B0E9-4F3C882AD2EF}" type="slidenum">
               <a:rPr lang="pl-PL" smtClean="0"/>
-              <a:t>38</a:t>
-            </a:fld>
-            <a:endParaRPr lang="pl-PL"/>
-          </a:p>
-        </p:txBody>
-      </p:sp>
-    </p:spTree>
-    <p:extLst>
-      <p:ext uri="{BB962C8B-B14F-4D97-AF65-F5344CB8AC3E}">
-        <p14:creationId xmlns:p14="http://schemas.microsoft.com/office/powerpoint/2010/main" val="3201802839"/>
-      </p:ext>
-    </p:extLst>
-  </p:cSld>
-  <p:clrMapOvr>
-    <a:masterClrMapping/>
-  </p:clrMapOvr>
-</p:notes>
-</file>
-
-<file path=ppt/notesSlides/notesSlide38.xml><?xml version="1.0" encoding="utf-8"?>
-<p:notes xmlns:a="http://schemas.openxmlformats.org/drawingml/2006/main" xmlns:r="http://schemas.openxmlformats.org/officeDocument/2006/relationships" xmlns:p="http://schemas.openxmlformats.org/presentationml/2006/main">
-  <p:cSld>
-    <p:spTree>
-      <p:nvGrpSpPr>
-        <p:cNvPr id="1" name=""/>
-        <p:cNvGrpSpPr/>
-        <p:nvPr/>
-      </p:nvGrpSpPr>
-      <p:grpSpPr>
-        <a:xfrm>
-          <a:off x="0" y="0"/>
-          <a:ext cx="0" cy="0"/>
-          <a:chOff x="0" y="0"/>
-          <a:chExt cx="0" cy="0"/>
-        </a:xfrm>
-      </p:grpSpPr>
-      <p:sp>
-        <p:nvSpPr>
-          <p:cNvPr id="2" name="Symbol zastępczy obrazu slajdu 1"/>
-          <p:cNvSpPr>
-            <a:spLocks noGrp="1" noRot="1" noChangeAspect="1"/>
-          </p:cNvSpPr>
-          <p:nvPr>
-            <p:ph type="sldImg"/>
-          </p:nvPr>
-        </p:nvSpPr>
-        <p:spPr/>
-      </p:sp>
-      <p:sp>
-        <p:nvSpPr>
-          <p:cNvPr id="3" name="Symbol zastępczy notatek 2"/>
-          <p:cNvSpPr>
-            <a:spLocks noGrp="1"/>
-          </p:cNvSpPr>
-          <p:nvPr>
-            <p:ph type="body" idx="1"/>
-          </p:nvPr>
-        </p:nvSpPr>
-        <p:spPr/>
-        <p:txBody>
-          <a:bodyPr/>
-          <a:lstStyle/>
-          <a:p>
-            <a:pPr marL="0" indent="0">
-              <a:buFontTx/>
-              <a:buNone/>
-            </a:pPr>
-            <a:r>
-              <a:rPr lang="pl-PL" sz="1200" b="0" i="0" kern="1200" dirty="0">
-                <a:solidFill>
-                  <a:schemeClr val="tx1"/>
-                </a:solidFill>
-                <a:effectLst/>
-                <a:latin typeface="+mn-lt"/>
-                <a:ea typeface="+mn-ea"/>
-                <a:cs typeface="+mn-cs"/>
-              </a:rPr>
-              <a:t>- Zamiana klas na funkcje z możliwością zarządzania stanem</a:t>
-            </a:r>
-          </a:p>
-        </p:txBody>
-      </p:sp>
-      <p:sp>
-        <p:nvSpPr>
-          <p:cNvPr id="4" name="Symbol zastępczy numeru slajdu 3"/>
-          <p:cNvSpPr>
-            <a:spLocks noGrp="1"/>
-          </p:cNvSpPr>
-          <p:nvPr>
-            <p:ph type="sldNum" sz="quarter" idx="5"/>
-          </p:nvPr>
-        </p:nvSpPr>
-        <p:spPr/>
-        <p:txBody>
-          <a:bodyPr/>
-          <a:lstStyle/>
-          <a:p>
-            <a:fld id="{810A6612-7A23-4B98-B0E9-4F3C882AD2EF}" type="slidenum">
-              <a:rPr lang="pl-PL" smtClean="0"/>
-              <a:t>39</a:t>
-            </a:fld>
-            <a:endParaRPr lang="pl-PL"/>
-          </a:p>
-        </p:txBody>
-      </p:sp>
-    </p:spTree>
-    <p:extLst>
-      <p:ext uri="{BB962C8B-B14F-4D97-AF65-F5344CB8AC3E}">
-        <p14:creationId xmlns:p14="http://schemas.microsoft.com/office/powerpoint/2010/main" val="3266315718"/>
-      </p:ext>
-    </p:extLst>
-  </p:cSld>
-  <p:clrMapOvr>
-    <a:masterClrMapping/>
-  </p:clrMapOvr>
-</p:notes>
-</file>
-
-<file path=ppt/notesSlides/notesSlide39.xml><?xml version="1.0" encoding="utf-8"?>
-<p:notes xmlns:a="http://schemas.openxmlformats.org/drawingml/2006/main" xmlns:r="http://schemas.openxmlformats.org/officeDocument/2006/relationships" xmlns:p="http://schemas.openxmlformats.org/presentationml/2006/main">
-  <p:cSld>
-    <p:spTree>
-      <p:nvGrpSpPr>
-        <p:cNvPr id="1" name=""/>
-        <p:cNvGrpSpPr/>
-        <p:nvPr/>
-      </p:nvGrpSpPr>
-      <p:grpSpPr>
-        <a:xfrm>
-          <a:off x="0" y="0"/>
-          <a:ext cx="0" cy="0"/>
-          <a:chOff x="0" y="0"/>
-          <a:chExt cx="0" cy="0"/>
-        </a:xfrm>
-      </p:grpSpPr>
-      <p:sp>
-        <p:nvSpPr>
-          <p:cNvPr id="2" name="Symbol zastępczy obrazu slajdu 1"/>
-          <p:cNvSpPr>
-            <a:spLocks noGrp="1" noRot="1" noChangeAspect="1"/>
-          </p:cNvSpPr>
-          <p:nvPr>
-            <p:ph type="sldImg"/>
-          </p:nvPr>
-        </p:nvSpPr>
-        <p:spPr/>
-      </p:sp>
-      <p:sp>
-        <p:nvSpPr>
-          <p:cNvPr id="3" name="Symbol zastępczy notatek 2"/>
-          <p:cNvSpPr>
-            <a:spLocks noGrp="1"/>
-          </p:cNvSpPr>
-          <p:nvPr>
-            <p:ph type="body" idx="1"/>
-          </p:nvPr>
-        </p:nvSpPr>
-        <p:spPr/>
-        <p:txBody>
-          <a:bodyPr/>
-          <a:lstStyle/>
-          <a:p>
-            <a:pPr marL="0" indent="0">
-              <a:buFontTx/>
-              <a:buNone/>
-            </a:pPr>
-            <a:endParaRPr lang="pl-PL" sz="1200" b="0" i="0" kern="1200" dirty="0">
-              <a:solidFill>
-                <a:schemeClr val="tx1"/>
-              </a:solidFill>
-              <a:effectLst/>
-              <a:latin typeface="+mn-lt"/>
-              <a:ea typeface="+mn-ea"/>
-              <a:cs typeface="+mn-cs"/>
-            </a:endParaRPr>
-          </a:p>
-        </p:txBody>
-      </p:sp>
-      <p:sp>
-        <p:nvSpPr>
-          <p:cNvPr id="4" name="Symbol zastępczy numeru slajdu 3"/>
-          <p:cNvSpPr>
-            <a:spLocks noGrp="1"/>
-          </p:cNvSpPr>
-          <p:nvPr>
-            <p:ph type="sldNum" sz="quarter" idx="5"/>
-          </p:nvPr>
-        </p:nvSpPr>
-        <p:spPr/>
-        <p:txBody>
-          <a:bodyPr/>
-          <a:lstStyle/>
-          <a:p>
-            <a:fld id="{810A6612-7A23-4B98-B0E9-4F3C882AD2EF}" type="slidenum">
-              <a:rPr lang="pl-PL" smtClean="0"/>
-              <a:t>40</a:t>
+              <a:t>37</a:t>
             </a:fld>
             <a:endParaRPr lang="pl-PL"/>
           </a:p>
@@ -41866,58 +41869,253 @@
       </p:grpSpPr>
       <p:sp>
         <p:nvSpPr>
-          <p:cNvPr id="2" name="Tytuł 1">
+          <p:cNvPr id="4" name="pole tekstowe 3">
             <a:extLst>
               <a:ext uri="{FF2B5EF4-FFF2-40B4-BE49-F238E27FC236}">
-                <a16:creationId xmlns:a16="http://schemas.microsoft.com/office/drawing/2014/main" id="{794976DA-E497-41CB-9445-140AB59DDAF5}"/>
+                <a16:creationId xmlns:a16="http://schemas.microsoft.com/office/drawing/2014/main" id="{F164A7B3-8808-414C-9401-3B25194E3B5A}"/>
               </a:ext>
             </a:extLst>
           </p:cNvPr>
-          <p:cNvSpPr>
-            <a:spLocks noGrp="1"/>
-          </p:cNvSpPr>
-          <p:nvPr>
-            <p:ph type="title"/>
-          </p:nvPr>
+          <p:cNvSpPr txBox="1"/>
+          <p:nvPr/>
         </p:nvSpPr>
-        <p:spPr/>
+        <p:spPr>
+          <a:xfrm>
+            <a:off x="497840" y="538480"/>
+            <a:ext cx="2103204" cy="369332"/>
+          </a:xfrm>
+          <a:prstGeom prst="rect">
+            <a:avLst/>
+          </a:prstGeom>
+          <a:noFill/>
+        </p:spPr>
         <p:txBody>
-          <a:bodyPr/>
+          <a:bodyPr wrap="none" rtlCol="0">
+            <a:spAutoFit/>
+          </a:bodyPr>
           <a:lstStyle/>
           <a:p>
-            <a:endParaRPr lang="pl-PL"/>
+            <a:r>
+              <a:rPr lang="pl-PL" dirty="0" err="1"/>
+              <a:t>Redux</a:t>
+            </a:r>
+            <a:r>
+              <a:rPr lang="pl-PL" dirty="0"/>
+              <a:t> - </a:t>
+            </a:r>
+            <a:r>
+              <a:rPr lang="pl-PL" dirty="0" err="1"/>
+              <a:t>introduction</a:t>
+            </a:r>
+            <a:endParaRPr lang="pl-PL" dirty="0"/>
           </a:p>
         </p:txBody>
       </p:sp>
       <p:sp>
         <p:nvSpPr>
-          <p:cNvPr id="3" name="Symbol zastępczy zawartości 2">
+          <p:cNvPr id="3" name="Prostokąt 2">
             <a:extLst>
               <a:ext uri="{FF2B5EF4-FFF2-40B4-BE49-F238E27FC236}">
-                <a16:creationId xmlns:a16="http://schemas.microsoft.com/office/drawing/2014/main" id="{B3FBF8A4-57FB-4CE9-B094-C5E5EDA94876}"/>
+                <a16:creationId xmlns:a16="http://schemas.microsoft.com/office/drawing/2014/main" id="{CC09B202-DCC1-41CB-B03D-B36150A8CCDD}"/>
               </a:ext>
             </a:extLst>
           </p:cNvPr>
-          <p:cNvSpPr>
-            <a:spLocks noGrp="1"/>
-          </p:cNvSpPr>
-          <p:nvPr>
-            <p:ph idx="1"/>
-          </p:nvPr>
+          <p:cNvSpPr/>
+          <p:nvPr/>
         </p:nvSpPr>
-        <p:spPr/>
+        <p:spPr>
+          <a:xfrm>
+            <a:off x="4720617" y="5513595"/>
+            <a:ext cx="2962799" cy="369332"/>
+          </a:xfrm>
+          <a:prstGeom prst="rect">
+            <a:avLst/>
+          </a:prstGeom>
+        </p:spPr>
         <p:txBody>
-          <a:bodyPr/>
+          <a:bodyPr wrap="none">
+            <a:spAutoFit/>
+          </a:bodyPr>
           <a:lstStyle/>
           <a:p>
-            <a:endParaRPr lang="pl-PL"/>
+            <a:r>
+              <a:rPr lang="pl-PL" dirty="0" err="1">
+                <a:latin typeface="SFMono-Regular"/>
+              </a:rPr>
+              <a:t>npm</a:t>
+            </a:r>
+            <a:r>
+              <a:rPr lang="pl-PL" dirty="0">
+                <a:latin typeface="SFMono-Regular"/>
+              </a:rPr>
+              <a:t> </a:t>
+            </a:r>
+            <a:r>
+              <a:rPr lang="pl-PL" dirty="0" err="1">
+                <a:latin typeface="SFMono-Regular"/>
+              </a:rPr>
+              <a:t>install</a:t>
+            </a:r>
+            <a:r>
+              <a:rPr lang="pl-PL" dirty="0">
+                <a:latin typeface="SFMono-Regular"/>
+              </a:rPr>
+              <a:t> --</a:t>
+            </a:r>
+            <a:r>
+              <a:rPr lang="pl-PL" dirty="0" err="1">
+                <a:latin typeface="SFMono-Regular"/>
+              </a:rPr>
+              <a:t>save</a:t>
+            </a:r>
+            <a:r>
+              <a:rPr lang="pl-PL" dirty="0">
+                <a:latin typeface="SFMono-Regular"/>
+              </a:rPr>
+              <a:t> </a:t>
+            </a:r>
+            <a:r>
+              <a:rPr lang="pl-PL" dirty="0" err="1">
+                <a:latin typeface="SFMono-Regular"/>
+              </a:rPr>
+              <a:t>react-redux</a:t>
+            </a:r>
+            <a:endParaRPr lang="pl-PL" dirty="0"/>
           </a:p>
         </p:txBody>
       </p:sp>
+      <p:sp>
+        <p:nvSpPr>
+          <p:cNvPr id="5" name="Prostokąt 4">
+            <a:extLst>
+              <a:ext uri="{FF2B5EF4-FFF2-40B4-BE49-F238E27FC236}">
+                <a16:creationId xmlns:a16="http://schemas.microsoft.com/office/drawing/2014/main" id="{2F16DEF6-1206-44B1-8AD6-E974761CC6C3}"/>
+              </a:ext>
+            </a:extLst>
+          </p:cNvPr>
+          <p:cNvSpPr/>
+          <p:nvPr/>
+        </p:nvSpPr>
+        <p:spPr>
+          <a:xfrm>
+            <a:off x="4720616" y="5882927"/>
+            <a:ext cx="2962799" cy="369332"/>
+          </a:xfrm>
+          <a:prstGeom prst="rect">
+            <a:avLst/>
+          </a:prstGeom>
+        </p:spPr>
+        <p:txBody>
+          <a:bodyPr wrap="square">
+            <a:spAutoFit/>
+          </a:bodyPr>
+          <a:lstStyle/>
+          <a:p>
+            <a:r>
+              <a:rPr lang="pl-PL" dirty="0" err="1">
+                <a:solidFill>
+                  <a:srgbClr val="000000"/>
+                </a:solidFill>
+                <a:latin typeface="inherit"/>
+              </a:rPr>
+              <a:t>npm</a:t>
+            </a:r>
+            <a:r>
+              <a:rPr lang="pl-PL" dirty="0">
+                <a:solidFill>
+                  <a:srgbClr val="000000"/>
+                </a:solidFill>
+                <a:latin typeface="inherit"/>
+              </a:rPr>
+              <a:t> i </a:t>
+            </a:r>
+            <a:r>
+              <a:rPr lang="pl-PL" dirty="0" err="1">
+                <a:solidFill>
+                  <a:srgbClr val="000000"/>
+                </a:solidFill>
+                <a:latin typeface="inherit"/>
+              </a:rPr>
+              <a:t>redux</a:t>
+            </a:r>
+            <a:r>
+              <a:rPr lang="pl-PL" dirty="0">
+                <a:solidFill>
+                  <a:srgbClr val="000000"/>
+                </a:solidFill>
+                <a:latin typeface="inherit"/>
+              </a:rPr>
+              <a:t> --</a:t>
+            </a:r>
+            <a:r>
+              <a:rPr lang="pl-PL" dirty="0" err="1">
+                <a:solidFill>
+                  <a:srgbClr val="000000"/>
+                </a:solidFill>
+                <a:latin typeface="inherit"/>
+              </a:rPr>
+              <a:t>save-dev</a:t>
+            </a:r>
+            <a:endParaRPr lang="pl-PL" dirty="0">
+              <a:solidFill>
+                <a:srgbClr val="444444"/>
+              </a:solidFill>
+              <a:latin typeface="Source Code Pro"/>
+            </a:endParaRPr>
+          </a:p>
+        </p:txBody>
+      </p:sp>
+      <p:pic>
+        <p:nvPicPr>
+          <p:cNvPr id="1026" name="Picture 2">
+            <a:extLst>
+              <a:ext uri="{FF2B5EF4-FFF2-40B4-BE49-F238E27FC236}">
+                <a16:creationId xmlns:a16="http://schemas.microsoft.com/office/drawing/2014/main" id="{660C8317-897A-442A-8C79-C264C7382AD3}"/>
+              </a:ext>
+            </a:extLst>
+          </p:cNvPr>
+          <p:cNvPicPr>
+            <a:picLocks noChangeAspect="1" noChangeArrowheads="1"/>
+          </p:cNvPicPr>
+          <p:nvPr/>
+        </p:nvPicPr>
+        <p:blipFill>
+          <a:blip r:embed="rId3">
+            <a:extLst>
+              <a:ext uri="{28A0092B-C50C-407E-A947-70E740481C1C}">
+                <a14:useLocalDpi xmlns:a14="http://schemas.microsoft.com/office/drawing/2010/main" val="0"/>
+              </a:ext>
+            </a:extLst>
+          </a:blip>
+          <a:srcRect/>
+          <a:stretch>
+            <a:fillRect/>
+          </a:stretch>
+        </p:blipFill>
+        <p:spPr bwMode="auto">
+          <a:xfrm>
+            <a:off x="2018265" y="1344405"/>
+            <a:ext cx="8420513" cy="3693842"/>
+          </a:xfrm>
+          <a:prstGeom prst="rect">
+            <a:avLst/>
+          </a:prstGeom>
+          <a:noFill/>
+          <a:extLst>
+            <a:ext uri="{909E8E84-426E-40DD-AFC4-6F175D3DCCD1}">
+              <a14:hiddenFill xmlns:a14="http://schemas.microsoft.com/office/drawing/2010/main">
+                <a:solidFill>
+                  <a:srgbClr val="FFFFFF"/>
+                </a:solidFill>
+              </a14:hiddenFill>
+            </a:ext>
+          </a:extLst>
+        </p:spPr>
+      </p:pic>
     </p:spTree>
     <p:extLst>
       <p:ext uri="{BB962C8B-B14F-4D97-AF65-F5344CB8AC3E}">
-        <p14:creationId xmlns:p14="http://schemas.microsoft.com/office/powerpoint/2010/main" val="3750603937"/>
+        <p14:creationId xmlns:p14="http://schemas.microsoft.com/office/powerpoint/2010/main" val="752642925"/>
       </p:ext>
     </p:extLst>
   </p:cSld>
@@ -41959,7 +42157,7 @@
         <p:spPr>
           <a:xfrm>
             <a:off x="497840" y="538480"/>
-            <a:ext cx="2103525" cy="369332"/>
+            <a:ext cx="2103204" cy="369332"/>
           </a:xfrm>
           <a:prstGeom prst="rect">
             <a:avLst/>
@@ -41974,7 +42172,7 @@
           <a:p>
             <a:r>
               <a:rPr lang="pl-PL" dirty="0" err="1"/>
-              <a:t>Hooks</a:t>
+              <a:t>Redux</a:t>
             </a:r>
             <a:r>
               <a:rPr lang="pl-PL" dirty="0"/>
@@ -41988,42 +42186,588 @@
           </a:p>
         </p:txBody>
       </p:sp>
-    </p:spTree>
-    <p:extLst>
-      <p:ext uri="{BB962C8B-B14F-4D97-AF65-F5344CB8AC3E}">
-        <p14:creationId xmlns:p14="http://schemas.microsoft.com/office/powerpoint/2010/main" val="752642925"/>
-      </p:ext>
-    </p:extLst>
-  </p:cSld>
-  <p:clrMapOvr>
-    <a:masterClrMapping/>
-  </p:clrMapOvr>
-</p:sld>
-</file>
-
-<file path=ppt/slides/slide38.xml><?xml version="1.0" encoding="utf-8"?>
-<p:sld xmlns:a="http://schemas.openxmlformats.org/drawingml/2006/main" xmlns:r="http://schemas.openxmlformats.org/officeDocument/2006/relationships" xmlns:p="http://schemas.openxmlformats.org/presentationml/2006/main">
-  <p:cSld>
-    <p:spTree>
-      <p:nvGrpSpPr>
-        <p:cNvPr id="1" name=""/>
-        <p:cNvGrpSpPr/>
-        <p:nvPr/>
-      </p:nvGrpSpPr>
-      <p:grpSpPr>
-        <a:xfrm>
-          <a:off x="0" y="0"/>
-          <a:ext cx="0" cy="0"/>
-          <a:chOff x="0" y="0"/>
-          <a:chExt cx="0" cy="0"/>
-        </a:xfrm>
-      </p:grpSpPr>
       <p:sp>
         <p:nvSpPr>
-          <p:cNvPr id="4" name="pole tekstowe 3">
+          <p:cNvPr id="2" name="Prostokąt 1">
             <a:extLst>
               <a:ext uri="{FF2B5EF4-FFF2-40B4-BE49-F238E27FC236}">
-                <a16:creationId xmlns:a16="http://schemas.microsoft.com/office/drawing/2014/main" id="{F164A7B3-8808-414C-9401-3B25194E3B5A}"/>
+                <a16:creationId xmlns:a16="http://schemas.microsoft.com/office/drawing/2014/main" id="{053FA734-B489-4C65-A235-879639E2157C}"/>
+              </a:ext>
+            </a:extLst>
+          </p:cNvPr>
+          <p:cNvSpPr/>
+          <p:nvPr/>
+        </p:nvSpPr>
+        <p:spPr>
+          <a:xfrm>
+            <a:off x="497840" y="1481005"/>
+            <a:ext cx="4776525" cy="1815882"/>
+          </a:xfrm>
+          <a:prstGeom prst="rect">
+            <a:avLst/>
+          </a:prstGeom>
+          <a:solidFill>
+            <a:schemeClr val="tx1"/>
+          </a:solidFill>
+        </p:spPr>
+        <p:txBody>
+          <a:bodyPr wrap="square">
+            <a:spAutoFit/>
+          </a:bodyPr>
+          <a:lstStyle/>
+          <a:p>
+            <a:r>
+              <a:rPr lang="pl-PL" sz="1400" dirty="0">
+                <a:solidFill>
+                  <a:srgbClr val="C586C0"/>
+                </a:solidFill>
+                <a:latin typeface="Consolas" panose="020B0609020204030204" pitchFamily="49" charset="0"/>
+              </a:rPr>
+              <a:t>export</a:t>
+            </a:r>
+            <a:r>
+              <a:rPr lang="pl-PL" sz="1400" dirty="0">
+                <a:solidFill>
+                  <a:srgbClr val="D4D4D4"/>
+                </a:solidFill>
+                <a:latin typeface="Consolas" panose="020B0609020204030204" pitchFamily="49" charset="0"/>
+              </a:rPr>
+              <a:t> </a:t>
+            </a:r>
+            <a:r>
+              <a:rPr lang="pl-PL" sz="1400" dirty="0" err="1">
+                <a:solidFill>
+                  <a:srgbClr val="569CD6"/>
+                </a:solidFill>
+                <a:latin typeface="Consolas" panose="020B0609020204030204" pitchFamily="49" charset="0"/>
+              </a:rPr>
+              <a:t>const</a:t>
+            </a:r>
+            <a:r>
+              <a:rPr lang="pl-PL" sz="1400" dirty="0">
+                <a:solidFill>
+                  <a:srgbClr val="D4D4D4"/>
+                </a:solidFill>
+                <a:latin typeface="Consolas" panose="020B0609020204030204" pitchFamily="49" charset="0"/>
+              </a:rPr>
+              <a:t> </a:t>
+            </a:r>
+            <a:r>
+              <a:rPr lang="pl-PL" sz="1400" dirty="0">
+                <a:solidFill>
+                  <a:srgbClr val="9CDCFE"/>
+                </a:solidFill>
+                <a:latin typeface="Consolas" panose="020B0609020204030204" pitchFamily="49" charset="0"/>
+              </a:rPr>
+              <a:t>INCREMENT</a:t>
+            </a:r>
+            <a:r>
+              <a:rPr lang="pl-PL" sz="1400" dirty="0">
+                <a:solidFill>
+                  <a:srgbClr val="D4D4D4"/>
+                </a:solidFill>
+                <a:latin typeface="Consolas" panose="020B0609020204030204" pitchFamily="49" charset="0"/>
+              </a:rPr>
+              <a:t> = </a:t>
+            </a:r>
+            <a:r>
+              <a:rPr lang="pl-PL" sz="1400" dirty="0">
+                <a:solidFill>
+                  <a:srgbClr val="CE9178"/>
+                </a:solidFill>
+                <a:latin typeface="Consolas" panose="020B0609020204030204" pitchFamily="49" charset="0"/>
+              </a:rPr>
+              <a:t>'INCREMENT'</a:t>
+            </a:r>
+            <a:endParaRPr lang="pl-PL" sz="1400" dirty="0">
+              <a:solidFill>
+                <a:srgbClr val="D4D4D4"/>
+              </a:solidFill>
+              <a:latin typeface="Consolas" panose="020B0609020204030204" pitchFamily="49" charset="0"/>
+            </a:endParaRPr>
+          </a:p>
+          <a:p>
+            <a:r>
+              <a:rPr lang="pl-PL" sz="1400" dirty="0">
+                <a:solidFill>
+                  <a:srgbClr val="C586C0"/>
+                </a:solidFill>
+                <a:latin typeface="Consolas" panose="020B0609020204030204" pitchFamily="49" charset="0"/>
+              </a:rPr>
+              <a:t>export</a:t>
+            </a:r>
+            <a:r>
+              <a:rPr lang="pl-PL" sz="1400" dirty="0">
+                <a:solidFill>
+                  <a:srgbClr val="D4D4D4"/>
+                </a:solidFill>
+                <a:latin typeface="Consolas" panose="020B0609020204030204" pitchFamily="49" charset="0"/>
+              </a:rPr>
+              <a:t> </a:t>
+            </a:r>
+            <a:r>
+              <a:rPr lang="pl-PL" sz="1400" dirty="0" err="1">
+                <a:solidFill>
+                  <a:srgbClr val="569CD6"/>
+                </a:solidFill>
+                <a:latin typeface="Consolas" panose="020B0609020204030204" pitchFamily="49" charset="0"/>
+              </a:rPr>
+              <a:t>const</a:t>
+            </a:r>
+            <a:r>
+              <a:rPr lang="pl-PL" sz="1400" dirty="0">
+                <a:solidFill>
+                  <a:srgbClr val="D4D4D4"/>
+                </a:solidFill>
+                <a:latin typeface="Consolas" panose="020B0609020204030204" pitchFamily="49" charset="0"/>
+              </a:rPr>
+              <a:t> </a:t>
+            </a:r>
+            <a:r>
+              <a:rPr lang="pl-PL" sz="1400" dirty="0">
+                <a:solidFill>
+                  <a:srgbClr val="9CDCFE"/>
+                </a:solidFill>
+                <a:latin typeface="Consolas" panose="020B0609020204030204" pitchFamily="49" charset="0"/>
+              </a:rPr>
+              <a:t>DECREMENT</a:t>
+            </a:r>
+            <a:r>
+              <a:rPr lang="pl-PL" sz="1400" dirty="0">
+                <a:solidFill>
+                  <a:srgbClr val="D4D4D4"/>
+                </a:solidFill>
+                <a:latin typeface="Consolas" panose="020B0609020204030204" pitchFamily="49" charset="0"/>
+              </a:rPr>
+              <a:t> = </a:t>
+            </a:r>
+            <a:r>
+              <a:rPr lang="pl-PL" sz="1400" dirty="0">
+                <a:solidFill>
+                  <a:srgbClr val="CE9178"/>
+                </a:solidFill>
+                <a:latin typeface="Consolas" panose="020B0609020204030204" pitchFamily="49" charset="0"/>
+              </a:rPr>
+              <a:t>'DECREMENT'</a:t>
+            </a:r>
+            <a:br>
+              <a:rPr lang="pl-PL" sz="1400" dirty="0">
+                <a:solidFill>
+                  <a:srgbClr val="D4D4D4"/>
+                </a:solidFill>
+                <a:latin typeface="Consolas" panose="020B0609020204030204" pitchFamily="49" charset="0"/>
+              </a:rPr>
+            </a:br>
+            <a:r>
+              <a:rPr lang="pl-PL" sz="1400" dirty="0">
+                <a:solidFill>
+                  <a:srgbClr val="C586C0"/>
+                </a:solidFill>
+                <a:latin typeface="Consolas" panose="020B0609020204030204" pitchFamily="49" charset="0"/>
+              </a:rPr>
+              <a:t>export</a:t>
+            </a:r>
+            <a:r>
+              <a:rPr lang="pl-PL" sz="1400" dirty="0">
+                <a:solidFill>
+                  <a:srgbClr val="D4D4D4"/>
+                </a:solidFill>
+                <a:latin typeface="Consolas" panose="020B0609020204030204" pitchFamily="49" charset="0"/>
+              </a:rPr>
+              <a:t> </a:t>
+            </a:r>
+            <a:r>
+              <a:rPr lang="pl-PL" sz="1400" dirty="0" err="1">
+                <a:solidFill>
+                  <a:srgbClr val="569CD6"/>
+                </a:solidFill>
+                <a:latin typeface="Consolas" panose="020B0609020204030204" pitchFamily="49" charset="0"/>
+              </a:rPr>
+              <a:t>function</a:t>
+            </a:r>
+            <a:r>
+              <a:rPr lang="pl-PL" sz="1400" dirty="0">
+                <a:solidFill>
+                  <a:srgbClr val="D4D4D4"/>
+                </a:solidFill>
+                <a:latin typeface="Consolas" panose="020B0609020204030204" pitchFamily="49" charset="0"/>
+              </a:rPr>
+              <a:t> </a:t>
+            </a:r>
+            <a:r>
+              <a:rPr lang="pl-PL" sz="1400" dirty="0" err="1">
+                <a:solidFill>
+                  <a:srgbClr val="DCDCAA"/>
+                </a:solidFill>
+                <a:latin typeface="Consolas" panose="020B0609020204030204" pitchFamily="49" charset="0"/>
+              </a:rPr>
+              <a:t>increment</a:t>
+            </a:r>
+            <a:r>
+              <a:rPr lang="pl-PL" sz="1400" dirty="0">
+                <a:solidFill>
+                  <a:srgbClr val="D4D4D4"/>
+                </a:solidFill>
+                <a:latin typeface="Consolas" panose="020B0609020204030204" pitchFamily="49" charset="0"/>
+              </a:rPr>
+              <a:t>(</a:t>
+            </a:r>
+            <a:r>
+              <a:rPr lang="pl-PL" sz="1400" dirty="0" err="1">
+                <a:solidFill>
+                  <a:srgbClr val="9CDCFE"/>
+                </a:solidFill>
+                <a:latin typeface="Consolas" panose="020B0609020204030204" pitchFamily="49" charset="0"/>
+              </a:rPr>
+              <a:t>payload</a:t>
+            </a:r>
+            <a:r>
+              <a:rPr lang="pl-PL" sz="1400" dirty="0">
+                <a:solidFill>
+                  <a:srgbClr val="D4D4D4"/>
+                </a:solidFill>
+                <a:latin typeface="Consolas" panose="020B0609020204030204" pitchFamily="49" charset="0"/>
+              </a:rPr>
+              <a:t>) {</a:t>
+            </a:r>
+          </a:p>
+          <a:p>
+            <a:r>
+              <a:rPr lang="pl-PL" sz="1400" dirty="0">
+                <a:solidFill>
+                  <a:srgbClr val="D4D4D4"/>
+                </a:solidFill>
+                <a:latin typeface="Consolas" panose="020B0609020204030204" pitchFamily="49" charset="0"/>
+              </a:rPr>
+              <a:t>    </a:t>
+            </a:r>
+            <a:r>
+              <a:rPr lang="pl-PL" sz="1400" dirty="0">
+                <a:solidFill>
+                  <a:srgbClr val="C586C0"/>
+                </a:solidFill>
+                <a:latin typeface="Consolas" panose="020B0609020204030204" pitchFamily="49" charset="0"/>
+              </a:rPr>
+              <a:t>return</a:t>
+            </a:r>
+            <a:r>
+              <a:rPr lang="pl-PL" sz="1400" dirty="0">
+                <a:solidFill>
+                  <a:srgbClr val="D4D4D4"/>
+                </a:solidFill>
+                <a:latin typeface="Consolas" panose="020B0609020204030204" pitchFamily="49" charset="0"/>
+              </a:rPr>
+              <a:t> { </a:t>
+            </a:r>
+            <a:r>
+              <a:rPr lang="pl-PL" sz="1400" dirty="0" err="1">
+                <a:solidFill>
+                  <a:srgbClr val="9CDCFE"/>
+                </a:solidFill>
+                <a:latin typeface="Consolas" panose="020B0609020204030204" pitchFamily="49" charset="0"/>
+              </a:rPr>
+              <a:t>type</a:t>
+            </a:r>
+            <a:r>
+              <a:rPr lang="pl-PL" sz="1400" dirty="0">
+                <a:solidFill>
+                  <a:srgbClr val="9CDCFE"/>
+                </a:solidFill>
+                <a:latin typeface="Consolas" panose="020B0609020204030204" pitchFamily="49" charset="0"/>
+              </a:rPr>
+              <a:t>:</a:t>
+            </a:r>
+            <a:r>
+              <a:rPr lang="pl-PL" sz="1400" dirty="0">
+                <a:solidFill>
+                  <a:srgbClr val="D4D4D4"/>
+                </a:solidFill>
+                <a:latin typeface="Consolas" panose="020B0609020204030204" pitchFamily="49" charset="0"/>
+              </a:rPr>
+              <a:t> </a:t>
+            </a:r>
+            <a:r>
+              <a:rPr lang="pl-PL" sz="1400" dirty="0">
+                <a:solidFill>
+                  <a:srgbClr val="9CDCFE"/>
+                </a:solidFill>
+                <a:latin typeface="Consolas" panose="020B0609020204030204" pitchFamily="49" charset="0"/>
+              </a:rPr>
+              <a:t>LOGIN</a:t>
+            </a:r>
+            <a:r>
+              <a:rPr lang="pl-PL" sz="1400" dirty="0">
+                <a:solidFill>
+                  <a:srgbClr val="D4D4D4"/>
+                </a:solidFill>
+                <a:latin typeface="Consolas" panose="020B0609020204030204" pitchFamily="49" charset="0"/>
+              </a:rPr>
+              <a:t>, </a:t>
+            </a:r>
+            <a:r>
+              <a:rPr lang="pl-PL" sz="1400" dirty="0" err="1">
+                <a:solidFill>
+                  <a:srgbClr val="9CDCFE"/>
+                </a:solidFill>
+                <a:latin typeface="Consolas" panose="020B0609020204030204" pitchFamily="49" charset="0"/>
+              </a:rPr>
+              <a:t>payload</a:t>
+            </a:r>
+            <a:r>
+              <a:rPr lang="pl-PL" sz="1400" dirty="0">
+                <a:solidFill>
+                  <a:srgbClr val="9CDCFE"/>
+                </a:solidFill>
+                <a:latin typeface="Consolas" panose="020B0609020204030204" pitchFamily="49" charset="0"/>
+              </a:rPr>
+              <a:t>:</a:t>
+            </a:r>
+            <a:r>
+              <a:rPr lang="pl-PL" sz="1400" dirty="0">
+                <a:solidFill>
+                  <a:srgbClr val="D4D4D4"/>
+                </a:solidFill>
+                <a:latin typeface="Consolas" panose="020B0609020204030204" pitchFamily="49" charset="0"/>
+              </a:rPr>
+              <a:t> </a:t>
+            </a:r>
+            <a:r>
+              <a:rPr lang="pl-PL" sz="1400" dirty="0" err="1">
+                <a:solidFill>
+                  <a:srgbClr val="9CDCFE"/>
+                </a:solidFill>
+                <a:latin typeface="Consolas" panose="020B0609020204030204" pitchFamily="49" charset="0"/>
+              </a:rPr>
+              <a:t>payload</a:t>
+            </a:r>
+            <a:r>
+              <a:rPr lang="pl-PL" sz="1400" dirty="0">
+                <a:solidFill>
+                  <a:srgbClr val="D4D4D4"/>
+                </a:solidFill>
+                <a:latin typeface="Consolas" panose="020B0609020204030204" pitchFamily="49" charset="0"/>
+              </a:rPr>
+              <a:t> }</a:t>
+            </a:r>
+          </a:p>
+          <a:p>
+            <a:r>
+              <a:rPr lang="pl-PL" sz="1400" dirty="0">
+                <a:solidFill>
+                  <a:srgbClr val="D4D4D4"/>
+                </a:solidFill>
+                <a:latin typeface="Consolas" panose="020B0609020204030204" pitchFamily="49" charset="0"/>
+              </a:rPr>
+              <a:t>}</a:t>
+            </a:r>
+            <a:br>
+              <a:rPr lang="pl-PL" sz="1400" dirty="0">
+                <a:solidFill>
+                  <a:srgbClr val="D4D4D4"/>
+                </a:solidFill>
+                <a:latin typeface="Consolas" panose="020B0609020204030204" pitchFamily="49" charset="0"/>
+              </a:rPr>
+            </a:br>
+            <a:r>
+              <a:rPr lang="pl-PL" sz="1400" dirty="0">
+                <a:solidFill>
+                  <a:srgbClr val="C586C0"/>
+                </a:solidFill>
+                <a:latin typeface="Consolas" panose="020B0609020204030204" pitchFamily="49" charset="0"/>
+              </a:rPr>
+              <a:t>export</a:t>
+            </a:r>
+            <a:r>
+              <a:rPr lang="pl-PL" sz="1400" dirty="0">
+                <a:solidFill>
+                  <a:srgbClr val="D4D4D4"/>
+                </a:solidFill>
+                <a:latin typeface="Consolas" panose="020B0609020204030204" pitchFamily="49" charset="0"/>
+              </a:rPr>
+              <a:t> </a:t>
+            </a:r>
+            <a:r>
+              <a:rPr lang="pl-PL" sz="1400" dirty="0" err="1">
+                <a:solidFill>
+                  <a:srgbClr val="569CD6"/>
+                </a:solidFill>
+                <a:latin typeface="Consolas" panose="020B0609020204030204" pitchFamily="49" charset="0"/>
+              </a:rPr>
+              <a:t>function</a:t>
+            </a:r>
+            <a:r>
+              <a:rPr lang="pl-PL" sz="1400" dirty="0">
+                <a:solidFill>
+                  <a:srgbClr val="D4D4D4"/>
+                </a:solidFill>
+                <a:latin typeface="Consolas" panose="020B0609020204030204" pitchFamily="49" charset="0"/>
+              </a:rPr>
+              <a:t> </a:t>
+            </a:r>
+            <a:r>
+              <a:rPr lang="pl-PL" sz="1400" dirty="0" err="1">
+                <a:solidFill>
+                  <a:srgbClr val="DCDCAA"/>
+                </a:solidFill>
+                <a:latin typeface="Consolas" panose="020B0609020204030204" pitchFamily="49" charset="0"/>
+              </a:rPr>
+              <a:t>decrement</a:t>
+            </a:r>
+            <a:r>
+              <a:rPr lang="pl-PL" sz="1400" dirty="0">
+                <a:solidFill>
+                  <a:srgbClr val="D4D4D4"/>
+                </a:solidFill>
+                <a:latin typeface="Consolas" panose="020B0609020204030204" pitchFamily="49" charset="0"/>
+              </a:rPr>
+              <a:t>() {</a:t>
+            </a:r>
+          </a:p>
+          <a:p>
+            <a:r>
+              <a:rPr lang="pl-PL" sz="1400" dirty="0">
+                <a:solidFill>
+                  <a:srgbClr val="D4D4D4"/>
+                </a:solidFill>
+                <a:latin typeface="Consolas" panose="020B0609020204030204" pitchFamily="49" charset="0"/>
+              </a:rPr>
+              <a:t>    </a:t>
+            </a:r>
+            <a:r>
+              <a:rPr lang="pl-PL" sz="1400" dirty="0">
+                <a:solidFill>
+                  <a:srgbClr val="C586C0"/>
+                </a:solidFill>
+                <a:latin typeface="Consolas" panose="020B0609020204030204" pitchFamily="49" charset="0"/>
+              </a:rPr>
+              <a:t>return</a:t>
+            </a:r>
+            <a:r>
+              <a:rPr lang="pl-PL" sz="1400" dirty="0">
+                <a:solidFill>
+                  <a:srgbClr val="D4D4D4"/>
+                </a:solidFill>
+                <a:latin typeface="Consolas" panose="020B0609020204030204" pitchFamily="49" charset="0"/>
+              </a:rPr>
+              <a:t> { </a:t>
+            </a:r>
+            <a:r>
+              <a:rPr lang="pl-PL" sz="1400" dirty="0" err="1">
+                <a:solidFill>
+                  <a:srgbClr val="9CDCFE"/>
+                </a:solidFill>
+                <a:latin typeface="Consolas" panose="020B0609020204030204" pitchFamily="49" charset="0"/>
+              </a:rPr>
+              <a:t>type</a:t>
+            </a:r>
+            <a:r>
+              <a:rPr lang="pl-PL" sz="1400" dirty="0">
+                <a:solidFill>
+                  <a:srgbClr val="9CDCFE"/>
+                </a:solidFill>
+                <a:latin typeface="Consolas" panose="020B0609020204030204" pitchFamily="49" charset="0"/>
+              </a:rPr>
+              <a:t>:</a:t>
+            </a:r>
+            <a:r>
+              <a:rPr lang="pl-PL" sz="1400" dirty="0">
+                <a:solidFill>
+                  <a:srgbClr val="D4D4D4"/>
+                </a:solidFill>
+                <a:latin typeface="Consolas" panose="020B0609020204030204" pitchFamily="49" charset="0"/>
+              </a:rPr>
+              <a:t> </a:t>
+            </a:r>
+            <a:r>
+              <a:rPr lang="pl-PL" sz="1400" dirty="0">
+                <a:solidFill>
+                  <a:srgbClr val="9CDCFE"/>
+                </a:solidFill>
+                <a:latin typeface="Consolas" panose="020B0609020204030204" pitchFamily="49" charset="0"/>
+              </a:rPr>
+              <a:t>LOGIN</a:t>
+            </a:r>
+            <a:r>
+              <a:rPr lang="pl-PL" sz="1400" dirty="0">
+                <a:solidFill>
+                  <a:srgbClr val="D4D4D4"/>
+                </a:solidFill>
+                <a:latin typeface="Consolas" panose="020B0609020204030204" pitchFamily="49" charset="0"/>
+              </a:rPr>
+              <a:t>, </a:t>
+            </a:r>
+            <a:r>
+              <a:rPr lang="pl-PL" sz="1400" dirty="0" err="1">
+                <a:solidFill>
+                  <a:srgbClr val="9CDCFE"/>
+                </a:solidFill>
+                <a:latin typeface="Consolas" panose="020B0609020204030204" pitchFamily="49" charset="0"/>
+              </a:rPr>
+              <a:t>payload</a:t>
+            </a:r>
+            <a:r>
+              <a:rPr lang="pl-PL" sz="1400" dirty="0">
+                <a:solidFill>
+                  <a:srgbClr val="9CDCFE"/>
+                </a:solidFill>
+                <a:latin typeface="Consolas" panose="020B0609020204030204" pitchFamily="49" charset="0"/>
+              </a:rPr>
+              <a:t>:</a:t>
+            </a:r>
+            <a:r>
+              <a:rPr lang="pl-PL" sz="1400" dirty="0">
+                <a:solidFill>
+                  <a:srgbClr val="D4D4D4"/>
+                </a:solidFill>
+                <a:latin typeface="Consolas" panose="020B0609020204030204" pitchFamily="49" charset="0"/>
+              </a:rPr>
+              <a:t> </a:t>
+            </a:r>
+            <a:r>
+              <a:rPr lang="pl-PL" sz="1400" dirty="0" err="1">
+                <a:solidFill>
+                  <a:srgbClr val="9CDCFE"/>
+                </a:solidFill>
+                <a:latin typeface="Consolas" panose="020B0609020204030204" pitchFamily="49" charset="0"/>
+              </a:rPr>
+              <a:t>payload</a:t>
+            </a:r>
+            <a:r>
+              <a:rPr lang="pl-PL" sz="1400" dirty="0">
+                <a:solidFill>
+                  <a:srgbClr val="D4D4D4"/>
+                </a:solidFill>
+                <a:latin typeface="Consolas" panose="020B0609020204030204" pitchFamily="49" charset="0"/>
+              </a:rPr>
+              <a:t> }</a:t>
+            </a:r>
+          </a:p>
+          <a:p>
+            <a:r>
+              <a:rPr lang="pl-PL" sz="1400" dirty="0">
+                <a:solidFill>
+                  <a:srgbClr val="D4D4D4"/>
+                </a:solidFill>
+                <a:latin typeface="Consolas" panose="020B0609020204030204" pitchFamily="49" charset="0"/>
+              </a:rPr>
+              <a:t>}</a:t>
+            </a:r>
+            <a:endParaRPr lang="pl-PL" sz="1400" b="0" dirty="0">
+              <a:solidFill>
+                <a:srgbClr val="D4D4D4"/>
+              </a:solidFill>
+              <a:effectLst/>
+              <a:latin typeface="Consolas" panose="020B0609020204030204" pitchFamily="49" charset="0"/>
+            </a:endParaRPr>
+          </a:p>
+        </p:txBody>
+      </p:sp>
+      <p:sp>
+        <p:nvSpPr>
+          <p:cNvPr id="8" name="pole tekstowe 7">
+            <a:extLst>
+              <a:ext uri="{FF2B5EF4-FFF2-40B4-BE49-F238E27FC236}">
+                <a16:creationId xmlns:a16="http://schemas.microsoft.com/office/drawing/2014/main" id="{ABFF2828-24D0-4EEA-806B-ED9304C32091}"/>
               </a:ext>
             </a:extLst>
           </p:cNvPr>
@@ -42032,8 +42776,8 @@
         </p:nvSpPr>
         <p:spPr>
           <a:xfrm>
-            <a:off x="497840" y="538480"/>
-            <a:ext cx="2103525" cy="369332"/>
+            <a:off x="497840" y="1111673"/>
+            <a:ext cx="856325" cy="369332"/>
           </a:xfrm>
           <a:prstGeom prst="rect">
             <a:avLst/>
@@ -42048,56 +42792,885 @@
           <a:p>
             <a:r>
               <a:rPr lang="pl-PL" dirty="0" err="1"/>
-              <a:t>Hooks</a:t>
-            </a:r>
-            <a:r>
-              <a:rPr lang="pl-PL" dirty="0"/>
-              <a:t> - </a:t>
-            </a:r>
-            <a:r>
-              <a:rPr lang="pl-PL" dirty="0" err="1"/>
-              <a:t>introduction</a:t>
+              <a:t>actions</a:t>
             </a:r>
             <a:endParaRPr lang="pl-PL" dirty="0"/>
           </a:p>
         </p:txBody>
       </p:sp>
-    </p:spTree>
-    <p:extLst>
-      <p:ext uri="{BB962C8B-B14F-4D97-AF65-F5344CB8AC3E}">
-        <p14:creationId xmlns:p14="http://schemas.microsoft.com/office/powerpoint/2010/main" val="2785540548"/>
-      </p:ext>
-    </p:extLst>
-  </p:cSld>
-  <p:clrMapOvr>
-    <a:masterClrMapping/>
-  </p:clrMapOvr>
-</p:sld>
-</file>
-
-<file path=ppt/slides/slide39.xml><?xml version="1.0" encoding="utf-8"?>
-<p:sld xmlns:a="http://schemas.openxmlformats.org/drawingml/2006/main" xmlns:r="http://schemas.openxmlformats.org/officeDocument/2006/relationships" xmlns:p="http://schemas.openxmlformats.org/presentationml/2006/main">
-  <p:cSld>
-    <p:spTree>
-      <p:nvGrpSpPr>
-        <p:cNvPr id="1" name=""/>
-        <p:cNvGrpSpPr/>
-        <p:nvPr/>
-      </p:nvGrpSpPr>
-      <p:grpSpPr>
-        <a:xfrm>
-          <a:off x="0" y="0"/>
-          <a:ext cx="0" cy="0"/>
-          <a:chOff x="0" y="0"/>
-          <a:chExt cx="0" cy="0"/>
-        </a:xfrm>
-      </p:grpSpPr>
       <p:sp>
         <p:nvSpPr>
-          <p:cNvPr id="4" name="pole tekstowe 3">
+          <p:cNvPr id="5" name="Prostokąt 4">
             <a:extLst>
               <a:ext uri="{FF2B5EF4-FFF2-40B4-BE49-F238E27FC236}">
-                <a16:creationId xmlns:a16="http://schemas.microsoft.com/office/drawing/2014/main" id="{F164A7B3-8808-414C-9401-3B25194E3B5A}"/>
+                <a16:creationId xmlns:a16="http://schemas.microsoft.com/office/drawing/2014/main" id="{1DBE36DD-B60E-49A5-8970-AD9BF81FC301}"/>
+              </a:ext>
+            </a:extLst>
+          </p:cNvPr>
+          <p:cNvSpPr/>
+          <p:nvPr/>
+        </p:nvSpPr>
+        <p:spPr>
+          <a:xfrm>
+            <a:off x="5459896" y="753205"/>
+            <a:ext cx="6732104" cy="3108543"/>
+          </a:xfrm>
+          <a:prstGeom prst="rect">
+            <a:avLst/>
+          </a:prstGeom>
+          <a:solidFill>
+            <a:schemeClr val="tx1"/>
+          </a:solidFill>
+        </p:spPr>
+        <p:txBody>
+          <a:bodyPr wrap="square">
+            <a:spAutoFit/>
+          </a:bodyPr>
+          <a:lstStyle/>
+          <a:p>
+            <a:r>
+              <a:rPr lang="pl-PL" sz="1400" dirty="0">
+                <a:solidFill>
+                  <a:srgbClr val="C586C0"/>
+                </a:solidFill>
+                <a:latin typeface="Consolas" panose="020B0609020204030204" pitchFamily="49" charset="0"/>
+              </a:rPr>
+              <a:t>import</a:t>
+            </a:r>
+            <a:r>
+              <a:rPr lang="pl-PL" sz="1400" dirty="0">
+                <a:solidFill>
+                  <a:srgbClr val="D4D4D4"/>
+                </a:solidFill>
+                <a:latin typeface="Consolas" panose="020B0609020204030204" pitchFamily="49" charset="0"/>
+              </a:rPr>
+              <a:t> {</a:t>
+            </a:r>
+            <a:r>
+              <a:rPr lang="pl-PL" sz="1400" dirty="0">
+                <a:solidFill>
+                  <a:srgbClr val="9CDCFE"/>
+                </a:solidFill>
+                <a:latin typeface="Consolas" panose="020B0609020204030204" pitchFamily="49" charset="0"/>
+              </a:rPr>
+              <a:t>INCREMENT</a:t>
+            </a:r>
+            <a:r>
+              <a:rPr lang="pl-PL" sz="1400" dirty="0">
+                <a:solidFill>
+                  <a:srgbClr val="D4D4D4"/>
+                </a:solidFill>
+                <a:latin typeface="Consolas" panose="020B0609020204030204" pitchFamily="49" charset="0"/>
+              </a:rPr>
+              <a:t>, </a:t>
+            </a:r>
+            <a:r>
+              <a:rPr lang="pl-PL" sz="1400" dirty="0">
+                <a:solidFill>
+                  <a:srgbClr val="9CDCFE"/>
+                </a:solidFill>
+                <a:latin typeface="Consolas" panose="020B0609020204030204" pitchFamily="49" charset="0"/>
+              </a:rPr>
+              <a:t>DECREMENT</a:t>
+            </a:r>
+            <a:r>
+              <a:rPr lang="pl-PL" sz="1400" dirty="0">
+                <a:solidFill>
+                  <a:srgbClr val="D4D4D4"/>
+                </a:solidFill>
+                <a:latin typeface="Consolas" panose="020B0609020204030204" pitchFamily="49" charset="0"/>
+              </a:rPr>
+              <a:t>} </a:t>
+            </a:r>
+            <a:r>
+              <a:rPr lang="pl-PL" sz="1400" dirty="0">
+                <a:solidFill>
+                  <a:srgbClr val="C586C0"/>
+                </a:solidFill>
+                <a:latin typeface="Consolas" panose="020B0609020204030204" pitchFamily="49" charset="0"/>
+              </a:rPr>
+              <a:t>from</a:t>
+            </a:r>
+            <a:r>
+              <a:rPr lang="pl-PL" sz="1400" dirty="0">
+                <a:solidFill>
+                  <a:srgbClr val="D4D4D4"/>
+                </a:solidFill>
+                <a:latin typeface="Consolas" panose="020B0609020204030204" pitchFamily="49" charset="0"/>
+              </a:rPr>
+              <a:t> </a:t>
+            </a:r>
+            <a:r>
+              <a:rPr lang="pl-PL" sz="1400" dirty="0">
+                <a:solidFill>
+                  <a:srgbClr val="CE9178"/>
+                </a:solidFill>
+                <a:latin typeface="Consolas" panose="020B0609020204030204" pitchFamily="49" charset="0"/>
+              </a:rPr>
+              <a:t>'../</a:t>
+            </a:r>
+            <a:r>
+              <a:rPr lang="pl-PL" sz="1400" dirty="0" err="1">
+                <a:solidFill>
+                  <a:srgbClr val="CE9178"/>
+                </a:solidFill>
+                <a:latin typeface="Consolas" panose="020B0609020204030204" pitchFamily="49" charset="0"/>
+              </a:rPr>
+              <a:t>Actions</a:t>
+            </a:r>
+            <a:r>
+              <a:rPr lang="pl-PL" sz="1400" dirty="0">
+                <a:solidFill>
+                  <a:srgbClr val="CE9178"/>
+                </a:solidFill>
+                <a:latin typeface="Consolas" panose="020B0609020204030204" pitchFamily="49" charset="0"/>
+              </a:rPr>
+              <a:t>/</a:t>
+            </a:r>
+            <a:r>
+              <a:rPr lang="pl-PL" sz="1400" dirty="0" err="1">
+                <a:solidFill>
+                  <a:srgbClr val="CE9178"/>
+                </a:solidFill>
+                <a:latin typeface="Consolas" panose="020B0609020204030204" pitchFamily="49" charset="0"/>
+              </a:rPr>
+              <a:t>counter.actions</a:t>
+            </a:r>
+            <a:r>
+              <a:rPr lang="pl-PL" sz="1400" dirty="0">
+                <a:solidFill>
+                  <a:srgbClr val="CE9178"/>
+                </a:solidFill>
+                <a:latin typeface="Consolas" panose="020B0609020204030204" pitchFamily="49" charset="0"/>
+              </a:rPr>
+              <a:t>'</a:t>
+            </a:r>
+            <a:r>
+              <a:rPr lang="pl-PL" sz="1400" dirty="0">
+                <a:solidFill>
+                  <a:srgbClr val="D4D4D4"/>
+                </a:solidFill>
+                <a:latin typeface="Consolas" panose="020B0609020204030204" pitchFamily="49" charset="0"/>
+              </a:rPr>
+              <a:t>;</a:t>
+            </a:r>
+            <a:br>
+              <a:rPr lang="pl-PL" sz="1400" dirty="0">
+                <a:solidFill>
+                  <a:srgbClr val="D4D4D4"/>
+                </a:solidFill>
+                <a:latin typeface="Consolas" panose="020B0609020204030204" pitchFamily="49" charset="0"/>
+              </a:rPr>
+            </a:br>
+            <a:r>
+              <a:rPr lang="pl-PL" sz="1400" dirty="0" err="1">
+                <a:solidFill>
+                  <a:srgbClr val="569CD6"/>
+                </a:solidFill>
+                <a:latin typeface="Consolas" panose="020B0609020204030204" pitchFamily="49" charset="0"/>
+              </a:rPr>
+              <a:t>const</a:t>
+            </a:r>
+            <a:r>
+              <a:rPr lang="pl-PL" sz="1400" dirty="0">
+                <a:solidFill>
+                  <a:srgbClr val="D4D4D4"/>
+                </a:solidFill>
+                <a:latin typeface="Consolas" panose="020B0609020204030204" pitchFamily="49" charset="0"/>
+              </a:rPr>
+              <a:t> </a:t>
+            </a:r>
+            <a:r>
+              <a:rPr lang="pl-PL" sz="1400" dirty="0" err="1">
+                <a:solidFill>
+                  <a:srgbClr val="9CDCFE"/>
+                </a:solidFill>
+                <a:latin typeface="Consolas" panose="020B0609020204030204" pitchFamily="49" charset="0"/>
+              </a:rPr>
+              <a:t>initialState</a:t>
+            </a:r>
+            <a:r>
+              <a:rPr lang="pl-PL" sz="1400" dirty="0">
+                <a:solidFill>
+                  <a:srgbClr val="D4D4D4"/>
+                </a:solidFill>
+                <a:latin typeface="Consolas" panose="020B0609020204030204" pitchFamily="49" charset="0"/>
+              </a:rPr>
+              <a:t> = {</a:t>
+            </a:r>
+          </a:p>
+          <a:p>
+            <a:r>
+              <a:rPr lang="pl-PL" sz="1400" dirty="0">
+                <a:solidFill>
+                  <a:srgbClr val="D4D4D4"/>
+                </a:solidFill>
+                <a:latin typeface="Consolas" panose="020B0609020204030204" pitchFamily="49" charset="0"/>
+              </a:rPr>
+              <a:t>    </a:t>
+            </a:r>
+            <a:r>
+              <a:rPr lang="pl-PL" sz="1400" dirty="0" err="1">
+                <a:solidFill>
+                  <a:srgbClr val="9CDCFE"/>
+                </a:solidFill>
+                <a:latin typeface="Consolas" panose="020B0609020204030204" pitchFamily="49" charset="0"/>
+              </a:rPr>
+              <a:t>counter</a:t>
+            </a:r>
+            <a:r>
+              <a:rPr lang="pl-PL" sz="1400" dirty="0">
+                <a:solidFill>
+                  <a:srgbClr val="9CDCFE"/>
+                </a:solidFill>
+                <a:latin typeface="Consolas" panose="020B0609020204030204" pitchFamily="49" charset="0"/>
+              </a:rPr>
+              <a:t>:</a:t>
+            </a:r>
+            <a:r>
+              <a:rPr lang="pl-PL" sz="1400" dirty="0">
+                <a:solidFill>
+                  <a:srgbClr val="D4D4D4"/>
+                </a:solidFill>
+                <a:latin typeface="Consolas" panose="020B0609020204030204" pitchFamily="49" charset="0"/>
+              </a:rPr>
+              <a:t> </a:t>
+            </a:r>
+            <a:r>
+              <a:rPr lang="pl-PL" sz="1400" dirty="0">
+                <a:solidFill>
+                  <a:srgbClr val="B5CEA8"/>
+                </a:solidFill>
+                <a:latin typeface="Consolas" panose="020B0609020204030204" pitchFamily="49" charset="0"/>
+              </a:rPr>
+              <a:t>0</a:t>
+            </a:r>
+            <a:endParaRPr lang="pl-PL" sz="1400" dirty="0">
+              <a:solidFill>
+                <a:srgbClr val="D4D4D4"/>
+              </a:solidFill>
+              <a:latin typeface="Consolas" panose="020B0609020204030204" pitchFamily="49" charset="0"/>
+            </a:endParaRPr>
+          </a:p>
+          <a:p>
+            <a:r>
+              <a:rPr lang="pl-PL" sz="1400" dirty="0">
+                <a:solidFill>
+                  <a:srgbClr val="D4D4D4"/>
+                </a:solidFill>
+                <a:latin typeface="Consolas" panose="020B0609020204030204" pitchFamily="49" charset="0"/>
+              </a:rPr>
+              <a:t>}</a:t>
+            </a:r>
+            <a:br>
+              <a:rPr lang="pl-PL" sz="1400" dirty="0">
+                <a:solidFill>
+                  <a:srgbClr val="D4D4D4"/>
+                </a:solidFill>
+                <a:latin typeface="Consolas" panose="020B0609020204030204" pitchFamily="49" charset="0"/>
+              </a:rPr>
+            </a:br>
+            <a:r>
+              <a:rPr lang="pl-PL" sz="1400" dirty="0" err="1">
+                <a:solidFill>
+                  <a:srgbClr val="569CD6"/>
+                </a:solidFill>
+                <a:latin typeface="Consolas" panose="020B0609020204030204" pitchFamily="49" charset="0"/>
+              </a:rPr>
+              <a:t>function</a:t>
+            </a:r>
+            <a:r>
+              <a:rPr lang="pl-PL" sz="1400" dirty="0">
+                <a:solidFill>
+                  <a:srgbClr val="D4D4D4"/>
+                </a:solidFill>
+                <a:latin typeface="Consolas" panose="020B0609020204030204" pitchFamily="49" charset="0"/>
+              </a:rPr>
+              <a:t> </a:t>
+            </a:r>
+            <a:r>
+              <a:rPr lang="pl-PL" sz="1400" dirty="0" err="1">
+                <a:solidFill>
+                  <a:srgbClr val="DCDCAA"/>
+                </a:solidFill>
+                <a:latin typeface="Consolas" panose="020B0609020204030204" pitchFamily="49" charset="0"/>
+              </a:rPr>
+              <a:t>counterReducer</a:t>
+            </a:r>
+            <a:r>
+              <a:rPr lang="pl-PL" sz="1400" dirty="0">
+                <a:solidFill>
+                  <a:srgbClr val="D4D4D4"/>
+                </a:solidFill>
+                <a:latin typeface="Consolas" panose="020B0609020204030204" pitchFamily="49" charset="0"/>
+              </a:rPr>
+              <a:t>(</a:t>
+            </a:r>
+            <a:r>
+              <a:rPr lang="pl-PL" sz="1400" dirty="0" err="1">
+                <a:solidFill>
+                  <a:srgbClr val="9CDCFE"/>
+                </a:solidFill>
+                <a:latin typeface="Consolas" panose="020B0609020204030204" pitchFamily="49" charset="0"/>
+              </a:rPr>
+              <a:t>state</a:t>
+            </a:r>
+            <a:r>
+              <a:rPr lang="pl-PL" sz="1400" dirty="0">
+                <a:solidFill>
+                  <a:srgbClr val="D4D4D4"/>
+                </a:solidFill>
+                <a:latin typeface="Consolas" panose="020B0609020204030204" pitchFamily="49" charset="0"/>
+              </a:rPr>
+              <a:t> = </a:t>
+            </a:r>
+            <a:r>
+              <a:rPr lang="pl-PL" sz="1400" dirty="0" err="1">
+                <a:solidFill>
+                  <a:srgbClr val="9CDCFE"/>
+                </a:solidFill>
+                <a:latin typeface="Consolas" panose="020B0609020204030204" pitchFamily="49" charset="0"/>
+              </a:rPr>
+              <a:t>initialState</a:t>
+            </a:r>
+            <a:r>
+              <a:rPr lang="pl-PL" sz="1400" dirty="0">
+                <a:solidFill>
+                  <a:srgbClr val="D4D4D4"/>
+                </a:solidFill>
+                <a:latin typeface="Consolas" panose="020B0609020204030204" pitchFamily="49" charset="0"/>
+              </a:rPr>
+              <a:t>, </a:t>
+            </a:r>
+            <a:r>
+              <a:rPr lang="pl-PL" sz="1400" dirty="0" err="1">
+                <a:solidFill>
+                  <a:srgbClr val="9CDCFE"/>
+                </a:solidFill>
+                <a:latin typeface="Consolas" panose="020B0609020204030204" pitchFamily="49" charset="0"/>
+              </a:rPr>
+              <a:t>action</a:t>
+            </a:r>
+            <a:r>
+              <a:rPr lang="pl-PL" sz="1400" dirty="0">
+                <a:solidFill>
+                  <a:srgbClr val="D4D4D4"/>
+                </a:solidFill>
+                <a:latin typeface="Consolas" panose="020B0609020204030204" pitchFamily="49" charset="0"/>
+              </a:rPr>
+              <a:t>) {</a:t>
+            </a:r>
+          </a:p>
+          <a:p>
+            <a:r>
+              <a:rPr lang="pl-PL" sz="1400" dirty="0">
+                <a:solidFill>
+                  <a:srgbClr val="D4D4D4"/>
+                </a:solidFill>
+                <a:latin typeface="Consolas" panose="020B0609020204030204" pitchFamily="49" charset="0"/>
+              </a:rPr>
+              <a:t>    </a:t>
+            </a:r>
+            <a:r>
+              <a:rPr lang="pl-PL" sz="1400" dirty="0" err="1">
+                <a:solidFill>
+                  <a:srgbClr val="C586C0"/>
+                </a:solidFill>
+                <a:latin typeface="Consolas" panose="020B0609020204030204" pitchFamily="49" charset="0"/>
+              </a:rPr>
+              <a:t>switch</a:t>
+            </a:r>
+            <a:r>
+              <a:rPr lang="pl-PL" sz="1400" dirty="0">
+                <a:solidFill>
+                  <a:srgbClr val="D4D4D4"/>
+                </a:solidFill>
+                <a:latin typeface="Consolas" panose="020B0609020204030204" pitchFamily="49" charset="0"/>
+              </a:rPr>
+              <a:t>(</a:t>
+            </a:r>
+            <a:r>
+              <a:rPr lang="pl-PL" sz="1400" dirty="0" err="1">
+                <a:solidFill>
+                  <a:srgbClr val="9CDCFE"/>
+                </a:solidFill>
+                <a:latin typeface="Consolas" panose="020B0609020204030204" pitchFamily="49" charset="0"/>
+              </a:rPr>
+              <a:t>action</a:t>
+            </a:r>
+            <a:r>
+              <a:rPr lang="pl-PL" sz="1400" dirty="0" err="1">
+                <a:solidFill>
+                  <a:srgbClr val="D4D4D4"/>
+                </a:solidFill>
+                <a:latin typeface="Consolas" panose="020B0609020204030204" pitchFamily="49" charset="0"/>
+              </a:rPr>
+              <a:t>.</a:t>
+            </a:r>
+            <a:r>
+              <a:rPr lang="pl-PL" sz="1400" dirty="0" err="1">
+                <a:solidFill>
+                  <a:srgbClr val="9CDCFE"/>
+                </a:solidFill>
+                <a:latin typeface="Consolas" panose="020B0609020204030204" pitchFamily="49" charset="0"/>
+              </a:rPr>
+              <a:t>type</a:t>
+            </a:r>
+            <a:r>
+              <a:rPr lang="pl-PL" sz="1400" dirty="0">
+                <a:solidFill>
+                  <a:srgbClr val="D4D4D4"/>
+                </a:solidFill>
+                <a:latin typeface="Consolas" panose="020B0609020204030204" pitchFamily="49" charset="0"/>
+              </a:rPr>
+              <a:t>) {</a:t>
+            </a:r>
+          </a:p>
+          <a:p>
+            <a:r>
+              <a:rPr lang="pl-PL" sz="1400" dirty="0">
+                <a:solidFill>
+                  <a:srgbClr val="D4D4D4"/>
+                </a:solidFill>
+                <a:latin typeface="Consolas" panose="020B0609020204030204" pitchFamily="49" charset="0"/>
+              </a:rPr>
+              <a:t>        </a:t>
+            </a:r>
+            <a:r>
+              <a:rPr lang="pl-PL" sz="1400" dirty="0" err="1">
+                <a:solidFill>
+                  <a:srgbClr val="C586C0"/>
+                </a:solidFill>
+                <a:latin typeface="Consolas" panose="020B0609020204030204" pitchFamily="49" charset="0"/>
+              </a:rPr>
+              <a:t>case</a:t>
+            </a:r>
+            <a:r>
+              <a:rPr lang="pl-PL" sz="1400" dirty="0">
+                <a:solidFill>
+                  <a:srgbClr val="D4D4D4"/>
+                </a:solidFill>
+                <a:latin typeface="Consolas" panose="020B0609020204030204" pitchFamily="49" charset="0"/>
+              </a:rPr>
+              <a:t> </a:t>
+            </a:r>
+            <a:r>
+              <a:rPr lang="pl-PL" sz="1400" dirty="0">
+                <a:solidFill>
+                  <a:srgbClr val="9CDCFE"/>
+                </a:solidFill>
+                <a:latin typeface="Consolas" panose="020B0609020204030204" pitchFamily="49" charset="0"/>
+              </a:rPr>
+              <a:t>INCREMENT</a:t>
+            </a:r>
+            <a:r>
+              <a:rPr lang="pl-PL" sz="1400" dirty="0">
+                <a:solidFill>
+                  <a:srgbClr val="D4D4D4"/>
+                </a:solidFill>
+                <a:latin typeface="Consolas" panose="020B0609020204030204" pitchFamily="49" charset="0"/>
+              </a:rPr>
+              <a:t> :</a:t>
+            </a:r>
+          </a:p>
+          <a:p>
+            <a:r>
+              <a:rPr lang="pl-PL" sz="1400" dirty="0">
+                <a:solidFill>
+                  <a:srgbClr val="D4D4D4"/>
+                </a:solidFill>
+                <a:latin typeface="Consolas" panose="020B0609020204030204" pitchFamily="49" charset="0"/>
+              </a:rPr>
+              <a:t>            </a:t>
+            </a:r>
+            <a:r>
+              <a:rPr lang="pl-PL" sz="1400" dirty="0">
+                <a:solidFill>
+                  <a:srgbClr val="C586C0"/>
+                </a:solidFill>
+                <a:latin typeface="Consolas" panose="020B0609020204030204" pitchFamily="49" charset="0"/>
+              </a:rPr>
+              <a:t>return</a:t>
+            </a:r>
+            <a:r>
+              <a:rPr lang="pl-PL" sz="1400" dirty="0">
+                <a:solidFill>
+                  <a:srgbClr val="D4D4D4"/>
+                </a:solidFill>
+                <a:latin typeface="Consolas" panose="020B0609020204030204" pitchFamily="49" charset="0"/>
+              </a:rPr>
+              <a:t> {</a:t>
+            </a:r>
+            <a:r>
+              <a:rPr lang="pl-PL" sz="1400" dirty="0" err="1">
+                <a:solidFill>
+                  <a:srgbClr val="9CDCFE"/>
+                </a:solidFill>
+                <a:latin typeface="Consolas" panose="020B0609020204030204" pitchFamily="49" charset="0"/>
+              </a:rPr>
+              <a:t>counter</a:t>
+            </a:r>
+            <a:r>
+              <a:rPr lang="pl-PL" sz="1400" dirty="0">
+                <a:solidFill>
+                  <a:srgbClr val="D4D4D4"/>
+                </a:solidFill>
+                <a:latin typeface="Consolas" panose="020B0609020204030204" pitchFamily="49" charset="0"/>
+              </a:rPr>
+              <a:t> = </a:t>
+            </a:r>
+            <a:r>
+              <a:rPr lang="pl-PL" sz="1400" dirty="0" err="1">
+                <a:solidFill>
+                  <a:srgbClr val="9CDCFE"/>
+                </a:solidFill>
+                <a:latin typeface="Consolas" panose="020B0609020204030204" pitchFamily="49" charset="0"/>
+              </a:rPr>
+              <a:t>state</a:t>
+            </a:r>
+            <a:r>
+              <a:rPr lang="pl-PL" sz="1400" dirty="0" err="1">
+                <a:solidFill>
+                  <a:srgbClr val="D4D4D4"/>
+                </a:solidFill>
+                <a:latin typeface="Consolas" panose="020B0609020204030204" pitchFamily="49" charset="0"/>
+              </a:rPr>
+              <a:t>.</a:t>
+            </a:r>
+            <a:r>
+              <a:rPr lang="pl-PL" sz="1400" dirty="0" err="1">
+                <a:solidFill>
+                  <a:srgbClr val="9CDCFE"/>
+                </a:solidFill>
+                <a:latin typeface="Consolas" panose="020B0609020204030204" pitchFamily="49" charset="0"/>
+              </a:rPr>
+              <a:t>counter</a:t>
+            </a:r>
+            <a:r>
+              <a:rPr lang="pl-PL" sz="1400" dirty="0">
+                <a:solidFill>
+                  <a:srgbClr val="D4D4D4"/>
+                </a:solidFill>
+                <a:latin typeface="Consolas" panose="020B0609020204030204" pitchFamily="49" charset="0"/>
+              </a:rPr>
+              <a:t> + </a:t>
+            </a:r>
+            <a:r>
+              <a:rPr lang="pl-PL" sz="1400" dirty="0" err="1">
+                <a:solidFill>
+                  <a:srgbClr val="9CDCFE"/>
+                </a:solidFill>
+                <a:latin typeface="Consolas" panose="020B0609020204030204" pitchFamily="49" charset="0"/>
+              </a:rPr>
+              <a:t>action</a:t>
+            </a:r>
+            <a:r>
+              <a:rPr lang="pl-PL" sz="1400" dirty="0" err="1">
+                <a:solidFill>
+                  <a:srgbClr val="D4D4D4"/>
+                </a:solidFill>
+                <a:latin typeface="Consolas" panose="020B0609020204030204" pitchFamily="49" charset="0"/>
+              </a:rPr>
+              <a:t>.</a:t>
+            </a:r>
+            <a:r>
+              <a:rPr lang="pl-PL" sz="1400" dirty="0" err="1">
+                <a:solidFill>
+                  <a:srgbClr val="9CDCFE"/>
+                </a:solidFill>
+                <a:latin typeface="Consolas" panose="020B0609020204030204" pitchFamily="49" charset="0"/>
+              </a:rPr>
+              <a:t>payload</a:t>
+            </a:r>
+            <a:r>
+              <a:rPr lang="pl-PL" sz="1400" dirty="0">
+                <a:solidFill>
+                  <a:srgbClr val="D4D4D4"/>
+                </a:solidFill>
+                <a:latin typeface="Consolas" panose="020B0609020204030204" pitchFamily="49" charset="0"/>
+              </a:rPr>
+              <a:t>}</a:t>
+            </a:r>
+          </a:p>
+          <a:p>
+            <a:r>
+              <a:rPr lang="pl-PL" sz="1400" dirty="0">
+                <a:solidFill>
+                  <a:srgbClr val="D4D4D4"/>
+                </a:solidFill>
+                <a:latin typeface="Consolas" panose="020B0609020204030204" pitchFamily="49" charset="0"/>
+              </a:rPr>
+              <a:t>        </a:t>
+            </a:r>
+            <a:r>
+              <a:rPr lang="pl-PL" sz="1400" dirty="0" err="1">
+                <a:solidFill>
+                  <a:srgbClr val="C586C0"/>
+                </a:solidFill>
+                <a:latin typeface="Consolas" panose="020B0609020204030204" pitchFamily="49" charset="0"/>
+              </a:rPr>
+              <a:t>case</a:t>
+            </a:r>
+            <a:r>
+              <a:rPr lang="pl-PL" sz="1400" dirty="0">
+                <a:solidFill>
+                  <a:srgbClr val="D4D4D4"/>
+                </a:solidFill>
+                <a:latin typeface="Consolas" panose="020B0609020204030204" pitchFamily="49" charset="0"/>
+              </a:rPr>
+              <a:t> </a:t>
+            </a:r>
+            <a:r>
+              <a:rPr lang="pl-PL" sz="1400" dirty="0">
+                <a:solidFill>
+                  <a:srgbClr val="9CDCFE"/>
+                </a:solidFill>
+                <a:latin typeface="Consolas" panose="020B0609020204030204" pitchFamily="49" charset="0"/>
+              </a:rPr>
+              <a:t>DECREMENT</a:t>
+            </a:r>
+            <a:r>
+              <a:rPr lang="pl-PL" sz="1400" dirty="0">
+                <a:solidFill>
+                  <a:srgbClr val="D4D4D4"/>
+                </a:solidFill>
+                <a:latin typeface="Consolas" panose="020B0609020204030204" pitchFamily="49" charset="0"/>
+              </a:rPr>
+              <a:t> :</a:t>
+            </a:r>
+          </a:p>
+          <a:p>
+            <a:r>
+              <a:rPr lang="pl-PL" sz="1400" dirty="0">
+                <a:solidFill>
+                  <a:srgbClr val="D4D4D4"/>
+                </a:solidFill>
+                <a:latin typeface="Consolas" panose="020B0609020204030204" pitchFamily="49" charset="0"/>
+              </a:rPr>
+              <a:t>            </a:t>
+            </a:r>
+            <a:r>
+              <a:rPr lang="pl-PL" sz="1400" dirty="0">
+                <a:solidFill>
+                  <a:srgbClr val="C586C0"/>
+                </a:solidFill>
+                <a:latin typeface="Consolas" panose="020B0609020204030204" pitchFamily="49" charset="0"/>
+              </a:rPr>
+              <a:t>return</a:t>
+            </a:r>
+            <a:r>
+              <a:rPr lang="pl-PL" sz="1400" dirty="0">
+                <a:solidFill>
+                  <a:srgbClr val="D4D4D4"/>
+                </a:solidFill>
+                <a:latin typeface="Consolas" panose="020B0609020204030204" pitchFamily="49" charset="0"/>
+              </a:rPr>
+              <a:t> {</a:t>
+            </a:r>
+            <a:r>
+              <a:rPr lang="pl-PL" sz="1400" dirty="0" err="1">
+                <a:solidFill>
+                  <a:srgbClr val="9CDCFE"/>
+                </a:solidFill>
+                <a:latin typeface="Consolas" panose="020B0609020204030204" pitchFamily="49" charset="0"/>
+              </a:rPr>
+              <a:t>counter</a:t>
+            </a:r>
+            <a:r>
+              <a:rPr lang="pl-PL" sz="1400" dirty="0">
+                <a:solidFill>
+                  <a:srgbClr val="D4D4D4"/>
+                </a:solidFill>
+                <a:latin typeface="Consolas" panose="020B0609020204030204" pitchFamily="49" charset="0"/>
+              </a:rPr>
+              <a:t> = </a:t>
+            </a:r>
+            <a:r>
+              <a:rPr lang="pl-PL" sz="1400" dirty="0" err="1">
+                <a:solidFill>
+                  <a:srgbClr val="9CDCFE"/>
+                </a:solidFill>
+                <a:latin typeface="Consolas" panose="020B0609020204030204" pitchFamily="49" charset="0"/>
+              </a:rPr>
+              <a:t>state</a:t>
+            </a:r>
+            <a:r>
+              <a:rPr lang="pl-PL" sz="1400" dirty="0" err="1">
+                <a:solidFill>
+                  <a:srgbClr val="D4D4D4"/>
+                </a:solidFill>
+                <a:latin typeface="Consolas" panose="020B0609020204030204" pitchFamily="49" charset="0"/>
+              </a:rPr>
+              <a:t>.</a:t>
+            </a:r>
+            <a:r>
+              <a:rPr lang="pl-PL" sz="1400" dirty="0" err="1">
+                <a:solidFill>
+                  <a:srgbClr val="9CDCFE"/>
+                </a:solidFill>
+                <a:latin typeface="Consolas" panose="020B0609020204030204" pitchFamily="49" charset="0"/>
+              </a:rPr>
+              <a:t>counter</a:t>
+            </a:r>
+            <a:r>
+              <a:rPr lang="pl-PL" sz="1400" dirty="0">
+                <a:solidFill>
+                  <a:srgbClr val="D4D4D4"/>
+                </a:solidFill>
+                <a:latin typeface="Consolas" panose="020B0609020204030204" pitchFamily="49" charset="0"/>
+              </a:rPr>
+              <a:t> - </a:t>
+            </a:r>
+            <a:r>
+              <a:rPr lang="pl-PL" sz="1400" dirty="0" err="1">
+                <a:solidFill>
+                  <a:srgbClr val="9CDCFE"/>
+                </a:solidFill>
+                <a:latin typeface="Consolas" panose="020B0609020204030204" pitchFamily="49" charset="0"/>
+              </a:rPr>
+              <a:t>action</a:t>
+            </a:r>
+            <a:r>
+              <a:rPr lang="pl-PL" sz="1400" dirty="0" err="1">
+                <a:solidFill>
+                  <a:srgbClr val="D4D4D4"/>
+                </a:solidFill>
+                <a:latin typeface="Consolas" panose="020B0609020204030204" pitchFamily="49" charset="0"/>
+              </a:rPr>
+              <a:t>.</a:t>
+            </a:r>
+            <a:r>
+              <a:rPr lang="pl-PL" sz="1400" dirty="0" err="1">
+                <a:solidFill>
+                  <a:srgbClr val="9CDCFE"/>
+                </a:solidFill>
+                <a:latin typeface="Consolas" panose="020B0609020204030204" pitchFamily="49" charset="0"/>
+              </a:rPr>
+              <a:t>payload</a:t>
+            </a:r>
+            <a:r>
+              <a:rPr lang="pl-PL" sz="1400" dirty="0">
+                <a:solidFill>
+                  <a:srgbClr val="D4D4D4"/>
+                </a:solidFill>
+                <a:latin typeface="Consolas" panose="020B0609020204030204" pitchFamily="49" charset="0"/>
+              </a:rPr>
+              <a:t>}</a:t>
+            </a:r>
+          </a:p>
+          <a:p>
+            <a:r>
+              <a:rPr lang="pl-PL" sz="1400" dirty="0">
+                <a:solidFill>
+                  <a:srgbClr val="D4D4D4"/>
+                </a:solidFill>
+                <a:latin typeface="Consolas" panose="020B0609020204030204" pitchFamily="49" charset="0"/>
+              </a:rPr>
+              <a:t>        </a:t>
+            </a:r>
+            <a:r>
+              <a:rPr lang="pl-PL" sz="1400" dirty="0" err="1">
+                <a:solidFill>
+                  <a:srgbClr val="C586C0"/>
+                </a:solidFill>
+                <a:latin typeface="Consolas" panose="020B0609020204030204" pitchFamily="49" charset="0"/>
+              </a:rPr>
+              <a:t>default</a:t>
+            </a:r>
+            <a:r>
+              <a:rPr lang="pl-PL" sz="1400" dirty="0">
+                <a:solidFill>
+                  <a:srgbClr val="D4D4D4"/>
+                </a:solidFill>
+                <a:latin typeface="Consolas" panose="020B0609020204030204" pitchFamily="49" charset="0"/>
+              </a:rPr>
+              <a:t>: </a:t>
+            </a:r>
+          </a:p>
+          <a:p>
+            <a:r>
+              <a:rPr lang="pl-PL" sz="1400" dirty="0">
+                <a:solidFill>
+                  <a:srgbClr val="D4D4D4"/>
+                </a:solidFill>
+                <a:latin typeface="Consolas" panose="020B0609020204030204" pitchFamily="49" charset="0"/>
+              </a:rPr>
+              <a:t>            </a:t>
+            </a:r>
+            <a:r>
+              <a:rPr lang="pl-PL" sz="1400" dirty="0">
+                <a:solidFill>
+                  <a:srgbClr val="C586C0"/>
+                </a:solidFill>
+                <a:latin typeface="Consolas" panose="020B0609020204030204" pitchFamily="49" charset="0"/>
+              </a:rPr>
+              <a:t>return</a:t>
+            </a:r>
+            <a:r>
+              <a:rPr lang="pl-PL" sz="1400" dirty="0">
+                <a:solidFill>
+                  <a:srgbClr val="D4D4D4"/>
+                </a:solidFill>
+                <a:latin typeface="Consolas" panose="020B0609020204030204" pitchFamily="49" charset="0"/>
+              </a:rPr>
+              <a:t> </a:t>
+            </a:r>
+            <a:r>
+              <a:rPr lang="pl-PL" sz="1400" dirty="0" err="1">
+                <a:solidFill>
+                  <a:srgbClr val="9CDCFE"/>
+                </a:solidFill>
+                <a:latin typeface="Consolas" panose="020B0609020204030204" pitchFamily="49" charset="0"/>
+              </a:rPr>
+              <a:t>state</a:t>
+            </a:r>
+            <a:r>
+              <a:rPr lang="pl-PL" sz="1400" dirty="0">
+                <a:solidFill>
+                  <a:srgbClr val="D4D4D4"/>
+                </a:solidFill>
+                <a:latin typeface="Consolas" panose="020B0609020204030204" pitchFamily="49" charset="0"/>
+              </a:rPr>
+              <a:t>;</a:t>
+            </a:r>
+          </a:p>
+          <a:p>
+            <a:r>
+              <a:rPr lang="pl-PL" sz="1400" dirty="0">
+                <a:solidFill>
+                  <a:srgbClr val="D4D4D4"/>
+                </a:solidFill>
+                <a:latin typeface="Consolas" panose="020B0609020204030204" pitchFamily="49" charset="0"/>
+              </a:rPr>
+              <a:t>    }</a:t>
+            </a:r>
+          </a:p>
+          <a:p>
+            <a:r>
+              <a:rPr lang="pl-PL" sz="1400" dirty="0">
+                <a:solidFill>
+                  <a:srgbClr val="D4D4D4"/>
+                </a:solidFill>
+                <a:latin typeface="Consolas" panose="020B0609020204030204" pitchFamily="49" charset="0"/>
+              </a:rPr>
+              <a:t>}</a:t>
+            </a:r>
+            <a:endParaRPr lang="pl-PL" sz="1400" b="0" dirty="0">
+              <a:solidFill>
+                <a:srgbClr val="D4D4D4"/>
+              </a:solidFill>
+              <a:effectLst/>
+              <a:latin typeface="Consolas" panose="020B0609020204030204" pitchFamily="49" charset="0"/>
+            </a:endParaRPr>
+          </a:p>
+        </p:txBody>
+      </p:sp>
+      <p:sp>
+        <p:nvSpPr>
+          <p:cNvPr id="9" name="pole tekstowe 8">
+            <a:extLst>
+              <a:ext uri="{FF2B5EF4-FFF2-40B4-BE49-F238E27FC236}">
+                <a16:creationId xmlns:a16="http://schemas.microsoft.com/office/drawing/2014/main" id="{C7D22BF2-5083-41FC-A207-D7E8F64D9FDC}"/>
               </a:ext>
             </a:extLst>
           </p:cNvPr>
@@ -42106,8 +43679,8 @@
         </p:nvSpPr>
         <p:spPr>
           <a:xfrm>
-            <a:off x="497840" y="538480"/>
-            <a:ext cx="2103525" cy="369332"/>
+            <a:off x="5459896" y="411447"/>
+            <a:ext cx="914225" cy="369332"/>
           </a:xfrm>
           <a:prstGeom prst="rect">
             <a:avLst/>
@@ -42122,15 +43695,1301 @@
           <a:p>
             <a:r>
               <a:rPr lang="pl-PL" dirty="0" err="1"/>
-              <a:t>Hooks</a:t>
-            </a:r>
+              <a:t>reducer</a:t>
+            </a:r>
+            <a:endParaRPr lang="pl-PL" dirty="0"/>
+          </a:p>
+        </p:txBody>
+      </p:sp>
+      <p:sp>
+        <p:nvSpPr>
+          <p:cNvPr id="10" name="Prostokąt 9">
+            <a:extLst>
+              <a:ext uri="{FF2B5EF4-FFF2-40B4-BE49-F238E27FC236}">
+                <a16:creationId xmlns:a16="http://schemas.microsoft.com/office/drawing/2014/main" id="{AE83C68C-BA54-4409-A55F-6B4B30ECA015}"/>
+              </a:ext>
+            </a:extLst>
+          </p:cNvPr>
+          <p:cNvSpPr/>
+          <p:nvPr/>
+        </p:nvSpPr>
+        <p:spPr>
+          <a:xfrm>
+            <a:off x="337930" y="4069247"/>
+            <a:ext cx="9872870" cy="1169551"/>
+          </a:xfrm>
+          <a:prstGeom prst="rect">
+            <a:avLst/>
+          </a:prstGeom>
+          <a:solidFill>
+            <a:schemeClr val="tx1"/>
+          </a:solidFill>
+        </p:spPr>
+        <p:txBody>
+          <a:bodyPr wrap="square">
+            <a:spAutoFit/>
+          </a:bodyPr>
+          <a:lstStyle/>
+          <a:p>
+            <a:r>
+              <a:rPr lang="pl-PL" sz="1400" dirty="0">
+                <a:solidFill>
+                  <a:srgbClr val="C586C0"/>
+                </a:solidFill>
+                <a:latin typeface="Consolas" panose="020B0609020204030204" pitchFamily="49" charset="0"/>
+              </a:rPr>
+              <a:t>import</a:t>
+            </a:r>
+            <a:r>
+              <a:rPr lang="pl-PL" sz="1400" dirty="0">
+                <a:solidFill>
+                  <a:srgbClr val="D4D4D4"/>
+                </a:solidFill>
+                <a:latin typeface="Consolas" panose="020B0609020204030204" pitchFamily="49" charset="0"/>
+              </a:rPr>
+              <a:t> {</a:t>
+            </a:r>
+            <a:r>
+              <a:rPr lang="pl-PL" sz="1400" dirty="0" err="1">
+                <a:solidFill>
+                  <a:srgbClr val="9CDCFE"/>
+                </a:solidFill>
+                <a:latin typeface="Consolas" panose="020B0609020204030204" pitchFamily="49" charset="0"/>
+              </a:rPr>
+              <a:t>createStore</a:t>
+            </a:r>
+            <a:r>
+              <a:rPr lang="pl-PL" sz="1400" dirty="0">
+                <a:solidFill>
+                  <a:srgbClr val="D4D4D4"/>
+                </a:solidFill>
+                <a:latin typeface="Consolas" panose="020B0609020204030204" pitchFamily="49" charset="0"/>
+              </a:rPr>
+              <a:t>} </a:t>
+            </a:r>
+            <a:r>
+              <a:rPr lang="pl-PL" sz="1400" dirty="0">
+                <a:solidFill>
+                  <a:srgbClr val="C586C0"/>
+                </a:solidFill>
+                <a:latin typeface="Consolas" panose="020B0609020204030204" pitchFamily="49" charset="0"/>
+              </a:rPr>
+              <a:t>from</a:t>
+            </a:r>
+            <a:r>
+              <a:rPr lang="pl-PL" sz="1400" dirty="0">
+                <a:solidFill>
+                  <a:srgbClr val="D4D4D4"/>
+                </a:solidFill>
+                <a:latin typeface="Consolas" panose="020B0609020204030204" pitchFamily="49" charset="0"/>
+              </a:rPr>
+              <a:t> </a:t>
+            </a:r>
+            <a:r>
+              <a:rPr lang="pl-PL" sz="1400" dirty="0">
+                <a:solidFill>
+                  <a:srgbClr val="CE9178"/>
+                </a:solidFill>
+                <a:latin typeface="Consolas" panose="020B0609020204030204" pitchFamily="49" charset="0"/>
+              </a:rPr>
+              <a:t>'</a:t>
+            </a:r>
+            <a:r>
+              <a:rPr lang="pl-PL" sz="1400" dirty="0" err="1">
+                <a:solidFill>
+                  <a:srgbClr val="CE9178"/>
+                </a:solidFill>
+                <a:latin typeface="Consolas" panose="020B0609020204030204" pitchFamily="49" charset="0"/>
+              </a:rPr>
+              <a:t>redux</a:t>
+            </a:r>
+            <a:r>
+              <a:rPr lang="pl-PL" sz="1400" dirty="0">
+                <a:solidFill>
+                  <a:srgbClr val="CE9178"/>
+                </a:solidFill>
+                <a:latin typeface="Consolas" panose="020B0609020204030204" pitchFamily="49" charset="0"/>
+              </a:rPr>
+              <a:t>'</a:t>
+            </a:r>
+            <a:endParaRPr lang="pl-PL" sz="1400" dirty="0">
+              <a:solidFill>
+                <a:srgbClr val="D4D4D4"/>
+              </a:solidFill>
+              <a:latin typeface="Consolas" panose="020B0609020204030204" pitchFamily="49" charset="0"/>
+            </a:endParaRPr>
+          </a:p>
+          <a:p>
+            <a:r>
+              <a:rPr lang="pl-PL" sz="1400" dirty="0">
+                <a:solidFill>
+                  <a:srgbClr val="C586C0"/>
+                </a:solidFill>
+                <a:latin typeface="Consolas" panose="020B0609020204030204" pitchFamily="49" charset="0"/>
+              </a:rPr>
+              <a:t>import</a:t>
+            </a:r>
+            <a:r>
+              <a:rPr lang="pl-PL" sz="1400" dirty="0">
+                <a:solidFill>
+                  <a:srgbClr val="D4D4D4"/>
+                </a:solidFill>
+                <a:latin typeface="Consolas" panose="020B0609020204030204" pitchFamily="49" charset="0"/>
+              </a:rPr>
+              <a:t> {</a:t>
+            </a:r>
+            <a:r>
+              <a:rPr lang="pl-PL" sz="1400" dirty="0">
+                <a:solidFill>
+                  <a:srgbClr val="9CDCFE"/>
+                </a:solidFill>
+                <a:latin typeface="Consolas" panose="020B0609020204030204" pitchFamily="49" charset="0"/>
+              </a:rPr>
+              <a:t>Provider</a:t>
+            </a:r>
+            <a:r>
+              <a:rPr lang="pl-PL" sz="1400" dirty="0">
+                <a:solidFill>
+                  <a:srgbClr val="D4D4D4"/>
+                </a:solidFill>
+                <a:latin typeface="Consolas" panose="020B0609020204030204" pitchFamily="49" charset="0"/>
+              </a:rPr>
+              <a:t>} </a:t>
+            </a:r>
+            <a:r>
+              <a:rPr lang="pl-PL" sz="1400" dirty="0">
+                <a:solidFill>
+                  <a:srgbClr val="C586C0"/>
+                </a:solidFill>
+                <a:latin typeface="Consolas" panose="020B0609020204030204" pitchFamily="49" charset="0"/>
+              </a:rPr>
+              <a:t>from</a:t>
+            </a:r>
+            <a:r>
+              <a:rPr lang="pl-PL" sz="1400" dirty="0">
+                <a:solidFill>
+                  <a:srgbClr val="D4D4D4"/>
+                </a:solidFill>
+                <a:latin typeface="Consolas" panose="020B0609020204030204" pitchFamily="49" charset="0"/>
+              </a:rPr>
+              <a:t> </a:t>
+            </a:r>
+            <a:r>
+              <a:rPr lang="pl-PL" sz="1400" dirty="0">
+                <a:solidFill>
+                  <a:srgbClr val="CE9178"/>
+                </a:solidFill>
+                <a:latin typeface="Consolas" panose="020B0609020204030204" pitchFamily="49" charset="0"/>
+              </a:rPr>
+              <a:t>'</a:t>
+            </a:r>
+            <a:r>
+              <a:rPr lang="pl-PL" sz="1400" dirty="0" err="1">
+                <a:solidFill>
+                  <a:srgbClr val="CE9178"/>
+                </a:solidFill>
+                <a:latin typeface="Consolas" panose="020B0609020204030204" pitchFamily="49" charset="0"/>
+              </a:rPr>
+              <a:t>react-redux</a:t>
+            </a:r>
+            <a:r>
+              <a:rPr lang="pl-PL" sz="1400" dirty="0">
+                <a:solidFill>
+                  <a:srgbClr val="CE9178"/>
+                </a:solidFill>
+                <a:latin typeface="Consolas" panose="020B0609020204030204" pitchFamily="49" charset="0"/>
+              </a:rPr>
+              <a:t>'</a:t>
+            </a:r>
+            <a:endParaRPr lang="pl-PL" sz="1400" dirty="0">
+              <a:solidFill>
+                <a:srgbClr val="D4D4D4"/>
+              </a:solidFill>
+              <a:latin typeface="Consolas" panose="020B0609020204030204" pitchFamily="49" charset="0"/>
+            </a:endParaRPr>
+          </a:p>
+          <a:p>
+            <a:r>
+              <a:rPr lang="pl-PL" sz="1400" dirty="0">
+                <a:solidFill>
+                  <a:srgbClr val="C586C0"/>
+                </a:solidFill>
+                <a:latin typeface="Consolas" panose="020B0609020204030204" pitchFamily="49" charset="0"/>
+              </a:rPr>
+              <a:t>import</a:t>
+            </a:r>
+            <a:r>
+              <a:rPr lang="pl-PL" sz="1400" dirty="0">
+                <a:solidFill>
+                  <a:srgbClr val="D4D4D4"/>
+                </a:solidFill>
+                <a:latin typeface="Consolas" panose="020B0609020204030204" pitchFamily="49" charset="0"/>
+              </a:rPr>
+              <a:t> </a:t>
+            </a:r>
+            <a:r>
+              <a:rPr lang="pl-PL" sz="1400" dirty="0">
+                <a:solidFill>
+                  <a:srgbClr val="DCDCAA"/>
+                </a:solidFill>
+                <a:latin typeface="Consolas" panose="020B0609020204030204" pitchFamily="49" charset="0"/>
+              </a:rPr>
+              <a:t> </a:t>
+            </a:r>
+            <a:r>
+              <a:rPr lang="pl-PL" sz="1400" dirty="0" err="1">
+                <a:solidFill>
+                  <a:srgbClr val="DCDCAA"/>
+                </a:solidFill>
+                <a:latin typeface="Consolas" panose="020B0609020204030204" pitchFamily="49" charset="0"/>
+              </a:rPr>
+              <a:t>counterReducer</a:t>
+            </a:r>
+            <a:r>
+              <a:rPr lang="pl-PL" sz="1400" dirty="0">
+                <a:solidFill>
+                  <a:srgbClr val="DCDCAA"/>
+                </a:solidFill>
+                <a:latin typeface="Consolas" panose="020B0609020204030204" pitchFamily="49" charset="0"/>
+              </a:rPr>
+              <a:t> </a:t>
+            </a:r>
+            <a:r>
+              <a:rPr lang="pl-PL" sz="1400" dirty="0">
+                <a:solidFill>
+                  <a:srgbClr val="D4D4D4"/>
+                </a:solidFill>
+                <a:latin typeface="Consolas" panose="020B0609020204030204" pitchFamily="49" charset="0"/>
+              </a:rPr>
+              <a:t> </a:t>
+            </a:r>
+            <a:r>
+              <a:rPr lang="pl-PL" sz="1400" dirty="0">
+                <a:solidFill>
+                  <a:srgbClr val="C586C0"/>
+                </a:solidFill>
+                <a:latin typeface="Consolas" panose="020B0609020204030204" pitchFamily="49" charset="0"/>
+              </a:rPr>
+              <a:t>from</a:t>
+            </a:r>
+            <a:r>
+              <a:rPr lang="pl-PL" sz="1400" dirty="0">
+                <a:solidFill>
+                  <a:srgbClr val="D4D4D4"/>
+                </a:solidFill>
+                <a:latin typeface="Consolas" panose="020B0609020204030204" pitchFamily="49" charset="0"/>
+              </a:rPr>
+              <a:t> </a:t>
+            </a:r>
+            <a:r>
+              <a:rPr lang="pl-PL" sz="1400" dirty="0">
+                <a:solidFill>
+                  <a:srgbClr val="CE9178"/>
+                </a:solidFill>
+                <a:latin typeface="Consolas" panose="020B0609020204030204" pitchFamily="49" charset="0"/>
+              </a:rPr>
+              <a:t>'./</a:t>
+            </a:r>
+            <a:r>
+              <a:rPr lang="pl-PL" sz="1400" dirty="0" err="1">
+                <a:solidFill>
+                  <a:srgbClr val="CE9178"/>
+                </a:solidFill>
+                <a:latin typeface="Consolas" panose="020B0609020204030204" pitchFamily="49" charset="0"/>
+              </a:rPr>
+              <a:t>Store</a:t>
+            </a:r>
+            <a:r>
+              <a:rPr lang="pl-PL" sz="1400" dirty="0">
+                <a:solidFill>
+                  <a:srgbClr val="CE9178"/>
+                </a:solidFill>
+                <a:latin typeface="Consolas" panose="020B0609020204030204" pitchFamily="49" charset="0"/>
+              </a:rPr>
+              <a:t>/</a:t>
+            </a:r>
+            <a:r>
+              <a:rPr lang="pl-PL" sz="1400" dirty="0" err="1">
+                <a:solidFill>
+                  <a:srgbClr val="CE9178"/>
+                </a:solidFill>
+                <a:latin typeface="Consolas" panose="020B0609020204030204" pitchFamily="49" charset="0"/>
+              </a:rPr>
+              <a:t>Reducers</a:t>
+            </a:r>
+            <a:r>
+              <a:rPr lang="pl-PL" sz="1400" dirty="0">
+                <a:solidFill>
+                  <a:srgbClr val="CE9178"/>
+                </a:solidFill>
+                <a:latin typeface="Consolas" panose="020B0609020204030204" pitchFamily="49" charset="0"/>
+              </a:rPr>
+              <a:t>/</a:t>
+            </a:r>
+            <a:r>
+              <a:rPr lang="pl-PL" sz="1400" dirty="0" err="1">
+                <a:solidFill>
+                  <a:srgbClr val="CE9178"/>
+                </a:solidFill>
+                <a:latin typeface="Consolas" panose="020B0609020204030204" pitchFamily="49" charset="0"/>
+              </a:rPr>
+              <a:t>counter.reducer</a:t>
+            </a:r>
+            <a:r>
+              <a:rPr lang="pl-PL" sz="1400" dirty="0">
+                <a:solidFill>
+                  <a:srgbClr val="CE9178"/>
+                </a:solidFill>
+                <a:latin typeface="Consolas" panose="020B0609020204030204" pitchFamily="49" charset="0"/>
+              </a:rPr>
+              <a:t>'</a:t>
+            </a:r>
+            <a:br>
+              <a:rPr lang="pl-PL" sz="1400" dirty="0">
+                <a:solidFill>
+                  <a:srgbClr val="D4D4D4"/>
+                </a:solidFill>
+                <a:latin typeface="Consolas" panose="020B0609020204030204" pitchFamily="49" charset="0"/>
+              </a:rPr>
+            </a:br>
+            <a:r>
+              <a:rPr lang="pl-PL" sz="1400" dirty="0" err="1">
+                <a:solidFill>
+                  <a:srgbClr val="569CD6"/>
+                </a:solidFill>
+                <a:latin typeface="Consolas" panose="020B0609020204030204" pitchFamily="49" charset="0"/>
+              </a:rPr>
+              <a:t>const</a:t>
+            </a:r>
+            <a:r>
+              <a:rPr lang="pl-PL" sz="1400" dirty="0">
+                <a:solidFill>
+                  <a:srgbClr val="D4D4D4"/>
+                </a:solidFill>
+                <a:latin typeface="Consolas" panose="020B0609020204030204" pitchFamily="49" charset="0"/>
+              </a:rPr>
+              <a:t> </a:t>
+            </a:r>
+            <a:r>
+              <a:rPr lang="pl-PL" sz="1400" dirty="0" err="1">
+                <a:solidFill>
+                  <a:srgbClr val="9CDCFE"/>
+                </a:solidFill>
+                <a:latin typeface="Consolas" panose="020B0609020204030204" pitchFamily="49" charset="0"/>
+              </a:rPr>
+              <a:t>store</a:t>
+            </a:r>
+            <a:r>
+              <a:rPr lang="pl-PL" sz="1400" dirty="0">
+                <a:solidFill>
+                  <a:srgbClr val="D4D4D4"/>
+                </a:solidFill>
+                <a:latin typeface="Consolas" panose="020B0609020204030204" pitchFamily="49" charset="0"/>
+              </a:rPr>
+              <a:t> = </a:t>
+            </a:r>
+            <a:r>
+              <a:rPr lang="pl-PL" sz="1400" dirty="0" err="1">
+                <a:solidFill>
+                  <a:srgbClr val="DCDCAA"/>
+                </a:solidFill>
+                <a:latin typeface="Consolas" panose="020B0609020204030204" pitchFamily="49" charset="0"/>
+              </a:rPr>
+              <a:t>createStore</a:t>
+            </a:r>
+            <a:r>
+              <a:rPr lang="pl-PL" sz="1400" dirty="0">
+                <a:solidFill>
+                  <a:srgbClr val="D4D4D4"/>
+                </a:solidFill>
+                <a:latin typeface="Consolas" panose="020B0609020204030204" pitchFamily="49" charset="0"/>
+              </a:rPr>
+              <a:t>(</a:t>
+            </a:r>
+            <a:r>
+              <a:rPr lang="pl-PL" sz="1400" dirty="0" err="1">
+                <a:solidFill>
+                  <a:srgbClr val="DCDCAA"/>
+                </a:solidFill>
+                <a:latin typeface="Consolas" panose="020B0609020204030204" pitchFamily="49" charset="0"/>
+              </a:rPr>
+              <a:t>counterReducer</a:t>
+            </a:r>
+            <a:r>
+              <a:rPr lang="pl-PL" sz="1400" dirty="0">
+                <a:solidFill>
+                  <a:srgbClr val="D4D4D4"/>
+                </a:solidFill>
+                <a:latin typeface="Consolas" panose="020B0609020204030204" pitchFamily="49" charset="0"/>
+              </a:rPr>
+              <a:t>);</a:t>
+            </a:r>
+            <a:br>
+              <a:rPr lang="pl-PL" sz="1400" dirty="0">
+                <a:solidFill>
+                  <a:srgbClr val="D4D4D4"/>
+                </a:solidFill>
+                <a:latin typeface="Consolas" panose="020B0609020204030204" pitchFamily="49" charset="0"/>
+              </a:rPr>
+            </a:br>
+            <a:r>
+              <a:rPr lang="pl-PL" sz="1400" dirty="0" err="1">
+                <a:solidFill>
+                  <a:srgbClr val="9CDCFE"/>
+                </a:solidFill>
+                <a:latin typeface="Consolas" panose="020B0609020204030204" pitchFamily="49" charset="0"/>
+              </a:rPr>
+              <a:t>ReactDOM</a:t>
+            </a:r>
+            <a:r>
+              <a:rPr lang="pl-PL" sz="1400" dirty="0" err="1">
+                <a:solidFill>
+                  <a:srgbClr val="D4D4D4"/>
+                </a:solidFill>
+                <a:latin typeface="Consolas" panose="020B0609020204030204" pitchFamily="49" charset="0"/>
+              </a:rPr>
+              <a:t>.</a:t>
+            </a:r>
+            <a:r>
+              <a:rPr lang="pl-PL" sz="1400" dirty="0" err="1">
+                <a:solidFill>
+                  <a:srgbClr val="DCDCAA"/>
+                </a:solidFill>
+                <a:latin typeface="Consolas" panose="020B0609020204030204" pitchFamily="49" charset="0"/>
+              </a:rPr>
+              <a:t>render</a:t>
+            </a:r>
+            <a:r>
+              <a:rPr lang="pl-PL" sz="1400" dirty="0">
+                <a:solidFill>
+                  <a:srgbClr val="D4D4D4"/>
+                </a:solidFill>
+                <a:latin typeface="Consolas" panose="020B0609020204030204" pitchFamily="49" charset="0"/>
+              </a:rPr>
+              <a:t>(</a:t>
+            </a:r>
+            <a:r>
+              <a:rPr lang="pl-PL" sz="1400" dirty="0">
+                <a:solidFill>
+                  <a:srgbClr val="808080"/>
+                </a:solidFill>
+                <a:latin typeface="Consolas" panose="020B0609020204030204" pitchFamily="49" charset="0"/>
+              </a:rPr>
+              <a:t>&lt;</a:t>
+            </a:r>
+            <a:r>
+              <a:rPr lang="pl-PL" sz="1400" dirty="0">
+                <a:solidFill>
+                  <a:srgbClr val="4EC9B0"/>
+                </a:solidFill>
+                <a:latin typeface="Consolas" panose="020B0609020204030204" pitchFamily="49" charset="0"/>
+              </a:rPr>
+              <a:t>Provider</a:t>
+            </a:r>
+            <a:r>
+              <a:rPr lang="pl-PL" sz="1400" dirty="0">
+                <a:solidFill>
+                  <a:srgbClr val="D4D4D4"/>
+                </a:solidFill>
+                <a:latin typeface="Consolas" panose="020B0609020204030204" pitchFamily="49" charset="0"/>
+              </a:rPr>
+              <a:t> </a:t>
+            </a:r>
+            <a:r>
+              <a:rPr lang="pl-PL" sz="1400" dirty="0" err="1">
+                <a:solidFill>
+                  <a:srgbClr val="9CDCFE"/>
+                </a:solidFill>
+                <a:latin typeface="Consolas" panose="020B0609020204030204" pitchFamily="49" charset="0"/>
+              </a:rPr>
+              <a:t>store</a:t>
+            </a:r>
+            <a:r>
+              <a:rPr lang="pl-PL" sz="1400" dirty="0">
+                <a:solidFill>
+                  <a:srgbClr val="D4D4D4"/>
+                </a:solidFill>
+                <a:latin typeface="Consolas" panose="020B0609020204030204" pitchFamily="49" charset="0"/>
+              </a:rPr>
+              <a:t>=</a:t>
+            </a:r>
+            <a:r>
+              <a:rPr lang="pl-PL" sz="1400" dirty="0">
+                <a:solidFill>
+                  <a:srgbClr val="569CD6"/>
+                </a:solidFill>
+                <a:latin typeface="Consolas" panose="020B0609020204030204" pitchFamily="49" charset="0"/>
+              </a:rPr>
+              <a:t>{</a:t>
+            </a:r>
+            <a:r>
+              <a:rPr lang="pl-PL" sz="1400" dirty="0" err="1">
+                <a:solidFill>
+                  <a:srgbClr val="9CDCFE"/>
+                </a:solidFill>
+                <a:latin typeface="Consolas" panose="020B0609020204030204" pitchFamily="49" charset="0"/>
+              </a:rPr>
+              <a:t>store</a:t>
+            </a:r>
+            <a:r>
+              <a:rPr lang="pl-PL" sz="1400" dirty="0">
+                <a:solidFill>
+                  <a:srgbClr val="569CD6"/>
+                </a:solidFill>
+                <a:latin typeface="Consolas" panose="020B0609020204030204" pitchFamily="49" charset="0"/>
+              </a:rPr>
+              <a:t>}</a:t>
+            </a:r>
+            <a:r>
+              <a:rPr lang="pl-PL" sz="1400" dirty="0">
+                <a:solidFill>
+                  <a:srgbClr val="808080"/>
+                </a:solidFill>
+                <a:latin typeface="Consolas" panose="020B0609020204030204" pitchFamily="49" charset="0"/>
+              </a:rPr>
+              <a:t>&gt;&lt;</a:t>
+            </a:r>
+            <a:r>
+              <a:rPr lang="pl-PL" sz="1400" dirty="0" err="1">
+                <a:solidFill>
+                  <a:srgbClr val="4EC9B0"/>
+                </a:solidFill>
+                <a:latin typeface="Consolas" panose="020B0609020204030204" pitchFamily="49" charset="0"/>
+              </a:rPr>
+              <a:t>App</a:t>
+            </a:r>
+            <a:r>
+              <a:rPr lang="pl-PL" sz="1400" dirty="0">
+                <a:solidFill>
+                  <a:srgbClr val="D4D4D4"/>
+                </a:solidFill>
+                <a:latin typeface="Consolas" panose="020B0609020204030204" pitchFamily="49" charset="0"/>
+              </a:rPr>
+              <a:t> </a:t>
+            </a:r>
+            <a:r>
+              <a:rPr lang="pl-PL" sz="1400" dirty="0">
+                <a:solidFill>
+                  <a:srgbClr val="808080"/>
+                </a:solidFill>
+                <a:latin typeface="Consolas" panose="020B0609020204030204" pitchFamily="49" charset="0"/>
+              </a:rPr>
+              <a:t>/&gt;&lt;/</a:t>
+            </a:r>
+            <a:r>
+              <a:rPr lang="pl-PL" sz="1400" dirty="0">
+                <a:solidFill>
+                  <a:srgbClr val="4EC9B0"/>
+                </a:solidFill>
+                <a:latin typeface="Consolas" panose="020B0609020204030204" pitchFamily="49" charset="0"/>
+              </a:rPr>
+              <a:t>Provider</a:t>
+            </a:r>
+            <a:r>
+              <a:rPr lang="pl-PL" sz="1400" dirty="0">
+                <a:solidFill>
+                  <a:srgbClr val="808080"/>
+                </a:solidFill>
+                <a:latin typeface="Consolas" panose="020B0609020204030204" pitchFamily="49" charset="0"/>
+              </a:rPr>
+              <a:t>&gt;</a:t>
+            </a:r>
+            <a:r>
+              <a:rPr lang="pl-PL" sz="1400" dirty="0">
+                <a:solidFill>
+                  <a:srgbClr val="D4D4D4"/>
+                </a:solidFill>
+                <a:latin typeface="Consolas" panose="020B0609020204030204" pitchFamily="49" charset="0"/>
+              </a:rPr>
+              <a:t>, </a:t>
+            </a:r>
+            <a:r>
+              <a:rPr lang="pl-PL" sz="1400" dirty="0" err="1">
+                <a:solidFill>
+                  <a:srgbClr val="9CDCFE"/>
+                </a:solidFill>
+                <a:latin typeface="Consolas" panose="020B0609020204030204" pitchFamily="49" charset="0"/>
+              </a:rPr>
+              <a:t>document</a:t>
+            </a:r>
+            <a:r>
+              <a:rPr lang="pl-PL" sz="1400" dirty="0" err="1">
+                <a:solidFill>
+                  <a:srgbClr val="D4D4D4"/>
+                </a:solidFill>
+                <a:latin typeface="Consolas" panose="020B0609020204030204" pitchFamily="49" charset="0"/>
+              </a:rPr>
+              <a:t>.</a:t>
+            </a:r>
+            <a:r>
+              <a:rPr lang="pl-PL" sz="1400" dirty="0" err="1">
+                <a:solidFill>
+                  <a:srgbClr val="DCDCAA"/>
+                </a:solidFill>
+                <a:latin typeface="Consolas" panose="020B0609020204030204" pitchFamily="49" charset="0"/>
+              </a:rPr>
+              <a:t>getElementById</a:t>
+            </a:r>
+            <a:r>
+              <a:rPr lang="pl-PL" sz="1400" dirty="0">
+                <a:solidFill>
+                  <a:srgbClr val="D4D4D4"/>
+                </a:solidFill>
+                <a:latin typeface="Consolas" panose="020B0609020204030204" pitchFamily="49" charset="0"/>
+              </a:rPr>
+              <a:t>(</a:t>
+            </a:r>
+            <a:r>
+              <a:rPr lang="pl-PL" sz="1400" dirty="0">
+                <a:solidFill>
+                  <a:srgbClr val="CE9178"/>
+                </a:solidFill>
+                <a:latin typeface="Consolas" panose="020B0609020204030204" pitchFamily="49" charset="0"/>
+              </a:rPr>
+              <a:t>'</a:t>
+            </a:r>
+            <a:r>
+              <a:rPr lang="pl-PL" sz="1400" dirty="0" err="1">
+                <a:solidFill>
+                  <a:srgbClr val="CE9178"/>
+                </a:solidFill>
+                <a:latin typeface="Consolas" panose="020B0609020204030204" pitchFamily="49" charset="0"/>
+              </a:rPr>
+              <a:t>root</a:t>
+            </a:r>
+            <a:r>
+              <a:rPr lang="pl-PL" sz="1400" dirty="0">
+                <a:solidFill>
+                  <a:srgbClr val="CE9178"/>
+                </a:solidFill>
+                <a:latin typeface="Consolas" panose="020B0609020204030204" pitchFamily="49" charset="0"/>
+              </a:rPr>
+              <a:t>'</a:t>
+            </a:r>
+            <a:r>
+              <a:rPr lang="pl-PL" sz="1400" dirty="0">
+                <a:solidFill>
+                  <a:srgbClr val="D4D4D4"/>
+                </a:solidFill>
+                <a:latin typeface="Consolas" panose="020B0609020204030204" pitchFamily="49" charset="0"/>
+              </a:rPr>
+              <a:t>));</a:t>
+            </a:r>
+            <a:endParaRPr lang="pl-PL" sz="1400" b="0" dirty="0">
+              <a:solidFill>
+                <a:srgbClr val="D4D4D4"/>
+              </a:solidFill>
+              <a:effectLst/>
+              <a:latin typeface="Consolas" panose="020B0609020204030204" pitchFamily="49" charset="0"/>
+            </a:endParaRPr>
+          </a:p>
+        </p:txBody>
+      </p:sp>
+      <p:sp>
+        <p:nvSpPr>
+          <p:cNvPr id="11" name="pole tekstowe 10">
+            <a:extLst>
+              <a:ext uri="{FF2B5EF4-FFF2-40B4-BE49-F238E27FC236}">
+                <a16:creationId xmlns:a16="http://schemas.microsoft.com/office/drawing/2014/main" id="{05C7D0D0-A010-439C-9334-0412142DDEF5}"/>
+              </a:ext>
+            </a:extLst>
+          </p:cNvPr>
+          <p:cNvSpPr txBox="1"/>
+          <p:nvPr/>
+        </p:nvSpPr>
+        <p:spPr>
+          <a:xfrm>
+            <a:off x="239423" y="3689471"/>
+            <a:ext cx="692562" cy="369332"/>
+          </a:xfrm>
+          <a:prstGeom prst="rect">
+            <a:avLst/>
+          </a:prstGeom>
+          <a:noFill/>
+        </p:spPr>
+        <p:txBody>
+          <a:bodyPr wrap="none" rtlCol="0">
+            <a:spAutoFit/>
+          </a:bodyPr>
+          <a:lstStyle/>
+          <a:p>
             <a:r>
               <a:rPr lang="pl-PL" dirty="0"/>
-              <a:t> - </a:t>
-            </a:r>
+              <a:t>index</a:t>
+            </a:r>
+          </a:p>
+        </p:txBody>
+      </p:sp>
+      <p:sp>
+        <p:nvSpPr>
+          <p:cNvPr id="12" name="Prostokąt 11">
+            <a:extLst>
+              <a:ext uri="{FF2B5EF4-FFF2-40B4-BE49-F238E27FC236}">
+                <a16:creationId xmlns:a16="http://schemas.microsoft.com/office/drawing/2014/main" id="{367BCB0D-B2B7-44A4-B58B-BD25CE52749D}"/>
+              </a:ext>
+            </a:extLst>
+          </p:cNvPr>
+          <p:cNvSpPr/>
+          <p:nvPr/>
+        </p:nvSpPr>
+        <p:spPr>
+          <a:xfrm>
+            <a:off x="337931" y="5744049"/>
+            <a:ext cx="5121966" cy="523220"/>
+          </a:xfrm>
+          <a:prstGeom prst="rect">
+            <a:avLst/>
+          </a:prstGeom>
+          <a:solidFill>
+            <a:schemeClr val="tx1"/>
+          </a:solidFill>
+        </p:spPr>
+        <p:txBody>
+          <a:bodyPr wrap="square">
+            <a:spAutoFit/>
+          </a:bodyPr>
+          <a:lstStyle/>
+          <a:p>
+            <a:r>
+              <a:rPr lang="en-US" sz="1400" dirty="0">
+                <a:solidFill>
+                  <a:srgbClr val="569CD6"/>
+                </a:solidFill>
+                <a:latin typeface="Consolas" panose="020B0609020204030204" pitchFamily="49" charset="0"/>
+              </a:rPr>
+              <a:t>const</a:t>
+            </a:r>
+            <a:r>
+              <a:rPr lang="en-US" sz="1400" dirty="0">
+                <a:solidFill>
+                  <a:srgbClr val="D4D4D4"/>
+                </a:solidFill>
+                <a:latin typeface="Consolas" panose="020B0609020204030204" pitchFamily="49" charset="0"/>
+              </a:rPr>
+              <a:t> </a:t>
+            </a:r>
+            <a:r>
+              <a:rPr lang="en-US" sz="1400" dirty="0">
+                <a:solidFill>
+                  <a:srgbClr val="9CDCFE"/>
+                </a:solidFill>
+                <a:latin typeface="Consolas" panose="020B0609020204030204" pitchFamily="49" charset="0"/>
+              </a:rPr>
+              <a:t>dispatch</a:t>
+            </a:r>
+            <a:r>
+              <a:rPr lang="en-US" sz="1400" dirty="0">
+                <a:solidFill>
+                  <a:srgbClr val="D4D4D4"/>
+                </a:solidFill>
+                <a:latin typeface="Consolas" panose="020B0609020204030204" pitchFamily="49" charset="0"/>
+              </a:rPr>
+              <a:t> = </a:t>
+            </a:r>
+            <a:r>
+              <a:rPr lang="en-US" sz="1400" dirty="0" err="1">
+                <a:solidFill>
+                  <a:srgbClr val="DCDCAA"/>
+                </a:solidFill>
+                <a:latin typeface="Consolas" panose="020B0609020204030204" pitchFamily="49" charset="0"/>
+              </a:rPr>
+              <a:t>useDispatch</a:t>
+            </a:r>
+            <a:r>
+              <a:rPr lang="en-US" sz="1400" dirty="0">
+                <a:solidFill>
+                  <a:srgbClr val="D4D4D4"/>
+                </a:solidFill>
+                <a:latin typeface="Consolas" panose="020B0609020204030204" pitchFamily="49" charset="0"/>
+              </a:rPr>
+              <a:t>();</a:t>
+            </a:r>
+          </a:p>
+          <a:p>
+            <a:r>
+              <a:rPr lang="en-US" sz="1400" dirty="0">
+                <a:solidFill>
+                  <a:srgbClr val="569CD6"/>
+                </a:solidFill>
+                <a:latin typeface="Consolas" panose="020B0609020204030204" pitchFamily="49" charset="0"/>
+              </a:rPr>
+              <a:t>const</a:t>
+            </a:r>
+            <a:r>
+              <a:rPr lang="en-US" sz="1400" dirty="0">
+                <a:solidFill>
+                  <a:srgbClr val="D4D4D4"/>
+                </a:solidFill>
+                <a:latin typeface="Consolas" panose="020B0609020204030204" pitchFamily="49" charset="0"/>
+              </a:rPr>
+              <a:t> </a:t>
+            </a:r>
+            <a:r>
+              <a:rPr lang="en-US" sz="1400" dirty="0">
+                <a:solidFill>
+                  <a:srgbClr val="9CDCFE"/>
+                </a:solidFill>
+                <a:latin typeface="Consolas" panose="020B0609020204030204" pitchFamily="49" charset="0"/>
+              </a:rPr>
+              <a:t>email</a:t>
+            </a:r>
+            <a:r>
+              <a:rPr lang="en-US" sz="1400" dirty="0">
+                <a:solidFill>
+                  <a:srgbClr val="D4D4D4"/>
+                </a:solidFill>
+                <a:latin typeface="Consolas" panose="020B0609020204030204" pitchFamily="49" charset="0"/>
+              </a:rPr>
+              <a:t> = </a:t>
+            </a:r>
+            <a:r>
+              <a:rPr lang="en-US" sz="1400" dirty="0" err="1">
+                <a:solidFill>
+                  <a:srgbClr val="DCDCAA"/>
+                </a:solidFill>
+                <a:latin typeface="Consolas" panose="020B0609020204030204" pitchFamily="49" charset="0"/>
+              </a:rPr>
+              <a:t>useSelector</a:t>
+            </a:r>
+            <a:r>
+              <a:rPr lang="en-US" sz="1400" dirty="0">
+                <a:solidFill>
+                  <a:srgbClr val="D4D4D4"/>
+                </a:solidFill>
+                <a:latin typeface="Consolas" panose="020B0609020204030204" pitchFamily="49" charset="0"/>
+              </a:rPr>
+              <a:t>(</a:t>
+            </a:r>
+            <a:r>
+              <a:rPr lang="en-US" sz="1400" dirty="0">
+                <a:solidFill>
+                  <a:srgbClr val="9CDCFE"/>
+                </a:solidFill>
+                <a:latin typeface="Consolas" panose="020B0609020204030204" pitchFamily="49" charset="0"/>
+              </a:rPr>
+              <a:t>state</a:t>
+            </a:r>
+            <a:r>
+              <a:rPr lang="en-US" sz="1400" dirty="0">
+                <a:solidFill>
+                  <a:srgbClr val="D4D4D4"/>
+                </a:solidFill>
+                <a:latin typeface="Consolas" panose="020B0609020204030204" pitchFamily="49" charset="0"/>
+              </a:rPr>
+              <a:t> </a:t>
+            </a:r>
+            <a:r>
+              <a:rPr lang="en-US" sz="1400" dirty="0">
+                <a:solidFill>
+                  <a:srgbClr val="569CD6"/>
+                </a:solidFill>
+                <a:latin typeface="Consolas" panose="020B0609020204030204" pitchFamily="49" charset="0"/>
+              </a:rPr>
+              <a:t>=&gt;</a:t>
+            </a:r>
+            <a:r>
+              <a:rPr lang="en-US" sz="1400" dirty="0">
+                <a:solidFill>
+                  <a:srgbClr val="D4D4D4"/>
+                </a:solidFill>
+                <a:latin typeface="Consolas" panose="020B0609020204030204" pitchFamily="49" charset="0"/>
+              </a:rPr>
+              <a:t> </a:t>
+            </a:r>
+            <a:r>
+              <a:rPr lang="en-US" sz="1400" dirty="0">
+                <a:solidFill>
+                  <a:srgbClr val="9CDCFE"/>
+                </a:solidFill>
+                <a:latin typeface="Consolas" panose="020B0609020204030204" pitchFamily="49" charset="0"/>
+              </a:rPr>
+              <a:t>state</a:t>
+            </a:r>
+            <a:r>
+              <a:rPr lang="en-US" sz="1400" dirty="0">
+                <a:solidFill>
+                  <a:srgbClr val="D4D4D4"/>
+                </a:solidFill>
+                <a:latin typeface="Consolas" panose="020B0609020204030204" pitchFamily="49" charset="0"/>
+              </a:rPr>
+              <a:t>.</a:t>
+            </a:r>
+            <a:r>
+              <a:rPr lang="pl-PL" sz="1400" dirty="0" err="1">
+                <a:solidFill>
+                  <a:srgbClr val="9CDCFE"/>
+                </a:solidFill>
+                <a:latin typeface="Consolas" panose="020B0609020204030204" pitchFamily="49" charset="0"/>
+              </a:rPr>
+              <a:t>counter</a:t>
+            </a:r>
+            <a:r>
+              <a:rPr lang="en-US" sz="1400" dirty="0">
+                <a:solidFill>
+                  <a:srgbClr val="D4D4D4"/>
+                </a:solidFill>
+                <a:latin typeface="Consolas" panose="020B0609020204030204" pitchFamily="49" charset="0"/>
+              </a:rPr>
+              <a:t>);</a:t>
+            </a:r>
+            <a:endParaRPr lang="en-US" sz="1400" b="0" dirty="0">
+              <a:solidFill>
+                <a:srgbClr val="D4D4D4"/>
+              </a:solidFill>
+              <a:effectLst/>
+              <a:latin typeface="Consolas" panose="020B0609020204030204" pitchFamily="49" charset="0"/>
+            </a:endParaRPr>
+          </a:p>
+        </p:txBody>
+      </p:sp>
+      <p:sp>
+        <p:nvSpPr>
+          <p:cNvPr id="13" name="pole tekstowe 12">
+            <a:extLst>
+              <a:ext uri="{FF2B5EF4-FFF2-40B4-BE49-F238E27FC236}">
+                <a16:creationId xmlns:a16="http://schemas.microsoft.com/office/drawing/2014/main" id="{48BF6B0F-1538-4032-B0A4-BAF88DCA6338}"/>
+              </a:ext>
+            </a:extLst>
+          </p:cNvPr>
+          <p:cNvSpPr txBox="1"/>
+          <p:nvPr/>
+        </p:nvSpPr>
+        <p:spPr>
+          <a:xfrm>
+            <a:off x="337930" y="5371729"/>
+            <a:ext cx="1264257" cy="369332"/>
+          </a:xfrm>
+          <a:prstGeom prst="rect">
+            <a:avLst/>
+          </a:prstGeom>
+          <a:noFill/>
+        </p:spPr>
+        <p:txBody>
+          <a:bodyPr wrap="none" rtlCol="0">
+            <a:spAutoFit/>
+          </a:bodyPr>
+          <a:lstStyle/>
+          <a:p>
+            <a:r>
+              <a:rPr lang="pl-PL" dirty="0"/>
+              <a:t>component</a:t>
+            </a:r>
+          </a:p>
+        </p:txBody>
+      </p:sp>
+      <p:sp>
+        <p:nvSpPr>
+          <p:cNvPr id="15" name="Prostokąt 14">
+            <a:extLst>
+              <a:ext uri="{FF2B5EF4-FFF2-40B4-BE49-F238E27FC236}">
+                <a16:creationId xmlns:a16="http://schemas.microsoft.com/office/drawing/2014/main" id="{7D8E88A4-CA01-472F-8E18-09369F381461}"/>
+              </a:ext>
+            </a:extLst>
+          </p:cNvPr>
+          <p:cNvSpPr/>
+          <p:nvPr/>
+        </p:nvSpPr>
+        <p:spPr>
+          <a:xfrm>
+            <a:off x="314168" y="6319520"/>
+            <a:ext cx="2470548" cy="307777"/>
+          </a:xfrm>
+          <a:prstGeom prst="rect">
+            <a:avLst/>
+          </a:prstGeom>
+          <a:solidFill>
+            <a:schemeClr val="tx1"/>
+          </a:solidFill>
+        </p:spPr>
+        <p:txBody>
+          <a:bodyPr wrap="none">
+            <a:spAutoFit/>
+          </a:bodyPr>
+          <a:lstStyle/>
+          <a:p>
+            <a:r>
+              <a:rPr lang="pl-PL" sz="1400" dirty="0" err="1">
+                <a:solidFill>
+                  <a:srgbClr val="DCDCAA"/>
+                </a:solidFill>
+                <a:latin typeface="Consolas" panose="020B0609020204030204" pitchFamily="49" charset="0"/>
+              </a:rPr>
+              <a:t>dispatch</a:t>
+            </a:r>
+            <a:r>
+              <a:rPr lang="pl-PL" sz="1400" dirty="0">
+                <a:solidFill>
+                  <a:srgbClr val="D4D4D4"/>
+                </a:solidFill>
+                <a:latin typeface="Consolas" panose="020B0609020204030204" pitchFamily="49" charset="0"/>
+              </a:rPr>
+              <a:t>(</a:t>
+            </a:r>
+            <a:r>
+              <a:rPr lang="pl-PL" sz="1400" dirty="0" err="1">
+                <a:solidFill>
+                  <a:srgbClr val="DCDCAA"/>
+                </a:solidFill>
+                <a:latin typeface="Consolas" panose="020B0609020204030204" pitchFamily="49" charset="0"/>
+              </a:rPr>
+              <a:t>increment</a:t>
+            </a:r>
+            <a:r>
+              <a:rPr lang="pl-PL" sz="1400" dirty="0">
+                <a:solidFill>
+                  <a:srgbClr val="D4D4D4"/>
+                </a:solidFill>
+                <a:latin typeface="Consolas" panose="020B0609020204030204" pitchFamily="49" charset="0"/>
+              </a:rPr>
+              <a:t>(</a:t>
+            </a:r>
+            <a:r>
+              <a:rPr lang="pl-PL" sz="1400" dirty="0">
+                <a:solidFill>
+                  <a:srgbClr val="B5CEA8"/>
+                </a:solidFill>
+                <a:latin typeface="Consolas" panose="020B0609020204030204" pitchFamily="49" charset="0"/>
+              </a:rPr>
+              <a:t>2</a:t>
+            </a:r>
+            <a:r>
+              <a:rPr lang="pl-PL" sz="1400" dirty="0">
+                <a:solidFill>
+                  <a:srgbClr val="D4D4D4"/>
+                </a:solidFill>
+                <a:latin typeface="Consolas" panose="020B0609020204030204" pitchFamily="49" charset="0"/>
+              </a:rPr>
+              <a:t>));</a:t>
+            </a:r>
+            <a:endParaRPr lang="pl-PL" sz="1400" b="0" dirty="0">
+              <a:solidFill>
+                <a:srgbClr val="D4D4D4"/>
+              </a:solidFill>
+              <a:effectLst/>
+              <a:latin typeface="Consolas" panose="020B0609020204030204" pitchFamily="49" charset="0"/>
+            </a:endParaRPr>
+          </a:p>
+        </p:txBody>
+      </p:sp>
+      <p:sp>
+        <p:nvSpPr>
+          <p:cNvPr id="16" name="Prostokąt 15">
+            <a:extLst>
+              <a:ext uri="{FF2B5EF4-FFF2-40B4-BE49-F238E27FC236}">
+                <a16:creationId xmlns:a16="http://schemas.microsoft.com/office/drawing/2014/main" id="{513EB6A9-A80C-4B92-88F3-8A79734FB1FE}"/>
+              </a:ext>
+            </a:extLst>
+          </p:cNvPr>
+          <p:cNvSpPr/>
+          <p:nvPr/>
+        </p:nvSpPr>
+        <p:spPr>
+          <a:xfrm>
+            <a:off x="6732105" y="5735463"/>
+            <a:ext cx="4850296" cy="738664"/>
+          </a:xfrm>
+          <a:prstGeom prst="rect">
+            <a:avLst/>
+          </a:prstGeom>
+          <a:solidFill>
+            <a:schemeClr val="tx1"/>
+          </a:solidFill>
+        </p:spPr>
+        <p:txBody>
+          <a:bodyPr wrap="square">
+            <a:spAutoFit/>
+          </a:bodyPr>
+          <a:lstStyle/>
+          <a:p>
+            <a:r>
+              <a:rPr lang="en-US" sz="1400" dirty="0">
+                <a:solidFill>
+                  <a:srgbClr val="569CD6"/>
+                </a:solidFill>
+                <a:latin typeface="Consolas" panose="020B0609020204030204" pitchFamily="49" charset="0"/>
+              </a:rPr>
+              <a:t>const</a:t>
+            </a:r>
+            <a:r>
+              <a:rPr lang="en-US" sz="1400" dirty="0">
+                <a:solidFill>
+                  <a:srgbClr val="D4D4D4"/>
+                </a:solidFill>
+                <a:latin typeface="Consolas" panose="020B0609020204030204" pitchFamily="49" charset="0"/>
+              </a:rPr>
+              <a:t> </a:t>
+            </a:r>
+            <a:r>
+              <a:rPr lang="en-US" sz="1400" dirty="0" err="1">
+                <a:solidFill>
+                  <a:srgbClr val="9CDCFE"/>
+                </a:solidFill>
+                <a:latin typeface="Consolas" panose="020B0609020204030204" pitchFamily="49" charset="0"/>
+              </a:rPr>
+              <a:t>rootReducer</a:t>
+            </a:r>
+            <a:r>
+              <a:rPr lang="en-US" sz="1400" dirty="0">
+                <a:solidFill>
+                  <a:srgbClr val="D4D4D4"/>
+                </a:solidFill>
+                <a:latin typeface="Consolas" panose="020B0609020204030204" pitchFamily="49" charset="0"/>
+              </a:rPr>
+              <a:t> = </a:t>
+            </a:r>
+            <a:r>
+              <a:rPr lang="en-US" sz="1400" dirty="0" err="1">
+                <a:solidFill>
+                  <a:srgbClr val="DCDCAA"/>
+                </a:solidFill>
+                <a:latin typeface="Consolas" panose="020B0609020204030204" pitchFamily="49" charset="0"/>
+              </a:rPr>
+              <a:t>combineReducers</a:t>
+            </a:r>
+            <a:r>
+              <a:rPr lang="en-US" sz="1400" dirty="0">
+                <a:solidFill>
+                  <a:srgbClr val="D4D4D4"/>
+                </a:solidFill>
+                <a:latin typeface="Consolas" panose="020B0609020204030204" pitchFamily="49" charset="0"/>
+              </a:rPr>
+              <a:t>({</a:t>
+            </a:r>
+            <a:endParaRPr lang="pl-PL" sz="1400" dirty="0">
+              <a:solidFill>
+                <a:srgbClr val="D4D4D4"/>
+              </a:solidFill>
+              <a:latin typeface="Consolas" panose="020B0609020204030204" pitchFamily="49" charset="0"/>
+            </a:endParaRPr>
+          </a:p>
+          <a:p>
+            <a:r>
+              <a:rPr lang="pl-PL" sz="1400" dirty="0">
+                <a:solidFill>
+                  <a:srgbClr val="9CDCFE"/>
+                </a:solidFill>
+                <a:latin typeface="Consolas" panose="020B0609020204030204" pitchFamily="49" charset="0"/>
+              </a:rPr>
+              <a:t>	</a:t>
+            </a:r>
+            <a:r>
+              <a:rPr lang="pl-PL" sz="1400" dirty="0" err="1">
+                <a:solidFill>
+                  <a:srgbClr val="9CDCFE"/>
+                </a:solidFill>
+                <a:latin typeface="Consolas" panose="020B0609020204030204" pitchFamily="49" charset="0"/>
+              </a:rPr>
+              <a:t>counter</a:t>
+            </a:r>
+            <a:r>
+              <a:rPr lang="en-US" sz="1400" dirty="0">
+                <a:solidFill>
+                  <a:srgbClr val="9CDCFE"/>
+                </a:solidFill>
+                <a:latin typeface="Consolas" panose="020B0609020204030204" pitchFamily="49" charset="0"/>
+              </a:rPr>
+              <a:t>:</a:t>
+            </a:r>
+            <a:r>
+              <a:rPr lang="en-US" sz="1400" dirty="0">
+                <a:solidFill>
+                  <a:srgbClr val="D4D4D4"/>
+                </a:solidFill>
+                <a:latin typeface="Consolas" panose="020B0609020204030204" pitchFamily="49" charset="0"/>
+              </a:rPr>
+              <a:t> </a:t>
+            </a:r>
+            <a:r>
+              <a:rPr lang="pl-PL" sz="1400" dirty="0" err="1">
+                <a:solidFill>
+                  <a:srgbClr val="9CDCFE"/>
+                </a:solidFill>
+                <a:latin typeface="Consolas" panose="020B0609020204030204" pitchFamily="49" charset="0"/>
+              </a:rPr>
+              <a:t>counterReducer</a:t>
+            </a:r>
+            <a:endParaRPr lang="pl-PL" sz="1400" dirty="0">
+              <a:solidFill>
+                <a:srgbClr val="9CDCFE"/>
+              </a:solidFill>
+              <a:latin typeface="Consolas" panose="020B0609020204030204" pitchFamily="49" charset="0"/>
+            </a:endParaRPr>
+          </a:p>
+          <a:p>
+            <a:r>
+              <a:rPr lang="en-US" sz="1400" dirty="0">
+                <a:solidFill>
+                  <a:srgbClr val="D4D4D4"/>
+                </a:solidFill>
+                <a:latin typeface="Consolas" panose="020B0609020204030204" pitchFamily="49" charset="0"/>
+              </a:rPr>
+              <a:t>})</a:t>
+            </a:r>
+            <a:endParaRPr lang="en-US" sz="1400" b="0" dirty="0">
+              <a:solidFill>
+                <a:srgbClr val="D4D4D4"/>
+              </a:solidFill>
+              <a:effectLst/>
+              <a:latin typeface="Consolas" panose="020B0609020204030204" pitchFamily="49" charset="0"/>
+            </a:endParaRPr>
+          </a:p>
+        </p:txBody>
+      </p:sp>
+      <p:sp>
+        <p:nvSpPr>
+          <p:cNvPr id="17" name="pole tekstowe 16">
+            <a:extLst>
+              <a:ext uri="{FF2B5EF4-FFF2-40B4-BE49-F238E27FC236}">
+                <a16:creationId xmlns:a16="http://schemas.microsoft.com/office/drawing/2014/main" id="{10B4BDAB-1AA6-4480-8D4C-644E9C0DE87F}"/>
+              </a:ext>
+            </a:extLst>
+          </p:cNvPr>
+          <p:cNvSpPr txBox="1"/>
+          <p:nvPr/>
+        </p:nvSpPr>
+        <p:spPr>
+          <a:xfrm>
+            <a:off x="6732105" y="5374717"/>
+            <a:ext cx="2408608" cy="369332"/>
+          </a:xfrm>
+          <a:prstGeom prst="rect">
+            <a:avLst/>
+          </a:prstGeom>
+          <a:noFill/>
+        </p:spPr>
+        <p:txBody>
+          <a:bodyPr wrap="none" rtlCol="0">
+            <a:spAutoFit/>
+          </a:bodyPr>
+          <a:lstStyle/>
+          <a:p>
             <a:r>
               <a:rPr lang="pl-PL" dirty="0" err="1"/>
-              <a:t>introduction</a:t>
+              <a:t>Build</a:t>
+            </a:r>
+            <a:r>
+              <a:rPr lang="pl-PL" dirty="0"/>
+              <a:t> </a:t>
+            </a:r>
+            <a:r>
+              <a:rPr lang="pl-PL" dirty="0" err="1"/>
+              <a:t>store</a:t>
+            </a:r>
+            <a:r>
+              <a:rPr lang="pl-PL" dirty="0"/>
+              <a:t> </a:t>
+            </a:r>
+            <a:r>
+              <a:rPr lang="pl-PL" dirty="0" err="1"/>
+              <a:t>reducer</a:t>
+            </a:r>
+            <a:r>
+              <a:rPr lang="pl-PL" dirty="0"/>
+              <a:t> </a:t>
+            </a:r>
+            <a:r>
+              <a:rPr lang="pl-PL" dirty="0" err="1"/>
+              <a:t>tree</a:t>
             </a:r>
             <a:endParaRPr lang="pl-PL" dirty="0"/>
           </a:p>
@@ -42139,7 +44998,7 @@
     </p:spTree>
     <p:extLst>
       <p:ext uri="{BB962C8B-B14F-4D97-AF65-F5344CB8AC3E}">
-        <p14:creationId xmlns:p14="http://schemas.microsoft.com/office/powerpoint/2010/main" val="2548649016"/>
+        <p14:creationId xmlns:p14="http://schemas.microsoft.com/office/powerpoint/2010/main" val="1976532068"/>
       </p:ext>
     </p:extLst>
   </p:cSld>
@@ -42527,234 +45386,6 @@
     <p:extLst>
       <p:ext uri="{BB962C8B-B14F-4D97-AF65-F5344CB8AC3E}">
         <p14:creationId xmlns:p14="http://schemas.microsoft.com/office/powerpoint/2010/main" val="2384723857"/>
-      </p:ext>
-    </p:extLst>
-  </p:cSld>
-  <p:clrMapOvr>
-    <a:masterClrMapping/>
-  </p:clrMapOvr>
-</p:sld>
-</file>
-
-<file path=ppt/slides/slide40.xml><?xml version="1.0" encoding="utf-8"?>
-<p:sld xmlns:a="http://schemas.openxmlformats.org/drawingml/2006/main" xmlns:r="http://schemas.openxmlformats.org/officeDocument/2006/relationships" xmlns:p="http://schemas.openxmlformats.org/presentationml/2006/main">
-  <p:cSld>
-    <p:spTree>
-      <p:nvGrpSpPr>
-        <p:cNvPr id="1" name=""/>
-        <p:cNvGrpSpPr/>
-        <p:nvPr/>
-      </p:nvGrpSpPr>
-      <p:grpSpPr>
-        <a:xfrm>
-          <a:off x="0" y="0"/>
-          <a:ext cx="0" cy="0"/>
-          <a:chOff x="0" y="0"/>
-          <a:chExt cx="0" cy="0"/>
-        </a:xfrm>
-      </p:grpSpPr>
-      <p:sp>
-        <p:nvSpPr>
-          <p:cNvPr id="4" name="pole tekstowe 3">
-            <a:extLst>
-              <a:ext uri="{FF2B5EF4-FFF2-40B4-BE49-F238E27FC236}">
-                <a16:creationId xmlns:a16="http://schemas.microsoft.com/office/drawing/2014/main" id="{F164A7B3-8808-414C-9401-3B25194E3B5A}"/>
-              </a:ext>
-            </a:extLst>
-          </p:cNvPr>
-          <p:cNvSpPr txBox="1"/>
-          <p:nvPr/>
-        </p:nvSpPr>
-        <p:spPr>
-          <a:xfrm>
-            <a:off x="497840" y="538480"/>
-            <a:ext cx="2103204" cy="369332"/>
-          </a:xfrm>
-          <a:prstGeom prst="rect">
-            <a:avLst/>
-          </a:prstGeom>
-          <a:noFill/>
-        </p:spPr>
-        <p:txBody>
-          <a:bodyPr wrap="none" rtlCol="0">
-            <a:spAutoFit/>
-          </a:bodyPr>
-          <a:lstStyle/>
-          <a:p>
-            <a:r>
-              <a:rPr lang="pl-PL" dirty="0" err="1"/>
-              <a:t>Redux</a:t>
-            </a:r>
-            <a:r>
-              <a:rPr lang="pl-PL" dirty="0"/>
-              <a:t> - </a:t>
-            </a:r>
-            <a:r>
-              <a:rPr lang="pl-PL" dirty="0" err="1"/>
-              <a:t>introduction</a:t>
-            </a:r>
-            <a:endParaRPr lang="pl-PL" dirty="0"/>
-          </a:p>
-        </p:txBody>
-      </p:sp>
-      <p:sp>
-        <p:nvSpPr>
-          <p:cNvPr id="6" name="Prostokąt 5">
-            <a:extLst>
-              <a:ext uri="{FF2B5EF4-FFF2-40B4-BE49-F238E27FC236}">
-                <a16:creationId xmlns:a16="http://schemas.microsoft.com/office/drawing/2014/main" id="{02CB4B36-132E-4A3A-AAF5-A1E25F7ADBC0}"/>
-              </a:ext>
-            </a:extLst>
-          </p:cNvPr>
-          <p:cNvSpPr/>
-          <p:nvPr/>
-        </p:nvSpPr>
-        <p:spPr>
-          <a:xfrm>
-            <a:off x="4482078" y="1415534"/>
-            <a:ext cx="2962799" cy="369332"/>
-          </a:xfrm>
-          <a:prstGeom prst="rect">
-            <a:avLst/>
-          </a:prstGeom>
-        </p:spPr>
-        <p:txBody>
-          <a:bodyPr wrap="none">
-            <a:spAutoFit/>
-          </a:bodyPr>
-          <a:lstStyle/>
-          <a:p>
-            <a:r>
-              <a:rPr lang="pl-PL" dirty="0" err="1">
-                <a:latin typeface="SFMono-Regular"/>
-              </a:rPr>
-              <a:t>npm</a:t>
-            </a:r>
-            <a:r>
-              <a:rPr lang="pl-PL" dirty="0">
-                <a:latin typeface="SFMono-Regular"/>
-              </a:rPr>
-              <a:t> </a:t>
-            </a:r>
-            <a:r>
-              <a:rPr lang="pl-PL" dirty="0" err="1">
-                <a:latin typeface="SFMono-Regular"/>
-              </a:rPr>
-              <a:t>install</a:t>
-            </a:r>
-            <a:r>
-              <a:rPr lang="pl-PL" dirty="0">
-                <a:latin typeface="SFMono-Regular"/>
-              </a:rPr>
-              <a:t> --</a:t>
-            </a:r>
-            <a:r>
-              <a:rPr lang="pl-PL" dirty="0" err="1">
-                <a:latin typeface="SFMono-Regular"/>
-              </a:rPr>
-              <a:t>save</a:t>
-            </a:r>
-            <a:r>
-              <a:rPr lang="pl-PL" dirty="0">
-                <a:latin typeface="SFMono-Regular"/>
-              </a:rPr>
-              <a:t> </a:t>
-            </a:r>
-            <a:r>
-              <a:rPr lang="pl-PL" dirty="0" err="1">
-                <a:latin typeface="SFMono-Regular"/>
-              </a:rPr>
-              <a:t>react-redux</a:t>
-            </a:r>
-            <a:endParaRPr lang="pl-PL" dirty="0"/>
-          </a:p>
-        </p:txBody>
-      </p:sp>
-      <p:sp>
-        <p:nvSpPr>
-          <p:cNvPr id="7" name="Prostokąt 6">
-            <a:extLst>
-              <a:ext uri="{FF2B5EF4-FFF2-40B4-BE49-F238E27FC236}">
-                <a16:creationId xmlns:a16="http://schemas.microsoft.com/office/drawing/2014/main" id="{8BF58E04-F447-4CA1-AC77-99E7122E8C0C}"/>
-              </a:ext>
-            </a:extLst>
-          </p:cNvPr>
-          <p:cNvSpPr/>
-          <p:nvPr/>
-        </p:nvSpPr>
-        <p:spPr>
-          <a:xfrm>
-            <a:off x="4482077" y="1784866"/>
-            <a:ext cx="2962799" cy="369332"/>
-          </a:xfrm>
-          <a:prstGeom prst="rect">
-            <a:avLst/>
-          </a:prstGeom>
-        </p:spPr>
-        <p:txBody>
-          <a:bodyPr wrap="square">
-            <a:spAutoFit/>
-          </a:bodyPr>
-          <a:lstStyle/>
-          <a:p>
-            <a:r>
-              <a:rPr lang="pl-PL" dirty="0" err="1">
-                <a:solidFill>
-                  <a:srgbClr val="000000"/>
-                </a:solidFill>
-                <a:latin typeface="inherit"/>
-              </a:rPr>
-              <a:t>npm</a:t>
-            </a:r>
-            <a:r>
-              <a:rPr lang="pl-PL" dirty="0">
-                <a:solidFill>
-                  <a:srgbClr val="000000"/>
-                </a:solidFill>
-                <a:latin typeface="inherit"/>
-              </a:rPr>
-              <a:t> i </a:t>
-            </a:r>
-            <a:r>
-              <a:rPr lang="pl-PL" dirty="0" err="1">
-                <a:solidFill>
-                  <a:srgbClr val="000000"/>
-                </a:solidFill>
-                <a:latin typeface="inherit"/>
-              </a:rPr>
-              <a:t>redux</a:t>
-            </a:r>
-            <a:r>
-              <a:rPr lang="pl-PL" dirty="0">
-                <a:solidFill>
-                  <a:srgbClr val="000000"/>
-                </a:solidFill>
-                <a:latin typeface="inherit"/>
-              </a:rPr>
-              <a:t> --</a:t>
-            </a:r>
-            <a:r>
-              <a:rPr lang="pl-PL" dirty="0" err="1">
-                <a:solidFill>
-                  <a:srgbClr val="000000"/>
-                </a:solidFill>
-                <a:latin typeface="inherit"/>
-              </a:rPr>
-              <a:t>save-dev</a:t>
-            </a:r>
-            <a:endParaRPr lang="pl-PL" dirty="0">
-              <a:solidFill>
-                <a:srgbClr val="444444"/>
-              </a:solidFill>
-              <a:latin typeface="Source Code Pro"/>
-            </a:endParaRPr>
-          </a:p>
-        </p:txBody>
-      </p:sp>
-    </p:spTree>
-    <p:extLst>
-      <p:ext uri="{BB962C8B-B14F-4D97-AF65-F5344CB8AC3E}">
-        <p14:creationId xmlns:p14="http://schemas.microsoft.com/office/powerpoint/2010/main" val="1976532068"/>
       </p:ext>
     </p:extLst>
   </p:cSld>

</xml_diff>

<commit_message>
Exercise 26: Redux - change list to use store
</commit_message>
<xml_diff>
--- a/tutorial/ReactjsTraining.pptx
+++ b/tutorial/ReactjsTraining.pptx
@@ -5,7 +5,7 @@
     <p:sldMasterId id="2147483648" r:id="rId1"/>
   </p:sldMasterIdLst>
   <p:notesMasterIdLst>
-    <p:notesMasterId r:id="rId39"/>
+    <p:notesMasterId r:id="rId40"/>
   </p:notesMasterIdLst>
   <p:sldIdLst>
     <p:sldId id="256" r:id="rId2"/>
@@ -45,6 +45,7 @@
     <p:sldId id="292" r:id="rId36"/>
     <p:sldId id="294" r:id="rId37"/>
     <p:sldId id="282" r:id="rId38"/>
+    <p:sldId id="295" r:id="rId39"/>
   </p:sldIdLst>
   <p:sldSz cx="12192000" cy="6858000"/>
   <p:notesSz cx="6858000" cy="9144000"/>
@@ -8212,6 +8213,315 @@
     <p:extLst>
       <p:ext uri="{BB962C8B-B14F-4D97-AF65-F5344CB8AC3E}">
         <p14:creationId xmlns:p14="http://schemas.microsoft.com/office/powerpoint/2010/main" val="3365077152"/>
+      </p:ext>
+    </p:extLst>
+  </p:cSld>
+  <p:clrMapOvr>
+    <a:masterClrMapping/>
+  </p:clrMapOvr>
+</p:notes>
+</file>
+
+<file path=ppt/notesSlides/notesSlide38.xml><?xml version="1.0" encoding="utf-8"?>
+<p:notes xmlns:a="http://schemas.openxmlformats.org/drawingml/2006/main" xmlns:r="http://schemas.openxmlformats.org/officeDocument/2006/relationships" xmlns:p="http://schemas.openxmlformats.org/presentationml/2006/main">
+  <p:cSld>
+    <p:spTree>
+      <p:nvGrpSpPr>
+        <p:cNvPr id="1" name=""/>
+        <p:cNvGrpSpPr/>
+        <p:nvPr/>
+      </p:nvGrpSpPr>
+      <p:grpSpPr>
+        <a:xfrm>
+          <a:off x="0" y="0"/>
+          <a:ext cx="0" cy="0"/>
+          <a:chOff x="0" y="0"/>
+          <a:chExt cx="0" cy="0"/>
+        </a:xfrm>
+      </p:grpSpPr>
+      <p:sp>
+        <p:nvSpPr>
+          <p:cNvPr id="2" name="Symbol zastępczy obrazu slajdu 1"/>
+          <p:cNvSpPr>
+            <a:spLocks noGrp="1" noRot="1" noChangeAspect="1"/>
+          </p:cNvSpPr>
+          <p:nvPr>
+            <p:ph type="sldImg"/>
+          </p:nvPr>
+        </p:nvSpPr>
+        <p:spPr/>
+      </p:sp>
+      <p:sp>
+        <p:nvSpPr>
+          <p:cNvPr id="3" name="Symbol zastępczy notatek 2"/>
+          <p:cNvSpPr>
+            <a:spLocks noGrp="1"/>
+          </p:cNvSpPr>
+          <p:nvPr>
+            <p:ph type="body" idx="1"/>
+          </p:nvPr>
+        </p:nvSpPr>
+        <p:spPr/>
+        <p:txBody>
+          <a:bodyPr/>
+          <a:lstStyle/>
+          <a:p>
+            <a:pPr marL="0" indent="0">
+              <a:buFontTx/>
+              <a:buNone/>
+            </a:pPr>
+            <a:r>
+              <a:rPr lang="pl-PL" sz="1200" b="0" i="0" kern="1200" dirty="0" err="1">
+                <a:solidFill>
+                  <a:schemeClr val="tx1"/>
+                </a:solidFill>
+                <a:effectLst/>
+                <a:latin typeface="+mn-lt"/>
+                <a:ea typeface="+mn-ea"/>
+                <a:cs typeface="+mn-cs"/>
+              </a:rPr>
+              <a:t>Exercise</a:t>
+            </a:r>
+            <a:r>
+              <a:rPr lang="pl-PL" sz="1200" b="0" i="0" kern="1200" dirty="0">
+                <a:solidFill>
+                  <a:schemeClr val="tx1"/>
+                </a:solidFill>
+                <a:effectLst/>
+                <a:latin typeface="+mn-lt"/>
+                <a:ea typeface="+mn-ea"/>
+                <a:cs typeface="+mn-cs"/>
+              </a:rPr>
+              <a:t> 26: </a:t>
+            </a:r>
+          </a:p>
+          <a:p>
+            <a:pPr marL="228600" indent="-228600">
+              <a:buFontTx/>
+              <a:buAutoNum type="arabicPeriod"/>
+            </a:pPr>
+            <a:r>
+              <a:rPr lang="pl-PL" sz="1200" b="0" i="0" kern="1200" dirty="0">
+                <a:solidFill>
+                  <a:schemeClr val="tx1"/>
+                </a:solidFill>
+                <a:effectLst/>
+                <a:latin typeface="+mn-lt"/>
+                <a:ea typeface="+mn-ea"/>
+                <a:cs typeface="+mn-cs"/>
+              </a:rPr>
+              <a:t>Stwórz osobny </a:t>
+            </a:r>
+            <a:r>
+              <a:rPr lang="pl-PL" sz="1200" b="0" i="0" kern="1200" dirty="0" err="1">
+                <a:solidFill>
+                  <a:schemeClr val="tx1"/>
+                </a:solidFill>
+                <a:effectLst/>
+                <a:latin typeface="+mn-lt"/>
+                <a:ea typeface="+mn-ea"/>
+                <a:cs typeface="+mn-cs"/>
+              </a:rPr>
+              <a:t>store</a:t>
+            </a:r>
+            <a:endParaRPr lang="pl-PL" sz="1200" b="0" i="0" kern="1200" dirty="0">
+              <a:solidFill>
+                <a:schemeClr val="tx1"/>
+              </a:solidFill>
+              <a:effectLst/>
+              <a:latin typeface="+mn-lt"/>
+              <a:ea typeface="+mn-ea"/>
+              <a:cs typeface="+mn-cs"/>
+            </a:endParaRPr>
+          </a:p>
+          <a:p>
+            <a:pPr marL="228600" indent="-228600">
+              <a:buFontTx/>
+              <a:buAutoNum type="arabicPeriod"/>
+            </a:pPr>
+            <a:r>
+              <a:rPr lang="pl-PL" sz="1200" b="0" i="0" kern="1200" dirty="0">
+                <a:solidFill>
+                  <a:schemeClr val="tx1"/>
+                </a:solidFill>
+                <a:effectLst/>
+                <a:latin typeface="+mn-lt"/>
+                <a:ea typeface="+mn-ea"/>
+                <a:cs typeface="+mn-cs"/>
+              </a:rPr>
+              <a:t>Przerób listę na </a:t>
+            </a:r>
+            <a:r>
+              <a:rPr lang="pl-PL" sz="1200" b="0" i="0" kern="1200" dirty="0" err="1">
+                <a:solidFill>
+                  <a:schemeClr val="tx1"/>
+                </a:solidFill>
+                <a:effectLst/>
+                <a:latin typeface="+mn-lt"/>
+                <a:ea typeface="+mn-ea"/>
+                <a:cs typeface="+mn-cs"/>
+              </a:rPr>
+              <a:t>redux</a:t>
+            </a:r>
+            <a:endParaRPr lang="pl-PL" sz="1200" b="0" i="0" kern="1200" dirty="0">
+              <a:solidFill>
+                <a:schemeClr val="tx1"/>
+              </a:solidFill>
+              <a:effectLst/>
+              <a:latin typeface="+mn-lt"/>
+              <a:ea typeface="+mn-ea"/>
+              <a:cs typeface="+mn-cs"/>
+            </a:endParaRPr>
+          </a:p>
+          <a:p>
+            <a:pPr marL="228600" indent="-228600">
+              <a:buFontTx/>
+              <a:buAutoNum type="arabicPeriod"/>
+            </a:pPr>
+            <a:r>
+              <a:rPr lang="pl-PL" sz="1200" b="0" i="0" kern="1200" dirty="0">
+                <a:solidFill>
+                  <a:schemeClr val="tx1"/>
+                </a:solidFill>
+                <a:effectLst/>
+                <a:latin typeface="+mn-lt"/>
+                <a:ea typeface="+mn-ea"/>
+                <a:cs typeface="+mn-cs"/>
+              </a:rPr>
+              <a:t>Trzymaj w </a:t>
+            </a:r>
+            <a:r>
+              <a:rPr lang="pl-PL" sz="1200" b="0" i="0" kern="1200" dirty="0" err="1">
+                <a:solidFill>
+                  <a:schemeClr val="tx1"/>
+                </a:solidFill>
+                <a:effectLst/>
+                <a:latin typeface="+mn-lt"/>
+                <a:ea typeface="+mn-ea"/>
+                <a:cs typeface="+mn-cs"/>
+              </a:rPr>
+              <a:t>store</a:t>
+            </a:r>
+            <a:r>
+              <a:rPr lang="pl-PL" sz="1200" b="0" i="0" kern="1200" dirty="0">
+                <a:solidFill>
+                  <a:schemeClr val="tx1"/>
+                </a:solidFill>
+                <a:effectLst/>
+                <a:latin typeface="+mn-lt"/>
+                <a:ea typeface="+mn-ea"/>
+                <a:cs typeface="+mn-cs"/>
+              </a:rPr>
+              <a:t> informację czy obecnie </a:t>
+            </a:r>
+            <a:r>
+              <a:rPr lang="pl-PL" sz="1200" b="0" i="0" kern="1200">
+                <a:solidFill>
+                  <a:schemeClr val="tx1"/>
+                </a:solidFill>
+                <a:effectLst/>
+                <a:latin typeface="+mn-lt"/>
+                <a:ea typeface="+mn-ea"/>
+                <a:cs typeface="+mn-cs"/>
+              </a:rPr>
+              <a:t>edytowanym użytkowniku</a:t>
+            </a:r>
+            <a:endParaRPr lang="pl-PL" sz="1200" b="0" i="0" kern="1200" dirty="0">
+              <a:solidFill>
+                <a:schemeClr val="tx1"/>
+              </a:solidFill>
+              <a:effectLst/>
+              <a:latin typeface="+mn-lt"/>
+              <a:ea typeface="+mn-ea"/>
+              <a:cs typeface="+mn-cs"/>
+            </a:endParaRPr>
+          </a:p>
+          <a:p>
+            <a:pPr marL="228600" indent="-228600">
+              <a:buFontTx/>
+              <a:buAutoNum type="arabicPeriod"/>
+            </a:pPr>
+            <a:r>
+              <a:rPr lang="pl-PL" sz="1200" b="0" i="0" kern="1200" dirty="0">
+                <a:solidFill>
+                  <a:schemeClr val="tx1"/>
+                </a:solidFill>
+                <a:effectLst/>
+                <a:latin typeface="+mn-lt"/>
+                <a:ea typeface="+mn-ea"/>
+                <a:cs typeface="+mn-cs"/>
+              </a:rPr>
+              <a:t>Za każdym razem jak się zmieni </a:t>
+            </a:r>
+            <a:r>
+              <a:rPr lang="pl-PL" sz="1200" b="0" i="0" kern="1200" dirty="0" err="1">
+                <a:solidFill>
+                  <a:schemeClr val="tx1"/>
+                </a:solidFill>
+                <a:effectLst/>
+                <a:latin typeface="+mn-lt"/>
+                <a:ea typeface="+mn-ea"/>
+                <a:cs typeface="+mn-cs"/>
+              </a:rPr>
+              <a:t>store</a:t>
+            </a:r>
+            <a:r>
+              <a:rPr lang="pl-PL" sz="1200" b="0" i="0" kern="1200" dirty="0">
+                <a:solidFill>
+                  <a:schemeClr val="tx1"/>
+                </a:solidFill>
+                <a:effectLst/>
+                <a:latin typeface="+mn-lt"/>
+                <a:ea typeface="+mn-ea"/>
+                <a:cs typeface="+mn-cs"/>
+              </a:rPr>
+              <a:t> to wyświetl go w konsoli</a:t>
+            </a:r>
+          </a:p>
+          <a:p>
+            <a:pPr marL="228600" indent="-228600">
+              <a:buFontTx/>
+              <a:buAutoNum type="arabicPeriod"/>
+            </a:pPr>
+            <a:endParaRPr lang="pl-PL" sz="1200" b="0" i="0" kern="1200" dirty="0">
+              <a:solidFill>
+                <a:schemeClr val="tx1"/>
+              </a:solidFill>
+              <a:effectLst/>
+              <a:latin typeface="+mn-lt"/>
+              <a:ea typeface="+mn-ea"/>
+              <a:cs typeface="+mn-cs"/>
+            </a:endParaRPr>
+          </a:p>
+        </p:txBody>
+      </p:sp>
+      <p:sp>
+        <p:nvSpPr>
+          <p:cNvPr id="4" name="Symbol zastępczy numeru slajdu 3"/>
+          <p:cNvSpPr>
+            <a:spLocks noGrp="1"/>
+          </p:cNvSpPr>
+          <p:nvPr>
+            <p:ph type="sldNum" sz="quarter" idx="5"/>
+          </p:nvPr>
+        </p:nvSpPr>
+        <p:spPr/>
+        <p:txBody>
+          <a:bodyPr/>
+          <a:lstStyle/>
+          <a:p>
+            <a:fld id="{810A6612-7A23-4B98-B0E9-4F3C882AD2EF}" type="slidenum">
+              <a:rPr lang="pl-PL" smtClean="0"/>
+              <a:t>38</a:t>
+            </a:fld>
+            <a:endParaRPr lang="pl-PL"/>
+          </a:p>
+        </p:txBody>
+      </p:sp>
+    </p:spTree>
+    <p:extLst>
+      <p:ext uri="{BB962C8B-B14F-4D97-AF65-F5344CB8AC3E}">
+        <p14:creationId xmlns:p14="http://schemas.microsoft.com/office/powerpoint/2010/main" val="1199877774"/>
       </p:ext>
     </p:extLst>
   </p:cSld>
@@ -44999,6 +45309,353 @@
     <p:extLst>
       <p:ext uri="{BB962C8B-B14F-4D97-AF65-F5344CB8AC3E}">
         <p14:creationId xmlns:p14="http://schemas.microsoft.com/office/powerpoint/2010/main" val="1976532068"/>
+      </p:ext>
+    </p:extLst>
+  </p:cSld>
+  <p:clrMapOvr>
+    <a:masterClrMapping/>
+  </p:clrMapOvr>
+</p:sld>
+</file>
+
+<file path=ppt/slides/slide38.xml><?xml version="1.0" encoding="utf-8"?>
+<p:sld xmlns:a="http://schemas.openxmlformats.org/drawingml/2006/main" xmlns:r="http://schemas.openxmlformats.org/officeDocument/2006/relationships" xmlns:p="http://schemas.openxmlformats.org/presentationml/2006/main">
+  <p:cSld>
+    <p:spTree>
+      <p:nvGrpSpPr>
+        <p:cNvPr id="1" name=""/>
+        <p:cNvGrpSpPr/>
+        <p:nvPr/>
+      </p:nvGrpSpPr>
+      <p:grpSpPr>
+        <a:xfrm>
+          <a:off x="0" y="0"/>
+          <a:ext cx="0" cy="0"/>
+          <a:chOff x="0" y="0"/>
+          <a:chExt cx="0" cy="0"/>
+        </a:xfrm>
+      </p:grpSpPr>
+      <p:sp>
+        <p:nvSpPr>
+          <p:cNvPr id="4" name="pole tekstowe 3">
+            <a:extLst>
+              <a:ext uri="{FF2B5EF4-FFF2-40B4-BE49-F238E27FC236}">
+                <a16:creationId xmlns:a16="http://schemas.microsoft.com/office/drawing/2014/main" id="{F164A7B3-8808-414C-9401-3B25194E3B5A}"/>
+              </a:ext>
+            </a:extLst>
+          </p:cNvPr>
+          <p:cNvSpPr txBox="1"/>
+          <p:nvPr/>
+        </p:nvSpPr>
+        <p:spPr>
+          <a:xfrm>
+            <a:off x="497840" y="538480"/>
+            <a:ext cx="1416734" cy="369332"/>
+          </a:xfrm>
+          <a:prstGeom prst="rect">
+            <a:avLst/>
+          </a:prstGeom>
+          <a:noFill/>
+        </p:spPr>
+        <p:txBody>
+          <a:bodyPr wrap="none" rtlCol="0">
+            <a:spAutoFit/>
+          </a:bodyPr>
+          <a:lstStyle/>
+          <a:p>
+            <a:r>
+              <a:rPr lang="pl-PL" dirty="0" err="1"/>
+              <a:t>Redux</a:t>
+            </a:r>
+            <a:r>
+              <a:rPr lang="pl-PL" dirty="0"/>
+              <a:t> - </a:t>
+            </a:r>
+            <a:r>
+              <a:rPr lang="pl-PL" dirty="0" err="1"/>
+              <a:t>store</a:t>
+            </a:r>
+            <a:endParaRPr lang="pl-PL" dirty="0"/>
+          </a:p>
+        </p:txBody>
+      </p:sp>
+      <p:sp>
+        <p:nvSpPr>
+          <p:cNvPr id="6" name="Prostokąt 5">
+            <a:extLst>
+              <a:ext uri="{FF2B5EF4-FFF2-40B4-BE49-F238E27FC236}">
+                <a16:creationId xmlns:a16="http://schemas.microsoft.com/office/drawing/2014/main" id="{E3C9D326-06F8-434D-AE4A-0D0B7DBE36ED}"/>
+              </a:ext>
+            </a:extLst>
+          </p:cNvPr>
+          <p:cNvSpPr/>
+          <p:nvPr/>
+        </p:nvSpPr>
+        <p:spPr>
+          <a:xfrm>
+            <a:off x="1914574" y="2373148"/>
+            <a:ext cx="9144000" cy="1477328"/>
+          </a:xfrm>
+          <a:prstGeom prst="rect">
+            <a:avLst/>
+          </a:prstGeom>
+          <a:solidFill>
+            <a:schemeClr val="tx1"/>
+          </a:solidFill>
+        </p:spPr>
+        <p:txBody>
+          <a:bodyPr wrap="square">
+            <a:spAutoFit/>
+          </a:bodyPr>
+          <a:lstStyle/>
+          <a:p>
+            <a:r>
+              <a:rPr lang="en-US" dirty="0">
+                <a:solidFill>
+                  <a:srgbClr val="569CD6"/>
+                </a:solidFill>
+                <a:latin typeface="Consolas" panose="020B0609020204030204" pitchFamily="49" charset="0"/>
+              </a:rPr>
+              <a:t>const</a:t>
+            </a:r>
+            <a:r>
+              <a:rPr lang="en-US" dirty="0">
+                <a:solidFill>
+                  <a:srgbClr val="D4D4D4"/>
+                </a:solidFill>
+                <a:latin typeface="Consolas" panose="020B0609020204030204" pitchFamily="49" charset="0"/>
+              </a:rPr>
+              <a:t> </a:t>
+            </a:r>
+            <a:r>
+              <a:rPr lang="en-US" dirty="0">
+                <a:solidFill>
+                  <a:srgbClr val="9CDCFE"/>
+                </a:solidFill>
+                <a:latin typeface="Consolas" panose="020B0609020204030204" pitchFamily="49" charset="0"/>
+              </a:rPr>
+              <a:t>subscribe</a:t>
+            </a:r>
+            <a:r>
+              <a:rPr lang="en-US" dirty="0">
+                <a:solidFill>
+                  <a:srgbClr val="D4D4D4"/>
+                </a:solidFill>
+                <a:latin typeface="Consolas" panose="020B0609020204030204" pitchFamily="49" charset="0"/>
+              </a:rPr>
+              <a:t> = </a:t>
+            </a:r>
+            <a:r>
+              <a:rPr lang="en-US" dirty="0" err="1">
+                <a:solidFill>
+                  <a:srgbClr val="9CDCFE"/>
+                </a:solidFill>
+                <a:latin typeface="Consolas" panose="020B0609020204030204" pitchFamily="49" charset="0"/>
+              </a:rPr>
+              <a:t>store</a:t>
+            </a:r>
+            <a:r>
+              <a:rPr lang="en-US" dirty="0" err="1">
+                <a:solidFill>
+                  <a:srgbClr val="D4D4D4"/>
+                </a:solidFill>
+                <a:latin typeface="Consolas" panose="020B0609020204030204" pitchFamily="49" charset="0"/>
+              </a:rPr>
+              <a:t>.</a:t>
+            </a:r>
+            <a:r>
+              <a:rPr lang="en-US" dirty="0" err="1">
+                <a:solidFill>
+                  <a:srgbClr val="DCDCAA"/>
+                </a:solidFill>
+                <a:latin typeface="Consolas" panose="020B0609020204030204" pitchFamily="49" charset="0"/>
+              </a:rPr>
+              <a:t>subscribe</a:t>
+            </a:r>
+            <a:r>
+              <a:rPr lang="en-US" dirty="0">
+                <a:solidFill>
+                  <a:srgbClr val="D4D4D4"/>
+                </a:solidFill>
+                <a:latin typeface="Consolas" panose="020B0609020204030204" pitchFamily="49" charset="0"/>
+              </a:rPr>
+              <a:t>(</a:t>
+            </a:r>
+            <a:endParaRPr lang="pl-PL" dirty="0">
+              <a:solidFill>
+                <a:srgbClr val="D4D4D4"/>
+              </a:solidFill>
+              <a:latin typeface="Consolas" panose="020B0609020204030204" pitchFamily="49" charset="0"/>
+            </a:endParaRPr>
+          </a:p>
+          <a:p>
+            <a:r>
+              <a:rPr lang="pl-PL" dirty="0">
+                <a:solidFill>
+                  <a:srgbClr val="D4D4D4"/>
+                </a:solidFill>
+                <a:latin typeface="Consolas" panose="020B0609020204030204" pitchFamily="49" charset="0"/>
+              </a:rPr>
+              <a:t>	</a:t>
+            </a:r>
+            <a:r>
+              <a:rPr lang="en-US" dirty="0">
+                <a:solidFill>
+                  <a:srgbClr val="D4D4D4"/>
+                </a:solidFill>
+                <a:latin typeface="Consolas" panose="020B0609020204030204" pitchFamily="49" charset="0"/>
+              </a:rPr>
+              <a:t>() </a:t>
+            </a:r>
+            <a:r>
+              <a:rPr lang="en-US" dirty="0">
+                <a:solidFill>
+                  <a:srgbClr val="569CD6"/>
+                </a:solidFill>
+                <a:latin typeface="Consolas" panose="020B0609020204030204" pitchFamily="49" charset="0"/>
+              </a:rPr>
+              <a:t>=&gt;</a:t>
+            </a:r>
+            <a:r>
+              <a:rPr lang="en-US" dirty="0">
+                <a:solidFill>
+                  <a:srgbClr val="D4D4D4"/>
+                </a:solidFill>
+                <a:latin typeface="Consolas" panose="020B0609020204030204" pitchFamily="49" charset="0"/>
+              </a:rPr>
+              <a:t> </a:t>
+            </a:r>
+            <a:r>
+              <a:rPr lang="en-US" dirty="0">
+                <a:solidFill>
+                  <a:srgbClr val="4EC9B0"/>
+                </a:solidFill>
+                <a:latin typeface="Consolas" panose="020B0609020204030204" pitchFamily="49" charset="0"/>
+              </a:rPr>
+              <a:t>console</a:t>
+            </a:r>
+            <a:r>
+              <a:rPr lang="en-US" dirty="0">
+                <a:solidFill>
+                  <a:srgbClr val="D4D4D4"/>
+                </a:solidFill>
+                <a:latin typeface="Consolas" panose="020B0609020204030204" pitchFamily="49" charset="0"/>
+              </a:rPr>
+              <a:t>.</a:t>
+            </a:r>
+            <a:r>
+              <a:rPr lang="en-US" dirty="0">
+                <a:solidFill>
+                  <a:srgbClr val="DCDCAA"/>
+                </a:solidFill>
+                <a:latin typeface="Consolas" panose="020B0609020204030204" pitchFamily="49" charset="0"/>
+              </a:rPr>
+              <a:t>log</a:t>
+            </a:r>
+            <a:r>
+              <a:rPr lang="en-US" dirty="0">
+                <a:solidFill>
+                  <a:srgbClr val="D4D4D4"/>
+                </a:solidFill>
+                <a:latin typeface="Consolas" panose="020B0609020204030204" pitchFamily="49" charset="0"/>
+              </a:rPr>
+              <a:t>(</a:t>
+            </a:r>
+            <a:r>
+              <a:rPr lang="en-US" dirty="0" err="1">
+                <a:solidFill>
+                  <a:srgbClr val="9CDCFE"/>
+                </a:solidFill>
+                <a:latin typeface="Consolas" panose="020B0609020204030204" pitchFamily="49" charset="0"/>
+              </a:rPr>
+              <a:t>store</a:t>
+            </a:r>
+            <a:r>
+              <a:rPr lang="en-US" dirty="0" err="1">
+                <a:solidFill>
+                  <a:srgbClr val="D4D4D4"/>
+                </a:solidFill>
+                <a:latin typeface="Consolas" panose="020B0609020204030204" pitchFamily="49" charset="0"/>
+              </a:rPr>
+              <a:t>.</a:t>
+            </a:r>
+            <a:r>
+              <a:rPr lang="en-US" dirty="0" err="1">
+                <a:solidFill>
+                  <a:srgbClr val="DCDCAA"/>
+                </a:solidFill>
+                <a:latin typeface="Consolas" panose="020B0609020204030204" pitchFamily="49" charset="0"/>
+              </a:rPr>
+              <a:t>getState</a:t>
+            </a:r>
+            <a:r>
+              <a:rPr lang="en-US" dirty="0">
+                <a:solidFill>
+                  <a:srgbClr val="D4D4D4"/>
+                </a:solidFill>
+                <a:latin typeface="Consolas" panose="020B0609020204030204" pitchFamily="49" charset="0"/>
+              </a:rPr>
+              <a:t>())</a:t>
+            </a:r>
+            <a:endParaRPr lang="pl-PL" dirty="0">
+              <a:solidFill>
+                <a:srgbClr val="D4D4D4"/>
+              </a:solidFill>
+              <a:latin typeface="Consolas" panose="020B0609020204030204" pitchFamily="49" charset="0"/>
+            </a:endParaRPr>
+          </a:p>
+          <a:p>
+            <a:r>
+              <a:rPr lang="en-US" dirty="0">
+                <a:solidFill>
+                  <a:srgbClr val="D4D4D4"/>
+                </a:solidFill>
+                <a:latin typeface="Consolas" panose="020B0609020204030204" pitchFamily="49" charset="0"/>
+              </a:rPr>
+              <a:t>)</a:t>
+            </a:r>
+          </a:p>
+          <a:p>
+            <a:br>
+              <a:rPr lang="en-US" dirty="0">
+                <a:solidFill>
+                  <a:srgbClr val="D4D4D4"/>
+                </a:solidFill>
+                <a:latin typeface="Consolas" panose="020B0609020204030204" pitchFamily="49" charset="0"/>
+              </a:rPr>
+            </a:br>
+            <a:r>
+              <a:rPr lang="en-US" dirty="0">
+                <a:solidFill>
+                  <a:srgbClr val="DCDCAA"/>
+                </a:solidFill>
+                <a:latin typeface="Consolas" panose="020B0609020204030204" pitchFamily="49" charset="0"/>
+              </a:rPr>
+              <a:t>unsubscribe</a:t>
+            </a:r>
+            <a:r>
+              <a:rPr lang="en-US" dirty="0">
+                <a:solidFill>
+                  <a:srgbClr val="D4D4D4"/>
+                </a:solidFill>
+                <a:latin typeface="Consolas" panose="020B0609020204030204" pitchFamily="49" charset="0"/>
+              </a:rPr>
+              <a:t>()</a:t>
+            </a:r>
+            <a:endParaRPr lang="en-US" b="0" dirty="0">
+              <a:solidFill>
+                <a:srgbClr val="D4D4D4"/>
+              </a:solidFill>
+              <a:effectLst/>
+              <a:latin typeface="Consolas" panose="020B0609020204030204" pitchFamily="49" charset="0"/>
+            </a:endParaRPr>
+          </a:p>
+        </p:txBody>
+      </p:sp>
+    </p:spTree>
+    <p:extLst>
+      <p:ext uri="{BB962C8B-B14F-4D97-AF65-F5344CB8AC3E}">
+        <p14:creationId xmlns:p14="http://schemas.microsoft.com/office/powerpoint/2010/main" val="3029284417"/>
       </p:ext>
     </p:extLst>
   </p:cSld>

</xml_diff>

<commit_message>
Exercise 27: Redux middleware - login http call
</commit_message>
<xml_diff>
--- a/tutorial/ReactjsTraining.pptx
+++ b/tutorial/ReactjsTraining.pptx
@@ -5,7 +5,7 @@
     <p:sldMasterId id="2147483648" r:id="rId1"/>
   </p:sldMasterIdLst>
   <p:notesMasterIdLst>
-    <p:notesMasterId r:id="rId40"/>
+    <p:notesMasterId r:id="rId41"/>
   </p:notesMasterIdLst>
   <p:sldIdLst>
     <p:sldId id="256" r:id="rId2"/>
@@ -46,6 +46,7 @@
     <p:sldId id="294" r:id="rId37"/>
     <p:sldId id="282" r:id="rId38"/>
     <p:sldId id="295" r:id="rId39"/>
+    <p:sldId id="296" r:id="rId40"/>
   </p:sldIdLst>
   <p:sldSz cx="12192000" cy="6858000"/>
   <p:notesSz cx="6858000" cy="9144000"/>
@@ -234,7 +235,7 @@
           <a:p>
             <a:fld id="{D61BAF21-C883-454C-A249-8697E6BEDB6B}" type="datetimeFigureOut">
               <a:rPr lang="pl-PL" smtClean="0"/>
-              <a:t>12.10.2019</a:t>
+              <a:t>13.10.2019</a:t>
             </a:fld>
             <a:endParaRPr lang="pl-PL"/>
           </a:p>
@@ -8531,6 +8532,363 @@
 </p:notes>
 </file>
 
+<file path=ppt/notesSlides/notesSlide39.xml><?xml version="1.0" encoding="utf-8"?>
+<p:notes xmlns:a="http://schemas.openxmlformats.org/drawingml/2006/main" xmlns:r="http://schemas.openxmlformats.org/officeDocument/2006/relationships" xmlns:p="http://schemas.openxmlformats.org/presentationml/2006/main">
+  <p:cSld>
+    <p:spTree>
+      <p:nvGrpSpPr>
+        <p:cNvPr id="1" name=""/>
+        <p:cNvGrpSpPr/>
+        <p:nvPr/>
+      </p:nvGrpSpPr>
+      <p:grpSpPr>
+        <a:xfrm>
+          <a:off x="0" y="0"/>
+          <a:ext cx="0" cy="0"/>
+          <a:chOff x="0" y="0"/>
+          <a:chExt cx="0" cy="0"/>
+        </a:xfrm>
+      </p:grpSpPr>
+      <p:sp>
+        <p:nvSpPr>
+          <p:cNvPr id="2" name="Symbol zastępczy obrazu slajdu 1"/>
+          <p:cNvSpPr>
+            <a:spLocks noGrp="1" noRot="1" noChangeAspect="1"/>
+          </p:cNvSpPr>
+          <p:nvPr>
+            <p:ph type="sldImg"/>
+          </p:nvPr>
+        </p:nvSpPr>
+        <p:spPr/>
+      </p:sp>
+      <p:sp>
+        <p:nvSpPr>
+          <p:cNvPr id="3" name="Symbol zastępczy notatek 2"/>
+          <p:cNvSpPr>
+            <a:spLocks noGrp="1"/>
+          </p:cNvSpPr>
+          <p:nvPr>
+            <p:ph type="body" idx="1"/>
+          </p:nvPr>
+        </p:nvSpPr>
+        <p:spPr/>
+        <p:txBody>
+          <a:bodyPr/>
+          <a:lstStyle/>
+          <a:p>
+            <a:pPr marL="0" indent="0">
+              <a:buFontTx/>
+              <a:buNone/>
+            </a:pPr>
+            <a:r>
+              <a:rPr lang="en-US" sz="1200" b="1" i="0" kern="1200" dirty="0">
+                <a:solidFill>
+                  <a:schemeClr val="tx1"/>
+                </a:solidFill>
+                <a:effectLst/>
+                <a:latin typeface="+mn-lt"/>
+                <a:ea typeface="+mn-ea"/>
+                <a:cs typeface="+mn-cs"/>
+              </a:rPr>
+              <a:t>It provides a third-party extension point between dispatching an action, and the moment it reaches the reducer.</a:t>
+            </a:r>
+            <a:r>
+              <a:rPr lang="en-US" sz="1200" b="0" i="0" kern="1200" dirty="0">
+                <a:solidFill>
+                  <a:schemeClr val="tx1"/>
+                </a:solidFill>
+                <a:effectLst/>
+                <a:latin typeface="+mn-lt"/>
+                <a:ea typeface="+mn-ea"/>
+                <a:cs typeface="+mn-cs"/>
+              </a:rPr>
+              <a:t> </a:t>
+            </a:r>
+            <a:endParaRPr lang="pl-PL" sz="1200" b="0" i="0" kern="1200" dirty="0">
+              <a:solidFill>
+                <a:schemeClr val="tx1"/>
+              </a:solidFill>
+              <a:effectLst/>
+              <a:latin typeface="+mn-lt"/>
+              <a:ea typeface="+mn-ea"/>
+              <a:cs typeface="+mn-cs"/>
+            </a:endParaRPr>
+          </a:p>
+          <a:p>
+            <a:pPr marL="0" indent="0">
+              <a:buFontTx/>
+              <a:buNone/>
+            </a:pPr>
+            <a:r>
+              <a:rPr lang="en-US" sz="1200" b="0" i="0" kern="1200" dirty="0">
+                <a:solidFill>
+                  <a:schemeClr val="tx1"/>
+                </a:solidFill>
+                <a:effectLst/>
+                <a:latin typeface="+mn-lt"/>
+                <a:ea typeface="+mn-ea"/>
+                <a:cs typeface="+mn-cs"/>
+              </a:rPr>
+              <a:t>People use Redux middleware for logging, crash reporting, talking to an asynchronous API, routing, and more.</a:t>
+            </a:r>
+            <a:endParaRPr lang="pl-PL" sz="1200" b="0" i="0" kern="1200" dirty="0">
+              <a:solidFill>
+                <a:schemeClr val="tx1"/>
+              </a:solidFill>
+              <a:effectLst/>
+              <a:latin typeface="+mn-lt"/>
+              <a:ea typeface="+mn-ea"/>
+              <a:cs typeface="+mn-cs"/>
+            </a:endParaRPr>
+          </a:p>
+          <a:p>
+            <a:pPr marL="0" indent="0">
+              <a:buFontTx/>
+              <a:buNone/>
+            </a:pPr>
+            <a:endParaRPr lang="pl-PL" sz="1200" b="0" i="0" kern="1200" dirty="0">
+              <a:solidFill>
+                <a:schemeClr val="tx1"/>
+              </a:solidFill>
+              <a:effectLst/>
+              <a:latin typeface="+mn-lt"/>
+              <a:ea typeface="+mn-ea"/>
+              <a:cs typeface="+mn-cs"/>
+            </a:endParaRPr>
+          </a:p>
+          <a:p>
+            <a:pPr marL="0" indent="0">
+              <a:buFontTx/>
+              <a:buNone/>
+            </a:pPr>
+            <a:r>
+              <a:rPr lang="pl-PL" sz="1200" b="0" i="0" kern="1200" dirty="0">
+                <a:solidFill>
+                  <a:schemeClr val="tx1"/>
+                </a:solidFill>
+                <a:effectLst/>
+                <a:latin typeface="+mn-lt"/>
+                <a:ea typeface="+mn-ea"/>
+                <a:cs typeface="+mn-cs"/>
+              </a:rPr>
+              <a:t>W skrócie – logika pomiędzy akcją a </a:t>
+            </a:r>
+            <a:r>
+              <a:rPr lang="pl-PL" sz="1200" b="0" i="0" kern="1200" dirty="0" err="1">
+                <a:solidFill>
+                  <a:schemeClr val="tx1"/>
+                </a:solidFill>
+                <a:effectLst/>
+                <a:latin typeface="+mn-lt"/>
+                <a:ea typeface="+mn-ea"/>
+                <a:cs typeface="+mn-cs"/>
+              </a:rPr>
+              <a:t>reducerem</a:t>
+            </a:r>
+            <a:r>
+              <a:rPr lang="pl-PL" sz="1200" b="0" i="0" kern="1200" dirty="0">
+                <a:solidFill>
+                  <a:schemeClr val="tx1"/>
+                </a:solidFill>
+                <a:effectLst/>
+                <a:latin typeface="+mn-lt"/>
+                <a:ea typeface="+mn-ea"/>
+                <a:cs typeface="+mn-cs"/>
+              </a:rPr>
+              <a:t> – tutaj po drodze odpytujemy API. Używane też do logowania, routingu itp.</a:t>
+            </a:r>
+          </a:p>
+          <a:p>
+            <a:pPr marL="0" indent="0">
+              <a:buFontTx/>
+              <a:buNone/>
+            </a:pPr>
+            <a:endParaRPr lang="pl-PL" sz="1200" b="0" i="0" kern="1200" dirty="0">
+              <a:solidFill>
+                <a:schemeClr val="tx1"/>
+              </a:solidFill>
+              <a:effectLst/>
+              <a:latin typeface="+mn-lt"/>
+              <a:ea typeface="+mn-ea"/>
+              <a:cs typeface="+mn-cs"/>
+            </a:endParaRPr>
+          </a:p>
+          <a:p>
+            <a:pPr marL="0" indent="0">
+              <a:buFontTx/>
+              <a:buNone/>
+            </a:pPr>
+            <a:r>
+              <a:rPr lang="pl-PL" sz="1200" b="0" i="0" kern="1200" dirty="0" err="1">
+                <a:solidFill>
+                  <a:schemeClr val="tx1"/>
+                </a:solidFill>
+                <a:effectLst/>
+                <a:latin typeface="+mn-lt"/>
+                <a:ea typeface="+mn-ea"/>
+                <a:cs typeface="+mn-cs"/>
+              </a:rPr>
+              <a:t>Exercise</a:t>
+            </a:r>
+            <a:r>
+              <a:rPr lang="pl-PL" sz="1200" b="0" i="0" kern="1200" dirty="0">
+                <a:solidFill>
+                  <a:schemeClr val="tx1"/>
+                </a:solidFill>
+                <a:effectLst/>
+                <a:latin typeface="+mn-lt"/>
+                <a:ea typeface="+mn-ea"/>
+                <a:cs typeface="+mn-cs"/>
+              </a:rPr>
+              <a:t> 27: </a:t>
+            </a:r>
+          </a:p>
+          <a:p>
+            <a:pPr marL="228600" indent="-228600">
+              <a:buFontTx/>
+              <a:buAutoNum type="arabicPeriod"/>
+            </a:pPr>
+            <a:r>
+              <a:rPr lang="pl-PL" sz="1200" b="0" i="0" kern="1200" dirty="0">
+                <a:solidFill>
+                  <a:schemeClr val="tx1"/>
+                </a:solidFill>
+                <a:effectLst/>
+                <a:latin typeface="+mn-lt"/>
+                <a:ea typeface="+mn-ea"/>
+                <a:cs typeface="+mn-cs"/>
+              </a:rPr>
+              <a:t>Wynieść login http </a:t>
+            </a:r>
+            <a:r>
+              <a:rPr lang="pl-PL" sz="1200" b="0" i="0" kern="1200" dirty="0" err="1">
+                <a:solidFill>
+                  <a:schemeClr val="tx1"/>
+                </a:solidFill>
+                <a:effectLst/>
+                <a:latin typeface="+mn-lt"/>
+                <a:ea typeface="+mn-ea"/>
+                <a:cs typeface="+mn-cs"/>
+              </a:rPr>
+              <a:t>request</a:t>
+            </a:r>
+            <a:r>
+              <a:rPr lang="pl-PL" sz="1200" b="0" i="0" kern="1200" dirty="0">
+                <a:solidFill>
+                  <a:schemeClr val="tx1"/>
+                </a:solidFill>
+                <a:effectLst/>
+                <a:latin typeface="+mn-lt"/>
+                <a:ea typeface="+mn-ea"/>
+                <a:cs typeface="+mn-cs"/>
+              </a:rPr>
+              <a:t> z Account.js do </a:t>
+            </a:r>
+            <a:r>
+              <a:rPr lang="pl-PL" sz="1200" b="0" i="0" kern="1200" dirty="0" err="1">
+                <a:solidFill>
+                  <a:schemeClr val="tx1"/>
+                </a:solidFill>
+                <a:effectLst/>
+                <a:latin typeface="+mn-lt"/>
+                <a:ea typeface="+mn-ea"/>
+                <a:cs typeface="+mn-cs"/>
+              </a:rPr>
+              <a:t>actions</a:t>
+            </a:r>
+            <a:r>
+              <a:rPr lang="pl-PL" sz="1200" b="0" i="0" kern="1200" dirty="0">
+                <a:solidFill>
+                  <a:schemeClr val="tx1"/>
+                </a:solidFill>
+                <a:effectLst/>
+                <a:latin typeface="+mn-lt"/>
+                <a:ea typeface="+mn-ea"/>
+                <a:cs typeface="+mn-cs"/>
+              </a:rPr>
+              <a:t> </a:t>
+            </a:r>
+          </a:p>
+          <a:p>
+            <a:pPr marL="228600" indent="-228600">
+              <a:buFontTx/>
+              <a:buAutoNum type="arabicPeriod"/>
+            </a:pPr>
+            <a:r>
+              <a:rPr lang="pl-PL" sz="1200" b="0" i="0" kern="1200" dirty="0">
+                <a:solidFill>
+                  <a:schemeClr val="tx1"/>
+                </a:solidFill>
+                <a:effectLst/>
+                <a:latin typeface="+mn-lt"/>
+                <a:ea typeface="+mn-ea"/>
+                <a:cs typeface="+mn-cs"/>
+              </a:rPr>
+              <a:t>Zalogować start, koniec i wynik każdego </a:t>
+            </a:r>
+            <a:r>
+              <a:rPr lang="pl-PL" sz="1200" b="0" i="0" kern="1200" dirty="0" err="1">
+                <a:solidFill>
+                  <a:schemeClr val="tx1"/>
+                </a:solidFill>
+                <a:effectLst/>
+                <a:latin typeface="+mn-lt"/>
+                <a:ea typeface="+mn-ea"/>
+                <a:cs typeface="+mn-cs"/>
+              </a:rPr>
+              <a:t>requestu</a:t>
+            </a:r>
+            <a:r>
+              <a:rPr lang="pl-PL" sz="1200" b="0" i="0" kern="1200" dirty="0">
+                <a:solidFill>
+                  <a:schemeClr val="tx1"/>
+                </a:solidFill>
+                <a:effectLst/>
+                <a:latin typeface="+mn-lt"/>
+                <a:ea typeface="+mn-ea"/>
+                <a:cs typeface="+mn-cs"/>
+              </a:rPr>
+              <a:t> logowania</a:t>
+            </a:r>
+          </a:p>
+        </p:txBody>
+      </p:sp>
+      <p:sp>
+        <p:nvSpPr>
+          <p:cNvPr id="4" name="Symbol zastępczy numeru slajdu 3"/>
+          <p:cNvSpPr>
+            <a:spLocks noGrp="1"/>
+          </p:cNvSpPr>
+          <p:nvPr>
+            <p:ph type="sldNum" sz="quarter" idx="5"/>
+          </p:nvPr>
+        </p:nvSpPr>
+        <p:spPr/>
+        <p:txBody>
+          <a:bodyPr/>
+          <a:lstStyle/>
+          <a:p>
+            <a:fld id="{810A6612-7A23-4B98-B0E9-4F3C882AD2EF}" type="slidenum">
+              <a:rPr lang="pl-PL" smtClean="0"/>
+              <a:t>39</a:t>
+            </a:fld>
+            <a:endParaRPr lang="pl-PL"/>
+          </a:p>
+        </p:txBody>
+      </p:sp>
+    </p:spTree>
+    <p:extLst>
+      <p:ext uri="{BB962C8B-B14F-4D97-AF65-F5344CB8AC3E}">
+        <p14:creationId xmlns:p14="http://schemas.microsoft.com/office/powerpoint/2010/main" val="2935137433"/>
+      </p:ext>
+    </p:extLst>
+  </p:cSld>
+  <p:clrMapOvr>
+    <a:masterClrMapping/>
+  </p:clrMapOvr>
+</p:notes>
+</file>
+
 <file path=ppt/notesSlides/notesSlide4.xml><?xml version="1.0" encoding="utf-8"?>
 <p:notes xmlns:a="http://schemas.openxmlformats.org/drawingml/2006/main" xmlns:r="http://schemas.openxmlformats.org/officeDocument/2006/relationships" xmlns:p="http://schemas.openxmlformats.org/presentationml/2006/main">
   <p:cSld>
@@ -9680,7 +10038,7 @@
           <a:p>
             <a:fld id="{95CCC2EB-502C-49A7-9CC4-85002E026034}" type="datetimeFigureOut">
               <a:rPr lang="pl-PL" smtClean="0"/>
-              <a:t>12.10.2019</a:t>
+              <a:t>13.10.2019</a:t>
             </a:fld>
             <a:endParaRPr lang="pl-PL"/>
           </a:p>
@@ -9878,7 +10236,7 @@
           <a:p>
             <a:fld id="{95CCC2EB-502C-49A7-9CC4-85002E026034}" type="datetimeFigureOut">
               <a:rPr lang="pl-PL" smtClean="0"/>
-              <a:t>12.10.2019</a:t>
+              <a:t>13.10.2019</a:t>
             </a:fld>
             <a:endParaRPr lang="pl-PL"/>
           </a:p>
@@ -10086,7 +10444,7 @@
           <a:p>
             <a:fld id="{95CCC2EB-502C-49A7-9CC4-85002E026034}" type="datetimeFigureOut">
               <a:rPr lang="pl-PL" smtClean="0"/>
-              <a:t>12.10.2019</a:t>
+              <a:t>13.10.2019</a:t>
             </a:fld>
             <a:endParaRPr lang="pl-PL"/>
           </a:p>
@@ -10284,7 +10642,7 @@
           <a:p>
             <a:fld id="{95CCC2EB-502C-49A7-9CC4-85002E026034}" type="datetimeFigureOut">
               <a:rPr lang="pl-PL" smtClean="0"/>
-              <a:t>12.10.2019</a:t>
+              <a:t>13.10.2019</a:t>
             </a:fld>
             <a:endParaRPr lang="pl-PL"/>
           </a:p>
@@ -10559,7 +10917,7 @@
           <a:p>
             <a:fld id="{95CCC2EB-502C-49A7-9CC4-85002E026034}" type="datetimeFigureOut">
               <a:rPr lang="pl-PL" smtClean="0"/>
-              <a:t>12.10.2019</a:t>
+              <a:t>13.10.2019</a:t>
             </a:fld>
             <a:endParaRPr lang="pl-PL"/>
           </a:p>
@@ -10824,7 +11182,7 @@
           <a:p>
             <a:fld id="{95CCC2EB-502C-49A7-9CC4-85002E026034}" type="datetimeFigureOut">
               <a:rPr lang="pl-PL" smtClean="0"/>
-              <a:t>12.10.2019</a:t>
+              <a:t>13.10.2019</a:t>
             </a:fld>
             <a:endParaRPr lang="pl-PL"/>
           </a:p>
@@ -11236,7 +11594,7 @@
           <a:p>
             <a:fld id="{95CCC2EB-502C-49A7-9CC4-85002E026034}" type="datetimeFigureOut">
               <a:rPr lang="pl-PL" smtClean="0"/>
-              <a:t>12.10.2019</a:t>
+              <a:t>13.10.2019</a:t>
             </a:fld>
             <a:endParaRPr lang="pl-PL"/>
           </a:p>
@@ -11377,7 +11735,7 @@
           <a:p>
             <a:fld id="{95CCC2EB-502C-49A7-9CC4-85002E026034}" type="datetimeFigureOut">
               <a:rPr lang="pl-PL" smtClean="0"/>
-              <a:t>12.10.2019</a:t>
+              <a:t>13.10.2019</a:t>
             </a:fld>
             <a:endParaRPr lang="pl-PL"/>
           </a:p>
@@ -11490,7 +11848,7 @@
           <a:p>
             <a:fld id="{95CCC2EB-502C-49A7-9CC4-85002E026034}" type="datetimeFigureOut">
               <a:rPr lang="pl-PL" smtClean="0"/>
-              <a:t>12.10.2019</a:t>
+              <a:t>13.10.2019</a:t>
             </a:fld>
             <a:endParaRPr lang="pl-PL"/>
           </a:p>
@@ -11801,7 +12159,7 @@
           <a:p>
             <a:fld id="{95CCC2EB-502C-49A7-9CC4-85002E026034}" type="datetimeFigureOut">
               <a:rPr lang="pl-PL" smtClean="0"/>
-              <a:t>12.10.2019</a:t>
+              <a:t>13.10.2019</a:t>
             </a:fld>
             <a:endParaRPr lang="pl-PL"/>
           </a:p>
@@ -12089,7 +12447,7 @@
           <a:p>
             <a:fld id="{95CCC2EB-502C-49A7-9CC4-85002E026034}" type="datetimeFigureOut">
               <a:rPr lang="pl-PL" smtClean="0"/>
-              <a:t>12.10.2019</a:t>
+              <a:t>13.10.2019</a:t>
             </a:fld>
             <a:endParaRPr lang="pl-PL"/>
           </a:p>
@@ -12330,7 +12688,7 @@
           <a:p>
             <a:fld id="{95CCC2EB-502C-49A7-9CC4-85002E026034}" type="datetimeFigureOut">
               <a:rPr lang="pl-PL" smtClean="0"/>
-              <a:t>12.10.2019</a:t>
+              <a:t>13.10.2019</a:t>
             </a:fld>
             <a:endParaRPr lang="pl-PL"/>
           </a:p>
@@ -45656,6 +46014,1090 @@
     <p:extLst>
       <p:ext uri="{BB962C8B-B14F-4D97-AF65-F5344CB8AC3E}">
         <p14:creationId xmlns:p14="http://schemas.microsoft.com/office/powerpoint/2010/main" val="3029284417"/>
+      </p:ext>
+    </p:extLst>
+  </p:cSld>
+  <p:clrMapOvr>
+    <a:masterClrMapping/>
+  </p:clrMapOvr>
+</p:sld>
+</file>
+
+<file path=ppt/slides/slide39.xml><?xml version="1.0" encoding="utf-8"?>
+<p:sld xmlns:a="http://schemas.openxmlformats.org/drawingml/2006/main" xmlns:r="http://schemas.openxmlformats.org/officeDocument/2006/relationships" xmlns:p="http://schemas.openxmlformats.org/presentationml/2006/main">
+  <p:cSld>
+    <p:spTree>
+      <p:nvGrpSpPr>
+        <p:cNvPr id="1" name=""/>
+        <p:cNvGrpSpPr/>
+        <p:nvPr/>
+      </p:nvGrpSpPr>
+      <p:grpSpPr>
+        <a:xfrm>
+          <a:off x="0" y="0"/>
+          <a:ext cx="0" cy="0"/>
+          <a:chOff x="0" y="0"/>
+          <a:chExt cx="0" cy="0"/>
+        </a:xfrm>
+      </p:grpSpPr>
+      <p:sp>
+        <p:nvSpPr>
+          <p:cNvPr id="4" name="pole tekstowe 3">
+            <a:extLst>
+              <a:ext uri="{FF2B5EF4-FFF2-40B4-BE49-F238E27FC236}">
+                <a16:creationId xmlns:a16="http://schemas.microsoft.com/office/drawing/2014/main" id="{F164A7B3-8808-414C-9401-3B25194E3B5A}"/>
+              </a:ext>
+            </a:extLst>
+          </p:cNvPr>
+          <p:cNvSpPr txBox="1"/>
+          <p:nvPr/>
+        </p:nvSpPr>
+        <p:spPr>
+          <a:xfrm>
+            <a:off x="497840" y="538480"/>
+            <a:ext cx="2054217" cy="369332"/>
+          </a:xfrm>
+          <a:prstGeom prst="rect">
+            <a:avLst/>
+          </a:prstGeom>
+          <a:noFill/>
+        </p:spPr>
+        <p:txBody>
+          <a:bodyPr wrap="none" rtlCol="0">
+            <a:spAutoFit/>
+          </a:bodyPr>
+          <a:lstStyle/>
+          <a:p>
+            <a:r>
+              <a:rPr lang="pl-PL" dirty="0" err="1"/>
+              <a:t>Redux</a:t>
+            </a:r>
+            <a:r>
+              <a:rPr lang="pl-PL" dirty="0"/>
+              <a:t> - </a:t>
+            </a:r>
+            <a:r>
+              <a:rPr lang="pl-PL" dirty="0" err="1"/>
+              <a:t>middleware</a:t>
+            </a:r>
+            <a:endParaRPr lang="pl-PL" dirty="0"/>
+          </a:p>
+        </p:txBody>
+      </p:sp>
+      <p:sp>
+        <p:nvSpPr>
+          <p:cNvPr id="2" name="Rectangle 1">
+            <a:extLst>
+              <a:ext uri="{FF2B5EF4-FFF2-40B4-BE49-F238E27FC236}">
+                <a16:creationId xmlns:a16="http://schemas.microsoft.com/office/drawing/2014/main" id="{8240C6AE-7F6F-45CF-B346-69E47CF807B4}"/>
+              </a:ext>
+            </a:extLst>
+          </p:cNvPr>
+          <p:cNvSpPr>
+            <a:spLocks noChangeArrowheads="1"/>
+          </p:cNvSpPr>
+          <p:nvPr/>
+        </p:nvSpPr>
+        <p:spPr bwMode="auto">
+          <a:xfrm>
+            <a:off x="4558749" y="1167997"/>
+            <a:ext cx="3432313" cy="564176"/>
+          </a:xfrm>
+          <a:prstGeom prst="rect">
+            <a:avLst/>
+          </a:prstGeom>
+          <a:solidFill>
+            <a:srgbClr val="FFFFFF"/>
+          </a:solidFill>
+          <a:ln>
+            <a:noFill/>
+          </a:ln>
+          <a:effectLst/>
+          <a:extLst>
+            <a:ext uri="{91240B29-F687-4F45-9708-019B960494DF}">
+              <a14:hiddenLine xmlns:a14="http://schemas.microsoft.com/office/drawing/2010/main" w="9525">
+                <a:solidFill>
+                  <a:schemeClr val="tx1"/>
+                </a:solidFill>
+                <a:miter lim="800000"/>
+                <a:headEnd/>
+                <a:tailEnd/>
+              </a14:hiddenLine>
+            </a:ext>
+            <a:ext uri="{AF507438-7753-43E0-B8FC-AC1667EBCBE1}">
+              <a14:hiddenEffects xmlns:a14="http://schemas.microsoft.com/office/drawing/2010/main">
+                <a:effectLst>
+                  <a:outerShdw dist="35921" dir="2700000" algn="ctr" rotWithShape="0">
+                    <a:schemeClr val="bg2"/>
+                  </a:outerShdw>
+                </a:effectLst>
+              </a14:hiddenEffects>
+            </a:ext>
+          </a:extLst>
+        </p:spPr>
+        <p:txBody>
+          <a:bodyPr vert="horz" wrap="square" lIns="-126960" tIns="152352" rIns="91440" bIns="101568" numCol="1" anchor="ctr" anchorCtr="0" compatLnSpc="1">
+            <a:prstTxWarp prst="textNoShape">
+              <a:avLst/>
+            </a:prstTxWarp>
+            <a:spAutoFit/>
+          </a:bodyPr>
+          <a:lstStyle/>
+          <a:p>
+            <a:pPr marL="0" marR="0" lvl="0" indent="0" algn="l" defTabSz="914400" rtl="0" eaLnBrk="0" fontAlgn="base" latinLnBrk="0" hangingPunct="0">
+              <a:lnSpc>
+                <a:spcPct val="100000"/>
+              </a:lnSpc>
+              <a:spcBef>
+                <a:spcPct val="0"/>
+              </a:spcBef>
+              <a:spcAft>
+                <a:spcPct val="0"/>
+              </a:spcAft>
+              <a:buClrTx/>
+              <a:buSzTx/>
+              <a:buFontTx/>
+              <a:buNone/>
+              <a:tabLst/>
+            </a:pPr>
+            <a:r>
+              <a:rPr kumimoji="0" lang="pl-PL" altLang="pl-PL" sz="2000" b="0" i="0" u="none" strike="noStrike" cap="none" normalizeH="0" baseline="0" dirty="0" err="1">
+                <a:ln>
+                  <a:noFill/>
+                </a:ln>
+                <a:solidFill>
+                  <a:srgbClr val="24292E"/>
+                </a:solidFill>
+                <a:effectLst/>
+                <a:latin typeface="SFMono-Regular"/>
+              </a:rPr>
+              <a:t>npm</a:t>
+            </a:r>
+            <a:r>
+              <a:rPr kumimoji="0" lang="pl-PL" altLang="pl-PL" sz="2000" b="0" i="0" u="none" strike="noStrike" cap="none" normalizeH="0" baseline="0" dirty="0">
+                <a:ln>
+                  <a:noFill/>
+                </a:ln>
+                <a:solidFill>
+                  <a:srgbClr val="24292E"/>
+                </a:solidFill>
+                <a:effectLst/>
+                <a:latin typeface="SFMono-Regular"/>
+              </a:rPr>
+              <a:t> </a:t>
+            </a:r>
+            <a:r>
+              <a:rPr kumimoji="0" lang="pl-PL" altLang="pl-PL" sz="2000" b="0" i="0" u="none" strike="noStrike" cap="none" normalizeH="0" baseline="0" dirty="0" err="1">
+                <a:ln>
+                  <a:noFill/>
+                </a:ln>
+                <a:solidFill>
+                  <a:srgbClr val="24292E"/>
+                </a:solidFill>
+                <a:effectLst/>
+                <a:latin typeface="SFMono-Regular"/>
+              </a:rPr>
+              <a:t>install</a:t>
+            </a:r>
+            <a:r>
+              <a:rPr kumimoji="0" lang="pl-PL" altLang="pl-PL" sz="2000" b="0" i="0" u="none" strike="noStrike" cap="none" normalizeH="0" baseline="0" dirty="0">
+                <a:ln>
+                  <a:noFill/>
+                </a:ln>
+                <a:solidFill>
+                  <a:srgbClr val="24292E"/>
+                </a:solidFill>
+                <a:effectLst/>
+                <a:latin typeface="SFMono-Regular"/>
+              </a:rPr>
+              <a:t> </a:t>
+            </a:r>
+            <a:r>
+              <a:rPr kumimoji="0" lang="pl-PL" altLang="pl-PL" sz="2000" b="0" i="0" u="none" strike="noStrike" cap="none" normalizeH="0" baseline="0" dirty="0" err="1">
+                <a:ln>
+                  <a:noFill/>
+                </a:ln>
+                <a:solidFill>
+                  <a:srgbClr val="24292E"/>
+                </a:solidFill>
+                <a:effectLst/>
+                <a:latin typeface="SFMono-Regular"/>
+              </a:rPr>
+              <a:t>redux</a:t>
+            </a:r>
+            <a:r>
+              <a:rPr kumimoji="0" lang="pl-PL" altLang="pl-PL" sz="2000" b="0" i="0" u="none" strike="noStrike" cap="none" normalizeH="0" baseline="0" dirty="0" err="1">
+                <a:ln>
+                  <a:noFill/>
+                </a:ln>
+                <a:solidFill>
+                  <a:srgbClr val="D73A49"/>
+                </a:solidFill>
+                <a:effectLst/>
+                <a:latin typeface="SFMono-Regular"/>
+              </a:rPr>
+              <a:t>-</a:t>
+            </a:r>
+            <a:r>
+              <a:rPr kumimoji="0" lang="pl-PL" altLang="pl-PL" sz="2000" b="0" i="0" u="none" strike="noStrike" cap="none" normalizeH="0" baseline="0" dirty="0" err="1">
+                <a:ln>
+                  <a:noFill/>
+                </a:ln>
+                <a:solidFill>
+                  <a:srgbClr val="24292E"/>
+                </a:solidFill>
+                <a:effectLst/>
+                <a:latin typeface="SFMono-Regular"/>
+              </a:rPr>
+              <a:t>thunk</a:t>
+            </a:r>
+            <a:endParaRPr kumimoji="0" lang="pl-PL" altLang="pl-PL" sz="77500" b="1" i="0" u="none" strike="noStrike" cap="none" normalizeH="0" baseline="0" dirty="0">
+              <a:ln>
+                <a:noFill/>
+              </a:ln>
+              <a:solidFill>
+                <a:srgbClr val="24292E"/>
+              </a:solidFill>
+              <a:effectLst/>
+              <a:latin typeface="-apple-system"/>
+            </a:endParaRPr>
+          </a:p>
+        </p:txBody>
+      </p:sp>
+      <p:sp>
+        <p:nvSpPr>
+          <p:cNvPr id="3" name="Prostokąt 2">
+            <a:extLst>
+              <a:ext uri="{FF2B5EF4-FFF2-40B4-BE49-F238E27FC236}">
+                <a16:creationId xmlns:a16="http://schemas.microsoft.com/office/drawing/2014/main" id="{81FAFB6C-99D1-4733-B5BC-C8BB251FAD1B}"/>
+              </a:ext>
+            </a:extLst>
+          </p:cNvPr>
+          <p:cNvSpPr/>
+          <p:nvPr/>
+        </p:nvSpPr>
+        <p:spPr>
+          <a:xfrm>
+            <a:off x="2325757" y="1732173"/>
+            <a:ext cx="7460974" cy="923330"/>
+          </a:xfrm>
+          <a:prstGeom prst="rect">
+            <a:avLst/>
+          </a:prstGeom>
+          <a:solidFill>
+            <a:schemeClr val="tx1"/>
+          </a:solidFill>
+        </p:spPr>
+        <p:txBody>
+          <a:bodyPr wrap="square">
+            <a:spAutoFit/>
+          </a:bodyPr>
+          <a:lstStyle/>
+          <a:p>
+            <a:r>
+              <a:rPr lang="en-US" dirty="0">
+                <a:solidFill>
+                  <a:srgbClr val="569CD6"/>
+                </a:solidFill>
+                <a:latin typeface="Consolas" panose="020B0609020204030204" pitchFamily="49" charset="0"/>
+              </a:rPr>
+              <a:t>const</a:t>
+            </a:r>
+            <a:r>
+              <a:rPr lang="en-US" dirty="0">
+                <a:solidFill>
+                  <a:srgbClr val="D4D4D4"/>
+                </a:solidFill>
+                <a:latin typeface="Consolas" panose="020B0609020204030204" pitchFamily="49" charset="0"/>
+              </a:rPr>
+              <a:t> </a:t>
+            </a:r>
+            <a:r>
+              <a:rPr lang="en-US" dirty="0">
+                <a:solidFill>
+                  <a:srgbClr val="9CDCFE"/>
+                </a:solidFill>
+                <a:latin typeface="Consolas" panose="020B0609020204030204" pitchFamily="49" charset="0"/>
+              </a:rPr>
+              <a:t>store</a:t>
+            </a:r>
+            <a:r>
+              <a:rPr lang="en-US" dirty="0">
+                <a:solidFill>
+                  <a:srgbClr val="D4D4D4"/>
+                </a:solidFill>
+                <a:latin typeface="Consolas" panose="020B0609020204030204" pitchFamily="49" charset="0"/>
+              </a:rPr>
+              <a:t> = </a:t>
+            </a:r>
+            <a:r>
+              <a:rPr lang="en-US" dirty="0" err="1">
+                <a:solidFill>
+                  <a:srgbClr val="DCDCAA"/>
+                </a:solidFill>
+                <a:latin typeface="Consolas" panose="020B0609020204030204" pitchFamily="49" charset="0"/>
+              </a:rPr>
+              <a:t>createStore</a:t>
+            </a:r>
+            <a:r>
+              <a:rPr lang="en-US" dirty="0">
+                <a:solidFill>
+                  <a:srgbClr val="D4D4D4"/>
+                </a:solidFill>
+                <a:latin typeface="Consolas" panose="020B0609020204030204" pitchFamily="49" charset="0"/>
+              </a:rPr>
+              <a:t>(</a:t>
+            </a:r>
+            <a:r>
+              <a:rPr lang="en-US" dirty="0" err="1">
+                <a:solidFill>
+                  <a:srgbClr val="9CDCFE"/>
+                </a:solidFill>
+                <a:latin typeface="Consolas" panose="020B0609020204030204" pitchFamily="49" charset="0"/>
+              </a:rPr>
+              <a:t>rootReducer</a:t>
+            </a:r>
+            <a:r>
+              <a:rPr lang="en-US" dirty="0">
+                <a:solidFill>
+                  <a:srgbClr val="D4D4D4"/>
+                </a:solidFill>
+                <a:latin typeface="Consolas" panose="020B0609020204030204" pitchFamily="49" charset="0"/>
+              </a:rPr>
+              <a:t>, </a:t>
+            </a:r>
+            <a:r>
+              <a:rPr lang="en-US" dirty="0" err="1">
+                <a:solidFill>
+                  <a:srgbClr val="DCDCAA"/>
+                </a:solidFill>
+                <a:latin typeface="Consolas" panose="020B0609020204030204" pitchFamily="49" charset="0"/>
+              </a:rPr>
+              <a:t>applyMiddleware</a:t>
+            </a:r>
+            <a:r>
+              <a:rPr lang="en-US" dirty="0">
+                <a:solidFill>
+                  <a:srgbClr val="D4D4D4"/>
+                </a:solidFill>
+                <a:latin typeface="Consolas" panose="020B0609020204030204" pitchFamily="49" charset="0"/>
+              </a:rPr>
+              <a:t>(</a:t>
+            </a:r>
+          </a:p>
+          <a:p>
+            <a:r>
+              <a:rPr lang="en-US" dirty="0">
+                <a:solidFill>
+                  <a:srgbClr val="D4D4D4"/>
+                </a:solidFill>
+                <a:latin typeface="Consolas" panose="020B0609020204030204" pitchFamily="49" charset="0"/>
+              </a:rPr>
+              <a:t>    </a:t>
+            </a:r>
+            <a:r>
+              <a:rPr lang="en-US" dirty="0" err="1">
+                <a:solidFill>
+                  <a:srgbClr val="9CDCFE"/>
+                </a:solidFill>
+                <a:latin typeface="Consolas" panose="020B0609020204030204" pitchFamily="49" charset="0"/>
+              </a:rPr>
+              <a:t>thunkMiddleware</a:t>
+            </a:r>
+            <a:r>
+              <a:rPr lang="en-US" dirty="0">
+                <a:solidFill>
+                  <a:srgbClr val="D4D4D4"/>
+                </a:solidFill>
+                <a:latin typeface="Consolas" panose="020B0609020204030204" pitchFamily="49" charset="0"/>
+              </a:rPr>
+              <a:t> </a:t>
+            </a:r>
+            <a:r>
+              <a:rPr lang="en-US" dirty="0">
+                <a:solidFill>
+                  <a:srgbClr val="6A9955"/>
+                </a:solidFill>
+                <a:latin typeface="Consolas" panose="020B0609020204030204" pitchFamily="49" charset="0"/>
+              </a:rPr>
+              <a:t>// lets us dispatch() functions</a:t>
+            </a:r>
+            <a:endParaRPr lang="en-US" dirty="0">
+              <a:solidFill>
+                <a:srgbClr val="D4D4D4"/>
+              </a:solidFill>
+              <a:latin typeface="Consolas" panose="020B0609020204030204" pitchFamily="49" charset="0"/>
+            </a:endParaRPr>
+          </a:p>
+          <a:p>
+            <a:r>
+              <a:rPr lang="en-US" dirty="0">
+                <a:solidFill>
+                  <a:srgbClr val="D4D4D4"/>
+                </a:solidFill>
+                <a:latin typeface="Consolas" panose="020B0609020204030204" pitchFamily="49" charset="0"/>
+              </a:rPr>
+              <a:t>));</a:t>
+            </a:r>
+            <a:endParaRPr lang="en-US" b="0" dirty="0">
+              <a:solidFill>
+                <a:srgbClr val="D4D4D4"/>
+              </a:solidFill>
+              <a:effectLst/>
+              <a:latin typeface="Consolas" panose="020B0609020204030204" pitchFamily="49" charset="0"/>
+            </a:endParaRPr>
+          </a:p>
+        </p:txBody>
+      </p:sp>
+      <p:sp>
+        <p:nvSpPr>
+          <p:cNvPr id="5" name="Prostokąt 4">
+            <a:extLst>
+              <a:ext uri="{FF2B5EF4-FFF2-40B4-BE49-F238E27FC236}">
+                <a16:creationId xmlns:a16="http://schemas.microsoft.com/office/drawing/2014/main" id="{047EE63D-3624-4B4C-8531-5B7FEE6E45F7}"/>
+              </a:ext>
+            </a:extLst>
+          </p:cNvPr>
+          <p:cNvSpPr/>
+          <p:nvPr/>
+        </p:nvSpPr>
+        <p:spPr>
+          <a:xfrm>
+            <a:off x="2289312" y="3185867"/>
+            <a:ext cx="7851913" cy="2585323"/>
+          </a:xfrm>
+          <a:prstGeom prst="rect">
+            <a:avLst/>
+          </a:prstGeom>
+          <a:solidFill>
+            <a:schemeClr val="tx1"/>
+          </a:solidFill>
+        </p:spPr>
+        <p:txBody>
+          <a:bodyPr wrap="square">
+            <a:spAutoFit/>
+          </a:bodyPr>
+          <a:lstStyle/>
+          <a:p>
+            <a:r>
+              <a:rPr lang="pl-PL" dirty="0">
+                <a:solidFill>
+                  <a:srgbClr val="C586C0"/>
+                </a:solidFill>
+                <a:latin typeface="Consolas" panose="020B0609020204030204" pitchFamily="49" charset="0"/>
+              </a:rPr>
+              <a:t>export</a:t>
+            </a:r>
+            <a:r>
+              <a:rPr lang="pl-PL" dirty="0">
+                <a:solidFill>
+                  <a:srgbClr val="D4D4D4"/>
+                </a:solidFill>
+                <a:latin typeface="Consolas" panose="020B0609020204030204" pitchFamily="49" charset="0"/>
+              </a:rPr>
+              <a:t> </a:t>
+            </a:r>
+            <a:r>
+              <a:rPr lang="pl-PL" dirty="0" err="1">
+                <a:solidFill>
+                  <a:srgbClr val="569CD6"/>
+                </a:solidFill>
+                <a:latin typeface="Consolas" panose="020B0609020204030204" pitchFamily="49" charset="0"/>
+              </a:rPr>
+              <a:t>function</a:t>
+            </a:r>
+            <a:r>
+              <a:rPr lang="pl-PL" dirty="0">
+                <a:solidFill>
+                  <a:srgbClr val="D4D4D4"/>
+                </a:solidFill>
+                <a:latin typeface="Consolas" panose="020B0609020204030204" pitchFamily="49" charset="0"/>
+              </a:rPr>
+              <a:t> </a:t>
+            </a:r>
+            <a:r>
+              <a:rPr lang="pl-PL" dirty="0" err="1">
+                <a:solidFill>
+                  <a:srgbClr val="DCDCAA"/>
+                </a:solidFill>
+                <a:latin typeface="Consolas" panose="020B0609020204030204" pitchFamily="49" charset="0"/>
+              </a:rPr>
+              <a:t>someHttpRequest</a:t>
+            </a:r>
+            <a:r>
+              <a:rPr lang="pl-PL" dirty="0">
+                <a:solidFill>
+                  <a:srgbClr val="D4D4D4"/>
+                </a:solidFill>
+                <a:latin typeface="Consolas" panose="020B0609020204030204" pitchFamily="49" charset="0"/>
+              </a:rPr>
+              <a:t>() {</a:t>
+            </a:r>
+          </a:p>
+          <a:p>
+            <a:r>
+              <a:rPr lang="pl-PL" dirty="0">
+                <a:solidFill>
+                  <a:srgbClr val="D4D4D4"/>
+                </a:solidFill>
+                <a:latin typeface="Consolas" panose="020B0609020204030204" pitchFamily="49" charset="0"/>
+              </a:rPr>
+              <a:t>    </a:t>
+            </a:r>
+            <a:r>
+              <a:rPr lang="pl-PL" dirty="0">
+                <a:solidFill>
+                  <a:srgbClr val="C586C0"/>
+                </a:solidFill>
+                <a:latin typeface="Consolas" panose="020B0609020204030204" pitchFamily="49" charset="0"/>
+              </a:rPr>
+              <a:t>return</a:t>
+            </a:r>
+            <a:r>
+              <a:rPr lang="pl-PL" dirty="0">
+                <a:solidFill>
+                  <a:srgbClr val="D4D4D4"/>
+                </a:solidFill>
+                <a:latin typeface="Consolas" panose="020B0609020204030204" pitchFamily="49" charset="0"/>
+              </a:rPr>
+              <a:t> </a:t>
+            </a:r>
+            <a:r>
+              <a:rPr lang="pl-PL" dirty="0" err="1">
+                <a:solidFill>
+                  <a:srgbClr val="569CD6"/>
+                </a:solidFill>
+                <a:latin typeface="Consolas" panose="020B0609020204030204" pitchFamily="49" charset="0"/>
+              </a:rPr>
+              <a:t>function</a:t>
+            </a:r>
+            <a:r>
+              <a:rPr lang="pl-PL" dirty="0">
+                <a:solidFill>
+                  <a:srgbClr val="D4D4D4"/>
+                </a:solidFill>
+                <a:latin typeface="Consolas" panose="020B0609020204030204" pitchFamily="49" charset="0"/>
+              </a:rPr>
+              <a:t> </a:t>
+            </a:r>
+            <a:r>
+              <a:rPr lang="pl-PL" dirty="0" err="1">
+                <a:solidFill>
+                  <a:srgbClr val="DCDCAA"/>
+                </a:solidFill>
+                <a:latin typeface="Consolas" panose="020B0609020204030204" pitchFamily="49" charset="0"/>
+              </a:rPr>
+              <a:t>action</a:t>
+            </a:r>
+            <a:r>
+              <a:rPr lang="pl-PL" dirty="0">
+                <a:solidFill>
+                  <a:srgbClr val="D4D4D4"/>
+                </a:solidFill>
+                <a:latin typeface="Consolas" panose="020B0609020204030204" pitchFamily="49" charset="0"/>
+              </a:rPr>
+              <a:t>(</a:t>
+            </a:r>
+            <a:r>
+              <a:rPr lang="pl-PL" dirty="0" err="1">
+                <a:solidFill>
+                  <a:srgbClr val="9CDCFE"/>
+                </a:solidFill>
+                <a:latin typeface="Consolas" panose="020B0609020204030204" pitchFamily="49" charset="0"/>
+              </a:rPr>
+              <a:t>dispatch</a:t>
+            </a:r>
+            <a:r>
+              <a:rPr lang="pl-PL" dirty="0">
+                <a:solidFill>
+                  <a:srgbClr val="D4D4D4"/>
+                </a:solidFill>
+                <a:latin typeface="Consolas" panose="020B0609020204030204" pitchFamily="49" charset="0"/>
+              </a:rPr>
+              <a:t>) {</a:t>
+            </a:r>
+            <a:br>
+              <a:rPr lang="pl-PL" dirty="0">
+                <a:solidFill>
+                  <a:srgbClr val="D4D4D4"/>
+                </a:solidFill>
+                <a:latin typeface="Consolas" panose="020B0609020204030204" pitchFamily="49" charset="0"/>
+              </a:rPr>
+            </a:br>
+            <a:r>
+              <a:rPr lang="pl-PL" dirty="0">
+                <a:solidFill>
+                  <a:srgbClr val="D4D4D4"/>
+                </a:solidFill>
+                <a:latin typeface="Consolas" panose="020B0609020204030204" pitchFamily="49" charset="0"/>
+              </a:rPr>
+              <a:t>        </a:t>
+            </a:r>
+            <a:r>
+              <a:rPr lang="pl-PL" dirty="0" err="1">
+                <a:solidFill>
+                  <a:srgbClr val="569CD6"/>
+                </a:solidFill>
+                <a:latin typeface="Consolas" panose="020B0609020204030204" pitchFamily="49" charset="0"/>
+              </a:rPr>
+              <a:t>const</a:t>
+            </a:r>
+            <a:r>
+              <a:rPr lang="pl-PL" dirty="0">
+                <a:solidFill>
+                  <a:srgbClr val="D4D4D4"/>
+                </a:solidFill>
+                <a:latin typeface="Consolas" panose="020B0609020204030204" pitchFamily="49" charset="0"/>
+              </a:rPr>
+              <a:t> </a:t>
+            </a:r>
+            <a:r>
+              <a:rPr lang="pl-PL" dirty="0" err="1">
+                <a:solidFill>
+                  <a:srgbClr val="9CDCFE"/>
+                </a:solidFill>
+                <a:latin typeface="Consolas" panose="020B0609020204030204" pitchFamily="49" charset="0"/>
+              </a:rPr>
+              <a:t>request</a:t>
+            </a:r>
+            <a:r>
+              <a:rPr lang="pl-PL" dirty="0">
+                <a:solidFill>
+                  <a:srgbClr val="D4D4D4"/>
+                </a:solidFill>
+                <a:latin typeface="Consolas" panose="020B0609020204030204" pitchFamily="49" charset="0"/>
+              </a:rPr>
+              <a:t> = </a:t>
+            </a:r>
+            <a:r>
+              <a:rPr lang="pl-PL" dirty="0" err="1">
+                <a:solidFill>
+                  <a:srgbClr val="9CDCFE"/>
+                </a:solidFill>
+                <a:latin typeface="Consolas" panose="020B0609020204030204" pitchFamily="49" charset="0"/>
+              </a:rPr>
+              <a:t>axios</a:t>
+            </a:r>
+            <a:r>
+              <a:rPr lang="pl-PL" dirty="0" err="1">
+                <a:solidFill>
+                  <a:srgbClr val="D4D4D4"/>
+                </a:solidFill>
+                <a:latin typeface="Consolas" panose="020B0609020204030204" pitchFamily="49" charset="0"/>
+              </a:rPr>
+              <a:t>.</a:t>
+            </a:r>
+            <a:r>
+              <a:rPr lang="pl-PL" dirty="0" err="1">
+                <a:solidFill>
+                  <a:srgbClr val="DCDCAA"/>
+                </a:solidFill>
+                <a:latin typeface="Consolas" panose="020B0609020204030204" pitchFamily="49" charset="0"/>
+              </a:rPr>
+              <a:t>get</a:t>
+            </a:r>
+            <a:r>
+              <a:rPr lang="pl-PL" dirty="0">
+                <a:solidFill>
+                  <a:srgbClr val="D4D4D4"/>
+                </a:solidFill>
+                <a:latin typeface="Consolas" panose="020B0609020204030204" pitchFamily="49" charset="0"/>
+              </a:rPr>
+              <a:t>(</a:t>
+            </a:r>
+            <a:r>
+              <a:rPr lang="pl-PL" dirty="0">
+                <a:solidFill>
+                  <a:srgbClr val="CE9178"/>
+                </a:solidFill>
+                <a:latin typeface="Consolas" panose="020B0609020204030204" pitchFamily="49" charset="0"/>
+              </a:rPr>
+              <a:t>'http://api.com/</a:t>
+            </a:r>
+            <a:r>
+              <a:rPr lang="pl-PL" dirty="0" err="1">
+                <a:solidFill>
+                  <a:srgbClr val="CE9178"/>
+                </a:solidFill>
+                <a:latin typeface="Consolas" panose="020B0609020204030204" pitchFamily="49" charset="0"/>
+              </a:rPr>
+              <a:t>getSth</a:t>
+            </a:r>
+            <a:r>
+              <a:rPr lang="pl-PL" dirty="0">
+                <a:solidFill>
+                  <a:srgbClr val="CE9178"/>
+                </a:solidFill>
+                <a:latin typeface="Consolas" panose="020B0609020204030204" pitchFamily="49" charset="0"/>
+              </a:rPr>
+              <a:t>'</a:t>
+            </a:r>
+            <a:r>
+              <a:rPr lang="pl-PL" dirty="0">
+                <a:solidFill>
+                  <a:srgbClr val="D4D4D4"/>
+                </a:solidFill>
+                <a:latin typeface="Consolas" panose="020B0609020204030204" pitchFamily="49" charset="0"/>
+              </a:rPr>
+              <a:t>);</a:t>
+            </a:r>
+            <a:br>
+              <a:rPr lang="pl-PL" dirty="0">
+                <a:solidFill>
+                  <a:srgbClr val="D4D4D4"/>
+                </a:solidFill>
+                <a:latin typeface="Consolas" panose="020B0609020204030204" pitchFamily="49" charset="0"/>
+              </a:rPr>
+            </a:br>
+            <a:r>
+              <a:rPr lang="pl-PL" dirty="0">
+                <a:solidFill>
+                  <a:srgbClr val="D4D4D4"/>
+                </a:solidFill>
+                <a:latin typeface="Consolas" panose="020B0609020204030204" pitchFamily="49" charset="0"/>
+              </a:rPr>
+              <a:t>        </a:t>
+            </a:r>
+            <a:r>
+              <a:rPr lang="pl-PL" dirty="0">
+                <a:solidFill>
+                  <a:srgbClr val="C586C0"/>
+                </a:solidFill>
+                <a:latin typeface="Consolas" panose="020B0609020204030204" pitchFamily="49" charset="0"/>
+              </a:rPr>
+              <a:t>return</a:t>
+            </a:r>
+            <a:r>
+              <a:rPr lang="pl-PL" dirty="0">
+                <a:solidFill>
+                  <a:srgbClr val="D4D4D4"/>
+                </a:solidFill>
+                <a:latin typeface="Consolas" panose="020B0609020204030204" pitchFamily="49" charset="0"/>
+              </a:rPr>
+              <a:t> </a:t>
+            </a:r>
+            <a:r>
+              <a:rPr lang="pl-PL" dirty="0" err="1">
+                <a:solidFill>
+                  <a:srgbClr val="9CDCFE"/>
+                </a:solidFill>
+                <a:latin typeface="Consolas" panose="020B0609020204030204" pitchFamily="49" charset="0"/>
+              </a:rPr>
+              <a:t>request</a:t>
+            </a:r>
+            <a:r>
+              <a:rPr lang="pl-PL" dirty="0" err="1">
+                <a:solidFill>
+                  <a:srgbClr val="D4D4D4"/>
+                </a:solidFill>
+                <a:latin typeface="Consolas" panose="020B0609020204030204" pitchFamily="49" charset="0"/>
+              </a:rPr>
+              <a:t>.</a:t>
+            </a:r>
+            <a:r>
+              <a:rPr lang="pl-PL" dirty="0" err="1">
+                <a:solidFill>
+                  <a:srgbClr val="DCDCAA"/>
+                </a:solidFill>
+                <a:latin typeface="Consolas" panose="020B0609020204030204" pitchFamily="49" charset="0"/>
+              </a:rPr>
+              <a:t>then</a:t>
+            </a:r>
+            <a:r>
+              <a:rPr lang="pl-PL" dirty="0">
+                <a:solidFill>
+                  <a:srgbClr val="D4D4D4"/>
+                </a:solidFill>
+                <a:latin typeface="Consolas" panose="020B0609020204030204" pitchFamily="49" charset="0"/>
+              </a:rPr>
+              <a:t>(</a:t>
+            </a:r>
+          </a:p>
+          <a:p>
+            <a:r>
+              <a:rPr lang="pl-PL" dirty="0">
+                <a:solidFill>
+                  <a:srgbClr val="D4D4D4"/>
+                </a:solidFill>
+                <a:latin typeface="Consolas" panose="020B0609020204030204" pitchFamily="49" charset="0"/>
+              </a:rPr>
+              <a:t>            </a:t>
+            </a:r>
+            <a:r>
+              <a:rPr lang="pl-PL" dirty="0" err="1">
+                <a:solidFill>
+                  <a:srgbClr val="9CDCFE"/>
+                </a:solidFill>
+                <a:latin typeface="Consolas" panose="020B0609020204030204" pitchFamily="49" charset="0"/>
+              </a:rPr>
+              <a:t>result</a:t>
+            </a:r>
+            <a:r>
+              <a:rPr lang="pl-PL" dirty="0">
+                <a:solidFill>
+                  <a:srgbClr val="D4D4D4"/>
+                </a:solidFill>
+                <a:latin typeface="Consolas" panose="020B0609020204030204" pitchFamily="49" charset="0"/>
+              </a:rPr>
+              <a:t> </a:t>
+            </a:r>
+            <a:r>
+              <a:rPr lang="pl-PL" dirty="0">
+                <a:solidFill>
+                  <a:srgbClr val="569CD6"/>
+                </a:solidFill>
+                <a:latin typeface="Consolas" panose="020B0609020204030204" pitchFamily="49" charset="0"/>
+              </a:rPr>
+              <a:t>=&gt;</a:t>
+            </a:r>
+            <a:r>
+              <a:rPr lang="pl-PL" dirty="0">
+                <a:solidFill>
+                  <a:srgbClr val="D4D4D4"/>
+                </a:solidFill>
+                <a:latin typeface="Consolas" panose="020B0609020204030204" pitchFamily="49" charset="0"/>
+              </a:rPr>
+              <a:t> </a:t>
+            </a:r>
+            <a:r>
+              <a:rPr lang="pl-PL" dirty="0" err="1">
+                <a:solidFill>
+                  <a:srgbClr val="DCDCAA"/>
+                </a:solidFill>
+                <a:latin typeface="Consolas" panose="020B0609020204030204" pitchFamily="49" charset="0"/>
+              </a:rPr>
+              <a:t>dispatch</a:t>
+            </a:r>
+            <a:r>
+              <a:rPr lang="pl-PL" dirty="0">
+                <a:solidFill>
+                  <a:srgbClr val="D4D4D4"/>
+                </a:solidFill>
+                <a:latin typeface="Consolas" panose="020B0609020204030204" pitchFamily="49" charset="0"/>
+              </a:rPr>
+              <a:t>(</a:t>
+            </a:r>
+            <a:r>
+              <a:rPr lang="pl-PL" dirty="0" err="1">
+                <a:solidFill>
+                  <a:srgbClr val="DCDCAA"/>
+                </a:solidFill>
+                <a:latin typeface="Consolas" panose="020B0609020204030204" pitchFamily="49" charset="0"/>
+              </a:rPr>
+              <a:t>doSthWithConsumedDataAction</a:t>
+            </a:r>
+            <a:r>
+              <a:rPr lang="pl-PL" dirty="0">
+                <a:solidFill>
+                  <a:srgbClr val="DCDCAA"/>
+                </a:solidFill>
+                <a:latin typeface="Consolas" panose="020B0609020204030204" pitchFamily="49" charset="0"/>
+              </a:rPr>
+              <a:t>)</a:t>
+            </a:r>
+          </a:p>
+          <a:p>
+            <a:r>
+              <a:rPr lang="pl-PL" dirty="0">
+                <a:solidFill>
+                  <a:srgbClr val="D4D4D4"/>
+                </a:solidFill>
+                <a:latin typeface="Consolas" panose="020B0609020204030204" pitchFamily="49" charset="0"/>
+              </a:rPr>
+              <a:t>            </a:t>
+            </a:r>
+            <a:r>
+              <a:rPr lang="pl-PL" dirty="0" err="1">
+                <a:solidFill>
+                  <a:srgbClr val="9CDCFE"/>
+                </a:solidFill>
+                <a:latin typeface="Consolas" panose="020B0609020204030204" pitchFamily="49" charset="0"/>
+              </a:rPr>
+              <a:t>err</a:t>
+            </a:r>
+            <a:r>
+              <a:rPr lang="pl-PL" dirty="0">
+                <a:solidFill>
+                  <a:srgbClr val="D4D4D4"/>
+                </a:solidFill>
+                <a:latin typeface="Consolas" panose="020B0609020204030204" pitchFamily="49" charset="0"/>
+              </a:rPr>
+              <a:t> </a:t>
+            </a:r>
+            <a:r>
+              <a:rPr lang="pl-PL" dirty="0">
+                <a:solidFill>
+                  <a:srgbClr val="569CD6"/>
+                </a:solidFill>
+                <a:latin typeface="Consolas" panose="020B0609020204030204" pitchFamily="49" charset="0"/>
+              </a:rPr>
+              <a:t>=&gt;</a:t>
+            </a:r>
+            <a:r>
+              <a:rPr lang="pl-PL" dirty="0">
+                <a:solidFill>
+                  <a:srgbClr val="D4D4D4"/>
+                </a:solidFill>
+                <a:latin typeface="Consolas" panose="020B0609020204030204" pitchFamily="49" charset="0"/>
+              </a:rPr>
+              <a:t> {</a:t>
+            </a:r>
+            <a:r>
+              <a:rPr lang="pl-PL" dirty="0" err="1">
+                <a:solidFill>
+                  <a:srgbClr val="DCDCAA"/>
+                </a:solidFill>
+                <a:latin typeface="Consolas" panose="020B0609020204030204" pitchFamily="49" charset="0"/>
+              </a:rPr>
+              <a:t>dispatch</a:t>
+            </a:r>
+            <a:r>
+              <a:rPr lang="pl-PL" dirty="0">
+                <a:solidFill>
+                  <a:srgbClr val="D4D4D4"/>
+                </a:solidFill>
+                <a:latin typeface="Consolas" panose="020B0609020204030204" pitchFamily="49" charset="0"/>
+              </a:rPr>
+              <a:t>(</a:t>
+            </a:r>
+            <a:r>
+              <a:rPr lang="pl-PL" dirty="0" err="1">
+                <a:solidFill>
+                  <a:srgbClr val="DCDCAA"/>
+                </a:solidFill>
+                <a:latin typeface="Consolas" panose="020B0609020204030204" pitchFamily="49" charset="0"/>
+              </a:rPr>
+              <a:t>loginRequestCompleted</a:t>
+            </a:r>
+            <a:r>
+              <a:rPr lang="pl-PL" dirty="0">
+                <a:solidFill>
+                  <a:srgbClr val="D4D4D4"/>
+                </a:solidFill>
+                <a:latin typeface="Consolas" panose="020B0609020204030204" pitchFamily="49" charset="0"/>
+              </a:rPr>
+              <a:t>(</a:t>
+            </a:r>
+            <a:r>
+              <a:rPr lang="pl-PL" dirty="0" err="1">
+                <a:solidFill>
+                  <a:srgbClr val="9CDCFE"/>
+                </a:solidFill>
+                <a:latin typeface="Consolas" panose="020B0609020204030204" pitchFamily="49" charset="0"/>
+              </a:rPr>
+              <a:t>err</a:t>
+            </a:r>
+            <a:r>
+              <a:rPr lang="pl-PL" dirty="0">
+                <a:solidFill>
+                  <a:srgbClr val="D4D4D4"/>
+                </a:solidFill>
+                <a:latin typeface="Consolas" panose="020B0609020204030204" pitchFamily="49" charset="0"/>
+              </a:rPr>
+              <a:t>))}</a:t>
+            </a:r>
+          </a:p>
+          <a:p>
+            <a:r>
+              <a:rPr lang="pl-PL" dirty="0">
+                <a:solidFill>
+                  <a:srgbClr val="D4D4D4"/>
+                </a:solidFill>
+                <a:latin typeface="Consolas" panose="020B0609020204030204" pitchFamily="49" charset="0"/>
+              </a:rPr>
+              <a:t>        );</a:t>
+            </a:r>
+          </a:p>
+          <a:p>
+            <a:r>
+              <a:rPr lang="pl-PL" dirty="0">
+                <a:solidFill>
+                  <a:srgbClr val="D4D4D4"/>
+                </a:solidFill>
+                <a:latin typeface="Consolas" panose="020B0609020204030204" pitchFamily="49" charset="0"/>
+              </a:rPr>
+              <a:t>    }</a:t>
+            </a:r>
+          </a:p>
+          <a:p>
+            <a:r>
+              <a:rPr lang="pl-PL" dirty="0">
+                <a:solidFill>
+                  <a:srgbClr val="D4D4D4"/>
+                </a:solidFill>
+                <a:latin typeface="Consolas" panose="020B0609020204030204" pitchFamily="49" charset="0"/>
+              </a:rPr>
+              <a:t>}</a:t>
+            </a:r>
+            <a:endParaRPr lang="pl-PL" b="0" dirty="0">
+              <a:solidFill>
+                <a:srgbClr val="D4D4D4"/>
+              </a:solidFill>
+              <a:effectLst/>
+              <a:latin typeface="Consolas" panose="020B0609020204030204" pitchFamily="49" charset="0"/>
+            </a:endParaRPr>
+          </a:p>
+        </p:txBody>
+      </p:sp>
+      <p:sp>
+        <p:nvSpPr>
+          <p:cNvPr id="7" name="pole tekstowe 6">
+            <a:extLst>
+              <a:ext uri="{FF2B5EF4-FFF2-40B4-BE49-F238E27FC236}">
+                <a16:creationId xmlns:a16="http://schemas.microsoft.com/office/drawing/2014/main" id="{39C8CF87-C4DD-4615-B2E7-6FDDA1711883}"/>
+              </a:ext>
+            </a:extLst>
+          </p:cNvPr>
+          <p:cNvSpPr txBox="1"/>
+          <p:nvPr/>
+        </p:nvSpPr>
+        <p:spPr>
+          <a:xfrm>
+            <a:off x="2187492" y="2850347"/>
+            <a:ext cx="2879058" cy="369332"/>
+          </a:xfrm>
+          <a:prstGeom prst="rect">
+            <a:avLst/>
+          </a:prstGeom>
+          <a:noFill/>
+        </p:spPr>
+        <p:txBody>
+          <a:bodyPr wrap="none" rtlCol="0">
+            <a:spAutoFit/>
+          </a:bodyPr>
+          <a:lstStyle/>
+          <a:p>
+            <a:r>
+              <a:rPr lang="pl-PL" dirty="0" err="1"/>
+              <a:t>Async</a:t>
+            </a:r>
+            <a:r>
+              <a:rPr lang="pl-PL" dirty="0"/>
+              <a:t> </a:t>
+            </a:r>
+            <a:r>
+              <a:rPr lang="pl-PL" dirty="0" err="1"/>
+              <a:t>action</a:t>
+            </a:r>
+            <a:r>
+              <a:rPr lang="pl-PL" dirty="0"/>
+              <a:t> </a:t>
+            </a:r>
+            <a:r>
+              <a:rPr lang="pl-PL" dirty="0" err="1"/>
+              <a:t>consuming</a:t>
+            </a:r>
+            <a:r>
+              <a:rPr lang="pl-PL" dirty="0"/>
+              <a:t> http</a:t>
+            </a:r>
+          </a:p>
+        </p:txBody>
+      </p:sp>
+    </p:spTree>
+    <p:extLst>
+      <p:ext uri="{BB962C8B-B14F-4D97-AF65-F5344CB8AC3E}">
+        <p14:creationId xmlns:p14="http://schemas.microsoft.com/office/powerpoint/2010/main" val="3165181399"/>
       </p:ext>
     </p:extLst>
   </p:cSld>

</xml_diff>

<commit_message>
Exercise 28: Add typescript for Account component
</commit_message>
<xml_diff>
--- a/tutorial/ReactjsTraining.pptx
+++ b/tutorial/ReactjsTraining.pptx
@@ -5,7 +5,7 @@
     <p:sldMasterId id="2147483648" r:id="rId1"/>
   </p:sldMasterIdLst>
   <p:notesMasterIdLst>
-    <p:notesMasterId r:id="rId41"/>
+    <p:notesMasterId r:id="rId42"/>
   </p:notesMasterIdLst>
   <p:sldIdLst>
     <p:sldId id="256" r:id="rId2"/>
@@ -47,6 +47,7 @@
     <p:sldId id="282" r:id="rId38"/>
     <p:sldId id="295" r:id="rId39"/>
     <p:sldId id="296" r:id="rId40"/>
+    <p:sldId id="297" r:id="rId41"/>
   </p:sldIdLst>
   <p:sldSz cx="12192000" cy="6858000"/>
   <p:notesSz cx="6858000" cy="9144000"/>
@@ -9167,6 +9168,186 @@
     <p:extLst>
       <p:ext uri="{BB962C8B-B14F-4D97-AF65-F5344CB8AC3E}">
         <p14:creationId xmlns:p14="http://schemas.microsoft.com/office/powerpoint/2010/main" val="2567423790"/>
+      </p:ext>
+    </p:extLst>
+  </p:cSld>
+  <p:clrMapOvr>
+    <a:masterClrMapping/>
+  </p:clrMapOvr>
+</p:notes>
+</file>
+
+<file path=ppt/notesSlides/notesSlide40.xml><?xml version="1.0" encoding="utf-8"?>
+<p:notes xmlns:a="http://schemas.openxmlformats.org/drawingml/2006/main" xmlns:r="http://schemas.openxmlformats.org/officeDocument/2006/relationships" xmlns:p="http://schemas.openxmlformats.org/presentationml/2006/main">
+  <p:cSld>
+    <p:spTree>
+      <p:nvGrpSpPr>
+        <p:cNvPr id="1" name=""/>
+        <p:cNvGrpSpPr/>
+        <p:nvPr/>
+      </p:nvGrpSpPr>
+      <p:grpSpPr>
+        <a:xfrm>
+          <a:off x="0" y="0"/>
+          <a:ext cx="0" cy="0"/>
+          <a:chOff x="0" y="0"/>
+          <a:chExt cx="0" cy="0"/>
+        </a:xfrm>
+      </p:grpSpPr>
+      <p:sp>
+        <p:nvSpPr>
+          <p:cNvPr id="2" name="Symbol zastępczy obrazu slajdu 1"/>
+          <p:cNvSpPr>
+            <a:spLocks noGrp="1" noRot="1" noChangeAspect="1"/>
+          </p:cNvSpPr>
+          <p:nvPr>
+            <p:ph type="sldImg"/>
+          </p:nvPr>
+        </p:nvSpPr>
+        <p:spPr/>
+      </p:sp>
+      <p:sp>
+        <p:nvSpPr>
+          <p:cNvPr id="3" name="Symbol zastępczy notatek 2"/>
+          <p:cNvSpPr>
+            <a:spLocks noGrp="1"/>
+          </p:cNvSpPr>
+          <p:nvPr>
+            <p:ph type="body" idx="1"/>
+          </p:nvPr>
+        </p:nvSpPr>
+        <p:spPr/>
+        <p:txBody>
+          <a:bodyPr/>
+          <a:lstStyle/>
+          <a:p>
+            <a:r>
+              <a:rPr lang="en-US" sz="1200" b="0" i="0" kern="1200" dirty="0">
+                <a:solidFill>
+                  <a:schemeClr val="tx1"/>
+                </a:solidFill>
+                <a:effectLst/>
+                <a:latin typeface="+mn-lt"/>
+                <a:ea typeface="+mn-ea"/>
+                <a:cs typeface="+mn-cs"/>
+              </a:rPr>
+              <a:t>.</a:t>
+            </a:r>
+            <a:r>
+              <a:rPr lang="en-US" sz="1200" b="0" i="0" kern="1200" dirty="0" err="1">
+                <a:solidFill>
+                  <a:schemeClr val="tx1"/>
+                </a:solidFill>
+                <a:effectLst/>
+                <a:latin typeface="+mn-lt"/>
+                <a:ea typeface="+mn-ea"/>
+                <a:cs typeface="+mn-cs"/>
+              </a:rPr>
+              <a:t>ts</a:t>
+            </a:r>
+            <a:r>
+              <a:rPr lang="en-US" sz="1200" b="0" i="0" kern="1200" dirty="0">
+                <a:solidFill>
+                  <a:schemeClr val="tx1"/>
+                </a:solidFill>
+                <a:effectLst/>
+                <a:latin typeface="+mn-lt"/>
+                <a:ea typeface="+mn-ea"/>
+                <a:cs typeface="+mn-cs"/>
+              </a:rPr>
+              <a:t> is the default file extension while .</a:t>
+            </a:r>
+            <a:r>
+              <a:rPr lang="en-US" sz="1200" b="0" i="0" kern="1200" dirty="0" err="1">
+                <a:solidFill>
+                  <a:schemeClr val="tx1"/>
+                </a:solidFill>
+                <a:effectLst/>
+                <a:latin typeface="+mn-lt"/>
+                <a:ea typeface="+mn-ea"/>
+                <a:cs typeface="+mn-cs"/>
+              </a:rPr>
+              <a:t>tsx</a:t>
+            </a:r>
+            <a:r>
+              <a:rPr lang="en-US" sz="1200" b="0" i="0" kern="1200" dirty="0">
+                <a:solidFill>
+                  <a:schemeClr val="tx1"/>
+                </a:solidFill>
+                <a:effectLst/>
+                <a:latin typeface="+mn-lt"/>
+                <a:ea typeface="+mn-ea"/>
+                <a:cs typeface="+mn-cs"/>
+              </a:rPr>
+              <a:t> is a special extension used for files which contain JSX.</a:t>
+            </a:r>
+          </a:p>
+          <a:p>
+            <a:endParaRPr lang="pl-PL" dirty="0"/>
+          </a:p>
+          <a:p>
+            <a:br>
+              <a:rPr lang="en-US" dirty="0"/>
+            </a:br>
+            <a:r>
+              <a:rPr lang="pl-PL" dirty="0" err="1"/>
+              <a:t>Exercise</a:t>
+            </a:r>
+            <a:r>
+              <a:rPr lang="pl-PL" dirty="0"/>
+              <a:t> 28: Dodać typowanie dla Account.js i </a:t>
+            </a:r>
+            <a:r>
+              <a:rPr lang="pl-PL" dirty="0" err="1"/>
+              <a:t>store</a:t>
+            </a:r>
+            <a:r>
+              <a:rPr lang="pl-PL" dirty="0"/>
+              <a:t> związany z </a:t>
+            </a:r>
+            <a:r>
+              <a:rPr lang="pl-PL" dirty="0" err="1"/>
+              <a:t>Account</a:t>
+            </a:r>
+            <a:endParaRPr lang="pl-PL" sz="1200" b="0" i="0" kern="1200" dirty="0">
+              <a:solidFill>
+                <a:schemeClr val="tx1"/>
+              </a:solidFill>
+              <a:effectLst/>
+              <a:latin typeface="+mn-lt"/>
+              <a:ea typeface="+mn-ea"/>
+              <a:cs typeface="+mn-cs"/>
+            </a:endParaRPr>
+          </a:p>
+        </p:txBody>
+      </p:sp>
+      <p:sp>
+        <p:nvSpPr>
+          <p:cNvPr id="4" name="Symbol zastępczy numeru slajdu 3"/>
+          <p:cNvSpPr>
+            <a:spLocks noGrp="1"/>
+          </p:cNvSpPr>
+          <p:nvPr>
+            <p:ph type="sldNum" sz="quarter" idx="5"/>
+          </p:nvPr>
+        </p:nvSpPr>
+        <p:spPr/>
+        <p:txBody>
+          <a:bodyPr/>
+          <a:lstStyle/>
+          <a:p>
+            <a:fld id="{810A6612-7A23-4B98-B0E9-4F3C882AD2EF}" type="slidenum">
+              <a:rPr lang="pl-PL" smtClean="0"/>
+              <a:t>40</a:t>
+            </a:fld>
+            <a:endParaRPr lang="pl-PL"/>
+          </a:p>
+        </p:txBody>
+      </p:sp>
+    </p:spTree>
+    <p:extLst>
+      <p:ext uri="{BB962C8B-B14F-4D97-AF65-F5344CB8AC3E}">
+        <p14:creationId xmlns:p14="http://schemas.microsoft.com/office/powerpoint/2010/main" val="3074783976"/>
       </p:ext>
     </p:extLst>
   </p:cSld>
@@ -47485,6 +47666,890 @@
     <p:extLst>
       <p:ext uri="{BB962C8B-B14F-4D97-AF65-F5344CB8AC3E}">
         <p14:creationId xmlns:p14="http://schemas.microsoft.com/office/powerpoint/2010/main" val="2384723857"/>
+      </p:ext>
+    </p:extLst>
+  </p:cSld>
+  <p:clrMapOvr>
+    <a:masterClrMapping/>
+  </p:clrMapOvr>
+</p:sld>
+</file>
+
+<file path=ppt/slides/slide40.xml><?xml version="1.0" encoding="utf-8"?>
+<p:sld xmlns:a="http://schemas.openxmlformats.org/drawingml/2006/main" xmlns:r="http://schemas.openxmlformats.org/officeDocument/2006/relationships" xmlns:p="http://schemas.openxmlformats.org/presentationml/2006/main">
+  <p:cSld>
+    <p:spTree>
+      <p:nvGrpSpPr>
+        <p:cNvPr id="1" name=""/>
+        <p:cNvGrpSpPr/>
+        <p:nvPr/>
+      </p:nvGrpSpPr>
+      <p:grpSpPr>
+        <a:xfrm>
+          <a:off x="0" y="0"/>
+          <a:ext cx="0" cy="0"/>
+          <a:chOff x="0" y="0"/>
+          <a:chExt cx="0" cy="0"/>
+        </a:xfrm>
+      </p:grpSpPr>
+      <p:sp>
+        <p:nvSpPr>
+          <p:cNvPr id="4" name="pole tekstowe 3">
+            <a:extLst>
+              <a:ext uri="{FF2B5EF4-FFF2-40B4-BE49-F238E27FC236}">
+                <a16:creationId xmlns:a16="http://schemas.microsoft.com/office/drawing/2014/main" id="{F164A7B3-8808-414C-9401-3B25194E3B5A}"/>
+              </a:ext>
+            </a:extLst>
+          </p:cNvPr>
+          <p:cNvSpPr txBox="1"/>
+          <p:nvPr/>
+        </p:nvSpPr>
+        <p:spPr>
+          <a:xfrm>
+            <a:off x="497840" y="538480"/>
+            <a:ext cx="2704779" cy="369332"/>
+          </a:xfrm>
+          <a:prstGeom prst="rect">
+            <a:avLst/>
+          </a:prstGeom>
+          <a:noFill/>
+        </p:spPr>
+        <p:txBody>
+          <a:bodyPr wrap="none" rtlCol="0">
+            <a:spAutoFit/>
+          </a:bodyPr>
+          <a:lstStyle/>
+          <a:p>
+            <a:r>
+              <a:rPr lang="pl-PL" dirty="0" err="1"/>
+              <a:t>TypeScript</a:t>
+            </a:r>
+            <a:r>
+              <a:rPr lang="pl-PL" dirty="0"/>
+              <a:t> – </a:t>
+            </a:r>
+            <a:r>
+              <a:rPr lang="pl-PL" dirty="0" err="1"/>
+              <a:t>add</a:t>
+            </a:r>
+            <a:r>
+              <a:rPr lang="pl-PL" dirty="0"/>
+              <a:t> to </a:t>
+            </a:r>
+            <a:r>
+              <a:rPr lang="pl-PL" dirty="0" err="1"/>
+              <a:t>project</a:t>
+            </a:r>
+            <a:endParaRPr lang="pl-PL" dirty="0"/>
+          </a:p>
+        </p:txBody>
+      </p:sp>
+      <p:sp>
+        <p:nvSpPr>
+          <p:cNvPr id="2" name="Rectangle 1">
+            <a:extLst>
+              <a:ext uri="{FF2B5EF4-FFF2-40B4-BE49-F238E27FC236}">
+                <a16:creationId xmlns:a16="http://schemas.microsoft.com/office/drawing/2014/main" id="{AB3F8509-A355-465B-B8EF-0CD1A0CA3ABB}"/>
+              </a:ext>
+            </a:extLst>
+          </p:cNvPr>
+          <p:cNvSpPr>
+            <a:spLocks noChangeArrowheads="1"/>
+          </p:cNvSpPr>
+          <p:nvPr/>
+        </p:nvSpPr>
+        <p:spPr bwMode="auto">
+          <a:xfrm>
+            <a:off x="2266123" y="1489064"/>
+            <a:ext cx="3442609" cy="246221"/>
+          </a:xfrm>
+          <a:prstGeom prst="rect">
+            <a:avLst/>
+          </a:prstGeom>
+          <a:noFill/>
+          <a:ln>
+            <a:noFill/>
+          </a:ln>
+          <a:effectLst/>
+          <a:extLst>
+            <a:ext uri="{909E8E84-426E-40DD-AFC4-6F175D3DCCD1}">
+              <a14:hiddenFill xmlns:a14="http://schemas.microsoft.com/office/drawing/2010/main">
+                <a:solidFill>
+                  <a:schemeClr val="accent1"/>
+                </a:solidFill>
+              </a14:hiddenFill>
+            </a:ext>
+            <a:ext uri="{91240B29-F687-4F45-9708-019B960494DF}">
+              <a14:hiddenLine xmlns:a14="http://schemas.microsoft.com/office/drawing/2010/main" w="9525">
+                <a:solidFill>
+                  <a:schemeClr val="tx1"/>
+                </a:solidFill>
+                <a:miter lim="800000"/>
+                <a:headEnd/>
+                <a:tailEnd/>
+              </a14:hiddenLine>
+            </a:ext>
+            <a:ext uri="{AF507438-7753-43E0-B8FC-AC1667EBCBE1}">
+              <a14:hiddenEffects xmlns:a14="http://schemas.microsoft.com/office/drawing/2010/main">
+                <a:effectLst>
+                  <a:outerShdw dist="35921" dir="2700000" algn="ctr" rotWithShape="0">
+                    <a:schemeClr val="bg2"/>
+                  </a:outerShdw>
+                </a:effectLst>
+              </a14:hiddenEffects>
+            </a:ext>
+          </a:extLst>
+        </p:spPr>
+        <p:txBody>
+          <a:bodyPr vert="horz" wrap="none" lIns="0" tIns="0" rIns="0" bIns="0" numCol="1" anchor="ctr" anchorCtr="0" compatLnSpc="1">
+            <a:prstTxWarp prst="textNoShape">
+              <a:avLst/>
+            </a:prstTxWarp>
+            <a:spAutoFit/>
+          </a:bodyPr>
+          <a:lstStyle/>
+          <a:p>
+            <a:pPr marL="0" marR="0" lvl="0" indent="0" algn="l" defTabSz="914400" rtl="0" eaLnBrk="0" fontAlgn="base" latinLnBrk="0" hangingPunct="0">
+              <a:lnSpc>
+                <a:spcPct val="100000"/>
+              </a:lnSpc>
+              <a:spcBef>
+                <a:spcPct val="0"/>
+              </a:spcBef>
+              <a:spcAft>
+                <a:spcPct val="0"/>
+              </a:spcAft>
+              <a:buClrTx/>
+              <a:buSzTx/>
+              <a:buFontTx/>
+              <a:buNone/>
+              <a:tabLst/>
+            </a:pPr>
+            <a:r>
+              <a:rPr kumimoji="0" lang="pl-PL" altLang="pl-PL" sz="1600" b="0" i="0" u="none" strike="noStrike" cap="none" normalizeH="0" baseline="0">
+                <a:ln>
+                  <a:noFill/>
+                </a:ln>
+                <a:effectLst/>
+                <a:latin typeface="source-code-pro"/>
+              </a:rPr>
+              <a:t>npx create-react-app my-app --typescript</a:t>
+            </a:r>
+            <a:r>
+              <a:rPr kumimoji="0" lang="pl-PL" altLang="pl-PL" sz="1200" b="0" i="0" u="none" strike="noStrike" cap="none" normalizeH="0" baseline="0">
+                <a:ln>
+                  <a:noFill/>
+                </a:ln>
+                <a:effectLst/>
+              </a:rPr>
+              <a:t> </a:t>
+            </a:r>
+            <a:endParaRPr kumimoji="0" lang="pl-PL" altLang="pl-PL" sz="3600" b="0" i="0" u="none" strike="noStrike" cap="none" normalizeH="0" baseline="0">
+              <a:ln>
+                <a:noFill/>
+              </a:ln>
+              <a:effectLst/>
+              <a:latin typeface="Arial" panose="020B0604020202020204" pitchFamily="34" charset="0"/>
+            </a:endParaRPr>
+          </a:p>
+        </p:txBody>
+      </p:sp>
+      <p:sp>
+        <p:nvSpPr>
+          <p:cNvPr id="5" name="pole tekstowe 4">
+            <a:extLst>
+              <a:ext uri="{FF2B5EF4-FFF2-40B4-BE49-F238E27FC236}">
+                <a16:creationId xmlns:a16="http://schemas.microsoft.com/office/drawing/2014/main" id="{74E2F12B-3BFD-4AF4-8447-045E25058874}"/>
+              </a:ext>
+            </a:extLst>
+          </p:cNvPr>
+          <p:cNvSpPr txBox="1"/>
+          <p:nvPr/>
+        </p:nvSpPr>
+        <p:spPr>
+          <a:xfrm>
+            <a:off x="2133600" y="1099585"/>
+            <a:ext cx="2542106" cy="369332"/>
+          </a:xfrm>
+          <a:prstGeom prst="rect">
+            <a:avLst/>
+          </a:prstGeom>
+          <a:noFill/>
+        </p:spPr>
+        <p:txBody>
+          <a:bodyPr wrap="none" rtlCol="0">
+            <a:spAutoFit/>
+          </a:bodyPr>
+          <a:lstStyle/>
+          <a:p>
+            <a:r>
+              <a:rPr lang="pl-PL" dirty="0">
+                <a:solidFill>
+                  <a:srgbClr val="00B050"/>
+                </a:solidFill>
+              </a:rPr>
+              <a:t>New </a:t>
+            </a:r>
+            <a:r>
+              <a:rPr lang="pl-PL" dirty="0" err="1">
+                <a:solidFill>
+                  <a:srgbClr val="00B050"/>
+                </a:solidFill>
+              </a:rPr>
+              <a:t>app</a:t>
+            </a:r>
+            <a:r>
+              <a:rPr lang="pl-PL" dirty="0">
+                <a:solidFill>
+                  <a:srgbClr val="00B050"/>
+                </a:solidFill>
+              </a:rPr>
+              <a:t> with </a:t>
+            </a:r>
+            <a:r>
+              <a:rPr lang="pl-PL" dirty="0" err="1">
+                <a:solidFill>
+                  <a:srgbClr val="00B050"/>
+                </a:solidFill>
+              </a:rPr>
+              <a:t>typescript</a:t>
+            </a:r>
+            <a:r>
+              <a:rPr lang="pl-PL" dirty="0">
+                <a:solidFill>
+                  <a:srgbClr val="00B050"/>
+                </a:solidFill>
+              </a:rPr>
+              <a:t>:</a:t>
+            </a:r>
+          </a:p>
+        </p:txBody>
+      </p:sp>
+      <p:sp>
+        <p:nvSpPr>
+          <p:cNvPr id="3" name="Prostokąt 2">
+            <a:extLst>
+              <a:ext uri="{FF2B5EF4-FFF2-40B4-BE49-F238E27FC236}">
+                <a16:creationId xmlns:a16="http://schemas.microsoft.com/office/drawing/2014/main" id="{1A257457-BDAC-496E-A2CC-998BFEE09E88}"/>
+              </a:ext>
+            </a:extLst>
+          </p:cNvPr>
+          <p:cNvSpPr/>
+          <p:nvPr/>
+        </p:nvSpPr>
+        <p:spPr>
+          <a:xfrm>
+            <a:off x="2133600" y="2370987"/>
+            <a:ext cx="8958470" cy="923330"/>
+          </a:xfrm>
+          <a:prstGeom prst="rect">
+            <a:avLst/>
+          </a:prstGeom>
+        </p:spPr>
+        <p:txBody>
+          <a:bodyPr wrap="square">
+            <a:spAutoFit/>
+          </a:bodyPr>
+          <a:lstStyle/>
+          <a:p>
+            <a:r>
+              <a:rPr lang="pl-PL" dirty="0" err="1">
+                <a:solidFill>
+                  <a:srgbClr val="444444"/>
+                </a:solidFill>
+                <a:latin typeface="SFMono-Regular"/>
+              </a:rPr>
+              <a:t>npm</a:t>
+            </a:r>
+            <a:r>
+              <a:rPr lang="pl-PL" dirty="0">
+                <a:solidFill>
+                  <a:srgbClr val="444444"/>
+                </a:solidFill>
+                <a:latin typeface="SFMono-Regular"/>
+              </a:rPr>
+              <a:t> </a:t>
+            </a:r>
+            <a:r>
+              <a:rPr lang="pl-PL" dirty="0" err="1">
+                <a:solidFill>
+                  <a:srgbClr val="444444"/>
+                </a:solidFill>
+                <a:latin typeface="SFMono-Regular"/>
+              </a:rPr>
+              <a:t>install</a:t>
+            </a:r>
+            <a:r>
+              <a:rPr lang="pl-PL" dirty="0">
+                <a:solidFill>
+                  <a:srgbClr val="444444"/>
+                </a:solidFill>
+                <a:latin typeface="SFMono-Regular"/>
+              </a:rPr>
+              <a:t> --</a:t>
+            </a:r>
+            <a:r>
+              <a:rPr lang="pl-PL" dirty="0" err="1">
+                <a:solidFill>
+                  <a:srgbClr val="444444"/>
+                </a:solidFill>
+                <a:latin typeface="SFMono-Regular"/>
+              </a:rPr>
+              <a:t>save</a:t>
+            </a:r>
+            <a:r>
+              <a:rPr lang="pl-PL" dirty="0">
+                <a:solidFill>
+                  <a:srgbClr val="444444"/>
+                </a:solidFill>
+                <a:latin typeface="SFMono-Regular"/>
+              </a:rPr>
+              <a:t> </a:t>
+            </a:r>
+            <a:r>
+              <a:rPr lang="pl-PL" dirty="0" err="1">
+                <a:solidFill>
+                  <a:srgbClr val="444444"/>
+                </a:solidFill>
+                <a:latin typeface="SFMono-Regular"/>
+              </a:rPr>
+              <a:t>typescript</a:t>
+            </a:r>
+            <a:r>
+              <a:rPr lang="pl-PL" dirty="0">
+                <a:solidFill>
+                  <a:srgbClr val="444444"/>
+                </a:solidFill>
+                <a:latin typeface="SFMono-Regular"/>
+              </a:rPr>
+              <a:t> @</a:t>
+            </a:r>
+            <a:r>
+              <a:rPr lang="pl-PL" dirty="0" err="1">
+                <a:solidFill>
+                  <a:srgbClr val="444444"/>
+                </a:solidFill>
+                <a:latin typeface="SFMono-Regular"/>
+              </a:rPr>
+              <a:t>types</a:t>
+            </a:r>
+            <a:r>
+              <a:rPr lang="pl-PL" dirty="0">
+                <a:solidFill>
+                  <a:srgbClr val="444444"/>
+                </a:solidFill>
+                <a:latin typeface="SFMono-Regular"/>
+              </a:rPr>
+              <a:t>/</a:t>
+            </a:r>
+            <a:r>
+              <a:rPr lang="pl-PL" dirty="0" err="1">
+                <a:solidFill>
+                  <a:srgbClr val="444444"/>
+                </a:solidFill>
+                <a:latin typeface="SFMono-Regular"/>
+              </a:rPr>
+              <a:t>node</a:t>
+            </a:r>
+            <a:r>
+              <a:rPr lang="pl-PL" dirty="0">
+                <a:solidFill>
+                  <a:srgbClr val="444444"/>
+                </a:solidFill>
+                <a:latin typeface="SFMono-Regular"/>
+              </a:rPr>
+              <a:t> @</a:t>
+            </a:r>
+            <a:r>
+              <a:rPr lang="pl-PL" dirty="0" err="1">
+                <a:solidFill>
+                  <a:srgbClr val="444444"/>
+                </a:solidFill>
+                <a:latin typeface="SFMono-Regular"/>
+              </a:rPr>
+              <a:t>types</a:t>
+            </a:r>
+            <a:r>
+              <a:rPr lang="pl-PL" dirty="0">
+                <a:solidFill>
+                  <a:srgbClr val="444444"/>
+                </a:solidFill>
+                <a:latin typeface="SFMono-Regular"/>
+              </a:rPr>
+              <a:t>/</a:t>
+            </a:r>
+            <a:r>
+              <a:rPr lang="pl-PL" dirty="0" err="1">
+                <a:solidFill>
+                  <a:srgbClr val="444444"/>
+                </a:solidFill>
+                <a:latin typeface="SFMono-Regular"/>
+              </a:rPr>
+              <a:t>react</a:t>
+            </a:r>
+            <a:r>
+              <a:rPr lang="pl-PL" dirty="0">
+                <a:solidFill>
+                  <a:srgbClr val="444444"/>
+                </a:solidFill>
+                <a:latin typeface="SFMono-Regular"/>
+              </a:rPr>
+              <a:t> @</a:t>
+            </a:r>
+            <a:r>
+              <a:rPr lang="pl-PL" dirty="0" err="1">
+                <a:solidFill>
+                  <a:srgbClr val="444444"/>
+                </a:solidFill>
+                <a:latin typeface="SFMono-Regular"/>
+              </a:rPr>
+              <a:t>types</a:t>
+            </a:r>
+            <a:r>
+              <a:rPr lang="pl-PL" dirty="0">
+                <a:solidFill>
+                  <a:srgbClr val="444444"/>
+                </a:solidFill>
+                <a:latin typeface="SFMono-Regular"/>
+              </a:rPr>
+              <a:t>/</a:t>
+            </a:r>
+            <a:r>
+              <a:rPr lang="pl-PL" dirty="0" err="1">
+                <a:solidFill>
+                  <a:srgbClr val="444444"/>
+                </a:solidFill>
+                <a:latin typeface="SFMono-Regular"/>
+              </a:rPr>
+              <a:t>react</a:t>
+            </a:r>
+            <a:r>
+              <a:rPr lang="pl-PL" dirty="0">
+                <a:solidFill>
+                  <a:srgbClr val="444444"/>
+                </a:solidFill>
+                <a:latin typeface="SFMono-Regular"/>
+              </a:rPr>
+              <a:t>-dom @</a:t>
+            </a:r>
+            <a:r>
+              <a:rPr lang="pl-PL" dirty="0" err="1">
+                <a:solidFill>
+                  <a:srgbClr val="444444"/>
+                </a:solidFill>
+                <a:latin typeface="SFMono-Regular"/>
+              </a:rPr>
+              <a:t>types</a:t>
+            </a:r>
+            <a:r>
+              <a:rPr lang="pl-PL" dirty="0">
+                <a:solidFill>
+                  <a:srgbClr val="444444"/>
+                </a:solidFill>
+                <a:latin typeface="SFMono-Regular"/>
+              </a:rPr>
+              <a:t>/jest @</a:t>
+            </a:r>
+            <a:r>
+              <a:rPr lang="pl-PL" dirty="0" err="1">
+                <a:solidFill>
+                  <a:srgbClr val="444444"/>
+                </a:solidFill>
+                <a:latin typeface="SFMono-Regular"/>
+              </a:rPr>
+              <a:t>types</a:t>
+            </a:r>
+            <a:r>
+              <a:rPr lang="pl-PL" dirty="0">
+                <a:solidFill>
+                  <a:srgbClr val="444444"/>
+                </a:solidFill>
+                <a:latin typeface="SFMono-Regular"/>
+              </a:rPr>
+              <a:t>/</a:t>
+            </a:r>
+            <a:r>
+              <a:rPr lang="pl-PL" dirty="0" err="1">
+                <a:solidFill>
+                  <a:srgbClr val="444444"/>
+                </a:solidFill>
+                <a:latin typeface="SFMono-Regular"/>
+              </a:rPr>
+              <a:t>react-redux</a:t>
+            </a:r>
+            <a:r>
+              <a:rPr lang="pl-PL" dirty="0">
+                <a:solidFill>
+                  <a:srgbClr val="444444"/>
+                </a:solidFill>
+                <a:latin typeface="SFMono-Regular"/>
+              </a:rPr>
+              <a:t> </a:t>
+            </a:r>
+            <a:br>
+              <a:rPr lang="pl-PL" dirty="0"/>
+            </a:br>
+            <a:endParaRPr lang="pl-PL" dirty="0"/>
+          </a:p>
+        </p:txBody>
+      </p:sp>
+      <p:sp>
+        <p:nvSpPr>
+          <p:cNvPr id="7" name="pole tekstowe 6">
+            <a:extLst>
+              <a:ext uri="{FF2B5EF4-FFF2-40B4-BE49-F238E27FC236}">
+                <a16:creationId xmlns:a16="http://schemas.microsoft.com/office/drawing/2014/main" id="{85CEC61C-E6FA-4321-8054-01BB41FC8274}"/>
+              </a:ext>
+            </a:extLst>
+          </p:cNvPr>
+          <p:cNvSpPr txBox="1"/>
+          <p:nvPr/>
+        </p:nvSpPr>
+        <p:spPr>
+          <a:xfrm>
+            <a:off x="2133600" y="2001655"/>
+            <a:ext cx="3013454" cy="369332"/>
+          </a:xfrm>
+          <a:prstGeom prst="rect">
+            <a:avLst/>
+          </a:prstGeom>
+          <a:noFill/>
+        </p:spPr>
+        <p:txBody>
+          <a:bodyPr wrap="none" rtlCol="0">
+            <a:spAutoFit/>
+          </a:bodyPr>
+          <a:lstStyle/>
+          <a:p>
+            <a:r>
+              <a:rPr lang="pl-PL" dirty="0" err="1">
+                <a:solidFill>
+                  <a:srgbClr val="00B050"/>
+                </a:solidFill>
+              </a:rPr>
+              <a:t>Add</a:t>
+            </a:r>
+            <a:r>
+              <a:rPr lang="pl-PL" dirty="0">
+                <a:solidFill>
+                  <a:srgbClr val="00B050"/>
+                </a:solidFill>
+              </a:rPr>
+              <a:t> </a:t>
+            </a:r>
+            <a:r>
+              <a:rPr lang="pl-PL" dirty="0" err="1">
+                <a:solidFill>
+                  <a:srgbClr val="00B050"/>
+                </a:solidFill>
+              </a:rPr>
+              <a:t>TypeScript</a:t>
+            </a:r>
+            <a:r>
+              <a:rPr lang="pl-PL" dirty="0">
+                <a:solidFill>
+                  <a:srgbClr val="00B050"/>
+                </a:solidFill>
+              </a:rPr>
+              <a:t> to </a:t>
+            </a:r>
+            <a:r>
+              <a:rPr lang="pl-PL" dirty="0" err="1">
+                <a:solidFill>
+                  <a:srgbClr val="00B050"/>
+                </a:solidFill>
+              </a:rPr>
+              <a:t>existing</a:t>
+            </a:r>
+            <a:r>
+              <a:rPr lang="pl-PL" dirty="0">
+                <a:solidFill>
+                  <a:srgbClr val="00B050"/>
+                </a:solidFill>
+              </a:rPr>
+              <a:t> </a:t>
+            </a:r>
+            <a:r>
+              <a:rPr lang="pl-PL" dirty="0" err="1">
+                <a:solidFill>
+                  <a:srgbClr val="00B050"/>
+                </a:solidFill>
+              </a:rPr>
+              <a:t>app</a:t>
+            </a:r>
+            <a:endParaRPr lang="pl-PL" dirty="0">
+              <a:solidFill>
+                <a:srgbClr val="00B050"/>
+              </a:solidFill>
+            </a:endParaRPr>
+          </a:p>
+        </p:txBody>
+      </p:sp>
+      <p:sp>
+        <p:nvSpPr>
+          <p:cNvPr id="8" name="Prostokąt 7">
+            <a:extLst>
+              <a:ext uri="{FF2B5EF4-FFF2-40B4-BE49-F238E27FC236}">
+                <a16:creationId xmlns:a16="http://schemas.microsoft.com/office/drawing/2014/main" id="{2A559368-EF25-436E-9171-8A0C65DE6BF4}"/>
+              </a:ext>
+            </a:extLst>
+          </p:cNvPr>
+          <p:cNvSpPr/>
+          <p:nvPr/>
+        </p:nvSpPr>
+        <p:spPr>
+          <a:xfrm>
+            <a:off x="2133600" y="3413024"/>
+            <a:ext cx="1025089" cy="369332"/>
+          </a:xfrm>
+          <a:prstGeom prst="rect">
+            <a:avLst/>
+          </a:prstGeom>
+        </p:spPr>
+        <p:txBody>
+          <a:bodyPr wrap="none">
+            <a:spAutoFit/>
+          </a:bodyPr>
+          <a:lstStyle/>
+          <a:p>
+            <a:r>
+              <a:rPr lang="pl-PL" dirty="0" err="1">
+                <a:solidFill>
+                  <a:srgbClr val="24292E"/>
+                </a:solidFill>
+                <a:latin typeface="SFMono-Regular"/>
+              </a:rPr>
+              <a:t>index.</a:t>
+            </a:r>
+            <a:r>
+              <a:rPr lang="pl-PL" b="1" dirty="0" err="1">
+                <a:solidFill>
+                  <a:srgbClr val="24292E"/>
+                </a:solidFill>
+                <a:latin typeface="SFMono-Regular"/>
+              </a:rPr>
+              <a:t>tsx</a:t>
+            </a:r>
+            <a:endParaRPr lang="pl-PL" b="1" dirty="0"/>
+          </a:p>
+        </p:txBody>
+      </p:sp>
+      <p:sp>
+        <p:nvSpPr>
+          <p:cNvPr id="9" name="pole tekstowe 8">
+            <a:extLst>
+              <a:ext uri="{FF2B5EF4-FFF2-40B4-BE49-F238E27FC236}">
+                <a16:creationId xmlns:a16="http://schemas.microsoft.com/office/drawing/2014/main" id="{252C003E-5958-47BE-AEEA-427BF59BD35E}"/>
+              </a:ext>
+            </a:extLst>
+          </p:cNvPr>
+          <p:cNvSpPr txBox="1"/>
+          <p:nvPr/>
+        </p:nvSpPr>
+        <p:spPr>
+          <a:xfrm>
+            <a:off x="2133600" y="3132842"/>
+            <a:ext cx="2006383" cy="369332"/>
+          </a:xfrm>
+          <a:prstGeom prst="rect">
+            <a:avLst/>
+          </a:prstGeom>
+          <a:noFill/>
+        </p:spPr>
+        <p:txBody>
+          <a:bodyPr wrap="none" rtlCol="0">
+            <a:spAutoFit/>
+          </a:bodyPr>
+          <a:lstStyle/>
+          <a:p>
+            <a:r>
+              <a:rPr lang="pl-PL" dirty="0" err="1">
+                <a:solidFill>
+                  <a:srgbClr val="00B050"/>
+                </a:solidFill>
+              </a:rPr>
+              <a:t>Rename</a:t>
+            </a:r>
+            <a:r>
+              <a:rPr lang="pl-PL" dirty="0">
+                <a:solidFill>
+                  <a:srgbClr val="00B050"/>
+                </a:solidFill>
+              </a:rPr>
+              <a:t> </a:t>
+            </a:r>
+            <a:r>
+              <a:rPr lang="pl-PL" dirty="0" err="1">
+                <a:solidFill>
+                  <a:srgbClr val="00B050"/>
+                </a:solidFill>
+              </a:rPr>
+              <a:t>files</a:t>
+            </a:r>
+            <a:r>
+              <a:rPr lang="pl-PL" dirty="0">
+                <a:solidFill>
+                  <a:srgbClr val="00B050"/>
+                </a:solidFill>
+              </a:rPr>
+              <a:t> to .</a:t>
+            </a:r>
+            <a:r>
+              <a:rPr lang="pl-PL" dirty="0" err="1">
+                <a:solidFill>
+                  <a:srgbClr val="00B050"/>
+                </a:solidFill>
+              </a:rPr>
+              <a:t>tsx</a:t>
+            </a:r>
+            <a:endParaRPr lang="pl-PL" dirty="0">
+              <a:solidFill>
+                <a:srgbClr val="00B050"/>
+              </a:solidFill>
+            </a:endParaRPr>
+          </a:p>
+        </p:txBody>
+      </p:sp>
+      <p:sp>
+        <p:nvSpPr>
+          <p:cNvPr id="11" name="Prostokąt 10">
+            <a:extLst>
+              <a:ext uri="{FF2B5EF4-FFF2-40B4-BE49-F238E27FC236}">
+                <a16:creationId xmlns:a16="http://schemas.microsoft.com/office/drawing/2014/main" id="{C588190C-EDF4-43F6-BD6C-9256679876E6}"/>
+              </a:ext>
+            </a:extLst>
+          </p:cNvPr>
+          <p:cNvSpPr/>
+          <p:nvPr/>
+        </p:nvSpPr>
+        <p:spPr>
+          <a:xfrm>
+            <a:off x="2133600" y="4302348"/>
+            <a:ext cx="1339021" cy="369332"/>
+          </a:xfrm>
+          <a:prstGeom prst="rect">
+            <a:avLst/>
+          </a:prstGeom>
+        </p:spPr>
+        <p:txBody>
+          <a:bodyPr wrap="none">
+            <a:spAutoFit/>
+          </a:bodyPr>
+          <a:lstStyle/>
+          <a:p>
+            <a:r>
+              <a:rPr lang="pl-PL" dirty="0" err="1">
+                <a:solidFill>
+                  <a:srgbClr val="24292E"/>
+                </a:solidFill>
+                <a:latin typeface="SFMono-Regular"/>
+              </a:rPr>
+              <a:t>npx</a:t>
+            </a:r>
+            <a:r>
+              <a:rPr lang="pl-PL" dirty="0">
+                <a:solidFill>
+                  <a:srgbClr val="24292E"/>
+                </a:solidFill>
+                <a:latin typeface="SFMono-Regular"/>
+              </a:rPr>
+              <a:t> </a:t>
+            </a:r>
+            <a:r>
+              <a:rPr lang="pl-PL" dirty="0" err="1">
+                <a:solidFill>
+                  <a:srgbClr val="24292E"/>
+                </a:solidFill>
+                <a:latin typeface="SFMono-Regular"/>
+              </a:rPr>
+              <a:t>tsc</a:t>
+            </a:r>
+            <a:r>
+              <a:rPr lang="pl-PL" dirty="0">
+                <a:solidFill>
+                  <a:srgbClr val="24292E"/>
+                </a:solidFill>
+                <a:latin typeface="SFMono-Regular"/>
+              </a:rPr>
+              <a:t> --</a:t>
+            </a:r>
+            <a:r>
+              <a:rPr lang="pl-PL" dirty="0" err="1">
+                <a:solidFill>
+                  <a:srgbClr val="24292E"/>
+                </a:solidFill>
+                <a:latin typeface="SFMono-Regular"/>
+              </a:rPr>
+              <a:t>init</a:t>
+            </a:r>
+            <a:endParaRPr lang="pl-PL" b="1" dirty="0"/>
+          </a:p>
+        </p:txBody>
+      </p:sp>
+      <p:sp>
+        <p:nvSpPr>
+          <p:cNvPr id="12" name="pole tekstowe 11">
+            <a:extLst>
+              <a:ext uri="{FF2B5EF4-FFF2-40B4-BE49-F238E27FC236}">
+                <a16:creationId xmlns:a16="http://schemas.microsoft.com/office/drawing/2014/main" id="{D5A90BD9-C2D0-452C-B966-C2473681957B}"/>
+              </a:ext>
+            </a:extLst>
+          </p:cNvPr>
+          <p:cNvSpPr txBox="1"/>
+          <p:nvPr/>
+        </p:nvSpPr>
+        <p:spPr>
+          <a:xfrm>
+            <a:off x="2133601" y="4051723"/>
+            <a:ext cx="1284262" cy="369332"/>
+          </a:xfrm>
+          <a:prstGeom prst="rect">
+            <a:avLst/>
+          </a:prstGeom>
+          <a:noFill/>
+        </p:spPr>
+        <p:txBody>
+          <a:bodyPr wrap="none" rtlCol="0">
+            <a:spAutoFit/>
+          </a:bodyPr>
+          <a:lstStyle/>
+          <a:p>
+            <a:r>
+              <a:rPr lang="pl-PL" dirty="0" err="1">
+                <a:solidFill>
+                  <a:srgbClr val="00B050"/>
+                </a:solidFill>
+              </a:rPr>
+              <a:t>Init</a:t>
+            </a:r>
+            <a:r>
+              <a:rPr lang="pl-PL" dirty="0">
+                <a:solidFill>
+                  <a:srgbClr val="00B050"/>
+                </a:solidFill>
+              </a:rPr>
+              <a:t> </a:t>
+            </a:r>
+            <a:r>
+              <a:rPr lang="pl-PL" dirty="0" err="1">
+                <a:solidFill>
+                  <a:srgbClr val="00B050"/>
+                </a:solidFill>
+              </a:rPr>
+              <a:t>tsconfig</a:t>
+            </a:r>
+            <a:endParaRPr lang="pl-PL" dirty="0">
+              <a:solidFill>
+                <a:srgbClr val="00B050"/>
+              </a:solidFill>
+            </a:endParaRPr>
+          </a:p>
+        </p:txBody>
+      </p:sp>
+    </p:spTree>
+    <p:extLst>
+      <p:ext uri="{BB962C8B-B14F-4D97-AF65-F5344CB8AC3E}">
+        <p14:creationId xmlns:p14="http://schemas.microsoft.com/office/powerpoint/2010/main" val="2485262463"/>
       </p:ext>
     </p:extLst>
   </p:cSld>

</xml_diff>